<commit_message>
Super early beginning of deck and narrative
</commit_message>
<xml_diff>
--- a/Secure Systems - CodeMash 2017.pptx
+++ b/Secure Systems - CodeMash 2017.pptx
@@ -5,15 +5,22 @@
     <p:sldMasterId id="2147483749" r:id="rId1"/>
   </p:sldMasterIdLst>
   <p:notesMasterIdLst>
-    <p:notesMasterId r:id="rId8"/>
+    <p:notesMasterId r:id="rId15"/>
   </p:notesMasterIdLst>
   <p:sldIdLst>
     <p:sldId id="395" r:id="rId2"/>
-    <p:sldId id="396" r:id="rId3"/>
-    <p:sldId id="483" r:id="rId4"/>
-    <p:sldId id="482" r:id="rId5"/>
-    <p:sldId id="484" r:id="rId6"/>
-    <p:sldId id="443" r:id="rId7"/>
+    <p:sldId id="486" r:id="rId3"/>
+    <p:sldId id="488" r:id="rId4"/>
+    <p:sldId id="489" r:id="rId5"/>
+    <p:sldId id="482" r:id="rId6"/>
+    <p:sldId id="490" r:id="rId7"/>
+    <p:sldId id="491" r:id="rId8"/>
+    <p:sldId id="492" r:id="rId9"/>
+    <p:sldId id="493" r:id="rId10"/>
+    <p:sldId id="494" r:id="rId11"/>
+    <p:sldId id="484" r:id="rId12"/>
+    <p:sldId id="485" r:id="rId13"/>
+    <p:sldId id="443" r:id="rId14"/>
   </p:sldIdLst>
   <p:sldSz cx="12192000" cy="6858000"/>
   <p:notesSz cx="6858000" cy="9144000"/>
@@ -213,7 +220,7 @@
           <a:p>
             <a:fld id="{C54A4886-B4AF-42F7-97BE-95CDF82A73E3}" type="datetimeFigureOut">
               <a:rPr lang="en-US" smtClean="0"/>
-              <a:t>12/3/2016</a:t>
+              <a:t>12/19/2016</a:t>
             </a:fld>
             <a:endParaRPr lang="en-US"/>
           </a:p>
@@ -573,6 +580,350 @@
 </p:notes>
 </file>
 
+<file path=ppt/notesSlides/notesSlide10.xml><?xml version="1.0" encoding="utf-8"?>
+<p:notes xmlns:a="http://schemas.openxmlformats.org/drawingml/2006/main" xmlns:r="http://schemas.openxmlformats.org/officeDocument/2006/relationships" xmlns:p="http://schemas.openxmlformats.org/presentationml/2006/main">
+  <p:cSld>
+    <p:spTree>
+      <p:nvGrpSpPr>
+        <p:cNvPr id="1" name=""/>
+        <p:cNvGrpSpPr/>
+        <p:nvPr/>
+      </p:nvGrpSpPr>
+      <p:grpSpPr>
+        <a:xfrm>
+          <a:off x="0" y="0"/>
+          <a:ext cx="0" cy="0"/>
+          <a:chOff x="0" y="0"/>
+          <a:chExt cx="0" cy="0"/>
+        </a:xfrm>
+      </p:grpSpPr>
+      <p:sp>
+        <p:nvSpPr>
+          <p:cNvPr id="2" name="Slide Image Placeholder 1"/>
+          <p:cNvSpPr>
+            <a:spLocks noGrp="1" noRot="1" noChangeAspect="1"/>
+          </p:cNvSpPr>
+          <p:nvPr>
+            <p:ph type="sldImg"/>
+          </p:nvPr>
+        </p:nvSpPr>
+        <p:spPr/>
+      </p:sp>
+      <p:sp>
+        <p:nvSpPr>
+          <p:cNvPr id="3" name="Notes Placeholder 2"/>
+          <p:cNvSpPr>
+            <a:spLocks noGrp="1"/>
+          </p:cNvSpPr>
+          <p:nvPr>
+            <p:ph type="body" idx="1"/>
+          </p:nvPr>
+        </p:nvSpPr>
+        <p:spPr/>
+        <p:txBody>
+          <a:bodyPr/>
+          <a:lstStyle/>
+          <a:p>
+            <a:endParaRPr lang="en-US" b="0" dirty="0" smtClean="0"/>
+          </a:p>
+        </p:txBody>
+      </p:sp>
+      <p:sp>
+        <p:nvSpPr>
+          <p:cNvPr id="4" name="Slide Number Placeholder 3"/>
+          <p:cNvSpPr>
+            <a:spLocks noGrp="1"/>
+          </p:cNvSpPr>
+          <p:nvPr>
+            <p:ph type="sldNum" sz="quarter" idx="10"/>
+          </p:nvPr>
+        </p:nvSpPr>
+        <p:spPr/>
+        <p:txBody>
+          <a:bodyPr/>
+          <a:lstStyle/>
+          <a:p>
+            <a:fld id="{89029652-62E7-43D6-83B5-097D7B7AA5D8}" type="slidenum">
+              <a:rPr lang="en-US" smtClean="0"/>
+              <a:t>10</a:t>
+            </a:fld>
+            <a:endParaRPr lang="en-US"/>
+          </a:p>
+        </p:txBody>
+      </p:sp>
+    </p:spTree>
+    <p:extLst>
+      <p:ext uri="{BB962C8B-B14F-4D97-AF65-F5344CB8AC3E}">
+        <p14:creationId xmlns:p14="http://schemas.microsoft.com/office/powerpoint/2010/main" val="455841040"/>
+      </p:ext>
+    </p:extLst>
+  </p:cSld>
+  <p:clrMapOvr>
+    <a:masterClrMapping/>
+  </p:clrMapOvr>
+</p:notes>
+</file>
+
+<file path=ppt/notesSlides/notesSlide11.xml><?xml version="1.0" encoding="utf-8"?>
+<p:notes xmlns:a="http://schemas.openxmlformats.org/drawingml/2006/main" xmlns:r="http://schemas.openxmlformats.org/officeDocument/2006/relationships" xmlns:p="http://schemas.openxmlformats.org/presentationml/2006/main">
+  <p:cSld>
+    <p:spTree>
+      <p:nvGrpSpPr>
+        <p:cNvPr id="1" name=""/>
+        <p:cNvGrpSpPr/>
+        <p:nvPr/>
+      </p:nvGrpSpPr>
+      <p:grpSpPr>
+        <a:xfrm>
+          <a:off x="0" y="0"/>
+          <a:ext cx="0" cy="0"/>
+          <a:chOff x="0" y="0"/>
+          <a:chExt cx="0" cy="0"/>
+        </a:xfrm>
+      </p:grpSpPr>
+      <p:sp>
+        <p:nvSpPr>
+          <p:cNvPr id="2" name="Slide Image Placeholder 1"/>
+          <p:cNvSpPr>
+            <a:spLocks noGrp="1" noRot="1" noChangeAspect="1"/>
+          </p:cNvSpPr>
+          <p:nvPr>
+            <p:ph type="sldImg"/>
+          </p:nvPr>
+        </p:nvSpPr>
+        <p:spPr/>
+      </p:sp>
+      <p:sp>
+        <p:nvSpPr>
+          <p:cNvPr id="3" name="Notes Placeholder 2"/>
+          <p:cNvSpPr>
+            <a:spLocks noGrp="1"/>
+          </p:cNvSpPr>
+          <p:nvPr>
+            <p:ph type="body" idx="1"/>
+          </p:nvPr>
+        </p:nvSpPr>
+        <p:spPr/>
+        <p:txBody>
+          <a:bodyPr/>
+          <a:lstStyle/>
+          <a:p>
+            <a:endParaRPr lang="en-US" b="0" dirty="0" smtClean="0"/>
+          </a:p>
+        </p:txBody>
+      </p:sp>
+      <p:sp>
+        <p:nvSpPr>
+          <p:cNvPr id="4" name="Slide Number Placeholder 3"/>
+          <p:cNvSpPr>
+            <a:spLocks noGrp="1"/>
+          </p:cNvSpPr>
+          <p:nvPr>
+            <p:ph type="sldNum" sz="quarter" idx="10"/>
+          </p:nvPr>
+        </p:nvSpPr>
+        <p:spPr/>
+        <p:txBody>
+          <a:bodyPr/>
+          <a:lstStyle/>
+          <a:p>
+            <a:fld id="{89029652-62E7-43D6-83B5-097D7B7AA5D8}" type="slidenum">
+              <a:rPr lang="en-US" smtClean="0"/>
+              <a:t>11</a:t>
+            </a:fld>
+            <a:endParaRPr lang="en-US"/>
+          </a:p>
+        </p:txBody>
+      </p:sp>
+    </p:spTree>
+    <p:extLst>
+      <p:ext uri="{BB962C8B-B14F-4D97-AF65-F5344CB8AC3E}">
+        <p14:creationId xmlns:p14="http://schemas.microsoft.com/office/powerpoint/2010/main" val="4212963282"/>
+      </p:ext>
+    </p:extLst>
+  </p:cSld>
+  <p:clrMapOvr>
+    <a:masterClrMapping/>
+  </p:clrMapOvr>
+</p:notes>
+</file>
+
+<file path=ppt/notesSlides/notesSlide12.xml><?xml version="1.0" encoding="utf-8"?>
+<p:notes xmlns:a="http://schemas.openxmlformats.org/drawingml/2006/main" xmlns:r="http://schemas.openxmlformats.org/officeDocument/2006/relationships" xmlns:p="http://schemas.openxmlformats.org/presentationml/2006/main">
+  <p:cSld>
+    <p:spTree>
+      <p:nvGrpSpPr>
+        <p:cNvPr id="1" name=""/>
+        <p:cNvGrpSpPr/>
+        <p:nvPr/>
+      </p:nvGrpSpPr>
+      <p:grpSpPr>
+        <a:xfrm>
+          <a:off x="0" y="0"/>
+          <a:ext cx="0" cy="0"/>
+          <a:chOff x="0" y="0"/>
+          <a:chExt cx="0" cy="0"/>
+        </a:xfrm>
+      </p:grpSpPr>
+      <p:sp>
+        <p:nvSpPr>
+          <p:cNvPr id="2" name="Slide Image Placeholder 1"/>
+          <p:cNvSpPr>
+            <a:spLocks noGrp="1" noRot="1" noChangeAspect="1"/>
+          </p:cNvSpPr>
+          <p:nvPr>
+            <p:ph type="sldImg"/>
+          </p:nvPr>
+        </p:nvSpPr>
+        <p:spPr/>
+      </p:sp>
+      <p:sp>
+        <p:nvSpPr>
+          <p:cNvPr id="3" name="Notes Placeholder 2"/>
+          <p:cNvSpPr>
+            <a:spLocks noGrp="1"/>
+          </p:cNvSpPr>
+          <p:nvPr>
+            <p:ph type="body" idx="1"/>
+          </p:nvPr>
+        </p:nvSpPr>
+        <p:spPr/>
+        <p:txBody>
+          <a:bodyPr/>
+          <a:lstStyle/>
+          <a:p>
+            <a:endParaRPr lang="en-US" b="0" dirty="0" smtClean="0"/>
+          </a:p>
+        </p:txBody>
+      </p:sp>
+      <p:sp>
+        <p:nvSpPr>
+          <p:cNvPr id="4" name="Slide Number Placeholder 3"/>
+          <p:cNvSpPr>
+            <a:spLocks noGrp="1"/>
+          </p:cNvSpPr>
+          <p:nvPr>
+            <p:ph type="sldNum" sz="quarter" idx="10"/>
+          </p:nvPr>
+        </p:nvSpPr>
+        <p:spPr/>
+        <p:txBody>
+          <a:bodyPr/>
+          <a:lstStyle/>
+          <a:p>
+            <a:fld id="{89029652-62E7-43D6-83B5-097D7B7AA5D8}" type="slidenum">
+              <a:rPr lang="en-US" smtClean="0"/>
+              <a:t>12</a:t>
+            </a:fld>
+            <a:endParaRPr lang="en-US"/>
+          </a:p>
+        </p:txBody>
+      </p:sp>
+    </p:spTree>
+    <p:extLst>
+      <p:ext uri="{BB962C8B-B14F-4D97-AF65-F5344CB8AC3E}">
+        <p14:creationId xmlns:p14="http://schemas.microsoft.com/office/powerpoint/2010/main" val="2267138517"/>
+      </p:ext>
+    </p:extLst>
+  </p:cSld>
+  <p:clrMapOvr>
+    <a:masterClrMapping/>
+  </p:clrMapOvr>
+</p:notes>
+</file>
+
+<file path=ppt/notesSlides/notesSlide13.xml><?xml version="1.0" encoding="utf-8"?>
+<p:notes xmlns:a="http://schemas.openxmlformats.org/drawingml/2006/main" xmlns:r="http://schemas.openxmlformats.org/officeDocument/2006/relationships" xmlns:p="http://schemas.openxmlformats.org/presentationml/2006/main">
+  <p:cSld>
+    <p:spTree>
+      <p:nvGrpSpPr>
+        <p:cNvPr id="1" name=""/>
+        <p:cNvGrpSpPr/>
+        <p:nvPr/>
+      </p:nvGrpSpPr>
+      <p:grpSpPr>
+        <a:xfrm>
+          <a:off x="0" y="0"/>
+          <a:ext cx="0" cy="0"/>
+          <a:chOff x="0" y="0"/>
+          <a:chExt cx="0" cy="0"/>
+        </a:xfrm>
+      </p:grpSpPr>
+      <p:sp>
+        <p:nvSpPr>
+          <p:cNvPr id="2" name="Slide Image Placeholder 1"/>
+          <p:cNvSpPr>
+            <a:spLocks noGrp="1" noRot="1" noChangeAspect="1"/>
+          </p:cNvSpPr>
+          <p:nvPr>
+            <p:ph type="sldImg"/>
+          </p:nvPr>
+        </p:nvSpPr>
+        <p:spPr/>
+      </p:sp>
+      <p:sp>
+        <p:nvSpPr>
+          <p:cNvPr id="3" name="Notes Placeholder 2"/>
+          <p:cNvSpPr>
+            <a:spLocks noGrp="1"/>
+          </p:cNvSpPr>
+          <p:nvPr>
+            <p:ph type="body" idx="1"/>
+          </p:nvPr>
+        </p:nvSpPr>
+        <p:spPr/>
+        <p:txBody>
+          <a:bodyPr/>
+          <a:lstStyle/>
+          <a:p>
+            <a:endParaRPr lang="en-US" sz="1200" kern="1200" dirty="0" smtClean="0">
+              <a:solidFill>
+                <a:schemeClr val="tx1"/>
+              </a:solidFill>
+              <a:effectLst/>
+              <a:latin typeface="+mn-lt"/>
+              <a:ea typeface="+mn-ea"/>
+              <a:cs typeface="+mn-cs"/>
+            </a:endParaRPr>
+          </a:p>
+        </p:txBody>
+      </p:sp>
+      <p:sp>
+        <p:nvSpPr>
+          <p:cNvPr id="4" name="Slide Number Placeholder 3"/>
+          <p:cNvSpPr>
+            <a:spLocks noGrp="1"/>
+          </p:cNvSpPr>
+          <p:nvPr>
+            <p:ph type="sldNum" sz="quarter" idx="10"/>
+          </p:nvPr>
+        </p:nvSpPr>
+        <p:spPr/>
+        <p:txBody>
+          <a:bodyPr/>
+          <a:lstStyle/>
+          <a:p>
+            <a:fld id="{89029652-62E7-43D6-83B5-097D7B7AA5D8}" type="slidenum">
+              <a:rPr lang="en-US" smtClean="0"/>
+              <a:t>13</a:t>
+            </a:fld>
+            <a:endParaRPr lang="en-US"/>
+          </a:p>
+        </p:txBody>
+      </p:sp>
+    </p:spTree>
+    <p:extLst>
+      <p:ext uri="{BB962C8B-B14F-4D97-AF65-F5344CB8AC3E}">
+        <p14:creationId xmlns:p14="http://schemas.microsoft.com/office/powerpoint/2010/main" val="2813022412"/>
+      </p:ext>
+    </p:extLst>
+  </p:cSld>
+  <p:clrMapOvr>
+    <a:masterClrMapping/>
+  </p:clrMapOvr>
+</p:notes>
+</file>
+
 <file path=ppt/notesSlides/notesSlide2.xml><?xml version="1.0" encoding="utf-8"?>
 <p:notes xmlns:a="http://schemas.openxmlformats.org/drawingml/2006/main" xmlns:r="http://schemas.openxmlformats.org/officeDocument/2006/relationships" xmlns:p="http://schemas.openxmlformats.org/presentationml/2006/main">
   <p:cSld>
@@ -672,7 +1023,7 @@
     </p:spTree>
     <p:extLst>
       <p:ext uri="{BB962C8B-B14F-4D97-AF65-F5344CB8AC3E}">
-        <p14:creationId xmlns:p14="http://schemas.microsoft.com/office/powerpoint/2010/main" val="2716095396"/>
+        <p14:creationId xmlns:p14="http://schemas.microsoft.com/office/powerpoint/2010/main" val="2712565248"/>
       </p:ext>
     </p:extLst>
   </p:cSld>
@@ -781,7 +1132,7 @@
     </p:spTree>
     <p:extLst>
       <p:ext uri="{BB962C8B-B14F-4D97-AF65-F5344CB8AC3E}">
-        <p14:creationId xmlns:p14="http://schemas.microsoft.com/office/powerpoint/2010/main" val="1914920869"/>
+        <p14:creationId xmlns:p14="http://schemas.microsoft.com/office/powerpoint/2010/main" val="2480999007"/>
       </p:ext>
     </p:extLst>
   </p:cSld>
@@ -835,7 +1186,32 @@
           <a:bodyPr/>
           <a:lstStyle/>
           <a:p>
-            <a:endParaRPr lang="en-US" b="0" dirty="0" smtClean="0"/>
+            <a:pPr marL="0" marR="0" indent="0" algn="l" defTabSz="914400" rtl="0" eaLnBrk="1" fontAlgn="auto" latinLnBrk="0" hangingPunct="1">
+              <a:lnSpc>
+                <a:spcPct val="100000"/>
+              </a:lnSpc>
+              <a:spcBef>
+                <a:spcPts val="0"/>
+              </a:spcBef>
+              <a:spcAft>
+                <a:spcPts val="0"/>
+              </a:spcAft>
+              <a:buClrTx/>
+              <a:buSzTx/>
+              <a:buFontTx/>
+              <a:buNone/>
+              <a:tabLst/>
+              <a:defRPr/>
+            </a:pPr>
+            <a:endParaRPr lang="en-US" sz="1200" kern="1200" dirty="0" smtClean="0">
+              <a:solidFill>
+                <a:schemeClr val="tx1"/>
+              </a:solidFill>
+              <a:effectLst/>
+              <a:latin typeface="+mn-lt"/>
+              <a:ea typeface="+mn-ea"/>
+              <a:cs typeface="+mn-cs"/>
+            </a:endParaRPr>
           </a:p>
         </p:txBody>
       </p:sp>
@@ -865,7 +1241,7 @@
     </p:spTree>
     <p:extLst>
       <p:ext uri="{BB962C8B-B14F-4D97-AF65-F5344CB8AC3E}">
-        <p14:creationId xmlns:p14="http://schemas.microsoft.com/office/powerpoint/2010/main" val="3283155068"/>
+        <p14:creationId xmlns:p14="http://schemas.microsoft.com/office/powerpoint/2010/main" val="1414051827"/>
       </p:ext>
     </p:extLst>
   </p:cSld>
@@ -949,7 +1325,7 @@
     </p:spTree>
     <p:extLst>
       <p:ext uri="{BB962C8B-B14F-4D97-AF65-F5344CB8AC3E}">
-        <p14:creationId xmlns:p14="http://schemas.microsoft.com/office/powerpoint/2010/main" val="4212963282"/>
+        <p14:creationId xmlns:p14="http://schemas.microsoft.com/office/powerpoint/2010/main" val="3283155068"/>
       </p:ext>
     </p:extLst>
   </p:cSld>
@@ -1003,15 +1379,7 @@
           <a:bodyPr/>
           <a:lstStyle/>
           <a:p>
-            <a:endParaRPr lang="en-US" sz="1200" kern="1200" dirty="0" smtClean="0">
-              <a:solidFill>
-                <a:schemeClr val="tx1"/>
-              </a:solidFill>
-              <a:effectLst/>
-              <a:latin typeface="+mn-lt"/>
-              <a:ea typeface="+mn-ea"/>
-              <a:cs typeface="+mn-cs"/>
-            </a:endParaRPr>
+            <a:endParaRPr lang="en-US" b="0" dirty="0" smtClean="0"/>
           </a:p>
         </p:txBody>
       </p:sp>
@@ -1041,7 +1409,259 @@
     </p:spTree>
     <p:extLst>
       <p:ext uri="{BB962C8B-B14F-4D97-AF65-F5344CB8AC3E}">
-        <p14:creationId xmlns:p14="http://schemas.microsoft.com/office/powerpoint/2010/main" val="2813022412"/>
+        <p14:creationId xmlns:p14="http://schemas.microsoft.com/office/powerpoint/2010/main" val="3857776700"/>
+      </p:ext>
+    </p:extLst>
+  </p:cSld>
+  <p:clrMapOvr>
+    <a:masterClrMapping/>
+  </p:clrMapOvr>
+</p:notes>
+</file>
+
+<file path=ppt/notesSlides/notesSlide7.xml><?xml version="1.0" encoding="utf-8"?>
+<p:notes xmlns:a="http://schemas.openxmlformats.org/drawingml/2006/main" xmlns:r="http://schemas.openxmlformats.org/officeDocument/2006/relationships" xmlns:p="http://schemas.openxmlformats.org/presentationml/2006/main">
+  <p:cSld>
+    <p:spTree>
+      <p:nvGrpSpPr>
+        <p:cNvPr id="1" name=""/>
+        <p:cNvGrpSpPr/>
+        <p:nvPr/>
+      </p:nvGrpSpPr>
+      <p:grpSpPr>
+        <a:xfrm>
+          <a:off x="0" y="0"/>
+          <a:ext cx="0" cy="0"/>
+          <a:chOff x="0" y="0"/>
+          <a:chExt cx="0" cy="0"/>
+        </a:xfrm>
+      </p:grpSpPr>
+      <p:sp>
+        <p:nvSpPr>
+          <p:cNvPr id="2" name="Slide Image Placeholder 1"/>
+          <p:cNvSpPr>
+            <a:spLocks noGrp="1" noRot="1" noChangeAspect="1"/>
+          </p:cNvSpPr>
+          <p:nvPr>
+            <p:ph type="sldImg"/>
+          </p:nvPr>
+        </p:nvSpPr>
+        <p:spPr/>
+      </p:sp>
+      <p:sp>
+        <p:nvSpPr>
+          <p:cNvPr id="3" name="Notes Placeholder 2"/>
+          <p:cNvSpPr>
+            <a:spLocks noGrp="1"/>
+          </p:cNvSpPr>
+          <p:nvPr>
+            <p:ph type="body" idx="1"/>
+          </p:nvPr>
+        </p:nvSpPr>
+        <p:spPr/>
+        <p:txBody>
+          <a:bodyPr/>
+          <a:lstStyle/>
+          <a:p>
+            <a:endParaRPr lang="en-US" b="0" dirty="0" smtClean="0"/>
+          </a:p>
+        </p:txBody>
+      </p:sp>
+      <p:sp>
+        <p:nvSpPr>
+          <p:cNvPr id="4" name="Slide Number Placeholder 3"/>
+          <p:cNvSpPr>
+            <a:spLocks noGrp="1"/>
+          </p:cNvSpPr>
+          <p:nvPr>
+            <p:ph type="sldNum" sz="quarter" idx="10"/>
+          </p:nvPr>
+        </p:nvSpPr>
+        <p:spPr/>
+        <p:txBody>
+          <a:bodyPr/>
+          <a:lstStyle/>
+          <a:p>
+            <a:fld id="{89029652-62E7-43D6-83B5-097D7B7AA5D8}" type="slidenum">
+              <a:rPr lang="en-US" smtClean="0"/>
+              <a:t>7</a:t>
+            </a:fld>
+            <a:endParaRPr lang="en-US"/>
+          </a:p>
+        </p:txBody>
+      </p:sp>
+    </p:spTree>
+    <p:extLst>
+      <p:ext uri="{BB962C8B-B14F-4D97-AF65-F5344CB8AC3E}">
+        <p14:creationId xmlns:p14="http://schemas.microsoft.com/office/powerpoint/2010/main" val="471706104"/>
+      </p:ext>
+    </p:extLst>
+  </p:cSld>
+  <p:clrMapOvr>
+    <a:masterClrMapping/>
+  </p:clrMapOvr>
+</p:notes>
+</file>
+
+<file path=ppt/notesSlides/notesSlide8.xml><?xml version="1.0" encoding="utf-8"?>
+<p:notes xmlns:a="http://schemas.openxmlformats.org/drawingml/2006/main" xmlns:r="http://schemas.openxmlformats.org/officeDocument/2006/relationships" xmlns:p="http://schemas.openxmlformats.org/presentationml/2006/main">
+  <p:cSld>
+    <p:spTree>
+      <p:nvGrpSpPr>
+        <p:cNvPr id="1" name=""/>
+        <p:cNvGrpSpPr/>
+        <p:nvPr/>
+      </p:nvGrpSpPr>
+      <p:grpSpPr>
+        <a:xfrm>
+          <a:off x="0" y="0"/>
+          <a:ext cx="0" cy="0"/>
+          <a:chOff x="0" y="0"/>
+          <a:chExt cx="0" cy="0"/>
+        </a:xfrm>
+      </p:grpSpPr>
+      <p:sp>
+        <p:nvSpPr>
+          <p:cNvPr id="2" name="Slide Image Placeholder 1"/>
+          <p:cNvSpPr>
+            <a:spLocks noGrp="1" noRot="1" noChangeAspect="1"/>
+          </p:cNvSpPr>
+          <p:nvPr>
+            <p:ph type="sldImg"/>
+          </p:nvPr>
+        </p:nvSpPr>
+        <p:spPr/>
+      </p:sp>
+      <p:sp>
+        <p:nvSpPr>
+          <p:cNvPr id="3" name="Notes Placeholder 2"/>
+          <p:cNvSpPr>
+            <a:spLocks noGrp="1"/>
+          </p:cNvSpPr>
+          <p:nvPr>
+            <p:ph type="body" idx="1"/>
+          </p:nvPr>
+        </p:nvSpPr>
+        <p:spPr/>
+        <p:txBody>
+          <a:bodyPr/>
+          <a:lstStyle/>
+          <a:p>
+            <a:endParaRPr lang="en-US" b="0" dirty="0" smtClean="0"/>
+          </a:p>
+        </p:txBody>
+      </p:sp>
+      <p:sp>
+        <p:nvSpPr>
+          <p:cNvPr id="4" name="Slide Number Placeholder 3"/>
+          <p:cNvSpPr>
+            <a:spLocks noGrp="1"/>
+          </p:cNvSpPr>
+          <p:nvPr>
+            <p:ph type="sldNum" sz="quarter" idx="10"/>
+          </p:nvPr>
+        </p:nvSpPr>
+        <p:spPr/>
+        <p:txBody>
+          <a:bodyPr/>
+          <a:lstStyle/>
+          <a:p>
+            <a:fld id="{89029652-62E7-43D6-83B5-097D7B7AA5D8}" type="slidenum">
+              <a:rPr lang="en-US" smtClean="0"/>
+              <a:t>8</a:t>
+            </a:fld>
+            <a:endParaRPr lang="en-US"/>
+          </a:p>
+        </p:txBody>
+      </p:sp>
+    </p:spTree>
+    <p:extLst>
+      <p:ext uri="{BB962C8B-B14F-4D97-AF65-F5344CB8AC3E}">
+        <p14:creationId xmlns:p14="http://schemas.microsoft.com/office/powerpoint/2010/main" val="904030834"/>
+      </p:ext>
+    </p:extLst>
+  </p:cSld>
+  <p:clrMapOvr>
+    <a:masterClrMapping/>
+  </p:clrMapOvr>
+</p:notes>
+</file>
+
+<file path=ppt/notesSlides/notesSlide9.xml><?xml version="1.0" encoding="utf-8"?>
+<p:notes xmlns:a="http://schemas.openxmlformats.org/drawingml/2006/main" xmlns:r="http://schemas.openxmlformats.org/officeDocument/2006/relationships" xmlns:p="http://schemas.openxmlformats.org/presentationml/2006/main">
+  <p:cSld>
+    <p:spTree>
+      <p:nvGrpSpPr>
+        <p:cNvPr id="1" name=""/>
+        <p:cNvGrpSpPr/>
+        <p:nvPr/>
+      </p:nvGrpSpPr>
+      <p:grpSpPr>
+        <a:xfrm>
+          <a:off x="0" y="0"/>
+          <a:ext cx="0" cy="0"/>
+          <a:chOff x="0" y="0"/>
+          <a:chExt cx="0" cy="0"/>
+        </a:xfrm>
+      </p:grpSpPr>
+      <p:sp>
+        <p:nvSpPr>
+          <p:cNvPr id="2" name="Slide Image Placeholder 1"/>
+          <p:cNvSpPr>
+            <a:spLocks noGrp="1" noRot="1" noChangeAspect="1"/>
+          </p:cNvSpPr>
+          <p:nvPr>
+            <p:ph type="sldImg"/>
+          </p:nvPr>
+        </p:nvSpPr>
+        <p:spPr/>
+      </p:sp>
+      <p:sp>
+        <p:nvSpPr>
+          <p:cNvPr id="3" name="Notes Placeholder 2"/>
+          <p:cNvSpPr>
+            <a:spLocks noGrp="1"/>
+          </p:cNvSpPr>
+          <p:nvPr>
+            <p:ph type="body" idx="1"/>
+          </p:nvPr>
+        </p:nvSpPr>
+        <p:spPr/>
+        <p:txBody>
+          <a:bodyPr/>
+          <a:lstStyle/>
+          <a:p>
+            <a:endParaRPr lang="en-US" b="0" dirty="0" smtClean="0"/>
+          </a:p>
+        </p:txBody>
+      </p:sp>
+      <p:sp>
+        <p:nvSpPr>
+          <p:cNvPr id="4" name="Slide Number Placeholder 3"/>
+          <p:cNvSpPr>
+            <a:spLocks noGrp="1"/>
+          </p:cNvSpPr>
+          <p:nvPr>
+            <p:ph type="sldNum" sz="quarter" idx="10"/>
+          </p:nvPr>
+        </p:nvSpPr>
+        <p:spPr/>
+        <p:txBody>
+          <a:bodyPr/>
+          <a:lstStyle/>
+          <a:p>
+            <a:fld id="{89029652-62E7-43D6-83B5-097D7B7AA5D8}" type="slidenum">
+              <a:rPr lang="en-US" smtClean="0"/>
+              <a:t>9</a:t>
+            </a:fld>
+            <a:endParaRPr lang="en-US"/>
+          </a:p>
+        </p:txBody>
+      </p:sp>
+    </p:spTree>
+    <p:extLst>
+      <p:ext uri="{BB962C8B-B14F-4D97-AF65-F5344CB8AC3E}">
+        <p14:creationId xmlns:p14="http://schemas.microsoft.com/office/powerpoint/2010/main" val="2815086961"/>
       </p:ext>
     </p:extLst>
   </p:cSld>
@@ -1182,7 +1802,7 @@
           <a:p>
             <a:fld id="{75AA6396-395E-4ADA-8EE5-F328BC863A04}" type="datetimeFigureOut">
               <a:rPr lang="en-US" smtClean="0"/>
-              <a:t>12/3/2016</a:t>
+              <a:t>12/19/2016</a:t>
             </a:fld>
             <a:endParaRPr lang="en-US"/>
           </a:p>
@@ -1359,7 +1979,7 @@
           <a:p>
             <a:fld id="{75AA6396-395E-4ADA-8EE5-F328BC863A04}" type="datetimeFigureOut">
               <a:rPr lang="en-US" smtClean="0"/>
-              <a:t>12/3/2016</a:t>
+              <a:t>12/19/2016</a:t>
             </a:fld>
             <a:endParaRPr lang="en-US"/>
           </a:p>
@@ -1539,7 +2159,7 @@
           <a:p>
             <a:fld id="{75AA6396-395E-4ADA-8EE5-F328BC863A04}" type="datetimeFigureOut">
               <a:rPr lang="en-US" smtClean="0"/>
-              <a:t>12/3/2016</a:t>
+              <a:t>12/19/2016</a:t>
             </a:fld>
             <a:endParaRPr lang="en-US"/>
           </a:p>
@@ -1759,7 +2379,7 @@
           <a:p>
             <a:fld id="{75AA6396-395E-4ADA-8EE5-F328BC863A04}" type="datetimeFigureOut">
               <a:rPr lang="en-US" smtClean="0"/>
-              <a:t>12/3/2016</a:t>
+              <a:t>12/19/2016</a:t>
             </a:fld>
             <a:endParaRPr lang="en-US"/>
           </a:p>
@@ -2012,7 +2632,7 @@
           <a:p>
             <a:fld id="{75AA6396-395E-4ADA-8EE5-F328BC863A04}" type="datetimeFigureOut">
               <a:rPr lang="en-US" smtClean="0"/>
-              <a:t>12/3/2016</a:t>
+              <a:t>12/19/2016</a:t>
             </a:fld>
             <a:endParaRPr lang="en-US"/>
           </a:p>
@@ -2251,7 +2871,7 @@
           <a:p>
             <a:fld id="{75AA6396-395E-4ADA-8EE5-F328BC863A04}" type="datetimeFigureOut">
               <a:rPr lang="en-US" smtClean="0"/>
-              <a:t>12/3/2016</a:t>
+              <a:t>12/19/2016</a:t>
             </a:fld>
             <a:endParaRPr lang="en-US"/>
           </a:p>
@@ -2625,7 +3245,7 @@
           <a:p>
             <a:fld id="{75AA6396-395E-4ADA-8EE5-F328BC863A04}" type="datetimeFigureOut">
               <a:rPr lang="en-US" smtClean="0"/>
-              <a:t>12/3/2016</a:t>
+              <a:t>12/19/2016</a:t>
             </a:fld>
             <a:endParaRPr lang="en-US"/>
           </a:p>
@@ -2743,7 +3363,7 @@
           <a:p>
             <a:fld id="{75AA6396-395E-4ADA-8EE5-F328BC863A04}" type="datetimeFigureOut">
               <a:rPr lang="en-US" smtClean="0"/>
-              <a:t>12/3/2016</a:t>
+              <a:t>12/19/2016</a:t>
             </a:fld>
             <a:endParaRPr lang="en-US"/>
           </a:p>
@@ -2838,7 +3458,7 @@
           <a:p>
             <a:fld id="{75AA6396-395E-4ADA-8EE5-F328BC863A04}" type="datetimeFigureOut">
               <a:rPr lang="en-US" smtClean="0"/>
-              <a:t>12/3/2016</a:t>
+              <a:t>12/19/2016</a:t>
             </a:fld>
             <a:endParaRPr lang="en-US"/>
           </a:p>
@@ -3115,7 +3735,7 @@
           <a:p>
             <a:fld id="{75AA6396-395E-4ADA-8EE5-F328BC863A04}" type="datetimeFigureOut">
               <a:rPr lang="en-US" smtClean="0"/>
-              <a:t>12/3/2016</a:t>
+              <a:t>12/19/2016</a:t>
             </a:fld>
             <a:endParaRPr lang="en-US"/>
           </a:p>
@@ -3368,7 +3988,7 @@
           <a:p>
             <a:fld id="{75AA6396-395E-4ADA-8EE5-F328BC863A04}" type="datetimeFigureOut">
               <a:rPr lang="en-US" smtClean="0"/>
-              <a:t>12/3/2016</a:t>
+              <a:t>12/19/2016</a:t>
             </a:fld>
             <a:endParaRPr lang="en-US"/>
           </a:p>
@@ -3581,7 +4201,7 @@
           <a:p>
             <a:fld id="{75AA6396-395E-4ADA-8EE5-F328BC863A04}" type="datetimeFigureOut">
               <a:rPr lang="en-US" smtClean="0"/>
-              <a:t>12/3/2016</a:t>
+              <a:t>12/19/2016</a:t>
             </a:fld>
             <a:endParaRPr lang="en-US"/>
           </a:p>
@@ -4127,6 +4747,551 @@
 </p:sld>
 </file>
 
+<file path=ppt/slides/slide10.xml><?xml version="1.0" encoding="utf-8"?>
+<p:sld xmlns:a="http://schemas.openxmlformats.org/drawingml/2006/main" xmlns:r="http://schemas.openxmlformats.org/officeDocument/2006/relationships" xmlns:p="http://schemas.openxmlformats.org/presentationml/2006/main">
+  <p:cSld>
+    <p:spTree>
+      <p:nvGrpSpPr>
+        <p:cNvPr id="1" name=""/>
+        <p:cNvGrpSpPr/>
+        <p:nvPr/>
+      </p:nvGrpSpPr>
+      <p:grpSpPr>
+        <a:xfrm>
+          <a:off x="0" y="0"/>
+          <a:ext cx="0" cy="0"/>
+          <a:chOff x="0" y="0"/>
+          <a:chExt cx="0" cy="0"/>
+        </a:xfrm>
+      </p:grpSpPr>
+      <p:sp>
+        <p:nvSpPr>
+          <p:cNvPr id="2" name="Title 1"/>
+          <p:cNvSpPr>
+            <a:spLocks noGrp="1"/>
+          </p:cNvSpPr>
+          <p:nvPr>
+            <p:ph type="title"/>
+          </p:nvPr>
+        </p:nvSpPr>
+        <p:spPr/>
+        <p:txBody>
+          <a:bodyPr>
+            <a:normAutofit/>
+          </a:bodyPr>
+          <a:lstStyle/>
+          <a:p>
+            <a:r>
+              <a:rPr lang="en-US" sz="4800" dirty="0" smtClean="0"/>
+              <a:t>"Cross cutting" concerns</a:t>
+            </a:r>
+            <a:endParaRPr lang="en-US" sz="4800" dirty="0"/>
+          </a:p>
+        </p:txBody>
+      </p:sp>
+      <p:sp>
+        <p:nvSpPr>
+          <p:cNvPr id="3" name="Content Placeholder 2"/>
+          <p:cNvSpPr>
+            <a:spLocks noGrp="1"/>
+          </p:cNvSpPr>
+          <p:nvPr>
+            <p:ph idx="1"/>
+          </p:nvPr>
+        </p:nvSpPr>
+        <p:spPr>
+          <a:xfrm>
+            <a:off x="838200" y="1825624"/>
+            <a:ext cx="10515600" cy="4589923"/>
+          </a:xfrm>
+        </p:spPr>
+        <p:txBody>
+          <a:bodyPr>
+            <a:normAutofit/>
+          </a:bodyPr>
+          <a:lstStyle/>
+          <a:p>
+            <a:endParaRPr lang="en-US" sz="4000" dirty="0"/>
+          </a:p>
+          <a:p>
+            <a:endParaRPr lang="en-US" sz="4000" dirty="0" smtClean="0"/>
+          </a:p>
+          <a:p>
+            <a:endParaRPr lang="en-US" sz="4000" dirty="0" smtClean="0"/>
+          </a:p>
+          <a:p>
+            <a:endParaRPr lang="en-US" dirty="0" smtClean="0"/>
+          </a:p>
+          <a:p>
+            <a:endParaRPr lang="en-US" dirty="0" smtClean="0"/>
+          </a:p>
+          <a:p>
+            <a:endParaRPr lang="en-US" dirty="0"/>
+          </a:p>
+        </p:txBody>
+      </p:sp>
+      <p:pic>
+        <p:nvPicPr>
+          <p:cNvPr id="4" name="Picture 3"/>
+          <p:cNvPicPr>
+            <a:picLocks noChangeAspect="1"/>
+          </p:cNvPicPr>
+          <p:nvPr/>
+        </p:nvPicPr>
+        <p:blipFill>
+          <a:blip r:embed="rId3"/>
+          <a:stretch>
+            <a:fillRect/>
+          </a:stretch>
+        </p:blipFill>
+        <p:spPr>
+          <a:xfrm>
+            <a:off x="838199" y="2769935"/>
+            <a:ext cx="10619049" cy="2819704"/>
+          </a:xfrm>
+          <a:prstGeom prst="rect">
+            <a:avLst/>
+          </a:prstGeom>
+        </p:spPr>
+      </p:pic>
+    </p:spTree>
+    <p:extLst>
+      <p:ext uri="{BB962C8B-B14F-4D97-AF65-F5344CB8AC3E}">
+        <p14:creationId xmlns:p14="http://schemas.microsoft.com/office/powerpoint/2010/main" val="828356661"/>
+      </p:ext>
+    </p:extLst>
+  </p:cSld>
+  <p:clrMapOvr>
+    <a:masterClrMapping/>
+  </p:clrMapOvr>
+  <p:timing>
+    <p:tnLst>
+      <p:par>
+        <p:cTn id="1" dur="indefinite" restart="never" nodeType="tmRoot"/>
+      </p:par>
+    </p:tnLst>
+  </p:timing>
+</p:sld>
+</file>
+
+<file path=ppt/slides/slide11.xml><?xml version="1.0" encoding="utf-8"?>
+<p:sld xmlns:a="http://schemas.openxmlformats.org/drawingml/2006/main" xmlns:r="http://schemas.openxmlformats.org/officeDocument/2006/relationships" xmlns:p="http://schemas.openxmlformats.org/presentationml/2006/main">
+  <p:cSld>
+    <p:spTree>
+      <p:nvGrpSpPr>
+        <p:cNvPr id="1" name=""/>
+        <p:cNvGrpSpPr/>
+        <p:nvPr/>
+      </p:nvGrpSpPr>
+      <p:grpSpPr>
+        <a:xfrm>
+          <a:off x="0" y="0"/>
+          <a:ext cx="0" cy="0"/>
+          <a:chOff x="0" y="0"/>
+          <a:chExt cx="0" cy="0"/>
+        </a:xfrm>
+      </p:grpSpPr>
+      <p:sp>
+        <p:nvSpPr>
+          <p:cNvPr id="2" name="Title 1"/>
+          <p:cNvSpPr>
+            <a:spLocks noGrp="1"/>
+          </p:cNvSpPr>
+          <p:nvPr>
+            <p:ph type="title"/>
+          </p:nvPr>
+        </p:nvSpPr>
+        <p:spPr/>
+        <p:txBody>
+          <a:bodyPr>
+            <a:normAutofit/>
+          </a:bodyPr>
+          <a:lstStyle/>
+          <a:p>
+            <a:r>
+              <a:rPr lang="en-US" sz="4800" dirty="0" smtClean="0"/>
+              <a:t>Patented step-by-step slide</a:t>
+            </a:r>
+            <a:endParaRPr lang="en-US" sz="4800" dirty="0"/>
+          </a:p>
+        </p:txBody>
+      </p:sp>
+      <p:sp>
+        <p:nvSpPr>
+          <p:cNvPr id="3" name="Content Placeholder 2"/>
+          <p:cNvSpPr>
+            <a:spLocks noGrp="1"/>
+          </p:cNvSpPr>
+          <p:nvPr>
+            <p:ph idx="1"/>
+          </p:nvPr>
+        </p:nvSpPr>
+        <p:spPr>
+          <a:xfrm>
+            <a:off x="838200" y="1825624"/>
+            <a:ext cx="10515600" cy="4589923"/>
+          </a:xfrm>
+        </p:spPr>
+        <p:txBody>
+          <a:bodyPr>
+            <a:normAutofit/>
+          </a:bodyPr>
+          <a:lstStyle/>
+          <a:p>
+            <a:r>
+              <a:rPr lang="en-US" sz="4000" dirty="0" smtClean="0">
+                <a:solidFill>
+                  <a:schemeClr val="bg1">
+                    <a:lumMod val="65000"/>
+                  </a:schemeClr>
+                </a:solidFill>
+              </a:rPr>
+              <a:t>Old news</a:t>
+            </a:r>
+            <a:br>
+              <a:rPr lang="en-US" sz="4000" dirty="0" smtClean="0">
+                <a:solidFill>
+                  <a:schemeClr val="bg1">
+                    <a:lumMod val="65000"/>
+                  </a:schemeClr>
+                </a:solidFill>
+              </a:rPr>
+            </a:br>
+            <a:endParaRPr lang="en-US" sz="4000" dirty="0" smtClean="0">
+              <a:solidFill>
+                <a:schemeClr val="bg1">
+                  <a:lumMod val="65000"/>
+                </a:schemeClr>
+              </a:solidFill>
+            </a:endParaRPr>
+          </a:p>
+          <a:p>
+            <a:r>
+              <a:rPr lang="en-US" sz="4000" b="1" dirty="0" smtClean="0"/>
+              <a:t>New hotness</a:t>
+            </a:r>
+          </a:p>
+          <a:p>
+            <a:endParaRPr lang="en-US" sz="4000" dirty="0" smtClean="0"/>
+          </a:p>
+          <a:p>
+            <a:endParaRPr lang="en-US" dirty="0" smtClean="0"/>
+          </a:p>
+          <a:p>
+            <a:endParaRPr lang="en-US" dirty="0" smtClean="0"/>
+          </a:p>
+          <a:p>
+            <a:endParaRPr lang="en-US" dirty="0"/>
+          </a:p>
+        </p:txBody>
+      </p:sp>
+    </p:spTree>
+    <p:extLst>
+      <p:ext uri="{BB962C8B-B14F-4D97-AF65-F5344CB8AC3E}">
+        <p14:creationId xmlns:p14="http://schemas.microsoft.com/office/powerpoint/2010/main" val="2285767896"/>
+      </p:ext>
+    </p:extLst>
+  </p:cSld>
+  <p:clrMapOvr>
+    <a:masterClrMapping/>
+  </p:clrMapOvr>
+  <p:timing>
+    <p:tnLst>
+      <p:par>
+        <p:cTn id="1" dur="indefinite" restart="never" nodeType="tmRoot"/>
+      </p:par>
+    </p:tnLst>
+  </p:timing>
+</p:sld>
+</file>
+
+<file path=ppt/slides/slide12.xml><?xml version="1.0" encoding="utf-8"?>
+<p:sld xmlns:a="http://schemas.openxmlformats.org/drawingml/2006/main" xmlns:r="http://schemas.openxmlformats.org/officeDocument/2006/relationships" xmlns:p="http://schemas.openxmlformats.org/presentationml/2006/main">
+  <p:cSld>
+    <p:spTree>
+      <p:nvGrpSpPr>
+        <p:cNvPr id="1" name=""/>
+        <p:cNvGrpSpPr/>
+        <p:nvPr/>
+      </p:nvGrpSpPr>
+      <p:grpSpPr>
+        <a:xfrm>
+          <a:off x="0" y="0"/>
+          <a:ext cx="0" cy="0"/>
+          <a:chOff x="0" y="0"/>
+          <a:chExt cx="0" cy="0"/>
+        </a:xfrm>
+      </p:grpSpPr>
+      <p:sp>
+        <p:nvSpPr>
+          <p:cNvPr id="2" name="Title 1"/>
+          <p:cNvSpPr>
+            <a:spLocks noGrp="1"/>
+          </p:cNvSpPr>
+          <p:nvPr>
+            <p:ph type="title"/>
+          </p:nvPr>
+        </p:nvSpPr>
+        <p:spPr/>
+        <p:txBody>
+          <a:bodyPr>
+            <a:normAutofit/>
+          </a:bodyPr>
+          <a:lstStyle/>
+          <a:p>
+            <a:r>
+              <a:rPr lang="en-US" sz="4800" dirty="0" smtClean="0"/>
+              <a:t>Canonical example: SQL Injection</a:t>
+            </a:r>
+            <a:endParaRPr lang="en-US" sz="4800" dirty="0"/>
+          </a:p>
+        </p:txBody>
+      </p:sp>
+      <p:sp>
+        <p:nvSpPr>
+          <p:cNvPr id="3" name="Content Placeholder 2"/>
+          <p:cNvSpPr>
+            <a:spLocks noGrp="1"/>
+          </p:cNvSpPr>
+          <p:nvPr>
+            <p:ph idx="1"/>
+          </p:nvPr>
+        </p:nvSpPr>
+        <p:spPr>
+          <a:xfrm>
+            <a:off x="838200" y="1825624"/>
+            <a:ext cx="10515600" cy="4589923"/>
+          </a:xfrm>
+        </p:spPr>
+        <p:txBody>
+          <a:bodyPr>
+            <a:normAutofit/>
+          </a:bodyPr>
+          <a:lstStyle/>
+          <a:p>
+            <a:endParaRPr lang="en-US" sz="4000" dirty="0" smtClean="0"/>
+          </a:p>
+          <a:p>
+            <a:endParaRPr lang="en-US" dirty="0" smtClean="0"/>
+          </a:p>
+          <a:p>
+            <a:endParaRPr lang="en-US" dirty="0" smtClean="0"/>
+          </a:p>
+          <a:p>
+            <a:endParaRPr lang="en-US" dirty="0"/>
+          </a:p>
+        </p:txBody>
+      </p:sp>
+    </p:spTree>
+    <p:extLst>
+      <p:ext uri="{BB962C8B-B14F-4D97-AF65-F5344CB8AC3E}">
+        <p14:creationId xmlns:p14="http://schemas.microsoft.com/office/powerpoint/2010/main" val="1766242099"/>
+      </p:ext>
+    </p:extLst>
+  </p:cSld>
+  <p:clrMapOvr>
+    <a:masterClrMapping/>
+  </p:clrMapOvr>
+  <p:timing>
+    <p:tnLst>
+      <p:par>
+        <p:cTn id="1" dur="indefinite" restart="never" nodeType="tmRoot"/>
+      </p:par>
+    </p:tnLst>
+  </p:timing>
+</p:sld>
+</file>
+
+<file path=ppt/slides/slide13.xml><?xml version="1.0" encoding="utf-8"?>
+<p:sld xmlns:a="http://schemas.openxmlformats.org/drawingml/2006/main" xmlns:r="http://schemas.openxmlformats.org/officeDocument/2006/relationships" xmlns:p="http://schemas.openxmlformats.org/presentationml/2006/main">
+  <p:cSld>
+    <p:spTree>
+      <p:nvGrpSpPr>
+        <p:cNvPr id="1" name=""/>
+        <p:cNvGrpSpPr/>
+        <p:nvPr/>
+      </p:nvGrpSpPr>
+      <p:grpSpPr>
+        <a:xfrm>
+          <a:off x="0" y="0"/>
+          <a:ext cx="0" cy="0"/>
+          <a:chOff x="0" y="0"/>
+          <a:chExt cx="0" cy="0"/>
+        </a:xfrm>
+      </p:grpSpPr>
+      <p:sp>
+        <p:nvSpPr>
+          <p:cNvPr id="2" name="Title 1"/>
+          <p:cNvSpPr>
+            <a:spLocks noGrp="1"/>
+          </p:cNvSpPr>
+          <p:nvPr>
+            <p:ph type="title"/>
+          </p:nvPr>
+        </p:nvSpPr>
+        <p:spPr>
+          <a:xfrm>
+            <a:off x="838200" y="365125"/>
+            <a:ext cx="10886768" cy="1325563"/>
+          </a:xfrm>
+        </p:spPr>
+        <p:txBody>
+          <a:bodyPr>
+            <a:noAutofit/>
+          </a:bodyPr>
+          <a:lstStyle/>
+          <a:p>
+            <a:r>
+              <a:rPr lang="en-US" sz="4800" dirty="0" smtClean="0"/>
+              <a:t>Closing slide</a:t>
+            </a:r>
+            <a:endParaRPr lang="en-US" sz="4800" dirty="0"/>
+          </a:p>
+        </p:txBody>
+      </p:sp>
+      <p:sp>
+        <p:nvSpPr>
+          <p:cNvPr id="3" name="Content Placeholder 2"/>
+          <p:cNvSpPr>
+            <a:spLocks noGrp="1"/>
+          </p:cNvSpPr>
+          <p:nvPr>
+            <p:ph idx="1"/>
+          </p:nvPr>
+        </p:nvSpPr>
+        <p:spPr>
+          <a:xfrm>
+            <a:off x="838200" y="1825625"/>
+            <a:ext cx="11137490" cy="4899640"/>
+          </a:xfrm>
+        </p:spPr>
+        <p:txBody>
+          <a:bodyPr>
+            <a:normAutofit/>
+          </a:bodyPr>
+          <a:lstStyle/>
+          <a:p>
+            <a:r>
+              <a:rPr lang="en-US" sz="4000" dirty="0" smtClean="0"/>
+              <a:t>The knowledge gets dropped here</a:t>
+            </a:r>
+          </a:p>
+          <a:p>
+            <a:pPr marL="0" indent="0">
+              <a:buNone/>
+            </a:pPr>
+            <a:endParaRPr lang="en-US" sz="3200" dirty="0" smtClean="0">
+              <a:hlinkClick r:id="rId3"/>
+            </a:endParaRPr>
+          </a:p>
+          <a:p>
+            <a:pPr marL="0" indent="0">
+              <a:buNone/>
+            </a:pPr>
+            <a:r>
+              <a:rPr lang="en-US" sz="3600" dirty="0" smtClean="0">
+                <a:hlinkClick r:id="rId3"/>
+              </a:rPr>
+              <a:t>github.com/</a:t>
+            </a:r>
+            <a:r>
+              <a:rPr lang="en-US" sz="3600" dirty="0" err="1" smtClean="0">
+                <a:hlinkClick r:id="rId3"/>
+              </a:rPr>
+              <a:t>spetryjohnson</a:t>
+            </a:r>
+            <a:r>
+              <a:rPr lang="en-US" sz="3600" dirty="0" smtClean="0"/>
+              <a:t> </a:t>
+            </a:r>
+            <a:r>
+              <a:rPr lang="en-US" sz="3600" dirty="0" smtClean="0">
+                <a:solidFill>
+                  <a:schemeClr val="bg1">
+                    <a:lumMod val="50000"/>
+                  </a:schemeClr>
+                </a:solidFill>
+              </a:rPr>
+              <a:t>|</a:t>
+            </a:r>
+            <a:r>
+              <a:rPr lang="en-US" sz="3600" dirty="0" smtClean="0"/>
+              <a:t> </a:t>
+            </a:r>
+            <a:r>
+              <a:rPr lang="en-US" sz="3600" dirty="0" smtClean="0">
+                <a:hlinkClick r:id="rId4"/>
+              </a:rPr>
+              <a:t>www.petry-johnson.com</a:t>
+            </a:r>
+            <a:r>
+              <a:rPr lang="en-US" sz="3600" dirty="0" smtClean="0"/>
+              <a:t/>
+            </a:r>
+            <a:br>
+              <a:rPr lang="en-US" sz="3600" dirty="0" smtClean="0"/>
+            </a:br>
+            <a:endParaRPr lang="en-US" sz="3600" dirty="0"/>
+          </a:p>
+          <a:p>
+            <a:pPr marL="0" indent="0" algn="ctr">
+              <a:buNone/>
+            </a:pPr>
+            <a:r>
+              <a:rPr lang="en-US" sz="3600" b="1" dirty="0" smtClean="0"/>
+              <a:t>@</a:t>
+            </a:r>
+            <a:r>
+              <a:rPr lang="en-US" sz="3600" b="1" dirty="0" err="1" smtClean="0"/>
+              <a:t>spetryjohnson</a:t>
+            </a:r>
+            <a:endParaRPr lang="en-US" b="1" dirty="0" smtClean="0"/>
+          </a:p>
+          <a:p>
+            <a:endParaRPr lang="en-US" dirty="0" smtClean="0"/>
+          </a:p>
+          <a:p>
+            <a:pPr lvl="1"/>
+            <a:endParaRPr lang="en-US" dirty="0" smtClean="0"/>
+          </a:p>
+          <a:p>
+            <a:pPr lvl="1"/>
+            <a:endParaRPr lang="en-US" dirty="0" smtClean="0"/>
+          </a:p>
+          <a:p>
+            <a:pPr lvl="1"/>
+            <a:endParaRPr lang="en-US" dirty="0"/>
+          </a:p>
+          <a:p>
+            <a:pPr lvl="1"/>
+            <a:endParaRPr lang="en-US" dirty="0" smtClean="0"/>
+          </a:p>
+          <a:p>
+            <a:pPr lvl="1"/>
+            <a:endParaRPr lang="en-US" dirty="0"/>
+          </a:p>
+        </p:txBody>
+      </p:sp>
+    </p:spTree>
+    <p:extLst>
+      <p:ext uri="{BB962C8B-B14F-4D97-AF65-F5344CB8AC3E}">
+        <p14:creationId xmlns:p14="http://schemas.microsoft.com/office/powerpoint/2010/main" val="659085787"/>
+      </p:ext>
+    </p:extLst>
+  </p:cSld>
+  <p:clrMapOvr>
+    <a:masterClrMapping/>
+  </p:clrMapOvr>
+  <p:timing>
+    <p:tnLst>
+      <p:par>
+        <p:cTn id="1" dur="indefinite" restart="never" nodeType="tmRoot"/>
+      </p:par>
+    </p:tnLst>
+  </p:timing>
+</p:sld>
+</file>
+
 <file path=ppt/slides/slide2.xml><?xml version="1.0" encoding="utf-8"?>
 <p:sld xmlns:a="http://schemas.openxmlformats.org/drawingml/2006/main" xmlns:r="http://schemas.openxmlformats.org/officeDocument/2006/relationships" xmlns:p="http://schemas.openxmlformats.org/presentationml/2006/main">
   <p:cSld>
@@ -4156,12 +5321,12 @@
         </p:nvSpPr>
         <p:spPr>
           <a:xfrm>
-            <a:off x="964927" y="2719405"/>
-            <a:ext cx="10515600" cy="1325563"/>
+            <a:off x="964927" y="1"/>
+            <a:ext cx="10515600" cy="6858000"/>
           </a:xfrm>
         </p:spPr>
         <p:txBody>
-          <a:bodyPr>
+          <a:bodyPr anchor="ctr">
             <a:normAutofit/>
           </a:bodyPr>
           <a:lstStyle/>
@@ -4169,7 +5334,7 @@
             <a:pPr algn="ctr"/>
             <a:r>
               <a:rPr lang="en-US" sz="4800" dirty="0" smtClean="0"/>
-              <a:t>Developers hate writing secure code</a:t>
+              <a:t>I hate writing secure code</a:t>
             </a:r>
             <a:endParaRPr lang="en-US" sz="4800" dirty="0"/>
           </a:p>
@@ -4178,7 +5343,7 @@
     </p:spTree>
     <p:extLst>
       <p:ext uri="{BB962C8B-B14F-4D97-AF65-F5344CB8AC3E}">
-        <p14:creationId xmlns:p14="http://schemas.microsoft.com/office/powerpoint/2010/main" val="2885496712"/>
+        <p14:creationId xmlns:p14="http://schemas.microsoft.com/office/powerpoint/2010/main" val="3599913949"/>
       </p:ext>
     </p:extLst>
   </p:cSld>
@@ -4224,45 +5389,60 @@
         </p:nvSpPr>
         <p:spPr>
           <a:xfrm>
-            <a:off x="964927" y="2719405"/>
-            <a:ext cx="10515600" cy="1325563"/>
+            <a:off x="964927" y="1"/>
+            <a:ext cx="10515600" cy="6858000"/>
           </a:xfrm>
         </p:spPr>
         <p:txBody>
-          <a:bodyPr>
+          <a:bodyPr anchor="ctr">
             <a:normAutofit/>
           </a:bodyPr>
           <a:lstStyle/>
           <a:p>
             <a:pPr algn="ctr"/>
             <a:r>
+              <a:rPr lang="en-US" sz="4800" strike="sngStrike" dirty="0" smtClean="0">
+                <a:solidFill>
+                  <a:schemeClr val="bg1">
+                    <a:lumMod val="75000"/>
+                  </a:schemeClr>
+                </a:solidFill>
+              </a:rPr>
+              <a:t>I hate writing secure </a:t>
+            </a:r>
+            <a:r>
+              <a:rPr lang="en-US" sz="4800" strike="sngStrike" dirty="0" smtClean="0">
+                <a:solidFill>
+                  <a:schemeClr val="bg1">
+                    <a:lumMod val="75000"/>
+                  </a:schemeClr>
+                </a:solidFill>
+              </a:rPr>
+              <a:t>code</a:t>
+            </a:r>
+            <a:r>
+              <a:rPr lang="en-US" sz="4800" strike="sngStrike" dirty="0" smtClean="0"/>
+              <a:t/>
+            </a:r>
+            <a:br>
+              <a:rPr lang="en-US" sz="4800" strike="sngStrike" dirty="0" smtClean="0"/>
+            </a:br>
+            <a:r>
               <a:rPr lang="en-US" sz="4800" dirty="0" smtClean="0"/>
-              <a:t>… but writing </a:t>
+              <a:t>I hate writing secure </a:t>
             </a:r>
             <a:r>
               <a:rPr lang="en-US" sz="4800" i="1" dirty="0" smtClean="0"/>
-              <a:t>security </a:t>
-            </a:r>
-            <a:r>
-              <a:rPr lang="en-US" sz="4800" dirty="0" smtClean="0"/>
-              <a:t>code</a:t>
-            </a:r>
-            <a:r>
-              <a:rPr lang="en-US" sz="4800" i="1" dirty="0" smtClean="0"/>
-              <a:t> </a:t>
-            </a:r>
-            <a:r>
-              <a:rPr lang="en-US" sz="4800" dirty="0" smtClean="0"/>
-              <a:t>ain't so bad.</a:t>
-            </a:r>
-            <a:endParaRPr lang="en-US" sz="4800" dirty="0"/>
+              <a:t>features</a:t>
+            </a:r>
+            <a:endParaRPr lang="en-US" sz="4800" i="1" dirty="0"/>
           </a:p>
         </p:txBody>
       </p:sp>
     </p:spTree>
     <p:extLst>
       <p:ext uri="{BB962C8B-B14F-4D97-AF65-F5344CB8AC3E}">
-        <p14:creationId xmlns:p14="http://schemas.microsoft.com/office/powerpoint/2010/main" val="3903192870"/>
+        <p14:creationId xmlns:p14="http://schemas.microsoft.com/office/powerpoint/2010/main" val="75936766"/>
       </p:ext>
     </p:extLst>
   </p:cSld>
@@ -4306,98 +5486,85 @@
             <p:ph type="title"/>
           </p:nvPr>
         </p:nvSpPr>
-        <p:spPr/>
-        <p:txBody>
-          <a:bodyPr>
+        <p:spPr>
+          <a:xfrm>
+            <a:off x="964927" y="1"/>
+            <a:ext cx="10515600" cy="6858000"/>
+          </a:xfrm>
+        </p:spPr>
+        <p:txBody>
+          <a:bodyPr anchor="ctr">
             <a:normAutofit/>
           </a:bodyPr>
           <a:lstStyle/>
           <a:p>
-            <a:r>
-              <a:rPr lang="en-US" sz="4800" dirty="0" smtClean="0"/>
-              <a:t>What's on </a:t>
-            </a:r>
-            <a:r>
-              <a:rPr lang="en-US" sz="4800" smtClean="0"/>
-              <a:t>the agenda?</a:t>
-            </a:r>
-            <a:endParaRPr lang="en-US" sz="4800" dirty="0"/>
-          </a:p>
-        </p:txBody>
-      </p:sp>
-      <p:sp>
-        <p:nvSpPr>
-          <p:cNvPr id="3" name="Content Placeholder 2"/>
-          <p:cNvSpPr>
-            <a:spLocks noGrp="1"/>
-          </p:cNvSpPr>
-          <p:nvPr>
-            <p:ph idx="1"/>
-          </p:nvPr>
-        </p:nvSpPr>
-        <p:spPr>
-          <a:xfrm>
-            <a:off x="838200" y="1825624"/>
-            <a:ext cx="10515600" cy="4589923"/>
-          </a:xfrm>
-        </p:spPr>
-        <p:txBody>
-          <a:bodyPr>
-            <a:normAutofit/>
-          </a:bodyPr>
-          <a:lstStyle/>
-          <a:p>
-            <a:r>
-              <a:rPr lang="en-US" sz="4000" dirty="0" smtClean="0">
+            <a:pPr algn="ctr"/>
+            <a:r>
+              <a:rPr lang="en-US" sz="4800" strike="sngStrike" dirty="0" smtClean="0">
                 <a:solidFill>
                   <a:schemeClr val="bg1">
-                    <a:lumMod val="65000"/>
+                    <a:lumMod val="75000"/>
                   </a:schemeClr>
                 </a:solidFill>
               </a:rPr>
-              <a:t>Old news</a:t>
-            </a:r>
-            <a:br>
-              <a:rPr lang="en-US" sz="4000" dirty="0" smtClean="0">
+              <a:t>I hate writing secure </a:t>
+            </a:r>
+            <a:r>
+              <a:rPr lang="en-US" sz="4800" strike="sngStrike" dirty="0" smtClean="0">
                 <a:solidFill>
                   <a:schemeClr val="bg1">
-                    <a:lumMod val="65000"/>
+                    <a:lumMod val="75000"/>
+                  </a:schemeClr>
+                </a:solidFill>
+              </a:rPr>
+              <a:t>code</a:t>
+            </a:r>
+            <a:br>
+              <a:rPr lang="en-US" sz="4800" strike="sngStrike" dirty="0" smtClean="0">
+                <a:solidFill>
+                  <a:schemeClr val="bg1">
+                    <a:lumMod val="75000"/>
                   </a:schemeClr>
                 </a:solidFill>
               </a:rPr>
             </a:br>
-            <a:endParaRPr lang="en-US" sz="4000" dirty="0" smtClean="0">
-              <a:solidFill>
-                <a:schemeClr val="bg1">
-                  <a:lumMod val="65000"/>
-                </a:schemeClr>
-              </a:solidFill>
-            </a:endParaRPr>
-          </a:p>
-          <a:p>
-            <a:r>
-              <a:rPr lang="en-US" sz="4000" b="1" dirty="0" smtClean="0"/>
-              <a:t>New hotness</a:t>
-            </a:r>
-          </a:p>
-          <a:p>
-            <a:endParaRPr lang="en-US" sz="4000" dirty="0" smtClean="0"/>
-          </a:p>
-          <a:p>
-            <a:endParaRPr lang="en-US" dirty="0" smtClean="0"/>
-          </a:p>
-          <a:p>
-            <a:endParaRPr lang="en-US" dirty="0" smtClean="0"/>
-          </a:p>
-          <a:p>
-            <a:endParaRPr lang="en-US" dirty="0"/>
+            <a:r>
+              <a:rPr lang="en-US" sz="4800" strike="sngStrike" dirty="0" smtClean="0">
+                <a:solidFill>
+                  <a:schemeClr val="bg1">
+                    <a:lumMod val="75000"/>
+                  </a:schemeClr>
+                </a:solidFill>
+              </a:rPr>
+              <a:t>I hate writing secure features</a:t>
+            </a:r>
+            <a:r>
+              <a:rPr lang="en-US" sz="4800" strike="sngStrike" dirty="0" smtClean="0"/>
+              <a:t/>
+            </a:r>
+            <a:br>
+              <a:rPr lang="en-US" sz="4800" strike="sngStrike" dirty="0" smtClean="0"/>
+            </a:br>
+            <a:r>
+              <a:rPr lang="en-US" sz="4800" dirty="0" smtClean="0"/>
+              <a:t>I hate implementing </a:t>
+            </a:r>
+            <a:r>
+              <a:rPr lang="en-US" sz="4800" i="1" dirty="0" smtClean="0"/>
+              <a:t>cross-cutting security concerns</a:t>
+            </a:r>
+            <a:r>
+              <a:rPr lang="en-US" sz="4800" dirty="0" smtClean="0"/>
+              <a:t> by repeating the same patterns over and over again in my feature-level code</a:t>
+            </a:r>
+            <a:endParaRPr lang="en-US" sz="4800" dirty="0"/>
           </a:p>
         </p:txBody>
       </p:sp>
     </p:spTree>
     <p:extLst>
       <p:ext uri="{BB962C8B-B14F-4D97-AF65-F5344CB8AC3E}">
-        <p14:creationId xmlns:p14="http://schemas.microsoft.com/office/powerpoint/2010/main" val="2651230507"/>
+        <p14:creationId xmlns:p14="http://schemas.microsoft.com/office/powerpoint/2010/main" val="3846056723"/>
       </p:ext>
     </p:extLst>
   </p:cSld>
@@ -4450,7 +5617,11 @@
           <a:p>
             <a:r>
               <a:rPr lang="en-US" sz="4800" dirty="0" smtClean="0"/>
-              <a:t>Patented step-by-step slide</a:t>
+              <a:t>What's on </a:t>
+            </a:r>
+            <a:r>
+              <a:rPr lang="en-US" sz="4800" smtClean="0"/>
+              <a:t>the agenda?</a:t>
             </a:r>
             <a:endParaRPr lang="en-US" sz="4800" dirty="0"/>
           </a:p>
@@ -4479,37 +5650,41 @@
           <a:lstStyle/>
           <a:p>
             <a:r>
-              <a:rPr lang="en-US" sz="4000" dirty="0" smtClean="0">
-                <a:solidFill>
-                  <a:schemeClr val="bg1">
-                    <a:lumMod val="65000"/>
-                  </a:schemeClr>
-                </a:solidFill>
-              </a:rPr>
-              <a:t>Old news</a:t>
-            </a:r>
-            <a:br>
-              <a:rPr lang="en-US" sz="4000" dirty="0" smtClean="0">
-                <a:solidFill>
-                  <a:schemeClr val="bg1">
-                    <a:lumMod val="65000"/>
-                  </a:schemeClr>
-                </a:solidFill>
-              </a:rPr>
-            </a:br>
-            <a:endParaRPr lang="en-US" sz="4000" dirty="0" smtClean="0">
-              <a:solidFill>
-                <a:schemeClr val="bg1">
-                  <a:lumMod val="65000"/>
-                </a:schemeClr>
-              </a:solidFill>
-            </a:endParaRPr>
-          </a:p>
-          <a:p>
-            <a:r>
-              <a:rPr lang="en-US" sz="4000" b="1" dirty="0" smtClean="0"/>
-              <a:t>New hotness</a:t>
-            </a:r>
+              <a:rPr lang="en-US" sz="4000" dirty="0" smtClean="0"/>
+              <a:t>Define "cross cutting" security concerns</a:t>
+            </a:r>
+          </a:p>
+          <a:p>
+            <a:endParaRPr lang="en-US" sz="4000" dirty="0"/>
+          </a:p>
+          <a:p>
+            <a:r>
+              <a:rPr lang="en-US" sz="4000" dirty="0" smtClean="0"/>
+              <a:t>&lt;x&gt; real-world examples (</a:t>
+            </a:r>
+            <a:r>
+              <a:rPr lang="en-US" sz="4000" i="1" dirty="0" smtClean="0"/>
+              <a:t>.NET and JS</a:t>
+            </a:r>
+            <a:r>
+              <a:rPr lang="en-US" sz="4000" dirty="0" smtClean="0"/>
+              <a:t>)</a:t>
+            </a:r>
+          </a:p>
+          <a:p>
+            <a:endParaRPr lang="en-US" sz="4000" dirty="0"/>
+          </a:p>
+          <a:p>
+            <a:r>
+              <a:rPr lang="en-US" sz="4000" dirty="0" smtClean="0"/>
+              <a:t>???</a:t>
+            </a:r>
+          </a:p>
+          <a:p>
+            <a:endParaRPr lang="en-US" sz="4000" dirty="0"/>
+          </a:p>
+          <a:p>
+            <a:endParaRPr lang="en-US" sz="4000" dirty="0" smtClean="0"/>
           </a:p>
           <a:p>
             <a:endParaRPr lang="en-US" sz="4000" dirty="0" smtClean="0"/>
@@ -4528,7 +5703,7 @@
     </p:spTree>
     <p:extLst>
       <p:ext uri="{BB962C8B-B14F-4D97-AF65-F5344CB8AC3E}">
-        <p14:creationId xmlns:p14="http://schemas.microsoft.com/office/powerpoint/2010/main" val="2285767896"/>
+        <p14:creationId xmlns:p14="http://schemas.microsoft.com/office/powerpoint/2010/main" val="2651230507"/>
       </p:ext>
     </p:extLst>
   </p:cSld>
@@ -4572,42 +5747,7 @@
             <p:ph type="title"/>
           </p:nvPr>
         </p:nvSpPr>
-        <p:spPr>
-          <a:xfrm>
-            <a:off x="838200" y="365125"/>
-            <a:ext cx="10886768" cy="1325563"/>
-          </a:xfrm>
-        </p:spPr>
-        <p:txBody>
-          <a:bodyPr>
-            <a:noAutofit/>
-          </a:bodyPr>
-          <a:lstStyle/>
-          <a:p>
-            <a:r>
-              <a:rPr lang="en-US" sz="4800" dirty="0" smtClean="0"/>
-              <a:t>Closing slide</a:t>
-            </a:r>
-            <a:endParaRPr lang="en-US" sz="4800" dirty="0"/>
-          </a:p>
-        </p:txBody>
-      </p:sp>
-      <p:sp>
-        <p:nvSpPr>
-          <p:cNvPr id="3" name="Content Placeholder 2"/>
-          <p:cNvSpPr>
-            <a:spLocks noGrp="1"/>
-          </p:cNvSpPr>
-          <p:nvPr>
-            <p:ph idx="1"/>
-          </p:nvPr>
-        </p:nvSpPr>
-        <p:spPr>
-          <a:xfrm>
-            <a:off x="838200" y="1825625"/>
-            <a:ext cx="11137490" cy="4899640"/>
-          </a:xfrm>
-        </p:spPr>
+        <p:spPr/>
         <p:txBody>
           <a:bodyPr>
             <a:normAutofit/>
@@ -4615,110 +5755,535 @@
           <a:lstStyle/>
           <a:p>
             <a:r>
-              <a:rPr lang="en-US" sz="4000" dirty="0" smtClean="0"/>
-              <a:t>The knowledge gets dropped here</a:t>
-            </a:r>
-          </a:p>
-          <a:p>
-            <a:pPr marL="0" indent="0">
-              <a:buNone/>
-            </a:pPr>
-            <a:endParaRPr lang="en-US" sz="3200" dirty="0" smtClean="0">
-              <a:hlinkClick r:id="rId3"/>
-            </a:endParaRPr>
-          </a:p>
-          <a:p>
-            <a:pPr marL="0" indent="0">
-              <a:buNone/>
-            </a:pPr>
-            <a:r>
-              <a:rPr lang="en-US" sz="3600" dirty="0" smtClean="0">
-                <a:hlinkClick r:id="rId3"/>
-              </a:rPr>
-              <a:t>github.com/</a:t>
-            </a:r>
-            <a:r>
-              <a:rPr lang="en-US" sz="3600" dirty="0" err="1" smtClean="0">
-                <a:hlinkClick r:id="rId3"/>
-              </a:rPr>
-              <a:t>spetryjohnson</a:t>
-            </a:r>
-            <a:r>
-              <a:rPr lang="en-US" sz="3600" dirty="0" smtClean="0"/>
-              <a:t> </a:t>
-            </a:r>
-            <a:r>
-              <a:rPr lang="en-US" sz="3600" dirty="0" smtClean="0">
-                <a:solidFill>
-                  <a:schemeClr val="bg1">
-                    <a:lumMod val="50000"/>
-                  </a:schemeClr>
-                </a:solidFill>
-              </a:rPr>
-              <a:t>|</a:t>
-            </a:r>
-            <a:r>
-              <a:rPr lang="en-US" sz="3600" dirty="0" smtClean="0"/>
-              <a:t> </a:t>
-            </a:r>
-            <a:r>
-              <a:rPr lang="en-US" sz="3600" dirty="0" smtClean="0">
-                <a:hlinkClick r:id="rId4"/>
-              </a:rPr>
-              <a:t>www.petry-johnson.com</a:t>
-            </a:r>
-            <a:r>
-              <a:rPr lang="en-US" sz="3600" dirty="0" smtClean="0"/>
-              <a:t/>
-            </a:r>
-            <a:br>
-              <a:rPr lang="en-US" sz="3600" dirty="0" smtClean="0"/>
-            </a:br>
-            <a:endParaRPr lang="en-US" sz="3600" dirty="0"/>
-          </a:p>
-          <a:p>
-            <a:pPr marL="0" indent="0" algn="ctr">
-              <a:buNone/>
-            </a:pPr>
-            <a:r>
-              <a:rPr lang="en-US" sz="3600" b="1" dirty="0" smtClean="0"/>
-              <a:t>@</a:t>
-            </a:r>
-            <a:r>
-              <a:rPr lang="en-US" sz="3600" b="1" dirty="0" err="1" smtClean="0"/>
-              <a:t>spetryjohnson</a:t>
-            </a:r>
-            <a:endParaRPr lang="en-US" b="1" dirty="0" smtClean="0"/>
+              <a:rPr lang="en-US" sz="4800" dirty="0" smtClean="0"/>
+              <a:t>"Cross cutting" concerns</a:t>
+            </a:r>
+            <a:endParaRPr lang="en-US" sz="4800" dirty="0"/>
+          </a:p>
+        </p:txBody>
+      </p:sp>
+      <p:sp>
+        <p:nvSpPr>
+          <p:cNvPr id="3" name="Content Placeholder 2"/>
+          <p:cNvSpPr>
+            <a:spLocks noGrp="1"/>
+          </p:cNvSpPr>
+          <p:nvPr>
+            <p:ph idx="1"/>
+          </p:nvPr>
+        </p:nvSpPr>
+        <p:spPr>
+          <a:xfrm>
+            <a:off x="838200" y="1825624"/>
+            <a:ext cx="10515600" cy="4589923"/>
+          </a:xfrm>
+        </p:spPr>
+        <p:txBody>
+          <a:bodyPr>
+            <a:normAutofit/>
+          </a:bodyPr>
+          <a:lstStyle/>
+          <a:p>
+            <a:endParaRPr lang="en-US" sz="4000" dirty="0"/>
+          </a:p>
+          <a:p>
+            <a:endParaRPr lang="en-US" sz="4000" dirty="0" smtClean="0"/>
+          </a:p>
+          <a:p>
+            <a:endParaRPr lang="en-US" sz="4000" dirty="0" smtClean="0"/>
           </a:p>
           <a:p>
             <a:endParaRPr lang="en-US" dirty="0" smtClean="0"/>
           </a:p>
           <a:p>
-            <a:pPr lvl="1"/>
             <a:endParaRPr lang="en-US" dirty="0" smtClean="0"/>
           </a:p>
           <a:p>
-            <a:pPr lvl="1"/>
-            <a:endParaRPr lang="en-US" dirty="0" smtClean="0"/>
-          </a:p>
-          <a:p>
-            <a:pPr lvl="1"/>
             <a:endParaRPr lang="en-US" dirty="0"/>
           </a:p>
-          <a:p>
-            <a:pPr lvl="1"/>
-            <a:endParaRPr lang="en-US" dirty="0" smtClean="0"/>
-          </a:p>
-          <a:p>
-            <a:pPr lvl="1"/>
-            <a:endParaRPr lang="en-US" dirty="0"/>
-          </a:p>
-        </p:txBody>
-      </p:sp>
+        </p:txBody>
+      </p:sp>
+      <p:pic>
+        <p:nvPicPr>
+          <p:cNvPr id="6" name="Picture 5"/>
+          <p:cNvPicPr>
+            <a:picLocks noChangeAspect="1"/>
+          </p:cNvPicPr>
+          <p:nvPr/>
+        </p:nvPicPr>
+        <p:blipFill>
+          <a:blip r:embed="rId3"/>
+          <a:stretch>
+            <a:fillRect/>
+          </a:stretch>
+        </p:blipFill>
+        <p:spPr>
+          <a:xfrm>
+            <a:off x="838200" y="1933777"/>
+            <a:ext cx="10515600" cy="4474906"/>
+          </a:xfrm>
+          <a:prstGeom prst="rect">
+            <a:avLst/>
+          </a:prstGeom>
+        </p:spPr>
+      </p:pic>
+      <p:pic>
+        <p:nvPicPr>
+          <p:cNvPr id="7" name="Picture 6"/>
+          <p:cNvPicPr>
+            <a:picLocks noChangeAspect="1"/>
+          </p:cNvPicPr>
+          <p:nvPr/>
+        </p:nvPicPr>
+        <p:blipFill>
+          <a:blip r:embed="rId4"/>
+          <a:stretch>
+            <a:fillRect/>
+          </a:stretch>
+        </p:blipFill>
+        <p:spPr>
+          <a:xfrm rot="5400000">
+            <a:off x="4947385" y="337963"/>
+            <a:ext cx="4810602" cy="8002231"/>
+          </a:xfrm>
+          <a:prstGeom prst="rect">
+            <a:avLst/>
+          </a:prstGeom>
+        </p:spPr>
+      </p:pic>
     </p:spTree>
     <p:extLst>
       <p:ext uri="{BB962C8B-B14F-4D97-AF65-F5344CB8AC3E}">
-        <p14:creationId xmlns:p14="http://schemas.microsoft.com/office/powerpoint/2010/main" val="659085787"/>
+        <p14:creationId xmlns:p14="http://schemas.microsoft.com/office/powerpoint/2010/main" val="3864357827"/>
+      </p:ext>
+    </p:extLst>
+  </p:cSld>
+  <p:clrMapOvr>
+    <a:masterClrMapping/>
+  </p:clrMapOvr>
+  <p:timing>
+    <p:tnLst>
+      <p:par>
+        <p:cTn id="1" dur="indefinite" restart="never" nodeType="tmRoot"/>
+      </p:par>
+    </p:tnLst>
+  </p:timing>
+</p:sld>
+</file>
+
+<file path=ppt/slides/slide7.xml><?xml version="1.0" encoding="utf-8"?>
+<p:sld xmlns:a="http://schemas.openxmlformats.org/drawingml/2006/main" xmlns:r="http://schemas.openxmlformats.org/officeDocument/2006/relationships" xmlns:p="http://schemas.openxmlformats.org/presentationml/2006/main">
+  <p:cSld>
+    <p:spTree>
+      <p:nvGrpSpPr>
+        <p:cNvPr id="1" name=""/>
+        <p:cNvGrpSpPr/>
+        <p:nvPr/>
+      </p:nvGrpSpPr>
+      <p:grpSpPr>
+        <a:xfrm>
+          <a:off x="0" y="0"/>
+          <a:ext cx="0" cy="0"/>
+          <a:chOff x="0" y="0"/>
+          <a:chExt cx="0" cy="0"/>
+        </a:xfrm>
+      </p:grpSpPr>
+      <p:sp>
+        <p:nvSpPr>
+          <p:cNvPr id="2" name="Title 1"/>
+          <p:cNvSpPr>
+            <a:spLocks noGrp="1"/>
+          </p:cNvSpPr>
+          <p:nvPr>
+            <p:ph type="title"/>
+          </p:nvPr>
+        </p:nvSpPr>
+        <p:spPr/>
+        <p:txBody>
+          <a:bodyPr>
+            <a:normAutofit/>
+          </a:bodyPr>
+          <a:lstStyle/>
+          <a:p>
+            <a:r>
+              <a:rPr lang="en-US" sz="4800" dirty="0" smtClean="0"/>
+              <a:t>"Cross cutting" concerns</a:t>
+            </a:r>
+            <a:endParaRPr lang="en-US" sz="4800" dirty="0"/>
+          </a:p>
+        </p:txBody>
+      </p:sp>
+      <p:sp>
+        <p:nvSpPr>
+          <p:cNvPr id="3" name="Content Placeholder 2"/>
+          <p:cNvSpPr>
+            <a:spLocks noGrp="1"/>
+          </p:cNvSpPr>
+          <p:nvPr>
+            <p:ph idx="1"/>
+          </p:nvPr>
+        </p:nvSpPr>
+        <p:spPr>
+          <a:xfrm>
+            <a:off x="838200" y="1825624"/>
+            <a:ext cx="10515600" cy="4589923"/>
+          </a:xfrm>
+        </p:spPr>
+        <p:txBody>
+          <a:bodyPr>
+            <a:normAutofit/>
+          </a:bodyPr>
+          <a:lstStyle/>
+          <a:p>
+            <a:endParaRPr lang="en-US" sz="4000" dirty="0"/>
+          </a:p>
+          <a:p>
+            <a:endParaRPr lang="en-US" sz="4000" dirty="0" smtClean="0"/>
+          </a:p>
+          <a:p>
+            <a:endParaRPr lang="en-US" sz="4000" dirty="0" smtClean="0"/>
+          </a:p>
+          <a:p>
+            <a:endParaRPr lang="en-US" dirty="0" smtClean="0"/>
+          </a:p>
+          <a:p>
+            <a:endParaRPr lang="en-US" dirty="0" smtClean="0"/>
+          </a:p>
+          <a:p>
+            <a:endParaRPr lang="en-US" dirty="0"/>
+          </a:p>
+        </p:txBody>
+      </p:sp>
+      <p:pic>
+        <p:nvPicPr>
+          <p:cNvPr id="6" name="Picture 5"/>
+          <p:cNvPicPr>
+            <a:picLocks noChangeAspect="1"/>
+          </p:cNvPicPr>
+          <p:nvPr/>
+        </p:nvPicPr>
+        <p:blipFill>
+          <a:blip r:embed="rId3"/>
+          <a:stretch>
+            <a:fillRect/>
+          </a:stretch>
+        </p:blipFill>
+        <p:spPr>
+          <a:xfrm>
+            <a:off x="838200" y="1933777"/>
+            <a:ext cx="10515600" cy="4474906"/>
+          </a:xfrm>
+          <a:prstGeom prst="rect">
+            <a:avLst/>
+          </a:prstGeom>
+        </p:spPr>
+      </p:pic>
+      <p:pic>
+        <p:nvPicPr>
+          <p:cNvPr id="5" name="Picture 4"/>
+          <p:cNvPicPr>
+            <a:picLocks noChangeAspect="1"/>
+          </p:cNvPicPr>
+          <p:nvPr/>
+        </p:nvPicPr>
+        <p:blipFill>
+          <a:blip r:embed="rId4"/>
+          <a:stretch>
+            <a:fillRect/>
+          </a:stretch>
+        </p:blipFill>
+        <p:spPr>
+          <a:xfrm rot="5400000">
+            <a:off x="6331890" y="1722468"/>
+            <a:ext cx="4810602" cy="5233221"/>
+          </a:xfrm>
+          <a:prstGeom prst="rect">
+            <a:avLst/>
+          </a:prstGeom>
+        </p:spPr>
+      </p:pic>
+    </p:spTree>
+    <p:extLst>
+      <p:ext uri="{BB962C8B-B14F-4D97-AF65-F5344CB8AC3E}">
+        <p14:creationId xmlns:p14="http://schemas.microsoft.com/office/powerpoint/2010/main" val="197551360"/>
+      </p:ext>
+    </p:extLst>
+  </p:cSld>
+  <p:clrMapOvr>
+    <a:masterClrMapping/>
+  </p:clrMapOvr>
+  <p:timing>
+    <p:tnLst>
+      <p:par>
+        <p:cTn id="1" dur="indefinite" restart="never" nodeType="tmRoot"/>
+      </p:par>
+    </p:tnLst>
+  </p:timing>
+</p:sld>
+</file>
+
+<file path=ppt/slides/slide8.xml><?xml version="1.0" encoding="utf-8"?>
+<p:sld xmlns:a="http://schemas.openxmlformats.org/drawingml/2006/main" xmlns:r="http://schemas.openxmlformats.org/officeDocument/2006/relationships" xmlns:p="http://schemas.openxmlformats.org/presentationml/2006/main">
+  <p:cSld>
+    <p:spTree>
+      <p:nvGrpSpPr>
+        <p:cNvPr id="1" name=""/>
+        <p:cNvGrpSpPr/>
+        <p:nvPr/>
+      </p:nvGrpSpPr>
+      <p:grpSpPr>
+        <a:xfrm>
+          <a:off x="0" y="0"/>
+          <a:ext cx="0" cy="0"/>
+          <a:chOff x="0" y="0"/>
+          <a:chExt cx="0" cy="0"/>
+        </a:xfrm>
+      </p:grpSpPr>
+      <p:sp>
+        <p:nvSpPr>
+          <p:cNvPr id="2" name="Title 1"/>
+          <p:cNvSpPr>
+            <a:spLocks noGrp="1"/>
+          </p:cNvSpPr>
+          <p:nvPr>
+            <p:ph type="title"/>
+          </p:nvPr>
+        </p:nvSpPr>
+        <p:spPr/>
+        <p:txBody>
+          <a:bodyPr>
+            <a:normAutofit/>
+          </a:bodyPr>
+          <a:lstStyle/>
+          <a:p>
+            <a:r>
+              <a:rPr lang="en-US" sz="4800" dirty="0" smtClean="0"/>
+              <a:t>"Cross cutting" concerns</a:t>
+            </a:r>
+            <a:endParaRPr lang="en-US" sz="4800" dirty="0"/>
+          </a:p>
+        </p:txBody>
+      </p:sp>
+      <p:sp>
+        <p:nvSpPr>
+          <p:cNvPr id="3" name="Content Placeholder 2"/>
+          <p:cNvSpPr>
+            <a:spLocks noGrp="1"/>
+          </p:cNvSpPr>
+          <p:nvPr>
+            <p:ph idx="1"/>
+          </p:nvPr>
+        </p:nvSpPr>
+        <p:spPr>
+          <a:xfrm>
+            <a:off x="838200" y="1825624"/>
+            <a:ext cx="10515600" cy="4589923"/>
+          </a:xfrm>
+        </p:spPr>
+        <p:txBody>
+          <a:bodyPr>
+            <a:normAutofit/>
+          </a:bodyPr>
+          <a:lstStyle/>
+          <a:p>
+            <a:endParaRPr lang="en-US" sz="4000" dirty="0"/>
+          </a:p>
+          <a:p>
+            <a:endParaRPr lang="en-US" sz="4000" dirty="0" smtClean="0"/>
+          </a:p>
+          <a:p>
+            <a:endParaRPr lang="en-US" sz="4000" dirty="0" smtClean="0"/>
+          </a:p>
+          <a:p>
+            <a:endParaRPr lang="en-US" dirty="0" smtClean="0"/>
+          </a:p>
+          <a:p>
+            <a:endParaRPr lang="en-US" dirty="0" smtClean="0"/>
+          </a:p>
+          <a:p>
+            <a:endParaRPr lang="en-US" dirty="0"/>
+          </a:p>
+        </p:txBody>
+      </p:sp>
+      <p:pic>
+        <p:nvPicPr>
+          <p:cNvPr id="6" name="Picture 5"/>
+          <p:cNvPicPr>
+            <a:picLocks noChangeAspect="1"/>
+          </p:cNvPicPr>
+          <p:nvPr/>
+        </p:nvPicPr>
+        <p:blipFill>
+          <a:blip r:embed="rId3"/>
+          <a:stretch>
+            <a:fillRect/>
+          </a:stretch>
+        </p:blipFill>
+        <p:spPr>
+          <a:xfrm>
+            <a:off x="838200" y="1933777"/>
+            <a:ext cx="10515600" cy="4474906"/>
+          </a:xfrm>
+          <a:prstGeom prst="rect">
+            <a:avLst/>
+          </a:prstGeom>
+        </p:spPr>
+      </p:pic>
+      <p:pic>
+        <p:nvPicPr>
+          <p:cNvPr id="5" name="Picture 4"/>
+          <p:cNvPicPr>
+            <a:picLocks noChangeAspect="1"/>
+          </p:cNvPicPr>
+          <p:nvPr/>
+        </p:nvPicPr>
+        <p:blipFill>
+          <a:blip r:embed="rId4"/>
+          <a:stretch>
+            <a:fillRect/>
+          </a:stretch>
+        </p:blipFill>
+        <p:spPr>
+          <a:xfrm rot="5400000">
+            <a:off x="7629748" y="3020326"/>
+            <a:ext cx="4810602" cy="2637505"/>
+          </a:xfrm>
+          <a:prstGeom prst="rect">
+            <a:avLst/>
+          </a:prstGeom>
+        </p:spPr>
+      </p:pic>
+    </p:spTree>
+    <p:extLst>
+      <p:ext uri="{BB962C8B-B14F-4D97-AF65-F5344CB8AC3E}">
+        <p14:creationId xmlns:p14="http://schemas.microsoft.com/office/powerpoint/2010/main" val="136631790"/>
+      </p:ext>
+    </p:extLst>
+  </p:cSld>
+  <p:clrMapOvr>
+    <a:masterClrMapping/>
+  </p:clrMapOvr>
+  <p:timing>
+    <p:tnLst>
+      <p:par>
+        <p:cTn id="1" dur="indefinite" restart="never" nodeType="tmRoot"/>
+      </p:par>
+    </p:tnLst>
+  </p:timing>
+</p:sld>
+</file>
+
+<file path=ppt/slides/slide9.xml><?xml version="1.0" encoding="utf-8"?>
+<p:sld xmlns:a="http://schemas.openxmlformats.org/drawingml/2006/main" xmlns:r="http://schemas.openxmlformats.org/officeDocument/2006/relationships" xmlns:p="http://schemas.openxmlformats.org/presentationml/2006/main">
+  <p:cSld>
+    <p:spTree>
+      <p:nvGrpSpPr>
+        <p:cNvPr id="1" name=""/>
+        <p:cNvGrpSpPr/>
+        <p:nvPr/>
+      </p:nvGrpSpPr>
+      <p:grpSpPr>
+        <a:xfrm>
+          <a:off x="0" y="0"/>
+          <a:ext cx="0" cy="0"/>
+          <a:chOff x="0" y="0"/>
+          <a:chExt cx="0" cy="0"/>
+        </a:xfrm>
+      </p:grpSpPr>
+      <p:sp>
+        <p:nvSpPr>
+          <p:cNvPr id="2" name="Title 1"/>
+          <p:cNvSpPr>
+            <a:spLocks noGrp="1"/>
+          </p:cNvSpPr>
+          <p:nvPr>
+            <p:ph type="title"/>
+          </p:nvPr>
+        </p:nvSpPr>
+        <p:spPr/>
+        <p:txBody>
+          <a:bodyPr>
+            <a:normAutofit/>
+          </a:bodyPr>
+          <a:lstStyle/>
+          <a:p>
+            <a:r>
+              <a:rPr lang="en-US" sz="4800" dirty="0" smtClean="0"/>
+              <a:t>"Cross cutting" concerns</a:t>
+            </a:r>
+            <a:endParaRPr lang="en-US" sz="4800" dirty="0"/>
+          </a:p>
+        </p:txBody>
+      </p:sp>
+      <p:sp>
+        <p:nvSpPr>
+          <p:cNvPr id="3" name="Content Placeholder 2"/>
+          <p:cNvSpPr>
+            <a:spLocks noGrp="1"/>
+          </p:cNvSpPr>
+          <p:nvPr>
+            <p:ph idx="1"/>
+          </p:nvPr>
+        </p:nvSpPr>
+        <p:spPr>
+          <a:xfrm>
+            <a:off x="838200" y="1825624"/>
+            <a:ext cx="10515600" cy="4589923"/>
+          </a:xfrm>
+        </p:spPr>
+        <p:txBody>
+          <a:bodyPr>
+            <a:normAutofit/>
+          </a:bodyPr>
+          <a:lstStyle/>
+          <a:p>
+            <a:endParaRPr lang="en-US" sz="4000" dirty="0"/>
+          </a:p>
+          <a:p>
+            <a:endParaRPr lang="en-US" sz="4000" dirty="0" smtClean="0"/>
+          </a:p>
+          <a:p>
+            <a:endParaRPr lang="en-US" sz="4000" dirty="0" smtClean="0"/>
+          </a:p>
+          <a:p>
+            <a:endParaRPr lang="en-US" dirty="0" smtClean="0"/>
+          </a:p>
+          <a:p>
+            <a:endParaRPr lang="en-US" dirty="0" smtClean="0"/>
+          </a:p>
+          <a:p>
+            <a:endParaRPr lang="en-US" dirty="0"/>
+          </a:p>
+        </p:txBody>
+      </p:sp>
+      <p:pic>
+        <p:nvPicPr>
+          <p:cNvPr id="6" name="Picture 5"/>
+          <p:cNvPicPr>
+            <a:picLocks noChangeAspect="1"/>
+          </p:cNvPicPr>
+          <p:nvPr/>
+        </p:nvPicPr>
+        <p:blipFill>
+          <a:blip r:embed="rId3"/>
+          <a:stretch>
+            <a:fillRect/>
+          </a:stretch>
+        </p:blipFill>
+        <p:spPr>
+          <a:xfrm>
+            <a:off x="838200" y="1933777"/>
+            <a:ext cx="10515600" cy="4474906"/>
+          </a:xfrm>
+          <a:prstGeom prst="rect">
+            <a:avLst/>
+          </a:prstGeom>
+        </p:spPr>
+      </p:pic>
+    </p:spTree>
+    <p:extLst>
+      <p:ext uri="{BB962C8B-B14F-4D97-AF65-F5344CB8AC3E}">
+        <p14:creationId xmlns:p14="http://schemas.microsoft.com/office/powerpoint/2010/main" val="3788007878"/>
       </p:ext>
     </p:extLst>
   </p:cSld>

</xml_diff>

<commit_message>
Making headway on deck
</commit_message>
<xml_diff>
--- a/Secure Systems - CodeMash 2017.pptx
+++ b/Secure Systems - CodeMash 2017.pptx
@@ -5,7 +5,7 @@
     <p:sldMasterId id="2147483749" r:id="rId1"/>
   </p:sldMasterIdLst>
   <p:notesMasterIdLst>
-    <p:notesMasterId r:id="rId15"/>
+    <p:notesMasterId r:id="rId19"/>
   </p:notesMasterIdLst>
   <p:sldIdLst>
     <p:sldId id="395" r:id="rId2"/>
@@ -13,14 +13,18 @@
     <p:sldId id="488" r:id="rId4"/>
     <p:sldId id="489" r:id="rId5"/>
     <p:sldId id="482" r:id="rId6"/>
-    <p:sldId id="490" r:id="rId7"/>
+    <p:sldId id="497" r:id="rId7"/>
     <p:sldId id="491" r:id="rId8"/>
-    <p:sldId id="492" r:id="rId9"/>
-    <p:sldId id="493" r:id="rId10"/>
-    <p:sldId id="494" r:id="rId11"/>
-    <p:sldId id="484" r:id="rId12"/>
-    <p:sldId id="485" r:id="rId13"/>
-    <p:sldId id="443" r:id="rId14"/>
+    <p:sldId id="495" r:id="rId9"/>
+    <p:sldId id="492" r:id="rId10"/>
+    <p:sldId id="493" r:id="rId11"/>
+    <p:sldId id="494" r:id="rId12"/>
+    <p:sldId id="498" r:id="rId13"/>
+    <p:sldId id="496" r:id="rId14"/>
+    <p:sldId id="499" r:id="rId15"/>
+    <p:sldId id="484" r:id="rId16"/>
+    <p:sldId id="485" r:id="rId17"/>
+    <p:sldId id="443" r:id="rId18"/>
   </p:sldIdLst>
   <p:sldSz cx="12192000" cy="6858000"/>
   <p:notesSz cx="6858000" cy="9144000"/>
@@ -654,7 +658,7 @@
     </p:spTree>
     <p:extLst>
       <p:ext uri="{BB962C8B-B14F-4D97-AF65-F5344CB8AC3E}">
-        <p14:creationId xmlns:p14="http://schemas.microsoft.com/office/powerpoint/2010/main" val="455841040"/>
+        <p14:creationId xmlns:p14="http://schemas.microsoft.com/office/powerpoint/2010/main" val="3246387786"/>
       </p:ext>
     </p:extLst>
   </p:cSld>
@@ -738,7 +742,7 @@
     </p:spTree>
     <p:extLst>
       <p:ext uri="{BB962C8B-B14F-4D97-AF65-F5344CB8AC3E}">
-        <p14:creationId xmlns:p14="http://schemas.microsoft.com/office/powerpoint/2010/main" val="4212963282"/>
+        <p14:creationId xmlns:p14="http://schemas.microsoft.com/office/powerpoint/2010/main" val="2622349736"/>
       </p:ext>
     </p:extLst>
   </p:cSld>
@@ -822,7 +826,7 @@
     </p:spTree>
     <p:extLst>
       <p:ext uri="{BB962C8B-B14F-4D97-AF65-F5344CB8AC3E}">
-        <p14:creationId xmlns:p14="http://schemas.microsoft.com/office/powerpoint/2010/main" val="2267138517"/>
+        <p14:creationId xmlns:p14="http://schemas.microsoft.com/office/powerpoint/2010/main" val="1778818159"/>
       </p:ext>
     </p:extLst>
   </p:cSld>
@@ -876,6 +880,107 @@
           <a:bodyPr/>
           <a:lstStyle/>
           <a:p>
+            <a:endParaRPr lang="en-US" b="0" dirty="0" smtClean="0"/>
+          </a:p>
+        </p:txBody>
+      </p:sp>
+      <p:sp>
+        <p:nvSpPr>
+          <p:cNvPr id="4" name="Slide Number Placeholder 3"/>
+          <p:cNvSpPr>
+            <a:spLocks noGrp="1"/>
+          </p:cNvSpPr>
+          <p:nvPr>
+            <p:ph type="sldNum" sz="quarter" idx="10"/>
+          </p:nvPr>
+        </p:nvSpPr>
+        <p:spPr/>
+        <p:txBody>
+          <a:bodyPr/>
+          <a:lstStyle/>
+          <a:p>
+            <a:fld id="{89029652-62E7-43D6-83B5-097D7B7AA5D8}" type="slidenum">
+              <a:rPr lang="en-US" smtClean="0"/>
+              <a:t>13</a:t>
+            </a:fld>
+            <a:endParaRPr lang="en-US"/>
+          </a:p>
+        </p:txBody>
+      </p:sp>
+    </p:spTree>
+    <p:extLst>
+      <p:ext uri="{BB962C8B-B14F-4D97-AF65-F5344CB8AC3E}">
+        <p14:creationId xmlns:p14="http://schemas.microsoft.com/office/powerpoint/2010/main" val="3559323980"/>
+      </p:ext>
+    </p:extLst>
+  </p:cSld>
+  <p:clrMapOvr>
+    <a:masterClrMapping/>
+  </p:clrMapOvr>
+</p:notes>
+</file>
+
+<file path=ppt/notesSlides/notesSlide14.xml><?xml version="1.0" encoding="utf-8"?>
+<p:notes xmlns:a="http://schemas.openxmlformats.org/drawingml/2006/main" xmlns:r="http://schemas.openxmlformats.org/officeDocument/2006/relationships" xmlns:p="http://schemas.openxmlformats.org/presentationml/2006/main">
+  <p:cSld>
+    <p:spTree>
+      <p:nvGrpSpPr>
+        <p:cNvPr id="1" name=""/>
+        <p:cNvGrpSpPr/>
+        <p:nvPr/>
+      </p:nvGrpSpPr>
+      <p:grpSpPr>
+        <a:xfrm>
+          <a:off x="0" y="0"/>
+          <a:ext cx="0" cy="0"/>
+          <a:chOff x="0" y="0"/>
+          <a:chExt cx="0" cy="0"/>
+        </a:xfrm>
+      </p:grpSpPr>
+      <p:sp>
+        <p:nvSpPr>
+          <p:cNvPr id="2" name="Slide Image Placeholder 1"/>
+          <p:cNvSpPr>
+            <a:spLocks noGrp="1" noRot="1" noChangeAspect="1"/>
+          </p:cNvSpPr>
+          <p:nvPr>
+            <p:ph type="sldImg"/>
+          </p:nvPr>
+        </p:nvSpPr>
+        <p:spPr/>
+      </p:sp>
+      <p:sp>
+        <p:nvSpPr>
+          <p:cNvPr id="3" name="Notes Placeholder 2"/>
+          <p:cNvSpPr>
+            <a:spLocks noGrp="1"/>
+          </p:cNvSpPr>
+          <p:nvPr>
+            <p:ph type="body" idx="1"/>
+          </p:nvPr>
+        </p:nvSpPr>
+        <p:spPr/>
+        <p:txBody>
+          <a:bodyPr/>
+          <a:lstStyle/>
+          <a:p>
+            <a:pPr marL="0" marR="0" indent="0" algn="l" defTabSz="914400" rtl="0" eaLnBrk="1" fontAlgn="auto" latinLnBrk="0" hangingPunct="1">
+              <a:lnSpc>
+                <a:spcPct val="100000"/>
+              </a:lnSpc>
+              <a:spcBef>
+                <a:spcPts val="0"/>
+              </a:spcBef>
+              <a:spcAft>
+                <a:spcPts val="0"/>
+              </a:spcAft>
+              <a:buClrTx/>
+              <a:buSzTx/>
+              <a:buFontTx/>
+              <a:buNone/>
+              <a:tabLst/>
+              <a:defRPr/>
+            </a:pPr>
             <a:endParaRPr lang="en-US" sz="1200" kern="1200" dirty="0" smtClean="0">
               <a:solidFill>
                 <a:schemeClr val="tx1"/>
@@ -905,7 +1010,267 @@
           <a:p>
             <a:fld id="{89029652-62E7-43D6-83B5-097D7B7AA5D8}" type="slidenum">
               <a:rPr lang="en-US" smtClean="0"/>
-              <a:t>13</a:t>
+              <a:t>14</a:t>
+            </a:fld>
+            <a:endParaRPr lang="en-US"/>
+          </a:p>
+        </p:txBody>
+      </p:sp>
+    </p:spTree>
+    <p:extLst>
+      <p:ext uri="{BB962C8B-B14F-4D97-AF65-F5344CB8AC3E}">
+        <p14:creationId xmlns:p14="http://schemas.microsoft.com/office/powerpoint/2010/main" val="2181037172"/>
+      </p:ext>
+    </p:extLst>
+  </p:cSld>
+  <p:clrMapOvr>
+    <a:masterClrMapping/>
+  </p:clrMapOvr>
+</p:notes>
+</file>
+
+<file path=ppt/notesSlides/notesSlide15.xml><?xml version="1.0" encoding="utf-8"?>
+<p:notes xmlns:a="http://schemas.openxmlformats.org/drawingml/2006/main" xmlns:r="http://schemas.openxmlformats.org/officeDocument/2006/relationships" xmlns:p="http://schemas.openxmlformats.org/presentationml/2006/main">
+  <p:cSld>
+    <p:spTree>
+      <p:nvGrpSpPr>
+        <p:cNvPr id="1" name=""/>
+        <p:cNvGrpSpPr/>
+        <p:nvPr/>
+      </p:nvGrpSpPr>
+      <p:grpSpPr>
+        <a:xfrm>
+          <a:off x="0" y="0"/>
+          <a:ext cx="0" cy="0"/>
+          <a:chOff x="0" y="0"/>
+          <a:chExt cx="0" cy="0"/>
+        </a:xfrm>
+      </p:grpSpPr>
+      <p:sp>
+        <p:nvSpPr>
+          <p:cNvPr id="2" name="Slide Image Placeholder 1"/>
+          <p:cNvSpPr>
+            <a:spLocks noGrp="1" noRot="1" noChangeAspect="1"/>
+          </p:cNvSpPr>
+          <p:nvPr>
+            <p:ph type="sldImg"/>
+          </p:nvPr>
+        </p:nvSpPr>
+        <p:spPr/>
+      </p:sp>
+      <p:sp>
+        <p:nvSpPr>
+          <p:cNvPr id="3" name="Notes Placeholder 2"/>
+          <p:cNvSpPr>
+            <a:spLocks noGrp="1"/>
+          </p:cNvSpPr>
+          <p:nvPr>
+            <p:ph type="body" idx="1"/>
+          </p:nvPr>
+        </p:nvSpPr>
+        <p:spPr/>
+        <p:txBody>
+          <a:bodyPr/>
+          <a:lstStyle/>
+          <a:p>
+            <a:endParaRPr lang="en-US" b="0" dirty="0" smtClean="0"/>
+          </a:p>
+        </p:txBody>
+      </p:sp>
+      <p:sp>
+        <p:nvSpPr>
+          <p:cNvPr id="4" name="Slide Number Placeholder 3"/>
+          <p:cNvSpPr>
+            <a:spLocks noGrp="1"/>
+          </p:cNvSpPr>
+          <p:nvPr>
+            <p:ph type="sldNum" sz="quarter" idx="10"/>
+          </p:nvPr>
+        </p:nvSpPr>
+        <p:spPr/>
+        <p:txBody>
+          <a:bodyPr/>
+          <a:lstStyle/>
+          <a:p>
+            <a:fld id="{89029652-62E7-43D6-83B5-097D7B7AA5D8}" type="slidenum">
+              <a:rPr lang="en-US" smtClean="0"/>
+              <a:t>15</a:t>
+            </a:fld>
+            <a:endParaRPr lang="en-US"/>
+          </a:p>
+        </p:txBody>
+      </p:sp>
+    </p:spTree>
+    <p:extLst>
+      <p:ext uri="{BB962C8B-B14F-4D97-AF65-F5344CB8AC3E}">
+        <p14:creationId xmlns:p14="http://schemas.microsoft.com/office/powerpoint/2010/main" val="4212963282"/>
+      </p:ext>
+    </p:extLst>
+  </p:cSld>
+  <p:clrMapOvr>
+    <a:masterClrMapping/>
+  </p:clrMapOvr>
+</p:notes>
+</file>
+
+<file path=ppt/notesSlides/notesSlide16.xml><?xml version="1.0" encoding="utf-8"?>
+<p:notes xmlns:a="http://schemas.openxmlformats.org/drawingml/2006/main" xmlns:r="http://schemas.openxmlformats.org/officeDocument/2006/relationships" xmlns:p="http://schemas.openxmlformats.org/presentationml/2006/main">
+  <p:cSld>
+    <p:spTree>
+      <p:nvGrpSpPr>
+        <p:cNvPr id="1" name=""/>
+        <p:cNvGrpSpPr/>
+        <p:nvPr/>
+      </p:nvGrpSpPr>
+      <p:grpSpPr>
+        <a:xfrm>
+          <a:off x="0" y="0"/>
+          <a:ext cx="0" cy="0"/>
+          <a:chOff x="0" y="0"/>
+          <a:chExt cx="0" cy="0"/>
+        </a:xfrm>
+      </p:grpSpPr>
+      <p:sp>
+        <p:nvSpPr>
+          <p:cNvPr id="2" name="Slide Image Placeholder 1"/>
+          <p:cNvSpPr>
+            <a:spLocks noGrp="1" noRot="1" noChangeAspect="1"/>
+          </p:cNvSpPr>
+          <p:nvPr>
+            <p:ph type="sldImg"/>
+          </p:nvPr>
+        </p:nvSpPr>
+        <p:spPr/>
+      </p:sp>
+      <p:sp>
+        <p:nvSpPr>
+          <p:cNvPr id="3" name="Notes Placeholder 2"/>
+          <p:cNvSpPr>
+            <a:spLocks noGrp="1"/>
+          </p:cNvSpPr>
+          <p:nvPr>
+            <p:ph type="body" idx="1"/>
+          </p:nvPr>
+        </p:nvSpPr>
+        <p:spPr/>
+        <p:txBody>
+          <a:bodyPr/>
+          <a:lstStyle/>
+          <a:p>
+            <a:endParaRPr lang="en-US" b="0" dirty="0" smtClean="0"/>
+          </a:p>
+        </p:txBody>
+      </p:sp>
+      <p:sp>
+        <p:nvSpPr>
+          <p:cNvPr id="4" name="Slide Number Placeholder 3"/>
+          <p:cNvSpPr>
+            <a:spLocks noGrp="1"/>
+          </p:cNvSpPr>
+          <p:nvPr>
+            <p:ph type="sldNum" sz="quarter" idx="10"/>
+          </p:nvPr>
+        </p:nvSpPr>
+        <p:spPr/>
+        <p:txBody>
+          <a:bodyPr/>
+          <a:lstStyle/>
+          <a:p>
+            <a:fld id="{89029652-62E7-43D6-83B5-097D7B7AA5D8}" type="slidenum">
+              <a:rPr lang="en-US" smtClean="0"/>
+              <a:t>16</a:t>
+            </a:fld>
+            <a:endParaRPr lang="en-US"/>
+          </a:p>
+        </p:txBody>
+      </p:sp>
+    </p:spTree>
+    <p:extLst>
+      <p:ext uri="{BB962C8B-B14F-4D97-AF65-F5344CB8AC3E}">
+        <p14:creationId xmlns:p14="http://schemas.microsoft.com/office/powerpoint/2010/main" val="2267138517"/>
+      </p:ext>
+    </p:extLst>
+  </p:cSld>
+  <p:clrMapOvr>
+    <a:masterClrMapping/>
+  </p:clrMapOvr>
+</p:notes>
+</file>
+
+<file path=ppt/notesSlides/notesSlide17.xml><?xml version="1.0" encoding="utf-8"?>
+<p:notes xmlns:a="http://schemas.openxmlformats.org/drawingml/2006/main" xmlns:r="http://schemas.openxmlformats.org/officeDocument/2006/relationships" xmlns:p="http://schemas.openxmlformats.org/presentationml/2006/main">
+  <p:cSld>
+    <p:spTree>
+      <p:nvGrpSpPr>
+        <p:cNvPr id="1" name=""/>
+        <p:cNvGrpSpPr/>
+        <p:nvPr/>
+      </p:nvGrpSpPr>
+      <p:grpSpPr>
+        <a:xfrm>
+          <a:off x="0" y="0"/>
+          <a:ext cx="0" cy="0"/>
+          <a:chOff x="0" y="0"/>
+          <a:chExt cx="0" cy="0"/>
+        </a:xfrm>
+      </p:grpSpPr>
+      <p:sp>
+        <p:nvSpPr>
+          <p:cNvPr id="2" name="Slide Image Placeholder 1"/>
+          <p:cNvSpPr>
+            <a:spLocks noGrp="1" noRot="1" noChangeAspect="1"/>
+          </p:cNvSpPr>
+          <p:nvPr>
+            <p:ph type="sldImg"/>
+          </p:nvPr>
+        </p:nvSpPr>
+        <p:spPr/>
+      </p:sp>
+      <p:sp>
+        <p:nvSpPr>
+          <p:cNvPr id="3" name="Notes Placeholder 2"/>
+          <p:cNvSpPr>
+            <a:spLocks noGrp="1"/>
+          </p:cNvSpPr>
+          <p:nvPr>
+            <p:ph type="body" idx="1"/>
+          </p:nvPr>
+        </p:nvSpPr>
+        <p:spPr/>
+        <p:txBody>
+          <a:bodyPr/>
+          <a:lstStyle/>
+          <a:p>
+            <a:endParaRPr lang="en-US" sz="1200" kern="1200" dirty="0" smtClean="0">
+              <a:solidFill>
+                <a:schemeClr val="tx1"/>
+              </a:solidFill>
+              <a:effectLst/>
+              <a:latin typeface="+mn-lt"/>
+              <a:ea typeface="+mn-ea"/>
+              <a:cs typeface="+mn-cs"/>
+            </a:endParaRPr>
+          </a:p>
+        </p:txBody>
+      </p:sp>
+      <p:sp>
+        <p:nvSpPr>
+          <p:cNvPr id="4" name="Slide Number Placeholder 3"/>
+          <p:cNvSpPr>
+            <a:spLocks noGrp="1"/>
+          </p:cNvSpPr>
+          <p:nvPr>
+            <p:ph type="sldNum" sz="quarter" idx="10"/>
+          </p:nvPr>
+        </p:nvSpPr>
+        <p:spPr/>
+        <p:txBody>
+          <a:bodyPr/>
+          <a:lstStyle/>
+          <a:p>
+            <a:fld id="{89029652-62E7-43D6-83B5-097D7B7AA5D8}" type="slidenum">
+              <a:rPr lang="en-US" smtClean="0"/>
+              <a:t>17</a:t>
             </a:fld>
             <a:endParaRPr lang="en-US"/>
           </a:p>
@@ -1409,7 +1774,7 @@
     </p:spTree>
     <p:extLst>
       <p:ext uri="{BB962C8B-B14F-4D97-AF65-F5344CB8AC3E}">
-        <p14:creationId xmlns:p14="http://schemas.microsoft.com/office/powerpoint/2010/main" val="3857776700"/>
+        <p14:creationId xmlns:p14="http://schemas.microsoft.com/office/powerpoint/2010/main" val="2618653752"/>
       </p:ext>
     </p:extLst>
   </p:cSld>
@@ -1493,7 +1858,7 @@
     </p:spTree>
     <p:extLst>
       <p:ext uri="{BB962C8B-B14F-4D97-AF65-F5344CB8AC3E}">
-        <p14:creationId xmlns:p14="http://schemas.microsoft.com/office/powerpoint/2010/main" val="471706104"/>
+        <p14:creationId xmlns:p14="http://schemas.microsoft.com/office/powerpoint/2010/main" val="2952211142"/>
       </p:ext>
     </p:extLst>
   </p:cSld>
@@ -1577,7 +1942,7 @@
     </p:spTree>
     <p:extLst>
       <p:ext uri="{BB962C8B-B14F-4D97-AF65-F5344CB8AC3E}">
-        <p14:creationId xmlns:p14="http://schemas.microsoft.com/office/powerpoint/2010/main" val="904030834"/>
+        <p14:creationId xmlns:p14="http://schemas.microsoft.com/office/powerpoint/2010/main" val="4127349146"/>
       </p:ext>
     </p:extLst>
   </p:cSld>
@@ -1661,7 +2026,7 @@
     </p:spTree>
     <p:extLst>
       <p:ext uri="{BB962C8B-B14F-4D97-AF65-F5344CB8AC3E}">
-        <p14:creationId xmlns:p14="http://schemas.microsoft.com/office/powerpoint/2010/main" val="2815086961"/>
+        <p14:creationId xmlns:p14="http://schemas.microsoft.com/office/powerpoint/2010/main" val="1755245411"/>
       </p:ext>
     </p:extLst>
   </p:cSld>
@@ -4832,7 +5197,7 @@
       </p:sp>
       <p:pic>
         <p:nvPicPr>
-          <p:cNvPr id="4" name="Picture 3"/>
+          <p:cNvPr id="5" name="Picture 4"/>
           <p:cNvPicPr>
             <a:picLocks noChangeAspect="1"/>
           </p:cNvPicPr>
@@ -4846,8 +5211,32 @@
         </p:blipFill>
         <p:spPr>
           <a:xfrm>
-            <a:off x="838199" y="2769935"/>
-            <a:ext cx="10619049" cy="2819704"/>
+            <a:off x="838200" y="1690688"/>
+            <a:ext cx="10438157" cy="5064073"/>
+          </a:xfrm>
+          <a:prstGeom prst="rect">
+            <a:avLst/>
+          </a:prstGeom>
+        </p:spPr>
+      </p:pic>
+      <p:pic>
+        <p:nvPicPr>
+          <p:cNvPr id="8" name="Picture 7"/>
+          <p:cNvPicPr>
+            <a:picLocks noChangeAspect="1"/>
+          </p:cNvPicPr>
+          <p:nvPr/>
+        </p:nvPicPr>
+        <p:blipFill>
+          <a:blip r:embed="rId4"/>
+          <a:stretch>
+            <a:fillRect/>
+          </a:stretch>
+        </p:blipFill>
+        <p:spPr>
+          <a:xfrm rot="5400000">
+            <a:off x="7585502" y="2976081"/>
+            <a:ext cx="4810602" cy="2725996"/>
           </a:xfrm>
           <a:prstGeom prst="rect">
             <a:avLst/>
@@ -4857,7 +5246,7 @@
     </p:spTree>
     <p:extLst>
       <p:ext uri="{BB962C8B-B14F-4D97-AF65-F5344CB8AC3E}">
-        <p14:creationId xmlns:p14="http://schemas.microsoft.com/office/powerpoint/2010/main" val="828356661"/>
+        <p14:creationId xmlns:p14="http://schemas.microsoft.com/office/powerpoint/2010/main" val="2554030609"/>
       </p:ext>
     </p:extLst>
   </p:cSld>
@@ -4910,7 +5299,7 @@
           <a:p>
             <a:r>
               <a:rPr lang="en-US" sz="4800" dirty="0" smtClean="0"/>
-              <a:t>Patented step-by-step slide</a:t>
+              <a:t>"Cross cutting" concerns</a:t>
             </a:r>
             <a:endParaRPr lang="en-US" sz="4800" dirty="0"/>
           </a:p>
@@ -4938,43 +5327,15 @@
           </a:bodyPr>
           <a:lstStyle/>
           <a:p>
-            <a:r>
-              <a:rPr lang="en-US" sz="4000" dirty="0" smtClean="0">
-                <a:solidFill>
-                  <a:schemeClr val="bg1">
-                    <a:lumMod val="65000"/>
-                  </a:schemeClr>
-                </a:solidFill>
-              </a:rPr>
-              <a:t>Old news</a:t>
-            </a:r>
-            <a:br>
-              <a:rPr lang="en-US" sz="4000" dirty="0" smtClean="0">
-                <a:solidFill>
-                  <a:schemeClr val="bg1">
-                    <a:lumMod val="65000"/>
-                  </a:schemeClr>
-                </a:solidFill>
-              </a:rPr>
-            </a:br>
-            <a:endParaRPr lang="en-US" sz="4000" dirty="0" smtClean="0">
-              <a:solidFill>
-                <a:schemeClr val="bg1">
-                  <a:lumMod val="65000"/>
-                </a:schemeClr>
-              </a:solidFill>
-            </a:endParaRPr>
-          </a:p>
-          <a:p>
-            <a:r>
-              <a:rPr lang="en-US" sz="4000" b="1" dirty="0" smtClean="0"/>
-              <a:t>New hotness</a:t>
-            </a:r>
+            <a:endParaRPr lang="en-US" sz="4000" dirty="0"/>
           </a:p>
           <a:p>
             <a:endParaRPr lang="en-US" sz="4000" dirty="0" smtClean="0"/>
           </a:p>
           <a:p>
+            <a:endParaRPr lang="en-US" sz="4000" dirty="0" smtClean="0"/>
+          </a:p>
+          <a:p>
             <a:endParaRPr lang="en-US" dirty="0" smtClean="0"/>
           </a:p>
           <a:p>
@@ -4985,10 +5346,34 @@
           </a:p>
         </p:txBody>
       </p:sp>
+      <p:pic>
+        <p:nvPicPr>
+          <p:cNvPr id="5" name="Picture 4"/>
+          <p:cNvPicPr>
+            <a:picLocks noChangeAspect="1"/>
+          </p:cNvPicPr>
+          <p:nvPr/>
+        </p:nvPicPr>
+        <p:blipFill>
+          <a:blip r:embed="rId3"/>
+          <a:stretch>
+            <a:fillRect/>
+          </a:stretch>
+        </p:blipFill>
+        <p:spPr>
+          <a:xfrm>
+            <a:off x="838200" y="1690688"/>
+            <a:ext cx="10438157" cy="5064073"/>
+          </a:xfrm>
+          <a:prstGeom prst="rect">
+            <a:avLst/>
+          </a:prstGeom>
+        </p:spPr>
+      </p:pic>
     </p:spTree>
     <p:extLst>
       <p:ext uri="{BB962C8B-B14F-4D97-AF65-F5344CB8AC3E}">
-        <p14:creationId xmlns:p14="http://schemas.microsoft.com/office/powerpoint/2010/main" val="2285767896"/>
+        <p14:creationId xmlns:p14="http://schemas.microsoft.com/office/powerpoint/2010/main" val="1000586095"/>
       </p:ext>
     </p:extLst>
   </p:cSld>
@@ -5022,6 +5407,459 @@
           <a:chExt cx="0" cy="0"/>
         </a:xfrm>
       </p:grpSpPr>
+      <p:pic>
+        <p:nvPicPr>
+          <p:cNvPr id="4" name="Picture 3"/>
+          <p:cNvPicPr>
+            <a:picLocks noChangeAspect="1"/>
+          </p:cNvPicPr>
+          <p:nvPr/>
+        </p:nvPicPr>
+        <p:blipFill>
+          <a:blip r:embed="rId3"/>
+          <a:stretch>
+            <a:fillRect/>
+          </a:stretch>
+        </p:blipFill>
+        <p:spPr>
+          <a:xfrm>
+            <a:off x="838200" y="1753158"/>
+            <a:ext cx="10522191" cy="5104842"/>
+          </a:xfrm>
+          <a:prstGeom prst="rect">
+            <a:avLst/>
+          </a:prstGeom>
+        </p:spPr>
+      </p:pic>
+      <p:sp>
+        <p:nvSpPr>
+          <p:cNvPr id="2" name="Title 1"/>
+          <p:cNvSpPr>
+            <a:spLocks noGrp="1"/>
+          </p:cNvSpPr>
+          <p:nvPr>
+            <p:ph type="title"/>
+          </p:nvPr>
+        </p:nvSpPr>
+        <p:spPr/>
+        <p:txBody>
+          <a:bodyPr>
+            <a:normAutofit/>
+          </a:bodyPr>
+          <a:lstStyle/>
+          <a:p>
+            <a:r>
+              <a:rPr lang="en-US" sz="4800" dirty="0" smtClean="0"/>
+              <a:t>"Cross cutting" concerns</a:t>
+            </a:r>
+            <a:endParaRPr lang="en-US" sz="4800" dirty="0"/>
+          </a:p>
+        </p:txBody>
+      </p:sp>
+      <p:sp>
+        <p:nvSpPr>
+          <p:cNvPr id="3" name="Content Placeholder 2"/>
+          <p:cNvSpPr>
+            <a:spLocks noGrp="1"/>
+          </p:cNvSpPr>
+          <p:nvPr>
+            <p:ph idx="1"/>
+          </p:nvPr>
+        </p:nvSpPr>
+        <p:spPr>
+          <a:xfrm>
+            <a:off x="838200" y="1825624"/>
+            <a:ext cx="10515600" cy="4589923"/>
+          </a:xfrm>
+        </p:spPr>
+        <p:txBody>
+          <a:bodyPr>
+            <a:normAutofit/>
+          </a:bodyPr>
+          <a:lstStyle/>
+          <a:p>
+            <a:endParaRPr lang="en-US" sz="4000" dirty="0"/>
+          </a:p>
+          <a:p>
+            <a:endParaRPr lang="en-US" sz="4000" dirty="0" smtClean="0"/>
+          </a:p>
+          <a:p>
+            <a:endParaRPr lang="en-US" sz="4000" dirty="0" smtClean="0"/>
+          </a:p>
+          <a:p>
+            <a:endParaRPr lang="en-US" dirty="0" smtClean="0"/>
+          </a:p>
+          <a:p>
+            <a:endParaRPr lang="en-US" dirty="0" smtClean="0"/>
+          </a:p>
+          <a:p>
+            <a:endParaRPr lang="en-US" dirty="0"/>
+          </a:p>
+        </p:txBody>
+      </p:sp>
+    </p:spTree>
+    <p:extLst>
+      <p:ext uri="{BB962C8B-B14F-4D97-AF65-F5344CB8AC3E}">
+        <p14:creationId xmlns:p14="http://schemas.microsoft.com/office/powerpoint/2010/main" val="523276211"/>
+      </p:ext>
+    </p:extLst>
+  </p:cSld>
+  <p:clrMapOvr>
+    <a:masterClrMapping/>
+  </p:clrMapOvr>
+  <p:timing>
+    <p:tnLst>
+      <p:par>
+        <p:cTn id="1" dur="indefinite" restart="never" nodeType="tmRoot"/>
+      </p:par>
+    </p:tnLst>
+  </p:timing>
+</p:sld>
+</file>
+
+<file path=ppt/slides/slide13.xml><?xml version="1.0" encoding="utf-8"?>
+<p:sld xmlns:a="http://schemas.openxmlformats.org/drawingml/2006/main" xmlns:r="http://schemas.openxmlformats.org/officeDocument/2006/relationships" xmlns:p="http://schemas.openxmlformats.org/presentationml/2006/main">
+  <p:cSld>
+    <p:spTree>
+      <p:nvGrpSpPr>
+        <p:cNvPr id="1" name=""/>
+        <p:cNvGrpSpPr/>
+        <p:nvPr/>
+      </p:nvGrpSpPr>
+      <p:grpSpPr>
+        <a:xfrm>
+          <a:off x="0" y="0"/>
+          <a:ext cx="0" cy="0"/>
+          <a:chOff x="0" y="0"/>
+          <a:chExt cx="0" cy="0"/>
+        </a:xfrm>
+      </p:grpSpPr>
+      <p:pic>
+        <p:nvPicPr>
+          <p:cNvPr id="6" name="Picture 5"/>
+          <p:cNvPicPr>
+            <a:picLocks noChangeAspect="1"/>
+          </p:cNvPicPr>
+          <p:nvPr/>
+        </p:nvPicPr>
+        <p:blipFill>
+          <a:blip r:embed="rId3"/>
+          <a:stretch>
+            <a:fillRect/>
+          </a:stretch>
+        </p:blipFill>
+        <p:spPr>
+          <a:xfrm>
+            <a:off x="533392" y="2193260"/>
+            <a:ext cx="10783355" cy="4561500"/>
+          </a:xfrm>
+          <a:prstGeom prst="rect">
+            <a:avLst/>
+          </a:prstGeom>
+        </p:spPr>
+      </p:pic>
+      <p:sp>
+        <p:nvSpPr>
+          <p:cNvPr id="2" name="Title 1"/>
+          <p:cNvSpPr>
+            <a:spLocks noGrp="1"/>
+          </p:cNvSpPr>
+          <p:nvPr>
+            <p:ph type="title"/>
+          </p:nvPr>
+        </p:nvSpPr>
+        <p:spPr/>
+        <p:txBody>
+          <a:bodyPr>
+            <a:normAutofit/>
+          </a:bodyPr>
+          <a:lstStyle/>
+          <a:p>
+            <a:r>
+              <a:rPr lang="en-US" sz="4800" dirty="0" smtClean="0"/>
+              <a:t>"Cross cutting" concerns</a:t>
+            </a:r>
+            <a:endParaRPr lang="en-US" sz="4800" dirty="0"/>
+          </a:p>
+        </p:txBody>
+      </p:sp>
+      <p:sp>
+        <p:nvSpPr>
+          <p:cNvPr id="3" name="Content Placeholder 2"/>
+          <p:cNvSpPr>
+            <a:spLocks noGrp="1"/>
+          </p:cNvSpPr>
+          <p:nvPr>
+            <p:ph idx="1"/>
+          </p:nvPr>
+        </p:nvSpPr>
+        <p:spPr>
+          <a:xfrm>
+            <a:off x="838200" y="1825624"/>
+            <a:ext cx="10515600" cy="4589923"/>
+          </a:xfrm>
+        </p:spPr>
+        <p:txBody>
+          <a:bodyPr>
+            <a:normAutofit/>
+          </a:bodyPr>
+          <a:lstStyle/>
+          <a:p>
+            <a:endParaRPr lang="en-US" sz="4000" dirty="0"/>
+          </a:p>
+          <a:p>
+            <a:endParaRPr lang="en-US" sz="4000" dirty="0" smtClean="0"/>
+          </a:p>
+          <a:p>
+            <a:endParaRPr lang="en-US" sz="4000" dirty="0" smtClean="0"/>
+          </a:p>
+          <a:p>
+            <a:endParaRPr lang="en-US" dirty="0" smtClean="0"/>
+          </a:p>
+          <a:p>
+            <a:endParaRPr lang="en-US" dirty="0" smtClean="0"/>
+          </a:p>
+          <a:p>
+            <a:endParaRPr lang="en-US" dirty="0"/>
+          </a:p>
+        </p:txBody>
+      </p:sp>
+    </p:spTree>
+    <p:extLst>
+      <p:ext uri="{BB962C8B-B14F-4D97-AF65-F5344CB8AC3E}">
+        <p14:creationId xmlns:p14="http://schemas.microsoft.com/office/powerpoint/2010/main" val="3351071678"/>
+      </p:ext>
+    </p:extLst>
+  </p:cSld>
+  <p:clrMapOvr>
+    <a:masterClrMapping/>
+  </p:clrMapOvr>
+  <p:timing>
+    <p:tnLst>
+      <p:par>
+        <p:cTn id="1" dur="indefinite" restart="never" nodeType="tmRoot"/>
+      </p:par>
+    </p:tnLst>
+  </p:timing>
+</p:sld>
+</file>
+
+<file path=ppt/slides/slide14.xml><?xml version="1.0" encoding="utf-8"?>
+<p:sld xmlns:a="http://schemas.openxmlformats.org/drawingml/2006/main" xmlns:r="http://schemas.openxmlformats.org/officeDocument/2006/relationships" xmlns:p="http://schemas.openxmlformats.org/presentationml/2006/main">
+  <p:cSld>
+    <p:spTree>
+      <p:nvGrpSpPr>
+        <p:cNvPr id="1" name=""/>
+        <p:cNvGrpSpPr/>
+        <p:nvPr/>
+      </p:nvGrpSpPr>
+      <p:grpSpPr>
+        <a:xfrm>
+          <a:off x="0" y="0"/>
+          <a:ext cx="0" cy="0"/>
+          <a:chOff x="0" y="0"/>
+          <a:chExt cx="0" cy="0"/>
+        </a:xfrm>
+      </p:grpSpPr>
+      <p:sp>
+        <p:nvSpPr>
+          <p:cNvPr id="2" name="Title 1"/>
+          <p:cNvSpPr>
+            <a:spLocks noGrp="1"/>
+          </p:cNvSpPr>
+          <p:nvPr>
+            <p:ph type="title"/>
+          </p:nvPr>
+        </p:nvSpPr>
+        <p:spPr>
+          <a:xfrm>
+            <a:off x="964927" y="1"/>
+            <a:ext cx="10515600" cy="6858000"/>
+          </a:xfrm>
+        </p:spPr>
+        <p:txBody>
+          <a:bodyPr anchor="ctr">
+            <a:normAutofit/>
+          </a:bodyPr>
+          <a:lstStyle/>
+          <a:p>
+            <a:pPr algn="ctr"/>
+            <a:r>
+              <a:rPr lang="en-US" sz="4800" dirty="0" smtClean="0"/>
+              <a:t>Show me the codez!</a:t>
+            </a:r>
+            <a:endParaRPr lang="en-US" sz="4800" dirty="0"/>
+          </a:p>
+        </p:txBody>
+      </p:sp>
+    </p:spTree>
+    <p:extLst>
+      <p:ext uri="{BB962C8B-B14F-4D97-AF65-F5344CB8AC3E}">
+        <p14:creationId xmlns:p14="http://schemas.microsoft.com/office/powerpoint/2010/main" val="269211379"/>
+      </p:ext>
+    </p:extLst>
+  </p:cSld>
+  <p:clrMapOvr>
+    <a:masterClrMapping/>
+  </p:clrMapOvr>
+  <p:timing>
+    <p:tnLst>
+      <p:par>
+        <p:cTn id="1" dur="indefinite" restart="never" nodeType="tmRoot"/>
+      </p:par>
+    </p:tnLst>
+  </p:timing>
+</p:sld>
+</file>
+
+<file path=ppt/slides/slide15.xml><?xml version="1.0" encoding="utf-8"?>
+<p:sld xmlns:a="http://schemas.openxmlformats.org/drawingml/2006/main" xmlns:r="http://schemas.openxmlformats.org/officeDocument/2006/relationships" xmlns:p="http://schemas.openxmlformats.org/presentationml/2006/main">
+  <p:cSld>
+    <p:spTree>
+      <p:nvGrpSpPr>
+        <p:cNvPr id="1" name=""/>
+        <p:cNvGrpSpPr/>
+        <p:nvPr/>
+      </p:nvGrpSpPr>
+      <p:grpSpPr>
+        <a:xfrm>
+          <a:off x="0" y="0"/>
+          <a:ext cx="0" cy="0"/>
+          <a:chOff x="0" y="0"/>
+          <a:chExt cx="0" cy="0"/>
+        </a:xfrm>
+      </p:grpSpPr>
+      <p:sp>
+        <p:nvSpPr>
+          <p:cNvPr id="2" name="Title 1"/>
+          <p:cNvSpPr>
+            <a:spLocks noGrp="1"/>
+          </p:cNvSpPr>
+          <p:nvPr>
+            <p:ph type="title"/>
+          </p:nvPr>
+        </p:nvSpPr>
+        <p:spPr/>
+        <p:txBody>
+          <a:bodyPr>
+            <a:normAutofit/>
+          </a:bodyPr>
+          <a:lstStyle/>
+          <a:p>
+            <a:r>
+              <a:rPr lang="en-US" sz="4800" dirty="0" smtClean="0"/>
+              <a:t>Patented step-by-step slide</a:t>
+            </a:r>
+            <a:endParaRPr lang="en-US" sz="4800" dirty="0"/>
+          </a:p>
+        </p:txBody>
+      </p:sp>
+      <p:sp>
+        <p:nvSpPr>
+          <p:cNvPr id="3" name="Content Placeholder 2"/>
+          <p:cNvSpPr>
+            <a:spLocks noGrp="1"/>
+          </p:cNvSpPr>
+          <p:nvPr>
+            <p:ph idx="1"/>
+          </p:nvPr>
+        </p:nvSpPr>
+        <p:spPr>
+          <a:xfrm>
+            <a:off x="838200" y="1825624"/>
+            <a:ext cx="10515600" cy="4589923"/>
+          </a:xfrm>
+        </p:spPr>
+        <p:txBody>
+          <a:bodyPr>
+            <a:normAutofit/>
+          </a:bodyPr>
+          <a:lstStyle/>
+          <a:p>
+            <a:r>
+              <a:rPr lang="en-US" sz="4000" dirty="0" smtClean="0">
+                <a:solidFill>
+                  <a:schemeClr val="bg1">
+                    <a:lumMod val="65000"/>
+                  </a:schemeClr>
+                </a:solidFill>
+              </a:rPr>
+              <a:t>Old news</a:t>
+            </a:r>
+            <a:br>
+              <a:rPr lang="en-US" sz="4000" dirty="0" smtClean="0">
+                <a:solidFill>
+                  <a:schemeClr val="bg1">
+                    <a:lumMod val="65000"/>
+                  </a:schemeClr>
+                </a:solidFill>
+              </a:rPr>
+            </a:br>
+            <a:endParaRPr lang="en-US" sz="4000" dirty="0" smtClean="0">
+              <a:solidFill>
+                <a:schemeClr val="bg1">
+                  <a:lumMod val="65000"/>
+                </a:schemeClr>
+              </a:solidFill>
+            </a:endParaRPr>
+          </a:p>
+          <a:p>
+            <a:r>
+              <a:rPr lang="en-US" sz="4000" b="1" dirty="0" smtClean="0"/>
+              <a:t>New hotness</a:t>
+            </a:r>
+          </a:p>
+          <a:p>
+            <a:endParaRPr lang="en-US" sz="4000" dirty="0" smtClean="0"/>
+          </a:p>
+          <a:p>
+            <a:endParaRPr lang="en-US" dirty="0" smtClean="0"/>
+          </a:p>
+          <a:p>
+            <a:endParaRPr lang="en-US" dirty="0" smtClean="0"/>
+          </a:p>
+          <a:p>
+            <a:endParaRPr lang="en-US" dirty="0"/>
+          </a:p>
+        </p:txBody>
+      </p:sp>
+    </p:spTree>
+    <p:extLst>
+      <p:ext uri="{BB962C8B-B14F-4D97-AF65-F5344CB8AC3E}">
+        <p14:creationId xmlns:p14="http://schemas.microsoft.com/office/powerpoint/2010/main" val="2285767896"/>
+      </p:ext>
+    </p:extLst>
+  </p:cSld>
+  <p:clrMapOvr>
+    <a:masterClrMapping/>
+  </p:clrMapOvr>
+  <p:timing>
+    <p:tnLst>
+      <p:par>
+        <p:cTn id="1" dur="indefinite" restart="never" nodeType="tmRoot"/>
+      </p:par>
+    </p:tnLst>
+  </p:timing>
+</p:sld>
+</file>
+
+<file path=ppt/slides/slide16.xml><?xml version="1.0" encoding="utf-8"?>
+<p:sld xmlns:a="http://schemas.openxmlformats.org/drawingml/2006/main" xmlns:r="http://schemas.openxmlformats.org/officeDocument/2006/relationships" xmlns:p="http://schemas.openxmlformats.org/presentationml/2006/main">
+  <p:cSld>
+    <p:spTree>
+      <p:nvGrpSpPr>
+        <p:cNvPr id="1" name=""/>
+        <p:cNvGrpSpPr/>
+        <p:nvPr/>
+      </p:nvGrpSpPr>
+      <p:grpSpPr>
+        <a:xfrm>
+          <a:off x="0" y="0"/>
+          <a:ext cx="0" cy="0"/>
+          <a:chOff x="0" y="0"/>
+          <a:chExt cx="0" cy="0"/>
+        </a:xfrm>
+      </p:grpSpPr>
       <p:sp>
         <p:nvSpPr>
           <p:cNvPr id="2" name="Title 1"/>
@@ -5102,7 +5940,7 @@
 </p:sld>
 </file>
 
-<file path=ppt/slides/slide13.xml><?xml version="1.0" encoding="utf-8"?>
+<file path=ppt/slides/slide17.xml><?xml version="1.0" encoding="utf-8"?>
 <p:sld xmlns:a="http://schemas.openxmlformats.org/drawingml/2006/main" xmlns:r="http://schemas.openxmlformats.org/officeDocument/2006/relationships" xmlns:p="http://schemas.openxmlformats.org/presentationml/2006/main">
   <p:cSld>
     <p:spTree>
@@ -5727,16 +6565,22 @@
             <p:ph type="title"/>
           </p:nvPr>
         </p:nvSpPr>
-        <p:spPr/>
+        <p:spPr>
+          <a:xfrm>
+            <a:off x="838200" y="1574493"/>
+            <a:ext cx="10515600" cy="1325563"/>
+          </a:xfrm>
+        </p:spPr>
         <p:txBody>
           <a:bodyPr>
             <a:normAutofit/>
           </a:bodyPr>
           <a:lstStyle/>
           <a:p>
+            <a:pPr algn="ctr"/>
             <a:r>
               <a:rPr lang="en-US" sz="4800" dirty="0" smtClean="0"/>
-              <a:t>"Cross cutting" concerns</a:t>
+              <a:t>"Cross cutting" concern</a:t>
             </a:r>
             <a:endParaRPr lang="en-US" sz="4800" dirty="0"/>
           </a:p>
@@ -5754,8 +6598,8 @@
         </p:nvSpPr>
         <p:spPr>
           <a:xfrm>
-            <a:off x="838200" y="1825624"/>
-            <a:ext cx="10515600" cy="4589923"/>
+            <a:off x="838200" y="3318387"/>
+            <a:ext cx="10515600" cy="1814052"/>
           </a:xfrm>
         </p:spPr>
         <p:txBody>
@@ -5764,15 +6608,31 @@
           </a:bodyPr>
           <a:lstStyle/>
           <a:p>
-            <a:endParaRPr lang="en-US" sz="4000" dirty="0"/>
-          </a:p>
-          <a:p>
+            <a:pPr marL="0" indent="0" algn="ctr">
+              <a:buNone/>
+            </a:pPr>
+            <a:r>
+              <a:rPr lang="en-US" sz="4000" dirty="0" smtClean="0"/>
+              <a:t>Any security requirement that </a:t>
+            </a:r>
+          </a:p>
+          <a:p>
+            <a:pPr marL="0" indent="0" algn="ctr">
+              <a:buNone/>
+            </a:pPr>
+            <a:r>
+              <a:rPr lang="en-US" sz="4000" dirty="0" smtClean="0"/>
+              <a:t>spans multiple features</a:t>
+            </a:r>
             <a:endParaRPr lang="en-US" sz="4000" dirty="0" smtClean="0"/>
           </a:p>
           <a:p>
             <a:endParaRPr lang="en-US" sz="4000" dirty="0" smtClean="0"/>
           </a:p>
           <a:p>
+            <a:endParaRPr lang="en-US" sz="4000" dirty="0" smtClean="0"/>
+          </a:p>
+          <a:p>
             <a:endParaRPr lang="en-US" dirty="0" smtClean="0"/>
           </a:p>
           <a:p>
@@ -5783,58 +6643,10 @@
           </a:p>
         </p:txBody>
       </p:sp>
-      <p:pic>
-        <p:nvPicPr>
-          <p:cNvPr id="6" name="Picture 5"/>
-          <p:cNvPicPr>
-            <a:picLocks noChangeAspect="1"/>
-          </p:cNvPicPr>
-          <p:nvPr/>
-        </p:nvPicPr>
-        <p:blipFill>
-          <a:blip r:embed="rId3"/>
-          <a:stretch>
-            <a:fillRect/>
-          </a:stretch>
-        </p:blipFill>
-        <p:spPr>
-          <a:xfrm>
-            <a:off x="838200" y="1933777"/>
-            <a:ext cx="10515600" cy="4474906"/>
-          </a:xfrm>
-          <a:prstGeom prst="rect">
-            <a:avLst/>
-          </a:prstGeom>
-        </p:spPr>
-      </p:pic>
-      <p:pic>
-        <p:nvPicPr>
-          <p:cNvPr id="7" name="Picture 6"/>
-          <p:cNvPicPr>
-            <a:picLocks noChangeAspect="1"/>
-          </p:cNvPicPr>
-          <p:nvPr/>
-        </p:nvPicPr>
-        <p:blipFill>
-          <a:blip r:embed="rId4"/>
-          <a:stretch>
-            <a:fillRect/>
-          </a:stretch>
-        </p:blipFill>
-        <p:spPr>
-          <a:xfrm rot="5400000">
-            <a:off x="4947385" y="337963"/>
-            <a:ext cx="4810602" cy="8002231"/>
-          </a:xfrm>
-          <a:prstGeom prst="rect">
-            <a:avLst/>
-          </a:prstGeom>
-        </p:spPr>
-      </p:pic>
     </p:spTree>
     <p:extLst>
       <p:ext uri="{BB962C8B-B14F-4D97-AF65-F5344CB8AC3E}">
-        <p14:creationId xmlns:p14="http://schemas.microsoft.com/office/powerpoint/2010/main" val="3864357827"/>
+        <p14:creationId xmlns:p14="http://schemas.microsoft.com/office/powerpoint/2010/main" val="1591414230"/>
       </p:ext>
     </p:extLst>
   </p:cSld>
@@ -5868,75 +6680,9 @@
           <a:chExt cx="0" cy="0"/>
         </a:xfrm>
       </p:grpSpPr>
-      <p:sp>
-        <p:nvSpPr>
-          <p:cNvPr id="2" name="Title 1"/>
-          <p:cNvSpPr>
-            <a:spLocks noGrp="1"/>
-          </p:cNvSpPr>
-          <p:nvPr>
-            <p:ph type="title"/>
-          </p:nvPr>
-        </p:nvSpPr>
-        <p:spPr/>
-        <p:txBody>
-          <a:bodyPr>
-            <a:normAutofit/>
-          </a:bodyPr>
-          <a:lstStyle/>
-          <a:p>
-            <a:r>
-              <a:rPr lang="en-US" sz="4800" dirty="0" smtClean="0"/>
-              <a:t>"Cross cutting" concerns</a:t>
-            </a:r>
-            <a:endParaRPr lang="en-US" sz="4800" dirty="0"/>
-          </a:p>
-        </p:txBody>
-      </p:sp>
-      <p:sp>
-        <p:nvSpPr>
-          <p:cNvPr id="3" name="Content Placeholder 2"/>
-          <p:cNvSpPr>
-            <a:spLocks noGrp="1"/>
-          </p:cNvSpPr>
-          <p:nvPr>
-            <p:ph idx="1"/>
-          </p:nvPr>
-        </p:nvSpPr>
-        <p:spPr>
-          <a:xfrm>
-            <a:off x="838200" y="1825624"/>
-            <a:ext cx="10515600" cy="4589923"/>
-          </a:xfrm>
-        </p:spPr>
-        <p:txBody>
-          <a:bodyPr>
-            <a:normAutofit/>
-          </a:bodyPr>
-          <a:lstStyle/>
-          <a:p>
-            <a:endParaRPr lang="en-US" sz="4000" dirty="0"/>
-          </a:p>
-          <a:p>
-            <a:endParaRPr lang="en-US" sz="4000" dirty="0" smtClean="0"/>
-          </a:p>
-          <a:p>
-            <a:endParaRPr lang="en-US" sz="4000" dirty="0" smtClean="0"/>
-          </a:p>
-          <a:p>
-            <a:endParaRPr lang="en-US" dirty="0" smtClean="0"/>
-          </a:p>
-          <a:p>
-            <a:endParaRPr lang="en-US" dirty="0" smtClean="0"/>
-          </a:p>
-          <a:p>
-            <a:endParaRPr lang="en-US" dirty="0"/>
-          </a:p>
-        </p:txBody>
-      </p:sp>
       <p:pic>
         <p:nvPicPr>
-          <p:cNvPr id="6" name="Picture 5"/>
+          <p:cNvPr id="9" name="Picture 8"/>
           <p:cNvPicPr>
             <a:picLocks noChangeAspect="1"/>
           </p:cNvPicPr>
@@ -5950,17 +6696,83 @@
         </p:blipFill>
         <p:spPr>
           <a:xfrm>
-            <a:off x="838200" y="1933777"/>
-            <a:ext cx="10515600" cy="4474906"/>
+            <a:off x="838198" y="3229789"/>
+            <a:ext cx="2303208" cy="3042449"/>
           </a:xfrm>
           <a:prstGeom prst="rect">
             <a:avLst/>
           </a:prstGeom>
         </p:spPr>
       </p:pic>
+      <p:sp>
+        <p:nvSpPr>
+          <p:cNvPr id="2" name="Title 1"/>
+          <p:cNvSpPr>
+            <a:spLocks noGrp="1"/>
+          </p:cNvSpPr>
+          <p:nvPr>
+            <p:ph type="title"/>
+          </p:nvPr>
+        </p:nvSpPr>
+        <p:spPr/>
+        <p:txBody>
+          <a:bodyPr>
+            <a:normAutofit/>
+          </a:bodyPr>
+          <a:lstStyle/>
+          <a:p>
+            <a:r>
+              <a:rPr lang="en-US" sz="4800" dirty="0" smtClean="0"/>
+              <a:t>"Cross cutting" concerns</a:t>
+            </a:r>
+            <a:endParaRPr lang="en-US" sz="4800" dirty="0"/>
+          </a:p>
+        </p:txBody>
+      </p:sp>
+      <p:sp>
+        <p:nvSpPr>
+          <p:cNvPr id="3" name="Content Placeholder 2"/>
+          <p:cNvSpPr>
+            <a:spLocks noGrp="1"/>
+          </p:cNvSpPr>
+          <p:nvPr>
+            <p:ph idx="1"/>
+          </p:nvPr>
+        </p:nvSpPr>
+        <p:spPr>
+          <a:xfrm>
+            <a:off x="838200" y="1825624"/>
+            <a:ext cx="10515600" cy="4589923"/>
+          </a:xfrm>
+        </p:spPr>
+        <p:txBody>
+          <a:bodyPr>
+            <a:normAutofit/>
+          </a:bodyPr>
+          <a:lstStyle/>
+          <a:p>
+            <a:endParaRPr lang="en-US" sz="4000" dirty="0"/>
+          </a:p>
+          <a:p>
+            <a:endParaRPr lang="en-US" sz="4000" dirty="0" smtClean="0"/>
+          </a:p>
+          <a:p>
+            <a:endParaRPr lang="en-US" sz="4000" dirty="0" smtClean="0"/>
+          </a:p>
+          <a:p>
+            <a:endParaRPr lang="en-US" dirty="0" smtClean="0"/>
+          </a:p>
+          <a:p>
+            <a:endParaRPr lang="en-US" dirty="0" smtClean="0"/>
+          </a:p>
+          <a:p>
+            <a:endParaRPr lang="en-US" dirty="0"/>
+          </a:p>
+        </p:txBody>
+      </p:sp>
       <p:pic>
         <p:nvPicPr>
-          <p:cNvPr id="5" name="Picture 4"/>
+          <p:cNvPr id="8" name="Picture 7"/>
           <p:cNvPicPr>
             <a:picLocks noChangeAspect="1"/>
           </p:cNvPicPr>
@@ -5974,18 +6786,86 @@
         </p:blipFill>
         <p:spPr>
           <a:xfrm rot="5400000">
-            <a:off x="6331890" y="1722468"/>
-            <a:ext cx="4810602" cy="5233221"/>
+            <a:off x="4947385" y="337963"/>
+            <a:ext cx="4810602" cy="8002231"/>
           </a:xfrm>
           <a:prstGeom prst="rect">
             <a:avLst/>
           </a:prstGeom>
         </p:spPr>
       </p:pic>
+      <p:sp>
+        <p:nvSpPr>
+          <p:cNvPr id="11" name="TextBox 10"/>
+          <p:cNvSpPr txBox="1"/>
+          <p:nvPr/>
+        </p:nvSpPr>
+        <p:spPr>
+          <a:xfrm>
+            <a:off x="3628103" y="2418734"/>
+            <a:ext cx="7648254" cy="3539430"/>
+          </a:xfrm>
+          <a:prstGeom prst="rect">
+            <a:avLst/>
+          </a:prstGeom>
+          <a:noFill/>
+        </p:spPr>
+        <p:txBody>
+          <a:bodyPr wrap="square" rtlCol="0">
+            <a:spAutoFit/>
+          </a:bodyPr>
+          <a:lstStyle/>
+          <a:p>
+            <a:r>
+              <a:rPr lang="en-US" sz="2800" dirty="0" smtClean="0"/>
+              <a:t>Security Requirements:</a:t>
+            </a:r>
+          </a:p>
+          <a:p>
+            <a:endParaRPr lang="en-US" sz="2800" dirty="0"/>
+          </a:p>
+          <a:p>
+            <a:pPr marL="342900" indent="-342900">
+              <a:buAutoNum type="arabicParenR"/>
+            </a:pPr>
+            <a:r>
+              <a:rPr lang="en-US" sz="2800" dirty="0" smtClean="0"/>
+              <a:t>User must be logged in</a:t>
+            </a:r>
+            <a:br>
+              <a:rPr lang="en-US" sz="2800" dirty="0" smtClean="0"/>
+            </a:br>
+            <a:endParaRPr lang="en-US" sz="2800" dirty="0" smtClean="0"/>
+          </a:p>
+          <a:p>
+            <a:pPr marL="342900" indent="-342900">
+              <a:buAutoNum type="arabicParenR"/>
+            </a:pPr>
+            <a:r>
+              <a:rPr lang="en-US" sz="2800" dirty="0" smtClean="0"/>
+              <a:t>Users with the "Manage Orders" permission see all Orders</a:t>
+            </a:r>
+            <a:br>
+              <a:rPr lang="en-US" sz="2800" dirty="0" smtClean="0"/>
+            </a:br>
+            <a:endParaRPr lang="en-US" sz="2800" dirty="0" smtClean="0"/>
+          </a:p>
+          <a:p>
+            <a:pPr marL="342900" indent="-342900">
+              <a:buAutoNum type="arabicParenR"/>
+            </a:pPr>
+            <a:r>
+              <a:rPr lang="en-US" sz="2800" dirty="0" smtClean="0"/>
+              <a:t>Everyone else sees only their own Orders</a:t>
+            </a:r>
+            <a:endParaRPr lang="en-US" sz="2800" dirty="0"/>
+          </a:p>
+        </p:txBody>
+      </p:sp>
     </p:spTree>
     <p:extLst>
       <p:ext uri="{BB962C8B-B14F-4D97-AF65-F5344CB8AC3E}">
-        <p14:creationId xmlns:p14="http://schemas.microsoft.com/office/powerpoint/2010/main" val="197551360"/>
+        <p14:creationId xmlns:p14="http://schemas.microsoft.com/office/powerpoint/2010/main" val="3081783614"/>
       </p:ext>
     </p:extLst>
   </p:cSld>
@@ -6087,7 +6967,7 @@
       </p:sp>
       <p:pic>
         <p:nvPicPr>
-          <p:cNvPr id="6" name="Picture 5"/>
+          <p:cNvPr id="5" name="Picture 4"/>
           <p:cNvPicPr>
             <a:picLocks noChangeAspect="1"/>
           </p:cNvPicPr>
@@ -6101,8 +6981,8 @@
         </p:blipFill>
         <p:spPr>
           <a:xfrm>
-            <a:off x="838200" y="1933777"/>
-            <a:ext cx="10515600" cy="4474906"/>
+            <a:off x="838200" y="1690688"/>
+            <a:ext cx="10438157" cy="5064073"/>
           </a:xfrm>
           <a:prstGeom prst="rect">
             <a:avLst/>
@@ -6111,7 +6991,7 @@
       </p:pic>
       <p:pic>
         <p:nvPicPr>
-          <p:cNvPr id="5" name="Picture 4"/>
+          <p:cNvPr id="8" name="Picture 7"/>
           <p:cNvPicPr>
             <a:picLocks noChangeAspect="1"/>
           </p:cNvPicPr>
@@ -6125,18 +7005,86 @@
         </p:blipFill>
         <p:spPr>
           <a:xfrm rot="5400000">
-            <a:off x="7629748" y="3020326"/>
-            <a:ext cx="4810602" cy="2637505"/>
+            <a:off x="4947385" y="337963"/>
+            <a:ext cx="4810602" cy="8002231"/>
           </a:xfrm>
           <a:prstGeom prst="rect">
             <a:avLst/>
           </a:prstGeom>
         </p:spPr>
       </p:pic>
+      <p:sp>
+        <p:nvSpPr>
+          <p:cNvPr id="4" name="TextBox 3"/>
+          <p:cNvSpPr txBox="1"/>
+          <p:nvPr/>
+        </p:nvSpPr>
+        <p:spPr>
+          <a:xfrm>
+            <a:off x="3628103" y="2418734"/>
+            <a:ext cx="7648254" cy="3539430"/>
+          </a:xfrm>
+          <a:prstGeom prst="rect">
+            <a:avLst/>
+          </a:prstGeom>
+          <a:noFill/>
+        </p:spPr>
+        <p:txBody>
+          <a:bodyPr wrap="square" rtlCol="0">
+            <a:spAutoFit/>
+          </a:bodyPr>
+          <a:lstStyle/>
+          <a:p>
+            <a:r>
+              <a:rPr lang="en-US" sz="2800" dirty="0" smtClean="0"/>
+              <a:t>Security Requirements:</a:t>
+            </a:r>
+          </a:p>
+          <a:p>
+            <a:endParaRPr lang="en-US" sz="2800" dirty="0"/>
+          </a:p>
+          <a:p>
+            <a:pPr marL="342900" indent="-342900">
+              <a:buAutoNum type="arabicParenR"/>
+            </a:pPr>
+            <a:r>
+              <a:rPr lang="en-US" sz="2800" dirty="0" smtClean="0"/>
+              <a:t>User must be logged in</a:t>
+            </a:r>
+            <a:br>
+              <a:rPr lang="en-US" sz="2800" dirty="0" smtClean="0"/>
+            </a:br>
+            <a:endParaRPr lang="en-US" sz="2800" dirty="0" smtClean="0"/>
+          </a:p>
+          <a:p>
+            <a:pPr marL="342900" indent="-342900">
+              <a:buAutoNum type="arabicParenR"/>
+            </a:pPr>
+            <a:r>
+              <a:rPr lang="en-US" sz="2800" dirty="0" smtClean="0"/>
+              <a:t>Users with the "Manage Orders" permission see all Orders</a:t>
+            </a:r>
+            <a:br>
+              <a:rPr lang="en-US" sz="2800" dirty="0" smtClean="0"/>
+            </a:br>
+            <a:endParaRPr lang="en-US" sz="2800" dirty="0" smtClean="0"/>
+          </a:p>
+          <a:p>
+            <a:pPr marL="342900" indent="-342900">
+              <a:buAutoNum type="arabicParenR"/>
+            </a:pPr>
+            <a:r>
+              <a:rPr lang="en-US" sz="2800" dirty="0" smtClean="0"/>
+              <a:t>Everyone else sees only their own Orders</a:t>
+            </a:r>
+            <a:endParaRPr lang="en-US" sz="2800" dirty="0"/>
+          </a:p>
+        </p:txBody>
+      </p:sp>
     </p:spTree>
     <p:extLst>
       <p:ext uri="{BB962C8B-B14F-4D97-AF65-F5344CB8AC3E}">
-        <p14:creationId xmlns:p14="http://schemas.microsoft.com/office/powerpoint/2010/main" val="136631790"/>
+        <p14:creationId xmlns:p14="http://schemas.microsoft.com/office/powerpoint/2010/main" val="692729472"/>
       </p:ext>
     </p:extLst>
   </p:cSld>
@@ -6238,7 +7186,7 @@
       </p:sp>
       <p:pic>
         <p:nvPicPr>
-          <p:cNvPr id="6" name="Picture 5"/>
+          <p:cNvPr id="5" name="Picture 4"/>
           <p:cNvPicPr>
             <a:picLocks noChangeAspect="1"/>
           </p:cNvPicPr>
@@ -6252,8 +7200,32 @@
         </p:blipFill>
         <p:spPr>
           <a:xfrm>
-            <a:off x="838200" y="1933777"/>
-            <a:ext cx="10515600" cy="4474906"/>
+            <a:off x="838200" y="1690688"/>
+            <a:ext cx="10438157" cy="5064073"/>
+          </a:xfrm>
+          <a:prstGeom prst="rect">
+            <a:avLst/>
+          </a:prstGeom>
+        </p:spPr>
+      </p:pic>
+      <p:pic>
+        <p:nvPicPr>
+          <p:cNvPr id="8" name="Picture 7"/>
+          <p:cNvPicPr>
+            <a:picLocks noChangeAspect="1"/>
+          </p:cNvPicPr>
+          <p:nvPr/>
+        </p:nvPicPr>
+        <p:blipFill>
+          <a:blip r:embed="rId4"/>
+          <a:stretch>
+            <a:fillRect/>
+          </a:stretch>
+        </p:blipFill>
+        <p:spPr>
+          <a:xfrm rot="5400000">
+            <a:off x="6295019" y="1685597"/>
+            <a:ext cx="4810602" cy="5306963"/>
           </a:xfrm>
           <a:prstGeom prst="rect">
             <a:avLst/>
@@ -6263,7 +7235,7 @@
     </p:spTree>
     <p:extLst>
       <p:ext uri="{BB962C8B-B14F-4D97-AF65-F5344CB8AC3E}">
-        <p14:creationId xmlns:p14="http://schemas.microsoft.com/office/powerpoint/2010/main" val="3788007878"/>
+        <p14:creationId xmlns:p14="http://schemas.microsoft.com/office/powerpoint/2010/main" val="109850210"/>
       </p:ext>
     </p:extLst>
   </p:cSld>

</xml_diff>

<commit_message>
Added narrative for anti-CSRF
</commit_message>
<xml_diff>
--- a/Secure Systems - CodeMash 2017.pptx
+++ b/Secure Systems - CodeMash 2017.pptx
@@ -5,7 +5,7 @@
     <p:sldMasterId id="2147483749" r:id="rId1"/>
   </p:sldMasterIdLst>
   <p:notesMasterIdLst>
-    <p:notesMasterId r:id="rId29"/>
+    <p:notesMasterId r:id="rId39"/>
   </p:notesMasterIdLst>
   <p:sldIdLst>
     <p:sldId id="395" r:id="rId2"/>
@@ -21,20 +21,30 @@
     <p:sldId id="494" r:id="rId12"/>
     <p:sldId id="498" r:id="rId13"/>
     <p:sldId id="496" r:id="rId14"/>
-    <p:sldId id="499" r:id="rId15"/>
-    <p:sldId id="484" r:id="rId16"/>
-    <p:sldId id="504" r:id="rId17"/>
-    <p:sldId id="485" r:id="rId18"/>
-    <p:sldId id="500" r:id="rId19"/>
-    <p:sldId id="501" r:id="rId20"/>
-    <p:sldId id="509" r:id="rId21"/>
-    <p:sldId id="502" r:id="rId22"/>
-    <p:sldId id="503" r:id="rId23"/>
-    <p:sldId id="505" r:id="rId24"/>
-    <p:sldId id="507" r:id="rId25"/>
-    <p:sldId id="506" r:id="rId26"/>
-    <p:sldId id="508" r:id="rId27"/>
-    <p:sldId id="443" r:id="rId28"/>
+    <p:sldId id="510" r:id="rId15"/>
+    <p:sldId id="511" r:id="rId16"/>
+    <p:sldId id="512" r:id="rId17"/>
+    <p:sldId id="515" r:id="rId18"/>
+    <p:sldId id="516" r:id="rId19"/>
+    <p:sldId id="517" r:id="rId20"/>
+    <p:sldId id="518" r:id="rId21"/>
+    <p:sldId id="499" r:id="rId22"/>
+    <p:sldId id="506" r:id="rId23"/>
+    <p:sldId id="519" r:id="rId24"/>
+    <p:sldId id="521" r:id="rId25"/>
+    <p:sldId id="522" r:id="rId26"/>
+    <p:sldId id="523" r:id="rId27"/>
+    <p:sldId id="520" r:id="rId28"/>
+    <p:sldId id="504" r:id="rId29"/>
+    <p:sldId id="485" r:id="rId30"/>
+    <p:sldId id="500" r:id="rId31"/>
+    <p:sldId id="501" r:id="rId32"/>
+    <p:sldId id="509" r:id="rId33"/>
+    <p:sldId id="502" r:id="rId34"/>
+    <p:sldId id="503" r:id="rId35"/>
+    <p:sldId id="505" r:id="rId36"/>
+    <p:sldId id="507" r:id="rId37"/>
+    <p:sldId id="443" r:id="rId38"/>
   </p:sldIdLst>
   <p:sldSz cx="12192000" cy="6858000"/>
   <p:notesSz cx="6858000" cy="9144000"/>
@@ -234,7 +244,7 @@
           <a:p>
             <a:fld id="{C54A4886-B4AF-42F7-97BE-95CDF82A73E3}" type="datetimeFigureOut">
               <a:rPr lang="en-US" smtClean="0"/>
-              <a:t>12/21/2016</a:t>
+              <a:t>12/22/2016</a:t>
             </a:fld>
             <a:endParaRPr lang="en-US"/>
           </a:p>
@@ -974,32 +984,7 @@
           <a:bodyPr/>
           <a:lstStyle/>
           <a:p>
-            <a:pPr marL="0" marR="0" indent="0" algn="l" defTabSz="914400" rtl="0" eaLnBrk="1" fontAlgn="auto" latinLnBrk="0" hangingPunct="1">
-              <a:lnSpc>
-                <a:spcPct val="100000"/>
-              </a:lnSpc>
-              <a:spcBef>
-                <a:spcPts val="0"/>
-              </a:spcBef>
-              <a:spcAft>
-                <a:spcPts val="0"/>
-              </a:spcAft>
-              <a:buClrTx/>
-              <a:buSzTx/>
-              <a:buFontTx/>
-              <a:buNone/>
-              <a:tabLst/>
-              <a:defRPr/>
-            </a:pPr>
-            <a:endParaRPr lang="en-US" sz="1200" kern="1200" dirty="0" smtClean="0">
-              <a:solidFill>
-                <a:schemeClr val="tx1"/>
-              </a:solidFill>
-              <a:effectLst/>
-              <a:latin typeface="+mn-lt"/>
-              <a:ea typeface="+mn-ea"/>
-              <a:cs typeface="+mn-cs"/>
-            </a:endParaRPr>
+            <a:endParaRPr lang="en-US" b="0" dirty="0" smtClean="0"/>
           </a:p>
         </p:txBody>
       </p:sp>
@@ -1029,7 +1014,7 @@
     </p:spTree>
     <p:extLst>
       <p:ext uri="{BB962C8B-B14F-4D97-AF65-F5344CB8AC3E}">
-        <p14:creationId xmlns:p14="http://schemas.microsoft.com/office/powerpoint/2010/main" val="2181037172"/>
+        <p14:creationId xmlns:p14="http://schemas.microsoft.com/office/powerpoint/2010/main" val="3097194813"/>
       </p:ext>
     </p:extLst>
   </p:cSld>
@@ -1113,7 +1098,7 @@
     </p:spTree>
     <p:extLst>
       <p:ext uri="{BB962C8B-B14F-4D97-AF65-F5344CB8AC3E}">
-        <p14:creationId xmlns:p14="http://schemas.microsoft.com/office/powerpoint/2010/main" val="4212963282"/>
+        <p14:creationId xmlns:p14="http://schemas.microsoft.com/office/powerpoint/2010/main" val="3114178305"/>
       </p:ext>
     </p:extLst>
   </p:cSld>
@@ -1197,7 +1182,7 @@
     </p:spTree>
     <p:extLst>
       <p:ext uri="{BB962C8B-B14F-4D97-AF65-F5344CB8AC3E}">
-        <p14:creationId xmlns:p14="http://schemas.microsoft.com/office/powerpoint/2010/main" val="2602777311"/>
+        <p14:creationId xmlns:p14="http://schemas.microsoft.com/office/powerpoint/2010/main" val="2521239552"/>
       </p:ext>
     </p:extLst>
   </p:cSld>
@@ -1281,7 +1266,7 @@
     </p:spTree>
     <p:extLst>
       <p:ext uri="{BB962C8B-B14F-4D97-AF65-F5344CB8AC3E}">
-        <p14:creationId xmlns:p14="http://schemas.microsoft.com/office/powerpoint/2010/main" val="2267138517"/>
+        <p14:creationId xmlns:p14="http://schemas.microsoft.com/office/powerpoint/2010/main" val="2447444500"/>
       </p:ext>
     </p:extLst>
   </p:cSld>
@@ -1365,7 +1350,7 @@
     </p:spTree>
     <p:extLst>
       <p:ext uri="{BB962C8B-B14F-4D97-AF65-F5344CB8AC3E}">
-        <p14:creationId xmlns:p14="http://schemas.microsoft.com/office/powerpoint/2010/main" val="1561525116"/>
+        <p14:creationId xmlns:p14="http://schemas.microsoft.com/office/powerpoint/2010/main" val="2539089675"/>
       </p:ext>
     </p:extLst>
   </p:cSld>
@@ -1449,7 +1434,7 @@
     </p:spTree>
     <p:extLst>
       <p:ext uri="{BB962C8B-B14F-4D97-AF65-F5344CB8AC3E}">
-        <p14:creationId xmlns:p14="http://schemas.microsoft.com/office/powerpoint/2010/main" val="3344468672"/>
+        <p14:creationId xmlns:p14="http://schemas.microsoft.com/office/powerpoint/2010/main" val="2881080776"/>
       </p:ext>
     </p:extLst>
   </p:cSld>
@@ -1642,7 +1627,7 @@
     </p:spTree>
     <p:extLst>
       <p:ext uri="{BB962C8B-B14F-4D97-AF65-F5344CB8AC3E}">
-        <p14:creationId xmlns:p14="http://schemas.microsoft.com/office/powerpoint/2010/main" val="2502330197"/>
+        <p14:creationId xmlns:p14="http://schemas.microsoft.com/office/powerpoint/2010/main" val="1916901341"/>
       </p:ext>
     </p:extLst>
   </p:cSld>
@@ -1696,7 +1681,32 @@
           <a:bodyPr/>
           <a:lstStyle/>
           <a:p>
-            <a:endParaRPr lang="en-US" b="0" dirty="0" smtClean="0"/>
+            <a:pPr marL="0" marR="0" indent="0" algn="l" defTabSz="914400" rtl="0" eaLnBrk="1" fontAlgn="auto" latinLnBrk="0" hangingPunct="1">
+              <a:lnSpc>
+                <a:spcPct val="100000"/>
+              </a:lnSpc>
+              <a:spcBef>
+                <a:spcPts val="0"/>
+              </a:spcBef>
+              <a:spcAft>
+                <a:spcPts val="0"/>
+              </a:spcAft>
+              <a:buClrTx/>
+              <a:buSzTx/>
+              <a:buFontTx/>
+              <a:buNone/>
+              <a:tabLst/>
+              <a:defRPr/>
+            </a:pPr>
+            <a:endParaRPr lang="en-US" sz="1200" kern="1200" dirty="0" smtClean="0">
+              <a:solidFill>
+                <a:schemeClr val="tx1"/>
+              </a:solidFill>
+              <a:effectLst/>
+              <a:latin typeface="+mn-lt"/>
+              <a:ea typeface="+mn-ea"/>
+              <a:cs typeface="+mn-cs"/>
+            </a:endParaRPr>
           </a:p>
         </p:txBody>
       </p:sp>
@@ -1726,7 +1736,7 @@
     </p:spTree>
     <p:extLst>
       <p:ext uri="{BB962C8B-B14F-4D97-AF65-F5344CB8AC3E}">
-        <p14:creationId xmlns:p14="http://schemas.microsoft.com/office/powerpoint/2010/main" val="3450469856"/>
+        <p14:creationId xmlns:p14="http://schemas.microsoft.com/office/powerpoint/2010/main" val="2181037172"/>
       </p:ext>
     </p:extLst>
   </p:cSld>
@@ -1810,7 +1820,7 @@
     </p:spTree>
     <p:extLst>
       <p:ext uri="{BB962C8B-B14F-4D97-AF65-F5344CB8AC3E}">
-        <p14:creationId xmlns:p14="http://schemas.microsoft.com/office/powerpoint/2010/main" val="2647091800"/>
+        <p14:creationId xmlns:p14="http://schemas.microsoft.com/office/powerpoint/2010/main" val="3766878569"/>
       </p:ext>
     </p:extLst>
   </p:cSld>
@@ -1894,7 +1904,7 @@
     </p:spTree>
     <p:extLst>
       <p:ext uri="{BB962C8B-B14F-4D97-AF65-F5344CB8AC3E}">
-        <p14:creationId xmlns:p14="http://schemas.microsoft.com/office/powerpoint/2010/main" val="2653332077"/>
+        <p14:creationId xmlns:p14="http://schemas.microsoft.com/office/powerpoint/2010/main" val="1777663287"/>
       </p:ext>
     </p:extLst>
   </p:cSld>
@@ -1978,7 +1988,7 @@
     </p:spTree>
     <p:extLst>
       <p:ext uri="{BB962C8B-B14F-4D97-AF65-F5344CB8AC3E}">
-        <p14:creationId xmlns:p14="http://schemas.microsoft.com/office/powerpoint/2010/main" val="3271057564"/>
+        <p14:creationId xmlns:p14="http://schemas.microsoft.com/office/powerpoint/2010/main" val="1266200327"/>
       </p:ext>
     </p:extLst>
   </p:cSld>
@@ -2062,7 +2072,7 @@
     </p:spTree>
     <p:extLst>
       <p:ext uri="{BB962C8B-B14F-4D97-AF65-F5344CB8AC3E}">
-        <p14:creationId xmlns:p14="http://schemas.microsoft.com/office/powerpoint/2010/main" val="3766878569"/>
+        <p14:creationId xmlns:p14="http://schemas.microsoft.com/office/powerpoint/2010/main" val="3516029556"/>
       </p:ext>
     </p:extLst>
   </p:cSld>
@@ -2146,7 +2156,7 @@
     </p:spTree>
     <p:extLst>
       <p:ext uri="{BB962C8B-B14F-4D97-AF65-F5344CB8AC3E}">
-        <p14:creationId xmlns:p14="http://schemas.microsoft.com/office/powerpoint/2010/main" val="3504203797"/>
+        <p14:creationId xmlns:p14="http://schemas.microsoft.com/office/powerpoint/2010/main" val="2712589128"/>
       </p:ext>
     </p:extLst>
   </p:cSld>
@@ -2200,15 +2210,7 @@
           <a:bodyPr/>
           <a:lstStyle/>
           <a:p>
-            <a:endParaRPr lang="en-US" sz="1200" kern="1200" dirty="0" smtClean="0">
-              <a:solidFill>
-                <a:schemeClr val="tx1"/>
-              </a:solidFill>
-              <a:effectLst/>
-              <a:latin typeface="+mn-lt"/>
-              <a:ea typeface="+mn-ea"/>
-              <a:cs typeface="+mn-cs"/>
-            </a:endParaRPr>
+            <a:endParaRPr lang="en-US" b="0" dirty="0" smtClean="0"/>
           </a:p>
         </p:txBody>
       </p:sp>
@@ -2238,7 +2240,175 @@
     </p:spTree>
     <p:extLst>
       <p:ext uri="{BB962C8B-B14F-4D97-AF65-F5344CB8AC3E}">
-        <p14:creationId xmlns:p14="http://schemas.microsoft.com/office/powerpoint/2010/main" val="2813022412"/>
+        <p14:creationId xmlns:p14="http://schemas.microsoft.com/office/powerpoint/2010/main" val="1609105756"/>
+      </p:ext>
+    </p:extLst>
+  </p:cSld>
+  <p:clrMapOvr>
+    <a:masterClrMapping/>
+  </p:clrMapOvr>
+</p:notes>
+</file>
+
+<file path=ppt/notesSlides/notesSlide28.xml><?xml version="1.0" encoding="utf-8"?>
+<p:notes xmlns:a="http://schemas.openxmlformats.org/drawingml/2006/main" xmlns:r="http://schemas.openxmlformats.org/officeDocument/2006/relationships" xmlns:p="http://schemas.openxmlformats.org/presentationml/2006/main">
+  <p:cSld>
+    <p:spTree>
+      <p:nvGrpSpPr>
+        <p:cNvPr id="1" name=""/>
+        <p:cNvGrpSpPr/>
+        <p:nvPr/>
+      </p:nvGrpSpPr>
+      <p:grpSpPr>
+        <a:xfrm>
+          <a:off x="0" y="0"/>
+          <a:ext cx="0" cy="0"/>
+          <a:chOff x="0" y="0"/>
+          <a:chExt cx="0" cy="0"/>
+        </a:xfrm>
+      </p:grpSpPr>
+      <p:sp>
+        <p:nvSpPr>
+          <p:cNvPr id="2" name="Slide Image Placeholder 1"/>
+          <p:cNvSpPr>
+            <a:spLocks noGrp="1" noRot="1" noChangeAspect="1"/>
+          </p:cNvSpPr>
+          <p:nvPr>
+            <p:ph type="sldImg"/>
+          </p:nvPr>
+        </p:nvSpPr>
+        <p:spPr/>
+      </p:sp>
+      <p:sp>
+        <p:nvSpPr>
+          <p:cNvPr id="3" name="Notes Placeholder 2"/>
+          <p:cNvSpPr>
+            <a:spLocks noGrp="1"/>
+          </p:cNvSpPr>
+          <p:nvPr>
+            <p:ph type="body" idx="1"/>
+          </p:nvPr>
+        </p:nvSpPr>
+        <p:spPr/>
+        <p:txBody>
+          <a:bodyPr/>
+          <a:lstStyle/>
+          <a:p>
+            <a:endParaRPr lang="en-US" b="0" dirty="0" smtClean="0"/>
+          </a:p>
+        </p:txBody>
+      </p:sp>
+      <p:sp>
+        <p:nvSpPr>
+          <p:cNvPr id="4" name="Slide Number Placeholder 3"/>
+          <p:cNvSpPr>
+            <a:spLocks noGrp="1"/>
+          </p:cNvSpPr>
+          <p:nvPr>
+            <p:ph type="sldNum" sz="quarter" idx="10"/>
+          </p:nvPr>
+        </p:nvSpPr>
+        <p:spPr/>
+        <p:txBody>
+          <a:bodyPr/>
+          <a:lstStyle/>
+          <a:p>
+            <a:fld id="{89029652-62E7-43D6-83B5-097D7B7AA5D8}" type="slidenum">
+              <a:rPr lang="en-US" smtClean="0"/>
+              <a:t>28</a:t>
+            </a:fld>
+            <a:endParaRPr lang="en-US"/>
+          </a:p>
+        </p:txBody>
+      </p:sp>
+    </p:spTree>
+    <p:extLst>
+      <p:ext uri="{BB962C8B-B14F-4D97-AF65-F5344CB8AC3E}">
+        <p14:creationId xmlns:p14="http://schemas.microsoft.com/office/powerpoint/2010/main" val="2602777311"/>
+      </p:ext>
+    </p:extLst>
+  </p:cSld>
+  <p:clrMapOvr>
+    <a:masterClrMapping/>
+  </p:clrMapOvr>
+</p:notes>
+</file>
+
+<file path=ppt/notesSlides/notesSlide29.xml><?xml version="1.0" encoding="utf-8"?>
+<p:notes xmlns:a="http://schemas.openxmlformats.org/drawingml/2006/main" xmlns:r="http://schemas.openxmlformats.org/officeDocument/2006/relationships" xmlns:p="http://schemas.openxmlformats.org/presentationml/2006/main">
+  <p:cSld>
+    <p:spTree>
+      <p:nvGrpSpPr>
+        <p:cNvPr id="1" name=""/>
+        <p:cNvGrpSpPr/>
+        <p:nvPr/>
+      </p:nvGrpSpPr>
+      <p:grpSpPr>
+        <a:xfrm>
+          <a:off x="0" y="0"/>
+          <a:ext cx="0" cy="0"/>
+          <a:chOff x="0" y="0"/>
+          <a:chExt cx="0" cy="0"/>
+        </a:xfrm>
+      </p:grpSpPr>
+      <p:sp>
+        <p:nvSpPr>
+          <p:cNvPr id="2" name="Slide Image Placeholder 1"/>
+          <p:cNvSpPr>
+            <a:spLocks noGrp="1" noRot="1" noChangeAspect="1"/>
+          </p:cNvSpPr>
+          <p:nvPr>
+            <p:ph type="sldImg"/>
+          </p:nvPr>
+        </p:nvSpPr>
+        <p:spPr/>
+      </p:sp>
+      <p:sp>
+        <p:nvSpPr>
+          <p:cNvPr id="3" name="Notes Placeholder 2"/>
+          <p:cNvSpPr>
+            <a:spLocks noGrp="1"/>
+          </p:cNvSpPr>
+          <p:nvPr>
+            <p:ph type="body" idx="1"/>
+          </p:nvPr>
+        </p:nvSpPr>
+        <p:spPr/>
+        <p:txBody>
+          <a:bodyPr/>
+          <a:lstStyle/>
+          <a:p>
+            <a:endParaRPr lang="en-US" b="0" dirty="0" smtClean="0"/>
+          </a:p>
+        </p:txBody>
+      </p:sp>
+      <p:sp>
+        <p:nvSpPr>
+          <p:cNvPr id="4" name="Slide Number Placeholder 3"/>
+          <p:cNvSpPr>
+            <a:spLocks noGrp="1"/>
+          </p:cNvSpPr>
+          <p:nvPr>
+            <p:ph type="sldNum" sz="quarter" idx="10"/>
+          </p:nvPr>
+        </p:nvSpPr>
+        <p:spPr/>
+        <p:txBody>
+          <a:bodyPr/>
+          <a:lstStyle/>
+          <a:p>
+            <a:fld id="{89029652-62E7-43D6-83B5-097D7B7AA5D8}" type="slidenum">
+              <a:rPr lang="en-US" smtClean="0"/>
+              <a:t>29</a:t>
+            </a:fld>
+            <a:endParaRPr lang="en-US"/>
+          </a:p>
+        </p:txBody>
+      </p:sp>
+    </p:spTree>
+    <p:extLst>
+      <p:ext uri="{BB962C8B-B14F-4D97-AF65-F5344CB8AC3E}">
+        <p14:creationId xmlns:p14="http://schemas.microsoft.com/office/powerpoint/2010/main" val="2267138517"/>
       </p:ext>
     </p:extLst>
   </p:cSld>
@@ -2348,6 +2518,686 @@
     <p:extLst>
       <p:ext uri="{BB962C8B-B14F-4D97-AF65-F5344CB8AC3E}">
         <p14:creationId xmlns:p14="http://schemas.microsoft.com/office/powerpoint/2010/main" val="2480999007"/>
+      </p:ext>
+    </p:extLst>
+  </p:cSld>
+  <p:clrMapOvr>
+    <a:masterClrMapping/>
+  </p:clrMapOvr>
+</p:notes>
+</file>
+
+<file path=ppt/notesSlides/notesSlide30.xml><?xml version="1.0" encoding="utf-8"?>
+<p:notes xmlns:a="http://schemas.openxmlformats.org/drawingml/2006/main" xmlns:r="http://schemas.openxmlformats.org/officeDocument/2006/relationships" xmlns:p="http://schemas.openxmlformats.org/presentationml/2006/main">
+  <p:cSld>
+    <p:spTree>
+      <p:nvGrpSpPr>
+        <p:cNvPr id="1" name=""/>
+        <p:cNvGrpSpPr/>
+        <p:nvPr/>
+      </p:nvGrpSpPr>
+      <p:grpSpPr>
+        <a:xfrm>
+          <a:off x="0" y="0"/>
+          <a:ext cx="0" cy="0"/>
+          <a:chOff x="0" y="0"/>
+          <a:chExt cx="0" cy="0"/>
+        </a:xfrm>
+      </p:grpSpPr>
+      <p:sp>
+        <p:nvSpPr>
+          <p:cNvPr id="2" name="Slide Image Placeholder 1"/>
+          <p:cNvSpPr>
+            <a:spLocks noGrp="1" noRot="1" noChangeAspect="1"/>
+          </p:cNvSpPr>
+          <p:nvPr>
+            <p:ph type="sldImg"/>
+          </p:nvPr>
+        </p:nvSpPr>
+        <p:spPr/>
+      </p:sp>
+      <p:sp>
+        <p:nvSpPr>
+          <p:cNvPr id="3" name="Notes Placeholder 2"/>
+          <p:cNvSpPr>
+            <a:spLocks noGrp="1"/>
+          </p:cNvSpPr>
+          <p:nvPr>
+            <p:ph type="body" idx="1"/>
+          </p:nvPr>
+        </p:nvSpPr>
+        <p:spPr/>
+        <p:txBody>
+          <a:bodyPr/>
+          <a:lstStyle/>
+          <a:p>
+            <a:endParaRPr lang="en-US" b="0" dirty="0" smtClean="0"/>
+          </a:p>
+        </p:txBody>
+      </p:sp>
+      <p:sp>
+        <p:nvSpPr>
+          <p:cNvPr id="4" name="Slide Number Placeholder 3"/>
+          <p:cNvSpPr>
+            <a:spLocks noGrp="1"/>
+          </p:cNvSpPr>
+          <p:nvPr>
+            <p:ph type="sldNum" sz="quarter" idx="10"/>
+          </p:nvPr>
+        </p:nvSpPr>
+        <p:spPr/>
+        <p:txBody>
+          <a:bodyPr/>
+          <a:lstStyle/>
+          <a:p>
+            <a:fld id="{89029652-62E7-43D6-83B5-097D7B7AA5D8}" type="slidenum">
+              <a:rPr lang="en-US" smtClean="0"/>
+              <a:t>30</a:t>
+            </a:fld>
+            <a:endParaRPr lang="en-US"/>
+          </a:p>
+        </p:txBody>
+      </p:sp>
+    </p:spTree>
+    <p:extLst>
+      <p:ext uri="{BB962C8B-B14F-4D97-AF65-F5344CB8AC3E}">
+        <p14:creationId xmlns:p14="http://schemas.microsoft.com/office/powerpoint/2010/main" val="1561525116"/>
+      </p:ext>
+    </p:extLst>
+  </p:cSld>
+  <p:clrMapOvr>
+    <a:masterClrMapping/>
+  </p:clrMapOvr>
+</p:notes>
+</file>
+
+<file path=ppt/notesSlides/notesSlide31.xml><?xml version="1.0" encoding="utf-8"?>
+<p:notes xmlns:a="http://schemas.openxmlformats.org/drawingml/2006/main" xmlns:r="http://schemas.openxmlformats.org/officeDocument/2006/relationships" xmlns:p="http://schemas.openxmlformats.org/presentationml/2006/main">
+  <p:cSld>
+    <p:spTree>
+      <p:nvGrpSpPr>
+        <p:cNvPr id="1" name=""/>
+        <p:cNvGrpSpPr/>
+        <p:nvPr/>
+      </p:nvGrpSpPr>
+      <p:grpSpPr>
+        <a:xfrm>
+          <a:off x="0" y="0"/>
+          <a:ext cx="0" cy="0"/>
+          <a:chOff x="0" y="0"/>
+          <a:chExt cx="0" cy="0"/>
+        </a:xfrm>
+      </p:grpSpPr>
+      <p:sp>
+        <p:nvSpPr>
+          <p:cNvPr id="2" name="Slide Image Placeholder 1"/>
+          <p:cNvSpPr>
+            <a:spLocks noGrp="1" noRot="1" noChangeAspect="1"/>
+          </p:cNvSpPr>
+          <p:nvPr>
+            <p:ph type="sldImg"/>
+          </p:nvPr>
+        </p:nvSpPr>
+        <p:spPr/>
+      </p:sp>
+      <p:sp>
+        <p:nvSpPr>
+          <p:cNvPr id="3" name="Notes Placeholder 2"/>
+          <p:cNvSpPr>
+            <a:spLocks noGrp="1"/>
+          </p:cNvSpPr>
+          <p:nvPr>
+            <p:ph type="body" idx="1"/>
+          </p:nvPr>
+        </p:nvSpPr>
+        <p:spPr/>
+        <p:txBody>
+          <a:bodyPr/>
+          <a:lstStyle/>
+          <a:p>
+            <a:endParaRPr lang="en-US" b="0" dirty="0" smtClean="0"/>
+          </a:p>
+        </p:txBody>
+      </p:sp>
+      <p:sp>
+        <p:nvSpPr>
+          <p:cNvPr id="4" name="Slide Number Placeholder 3"/>
+          <p:cNvSpPr>
+            <a:spLocks noGrp="1"/>
+          </p:cNvSpPr>
+          <p:nvPr>
+            <p:ph type="sldNum" sz="quarter" idx="10"/>
+          </p:nvPr>
+        </p:nvSpPr>
+        <p:spPr/>
+        <p:txBody>
+          <a:bodyPr/>
+          <a:lstStyle/>
+          <a:p>
+            <a:fld id="{89029652-62E7-43D6-83B5-097D7B7AA5D8}" type="slidenum">
+              <a:rPr lang="en-US" smtClean="0"/>
+              <a:t>31</a:t>
+            </a:fld>
+            <a:endParaRPr lang="en-US"/>
+          </a:p>
+        </p:txBody>
+      </p:sp>
+    </p:spTree>
+    <p:extLst>
+      <p:ext uri="{BB962C8B-B14F-4D97-AF65-F5344CB8AC3E}">
+        <p14:creationId xmlns:p14="http://schemas.microsoft.com/office/powerpoint/2010/main" val="3344468672"/>
+      </p:ext>
+    </p:extLst>
+  </p:cSld>
+  <p:clrMapOvr>
+    <a:masterClrMapping/>
+  </p:clrMapOvr>
+</p:notes>
+</file>
+
+<file path=ppt/notesSlides/notesSlide32.xml><?xml version="1.0" encoding="utf-8"?>
+<p:notes xmlns:a="http://schemas.openxmlformats.org/drawingml/2006/main" xmlns:r="http://schemas.openxmlformats.org/officeDocument/2006/relationships" xmlns:p="http://schemas.openxmlformats.org/presentationml/2006/main">
+  <p:cSld>
+    <p:spTree>
+      <p:nvGrpSpPr>
+        <p:cNvPr id="1" name=""/>
+        <p:cNvGrpSpPr/>
+        <p:nvPr/>
+      </p:nvGrpSpPr>
+      <p:grpSpPr>
+        <a:xfrm>
+          <a:off x="0" y="0"/>
+          <a:ext cx="0" cy="0"/>
+          <a:chOff x="0" y="0"/>
+          <a:chExt cx="0" cy="0"/>
+        </a:xfrm>
+      </p:grpSpPr>
+      <p:sp>
+        <p:nvSpPr>
+          <p:cNvPr id="2" name="Slide Image Placeholder 1"/>
+          <p:cNvSpPr>
+            <a:spLocks noGrp="1" noRot="1" noChangeAspect="1"/>
+          </p:cNvSpPr>
+          <p:nvPr>
+            <p:ph type="sldImg"/>
+          </p:nvPr>
+        </p:nvSpPr>
+        <p:spPr/>
+      </p:sp>
+      <p:sp>
+        <p:nvSpPr>
+          <p:cNvPr id="3" name="Notes Placeholder 2"/>
+          <p:cNvSpPr>
+            <a:spLocks noGrp="1"/>
+          </p:cNvSpPr>
+          <p:nvPr>
+            <p:ph type="body" idx="1"/>
+          </p:nvPr>
+        </p:nvSpPr>
+        <p:spPr/>
+        <p:txBody>
+          <a:bodyPr/>
+          <a:lstStyle/>
+          <a:p>
+            <a:endParaRPr lang="en-US" b="0" dirty="0" smtClean="0"/>
+          </a:p>
+        </p:txBody>
+      </p:sp>
+      <p:sp>
+        <p:nvSpPr>
+          <p:cNvPr id="4" name="Slide Number Placeholder 3"/>
+          <p:cNvSpPr>
+            <a:spLocks noGrp="1"/>
+          </p:cNvSpPr>
+          <p:nvPr>
+            <p:ph type="sldNum" sz="quarter" idx="10"/>
+          </p:nvPr>
+        </p:nvSpPr>
+        <p:spPr/>
+        <p:txBody>
+          <a:bodyPr/>
+          <a:lstStyle/>
+          <a:p>
+            <a:fld id="{89029652-62E7-43D6-83B5-097D7B7AA5D8}" type="slidenum">
+              <a:rPr lang="en-US" smtClean="0"/>
+              <a:t>32</a:t>
+            </a:fld>
+            <a:endParaRPr lang="en-US"/>
+          </a:p>
+        </p:txBody>
+      </p:sp>
+    </p:spTree>
+    <p:extLst>
+      <p:ext uri="{BB962C8B-B14F-4D97-AF65-F5344CB8AC3E}">
+        <p14:creationId xmlns:p14="http://schemas.microsoft.com/office/powerpoint/2010/main" val="2502330197"/>
+      </p:ext>
+    </p:extLst>
+  </p:cSld>
+  <p:clrMapOvr>
+    <a:masterClrMapping/>
+  </p:clrMapOvr>
+</p:notes>
+</file>
+
+<file path=ppt/notesSlides/notesSlide33.xml><?xml version="1.0" encoding="utf-8"?>
+<p:notes xmlns:a="http://schemas.openxmlformats.org/drawingml/2006/main" xmlns:r="http://schemas.openxmlformats.org/officeDocument/2006/relationships" xmlns:p="http://schemas.openxmlformats.org/presentationml/2006/main">
+  <p:cSld>
+    <p:spTree>
+      <p:nvGrpSpPr>
+        <p:cNvPr id="1" name=""/>
+        <p:cNvGrpSpPr/>
+        <p:nvPr/>
+      </p:nvGrpSpPr>
+      <p:grpSpPr>
+        <a:xfrm>
+          <a:off x="0" y="0"/>
+          <a:ext cx="0" cy="0"/>
+          <a:chOff x="0" y="0"/>
+          <a:chExt cx="0" cy="0"/>
+        </a:xfrm>
+      </p:grpSpPr>
+      <p:sp>
+        <p:nvSpPr>
+          <p:cNvPr id="2" name="Slide Image Placeholder 1"/>
+          <p:cNvSpPr>
+            <a:spLocks noGrp="1" noRot="1" noChangeAspect="1"/>
+          </p:cNvSpPr>
+          <p:nvPr>
+            <p:ph type="sldImg"/>
+          </p:nvPr>
+        </p:nvSpPr>
+        <p:spPr/>
+      </p:sp>
+      <p:sp>
+        <p:nvSpPr>
+          <p:cNvPr id="3" name="Notes Placeholder 2"/>
+          <p:cNvSpPr>
+            <a:spLocks noGrp="1"/>
+          </p:cNvSpPr>
+          <p:nvPr>
+            <p:ph type="body" idx="1"/>
+          </p:nvPr>
+        </p:nvSpPr>
+        <p:spPr/>
+        <p:txBody>
+          <a:bodyPr/>
+          <a:lstStyle/>
+          <a:p>
+            <a:endParaRPr lang="en-US" b="0" dirty="0" smtClean="0"/>
+          </a:p>
+        </p:txBody>
+      </p:sp>
+      <p:sp>
+        <p:nvSpPr>
+          <p:cNvPr id="4" name="Slide Number Placeholder 3"/>
+          <p:cNvSpPr>
+            <a:spLocks noGrp="1"/>
+          </p:cNvSpPr>
+          <p:nvPr>
+            <p:ph type="sldNum" sz="quarter" idx="10"/>
+          </p:nvPr>
+        </p:nvSpPr>
+        <p:spPr/>
+        <p:txBody>
+          <a:bodyPr/>
+          <a:lstStyle/>
+          <a:p>
+            <a:fld id="{89029652-62E7-43D6-83B5-097D7B7AA5D8}" type="slidenum">
+              <a:rPr lang="en-US" smtClean="0"/>
+              <a:t>33</a:t>
+            </a:fld>
+            <a:endParaRPr lang="en-US"/>
+          </a:p>
+        </p:txBody>
+      </p:sp>
+    </p:spTree>
+    <p:extLst>
+      <p:ext uri="{BB962C8B-B14F-4D97-AF65-F5344CB8AC3E}">
+        <p14:creationId xmlns:p14="http://schemas.microsoft.com/office/powerpoint/2010/main" val="3450469856"/>
+      </p:ext>
+    </p:extLst>
+  </p:cSld>
+  <p:clrMapOvr>
+    <a:masterClrMapping/>
+  </p:clrMapOvr>
+</p:notes>
+</file>
+
+<file path=ppt/notesSlides/notesSlide34.xml><?xml version="1.0" encoding="utf-8"?>
+<p:notes xmlns:a="http://schemas.openxmlformats.org/drawingml/2006/main" xmlns:r="http://schemas.openxmlformats.org/officeDocument/2006/relationships" xmlns:p="http://schemas.openxmlformats.org/presentationml/2006/main">
+  <p:cSld>
+    <p:spTree>
+      <p:nvGrpSpPr>
+        <p:cNvPr id="1" name=""/>
+        <p:cNvGrpSpPr/>
+        <p:nvPr/>
+      </p:nvGrpSpPr>
+      <p:grpSpPr>
+        <a:xfrm>
+          <a:off x="0" y="0"/>
+          <a:ext cx="0" cy="0"/>
+          <a:chOff x="0" y="0"/>
+          <a:chExt cx="0" cy="0"/>
+        </a:xfrm>
+      </p:grpSpPr>
+      <p:sp>
+        <p:nvSpPr>
+          <p:cNvPr id="2" name="Slide Image Placeholder 1"/>
+          <p:cNvSpPr>
+            <a:spLocks noGrp="1" noRot="1" noChangeAspect="1"/>
+          </p:cNvSpPr>
+          <p:nvPr>
+            <p:ph type="sldImg"/>
+          </p:nvPr>
+        </p:nvSpPr>
+        <p:spPr/>
+      </p:sp>
+      <p:sp>
+        <p:nvSpPr>
+          <p:cNvPr id="3" name="Notes Placeholder 2"/>
+          <p:cNvSpPr>
+            <a:spLocks noGrp="1"/>
+          </p:cNvSpPr>
+          <p:nvPr>
+            <p:ph type="body" idx="1"/>
+          </p:nvPr>
+        </p:nvSpPr>
+        <p:spPr/>
+        <p:txBody>
+          <a:bodyPr/>
+          <a:lstStyle/>
+          <a:p>
+            <a:endParaRPr lang="en-US" b="0" dirty="0" smtClean="0"/>
+          </a:p>
+        </p:txBody>
+      </p:sp>
+      <p:sp>
+        <p:nvSpPr>
+          <p:cNvPr id="4" name="Slide Number Placeholder 3"/>
+          <p:cNvSpPr>
+            <a:spLocks noGrp="1"/>
+          </p:cNvSpPr>
+          <p:nvPr>
+            <p:ph type="sldNum" sz="quarter" idx="10"/>
+          </p:nvPr>
+        </p:nvSpPr>
+        <p:spPr/>
+        <p:txBody>
+          <a:bodyPr/>
+          <a:lstStyle/>
+          <a:p>
+            <a:fld id="{89029652-62E7-43D6-83B5-097D7B7AA5D8}" type="slidenum">
+              <a:rPr lang="en-US" smtClean="0"/>
+              <a:t>34</a:t>
+            </a:fld>
+            <a:endParaRPr lang="en-US"/>
+          </a:p>
+        </p:txBody>
+      </p:sp>
+    </p:spTree>
+    <p:extLst>
+      <p:ext uri="{BB962C8B-B14F-4D97-AF65-F5344CB8AC3E}">
+        <p14:creationId xmlns:p14="http://schemas.microsoft.com/office/powerpoint/2010/main" val="2647091800"/>
+      </p:ext>
+    </p:extLst>
+  </p:cSld>
+  <p:clrMapOvr>
+    <a:masterClrMapping/>
+  </p:clrMapOvr>
+</p:notes>
+</file>
+
+<file path=ppt/notesSlides/notesSlide35.xml><?xml version="1.0" encoding="utf-8"?>
+<p:notes xmlns:a="http://schemas.openxmlformats.org/drawingml/2006/main" xmlns:r="http://schemas.openxmlformats.org/officeDocument/2006/relationships" xmlns:p="http://schemas.openxmlformats.org/presentationml/2006/main">
+  <p:cSld>
+    <p:spTree>
+      <p:nvGrpSpPr>
+        <p:cNvPr id="1" name=""/>
+        <p:cNvGrpSpPr/>
+        <p:nvPr/>
+      </p:nvGrpSpPr>
+      <p:grpSpPr>
+        <a:xfrm>
+          <a:off x="0" y="0"/>
+          <a:ext cx="0" cy="0"/>
+          <a:chOff x="0" y="0"/>
+          <a:chExt cx="0" cy="0"/>
+        </a:xfrm>
+      </p:grpSpPr>
+      <p:sp>
+        <p:nvSpPr>
+          <p:cNvPr id="2" name="Slide Image Placeholder 1"/>
+          <p:cNvSpPr>
+            <a:spLocks noGrp="1" noRot="1" noChangeAspect="1"/>
+          </p:cNvSpPr>
+          <p:nvPr>
+            <p:ph type="sldImg"/>
+          </p:nvPr>
+        </p:nvSpPr>
+        <p:spPr/>
+      </p:sp>
+      <p:sp>
+        <p:nvSpPr>
+          <p:cNvPr id="3" name="Notes Placeholder 2"/>
+          <p:cNvSpPr>
+            <a:spLocks noGrp="1"/>
+          </p:cNvSpPr>
+          <p:nvPr>
+            <p:ph type="body" idx="1"/>
+          </p:nvPr>
+        </p:nvSpPr>
+        <p:spPr/>
+        <p:txBody>
+          <a:bodyPr/>
+          <a:lstStyle/>
+          <a:p>
+            <a:endParaRPr lang="en-US" b="0" dirty="0" smtClean="0"/>
+          </a:p>
+        </p:txBody>
+      </p:sp>
+      <p:sp>
+        <p:nvSpPr>
+          <p:cNvPr id="4" name="Slide Number Placeholder 3"/>
+          <p:cNvSpPr>
+            <a:spLocks noGrp="1"/>
+          </p:cNvSpPr>
+          <p:nvPr>
+            <p:ph type="sldNum" sz="quarter" idx="10"/>
+          </p:nvPr>
+        </p:nvSpPr>
+        <p:spPr/>
+        <p:txBody>
+          <a:bodyPr/>
+          <a:lstStyle/>
+          <a:p>
+            <a:fld id="{89029652-62E7-43D6-83B5-097D7B7AA5D8}" type="slidenum">
+              <a:rPr lang="en-US" smtClean="0"/>
+              <a:t>35</a:t>
+            </a:fld>
+            <a:endParaRPr lang="en-US"/>
+          </a:p>
+        </p:txBody>
+      </p:sp>
+    </p:spTree>
+    <p:extLst>
+      <p:ext uri="{BB962C8B-B14F-4D97-AF65-F5344CB8AC3E}">
+        <p14:creationId xmlns:p14="http://schemas.microsoft.com/office/powerpoint/2010/main" val="2653332077"/>
+      </p:ext>
+    </p:extLst>
+  </p:cSld>
+  <p:clrMapOvr>
+    <a:masterClrMapping/>
+  </p:clrMapOvr>
+</p:notes>
+</file>
+
+<file path=ppt/notesSlides/notesSlide36.xml><?xml version="1.0" encoding="utf-8"?>
+<p:notes xmlns:a="http://schemas.openxmlformats.org/drawingml/2006/main" xmlns:r="http://schemas.openxmlformats.org/officeDocument/2006/relationships" xmlns:p="http://schemas.openxmlformats.org/presentationml/2006/main">
+  <p:cSld>
+    <p:spTree>
+      <p:nvGrpSpPr>
+        <p:cNvPr id="1" name=""/>
+        <p:cNvGrpSpPr/>
+        <p:nvPr/>
+      </p:nvGrpSpPr>
+      <p:grpSpPr>
+        <a:xfrm>
+          <a:off x="0" y="0"/>
+          <a:ext cx="0" cy="0"/>
+          <a:chOff x="0" y="0"/>
+          <a:chExt cx="0" cy="0"/>
+        </a:xfrm>
+      </p:grpSpPr>
+      <p:sp>
+        <p:nvSpPr>
+          <p:cNvPr id="2" name="Slide Image Placeholder 1"/>
+          <p:cNvSpPr>
+            <a:spLocks noGrp="1" noRot="1" noChangeAspect="1"/>
+          </p:cNvSpPr>
+          <p:nvPr>
+            <p:ph type="sldImg"/>
+          </p:nvPr>
+        </p:nvSpPr>
+        <p:spPr/>
+      </p:sp>
+      <p:sp>
+        <p:nvSpPr>
+          <p:cNvPr id="3" name="Notes Placeholder 2"/>
+          <p:cNvSpPr>
+            <a:spLocks noGrp="1"/>
+          </p:cNvSpPr>
+          <p:nvPr>
+            <p:ph type="body" idx="1"/>
+          </p:nvPr>
+        </p:nvSpPr>
+        <p:spPr/>
+        <p:txBody>
+          <a:bodyPr/>
+          <a:lstStyle/>
+          <a:p>
+            <a:endParaRPr lang="en-US" b="0" dirty="0" smtClean="0"/>
+          </a:p>
+        </p:txBody>
+      </p:sp>
+      <p:sp>
+        <p:nvSpPr>
+          <p:cNvPr id="4" name="Slide Number Placeholder 3"/>
+          <p:cNvSpPr>
+            <a:spLocks noGrp="1"/>
+          </p:cNvSpPr>
+          <p:nvPr>
+            <p:ph type="sldNum" sz="quarter" idx="10"/>
+          </p:nvPr>
+        </p:nvSpPr>
+        <p:spPr/>
+        <p:txBody>
+          <a:bodyPr/>
+          <a:lstStyle/>
+          <a:p>
+            <a:fld id="{89029652-62E7-43D6-83B5-097D7B7AA5D8}" type="slidenum">
+              <a:rPr lang="en-US" smtClean="0"/>
+              <a:t>36</a:t>
+            </a:fld>
+            <a:endParaRPr lang="en-US"/>
+          </a:p>
+        </p:txBody>
+      </p:sp>
+    </p:spTree>
+    <p:extLst>
+      <p:ext uri="{BB962C8B-B14F-4D97-AF65-F5344CB8AC3E}">
+        <p14:creationId xmlns:p14="http://schemas.microsoft.com/office/powerpoint/2010/main" val="3271057564"/>
+      </p:ext>
+    </p:extLst>
+  </p:cSld>
+  <p:clrMapOvr>
+    <a:masterClrMapping/>
+  </p:clrMapOvr>
+</p:notes>
+</file>
+
+<file path=ppt/notesSlides/notesSlide37.xml><?xml version="1.0" encoding="utf-8"?>
+<p:notes xmlns:a="http://schemas.openxmlformats.org/drawingml/2006/main" xmlns:r="http://schemas.openxmlformats.org/officeDocument/2006/relationships" xmlns:p="http://schemas.openxmlformats.org/presentationml/2006/main">
+  <p:cSld>
+    <p:spTree>
+      <p:nvGrpSpPr>
+        <p:cNvPr id="1" name=""/>
+        <p:cNvGrpSpPr/>
+        <p:nvPr/>
+      </p:nvGrpSpPr>
+      <p:grpSpPr>
+        <a:xfrm>
+          <a:off x="0" y="0"/>
+          <a:ext cx="0" cy="0"/>
+          <a:chOff x="0" y="0"/>
+          <a:chExt cx="0" cy="0"/>
+        </a:xfrm>
+      </p:grpSpPr>
+      <p:sp>
+        <p:nvSpPr>
+          <p:cNvPr id="2" name="Slide Image Placeholder 1"/>
+          <p:cNvSpPr>
+            <a:spLocks noGrp="1" noRot="1" noChangeAspect="1"/>
+          </p:cNvSpPr>
+          <p:nvPr>
+            <p:ph type="sldImg"/>
+          </p:nvPr>
+        </p:nvSpPr>
+        <p:spPr/>
+      </p:sp>
+      <p:sp>
+        <p:nvSpPr>
+          <p:cNvPr id="3" name="Notes Placeholder 2"/>
+          <p:cNvSpPr>
+            <a:spLocks noGrp="1"/>
+          </p:cNvSpPr>
+          <p:nvPr>
+            <p:ph type="body" idx="1"/>
+          </p:nvPr>
+        </p:nvSpPr>
+        <p:spPr/>
+        <p:txBody>
+          <a:bodyPr/>
+          <a:lstStyle/>
+          <a:p>
+            <a:endParaRPr lang="en-US" sz="1200" kern="1200" dirty="0" smtClean="0">
+              <a:solidFill>
+                <a:schemeClr val="tx1"/>
+              </a:solidFill>
+              <a:effectLst/>
+              <a:latin typeface="+mn-lt"/>
+              <a:ea typeface="+mn-ea"/>
+              <a:cs typeface="+mn-cs"/>
+            </a:endParaRPr>
+          </a:p>
+        </p:txBody>
+      </p:sp>
+      <p:sp>
+        <p:nvSpPr>
+          <p:cNvPr id="4" name="Slide Number Placeholder 3"/>
+          <p:cNvSpPr>
+            <a:spLocks noGrp="1"/>
+          </p:cNvSpPr>
+          <p:nvPr>
+            <p:ph type="sldNum" sz="quarter" idx="10"/>
+          </p:nvPr>
+        </p:nvSpPr>
+        <p:spPr/>
+        <p:txBody>
+          <a:bodyPr/>
+          <a:lstStyle/>
+          <a:p>
+            <a:fld id="{89029652-62E7-43D6-83B5-097D7B7AA5D8}" type="slidenum">
+              <a:rPr lang="en-US" smtClean="0"/>
+              <a:t>37</a:t>
+            </a:fld>
+            <a:endParaRPr lang="en-US"/>
+          </a:p>
+        </p:txBody>
+      </p:sp>
+    </p:spTree>
+    <p:extLst>
+      <p:ext uri="{BB962C8B-B14F-4D97-AF65-F5344CB8AC3E}">
+        <p14:creationId xmlns:p14="http://schemas.microsoft.com/office/powerpoint/2010/main" val="2813022412"/>
       </p:ext>
     </p:extLst>
   </p:cSld>
@@ -3017,7 +3867,7 @@
           <a:p>
             <a:fld id="{75AA6396-395E-4ADA-8EE5-F328BC863A04}" type="datetimeFigureOut">
               <a:rPr lang="en-US" smtClean="0"/>
-              <a:t>12/21/2016</a:t>
+              <a:t>12/22/2016</a:t>
             </a:fld>
             <a:endParaRPr lang="en-US"/>
           </a:p>
@@ -3194,7 +4044,7 @@
           <a:p>
             <a:fld id="{75AA6396-395E-4ADA-8EE5-F328BC863A04}" type="datetimeFigureOut">
               <a:rPr lang="en-US" smtClean="0"/>
-              <a:t>12/21/2016</a:t>
+              <a:t>12/22/2016</a:t>
             </a:fld>
             <a:endParaRPr lang="en-US"/>
           </a:p>
@@ -3374,7 +4224,7 @@
           <a:p>
             <a:fld id="{75AA6396-395E-4ADA-8EE5-F328BC863A04}" type="datetimeFigureOut">
               <a:rPr lang="en-US" smtClean="0"/>
-              <a:t>12/21/2016</a:t>
+              <a:t>12/22/2016</a:t>
             </a:fld>
             <a:endParaRPr lang="en-US"/>
           </a:p>
@@ -3594,7 +4444,7 @@
           <a:p>
             <a:fld id="{75AA6396-395E-4ADA-8EE5-F328BC863A04}" type="datetimeFigureOut">
               <a:rPr lang="en-US" smtClean="0"/>
-              <a:t>12/21/2016</a:t>
+              <a:t>12/22/2016</a:t>
             </a:fld>
             <a:endParaRPr lang="en-US"/>
           </a:p>
@@ -3847,7 +4697,7 @@
           <a:p>
             <a:fld id="{75AA6396-395E-4ADA-8EE5-F328BC863A04}" type="datetimeFigureOut">
               <a:rPr lang="en-US" smtClean="0"/>
-              <a:t>12/21/2016</a:t>
+              <a:t>12/22/2016</a:t>
             </a:fld>
             <a:endParaRPr lang="en-US"/>
           </a:p>
@@ -4086,7 +4936,7 @@
           <a:p>
             <a:fld id="{75AA6396-395E-4ADA-8EE5-F328BC863A04}" type="datetimeFigureOut">
               <a:rPr lang="en-US" smtClean="0"/>
-              <a:t>12/21/2016</a:t>
+              <a:t>12/22/2016</a:t>
             </a:fld>
             <a:endParaRPr lang="en-US"/>
           </a:p>
@@ -4460,7 +5310,7 @@
           <a:p>
             <a:fld id="{75AA6396-395E-4ADA-8EE5-F328BC863A04}" type="datetimeFigureOut">
               <a:rPr lang="en-US" smtClean="0"/>
-              <a:t>12/21/2016</a:t>
+              <a:t>12/22/2016</a:t>
             </a:fld>
             <a:endParaRPr lang="en-US"/>
           </a:p>
@@ -4578,7 +5428,7 @@
           <a:p>
             <a:fld id="{75AA6396-395E-4ADA-8EE5-F328BC863A04}" type="datetimeFigureOut">
               <a:rPr lang="en-US" smtClean="0"/>
-              <a:t>12/21/2016</a:t>
+              <a:t>12/22/2016</a:t>
             </a:fld>
             <a:endParaRPr lang="en-US"/>
           </a:p>
@@ -4673,7 +5523,7 @@
           <a:p>
             <a:fld id="{75AA6396-395E-4ADA-8EE5-F328BC863A04}" type="datetimeFigureOut">
               <a:rPr lang="en-US" smtClean="0"/>
-              <a:t>12/21/2016</a:t>
+              <a:t>12/22/2016</a:t>
             </a:fld>
             <a:endParaRPr lang="en-US"/>
           </a:p>
@@ -4950,7 +5800,7 @@
           <a:p>
             <a:fld id="{75AA6396-395E-4ADA-8EE5-F328BC863A04}" type="datetimeFigureOut">
               <a:rPr lang="en-US" smtClean="0"/>
-              <a:t>12/21/2016</a:t>
+              <a:t>12/22/2016</a:t>
             </a:fld>
             <a:endParaRPr lang="en-US"/>
           </a:p>
@@ -5203,7 +6053,7 @@
           <a:p>
             <a:fld id="{75AA6396-395E-4ADA-8EE5-F328BC863A04}" type="datetimeFigureOut">
               <a:rPr lang="en-US" smtClean="0"/>
-              <a:t>12/21/2016</a:t>
+              <a:t>12/22/2016</a:t>
             </a:fld>
             <a:endParaRPr lang="en-US"/>
           </a:p>
@@ -5416,7 +6266,7 @@
           <a:p>
             <a:fld id="{75AA6396-395E-4ADA-8EE5-F328BC863A04}" type="datetimeFigureOut">
               <a:rPr lang="en-US" smtClean="0"/>
-              <a:t>12/21/2016</a:t>
+              <a:t>12/22/2016</a:t>
             </a:fld>
             <a:endParaRPr lang="en-US"/>
           </a:p>
@@ -6511,41 +7361,124 @@
           <a:chExt cx="0" cy="0"/>
         </a:xfrm>
       </p:grpSpPr>
-      <p:sp>
-        <p:nvSpPr>
-          <p:cNvPr id="2" name="Title 1"/>
-          <p:cNvSpPr>
-            <a:spLocks noGrp="1"/>
-          </p:cNvSpPr>
-          <p:nvPr>
-            <p:ph type="title"/>
-          </p:nvPr>
-        </p:nvSpPr>
+      <p:pic>
+        <p:nvPicPr>
+          <p:cNvPr id="6" name="Picture 5"/>
+          <p:cNvPicPr>
+            <a:picLocks noChangeAspect="1"/>
+          </p:cNvPicPr>
+          <p:nvPr/>
+        </p:nvPicPr>
+        <p:blipFill>
+          <a:blip r:embed="rId3"/>
+          <a:stretch>
+            <a:fillRect/>
+          </a:stretch>
+        </p:blipFill>
         <p:spPr>
           <a:xfrm>
-            <a:off x="964927" y="1"/>
-            <a:ext cx="10515600" cy="6858000"/>
+            <a:off x="533392" y="2193260"/>
+            <a:ext cx="10783355" cy="4561500"/>
+          </a:xfrm>
+          <a:prstGeom prst="rect">
+            <a:avLst/>
+          </a:prstGeom>
+        </p:spPr>
+      </p:pic>
+      <p:sp>
+        <p:nvSpPr>
+          <p:cNvPr id="2" name="Title 1"/>
+          <p:cNvSpPr>
+            <a:spLocks noGrp="1"/>
+          </p:cNvSpPr>
+          <p:nvPr>
+            <p:ph type="title"/>
+          </p:nvPr>
+        </p:nvSpPr>
+        <p:spPr/>
+        <p:txBody>
+          <a:bodyPr>
+            <a:normAutofit/>
+          </a:bodyPr>
+          <a:lstStyle/>
+          <a:p>
+            <a:r>
+              <a:rPr lang="en-US" sz="4800" dirty="0" smtClean="0"/>
+              <a:t>"Cross cutting" concerns</a:t>
+            </a:r>
+            <a:endParaRPr lang="en-US" sz="4800" dirty="0"/>
+          </a:p>
+        </p:txBody>
+      </p:sp>
+      <p:sp>
+        <p:nvSpPr>
+          <p:cNvPr id="3" name="Content Placeholder 2"/>
+          <p:cNvSpPr>
+            <a:spLocks noGrp="1"/>
+          </p:cNvSpPr>
+          <p:nvPr>
+            <p:ph idx="1"/>
+          </p:nvPr>
+        </p:nvSpPr>
+        <p:spPr>
+          <a:xfrm>
+            <a:off x="838200" y="1825624"/>
+            <a:ext cx="10515600" cy="4589923"/>
           </a:xfrm>
         </p:spPr>
         <p:txBody>
-          <a:bodyPr anchor="ctr">
+          <a:bodyPr>
             <a:normAutofit/>
           </a:bodyPr>
           <a:lstStyle/>
           <a:p>
-            <a:pPr algn="ctr"/>
-            <a:r>
-              <a:rPr lang="en-US" sz="4800" dirty="0" smtClean="0"/>
-              <a:t>Show me the codez!</a:t>
-            </a:r>
-            <a:endParaRPr lang="en-US" sz="4800" dirty="0"/>
-          </a:p>
-        </p:txBody>
-      </p:sp>
+            <a:endParaRPr lang="en-US" sz="4000" dirty="0"/>
+          </a:p>
+          <a:p>
+            <a:endParaRPr lang="en-US" sz="4000" dirty="0" smtClean="0"/>
+          </a:p>
+          <a:p>
+            <a:endParaRPr lang="en-US" sz="4000" dirty="0" smtClean="0"/>
+          </a:p>
+          <a:p>
+            <a:endParaRPr lang="en-US" dirty="0" smtClean="0"/>
+          </a:p>
+          <a:p>
+            <a:endParaRPr lang="en-US" dirty="0" smtClean="0"/>
+          </a:p>
+          <a:p>
+            <a:endParaRPr lang="en-US" dirty="0"/>
+          </a:p>
+        </p:txBody>
+      </p:sp>
+      <p:pic>
+        <p:nvPicPr>
+          <p:cNvPr id="4" name="Picture 3"/>
+          <p:cNvPicPr>
+            <a:picLocks noChangeAspect="1"/>
+          </p:cNvPicPr>
+          <p:nvPr/>
+        </p:nvPicPr>
+        <p:blipFill>
+          <a:blip r:embed="rId4"/>
+          <a:stretch>
+            <a:fillRect/>
+          </a:stretch>
+        </p:blipFill>
+        <p:spPr>
+          <a:xfrm>
+            <a:off x="3840103" y="1742919"/>
+            <a:ext cx="7781452" cy="2377666"/>
+          </a:xfrm>
+          <a:prstGeom prst="rect">
+            <a:avLst/>
+          </a:prstGeom>
+        </p:spPr>
+      </p:pic>
     </p:spTree>
     <p:extLst>
       <p:ext uri="{BB962C8B-B14F-4D97-AF65-F5344CB8AC3E}">
-        <p14:creationId xmlns:p14="http://schemas.microsoft.com/office/powerpoint/2010/main" val="269211379"/>
+        <p14:creationId xmlns:p14="http://schemas.microsoft.com/office/powerpoint/2010/main" val="1750226626"/>
       </p:ext>
     </p:extLst>
   </p:cSld>
@@ -6579,6 +7512,30 @@
           <a:chExt cx="0" cy="0"/>
         </a:xfrm>
       </p:grpSpPr>
+      <p:pic>
+        <p:nvPicPr>
+          <p:cNvPr id="6" name="Picture 5"/>
+          <p:cNvPicPr>
+            <a:picLocks noChangeAspect="1"/>
+          </p:cNvPicPr>
+          <p:nvPr/>
+        </p:nvPicPr>
+        <p:blipFill>
+          <a:blip r:embed="rId3"/>
+          <a:stretch>
+            <a:fillRect/>
+          </a:stretch>
+        </p:blipFill>
+        <p:spPr>
+          <a:xfrm>
+            <a:off x="533392" y="2193260"/>
+            <a:ext cx="10783355" cy="4561500"/>
+          </a:xfrm>
+          <a:prstGeom prst="rect">
+            <a:avLst/>
+          </a:prstGeom>
+        </p:spPr>
+      </p:pic>
       <p:sp>
         <p:nvSpPr>
           <p:cNvPr id="2" name="Title 1"/>
@@ -6598,7 +7555,7 @@
           <a:p>
             <a:r>
               <a:rPr lang="en-US" sz="4800" dirty="0" smtClean="0"/>
-              <a:t>Goals for framework-level security code</a:t>
+              <a:t>"Cross cutting" concerns</a:t>
             </a:r>
             <a:endParaRPr lang="en-US" sz="4800" dirty="0"/>
           </a:p>
@@ -6626,33 +7583,9 @@
           </a:bodyPr>
           <a:lstStyle/>
           <a:p>
-            <a:r>
-              <a:rPr lang="en-US" sz="4000" dirty="0" smtClean="0"/>
-              <a:t>"Secure by default"</a:t>
-            </a:r>
-          </a:p>
-          <a:p>
             <a:endParaRPr lang="en-US" sz="4000" dirty="0"/>
           </a:p>
           <a:p>
-            <a:r>
-              <a:rPr lang="en-US" sz="4000" dirty="0" smtClean="0"/>
-              <a:t>Consistent implementation</a:t>
-            </a:r>
-          </a:p>
-          <a:p>
-            <a:endParaRPr lang="en-US" sz="4000" dirty="0"/>
-          </a:p>
-          <a:p>
-            <a:r>
-              <a:rPr lang="en-US" sz="4000" dirty="0" smtClean="0"/>
-              <a:t>Easy to audit</a:t>
-            </a:r>
-          </a:p>
-          <a:p>
-            <a:endParaRPr lang="en-US" sz="4000" dirty="0"/>
-          </a:p>
-          <a:p>
             <a:endParaRPr lang="en-US" sz="4000" dirty="0" smtClean="0"/>
           </a:p>
           <a:p>
@@ -6669,10 +7602,34 @@
           </a:p>
         </p:txBody>
       </p:sp>
+      <p:pic>
+        <p:nvPicPr>
+          <p:cNvPr id="4" name="Picture 3"/>
+          <p:cNvPicPr>
+            <a:picLocks noChangeAspect="1"/>
+          </p:cNvPicPr>
+          <p:nvPr/>
+        </p:nvPicPr>
+        <p:blipFill>
+          <a:blip r:embed="rId4"/>
+          <a:stretch>
+            <a:fillRect/>
+          </a:stretch>
+        </p:blipFill>
+        <p:spPr>
+          <a:xfrm>
+            <a:off x="3847789" y="1690688"/>
+            <a:ext cx="7198579" cy="2451408"/>
+          </a:xfrm>
+          <a:prstGeom prst="rect">
+            <a:avLst/>
+          </a:prstGeom>
+        </p:spPr>
+      </p:pic>
     </p:spTree>
     <p:extLst>
       <p:ext uri="{BB962C8B-B14F-4D97-AF65-F5344CB8AC3E}">
-        <p14:creationId xmlns:p14="http://schemas.microsoft.com/office/powerpoint/2010/main" val="2285767896"/>
+        <p14:creationId xmlns:p14="http://schemas.microsoft.com/office/powerpoint/2010/main" val="841446169"/>
       </p:ext>
     </p:extLst>
   </p:cSld>
@@ -6706,6 +7663,30 @@
           <a:chExt cx="0" cy="0"/>
         </a:xfrm>
       </p:grpSpPr>
+      <p:pic>
+        <p:nvPicPr>
+          <p:cNvPr id="6" name="Picture 5"/>
+          <p:cNvPicPr>
+            <a:picLocks noChangeAspect="1"/>
+          </p:cNvPicPr>
+          <p:nvPr/>
+        </p:nvPicPr>
+        <p:blipFill>
+          <a:blip r:embed="rId3"/>
+          <a:stretch>
+            <a:fillRect/>
+          </a:stretch>
+        </p:blipFill>
+        <p:spPr>
+          <a:xfrm>
+            <a:off x="533392" y="2193260"/>
+            <a:ext cx="10783355" cy="4561500"/>
+          </a:xfrm>
+          <a:prstGeom prst="rect">
+            <a:avLst/>
+          </a:prstGeom>
+        </p:spPr>
+      </p:pic>
       <p:sp>
         <p:nvSpPr>
           <p:cNvPr id="2" name="Title 1"/>
@@ -6725,7 +7706,7 @@
           <a:p>
             <a:r>
               <a:rPr lang="en-US" sz="4800" dirty="0" smtClean="0"/>
-              <a:t>Patented step-by-step slide</a:t>
+              <a:t>"Cross cutting" concerns</a:t>
             </a:r>
             <a:endParaRPr lang="en-US" sz="4800" dirty="0"/>
           </a:p>
@@ -6753,43 +7734,15 @@
           </a:bodyPr>
           <a:lstStyle/>
           <a:p>
-            <a:r>
-              <a:rPr lang="en-US" sz="4000" dirty="0" smtClean="0">
-                <a:solidFill>
-                  <a:schemeClr val="bg1">
-                    <a:lumMod val="65000"/>
-                  </a:schemeClr>
-                </a:solidFill>
-              </a:rPr>
-              <a:t>Old news</a:t>
-            </a:r>
-            <a:br>
-              <a:rPr lang="en-US" sz="4000" dirty="0" smtClean="0">
-                <a:solidFill>
-                  <a:schemeClr val="bg1">
-                    <a:lumMod val="65000"/>
-                  </a:schemeClr>
-                </a:solidFill>
-              </a:rPr>
-            </a:br>
-            <a:endParaRPr lang="en-US" sz="4000" dirty="0" smtClean="0">
-              <a:solidFill>
-                <a:schemeClr val="bg1">
-                  <a:lumMod val="65000"/>
-                </a:schemeClr>
-              </a:solidFill>
-            </a:endParaRPr>
-          </a:p>
-          <a:p>
-            <a:r>
-              <a:rPr lang="en-US" sz="4000" b="1" dirty="0" smtClean="0"/>
-              <a:t>New hotness</a:t>
-            </a:r>
+            <a:endParaRPr lang="en-US" sz="4000" dirty="0"/>
           </a:p>
           <a:p>
             <a:endParaRPr lang="en-US" sz="4000" dirty="0" smtClean="0"/>
           </a:p>
           <a:p>
+            <a:endParaRPr lang="en-US" sz="4000" dirty="0" smtClean="0"/>
+          </a:p>
+          <a:p>
             <a:endParaRPr lang="en-US" dirty="0" smtClean="0"/>
           </a:p>
           <a:p>
@@ -6800,10 +7753,34 @@
           </a:p>
         </p:txBody>
       </p:sp>
+      <p:pic>
+        <p:nvPicPr>
+          <p:cNvPr id="5" name="Picture 4"/>
+          <p:cNvPicPr>
+            <a:picLocks noChangeAspect="1"/>
+          </p:cNvPicPr>
+          <p:nvPr/>
+        </p:nvPicPr>
+        <p:blipFill>
+          <a:blip r:embed="rId4"/>
+          <a:stretch>
+            <a:fillRect/>
+          </a:stretch>
+        </p:blipFill>
+        <p:spPr>
+          <a:xfrm>
+            <a:off x="3917046" y="2058324"/>
+            <a:ext cx="7704509" cy="1819378"/>
+          </a:xfrm>
+          <a:prstGeom prst="rect">
+            <a:avLst/>
+          </a:prstGeom>
+        </p:spPr>
+      </p:pic>
     </p:spTree>
     <p:extLst>
       <p:ext uri="{BB962C8B-B14F-4D97-AF65-F5344CB8AC3E}">
-        <p14:creationId xmlns:p14="http://schemas.microsoft.com/office/powerpoint/2010/main" val="1887088746"/>
+        <p14:creationId xmlns:p14="http://schemas.microsoft.com/office/powerpoint/2010/main" val="528689166"/>
       </p:ext>
     </p:extLst>
   </p:cSld>
@@ -6847,7 +7824,12 @@
             <p:ph type="title"/>
           </p:nvPr>
         </p:nvSpPr>
-        <p:spPr/>
+        <p:spPr>
+          <a:xfrm>
+            <a:off x="838200" y="365125"/>
+            <a:ext cx="10960510" cy="1325563"/>
+          </a:xfrm>
+        </p:spPr>
         <p:txBody>
           <a:bodyPr>
             <a:normAutofit/>
@@ -6856,7 +7838,7 @@
           <a:p>
             <a:r>
               <a:rPr lang="en-US" sz="4800" dirty="0" smtClean="0"/>
-              <a:t>Canonical example: SQL Injection</a:t>
+              <a:t>What makes a concern "cross cutting"?</a:t>
             </a:r>
             <a:endParaRPr lang="en-US" sz="4800" dirty="0"/>
           </a:p>
@@ -6875,7 +7857,7 @@
         <p:spPr>
           <a:xfrm>
             <a:off x="838200" y="1825624"/>
-            <a:ext cx="10515600" cy="4589923"/>
+            <a:ext cx="10515600" cy="4899641"/>
           </a:xfrm>
         </p:spPr>
         <p:txBody>
@@ -6884,6 +7866,22 @@
           </a:bodyPr>
           <a:lstStyle/>
           <a:p>
+            <a:r>
+              <a:rPr lang="en-US" sz="4000" dirty="0" smtClean="0"/>
+              <a:t>Orthogonal to feature-specific business rules</a:t>
+            </a:r>
+            <a:endParaRPr lang="en-US" sz="4000" dirty="0"/>
+          </a:p>
+          <a:p>
+            <a:endParaRPr lang="en-US" sz="4000" dirty="0" smtClean="0"/>
+          </a:p>
+          <a:p>
+            <a:endParaRPr lang="en-US" sz="4000" dirty="0"/>
+          </a:p>
+          <a:p>
+            <a:endParaRPr lang="en-US" sz="4000" dirty="0" smtClean="0"/>
+          </a:p>
+          <a:p>
             <a:endParaRPr lang="en-US" sz="4000" dirty="0" smtClean="0"/>
           </a:p>
           <a:p>
@@ -6900,7 +7898,7 @@
     </p:spTree>
     <p:extLst>
       <p:ext uri="{BB962C8B-B14F-4D97-AF65-F5344CB8AC3E}">
-        <p14:creationId xmlns:p14="http://schemas.microsoft.com/office/powerpoint/2010/main" val="1766242099"/>
+        <p14:creationId xmlns:p14="http://schemas.microsoft.com/office/powerpoint/2010/main" val="3524168665"/>
       </p:ext>
     </p:extLst>
   </p:cSld>
@@ -6944,7 +7942,12 @@
             <p:ph type="title"/>
           </p:nvPr>
         </p:nvSpPr>
-        <p:spPr/>
+        <p:spPr>
+          <a:xfrm>
+            <a:off x="838200" y="365125"/>
+            <a:ext cx="10960510" cy="1325563"/>
+          </a:xfrm>
+        </p:spPr>
         <p:txBody>
           <a:bodyPr>
             <a:normAutofit/>
@@ -6953,7 +7956,7 @@
           <a:p>
             <a:r>
               <a:rPr lang="en-US" sz="4800" dirty="0" smtClean="0"/>
-              <a:t>Authorization - feature</a:t>
+              <a:t>What makes a concern "cross cutting"?</a:t>
             </a:r>
             <a:endParaRPr lang="en-US" sz="4800" dirty="0"/>
           </a:p>
@@ -6972,7 +7975,7 @@
         <p:spPr>
           <a:xfrm>
             <a:off x="838200" y="1825624"/>
-            <a:ext cx="10515600" cy="4589923"/>
+            <a:ext cx="10515600" cy="4899641"/>
           </a:xfrm>
         </p:spPr>
         <p:txBody>
@@ -6981,9 +7984,46 @@
           </a:bodyPr>
           <a:lstStyle/>
           <a:p>
+            <a:r>
+              <a:rPr lang="en-US" sz="4000" dirty="0" smtClean="0">
+                <a:solidFill>
+                  <a:schemeClr val="bg1">
+                    <a:lumMod val="75000"/>
+                  </a:schemeClr>
+                </a:solidFill>
+              </a:rPr>
+              <a:t>Orthogonal to feature-specific business rules</a:t>
+            </a:r>
+            <a:endParaRPr lang="en-US" sz="4000" dirty="0">
+              <a:solidFill>
+                <a:schemeClr val="bg1">
+                  <a:lumMod val="75000"/>
+                </a:schemeClr>
+              </a:solidFill>
+            </a:endParaRPr>
+          </a:p>
+          <a:p>
             <a:endParaRPr lang="en-US" sz="4000" dirty="0" smtClean="0"/>
           </a:p>
           <a:p>
+            <a:r>
+              <a:rPr lang="en-US" sz="4000" dirty="0" smtClean="0"/>
+              <a:t>Applies to multiple features</a:t>
+            </a:r>
+          </a:p>
+          <a:p>
+            <a:endParaRPr lang="en-US" sz="4000" dirty="0" smtClean="0"/>
+          </a:p>
+          <a:p>
+            <a:endParaRPr lang="en-US" sz="4000" dirty="0"/>
+          </a:p>
+          <a:p>
+            <a:endParaRPr lang="en-US" sz="4000" dirty="0" smtClean="0"/>
+          </a:p>
+          <a:p>
+            <a:endParaRPr lang="en-US" sz="4000" dirty="0" smtClean="0"/>
+          </a:p>
+          <a:p>
             <a:endParaRPr lang="en-US" dirty="0" smtClean="0"/>
           </a:p>
           <a:p>
@@ -6994,34 +8034,10 @@
           </a:p>
         </p:txBody>
       </p:sp>
-      <p:pic>
-        <p:nvPicPr>
-          <p:cNvPr id="5" name="Picture 4"/>
-          <p:cNvPicPr>
-            <a:picLocks noChangeAspect="1"/>
-          </p:cNvPicPr>
-          <p:nvPr/>
-        </p:nvPicPr>
-        <p:blipFill>
-          <a:blip r:embed="rId3"/>
-          <a:stretch>
-            <a:fillRect/>
-          </a:stretch>
-        </p:blipFill>
-        <p:spPr>
-          <a:xfrm>
-            <a:off x="838200" y="2946501"/>
-            <a:ext cx="10431478" cy="2554647"/>
-          </a:xfrm>
-          <a:prstGeom prst="rect">
-            <a:avLst/>
-          </a:prstGeom>
-        </p:spPr>
-      </p:pic>
     </p:spTree>
     <p:extLst>
       <p:ext uri="{BB962C8B-B14F-4D97-AF65-F5344CB8AC3E}">
-        <p14:creationId xmlns:p14="http://schemas.microsoft.com/office/powerpoint/2010/main" val="176538875"/>
+        <p14:creationId xmlns:p14="http://schemas.microsoft.com/office/powerpoint/2010/main" val="4241676050"/>
       </p:ext>
     </p:extLst>
   </p:cSld>
@@ -7065,7 +8081,12 @@
             <p:ph type="title"/>
           </p:nvPr>
         </p:nvSpPr>
-        <p:spPr/>
+        <p:spPr>
+          <a:xfrm>
+            <a:off x="838200" y="365125"/>
+            <a:ext cx="10960510" cy="1325563"/>
+          </a:xfrm>
+        </p:spPr>
         <p:txBody>
           <a:bodyPr>
             <a:normAutofit/>
@@ -7073,12 +8094,8 @@
           <a:lstStyle/>
           <a:p>
             <a:r>
-              <a:rPr lang="en-US" sz="4800" dirty="0"/>
-              <a:t>Authorization - </a:t>
-            </a:r>
-            <a:r>
               <a:rPr lang="en-US" sz="4800" dirty="0" smtClean="0"/>
-              <a:t>framework</a:t>
+              <a:t>What makes a concern "cross cutting"?</a:t>
             </a:r>
             <a:endParaRPr lang="en-US" sz="4800" dirty="0"/>
           </a:p>
@@ -7097,7 +8114,7 @@
         <p:spPr>
           <a:xfrm>
             <a:off x="838200" y="1825624"/>
-            <a:ext cx="10515600" cy="4589923"/>
+            <a:ext cx="10515600" cy="4899641"/>
           </a:xfrm>
         </p:spPr>
         <p:txBody>
@@ -7106,9 +8123,71 @@
           </a:bodyPr>
           <a:lstStyle/>
           <a:p>
+            <a:r>
+              <a:rPr lang="en-US" sz="4000" dirty="0" smtClean="0">
+                <a:solidFill>
+                  <a:schemeClr val="bg1">
+                    <a:lumMod val="75000"/>
+                  </a:schemeClr>
+                </a:solidFill>
+              </a:rPr>
+              <a:t>Orthogonal to feature-specific business rules</a:t>
+            </a:r>
+            <a:endParaRPr lang="en-US" sz="4000" dirty="0">
+              <a:solidFill>
+                <a:schemeClr val="bg1">
+                  <a:lumMod val="75000"/>
+                </a:schemeClr>
+              </a:solidFill>
+            </a:endParaRPr>
+          </a:p>
+          <a:p>
+            <a:endParaRPr lang="en-US" sz="4000" dirty="0" smtClean="0">
+              <a:solidFill>
+                <a:schemeClr val="bg1">
+                  <a:lumMod val="75000"/>
+                </a:schemeClr>
+              </a:solidFill>
+            </a:endParaRPr>
+          </a:p>
+          <a:p>
+            <a:r>
+              <a:rPr lang="en-US" sz="4000" dirty="0" smtClean="0">
+                <a:solidFill>
+                  <a:schemeClr val="bg1">
+                    <a:lumMod val="75000"/>
+                  </a:schemeClr>
+                </a:solidFill>
+              </a:rPr>
+              <a:t>Applies to multiple features</a:t>
+            </a:r>
+          </a:p>
+          <a:p>
             <a:endParaRPr lang="en-US" sz="4000" dirty="0" smtClean="0"/>
           </a:p>
           <a:p>
+            <a:r>
+              <a:rPr lang="en-US" sz="4000" dirty="0" smtClean="0"/>
+              <a:t>Can be made "secure </a:t>
+            </a:r>
+            <a:r>
+              <a:rPr lang="en-US" sz="4000" dirty="0" smtClean="0"/>
+              <a:t>by default"</a:t>
+            </a:r>
+          </a:p>
+          <a:p>
+            <a:endParaRPr lang="en-US" sz="4000" dirty="0"/>
+          </a:p>
+          <a:p>
+            <a:endParaRPr lang="en-US" sz="4000" dirty="0"/>
+          </a:p>
+          <a:p>
+            <a:endParaRPr lang="en-US" sz="4000" dirty="0" smtClean="0"/>
+          </a:p>
+          <a:p>
+            <a:endParaRPr lang="en-US" sz="4000" dirty="0" smtClean="0"/>
+          </a:p>
+          <a:p>
             <a:endParaRPr lang="en-US" dirty="0" smtClean="0"/>
           </a:p>
           <a:p>
@@ -7119,34 +8198,10 @@
           </a:p>
         </p:txBody>
       </p:sp>
-      <p:pic>
-        <p:nvPicPr>
-          <p:cNvPr id="5" name="Picture 4"/>
-          <p:cNvPicPr>
-            <a:picLocks noChangeAspect="1"/>
-          </p:cNvPicPr>
-          <p:nvPr/>
-        </p:nvPicPr>
-        <p:blipFill>
-          <a:blip r:embed="rId3"/>
-          <a:stretch>
-            <a:fillRect/>
-          </a:stretch>
-        </p:blipFill>
-        <p:spPr>
-          <a:xfrm>
-            <a:off x="838201" y="2736220"/>
-            <a:ext cx="9677400" cy="1971323"/>
-          </a:xfrm>
-          <a:prstGeom prst="rect">
-            <a:avLst/>
-          </a:prstGeom>
-        </p:spPr>
-      </p:pic>
     </p:spTree>
     <p:extLst>
       <p:ext uri="{BB962C8B-B14F-4D97-AF65-F5344CB8AC3E}">
-        <p14:creationId xmlns:p14="http://schemas.microsoft.com/office/powerpoint/2010/main" val="4046002787"/>
+        <p14:creationId xmlns:p14="http://schemas.microsoft.com/office/powerpoint/2010/main" val="3289574924"/>
       </p:ext>
     </p:extLst>
   </p:cSld>
@@ -7250,6 +8305,36 @@
       </p:grpSpPr>
       <p:sp>
         <p:nvSpPr>
+          <p:cNvPr id="2" name="Title 1"/>
+          <p:cNvSpPr>
+            <a:spLocks noGrp="1"/>
+          </p:cNvSpPr>
+          <p:nvPr>
+            <p:ph type="title"/>
+          </p:nvPr>
+        </p:nvSpPr>
+        <p:spPr>
+          <a:xfrm>
+            <a:off x="838200" y="365125"/>
+            <a:ext cx="10960510" cy="1325563"/>
+          </a:xfrm>
+        </p:spPr>
+        <p:txBody>
+          <a:bodyPr>
+            <a:normAutofit/>
+          </a:bodyPr>
+          <a:lstStyle/>
+          <a:p>
+            <a:r>
+              <a:rPr lang="en-US" sz="4800" dirty="0" smtClean="0"/>
+              <a:t>What makes a concern "cross cutting"?</a:t>
+            </a:r>
+            <a:endParaRPr lang="en-US" sz="4800" dirty="0"/>
+          </a:p>
+        </p:txBody>
+      </p:sp>
+      <p:sp>
+        <p:nvSpPr>
           <p:cNvPr id="3" name="Content Placeholder 2"/>
           <p:cNvSpPr>
             <a:spLocks noGrp="1"/>
@@ -7261,7 +8346,7 @@
         <p:spPr>
           <a:xfrm>
             <a:off x="838200" y="1825624"/>
-            <a:ext cx="10515600" cy="4589923"/>
+            <a:ext cx="10515600" cy="4899641"/>
           </a:xfrm>
         </p:spPr>
         <p:txBody>
@@ -7270,9 +8355,96 @@
           </a:bodyPr>
           <a:lstStyle/>
           <a:p>
+            <a:r>
+              <a:rPr lang="en-US" sz="4000" dirty="0" smtClean="0">
+                <a:solidFill>
+                  <a:schemeClr val="bg1">
+                    <a:lumMod val="75000"/>
+                  </a:schemeClr>
+                </a:solidFill>
+              </a:rPr>
+              <a:t>Orthogonal to feature-specific business rules</a:t>
+            </a:r>
+            <a:endParaRPr lang="en-US" sz="4000" dirty="0">
+              <a:solidFill>
+                <a:schemeClr val="bg1">
+                  <a:lumMod val="75000"/>
+                </a:schemeClr>
+              </a:solidFill>
+            </a:endParaRPr>
+          </a:p>
+          <a:p>
+            <a:endParaRPr lang="en-US" sz="4000" dirty="0" smtClean="0">
+              <a:solidFill>
+                <a:schemeClr val="bg1">
+                  <a:lumMod val="75000"/>
+                </a:schemeClr>
+              </a:solidFill>
+            </a:endParaRPr>
+          </a:p>
+          <a:p>
+            <a:r>
+              <a:rPr lang="en-US" sz="4000" dirty="0" smtClean="0">
+                <a:solidFill>
+                  <a:schemeClr val="bg1">
+                    <a:lumMod val="75000"/>
+                  </a:schemeClr>
+                </a:solidFill>
+              </a:rPr>
+              <a:t>Applies to multiple features</a:t>
+            </a:r>
+          </a:p>
+          <a:p>
+            <a:endParaRPr lang="en-US" sz="4000" dirty="0" smtClean="0">
+              <a:solidFill>
+                <a:schemeClr val="bg1">
+                  <a:lumMod val="75000"/>
+                </a:schemeClr>
+              </a:solidFill>
+            </a:endParaRPr>
+          </a:p>
+          <a:p>
+            <a:r>
+              <a:rPr lang="en-US" sz="4000" dirty="0" smtClean="0">
+                <a:solidFill>
+                  <a:schemeClr val="bg1">
+                    <a:lumMod val="75000"/>
+                  </a:schemeClr>
+                </a:solidFill>
+              </a:rPr>
+              <a:t>Can be made "secure </a:t>
+            </a:r>
+            <a:r>
+              <a:rPr lang="en-US" sz="4000" dirty="0" smtClean="0">
+                <a:solidFill>
+                  <a:schemeClr val="bg1">
+                    <a:lumMod val="75000"/>
+                  </a:schemeClr>
+                </a:solidFill>
+              </a:rPr>
+              <a:t>by default"</a:t>
+            </a:r>
+          </a:p>
+          <a:p>
+            <a:endParaRPr lang="en-US" sz="4000" dirty="0"/>
+          </a:p>
+          <a:p>
+            <a:r>
+              <a:rPr lang="en-US" sz="4000" dirty="0" smtClean="0"/>
+              <a:t>Needs auditing</a:t>
+            </a:r>
             <a:endParaRPr lang="en-US" sz="4000" dirty="0" smtClean="0"/>
           </a:p>
           <a:p>
+            <a:endParaRPr lang="en-US" sz="4000" dirty="0"/>
+          </a:p>
+          <a:p>
+            <a:endParaRPr lang="en-US" sz="4000" dirty="0" smtClean="0"/>
+          </a:p>
+          <a:p>
+            <a:endParaRPr lang="en-US" sz="4000" dirty="0" smtClean="0"/>
+          </a:p>
+          <a:p>
             <a:endParaRPr lang="en-US" dirty="0" smtClean="0"/>
           </a:p>
           <a:p>
@@ -7283,34 +8455,10 @@
           </a:p>
         </p:txBody>
       </p:sp>
-      <p:pic>
-        <p:nvPicPr>
-          <p:cNvPr id="7" name="Picture 6"/>
-          <p:cNvPicPr>
-            <a:picLocks noChangeAspect="1"/>
-          </p:cNvPicPr>
-          <p:nvPr/>
-        </p:nvPicPr>
-        <p:blipFill>
-          <a:blip r:embed="rId3"/>
-          <a:stretch>
-            <a:fillRect/>
-          </a:stretch>
-        </p:blipFill>
-        <p:spPr>
-          <a:xfrm>
-            <a:off x="0" y="265470"/>
-            <a:ext cx="11983223" cy="6415547"/>
-          </a:xfrm>
-          <a:prstGeom prst="rect">
-            <a:avLst/>
-          </a:prstGeom>
-        </p:spPr>
-      </p:pic>
     </p:spTree>
     <p:extLst>
       <p:ext uri="{BB962C8B-B14F-4D97-AF65-F5344CB8AC3E}">
-        <p14:creationId xmlns:p14="http://schemas.microsoft.com/office/powerpoint/2010/main" val="1217261759"/>
+        <p14:creationId xmlns:p14="http://schemas.microsoft.com/office/powerpoint/2010/main" val="617467512"/>
       </p:ext>
     </p:extLst>
   </p:cSld>
@@ -7354,84 +8502,61 @@
             <p:ph type="title"/>
           </p:nvPr>
         </p:nvSpPr>
-        <p:spPr/>
-        <p:txBody>
-          <a:bodyPr>
+        <p:spPr>
+          <a:xfrm>
+            <a:off x="964927" y="1"/>
+            <a:ext cx="10515600" cy="6858000"/>
+          </a:xfrm>
+        </p:spPr>
+        <p:txBody>
+          <a:bodyPr anchor="ctr">
             <a:normAutofit/>
           </a:bodyPr>
           <a:lstStyle/>
           <a:p>
+            <a:pPr algn="ctr"/>
+            <a:r>
+              <a:rPr lang="en-US" sz="4800" dirty="0" smtClean="0"/>
+              <a:t>Show me the </a:t>
+            </a:r>
+            <a:r>
+              <a:rPr lang="en-US" sz="4800" dirty="0" err="1" smtClean="0"/>
+              <a:t>codez</a:t>
+            </a:r>
+            <a:r>
+              <a:rPr lang="en-US" sz="4800" dirty="0" smtClean="0"/>
+              <a:t>!</a:t>
+            </a:r>
+            <a:br>
+              <a:rPr lang="en-US" sz="4800" dirty="0" smtClean="0"/>
+            </a:br>
             <a:r>
               <a:rPr lang="en-US" sz="4800" dirty="0"/>
-              <a:t>Authorization - feature</a:t>
-            </a:r>
-            <a:endParaRPr lang="en-US" sz="4800" dirty="0"/>
-          </a:p>
-        </p:txBody>
-      </p:sp>
-      <p:sp>
-        <p:nvSpPr>
-          <p:cNvPr id="3" name="Content Placeholder 2"/>
-          <p:cNvSpPr>
-            <a:spLocks noGrp="1"/>
-          </p:cNvSpPr>
-          <p:nvPr>
-            <p:ph idx="1"/>
-          </p:nvPr>
-        </p:nvSpPr>
-        <p:spPr>
-          <a:xfrm>
-            <a:off x="838200" y="1825624"/>
-            <a:ext cx="10515600" cy="4589923"/>
-          </a:xfrm>
-        </p:spPr>
-        <p:txBody>
-          <a:bodyPr>
-            <a:normAutofit/>
-          </a:bodyPr>
-          <a:lstStyle/>
-          <a:p>
-            <a:endParaRPr lang="en-US" sz="4000" dirty="0" smtClean="0"/>
-          </a:p>
-          <a:p>
-            <a:endParaRPr lang="en-US" dirty="0" smtClean="0"/>
-          </a:p>
-          <a:p>
-            <a:endParaRPr lang="en-US" dirty="0" smtClean="0"/>
-          </a:p>
-          <a:p>
-            <a:endParaRPr lang="en-US" dirty="0"/>
-          </a:p>
-        </p:txBody>
-      </p:sp>
-      <p:pic>
-        <p:nvPicPr>
-          <p:cNvPr id="4" name="Picture 3"/>
-          <p:cNvPicPr>
-            <a:picLocks noChangeAspect="1"/>
-          </p:cNvPicPr>
-          <p:nvPr/>
-        </p:nvPicPr>
-        <p:blipFill>
-          <a:blip r:embed="rId3"/>
-          <a:stretch>
-            <a:fillRect/>
-          </a:stretch>
-        </p:blipFill>
-        <p:spPr>
-          <a:xfrm>
-            <a:off x="838200" y="2019736"/>
-            <a:ext cx="11012331" cy="4145090"/>
-          </a:xfrm>
-          <a:prstGeom prst="rect">
-            <a:avLst/>
-          </a:prstGeom>
-        </p:spPr>
-      </p:pic>
+              <a:t/>
+            </a:r>
+            <a:br>
+              <a:rPr lang="en-US" sz="4800" dirty="0"/>
+            </a:br>
+            <a:r>
+              <a:rPr lang="en-US" dirty="0" smtClean="0">
+                <a:solidFill>
+                  <a:srgbClr val="013947"/>
+                </a:solidFill>
+              </a:rPr>
+              <a:t>bit.ly/2i0J91d</a:t>
+            </a:r>
+            <a:endParaRPr lang="en-US" sz="4800" dirty="0">
+              <a:solidFill>
+                <a:srgbClr val="013947"/>
+              </a:solidFill>
+            </a:endParaRPr>
+          </a:p>
+        </p:txBody>
+      </p:sp>
     </p:spTree>
     <p:extLst>
       <p:ext uri="{BB962C8B-B14F-4D97-AF65-F5344CB8AC3E}">
-        <p14:creationId xmlns:p14="http://schemas.microsoft.com/office/powerpoint/2010/main" val="806865913"/>
+        <p14:creationId xmlns:p14="http://schemas.microsoft.com/office/powerpoint/2010/main" val="269211379"/>
       </p:ext>
     </p:extLst>
   </p:cSld>
@@ -7483,8 +8608,8 @@
           <a:lstStyle/>
           <a:p>
             <a:r>
-              <a:rPr lang="en-US" sz="4800" dirty="0"/>
-              <a:t>Authorization - framework</a:t>
+              <a:rPr lang="en-US" sz="4800" dirty="0" smtClean="0"/>
+              <a:t>Cross Site Request Forgery (CSRF)</a:t>
             </a:r>
             <a:endParaRPr lang="en-US" sz="4800" dirty="0"/>
           </a:p>
@@ -7512,9 +8637,6 @@
           </a:bodyPr>
           <a:lstStyle/>
           <a:p>
-            <a:endParaRPr lang="en-US" sz="4000" dirty="0" smtClean="0"/>
-          </a:p>
-          <a:p>
             <a:endParaRPr lang="en-US" dirty="0" smtClean="0"/>
           </a:p>
           <a:p>
@@ -7527,7 +8649,7 @@
       </p:sp>
       <p:pic>
         <p:nvPicPr>
-          <p:cNvPr id="5" name="Picture 4"/>
+          <p:cNvPr id="4" name="Picture 3"/>
           <p:cNvPicPr>
             <a:picLocks noChangeAspect="1"/>
           </p:cNvPicPr>
@@ -7541,8 +8663,8 @@
         </p:blipFill>
         <p:spPr>
           <a:xfrm>
-            <a:off x="838200" y="2136103"/>
-            <a:ext cx="7184923" cy="3968963"/>
+            <a:off x="838200" y="1303066"/>
+            <a:ext cx="8822230" cy="5304211"/>
           </a:xfrm>
           <a:prstGeom prst="rect">
             <a:avLst/>
@@ -7552,7 +8674,7 @@
     </p:spTree>
     <p:extLst>
       <p:ext uri="{BB962C8B-B14F-4D97-AF65-F5344CB8AC3E}">
-        <p14:creationId xmlns:p14="http://schemas.microsoft.com/office/powerpoint/2010/main" val="3305015095"/>
+        <p14:creationId xmlns:p14="http://schemas.microsoft.com/office/powerpoint/2010/main" val="4124003797"/>
       </p:ext>
     </p:extLst>
   </p:cSld>
@@ -7570,254 +8692,6 @@
 </file>
 
 <file path=ppt/slides/slide23.xml><?xml version="1.0" encoding="utf-8"?>
-<p:sld xmlns:a="http://schemas.openxmlformats.org/drawingml/2006/main" xmlns:r="http://schemas.openxmlformats.org/officeDocument/2006/relationships" xmlns:p="http://schemas.openxmlformats.org/presentationml/2006/main">
-  <p:cSld>
-    <p:spTree>
-      <p:nvGrpSpPr>
-        <p:cNvPr id="1" name=""/>
-        <p:cNvGrpSpPr/>
-        <p:nvPr/>
-      </p:nvGrpSpPr>
-      <p:grpSpPr>
-        <a:xfrm>
-          <a:off x="0" y="0"/>
-          <a:ext cx="0" cy="0"/>
-          <a:chOff x="0" y="0"/>
-          <a:chExt cx="0" cy="0"/>
-        </a:xfrm>
-      </p:grpSpPr>
-      <p:sp>
-        <p:nvSpPr>
-          <p:cNvPr id="2" name="Title 1"/>
-          <p:cNvSpPr>
-            <a:spLocks noGrp="1"/>
-          </p:cNvSpPr>
-          <p:nvPr>
-            <p:ph type="title"/>
-          </p:nvPr>
-        </p:nvSpPr>
-        <p:spPr/>
-        <p:txBody>
-          <a:bodyPr>
-            <a:normAutofit/>
-          </a:bodyPr>
-          <a:lstStyle/>
-          <a:p>
-            <a:r>
-              <a:rPr lang="en-US" sz="4800" dirty="0" smtClean="0"/>
-              <a:t>Access Control </a:t>
-            </a:r>
-            <a:r>
-              <a:rPr lang="en-US" sz="4800" dirty="0"/>
-              <a:t>- feature</a:t>
-            </a:r>
-            <a:endParaRPr lang="en-US" sz="4800" dirty="0"/>
-          </a:p>
-        </p:txBody>
-      </p:sp>
-      <p:sp>
-        <p:nvSpPr>
-          <p:cNvPr id="3" name="Content Placeholder 2"/>
-          <p:cNvSpPr>
-            <a:spLocks noGrp="1"/>
-          </p:cNvSpPr>
-          <p:nvPr>
-            <p:ph idx="1"/>
-          </p:nvPr>
-        </p:nvSpPr>
-        <p:spPr>
-          <a:xfrm>
-            <a:off x="838200" y="1825624"/>
-            <a:ext cx="10515600" cy="4589923"/>
-          </a:xfrm>
-        </p:spPr>
-        <p:txBody>
-          <a:bodyPr>
-            <a:normAutofit/>
-          </a:bodyPr>
-          <a:lstStyle/>
-          <a:p>
-            <a:endParaRPr lang="en-US" dirty="0" smtClean="0"/>
-          </a:p>
-          <a:p>
-            <a:endParaRPr lang="en-US" dirty="0" smtClean="0"/>
-          </a:p>
-          <a:p>
-            <a:endParaRPr lang="en-US" dirty="0"/>
-          </a:p>
-        </p:txBody>
-      </p:sp>
-      <p:pic>
-        <p:nvPicPr>
-          <p:cNvPr id="5" name="Picture 4"/>
-          <p:cNvPicPr>
-            <a:picLocks noChangeAspect="1"/>
-          </p:cNvPicPr>
-          <p:nvPr/>
-        </p:nvPicPr>
-        <p:blipFill>
-          <a:blip r:embed="rId3"/>
-          <a:stretch>
-            <a:fillRect/>
-          </a:stretch>
-        </p:blipFill>
-        <p:spPr>
-          <a:xfrm>
-            <a:off x="838200" y="2135339"/>
-            <a:ext cx="11037660" cy="4280208"/>
-          </a:xfrm>
-          <a:prstGeom prst="rect">
-            <a:avLst/>
-          </a:prstGeom>
-        </p:spPr>
-      </p:pic>
-    </p:spTree>
-    <p:extLst>
-      <p:ext uri="{BB962C8B-B14F-4D97-AF65-F5344CB8AC3E}">
-        <p14:creationId xmlns:p14="http://schemas.microsoft.com/office/powerpoint/2010/main" val="1150970120"/>
-      </p:ext>
-    </p:extLst>
-  </p:cSld>
-  <p:clrMapOvr>
-    <a:masterClrMapping/>
-  </p:clrMapOvr>
-  <p:timing>
-    <p:tnLst>
-      <p:par>
-        <p:cTn id="1" dur="indefinite" restart="never" nodeType="tmRoot"/>
-      </p:par>
-    </p:tnLst>
-  </p:timing>
-</p:sld>
-</file>
-
-<file path=ppt/slides/slide24.xml><?xml version="1.0" encoding="utf-8"?>
-<p:sld xmlns:a="http://schemas.openxmlformats.org/drawingml/2006/main" xmlns:r="http://schemas.openxmlformats.org/officeDocument/2006/relationships" xmlns:p="http://schemas.openxmlformats.org/presentationml/2006/main">
-  <p:cSld>
-    <p:spTree>
-      <p:nvGrpSpPr>
-        <p:cNvPr id="1" name=""/>
-        <p:cNvGrpSpPr/>
-        <p:nvPr/>
-      </p:nvGrpSpPr>
-      <p:grpSpPr>
-        <a:xfrm>
-          <a:off x="0" y="0"/>
-          <a:ext cx="0" cy="0"/>
-          <a:chOff x="0" y="0"/>
-          <a:chExt cx="0" cy="0"/>
-        </a:xfrm>
-      </p:grpSpPr>
-      <p:sp>
-        <p:nvSpPr>
-          <p:cNvPr id="2" name="Title 1"/>
-          <p:cNvSpPr>
-            <a:spLocks noGrp="1"/>
-          </p:cNvSpPr>
-          <p:nvPr>
-            <p:ph type="title"/>
-          </p:nvPr>
-        </p:nvSpPr>
-        <p:spPr/>
-        <p:txBody>
-          <a:bodyPr>
-            <a:normAutofit/>
-          </a:bodyPr>
-          <a:lstStyle/>
-          <a:p>
-            <a:r>
-              <a:rPr lang="en-US" sz="4800" dirty="0" smtClean="0"/>
-              <a:t>Access Control </a:t>
-            </a:r>
-            <a:r>
-              <a:rPr lang="en-US" sz="4800" dirty="0"/>
-              <a:t>- </a:t>
-            </a:r>
-            <a:r>
-              <a:rPr lang="en-US" sz="4800" dirty="0" smtClean="0"/>
-              <a:t>framework</a:t>
-            </a:r>
-            <a:endParaRPr lang="en-US" sz="4800" dirty="0"/>
-          </a:p>
-        </p:txBody>
-      </p:sp>
-      <p:sp>
-        <p:nvSpPr>
-          <p:cNvPr id="3" name="Content Placeholder 2"/>
-          <p:cNvSpPr>
-            <a:spLocks noGrp="1"/>
-          </p:cNvSpPr>
-          <p:nvPr>
-            <p:ph idx="1"/>
-          </p:nvPr>
-        </p:nvSpPr>
-        <p:spPr>
-          <a:xfrm>
-            <a:off x="838200" y="1825624"/>
-            <a:ext cx="10515600" cy="4589923"/>
-          </a:xfrm>
-        </p:spPr>
-        <p:txBody>
-          <a:bodyPr>
-            <a:normAutofit/>
-          </a:bodyPr>
-          <a:lstStyle/>
-          <a:p>
-            <a:endParaRPr lang="en-US" dirty="0" smtClean="0"/>
-          </a:p>
-          <a:p>
-            <a:endParaRPr lang="en-US" dirty="0" smtClean="0"/>
-          </a:p>
-          <a:p>
-            <a:endParaRPr lang="en-US" dirty="0"/>
-          </a:p>
-        </p:txBody>
-      </p:sp>
-      <p:pic>
-        <p:nvPicPr>
-          <p:cNvPr id="4" name="Picture 3"/>
-          <p:cNvPicPr>
-            <a:picLocks noChangeAspect="1"/>
-          </p:cNvPicPr>
-          <p:nvPr/>
-        </p:nvPicPr>
-        <p:blipFill>
-          <a:blip r:embed="rId3"/>
-          <a:stretch>
-            <a:fillRect/>
-          </a:stretch>
-        </p:blipFill>
-        <p:spPr>
-          <a:xfrm>
-            <a:off x="838200" y="2607646"/>
-            <a:ext cx="10628393" cy="3025877"/>
-          </a:xfrm>
-          <a:prstGeom prst="rect">
-            <a:avLst/>
-          </a:prstGeom>
-        </p:spPr>
-      </p:pic>
-    </p:spTree>
-    <p:extLst>
-      <p:ext uri="{BB962C8B-B14F-4D97-AF65-F5344CB8AC3E}">
-        <p14:creationId xmlns:p14="http://schemas.microsoft.com/office/powerpoint/2010/main" val="2515974239"/>
-      </p:ext>
-    </p:extLst>
-  </p:cSld>
-  <p:clrMapOvr>
-    <a:masterClrMapping/>
-  </p:clrMapOvr>
-  <p:timing>
-    <p:tnLst>
-      <p:par>
-        <p:cTn id="1" dur="indefinite" restart="never" nodeType="tmRoot"/>
-      </p:par>
-    </p:tnLst>
-  </p:timing>
-</p:sld>
-</file>
-
-<file path=ppt/slides/slide25.xml><?xml version="1.0" encoding="utf-8"?>
 <p:sld xmlns:a="http://schemas.openxmlformats.org/drawingml/2006/main" xmlns:r="http://schemas.openxmlformats.org/officeDocument/2006/relationships" xmlns:p="http://schemas.openxmlformats.org/presentationml/2006/main">
   <p:cSld>
     <p:spTree>
@@ -7950,7 +8824,277 @@
     </p:spTree>
     <p:extLst>
       <p:ext uri="{BB962C8B-B14F-4D97-AF65-F5344CB8AC3E}">
-        <p14:creationId xmlns:p14="http://schemas.microsoft.com/office/powerpoint/2010/main" val="4124003797"/>
+        <p14:creationId xmlns:p14="http://schemas.microsoft.com/office/powerpoint/2010/main" val="3193687172"/>
+      </p:ext>
+    </p:extLst>
+  </p:cSld>
+  <p:clrMapOvr>
+    <a:masterClrMapping/>
+  </p:clrMapOvr>
+  <p:timing>
+    <p:tnLst>
+      <p:par>
+        <p:cTn id="1" dur="indefinite" restart="never" nodeType="tmRoot"/>
+      </p:par>
+    </p:tnLst>
+  </p:timing>
+</p:sld>
+</file>
+
+<file path=ppt/slides/slide24.xml><?xml version="1.0" encoding="utf-8"?>
+<p:sld xmlns:a="http://schemas.openxmlformats.org/drawingml/2006/main" xmlns:r="http://schemas.openxmlformats.org/officeDocument/2006/relationships" xmlns:p="http://schemas.openxmlformats.org/presentationml/2006/main">
+  <p:cSld>
+    <p:spTree>
+      <p:nvGrpSpPr>
+        <p:cNvPr id="1" name=""/>
+        <p:cNvGrpSpPr/>
+        <p:nvPr/>
+      </p:nvGrpSpPr>
+      <p:grpSpPr>
+        <a:xfrm>
+          <a:off x="0" y="0"/>
+          <a:ext cx="0" cy="0"/>
+          <a:chOff x="0" y="0"/>
+          <a:chExt cx="0" cy="0"/>
+        </a:xfrm>
+      </p:grpSpPr>
+      <p:sp>
+        <p:nvSpPr>
+          <p:cNvPr id="2" name="Title 1"/>
+          <p:cNvSpPr>
+            <a:spLocks noGrp="1"/>
+          </p:cNvSpPr>
+          <p:nvPr>
+            <p:ph type="title"/>
+          </p:nvPr>
+        </p:nvSpPr>
+        <p:spPr>
+          <a:xfrm>
+            <a:off x="838200" y="365125"/>
+            <a:ext cx="10960510" cy="1325563"/>
+          </a:xfrm>
+        </p:spPr>
+        <p:txBody>
+          <a:bodyPr>
+            <a:normAutofit/>
+          </a:bodyPr>
+          <a:lstStyle/>
+          <a:p>
+            <a:r>
+              <a:rPr lang="en-US" sz="4800" dirty="0" smtClean="0"/>
+              <a:t>CSRF Defense - framework</a:t>
+            </a:r>
+            <a:endParaRPr lang="en-US" sz="4800" dirty="0"/>
+          </a:p>
+        </p:txBody>
+      </p:sp>
+      <p:sp>
+        <p:nvSpPr>
+          <p:cNvPr id="3" name="Content Placeholder 2"/>
+          <p:cNvSpPr>
+            <a:spLocks noGrp="1"/>
+          </p:cNvSpPr>
+          <p:nvPr>
+            <p:ph idx="1"/>
+          </p:nvPr>
+        </p:nvSpPr>
+        <p:spPr>
+          <a:xfrm>
+            <a:off x="838200" y="1825624"/>
+            <a:ext cx="10515600" cy="4899641"/>
+          </a:xfrm>
+        </p:spPr>
+        <p:txBody>
+          <a:bodyPr>
+            <a:normAutofit/>
+          </a:bodyPr>
+          <a:lstStyle/>
+          <a:p>
+            <a:pPr marL="0" indent="0">
+              <a:buNone/>
+            </a:pPr>
+            <a:endParaRPr lang="en-US" sz="4000" dirty="0"/>
+          </a:p>
+          <a:p>
+            <a:endParaRPr lang="en-US" sz="4000" dirty="0" smtClean="0"/>
+          </a:p>
+          <a:p>
+            <a:endParaRPr lang="en-US" sz="4000" dirty="0" smtClean="0"/>
+          </a:p>
+          <a:p>
+            <a:endParaRPr lang="en-US" dirty="0" smtClean="0"/>
+          </a:p>
+          <a:p>
+            <a:endParaRPr lang="en-US" dirty="0" smtClean="0"/>
+          </a:p>
+          <a:p>
+            <a:endParaRPr lang="en-US" dirty="0"/>
+          </a:p>
+        </p:txBody>
+      </p:sp>
+      <p:pic>
+        <p:nvPicPr>
+          <p:cNvPr id="5" name="Picture 4"/>
+          <p:cNvPicPr>
+            <a:picLocks noChangeAspect="1"/>
+          </p:cNvPicPr>
+          <p:nvPr/>
+        </p:nvPicPr>
+        <p:blipFill>
+          <a:blip r:embed="rId3"/>
+          <a:stretch>
+            <a:fillRect/>
+          </a:stretch>
+        </p:blipFill>
+        <p:spPr>
+          <a:xfrm>
+            <a:off x="838200" y="2849972"/>
+            <a:ext cx="8481011" cy="1899009"/>
+          </a:xfrm>
+          <a:prstGeom prst="rect">
+            <a:avLst/>
+          </a:prstGeom>
+        </p:spPr>
+      </p:pic>
+    </p:spTree>
+    <p:extLst>
+      <p:ext uri="{BB962C8B-B14F-4D97-AF65-F5344CB8AC3E}">
+        <p14:creationId xmlns:p14="http://schemas.microsoft.com/office/powerpoint/2010/main" val="3563268453"/>
+      </p:ext>
+    </p:extLst>
+  </p:cSld>
+  <p:clrMapOvr>
+    <a:masterClrMapping/>
+  </p:clrMapOvr>
+  <p:timing>
+    <p:tnLst>
+      <p:par>
+        <p:cTn id="1" dur="indefinite" restart="never" nodeType="tmRoot"/>
+      </p:par>
+    </p:tnLst>
+  </p:timing>
+</p:sld>
+</file>
+
+<file path=ppt/slides/slide25.xml><?xml version="1.0" encoding="utf-8"?>
+<p:sld xmlns:a="http://schemas.openxmlformats.org/drawingml/2006/main" xmlns:r="http://schemas.openxmlformats.org/officeDocument/2006/relationships" xmlns:p="http://schemas.openxmlformats.org/presentationml/2006/main">
+  <p:cSld>
+    <p:spTree>
+      <p:nvGrpSpPr>
+        <p:cNvPr id="1" name=""/>
+        <p:cNvGrpSpPr/>
+        <p:nvPr/>
+      </p:nvGrpSpPr>
+      <p:grpSpPr>
+        <a:xfrm>
+          <a:off x="0" y="0"/>
+          <a:ext cx="0" cy="0"/>
+          <a:chOff x="0" y="0"/>
+          <a:chExt cx="0" cy="0"/>
+        </a:xfrm>
+      </p:grpSpPr>
+      <p:sp>
+        <p:nvSpPr>
+          <p:cNvPr id="2" name="Title 1"/>
+          <p:cNvSpPr>
+            <a:spLocks noGrp="1"/>
+          </p:cNvSpPr>
+          <p:nvPr>
+            <p:ph type="title"/>
+          </p:nvPr>
+        </p:nvSpPr>
+        <p:spPr>
+          <a:xfrm>
+            <a:off x="838200" y="365125"/>
+            <a:ext cx="10960510" cy="1325563"/>
+          </a:xfrm>
+        </p:spPr>
+        <p:txBody>
+          <a:bodyPr>
+            <a:normAutofit/>
+          </a:bodyPr>
+          <a:lstStyle/>
+          <a:p>
+            <a:r>
+              <a:rPr lang="en-US" sz="4800" dirty="0" smtClean="0"/>
+              <a:t>CSRF Defense - framework</a:t>
+            </a:r>
+            <a:endParaRPr lang="en-US" sz="4800" dirty="0"/>
+          </a:p>
+        </p:txBody>
+      </p:sp>
+      <p:sp>
+        <p:nvSpPr>
+          <p:cNvPr id="3" name="Content Placeholder 2"/>
+          <p:cNvSpPr>
+            <a:spLocks noGrp="1"/>
+          </p:cNvSpPr>
+          <p:nvPr>
+            <p:ph idx="1"/>
+          </p:nvPr>
+        </p:nvSpPr>
+        <p:spPr>
+          <a:xfrm>
+            <a:off x="838200" y="1825624"/>
+            <a:ext cx="10515600" cy="4899641"/>
+          </a:xfrm>
+        </p:spPr>
+        <p:txBody>
+          <a:bodyPr>
+            <a:normAutofit/>
+          </a:bodyPr>
+          <a:lstStyle/>
+          <a:p>
+            <a:endParaRPr lang="en-US" sz="4000" dirty="0" smtClean="0"/>
+          </a:p>
+          <a:p>
+            <a:endParaRPr lang="en-US" sz="4000" dirty="0"/>
+          </a:p>
+          <a:p>
+            <a:endParaRPr lang="en-US" sz="4000" dirty="0" smtClean="0"/>
+          </a:p>
+          <a:p>
+            <a:endParaRPr lang="en-US" sz="4000" dirty="0" smtClean="0"/>
+          </a:p>
+          <a:p>
+            <a:endParaRPr lang="en-US" dirty="0" smtClean="0"/>
+          </a:p>
+          <a:p>
+            <a:endParaRPr lang="en-US" dirty="0" smtClean="0"/>
+          </a:p>
+          <a:p>
+            <a:endParaRPr lang="en-US" dirty="0"/>
+          </a:p>
+        </p:txBody>
+      </p:sp>
+      <p:pic>
+        <p:nvPicPr>
+          <p:cNvPr id="6" name="Picture 5"/>
+          <p:cNvPicPr>
+            <a:picLocks noChangeAspect="1"/>
+          </p:cNvPicPr>
+          <p:nvPr/>
+        </p:nvPicPr>
+        <p:blipFill>
+          <a:blip r:embed="rId3"/>
+          <a:stretch>
+            <a:fillRect/>
+          </a:stretch>
+        </p:blipFill>
+        <p:spPr>
+          <a:xfrm>
+            <a:off x="145024" y="1941411"/>
+            <a:ext cx="11918630" cy="4783854"/>
+          </a:xfrm>
+          <a:prstGeom prst="rect">
+            <a:avLst/>
+          </a:prstGeom>
+        </p:spPr>
+      </p:pic>
+    </p:spTree>
+    <p:extLst>
+      <p:ext uri="{BB962C8B-B14F-4D97-AF65-F5344CB8AC3E}">
+        <p14:creationId xmlns:p14="http://schemas.microsoft.com/office/powerpoint/2010/main" val="3582975040"/>
       </p:ext>
     </p:extLst>
   </p:cSld>
@@ -7968,6 +9112,141 @@
 </file>
 
 <file path=ppt/slides/slide26.xml><?xml version="1.0" encoding="utf-8"?>
+<p:sld xmlns:a="http://schemas.openxmlformats.org/drawingml/2006/main" xmlns:r="http://schemas.openxmlformats.org/officeDocument/2006/relationships" xmlns:p="http://schemas.openxmlformats.org/presentationml/2006/main">
+  <p:cSld>
+    <p:spTree>
+      <p:nvGrpSpPr>
+        <p:cNvPr id="1" name=""/>
+        <p:cNvGrpSpPr/>
+        <p:nvPr/>
+      </p:nvGrpSpPr>
+      <p:grpSpPr>
+        <a:xfrm>
+          <a:off x="0" y="0"/>
+          <a:ext cx="0" cy="0"/>
+          <a:chOff x="0" y="0"/>
+          <a:chExt cx="0" cy="0"/>
+        </a:xfrm>
+      </p:grpSpPr>
+      <p:sp>
+        <p:nvSpPr>
+          <p:cNvPr id="2" name="Title 1"/>
+          <p:cNvSpPr>
+            <a:spLocks noGrp="1"/>
+          </p:cNvSpPr>
+          <p:nvPr>
+            <p:ph type="title"/>
+          </p:nvPr>
+        </p:nvSpPr>
+        <p:spPr>
+          <a:xfrm>
+            <a:off x="838200" y="365125"/>
+            <a:ext cx="10960510" cy="1325563"/>
+          </a:xfrm>
+        </p:spPr>
+        <p:txBody>
+          <a:bodyPr>
+            <a:normAutofit/>
+          </a:bodyPr>
+          <a:lstStyle/>
+          <a:p>
+            <a:r>
+              <a:rPr lang="en-US" sz="4800" dirty="0" smtClean="0"/>
+              <a:t>CSRF Defense - framework</a:t>
+            </a:r>
+            <a:endParaRPr lang="en-US" sz="4800" dirty="0"/>
+          </a:p>
+        </p:txBody>
+      </p:sp>
+      <p:sp>
+        <p:nvSpPr>
+          <p:cNvPr id="3" name="Content Placeholder 2"/>
+          <p:cNvSpPr>
+            <a:spLocks noGrp="1"/>
+          </p:cNvSpPr>
+          <p:nvPr>
+            <p:ph idx="1"/>
+          </p:nvPr>
+        </p:nvSpPr>
+        <p:spPr>
+          <a:xfrm>
+            <a:off x="838200" y="1825624"/>
+            <a:ext cx="10515600" cy="4899641"/>
+          </a:xfrm>
+        </p:spPr>
+        <p:txBody>
+          <a:bodyPr>
+            <a:normAutofit/>
+          </a:bodyPr>
+          <a:lstStyle/>
+          <a:p>
+            <a:endParaRPr lang="en-US" sz="4000" dirty="0" smtClean="0"/>
+          </a:p>
+          <a:p>
+            <a:endParaRPr lang="en-US" sz="4000" dirty="0"/>
+          </a:p>
+          <a:p>
+            <a:endParaRPr lang="en-US" sz="4000" dirty="0" smtClean="0"/>
+          </a:p>
+          <a:p>
+            <a:endParaRPr lang="en-US" sz="4000" dirty="0" smtClean="0"/>
+          </a:p>
+          <a:p>
+            <a:endParaRPr lang="en-US" dirty="0" smtClean="0"/>
+          </a:p>
+          <a:p>
+            <a:endParaRPr lang="en-US" dirty="0" smtClean="0"/>
+          </a:p>
+          <a:p>
+            <a:endParaRPr lang="en-US" dirty="0"/>
+          </a:p>
+        </p:txBody>
+      </p:sp>
+      <p:pic>
+        <p:nvPicPr>
+          <p:cNvPr id="5" name="Picture 4"/>
+          <p:cNvPicPr>
+            <a:picLocks noChangeAspect="1"/>
+          </p:cNvPicPr>
+          <p:nvPr/>
+        </p:nvPicPr>
+        <p:blipFill>
+          <a:blip r:embed="rId3"/>
+          <a:stretch>
+            <a:fillRect/>
+          </a:stretch>
+        </p:blipFill>
+        <p:spPr>
+          <a:xfrm>
+            <a:off x="245417" y="2238493"/>
+            <a:ext cx="11946824" cy="4029571"/>
+          </a:xfrm>
+          <a:prstGeom prst="rect">
+            <a:avLst/>
+          </a:prstGeom>
+        </p:spPr>
+      </p:pic>
+    </p:spTree>
+    <p:extLst>
+      <p:ext uri="{BB962C8B-B14F-4D97-AF65-F5344CB8AC3E}">
+        <p14:creationId xmlns:p14="http://schemas.microsoft.com/office/powerpoint/2010/main" val="2788254195"/>
+      </p:ext>
+    </p:extLst>
+  </p:cSld>
+  <p:clrMapOvr>
+    <a:masterClrMapping/>
+  </p:clrMapOvr>
+  <p:timing>
+    <p:tnLst>
+      <p:par>
+        <p:cTn id="1" dur="indefinite" restart="never" nodeType="tmRoot"/>
+      </p:par>
+    </p:tnLst>
+  </p:timing>
+</p:sld>
+</file>
+
+<file path=ppt/slides/slide27.xml><?xml version="1.0" encoding="utf-8"?>
 <p:sld xmlns:a="http://schemas.openxmlformats.org/drawingml/2006/main" xmlns:r="http://schemas.openxmlformats.org/officeDocument/2006/relationships" xmlns:p="http://schemas.openxmlformats.org/presentationml/2006/main">
   <p:cSld>
     <p:spTree>
@@ -8100,7 +9379,7 @@
     </p:spTree>
     <p:extLst>
       <p:ext uri="{BB962C8B-B14F-4D97-AF65-F5344CB8AC3E}">
-        <p14:creationId xmlns:p14="http://schemas.microsoft.com/office/powerpoint/2010/main" val="1913698806"/>
+        <p14:creationId xmlns:p14="http://schemas.microsoft.com/office/powerpoint/2010/main" val="4022463779"/>
       </p:ext>
     </p:extLst>
   </p:cSld>
@@ -8117,7 +9396,7 @@
 </p:sld>
 </file>
 
-<file path=ppt/slides/slide27.xml><?xml version="1.0" encoding="utf-8"?>
+<file path=ppt/slides/slide28.xml><?xml version="1.0" encoding="utf-8"?>
 <p:sld xmlns:a="http://schemas.openxmlformats.org/drawingml/2006/main" xmlns:r="http://schemas.openxmlformats.org/officeDocument/2006/relationships" xmlns:p="http://schemas.openxmlformats.org/presentationml/2006/main">
   <p:cSld>
     <p:spTree>
@@ -8144,42 +9423,7 @@
             <p:ph type="title"/>
           </p:nvPr>
         </p:nvSpPr>
-        <p:spPr>
-          <a:xfrm>
-            <a:off x="838200" y="365125"/>
-            <a:ext cx="10886768" cy="1325563"/>
-          </a:xfrm>
-        </p:spPr>
-        <p:txBody>
-          <a:bodyPr>
-            <a:noAutofit/>
-          </a:bodyPr>
-          <a:lstStyle/>
-          <a:p>
-            <a:r>
-              <a:rPr lang="en-US" sz="4800" dirty="0" smtClean="0"/>
-              <a:t>Closing slide</a:t>
-            </a:r>
-            <a:endParaRPr lang="en-US" sz="4800" dirty="0"/>
-          </a:p>
-        </p:txBody>
-      </p:sp>
-      <p:sp>
-        <p:nvSpPr>
-          <p:cNvPr id="3" name="Content Placeholder 2"/>
-          <p:cNvSpPr>
-            <a:spLocks noGrp="1"/>
-          </p:cNvSpPr>
-          <p:nvPr>
-            <p:ph idx="1"/>
-          </p:nvPr>
-        </p:nvSpPr>
-        <p:spPr>
-          <a:xfrm>
-            <a:off x="838200" y="1825625"/>
-            <a:ext cx="11137490" cy="4899640"/>
-          </a:xfrm>
-        </p:spPr>
+        <p:spPr/>
         <p:txBody>
           <a:bodyPr>
             <a:normAutofit/>
@@ -8187,102 +9431,78 @@
           <a:lstStyle/>
           <a:p>
             <a:r>
-              <a:rPr lang="en-US" sz="4000" dirty="0" smtClean="0"/>
-              <a:t>The knowledge gets dropped here</a:t>
-            </a:r>
-          </a:p>
-          <a:p>
-            <a:pPr marL="0" indent="0">
-              <a:buNone/>
-            </a:pPr>
-            <a:endParaRPr lang="en-US" sz="3200" dirty="0" smtClean="0">
-              <a:hlinkClick r:id="rId3"/>
-            </a:endParaRPr>
-          </a:p>
-          <a:p>
-            <a:pPr marL="0" indent="0">
-              <a:buNone/>
-            </a:pPr>
-            <a:r>
-              <a:rPr lang="en-US" sz="3600" dirty="0" smtClean="0">
-                <a:hlinkClick r:id="rId3"/>
-              </a:rPr>
-              <a:t>github.com/</a:t>
-            </a:r>
-            <a:r>
-              <a:rPr lang="en-US" sz="3600" dirty="0" err="1" smtClean="0">
-                <a:hlinkClick r:id="rId3"/>
-              </a:rPr>
-              <a:t>spetryjohnson</a:t>
-            </a:r>
-            <a:r>
-              <a:rPr lang="en-US" sz="3600" dirty="0" smtClean="0"/>
-              <a:t> </a:t>
-            </a:r>
-            <a:r>
-              <a:rPr lang="en-US" sz="3600" dirty="0" smtClean="0">
+              <a:rPr lang="en-US" sz="4800" dirty="0" smtClean="0"/>
+              <a:t>Patented step-by-step slide</a:t>
+            </a:r>
+            <a:endParaRPr lang="en-US" sz="4800" dirty="0"/>
+          </a:p>
+        </p:txBody>
+      </p:sp>
+      <p:sp>
+        <p:nvSpPr>
+          <p:cNvPr id="3" name="Content Placeholder 2"/>
+          <p:cNvSpPr>
+            <a:spLocks noGrp="1"/>
+          </p:cNvSpPr>
+          <p:nvPr>
+            <p:ph idx="1"/>
+          </p:nvPr>
+        </p:nvSpPr>
+        <p:spPr>
+          <a:xfrm>
+            <a:off x="838200" y="1825624"/>
+            <a:ext cx="10515600" cy="4589923"/>
+          </a:xfrm>
+        </p:spPr>
+        <p:txBody>
+          <a:bodyPr>
+            <a:normAutofit/>
+          </a:bodyPr>
+          <a:lstStyle/>
+          <a:p>
+            <a:r>
+              <a:rPr lang="en-US" sz="4000" dirty="0" smtClean="0">
                 <a:solidFill>
                   <a:schemeClr val="bg1">
-                    <a:lumMod val="50000"/>
+                    <a:lumMod val="65000"/>
                   </a:schemeClr>
                 </a:solidFill>
               </a:rPr>
-              <a:t>|</a:t>
-            </a:r>
-            <a:r>
-              <a:rPr lang="en-US" sz="3600" dirty="0" smtClean="0"/>
-              <a:t> </a:t>
-            </a:r>
-            <a:r>
-              <a:rPr lang="en-US" sz="3600" dirty="0" smtClean="0">
-                <a:hlinkClick r:id="rId4"/>
+              <a:t>Old news</a:t>
+            </a:r>
+            <a:br>
+              <a:rPr lang="en-US" sz="4000" dirty="0" smtClean="0">
+                <a:solidFill>
+                  <a:schemeClr val="bg1">
+                    <a:lumMod val="65000"/>
+                  </a:schemeClr>
+                </a:solidFill>
               </a:rPr>
-              <a:t>www.petry-johnson.com</a:t>
-            </a:r>
-            <a:r>
-              <a:rPr lang="en-US" sz="3600" dirty="0" smtClean="0"/>
-              <a:t/>
-            </a:r>
-            <a:br>
-              <a:rPr lang="en-US" sz="3600" dirty="0" smtClean="0"/>
             </a:br>
-            <a:endParaRPr lang="en-US" sz="3600" dirty="0"/>
-          </a:p>
-          <a:p>
-            <a:pPr marL="0" indent="0" algn="ctr">
-              <a:buNone/>
-            </a:pPr>
-            <a:r>
-              <a:rPr lang="en-US" sz="3600" b="1" dirty="0" smtClean="0"/>
-              <a:t>@</a:t>
-            </a:r>
-            <a:r>
-              <a:rPr lang="en-US" sz="3600" b="1" dirty="0" err="1" smtClean="0"/>
-              <a:t>spetryjohnson</a:t>
-            </a:r>
-            <a:endParaRPr lang="en-US" b="1" dirty="0" smtClean="0"/>
+            <a:endParaRPr lang="en-US" sz="4000" dirty="0" smtClean="0">
+              <a:solidFill>
+                <a:schemeClr val="bg1">
+                  <a:lumMod val="65000"/>
+                </a:schemeClr>
+              </a:solidFill>
+            </a:endParaRPr>
+          </a:p>
+          <a:p>
+            <a:r>
+              <a:rPr lang="en-US" sz="4000" b="1" dirty="0" smtClean="0"/>
+              <a:t>New hotness</a:t>
+            </a:r>
+          </a:p>
+          <a:p>
+            <a:endParaRPr lang="en-US" sz="4000" dirty="0" smtClean="0"/>
           </a:p>
           <a:p>
             <a:endParaRPr lang="en-US" dirty="0" smtClean="0"/>
           </a:p>
           <a:p>
-            <a:pPr lvl="1"/>
             <a:endParaRPr lang="en-US" dirty="0" smtClean="0"/>
           </a:p>
           <a:p>
-            <a:pPr lvl="1"/>
-            <a:endParaRPr lang="en-US" dirty="0" smtClean="0"/>
-          </a:p>
-          <a:p>
-            <a:pPr lvl="1"/>
-            <a:endParaRPr lang="en-US" dirty="0"/>
-          </a:p>
-          <a:p>
-            <a:pPr lvl="1"/>
-            <a:endParaRPr lang="en-US" dirty="0" smtClean="0"/>
-          </a:p>
-          <a:p>
-            <a:pPr lvl="1"/>
             <a:endParaRPr lang="en-US" dirty="0"/>
           </a:p>
         </p:txBody>
@@ -8290,7 +9510,104 @@
     </p:spTree>
     <p:extLst>
       <p:ext uri="{BB962C8B-B14F-4D97-AF65-F5344CB8AC3E}">
-        <p14:creationId xmlns:p14="http://schemas.microsoft.com/office/powerpoint/2010/main" val="659085787"/>
+        <p14:creationId xmlns:p14="http://schemas.microsoft.com/office/powerpoint/2010/main" val="1887088746"/>
+      </p:ext>
+    </p:extLst>
+  </p:cSld>
+  <p:clrMapOvr>
+    <a:masterClrMapping/>
+  </p:clrMapOvr>
+  <p:timing>
+    <p:tnLst>
+      <p:par>
+        <p:cTn id="1" dur="indefinite" restart="never" nodeType="tmRoot"/>
+      </p:par>
+    </p:tnLst>
+  </p:timing>
+</p:sld>
+</file>
+
+<file path=ppt/slides/slide29.xml><?xml version="1.0" encoding="utf-8"?>
+<p:sld xmlns:a="http://schemas.openxmlformats.org/drawingml/2006/main" xmlns:r="http://schemas.openxmlformats.org/officeDocument/2006/relationships" xmlns:p="http://schemas.openxmlformats.org/presentationml/2006/main">
+  <p:cSld>
+    <p:spTree>
+      <p:nvGrpSpPr>
+        <p:cNvPr id="1" name=""/>
+        <p:cNvGrpSpPr/>
+        <p:nvPr/>
+      </p:nvGrpSpPr>
+      <p:grpSpPr>
+        <a:xfrm>
+          <a:off x="0" y="0"/>
+          <a:ext cx="0" cy="0"/>
+          <a:chOff x="0" y="0"/>
+          <a:chExt cx="0" cy="0"/>
+        </a:xfrm>
+      </p:grpSpPr>
+      <p:sp>
+        <p:nvSpPr>
+          <p:cNvPr id="2" name="Title 1"/>
+          <p:cNvSpPr>
+            <a:spLocks noGrp="1"/>
+          </p:cNvSpPr>
+          <p:nvPr>
+            <p:ph type="title"/>
+          </p:nvPr>
+        </p:nvSpPr>
+        <p:spPr/>
+        <p:txBody>
+          <a:bodyPr>
+            <a:normAutofit/>
+          </a:bodyPr>
+          <a:lstStyle/>
+          <a:p>
+            <a:r>
+              <a:rPr lang="en-US" sz="4800" dirty="0" smtClean="0"/>
+              <a:t>Canonical example: SQL Injection</a:t>
+            </a:r>
+            <a:endParaRPr lang="en-US" sz="4800" dirty="0"/>
+          </a:p>
+        </p:txBody>
+      </p:sp>
+      <p:sp>
+        <p:nvSpPr>
+          <p:cNvPr id="3" name="Content Placeholder 2"/>
+          <p:cNvSpPr>
+            <a:spLocks noGrp="1"/>
+          </p:cNvSpPr>
+          <p:nvPr>
+            <p:ph idx="1"/>
+          </p:nvPr>
+        </p:nvSpPr>
+        <p:spPr>
+          <a:xfrm>
+            <a:off x="838200" y="1825624"/>
+            <a:ext cx="10515600" cy="4589923"/>
+          </a:xfrm>
+        </p:spPr>
+        <p:txBody>
+          <a:bodyPr>
+            <a:normAutofit/>
+          </a:bodyPr>
+          <a:lstStyle/>
+          <a:p>
+            <a:endParaRPr lang="en-US" sz="4000" dirty="0" smtClean="0"/>
+          </a:p>
+          <a:p>
+            <a:endParaRPr lang="en-US" dirty="0" smtClean="0"/>
+          </a:p>
+          <a:p>
+            <a:endParaRPr lang="en-US" dirty="0" smtClean="0"/>
+          </a:p>
+          <a:p>
+            <a:endParaRPr lang="en-US" dirty="0"/>
+          </a:p>
+        </p:txBody>
+      </p:sp>
+    </p:spTree>
+    <p:extLst>
+      <p:ext uri="{BB962C8B-B14F-4D97-AF65-F5344CB8AC3E}">
+        <p14:creationId xmlns:p14="http://schemas.microsoft.com/office/powerpoint/2010/main" val="1766242099"/>
       </p:ext>
     </p:extLst>
   </p:cSld>
@@ -8380,6 +9697,1025 @@
     <p:extLst>
       <p:ext uri="{BB962C8B-B14F-4D97-AF65-F5344CB8AC3E}">
         <p14:creationId xmlns:p14="http://schemas.microsoft.com/office/powerpoint/2010/main" val="75936766"/>
+      </p:ext>
+    </p:extLst>
+  </p:cSld>
+  <p:clrMapOvr>
+    <a:masterClrMapping/>
+  </p:clrMapOvr>
+  <p:timing>
+    <p:tnLst>
+      <p:par>
+        <p:cTn id="1" dur="indefinite" restart="never" nodeType="tmRoot"/>
+      </p:par>
+    </p:tnLst>
+  </p:timing>
+</p:sld>
+</file>
+
+<file path=ppt/slides/slide30.xml><?xml version="1.0" encoding="utf-8"?>
+<p:sld xmlns:a="http://schemas.openxmlformats.org/drawingml/2006/main" xmlns:r="http://schemas.openxmlformats.org/officeDocument/2006/relationships" xmlns:p="http://schemas.openxmlformats.org/presentationml/2006/main">
+  <p:cSld>
+    <p:spTree>
+      <p:nvGrpSpPr>
+        <p:cNvPr id="1" name=""/>
+        <p:cNvGrpSpPr/>
+        <p:nvPr/>
+      </p:nvGrpSpPr>
+      <p:grpSpPr>
+        <a:xfrm>
+          <a:off x="0" y="0"/>
+          <a:ext cx="0" cy="0"/>
+          <a:chOff x="0" y="0"/>
+          <a:chExt cx="0" cy="0"/>
+        </a:xfrm>
+      </p:grpSpPr>
+      <p:sp>
+        <p:nvSpPr>
+          <p:cNvPr id="2" name="Title 1"/>
+          <p:cNvSpPr>
+            <a:spLocks noGrp="1"/>
+          </p:cNvSpPr>
+          <p:nvPr>
+            <p:ph type="title"/>
+          </p:nvPr>
+        </p:nvSpPr>
+        <p:spPr/>
+        <p:txBody>
+          <a:bodyPr>
+            <a:normAutofit/>
+          </a:bodyPr>
+          <a:lstStyle/>
+          <a:p>
+            <a:r>
+              <a:rPr lang="en-US" sz="4800" dirty="0" smtClean="0"/>
+              <a:t>Authorization - feature</a:t>
+            </a:r>
+            <a:endParaRPr lang="en-US" sz="4800" dirty="0"/>
+          </a:p>
+        </p:txBody>
+      </p:sp>
+      <p:sp>
+        <p:nvSpPr>
+          <p:cNvPr id="3" name="Content Placeholder 2"/>
+          <p:cNvSpPr>
+            <a:spLocks noGrp="1"/>
+          </p:cNvSpPr>
+          <p:nvPr>
+            <p:ph idx="1"/>
+          </p:nvPr>
+        </p:nvSpPr>
+        <p:spPr>
+          <a:xfrm>
+            <a:off x="838200" y="1825624"/>
+            <a:ext cx="10515600" cy="4589923"/>
+          </a:xfrm>
+        </p:spPr>
+        <p:txBody>
+          <a:bodyPr>
+            <a:normAutofit/>
+          </a:bodyPr>
+          <a:lstStyle/>
+          <a:p>
+            <a:endParaRPr lang="en-US" sz="4000" dirty="0" smtClean="0"/>
+          </a:p>
+          <a:p>
+            <a:endParaRPr lang="en-US" dirty="0" smtClean="0"/>
+          </a:p>
+          <a:p>
+            <a:endParaRPr lang="en-US" dirty="0" smtClean="0"/>
+          </a:p>
+          <a:p>
+            <a:endParaRPr lang="en-US" dirty="0"/>
+          </a:p>
+        </p:txBody>
+      </p:sp>
+      <p:pic>
+        <p:nvPicPr>
+          <p:cNvPr id="5" name="Picture 4"/>
+          <p:cNvPicPr>
+            <a:picLocks noChangeAspect="1"/>
+          </p:cNvPicPr>
+          <p:nvPr/>
+        </p:nvPicPr>
+        <p:blipFill>
+          <a:blip r:embed="rId3"/>
+          <a:stretch>
+            <a:fillRect/>
+          </a:stretch>
+        </p:blipFill>
+        <p:spPr>
+          <a:xfrm>
+            <a:off x="838200" y="2946501"/>
+            <a:ext cx="10431478" cy="2554647"/>
+          </a:xfrm>
+          <a:prstGeom prst="rect">
+            <a:avLst/>
+          </a:prstGeom>
+        </p:spPr>
+      </p:pic>
+    </p:spTree>
+    <p:extLst>
+      <p:ext uri="{BB962C8B-B14F-4D97-AF65-F5344CB8AC3E}">
+        <p14:creationId xmlns:p14="http://schemas.microsoft.com/office/powerpoint/2010/main" val="176538875"/>
+      </p:ext>
+    </p:extLst>
+  </p:cSld>
+  <p:clrMapOvr>
+    <a:masterClrMapping/>
+  </p:clrMapOvr>
+  <p:timing>
+    <p:tnLst>
+      <p:par>
+        <p:cTn id="1" dur="indefinite" restart="never" nodeType="tmRoot"/>
+      </p:par>
+    </p:tnLst>
+  </p:timing>
+</p:sld>
+</file>
+
+<file path=ppt/slides/slide31.xml><?xml version="1.0" encoding="utf-8"?>
+<p:sld xmlns:a="http://schemas.openxmlformats.org/drawingml/2006/main" xmlns:r="http://schemas.openxmlformats.org/officeDocument/2006/relationships" xmlns:p="http://schemas.openxmlformats.org/presentationml/2006/main">
+  <p:cSld>
+    <p:spTree>
+      <p:nvGrpSpPr>
+        <p:cNvPr id="1" name=""/>
+        <p:cNvGrpSpPr/>
+        <p:nvPr/>
+      </p:nvGrpSpPr>
+      <p:grpSpPr>
+        <a:xfrm>
+          <a:off x="0" y="0"/>
+          <a:ext cx="0" cy="0"/>
+          <a:chOff x="0" y="0"/>
+          <a:chExt cx="0" cy="0"/>
+        </a:xfrm>
+      </p:grpSpPr>
+      <p:sp>
+        <p:nvSpPr>
+          <p:cNvPr id="2" name="Title 1"/>
+          <p:cNvSpPr>
+            <a:spLocks noGrp="1"/>
+          </p:cNvSpPr>
+          <p:nvPr>
+            <p:ph type="title"/>
+          </p:nvPr>
+        </p:nvSpPr>
+        <p:spPr/>
+        <p:txBody>
+          <a:bodyPr>
+            <a:normAutofit/>
+          </a:bodyPr>
+          <a:lstStyle/>
+          <a:p>
+            <a:r>
+              <a:rPr lang="en-US" sz="4800" dirty="0"/>
+              <a:t>Authorization - </a:t>
+            </a:r>
+            <a:r>
+              <a:rPr lang="en-US" sz="4800" dirty="0" smtClean="0"/>
+              <a:t>framework</a:t>
+            </a:r>
+            <a:endParaRPr lang="en-US" sz="4800" dirty="0"/>
+          </a:p>
+        </p:txBody>
+      </p:sp>
+      <p:sp>
+        <p:nvSpPr>
+          <p:cNvPr id="3" name="Content Placeholder 2"/>
+          <p:cNvSpPr>
+            <a:spLocks noGrp="1"/>
+          </p:cNvSpPr>
+          <p:nvPr>
+            <p:ph idx="1"/>
+          </p:nvPr>
+        </p:nvSpPr>
+        <p:spPr>
+          <a:xfrm>
+            <a:off x="838200" y="1825624"/>
+            <a:ext cx="10515600" cy="4589923"/>
+          </a:xfrm>
+        </p:spPr>
+        <p:txBody>
+          <a:bodyPr>
+            <a:normAutofit/>
+          </a:bodyPr>
+          <a:lstStyle/>
+          <a:p>
+            <a:endParaRPr lang="en-US" sz="4000" dirty="0" smtClean="0"/>
+          </a:p>
+          <a:p>
+            <a:endParaRPr lang="en-US" dirty="0" smtClean="0"/>
+          </a:p>
+          <a:p>
+            <a:endParaRPr lang="en-US" dirty="0" smtClean="0"/>
+          </a:p>
+          <a:p>
+            <a:endParaRPr lang="en-US" dirty="0"/>
+          </a:p>
+        </p:txBody>
+      </p:sp>
+      <p:pic>
+        <p:nvPicPr>
+          <p:cNvPr id="5" name="Picture 4"/>
+          <p:cNvPicPr>
+            <a:picLocks noChangeAspect="1"/>
+          </p:cNvPicPr>
+          <p:nvPr/>
+        </p:nvPicPr>
+        <p:blipFill>
+          <a:blip r:embed="rId3"/>
+          <a:stretch>
+            <a:fillRect/>
+          </a:stretch>
+        </p:blipFill>
+        <p:spPr>
+          <a:xfrm>
+            <a:off x="838201" y="2736220"/>
+            <a:ext cx="9677400" cy="1971323"/>
+          </a:xfrm>
+          <a:prstGeom prst="rect">
+            <a:avLst/>
+          </a:prstGeom>
+        </p:spPr>
+      </p:pic>
+    </p:spTree>
+    <p:extLst>
+      <p:ext uri="{BB962C8B-B14F-4D97-AF65-F5344CB8AC3E}">
+        <p14:creationId xmlns:p14="http://schemas.microsoft.com/office/powerpoint/2010/main" val="4046002787"/>
+      </p:ext>
+    </p:extLst>
+  </p:cSld>
+  <p:clrMapOvr>
+    <a:masterClrMapping/>
+  </p:clrMapOvr>
+  <p:timing>
+    <p:tnLst>
+      <p:par>
+        <p:cTn id="1" dur="indefinite" restart="never" nodeType="tmRoot"/>
+      </p:par>
+    </p:tnLst>
+  </p:timing>
+</p:sld>
+</file>
+
+<file path=ppt/slides/slide32.xml><?xml version="1.0" encoding="utf-8"?>
+<p:sld xmlns:a="http://schemas.openxmlformats.org/drawingml/2006/main" xmlns:r="http://schemas.openxmlformats.org/officeDocument/2006/relationships" xmlns:p="http://schemas.openxmlformats.org/presentationml/2006/main">
+  <p:cSld>
+    <p:spTree>
+      <p:nvGrpSpPr>
+        <p:cNvPr id="1" name=""/>
+        <p:cNvGrpSpPr/>
+        <p:nvPr/>
+      </p:nvGrpSpPr>
+      <p:grpSpPr>
+        <a:xfrm>
+          <a:off x="0" y="0"/>
+          <a:ext cx="0" cy="0"/>
+          <a:chOff x="0" y="0"/>
+          <a:chExt cx="0" cy="0"/>
+        </a:xfrm>
+      </p:grpSpPr>
+      <p:sp>
+        <p:nvSpPr>
+          <p:cNvPr id="3" name="Content Placeholder 2"/>
+          <p:cNvSpPr>
+            <a:spLocks noGrp="1"/>
+          </p:cNvSpPr>
+          <p:nvPr>
+            <p:ph idx="1"/>
+          </p:nvPr>
+        </p:nvSpPr>
+        <p:spPr>
+          <a:xfrm>
+            <a:off x="838200" y="1825624"/>
+            <a:ext cx="10515600" cy="4589923"/>
+          </a:xfrm>
+        </p:spPr>
+        <p:txBody>
+          <a:bodyPr>
+            <a:normAutofit/>
+          </a:bodyPr>
+          <a:lstStyle/>
+          <a:p>
+            <a:endParaRPr lang="en-US" sz="4000" dirty="0" smtClean="0"/>
+          </a:p>
+          <a:p>
+            <a:endParaRPr lang="en-US" dirty="0" smtClean="0"/>
+          </a:p>
+          <a:p>
+            <a:endParaRPr lang="en-US" dirty="0" smtClean="0"/>
+          </a:p>
+          <a:p>
+            <a:endParaRPr lang="en-US" dirty="0"/>
+          </a:p>
+        </p:txBody>
+      </p:sp>
+      <p:pic>
+        <p:nvPicPr>
+          <p:cNvPr id="7" name="Picture 6"/>
+          <p:cNvPicPr>
+            <a:picLocks noChangeAspect="1"/>
+          </p:cNvPicPr>
+          <p:nvPr/>
+        </p:nvPicPr>
+        <p:blipFill>
+          <a:blip r:embed="rId3"/>
+          <a:stretch>
+            <a:fillRect/>
+          </a:stretch>
+        </p:blipFill>
+        <p:spPr>
+          <a:xfrm>
+            <a:off x="0" y="265470"/>
+            <a:ext cx="11983223" cy="6415547"/>
+          </a:xfrm>
+          <a:prstGeom prst="rect">
+            <a:avLst/>
+          </a:prstGeom>
+        </p:spPr>
+      </p:pic>
+    </p:spTree>
+    <p:extLst>
+      <p:ext uri="{BB962C8B-B14F-4D97-AF65-F5344CB8AC3E}">
+        <p14:creationId xmlns:p14="http://schemas.microsoft.com/office/powerpoint/2010/main" val="1217261759"/>
+      </p:ext>
+    </p:extLst>
+  </p:cSld>
+  <p:clrMapOvr>
+    <a:masterClrMapping/>
+  </p:clrMapOvr>
+  <p:timing>
+    <p:tnLst>
+      <p:par>
+        <p:cTn id="1" dur="indefinite" restart="never" nodeType="tmRoot"/>
+      </p:par>
+    </p:tnLst>
+  </p:timing>
+</p:sld>
+</file>
+
+<file path=ppt/slides/slide33.xml><?xml version="1.0" encoding="utf-8"?>
+<p:sld xmlns:a="http://schemas.openxmlformats.org/drawingml/2006/main" xmlns:r="http://schemas.openxmlformats.org/officeDocument/2006/relationships" xmlns:p="http://schemas.openxmlformats.org/presentationml/2006/main">
+  <p:cSld>
+    <p:spTree>
+      <p:nvGrpSpPr>
+        <p:cNvPr id="1" name=""/>
+        <p:cNvGrpSpPr/>
+        <p:nvPr/>
+      </p:nvGrpSpPr>
+      <p:grpSpPr>
+        <a:xfrm>
+          <a:off x="0" y="0"/>
+          <a:ext cx="0" cy="0"/>
+          <a:chOff x="0" y="0"/>
+          <a:chExt cx="0" cy="0"/>
+        </a:xfrm>
+      </p:grpSpPr>
+      <p:sp>
+        <p:nvSpPr>
+          <p:cNvPr id="2" name="Title 1"/>
+          <p:cNvSpPr>
+            <a:spLocks noGrp="1"/>
+          </p:cNvSpPr>
+          <p:nvPr>
+            <p:ph type="title"/>
+          </p:nvPr>
+        </p:nvSpPr>
+        <p:spPr/>
+        <p:txBody>
+          <a:bodyPr>
+            <a:normAutofit/>
+          </a:bodyPr>
+          <a:lstStyle/>
+          <a:p>
+            <a:r>
+              <a:rPr lang="en-US" sz="4800" dirty="0"/>
+              <a:t>Authorization - feature</a:t>
+            </a:r>
+          </a:p>
+        </p:txBody>
+      </p:sp>
+      <p:sp>
+        <p:nvSpPr>
+          <p:cNvPr id="3" name="Content Placeholder 2"/>
+          <p:cNvSpPr>
+            <a:spLocks noGrp="1"/>
+          </p:cNvSpPr>
+          <p:nvPr>
+            <p:ph idx="1"/>
+          </p:nvPr>
+        </p:nvSpPr>
+        <p:spPr>
+          <a:xfrm>
+            <a:off x="838200" y="1825624"/>
+            <a:ext cx="10515600" cy="4589923"/>
+          </a:xfrm>
+        </p:spPr>
+        <p:txBody>
+          <a:bodyPr>
+            <a:normAutofit/>
+          </a:bodyPr>
+          <a:lstStyle/>
+          <a:p>
+            <a:endParaRPr lang="en-US" sz="4000" dirty="0" smtClean="0"/>
+          </a:p>
+          <a:p>
+            <a:endParaRPr lang="en-US" dirty="0" smtClean="0"/>
+          </a:p>
+          <a:p>
+            <a:endParaRPr lang="en-US" dirty="0" smtClean="0"/>
+          </a:p>
+          <a:p>
+            <a:endParaRPr lang="en-US" dirty="0"/>
+          </a:p>
+        </p:txBody>
+      </p:sp>
+      <p:pic>
+        <p:nvPicPr>
+          <p:cNvPr id="4" name="Picture 3"/>
+          <p:cNvPicPr>
+            <a:picLocks noChangeAspect="1"/>
+          </p:cNvPicPr>
+          <p:nvPr/>
+        </p:nvPicPr>
+        <p:blipFill>
+          <a:blip r:embed="rId3"/>
+          <a:stretch>
+            <a:fillRect/>
+          </a:stretch>
+        </p:blipFill>
+        <p:spPr>
+          <a:xfrm>
+            <a:off x="838200" y="2019736"/>
+            <a:ext cx="11012331" cy="4145090"/>
+          </a:xfrm>
+          <a:prstGeom prst="rect">
+            <a:avLst/>
+          </a:prstGeom>
+        </p:spPr>
+      </p:pic>
+    </p:spTree>
+    <p:extLst>
+      <p:ext uri="{BB962C8B-B14F-4D97-AF65-F5344CB8AC3E}">
+        <p14:creationId xmlns:p14="http://schemas.microsoft.com/office/powerpoint/2010/main" val="806865913"/>
+      </p:ext>
+    </p:extLst>
+  </p:cSld>
+  <p:clrMapOvr>
+    <a:masterClrMapping/>
+  </p:clrMapOvr>
+  <p:timing>
+    <p:tnLst>
+      <p:par>
+        <p:cTn id="1" dur="indefinite" restart="never" nodeType="tmRoot"/>
+      </p:par>
+    </p:tnLst>
+  </p:timing>
+</p:sld>
+</file>
+
+<file path=ppt/slides/slide34.xml><?xml version="1.0" encoding="utf-8"?>
+<p:sld xmlns:a="http://schemas.openxmlformats.org/drawingml/2006/main" xmlns:r="http://schemas.openxmlformats.org/officeDocument/2006/relationships" xmlns:p="http://schemas.openxmlformats.org/presentationml/2006/main">
+  <p:cSld>
+    <p:spTree>
+      <p:nvGrpSpPr>
+        <p:cNvPr id="1" name=""/>
+        <p:cNvGrpSpPr/>
+        <p:nvPr/>
+      </p:nvGrpSpPr>
+      <p:grpSpPr>
+        <a:xfrm>
+          <a:off x="0" y="0"/>
+          <a:ext cx="0" cy="0"/>
+          <a:chOff x="0" y="0"/>
+          <a:chExt cx="0" cy="0"/>
+        </a:xfrm>
+      </p:grpSpPr>
+      <p:sp>
+        <p:nvSpPr>
+          <p:cNvPr id="2" name="Title 1"/>
+          <p:cNvSpPr>
+            <a:spLocks noGrp="1"/>
+          </p:cNvSpPr>
+          <p:nvPr>
+            <p:ph type="title"/>
+          </p:nvPr>
+        </p:nvSpPr>
+        <p:spPr/>
+        <p:txBody>
+          <a:bodyPr>
+            <a:normAutofit/>
+          </a:bodyPr>
+          <a:lstStyle/>
+          <a:p>
+            <a:r>
+              <a:rPr lang="en-US" sz="4800" dirty="0"/>
+              <a:t>Authorization - framework</a:t>
+            </a:r>
+          </a:p>
+        </p:txBody>
+      </p:sp>
+      <p:sp>
+        <p:nvSpPr>
+          <p:cNvPr id="3" name="Content Placeholder 2"/>
+          <p:cNvSpPr>
+            <a:spLocks noGrp="1"/>
+          </p:cNvSpPr>
+          <p:nvPr>
+            <p:ph idx="1"/>
+          </p:nvPr>
+        </p:nvSpPr>
+        <p:spPr>
+          <a:xfrm>
+            <a:off x="838200" y="1825624"/>
+            <a:ext cx="10515600" cy="4589923"/>
+          </a:xfrm>
+        </p:spPr>
+        <p:txBody>
+          <a:bodyPr>
+            <a:normAutofit/>
+          </a:bodyPr>
+          <a:lstStyle/>
+          <a:p>
+            <a:endParaRPr lang="en-US" sz="4000" dirty="0" smtClean="0"/>
+          </a:p>
+          <a:p>
+            <a:endParaRPr lang="en-US" dirty="0" smtClean="0"/>
+          </a:p>
+          <a:p>
+            <a:endParaRPr lang="en-US" dirty="0" smtClean="0"/>
+          </a:p>
+          <a:p>
+            <a:endParaRPr lang="en-US" dirty="0"/>
+          </a:p>
+        </p:txBody>
+      </p:sp>
+      <p:pic>
+        <p:nvPicPr>
+          <p:cNvPr id="5" name="Picture 4"/>
+          <p:cNvPicPr>
+            <a:picLocks noChangeAspect="1"/>
+          </p:cNvPicPr>
+          <p:nvPr/>
+        </p:nvPicPr>
+        <p:blipFill>
+          <a:blip r:embed="rId3"/>
+          <a:stretch>
+            <a:fillRect/>
+          </a:stretch>
+        </p:blipFill>
+        <p:spPr>
+          <a:xfrm>
+            <a:off x="838200" y="2136103"/>
+            <a:ext cx="7184923" cy="3968963"/>
+          </a:xfrm>
+          <a:prstGeom prst="rect">
+            <a:avLst/>
+          </a:prstGeom>
+        </p:spPr>
+      </p:pic>
+    </p:spTree>
+    <p:extLst>
+      <p:ext uri="{BB962C8B-B14F-4D97-AF65-F5344CB8AC3E}">
+        <p14:creationId xmlns:p14="http://schemas.microsoft.com/office/powerpoint/2010/main" val="3305015095"/>
+      </p:ext>
+    </p:extLst>
+  </p:cSld>
+  <p:clrMapOvr>
+    <a:masterClrMapping/>
+  </p:clrMapOvr>
+  <p:timing>
+    <p:tnLst>
+      <p:par>
+        <p:cTn id="1" dur="indefinite" restart="never" nodeType="tmRoot"/>
+      </p:par>
+    </p:tnLst>
+  </p:timing>
+</p:sld>
+</file>
+
+<file path=ppt/slides/slide35.xml><?xml version="1.0" encoding="utf-8"?>
+<p:sld xmlns:a="http://schemas.openxmlformats.org/drawingml/2006/main" xmlns:r="http://schemas.openxmlformats.org/officeDocument/2006/relationships" xmlns:p="http://schemas.openxmlformats.org/presentationml/2006/main">
+  <p:cSld>
+    <p:spTree>
+      <p:nvGrpSpPr>
+        <p:cNvPr id="1" name=""/>
+        <p:cNvGrpSpPr/>
+        <p:nvPr/>
+      </p:nvGrpSpPr>
+      <p:grpSpPr>
+        <a:xfrm>
+          <a:off x="0" y="0"/>
+          <a:ext cx="0" cy="0"/>
+          <a:chOff x="0" y="0"/>
+          <a:chExt cx="0" cy="0"/>
+        </a:xfrm>
+      </p:grpSpPr>
+      <p:sp>
+        <p:nvSpPr>
+          <p:cNvPr id="2" name="Title 1"/>
+          <p:cNvSpPr>
+            <a:spLocks noGrp="1"/>
+          </p:cNvSpPr>
+          <p:nvPr>
+            <p:ph type="title"/>
+          </p:nvPr>
+        </p:nvSpPr>
+        <p:spPr/>
+        <p:txBody>
+          <a:bodyPr>
+            <a:normAutofit/>
+          </a:bodyPr>
+          <a:lstStyle/>
+          <a:p>
+            <a:r>
+              <a:rPr lang="en-US" sz="4800" dirty="0" smtClean="0"/>
+              <a:t>Access Control </a:t>
+            </a:r>
+            <a:r>
+              <a:rPr lang="en-US" sz="4800" dirty="0"/>
+              <a:t>- feature</a:t>
+            </a:r>
+          </a:p>
+        </p:txBody>
+      </p:sp>
+      <p:sp>
+        <p:nvSpPr>
+          <p:cNvPr id="3" name="Content Placeholder 2"/>
+          <p:cNvSpPr>
+            <a:spLocks noGrp="1"/>
+          </p:cNvSpPr>
+          <p:nvPr>
+            <p:ph idx="1"/>
+          </p:nvPr>
+        </p:nvSpPr>
+        <p:spPr>
+          <a:xfrm>
+            <a:off x="838200" y="1825624"/>
+            <a:ext cx="10515600" cy="4589923"/>
+          </a:xfrm>
+        </p:spPr>
+        <p:txBody>
+          <a:bodyPr>
+            <a:normAutofit/>
+          </a:bodyPr>
+          <a:lstStyle/>
+          <a:p>
+            <a:endParaRPr lang="en-US" dirty="0" smtClean="0"/>
+          </a:p>
+          <a:p>
+            <a:endParaRPr lang="en-US" dirty="0" smtClean="0"/>
+          </a:p>
+          <a:p>
+            <a:endParaRPr lang="en-US" dirty="0"/>
+          </a:p>
+        </p:txBody>
+      </p:sp>
+      <p:pic>
+        <p:nvPicPr>
+          <p:cNvPr id="5" name="Picture 4"/>
+          <p:cNvPicPr>
+            <a:picLocks noChangeAspect="1"/>
+          </p:cNvPicPr>
+          <p:nvPr/>
+        </p:nvPicPr>
+        <p:blipFill>
+          <a:blip r:embed="rId3"/>
+          <a:stretch>
+            <a:fillRect/>
+          </a:stretch>
+        </p:blipFill>
+        <p:spPr>
+          <a:xfrm>
+            <a:off x="838200" y="2135339"/>
+            <a:ext cx="11037660" cy="4280208"/>
+          </a:xfrm>
+          <a:prstGeom prst="rect">
+            <a:avLst/>
+          </a:prstGeom>
+        </p:spPr>
+      </p:pic>
+    </p:spTree>
+    <p:extLst>
+      <p:ext uri="{BB962C8B-B14F-4D97-AF65-F5344CB8AC3E}">
+        <p14:creationId xmlns:p14="http://schemas.microsoft.com/office/powerpoint/2010/main" val="1150970120"/>
+      </p:ext>
+    </p:extLst>
+  </p:cSld>
+  <p:clrMapOvr>
+    <a:masterClrMapping/>
+  </p:clrMapOvr>
+  <p:timing>
+    <p:tnLst>
+      <p:par>
+        <p:cTn id="1" dur="indefinite" restart="never" nodeType="tmRoot"/>
+      </p:par>
+    </p:tnLst>
+  </p:timing>
+</p:sld>
+</file>
+
+<file path=ppt/slides/slide36.xml><?xml version="1.0" encoding="utf-8"?>
+<p:sld xmlns:a="http://schemas.openxmlformats.org/drawingml/2006/main" xmlns:r="http://schemas.openxmlformats.org/officeDocument/2006/relationships" xmlns:p="http://schemas.openxmlformats.org/presentationml/2006/main">
+  <p:cSld>
+    <p:spTree>
+      <p:nvGrpSpPr>
+        <p:cNvPr id="1" name=""/>
+        <p:cNvGrpSpPr/>
+        <p:nvPr/>
+      </p:nvGrpSpPr>
+      <p:grpSpPr>
+        <a:xfrm>
+          <a:off x="0" y="0"/>
+          <a:ext cx="0" cy="0"/>
+          <a:chOff x="0" y="0"/>
+          <a:chExt cx="0" cy="0"/>
+        </a:xfrm>
+      </p:grpSpPr>
+      <p:sp>
+        <p:nvSpPr>
+          <p:cNvPr id="2" name="Title 1"/>
+          <p:cNvSpPr>
+            <a:spLocks noGrp="1"/>
+          </p:cNvSpPr>
+          <p:nvPr>
+            <p:ph type="title"/>
+          </p:nvPr>
+        </p:nvSpPr>
+        <p:spPr/>
+        <p:txBody>
+          <a:bodyPr>
+            <a:normAutofit/>
+          </a:bodyPr>
+          <a:lstStyle/>
+          <a:p>
+            <a:r>
+              <a:rPr lang="en-US" sz="4800" dirty="0" smtClean="0"/>
+              <a:t>Access Control </a:t>
+            </a:r>
+            <a:r>
+              <a:rPr lang="en-US" sz="4800" dirty="0"/>
+              <a:t>- </a:t>
+            </a:r>
+            <a:r>
+              <a:rPr lang="en-US" sz="4800" dirty="0" smtClean="0"/>
+              <a:t>framework</a:t>
+            </a:r>
+            <a:endParaRPr lang="en-US" sz="4800" dirty="0"/>
+          </a:p>
+        </p:txBody>
+      </p:sp>
+      <p:sp>
+        <p:nvSpPr>
+          <p:cNvPr id="3" name="Content Placeholder 2"/>
+          <p:cNvSpPr>
+            <a:spLocks noGrp="1"/>
+          </p:cNvSpPr>
+          <p:nvPr>
+            <p:ph idx="1"/>
+          </p:nvPr>
+        </p:nvSpPr>
+        <p:spPr>
+          <a:xfrm>
+            <a:off x="838200" y="1825624"/>
+            <a:ext cx="10515600" cy="4589923"/>
+          </a:xfrm>
+        </p:spPr>
+        <p:txBody>
+          <a:bodyPr>
+            <a:normAutofit/>
+          </a:bodyPr>
+          <a:lstStyle/>
+          <a:p>
+            <a:endParaRPr lang="en-US" dirty="0" smtClean="0"/>
+          </a:p>
+          <a:p>
+            <a:endParaRPr lang="en-US" dirty="0" smtClean="0"/>
+          </a:p>
+          <a:p>
+            <a:endParaRPr lang="en-US" dirty="0"/>
+          </a:p>
+        </p:txBody>
+      </p:sp>
+      <p:pic>
+        <p:nvPicPr>
+          <p:cNvPr id="4" name="Picture 3"/>
+          <p:cNvPicPr>
+            <a:picLocks noChangeAspect="1"/>
+          </p:cNvPicPr>
+          <p:nvPr/>
+        </p:nvPicPr>
+        <p:blipFill>
+          <a:blip r:embed="rId3"/>
+          <a:stretch>
+            <a:fillRect/>
+          </a:stretch>
+        </p:blipFill>
+        <p:spPr>
+          <a:xfrm>
+            <a:off x="838200" y="2607646"/>
+            <a:ext cx="10628393" cy="3025877"/>
+          </a:xfrm>
+          <a:prstGeom prst="rect">
+            <a:avLst/>
+          </a:prstGeom>
+        </p:spPr>
+      </p:pic>
+    </p:spTree>
+    <p:extLst>
+      <p:ext uri="{BB962C8B-B14F-4D97-AF65-F5344CB8AC3E}">
+        <p14:creationId xmlns:p14="http://schemas.microsoft.com/office/powerpoint/2010/main" val="2515974239"/>
+      </p:ext>
+    </p:extLst>
+  </p:cSld>
+  <p:clrMapOvr>
+    <a:masterClrMapping/>
+  </p:clrMapOvr>
+  <p:timing>
+    <p:tnLst>
+      <p:par>
+        <p:cTn id="1" dur="indefinite" restart="never" nodeType="tmRoot"/>
+      </p:par>
+    </p:tnLst>
+  </p:timing>
+</p:sld>
+</file>
+
+<file path=ppt/slides/slide37.xml><?xml version="1.0" encoding="utf-8"?>
+<p:sld xmlns:a="http://schemas.openxmlformats.org/drawingml/2006/main" xmlns:r="http://schemas.openxmlformats.org/officeDocument/2006/relationships" xmlns:p="http://schemas.openxmlformats.org/presentationml/2006/main">
+  <p:cSld>
+    <p:spTree>
+      <p:nvGrpSpPr>
+        <p:cNvPr id="1" name=""/>
+        <p:cNvGrpSpPr/>
+        <p:nvPr/>
+      </p:nvGrpSpPr>
+      <p:grpSpPr>
+        <a:xfrm>
+          <a:off x="0" y="0"/>
+          <a:ext cx="0" cy="0"/>
+          <a:chOff x="0" y="0"/>
+          <a:chExt cx="0" cy="0"/>
+        </a:xfrm>
+      </p:grpSpPr>
+      <p:sp>
+        <p:nvSpPr>
+          <p:cNvPr id="2" name="Title 1"/>
+          <p:cNvSpPr>
+            <a:spLocks noGrp="1"/>
+          </p:cNvSpPr>
+          <p:nvPr>
+            <p:ph type="title"/>
+          </p:nvPr>
+        </p:nvSpPr>
+        <p:spPr>
+          <a:xfrm>
+            <a:off x="838200" y="365125"/>
+            <a:ext cx="10886768" cy="1325563"/>
+          </a:xfrm>
+        </p:spPr>
+        <p:txBody>
+          <a:bodyPr>
+            <a:noAutofit/>
+          </a:bodyPr>
+          <a:lstStyle/>
+          <a:p>
+            <a:r>
+              <a:rPr lang="en-US" sz="4800" dirty="0" smtClean="0"/>
+              <a:t>Closing slide</a:t>
+            </a:r>
+            <a:endParaRPr lang="en-US" sz="4800" dirty="0"/>
+          </a:p>
+        </p:txBody>
+      </p:sp>
+      <p:sp>
+        <p:nvSpPr>
+          <p:cNvPr id="3" name="Content Placeholder 2"/>
+          <p:cNvSpPr>
+            <a:spLocks noGrp="1"/>
+          </p:cNvSpPr>
+          <p:nvPr>
+            <p:ph idx="1"/>
+          </p:nvPr>
+        </p:nvSpPr>
+        <p:spPr>
+          <a:xfrm>
+            <a:off x="838200" y="1825625"/>
+            <a:ext cx="11137490" cy="4899640"/>
+          </a:xfrm>
+        </p:spPr>
+        <p:txBody>
+          <a:bodyPr>
+            <a:normAutofit/>
+          </a:bodyPr>
+          <a:lstStyle/>
+          <a:p>
+            <a:r>
+              <a:rPr lang="en-US" sz="4000" dirty="0" smtClean="0"/>
+              <a:t>The knowledge gets dropped here</a:t>
+            </a:r>
+          </a:p>
+          <a:p>
+            <a:pPr marL="0" indent="0">
+              <a:buNone/>
+            </a:pPr>
+            <a:endParaRPr lang="en-US" sz="3200" dirty="0" smtClean="0">
+              <a:hlinkClick r:id="rId3"/>
+            </a:endParaRPr>
+          </a:p>
+          <a:p>
+            <a:pPr marL="0" indent="0">
+              <a:buNone/>
+            </a:pPr>
+            <a:r>
+              <a:rPr lang="en-US" sz="3600" dirty="0" smtClean="0">
+                <a:hlinkClick r:id="rId3"/>
+              </a:rPr>
+              <a:t>github.com/</a:t>
+            </a:r>
+            <a:r>
+              <a:rPr lang="en-US" sz="3600" dirty="0" err="1" smtClean="0">
+                <a:hlinkClick r:id="rId3"/>
+              </a:rPr>
+              <a:t>spetryjohnson</a:t>
+            </a:r>
+            <a:r>
+              <a:rPr lang="en-US" sz="3600" dirty="0" smtClean="0"/>
+              <a:t> </a:t>
+            </a:r>
+            <a:r>
+              <a:rPr lang="en-US" sz="3600" dirty="0" smtClean="0">
+                <a:solidFill>
+                  <a:schemeClr val="bg1">
+                    <a:lumMod val="50000"/>
+                  </a:schemeClr>
+                </a:solidFill>
+              </a:rPr>
+              <a:t>|</a:t>
+            </a:r>
+            <a:r>
+              <a:rPr lang="en-US" sz="3600" dirty="0" smtClean="0"/>
+              <a:t> </a:t>
+            </a:r>
+            <a:r>
+              <a:rPr lang="en-US" sz="3600" dirty="0" smtClean="0">
+                <a:hlinkClick r:id="rId4"/>
+              </a:rPr>
+              <a:t>www.petry-johnson.com</a:t>
+            </a:r>
+            <a:r>
+              <a:rPr lang="en-US" sz="3600" dirty="0" smtClean="0"/>
+              <a:t/>
+            </a:r>
+            <a:br>
+              <a:rPr lang="en-US" sz="3600" dirty="0" smtClean="0"/>
+            </a:br>
+            <a:endParaRPr lang="en-US" sz="3600" dirty="0"/>
+          </a:p>
+          <a:p>
+            <a:pPr marL="0" indent="0" algn="ctr">
+              <a:buNone/>
+            </a:pPr>
+            <a:r>
+              <a:rPr lang="en-US" sz="3600" b="1" dirty="0" smtClean="0"/>
+              <a:t>@</a:t>
+            </a:r>
+            <a:r>
+              <a:rPr lang="en-US" sz="3600" b="1" dirty="0" err="1" smtClean="0"/>
+              <a:t>spetryjohnson</a:t>
+            </a:r>
+            <a:endParaRPr lang="en-US" b="1" dirty="0" smtClean="0"/>
+          </a:p>
+          <a:p>
+            <a:endParaRPr lang="en-US" dirty="0" smtClean="0"/>
+          </a:p>
+          <a:p>
+            <a:pPr lvl="1"/>
+            <a:endParaRPr lang="en-US" dirty="0" smtClean="0"/>
+          </a:p>
+          <a:p>
+            <a:pPr lvl="1"/>
+            <a:endParaRPr lang="en-US" dirty="0" smtClean="0"/>
+          </a:p>
+          <a:p>
+            <a:pPr lvl="1"/>
+            <a:endParaRPr lang="en-US" dirty="0"/>
+          </a:p>
+          <a:p>
+            <a:pPr lvl="1"/>
+            <a:endParaRPr lang="en-US" dirty="0" smtClean="0"/>
+          </a:p>
+          <a:p>
+            <a:pPr lvl="1"/>
+            <a:endParaRPr lang="en-US" dirty="0"/>
+          </a:p>
+        </p:txBody>
+      </p:sp>
+    </p:spTree>
+    <p:extLst>
+      <p:ext uri="{BB962C8B-B14F-4D97-AF65-F5344CB8AC3E}">
+        <p14:creationId xmlns:p14="http://schemas.microsoft.com/office/powerpoint/2010/main" val="659085787"/>
       </p:ext>
     </p:extLst>
   </p:cSld>

</xml_diff>

<commit_message>
Added authorization to PPT and narrative
</commit_message>
<xml_diff>
--- a/Secure Systems - CodeMash 2017.pptx
+++ b/Secure Systems - CodeMash 2017.pptx
@@ -5,7 +5,7 @@
     <p:sldMasterId id="2147483749" r:id="rId1"/>
   </p:sldMasterIdLst>
   <p:notesMasterIdLst>
-    <p:notesMasterId r:id="rId39"/>
+    <p:notesMasterId r:id="rId46"/>
   </p:notesMasterIdLst>
   <p:sldIdLst>
     <p:sldId id="395" r:id="rId2"/>
@@ -31,20 +31,27 @@
     <p:sldId id="499" r:id="rId22"/>
     <p:sldId id="506" r:id="rId23"/>
     <p:sldId id="519" r:id="rId24"/>
-    <p:sldId id="521" r:id="rId25"/>
-    <p:sldId id="522" r:id="rId26"/>
-    <p:sldId id="523" r:id="rId27"/>
-    <p:sldId id="520" r:id="rId28"/>
-    <p:sldId id="504" r:id="rId29"/>
-    <p:sldId id="485" r:id="rId30"/>
-    <p:sldId id="500" r:id="rId31"/>
-    <p:sldId id="501" r:id="rId32"/>
-    <p:sldId id="509" r:id="rId33"/>
-    <p:sldId id="502" r:id="rId34"/>
-    <p:sldId id="503" r:id="rId35"/>
-    <p:sldId id="505" r:id="rId36"/>
-    <p:sldId id="507" r:id="rId37"/>
-    <p:sldId id="443" r:id="rId38"/>
+    <p:sldId id="524" r:id="rId25"/>
+    <p:sldId id="521" r:id="rId26"/>
+    <p:sldId id="522" r:id="rId27"/>
+    <p:sldId id="525" r:id="rId28"/>
+    <p:sldId id="523" r:id="rId29"/>
+    <p:sldId id="520" r:id="rId30"/>
+    <p:sldId id="526" r:id="rId31"/>
+    <p:sldId id="528" r:id="rId32"/>
+    <p:sldId id="500" r:id="rId33"/>
+    <p:sldId id="501" r:id="rId34"/>
+    <p:sldId id="529" r:id="rId35"/>
+    <p:sldId id="530" r:id="rId36"/>
+    <p:sldId id="502" r:id="rId37"/>
+    <p:sldId id="503" r:id="rId38"/>
+    <p:sldId id="531" r:id="rId39"/>
+    <p:sldId id="532" r:id="rId40"/>
+    <p:sldId id="504" r:id="rId41"/>
+    <p:sldId id="485" r:id="rId42"/>
+    <p:sldId id="505" r:id="rId43"/>
+    <p:sldId id="507" r:id="rId44"/>
+    <p:sldId id="443" r:id="rId45"/>
   </p:sldIdLst>
   <p:sldSz cx="12192000" cy="6858000"/>
   <p:notesSz cx="6858000" cy="9144000"/>
@@ -244,7 +251,7 @@
           <a:p>
             <a:fld id="{C54A4886-B4AF-42F7-97BE-95CDF82A73E3}" type="datetimeFigureOut">
               <a:rPr lang="en-US" smtClean="0"/>
-              <a:t>12/22/2016</a:t>
+              <a:t>12/23/2016</a:t>
             </a:fld>
             <a:endParaRPr lang="en-US"/>
           </a:p>
@@ -1988,7 +1995,7 @@
     </p:spTree>
     <p:extLst>
       <p:ext uri="{BB962C8B-B14F-4D97-AF65-F5344CB8AC3E}">
-        <p14:creationId xmlns:p14="http://schemas.microsoft.com/office/powerpoint/2010/main" val="1266200327"/>
+        <p14:creationId xmlns:p14="http://schemas.microsoft.com/office/powerpoint/2010/main" val="128284815"/>
       </p:ext>
     </p:extLst>
   </p:cSld>
@@ -2072,7 +2079,7 @@
     </p:spTree>
     <p:extLst>
       <p:ext uri="{BB962C8B-B14F-4D97-AF65-F5344CB8AC3E}">
-        <p14:creationId xmlns:p14="http://schemas.microsoft.com/office/powerpoint/2010/main" val="3516029556"/>
+        <p14:creationId xmlns:p14="http://schemas.microsoft.com/office/powerpoint/2010/main" val="1266200327"/>
       </p:ext>
     </p:extLst>
   </p:cSld>
@@ -2156,7 +2163,7 @@
     </p:spTree>
     <p:extLst>
       <p:ext uri="{BB962C8B-B14F-4D97-AF65-F5344CB8AC3E}">
-        <p14:creationId xmlns:p14="http://schemas.microsoft.com/office/powerpoint/2010/main" val="2712589128"/>
+        <p14:creationId xmlns:p14="http://schemas.microsoft.com/office/powerpoint/2010/main" val="3516029556"/>
       </p:ext>
     </p:extLst>
   </p:cSld>
@@ -2240,7 +2247,7 @@
     </p:spTree>
     <p:extLst>
       <p:ext uri="{BB962C8B-B14F-4D97-AF65-F5344CB8AC3E}">
-        <p14:creationId xmlns:p14="http://schemas.microsoft.com/office/powerpoint/2010/main" val="1609105756"/>
+        <p14:creationId xmlns:p14="http://schemas.microsoft.com/office/powerpoint/2010/main" val="3404565588"/>
       </p:ext>
     </p:extLst>
   </p:cSld>
@@ -2324,7 +2331,7 @@
     </p:spTree>
     <p:extLst>
       <p:ext uri="{BB962C8B-B14F-4D97-AF65-F5344CB8AC3E}">
-        <p14:creationId xmlns:p14="http://schemas.microsoft.com/office/powerpoint/2010/main" val="2602777311"/>
+        <p14:creationId xmlns:p14="http://schemas.microsoft.com/office/powerpoint/2010/main" val="2712589128"/>
       </p:ext>
     </p:extLst>
   </p:cSld>
@@ -2408,7 +2415,7 @@
     </p:spTree>
     <p:extLst>
       <p:ext uri="{BB962C8B-B14F-4D97-AF65-F5344CB8AC3E}">
-        <p14:creationId xmlns:p14="http://schemas.microsoft.com/office/powerpoint/2010/main" val="2267138517"/>
+        <p14:creationId xmlns:p14="http://schemas.microsoft.com/office/powerpoint/2010/main" val="1609105756"/>
       </p:ext>
     </p:extLst>
   </p:cSld>
@@ -2601,7 +2608,7 @@
     </p:spTree>
     <p:extLst>
       <p:ext uri="{BB962C8B-B14F-4D97-AF65-F5344CB8AC3E}">
-        <p14:creationId xmlns:p14="http://schemas.microsoft.com/office/powerpoint/2010/main" val="1561525116"/>
+        <p14:creationId xmlns:p14="http://schemas.microsoft.com/office/powerpoint/2010/main" val="4079219210"/>
       </p:ext>
     </p:extLst>
   </p:cSld>
@@ -2655,7 +2662,32 @@
           <a:bodyPr/>
           <a:lstStyle/>
           <a:p>
-            <a:endParaRPr lang="en-US" b="0" dirty="0" smtClean="0"/>
+            <a:pPr marL="0" marR="0" indent="0" algn="l" defTabSz="914400" rtl="0" eaLnBrk="1" fontAlgn="auto" latinLnBrk="0" hangingPunct="1">
+              <a:lnSpc>
+                <a:spcPct val="100000"/>
+              </a:lnSpc>
+              <a:spcBef>
+                <a:spcPts val="0"/>
+              </a:spcBef>
+              <a:spcAft>
+                <a:spcPts val="0"/>
+              </a:spcAft>
+              <a:buClrTx/>
+              <a:buSzTx/>
+              <a:buFontTx/>
+              <a:buNone/>
+              <a:tabLst/>
+              <a:defRPr/>
+            </a:pPr>
+            <a:endParaRPr lang="en-US" sz="1200" kern="1200" dirty="0" smtClean="0">
+              <a:solidFill>
+                <a:schemeClr val="tx1"/>
+              </a:solidFill>
+              <a:effectLst/>
+              <a:latin typeface="+mn-lt"/>
+              <a:ea typeface="+mn-ea"/>
+              <a:cs typeface="+mn-cs"/>
+            </a:endParaRPr>
           </a:p>
         </p:txBody>
       </p:sp>
@@ -2685,7 +2717,7 @@
     </p:spTree>
     <p:extLst>
       <p:ext uri="{BB962C8B-B14F-4D97-AF65-F5344CB8AC3E}">
-        <p14:creationId xmlns:p14="http://schemas.microsoft.com/office/powerpoint/2010/main" val="3344468672"/>
+        <p14:creationId xmlns:p14="http://schemas.microsoft.com/office/powerpoint/2010/main" val="3734542197"/>
       </p:ext>
     </p:extLst>
   </p:cSld>
@@ -2769,7 +2801,7 @@
     </p:spTree>
     <p:extLst>
       <p:ext uri="{BB962C8B-B14F-4D97-AF65-F5344CB8AC3E}">
-        <p14:creationId xmlns:p14="http://schemas.microsoft.com/office/powerpoint/2010/main" val="2502330197"/>
+        <p14:creationId xmlns:p14="http://schemas.microsoft.com/office/powerpoint/2010/main" val="1561525116"/>
       </p:ext>
     </p:extLst>
   </p:cSld>
@@ -2853,7 +2885,7 @@
     </p:spTree>
     <p:extLst>
       <p:ext uri="{BB962C8B-B14F-4D97-AF65-F5344CB8AC3E}">
-        <p14:creationId xmlns:p14="http://schemas.microsoft.com/office/powerpoint/2010/main" val="3450469856"/>
+        <p14:creationId xmlns:p14="http://schemas.microsoft.com/office/powerpoint/2010/main" val="3344468672"/>
       </p:ext>
     </p:extLst>
   </p:cSld>
@@ -2937,7 +2969,7 @@
     </p:spTree>
     <p:extLst>
       <p:ext uri="{BB962C8B-B14F-4D97-AF65-F5344CB8AC3E}">
-        <p14:creationId xmlns:p14="http://schemas.microsoft.com/office/powerpoint/2010/main" val="2647091800"/>
+        <p14:creationId xmlns:p14="http://schemas.microsoft.com/office/powerpoint/2010/main" val="3143393369"/>
       </p:ext>
     </p:extLst>
   </p:cSld>
@@ -3021,7 +3053,7 @@
     </p:spTree>
     <p:extLst>
       <p:ext uri="{BB962C8B-B14F-4D97-AF65-F5344CB8AC3E}">
-        <p14:creationId xmlns:p14="http://schemas.microsoft.com/office/powerpoint/2010/main" val="2653332077"/>
+        <p14:creationId xmlns:p14="http://schemas.microsoft.com/office/powerpoint/2010/main" val="531577243"/>
       </p:ext>
     </p:extLst>
   </p:cSld>
@@ -3105,7 +3137,7 @@
     </p:spTree>
     <p:extLst>
       <p:ext uri="{BB962C8B-B14F-4D97-AF65-F5344CB8AC3E}">
-        <p14:creationId xmlns:p14="http://schemas.microsoft.com/office/powerpoint/2010/main" val="3271057564"/>
+        <p14:creationId xmlns:p14="http://schemas.microsoft.com/office/powerpoint/2010/main" val="3450469856"/>
       </p:ext>
     </p:extLst>
   </p:cSld>
@@ -3159,15 +3191,7 @@
           <a:bodyPr/>
           <a:lstStyle/>
           <a:p>
-            <a:endParaRPr lang="en-US" sz="1200" kern="1200" dirty="0" smtClean="0">
-              <a:solidFill>
-                <a:schemeClr val="tx1"/>
-              </a:solidFill>
-              <a:effectLst/>
-              <a:latin typeface="+mn-lt"/>
-              <a:ea typeface="+mn-ea"/>
-              <a:cs typeface="+mn-cs"/>
-            </a:endParaRPr>
+            <a:endParaRPr lang="en-US" b="0" dirty="0" smtClean="0"/>
           </a:p>
         </p:txBody>
       </p:sp>
@@ -3197,7 +3221,175 @@
     </p:spTree>
     <p:extLst>
       <p:ext uri="{BB962C8B-B14F-4D97-AF65-F5344CB8AC3E}">
-        <p14:creationId xmlns:p14="http://schemas.microsoft.com/office/powerpoint/2010/main" val="2813022412"/>
+        <p14:creationId xmlns:p14="http://schemas.microsoft.com/office/powerpoint/2010/main" val="2647091800"/>
+      </p:ext>
+    </p:extLst>
+  </p:cSld>
+  <p:clrMapOvr>
+    <a:masterClrMapping/>
+  </p:clrMapOvr>
+</p:notes>
+</file>
+
+<file path=ppt/notesSlides/notesSlide38.xml><?xml version="1.0" encoding="utf-8"?>
+<p:notes xmlns:a="http://schemas.openxmlformats.org/drawingml/2006/main" xmlns:r="http://schemas.openxmlformats.org/officeDocument/2006/relationships" xmlns:p="http://schemas.openxmlformats.org/presentationml/2006/main">
+  <p:cSld>
+    <p:spTree>
+      <p:nvGrpSpPr>
+        <p:cNvPr id="1" name=""/>
+        <p:cNvGrpSpPr/>
+        <p:nvPr/>
+      </p:nvGrpSpPr>
+      <p:grpSpPr>
+        <a:xfrm>
+          <a:off x="0" y="0"/>
+          <a:ext cx="0" cy="0"/>
+          <a:chOff x="0" y="0"/>
+          <a:chExt cx="0" cy="0"/>
+        </a:xfrm>
+      </p:grpSpPr>
+      <p:sp>
+        <p:nvSpPr>
+          <p:cNvPr id="2" name="Slide Image Placeholder 1"/>
+          <p:cNvSpPr>
+            <a:spLocks noGrp="1" noRot="1" noChangeAspect="1"/>
+          </p:cNvSpPr>
+          <p:nvPr>
+            <p:ph type="sldImg"/>
+          </p:nvPr>
+        </p:nvSpPr>
+        <p:spPr/>
+      </p:sp>
+      <p:sp>
+        <p:nvSpPr>
+          <p:cNvPr id="3" name="Notes Placeholder 2"/>
+          <p:cNvSpPr>
+            <a:spLocks noGrp="1"/>
+          </p:cNvSpPr>
+          <p:nvPr>
+            <p:ph type="body" idx="1"/>
+          </p:nvPr>
+        </p:nvSpPr>
+        <p:spPr/>
+        <p:txBody>
+          <a:bodyPr/>
+          <a:lstStyle/>
+          <a:p>
+            <a:endParaRPr lang="en-US" b="0" dirty="0" smtClean="0"/>
+          </a:p>
+        </p:txBody>
+      </p:sp>
+      <p:sp>
+        <p:nvSpPr>
+          <p:cNvPr id="4" name="Slide Number Placeholder 3"/>
+          <p:cNvSpPr>
+            <a:spLocks noGrp="1"/>
+          </p:cNvSpPr>
+          <p:nvPr>
+            <p:ph type="sldNum" sz="quarter" idx="10"/>
+          </p:nvPr>
+        </p:nvSpPr>
+        <p:spPr/>
+        <p:txBody>
+          <a:bodyPr/>
+          <a:lstStyle/>
+          <a:p>
+            <a:fld id="{89029652-62E7-43D6-83B5-097D7B7AA5D8}" type="slidenum">
+              <a:rPr lang="en-US" smtClean="0"/>
+              <a:t>38</a:t>
+            </a:fld>
+            <a:endParaRPr lang="en-US"/>
+          </a:p>
+        </p:txBody>
+      </p:sp>
+    </p:spTree>
+    <p:extLst>
+      <p:ext uri="{BB962C8B-B14F-4D97-AF65-F5344CB8AC3E}">
+        <p14:creationId xmlns:p14="http://schemas.microsoft.com/office/powerpoint/2010/main" val="3603726692"/>
+      </p:ext>
+    </p:extLst>
+  </p:cSld>
+  <p:clrMapOvr>
+    <a:masterClrMapping/>
+  </p:clrMapOvr>
+</p:notes>
+</file>
+
+<file path=ppt/notesSlides/notesSlide39.xml><?xml version="1.0" encoding="utf-8"?>
+<p:notes xmlns:a="http://schemas.openxmlformats.org/drawingml/2006/main" xmlns:r="http://schemas.openxmlformats.org/officeDocument/2006/relationships" xmlns:p="http://schemas.openxmlformats.org/presentationml/2006/main">
+  <p:cSld>
+    <p:spTree>
+      <p:nvGrpSpPr>
+        <p:cNvPr id="1" name=""/>
+        <p:cNvGrpSpPr/>
+        <p:nvPr/>
+      </p:nvGrpSpPr>
+      <p:grpSpPr>
+        <a:xfrm>
+          <a:off x="0" y="0"/>
+          <a:ext cx="0" cy="0"/>
+          <a:chOff x="0" y="0"/>
+          <a:chExt cx="0" cy="0"/>
+        </a:xfrm>
+      </p:grpSpPr>
+      <p:sp>
+        <p:nvSpPr>
+          <p:cNvPr id="2" name="Slide Image Placeholder 1"/>
+          <p:cNvSpPr>
+            <a:spLocks noGrp="1" noRot="1" noChangeAspect="1"/>
+          </p:cNvSpPr>
+          <p:nvPr>
+            <p:ph type="sldImg"/>
+          </p:nvPr>
+        </p:nvSpPr>
+        <p:spPr/>
+      </p:sp>
+      <p:sp>
+        <p:nvSpPr>
+          <p:cNvPr id="3" name="Notes Placeholder 2"/>
+          <p:cNvSpPr>
+            <a:spLocks noGrp="1"/>
+          </p:cNvSpPr>
+          <p:nvPr>
+            <p:ph type="body" idx="1"/>
+          </p:nvPr>
+        </p:nvSpPr>
+        <p:spPr/>
+        <p:txBody>
+          <a:bodyPr/>
+          <a:lstStyle/>
+          <a:p>
+            <a:endParaRPr lang="en-US" b="0" dirty="0" smtClean="0"/>
+          </a:p>
+        </p:txBody>
+      </p:sp>
+      <p:sp>
+        <p:nvSpPr>
+          <p:cNvPr id="4" name="Slide Number Placeholder 3"/>
+          <p:cNvSpPr>
+            <a:spLocks noGrp="1"/>
+          </p:cNvSpPr>
+          <p:nvPr>
+            <p:ph type="sldNum" sz="quarter" idx="10"/>
+          </p:nvPr>
+        </p:nvSpPr>
+        <p:spPr/>
+        <p:txBody>
+          <a:bodyPr/>
+          <a:lstStyle/>
+          <a:p>
+            <a:fld id="{89029652-62E7-43D6-83B5-097D7B7AA5D8}" type="slidenum">
+              <a:rPr lang="en-US" smtClean="0"/>
+              <a:t>39</a:t>
+            </a:fld>
+            <a:endParaRPr lang="en-US"/>
+          </a:p>
+        </p:txBody>
+      </p:sp>
+    </p:spTree>
+    <p:extLst>
+      <p:ext uri="{BB962C8B-B14F-4D97-AF65-F5344CB8AC3E}">
+        <p14:creationId xmlns:p14="http://schemas.microsoft.com/office/powerpoint/2010/main" val="2106924964"/>
       </p:ext>
     </p:extLst>
   </p:cSld>
@@ -3307,6 +3499,434 @@
     <p:extLst>
       <p:ext uri="{BB962C8B-B14F-4D97-AF65-F5344CB8AC3E}">
         <p14:creationId xmlns:p14="http://schemas.microsoft.com/office/powerpoint/2010/main" val="1414051827"/>
+      </p:ext>
+    </p:extLst>
+  </p:cSld>
+  <p:clrMapOvr>
+    <a:masterClrMapping/>
+  </p:clrMapOvr>
+</p:notes>
+</file>
+
+<file path=ppt/notesSlides/notesSlide40.xml><?xml version="1.0" encoding="utf-8"?>
+<p:notes xmlns:a="http://schemas.openxmlformats.org/drawingml/2006/main" xmlns:r="http://schemas.openxmlformats.org/officeDocument/2006/relationships" xmlns:p="http://schemas.openxmlformats.org/presentationml/2006/main">
+  <p:cSld>
+    <p:spTree>
+      <p:nvGrpSpPr>
+        <p:cNvPr id="1" name=""/>
+        <p:cNvGrpSpPr/>
+        <p:nvPr/>
+      </p:nvGrpSpPr>
+      <p:grpSpPr>
+        <a:xfrm>
+          <a:off x="0" y="0"/>
+          <a:ext cx="0" cy="0"/>
+          <a:chOff x="0" y="0"/>
+          <a:chExt cx="0" cy="0"/>
+        </a:xfrm>
+      </p:grpSpPr>
+      <p:sp>
+        <p:nvSpPr>
+          <p:cNvPr id="2" name="Slide Image Placeholder 1"/>
+          <p:cNvSpPr>
+            <a:spLocks noGrp="1" noRot="1" noChangeAspect="1"/>
+          </p:cNvSpPr>
+          <p:nvPr>
+            <p:ph type="sldImg"/>
+          </p:nvPr>
+        </p:nvSpPr>
+        <p:spPr/>
+      </p:sp>
+      <p:sp>
+        <p:nvSpPr>
+          <p:cNvPr id="3" name="Notes Placeholder 2"/>
+          <p:cNvSpPr>
+            <a:spLocks noGrp="1"/>
+          </p:cNvSpPr>
+          <p:nvPr>
+            <p:ph type="body" idx="1"/>
+          </p:nvPr>
+        </p:nvSpPr>
+        <p:spPr/>
+        <p:txBody>
+          <a:bodyPr/>
+          <a:lstStyle/>
+          <a:p>
+            <a:endParaRPr lang="en-US" b="0" dirty="0" smtClean="0"/>
+          </a:p>
+        </p:txBody>
+      </p:sp>
+      <p:sp>
+        <p:nvSpPr>
+          <p:cNvPr id="4" name="Slide Number Placeholder 3"/>
+          <p:cNvSpPr>
+            <a:spLocks noGrp="1"/>
+          </p:cNvSpPr>
+          <p:nvPr>
+            <p:ph type="sldNum" sz="quarter" idx="10"/>
+          </p:nvPr>
+        </p:nvSpPr>
+        <p:spPr/>
+        <p:txBody>
+          <a:bodyPr/>
+          <a:lstStyle/>
+          <a:p>
+            <a:fld id="{89029652-62E7-43D6-83B5-097D7B7AA5D8}" type="slidenum">
+              <a:rPr lang="en-US" smtClean="0"/>
+              <a:t>40</a:t>
+            </a:fld>
+            <a:endParaRPr lang="en-US"/>
+          </a:p>
+        </p:txBody>
+      </p:sp>
+    </p:spTree>
+    <p:extLst>
+      <p:ext uri="{BB962C8B-B14F-4D97-AF65-F5344CB8AC3E}">
+        <p14:creationId xmlns:p14="http://schemas.microsoft.com/office/powerpoint/2010/main" val="2602777311"/>
+      </p:ext>
+    </p:extLst>
+  </p:cSld>
+  <p:clrMapOvr>
+    <a:masterClrMapping/>
+  </p:clrMapOvr>
+</p:notes>
+</file>
+
+<file path=ppt/notesSlides/notesSlide41.xml><?xml version="1.0" encoding="utf-8"?>
+<p:notes xmlns:a="http://schemas.openxmlformats.org/drawingml/2006/main" xmlns:r="http://schemas.openxmlformats.org/officeDocument/2006/relationships" xmlns:p="http://schemas.openxmlformats.org/presentationml/2006/main">
+  <p:cSld>
+    <p:spTree>
+      <p:nvGrpSpPr>
+        <p:cNvPr id="1" name=""/>
+        <p:cNvGrpSpPr/>
+        <p:nvPr/>
+      </p:nvGrpSpPr>
+      <p:grpSpPr>
+        <a:xfrm>
+          <a:off x="0" y="0"/>
+          <a:ext cx="0" cy="0"/>
+          <a:chOff x="0" y="0"/>
+          <a:chExt cx="0" cy="0"/>
+        </a:xfrm>
+      </p:grpSpPr>
+      <p:sp>
+        <p:nvSpPr>
+          <p:cNvPr id="2" name="Slide Image Placeholder 1"/>
+          <p:cNvSpPr>
+            <a:spLocks noGrp="1" noRot="1" noChangeAspect="1"/>
+          </p:cNvSpPr>
+          <p:nvPr>
+            <p:ph type="sldImg"/>
+          </p:nvPr>
+        </p:nvSpPr>
+        <p:spPr/>
+      </p:sp>
+      <p:sp>
+        <p:nvSpPr>
+          <p:cNvPr id="3" name="Notes Placeholder 2"/>
+          <p:cNvSpPr>
+            <a:spLocks noGrp="1"/>
+          </p:cNvSpPr>
+          <p:nvPr>
+            <p:ph type="body" idx="1"/>
+          </p:nvPr>
+        </p:nvSpPr>
+        <p:spPr/>
+        <p:txBody>
+          <a:bodyPr/>
+          <a:lstStyle/>
+          <a:p>
+            <a:endParaRPr lang="en-US" b="0" dirty="0" smtClean="0"/>
+          </a:p>
+        </p:txBody>
+      </p:sp>
+      <p:sp>
+        <p:nvSpPr>
+          <p:cNvPr id="4" name="Slide Number Placeholder 3"/>
+          <p:cNvSpPr>
+            <a:spLocks noGrp="1"/>
+          </p:cNvSpPr>
+          <p:nvPr>
+            <p:ph type="sldNum" sz="quarter" idx="10"/>
+          </p:nvPr>
+        </p:nvSpPr>
+        <p:spPr/>
+        <p:txBody>
+          <a:bodyPr/>
+          <a:lstStyle/>
+          <a:p>
+            <a:fld id="{89029652-62E7-43D6-83B5-097D7B7AA5D8}" type="slidenum">
+              <a:rPr lang="en-US" smtClean="0"/>
+              <a:t>41</a:t>
+            </a:fld>
+            <a:endParaRPr lang="en-US"/>
+          </a:p>
+        </p:txBody>
+      </p:sp>
+    </p:spTree>
+    <p:extLst>
+      <p:ext uri="{BB962C8B-B14F-4D97-AF65-F5344CB8AC3E}">
+        <p14:creationId xmlns:p14="http://schemas.microsoft.com/office/powerpoint/2010/main" val="2267138517"/>
+      </p:ext>
+    </p:extLst>
+  </p:cSld>
+  <p:clrMapOvr>
+    <a:masterClrMapping/>
+  </p:clrMapOvr>
+</p:notes>
+</file>
+
+<file path=ppt/notesSlides/notesSlide42.xml><?xml version="1.0" encoding="utf-8"?>
+<p:notes xmlns:a="http://schemas.openxmlformats.org/drawingml/2006/main" xmlns:r="http://schemas.openxmlformats.org/officeDocument/2006/relationships" xmlns:p="http://schemas.openxmlformats.org/presentationml/2006/main">
+  <p:cSld>
+    <p:spTree>
+      <p:nvGrpSpPr>
+        <p:cNvPr id="1" name=""/>
+        <p:cNvGrpSpPr/>
+        <p:nvPr/>
+      </p:nvGrpSpPr>
+      <p:grpSpPr>
+        <a:xfrm>
+          <a:off x="0" y="0"/>
+          <a:ext cx="0" cy="0"/>
+          <a:chOff x="0" y="0"/>
+          <a:chExt cx="0" cy="0"/>
+        </a:xfrm>
+      </p:grpSpPr>
+      <p:sp>
+        <p:nvSpPr>
+          <p:cNvPr id="2" name="Slide Image Placeholder 1"/>
+          <p:cNvSpPr>
+            <a:spLocks noGrp="1" noRot="1" noChangeAspect="1"/>
+          </p:cNvSpPr>
+          <p:nvPr>
+            <p:ph type="sldImg"/>
+          </p:nvPr>
+        </p:nvSpPr>
+        <p:spPr/>
+      </p:sp>
+      <p:sp>
+        <p:nvSpPr>
+          <p:cNvPr id="3" name="Notes Placeholder 2"/>
+          <p:cNvSpPr>
+            <a:spLocks noGrp="1"/>
+          </p:cNvSpPr>
+          <p:nvPr>
+            <p:ph type="body" idx="1"/>
+          </p:nvPr>
+        </p:nvSpPr>
+        <p:spPr/>
+        <p:txBody>
+          <a:bodyPr/>
+          <a:lstStyle/>
+          <a:p>
+            <a:endParaRPr lang="en-US" b="0" dirty="0" smtClean="0"/>
+          </a:p>
+        </p:txBody>
+      </p:sp>
+      <p:sp>
+        <p:nvSpPr>
+          <p:cNvPr id="4" name="Slide Number Placeholder 3"/>
+          <p:cNvSpPr>
+            <a:spLocks noGrp="1"/>
+          </p:cNvSpPr>
+          <p:nvPr>
+            <p:ph type="sldNum" sz="quarter" idx="10"/>
+          </p:nvPr>
+        </p:nvSpPr>
+        <p:spPr/>
+        <p:txBody>
+          <a:bodyPr/>
+          <a:lstStyle/>
+          <a:p>
+            <a:fld id="{89029652-62E7-43D6-83B5-097D7B7AA5D8}" type="slidenum">
+              <a:rPr lang="en-US" smtClean="0"/>
+              <a:t>42</a:t>
+            </a:fld>
+            <a:endParaRPr lang="en-US"/>
+          </a:p>
+        </p:txBody>
+      </p:sp>
+    </p:spTree>
+    <p:extLst>
+      <p:ext uri="{BB962C8B-B14F-4D97-AF65-F5344CB8AC3E}">
+        <p14:creationId xmlns:p14="http://schemas.microsoft.com/office/powerpoint/2010/main" val="2653332077"/>
+      </p:ext>
+    </p:extLst>
+  </p:cSld>
+  <p:clrMapOvr>
+    <a:masterClrMapping/>
+  </p:clrMapOvr>
+</p:notes>
+</file>
+
+<file path=ppt/notesSlides/notesSlide43.xml><?xml version="1.0" encoding="utf-8"?>
+<p:notes xmlns:a="http://schemas.openxmlformats.org/drawingml/2006/main" xmlns:r="http://schemas.openxmlformats.org/officeDocument/2006/relationships" xmlns:p="http://schemas.openxmlformats.org/presentationml/2006/main">
+  <p:cSld>
+    <p:spTree>
+      <p:nvGrpSpPr>
+        <p:cNvPr id="1" name=""/>
+        <p:cNvGrpSpPr/>
+        <p:nvPr/>
+      </p:nvGrpSpPr>
+      <p:grpSpPr>
+        <a:xfrm>
+          <a:off x="0" y="0"/>
+          <a:ext cx="0" cy="0"/>
+          <a:chOff x="0" y="0"/>
+          <a:chExt cx="0" cy="0"/>
+        </a:xfrm>
+      </p:grpSpPr>
+      <p:sp>
+        <p:nvSpPr>
+          <p:cNvPr id="2" name="Slide Image Placeholder 1"/>
+          <p:cNvSpPr>
+            <a:spLocks noGrp="1" noRot="1" noChangeAspect="1"/>
+          </p:cNvSpPr>
+          <p:nvPr>
+            <p:ph type="sldImg"/>
+          </p:nvPr>
+        </p:nvSpPr>
+        <p:spPr/>
+      </p:sp>
+      <p:sp>
+        <p:nvSpPr>
+          <p:cNvPr id="3" name="Notes Placeholder 2"/>
+          <p:cNvSpPr>
+            <a:spLocks noGrp="1"/>
+          </p:cNvSpPr>
+          <p:nvPr>
+            <p:ph type="body" idx="1"/>
+          </p:nvPr>
+        </p:nvSpPr>
+        <p:spPr/>
+        <p:txBody>
+          <a:bodyPr/>
+          <a:lstStyle/>
+          <a:p>
+            <a:endParaRPr lang="en-US" b="0" dirty="0" smtClean="0"/>
+          </a:p>
+        </p:txBody>
+      </p:sp>
+      <p:sp>
+        <p:nvSpPr>
+          <p:cNvPr id="4" name="Slide Number Placeholder 3"/>
+          <p:cNvSpPr>
+            <a:spLocks noGrp="1"/>
+          </p:cNvSpPr>
+          <p:nvPr>
+            <p:ph type="sldNum" sz="quarter" idx="10"/>
+          </p:nvPr>
+        </p:nvSpPr>
+        <p:spPr/>
+        <p:txBody>
+          <a:bodyPr/>
+          <a:lstStyle/>
+          <a:p>
+            <a:fld id="{89029652-62E7-43D6-83B5-097D7B7AA5D8}" type="slidenum">
+              <a:rPr lang="en-US" smtClean="0"/>
+              <a:t>43</a:t>
+            </a:fld>
+            <a:endParaRPr lang="en-US"/>
+          </a:p>
+        </p:txBody>
+      </p:sp>
+    </p:spTree>
+    <p:extLst>
+      <p:ext uri="{BB962C8B-B14F-4D97-AF65-F5344CB8AC3E}">
+        <p14:creationId xmlns:p14="http://schemas.microsoft.com/office/powerpoint/2010/main" val="3271057564"/>
+      </p:ext>
+    </p:extLst>
+  </p:cSld>
+  <p:clrMapOvr>
+    <a:masterClrMapping/>
+  </p:clrMapOvr>
+</p:notes>
+</file>
+
+<file path=ppt/notesSlides/notesSlide44.xml><?xml version="1.0" encoding="utf-8"?>
+<p:notes xmlns:a="http://schemas.openxmlformats.org/drawingml/2006/main" xmlns:r="http://schemas.openxmlformats.org/officeDocument/2006/relationships" xmlns:p="http://schemas.openxmlformats.org/presentationml/2006/main">
+  <p:cSld>
+    <p:spTree>
+      <p:nvGrpSpPr>
+        <p:cNvPr id="1" name=""/>
+        <p:cNvGrpSpPr/>
+        <p:nvPr/>
+      </p:nvGrpSpPr>
+      <p:grpSpPr>
+        <a:xfrm>
+          <a:off x="0" y="0"/>
+          <a:ext cx="0" cy="0"/>
+          <a:chOff x="0" y="0"/>
+          <a:chExt cx="0" cy="0"/>
+        </a:xfrm>
+      </p:grpSpPr>
+      <p:sp>
+        <p:nvSpPr>
+          <p:cNvPr id="2" name="Slide Image Placeholder 1"/>
+          <p:cNvSpPr>
+            <a:spLocks noGrp="1" noRot="1" noChangeAspect="1"/>
+          </p:cNvSpPr>
+          <p:nvPr>
+            <p:ph type="sldImg"/>
+          </p:nvPr>
+        </p:nvSpPr>
+        <p:spPr/>
+      </p:sp>
+      <p:sp>
+        <p:nvSpPr>
+          <p:cNvPr id="3" name="Notes Placeholder 2"/>
+          <p:cNvSpPr>
+            <a:spLocks noGrp="1"/>
+          </p:cNvSpPr>
+          <p:nvPr>
+            <p:ph type="body" idx="1"/>
+          </p:nvPr>
+        </p:nvSpPr>
+        <p:spPr/>
+        <p:txBody>
+          <a:bodyPr/>
+          <a:lstStyle/>
+          <a:p>
+            <a:endParaRPr lang="en-US" sz="1200" kern="1200" dirty="0" smtClean="0">
+              <a:solidFill>
+                <a:schemeClr val="tx1"/>
+              </a:solidFill>
+              <a:effectLst/>
+              <a:latin typeface="+mn-lt"/>
+              <a:ea typeface="+mn-ea"/>
+              <a:cs typeface="+mn-cs"/>
+            </a:endParaRPr>
+          </a:p>
+        </p:txBody>
+      </p:sp>
+      <p:sp>
+        <p:nvSpPr>
+          <p:cNvPr id="4" name="Slide Number Placeholder 3"/>
+          <p:cNvSpPr>
+            <a:spLocks noGrp="1"/>
+          </p:cNvSpPr>
+          <p:nvPr>
+            <p:ph type="sldNum" sz="quarter" idx="10"/>
+          </p:nvPr>
+        </p:nvSpPr>
+        <p:spPr/>
+        <p:txBody>
+          <a:bodyPr/>
+          <a:lstStyle/>
+          <a:p>
+            <a:fld id="{89029652-62E7-43D6-83B5-097D7B7AA5D8}" type="slidenum">
+              <a:rPr lang="en-US" smtClean="0"/>
+              <a:t>44</a:t>
+            </a:fld>
+            <a:endParaRPr lang="en-US"/>
+          </a:p>
+        </p:txBody>
+      </p:sp>
+    </p:spTree>
+    <p:extLst>
+      <p:ext uri="{BB962C8B-B14F-4D97-AF65-F5344CB8AC3E}">
+        <p14:creationId xmlns:p14="http://schemas.microsoft.com/office/powerpoint/2010/main" val="2813022412"/>
       </p:ext>
     </p:extLst>
   </p:cSld>
@@ -3867,7 +4487,7 @@
           <a:p>
             <a:fld id="{75AA6396-395E-4ADA-8EE5-F328BC863A04}" type="datetimeFigureOut">
               <a:rPr lang="en-US" smtClean="0"/>
-              <a:t>12/22/2016</a:t>
+              <a:t>12/23/2016</a:t>
             </a:fld>
             <a:endParaRPr lang="en-US"/>
           </a:p>
@@ -4044,7 +4664,7 @@
           <a:p>
             <a:fld id="{75AA6396-395E-4ADA-8EE5-F328BC863A04}" type="datetimeFigureOut">
               <a:rPr lang="en-US" smtClean="0"/>
-              <a:t>12/22/2016</a:t>
+              <a:t>12/23/2016</a:t>
             </a:fld>
             <a:endParaRPr lang="en-US"/>
           </a:p>
@@ -4224,7 +4844,7 @@
           <a:p>
             <a:fld id="{75AA6396-395E-4ADA-8EE5-F328BC863A04}" type="datetimeFigureOut">
               <a:rPr lang="en-US" smtClean="0"/>
-              <a:t>12/22/2016</a:t>
+              <a:t>12/23/2016</a:t>
             </a:fld>
             <a:endParaRPr lang="en-US"/>
           </a:p>
@@ -4444,7 +5064,7 @@
           <a:p>
             <a:fld id="{75AA6396-395E-4ADA-8EE5-F328BC863A04}" type="datetimeFigureOut">
               <a:rPr lang="en-US" smtClean="0"/>
-              <a:t>12/22/2016</a:t>
+              <a:t>12/23/2016</a:t>
             </a:fld>
             <a:endParaRPr lang="en-US"/>
           </a:p>
@@ -4697,7 +5317,7 @@
           <a:p>
             <a:fld id="{75AA6396-395E-4ADA-8EE5-F328BC863A04}" type="datetimeFigureOut">
               <a:rPr lang="en-US" smtClean="0"/>
-              <a:t>12/22/2016</a:t>
+              <a:t>12/23/2016</a:t>
             </a:fld>
             <a:endParaRPr lang="en-US"/>
           </a:p>
@@ -4936,7 +5556,7 @@
           <a:p>
             <a:fld id="{75AA6396-395E-4ADA-8EE5-F328BC863A04}" type="datetimeFigureOut">
               <a:rPr lang="en-US" smtClean="0"/>
-              <a:t>12/22/2016</a:t>
+              <a:t>12/23/2016</a:t>
             </a:fld>
             <a:endParaRPr lang="en-US"/>
           </a:p>
@@ -5310,7 +5930,7 @@
           <a:p>
             <a:fld id="{75AA6396-395E-4ADA-8EE5-F328BC863A04}" type="datetimeFigureOut">
               <a:rPr lang="en-US" smtClean="0"/>
-              <a:t>12/22/2016</a:t>
+              <a:t>12/23/2016</a:t>
             </a:fld>
             <a:endParaRPr lang="en-US"/>
           </a:p>
@@ -5428,7 +6048,7 @@
           <a:p>
             <a:fld id="{75AA6396-395E-4ADA-8EE5-F328BC863A04}" type="datetimeFigureOut">
               <a:rPr lang="en-US" smtClean="0"/>
-              <a:t>12/22/2016</a:t>
+              <a:t>12/23/2016</a:t>
             </a:fld>
             <a:endParaRPr lang="en-US"/>
           </a:p>
@@ -5523,7 +6143,7 @@
           <a:p>
             <a:fld id="{75AA6396-395E-4ADA-8EE5-F328BC863A04}" type="datetimeFigureOut">
               <a:rPr lang="en-US" smtClean="0"/>
-              <a:t>12/22/2016</a:t>
+              <a:t>12/23/2016</a:t>
             </a:fld>
             <a:endParaRPr lang="en-US"/>
           </a:p>
@@ -5800,7 +6420,7 @@
           <a:p>
             <a:fld id="{75AA6396-395E-4ADA-8EE5-F328BC863A04}" type="datetimeFigureOut">
               <a:rPr lang="en-US" smtClean="0"/>
-              <a:t>12/22/2016</a:t>
+              <a:t>12/23/2016</a:t>
             </a:fld>
             <a:endParaRPr lang="en-US"/>
           </a:p>
@@ -6053,7 +6673,7 @@
           <a:p>
             <a:fld id="{75AA6396-395E-4ADA-8EE5-F328BC863A04}" type="datetimeFigureOut">
               <a:rPr lang="en-US" smtClean="0"/>
-              <a:t>12/22/2016</a:t>
+              <a:t>12/23/2016</a:t>
             </a:fld>
             <a:endParaRPr lang="en-US"/>
           </a:p>
@@ -6266,7 +6886,7 @@
           <a:p>
             <a:fld id="{75AA6396-395E-4ADA-8EE5-F328BC863A04}" type="datetimeFigureOut">
               <a:rPr lang="en-US" smtClean="0"/>
-              <a:t>12/22/2016</a:t>
+              <a:t>12/23/2016</a:t>
             </a:fld>
             <a:endParaRPr lang="en-US"/>
           </a:p>
@@ -8168,11 +8788,7 @@
           <a:p>
             <a:r>
               <a:rPr lang="en-US" sz="4000" dirty="0" smtClean="0"/>
-              <a:t>Can be made "secure </a:t>
-            </a:r>
-            <a:r>
-              <a:rPr lang="en-US" sz="4000" dirty="0" smtClean="0"/>
-              <a:t>by default"</a:t>
+              <a:t>Can be made "secure by default"</a:t>
             </a:r>
           </a:p>
           <a:p>
@@ -8412,17 +9028,7 @@
                   </a:schemeClr>
                 </a:solidFill>
               </a:rPr>
-              <a:t>Can be made "secure </a:t>
-            </a:r>
-            <a:r>
-              <a:rPr lang="en-US" sz="4000" dirty="0" smtClean="0">
-                <a:solidFill>
-                  <a:schemeClr val="bg1">
-                    <a:lumMod val="75000"/>
-                  </a:schemeClr>
-                </a:solidFill>
-              </a:rPr>
-              <a:t>by default"</a:t>
+              <a:t>Can be made "secure by default"</a:t>
             </a:r>
           </a:p>
           <a:p>
@@ -8433,7 +9039,6 @@
               <a:rPr lang="en-US" sz="4000" dirty="0" smtClean="0"/>
               <a:t>Needs auditing</a:t>
             </a:r>
-            <a:endParaRPr lang="en-US" sz="4000" dirty="0" smtClean="0"/>
           </a:p>
           <a:p>
             <a:endParaRPr lang="en-US" sz="4000" dirty="0"/>
@@ -8731,11 +9336,7 @@
             </a:r>
             <a:r>
               <a:rPr lang="en-US" sz="4800" dirty="0"/>
-              <a:t>- </a:t>
-            </a:r>
-            <a:r>
-              <a:rPr lang="en-US" sz="4800" dirty="0" smtClean="0"/>
-              <a:t>feature</a:t>
+              <a:t>– feature</a:t>
             </a:r>
             <a:endParaRPr lang="en-US" sz="4800" dirty="0"/>
           </a:p>
@@ -8868,6 +9469,152 @@
             <p:ph type="title"/>
           </p:nvPr>
         </p:nvSpPr>
+        <p:spPr/>
+        <p:txBody>
+          <a:bodyPr>
+            <a:normAutofit/>
+          </a:bodyPr>
+          <a:lstStyle/>
+          <a:p>
+            <a:r>
+              <a:rPr lang="en-US" sz="4800" dirty="0" smtClean="0"/>
+              <a:t>CSRF Defense </a:t>
+            </a:r>
+            <a:r>
+              <a:rPr lang="en-US" sz="4800" dirty="0" smtClean="0"/>
+              <a:t>– feature (ajax)</a:t>
+            </a:r>
+            <a:endParaRPr lang="en-US" sz="4800" dirty="0"/>
+          </a:p>
+        </p:txBody>
+      </p:sp>
+      <p:sp>
+        <p:nvSpPr>
+          <p:cNvPr id="3" name="Content Placeholder 2"/>
+          <p:cNvSpPr>
+            <a:spLocks noGrp="1"/>
+          </p:cNvSpPr>
+          <p:nvPr>
+            <p:ph idx="1"/>
+          </p:nvPr>
+        </p:nvSpPr>
+        <p:spPr>
+          <a:xfrm>
+            <a:off x="838200" y="1825624"/>
+            <a:ext cx="10515600" cy="4589923"/>
+          </a:xfrm>
+        </p:spPr>
+        <p:txBody>
+          <a:bodyPr>
+            <a:normAutofit/>
+          </a:bodyPr>
+          <a:lstStyle/>
+          <a:p>
+            <a:endParaRPr lang="en-US" dirty="0" smtClean="0"/>
+          </a:p>
+          <a:p>
+            <a:endParaRPr lang="en-US" dirty="0" smtClean="0"/>
+          </a:p>
+          <a:p>
+            <a:endParaRPr lang="en-US" dirty="0"/>
+          </a:p>
+        </p:txBody>
+      </p:sp>
+      <p:pic>
+        <p:nvPicPr>
+          <p:cNvPr id="4" name="Picture 3"/>
+          <p:cNvPicPr>
+            <a:picLocks noChangeAspect="1"/>
+          </p:cNvPicPr>
+          <p:nvPr/>
+        </p:nvPicPr>
+        <p:blipFill>
+          <a:blip r:embed="rId3"/>
+          <a:stretch>
+            <a:fillRect/>
+          </a:stretch>
+        </p:blipFill>
+        <p:spPr>
+          <a:xfrm>
+            <a:off x="838199" y="1990797"/>
+            <a:ext cx="5415116" cy="1250908"/>
+          </a:xfrm>
+          <a:prstGeom prst="rect">
+            <a:avLst/>
+          </a:prstGeom>
+        </p:spPr>
+      </p:pic>
+      <p:pic>
+        <p:nvPicPr>
+          <p:cNvPr id="7" name="Picture 6"/>
+          <p:cNvPicPr>
+            <a:picLocks noChangeAspect="1"/>
+          </p:cNvPicPr>
+          <p:nvPr/>
+        </p:nvPicPr>
+        <p:blipFill>
+          <a:blip r:embed="rId4"/>
+          <a:stretch>
+            <a:fillRect/>
+          </a:stretch>
+        </p:blipFill>
+        <p:spPr>
+          <a:xfrm>
+            <a:off x="838199" y="3748290"/>
+            <a:ext cx="11309381" cy="2416535"/>
+          </a:xfrm>
+          <a:prstGeom prst="rect">
+            <a:avLst/>
+          </a:prstGeom>
+        </p:spPr>
+      </p:pic>
+    </p:spTree>
+    <p:extLst>
+      <p:ext uri="{BB962C8B-B14F-4D97-AF65-F5344CB8AC3E}">
+        <p14:creationId xmlns:p14="http://schemas.microsoft.com/office/powerpoint/2010/main" val="3922507534"/>
+      </p:ext>
+    </p:extLst>
+  </p:cSld>
+  <p:clrMapOvr>
+    <a:masterClrMapping/>
+  </p:clrMapOvr>
+  <p:timing>
+    <p:tnLst>
+      <p:par>
+        <p:cTn id="1" dur="indefinite" restart="never" nodeType="tmRoot"/>
+      </p:par>
+    </p:tnLst>
+  </p:timing>
+</p:sld>
+</file>
+
+<file path=ppt/slides/slide25.xml><?xml version="1.0" encoding="utf-8"?>
+<p:sld xmlns:a="http://schemas.openxmlformats.org/drawingml/2006/main" xmlns:r="http://schemas.openxmlformats.org/officeDocument/2006/relationships" xmlns:p="http://schemas.openxmlformats.org/presentationml/2006/main">
+  <p:cSld>
+    <p:spTree>
+      <p:nvGrpSpPr>
+        <p:cNvPr id="1" name=""/>
+        <p:cNvGrpSpPr/>
+        <p:nvPr/>
+      </p:nvGrpSpPr>
+      <p:grpSpPr>
+        <a:xfrm>
+          <a:off x="0" y="0"/>
+          <a:ext cx="0" cy="0"/>
+          <a:chOff x="0" y="0"/>
+          <a:chExt cx="0" cy="0"/>
+        </a:xfrm>
+      </p:grpSpPr>
+      <p:sp>
+        <p:nvSpPr>
+          <p:cNvPr id="2" name="Title 1"/>
+          <p:cNvSpPr>
+            <a:spLocks noGrp="1"/>
+          </p:cNvSpPr>
+          <p:nvPr>
+            <p:ph type="title"/>
+          </p:nvPr>
+        </p:nvSpPr>
         <p:spPr>
           <a:xfrm>
             <a:off x="838200" y="365125"/>
@@ -8882,7 +9629,15 @@
           <a:p>
             <a:r>
               <a:rPr lang="en-US" sz="4800" dirty="0" smtClean="0"/>
-              <a:t>CSRF Defense - framework</a:t>
+              <a:t>CSRF Defense </a:t>
+            </a:r>
+            <a:r>
+              <a:rPr lang="en-US" sz="4800" dirty="0"/>
+              <a:t>– </a:t>
+            </a:r>
+            <a:r>
+              <a:rPr lang="en-US" sz="4800" dirty="0" smtClean="0"/>
+              <a:t>cross cutting</a:t>
             </a:r>
             <a:endParaRPr lang="en-US" sz="4800" dirty="0"/>
           </a:p>
@@ -8976,7 +9731,7 @@
 </p:sld>
 </file>
 
-<file path=ppt/slides/slide25.xml><?xml version="1.0" encoding="utf-8"?>
+<file path=ppt/slides/slide26.xml><?xml version="1.0" encoding="utf-8"?>
 <p:sld xmlns:a="http://schemas.openxmlformats.org/drawingml/2006/main" xmlns:r="http://schemas.openxmlformats.org/officeDocument/2006/relationships" xmlns:p="http://schemas.openxmlformats.org/presentationml/2006/main">
   <p:cSld>
     <p:spTree>
@@ -9017,7 +9772,11 @@
           <a:p>
             <a:r>
               <a:rPr lang="en-US" sz="4800" dirty="0" smtClean="0"/>
-              <a:t>CSRF Defense - framework</a:t>
+              <a:t>CSRF Defense </a:t>
+            </a:r>
+            <a:r>
+              <a:rPr lang="en-US" sz="4800" dirty="0"/>
+              <a:t>– cross cutting</a:t>
             </a:r>
             <a:endParaRPr lang="en-US" sz="4800" dirty="0"/>
           </a:p>
@@ -9111,7 +9870,7 @@
 </p:sld>
 </file>
 
-<file path=ppt/slides/slide26.xml><?xml version="1.0" encoding="utf-8"?>
+<file path=ppt/slides/slide27.xml><?xml version="1.0" encoding="utf-8"?>
 <p:sld xmlns:a="http://schemas.openxmlformats.org/drawingml/2006/main" xmlns:r="http://schemas.openxmlformats.org/officeDocument/2006/relationships" xmlns:p="http://schemas.openxmlformats.org/presentationml/2006/main">
   <p:cSld>
     <p:spTree>
@@ -9152,7 +9911,150 @@
           <a:p>
             <a:r>
               <a:rPr lang="en-US" sz="4800" dirty="0" smtClean="0"/>
-              <a:t>CSRF Defense - framework</a:t>
+              <a:t>CSRF Defense </a:t>
+            </a:r>
+            <a:r>
+              <a:rPr lang="en-US" sz="4800" dirty="0"/>
+              <a:t>– cross cutting</a:t>
+            </a:r>
+            <a:endParaRPr lang="en-US" sz="4800" dirty="0"/>
+          </a:p>
+        </p:txBody>
+      </p:sp>
+      <p:sp>
+        <p:nvSpPr>
+          <p:cNvPr id="3" name="Content Placeholder 2"/>
+          <p:cNvSpPr>
+            <a:spLocks noGrp="1"/>
+          </p:cNvSpPr>
+          <p:nvPr>
+            <p:ph idx="1"/>
+          </p:nvPr>
+        </p:nvSpPr>
+        <p:spPr>
+          <a:xfrm>
+            <a:off x="838200" y="1825624"/>
+            <a:ext cx="10515600" cy="4899641"/>
+          </a:xfrm>
+        </p:spPr>
+        <p:txBody>
+          <a:bodyPr>
+            <a:normAutofit/>
+          </a:bodyPr>
+          <a:lstStyle/>
+          <a:p>
+            <a:endParaRPr lang="en-US" sz="4000" dirty="0" smtClean="0"/>
+          </a:p>
+          <a:p>
+            <a:endParaRPr lang="en-US" sz="4000" dirty="0"/>
+          </a:p>
+          <a:p>
+            <a:endParaRPr lang="en-US" sz="4000" dirty="0" smtClean="0"/>
+          </a:p>
+          <a:p>
+            <a:endParaRPr lang="en-US" sz="4000" dirty="0" smtClean="0"/>
+          </a:p>
+          <a:p>
+            <a:endParaRPr lang="en-US" dirty="0" smtClean="0"/>
+          </a:p>
+          <a:p>
+            <a:endParaRPr lang="en-US" dirty="0" smtClean="0"/>
+          </a:p>
+          <a:p>
+            <a:endParaRPr lang="en-US" dirty="0"/>
+          </a:p>
+        </p:txBody>
+      </p:sp>
+      <p:pic>
+        <p:nvPicPr>
+          <p:cNvPr id="4" name="Picture 3"/>
+          <p:cNvPicPr>
+            <a:picLocks noChangeAspect="1"/>
+          </p:cNvPicPr>
+          <p:nvPr/>
+        </p:nvPicPr>
+        <p:blipFill>
+          <a:blip r:embed="rId3"/>
+          <a:stretch>
+            <a:fillRect/>
+          </a:stretch>
+        </p:blipFill>
+        <p:spPr>
+          <a:xfrm>
+            <a:off x="218981" y="2354365"/>
+            <a:ext cx="11754038" cy="3323764"/>
+          </a:xfrm>
+          <a:prstGeom prst="rect">
+            <a:avLst/>
+          </a:prstGeom>
+        </p:spPr>
+      </p:pic>
+    </p:spTree>
+    <p:extLst>
+      <p:ext uri="{BB962C8B-B14F-4D97-AF65-F5344CB8AC3E}">
+        <p14:creationId xmlns:p14="http://schemas.microsoft.com/office/powerpoint/2010/main" val="2513997030"/>
+      </p:ext>
+    </p:extLst>
+  </p:cSld>
+  <p:clrMapOvr>
+    <a:masterClrMapping/>
+  </p:clrMapOvr>
+  <p:timing>
+    <p:tnLst>
+      <p:par>
+        <p:cTn id="1" dur="indefinite" restart="never" nodeType="tmRoot"/>
+      </p:par>
+    </p:tnLst>
+  </p:timing>
+</p:sld>
+</file>
+
+<file path=ppt/slides/slide28.xml><?xml version="1.0" encoding="utf-8"?>
+<p:sld xmlns:a="http://schemas.openxmlformats.org/drawingml/2006/main" xmlns:r="http://schemas.openxmlformats.org/officeDocument/2006/relationships" xmlns:p="http://schemas.openxmlformats.org/presentationml/2006/main">
+  <p:cSld>
+    <p:spTree>
+      <p:nvGrpSpPr>
+        <p:cNvPr id="1" name=""/>
+        <p:cNvGrpSpPr/>
+        <p:nvPr/>
+      </p:nvGrpSpPr>
+      <p:grpSpPr>
+        <a:xfrm>
+          <a:off x="0" y="0"/>
+          <a:ext cx="0" cy="0"/>
+          <a:chOff x="0" y="0"/>
+          <a:chExt cx="0" cy="0"/>
+        </a:xfrm>
+      </p:grpSpPr>
+      <p:sp>
+        <p:nvSpPr>
+          <p:cNvPr id="2" name="Title 1"/>
+          <p:cNvSpPr>
+            <a:spLocks noGrp="1"/>
+          </p:cNvSpPr>
+          <p:nvPr>
+            <p:ph type="title"/>
+          </p:nvPr>
+        </p:nvSpPr>
+        <p:spPr>
+          <a:xfrm>
+            <a:off x="838200" y="365125"/>
+            <a:ext cx="10960510" cy="1325563"/>
+          </a:xfrm>
+        </p:spPr>
+        <p:txBody>
+          <a:bodyPr>
+            <a:normAutofit/>
+          </a:bodyPr>
+          <a:lstStyle/>
+          <a:p>
+            <a:r>
+              <a:rPr lang="en-US" sz="4800" dirty="0" smtClean="0"/>
+              <a:t>CSRF Defense </a:t>
+            </a:r>
+            <a:r>
+              <a:rPr lang="en-US" sz="4800" dirty="0"/>
+              <a:t>– cross cutting</a:t>
             </a:r>
             <a:endParaRPr lang="en-US" sz="4800" dirty="0"/>
           </a:p>
@@ -9246,7 +10148,7 @@
 </p:sld>
 </file>
 
-<file path=ppt/slides/slide27.xml><?xml version="1.0" encoding="utf-8"?>
+<file path=ppt/slides/slide29.xml><?xml version="1.0" encoding="utf-8"?>
 <p:sld xmlns:a="http://schemas.openxmlformats.org/drawingml/2006/main" xmlns:r="http://schemas.openxmlformats.org/officeDocument/2006/relationships" xmlns:p="http://schemas.openxmlformats.org/presentationml/2006/main">
   <p:cSld>
     <p:spTree>
@@ -9286,11 +10188,7 @@
             </a:r>
             <a:r>
               <a:rPr lang="en-US" sz="4800" dirty="0"/>
-              <a:t>- </a:t>
-            </a:r>
-            <a:r>
-              <a:rPr lang="en-US" sz="4800" dirty="0" smtClean="0"/>
-              <a:t>framework</a:t>
+              <a:t>– cross cutting</a:t>
             </a:r>
             <a:endParaRPr lang="en-US" sz="4800" dirty="0"/>
           </a:p>
@@ -9396,234 +10294,6 @@
 </p:sld>
 </file>
 
-<file path=ppt/slides/slide28.xml><?xml version="1.0" encoding="utf-8"?>
-<p:sld xmlns:a="http://schemas.openxmlformats.org/drawingml/2006/main" xmlns:r="http://schemas.openxmlformats.org/officeDocument/2006/relationships" xmlns:p="http://schemas.openxmlformats.org/presentationml/2006/main">
-  <p:cSld>
-    <p:spTree>
-      <p:nvGrpSpPr>
-        <p:cNvPr id="1" name=""/>
-        <p:cNvGrpSpPr/>
-        <p:nvPr/>
-      </p:nvGrpSpPr>
-      <p:grpSpPr>
-        <a:xfrm>
-          <a:off x="0" y="0"/>
-          <a:ext cx="0" cy="0"/>
-          <a:chOff x="0" y="0"/>
-          <a:chExt cx="0" cy="0"/>
-        </a:xfrm>
-      </p:grpSpPr>
-      <p:sp>
-        <p:nvSpPr>
-          <p:cNvPr id="2" name="Title 1"/>
-          <p:cNvSpPr>
-            <a:spLocks noGrp="1"/>
-          </p:cNvSpPr>
-          <p:nvPr>
-            <p:ph type="title"/>
-          </p:nvPr>
-        </p:nvSpPr>
-        <p:spPr/>
-        <p:txBody>
-          <a:bodyPr>
-            <a:normAutofit/>
-          </a:bodyPr>
-          <a:lstStyle/>
-          <a:p>
-            <a:r>
-              <a:rPr lang="en-US" sz="4800" dirty="0" smtClean="0"/>
-              <a:t>Patented step-by-step slide</a:t>
-            </a:r>
-            <a:endParaRPr lang="en-US" sz="4800" dirty="0"/>
-          </a:p>
-        </p:txBody>
-      </p:sp>
-      <p:sp>
-        <p:nvSpPr>
-          <p:cNvPr id="3" name="Content Placeholder 2"/>
-          <p:cNvSpPr>
-            <a:spLocks noGrp="1"/>
-          </p:cNvSpPr>
-          <p:nvPr>
-            <p:ph idx="1"/>
-          </p:nvPr>
-        </p:nvSpPr>
-        <p:spPr>
-          <a:xfrm>
-            <a:off x="838200" y="1825624"/>
-            <a:ext cx="10515600" cy="4589923"/>
-          </a:xfrm>
-        </p:spPr>
-        <p:txBody>
-          <a:bodyPr>
-            <a:normAutofit/>
-          </a:bodyPr>
-          <a:lstStyle/>
-          <a:p>
-            <a:r>
-              <a:rPr lang="en-US" sz="4000" dirty="0" smtClean="0">
-                <a:solidFill>
-                  <a:schemeClr val="bg1">
-                    <a:lumMod val="65000"/>
-                  </a:schemeClr>
-                </a:solidFill>
-              </a:rPr>
-              <a:t>Old news</a:t>
-            </a:r>
-            <a:br>
-              <a:rPr lang="en-US" sz="4000" dirty="0" smtClean="0">
-                <a:solidFill>
-                  <a:schemeClr val="bg1">
-                    <a:lumMod val="65000"/>
-                  </a:schemeClr>
-                </a:solidFill>
-              </a:rPr>
-            </a:br>
-            <a:endParaRPr lang="en-US" sz="4000" dirty="0" smtClean="0">
-              <a:solidFill>
-                <a:schemeClr val="bg1">
-                  <a:lumMod val="65000"/>
-                </a:schemeClr>
-              </a:solidFill>
-            </a:endParaRPr>
-          </a:p>
-          <a:p>
-            <a:r>
-              <a:rPr lang="en-US" sz="4000" b="1" dirty="0" smtClean="0"/>
-              <a:t>New hotness</a:t>
-            </a:r>
-          </a:p>
-          <a:p>
-            <a:endParaRPr lang="en-US" sz="4000" dirty="0" smtClean="0"/>
-          </a:p>
-          <a:p>
-            <a:endParaRPr lang="en-US" dirty="0" smtClean="0"/>
-          </a:p>
-          <a:p>
-            <a:endParaRPr lang="en-US" dirty="0" smtClean="0"/>
-          </a:p>
-          <a:p>
-            <a:endParaRPr lang="en-US" dirty="0"/>
-          </a:p>
-        </p:txBody>
-      </p:sp>
-    </p:spTree>
-    <p:extLst>
-      <p:ext uri="{BB962C8B-B14F-4D97-AF65-F5344CB8AC3E}">
-        <p14:creationId xmlns:p14="http://schemas.microsoft.com/office/powerpoint/2010/main" val="1887088746"/>
-      </p:ext>
-    </p:extLst>
-  </p:cSld>
-  <p:clrMapOvr>
-    <a:masterClrMapping/>
-  </p:clrMapOvr>
-  <p:timing>
-    <p:tnLst>
-      <p:par>
-        <p:cTn id="1" dur="indefinite" restart="never" nodeType="tmRoot"/>
-      </p:par>
-    </p:tnLst>
-  </p:timing>
-</p:sld>
-</file>
-
-<file path=ppt/slides/slide29.xml><?xml version="1.0" encoding="utf-8"?>
-<p:sld xmlns:a="http://schemas.openxmlformats.org/drawingml/2006/main" xmlns:r="http://schemas.openxmlformats.org/officeDocument/2006/relationships" xmlns:p="http://schemas.openxmlformats.org/presentationml/2006/main">
-  <p:cSld>
-    <p:spTree>
-      <p:nvGrpSpPr>
-        <p:cNvPr id="1" name=""/>
-        <p:cNvGrpSpPr/>
-        <p:nvPr/>
-      </p:nvGrpSpPr>
-      <p:grpSpPr>
-        <a:xfrm>
-          <a:off x="0" y="0"/>
-          <a:ext cx="0" cy="0"/>
-          <a:chOff x="0" y="0"/>
-          <a:chExt cx="0" cy="0"/>
-        </a:xfrm>
-      </p:grpSpPr>
-      <p:sp>
-        <p:nvSpPr>
-          <p:cNvPr id="2" name="Title 1"/>
-          <p:cNvSpPr>
-            <a:spLocks noGrp="1"/>
-          </p:cNvSpPr>
-          <p:nvPr>
-            <p:ph type="title"/>
-          </p:nvPr>
-        </p:nvSpPr>
-        <p:spPr/>
-        <p:txBody>
-          <a:bodyPr>
-            <a:normAutofit/>
-          </a:bodyPr>
-          <a:lstStyle/>
-          <a:p>
-            <a:r>
-              <a:rPr lang="en-US" sz="4800" dirty="0" smtClean="0"/>
-              <a:t>Canonical example: SQL Injection</a:t>
-            </a:r>
-            <a:endParaRPr lang="en-US" sz="4800" dirty="0"/>
-          </a:p>
-        </p:txBody>
-      </p:sp>
-      <p:sp>
-        <p:nvSpPr>
-          <p:cNvPr id="3" name="Content Placeholder 2"/>
-          <p:cNvSpPr>
-            <a:spLocks noGrp="1"/>
-          </p:cNvSpPr>
-          <p:nvPr>
-            <p:ph idx="1"/>
-          </p:nvPr>
-        </p:nvSpPr>
-        <p:spPr>
-          <a:xfrm>
-            <a:off x="838200" y="1825624"/>
-            <a:ext cx="10515600" cy="4589923"/>
-          </a:xfrm>
-        </p:spPr>
-        <p:txBody>
-          <a:bodyPr>
-            <a:normAutofit/>
-          </a:bodyPr>
-          <a:lstStyle/>
-          <a:p>
-            <a:endParaRPr lang="en-US" sz="4000" dirty="0" smtClean="0"/>
-          </a:p>
-          <a:p>
-            <a:endParaRPr lang="en-US" dirty="0" smtClean="0"/>
-          </a:p>
-          <a:p>
-            <a:endParaRPr lang="en-US" dirty="0" smtClean="0"/>
-          </a:p>
-          <a:p>
-            <a:endParaRPr lang="en-US" dirty="0"/>
-          </a:p>
-        </p:txBody>
-      </p:sp>
-    </p:spTree>
-    <p:extLst>
-      <p:ext uri="{BB962C8B-B14F-4D97-AF65-F5344CB8AC3E}">
-        <p14:creationId xmlns:p14="http://schemas.microsoft.com/office/powerpoint/2010/main" val="1766242099"/>
-      </p:ext>
-    </p:extLst>
-  </p:cSld>
-  <p:clrMapOvr>
-    <a:masterClrMapping/>
-  </p:clrMapOvr>
-  <p:timing>
-    <p:tnLst>
-      <p:par>
-        <p:cTn id="1" dur="indefinite" restart="never" nodeType="tmRoot"/>
-      </p:par>
-    </p:tnLst>
-  </p:timing>
-</p:sld>
-</file>
-
 <file path=ppt/slides/slide3.xml><?xml version="1.0" encoding="utf-8"?>
 <p:sld xmlns:a="http://schemas.openxmlformats.org/drawingml/2006/main" xmlns:r="http://schemas.openxmlformats.org/officeDocument/2006/relationships" xmlns:p="http://schemas.openxmlformats.org/presentationml/2006/main">
   <p:cSld>
@@ -9749,7 +10419,15 @@
           <a:p>
             <a:r>
               <a:rPr lang="en-US" sz="4800" dirty="0" smtClean="0"/>
-              <a:t>Authorization - feature</a:t>
+              <a:t>CSRF Defense </a:t>
+            </a:r>
+            <a:r>
+              <a:rPr lang="en-US" sz="4800" dirty="0"/>
+              <a:t>– cross </a:t>
+            </a:r>
+            <a:r>
+              <a:rPr lang="en-US" sz="4800" dirty="0" smtClean="0"/>
+              <a:t>cutting (ajax)</a:t>
             </a:r>
             <a:endParaRPr lang="en-US" sz="4800" dirty="0"/>
           </a:p>
@@ -9777,9 +10455,6 @@
           </a:bodyPr>
           <a:lstStyle/>
           <a:p>
-            <a:endParaRPr lang="en-US" sz="4000" dirty="0" smtClean="0"/>
-          </a:p>
-          <a:p>
             <a:endParaRPr lang="en-US" dirty="0" smtClean="0"/>
           </a:p>
           <a:p>
@@ -9792,7 +10467,7 @@
       </p:sp>
       <p:pic>
         <p:nvPicPr>
-          <p:cNvPr id="5" name="Picture 4"/>
+          <p:cNvPr id="6" name="Picture 5"/>
           <p:cNvPicPr>
             <a:picLocks noChangeAspect="1"/>
           </p:cNvPicPr>
@@ -9806,8 +10481,32 @@
         </p:blipFill>
         <p:spPr>
           <a:xfrm>
-            <a:off x="838200" y="2946501"/>
-            <a:ext cx="10431478" cy="2554647"/>
+            <a:off x="838200" y="1695088"/>
+            <a:ext cx="9342718" cy="2215434"/>
+          </a:xfrm>
+          <a:prstGeom prst="rect">
+            <a:avLst/>
+          </a:prstGeom>
+        </p:spPr>
+      </p:pic>
+      <p:pic>
+        <p:nvPicPr>
+          <p:cNvPr id="7" name="Picture 6"/>
+          <p:cNvPicPr>
+            <a:picLocks noChangeAspect="1"/>
+          </p:cNvPicPr>
+          <p:nvPr/>
+        </p:nvPicPr>
+        <p:blipFill>
+          <a:blip r:embed="rId4"/>
+          <a:stretch>
+            <a:fillRect/>
+          </a:stretch>
+        </p:blipFill>
+        <p:spPr>
+          <a:xfrm>
+            <a:off x="838200" y="4175994"/>
+            <a:ext cx="9452294" cy="2505025"/>
           </a:xfrm>
           <a:prstGeom prst="rect">
             <a:avLst/>
@@ -9817,7 +10516,7 @@
     </p:spTree>
     <p:extLst>
       <p:ext uri="{BB962C8B-B14F-4D97-AF65-F5344CB8AC3E}">
-        <p14:creationId xmlns:p14="http://schemas.microsoft.com/office/powerpoint/2010/main" val="176538875"/>
+        <p14:creationId xmlns:p14="http://schemas.microsoft.com/office/powerpoint/2010/main" val="2578231445"/>
       </p:ext>
     </p:extLst>
   </p:cSld>
@@ -9861,88 +10560,84 @@
             <p:ph type="title"/>
           </p:nvPr>
         </p:nvSpPr>
-        <p:spPr/>
-        <p:txBody>
-          <a:bodyPr>
+        <p:spPr>
+          <a:xfrm>
+            <a:off x="964927" y="1"/>
+            <a:ext cx="10515600" cy="6858000"/>
+          </a:xfrm>
+        </p:spPr>
+        <p:txBody>
+          <a:bodyPr anchor="ctr">
             <a:normAutofit/>
           </a:bodyPr>
           <a:lstStyle/>
           <a:p>
+            <a:pPr algn="ctr"/>
+            <a:r>
+              <a:rPr lang="en-US" sz="4800" dirty="0" smtClean="0"/>
+              <a:t>Authorization</a:t>
+            </a:r>
+            <a:br>
+              <a:rPr lang="en-US" sz="4800" dirty="0" smtClean="0"/>
+            </a:br>
             <a:r>
               <a:rPr lang="en-US" sz="4800" dirty="0"/>
-              <a:t>Authorization - </a:t>
-            </a:r>
-            <a:r>
-              <a:rPr lang="en-US" sz="4800" dirty="0" smtClean="0"/>
-              <a:t>framework</a:t>
-            </a:r>
-            <a:endParaRPr lang="en-US" sz="4800" dirty="0"/>
-          </a:p>
-        </p:txBody>
-      </p:sp>
-      <p:sp>
-        <p:nvSpPr>
-          <p:cNvPr id="3" name="Content Placeholder 2"/>
-          <p:cNvSpPr>
-            <a:spLocks noGrp="1"/>
-          </p:cNvSpPr>
-          <p:nvPr>
-            <p:ph idx="1"/>
-          </p:nvPr>
-        </p:nvSpPr>
-        <p:spPr>
-          <a:xfrm>
-            <a:off x="838200" y="1825624"/>
-            <a:ext cx="10515600" cy="4589923"/>
-          </a:xfrm>
-        </p:spPr>
-        <p:txBody>
-          <a:bodyPr>
-            <a:normAutofit/>
-          </a:bodyPr>
-          <a:lstStyle/>
-          <a:p>
-            <a:endParaRPr lang="en-US" sz="4000" dirty="0" smtClean="0"/>
-          </a:p>
-          <a:p>
-            <a:endParaRPr lang="en-US" dirty="0" smtClean="0"/>
-          </a:p>
-          <a:p>
-            <a:endParaRPr lang="en-US" dirty="0" smtClean="0"/>
-          </a:p>
-          <a:p>
-            <a:endParaRPr lang="en-US" dirty="0"/>
-          </a:p>
-        </p:txBody>
-      </p:sp>
-      <p:pic>
-        <p:nvPicPr>
-          <p:cNvPr id="5" name="Picture 4"/>
-          <p:cNvPicPr>
-            <a:picLocks noChangeAspect="1"/>
-          </p:cNvPicPr>
-          <p:nvPr/>
-        </p:nvPicPr>
-        <p:blipFill>
-          <a:blip r:embed="rId3"/>
-          <a:stretch>
-            <a:fillRect/>
-          </a:stretch>
-        </p:blipFill>
-        <p:spPr>
-          <a:xfrm>
-            <a:off x="838201" y="2736220"/>
-            <a:ext cx="9677400" cy="1971323"/>
-          </a:xfrm>
-          <a:prstGeom prst="rect">
-            <a:avLst/>
-          </a:prstGeom>
-        </p:spPr>
-      </p:pic>
+              <a:t/>
+            </a:r>
+            <a:br>
+              <a:rPr lang="en-US" sz="4800" dirty="0"/>
+            </a:br>
+            <a:r>
+              <a:rPr lang="en-US" dirty="0" smtClean="0">
+                <a:solidFill>
+                  <a:srgbClr val="013947"/>
+                </a:solidFill>
+              </a:rPr>
+              <a:t>Is user </a:t>
+            </a:r>
+            <a:r>
+              <a:rPr lang="en-US" u="sng" dirty="0" smtClean="0">
+                <a:solidFill>
+                  <a:srgbClr val="013947"/>
+                </a:solidFill>
+              </a:rPr>
+              <a:t>allowed</a:t>
+            </a:r>
+            <a:r>
+              <a:rPr lang="en-US" dirty="0" smtClean="0">
+                <a:solidFill>
+                  <a:srgbClr val="013947"/>
+                </a:solidFill>
+              </a:rPr>
+              <a:t> to perform </a:t>
+            </a:r>
+            <a:br>
+              <a:rPr lang="en-US" dirty="0" smtClean="0">
+                <a:solidFill>
+                  <a:srgbClr val="013947"/>
+                </a:solidFill>
+              </a:rPr>
+            </a:br>
+            <a:r>
+              <a:rPr lang="en-US" dirty="0" smtClean="0">
+                <a:solidFill>
+                  <a:srgbClr val="013947"/>
+                </a:solidFill>
+              </a:rPr>
+              <a:t>a given request?</a:t>
+            </a:r>
+            <a:endParaRPr lang="en-US" sz="4800" dirty="0">
+              <a:solidFill>
+                <a:srgbClr val="013947"/>
+              </a:solidFill>
+            </a:endParaRPr>
+          </a:p>
+        </p:txBody>
+      </p:sp>
     </p:spTree>
     <p:extLst>
       <p:ext uri="{BB962C8B-B14F-4D97-AF65-F5344CB8AC3E}">
-        <p14:creationId xmlns:p14="http://schemas.microsoft.com/office/powerpoint/2010/main" val="4046002787"/>
+        <p14:creationId xmlns:p14="http://schemas.microsoft.com/office/powerpoint/2010/main" val="2983310270"/>
       </p:ext>
     </p:extLst>
   </p:cSld>
@@ -9978,6 +10673,31 @@
       </p:grpSpPr>
       <p:sp>
         <p:nvSpPr>
+          <p:cNvPr id="2" name="Title 1"/>
+          <p:cNvSpPr>
+            <a:spLocks noGrp="1"/>
+          </p:cNvSpPr>
+          <p:nvPr>
+            <p:ph type="title"/>
+          </p:nvPr>
+        </p:nvSpPr>
+        <p:spPr/>
+        <p:txBody>
+          <a:bodyPr>
+            <a:normAutofit/>
+          </a:bodyPr>
+          <a:lstStyle/>
+          <a:p>
+            <a:r>
+              <a:rPr lang="en-US" sz="4800" dirty="0"/>
+              <a:t>Page Authorization – feature</a:t>
+            </a:r>
+            <a:endParaRPr lang="en-US" sz="4800" dirty="0"/>
+          </a:p>
+        </p:txBody>
+      </p:sp>
+      <p:sp>
+        <p:nvSpPr>
           <p:cNvPr id="3" name="Content Placeholder 2"/>
           <p:cNvSpPr>
             <a:spLocks noGrp="1"/>
@@ -10013,7 +10733,7 @@
       </p:sp>
       <p:pic>
         <p:nvPicPr>
-          <p:cNvPr id="7" name="Picture 6"/>
+          <p:cNvPr id="5" name="Picture 4"/>
           <p:cNvPicPr>
             <a:picLocks noChangeAspect="1"/>
           </p:cNvPicPr>
@@ -10027,8 +10747,8 @@
         </p:blipFill>
         <p:spPr>
           <a:xfrm>
-            <a:off x="0" y="265470"/>
-            <a:ext cx="11983223" cy="6415547"/>
+            <a:off x="838199" y="2946501"/>
+            <a:ext cx="11154151" cy="2731628"/>
           </a:xfrm>
           <a:prstGeom prst="rect">
             <a:avLst/>
@@ -10038,7 +10758,7 @@
     </p:spTree>
     <p:extLst>
       <p:ext uri="{BB962C8B-B14F-4D97-AF65-F5344CB8AC3E}">
-        <p14:creationId xmlns:p14="http://schemas.microsoft.com/office/powerpoint/2010/main" val="1217261759"/>
+        <p14:creationId xmlns:p14="http://schemas.microsoft.com/office/powerpoint/2010/main" val="176538875"/>
       </p:ext>
     </p:extLst>
   </p:cSld>
@@ -10091,8 +10811,13 @@
           <a:p>
             <a:r>
               <a:rPr lang="en-US" sz="4800" dirty="0"/>
-              <a:t>Authorization - feature</a:t>
-            </a:r>
+              <a:t>Page Authorization – </a:t>
+            </a:r>
+            <a:r>
+              <a:rPr lang="en-US" sz="4800" dirty="0" smtClean="0"/>
+              <a:t>cross cutting</a:t>
+            </a:r>
+            <a:endParaRPr lang="en-US" sz="4800" dirty="0"/>
           </a:p>
         </p:txBody>
       </p:sp>
@@ -10133,7 +10858,7 @@
       </p:sp>
       <p:pic>
         <p:nvPicPr>
-          <p:cNvPr id="4" name="Picture 3"/>
+          <p:cNvPr id="5" name="Picture 4"/>
           <p:cNvPicPr>
             <a:picLocks noChangeAspect="1"/>
           </p:cNvPicPr>
@@ -10147,8 +10872,8 @@
         </p:blipFill>
         <p:spPr>
           <a:xfrm>
-            <a:off x="838200" y="2019736"/>
-            <a:ext cx="11012331" cy="4145090"/>
+            <a:off x="838200" y="2721471"/>
+            <a:ext cx="9677400" cy="1971323"/>
           </a:xfrm>
           <a:prstGeom prst="rect">
             <a:avLst/>
@@ -10158,7 +10883,7 @@
     </p:spTree>
     <p:extLst>
       <p:ext uri="{BB962C8B-B14F-4D97-AF65-F5344CB8AC3E}">
-        <p14:creationId xmlns:p14="http://schemas.microsoft.com/office/powerpoint/2010/main" val="806865913"/>
+        <p14:creationId xmlns:p14="http://schemas.microsoft.com/office/powerpoint/2010/main" val="4046002787"/>
       </p:ext>
     </p:extLst>
   </p:cSld>
@@ -10194,25 +10919,380 @@
       </p:grpSpPr>
       <p:sp>
         <p:nvSpPr>
-          <p:cNvPr id="2" name="Title 1"/>
-          <p:cNvSpPr>
-            <a:spLocks noGrp="1"/>
-          </p:cNvSpPr>
-          <p:nvPr>
-            <p:ph type="title"/>
-          </p:nvPr>
-        </p:nvSpPr>
-        <p:spPr/>
+          <p:cNvPr id="3" name="Content Placeholder 2"/>
+          <p:cNvSpPr>
+            <a:spLocks noGrp="1"/>
+          </p:cNvSpPr>
+          <p:nvPr>
+            <p:ph idx="1"/>
+          </p:nvPr>
+        </p:nvSpPr>
+        <p:spPr>
+          <a:xfrm>
+            <a:off x="838200" y="1825624"/>
+            <a:ext cx="10515600" cy="4589923"/>
+          </a:xfrm>
+        </p:spPr>
         <p:txBody>
           <a:bodyPr>
             <a:normAutofit/>
           </a:bodyPr>
           <a:lstStyle/>
           <a:p>
+            <a:endParaRPr lang="en-US" sz="4000" dirty="0" smtClean="0"/>
+          </a:p>
+          <a:p>
+            <a:endParaRPr lang="en-US" dirty="0" smtClean="0"/>
+          </a:p>
+          <a:p>
+            <a:endParaRPr lang="en-US" dirty="0" smtClean="0"/>
+          </a:p>
+          <a:p>
+            <a:endParaRPr lang="en-US" dirty="0"/>
+          </a:p>
+        </p:txBody>
+      </p:sp>
+      <p:pic>
+        <p:nvPicPr>
+          <p:cNvPr id="6" name="Picture 5"/>
+          <p:cNvPicPr>
+            <a:picLocks noChangeAspect="1"/>
+          </p:cNvPicPr>
+          <p:nvPr/>
+        </p:nvPicPr>
+        <p:blipFill>
+          <a:blip r:embed="rId3"/>
+          <a:stretch>
+            <a:fillRect/>
+          </a:stretch>
+        </p:blipFill>
+        <p:spPr>
+          <a:xfrm>
+            <a:off x="133231" y="133650"/>
+            <a:ext cx="11973255" cy="6488376"/>
+          </a:xfrm>
+          <a:prstGeom prst="rect">
+            <a:avLst/>
+          </a:prstGeom>
+        </p:spPr>
+      </p:pic>
+    </p:spTree>
+    <p:extLst>
+      <p:ext uri="{BB962C8B-B14F-4D97-AF65-F5344CB8AC3E}">
+        <p14:creationId xmlns:p14="http://schemas.microsoft.com/office/powerpoint/2010/main" val="1366898581"/>
+      </p:ext>
+    </p:extLst>
+  </p:cSld>
+  <p:clrMapOvr>
+    <a:masterClrMapping/>
+  </p:clrMapOvr>
+  <p:timing>
+    <p:tnLst>
+      <p:par>
+        <p:cTn id="1" dur="indefinite" restart="never" nodeType="tmRoot"/>
+      </p:par>
+    </p:tnLst>
+  </p:timing>
+</p:sld>
+</file>
+
+<file path=ppt/slides/slide35.xml><?xml version="1.0" encoding="utf-8"?>
+<p:sld xmlns:a="http://schemas.openxmlformats.org/drawingml/2006/main" xmlns:r="http://schemas.openxmlformats.org/officeDocument/2006/relationships" xmlns:p="http://schemas.openxmlformats.org/presentationml/2006/main">
+  <p:cSld>
+    <p:spTree>
+      <p:nvGrpSpPr>
+        <p:cNvPr id="1" name=""/>
+        <p:cNvGrpSpPr/>
+        <p:nvPr/>
+      </p:nvGrpSpPr>
+      <p:grpSpPr>
+        <a:xfrm>
+          <a:off x="0" y="0"/>
+          <a:ext cx="0" cy="0"/>
+          <a:chOff x="0" y="0"/>
+          <a:chExt cx="0" cy="0"/>
+        </a:xfrm>
+      </p:grpSpPr>
+      <p:sp>
+        <p:nvSpPr>
+          <p:cNvPr id="2" name="Title 1"/>
+          <p:cNvSpPr>
+            <a:spLocks noGrp="1"/>
+          </p:cNvSpPr>
+          <p:nvPr>
+            <p:ph type="title"/>
+          </p:nvPr>
+        </p:nvSpPr>
+        <p:spPr/>
+        <p:txBody>
+          <a:bodyPr>
+            <a:normAutofit/>
+          </a:bodyPr>
+          <a:lstStyle/>
+          <a:p>
+            <a:r>
+              <a:rPr lang="en-US" sz="4800" dirty="0" smtClean="0"/>
+              <a:t>Page Authorization </a:t>
+            </a:r>
             <a:r>
               <a:rPr lang="en-US" sz="4800" dirty="0"/>
-              <a:t>Authorization - framework</a:t>
-            </a:r>
+              <a:t>– </a:t>
+            </a:r>
+            <a:r>
+              <a:rPr lang="en-US" sz="4800" dirty="0" smtClean="0"/>
+              <a:t>auditing</a:t>
+            </a:r>
+            <a:endParaRPr lang="en-US" sz="4800" dirty="0"/>
+          </a:p>
+        </p:txBody>
+      </p:sp>
+      <p:sp>
+        <p:nvSpPr>
+          <p:cNvPr id="3" name="Content Placeholder 2"/>
+          <p:cNvSpPr>
+            <a:spLocks noGrp="1"/>
+          </p:cNvSpPr>
+          <p:nvPr>
+            <p:ph idx="1"/>
+          </p:nvPr>
+        </p:nvSpPr>
+        <p:spPr>
+          <a:xfrm>
+            <a:off x="838200" y="1825624"/>
+            <a:ext cx="10515600" cy="4589923"/>
+          </a:xfrm>
+        </p:spPr>
+        <p:txBody>
+          <a:bodyPr>
+            <a:normAutofit/>
+          </a:bodyPr>
+          <a:lstStyle/>
+          <a:p>
+            <a:endParaRPr lang="en-US" sz="4000" dirty="0" smtClean="0"/>
+          </a:p>
+          <a:p>
+            <a:endParaRPr lang="en-US" dirty="0" smtClean="0"/>
+          </a:p>
+          <a:p>
+            <a:endParaRPr lang="en-US" dirty="0" smtClean="0"/>
+          </a:p>
+          <a:p>
+            <a:endParaRPr lang="en-US" dirty="0"/>
+          </a:p>
+        </p:txBody>
+      </p:sp>
+      <p:pic>
+        <p:nvPicPr>
+          <p:cNvPr id="4" name="Picture 3"/>
+          <p:cNvPicPr>
+            <a:picLocks noChangeAspect="1"/>
+          </p:cNvPicPr>
+          <p:nvPr/>
+        </p:nvPicPr>
+        <p:blipFill>
+          <a:blip r:embed="rId3"/>
+          <a:stretch>
+            <a:fillRect/>
+          </a:stretch>
+        </p:blipFill>
+        <p:spPr>
+          <a:xfrm>
+            <a:off x="838199" y="1690688"/>
+            <a:ext cx="7509387" cy="5073546"/>
+          </a:xfrm>
+          <a:prstGeom prst="rect">
+            <a:avLst/>
+          </a:prstGeom>
+        </p:spPr>
+      </p:pic>
+    </p:spTree>
+    <p:extLst>
+      <p:ext uri="{BB962C8B-B14F-4D97-AF65-F5344CB8AC3E}">
+        <p14:creationId xmlns:p14="http://schemas.microsoft.com/office/powerpoint/2010/main" val="3981982837"/>
+      </p:ext>
+    </p:extLst>
+  </p:cSld>
+  <p:clrMapOvr>
+    <a:masterClrMapping/>
+  </p:clrMapOvr>
+  <p:timing>
+    <p:tnLst>
+      <p:par>
+        <p:cTn id="1" dur="indefinite" restart="never" nodeType="tmRoot"/>
+      </p:par>
+    </p:tnLst>
+  </p:timing>
+</p:sld>
+</file>
+
+<file path=ppt/slides/slide36.xml><?xml version="1.0" encoding="utf-8"?>
+<p:sld xmlns:a="http://schemas.openxmlformats.org/drawingml/2006/main" xmlns:r="http://schemas.openxmlformats.org/officeDocument/2006/relationships" xmlns:p="http://schemas.openxmlformats.org/presentationml/2006/main">
+  <p:cSld>
+    <p:spTree>
+      <p:nvGrpSpPr>
+        <p:cNvPr id="1" name=""/>
+        <p:cNvGrpSpPr/>
+        <p:nvPr/>
+      </p:nvGrpSpPr>
+      <p:grpSpPr>
+        <a:xfrm>
+          <a:off x="0" y="0"/>
+          <a:ext cx="0" cy="0"/>
+          <a:chOff x="0" y="0"/>
+          <a:chExt cx="0" cy="0"/>
+        </a:xfrm>
+      </p:grpSpPr>
+      <p:sp>
+        <p:nvSpPr>
+          <p:cNvPr id="2" name="Title 1"/>
+          <p:cNvSpPr>
+            <a:spLocks noGrp="1"/>
+          </p:cNvSpPr>
+          <p:nvPr>
+            <p:ph type="title"/>
+          </p:nvPr>
+        </p:nvSpPr>
+        <p:spPr/>
+        <p:txBody>
+          <a:bodyPr>
+            <a:normAutofit/>
+          </a:bodyPr>
+          <a:lstStyle/>
+          <a:p>
+            <a:r>
+              <a:rPr lang="en-US" sz="4800" dirty="0" smtClean="0"/>
+              <a:t>Property </a:t>
+            </a:r>
+            <a:r>
+              <a:rPr lang="en-US" sz="4800" dirty="0"/>
+              <a:t>Authorization – feature</a:t>
+            </a:r>
+            <a:endParaRPr lang="en-US" sz="4800" dirty="0"/>
+          </a:p>
+        </p:txBody>
+      </p:sp>
+      <p:sp>
+        <p:nvSpPr>
+          <p:cNvPr id="3" name="Content Placeholder 2"/>
+          <p:cNvSpPr>
+            <a:spLocks noGrp="1"/>
+          </p:cNvSpPr>
+          <p:nvPr>
+            <p:ph idx="1"/>
+          </p:nvPr>
+        </p:nvSpPr>
+        <p:spPr>
+          <a:xfrm>
+            <a:off x="838200" y="1825624"/>
+            <a:ext cx="10515600" cy="4589923"/>
+          </a:xfrm>
+        </p:spPr>
+        <p:txBody>
+          <a:bodyPr>
+            <a:normAutofit/>
+          </a:bodyPr>
+          <a:lstStyle/>
+          <a:p>
+            <a:endParaRPr lang="en-US" sz="4000" dirty="0" smtClean="0"/>
+          </a:p>
+          <a:p>
+            <a:endParaRPr lang="en-US" dirty="0" smtClean="0"/>
+          </a:p>
+          <a:p>
+            <a:endParaRPr lang="en-US" dirty="0" smtClean="0"/>
+          </a:p>
+          <a:p>
+            <a:endParaRPr lang="en-US" dirty="0"/>
+          </a:p>
+        </p:txBody>
+      </p:sp>
+      <p:pic>
+        <p:nvPicPr>
+          <p:cNvPr id="4" name="Picture 3"/>
+          <p:cNvPicPr>
+            <a:picLocks noChangeAspect="1"/>
+          </p:cNvPicPr>
+          <p:nvPr/>
+        </p:nvPicPr>
+        <p:blipFill>
+          <a:blip r:embed="rId3"/>
+          <a:stretch>
+            <a:fillRect/>
+          </a:stretch>
+        </p:blipFill>
+        <p:spPr>
+          <a:xfrm>
+            <a:off x="838200" y="2019735"/>
+            <a:ext cx="11325789" cy="4263077"/>
+          </a:xfrm>
+          <a:prstGeom prst="rect">
+            <a:avLst/>
+          </a:prstGeom>
+        </p:spPr>
+      </p:pic>
+    </p:spTree>
+    <p:extLst>
+      <p:ext uri="{BB962C8B-B14F-4D97-AF65-F5344CB8AC3E}">
+        <p14:creationId xmlns:p14="http://schemas.microsoft.com/office/powerpoint/2010/main" val="806865913"/>
+      </p:ext>
+    </p:extLst>
+  </p:cSld>
+  <p:clrMapOvr>
+    <a:masterClrMapping/>
+  </p:clrMapOvr>
+  <p:timing>
+    <p:tnLst>
+      <p:par>
+        <p:cTn id="1" dur="indefinite" restart="never" nodeType="tmRoot"/>
+      </p:par>
+    </p:tnLst>
+  </p:timing>
+</p:sld>
+</file>
+
+<file path=ppt/slides/slide37.xml><?xml version="1.0" encoding="utf-8"?>
+<p:sld xmlns:a="http://schemas.openxmlformats.org/drawingml/2006/main" xmlns:r="http://schemas.openxmlformats.org/officeDocument/2006/relationships" xmlns:p="http://schemas.openxmlformats.org/presentationml/2006/main">
+  <p:cSld>
+    <p:spTree>
+      <p:nvGrpSpPr>
+        <p:cNvPr id="1" name=""/>
+        <p:cNvGrpSpPr/>
+        <p:nvPr/>
+      </p:nvGrpSpPr>
+      <p:grpSpPr>
+        <a:xfrm>
+          <a:off x="0" y="0"/>
+          <a:ext cx="0" cy="0"/>
+          <a:chOff x="0" y="0"/>
+          <a:chExt cx="0" cy="0"/>
+        </a:xfrm>
+      </p:grpSpPr>
+      <p:sp>
+        <p:nvSpPr>
+          <p:cNvPr id="2" name="Title 1"/>
+          <p:cNvSpPr>
+            <a:spLocks noGrp="1"/>
+          </p:cNvSpPr>
+          <p:nvPr>
+            <p:ph type="title"/>
+          </p:nvPr>
+        </p:nvSpPr>
+        <p:spPr/>
+        <p:txBody>
+          <a:bodyPr>
+            <a:normAutofit/>
+          </a:bodyPr>
+          <a:lstStyle/>
+          <a:p>
+            <a:r>
+              <a:rPr lang="en-US" sz="4800" dirty="0"/>
+              <a:t>Property Authorization – </a:t>
+            </a:r>
+            <a:r>
+              <a:rPr lang="en-US" sz="4800" dirty="0" smtClean="0"/>
+              <a:t>cross cutting</a:t>
+            </a:r>
+            <a:endParaRPr lang="en-US" sz="4800" dirty="0"/>
           </a:p>
         </p:txBody>
       </p:sp>
@@ -10295,7 +11375,565 @@
 </p:sld>
 </file>
 
-<file path=ppt/slides/slide35.xml><?xml version="1.0" encoding="utf-8"?>
+<file path=ppt/slides/slide38.xml><?xml version="1.0" encoding="utf-8"?>
+<p:sld xmlns:a="http://schemas.openxmlformats.org/drawingml/2006/main" xmlns:r="http://schemas.openxmlformats.org/officeDocument/2006/relationships" xmlns:p="http://schemas.openxmlformats.org/presentationml/2006/main">
+  <p:cSld>
+    <p:spTree>
+      <p:nvGrpSpPr>
+        <p:cNvPr id="1" name=""/>
+        <p:cNvGrpSpPr/>
+        <p:nvPr/>
+      </p:nvGrpSpPr>
+      <p:grpSpPr>
+        <a:xfrm>
+          <a:off x="0" y="0"/>
+          <a:ext cx="0" cy="0"/>
+          <a:chOff x="0" y="0"/>
+          <a:chExt cx="0" cy="0"/>
+        </a:xfrm>
+      </p:grpSpPr>
+      <p:sp>
+        <p:nvSpPr>
+          <p:cNvPr id="3" name="Content Placeholder 2"/>
+          <p:cNvSpPr>
+            <a:spLocks noGrp="1"/>
+          </p:cNvSpPr>
+          <p:nvPr>
+            <p:ph idx="1"/>
+          </p:nvPr>
+        </p:nvSpPr>
+        <p:spPr>
+          <a:xfrm>
+            <a:off x="838200" y="1825624"/>
+            <a:ext cx="10515600" cy="4589923"/>
+          </a:xfrm>
+        </p:spPr>
+        <p:txBody>
+          <a:bodyPr>
+            <a:normAutofit/>
+          </a:bodyPr>
+          <a:lstStyle/>
+          <a:p>
+            <a:endParaRPr lang="en-US" dirty="0" smtClean="0"/>
+          </a:p>
+          <a:p>
+            <a:endParaRPr lang="en-US" dirty="0" smtClean="0"/>
+          </a:p>
+          <a:p>
+            <a:endParaRPr lang="en-US" dirty="0"/>
+          </a:p>
+        </p:txBody>
+      </p:sp>
+      <p:pic>
+        <p:nvPicPr>
+          <p:cNvPr id="6" name="Picture 5"/>
+          <p:cNvPicPr>
+            <a:picLocks noChangeAspect="1"/>
+          </p:cNvPicPr>
+          <p:nvPr/>
+        </p:nvPicPr>
+        <p:blipFill>
+          <a:blip r:embed="rId3"/>
+          <a:stretch>
+            <a:fillRect/>
+          </a:stretch>
+        </p:blipFill>
+        <p:spPr>
+          <a:xfrm>
+            <a:off x="198603" y="85314"/>
+            <a:ext cx="9276976" cy="6772686"/>
+          </a:xfrm>
+          <a:prstGeom prst="rect">
+            <a:avLst/>
+          </a:prstGeom>
+        </p:spPr>
+      </p:pic>
+    </p:spTree>
+    <p:extLst>
+      <p:ext uri="{BB962C8B-B14F-4D97-AF65-F5344CB8AC3E}">
+        <p14:creationId xmlns:p14="http://schemas.microsoft.com/office/powerpoint/2010/main" val="4159394539"/>
+      </p:ext>
+    </p:extLst>
+  </p:cSld>
+  <p:clrMapOvr>
+    <a:masterClrMapping/>
+  </p:clrMapOvr>
+  <p:timing>
+    <p:tnLst>
+      <p:par>
+        <p:cTn id="1" dur="indefinite" restart="never" nodeType="tmRoot"/>
+      </p:par>
+    </p:tnLst>
+  </p:timing>
+</p:sld>
+</file>
+
+<file path=ppt/slides/slide39.xml><?xml version="1.0" encoding="utf-8"?>
+<p:sld xmlns:a="http://schemas.openxmlformats.org/drawingml/2006/main" xmlns:r="http://schemas.openxmlformats.org/officeDocument/2006/relationships" xmlns:p="http://schemas.openxmlformats.org/presentationml/2006/main">
+  <p:cSld>
+    <p:spTree>
+      <p:nvGrpSpPr>
+        <p:cNvPr id="1" name=""/>
+        <p:cNvGrpSpPr/>
+        <p:nvPr/>
+      </p:nvGrpSpPr>
+      <p:grpSpPr>
+        <a:xfrm>
+          <a:off x="0" y="0"/>
+          <a:ext cx="0" cy="0"/>
+          <a:chOff x="0" y="0"/>
+          <a:chExt cx="0" cy="0"/>
+        </a:xfrm>
+      </p:grpSpPr>
+      <p:sp>
+        <p:nvSpPr>
+          <p:cNvPr id="2" name="Title 1"/>
+          <p:cNvSpPr>
+            <a:spLocks noGrp="1"/>
+          </p:cNvSpPr>
+          <p:nvPr>
+            <p:ph type="title"/>
+          </p:nvPr>
+        </p:nvSpPr>
+        <p:spPr/>
+        <p:txBody>
+          <a:bodyPr>
+            <a:normAutofit/>
+          </a:bodyPr>
+          <a:lstStyle/>
+          <a:p>
+            <a:r>
+              <a:rPr lang="en-US" sz="4800" dirty="0"/>
+              <a:t>Property Authorization – </a:t>
+            </a:r>
+            <a:r>
+              <a:rPr lang="en-US" sz="4800" dirty="0" smtClean="0"/>
+              <a:t>cross cutting</a:t>
+            </a:r>
+            <a:endParaRPr lang="en-US" sz="4800" dirty="0"/>
+          </a:p>
+        </p:txBody>
+      </p:sp>
+      <p:sp>
+        <p:nvSpPr>
+          <p:cNvPr id="3" name="Content Placeholder 2"/>
+          <p:cNvSpPr>
+            <a:spLocks noGrp="1"/>
+          </p:cNvSpPr>
+          <p:nvPr>
+            <p:ph idx="1"/>
+          </p:nvPr>
+        </p:nvSpPr>
+        <p:spPr>
+          <a:xfrm>
+            <a:off x="838200" y="1825624"/>
+            <a:ext cx="10515600" cy="4589923"/>
+          </a:xfrm>
+        </p:spPr>
+        <p:txBody>
+          <a:bodyPr>
+            <a:normAutofit/>
+          </a:bodyPr>
+          <a:lstStyle/>
+          <a:p>
+            <a:endParaRPr lang="en-US" sz="4000" dirty="0" smtClean="0"/>
+          </a:p>
+          <a:p>
+            <a:endParaRPr lang="en-US" dirty="0" smtClean="0"/>
+          </a:p>
+          <a:p>
+            <a:endParaRPr lang="en-US" dirty="0" smtClean="0"/>
+          </a:p>
+          <a:p>
+            <a:endParaRPr lang="en-US" dirty="0"/>
+          </a:p>
+        </p:txBody>
+      </p:sp>
+      <p:pic>
+        <p:nvPicPr>
+          <p:cNvPr id="5" name="Picture 4"/>
+          <p:cNvPicPr>
+            <a:picLocks noChangeAspect="1"/>
+          </p:cNvPicPr>
+          <p:nvPr/>
+        </p:nvPicPr>
+        <p:blipFill>
+          <a:blip r:embed="rId3"/>
+          <a:stretch>
+            <a:fillRect/>
+          </a:stretch>
+        </p:blipFill>
+        <p:spPr>
+          <a:xfrm>
+            <a:off x="838200" y="2136103"/>
+            <a:ext cx="7184923" cy="3968963"/>
+          </a:xfrm>
+          <a:prstGeom prst="rect">
+            <a:avLst/>
+          </a:prstGeom>
+        </p:spPr>
+      </p:pic>
+    </p:spTree>
+    <p:extLst>
+      <p:ext uri="{BB962C8B-B14F-4D97-AF65-F5344CB8AC3E}">
+        <p14:creationId xmlns:p14="http://schemas.microsoft.com/office/powerpoint/2010/main" val="3763800813"/>
+      </p:ext>
+    </p:extLst>
+  </p:cSld>
+  <p:clrMapOvr>
+    <a:masterClrMapping/>
+  </p:clrMapOvr>
+  <p:timing>
+    <p:tnLst>
+      <p:par>
+        <p:cTn id="1" dur="indefinite" restart="never" nodeType="tmRoot"/>
+      </p:par>
+    </p:tnLst>
+  </p:timing>
+</p:sld>
+</file>
+
+<file path=ppt/slides/slide4.xml><?xml version="1.0" encoding="utf-8"?>
+<p:sld xmlns:a="http://schemas.openxmlformats.org/drawingml/2006/main" xmlns:r="http://schemas.openxmlformats.org/officeDocument/2006/relationships" xmlns:p="http://schemas.openxmlformats.org/presentationml/2006/main">
+  <p:cSld>
+    <p:spTree>
+      <p:nvGrpSpPr>
+        <p:cNvPr id="1" name=""/>
+        <p:cNvGrpSpPr/>
+        <p:nvPr/>
+      </p:nvGrpSpPr>
+      <p:grpSpPr>
+        <a:xfrm>
+          <a:off x="0" y="0"/>
+          <a:ext cx="0" cy="0"/>
+          <a:chOff x="0" y="0"/>
+          <a:chExt cx="0" cy="0"/>
+        </a:xfrm>
+      </p:grpSpPr>
+      <p:sp>
+        <p:nvSpPr>
+          <p:cNvPr id="2" name="Title 1"/>
+          <p:cNvSpPr>
+            <a:spLocks noGrp="1"/>
+          </p:cNvSpPr>
+          <p:nvPr>
+            <p:ph type="title"/>
+          </p:nvPr>
+        </p:nvSpPr>
+        <p:spPr>
+          <a:xfrm>
+            <a:off x="964927" y="1"/>
+            <a:ext cx="10515600" cy="6858000"/>
+          </a:xfrm>
+        </p:spPr>
+        <p:txBody>
+          <a:bodyPr anchor="ctr">
+            <a:normAutofit/>
+          </a:bodyPr>
+          <a:lstStyle/>
+          <a:p>
+            <a:pPr algn="ctr"/>
+            <a:r>
+              <a:rPr lang="en-US" sz="4800" strike="sngStrike" dirty="0" smtClean="0">
+                <a:solidFill>
+                  <a:schemeClr val="bg1">
+                    <a:lumMod val="75000"/>
+                  </a:schemeClr>
+                </a:solidFill>
+              </a:rPr>
+              <a:t>I hate writing secure code</a:t>
+            </a:r>
+            <a:br>
+              <a:rPr lang="en-US" sz="4800" strike="sngStrike" dirty="0" smtClean="0">
+                <a:solidFill>
+                  <a:schemeClr val="bg1">
+                    <a:lumMod val="75000"/>
+                  </a:schemeClr>
+                </a:solidFill>
+              </a:rPr>
+            </a:br>
+            <a:r>
+              <a:rPr lang="en-US" sz="4800" strike="sngStrike" dirty="0" smtClean="0">
+                <a:solidFill>
+                  <a:schemeClr val="bg1">
+                    <a:lumMod val="75000"/>
+                  </a:schemeClr>
+                </a:solidFill>
+              </a:rPr>
+              <a:t>I hate writing secure features</a:t>
+            </a:r>
+            <a:r>
+              <a:rPr lang="en-US" sz="4800" strike="sngStrike" dirty="0" smtClean="0"/>
+              <a:t/>
+            </a:r>
+            <a:br>
+              <a:rPr lang="en-US" sz="4800" strike="sngStrike" dirty="0" smtClean="0"/>
+            </a:br>
+            <a:r>
+              <a:rPr lang="en-US" sz="4800" dirty="0" smtClean="0"/>
+              <a:t>I hate implementing </a:t>
+            </a:r>
+            <a:r>
+              <a:rPr lang="en-US" sz="4800" i="1" dirty="0" smtClean="0"/>
+              <a:t>cross-cutting security concerns</a:t>
+            </a:r>
+            <a:r>
+              <a:rPr lang="en-US" sz="4800" dirty="0" smtClean="0"/>
+              <a:t> by repeating the same patterns over and over again in my feature-level code</a:t>
+            </a:r>
+            <a:endParaRPr lang="en-US" sz="4800" dirty="0"/>
+          </a:p>
+        </p:txBody>
+      </p:sp>
+    </p:spTree>
+    <p:extLst>
+      <p:ext uri="{BB962C8B-B14F-4D97-AF65-F5344CB8AC3E}">
+        <p14:creationId xmlns:p14="http://schemas.microsoft.com/office/powerpoint/2010/main" val="3846056723"/>
+      </p:ext>
+    </p:extLst>
+  </p:cSld>
+  <p:clrMapOvr>
+    <a:masterClrMapping/>
+  </p:clrMapOvr>
+  <p:timing>
+    <p:tnLst>
+      <p:par>
+        <p:cTn id="1" dur="indefinite" restart="never" nodeType="tmRoot"/>
+      </p:par>
+    </p:tnLst>
+  </p:timing>
+</p:sld>
+</file>
+
+<file path=ppt/slides/slide40.xml><?xml version="1.0" encoding="utf-8"?>
+<p:sld xmlns:a="http://schemas.openxmlformats.org/drawingml/2006/main" xmlns:r="http://schemas.openxmlformats.org/officeDocument/2006/relationships" xmlns:p="http://schemas.openxmlformats.org/presentationml/2006/main">
+  <p:cSld>
+    <p:spTree>
+      <p:nvGrpSpPr>
+        <p:cNvPr id="1" name=""/>
+        <p:cNvGrpSpPr/>
+        <p:nvPr/>
+      </p:nvGrpSpPr>
+      <p:grpSpPr>
+        <a:xfrm>
+          <a:off x="0" y="0"/>
+          <a:ext cx="0" cy="0"/>
+          <a:chOff x="0" y="0"/>
+          <a:chExt cx="0" cy="0"/>
+        </a:xfrm>
+      </p:grpSpPr>
+      <p:sp>
+        <p:nvSpPr>
+          <p:cNvPr id="2" name="Title 1"/>
+          <p:cNvSpPr>
+            <a:spLocks noGrp="1"/>
+          </p:cNvSpPr>
+          <p:nvPr>
+            <p:ph type="title"/>
+          </p:nvPr>
+        </p:nvSpPr>
+        <p:spPr/>
+        <p:txBody>
+          <a:bodyPr>
+            <a:normAutofit/>
+          </a:bodyPr>
+          <a:lstStyle/>
+          <a:p>
+            <a:r>
+              <a:rPr lang="en-US" sz="4800" dirty="0" smtClean="0"/>
+              <a:t>Patented step-by-step slide</a:t>
+            </a:r>
+            <a:endParaRPr lang="en-US" sz="4800" dirty="0"/>
+          </a:p>
+        </p:txBody>
+      </p:sp>
+      <p:sp>
+        <p:nvSpPr>
+          <p:cNvPr id="3" name="Content Placeholder 2"/>
+          <p:cNvSpPr>
+            <a:spLocks noGrp="1"/>
+          </p:cNvSpPr>
+          <p:nvPr>
+            <p:ph idx="1"/>
+          </p:nvPr>
+        </p:nvSpPr>
+        <p:spPr>
+          <a:xfrm>
+            <a:off x="838200" y="1825624"/>
+            <a:ext cx="10515600" cy="4589923"/>
+          </a:xfrm>
+        </p:spPr>
+        <p:txBody>
+          <a:bodyPr>
+            <a:normAutofit/>
+          </a:bodyPr>
+          <a:lstStyle/>
+          <a:p>
+            <a:r>
+              <a:rPr lang="en-US" sz="4000" dirty="0" smtClean="0">
+                <a:solidFill>
+                  <a:schemeClr val="bg1">
+                    <a:lumMod val="65000"/>
+                  </a:schemeClr>
+                </a:solidFill>
+              </a:rPr>
+              <a:t>Old news</a:t>
+            </a:r>
+            <a:br>
+              <a:rPr lang="en-US" sz="4000" dirty="0" smtClean="0">
+                <a:solidFill>
+                  <a:schemeClr val="bg1">
+                    <a:lumMod val="65000"/>
+                  </a:schemeClr>
+                </a:solidFill>
+              </a:rPr>
+            </a:br>
+            <a:endParaRPr lang="en-US" sz="4000" dirty="0" smtClean="0">
+              <a:solidFill>
+                <a:schemeClr val="bg1">
+                  <a:lumMod val="65000"/>
+                </a:schemeClr>
+              </a:solidFill>
+            </a:endParaRPr>
+          </a:p>
+          <a:p>
+            <a:r>
+              <a:rPr lang="en-US" sz="4000" b="1" dirty="0" smtClean="0"/>
+              <a:t>New hotness</a:t>
+            </a:r>
+          </a:p>
+          <a:p>
+            <a:endParaRPr lang="en-US" sz="4000" dirty="0" smtClean="0"/>
+          </a:p>
+          <a:p>
+            <a:endParaRPr lang="en-US" dirty="0" smtClean="0"/>
+          </a:p>
+          <a:p>
+            <a:endParaRPr lang="en-US" dirty="0" smtClean="0"/>
+          </a:p>
+          <a:p>
+            <a:endParaRPr lang="en-US" dirty="0"/>
+          </a:p>
+        </p:txBody>
+      </p:sp>
+    </p:spTree>
+    <p:extLst>
+      <p:ext uri="{BB962C8B-B14F-4D97-AF65-F5344CB8AC3E}">
+        <p14:creationId xmlns:p14="http://schemas.microsoft.com/office/powerpoint/2010/main" val="1887088746"/>
+      </p:ext>
+    </p:extLst>
+  </p:cSld>
+  <p:clrMapOvr>
+    <a:masterClrMapping/>
+  </p:clrMapOvr>
+  <p:timing>
+    <p:tnLst>
+      <p:par>
+        <p:cTn id="1" dur="indefinite" restart="never" nodeType="tmRoot"/>
+      </p:par>
+    </p:tnLst>
+  </p:timing>
+</p:sld>
+</file>
+
+<file path=ppt/slides/slide41.xml><?xml version="1.0" encoding="utf-8"?>
+<p:sld xmlns:a="http://schemas.openxmlformats.org/drawingml/2006/main" xmlns:r="http://schemas.openxmlformats.org/officeDocument/2006/relationships" xmlns:p="http://schemas.openxmlformats.org/presentationml/2006/main">
+  <p:cSld>
+    <p:spTree>
+      <p:nvGrpSpPr>
+        <p:cNvPr id="1" name=""/>
+        <p:cNvGrpSpPr/>
+        <p:nvPr/>
+      </p:nvGrpSpPr>
+      <p:grpSpPr>
+        <a:xfrm>
+          <a:off x="0" y="0"/>
+          <a:ext cx="0" cy="0"/>
+          <a:chOff x="0" y="0"/>
+          <a:chExt cx="0" cy="0"/>
+        </a:xfrm>
+      </p:grpSpPr>
+      <p:sp>
+        <p:nvSpPr>
+          <p:cNvPr id="2" name="Title 1"/>
+          <p:cNvSpPr>
+            <a:spLocks noGrp="1"/>
+          </p:cNvSpPr>
+          <p:nvPr>
+            <p:ph type="title"/>
+          </p:nvPr>
+        </p:nvSpPr>
+        <p:spPr/>
+        <p:txBody>
+          <a:bodyPr>
+            <a:normAutofit/>
+          </a:bodyPr>
+          <a:lstStyle/>
+          <a:p>
+            <a:r>
+              <a:rPr lang="en-US" sz="4800" dirty="0" smtClean="0"/>
+              <a:t>Canonical example: SQL Injection</a:t>
+            </a:r>
+            <a:endParaRPr lang="en-US" sz="4800" dirty="0"/>
+          </a:p>
+        </p:txBody>
+      </p:sp>
+      <p:sp>
+        <p:nvSpPr>
+          <p:cNvPr id="3" name="Content Placeholder 2"/>
+          <p:cNvSpPr>
+            <a:spLocks noGrp="1"/>
+          </p:cNvSpPr>
+          <p:nvPr>
+            <p:ph idx="1"/>
+          </p:nvPr>
+        </p:nvSpPr>
+        <p:spPr>
+          <a:xfrm>
+            <a:off x="838200" y="1825624"/>
+            <a:ext cx="10515600" cy="4589923"/>
+          </a:xfrm>
+        </p:spPr>
+        <p:txBody>
+          <a:bodyPr>
+            <a:normAutofit/>
+          </a:bodyPr>
+          <a:lstStyle/>
+          <a:p>
+            <a:endParaRPr lang="en-US" sz="4000" dirty="0" smtClean="0"/>
+          </a:p>
+          <a:p>
+            <a:endParaRPr lang="en-US" dirty="0" smtClean="0"/>
+          </a:p>
+          <a:p>
+            <a:endParaRPr lang="en-US" dirty="0" smtClean="0"/>
+          </a:p>
+          <a:p>
+            <a:endParaRPr lang="en-US" dirty="0"/>
+          </a:p>
+        </p:txBody>
+      </p:sp>
+    </p:spTree>
+    <p:extLst>
+      <p:ext uri="{BB962C8B-B14F-4D97-AF65-F5344CB8AC3E}">
+        <p14:creationId xmlns:p14="http://schemas.microsoft.com/office/powerpoint/2010/main" val="1766242099"/>
+      </p:ext>
+    </p:extLst>
+  </p:cSld>
+  <p:clrMapOvr>
+    <a:masterClrMapping/>
+  </p:clrMapOvr>
+  <p:timing>
+    <p:tnLst>
+      <p:par>
+        <p:cTn id="1" dur="indefinite" restart="never" nodeType="tmRoot"/>
+      </p:par>
+    </p:tnLst>
+  </p:timing>
+</p:sld>
+</file>
+
+<file path=ppt/slides/slide42.xml><?xml version="1.0" encoding="utf-8"?>
 <p:sld xmlns:a="http://schemas.openxmlformats.org/drawingml/2006/main" xmlns:r="http://schemas.openxmlformats.org/officeDocument/2006/relationships" xmlns:p="http://schemas.openxmlformats.org/presentationml/2006/main">
   <p:cSld>
     <p:spTree>
@@ -10416,7 +12054,7 @@
 </p:sld>
 </file>
 
-<file path=ppt/slides/slide36.xml><?xml version="1.0" encoding="utf-8"?>
+<file path=ppt/slides/slide43.xml><?xml version="1.0" encoding="utf-8"?>
 <p:sld xmlns:a="http://schemas.openxmlformats.org/drawingml/2006/main" xmlns:r="http://schemas.openxmlformats.org/officeDocument/2006/relationships" xmlns:p="http://schemas.openxmlformats.org/presentationml/2006/main">
   <p:cSld>
     <p:spTree>
@@ -10542,7 +12180,7 @@
 </p:sld>
 </file>
 
-<file path=ppt/slides/slide37.xml><?xml version="1.0" encoding="utf-8"?>
+<file path=ppt/slides/slide44.xml><?xml version="1.0" encoding="utf-8"?>
 <p:sld xmlns:a="http://schemas.openxmlformats.org/drawingml/2006/main" xmlns:r="http://schemas.openxmlformats.org/officeDocument/2006/relationships" xmlns:p="http://schemas.openxmlformats.org/presentationml/2006/main">
   <p:cSld>
     <p:spTree>
@@ -10716,118 +12354,6 @@
     <p:extLst>
       <p:ext uri="{BB962C8B-B14F-4D97-AF65-F5344CB8AC3E}">
         <p14:creationId xmlns:p14="http://schemas.microsoft.com/office/powerpoint/2010/main" val="659085787"/>
-      </p:ext>
-    </p:extLst>
-  </p:cSld>
-  <p:clrMapOvr>
-    <a:masterClrMapping/>
-  </p:clrMapOvr>
-  <p:timing>
-    <p:tnLst>
-      <p:par>
-        <p:cTn id="1" dur="indefinite" restart="never" nodeType="tmRoot"/>
-      </p:par>
-    </p:tnLst>
-  </p:timing>
-</p:sld>
-</file>
-
-<file path=ppt/slides/slide4.xml><?xml version="1.0" encoding="utf-8"?>
-<p:sld xmlns:a="http://schemas.openxmlformats.org/drawingml/2006/main" xmlns:r="http://schemas.openxmlformats.org/officeDocument/2006/relationships" xmlns:p="http://schemas.openxmlformats.org/presentationml/2006/main">
-  <p:cSld>
-    <p:spTree>
-      <p:nvGrpSpPr>
-        <p:cNvPr id="1" name=""/>
-        <p:cNvGrpSpPr/>
-        <p:nvPr/>
-      </p:nvGrpSpPr>
-      <p:grpSpPr>
-        <a:xfrm>
-          <a:off x="0" y="0"/>
-          <a:ext cx="0" cy="0"/>
-          <a:chOff x="0" y="0"/>
-          <a:chExt cx="0" cy="0"/>
-        </a:xfrm>
-      </p:grpSpPr>
-      <p:sp>
-        <p:nvSpPr>
-          <p:cNvPr id="2" name="Title 1"/>
-          <p:cNvSpPr>
-            <a:spLocks noGrp="1"/>
-          </p:cNvSpPr>
-          <p:nvPr>
-            <p:ph type="title"/>
-          </p:nvPr>
-        </p:nvSpPr>
-        <p:spPr>
-          <a:xfrm>
-            <a:off x="964927" y="1"/>
-            <a:ext cx="10515600" cy="6858000"/>
-          </a:xfrm>
-        </p:spPr>
-        <p:txBody>
-          <a:bodyPr anchor="ctr">
-            <a:normAutofit/>
-          </a:bodyPr>
-          <a:lstStyle/>
-          <a:p>
-            <a:pPr algn="ctr"/>
-            <a:r>
-              <a:rPr lang="en-US" sz="4800" strike="sngStrike" dirty="0" smtClean="0">
-                <a:solidFill>
-                  <a:schemeClr val="bg1">
-                    <a:lumMod val="75000"/>
-                  </a:schemeClr>
-                </a:solidFill>
-              </a:rPr>
-              <a:t>I hate writing secure code</a:t>
-            </a:r>
-            <a:br>
-              <a:rPr lang="en-US" sz="4800" strike="sngStrike" dirty="0" smtClean="0">
-                <a:solidFill>
-                  <a:schemeClr val="bg1">
-                    <a:lumMod val="75000"/>
-                  </a:schemeClr>
-                </a:solidFill>
-              </a:rPr>
-            </a:br>
-            <a:r>
-              <a:rPr lang="en-US" sz="4800" strike="sngStrike" dirty="0" smtClean="0">
-                <a:solidFill>
-                  <a:schemeClr val="bg1">
-                    <a:lumMod val="75000"/>
-                  </a:schemeClr>
-                </a:solidFill>
-              </a:rPr>
-              <a:t>I hate writing secure features</a:t>
-            </a:r>
-            <a:r>
-              <a:rPr lang="en-US" sz="4800" strike="sngStrike" dirty="0" smtClean="0"/>
-              <a:t/>
-            </a:r>
-            <a:br>
-              <a:rPr lang="en-US" sz="4800" strike="sngStrike" dirty="0" smtClean="0"/>
-            </a:br>
-            <a:r>
-              <a:rPr lang="en-US" sz="4800" dirty="0" smtClean="0"/>
-              <a:t>I hate implementing </a:t>
-            </a:r>
-            <a:r>
-              <a:rPr lang="en-US" sz="4800" i="1" dirty="0" smtClean="0"/>
-              <a:t>cross-cutting security concerns</a:t>
-            </a:r>
-            <a:r>
-              <a:rPr lang="en-US" sz="4800" dirty="0" smtClean="0"/>
-              <a:t> by repeating the same patterns over and over again in my feature-level code</a:t>
-            </a:r>
-            <a:endParaRPr lang="en-US" sz="4800" dirty="0"/>
-          </a:p>
-        </p:txBody>
-      </p:sp>
-    </p:spTree>
-    <p:extLst>
-      <p:ext uri="{BB962C8B-B14F-4D97-AF65-F5344CB8AC3E}">
-        <p14:creationId xmlns:p14="http://schemas.microsoft.com/office/powerpoint/2010/main" val="3846056723"/>
       </p:ext>
     </p:extLst>
   </p:cSld>

</xml_diff>

<commit_message>
Started Access Control narrative and PPT
</commit_message>
<xml_diff>
--- a/Secure Systems - CodeMash 2017.pptx
+++ b/Secure Systems - CodeMash 2017.pptx
@@ -5,7 +5,7 @@
     <p:sldMasterId id="2147483749" r:id="rId1"/>
   </p:sldMasterIdLst>
   <p:notesMasterIdLst>
-    <p:notesMasterId r:id="rId46"/>
+    <p:notesMasterId r:id="rId50"/>
   </p:notesMasterIdLst>
   <p:sldIdLst>
     <p:sldId id="395" r:id="rId2"/>
@@ -47,11 +47,15 @@
     <p:sldId id="503" r:id="rId38"/>
     <p:sldId id="531" r:id="rId39"/>
     <p:sldId id="532" r:id="rId40"/>
-    <p:sldId id="504" r:id="rId41"/>
-    <p:sldId id="485" r:id="rId42"/>
+    <p:sldId id="533" r:id="rId41"/>
+    <p:sldId id="534" r:id="rId42"/>
     <p:sldId id="505" r:id="rId43"/>
-    <p:sldId id="507" r:id="rId44"/>
-    <p:sldId id="443" r:id="rId45"/>
+    <p:sldId id="535" r:id="rId44"/>
+    <p:sldId id="507" r:id="rId45"/>
+    <p:sldId id="536" r:id="rId46"/>
+    <p:sldId id="504" r:id="rId47"/>
+    <p:sldId id="485" r:id="rId48"/>
+    <p:sldId id="443" r:id="rId49"/>
   </p:sldIdLst>
   <p:sldSz cx="12192000" cy="6858000"/>
   <p:notesSz cx="6858000" cy="9144000"/>
@@ -3582,7 +3586,7 @@
     </p:spTree>
     <p:extLst>
       <p:ext uri="{BB962C8B-B14F-4D97-AF65-F5344CB8AC3E}">
-        <p14:creationId xmlns:p14="http://schemas.microsoft.com/office/powerpoint/2010/main" val="2602777311"/>
+        <p14:creationId xmlns:p14="http://schemas.microsoft.com/office/powerpoint/2010/main" val="506673237"/>
       </p:ext>
     </p:extLst>
   </p:cSld>
@@ -3636,7 +3640,32 @@
           <a:bodyPr/>
           <a:lstStyle/>
           <a:p>
-            <a:endParaRPr lang="en-US" b="0" dirty="0" smtClean="0"/>
+            <a:pPr marL="0" marR="0" indent="0" algn="l" defTabSz="914400" rtl="0" eaLnBrk="1" fontAlgn="auto" latinLnBrk="0" hangingPunct="1">
+              <a:lnSpc>
+                <a:spcPct val="100000"/>
+              </a:lnSpc>
+              <a:spcBef>
+                <a:spcPts val="0"/>
+              </a:spcBef>
+              <a:spcAft>
+                <a:spcPts val="0"/>
+              </a:spcAft>
+              <a:buClrTx/>
+              <a:buSzTx/>
+              <a:buFontTx/>
+              <a:buNone/>
+              <a:tabLst/>
+              <a:defRPr/>
+            </a:pPr>
+            <a:endParaRPr lang="en-US" sz="1200" kern="1200" dirty="0" smtClean="0">
+              <a:solidFill>
+                <a:schemeClr val="tx1"/>
+              </a:solidFill>
+              <a:effectLst/>
+              <a:latin typeface="+mn-lt"/>
+              <a:ea typeface="+mn-ea"/>
+              <a:cs typeface="+mn-cs"/>
+            </a:endParaRPr>
           </a:p>
         </p:txBody>
       </p:sp>
@@ -3666,7 +3695,7 @@
     </p:spTree>
     <p:extLst>
       <p:ext uri="{BB962C8B-B14F-4D97-AF65-F5344CB8AC3E}">
-        <p14:creationId xmlns:p14="http://schemas.microsoft.com/office/powerpoint/2010/main" val="2267138517"/>
+        <p14:creationId xmlns:p14="http://schemas.microsoft.com/office/powerpoint/2010/main" val="2286755864"/>
       </p:ext>
     </p:extLst>
   </p:cSld>
@@ -3834,7 +3863,7 @@
     </p:spTree>
     <p:extLst>
       <p:ext uri="{BB962C8B-B14F-4D97-AF65-F5344CB8AC3E}">
-        <p14:creationId xmlns:p14="http://schemas.microsoft.com/office/powerpoint/2010/main" val="3271057564"/>
+        <p14:creationId xmlns:p14="http://schemas.microsoft.com/office/powerpoint/2010/main" val="3778399677"/>
       </p:ext>
     </p:extLst>
   </p:cSld>
@@ -3888,6 +3917,342 @@
           <a:bodyPr/>
           <a:lstStyle/>
           <a:p>
+            <a:endParaRPr lang="en-US" b="0" dirty="0" smtClean="0"/>
+          </a:p>
+        </p:txBody>
+      </p:sp>
+      <p:sp>
+        <p:nvSpPr>
+          <p:cNvPr id="4" name="Slide Number Placeholder 3"/>
+          <p:cNvSpPr>
+            <a:spLocks noGrp="1"/>
+          </p:cNvSpPr>
+          <p:nvPr>
+            <p:ph type="sldNum" sz="quarter" idx="10"/>
+          </p:nvPr>
+        </p:nvSpPr>
+        <p:spPr/>
+        <p:txBody>
+          <a:bodyPr/>
+          <a:lstStyle/>
+          <a:p>
+            <a:fld id="{89029652-62E7-43D6-83B5-097D7B7AA5D8}" type="slidenum">
+              <a:rPr lang="en-US" smtClean="0"/>
+              <a:t>44</a:t>
+            </a:fld>
+            <a:endParaRPr lang="en-US"/>
+          </a:p>
+        </p:txBody>
+      </p:sp>
+    </p:spTree>
+    <p:extLst>
+      <p:ext uri="{BB962C8B-B14F-4D97-AF65-F5344CB8AC3E}">
+        <p14:creationId xmlns:p14="http://schemas.microsoft.com/office/powerpoint/2010/main" val="3271057564"/>
+      </p:ext>
+    </p:extLst>
+  </p:cSld>
+  <p:clrMapOvr>
+    <a:masterClrMapping/>
+  </p:clrMapOvr>
+</p:notes>
+</file>
+
+<file path=ppt/notesSlides/notesSlide45.xml><?xml version="1.0" encoding="utf-8"?>
+<p:notes xmlns:a="http://schemas.openxmlformats.org/drawingml/2006/main" xmlns:r="http://schemas.openxmlformats.org/officeDocument/2006/relationships" xmlns:p="http://schemas.openxmlformats.org/presentationml/2006/main">
+  <p:cSld>
+    <p:spTree>
+      <p:nvGrpSpPr>
+        <p:cNvPr id="1" name=""/>
+        <p:cNvGrpSpPr/>
+        <p:nvPr/>
+      </p:nvGrpSpPr>
+      <p:grpSpPr>
+        <a:xfrm>
+          <a:off x="0" y="0"/>
+          <a:ext cx="0" cy="0"/>
+          <a:chOff x="0" y="0"/>
+          <a:chExt cx="0" cy="0"/>
+        </a:xfrm>
+      </p:grpSpPr>
+      <p:sp>
+        <p:nvSpPr>
+          <p:cNvPr id="2" name="Slide Image Placeholder 1"/>
+          <p:cNvSpPr>
+            <a:spLocks noGrp="1" noRot="1" noChangeAspect="1"/>
+          </p:cNvSpPr>
+          <p:nvPr>
+            <p:ph type="sldImg"/>
+          </p:nvPr>
+        </p:nvSpPr>
+        <p:spPr/>
+      </p:sp>
+      <p:sp>
+        <p:nvSpPr>
+          <p:cNvPr id="3" name="Notes Placeholder 2"/>
+          <p:cNvSpPr>
+            <a:spLocks noGrp="1"/>
+          </p:cNvSpPr>
+          <p:nvPr>
+            <p:ph type="body" idx="1"/>
+          </p:nvPr>
+        </p:nvSpPr>
+        <p:spPr/>
+        <p:txBody>
+          <a:bodyPr/>
+          <a:lstStyle/>
+          <a:p>
+            <a:endParaRPr lang="en-US" b="0" dirty="0" smtClean="0"/>
+          </a:p>
+        </p:txBody>
+      </p:sp>
+      <p:sp>
+        <p:nvSpPr>
+          <p:cNvPr id="4" name="Slide Number Placeholder 3"/>
+          <p:cNvSpPr>
+            <a:spLocks noGrp="1"/>
+          </p:cNvSpPr>
+          <p:nvPr>
+            <p:ph type="sldNum" sz="quarter" idx="10"/>
+          </p:nvPr>
+        </p:nvSpPr>
+        <p:spPr/>
+        <p:txBody>
+          <a:bodyPr/>
+          <a:lstStyle/>
+          <a:p>
+            <a:fld id="{89029652-62E7-43D6-83B5-097D7B7AA5D8}" type="slidenum">
+              <a:rPr lang="en-US" smtClean="0"/>
+              <a:t>45</a:t>
+            </a:fld>
+            <a:endParaRPr lang="en-US"/>
+          </a:p>
+        </p:txBody>
+      </p:sp>
+    </p:spTree>
+    <p:extLst>
+      <p:ext uri="{BB962C8B-B14F-4D97-AF65-F5344CB8AC3E}">
+        <p14:creationId xmlns:p14="http://schemas.microsoft.com/office/powerpoint/2010/main" val="150335864"/>
+      </p:ext>
+    </p:extLst>
+  </p:cSld>
+  <p:clrMapOvr>
+    <a:masterClrMapping/>
+  </p:clrMapOvr>
+</p:notes>
+</file>
+
+<file path=ppt/notesSlides/notesSlide46.xml><?xml version="1.0" encoding="utf-8"?>
+<p:notes xmlns:a="http://schemas.openxmlformats.org/drawingml/2006/main" xmlns:r="http://schemas.openxmlformats.org/officeDocument/2006/relationships" xmlns:p="http://schemas.openxmlformats.org/presentationml/2006/main">
+  <p:cSld>
+    <p:spTree>
+      <p:nvGrpSpPr>
+        <p:cNvPr id="1" name=""/>
+        <p:cNvGrpSpPr/>
+        <p:nvPr/>
+      </p:nvGrpSpPr>
+      <p:grpSpPr>
+        <a:xfrm>
+          <a:off x="0" y="0"/>
+          <a:ext cx="0" cy="0"/>
+          <a:chOff x="0" y="0"/>
+          <a:chExt cx="0" cy="0"/>
+        </a:xfrm>
+      </p:grpSpPr>
+      <p:sp>
+        <p:nvSpPr>
+          <p:cNvPr id="2" name="Slide Image Placeholder 1"/>
+          <p:cNvSpPr>
+            <a:spLocks noGrp="1" noRot="1" noChangeAspect="1"/>
+          </p:cNvSpPr>
+          <p:nvPr>
+            <p:ph type="sldImg"/>
+          </p:nvPr>
+        </p:nvSpPr>
+        <p:spPr/>
+      </p:sp>
+      <p:sp>
+        <p:nvSpPr>
+          <p:cNvPr id="3" name="Notes Placeholder 2"/>
+          <p:cNvSpPr>
+            <a:spLocks noGrp="1"/>
+          </p:cNvSpPr>
+          <p:nvPr>
+            <p:ph type="body" idx="1"/>
+          </p:nvPr>
+        </p:nvSpPr>
+        <p:spPr/>
+        <p:txBody>
+          <a:bodyPr/>
+          <a:lstStyle/>
+          <a:p>
+            <a:endParaRPr lang="en-US" b="0" dirty="0" smtClean="0"/>
+          </a:p>
+        </p:txBody>
+      </p:sp>
+      <p:sp>
+        <p:nvSpPr>
+          <p:cNvPr id="4" name="Slide Number Placeholder 3"/>
+          <p:cNvSpPr>
+            <a:spLocks noGrp="1"/>
+          </p:cNvSpPr>
+          <p:nvPr>
+            <p:ph type="sldNum" sz="quarter" idx="10"/>
+          </p:nvPr>
+        </p:nvSpPr>
+        <p:spPr/>
+        <p:txBody>
+          <a:bodyPr/>
+          <a:lstStyle/>
+          <a:p>
+            <a:fld id="{89029652-62E7-43D6-83B5-097D7B7AA5D8}" type="slidenum">
+              <a:rPr lang="en-US" smtClean="0"/>
+              <a:t>46</a:t>
+            </a:fld>
+            <a:endParaRPr lang="en-US"/>
+          </a:p>
+        </p:txBody>
+      </p:sp>
+    </p:spTree>
+    <p:extLst>
+      <p:ext uri="{BB962C8B-B14F-4D97-AF65-F5344CB8AC3E}">
+        <p14:creationId xmlns:p14="http://schemas.microsoft.com/office/powerpoint/2010/main" val="2602777311"/>
+      </p:ext>
+    </p:extLst>
+  </p:cSld>
+  <p:clrMapOvr>
+    <a:masterClrMapping/>
+  </p:clrMapOvr>
+</p:notes>
+</file>
+
+<file path=ppt/notesSlides/notesSlide47.xml><?xml version="1.0" encoding="utf-8"?>
+<p:notes xmlns:a="http://schemas.openxmlformats.org/drawingml/2006/main" xmlns:r="http://schemas.openxmlformats.org/officeDocument/2006/relationships" xmlns:p="http://schemas.openxmlformats.org/presentationml/2006/main">
+  <p:cSld>
+    <p:spTree>
+      <p:nvGrpSpPr>
+        <p:cNvPr id="1" name=""/>
+        <p:cNvGrpSpPr/>
+        <p:nvPr/>
+      </p:nvGrpSpPr>
+      <p:grpSpPr>
+        <a:xfrm>
+          <a:off x="0" y="0"/>
+          <a:ext cx="0" cy="0"/>
+          <a:chOff x="0" y="0"/>
+          <a:chExt cx="0" cy="0"/>
+        </a:xfrm>
+      </p:grpSpPr>
+      <p:sp>
+        <p:nvSpPr>
+          <p:cNvPr id="2" name="Slide Image Placeholder 1"/>
+          <p:cNvSpPr>
+            <a:spLocks noGrp="1" noRot="1" noChangeAspect="1"/>
+          </p:cNvSpPr>
+          <p:nvPr>
+            <p:ph type="sldImg"/>
+          </p:nvPr>
+        </p:nvSpPr>
+        <p:spPr/>
+      </p:sp>
+      <p:sp>
+        <p:nvSpPr>
+          <p:cNvPr id="3" name="Notes Placeholder 2"/>
+          <p:cNvSpPr>
+            <a:spLocks noGrp="1"/>
+          </p:cNvSpPr>
+          <p:nvPr>
+            <p:ph type="body" idx="1"/>
+          </p:nvPr>
+        </p:nvSpPr>
+        <p:spPr/>
+        <p:txBody>
+          <a:bodyPr/>
+          <a:lstStyle/>
+          <a:p>
+            <a:endParaRPr lang="en-US" b="0" dirty="0" smtClean="0"/>
+          </a:p>
+        </p:txBody>
+      </p:sp>
+      <p:sp>
+        <p:nvSpPr>
+          <p:cNvPr id="4" name="Slide Number Placeholder 3"/>
+          <p:cNvSpPr>
+            <a:spLocks noGrp="1"/>
+          </p:cNvSpPr>
+          <p:nvPr>
+            <p:ph type="sldNum" sz="quarter" idx="10"/>
+          </p:nvPr>
+        </p:nvSpPr>
+        <p:spPr/>
+        <p:txBody>
+          <a:bodyPr/>
+          <a:lstStyle/>
+          <a:p>
+            <a:fld id="{89029652-62E7-43D6-83B5-097D7B7AA5D8}" type="slidenum">
+              <a:rPr lang="en-US" smtClean="0"/>
+              <a:t>47</a:t>
+            </a:fld>
+            <a:endParaRPr lang="en-US"/>
+          </a:p>
+        </p:txBody>
+      </p:sp>
+    </p:spTree>
+    <p:extLst>
+      <p:ext uri="{BB962C8B-B14F-4D97-AF65-F5344CB8AC3E}">
+        <p14:creationId xmlns:p14="http://schemas.microsoft.com/office/powerpoint/2010/main" val="2267138517"/>
+      </p:ext>
+    </p:extLst>
+  </p:cSld>
+  <p:clrMapOvr>
+    <a:masterClrMapping/>
+  </p:clrMapOvr>
+</p:notes>
+</file>
+
+<file path=ppt/notesSlides/notesSlide48.xml><?xml version="1.0" encoding="utf-8"?>
+<p:notes xmlns:a="http://schemas.openxmlformats.org/drawingml/2006/main" xmlns:r="http://schemas.openxmlformats.org/officeDocument/2006/relationships" xmlns:p="http://schemas.openxmlformats.org/presentationml/2006/main">
+  <p:cSld>
+    <p:spTree>
+      <p:nvGrpSpPr>
+        <p:cNvPr id="1" name=""/>
+        <p:cNvGrpSpPr/>
+        <p:nvPr/>
+      </p:nvGrpSpPr>
+      <p:grpSpPr>
+        <a:xfrm>
+          <a:off x="0" y="0"/>
+          <a:ext cx="0" cy="0"/>
+          <a:chOff x="0" y="0"/>
+          <a:chExt cx="0" cy="0"/>
+        </a:xfrm>
+      </p:grpSpPr>
+      <p:sp>
+        <p:nvSpPr>
+          <p:cNvPr id="2" name="Slide Image Placeholder 1"/>
+          <p:cNvSpPr>
+            <a:spLocks noGrp="1" noRot="1" noChangeAspect="1"/>
+          </p:cNvSpPr>
+          <p:nvPr>
+            <p:ph type="sldImg"/>
+          </p:nvPr>
+        </p:nvSpPr>
+        <p:spPr/>
+      </p:sp>
+      <p:sp>
+        <p:nvSpPr>
+          <p:cNvPr id="3" name="Notes Placeholder 2"/>
+          <p:cNvSpPr>
+            <a:spLocks noGrp="1"/>
+          </p:cNvSpPr>
+          <p:nvPr>
+            <p:ph type="body" idx="1"/>
+          </p:nvPr>
+        </p:nvSpPr>
+        <p:spPr/>
+        <p:txBody>
+          <a:bodyPr/>
+          <a:lstStyle/>
+          <a:p>
             <a:endParaRPr lang="en-US" sz="1200" kern="1200" dirty="0" smtClean="0">
               <a:solidFill>
                 <a:schemeClr val="tx1"/>
@@ -3917,7 +4282,7 @@
           <a:p>
             <a:fld id="{89029652-62E7-43D6-83B5-097D7B7AA5D8}" type="slidenum">
               <a:rPr lang="en-US" smtClean="0"/>
-              <a:t>44</a:t>
+              <a:t>48</a:t>
             </a:fld>
             <a:endParaRPr lang="en-US"/>
           </a:p>
@@ -9338,7 +9703,6 @@
               <a:rPr lang="en-US" sz="4800" dirty="0"/>
               <a:t>– feature</a:t>
             </a:r>
-            <a:endParaRPr lang="en-US" sz="4800" dirty="0"/>
           </a:p>
         </p:txBody>
       </p:sp>
@@ -9478,11 +9842,7 @@
           <a:p>
             <a:r>
               <a:rPr lang="en-US" sz="4800" dirty="0" smtClean="0"/>
-              <a:t>CSRF Defense </a:t>
-            </a:r>
-            <a:r>
-              <a:rPr lang="en-US" sz="4800" dirty="0" smtClean="0"/>
-              <a:t>– feature (ajax)</a:t>
+              <a:t>CSRF Defense – feature (ajax)</a:t>
             </a:r>
             <a:endParaRPr lang="en-US" sz="4800" dirty="0"/>
           </a:p>
@@ -9778,7 +10138,6 @@
               <a:rPr lang="en-US" sz="4800" dirty="0"/>
               <a:t>– cross cutting</a:t>
             </a:r>
-            <a:endParaRPr lang="en-US" sz="4800" dirty="0"/>
           </a:p>
         </p:txBody>
       </p:sp>
@@ -9917,7 +10276,6 @@
               <a:rPr lang="en-US" sz="4800" dirty="0"/>
               <a:t>– cross cutting</a:t>
             </a:r>
-            <a:endParaRPr lang="en-US" sz="4800" dirty="0"/>
           </a:p>
         </p:txBody>
       </p:sp>
@@ -10056,7 +10414,6 @@
               <a:rPr lang="en-US" sz="4800" dirty="0"/>
               <a:t>– cross cutting</a:t>
             </a:r>
-            <a:endParaRPr lang="en-US" sz="4800" dirty="0"/>
           </a:p>
         </p:txBody>
       </p:sp>
@@ -10190,7 +10547,6 @@
               <a:rPr lang="en-US" sz="4800" dirty="0"/>
               <a:t>– cross cutting</a:t>
             </a:r>
-            <a:endParaRPr lang="en-US" sz="4800" dirty="0"/>
           </a:p>
         </p:txBody>
       </p:sp>
@@ -10611,20 +10967,21 @@
               </a:rPr>
               <a:t> to perform </a:t>
             </a:r>
-            <a:br>
+            <a:r>
               <a:rPr lang="en-US" dirty="0" smtClean="0">
                 <a:solidFill>
                   <a:srgbClr val="013947"/>
                 </a:solidFill>
               </a:rPr>
-            </a:br>
+              <a:t>a </a:t>
+            </a:r>
             <a:r>
               <a:rPr lang="en-US" dirty="0" smtClean="0">
                 <a:solidFill>
                   <a:srgbClr val="013947"/>
                 </a:solidFill>
               </a:rPr>
-              <a:t>a given request?</a:t>
+              <a:t>given request?</a:t>
             </a:r>
             <a:endParaRPr lang="en-US" sz="4800" dirty="0">
               <a:solidFill>
@@ -10692,7 +11049,6 @@
               <a:rPr lang="en-US" sz="4800" dirty="0"/>
               <a:t>Page Authorization – feature</a:t>
             </a:r>
-            <a:endParaRPr lang="en-US" sz="4800" dirty="0"/>
           </a:p>
         </p:txBody>
       </p:sp>
@@ -11167,7 +11523,6 @@
               <a:rPr lang="en-US" sz="4800" dirty="0"/>
               <a:t>Authorization – feature</a:t>
             </a:r>
-            <a:endParaRPr lang="en-US" sz="4800" dirty="0"/>
           </a:p>
         </p:txBody>
       </p:sp>
@@ -11551,7 +11906,7 @@
       </p:sp>
       <p:pic>
         <p:nvPicPr>
-          <p:cNvPr id="5" name="Picture 4"/>
+          <p:cNvPr id="4" name="Picture 3"/>
           <p:cNvPicPr>
             <a:picLocks noChangeAspect="1"/>
           </p:cNvPicPr>
@@ -11565,8 +11920,8 @@
         </p:blipFill>
         <p:spPr>
           <a:xfrm>
-            <a:off x="838200" y="2136103"/>
-            <a:ext cx="7184923" cy="3968963"/>
+            <a:off x="838200" y="2887507"/>
+            <a:ext cx="7194741" cy="1861473"/>
           </a:xfrm>
           <a:prstGeom prst="rect">
             <a:avLst/>
@@ -11740,8 +12095,20 @@
           <a:lstStyle/>
           <a:p>
             <a:r>
+              <a:rPr lang="en-US" sz="4800" dirty="0"/>
+              <a:t>Property </a:t>
+            </a:r>
+            <a:r>
               <a:rPr lang="en-US" sz="4800" dirty="0" smtClean="0"/>
-              <a:t>Patented step-by-step slide</a:t>
+              <a:t>Encryption </a:t>
+            </a:r>
+            <a:r>
+              <a:rPr lang="en-US" sz="4800" dirty="0"/>
+              <a:t>– </a:t>
+            </a:r>
+            <a:r>
+              <a:rPr lang="en-US" sz="4800" dirty="0" smtClean="0"/>
+              <a:t>cross cutting</a:t>
             </a:r>
             <a:endParaRPr lang="en-US" sz="4800" dirty="0"/>
           </a:p>
@@ -11769,40 +12136,6 @@
           </a:bodyPr>
           <a:lstStyle/>
           <a:p>
-            <a:r>
-              <a:rPr lang="en-US" sz="4000" dirty="0" smtClean="0">
-                <a:solidFill>
-                  <a:schemeClr val="bg1">
-                    <a:lumMod val="65000"/>
-                  </a:schemeClr>
-                </a:solidFill>
-              </a:rPr>
-              <a:t>Old news</a:t>
-            </a:r>
-            <a:br>
-              <a:rPr lang="en-US" sz="4000" dirty="0" smtClean="0">
-                <a:solidFill>
-                  <a:schemeClr val="bg1">
-                    <a:lumMod val="65000"/>
-                  </a:schemeClr>
-                </a:solidFill>
-              </a:rPr>
-            </a:br>
-            <a:endParaRPr lang="en-US" sz="4000" dirty="0" smtClean="0">
-              <a:solidFill>
-                <a:schemeClr val="bg1">
-                  <a:lumMod val="65000"/>
-                </a:schemeClr>
-              </a:solidFill>
-            </a:endParaRPr>
-          </a:p>
-          <a:p>
-            <a:r>
-              <a:rPr lang="en-US" sz="4000" b="1" dirty="0" smtClean="0"/>
-              <a:t>New hotness</a:t>
-            </a:r>
-          </a:p>
-          <a:p>
             <a:endParaRPr lang="en-US" sz="4000" dirty="0" smtClean="0"/>
           </a:p>
           <a:p>
@@ -11816,10 +12149,34 @@
           </a:p>
         </p:txBody>
       </p:sp>
+      <p:pic>
+        <p:nvPicPr>
+          <p:cNvPr id="4" name="Picture 3"/>
+          <p:cNvPicPr>
+            <a:picLocks noChangeAspect="1"/>
+          </p:cNvPicPr>
+          <p:nvPr/>
+        </p:nvPicPr>
+        <p:blipFill>
+          <a:blip r:embed="rId3"/>
+          <a:stretch>
+            <a:fillRect/>
+          </a:stretch>
+        </p:blipFill>
+        <p:spPr>
+          <a:xfrm>
+            <a:off x="838200" y="3055525"/>
+            <a:ext cx="7301063" cy="1065060"/>
+          </a:xfrm>
+          <a:prstGeom prst="rect">
+            <a:avLst/>
+          </a:prstGeom>
+        </p:spPr>
+      </p:pic>
     </p:spTree>
     <p:extLst>
       <p:ext uri="{BB962C8B-B14F-4D97-AF65-F5344CB8AC3E}">
-        <p14:creationId xmlns:p14="http://schemas.microsoft.com/office/powerpoint/2010/main" val="1887088746"/>
+        <p14:creationId xmlns:p14="http://schemas.microsoft.com/office/powerpoint/2010/main" val="1269661880"/>
       </p:ext>
     </p:extLst>
   </p:cSld>
@@ -11863,60 +12220,57 @@
             <p:ph type="title"/>
           </p:nvPr>
         </p:nvSpPr>
-        <p:spPr/>
-        <p:txBody>
-          <a:bodyPr>
+        <p:spPr>
+          <a:xfrm>
+            <a:off x="964927" y="1"/>
+            <a:ext cx="10515600" cy="6858000"/>
+          </a:xfrm>
+        </p:spPr>
+        <p:txBody>
+          <a:bodyPr anchor="ctr">
             <a:normAutofit/>
           </a:bodyPr>
           <a:lstStyle/>
           <a:p>
+            <a:pPr algn="ctr"/>
             <a:r>
               <a:rPr lang="en-US" sz="4800" dirty="0" smtClean="0"/>
-              <a:t>Canonical example: SQL Injection</a:t>
-            </a:r>
-            <a:endParaRPr lang="en-US" sz="4800" dirty="0"/>
-          </a:p>
-        </p:txBody>
-      </p:sp>
-      <p:sp>
-        <p:nvSpPr>
-          <p:cNvPr id="3" name="Content Placeholder 2"/>
-          <p:cNvSpPr>
-            <a:spLocks noGrp="1"/>
-          </p:cNvSpPr>
-          <p:nvPr>
-            <p:ph idx="1"/>
-          </p:nvPr>
-        </p:nvSpPr>
-        <p:spPr>
-          <a:xfrm>
-            <a:off x="838200" y="1825624"/>
-            <a:ext cx="10515600" cy="4589923"/>
-          </a:xfrm>
-        </p:spPr>
-        <p:txBody>
-          <a:bodyPr>
-            <a:normAutofit/>
-          </a:bodyPr>
-          <a:lstStyle/>
-          <a:p>
-            <a:endParaRPr lang="en-US" sz="4000" dirty="0" smtClean="0"/>
-          </a:p>
-          <a:p>
-            <a:endParaRPr lang="en-US" dirty="0" smtClean="0"/>
-          </a:p>
-          <a:p>
-            <a:endParaRPr lang="en-US" dirty="0" smtClean="0"/>
-          </a:p>
-          <a:p>
-            <a:endParaRPr lang="en-US" dirty="0"/>
+              <a:t>Access Control</a:t>
+            </a:r>
+            <a:r>
+              <a:rPr lang="en-US" sz="4800" dirty="0" smtClean="0"/>
+              <a:t/>
+            </a:r>
+            <a:br>
+              <a:rPr lang="en-US" sz="4800" dirty="0" smtClean="0"/>
+            </a:br>
+            <a:r>
+              <a:rPr lang="en-US" sz="4800" dirty="0"/>
+              <a:t/>
+            </a:r>
+            <a:br>
+              <a:rPr lang="en-US" sz="4800" dirty="0"/>
+            </a:br>
+            <a:r>
+              <a:rPr lang="en-US" dirty="0" smtClean="0">
+                <a:solidFill>
+                  <a:srgbClr val="013947"/>
+                </a:solidFill>
+              </a:rPr>
+              <a:t>Keeping Bob's hands off Alice's data</a:t>
+            </a:r>
+            <a:endParaRPr lang="en-US" sz="4800" dirty="0">
+              <a:solidFill>
+                <a:srgbClr val="013947"/>
+              </a:solidFill>
+            </a:endParaRPr>
           </a:p>
         </p:txBody>
       </p:sp>
     </p:spTree>
     <p:extLst>
       <p:ext uri="{BB962C8B-B14F-4D97-AF65-F5344CB8AC3E}">
-        <p14:creationId xmlns:p14="http://schemas.microsoft.com/office/powerpoint/2010/main" val="1766242099"/>
+        <p14:creationId xmlns:p14="http://schemas.microsoft.com/office/powerpoint/2010/main" val="1068382756"/>
       </p:ext>
     </p:extLst>
   </p:cSld>
@@ -11973,8 +12327,13 @@
             </a:r>
             <a:r>
               <a:rPr lang="en-US" sz="4800" dirty="0"/>
-              <a:t>- feature</a:t>
-            </a:r>
+              <a:t>– </a:t>
+            </a:r>
+            <a:r>
+              <a:rPr lang="en-US" sz="4800" dirty="0" smtClean="0"/>
+              <a:t>feature</a:t>
+            </a:r>
+            <a:endParaRPr lang="en-US" sz="4800" dirty="0"/>
           </a:p>
         </p:txBody>
       </p:sp>
@@ -12094,11 +12453,11 @@
             </a:r>
             <a:r>
               <a:rPr lang="en-US" sz="4800" dirty="0"/>
-              <a:t>- </a:t>
+              <a:t>– </a:t>
             </a:r>
             <a:r>
               <a:rPr lang="en-US" sz="4800" dirty="0" smtClean="0"/>
-              <a:t>framework</a:t>
+              <a:t>feature</a:t>
             </a:r>
             <a:endParaRPr lang="en-US" sz="4800" dirty="0"/>
           </a:p>
@@ -12152,8 +12511,130 @@
         </p:blipFill>
         <p:spPr>
           <a:xfrm>
-            <a:off x="838200" y="2607646"/>
-            <a:ext cx="10628393" cy="3025877"/>
+            <a:off x="838200" y="2221629"/>
+            <a:ext cx="11276443" cy="4193918"/>
+          </a:xfrm>
+          <a:prstGeom prst="rect">
+            <a:avLst/>
+          </a:prstGeom>
+        </p:spPr>
+      </p:pic>
+    </p:spTree>
+    <p:extLst>
+      <p:ext uri="{BB962C8B-B14F-4D97-AF65-F5344CB8AC3E}">
+        <p14:creationId xmlns:p14="http://schemas.microsoft.com/office/powerpoint/2010/main" val="3760007832"/>
+      </p:ext>
+    </p:extLst>
+  </p:cSld>
+  <p:clrMapOvr>
+    <a:masterClrMapping/>
+  </p:clrMapOvr>
+  <p:timing>
+    <p:tnLst>
+      <p:par>
+        <p:cTn id="1" dur="indefinite" restart="never" nodeType="tmRoot"/>
+      </p:par>
+    </p:tnLst>
+  </p:timing>
+</p:sld>
+</file>
+
+<file path=ppt/slides/slide44.xml><?xml version="1.0" encoding="utf-8"?>
+<p:sld xmlns:a="http://schemas.openxmlformats.org/drawingml/2006/main" xmlns:r="http://schemas.openxmlformats.org/officeDocument/2006/relationships" xmlns:p="http://schemas.openxmlformats.org/presentationml/2006/main">
+  <p:cSld>
+    <p:spTree>
+      <p:nvGrpSpPr>
+        <p:cNvPr id="1" name=""/>
+        <p:cNvGrpSpPr/>
+        <p:nvPr/>
+      </p:nvGrpSpPr>
+      <p:grpSpPr>
+        <a:xfrm>
+          <a:off x="0" y="0"/>
+          <a:ext cx="0" cy="0"/>
+          <a:chOff x="0" y="0"/>
+          <a:chExt cx="0" cy="0"/>
+        </a:xfrm>
+      </p:grpSpPr>
+      <p:sp>
+        <p:nvSpPr>
+          <p:cNvPr id="2" name="Title 1"/>
+          <p:cNvSpPr>
+            <a:spLocks noGrp="1"/>
+          </p:cNvSpPr>
+          <p:nvPr>
+            <p:ph type="title"/>
+          </p:nvPr>
+        </p:nvSpPr>
+        <p:spPr/>
+        <p:txBody>
+          <a:bodyPr>
+            <a:normAutofit/>
+          </a:bodyPr>
+          <a:lstStyle/>
+          <a:p>
+            <a:r>
+              <a:rPr lang="en-US" sz="4800" dirty="0" smtClean="0"/>
+              <a:t>Access Control </a:t>
+            </a:r>
+            <a:r>
+              <a:rPr lang="en-US" sz="4800" dirty="0"/>
+              <a:t>– framework</a:t>
+            </a:r>
+            <a:endParaRPr lang="en-US" sz="4800" dirty="0"/>
+          </a:p>
+        </p:txBody>
+      </p:sp>
+      <p:sp>
+        <p:nvSpPr>
+          <p:cNvPr id="3" name="Content Placeholder 2"/>
+          <p:cNvSpPr>
+            <a:spLocks noGrp="1"/>
+          </p:cNvSpPr>
+          <p:nvPr>
+            <p:ph idx="1"/>
+          </p:nvPr>
+        </p:nvSpPr>
+        <p:spPr>
+          <a:xfrm>
+            <a:off x="838200" y="1825624"/>
+            <a:ext cx="10515600" cy="4589923"/>
+          </a:xfrm>
+        </p:spPr>
+        <p:txBody>
+          <a:bodyPr>
+            <a:normAutofit/>
+          </a:bodyPr>
+          <a:lstStyle/>
+          <a:p>
+            <a:endParaRPr lang="en-US" dirty="0" smtClean="0"/>
+          </a:p>
+          <a:p>
+            <a:endParaRPr lang="en-US" dirty="0" smtClean="0"/>
+          </a:p>
+          <a:p>
+            <a:endParaRPr lang="en-US" dirty="0"/>
+          </a:p>
+        </p:txBody>
+      </p:sp>
+      <p:pic>
+        <p:nvPicPr>
+          <p:cNvPr id="7" name="Picture 6"/>
+          <p:cNvPicPr>
+            <a:picLocks noChangeAspect="1"/>
+          </p:cNvPicPr>
+          <p:nvPr/>
+        </p:nvPicPr>
+        <p:blipFill>
+          <a:blip r:embed="rId3"/>
+          <a:stretch>
+            <a:fillRect/>
+          </a:stretch>
+        </p:blipFill>
+        <p:spPr>
+          <a:xfrm>
+            <a:off x="838200" y="1960560"/>
+            <a:ext cx="10991659" cy="4589923"/>
           </a:xfrm>
           <a:prstGeom prst="rect">
             <a:avLst/>
@@ -12180,7 +12661,357 @@
 </p:sld>
 </file>
 
-<file path=ppt/slides/slide44.xml><?xml version="1.0" encoding="utf-8"?>
+<file path=ppt/slides/slide45.xml><?xml version="1.0" encoding="utf-8"?>
+<p:sld xmlns:a="http://schemas.openxmlformats.org/drawingml/2006/main" xmlns:r="http://schemas.openxmlformats.org/officeDocument/2006/relationships" xmlns:p="http://schemas.openxmlformats.org/presentationml/2006/main">
+  <p:cSld>
+    <p:spTree>
+      <p:nvGrpSpPr>
+        <p:cNvPr id="1" name=""/>
+        <p:cNvGrpSpPr/>
+        <p:nvPr/>
+      </p:nvGrpSpPr>
+      <p:grpSpPr>
+        <a:xfrm>
+          <a:off x="0" y="0"/>
+          <a:ext cx="0" cy="0"/>
+          <a:chOff x="0" y="0"/>
+          <a:chExt cx="0" cy="0"/>
+        </a:xfrm>
+      </p:grpSpPr>
+      <p:sp>
+        <p:nvSpPr>
+          <p:cNvPr id="2" name="Title 1"/>
+          <p:cNvSpPr>
+            <a:spLocks noGrp="1"/>
+          </p:cNvSpPr>
+          <p:nvPr>
+            <p:ph type="title"/>
+          </p:nvPr>
+        </p:nvSpPr>
+        <p:spPr/>
+        <p:txBody>
+          <a:bodyPr>
+            <a:normAutofit/>
+          </a:bodyPr>
+          <a:lstStyle/>
+          <a:p>
+            <a:r>
+              <a:rPr lang="en-US" sz="4800" dirty="0" smtClean="0"/>
+              <a:t>Access Control </a:t>
+            </a:r>
+            <a:r>
+              <a:rPr lang="en-US" sz="4800" dirty="0"/>
+              <a:t>– framework</a:t>
+            </a:r>
+            <a:endParaRPr lang="en-US" sz="4800" dirty="0"/>
+          </a:p>
+        </p:txBody>
+      </p:sp>
+      <p:sp>
+        <p:nvSpPr>
+          <p:cNvPr id="3" name="Content Placeholder 2"/>
+          <p:cNvSpPr>
+            <a:spLocks noGrp="1"/>
+          </p:cNvSpPr>
+          <p:nvPr>
+            <p:ph idx="1"/>
+          </p:nvPr>
+        </p:nvSpPr>
+        <p:spPr>
+          <a:xfrm>
+            <a:off x="838200" y="1825624"/>
+            <a:ext cx="10515600" cy="4589923"/>
+          </a:xfrm>
+        </p:spPr>
+        <p:txBody>
+          <a:bodyPr>
+            <a:normAutofit/>
+          </a:bodyPr>
+          <a:lstStyle/>
+          <a:p>
+            <a:endParaRPr lang="en-US" dirty="0" smtClean="0"/>
+          </a:p>
+          <a:p>
+            <a:endParaRPr lang="en-US" dirty="0" smtClean="0"/>
+          </a:p>
+          <a:p>
+            <a:endParaRPr lang="en-US" dirty="0"/>
+          </a:p>
+        </p:txBody>
+      </p:sp>
+      <p:pic>
+        <p:nvPicPr>
+          <p:cNvPr id="4" name="Picture 3"/>
+          <p:cNvPicPr>
+            <a:picLocks noChangeAspect="1"/>
+          </p:cNvPicPr>
+          <p:nvPr/>
+        </p:nvPicPr>
+        <p:blipFill>
+          <a:blip r:embed="rId3"/>
+          <a:stretch>
+            <a:fillRect/>
+          </a:stretch>
+        </p:blipFill>
+        <p:spPr>
+          <a:xfrm>
+            <a:off x="838200" y="2607646"/>
+            <a:ext cx="11147699" cy="3173722"/>
+          </a:xfrm>
+          <a:prstGeom prst="rect">
+            <a:avLst/>
+          </a:prstGeom>
+        </p:spPr>
+      </p:pic>
+    </p:spTree>
+    <p:extLst>
+      <p:ext uri="{BB962C8B-B14F-4D97-AF65-F5344CB8AC3E}">
+        <p14:creationId xmlns:p14="http://schemas.microsoft.com/office/powerpoint/2010/main" val="1142635180"/>
+      </p:ext>
+    </p:extLst>
+  </p:cSld>
+  <p:clrMapOvr>
+    <a:masterClrMapping/>
+  </p:clrMapOvr>
+  <p:timing>
+    <p:tnLst>
+      <p:par>
+        <p:cTn id="1" dur="indefinite" restart="never" nodeType="tmRoot"/>
+      </p:par>
+    </p:tnLst>
+  </p:timing>
+</p:sld>
+</file>
+
+<file path=ppt/slides/slide46.xml><?xml version="1.0" encoding="utf-8"?>
+<p:sld xmlns:a="http://schemas.openxmlformats.org/drawingml/2006/main" xmlns:r="http://schemas.openxmlformats.org/officeDocument/2006/relationships" xmlns:p="http://schemas.openxmlformats.org/presentationml/2006/main">
+  <p:cSld>
+    <p:spTree>
+      <p:nvGrpSpPr>
+        <p:cNvPr id="1" name=""/>
+        <p:cNvGrpSpPr/>
+        <p:nvPr/>
+      </p:nvGrpSpPr>
+      <p:grpSpPr>
+        <a:xfrm>
+          <a:off x="0" y="0"/>
+          <a:ext cx="0" cy="0"/>
+          <a:chOff x="0" y="0"/>
+          <a:chExt cx="0" cy="0"/>
+        </a:xfrm>
+      </p:grpSpPr>
+      <p:sp>
+        <p:nvSpPr>
+          <p:cNvPr id="2" name="Title 1"/>
+          <p:cNvSpPr>
+            <a:spLocks noGrp="1"/>
+          </p:cNvSpPr>
+          <p:nvPr>
+            <p:ph type="title"/>
+          </p:nvPr>
+        </p:nvSpPr>
+        <p:spPr/>
+        <p:txBody>
+          <a:bodyPr>
+            <a:normAutofit/>
+          </a:bodyPr>
+          <a:lstStyle/>
+          <a:p>
+            <a:r>
+              <a:rPr lang="en-US" sz="4800" dirty="0" smtClean="0"/>
+              <a:t>Patented step-by-step slide</a:t>
+            </a:r>
+            <a:endParaRPr lang="en-US" sz="4800" dirty="0"/>
+          </a:p>
+        </p:txBody>
+      </p:sp>
+      <p:sp>
+        <p:nvSpPr>
+          <p:cNvPr id="3" name="Content Placeholder 2"/>
+          <p:cNvSpPr>
+            <a:spLocks noGrp="1"/>
+          </p:cNvSpPr>
+          <p:nvPr>
+            <p:ph idx="1"/>
+          </p:nvPr>
+        </p:nvSpPr>
+        <p:spPr>
+          <a:xfrm>
+            <a:off x="838200" y="1825624"/>
+            <a:ext cx="10515600" cy="4589923"/>
+          </a:xfrm>
+        </p:spPr>
+        <p:txBody>
+          <a:bodyPr>
+            <a:normAutofit/>
+          </a:bodyPr>
+          <a:lstStyle/>
+          <a:p>
+            <a:r>
+              <a:rPr lang="en-US" sz="4000" dirty="0" smtClean="0">
+                <a:solidFill>
+                  <a:schemeClr val="bg1">
+                    <a:lumMod val="65000"/>
+                  </a:schemeClr>
+                </a:solidFill>
+              </a:rPr>
+              <a:t>Old news</a:t>
+            </a:r>
+            <a:br>
+              <a:rPr lang="en-US" sz="4000" dirty="0" smtClean="0">
+                <a:solidFill>
+                  <a:schemeClr val="bg1">
+                    <a:lumMod val="65000"/>
+                  </a:schemeClr>
+                </a:solidFill>
+              </a:rPr>
+            </a:br>
+            <a:endParaRPr lang="en-US" sz="4000" dirty="0" smtClean="0">
+              <a:solidFill>
+                <a:schemeClr val="bg1">
+                  <a:lumMod val="65000"/>
+                </a:schemeClr>
+              </a:solidFill>
+            </a:endParaRPr>
+          </a:p>
+          <a:p>
+            <a:r>
+              <a:rPr lang="en-US" sz="4000" b="1" dirty="0" smtClean="0"/>
+              <a:t>New hotness</a:t>
+            </a:r>
+          </a:p>
+          <a:p>
+            <a:endParaRPr lang="en-US" sz="4000" dirty="0" smtClean="0"/>
+          </a:p>
+          <a:p>
+            <a:endParaRPr lang="en-US" dirty="0" smtClean="0"/>
+          </a:p>
+          <a:p>
+            <a:endParaRPr lang="en-US" dirty="0" smtClean="0"/>
+          </a:p>
+          <a:p>
+            <a:endParaRPr lang="en-US" dirty="0"/>
+          </a:p>
+        </p:txBody>
+      </p:sp>
+    </p:spTree>
+    <p:extLst>
+      <p:ext uri="{BB962C8B-B14F-4D97-AF65-F5344CB8AC3E}">
+        <p14:creationId xmlns:p14="http://schemas.microsoft.com/office/powerpoint/2010/main" val="1887088746"/>
+      </p:ext>
+    </p:extLst>
+  </p:cSld>
+  <p:clrMapOvr>
+    <a:masterClrMapping/>
+  </p:clrMapOvr>
+  <p:timing>
+    <p:tnLst>
+      <p:par>
+        <p:cTn id="1" dur="indefinite" restart="never" nodeType="tmRoot"/>
+      </p:par>
+    </p:tnLst>
+  </p:timing>
+</p:sld>
+</file>
+
+<file path=ppt/slides/slide47.xml><?xml version="1.0" encoding="utf-8"?>
+<p:sld xmlns:a="http://schemas.openxmlformats.org/drawingml/2006/main" xmlns:r="http://schemas.openxmlformats.org/officeDocument/2006/relationships" xmlns:p="http://schemas.openxmlformats.org/presentationml/2006/main">
+  <p:cSld>
+    <p:spTree>
+      <p:nvGrpSpPr>
+        <p:cNvPr id="1" name=""/>
+        <p:cNvGrpSpPr/>
+        <p:nvPr/>
+      </p:nvGrpSpPr>
+      <p:grpSpPr>
+        <a:xfrm>
+          <a:off x="0" y="0"/>
+          <a:ext cx="0" cy="0"/>
+          <a:chOff x="0" y="0"/>
+          <a:chExt cx="0" cy="0"/>
+        </a:xfrm>
+      </p:grpSpPr>
+      <p:sp>
+        <p:nvSpPr>
+          <p:cNvPr id="2" name="Title 1"/>
+          <p:cNvSpPr>
+            <a:spLocks noGrp="1"/>
+          </p:cNvSpPr>
+          <p:nvPr>
+            <p:ph type="title"/>
+          </p:nvPr>
+        </p:nvSpPr>
+        <p:spPr/>
+        <p:txBody>
+          <a:bodyPr>
+            <a:normAutofit/>
+          </a:bodyPr>
+          <a:lstStyle/>
+          <a:p>
+            <a:r>
+              <a:rPr lang="en-US" sz="4800" dirty="0" smtClean="0"/>
+              <a:t>Canonical example: SQL Injection</a:t>
+            </a:r>
+            <a:endParaRPr lang="en-US" sz="4800" dirty="0"/>
+          </a:p>
+        </p:txBody>
+      </p:sp>
+      <p:sp>
+        <p:nvSpPr>
+          <p:cNvPr id="3" name="Content Placeholder 2"/>
+          <p:cNvSpPr>
+            <a:spLocks noGrp="1"/>
+          </p:cNvSpPr>
+          <p:nvPr>
+            <p:ph idx="1"/>
+          </p:nvPr>
+        </p:nvSpPr>
+        <p:spPr>
+          <a:xfrm>
+            <a:off x="838200" y="1825624"/>
+            <a:ext cx="10515600" cy="4589923"/>
+          </a:xfrm>
+        </p:spPr>
+        <p:txBody>
+          <a:bodyPr>
+            <a:normAutofit/>
+          </a:bodyPr>
+          <a:lstStyle/>
+          <a:p>
+            <a:endParaRPr lang="en-US" sz="4000" dirty="0" smtClean="0"/>
+          </a:p>
+          <a:p>
+            <a:endParaRPr lang="en-US" dirty="0" smtClean="0"/>
+          </a:p>
+          <a:p>
+            <a:endParaRPr lang="en-US" dirty="0" smtClean="0"/>
+          </a:p>
+          <a:p>
+            <a:endParaRPr lang="en-US" dirty="0"/>
+          </a:p>
+        </p:txBody>
+      </p:sp>
+    </p:spTree>
+    <p:extLst>
+      <p:ext uri="{BB962C8B-B14F-4D97-AF65-F5344CB8AC3E}">
+        <p14:creationId xmlns:p14="http://schemas.microsoft.com/office/powerpoint/2010/main" val="1766242099"/>
+      </p:ext>
+    </p:extLst>
+  </p:cSld>
+  <p:clrMapOvr>
+    <a:masterClrMapping/>
+  </p:clrMapOvr>
+  <p:timing>
+    <p:tnLst>
+      <p:par>
+        <p:cTn id="1" dur="indefinite" restart="never" nodeType="tmRoot"/>
+      </p:par>
+    </p:tnLst>
+  </p:timing>
+</p:sld>
+</file>
+
+<file path=ppt/slides/slide48.xml><?xml version="1.0" encoding="utf-8"?>
 <p:sld xmlns:a="http://schemas.openxmlformats.org/drawingml/2006/main" xmlns:r="http://schemas.openxmlformats.org/officeDocument/2006/relationships" xmlns:p="http://schemas.openxmlformats.org/presentationml/2006/main">
   <p:cSld>
     <p:spTree>

</xml_diff>

<commit_message>
Added RLS to narrative / PPT
</commit_message>
<xml_diff>
--- a/Secure Systems - CodeMash 2017.pptx
+++ b/Secure Systems - CodeMash 2017.pptx
@@ -5,7 +5,7 @@
     <p:sldMasterId id="2147483749" r:id="rId1"/>
   </p:sldMasterIdLst>
   <p:notesMasterIdLst>
-    <p:notesMasterId r:id="rId50"/>
+    <p:notesMasterId r:id="rId53"/>
   </p:notesMasterIdLst>
   <p:sldIdLst>
     <p:sldId id="395" r:id="rId2"/>
@@ -53,9 +53,12 @@
     <p:sldId id="535" r:id="rId44"/>
     <p:sldId id="507" r:id="rId45"/>
     <p:sldId id="536" r:id="rId46"/>
-    <p:sldId id="504" r:id="rId47"/>
-    <p:sldId id="485" r:id="rId48"/>
-    <p:sldId id="443" r:id="rId49"/>
+    <p:sldId id="538" r:id="rId47"/>
+    <p:sldId id="539" r:id="rId48"/>
+    <p:sldId id="537" r:id="rId49"/>
+    <p:sldId id="504" r:id="rId50"/>
+    <p:sldId id="485" r:id="rId51"/>
+    <p:sldId id="443" r:id="rId52"/>
   </p:sldIdLst>
   <p:sldSz cx="12192000" cy="6858000"/>
   <p:notesSz cx="6858000" cy="9144000"/>
@@ -4115,7 +4118,7 @@
     </p:spTree>
     <p:extLst>
       <p:ext uri="{BB962C8B-B14F-4D97-AF65-F5344CB8AC3E}">
-        <p14:creationId xmlns:p14="http://schemas.microsoft.com/office/powerpoint/2010/main" val="2602777311"/>
+        <p14:creationId xmlns:p14="http://schemas.microsoft.com/office/powerpoint/2010/main" val="1174323916"/>
       </p:ext>
     </p:extLst>
   </p:cSld>
@@ -4199,7 +4202,7 @@
     </p:spTree>
     <p:extLst>
       <p:ext uri="{BB962C8B-B14F-4D97-AF65-F5344CB8AC3E}">
-        <p14:creationId xmlns:p14="http://schemas.microsoft.com/office/powerpoint/2010/main" val="2267138517"/>
+        <p14:creationId xmlns:p14="http://schemas.microsoft.com/office/powerpoint/2010/main" val="22929660"/>
       </p:ext>
     </p:extLst>
   </p:cSld>
@@ -4253,15 +4256,7 @@
           <a:bodyPr/>
           <a:lstStyle/>
           <a:p>
-            <a:endParaRPr lang="en-US" sz="1200" kern="1200" dirty="0" smtClean="0">
-              <a:solidFill>
-                <a:schemeClr val="tx1"/>
-              </a:solidFill>
-              <a:effectLst/>
-              <a:latin typeface="+mn-lt"/>
-              <a:ea typeface="+mn-ea"/>
-              <a:cs typeface="+mn-cs"/>
-            </a:endParaRPr>
+            <a:endParaRPr lang="en-US" b="0" dirty="0" smtClean="0"/>
           </a:p>
         </p:txBody>
       </p:sp>
@@ -4291,7 +4286,91 @@
     </p:spTree>
     <p:extLst>
       <p:ext uri="{BB962C8B-B14F-4D97-AF65-F5344CB8AC3E}">
-        <p14:creationId xmlns:p14="http://schemas.microsoft.com/office/powerpoint/2010/main" val="2813022412"/>
+        <p14:creationId xmlns:p14="http://schemas.microsoft.com/office/powerpoint/2010/main" val="3079792467"/>
+      </p:ext>
+    </p:extLst>
+  </p:cSld>
+  <p:clrMapOvr>
+    <a:masterClrMapping/>
+  </p:clrMapOvr>
+</p:notes>
+</file>
+
+<file path=ppt/notesSlides/notesSlide49.xml><?xml version="1.0" encoding="utf-8"?>
+<p:notes xmlns:a="http://schemas.openxmlformats.org/drawingml/2006/main" xmlns:r="http://schemas.openxmlformats.org/officeDocument/2006/relationships" xmlns:p="http://schemas.openxmlformats.org/presentationml/2006/main">
+  <p:cSld>
+    <p:spTree>
+      <p:nvGrpSpPr>
+        <p:cNvPr id="1" name=""/>
+        <p:cNvGrpSpPr/>
+        <p:nvPr/>
+      </p:nvGrpSpPr>
+      <p:grpSpPr>
+        <a:xfrm>
+          <a:off x="0" y="0"/>
+          <a:ext cx="0" cy="0"/>
+          <a:chOff x="0" y="0"/>
+          <a:chExt cx="0" cy="0"/>
+        </a:xfrm>
+      </p:grpSpPr>
+      <p:sp>
+        <p:nvSpPr>
+          <p:cNvPr id="2" name="Slide Image Placeholder 1"/>
+          <p:cNvSpPr>
+            <a:spLocks noGrp="1" noRot="1" noChangeAspect="1"/>
+          </p:cNvSpPr>
+          <p:nvPr>
+            <p:ph type="sldImg"/>
+          </p:nvPr>
+        </p:nvSpPr>
+        <p:spPr/>
+      </p:sp>
+      <p:sp>
+        <p:nvSpPr>
+          <p:cNvPr id="3" name="Notes Placeholder 2"/>
+          <p:cNvSpPr>
+            <a:spLocks noGrp="1"/>
+          </p:cNvSpPr>
+          <p:nvPr>
+            <p:ph type="body" idx="1"/>
+          </p:nvPr>
+        </p:nvSpPr>
+        <p:spPr/>
+        <p:txBody>
+          <a:bodyPr/>
+          <a:lstStyle/>
+          <a:p>
+            <a:endParaRPr lang="en-US" b="0" dirty="0" smtClean="0"/>
+          </a:p>
+        </p:txBody>
+      </p:sp>
+      <p:sp>
+        <p:nvSpPr>
+          <p:cNvPr id="4" name="Slide Number Placeholder 3"/>
+          <p:cNvSpPr>
+            <a:spLocks noGrp="1"/>
+          </p:cNvSpPr>
+          <p:nvPr>
+            <p:ph type="sldNum" sz="quarter" idx="10"/>
+          </p:nvPr>
+        </p:nvSpPr>
+        <p:spPr/>
+        <p:txBody>
+          <a:bodyPr/>
+          <a:lstStyle/>
+          <a:p>
+            <a:fld id="{89029652-62E7-43D6-83B5-097D7B7AA5D8}" type="slidenum">
+              <a:rPr lang="en-US" smtClean="0"/>
+              <a:t>49</a:t>
+            </a:fld>
+            <a:endParaRPr lang="en-US"/>
+          </a:p>
+        </p:txBody>
+      </p:sp>
+    </p:spTree>
+    <p:extLst>
+      <p:ext uri="{BB962C8B-B14F-4D97-AF65-F5344CB8AC3E}">
+        <p14:creationId xmlns:p14="http://schemas.microsoft.com/office/powerpoint/2010/main" val="2602777311"/>
       </p:ext>
     </p:extLst>
   </p:cSld>
@@ -4376,6 +4455,182 @@
     <p:extLst>
       <p:ext uri="{BB962C8B-B14F-4D97-AF65-F5344CB8AC3E}">
         <p14:creationId xmlns:p14="http://schemas.microsoft.com/office/powerpoint/2010/main" val="3283155068"/>
+      </p:ext>
+    </p:extLst>
+  </p:cSld>
+  <p:clrMapOvr>
+    <a:masterClrMapping/>
+  </p:clrMapOvr>
+</p:notes>
+</file>
+
+<file path=ppt/notesSlides/notesSlide50.xml><?xml version="1.0" encoding="utf-8"?>
+<p:notes xmlns:a="http://schemas.openxmlformats.org/drawingml/2006/main" xmlns:r="http://schemas.openxmlformats.org/officeDocument/2006/relationships" xmlns:p="http://schemas.openxmlformats.org/presentationml/2006/main">
+  <p:cSld>
+    <p:spTree>
+      <p:nvGrpSpPr>
+        <p:cNvPr id="1" name=""/>
+        <p:cNvGrpSpPr/>
+        <p:nvPr/>
+      </p:nvGrpSpPr>
+      <p:grpSpPr>
+        <a:xfrm>
+          <a:off x="0" y="0"/>
+          <a:ext cx="0" cy="0"/>
+          <a:chOff x="0" y="0"/>
+          <a:chExt cx="0" cy="0"/>
+        </a:xfrm>
+      </p:grpSpPr>
+      <p:sp>
+        <p:nvSpPr>
+          <p:cNvPr id="2" name="Slide Image Placeholder 1"/>
+          <p:cNvSpPr>
+            <a:spLocks noGrp="1" noRot="1" noChangeAspect="1"/>
+          </p:cNvSpPr>
+          <p:nvPr>
+            <p:ph type="sldImg"/>
+          </p:nvPr>
+        </p:nvSpPr>
+        <p:spPr/>
+      </p:sp>
+      <p:sp>
+        <p:nvSpPr>
+          <p:cNvPr id="3" name="Notes Placeholder 2"/>
+          <p:cNvSpPr>
+            <a:spLocks noGrp="1"/>
+          </p:cNvSpPr>
+          <p:nvPr>
+            <p:ph type="body" idx="1"/>
+          </p:nvPr>
+        </p:nvSpPr>
+        <p:spPr/>
+        <p:txBody>
+          <a:bodyPr/>
+          <a:lstStyle/>
+          <a:p>
+            <a:endParaRPr lang="en-US" b="0" dirty="0" smtClean="0"/>
+          </a:p>
+        </p:txBody>
+      </p:sp>
+      <p:sp>
+        <p:nvSpPr>
+          <p:cNvPr id="4" name="Slide Number Placeholder 3"/>
+          <p:cNvSpPr>
+            <a:spLocks noGrp="1"/>
+          </p:cNvSpPr>
+          <p:nvPr>
+            <p:ph type="sldNum" sz="quarter" idx="10"/>
+          </p:nvPr>
+        </p:nvSpPr>
+        <p:spPr/>
+        <p:txBody>
+          <a:bodyPr/>
+          <a:lstStyle/>
+          <a:p>
+            <a:fld id="{89029652-62E7-43D6-83B5-097D7B7AA5D8}" type="slidenum">
+              <a:rPr lang="en-US" smtClean="0"/>
+              <a:t>50</a:t>
+            </a:fld>
+            <a:endParaRPr lang="en-US"/>
+          </a:p>
+        </p:txBody>
+      </p:sp>
+    </p:spTree>
+    <p:extLst>
+      <p:ext uri="{BB962C8B-B14F-4D97-AF65-F5344CB8AC3E}">
+        <p14:creationId xmlns:p14="http://schemas.microsoft.com/office/powerpoint/2010/main" val="2267138517"/>
+      </p:ext>
+    </p:extLst>
+  </p:cSld>
+  <p:clrMapOvr>
+    <a:masterClrMapping/>
+  </p:clrMapOvr>
+</p:notes>
+</file>
+
+<file path=ppt/notesSlides/notesSlide51.xml><?xml version="1.0" encoding="utf-8"?>
+<p:notes xmlns:a="http://schemas.openxmlformats.org/drawingml/2006/main" xmlns:r="http://schemas.openxmlformats.org/officeDocument/2006/relationships" xmlns:p="http://schemas.openxmlformats.org/presentationml/2006/main">
+  <p:cSld>
+    <p:spTree>
+      <p:nvGrpSpPr>
+        <p:cNvPr id="1" name=""/>
+        <p:cNvGrpSpPr/>
+        <p:nvPr/>
+      </p:nvGrpSpPr>
+      <p:grpSpPr>
+        <a:xfrm>
+          <a:off x="0" y="0"/>
+          <a:ext cx="0" cy="0"/>
+          <a:chOff x="0" y="0"/>
+          <a:chExt cx="0" cy="0"/>
+        </a:xfrm>
+      </p:grpSpPr>
+      <p:sp>
+        <p:nvSpPr>
+          <p:cNvPr id="2" name="Slide Image Placeholder 1"/>
+          <p:cNvSpPr>
+            <a:spLocks noGrp="1" noRot="1" noChangeAspect="1"/>
+          </p:cNvSpPr>
+          <p:nvPr>
+            <p:ph type="sldImg"/>
+          </p:nvPr>
+        </p:nvSpPr>
+        <p:spPr/>
+      </p:sp>
+      <p:sp>
+        <p:nvSpPr>
+          <p:cNvPr id="3" name="Notes Placeholder 2"/>
+          <p:cNvSpPr>
+            <a:spLocks noGrp="1"/>
+          </p:cNvSpPr>
+          <p:nvPr>
+            <p:ph type="body" idx="1"/>
+          </p:nvPr>
+        </p:nvSpPr>
+        <p:spPr/>
+        <p:txBody>
+          <a:bodyPr/>
+          <a:lstStyle/>
+          <a:p>
+            <a:endParaRPr lang="en-US" sz="1200" kern="1200" dirty="0" smtClean="0">
+              <a:solidFill>
+                <a:schemeClr val="tx1"/>
+              </a:solidFill>
+              <a:effectLst/>
+              <a:latin typeface="+mn-lt"/>
+              <a:ea typeface="+mn-ea"/>
+              <a:cs typeface="+mn-cs"/>
+            </a:endParaRPr>
+          </a:p>
+        </p:txBody>
+      </p:sp>
+      <p:sp>
+        <p:nvSpPr>
+          <p:cNvPr id="4" name="Slide Number Placeholder 3"/>
+          <p:cNvSpPr>
+            <a:spLocks noGrp="1"/>
+          </p:cNvSpPr>
+          <p:nvPr>
+            <p:ph type="sldNum" sz="quarter" idx="10"/>
+          </p:nvPr>
+        </p:nvSpPr>
+        <p:spPr/>
+        <p:txBody>
+          <a:bodyPr/>
+          <a:lstStyle/>
+          <a:p>
+            <a:fld id="{89029652-62E7-43D6-83B5-097D7B7AA5D8}" type="slidenum">
+              <a:rPr lang="en-US" smtClean="0"/>
+              <a:t>51</a:t>
+            </a:fld>
+            <a:endParaRPr lang="en-US"/>
+          </a:p>
+        </p:txBody>
+      </p:sp>
+    </p:spTree>
+    <p:extLst>
+      <p:ext uri="{BB962C8B-B14F-4D97-AF65-F5344CB8AC3E}">
+        <p14:creationId xmlns:p14="http://schemas.microsoft.com/office/powerpoint/2010/main" val="2813022412"/>
       </p:ext>
     </p:extLst>
   </p:cSld>
@@ -10965,23 +11220,7 @@
                   <a:srgbClr val="013947"/>
                 </a:solidFill>
               </a:rPr>
-              <a:t> to perform </a:t>
-            </a:r>
-            <a:r>
-              <a:rPr lang="en-US" dirty="0" smtClean="0">
-                <a:solidFill>
-                  <a:srgbClr val="013947"/>
-                </a:solidFill>
-              </a:rPr>
-              <a:t>a </a:t>
-            </a:r>
-            <a:r>
-              <a:rPr lang="en-US" dirty="0" smtClean="0">
-                <a:solidFill>
-                  <a:srgbClr val="013947"/>
-                </a:solidFill>
-              </a:rPr>
-              <a:t>given request?</a:t>
+              <a:t> to perform a given request?</a:t>
             </a:r>
             <a:endParaRPr lang="en-US" sz="4800" dirty="0">
               <a:solidFill>
@@ -12237,10 +12476,6 @@
               <a:rPr lang="en-US" sz="4800" dirty="0" smtClean="0"/>
               <a:t>Access Control</a:t>
             </a:r>
-            <a:r>
-              <a:rPr lang="en-US" sz="4800" dirty="0" smtClean="0"/>
-              <a:t/>
-            </a:r>
             <a:br>
               <a:rPr lang="en-US" sz="4800" dirty="0" smtClean="0"/>
             </a:br>
@@ -12581,7 +12816,6 @@
               <a:rPr lang="en-US" sz="4800" dirty="0"/>
               <a:t>– framework</a:t>
             </a:r>
-            <a:endParaRPr lang="en-US" sz="4800" dirty="0"/>
           </a:p>
         </p:txBody>
       </p:sp>
@@ -12701,7 +12935,11 @@
             </a:r>
             <a:r>
               <a:rPr lang="en-US" sz="4800" dirty="0"/>
-              <a:t>– framework</a:t>
+              <a:t>– </a:t>
+            </a:r>
+            <a:r>
+              <a:rPr lang="en-US" sz="4800" dirty="0" smtClean="0"/>
+              <a:t>Row Level Security</a:t>
             </a:r>
             <a:endParaRPr lang="en-US" sz="4800" dirty="0"/>
           </a:p>
@@ -12741,7 +12979,7 @@
       </p:sp>
       <p:pic>
         <p:nvPicPr>
-          <p:cNvPr id="4" name="Picture 3"/>
+          <p:cNvPr id="6" name="Picture 5"/>
           <p:cNvPicPr>
             <a:picLocks noChangeAspect="1"/>
           </p:cNvPicPr>
@@ -12755,8 +12993,8 @@
         </p:blipFill>
         <p:spPr>
           <a:xfrm>
-            <a:off x="838200" y="2607646"/>
-            <a:ext cx="11147699" cy="3173722"/>
+            <a:off x="838199" y="1447348"/>
+            <a:ext cx="11099705" cy="5410652"/>
           </a:xfrm>
           <a:prstGeom prst="rect">
             <a:avLst/>
@@ -12819,7 +13057,15 @@
           <a:p>
             <a:r>
               <a:rPr lang="en-US" sz="4800" dirty="0" smtClean="0"/>
-              <a:t>Patented step-by-step slide</a:t>
+              <a:t>Access Control </a:t>
+            </a:r>
+            <a:r>
+              <a:rPr lang="en-US" sz="4800" dirty="0"/>
+              <a:t>– </a:t>
+            </a:r>
+            <a:r>
+              <a:rPr lang="en-US" sz="4800" dirty="0" smtClean="0"/>
+              <a:t>Row Level Security</a:t>
             </a:r>
             <a:endParaRPr lang="en-US" sz="4800" dirty="0"/>
           </a:p>
@@ -12847,43 +13093,6 @@
           </a:bodyPr>
           <a:lstStyle/>
           <a:p>
-            <a:r>
-              <a:rPr lang="en-US" sz="4000" dirty="0" smtClean="0">
-                <a:solidFill>
-                  <a:schemeClr val="bg1">
-                    <a:lumMod val="65000"/>
-                  </a:schemeClr>
-                </a:solidFill>
-              </a:rPr>
-              <a:t>Old news</a:t>
-            </a:r>
-            <a:br>
-              <a:rPr lang="en-US" sz="4000" dirty="0" smtClean="0">
-                <a:solidFill>
-                  <a:schemeClr val="bg1">
-                    <a:lumMod val="65000"/>
-                  </a:schemeClr>
-                </a:solidFill>
-              </a:rPr>
-            </a:br>
-            <a:endParaRPr lang="en-US" sz="4000" dirty="0" smtClean="0">
-              <a:solidFill>
-                <a:schemeClr val="bg1">
-                  <a:lumMod val="65000"/>
-                </a:schemeClr>
-              </a:solidFill>
-            </a:endParaRPr>
-          </a:p>
-          <a:p>
-            <a:r>
-              <a:rPr lang="en-US" sz="4000" b="1" dirty="0" smtClean="0"/>
-              <a:t>New hotness</a:t>
-            </a:r>
-          </a:p>
-          <a:p>
-            <a:endParaRPr lang="en-US" sz="4000" dirty="0" smtClean="0"/>
-          </a:p>
-          <a:p>
             <a:endParaRPr lang="en-US" dirty="0" smtClean="0"/>
           </a:p>
           <a:p>
@@ -12894,10 +13103,34 @@
           </a:p>
         </p:txBody>
       </p:sp>
+      <p:pic>
+        <p:nvPicPr>
+          <p:cNvPr id="5" name="Picture 4"/>
+          <p:cNvPicPr>
+            <a:picLocks noChangeAspect="1"/>
+          </p:cNvPicPr>
+          <p:nvPr/>
+        </p:nvPicPr>
+        <p:blipFill>
+          <a:blip r:embed="rId3"/>
+          <a:stretch>
+            <a:fillRect/>
+          </a:stretch>
+        </p:blipFill>
+        <p:spPr>
+          <a:xfrm>
+            <a:off x="359046" y="1471339"/>
+            <a:ext cx="11808716" cy="5386661"/>
+          </a:xfrm>
+          <a:prstGeom prst="rect">
+            <a:avLst/>
+          </a:prstGeom>
+        </p:spPr>
+      </p:pic>
     </p:spTree>
     <p:extLst>
       <p:ext uri="{BB962C8B-B14F-4D97-AF65-F5344CB8AC3E}">
-        <p14:creationId xmlns:p14="http://schemas.microsoft.com/office/powerpoint/2010/main" val="1887088746"/>
+        <p14:creationId xmlns:p14="http://schemas.microsoft.com/office/powerpoint/2010/main" val="789907537"/>
       </p:ext>
     </p:extLst>
   </p:cSld>
@@ -12950,7 +13183,15 @@
           <a:p>
             <a:r>
               <a:rPr lang="en-US" sz="4800" dirty="0" smtClean="0"/>
-              <a:t>Canonical example: SQL Injection</a:t>
+              <a:t>Access Control </a:t>
+            </a:r>
+            <a:r>
+              <a:rPr lang="en-US" sz="4800" dirty="0"/>
+              <a:t>– </a:t>
+            </a:r>
+            <a:r>
+              <a:rPr lang="en-US" sz="4800" dirty="0" smtClean="0"/>
+              <a:t>Row Level Security</a:t>
             </a:r>
             <a:endParaRPr lang="en-US" sz="4800" dirty="0"/>
           </a:p>
@@ -12978,9 +13219,6 @@
           </a:bodyPr>
           <a:lstStyle/>
           <a:p>
-            <a:endParaRPr lang="en-US" sz="4000" dirty="0" smtClean="0"/>
-          </a:p>
-          <a:p>
             <a:endParaRPr lang="en-US" dirty="0" smtClean="0"/>
           </a:p>
           <a:p>
@@ -12991,10 +13229,34 @@
           </a:p>
         </p:txBody>
       </p:sp>
+      <p:pic>
+        <p:nvPicPr>
+          <p:cNvPr id="4" name="Picture 3"/>
+          <p:cNvPicPr>
+            <a:picLocks noChangeAspect="1"/>
+          </p:cNvPicPr>
+          <p:nvPr/>
+        </p:nvPicPr>
+        <p:blipFill>
+          <a:blip r:embed="rId3"/>
+          <a:stretch>
+            <a:fillRect/>
+          </a:stretch>
+        </p:blipFill>
+        <p:spPr>
+          <a:xfrm>
+            <a:off x="846711" y="3034992"/>
+            <a:ext cx="11345289" cy="1566505"/>
+          </a:xfrm>
+          <a:prstGeom prst="rect">
+            <a:avLst/>
+          </a:prstGeom>
+        </p:spPr>
+      </p:pic>
     </p:spTree>
     <p:extLst>
       <p:ext uri="{BB962C8B-B14F-4D97-AF65-F5344CB8AC3E}">
-        <p14:creationId xmlns:p14="http://schemas.microsoft.com/office/powerpoint/2010/main" val="1766242099"/>
+        <p14:creationId xmlns:p14="http://schemas.microsoft.com/office/powerpoint/2010/main" val="3564175732"/>
       </p:ext>
     </p:extLst>
   </p:cSld>
@@ -13038,42 +13300,7 @@
             <p:ph type="title"/>
           </p:nvPr>
         </p:nvSpPr>
-        <p:spPr>
-          <a:xfrm>
-            <a:off x="838200" y="365125"/>
-            <a:ext cx="10886768" cy="1325563"/>
-          </a:xfrm>
-        </p:spPr>
-        <p:txBody>
-          <a:bodyPr>
-            <a:noAutofit/>
-          </a:bodyPr>
-          <a:lstStyle/>
-          <a:p>
-            <a:r>
-              <a:rPr lang="en-US" sz="4800" dirty="0" smtClean="0"/>
-              <a:t>Closing slide</a:t>
-            </a:r>
-            <a:endParaRPr lang="en-US" sz="4800" dirty="0"/>
-          </a:p>
-        </p:txBody>
-      </p:sp>
-      <p:sp>
-        <p:nvSpPr>
-          <p:cNvPr id="3" name="Content Placeholder 2"/>
-          <p:cNvSpPr>
-            <a:spLocks noGrp="1"/>
-          </p:cNvSpPr>
-          <p:nvPr>
-            <p:ph idx="1"/>
-          </p:nvPr>
-        </p:nvSpPr>
-        <p:spPr>
-          <a:xfrm>
-            <a:off x="838200" y="1825625"/>
-            <a:ext cx="11137490" cy="4899640"/>
-          </a:xfrm>
-        </p:spPr>
+        <p:spPr/>
         <p:txBody>
           <a:bodyPr>
             <a:normAutofit/>
@@ -13081,102 +13308,199 @@
           <a:lstStyle/>
           <a:p>
             <a:r>
-              <a:rPr lang="en-US" sz="4000" dirty="0" smtClean="0"/>
-              <a:t>The knowledge gets dropped here</a:t>
-            </a:r>
-          </a:p>
-          <a:p>
-            <a:pPr marL="0" indent="0">
-              <a:buNone/>
-            </a:pPr>
-            <a:endParaRPr lang="en-US" sz="3200" dirty="0" smtClean="0">
-              <a:hlinkClick r:id="rId3"/>
-            </a:endParaRPr>
-          </a:p>
-          <a:p>
-            <a:pPr marL="0" indent="0">
-              <a:buNone/>
-            </a:pPr>
-            <a:r>
-              <a:rPr lang="en-US" sz="3600" dirty="0" smtClean="0">
-                <a:hlinkClick r:id="rId3"/>
-              </a:rPr>
-              <a:t>github.com/</a:t>
-            </a:r>
-            <a:r>
-              <a:rPr lang="en-US" sz="3600" dirty="0" err="1" smtClean="0">
-                <a:hlinkClick r:id="rId3"/>
-              </a:rPr>
-              <a:t>spetryjohnson</a:t>
-            </a:r>
-            <a:r>
-              <a:rPr lang="en-US" sz="3600" dirty="0" smtClean="0"/>
-              <a:t> </a:t>
-            </a:r>
-            <a:r>
-              <a:rPr lang="en-US" sz="3600" dirty="0" smtClean="0">
+              <a:rPr lang="en-US" sz="4800" dirty="0" smtClean="0"/>
+              <a:t>Access Control </a:t>
+            </a:r>
+            <a:r>
+              <a:rPr lang="en-US" sz="4800" dirty="0"/>
+              <a:t>– framework</a:t>
+            </a:r>
+          </a:p>
+        </p:txBody>
+      </p:sp>
+      <p:sp>
+        <p:nvSpPr>
+          <p:cNvPr id="3" name="Content Placeholder 2"/>
+          <p:cNvSpPr>
+            <a:spLocks noGrp="1"/>
+          </p:cNvSpPr>
+          <p:nvPr>
+            <p:ph idx="1"/>
+          </p:nvPr>
+        </p:nvSpPr>
+        <p:spPr>
+          <a:xfrm>
+            <a:off x="838200" y="1825624"/>
+            <a:ext cx="10515600" cy="4589923"/>
+          </a:xfrm>
+        </p:spPr>
+        <p:txBody>
+          <a:bodyPr>
+            <a:normAutofit/>
+          </a:bodyPr>
+          <a:lstStyle/>
+          <a:p>
+            <a:endParaRPr lang="en-US" dirty="0" smtClean="0"/>
+          </a:p>
+          <a:p>
+            <a:endParaRPr lang="en-US" dirty="0" smtClean="0"/>
+          </a:p>
+          <a:p>
+            <a:endParaRPr lang="en-US" dirty="0"/>
+          </a:p>
+        </p:txBody>
+      </p:sp>
+      <p:pic>
+        <p:nvPicPr>
+          <p:cNvPr id="4" name="Picture 3"/>
+          <p:cNvPicPr>
+            <a:picLocks noChangeAspect="1"/>
+          </p:cNvPicPr>
+          <p:nvPr/>
+        </p:nvPicPr>
+        <p:blipFill>
+          <a:blip r:embed="rId3"/>
+          <a:stretch>
+            <a:fillRect/>
+          </a:stretch>
+        </p:blipFill>
+        <p:spPr>
+          <a:xfrm>
+            <a:off x="838200" y="2607646"/>
+            <a:ext cx="11147699" cy="3173722"/>
+          </a:xfrm>
+          <a:prstGeom prst="rect">
+            <a:avLst/>
+          </a:prstGeom>
+        </p:spPr>
+      </p:pic>
+    </p:spTree>
+    <p:extLst>
+      <p:ext uri="{BB962C8B-B14F-4D97-AF65-F5344CB8AC3E}">
+        <p14:creationId xmlns:p14="http://schemas.microsoft.com/office/powerpoint/2010/main" val="3053964411"/>
+      </p:ext>
+    </p:extLst>
+  </p:cSld>
+  <p:clrMapOvr>
+    <a:masterClrMapping/>
+  </p:clrMapOvr>
+  <p:timing>
+    <p:tnLst>
+      <p:par>
+        <p:cTn id="1" dur="indefinite" restart="never" nodeType="tmRoot"/>
+      </p:par>
+    </p:tnLst>
+  </p:timing>
+</p:sld>
+</file>
+
+<file path=ppt/slides/slide49.xml><?xml version="1.0" encoding="utf-8"?>
+<p:sld xmlns:a="http://schemas.openxmlformats.org/drawingml/2006/main" xmlns:r="http://schemas.openxmlformats.org/officeDocument/2006/relationships" xmlns:p="http://schemas.openxmlformats.org/presentationml/2006/main">
+  <p:cSld>
+    <p:spTree>
+      <p:nvGrpSpPr>
+        <p:cNvPr id="1" name=""/>
+        <p:cNvGrpSpPr/>
+        <p:nvPr/>
+      </p:nvGrpSpPr>
+      <p:grpSpPr>
+        <a:xfrm>
+          <a:off x="0" y="0"/>
+          <a:ext cx="0" cy="0"/>
+          <a:chOff x="0" y="0"/>
+          <a:chExt cx="0" cy="0"/>
+        </a:xfrm>
+      </p:grpSpPr>
+      <p:sp>
+        <p:nvSpPr>
+          <p:cNvPr id="2" name="Title 1"/>
+          <p:cNvSpPr>
+            <a:spLocks noGrp="1"/>
+          </p:cNvSpPr>
+          <p:nvPr>
+            <p:ph type="title"/>
+          </p:nvPr>
+        </p:nvSpPr>
+        <p:spPr/>
+        <p:txBody>
+          <a:bodyPr>
+            <a:normAutofit/>
+          </a:bodyPr>
+          <a:lstStyle/>
+          <a:p>
+            <a:r>
+              <a:rPr lang="en-US" sz="4800" dirty="0" smtClean="0"/>
+              <a:t>Patented step-by-step slide</a:t>
+            </a:r>
+            <a:endParaRPr lang="en-US" sz="4800" dirty="0"/>
+          </a:p>
+        </p:txBody>
+      </p:sp>
+      <p:sp>
+        <p:nvSpPr>
+          <p:cNvPr id="3" name="Content Placeholder 2"/>
+          <p:cNvSpPr>
+            <a:spLocks noGrp="1"/>
+          </p:cNvSpPr>
+          <p:nvPr>
+            <p:ph idx="1"/>
+          </p:nvPr>
+        </p:nvSpPr>
+        <p:spPr>
+          <a:xfrm>
+            <a:off x="838200" y="1825624"/>
+            <a:ext cx="10515600" cy="4589923"/>
+          </a:xfrm>
+        </p:spPr>
+        <p:txBody>
+          <a:bodyPr>
+            <a:normAutofit/>
+          </a:bodyPr>
+          <a:lstStyle/>
+          <a:p>
+            <a:r>
+              <a:rPr lang="en-US" sz="4000" dirty="0" smtClean="0">
                 <a:solidFill>
                   <a:schemeClr val="bg1">
-                    <a:lumMod val="50000"/>
+                    <a:lumMod val="65000"/>
                   </a:schemeClr>
                 </a:solidFill>
               </a:rPr>
-              <a:t>|</a:t>
-            </a:r>
-            <a:r>
-              <a:rPr lang="en-US" sz="3600" dirty="0" smtClean="0"/>
-              <a:t> </a:t>
-            </a:r>
-            <a:r>
-              <a:rPr lang="en-US" sz="3600" dirty="0" smtClean="0">
-                <a:hlinkClick r:id="rId4"/>
+              <a:t>Old news</a:t>
+            </a:r>
+            <a:br>
+              <a:rPr lang="en-US" sz="4000" dirty="0" smtClean="0">
+                <a:solidFill>
+                  <a:schemeClr val="bg1">
+                    <a:lumMod val="65000"/>
+                  </a:schemeClr>
+                </a:solidFill>
               </a:rPr>
-              <a:t>www.petry-johnson.com</a:t>
-            </a:r>
-            <a:r>
-              <a:rPr lang="en-US" sz="3600" dirty="0" smtClean="0"/>
-              <a:t/>
-            </a:r>
-            <a:br>
-              <a:rPr lang="en-US" sz="3600" dirty="0" smtClean="0"/>
             </a:br>
-            <a:endParaRPr lang="en-US" sz="3600" dirty="0"/>
-          </a:p>
-          <a:p>
-            <a:pPr marL="0" indent="0" algn="ctr">
-              <a:buNone/>
-            </a:pPr>
-            <a:r>
-              <a:rPr lang="en-US" sz="3600" b="1" dirty="0" smtClean="0"/>
-              <a:t>@</a:t>
-            </a:r>
-            <a:r>
-              <a:rPr lang="en-US" sz="3600" b="1" dirty="0" err="1" smtClean="0"/>
-              <a:t>spetryjohnson</a:t>
-            </a:r>
-            <a:endParaRPr lang="en-US" b="1" dirty="0" smtClean="0"/>
+            <a:endParaRPr lang="en-US" sz="4000" dirty="0" smtClean="0">
+              <a:solidFill>
+                <a:schemeClr val="bg1">
+                  <a:lumMod val="65000"/>
+                </a:schemeClr>
+              </a:solidFill>
+            </a:endParaRPr>
+          </a:p>
+          <a:p>
+            <a:r>
+              <a:rPr lang="en-US" sz="4000" b="1" dirty="0" smtClean="0"/>
+              <a:t>New hotness</a:t>
+            </a:r>
+          </a:p>
+          <a:p>
+            <a:endParaRPr lang="en-US" sz="4000" dirty="0" smtClean="0"/>
           </a:p>
           <a:p>
             <a:endParaRPr lang="en-US" dirty="0" smtClean="0"/>
           </a:p>
           <a:p>
-            <a:pPr lvl="1"/>
             <a:endParaRPr lang="en-US" dirty="0" smtClean="0"/>
           </a:p>
           <a:p>
-            <a:pPr lvl="1"/>
-            <a:endParaRPr lang="en-US" dirty="0" smtClean="0"/>
-          </a:p>
-          <a:p>
-            <a:pPr lvl="1"/>
-            <a:endParaRPr lang="en-US" dirty="0"/>
-          </a:p>
-          <a:p>
-            <a:pPr lvl="1"/>
-            <a:endParaRPr lang="en-US" dirty="0" smtClean="0"/>
-          </a:p>
-          <a:p>
-            <a:pPr lvl="1"/>
             <a:endParaRPr lang="en-US" dirty="0"/>
           </a:p>
         </p:txBody>
@@ -13184,7 +13508,7 @@
     </p:spTree>
     <p:extLst>
       <p:ext uri="{BB962C8B-B14F-4D97-AF65-F5344CB8AC3E}">
-        <p14:creationId xmlns:p14="http://schemas.microsoft.com/office/powerpoint/2010/main" val="659085787"/>
+        <p14:creationId xmlns:p14="http://schemas.microsoft.com/office/powerpoint/2010/main" val="1887088746"/>
       </p:ext>
     </p:extLst>
   </p:cSld>
@@ -13324,6 +13648,293 @@
     <p:extLst>
       <p:ext uri="{BB962C8B-B14F-4D97-AF65-F5344CB8AC3E}">
         <p14:creationId xmlns:p14="http://schemas.microsoft.com/office/powerpoint/2010/main" val="2651230507"/>
+      </p:ext>
+    </p:extLst>
+  </p:cSld>
+  <p:clrMapOvr>
+    <a:masterClrMapping/>
+  </p:clrMapOvr>
+  <p:timing>
+    <p:tnLst>
+      <p:par>
+        <p:cTn id="1" dur="indefinite" restart="never" nodeType="tmRoot"/>
+      </p:par>
+    </p:tnLst>
+  </p:timing>
+</p:sld>
+</file>
+
+<file path=ppt/slides/slide50.xml><?xml version="1.0" encoding="utf-8"?>
+<p:sld xmlns:a="http://schemas.openxmlformats.org/drawingml/2006/main" xmlns:r="http://schemas.openxmlformats.org/officeDocument/2006/relationships" xmlns:p="http://schemas.openxmlformats.org/presentationml/2006/main">
+  <p:cSld>
+    <p:spTree>
+      <p:nvGrpSpPr>
+        <p:cNvPr id="1" name=""/>
+        <p:cNvGrpSpPr/>
+        <p:nvPr/>
+      </p:nvGrpSpPr>
+      <p:grpSpPr>
+        <a:xfrm>
+          <a:off x="0" y="0"/>
+          <a:ext cx="0" cy="0"/>
+          <a:chOff x="0" y="0"/>
+          <a:chExt cx="0" cy="0"/>
+        </a:xfrm>
+      </p:grpSpPr>
+      <p:sp>
+        <p:nvSpPr>
+          <p:cNvPr id="2" name="Title 1"/>
+          <p:cNvSpPr>
+            <a:spLocks noGrp="1"/>
+          </p:cNvSpPr>
+          <p:nvPr>
+            <p:ph type="title"/>
+          </p:nvPr>
+        </p:nvSpPr>
+        <p:spPr/>
+        <p:txBody>
+          <a:bodyPr>
+            <a:normAutofit/>
+          </a:bodyPr>
+          <a:lstStyle/>
+          <a:p>
+            <a:r>
+              <a:rPr lang="en-US" sz="4800" dirty="0" smtClean="0"/>
+              <a:t>Canonical example: SQL Injection</a:t>
+            </a:r>
+            <a:endParaRPr lang="en-US" sz="4800" dirty="0"/>
+          </a:p>
+        </p:txBody>
+      </p:sp>
+      <p:sp>
+        <p:nvSpPr>
+          <p:cNvPr id="3" name="Content Placeholder 2"/>
+          <p:cNvSpPr>
+            <a:spLocks noGrp="1"/>
+          </p:cNvSpPr>
+          <p:nvPr>
+            <p:ph idx="1"/>
+          </p:nvPr>
+        </p:nvSpPr>
+        <p:spPr>
+          <a:xfrm>
+            <a:off x="838200" y="1825624"/>
+            <a:ext cx="10515600" cy="4589923"/>
+          </a:xfrm>
+        </p:spPr>
+        <p:txBody>
+          <a:bodyPr>
+            <a:normAutofit/>
+          </a:bodyPr>
+          <a:lstStyle/>
+          <a:p>
+            <a:endParaRPr lang="en-US" sz="4000" dirty="0" smtClean="0"/>
+          </a:p>
+          <a:p>
+            <a:endParaRPr lang="en-US" dirty="0" smtClean="0"/>
+          </a:p>
+          <a:p>
+            <a:endParaRPr lang="en-US" dirty="0" smtClean="0"/>
+          </a:p>
+          <a:p>
+            <a:endParaRPr lang="en-US" dirty="0"/>
+          </a:p>
+        </p:txBody>
+      </p:sp>
+    </p:spTree>
+    <p:extLst>
+      <p:ext uri="{BB962C8B-B14F-4D97-AF65-F5344CB8AC3E}">
+        <p14:creationId xmlns:p14="http://schemas.microsoft.com/office/powerpoint/2010/main" val="1766242099"/>
+      </p:ext>
+    </p:extLst>
+  </p:cSld>
+  <p:clrMapOvr>
+    <a:masterClrMapping/>
+  </p:clrMapOvr>
+  <p:timing>
+    <p:tnLst>
+      <p:par>
+        <p:cTn id="1" dur="indefinite" restart="never" nodeType="tmRoot"/>
+      </p:par>
+    </p:tnLst>
+  </p:timing>
+</p:sld>
+</file>
+
+<file path=ppt/slides/slide51.xml><?xml version="1.0" encoding="utf-8"?>
+<p:sld xmlns:a="http://schemas.openxmlformats.org/drawingml/2006/main" xmlns:r="http://schemas.openxmlformats.org/officeDocument/2006/relationships" xmlns:p="http://schemas.openxmlformats.org/presentationml/2006/main">
+  <p:cSld>
+    <p:spTree>
+      <p:nvGrpSpPr>
+        <p:cNvPr id="1" name=""/>
+        <p:cNvGrpSpPr/>
+        <p:nvPr/>
+      </p:nvGrpSpPr>
+      <p:grpSpPr>
+        <a:xfrm>
+          <a:off x="0" y="0"/>
+          <a:ext cx="0" cy="0"/>
+          <a:chOff x="0" y="0"/>
+          <a:chExt cx="0" cy="0"/>
+        </a:xfrm>
+      </p:grpSpPr>
+      <p:sp>
+        <p:nvSpPr>
+          <p:cNvPr id="2" name="Title 1"/>
+          <p:cNvSpPr>
+            <a:spLocks noGrp="1"/>
+          </p:cNvSpPr>
+          <p:nvPr>
+            <p:ph type="title"/>
+          </p:nvPr>
+        </p:nvSpPr>
+        <p:spPr>
+          <a:xfrm>
+            <a:off x="838200" y="365125"/>
+            <a:ext cx="10886768" cy="1325563"/>
+          </a:xfrm>
+        </p:spPr>
+        <p:txBody>
+          <a:bodyPr>
+            <a:noAutofit/>
+          </a:bodyPr>
+          <a:lstStyle/>
+          <a:p>
+            <a:r>
+              <a:rPr lang="en-US" sz="4800" dirty="0" smtClean="0"/>
+              <a:t>Closing slide</a:t>
+            </a:r>
+            <a:endParaRPr lang="en-US" sz="4800" dirty="0"/>
+          </a:p>
+        </p:txBody>
+      </p:sp>
+      <p:sp>
+        <p:nvSpPr>
+          <p:cNvPr id="3" name="Content Placeholder 2"/>
+          <p:cNvSpPr>
+            <a:spLocks noGrp="1"/>
+          </p:cNvSpPr>
+          <p:nvPr>
+            <p:ph idx="1"/>
+          </p:nvPr>
+        </p:nvSpPr>
+        <p:spPr>
+          <a:xfrm>
+            <a:off x="838200" y="1825625"/>
+            <a:ext cx="11137490" cy="4899640"/>
+          </a:xfrm>
+        </p:spPr>
+        <p:txBody>
+          <a:bodyPr>
+            <a:normAutofit/>
+          </a:bodyPr>
+          <a:lstStyle/>
+          <a:p>
+            <a:r>
+              <a:rPr lang="en-US" sz="4000" dirty="0" smtClean="0"/>
+              <a:t>The knowledge gets dropped here</a:t>
+            </a:r>
+          </a:p>
+          <a:p>
+            <a:pPr marL="0" indent="0">
+              <a:buNone/>
+            </a:pPr>
+            <a:endParaRPr lang="en-US" sz="3200" dirty="0" smtClean="0">
+              <a:hlinkClick r:id="rId3"/>
+            </a:endParaRPr>
+          </a:p>
+          <a:p>
+            <a:pPr marL="0" indent="0">
+              <a:buNone/>
+            </a:pPr>
+            <a:r>
+              <a:rPr lang="en-US" sz="3600" dirty="0" smtClean="0">
+                <a:hlinkClick r:id="rId3"/>
+              </a:rPr>
+              <a:t>github.com/</a:t>
+            </a:r>
+            <a:r>
+              <a:rPr lang="en-US" sz="3600" dirty="0" err="1" smtClean="0">
+                <a:hlinkClick r:id="rId3"/>
+              </a:rPr>
+              <a:t>spetryjohnson</a:t>
+            </a:r>
+            <a:r>
+              <a:rPr lang="en-US" sz="3600" dirty="0" smtClean="0"/>
+              <a:t> </a:t>
+            </a:r>
+            <a:r>
+              <a:rPr lang="en-US" sz="3600" dirty="0" smtClean="0">
+                <a:solidFill>
+                  <a:schemeClr val="bg1">
+                    <a:lumMod val="50000"/>
+                  </a:schemeClr>
+                </a:solidFill>
+              </a:rPr>
+              <a:t>|</a:t>
+            </a:r>
+            <a:r>
+              <a:rPr lang="en-US" sz="3600" dirty="0" smtClean="0"/>
+              <a:t> </a:t>
+            </a:r>
+            <a:r>
+              <a:rPr lang="en-US" sz="3600" dirty="0" smtClean="0">
+                <a:hlinkClick r:id="rId4"/>
+              </a:rPr>
+              <a:t>www.petry-johnson.com</a:t>
+            </a:r>
+            <a:r>
+              <a:rPr lang="en-US" sz="3600" dirty="0" smtClean="0"/>
+              <a:t/>
+            </a:r>
+            <a:br>
+              <a:rPr lang="en-US" sz="3600" dirty="0" smtClean="0"/>
+            </a:br>
+            <a:endParaRPr lang="en-US" sz="3600" dirty="0"/>
+          </a:p>
+          <a:p>
+            <a:pPr marL="0" indent="0" algn="ctr">
+              <a:buNone/>
+            </a:pPr>
+            <a:r>
+              <a:rPr lang="en-US" sz="3600" b="1" dirty="0" smtClean="0"/>
+              <a:t>@</a:t>
+            </a:r>
+            <a:r>
+              <a:rPr lang="en-US" sz="3600" b="1" dirty="0" err="1" smtClean="0"/>
+              <a:t>spetryjohnson</a:t>
+            </a:r>
+            <a:endParaRPr lang="en-US" b="1" dirty="0" smtClean="0"/>
+          </a:p>
+          <a:p>
+            <a:endParaRPr lang="en-US" dirty="0" smtClean="0"/>
+          </a:p>
+          <a:p>
+            <a:pPr lvl="1"/>
+            <a:endParaRPr lang="en-US" dirty="0" smtClean="0"/>
+          </a:p>
+          <a:p>
+            <a:pPr lvl="1"/>
+            <a:endParaRPr lang="en-US" dirty="0" smtClean="0"/>
+          </a:p>
+          <a:p>
+            <a:pPr lvl="1"/>
+            <a:endParaRPr lang="en-US" dirty="0"/>
+          </a:p>
+          <a:p>
+            <a:pPr lvl="1"/>
+            <a:endParaRPr lang="en-US" dirty="0" smtClean="0"/>
+          </a:p>
+          <a:p>
+            <a:pPr lvl="1"/>
+            <a:endParaRPr lang="en-US" dirty="0"/>
+          </a:p>
+        </p:txBody>
+      </p:sp>
+    </p:spTree>
+    <p:extLst>
+      <p:ext uri="{BB962C8B-B14F-4D97-AF65-F5344CB8AC3E}">
+        <p14:creationId xmlns:p14="http://schemas.microsoft.com/office/powerpoint/2010/main" val="659085787"/>
       </p:ext>
     </p:extLst>
   </p:cSld>

</xml_diff>

<commit_message>
Added Injection, other tweaks
</commit_message>
<xml_diff>
--- a/Secure Systems - CodeMash 2017.pptx
+++ b/Secure Systems - CodeMash 2017.pptx
@@ -5,7 +5,7 @@
     <p:sldMasterId id="2147483749" r:id="rId1"/>
   </p:sldMasterIdLst>
   <p:notesMasterIdLst>
-    <p:notesMasterId r:id="rId53"/>
+    <p:notesMasterId r:id="rId58"/>
   </p:notesMasterIdLst>
   <p:sldIdLst>
     <p:sldId id="395" r:id="rId2"/>
@@ -29,36 +29,41 @@
     <p:sldId id="517" r:id="rId20"/>
     <p:sldId id="518" r:id="rId21"/>
     <p:sldId id="499" r:id="rId22"/>
-    <p:sldId id="506" r:id="rId23"/>
-    <p:sldId id="519" r:id="rId24"/>
-    <p:sldId id="524" r:id="rId25"/>
-    <p:sldId id="521" r:id="rId26"/>
-    <p:sldId id="522" r:id="rId27"/>
-    <p:sldId id="525" r:id="rId28"/>
-    <p:sldId id="523" r:id="rId29"/>
-    <p:sldId id="520" r:id="rId30"/>
-    <p:sldId id="526" r:id="rId31"/>
-    <p:sldId id="528" r:id="rId32"/>
-    <p:sldId id="500" r:id="rId33"/>
-    <p:sldId id="501" r:id="rId34"/>
-    <p:sldId id="529" r:id="rId35"/>
-    <p:sldId id="530" r:id="rId36"/>
-    <p:sldId id="502" r:id="rId37"/>
-    <p:sldId id="503" r:id="rId38"/>
-    <p:sldId id="531" r:id="rId39"/>
-    <p:sldId id="532" r:id="rId40"/>
-    <p:sldId id="533" r:id="rId41"/>
-    <p:sldId id="534" r:id="rId42"/>
-    <p:sldId id="505" r:id="rId43"/>
-    <p:sldId id="535" r:id="rId44"/>
-    <p:sldId id="507" r:id="rId45"/>
-    <p:sldId id="536" r:id="rId46"/>
-    <p:sldId id="538" r:id="rId47"/>
-    <p:sldId id="539" r:id="rId48"/>
-    <p:sldId id="537" r:id="rId49"/>
-    <p:sldId id="504" r:id="rId50"/>
-    <p:sldId id="485" r:id="rId51"/>
-    <p:sldId id="443" r:id="rId52"/>
+    <p:sldId id="528" r:id="rId23"/>
+    <p:sldId id="541" r:id="rId24"/>
+    <p:sldId id="544" r:id="rId25"/>
+    <p:sldId id="545" r:id="rId26"/>
+    <p:sldId id="506" r:id="rId27"/>
+    <p:sldId id="519" r:id="rId28"/>
+    <p:sldId id="524" r:id="rId29"/>
+    <p:sldId id="521" r:id="rId30"/>
+    <p:sldId id="522" r:id="rId31"/>
+    <p:sldId id="525" r:id="rId32"/>
+    <p:sldId id="523" r:id="rId33"/>
+    <p:sldId id="520" r:id="rId34"/>
+    <p:sldId id="526" r:id="rId35"/>
+    <p:sldId id="540" r:id="rId36"/>
+    <p:sldId id="500" r:id="rId37"/>
+    <p:sldId id="501" r:id="rId38"/>
+    <p:sldId id="529" r:id="rId39"/>
+    <p:sldId id="530" r:id="rId40"/>
+    <p:sldId id="546" r:id="rId41"/>
+    <p:sldId id="502" r:id="rId42"/>
+    <p:sldId id="503" r:id="rId43"/>
+    <p:sldId id="531" r:id="rId44"/>
+    <p:sldId id="532" r:id="rId45"/>
+    <p:sldId id="533" r:id="rId46"/>
+    <p:sldId id="534" r:id="rId47"/>
+    <p:sldId id="505" r:id="rId48"/>
+    <p:sldId id="535" r:id="rId49"/>
+    <p:sldId id="507" r:id="rId50"/>
+    <p:sldId id="536" r:id="rId51"/>
+    <p:sldId id="538" r:id="rId52"/>
+    <p:sldId id="539" r:id="rId53"/>
+    <p:sldId id="537" r:id="rId54"/>
+    <p:sldId id="504" r:id="rId55"/>
+    <p:sldId id="485" r:id="rId56"/>
+    <p:sldId id="443" r:id="rId57"/>
   </p:sldIdLst>
   <p:sldSz cx="12192000" cy="6858000"/>
   <p:notesSz cx="6858000" cy="9144000"/>
@@ -176,6 +181,46 @@
 </p:presentation>
 </file>
 
+<file path=ppt/commentAuthors.xml><?xml version="1.0" encoding="utf-8"?>
+<p:cmAuthorLst xmlns:a="http://schemas.openxmlformats.org/drawingml/2006/main" xmlns:r="http://schemas.openxmlformats.org/officeDocument/2006/relationships" xmlns:p="http://schemas.openxmlformats.org/presentationml/2006/main">
+  <p:cmAuthor id="1" name="Seth Petry-Johnson" initials="SP" lastIdx="1" clrIdx="0">
+    <p:extLst>
+      <p:ext uri="{19B8F6BF-5375-455C-9EA6-DF929625EA0E}">
+        <p15:presenceInfo xmlns:p15="http://schemas.microsoft.com/office/powerpoint/2012/main" userId="Seth Petry-Johnson" providerId="None"/>
+      </p:ext>
+    </p:extLst>
+  </p:cmAuthor>
+</p:cmAuthorLst>
+</file>
+
+<file path=ppt/comments/comment1.xml><?xml version="1.0" encoding="utf-8"?>
+<p:cmLst xmlns:a="http://schemas.openxmlformats.org/drawingml/2006/main" xmlns:r="http://schemas.openxmlformats.org/officeDocument/2006/relationships" xmlns:p="http://schemas.openxmlformats.org/presentationml/2006/main">
+  <p:cm authorId="1" dt="2016-12-27T21:40:50.582" idx="1">
+    <p:pos x="10" y="10"/>
+    <p:text/>
+    <p:extLst>
+      <p:ext uri="{C676402C-5697-4E1C-873F-D02D1690AC5C}">
+        <p15:threadingInfo xmlns:p15="http://schemas.microsoft.com/office/powerpoint/2012/main" timeZoneBias="300"/>
+      </p:ext>
+    </p:extLst>
+  </p:cm>
+</p:cmLst>
+</file>
+
+<file path=ppt/comments/comment2.xml><?xml version="1.0" encoding="utf-8"?>
+<p:cmLst xmlns:a="http://schemas.openxmlformats.org/drawingml/2006/main" xmlns:r="http://schemas.openxmlformats.org/officeDocument/2006/relationships" xmlns:p="http://schemas.openxmlformats.org/presentationml/2006/main">
+  <p:cm authorId="1" dt="2016-12-27T21:40:50.582" idx="1">
+    <p:pos x="10" y="10"/>
+    <p:text/>
+    <p:extLst>
+      <p:ext uri="{C676402C-5697-4E1C-873F-D02D1690AC5C}">
+        <p15:threadingInfo xmlns:p15="http://schemas.microsoft.com/office/powerpoint/2012/main" timeZoneBias="300"/>
+      </p:ext>
+    </p:extLst>
+  </p:cm>
+</p:cmLst>
+</file>
+
 <file path=ppt/notesMasters/notesMaster1.xml><?xml version="1.0" encoding="utf-8"?>
 <p:notesMaster xmlns:a="http://schemas.openxmlformats.org/drawingml/2006/main" xmlns:r="http://schemas.openxmlformats.org/officeDocument/2006/relationships" xmlns:p="http://schemas.openxmlformats.org/presentationml/2006/main">
   <p:cSld>
@@ -258,7 +303,7 @@
           <a:p>
             <a:fld id="{C54A4886-B4AF-42F7-97BE-95CDF82A73E3}" type="datetimeFigureOut">
               <a:rPr lang="en-US" smtClean="0"/>
-              <a:t>12/23/2016</a:t>
+              <a:t>12/27/2016</a:t>
             </a:fld>
             <a:endParaRPr lang="en-US"/>
           </a:p>
@@ -1804,7 +1849,32 @@
           <a:bodyPr/>
           <a:lstStyle/>
           <a:p>
-            <a:endParaRPr lang="en-US" b="0" dirty="0" smtClean="0"/>
+            <a:pPr marL="0" marR="0" indent="0" algn="l" defTabSz="914400" rtl="0" eaLnBrk="1" fontAlgn="auto" latinLnBrk="0" hangingPunct="1">
+              <a:lnSpc>
+                <a:spcPct val="100000"/>
+              </a:lnSpc>
+              <a:spcBef>
+                <a:spcPts val="0"/>
+              </a:spcBef>
+              <a:spcAft>
+                <a:spcPts val="0"/>
+              </a:spcAft>
+              <a:buClrTx/>
+              <a:buSzTx/>
+              <a:buFontTx/>
+              <a:buNone/>
+              <a:tabLst/>
+              <a:defRPr/>
+            </a:pPr>
+            <a:endParaRPr lang="en-US" sz="1200" kern="1200" dirty="0" smtClean="0">
+              <a:solidFill>
+                <a:schemeClr val="tx1"/>
+              </a:solidFill>
+              <a:effectLst/>
+              <a:latin typeface="+mn-lt"/>
+              <a:ea typeface="+mn-ea"/>
+              <a:cs typeface="+mn-cs"/>
+            </a:endParaRPr>
           </a:p>
         </p:txBody>
       </p:sp>
@@ -1834,7 +1904,7 @@
     </p:spTree>
     <p:extLst>
       <p:ext uri="{BB962C8B-B14F-4D97-AF65-F5344CB8AC3E}">
-        <p14:creationId xmlns:p14="http://schemas.microsoft.com/office/powerpoint/2010/main" val="3766878569"/>
+        <p14:creationId xmlns:p14="http://schemas.microsoft.com/office/powerpoint/2010/main" val="3734542197"/>
       </p:ext>
     </p:extLst>
   </p:cSld>
@@ -1918,7 +1988,7 @@
     </p:spTree>
     <p:extLst>
       <p:ext uri="{BB962C8B-B14F-4D97-AF65-F5344CB8AC3E}">
-        <p14:creationId xmlns:p14="http://schemas.microsoft.com/office/powerpoint/2010/main" val="1777663287"/>
+        <p14:creationId xmlns:p14="http://schemas.microsoft.com/office/powerpoint/2010/main" val="2847908271"/>
       </p:ext>
     </p:extLst>
   </p:cSld>
@@ -2002,7 +2072,7 @@
     </p:spTree>
     <p:extLst>
       <p:ext uri="{BB962C8B-B14F-4D97-AF65-F5344CB8AC3E}">
-        <p14:creationId xmlns:p14="http://schemas.microsoft.com/office/powerpoint/2010/main" val="128284815"/>
+        <p14:creationId xmlns:p14="http://schemas.microsoft.com/office/powerpoint/2010/main" val="980274710"/>
       </p:ext>
     </p:extLst>
   </p:cSld>
@@ -2056,7 +2126,32 @@
           <a:bodyPr/>
           <a:lstStyle/>
           <a:p>
-            <a:endParaRPr lang="en-US" b="0" dirty="0" smtClean="0"/>
+            <a:pPr marL="0" marR="0" indent="0" algn="l" defTabSz="914400" rtl="0" eaLnBrk="1" fontAlgn="auto" latinLnBrk="0" hangingPunct="1">
+              <a:lnSpc>
+                <a:spcPct val="100000"/>
+              </a:lnSpc>
+              <a:spcBef>
+                <a:spcPts val="0"/>
+              </a:spcBef>
+              <a:spcAft>
+                <a:spcPts val="0"/>
+              </a:spcAft>
+              <a:buClrTx/>
+              <a:buSzTx/>
+              <a:buFontTx/>
+              <a:buNone/>
+              <a:tabLst/>
+              <a:defRPr/>
+            </a:pPr>
+            <a:endParaRPr lang="en-US" sz="1200" kern="1200" dirty="0" smtClean="0">
+              <a:solidFill>
+                <a:schemeClr val="tx1"/>
+              </a:solidFill>
+              <a:effectLst/>
+              <a:latin typeface="+mn-lt"/>
+              <a:ea typeface="+mn-ea"/>
+              <a:cs typeface="+mn-cs"/>
+            </a:endParaRPr>
           </a:p>
         </p:txBody>
       </p:sp>
@@ -2086,7 +2181,7 @@
     </p:spTree>
     <p:extLst>
       <p:ext uri="{BB962C8B-B14F-4D97-AF65-F5344CB8AC3E}">
-        <p14:creationId xmlns:p14="http://schemas.microsoft.com/office/powerpoint/2010/main" val="1266200327"/>
+        <p14:creationId xmlns:p14="http://schemas.microsoft.com/office/powerpoint/2010/main" val="532131523"/>
       </p:ext>
     </p:extLst>
   </p:cSld>
@@ -2170,7 +2265,7 @@
     </p:spTree>
     <p:extLst>
       <p:ext uri="{BB962C8B-B14F-4D97-AF65-F5344CB8AC3E}">
-        <p14:creationId xmlns:p14="http://schemas.microsoft.com/office/powerpoint/2010/main" val="3516029556"/>
+        <p14:creationId xmlns:p14="http://schemas.microsoft.com/office/powerpoint/2010/main" val="3766878569"/>
       </p:ext>
     </p:extLst>
   </p:cSld>
@@ -2254,7 +2349,7 @@
     </p:spTree>
     <p:extLst>
       <p:ext uri="{BB962C8B-B14F-4D97-AF65-F5344CB8AC3E}">
-        <p14:creationId xmlns:p14="http://schemas.microsoft.com/office/powerpoint/2010/main" val="3404565588"/>
+        <p14:creationId xmlns:p14="http://schemas.microsoft.com/office/powerpoint/2010/main" val="1777663287"/>
       </p:ext>
     </p:extLst>
   </p:cSld>
@@ -2338,7 +2433,7 @@
     </p:spTree>
     <p:extLst>
       <p:ext uri="{BB962C8B-B14F-4D97-AF65-F5344CB8AC3E}">
-        <p14:creationId xmlns:p14="http://schemas.microsoft.com/office/powerpoint/2010/main" val="2712589128"/>
+        <p14:creationId xmlns:p14="http://schemas.microsoft.com/office/powerpoint/2010/main" val="128284815"/>
       </p:ext>
     </p:extLst>
   </p:cSld>
@@ -2422,7 +2517,7 @@
     </p:spTree>
     <p:extLst>
       <p:ext uri="{BB962C8B-B14F-4D97-AF65-F5344CB8AC3E}">
-        <p14:creationId xmlns:p14="http://schemas.microsoft.com/office/powerpoint/2010/main" val="1609105756"/>
+        <p14:creationId xmlns:p14="http://schemas.microsoft.com/office/powerpoint/2010/main" val="1266200327"/>
       </p:ext>
     </p:extLst>
   </p:cSld>
@@ -2615,7 +2710,7 @@
     </p:spTree>
     <p:extLst>
       <p:ext uri="{BB962C8B-B14F-4D97-AF65-F5344CB8AC3E}">
-        <p14:creationId xmlns:p14="http://schemas.microsoft.com/office/powerpoint/2010/main" val="4079219210"/>
+        <p14:creationId xmlns:p14="http://schemas.microsoft.com/office/powerpoint/2010/main" val="3516029556"/>
       </p:ext>
     </p:extLst>
   </p:cSld>
@@ -2669,6 +2764,342 @@
           <a:bodyPr/>
           <a:lstStyle/>
           <a:p>
+            <a:endParaRPr lang="en-US" b="0" dirty="0" smtClean="0"/>
+          </a:p>
+        </p:txBody>
+      </p:sp>
+      <p:sp>
+        <p:nvSpPr>
+          <p:cNvPr id="4" name="Slide Number Placeholder 3"/>
+          <p:cNvSpPr>
+            <a:spLocks noGrp="1"/>
+          </p:cNvSpPr>
+          <p:nvPr>
+            <p:ph type="sldNum" sz="quarter" idx="10"/>
+          </p:nvPr>
+        </p:nvSpPr>
+        <p:spPr/>
+        <p:txBody>
+          <a:bodyPr/>
+          <a:lstStyle/>
+          <a:p>
+            <a:fld id="{89029652-62E7-43D6-83B5-097D7B7AA5D8}" type="slidenum">
+              <a:rPr lang="en-US" smtClean="0"/>
+              <a:t>31</a:t>
+            </a:fld>
+            <a:endParaRPr lang="en-US"/>
+          </a:p>
+        </p:txBody>
+      </p:sp>
+    </p:spTree>
+    <p:extLst>
+      <p:ext uri="{BB962C8B-B14F-4D97-AF65-F5344CB8AC3E}">
+        <p14:creationId xmlns:p14="http://schemas.microsoft.com/office/powerpoint/2010/main" val="3404565588"/>
+      </p:ext>
+    </p:extLst>
+  </p:cSld>
+  <p:clrMapOvr>
+    <a:masterClrMapping/>
+  </p:clrMapOvr>
+</p:notes>
+</file>
+
+<file path=ppt/notesSlides/notesSlide32.xml><?xml version="1.0" encoding="utf-8"?>
+<p:notes xmlns:a="http://schemas.openxmlformats.org/drawingml/2006/main" xmlns:r="http://schemas.openxmlformats.org/officeDocument/2006/relationships" xmlns:p="http://schemas.openxmlformats.org/presentationml/2006/main">
+  <p:cSld>
+    <p:spTree>
+      <p:nvGrpSpPr>
+        <p:cNvPr id="1" name=""/>
+        <p:cNvGrpSpPr/>
+        <p:nvPr/>
+      </p:nvGrpSpPr>
+      <p:grpSpPr>
+        <a:xfrm>
+          <a:off x="0" y="0"/>
+          <a:ext cx="0" cy="0"/>
+          <a:chOff x="0" y="0"/>
+          <a:chExt cx="0" cy="0"/>
+        </a:xfrm>
+      </p:grpSpPr>
+      <p:sp>
+        <p:nvSpPr>
+          <p:cNvPr id="2" name="Slide Image Placeholder 1"/>
+          <p:cNvSpPr>
+            <a:spLocks noGrp="1" noRot="1" noChangeAspect="1"/>
+          </p:cNvSpPr>
+          <p:nvPr>
+            <p:ph type="sldImg"/>
+          </p:nvPr>
+        </p:nvSpPr>
+        <p:spPr/>
+      </p:sp>
+      <p:sp>
+        <p:nvSpPr>
+          <p:cNvPr id="3" name="Notes Placeholder 2"/>
+          <p:cNvSpPr>
+            <a:spLocks noGrp="1"/>
+          </p:cNvSpPr>
+          <p:nvPr>
+            <p:ph type="body" idx="1"/>
+          </p:nvPr>
+        </p:nvSpPr>
+        <p:spPr/>
+        <p:txBody>
+          <a:bodyPr/>
+          <a:lstStyle/>
+          <a:p>
+            <a:endParaRPr lang="en-US" b="0" dirty="0" smtClean="0"/>
+          </a:p>
+        </p:txBody>
+      </p:sp>
+      <p:sp>
+        <p:nvSpPr>
+          <p:cNvPr id="4" name="Slide Number Placeholder 3"/>
+          <p:cNvSpPr>
+            <a:spLocks noGrp="1"/>
+          </p:cNvSpPr>
+          <p:nvPr>
+            <p:ph type="sldNum" sz="quarter" idx="10"/>
+          </p:nvPr>
+        </p:nvSpPr>
+        <p:spPr/>
+        <p:txBody>
+          <a:bodyPr/>
+          <a:lstStyle/>
+          <a:p>
+            <a:fld id="{89029652-62E7-43D6-83B5-097D7B7AA5D8}" type="slidenum">
+              <a:rPr lang="en-US" smtClean="0"/>
+              <a:t>32</a:t>
+            </a:fld>
+            <a:endParaRPr lang="en-US"/>
+          </a:p>
+        </p:txBody>
+      </p:sp>
+    </p:spTree>
+    <p:extLst>
+      <p:ext uri="{BB962C8B-B14F-4D97-AF65-F5344CB8AC3E}">
+        <p14:creationId xmlns:p14="http://schemas.microsoft.com/office/powerpoint/2010/main" val="2712589128"/>
+      </p:ext>
+    </p:extLst>
+  </p:cSld>
+  <p:clrMapOvr>
+    <a:masterClrMapping/>
+  </p:clrMapOvr>
+</p:notes>
+</file>
+
+<file path=ppt/notesSlides/notesSlide33.xml><?xml version="1.0" encoding="utf-8"?>
+<p:notes xmlns:a="http://schemas.openxmlformats.org/drawingml/2006/main" xmlns:r="http://schemas.openxmlformats.org/officeDocument/2006/relationships" xmlns:p="http://schemas.openxmlformats.org/presentationml/2006/main">
+  <p:cSld>
+    <p:spTree>
+      <p:nvGrpSpPr>
+        <p:cNvPr id="1" name=""/>
+        <p:cNvGrpSpPr/>
+        <p:nvPr/>
+      </p:nvGrpSpPr>
+      <p:grpSpPr>
+        <a:xfrm>
+          <a:off x="0" y="0"/>
+          <a:ext cx="0" cy="0"/>
+          <a:chOff x="0" y="0"/>
+          <a:chExt cx="0" cy="0"/>
+        </a:xfrm>
+      </p:grpSpPr>
+      <p:sp>
+        <p:nvSpPr>
+          <p:cNvPr id="2" name="Slide Image Placeholder 1"/>
+          <p:cNvSpPr>
+            <a:spLocks noGrp="1" noRot="1" noChangeAspect="1"/>
+          </p:cNvSpPr>
+          <p:nvPr>
+            <p:ph type="sldImg"/>
+          </p:nvPr>
+        </p:nvSpPr>
+        <p:spPr/>
+      </p:sp>
+      <p:sp>
+        <p:nvSpPr>
+          <p:cNvPr id="3" name="Notes Placeholder 2"/>
+          <p:cNvSpPr>
+            <a:spLocks noGrp="1"/>
+          </p:cNvSpPr>
+          <p:nvPr>
+            <p:ph type="body" idx="1"/>
+          </p:nvPr>
+        </p:nvSpPr>
+        <p:spPr/>
+        <p:txBody>
+          <a:bodyPr/>
+          <a:lstStyle/>
+          <a:p>
+            <a:endParaRPr lang="en-US" b="0" dirty="0" smtClean="0"/>
+          </a:p>
+        </p:txBody>
+      </p:sp>
+      <p:sp>
+        <p:nvSpPr>
+          <p:cNvPr id="4" name="Slide Number Placeholder 3"/>
+          <p:cNvSpPr>
+            <a:spLocks noGrp="1"/>
+          </p:cNvSpPr>
+          <p:nvPr>
+            <p:ph type="sldNum" sz="quarter" idx="10"/>
+          </p:nvPr>
+        </p:nvSpPr>
+        <p:spPr/>
+        <p:txBody>
+          <a:bodyPr/>
+          <a:lstStyle/>
+          <a:p>
+            <a:fld id="{89029652-62E7-43D6-83B5-097D7B7AA5D8}" type="slidenum">
+              <a:rPr lang="en-US" smtClean="0"/>
+              <a:t>33</a:t>
+            </a:fld>
+            <a:endParaRPr lang="en-US"/>
+          </a:p>
+        </p:txBody>
+      </p:sp>
+    </p:spTree>
+    <p:extLst>
+      <p:ext uri="{BB962C8B-B14F-4D97-AF65-F5344CB8AC3E}">
+        <p14:creationId xmlns:p14="http://schemas.microsoft.com/office/powerpoint/2010/main" val="1609105756"/>
+      </p:ext>
+    </p:extLst>
+  </p:cSld>
+  <p:clrMapOvr>
+    <a:masterClrMapping/>
+  </p:clrMapOvr>
+</p:notes>
+</file>
+
+<file path=ppt/notesSlides/notesSlide34.xml><?xml version="1.0" encoding="utf-8"?>
+<p:notes xmlns:a="http://schemas.openxmlformats.org/drawingml/2006/main" xmlns:r="http://schemas.openxmlformats.org/officeDocument/2006/relationships" xmlns:p="http://schemas.openxmlformats.org/presentationml/2006/main">
+  <p:cSld>
+    <p:spTree>
+      <p:nvGrpSpPr>
+        <p:cNvPr id="1" name=""/>
+        <p:cNvGrpSpPr/>
+        <p:nvPr/>
+      </p:nvGrpSpPr>
+      <p:grpSpPr>
+        <a:xfrm>
+          <a:off x="0" y="0"/>
+          <a:ext cx="0" cy="0"/>
+          <a:chOff x="0" y="0"/>
+          <a:chExt cx="0" cy="0"/>
+        </a:xfrm>
+      </p:grpSpPr>
+      <p:sp>
+        <p:nvSpPr>
+          <p:cNvPr id="2" name="Slide Image Placeholder 1"/>
+          <p:cNvSpPr>
+            <a:spLocks noGrp="1" noRot="1" noChangeAspect="1"/>
+          </p:cNvSpPr>
+          <p:nvPr>
+            <p:ph type="sldImg"/>
+          </p:nvPr>
+        </p:nvSpPr>
+        <p:spPr/>
+      </p:sp>
+      <p:sp>
+        <p:nvSpPr>
+          <p:cNvPr id="3" name="Notes Placeholder 2"/>
+          <p:cNvSpPr>
+            <a:spLocks noGrp="1"/>
+          </p:cNvSpPr>
+          <p:nvPr>
+            <p:ph type="body" idx="1"/>
+          </p:nvPr>
+        </p:nvSpPr>
+        <p:spPr/>
+        <p:txBody>
+          <a:bodyPr/>
+          <a:lstStyle/>
+          <a:p>
+            <a:endParaRPr lang="en-US" b="0" dirty="0" smtClean="0"/>
+          </a:p>
+        </p:txBody>
+      </p:sp>
+      <p:sp>
+        <p:nvSpPr>
+          <p:cNvPr id="4" name="Slide Number Placeholder 3"/>
+          <p:cNvSpPr>
+            <a:spLocks noGrp="1"/>
+          </p:cNvSpPr>
+          <p:nvPr>
+            <p:ph type="sldNum" sz="quarter" idx="10"/>
+          </p:nvPr>
+        </p:nvSpPr>
+        <p:spPr/>
+        <p:txBody>
+          <a:bodyPr/>
+          <a:lstStyle/>
+          <a:p>
+            <a:fld id="{89029652-62E7-43D6-83B5-097D7B7AA5D8}" type="slidenum">
+              <a:rPr lang="en-US" smtClean="0"/>
+              <a:t>34</a:t>
+            </a:fld>
+            <a:endParaRPr lang="en-US"/>
+          </a:p>
+        </p:txBody>
+      </p:sp>
+    </p:spTree>
+    <p:extLst>
+      <p:ext uri="{BB962C8B-B14F-4D97-AF65-F5344CB8AC3E}">
+        <p14:creationId xmlns:p14="http://schemas.microsoft.com/office/powerpoint/2010/main" val="4079219210"/>
+      </p:ext>
+    </p:extLst>
+  </p:cSld>
+  <p:clrMapOvr>
+    <a:masterClrMapping/>
+  </p:clrMapOvr>
+</p:notes>
+</file>
+
+<file path=ppt/notesSlides/notesSlide35.xml><?xml version="1.0" encoding="utf-8"?>
+<p:notes xmlns:a="http://schemas.openxmlformats.org/drawingml/2006/main" xmlns:r="http://schemas.openxmlformats.org/officeDocument/2006/relationships" xmlns:p="http://schemas.openxmlformats.org/presentationml/2006/main">
+  <p:cSld>
+    <p:spTree>
+      <p:nvGrpSpPr>
+        <p:cNvPr id="1" name=""/>
+        <p:cNvGrpSpPr/>
+        <p:nvPr/>
+      </p:nvGrpSpPr>
+      <p:grpSpPr>
+        <a:xfrm>
+          <a:off x="0" y="0"/>
+          <a:ext cx="0" cy="0"/>
+          <a:chOff x="0" y="0"/>
+          <a:chExt cx="0" cy="0"/>
+        </a:xfrm>
+      </p:grpSpPr>
+      <p:sp>
+        <p:nvSpPr>
+          <p:cNvPr id="2" name="Slide Image Placeholder 1"/>
+          <p:cNvSpPr>
+            <a:spLocks noGrp="1" noRot="1" noChangeAspect="1"/>
+          </p:cNvSpPr>
+          <p:nvPr>
+            <p:ph type="sldImg"/>
+          </p:nvPr>
+        </p:nvSpPr>
+        <p:spPr/>
+      </p:sp>
+      <p:sp>
+        <p:nvSpPr>
+          <p:cNvPr id="3" name="Notes Placeholder 2"/>
+          <p:cNvSpPr>
+            <a:spLocks noGrp="1"/>
+          </p:cNvSpPr>
+          <p:nvPr>
+            <p:ph type="body" idx="1"/>
+          </p:nvPr>
+        </p:nvSpPr>
+        <p:spPr/>
+        <p:txBody>
+          <a:bodyPr/>
+          <a:lstStyle/>
+          <a:p>
             <a:pPr marL="0" marR="0" indent="0" algn="l" defTabSz="914400" rtl="0" eaLnBrk="1" fontAlgn="auto" latinLnBrk="0" hangingPunct="1">
               <a:lnSpc>
                 <a:spcPct val="100000"/>
@@ -2715,7 +3146,7 @@
           <a:p>
             <a:fld id="{89029652-62E7-43D6-83B5-097D7B7AA5D8}" type="slidenum">
               <a:rPr lang="en-US" smtClean="0"/>
-              <a:t>31</a:t>
+              <a:t>35</a:t>
             </a:fld>
             <a:endParaRPr lang="en-US"/>
           </a:p>
@@ -2724,343 +3155,7 @@
     </p:spTree>
     <p:extLst>
       <p:ext uri="{BB962C8B-B14F-4D97-AF65-F5344CB8AC3E}">
-        <p14:creationId xmlns:p14="http://schemas.microsoft.com/office/powerpoint/2010/main" val="3734542197"/>
-      </p:ext>
-    </p:extLst>
-  </p:cSld>
-  <p:clrMapOvr>
-    <a:masterClrMapping/>
-  </p:clrMapOvr>
-</p:notes>
-</file>
-
-<file path=ppt/notesSlides/notesSlide32.xml><?xml version="1.0" encoding="utf-8"?>
-<p:notes xmlns:a="http://schemas.openxmlformats.org/drawingml/2006/main" xmlns:r="http://schemas.openxmlformats.org/officeDocument/2006/relationships" xmlns:p="http://schemas.openxmlformats.org/presentationml/2006/main">
-  <p:cSld>
-    <p:spTree>
-      <p:nvGrpSpPr>
-        <p:cNvPr id="1" name=""/>
-        <p:cNvGrpSpPr/>
-        <p:nvPr/>
-      </p:nvGrpSpPr>
-      <p:grpSpPr>
-        <a:xfrm>
-          <a:off x="0" y="0"/>
-          <a:ext cx="0" cy="0"/>
-          <a:chOff x="0" y="0"/>
-          <a:chExt cx="0" cy="0"/>
-        </a:xfrm>
-      </p:grpSpPr>
-      <p:sp>
-        <p:nvSpPr>
-          <p:cNvPr id="2" name="Slide Image Placeholder 1"/>
-          <p:cNvSpPr>
-            <a:spLocks noGrp="1" noRot="1" noChangeAspect="1"/>
-          </p:cNvSpPr>
-          <p:nvPr>
-            <p:ph type="sldImg"/>
-          </p:nvPr>
-        </p:nvSpPr>
-        <p:spPr/>
-      </p:sp>
-      <p:sp>
-        <p:nvSpPr>
-          <p:cNvPr id="3" name="Notes Placeholder 2"/>
-          <p:cNvSpPr>
-            <a:spLocks noGrp="1"/>
-          </p:cNvSpPr>
-          <p:nvPr>
-            <p:ph type="body" idx="1"/>
-          </p:nvPr>
-        </p:nvSpPr>
-        <p:spPr/>
-        <p:txBody>
-          <a:bodyPr/>
-          <a:lstStyle/>
-          <a:p>
-            <a:endParaRPr lang="en-US" b="0" dirty="0" smtClean="0"/>
-          </a:p>
-        </p:txBody>
-      </p:sp>
-      <p:sp>
-        <p:nvSpPr>
-          <p:cNvPr id="4" name="Slide Number Placeholder 3"/>
-          <p:cNvSpPr>
-            <a:spLocks noGrp="1"/>
-          </p:cNvSpPr>
-          <p:nvPr>
-            <p:ph type="sldNum" sz="quarter" idx="10"/>
-          </p:nvPr>
-        </p:nvSpPr>
-        <p:spPr/>
-        <p:txBody>
-          <a:bodyPr/>
-          <a:lstStyle/>
-          <a:p>
-            <a:fld id="{89029652-62E7-43D6-83B5-097D7B7AA5D8}" type="slidenum">
-              <a:rPr lang="en-US" smtClean="0"/>
-              <a:t>32</a:t>
-            </a:fld>
-            <a:endParaRPr lang="en-US"/>
-          </a:p>
-        </p:txBody>
-      </p:sp>
-    </p:spTree>
-    <p:extLst>
-      <p:ext uri="{BB962C8B-B14F-4D97-AF65-F5344CB8AC3E}">
-        <p14:creationId xmlns:p14="http://schemas.microsoft.com/office/powerpoint/2010/main" val="1561525116"/>
-      </p:ext>
-    </p:extLst>
-  </p:cSld>
-  <p:clrMapOvr>
-    <a:masterClrMapping/>
-  </p:clrMapOvr>
-</p:notes>
-</file>
-
-<file path=ppt/notesSlides/notesSlide33.xml><?xml version="1.0" encoding="utf-8"?>
-<p:notes xmlns:a="http://schemas.openxmlformats.org/drawingml/2006/main" xmlns:r="http://schemas.openxmlformats.org/officeDocument/2006/relationships" xmlns:p="http://schemas.openxmlformats.org/presentationml/2006/main">
-  <p:cSld>
-    <p:spTree>
-      <p:nvGrpSpPr>
-        <p:cNvPr id="1" name=""/>
-        <p:cNvGrpSpPr/>
-        <p:nvPr/>
-      </p:nvGrpSpPr>
-      <p:grpSpPr>
-        <a:xfrm>
-          <a:off x="0" y="0"/>
-          <a:ext cx="0" cy="0"/>
-          <a:chOff x="0" y="0"/>
-          <a:chExt cx="0" cy="0"/>
-        </a:xfrm>
-      </p:grpSpPr>
-      <p:sp>
-        <p:nvSpPr>
-          <p:cNvPr id="2" name="Slide Image Placeholder 1"/>
-          <p:cNvSpPr>
-            <a:spLocks noGrp="1" noRot="1" noChangeAspect="1"/>
-          </p:cNvSpPr>
-          <p:nvPr>
-            <p:ph type="sldImg"/>
-          </p:nvPr>
-        </p:nvSpPr>
-        <p:spPr/>
-      </p:sp>
-      <p:sp>
-        <p:nvSpPr>
-          <p:cNvPr id="3" name="Notes Placeholder 2"/>
-          <p:cNvSpPr>
-            <a:spLocks noGrp="1"/>
-          </p:cNvSpPr>
-          <p:nvPr>
-            <p:ph type="body" idx="1"/>
-          </p:nvPr>
-        </p:nvSpPr>
-        <p:spPr/>
-        <p:txBody>
-          <a:bodyPr/>
-          <a:lstStyle/>
-          <a:p>
-            <a:endParaRPr lang="en-US" b="0" dirty="0" smtClean="0"/>
-          </a:p>
-        </p:txBody>
-      </p:sp>
-      <p:sp>
-        <p:nvSpPr>
-          <p:cNvPr id="4" name="Slide Number Placeholder 3"/>
-          <p:cNvSpPr>
-            <a:spLocks noGrp="1"/>
-          </p:cNvSpPr>
-          <p:nvPr>
-            <p:ph type="sldNum" sz="quarter" idx="10"/>
-          </p:nvPr>
-        </p:nvSpPr>
-        <p:spPr/>
-        <p:txBody>
-          <a:bodyPr/>
-          <a:lstStyle/>
-          <a:p>
-            <a:fld id="{89029652-62E7-43D6-83B5-097D7B7AA5D8}" type="slidenum">
-              <a:rPr lang="en-US" smtClean="0"/>
-              <a:t>33</a:t>
-            </a:fld>
-            <a:endParaRPr lang="en-US"/>
-          </a:p>
-        </p:txBody>
-      </p:sp>
-    </p:spTree>
-    <p:extLst>
-      <p:ext uri="{BB962C8B-B14F-4D97-AF65-F5344CB8AC3E}">
-        <p14:creationId xmlns:p14="http://schemas.microsoft.com/office/powerpoint/2010/main" val="3344468672"/>
-      </p:ext>
-    </p:extLst>
-  </p:cSld>
-  <p:clrMapOvr>
-    <a:masterClrMapping/>
-  </p:clrMapOvr>
-</p:notes>
-</file>
-
-<file path=ppt/notesSlides/notesSlide34.xml><?xml version="1.0" encoding="utf-8"?>
-<p:notes xmlns:a="http://schemas.openxmlformats.org/drawingml/2006/main" xmlns:r="http://schemas.openxmlformats.org/officeDocument/2006/relationships" xmlns:p="http://schemas.openxmlformats.org/presentationml/2006/main">
-  <p:cSld>
-    <p:spTree>
-      <p:nvGrpSpPr>
-        <p:cNvPr id="1" name=""/>
-        <p:cNvGrpSpPr/>
-        <p:nvPr/>
-      </p:nvGrpSpPr>
-      <p:grpSpPr>
-        <a:xfrm>
-          <a:off x="0" y="0"/>
-          <a:ext cx="0" cy="0"/>
-          <a:chOff x="0" y="0"/>
-          <a:chExt cx="0" cy="0"/>
-        </a:xfrm>
-      </p:grpSpPr>
-      <p:sp>
-        <p:nvSpPr>
-          <p:cNvPr id="2" name="Slide Image Placeholder 1"/>
-          <p:cNvSpPr>
-            <a:spLocks noGrp="1" noRot="1" noChangeAspect="1"/>
-          </p:cNvSpPr>
-          <p:nvPr>
-            <p:ph type="sldImg"/>
-          </p:nvPr>
-        </p:nvSpPr>
-        <p:spPr/>
-      </p:sp>
-      <p:sp>
-        <p:nvSpPr>
-          <p:cNvPr id="3" name="Notes Placeholder 2"/>
-          <p:cNvSpPr>
-            <a:spLocks noGrp="1"/>
-          </p:cNvSpPr>
-          <p:nvPr>
-            <p:ph type="body" idx="1"/>
-          </p:nvPr>
-        </p:nvSpPr>
-        <p:spPr/>
-        <p:txBody>
-          <a:bodyPr/>
-          <a:lstStyle/>
-          <a:p>
-            <a:endParaRPr lang="en-US" b="0" dirty="0" smtClean="0"/>
-          </a:p>
-        </p:txBody>
-      </p:sp>
-      <p:sp>
-        <p:nvSpPr>
-          <p:cNvPr id="4" name="Slide Number Placeholder 3"/>
-          <p:cNvSpPr>
-            <a:spLocks noGrp="1"/>
-          </p:cNvSpPr>
-          <p:nvPr>
-            <p:ph type="sldNum" sz="quarter" idx="10"/>
-          </p:nvPr>
-        </p:nvSpPr>
-        <p:spPr/>
-        <p:txBody>
-          <a:bodyPr/>
-          <a:lstStyle/>
-          <a:p>
-            <a:fld id="{89029652-62E7-43D6-83B5-097D7B7AA5D8}" type="slidenum">
-              <a:rPr lang="en-US" smtClean="0"/>
-              <a:t>34</a:t>
-            </a:fld>
-            <a:endParaRPr lang="en-US"/>
-          </a:p>
-        </p:txBody>
-      </p:sp>
-    </p:spTree>
-    <p:extLst>
-      <p:ext uri="{BB962C8B-B14F-4D97-AF65-F5344CB8AC3E}">
-        <p14:creationId xmlns:p14="http://schemas.microsoft.com/office/powerpoint/2010/main" val="3143393369"/>
-      </p:ext>
-    </p:extLst>
-  </p:cSld>
-  <p:clrMapOvr>
-    <a:masterClrMapping/>
-  </p:clrMapOvr>
-</p:notes>
-</file>
-
-<file path=ppt/notesSlides/notesSlide35.xml><?xml version="1.0" encoding="utf-8"?>
-<p:notes xmlns:a="http://schemas.openxmlformats.org/drawingml/2006/main" xmlns:r="http://schemas.openxmlformats.org/officeDocument/2006/relationships" xmlns:p="http://schemas.openxmlformats.org/presentationml/2006/main">
-  <p:cSld>
-    <p:spTree>
-      <p:nvGrpSpPr>
-        <p:cNvPr id="1" name=""/>
-        <p:cNvGrpSpPr/>
-        <p:nvPr/>
-      </p:nvGrpSpPr>
-      <p:grpSpPr>
-        <a:xfrm>
-          <a:off x="0" y="0"/>
-          <a:ext cx="0" cy="0"/>
-          <a:chOff x="0" y="0"/>
-          <a:chExt cx="0" cy="0"/>
-        </a:xfrm>
-      </p:grpSpPr>
-      <p:sp>
-        <p:nvSpPr>
-          <p:cNvPr id="2" name="Slide Image Placeholder 1"/>
-          <p:cNvSpPr>
-            <a:spLocks noGrp="1" noRot="1" noChangeAspect="1"/>
-          </p:cNvSpPr>
-          <p:nvPr>
-            <p:ph type="sldImg"/>
-          </p:nvPr>
-        </p:nvSpPr>
-        <p:spPr/>
-      </p:sp>
-      <p:sp>
-        <p:nvSpPr>
-          <p:cNvPr id="3" name="Notes Placeholder 2"/>
-          <p:cNvSpPr>
-            <a:spLocks noGrp="1"/>
-          </p:cNvSpPr>
-          <p:nvPr>
-            <p:ph type="body" idx="1"/>
-          </p:nvPr>
-        </p:nvSpPr>
-        <p:spPr/>
-        <p:txBody>
-          <a:bodyPr/>
-          <a:lstStyle/>
-          <a:p>
-            <a:endParaRPr lang="en-US" b="0" dirty="0" smtClean="0"/>
-          </a:p>
-        </p:txBody>
-      </p:sp>
-      <p:sp>
-        <p:nvSpPr>
-          <p:cNvPr id="4" name="Slide Number Placeholder 3"/>
-          <p:cNvSpPr>
-            <a:spLocks noGrp="1"/>
-          </p:cNvSpPr>
-          <p:nvPr>
-            <p:ph type="sldNum" sz="quarter" idx="10"/>
-          </p:nvPr>
-        </p:nvSpPr>
-        <p:spPr/>
-        <p:txBody>
-          <a:bodyPr/>
-          <a:lstStyle/>
-          <a:p>
-            <a:fld id="{89029652-62E7-43D6-83B5-097D7B7AA5D8}" type="slidenum">
-              <a:rPr lang="en-US" smtClean="0"/>
-              <a:t>35</a:t>
-            </a:fld>
-            <a:endParaRPr lang="en-US"/>
-          </a:p>
-        </p:txBody>
-      </p:sp>
-    </p:spTree>
-    <p:extLst>
-      <p:ext uri="{BB962C8B-B14F-4D97-AF65-F5344CB8AC3E}">
-        <p14:creationId xmlns:p14="http://schemas.microsoft.com/office/powerpoint/2010/main" val="531577243"/>
+        <p14:creationId xmlns:p14="http://schemas.microsoft.com/office/powerpoint/2010/main" val="1830730383"/>
       </p:ext>
     </p:extLst>
   </p:cSld>
@@ -3144,7 +3239,7 @@
     </p:spTree>
     <p:extLst>
       <p:ext uri="{BB962C8B-B14F-4D97-AF65-F5344CB8AC3E}">
-        <p14:creationId xmlns:p14="http://schemas.microsoft.com/office/powerpoint/2010/main" val="3450469856"/>
+        <p14:creationId xmlns:p14="http://schemas.microsoft.com/office/powerpoint/2010/main" val="1561525116"/>
       </p:ext>
     </p:extLst>
   </p:cSld>
@@ -3228,7 +3323,7 @@
     </p:spTree>
     <p:extLst>
       <p:ext uri="{BB962C8B-B14F-4D97-AF65-F5344CB8AC3E}">
-        <p14:creationId xmlns:p14="http://schemas.microsoft.com/office/powerpoint/2010/main" val="2647091800"/>
+        <p14:creationId xmlns:p14="http://schemas.microsoft.com/office/powerpoint/2010/main" val="3344468672"/>
       </p:ext>
     </p:extLst>
   </p:cSld>
@@ -3312,7 +3407,7 @@
     </p:spTree>
     <p:extLst>
       <p:ext uri="{BB962C8B-B14F-4D97-AF65-F5344CB8AC3E}">
-        <p14:creationId xmlns:p14="http://schemas.microsoft.com/office/powerpoint/2010/main" val="3603726692"/>
+        <p14:creationId xmlns:p14="http://schemas.microsoft.com/office/powerpoint/2010/main" val="3143393369"/>
       </p:ext>
     </p:extLst>
   </p:cSld>
@@ -3396,7 +3491,7 @@
     </p:spTree>
     <p:extLst>
       <p:ext uri="{BB962C8B-B14F-4D97-AF65-F5344CB8AC3E}">
-        <p14:creationId xmlns:p14="http://schemas.microsoft.com/office/powerpoint/2010/main" val="2106924964"/>
+        <p14:creationId xmlns:p14="http://schemas.microsoft.com/office/powerpoint/2010/main" val="531577243"/>
       </p:ext>
     </p:extLst>
   </p:cSld>
@@ -3559,7 +3654,32 @@
           <a:bodyPr/>
           <a:lstStyle/>
           <a:p>
-            <a:endParaRPr lang="en-US" b="0" dirty="0" smtClean="0"/>
+            <a:pPr marL="0" marR="0" indent="0" algn="l" defTabSz="914400" rtl="0" eaLnBrk="1" fontAlgn="auto" latinLnBrk="0" hangingPunct="1">
+              <a:lnSpc>
+                <a:spcPct val="100000"/>
+              </a:lnSpc>
+              <a:spcBef>
+                <a:spcPts val="0"/>
+              </a:spcBef>
+              <a:spcAft>
+                <a:spcPts val="0"/>
+              </a:spcAft>
+              <a:buClrTx/>
+              <a:buSzTx/>
+              <a:buFontTx/>
+              <a:buNone/>
+              <a:tabLst/>
+              <a:defRPr/>
+            </a:pPr>
+            <a:endParaRPr lang="en-US" sz="1200" kern="1200" dirty="0" smtClean="0">
+              <a:solidFill>
+                <a:schemeClr val="tx1"/>
+              </a:solidFill>
+              <a:effectLst/>
+              <a:latin typeface="+mn-lt"/>
+              <a:ea typeface="+mn-ea"/>
+              <a:cs typeface="+mn-cs"/>
+            </a:endParaRPr>
           </a:p>
         </p:txBody>
       </p:sp>
@@ -3589,7 +3709,7 @@
     </p:spTree>
     <p:extLst>
       <p:ext uri="{BB962C8B-B14F-4D97-AF65-F5344CB8AC3E}">
-        <p14:creationId xmlns:p14="http://schemas.microsoft.com/office/powerpoint/2010/main" val="506673237"/>
+        <p14:creationId xmlns:p14="http://schemas.microsoft.com/office/powerpoint/2010/main" val="1557858908"/>
       </p:ext>
     </p:extLst>
   </p:cSld>
@@ -3643,6 +3763,426 @@
           <a:bodyPr/>
           <a:lstStyle/>
           <a:p>
+            <a:endParaRPr lang="en-US" b="0" dirty="0" smtClean="0"/>
+          </a:p>
+        </p:txBody>
+      </p:sp>
+      <p:sp>
+        <p:nvSpPr>
+          <p:cNvPr id="4" name="Slide Number Placeholder 3"/>
+          <p:cNvSpPr>
+            <a:spLocks noGrp="1"/>
+          </p:cNvSpPr>
+          <p:nvPr>
+            <p:ph type="sldNum" sz="quarter" idx="10"/>
+          </p:nvPr>
+        </p:nvSpPr>
+        <p:spPr/>
+        <p:txBody>
+          <a:bodyPr/>
+          <a:lstStyle/>
+          <a:p>
+            <a:fld id="{89029652-62E7-43D6-83B5-097D7B7AA5D8}" type="slidenum">
+              <a:rPr lang="en-US" smtClean="0"/>
+              <a:t>41</a:t>
+            </a:fld>
+            <a:endParaRPr lang="en-US"/>
+          </a:p>
+        </p:txBody>
+      </p:sp>
+    </p:spTree>
+    <p:extLst>
+      <p:ext uri="{BB962C8B-B14F-4D97-AF65-F5344CB8AC3E}">
+        <p14:creationId xmlns:p14="http://schemas.microsoft.com/office/powerpoint/2010/main" val="3450469856"/>
+      </p:ext>
+    </p:extLst>
+  </p:cSld>
+  <p:clrMapOvr>
+    <a:masterClrMapping/>
+  </p:clrMapOvr>
+</p:notes>
+</file>
+
+<file path=ppt/notesSlides/notesSlide42.xml><?xml version="1.0" encoding="utf-8"?>
+<p:notes xmlns:a="http://schemas.openxmlformats.org/drawingml/2006/main" xmlns:r="http://schemas.openxmlformats.org/officeDocument/2006/relationships" xmlns:p="http://schemas.openxmlformats.org/presentationml/2006/main">
+  <p:cSld>
+    <p:spTree>
+      <p:nvGrpSpPr>
+        <p:cNvPr id="1" name=""/>
+        <p:cNvGrpSpPr/>
+        <p:nvPr/>
+      </p:nvGrpSpPr>
+      <p:grpSpPr>
+        <a:xfrm>
+          <a:off x="0" y="0"/>
+          <a:ext cx="0" cy="0"/>
+          <a:chOff x="0" y="0"/>
+          <a:chExt cx="0" cy="0"/>
+        </a:xfrm>
+      </p:grpSpPr>
+      <p:sp>
+        <p:nvSpPr>
+          <p:cNvPr id="2" name="Slide Image Placeholder 1"/>
+          <p:cNvSpPr>
+            <a:spLocks noGrp="1" noRot="1" noChangeAspect="1"/>
+          </p:cNvSpPr>
+          <p:nvPr>
+            <p:ph type="sldImg"/>
+          </p:nvPr>
+        </p:nvSpPr>
+        <p:spPr/>
+      </p:sp>
+      <p:sp>
+        <p:nvSpPr>
+          <p:cNvPr id="3" name="Notes Placeholder 2"/>
+          <p:cNvSpPr>
+            <a:spLocks noGrp="1"/>
+          </p:cNvSpPr>
+          <p:nvPr>
+            <p:ph type="body" idx="1"/>
+          </p:nvPr>
+        </p:nvSpPr>
+        <p:spPr/>
+        <p:txBody>
+          <a:bodyPr/>
+          <a:lstStyle/>
+          <a:p>
+            <a:endParaRPr lang="en-US" b="0" dirty="0" smtClean="0"/>
+          </a:p>
+        </p:txBody>
+      </p:sp>
+      <p:sp>
+        <p:nvSpPr>
+          <p:cNvPr id="4" name="Slide Number Placeholder 3"/>
+          <p:cNvSpPr>
+            <a:spLocks noGrp="1"/>
+          </p:cNvSpPr>
+          <p:nvPr>
+            <p:ph type="sldNum" sz="quarter" idx="10"/>
+          </p:nvPr>
+        </p:nvSpPr>
+        <p:spPr/>
+        <p:txBody>
+          <a:bodyPr/>
+          <a:lstStyle/>
+          <a:p>
+            <a:fld id="{89029652-62E7-43D6-83B5-097D7B7AA5D8}" type="slidenum">
+              <a:rPr lang="en-US" smtClean="0"/>
+              <a:t>42</a:t>
+            </a:fld>
+            <a:endParaRPr lang="en-US"/>
+          </a:p>
+        </p:txBody>
+      </p:sp>
+    </p:spTree>
+    <p:extLst>
+      <p:ext uri="{BB962C8B-B14F-4D97-AF65-F5344CB8AC3E}">
+        <p14:creationId xmlns:p14="http://schemas.microsoft.com/office/powerpoint/2010/main" val="2647091800"/>
+      </p:ext>
+    </p:extLst>
+  </p:cSld>
+  <p:clrMapOvr>
+    <a:masterClrMapping/>
+  </p:clrMapOvr>
+</p:notes>
+</file>
+
+<file path=ppt/notesSlides/notesSlide43.xml><?xml version="1.0" encoding="utf-8"?>
+<p:notes xmlns:a="http://schemas.openxmlformats.org/drawingml/2006/main" xmlns:r="http://schemas.openxmlformats.org/officeDocument/2006/relationships" xmlns:p="http://schemas.openxmlformats.org/presentationml/2006/main">
+  <p:cSld>
+    <p:spTree>
+      <p:nvGrpSpPr>
+        <p:cNvPr id="1" name=""/>
+        <p:cNvGrpSpPr/>
+        <p:nvPr/>
+      </p:nvGrpSpPr>
+      <p:grpSpPr>
+        <a:xfrm>
+          <a:off x="0" y="0"/>
+          <a:ext cx="0" cy="0"/>
+          <a:chOff x="0" y="0"/>
+          <a:chExt cx="0" cy="0"/>
+        </a:xfrm>
+      </p:grpSpPr>
+      <p:sp>
+        <p:nvSpPr>
+          <p:cNvPr id="2" name="Slide Image Placeholder 1"/>
+          <p:cNvSpPr>
+            <a:spLocks noGrp="1" noRot="1" noChangeAspect="1"/>
+          </p:cNvSpPr>
+          <p:nvPr>
+            <p:ph type="sldImg"/>
+          </p:nvPr>
+        </p:nvSpPr>
+        <p:spPr/>
+      </p:sp>
+      <p:sp>
+        <p:nvSpPr>
+          <p:cNvPr id="3" name="Notes Placeholder 2"/>
+          <p:cNvSpPr>
+            <a:spLocks noGrp="1"/>
+          </p:cNvSpPr>
+          <p:nvPr>
+            <p:ph type="body" idx="1"/>
+          </p:nvPr>
+        </p:nvSpPr>
+        <p:spPr/>
+        <p:txBody>
+          <a:bodyPr/>
+          <a:lstStyle/>
+          <a:p>
+            <a:endParaRPr lang="en-US" b="0" dirty="0" smtClean="0"/>
+          </a:p>
+        </p:txBody>
+      </p:sp>
+      <p:sp>
+        <p:nvSpPr>
+          <p:cNvPr id="4" name="Slide Number Placeholder 3"/>
+          <p:cNvSpPr>
+            <a:spLocks noGrp="1"/>
+          </p:cNvSpPr>
+          <p:nvPr>
+            <p:ph type="sldNum" sz="quarter" idx="10"/>
+          </p:nvPr>
+        </p:nvSpPr>
+        <p:spPr/>
+        <p:txBody>
+          <a:bodyPr/>
+          <a:lstStyle/>
+          <a:p>
+            <a:fld id="{89029652-62E7-43D6-83B5-097D7B7AA5D8}" type="slidenum">
+              <a:rPr lang="en-US" smtClean="0"/>
+              <a:t>43</a:t>
+            </a:fld>
+            <a:endParaRPr lang="en-US"/>
+          </a:p>
+        </p:txBody>
+      </p:sp>
+    </p:spTree>
+    <p:extLst>
+      <p:ext uri="{BB962C8B-B14F-4D97-AF65-F5344CB8AC3E}">
+        <p14:creationId xmlns:p14="http://schemas.microsoft.com/office/powerpoint/2010/main" val="3603726692"/>
+      </p:ext>
+    </p:extLst>
+  </p:cSld>
+  <p:clrMapOvr>
+    <a:masterClrMapping/>
+  </p:clrMapOvr>
+</p:notes>
+</file>
+
+<file path=ppt/notesSlides/notesSlide44.xml><?xml version="1.0" encoding="utf-8"?>
+<p:notes xmlns:a="http://schemas.openxmlformats.org/drawingml/2006/main" xmlns:r="http://schemas.openxmlformats.org/officeDocument/2006/relationships" xmlns:p="http://schemas.openxmlformats.org/presentationml/2006/main">
+  <p:cSld>
+    <p:spTree>
+      <p:nvGrpSpPr>
+        <p:cNvPr id="1" name=""/>
+        <p:cNvGrpSpPr/>
+        <p:nvPr/>
+      </p:nvGrpSpPr>
+      <p:grpSpPr>
+        <a:xfrm>
+          <a:off x="0" y="0"/>
+          <a:ext cx="0" cy="0"/>
+          <a:chOff x="0" y="0"/>
+          <a:chExt cx="0" cy="0"/>
+        </a:xfrm>
+      </p:grpSpPr>
+      <p:sp>
+        <p:nvSpPr>
+          <p:cNvPr id="2" name="Slide Image Placeholder 1"/>
+          <p:cNvSpPr>
+            <a:spLocks noGrp="1" noRot="1" noChangeAspect="1"/>
+          </p:cNvSpPr>
+          <p:nvPr>
+            <p:ph type="sldImg"/>
+          </p:nvPr>
+        </p:nvSpPr>
+        <p:spPr/>
+      </p:sp>
+      <p:sp>
+        <p:nvSpPr>
+          <p:cNvPr id="3" name="Notes Placeholder 2"/>
+          <p:cNvSpPr>
+            <a:spLocks noGrp="1"/>
+          </p:cNvSpPr>
+          <p:nvPr>
+            <p:ph type="body" idx="1"/>
+          </p:nvPr>
+        </p:nvSpPr>
+        <p:spPr/>
+        <p:txBody>
+          <a:bodyPr/>
+          <a:lstStyle/>
+          <a:p>
+            <a:endParaRPr lang="en-US" b="0" dirty="0" smtClean="0"/>
+          </a:p>
+        </p:txBody>
+      </p:sp>
+      <p:sp>
+        <p:nvSpPr>
+          <p:cNvPr id="4" name="Slide Number Placeholder 3"/>
+          <p:cNvSpPr>
+            <a:spLocks noGrp="1"/>
+          </p:cNvSpPr>
+          <p:nvPr>
+            <p:ph type="sldNum" sz="quarter" idx="10"/>
+          </p:nvPr>
+        </p:nvSpPr>
+        <p:spPr/>
+        <p:txBody>
+          <a:bodyPr/>
+          <a:lstStyle/>
+          <a:p>
+            <a:fld id="{89029652-62E7-43D6-83B5-097D7B7AA5D8}" type="slidenum">
+              <a:rPr lang="en-US" smtClean="0"/>
+              <a:t>44</a:t>
+            </a:fld>
+            <a:endParaRPr lang="en-US"/>
+          </a:p>
+        </p:txBody>
+      </p:sp>
+    </p:spTree>
+    <p:extLst>
+      <p:ext uri="{BB962C8B-B14F-4D97-AF65-F5344CB8AC3E}">
+        <p14:creationId xmlns:p14="http://schemas.microsoft.com/office/powerpoint/2010/main" val="2106924964"/>
+      </p:ext>
+    </p:extLst>
+  </p:cSld>
+  <p:clrMapOvr>
+    <a:masterClrMapping/>
+  </p:clrMapOvr>
+</p:notes>
+</file>
+
+<file path=ppt/notesSlides/notesSlide45.xml><?xml version="1.0" encoding="utf-8"?>
+<p:notes xmlns:a="http://schemas.openxmlformats.org/drawingml/2006/main" xmlns:r="http://schemas.openxmlformats.org/officeDocument/2006/relationships" xmlns:p="http://schemas.openxmlformats.org/presentationml/2006/main">
+  <p:cSld>
+    <p:spTree>
+      <p:nvGrpSpPr>
+        <p:cNvPr id="1" name=""/>
+        <p:cNvGrpSpPr/>
+        <p:nvPr/>
+      </p:nvGrpSpPr>
+      <p:grpSpPr>
+        <a:xfrm>
+          <a:off x="0" y="0"/>
+          <a:ext cx="0" cy="0"/>
+          <a:chOff x="0" y="0"/>
+          <a:chExt cx="0" cy="0"/>
+        </a:xfrm>
+      </p:grpSpPr>
+      <p:sp>
+        <p:nvSpPr>
+          <p:cNvPr id="2" name="Slide Image Placeholder 1"/>
+          <p:cNvSpPr>
+            <a:spLocks noGrp="1" noRot="1" noChangeAspect="1"/>
+          </p:cNvSpPr>
+          <p:nvPr>
+            <p:ph type="sldImg"/>
+          </p:nvPr>
+        </p:nvSpPr>
+        <p:spPr/>
+      </p:sp>
+      <p:sp>
+        <p:nvSpPr>
+          <p:cNvPr id="3" name="Notes Placeholder 2"/>
+          <p:cNvSpPr>
+            <a:spLocks noGrp="1"/>
+          </p:cNvSpPr>
+          <p:nvPr>
+            <p:ph type="body" idx="1"/>
+          </p:nvPr>
+        </p:nvSpPr>
+        <p:spPr/>
+        <p:txBody>
+          <a:bodyPr/>
+          <a:lstStyle/>
+          <a:p>
+            <a:endParaRPr lang="en-US" b="0" dirty="0" smtClean="0"/>
+          </a:p>
+        </p:txBody>
+      </p:sp>
+      <p:sp>
+        <p:nvSpPr>
+          <p:cNvPr id="4" name="Slide Number Placeholder 3"/>
+          <p:cNvSpPr>
+            <a:spLocks noGrp="1"/>
+          </p:cNvSpPr>
+          <p:nvPr>
+            <p:ph type="sldNum" sz="quarter" idx="10"/>
+          </p:nvPr>
+        </p:nvSpPr>
+        <p:spPr/>
+        <p:txBody>
+          <a:bodyPr/>
+          <a:lstStyle/>
+          <a:p>
+            <a:fld id="{89029652-62E7-43D6-83B5-097D7B7AA5D8}" type="slidenum">
+              <a:rPr lang="en-US" smtClean="0"/>
+              <a:t>45</a:t>
+            </a:fld>
+            <a:endParaRPr lang="en-US"/>
+          </a:p>
+        </p:txBody>
+      </p:sp>
+    </p:spTree>
+    <p:extLst>
+      <p:ext uri="{BB962C8B-B14F-4D97-AF65-F5344CB8AC3E}">
+        <p14:creationId xmlns:p14="http://schemas.microsoft.com/office/powerpoint/2010/main" val="506673237"/>
+      </p:ext>
+    </p:extLst>
+  </p:cSld>
+  <p:clrMapOvr>
+    <a:masterClrMapping/>
+  </p:clrMapOvr>
+</p:notes>
+</file>
+
+<file path=ppt/notesSlides/notesSlide46.xml><?xml version="1.0" encoding="utf-8"?>
+<p:notes xmlns:a="http://schemas.openxmlformats.org/drawingml/2006/main" xmlns:r="http://schemas.openxmlformats.org/officeDocument/2006/relationships" xmlns:p="http://schemas.openxmlformats.org/presentationml/2006/main">
+  <p:cSld>
+    <p:spTree>
+      <p:nvGrpSpPr>
+        <p:cNvPr id="1" name=""/>
+        <p:cNvGrpSpPr/>
+        <p:nvPr/>
+      </p:nvGrpSpPr>
+      <p:grpSpPr>
+        <a:xfrm>
+          <a:off x="0" y="0"/>
+          <a:ext cx="0" cy="0"/>
+          <a:chOff x="0" y="0"/>
+          <a:chExt cx="0" cy="0"/>
+        </a:xfrm>
+      </p:grpSpPr>
+      <p:sp>
+        <p:nvSpPr>
+          <p:cNvPr id="2" name="Slide Image Placeholder 1"/>
+          <p:cNvSpPr>
+            <a:spLocks noGrp="1" noRot="1" noChangeAspect="1"/>
+          </p:cNvSpPr>
+          <p:nvPr>
+            <p:ph type="sldImg"/>
+          </p:nvPr>
+        </p:nvSpPr>
+        <p:spPr/>
+      </p:sp>
+      <p:sp>
+        <p:nvSpPr>
+          <p:cNvPr id="3" name="Notes Placeholder 2"/>
+          <p:cNvSpPr>
+            <a:spLocks noGrp="1"/>
+          </p:cNvSpPr>
+          <p:nvPr>
+            <p:ph type="body" idx="1"/>
+          </p:nvPr>
+        </p:nvSpPr>
+        <p:spPr/>
+        <p:txBody>
+          <a:bodyPr/>
+          <a:lstStyle/>
+          <a:p>
             <a:pPr marL="0" marR="0" indent="0" algn="l" defTabSz="914400" rtl="0" eaLnBrk="1" fontAlgn="auto" latinLnBrk="0" hangingPunct="1">
               <a:lnSpc>
                 <a:spcPct val="100000"/>
@@ -3689,7 +4229,7 @@
           <a:p>
             <a:fld id="{89029652-62E7-43D6-83B5-097D7B7AA5D8}" type="slidenum">
               <a:rPr lang="en-US" smtClean="0"/>
-              <a:t>41</a:t>
+              <a:t>46</a:t>
             </a:fld>
             <a:endParaRPr lang="en-US"/>
           </a:p>
@@ -3699,426 +4239,6 @@
     <p:extLst>
       <p:ext uri="{BB962C8B-B14F-4D97-AF65-F5344CB8AC3E}">
         <p14:creationId xmlns:p14="http://schemas.microsoft.com/office/powerpoint/2010/main" val="2286755864"/>
-      </p:ext>
-    </p:extLst>
-  </p:cSld>
-  <p:clrMapOvr>
-    <a:masterClrMapping/>
-  </p:clrMapOvr>
-</p:notes>
-</file>
-
-<file path=ppt/notesSlides/notesSlide42.xml><?xml version="1.0" encoding="utf-8"?>
-<p:notes xmlns:a="http://schemas.openxmlformats.org/drawingml/2006/main" xmlns:r="http://schemas.openxmlformats.org/officeDocument/2006/relationships" xmlns:p="http://schemas.openxmlformats.org/presentationml/2006/main">
-  <p:cSld>
-    <p:spTree>
-      <p:nvGrpSpPr>
-        <p:cNvPr id="1" name=""/>
-        <p:cNvGrpSpPr/>
-        <p:nvPr/>
-      </p:nvGrpSpPr>
-      <p:grpSpPr>
-        <a:xfrm>
-          <a:off x="0" y="0"/>
-          <a:ext cx="0" cy="0"/>
-          <a:chOff x="0" y="0"/>
-          <a:chExt cx="0" cy="0"/>
-        </a:xfrm>
-      </p:grpSpPr>
-      <p:sp>
-        <p:nvSpPr>
-          <p:cNvPr id="2" name="Slide Image Placeholder 1"/>
-          <p:cNvSpPr>
-            <a:spLocks noGrp="1" noRot="1" noChangeAspect="1"/>
-          </p:cNvSpPr>
-          <p:nvPr>
-            <p:ph type="sldImg"/>
-          </p:nvPr>
-        </p:nvSpPr>
-        <p:spPr/>
-      </p:sp>
-      <p:sp>
-        <p:nvSpPr>
-          <p:cNvPr id="3" name="Notes Placeholder 2"/>
-          <p:cNvSpPr>
-            <a:spLocks noGrp="1"/>
-          </p:cNvSpPr>
-          <p:nvPr>
-            <p:ph type="body" idx="1"/>
-          </p:nvPr>
-        </p:nvSpPr>
-        <p:spPr/>
-        <p:txBody>
-          <a:bodyPr/>
-          <a:lstStyle/>
-          <a:p>
-            <a:endParaRPr lang="en-US" b="0" dirty="0" smtClean="0"/>
-          </a:p>
-        </p:txBody>
-      </p:sp>
-      <p:sp>
-        <p:nvSpPr>
-          <p:cNvPr id="4" name="Slide Number Placeholder 3"/>
-          <p:cNvSpPr>
-            <a:spLocks noGrp="1"/>
-          </p:cNvSpPr>
-          <p:nvPr>
-            <p:ph type="sldNum" sz="quarter" idx="10"/>
-          </p:nvPr>
-        </p:nvSpPr>
-        <p:spPr/>
-        <p:txBody>
-          <a:bodyPr/>
-          <a:lstStyle/>
-          <a:p>
-            <a:fld id="{89029652-62E7-43D6-83B5-097D7B7AA5D8}" type="slidenum">
-              <a:rPr lang="en-US" smtClean="0"/>
-              <a:t>42</a:t>
-            </a:fld>
-            <a:endParaRPr lang="en-US"/>
-          </a:p>
-        </p:txBody>
-      </p:sp>
-    </p:spTree>
-    <p:extLst>
-      <p:ext uri="{BB962C8B-B14F-4D97-AF65-F5344CB8AC3E}">
-        <p14:creationId xmlns:p14="http://schemas.microsoft.com/office/powerpoint/2010/main" val="2653332077"/>
-      </p:ext>
-    </p:extLst>
-  </p:cSld>
-  <p:clrMapOvr>
-    <a:masterClrMapping/>
-  </p:clrMapOvr>
-</p:notes>
-</file>
-
-<file path=ppt/notesSlides/notesSlide43.xml><?xml version="1.0" encoding="utf-8"?>
-<p:notes xmlns:a="http://schemas.openxmlformats.org/drawingml/2006/main" xmlns:r="http://schemas.openxmlformats.org/officeDocument/2006/relationships" xmlns:p="http://schemas.openxmlformats.org/presentationml/2006/main">
-  <p:cSld>
-    <p:spTree>
-      <p:nvGrpSpPr>
-        <p:cNvPr id="1" name=""/>
-        <p:cNvGrpSpPr/>
-        <p:nvPr/>
-      </p:nvGrpSpPr>
-      <p:grpSpPr>
-        <a:xfrm>
-          <a:off x="0" y="0"/>
-          <a:ext cx="0" cy="0"/>
-          <a:chOff x="0" y="0"/>
-          <a:chExt cx="0" cy="0"/>
-        </a:xfrm>
-      </p:grpSpPr>
-      <p:sp>
-        <p:nvSpPr>
-          <p:cNvPr id="2" name="Slide Image Placeholder 1"/>
-          <p:cNvSpPr>
-            <a:spLocks noGrp="1" noRot="1" noChangeAspect="1"/>
-          </p:cNvSpPr>
-          <p:nvPr>
-            <p:ph type="sldImg"/>
-          </p:nvPr>
-        </p:nvSpPr>
-        <p:spPr/>
-      </p:sp>
-      <p:sp>
-        <p:nvSpPr>
-          <p:cNvPr id="3" name="Notes Placeholder 2"/>
-          <p:cNvSpPr>
-            <a:spLocks noGrp="1"/>
-          </p:cNvSpPr>
-          <p:nvPr>
-            <p:ph type="body" idx="1"/>
-          </p:nvPr>
-        </p:nvSpPr>
-        <p:spPr/>
-        <p:txBody>
-          <a:bodyPr/>
-          <a:lstStyle/>
-          <a:p>
-            <a:endParaRPr lang="en-US" b="0" dirty="0" smtClean="0"/>
-          </a:p>
-        </p:txBody>
-      </p:sp>
-      <p:sp>
-        <p:nvSpPr>
-          <p:cNvPr id="4" name="Slide Number Placeholder 3"/>
-          <p:cNvSpPr>
-            <a:spLocks noGrp="1"/>
-          </p:cNvSpPr>
-          <p:nvPr>
-            <p:ph type="sldNum" sz="quarter" idx="10"/>
-          </p:nvPr>
-        </p:nvSpPr>
-        <p:spPr/>
-        <p:txBody>
-          <a:bodyPr/>
-          <a:lstStyle/>
-          <a:p>
-            <a:fld id="{89029652-62E7-43D6-83B5-097D7B7AA5D8}" type="slidenum">
-              <a:rPr lang="en-US" smtClean="0"/>
-              <a:t>43</a:t>
-            </a:fld>
-            <a:endParaRPr lang="en-US"/>
-          </a:p>
-        </p:txBody>
-      </p:sp>
-    </p:spTree>
-    <p:extLst>
-      <p:ext uri="{BB962C8B-B14F-4D97-AF65-F5344CB8AC3E}">
-        <p14:creationId xmlns:p14="http://schemas.microsoft.com/office/powerpoint/2010/main" val="3778399677"/>
-      </p:ext>
-    </p:extLst>
-  </p:cSld>
-  <p:clrMapOvr>
-    <a:masterClrMapping/>
-  </p:clrMapOvr>
-</p:notes>
-</file>
-
-<file path=ppt/notesSlides/notesSlide44.xml><?xml version="1.0" encoding="utf-8"?>
-<p:notes xmlns:a="http://schemas.openxmlformats.org/drawingml/2006/main" xmlns:r="http://schemas.openxmlformats.org/officeDocument/2006/relationships" xmlns:p="http://schemas.openxmlformats.org/presentationml/2006/main">
-  <p:cSld>
-    <p:spTree>
-      <p:nvGrpSpPr>
-        <p:cNvPr id="1" name=""/>
-        <p:cNvGrpSpPr/>
-        <p:nvPr/>
-      </p:nvGrpSpPr>
-      <p:grpSpPr>
-        <a:xfrm>
-          <a:off x="0" y="0"/>
-          <a:ext cx="0" cy="0"/>
-          <a:chOff x="0" y="0"/>
-          <a:chExt cx="0" cy="0"/>
-        </a:xfrm>
-      </p:grpSpPr>
-      <p:sp>
-        <p:nvSpPr>
-          <p:cNvPr id="2" name="Slide Image Placeholder 1"/>
-          <p:cNvSpPr>
-            <a:spLocks noGrp="1" noRot="1" noChangeAspect="1"/>
-          </p:cNvSpPr>
-          <p:nvPr>
-            <p:ph type="sldImg"/>
-          </p:nvPr>
-        </p:nvSpPr>
-        <p:spPr/>
-      </p:sp>
-      <p:sp>
-        <p:nvSpPr>
-          <p:cNvPr id="3" name="Notes Placeholder 2"/>
-          <p:cNvSpPr>
-            <a:spLocks noGrp="1"/>
-          </p:cNvSpPr>
-          <p:nvPr>
-            <p:ph type="body" idx="1"/>
-          </p:nvPr>
-        </p:nvSpPr>
-        <p:spPr/>
-        <p:txBody>
-          <a:bodyPr/>
-          <a:lstStyle/>
-          <a:p>
-            <a:endParaRPr lang="en-US" b="0" dirty="0" smtClean="0"/>
-          </a:p>
-        </p:txBody>
-      </p:sp>
-      <p:sp>
-        <p:nvSpPr>
-          <p:cNvPr id="4" name="Slide Number Placeholder 3"/>
-          <p:cNvSpPr>
-            <a:spLocks noGrp="1"/>
-          </p:cNvSpPr>
-          <p:nvPr>
-            <p:ph type="sldNum" sz="quarter" idx="10"/>
-          </p:nvPr>
-        </p:nvSpPr>
-        <p:spPr/>
-        <p:txBody>
-          <a:bodyPr/>
-          <a:lstStyle/>
-          <a:p>
-            <a:fld id="{89029652-62E7-43D6-83B5-097D7B7AA5D8}" type="slidenum">
-              <a:rPr lang="en-US" smtClean="0"/>
-              <a:t>44</a:t>
-            </a:fld>
-            <a:endParaRPr lang="en-US"/>
-          </a:p>
-        </p:txBody>
-      </p:sp>
-    </p:spTree>
-    <p:extLst>
-      <p:ext uri="{BB962C8B-B14F-4D97-AF65-F5344CB8AC3E}">
-        <p14:creationId xmlns:p14="http://schemas.microsoft.com/office/powerpoint/2010/main" val="3271057564"/>
-      </p:ext>
-    </p:extLst>
-  </p:cSld>
-  <p:clrMapOvr>
-    <a:masterClrMapping/>
-  </p:clrMapOvr>
-</p:notes>
-</file>
-
-<file path=ppt/notesSlides/notesSlide45.xml><?xml version="1.0" encoding="utf-8"?>
-<p:notes xmlns:a="http://schemas.openxmlformats.org/drawingml/2006/main" xmlns:r="http://schemas.openxmlformats.org/officeDocument/2006/relationships" xmlns:p="http://schemas.openxmlformats.org/presentationml/2006/main">
-  <p:cSld>
-    <p:spTree>
-      <p:nvGrpSpPr>
-        <p:cNvPr id="1" name=""/>
-        <p:cNvGrpSpPr/>
-        <p:nvPr/>
-      </p:nvGrpSpPr>
-      <p:grpSpPr>
-        <a:xfrm>
-          <a:off x="0" y="0"/>
-          <a:ext cx="0" cy="0"/>
-          <a:chOff x="0" y="0"/>
-          <a:chExt cx="0" cy="0"/>
-        </a:xfrm>
-      </p:grpSpPr>
-      <p:sp>
-        <p:nvSpPr>
-          <p:cNvPr id="2" name="Slide Image Placeholder 1"/>
-          <p:cNvSpPr>
-            <a:spLocks noGrp="1" noRot="1" noChangeAspect="1"/>
-          </p:cNvSpPr>
-          <p:nvPr>
-            <p:ph type="sldImg"/>
-          </p:nvPr>
-        </p:nvSpPr>
-        <p:spPr/>
-      </p:sp>
-      <p:sp>
-        <p:nvSpPr>
-          <p:cNvPr id="3" name="Notes Placeholder 2"/>
-          <p:cNvSpPr>
-            <a:spLocks noGrp="1"/>
-          </p:cNvSpPr>
-          <p:nvPr>
-            <p:ph type="body" idx="1"/>
-          </p:nvPr>
-        </p:nvSpPr>
-        <p:spPr/>
-        <p:txBody>
-          <a:bodyPr/>
-          <a:lstStyle/>
-          <a:p>
-            <a:endParaRPr lang="en-US" b="0" dirty="0" smtClean="0"/>
-          </a:p>
-        </p:txBody>
-      </p:sp>
-      <p:sp>
-        <p:nvSpPr>
-          <p:cNvPr id="4" name="Slide Number Placeholder 3"/>
-          <p:cNvSpPr>
-            <a:spLocks noGrp="1"/>
-          </p:cNvSpPr>
-          <p:nvPr>
-            <p:ph type="sldNum" sz="quarter" idx="10"/>
-          </p:nvPr>
-        </p:nvSpPr>
-        <p:spPr/>
-        <p:txBody>
-          <a:bodyPr/>
-          <a:lstStyle/>
-          <a:p>
-            <a:fld id="{89029652-62E7-43D6-83B5-097D7B7AA5D8}" type="slidenum">
-              <a:rPr lang="en-US" smtClean="0"/>
-              <a:t>45</a:t>
-            </a:fld>
-            <a:endParaRPr lang="en-US"/>
-          </a:p>
-        </p:txBody>
-      </p:sp>
-    </p:spTree>
-    <p:extLst>
-      <p:ext uri="{BB962C8B-B14F-4D97-AF65-F5344CB8AC3E}">
-        <p14:creationId xmlns:p14="http://schemas.microsoft.com/office/powerpoint/2010/main" val="150335864"/>
-      </p:ext>
-    </p:extLst>
-  </p:cSld>
-  <p:clrMapOvr>
-    <a:masterClrMapping/>
-  </p:clrMapOvr>
-</p:notes>
-</file>
-
-<file path=ppt/notesSlides/notesSlide46.xml><?xml version="1.0" encoding="utf-8"?>
-<p:notes xmlns:a="http://schemas.openxmlformats.org/drawingml/2006/main" xmlns:r="http://schemas.openxmlformats.org/officeDocument/2006/relationships" xmlns:p="http://schemas.openxmlformats.org/presentationml/2006/main">
-  <p:cSld>
-    <p:spTree>
-      <p:nvGrpSpPr>
-        <p:cNvPr id="1" name=""/>
-        <p:cNvGrpSpPr/>
-        <p:nvPr/>
-      </p:nvGrpSpPr>
-      <p:grpSpPr>
-        <a:xfrm>
-          <a:off x="0" y="0"/>
-          <a:ext cx="0" cy="0"/>
-          <a:chOff x="0" y="0"/>
-          <a:chExt cx="0" cy="0"/>
-        </a:xfrm>
-      </p:grpSpPr>
-      <p:sp>
-        <p:nvSpPr>
-          <p:cNvPr id="2" name="Slide Image Placeholder 1"/>
-          <p:cNvSpPr>
-            <a:spLocks noGrp="1" noRot="1" noChangeAspect="1"/>
-          </p:cNvSpPr>
-          <p:nvPr>
-            <p:ph type="sldImg"/>
-          </p:nvPr>
-        </p:nvSpPr>
-        <p:spPr/>
-      </p:sp>
-      <p:sp>
-        <p:nvSpPr>
-          <p:cNvPr id="3" name="Notes Placeholder 2"/>
-          <p:cNvSpPr>
-            <a:spLocks noGrp="1"/>
-          </p:cNvSpPr>
-          <p:nvPr>
-            <p:ph type="body" idx="1"/>
-          </p:nvPr>
-        </p:nvSpPr>
-        <p:spPr/>
-        <p:txBody>
-          <a:bodyPr/>
-          <a:lstStyle/>
-          <a:p>
-            <a:endParaRPr lang="en-US" b="0" dirty="0" smtClean="0"/>
-          </a:p>
-        </p:txBody>
-      </p:sp>
-      <p:sp>
-        <p:nvSpPr>
-          <p:cNvPr id="4" name="Slide Number Placeholder 3"/>
-          <p:cNvSpPr>
-            <a:spLocks noGrp="1"/>
-          </p:cNvSpPr>
-          <p:nvPr>
-            <p:ph type="sldNum" sz="quarter" idx="10"/>
-          </p:nvPr>
-        </p:nvSpPr>
-        <p:spPr/>
-        <p:txBody>
-          <a:bodyPr/>
-          <a:lstStyle/>
-          <a:p>
-            <a:fld id="{89029652-62E7-43D6-83B5-097D7B7AA5D8}" type="slidenum">
-              <a:rPr lang="en-US" smtClean="0"/>
-              <a:t>46</a:t>
-            </a:fld>
-            <a:endParaRPr lang="en-US"/>
-          </a:p>
-        </p:txBody>
-      </p:sp>
-    </p:spTree>
-    <p:extLst>
-      <p:ext uri="{BB962C8B-B14F-4D97-AF65-F5344CB8AC3E}">
-        <p14:creationId xmlns:p14="http://schemas.microsoft.com/office/powerpoint/2010/main" val="1174323916"/>
       </p:ext>
     </p:extLst>
   </p:cSld>
@@ -4202,7 +4322,7 @@
     </p:spTree>
     <p:extLst>
       <p:ext uri="{BB962C8B-B14F-4D97-AF65-F5344CB8AC3E}">
-        <p14:creationId xmlns:p14="http://schemas.microsoft.com/office/powerpoint/2010/main" val="22929660"/>
+        <p14:creationId xmlns:p14="http://schemas.microsoft.com/office/powerpoint/2010/main" val="2653332077"/>
       </p:ext>
     </p:extLst>
   </p:cSld>
@@ -4286,7 +4406,7 @@
     </p:spTree>
     <p:extLst>
       <p:ext uri="{BB962C8B-B14F-4D97-AF65-F5344CB8AC3E}">
-        <p14:creationId xmlns:p14="http://schemas.microsoft.com/office/powerpoint/2010/main" val="3079792467"/>
+        <p14:creationId xmlns:p14="http://schemas.microsoft.com/office/powerpoint/2010/main" val="3778399677"/>
       </p:ext>
     </p:extLst>
   </p:cSld>
@@ -4370,7 +4490,7 @@
     </p:spTree>
     <p:extLst>
       <p:ext uri="{BB962C8B-B14F-4D97-AF65-F5344CB8AC3E}">
-        <p14:creationId xmlns:p14="http://schemas.microsoft.com/office/powerpoint/2010/main" val="2602777311"/>
+        <p14:creationId xmlns:p14="http://schemas.microsoft.com/office/powerpoint/2010/main" val="3271057564"/>
       </p:ext>
     </p:extLst>
   </p:cSld>
@@ -4538,7 +4658,7 @@
     </p:spTree>
     <p:extLst>
       <p:ext uri="{BB962C8B-B14F-4D97-AF65-F5344CB8AC3E}">
-        <p14:creationId xmlns:p14="http://schemas.microsoft.com/office/powerpoint/2010/main" val="2267138517"/>
+        <p14:creationId xmlns:p14="http://schemas.microsoft.com/office/powerpoint/2010/main" val="150335864"/>
       </p:ext>
     </p:extLst>
   </p:cSld>
@@ -4592,6 +4712,426 @@
           <a:bodyPr/>
           <a:lstStyle/>
           <a:p>
+            <a:endParaRPr lang="en-US" b="0" dirty="0" smtClean="0"/>
+          </a:p>
+        </p:txBody>
+      </p:sp>
+      <p:sp>
+        <p:nvSpPr>
+          <p:cNvPr id="4" name="Slide Number Placeholder 3"/>
+          <p:cNvSpPr>
+            <a:spLocks noGrp="1"/>
+          </p:cNvSpPr>
+          <p:nvPr>
+            <p:ph type="sldNum" sz="quarter" idx="10"/>
+          </p:nvPr>
+        </p:nvSpPr>
+        <p:spPr/>
+        <p:txBody>
+          <a:bodyPr/>
+          <a:lstStyle/>
+          <a:p>
+            <a:fld id="{89029652-62E7-43D6-83B5-097D7B7AA5D8}" type="slidenum">
+              <a:rPr lang="en-US" smtClean="0"/>
+              <a:t>51</a:t>
+            </a:fld>
+            <a:endParaRPr lang="en-US"/>
+          </a:p>
+        </p:txBody>
+      </p:sp>
+    </p:spTree>
+    <p:extLst>
+      <p:ext uri="{BB962C8B-B14F-4D97-AF65-F5344CB8AC3E}">
+        <p14:creationId xmlns:p14="http://schemas.microsoft.com/office/powerpoint/2010/main" val="1174323916"/>
+      </p:ext>
+    </p:extLst>
+  </p:cSld>
+  <p:clrMapOvr>
+    <a:masterClrMapping/>
+  </p:clrMapOvr>
+</p:notes>
+</file>
+
+<file path=ppt/notesSlides/notesSlide52.xml><?xml version="1.0" encoding="utf-8"?>
+<p:notes xmlns:a="http://schemas.openxmlformats.org/drawingml/2006/main" xmlns:r="http://schemas.openxmlformats.org/officeDocument/2006/relationships" xmlns:p="http://schemas.openxmlformats.org/presentationml/2006/main">
+  <p:cSld>
+    <p:spTree>
+      <p:nvGrpSpPr>
+        <p:cNvPr id="1" name=""/>
+        <p:cNvGrpSpPr/>
+        <p:nvPr/>
+      </p:nvGrpSpPr>
+      <p:grpSpPr>
+        <a:xfrm>
+          <a:off x="0" y="0"/>
+          <a:ext cx="0" cy="0"/>
+          <a:chOff x="0" y="0"/>
+          <a:chExt cx="0" cy="0"/>
+        </a:xfrm>
+      </p:grpSpPr>
+      <p:sp>
+        <p:nvSpPr>
+          <p:cNvPr id="2" name="Slide Image Placeholder 1"/>
+          <p:cNvSpPr>
+            <a:spLocks noGrp="1" noRot="1" noChangeAspect="1"/>
+          </p:cNvSpPr>
+          <p:nvPr>
+            <p:ph type="sldImg"/>
+          </p:nvPr>
+        </p:nvSpPr>
+        <p:spPr/>
+      </p:sp>
+      <p:sp>
+        <p:nvSpPr>
+          <p:cNvPr id="3" name="Notes Placeholder 2"/>
+          <p:cNvSpPr>
+            <a:spLocks noGrp="1"/>
+          </p:cNvSpPr>
+          <p:nvPr>
+            <p:ph type="body" idx="1"/>
+          </p:nvPr>
+        </p:nvSpPr>
+        <p:spPr/>
+        <p:txBody>
+          <a:bodyPr/>
+          <a:lstStyle/>
+          <a:p>
+            <a:endParaRPr lang="en-US" b="0" dirty="0" smtClean="0"/>
+          </a:p>
+        </p:txBody>
+      </p:sp>
+      <p:sp>
+        <p:nvSpPr>
+          <p:cNvPr id="4" name="Slide Number Placeholder 3"/>
+          <p:cNvSpPr>
+            <a:spLocks noGrp="1"/>
+          </p:cNvSpPr>
+          <p:nvPr>
+            <p:ph type="sldNum" sz="quarter" idx="10"/>
+          </p:nvPr>
+        </p:nvSpPr>
+        <p:spPr/>
+        <p:txBody>
+          <a:bodyPr/>
+          <a:lstStyle/>
+          <a:p>
+            <a:fld id="{89029652-62E7-43D6-83B5-097D7B7AA5D8}" type="slidenum">
+              <a:rPr lang="en-US" smtClean="0"/>
+              <a:t>52</a:t>
+            </a:fld>
+            <a:endParaRPr lang="en-US"/>
+          </a:p>
+        </p:txBody>
+      </p:sp>
+    </p:spTree>
+    <p:extLst>
+      <p:ext uri="{BB962C8B-B14F-4D97-AF65-F5344CB8AC3E}">
+        <p14:creationId xmlns:p14="http://schemas.microsoft.com/office/powerpoint/2010/main" val="22929660"/>
+      </p:ext>
+    </p:extLst>
+  </p:cSld>
+  <p:clrMapOvr>
+    <a:masterClrMapping/>
+  </p:clrMapOvr>
+</p:notes>
+</file>
+
+<file path=ppt/notesSlides/notesSlide53.xml><?xml version="1.0" encoding="utf-8"?>
+<p:notes xmlns:a="http://schemas.openxmlformats.org/drawingml/2006/main" xmlns:r="http://schemas.openxmlformats.org/officeDocument/2006/relationships" xmlns:p="http://schemas.openxmlformats.org/presentationml/2006/main">
+  <p:cSld>
+    <p:spTree>
+      <p:nvGrpSpPr>
+        <p:cNvPr id="1" name=""/>
+        <p:cNvGrpSpPr/>
+        <p:nvPr/>
+      </p:nvGrpSpPr>
+      <p:grpSpPr>
+        <a:xfrm>
+          <a:off x="0" y="0"/>
+          <a:ext cx="0" cy="0"/>
+          <a:chOff x="0" y="0"/>
+          <a:chExt cx="0" cy="0"/>
+        </a:xfrm>
+      </p:grpSpPr>
+      <p:sp>
+        <p:nvSpPr>
+          <p:cNvPr id="2" name="Slide Image Placeholder 1"/>
+          <p:cNvSpPr>
+            <a:spLocks noGrp="1" noRot="1" noChangeAspect="1"/>
+          </p:cNvSpPr>
+          <p:nvPr>
+            <p:ph type="sldImg"/>
+          </p:nvPr>
+        </p:nvSpPr>
+        <p:spPr/>
+      </p:sp>
+      <p:sp>
+        <p:nvSpPr>
+          <p:cNvPr id="3" name="Notes Placeholder 2"/>
+          <p:cNvSpPr>
+            <a:spLocks noGrp="1"/>
+          </p:cNvSpPr>
+          <p:nvPr>
+            <p:ph type="body" idx="1"/>
+          </p:nvPr>
+        </p:nvSpPr>
+        <p:spPr/>
+        <p:txBody>
+          <a:bodyPr/>
+          <a:lstStyle/>
+          <a:p>
+            <a:endParaRPr lang="en-US" b="0" dirty="0" smtClean="0"/>
+          </a:p>
+        </p:txBody>
+      </p:sp>
+      <p:sp>
+        <p:nvSpPr>
+          <p:cNvPr id="4" name="Slide Number Placeholder 3"/>
+          <p:cNvSpPr>
+            <a:spLocks noGrp="1"/>
+          </p:cNvSpPr>
+          <p:nvPr>
+            <p:ph type="sldNum" sz="quarter" idx="10"/>
+          </p:nvPr>
+        </p:nvSpPr>
+        <p:spPr/>
+        <p:txBody>
+          <a:bodyPr/>
+          <a:lstStyle/>
+          <a:p>
+            <a:fld id="{89029652-62E7-43D6-83B5-097D7B7AA5D8}" type="slidenum">
+              <a:rPr lang="en-US" smtClean="0"/>
+              <a:t>53</a:t>
+            </a:fld>
+            <a:endParaRPr lang="en-US"/>
+          </a:p>
+        </p:txBody>
+      </p:sp>
+    </p:spTree>
+    <p:extLst>
+      <p:ext uri="{BB962C8B-B14F-4D97-AF65-F5344CB8AC3E}">
+        <p14:creationId xmlns:p14="http://schemas.microsoft.com/office/powerpoint/2010/main" val="3079792467"/>
+      </p:ext>
+    </p:extLst>
+  </p:cSld>
+  <p:clrMapOvr>
+    <a:masterClrMapping/>
+  </p:clrMapOvr>
+</p:notes>
+</file>
+
+<file path=ppt/notesSlides/notesSlide54.xml><?xml version="1.0" encoding="utf-8"?>
+<p:notes xmlns:a="http://schemas.openxmlformats.org/drawingml/2006/main" xmlns:r="http://schemas.openxmlformats.org/officeDocument/2006/relationships" xmlns:p="http://schemas.openxmlformats.org/presentationml/2006/main">
+  <p:cSld>
+    <p:spTree>
+      <p:nvGrpSpPr>
+        <p:cNvPr id="1" name=""/>
+        <p:cNvGrpSpPr/>
+        <p:nvPr/>
+      </p:nvGrpSpPr>
+      <p:grpSpPr>
+        <a:xfrm>
+          <a:off x="0" y="0"/>
+          <a:ext cx="0" cy="0"/>
+          <a:chOff x="0" y="0"/>
+          <a:chExt cx="0" cy="0"/>
+        </a:xfrm>
+      </p:grpSpPr>
+      <p:sp>
+        <p:nvSpPr>
+          <p:cNvPr id="2" name="Slide Image Placeholder 1"/>
+          <p:cNvSpPr>
+            <a:spLocks noGrp="1" noRot="1" noChangeAspect="1"/>
+          </p:cNvSpPr>
+          <p:nvPr>
+            <p:ph type="sldImg"/>
+          </p:nvPr>
+        </p:nvSpPr>
+        <p:spPr/>
+      </p:sp>
+      <p:sp>
+        <p:nvSpPr>
+          <p:cNvPr id="3" name="Notes Placeholder 2"/>
+          <p:cNvSpPr>
+            <a:spLocks noGrp="1"/>
+          </p:cNvSpPr>
+          <p:nvPr>
+            <p:ph type="body" idx="1"/>
+          </p:nvPr>
+        </p:nvSpPr>
+        <p:spPr/>
+        <p:txBody>
+          <a:bodyPr/>
+          <a:lstStyle/>
+          <a:p>
+            <a:endParaRPr lang="en-US" b="0" dirty="0" smtClean="0"/>
+          </a:p>
+        </p:txBody>
+      </p:sp>
+      <p:sp>
+        <p:nvSpPr>
+          <p:cNvPr id="4" name="Slide Number Placeholder 3"/>
+          <p:cNvSpPr>
+            <a:spLocks noGrp="1"/>
+          </p:cNvSpPr>
+          <p:nvPr>
+            <p:ph type="sldNum" sz="quarter" idx="10"/>
+          </p:nvPr>
+        </p:nvSpPr>
+        <p:spPr/>
+        <p:txBody>
+          <a:bodyPr/>
+          <a:lstStyle/>
+          <a:p>
+            <a:fld id="{89029652-62E7-43D6-83B5-097D7B7AA5D8}" type="slidenum">
+              <a:rPr lang="en-US" smtClean="0"/>
+              <a:t>54</a:t>
+            </a:fld>
+            <a:endParaRPr lang="en-US"/>
+          </a:p>
+        </p:txBody>
+      </p:sp>
+    </p:spTree>
+    <p:extLst>
+      <p:ext uri="{BB962C8B-B14F-4D97-AF65-F5344CB8AC3E}">
+        <p14:creationId xmlns:p14="http://schemas.microsoft.com/office/powerpoint/2010/main" val="2602777311"/>
+      </p:ext>
+    </p:extLst>
+  </p:cSld>
+  <p:clrMapOvr>
+    <a:masterClrMapping/>
+  </p:clrMapOvr>
+</p:notes>
+</file>
+
+<file path=ppt/notesSlides/notesSlide55.xml><?xml version="1.0" encoding="utf-8"?>
+<p:notes xmlns:a="http://schemas.openxmlformats.org/drawingml/2006/main" xmlns:r="http://schemas.openxmlformats.org/officeDocument/2006/relationships" xmlns:p="http://schemas.openxmlformats.org/presentationml/2006/main">
+  <p:cSld>
+    <p:spTree>
+      <p:nvGrpSpPr>
+        <p:cNvPr id="1" name=""/>
+        <p:cNvGrpSpPr/>
+        <p:nvPr/>
+      </p:nvGrpSpPr>
+      <p:grpSpPr>
+        <a:xfrm>
+          <a:off x="0" y="0"/>
+          <a:ext cx="0" cy="0"/>
+          <a:chOff x="0" y="0"/>
+          <a:chExt cx="0" cy="0"/>
+        </a:xfrm>
+      </p:grpSpPr>
+      <p:sp>
+        <p:nvSpPr>
+          <p:cNvPr id="2" name="Slide Image Placeholder 1"/>
+          <p:cNvSpPr>
+            <a:spLocks noGrp="1" noRot="1" noChangeAspect="1"/>
+          </p:cNvSpPr>
+          <p:nvPr>
+            <p:ph type="sldImg"/>
+          </p:nvPr>
+        </p:nvSpPr>
+        <p:spPr/>
+      </p:sp>
+      <p:sp>
+        <p:nvSpPr>
+          <p:cNvPr id="3" name="Notes Placeholder 2"/>
+          <p:cNvSpPr>
+            <a:spLocks noGrp="1"/>
+          </p:cNvSpPr>
+          <p:nvPr>
+            <p:ph type="body" idx="1"/>
+          </p:nvPr>
+        </p:nvSpPr>
+        <p:spPr/>
+        <p:txBody>
+          <a:bodyPr/>
+          <a:lstStyle/>
+          <a:p>
+            <a:endParaRPr lang="en-US" b="0" dirty="0" smtClean="0"/>
+          </a:p>
+        </p:txBody>
+      </p:sp>
+      <p:sp>
+        <p:nvSpPr>
+          <p:cNvPr id="4" name="Slide Number Placeholder 3"/>
+          <p:cNvSpPr>
+            <a:spLocks noGrp="1"/>
+          </p:cNvSpPr>
+          <p:nvPr>
+            <p:ph type="sldNum" sz="quarter" idx="10"/>
+          </p:nvPr>
+        </p:nvSpPr>
+        <p:spPr/>
+        <p:txBody>
+          <a:bodyPr/>
+          <a:lstStyle/>
+          <a:p>
+            <a:fld id="{89029652-62E7-43D6-83B5-097D7B7AA5D8}" type="slidenum">
+              <a:rPr lang="en-US" smtClean="0"/>
+              <a:t>55</a:t>
+            </a:fld>
+            <a:endParaRPr lang="en-US"/>
+          </a:p>
+        </p:txBody>
+      </p:sp>
+    </p:spTree>
+    <p:extLst>
+      <p:ext uri="{BB962C8B-B14F-4D97-AF65-F5344CB8AC3E}">
+        <p14:creationId xmlns:p14="http://schemas.microsoft.com/office/powerpoint/2010/main" val="2267138517"/>
+      </p:ext>
+    </p:extLst>
+  </p:cSld>
+  <p:clrMapOvr>
+    <a:masterClrMapping/>
+  </p:clrMapOvr>
+</p:notes>
+</file>
+
+<file path=ppt/notesSlides/notesSlide56.xml><?xml version="1.0" encoding="utf-8"?>
+<p:notes xmlns:a="http://schemas.openxmlformats.org/drawingml/2006/main" xmlns:r="http://schemas.openxmlformats.org/officeDocument/2006/relationships" xmlns:p="http://schemas.openxmlformats.org/presentationml/2006/main">
+  <p:cSld>
+    <p:spTree>
+      <p:nvGrpSpPr>
+        <p:cNvPr id="1" name=""/>
+        <p:cNvGrpSpPr/>
+        <p:nvPr/>
+      </p:nvGrpSpPr>
+      <p:grpSpPr>
+        <a:xfrm>
+          <a:off x="0" y="0"/>
+          <a:ext cx="0" cy="0"/>
+          <a:chOff x="0" y="0"/>
+          <a:chExt cx="0" cy="0"/>
+        </a:xfrm>
+      </p:grpSpPr>
+      <p:sp>
+        <p:nvSpPr>
+          <p:cNvPr id="2" name="Slide Image Placeholder 1"/>
+          <p:cNvSpPr>
+            <a:spLocks noGrp="1" noRot="1" noChangeAspect="1"/>
+          </p:cNvSpPr>
+          <p:nvPr>
+            <p:ph type="sldImg"/>
+          </p:nvPr>
+        </p:nvSpPr>
+        <p:spPr/>
+      </p:sp>
+      <p:sp>
+        <p:nvSpPr>
+          <p:cNvPr id="3" name="Notes Placeholder 2"/>
+          <p:cNvSpPr>
+            <a:spLocks noGrp="1"/>
+          </p:cNvSpPr>
+          <p:nvPr>
+            <p:ph type="body" idx="1"/>
+          </p:nvPr>
+        </p:nvSpPr>
+        <p:spPr/>
+        <p:txBody>
+          <a:bodyPr/>
+          <a:lstStyle/>
+          <a:p>
             <a:endParaRPr lang="en-US" sz="1200" kern="1200" dirty="0" smtClean="0">
               <a:solidFill>
                 <a:schemeClr val="tx1"/>
@@ -4621,7 +5161,7 @@
           <a:p>
             <a:fld id="{89029652-62E7-43D6-83B5-097D7B7AA5D8}" type="slidenum">
               <a:rPr lang="en-US" smtClean="0"/>
-              <a:t>51</a:t>
+              <a:t>56</a:t>
             </a:fld>
             <a:endParaRPr lang="en-US"/>
           </a:p>
@@ -5107,7 +5647,7 @@
           <a:p>
             <a:fld id="{75AA6396-395E-4ADA-8EE5-F328BC863A04}" type="datetimeFigureOut">
               <a:rPr lang="en-US" smtClean="0"/>
-              <a:t>12/23/2016</a:t>
+              <a:t>12/27/2016</a:t>
             </a:fld>
             <a:endParaRPr lang="en-US"/>
           </a:p>
@@ -5284,7 +5824,7 @@
           <a:p>
             <a:fld id="{75AA6396-395E-4ADA-8EE5-F328BC863A04}" type="datetimeFigureOut">
               <a:rPr lang="en-US" smtClean="0"/>
-              <a:t>12/23/2016</a:t>
+              <a:t>12/27/2016</a:t>
             </a:fld>
             <a:endParaRPr lang="en-US"/>
           </a:p>
@@ -5464,7 +6004,7 @@
           <a:p>
             <a:fld id="{75AA6396-395E-4ADA-8EE5-F328BC863A04}" type="datetimeFigureOut">
               <a:rPr lang="en-US" smtClean="0"/>
-              <a:t>12/23/2016</a:t>
+              <a:t>12/27/2016</a:t>
             </a:fld>
             <a:endParaRPr lang="en-US"/>
           </a:p>
@@ -5684,7 +6224,7 @@
           <a:p>
             <a:fld id="{75AA6396-395E-4ADA-8EE5-F328BC863A04}" type="datetimeFigureOut">
               <a:rPr lang="en-US" smtClean="0"/>
-              <a:t>12/23/2016</a:t>
+              <a:t>12/27/2016</a:t>
             </a:fld>
             <a:endParaRPr lang="en-US"/>
           </a:p>
@@ -5937,7 +6477,7 @@
           <a:p>
             <a:fld id="{75AA6396-395E-4ADA-8EE5-F328BC863A04}" type="datetimeFigureOut">
               <a:rPr lang="en-US" smtClean="0"/>
-              <a:t>12/23/2016</a:t>
+              <a:t>12/27/2016</a:t>
             </a:fld>
             <a:endParaRPr lang="en-US"/>
           </a:p>
@@ -6176,7 +6716,7 @@
           <a:p>
             <a:fld id="{75AA6396-395E-4ADA-8EE5-F328BC863A04}" type="datetimeFigureOut">
               <a:rPr lang="en-US" smtClean="0"/>
-              <a:t>12/23/2016</a:t>
+              <a:t>12/27/2016</a:t>
             </a:fld>
             <a:endParaRPr lang="en-US"/>
           </a:p>
@@ -6550,7 +7090,7 @@
           <a:p>
             <a:fld id="{75AA6396-395E-4ADA-8EE5-F328BC863A04}" type="datetimeFigureOut">
               <a:rPr lang="en-US" smtClean="0"/>
-              <a:t>12/23/2016</a:t>
+              <a:t>12/27/2016</a:t>
             </a:fld>
             <a:endParaRPr lang="en-US"/>
           </a:p>
@@ -6668,7 +7208,7 @@
           <a:p>
             <a:fld id="{75AA6396-395E-4ADA-8EE5-F328BC863A04}" type="datetimeFigureOut">
               <a:rPr lang="en-US" smtClean="0"/>
-              <a:t>12/23/2016</a:t>
+              <a:t>12/27/2016</a:t>
             </a:fld>
             <a:endParaRPr lang="en-US"/>
           </a:p>
@@ -6763,7 +7303,7 @@
           <a:p>
             <a:fld id="{75AA6396-395E-4ADA-8EE5-F328BC863A04}" type="datetimeFigureOut">
               <a:rPr lang="en-US" smtClean="0"/>
-              <a:t>12/23/2016</a:t>
+              <a:t>12/27/2016</a:t>
             </a:fld>
             <a:endParaRPr lang="en-US"/>
           </a:p>
@@ -7040,7 +7580,7 @@
           <a:p>
             <a:fld id="{75AA6396-395E-4ADA-8EE5-F328BC863A04}" type="datetimeFigureOut">
               <a:rPr lang="en-US" smtClean="0"/>
-              <a:t>12/23/2016</a:t>
+              <a:t>12/27/2016</a:t>
             </a:fld>
             <a:endParaRPr lang="en-US"/>
           </a:p>
@@ -7293,7 +7833,7 @@
           <a:p>
             <a:fld id="{75AA6396-395E-4ADA-8EE5-F328BC863A04}" type="datetimeFigureOut">
               <a:rPr lang="en-US" smtClean="0"/>
-              <a:t>12/23/2016</a:t>
+              <a:t>12/27/2016</a:t>
             </a:fld>
             <a:endParaRPr lang="en-US"/>
           </a:p>
@@ -7506,7 +8046,7 @@
           <a:p>
             <a:fld id="{75AA6396-395E-4ADA-8EE5-F328BC863A04}" type="datetimeFigureOut">
               <a:rPr lang="en-US" smtClean="0"/>
-              <a:t>12/23/2016</a:t>
+              <a:t>12/27/2016</a:t>
             </a:fld>
             <a:endParaRPr lang="en-US"/>
           </a:p>
@@ -9825,6 +10365,608 @@
             <p:ph type="title"/>
           </p:nvPr>
         </p:nvSpPr>
+        <p:spPr>
+          <a:xfrm>
+            <a:off x="964927" y="1"/>
+            <a:ext cx="10515600" cy="6858000"/>
+          </a:xfrm>
+        </p:spPr>
+        <p:txBody>
+          <a:bodyPr anchor="ctr">
+            <a:normAutofit/>
+          </a:bodyPr>
+          <a:lstStyle/>
+          <a:p>
+            <a:pPr algn="ctr"/>
+            <a:r>
+              <a:rPr lang="en-US" sz="4800" dirty="0" smtClean="0"/>
+              <a:t>A1 - Injection</a:t>
+            </a:r>
+            <a:r>
+              <a:rPr lang="en-US" sz="4800" dirty="0" smtClean="0"/>
+              <a:t/>
+            </a:r>
+            <a:br>
+              <a:rPr lang="en-US" sz="4800" dirty="0" smtClean="0"/>
+            </a:br>
+            <a:r>
+              <a:rPr lang="en-US" sz="4800" dirty="0"/>
+              <a:t/>
+            </a:r>
+            <a:br>
+              <a:rPr lang="en-US" sz="4800" dirty="0"/>
+            </a:br>
+            <a:r>
+              <a:rPr lang="en-US" dirty="0" smtClean="0">
+                <a:solidFill>
+                  <a:srgbClr val="013947"/>
+                </a:solidFill>
+              </a:rPr>
+              <a:t>Watch out for "little Bobby Tables"!</a:t>
+            </a:r>
+            <a:endParaRPr lang="en-US" sz="4800" dirty="0">
+              <a:solidFill>
+                <a:srgbClr val="013947"/>
+              </a:solidFill>
+            </a:endParaRPr>
+          </a:p>
+        </p:txBody>
+      </p:sp>
+    </p:spTree>
+    <p:extLst>
+      <p:ext uri="{BB962C8B-B14F-4D97-AF65-F5344CB8AC3E}">
+        <p14:creationId xmlns:p14="http://schemas.microsoft.com/office/powerpoint/2010/main" val="2983310270"/>
+      </p:ext>
+    </p:extLst>
+  </p:cSld>
+  <p:clrMapOvr>
+    <a:masterClrMapping/>
+  </p:clrMapOvr>
+  <p:timing>
+    <p:tnLst>
+      <p:par>
+        <p:cTn id="1" dur="indefinite" restart="never" nodeType="tmRoot"/>
+      </p:par>
+    </p:tnLst>
+  </p:timing>
+</p:sld>
+</file>
+
+<file path=ppt/slides/slide23.xml><?xml version="1.0" encoding="utf-8"?>
+<p:sld xmlns:a="http://schemas.openxmlformats.org/drawingml/2006/main" xmlns:r="http://schemas.openxmlformats.org/officeDocument/2006/relationships" xmlns:p="http://schemas.openxmlformats.org/presentationml/2006/main">
+  <p:cSld>
+    <p:spTree>
+      <p:nvGrpSpPr>
+        <p:cNvPr id="1" name=""/>
+        <p:cNvGrpSpPr/>
+        <p:nvPr/>
+      </p:nvGrpSpPr>
+      <p:grpSpPr>
+        <a:xfrm>
+          <a:off x="0" y="0"/>
+          <a:ext cx="0" cy="0"/>
+          <a:chOff x="0" y="0"/>
+          <a:chExt cx="0" cy="0"/>
+        </a:xfrm>
+      </p:grpSpPr>
+      <p:sp>
+        <p:nvSpPr>
+          <p:cNvPr id="2" name="Title 1"/>
+          <p:cNvSpPr>
+            <a:spLocks noGrp="1"/>
+          </p:cNvSpPr>
+          <p:nvPr>
+            <p:ph type="title"/>
+          </p:nvPr>
+        </p:nvSpPr>
+        <p:spPr/>
+        <p:txBody>
+          <a:bodyPr>
+            <a:normAutofit/>
+          </a:bodyPr>
+          <a:lstStyle/>
+          <a:p>
+            <a:r>
+              <a:rPr lang="en-US" sz="4800" dirty="0" smtClean="0"/>
+              <a:t>CSRF Defense </a:t>
+            </a:r>
+            <a:r>
+              <a:rPr lang="en-US" sz="4800" dirty="0"/>
+              <a:t>– feature</a:t>
+            </a:r>
+          </a:p>
+        </p:txBody>
+      </p:sp>
+      <p:sp>
+        <p:nvSpPr>
+          <p:cNvPr id="3" name="Content Placeholder 2"/>
+          <p:cNvSpPr>
+            <a:spLocks noGrp="1"/>
+          </p:cNvSpPr>
+          <p:nvPr>
+            <p:ph idx="1"/>
+          </p:nvPr>
+        </p:nvSpPr>
+        <p:spPr>
+          <a:xfrm>
+            <a:off x="838200" y="1825624"/>
+            <a:ext cx="10515600" cy="4589923"/>
+          </a:xfrm>
+        </p:spPr>
+        <p:txBody>
+          <a:bodyPr>
+            <a:normAutofit/>
+          </a:bodyPr>
+          <a:lstStyle/>
+          <a:p>
+            <a:endParaRPr lang="en-US" dirty="0" smtClean="0"/>
+          </a:p>
+          <a:p>
+            <a:endParaRPr lang="en-US" dirty="0" smtClean="0"/>
+          </a:p>
+          <a:p>
+            <a:endParaRPr lang="en-US" dirty="0"/>
+          </a:p>
+        </p:txBody>
+      </p:sp>
+      <p:pic>
+        <p:nvPicPr>
+          <p:cNvPr id="4" name="Picture 3"/>
+          <p:cNvPicPr>
+            <a:picLocks noChangeAspect="1"/>
+          </p:cNvPicPr>
+          <p:nvPr/>
+        </p:nvPicPr>
+        <p:blipFill>
+          <a:blip r:embed="rId3"/>
+          <a:stretch>
+            <a:fillRect/>
+          </a:stretch>
+        </p:blipFill>
+        <p:spPr>
+          <a:xfrm>
+            <a:off x="838200" y="2139744"/>
+            <a:ext cx="10783529" cy="1797256"/>
+          </a:xfrm>
+          <a:prstGeom prst="rect">
+            <a:avLst/>
+          </a:prstGeom>
+        </p:spPr>
+      </p:pic>
+      <p:pic>
+        <p:nvPicPr>
+          <p:cNvPr id="9" name="Picture 8"/>
+          <p:cNvPicPr>
+            <a:picLocks noChangeAspect="1"/>
+          </p:cNvPicPr>
+          <p:nvPr/>
+        </p:nvPicPr>
+        <p:blipFill>
+          <a:blip r:embed="rId4"/>
+          <a:stretch>
+            <a:fillRect/>
+          </a:stretch>
+        </p:blipFill>
+        <p:spPr>
+          <a:xfrm>
+            <a:off x="838200" y="4386055"/>
+            <a:ext cx="10870128" cy="1439557"/>
+          </a:xfrm>
+          <a:prstGeom prst="rect">
+            <a:avLst/>
+          </a:prstGeom>
+        </p:spPr>
+      </p:pic>
+    </p:spTree>
+    <p:extLst>
+      <p:ext uri="{BB962C8B-B14F-4D97-AF65-F5344CB8AC3E}">
+        <p14:creationId xmlns:p14="http://schemas.microsoft.com/office/powerpoint/2010/main" val="27120899"/>
+      </p:ext>
+    </p:extLst>
+  </p:cSld>
+  <p:clrMapOvr>
+    <a:masterClrMapping/>
+  </p:clrMapOvr>
+  <p:timing>
+    <p:tnLst>
+      <p:par>
+        <p:cTn id="1" dur="indefinite" restart="never" nodeType="tmRoot"/>
+      </p:par>
+    </p:tnLst>
+  </p:timing>
+</p:sld>
+</file>
+
+<file path=ppt/slides/slide24.xml><?xml version="1.0" encoding="utf-8"?>
+<p:sld xmlns:a="http://schemas.openxmlformats.org/drawingml/2006/main" xmlns:r="http://schemas.openxmlformats.org/officeDocument/2006/relationships" xmlns:p="http://schemas.openxmlformats.org/presentationml/2006/main" show="0">
+  <p:cSld>
+    <p:spTree>
+      <p:nvGrpSpPr>
+        <p:cNvPr id="1" name=""/>
+        <p:cNvGrpSpPr/>
+        <p:nvPr/>
+      </p:nvGrpSpPr>
+      <p:grpSpPr>
+        <a:xfrm>
+          <a:off x="0" y="0"/>
+          <a:ext cx="0" cy="0"/>
+          <a:chOff x="0" y="0"/>
+          <a:chExt cx="0" cy="0"/>
+        </a:xfrm>
+      </p:grpSpPr>
+      <p:sp>
+        <p:nvSpPr>
+          <p:cNvPr id="2" name="Title 1"/>
+          <p:cNvSpPr>
+            <a:spLocks noGrp="1"/>
+          </p:cNvSpPr>
+          <p:nvPr>
+            <p:ph type="title"/>
+          </p:nvPr>
+        </p:nvSpPr>
+        <p:spPr/>
+        <p:txBody>
+          <a:bodyPr>
+            <a:normAutofit/>
+          </a:bodyPr>
+          <a:lstStyle/>
+          <a:p>
+            <a:r>
+              <a:rPr lang="en-US" sz="4800" dirty="0" smtClean="0"/>
+              <a:t>CSRF Defense </a:t>
+            </a:r>
+            <a:r>
+              <a:rPr lang="en-US" sz="4800" dirty="0"/>
+              <a:t>– feature</a:t>
+            </a:r>
+          </a:p>
+        </p:txBody>
+      </p:sp>
+      <p:sp>
+        <p:nvSpPr>
+          <p:cNvPr id="3" name="Content Placeholder 2"/>
+          <p:cNvSpPr>
+            <a:spLocks noGrp="1"/>
+          </p:cNvSpPr>
+          <p:nvPr>
+            <p:ph idx="1"/>
+          </p:nvPr>
+        </p:nvSpPr>
+        <p:spPr>
+          <a:xfrm>
+            <a:off x="838200" y="1825624"/>
+            <a:ext cx="10515600" cy="4589923"/>
+          </a:xfrm>
+        </p:spPr>
+        <p:txBody>
+          <a:bodyPr>
+            <a:normAutofit/>
+          </a:bodyPr>
+          <a:lstStyle/>
+          <a:p>
+            <a:endParaRPr lang="en-US" dirty="0" smtClean="0"/>
+          </a:p>
+          <a:p>
+            <a:endParaRPr lang="en-US" dirty="0" smtClean="0"/>
+          </a:p>
+          <a:p>
+            <a:endParaRPr lang="en-US" dirty="0"/>
+          </a:p>
+        </p:txBody>
+      </p:sp>
+      <p:pic>
+        <p:nvPicPr>
+          <p:cNvPr id="4" name="Picture 3"/>
+          <p:cNvPicPr>
+            <a:picLocks noChangeAspect="1"/>
+          </p:cNvPicPr>
+          <p:nvPr/>
+        </p:nvPicPr>
+        <p:blipFill>
+          <a:blip r:embed="rId3"/>
+          <a:stretch>
+            <a:fillRect/>
+          </a:stretch>
+        </p:blipFill>
+        <p:spPr>
+          <a:xfrm>
+            <a:off x="838200" y="2139744"/>
+            <a:ext cx="10783529" cy="1797256"/>
+          </a:xfrm>
+          <a:prstGeom prst="rect">
+            <a:avLst/>
+          </a:prstGeom>
+        </p:spPr>
+      </p:pic>
+      <p:sp>
+        <p:nvSpPr>
+          <p:cNvPr id="6" name="TextBox 5"/>
+          <p:cNvSpPr txBox="1"/>
+          <p:nvPr/>
+        </p:nvSpPr>
+        <p:spPr>
+          <a:xfrm>
+            <a:off x="838200" y="4599665"/>
+            <a:ext cx="10621297" cy="2062103"/>
+          </a:xfrm>
+          <a:prstGeom prst="rect">
+            <a:avLst/>
+          </a:prstGeom>
+          <a:solidFill>
+            <a:schemeClr val="accent4">
+              <a:lumMod val="60000"/>
+              <a:lumOff val="40000"/>
+            </a:schemeClr>
+          </a:solidFill>
+        </p:spPr>
+        <p:txBody>
+          <a:bodyPr wrap="square" rtlCol="0">
+            <a:spAutoFit/>
+          </a:bodyPr>
+          <a:lstStyle/>
+          <a:p>
+            <a:r>
+              <a:rPr lang="en-US" sz="3200" b="1" dirty="0" smtClean="0">
+                <a:latin typeface="Maiandra GD" panose="020E0502030308020204" pitchFamily="34" charset="0"/>
+              </a:rPr>
+              <a:t>Pro tip</a:t>
+            </a:r>
+            <a:r>
+              <a:rPr lang="en-US" sz="3200" dirty="0" smtClean="0">
+                <a:latin typeface="Maiandra GD" panose="020E0502030308020204" pitchFamily="34" charset="0"/>
+              </a:rPr>
+              <a:t>: Concatenating raw strings into SQL queries makes you a bad person.</a:t>
+            </a:r>
+          </a:p>
+          <a:p>
+            <a:endParaRPr lang="en-US" sz="3200" dirty="0">
+              <a:latin typeface="Maiandra GD" panose="020E0502030308020204" pitchFamily="34" charset="0"/>
+            </a:endParaRPr>
+          </a:p>
+          <a:p>
+            <a:r>
+              <a:rPr lang="en-US" sz="3200" dirty="0" smtClean="0">
+                <a:latin typeface="Maiandra GD" panose="020E0502030308020204" pitchFamily="34" charset="0"/>
+              </a:rPr>
+              <a:t>Don't be a bad person. Parameterize your SQL.</a:t>
+            </a:r>
+            <a:endParaRPr lang="en-US" sz="3200" dirty="0">
+              <a:latin typeface="Maiandra GD" panose="020E0502030308020204" pitchFamily="34" charset="0"/>
+            </a:endParaRPr>
+          </a:p>
+        </p:txBody>
+      </p:sp>
+    </p:spTree>
+    <p:extLst>
+      <p:ext uri="{BB962C8B-B14F-4D97-AF65-F5344CB8AC3E}">
+        <p14:creationId xmlns:p14="http://schemas.microsoft.com/office/powerpoint/2010/main" val="3804802249"/>
+      </p:ext>
+    </p:extLst>
+  </p:cSld>
+  <p:clrMapOvr>
+    <a:masterClrMapping/>
+  </p:clrMapOvr>
+  <mc:AlternateContent xmlns:mc="http://schemas.openxmlformats.org/markup-compatibility/2006">
+    <mc:Choice xmlns:p14="http://schemas.microsoft.com/office/powerpoint/2010/main" Requires="p14">
+      <p:transition spd="slow" p14:dur="2000"/>
+    </mc:Choice>
+    <mc:Fallback>
+      <p:transition spd="slow"/>
+    </mc:Fallback>
+  </mc:AlternateContent>
+  <p:timing>
+    <p:tnLst>
+      <p:par>
+        <p:cTn id="1" dur="indefinite" restart="never" nodeType="tmRoot"/>
+      </p:par>
+    </p:tnLst>
+  </p:timing>
+</p:sld>
+</file>
+
+<file path=ppt/slides/slide25.xml><?xml version="1.0" encoding="utf-8"?>
+<p:sld xmlns:a="http://schemas.openxmlformats.org/drawingml/2006/main" xmlns:r="http://schemas.openxmlformats.org/officeDocument/2006/relationships" xmlns:p="http://schemas.openxmlformats.org/presentationml/2006/main">
+  <p:cSld>
+    <p:spTree>
+      <p:nvGrpSpPr>
+        <p:cNvPr id="1" name=""/>
+        <p:cNvGrpSpPr/>
+        <p:nvPr/>
+      </p:nvGrpSpPr>
+      <p:grpSpPr>
+        <a:xfrm>
+          <a:off x="0" y="0"/>
+          <a:ext cx="0" cy="0"/>
+          <a:chOff x="0" y="0"/>
+          <a:chExt cx="0" cy="0"/>
+        </a:xfrm>
+      </p:grpSpPr>
+      <p:sp>
+        <p:nvSpPr>
+          <p:cNvPr id="2" name="Title 1"/>
+          <p:cNvSpPr>
+            <a:spLocks noGrp="1"/>
+          </p:cNvSpPr>
+          <p:nvPr>
+            <p:ph type="title"/>
+          </p:nvPr>
+        </p:nvSpPr>
+        <p:spPr>
+          <a:xfrm>
+            <a:off x="964927" y="1"/>
+            <a:ext cx="10515600" cy="6858000"/>
+          </a:xfrm>
+        </p:spPr>
+        <p:txBody>
+          <a:bodyPr anchor="ctr">
+            <a:normAutofit/>
+          </a:bodyPr>
+          <a:lstStyle/>
+          <a:p>
+            <a:pPr algn="ctr"/>
+            <a:r>
+              <a:rPr lang="en-US" sz="4800" dirty="0"/>
+              <a:t>A8 – Cross Site Request </a:t>
+            </a:r>
+            <a:r>
+              <a:rPr lang="en-US" sz="4800" dirty="0" smtClean="0"/>
+              <a:t>Forgery</a:t>
+            </a:r>
+            <a:r>
+              <a:rPr lang="en-US" sz="4800" dirty="0" smtClean="0"/>
+              <a:t/>
+            </a:r>
+            <a:br>
+              <a:rPr lang="en-US" sz="4800" dirty="0" smtClean="0"/>
+            </a:br>
+            <a:r>
+              <a:rPr lang="en-US" sz="4800" dirty="0"/>
+              <a:t/>
+            </a:r>
+            <a:br>
+              <a:rPr lang="en-US" sz="4800" dirty="0"/>
+            </a:br>
+            <a:r>
+              <a:rPr lang="en-US" dirty="0" smtClean="0">
+                <a:solidFill>
+                  <a:srgbClr val="013947"/>
+                </a:solidFill>
+              </a:rPr>
+              <a:t>Fun fact</a:t>
+            </a:r>
+            <a:r>
+              <a:rPr lang="en-US" baseline="30000" dirty="0" smtClean="0">
+                <a:solidFill>
+                  <a:srgbClr val="013947"/>
+                </a:solidFill>
+              </a:rPr>
+              <a:t>*</a:t>
+            </a:r>
+            <a:r>
+              <a:rPr lang="en-US" dirty="0" smtClean="0">
+                <a:solidFill>
+                  <a:srgbClr val="013947"/>
+                </a:solidFill>
+              </a:rPr>
+              <a:t>: users never log out. Ever.</a:t>
+            </a:r>
+            <a:endParaRPr lang="en-US" sz="4800" dirty="0">
+              <a:solidFill>
+                <a:srgbClr val="013947"/>
+              </a:solidFill>
+            </a:endParaRPr>
+          </a:p>
+        </p:txBody>
+      </p:sp>
+      <p:sp>
+        <p:nvSpPr>
+          <p:cNvPr id="3" name="TextBox 2"/>
+          <p:cNvSpPr txBox="1"/>
+          <p:nvPr/>
+        </p:nvSpPr>
+        <p:spPr>
+          <a:xfrm>
+            <a:off x="0" y="6457891"/>
+            <a:ext cx="2733825" cy="461665"/>
+          </a:xfrm>
+          <a:prstGeom prst="rect">
+            <a:avLst/>
+          </a:prstGeom>
+          <a:noFill/>
+        </p:spPr>
+        <p:txBody>
+          <a:bodyPr wrap="none" rtlCol="0">
+            <a:spAutoFit/>
+          </a:bodyPr>
+          <a:lstStyle/>
+          <a:p>
+            <a:r>
+              <a:rPr lang="en-US" sz="2400" baseline="30000" dirty="0" smtClean="0">
+                <a:solidFill>
+                  <a:schemeClr val="bg1">
+                    <a:lumMod val="50000"/>
+                  </a:schemeClr>
+                </a:solidFill>
+              </a:rPr>
+              <a:t>*</a:t>
+            </a:r>
+            <a:r>
+              <a:rPr lang="en-US" sz="2400" dirty="0" smtClean="0">
+                <a:solidFill>
+                  <a:schemeClr val="bg1">
+                    <a:lumMod val="50000"/>
+                  </a:schemeClr>
+                </a:solidFill>
+              </a:rPr>
+              <a:t> Not actually a fact</a:t>
+            </a:r>
+            <a:r>
+              <a:rPr lang="en-US" sz="2000" dirty="0" smtClean="0">
+                <a:solidFill>
+                  <a:schemeClr val="bg1">
+                    <a:lumMod val="50000"/>
+                  </a:schemeClr>
+                </a:solidFill>
+              </a:rPr>
+              <a:t>. </a:t>
+            </a:r>
+            <a:endParaRPr lang="en-US" sz="2000" dirty="0">
+              <a:solidFill>
+                <a:schemeClr val="bg1">
+                  <a:lumMod val="50000"/>
+                </a:schemeClr>
+              </a:solidFill>
+            </a:endParaRPr>
+          </a:p>
+        </p:txBody>
+      </p:sp>
+    </p:spTree>
+    <p:extLst>
+      <p:ext uri="{BB962C8B-B14F-4D97-AF65-F5344CB8AC3E}">
+        <p14:creationId xmlns:p14="http://schemas.microsoft.com/office/powerpoint/2010/main" val="1693683598"/>
+      </p:ext>
+    </p:extLst>
+  </p:cSld>
+  <p:clrMapOvr>
+    <a:masterClrMapping/>
+  </p:clrMapOvr>
+  <p:timing>
+    <p:tnLst>
+      <p:par>
+        <p:cTn id="1" dur="indefinite" restart="never" nodeType="tmRoot"/>
+      </p:par>
+    </p:tnLst>
+  </p:timing>
+</p:sld>
+</file>
+
+<file path=ppt/slides/slide26.xml><?xml version="1.0" encoding="utf-8"?>
+<p:sld xmlns:a="http://schemas.openxmlformats.org/drawingml/2006/main" xmlns:r="http://schemas.openxmlformats.org/officeDocument/2006/relationships" xmlns:p="http://schemas.openxmlformats.org/presentationml/2006/main">
+  <p:cSld>
+    <p:spTree>
+      <p:nvGrpSpPr>
+        <p:cNvPr id="1" name=""/>
+        <p:cNvGrpSpPr/>
+        <p:nvPr/>
+      </p:nvGrpSpPr>
+      <p:grpSpPr>
+        <a:xfrm>
+          <a:off x="0" y="0"/>
+          <a:ext cx="0" cy="0"/>
+          <a:chOff x="0" y="0"/>
+          <a:chExt cx="0" cy="0"/>
+        </a:xfrm>
+      </p:grpSpPr>
+      <p:sp>
+        <p:nvSpPr>
+          <p:cNvPr id="2" name="Title 1"/>
+          <p:cNvSpPr>
+            <a:spLocks noGrp="1"/>
+          </p:cNvSpPr>
+          <p:nvPr>
+            <p:ph type="title"/>
+          </p:nvPr>
+        </p:nvSpPr>
         <p:spPr/>
         <p:txBody>
           <a:bodyPr>
@@ -9916,7 +11058,7 @@
 </p:sld>
 </file>
 
-<file path=ppt/slides/slide23.xml><?xml version="1.0" encoding="utf-8"?>
+<file path=ppt/slides/slide27.xml><?xml version="1.0" encoding="utf-8"?>
 <p:sld xmlns:a="http://schemas.openxmlformats.org/drawingml/2006/main" xmlns:r="http://schemas.openxmlformats.org/officeDocument/2006/relationships" xmlns:p="http://schemas.openxmlformats.org/presentationml/2006/main">
   <p:cSld>
     <p:spTree>
@@ -10061,7 +11203,7 @@
 </p:sld>
 </file>
 
-<file path=ppt/slides/slide24.xml><?xml version="1.0" encoding="utf-8"?>
+<file path=ppt/slides/slide28.xml><?xml version="1.0" encoding="utf-8"?>
 <p:sld xmlns:a="http://schemas.openxmlformats.org/drawingml/2006/main" xmlns:r="http://schemas.openxmlformats.org/officeDocument/2006/relationships" xmlns:p="http://schemas.openxmlformats.org/presentationml/2006/main">
   <p:cSld>
     <p:spTree>
@@ -10203,7 +11345,7 @@
 </p:sld>
 </file>
 
-<file path=ppt/slides/slide25.xml><?xml version="1.0" encoding="utf-8"?>
+<file path=ppt/slides/slide29.xml><?xml version="1.0" encoding="utf-8"?>
 <p:sld xmlns:a="http://schemas.openxmlformats.org/drawingml/2006/main" xmlns:r="http://schemas.openxmlformats.org/officeDocument/2006/relationships" xmlns:p="http://schemas.openxmlformats.org/presentationml/2006/main">
   <p:cSld>
     <p:spTree>
@@ -10346,7 +11488,96 @@
 </p:sld>
 </file>
 
-<file path=ppt/slides/slide26.xml><?xml version="1.0" encoding="utf-8"?>
+<file path=ppt/slides/slide3.xml><?xml version="1.0" encoding="utf-8"?>
+<p:sld xmlns:a="http://schemas.openxmlformats.org/drawingml/2006/main" xmlns:r="http://schemas.openxmlformats.org/officeDocument/2006/relationships" xmlns:p="http://schemas.openxmlformats.org/presentationml/2006/main">
+  <p:cSld>
+    <p:spTree>
+      <p:nvGrpSpPr>
+        <p:cNvPr id="1" name=""/>
+        <p:cNvGrpSpPr/>
+        <p:nvPr/>
+      </p:nvGrpSpPr>
+      <p:grpSpPr>
+        <a:xfrm>
+          <a:off x="0" y="0"/>
+          <a:ext cx="0" cy="0"/>
+          <a:chOff x="0" y="0"/>
+          <a:chExt cx="0" cy="0"/>
+        </a:xfrm>
+      </p:grpSpPr>
+      <p:sp>
+        <p:nvSpPr>
+          <p:cNvPr id="2" name="Title 1"/>
+          <p:cNvSpPr>
+            <a:spLocks noGrp="1"/>
+          </p:cNvSpPr>
+          <p:nvPr>
+            <p:ph type="title"/>
+          </p:nvPr>
+        </p:nvSpPr>
+        <p:spPr>
+          <a:xfrm>
+            <a:off x="964927" y="1"/>
+            <a:ext cx="10515600" cy="6858000"/>
+          </a:xfrm>
+        </p:spPr>
+        <p:txBody>
+          <a:bodyPr anchor="ctr">
+            <a:normAutofit/>
+          </a:bodyPr>
+          <a:lstStyle/>
+          <a:p>
+            <a:pPr algn="ctr"/>
+            <a:r>
+              <a:rPr lang="en-US" sz="4800" strike="sngStrike" dirty="0" smtClean="0">
+                <a:solidFill>
+                  <a:schemeClr val="bg1">
+                    <a:lumMod val="75000"/>
+                  </a:schemeClr>
+                </a:solidFill>
+              </a:rPr>
+              <a:t>I hate writing secure code</a:t>
+            </a:r>
+            <a:r>
+              <a:rPr lang="en-US" sz="4800" strike="sngStrike" dirty="0" smtClean="0"/>
+              <a:t/>
+            </a:r>
+            <a:br>
+              <a:rPr lang="en-US" sz="4800" strike="sngStrike" dirty="0" smtClean="0"/>
+            </a:br>
+            <a:r>
+              <a:rPr lang="en-US" sz="4800" dirty="0" smtClean="0"/>
+              <a:t>I hate writing secure </a:t>
+            </a:r>
+            <a:r>
+              <a:rPr lang="en-US" sz="4800" i="1" dirty="0" smtClean="0"/>
+              <a:t>features</a:t>
+            </a:r>
+            <a:endParaRPr lang="en-US" sz="4800" i="1" dirty="0"/>
+          </a:p>
+        </p:txBody>
+      </p:sp>
+    </p:spTree>
+    <p:extLst>
+      <p:ext uri="{BB962C8B-B14F-4D97-AF65-F5344CB8AC3E}">
+        <p14:creationId xmlns:p14="http://schemas.microsoft.com/office/powerpoint/2010/main" val="75936766"/>
+      </p:ext>
+    </p:extLst>
+  </p:cSld>
+  <p:clrMapOvr>
+    <a:masterClrMapping/>
+  </p:clrMapOvr>
+  <p:timing>
+    <p:tnLst>
+      <p:par>
+        <p:cTn id="1" dur="indefinite" restart="never" nodeType="tmRoot"/>
+      </p:par>
+    </p:tnLst>
+  </p:timing>
+</p:sld>
+</file>
+
+<file path=ppt/slides/slide30.xml><?xml version="1.0" encoding="utf-8"?>
 <p:sld xmlns:a="http://schemas.openxmlformats.org/drawingml/2006/main" xmlns:r="http://schemas.openxmlformats.org/officeDocument/2006/relationships" xmlns:p="http://schemas.openxmlformats.org/presentationml/2006/main">
   <p:cSld>
     <p:spTree>
@@ -10484,7 +11715,7 @@
 </p:sld>
 </file>
 
-<file path=ppt/slides/slide27.xml><?xml version="1.0" encoding="utf-8"?>
+<file path=ppt/slides/slide31.xml><?xml version="1.0" encoding="utf-8"?>
 <p:sld xmlns:a="http://schemas.openxmlformats.org/drawingml/2006/main" xmlns:r="http://schemas.openxmlformats.org/officeDocument/2006/relationships" xmlns:p="http://schemas.openxmlformats.org/presentationml/2006/main">
   <p:cSld>
     <p:spTree>
@@ -10622,7 +11853,7 @@
 </p:sld>
 </file>
 
-<file path=ppt/slides/slide28.xml><?xml version="1.0" encoding="utf-8"?>
+<file path=ppt/slides/slide32.xml><?xml version="1.0" encoding="utf-8"?>
 <p:sld xmlns:a="http://schemas.openxmlformats.org/drawingml/2006/main" xmlns:r="http://schemas.openxmlformats.org/officeDocument/2006/relationships" xmlns:p="http://schemas.openxmlformats.org/presentationml/2006/main">
   <p:cSld>
     <p:spTree>
@@ -10760,7 +11991,7 @@
 </p:sld>
 </file>
 
-<file path=ppt/slides/slide29.xml><?xml version="1.0" encoding="utf-8"?>
+<file path=ppt/slides/slide33.xml><?xml version="1.0" encoding="utf-8"?>
 <p:sld xmlns:a="http://schemas.openxmlformats.org/drawingml/2006/main" xmlns:r="http://schemas.openxmlformats.org/officeDocument/2006/relationships" xmlns:p="http://schemas.openxmlformats.org/presentationml/2006/main">
   <p:cSld>
     <p:spTree>
@@ -10905,96 +12136,7 @@
 </p:sld>
 </file>
 
-<file path=ppt/slides/slide3.xml><?xml version="1.0" encoding="utf-8"?>
-<p:sld xmlns:a="http://schemas.openxmlformats.org/drawingml/2006/main" xmlns:r="http://schemas.openxmlformats.org/officeDocument/2006/relationships" xmlns:p="http://schemas.openxmlformats.org/presentationml/2006/main">
-  <p:cSld>
-    <p:spTree>
-      <p:nvGrpSpPr>
-        <p:cNvPr id="1" name=""/>
-        <p:cNvGrpSpPr/>
-        <p:nvPr/>
-      </p:nvGrpSpPr>
-      <p:grpSpPr>
-        <a:xfrm>
-          <a:off x="0" y="0"/>
-          <a:ext cx="0" cy="0"/>
-          <a:chOff x="0" y="0"/>
-          <a:chExt cx="0" cy="0"/>
-        </a:xfrm>
-      </p:grpSpPr>
-      <p:sp>
-        <p:nvSpPr>
-          <p:cNvPr id="2" name="Title 1"/>
-          <p:cNvSpPr>
-            <a:spLocks noGrp="1"/>
-          </p:cNvSpPr>
-          <p:nvPr>
-            <p:ph type="title"/>
-          </p:nvPr>
-        </p:nvSpPr>
-        <p:spPr>
-          <a:xfrm>
-            <a:off x="964927" y="1"/>
-            <a:ext cx="10515600" cy="6858000"/>
-          </a:xfrm>
-        </p:spPr>
-        <p:txBody>
-          <a:bodyPr anchor="ctr">
-            <a:normAutofit/>
-          </a:bodyPr>
-          <a:lstStyle/>
-          <a:p>
-            <a:pPr algn="ctr"/>
-            <a:r>
-              <a:rPr lang="en-US" sz="4800" strike="sngStrike" dirty="0" smtClean="0">
-                <a:solidFill>
-                  <a:schemeClr val="bg1">
-                    <a:lumMod val="75000"/>
-                  </a:schemeClr>
-                </a:solidFill>
-              </a:rPr>
-              <a:t>I hate writing secure code</a:t>
-            </a:r>
-            <a:r>
-              <a:rPr lang="en-US" sz="4800" strike="sngStrike" dirty="0" smtClean="0"/>
-              <a:t/>
-            </a:r>
-            <a:br>
-              <a:rPr lang="en-US" sz="4800" strike="sngStrike" dirty="0" smtClean="0"/>
-            </a:br>
-            <a:r>
-              <a:rPr lang="en-US" sz="4800" dirty="0" smtClean="0"/>
-              <a:t>I hate writing secure </a:t>
-            </a:r>
-            <a:r>
-              <a:rPr lang="en-US" sz="4800" i="1" dirty="0" smtClean="0"/>
-              <a:t>features</a:t>
-            </a:r>
-            <a:endParaRPr lang="en-US" sz="4800" i="1" dirty="0"/>
-          </a:p>
-        </p:txBody>
-      </p:sp>
-    </p:spTree>
-    <p:extLst>
-      <p:ext uri="{BB962C8B-B14F-4D97-AF65-F5344CB8AC3E}">
-        <p14:creationId xmlns:p14="http://schemas.microsoft.com/office/powerpoint/2010/main" val="75936766"/>
-      </p:ext>
-    </p:extLst>
-  </p:cSld>
-  <p:clrMapOvr>
-    <a:masterClrMapping/>
-  </p:clrMapOvr>
-  <p:timing>
-    <p:tnLst>
-      <p:par>
-        <p:cTn id="1" dur="indefinite" restart="never" nodeType="tmRoot"/>
-      </p:par>
-    </p:tnLst>
-  </p:timing>
-</p:sld>
-</file>
-
-<file path=ppt/slides/slide30.xml><?xml version="1.0" encoding="utf-8"?>
+<file path=ppt/slides/slide34.xml><?xml version="1.0" encoding="utf-8"?>
 <p:sld xmlns:a="http://schemas.openxmlformats.org/drawingml/2006/main" xmlns:r="http://schemas.openxmlformats.org/officeDocument/2006/relationships" xmlns:p="http://schemas.openxmlformats.org/presentationml/2006/main">
   <p:cSld>
     <p:spTree>
@@ -11144,7 +12286,7 @@
 </p:sld>
 </file>
 
-<file path=ppt/slides/slide31.xml><?xml version="1.0" encoding="utf-8"?>
+<file path=ppt/slides/slide35.xml><?xml version="1.0" encoding="utf-8"?>
 <p:sld xmlns:a="http://schemas.openxmlformats.org/drawingml/2006/main" xmlns:r="http://schemas.openxmlformats.org/officeDocument/2006/relationships" xmlns:p="http://schemas.openxmlformats.org/presentationml/2006/main">
   <p:cSld>
     <p:spTree>
@@ -11186,7 +12328,26 @@
             <a:pPr algn="ctr"/>
             <a:r>
               <a:rPr lang="en-US" sz="4800" dirty="0" smtClean="0"/>
-              <a:t>Authorization</a:t>
+              <a:t>A4 </a:t>
+            </a:r>
+            <a:r>
+              <a:rPr lang="en-US" sz="4800" dirty="0"/>
+              <a:t>– </a:t>
+            </a:r>
+            <a:r>
+              <a:rPr lang="en-US" sz="4800" dirty="0" smtClean="0"/>
+              <a:t>Insecure Direct Object References</a:t>
+            </a:r>
+            <a:br>
+              <a:rPr lang="en-US" sz="4800" dirty="0" smtClean="0"/>
+            </a:br>
+            <a:r>
+              <a:rPr lang="en-US" sz="4800" dirty="0" smtClean="0"/>
+              <a:t>A7 </a:t>
+            </a:r>
+            <a:r>
+              <a:rPr lang="en-US" sz="4800" dirty="0" smtClean="0"/>
+              <a:t>– Function Level Authorization</a:t>
             </a:r>
             <a:br>
               <a:rPr lang="en-US" sz="4800" dirty="0" smtClean="0"/>
@@ -11204,23 +12365,7 @@
                   <a:srgbClr val="013947"/>
                 </a:solidFill>
               </a:rPr>
-              <a:t>Is user </a:t>
-            </a:r>
-            <a:r>
-              <a:rPr lang="en-US" u="sng" dirty="0" smtClean="0">
-                <a:solidFill>
-                  <a:srgbClr val="013947"/>
-                </a:solidFill>
-              </a:rPr>
-              <a:t>allowed</a:t>
-            </a:r>
-            <a:r>
-              <a:rPr lang="en-US" dirty="0" smtClean="0">
-                <a:solidFill>
-                  <a:srgbClr val="013947"/>
-                </a:solidFill>
-              </a:rPr>
-              <a:t> to perform a given request?</a:t>
+              <a:t>Security via hidden links is weak sauce</a:t>
             </a:r>
             <a:endParaRPr lang="en-US" sz="4800" dirty="0">
               <a:solidFill>
@@ -11233,7 +12378,7 @@
     </p:spTree>
     <p:extLst>
       <p:ext uri="{BB962C8B-B14F-4D97-AF65-F5344CB8AC3E}">
-        <p14:creationId xmlns:p14="http://schemas.microsoft.com/office/powerpoint/2010/main" val="2983310270"/>
+        <p14:creationId xmlns:p14="http://schemas.microsoft.com/office/powerpoint/2010/main" val="565801111"/>
       </p:ext>
     </p:extLst>
   </p:cSld>
@@ -11250,7 +12395,7 @@
 </p:sld>
 </file>
 
-<file path=ppt/slides/slide32.xml><?xml version="1.0" encoding="utf-8"?>
+<file path=ppt/slides/slide36.xml><?xml version="1.0" encoding="utf-8"?>
 <p:sld xmlns:a="http://schemas.openxmlformats.org/drawingml/2006/main" xmlns:r="http://schemas.openxmlformats.org/officeDocument/2006/relationships" xmlns:p="http://schemas.openxmlformats.org/presentationml/2006/main">
   <p:cSld>
     <p:spTree>
@@ -11370,7 +12515,7 @@
 </p:sld>
 </file>
 
-<file path=ppt/slides/slide33.xml><?xml version="1.0" encoding="utf-8"?>
+<file path=ppt/slides/slide37.xml><?xml version="1.0" encoding="utf-8"?>
 <p:sld xmlns:a="http://schemas.openxmlformats.org/drawingml/2006/main" xmlns:r="http://schemas.openxmlformats.org/officeDocument/2006/relationships" xmlns:p="http://schemas.openxmlformats.org/presentationml/2006/main">
   <p:cSld>
     <p:spTree>
@@ -11495,7 +12640,7 @@
 </p:sld>
 </file>
 
-<file path=ppt/slides/slide34.xml><?xml version="1.0" encoding="utf-8"?>
+<file path=ppt/slides/slide38.xml><?xml version="1.0" encoding="utf-8"?>
 <p:sld xmlns:a="http://schemas.openxmlformats.org/drawingml/2006/main" xmlns:r="http://schemas.openxmlformats.org/officeDocument/2006/relationships" xmlns:p="http://schemas.openxmlformats.org/presentationml/2006/main">
   <p:cSld>
     <p:spTree>
@@ -11591,7 +12736,7 @@
 </p:sld>
 </file>
 
-<file path=ppt/slides/slide35.xml><?xml version="1.0" encoding="utf-8"?>
+<file path=ppt/slides/slide39.xml><?xml version="1.0" encoding="utf-8"?>
 <p:sld xmlns:a="http://schemas.openxmlformats.org/drawingml/2006/main" xmlns:r="http://schemas.openxmlformats.org/officeDocument/2006/relationships" xmlns:p="http://schemas.openxmlformats.org/presentationml/2006/main">
   <p:cSld>
     <p:spTree>
@@ -11720,7 +12865,209 @@
 </p:sld>
 </file>
 
-<file path=ppt/slides/slide36.xml><?xml version="1.0" encoding="utf-8"?>
+<file path=ppt/slides/slide4.xml><?xml version="1.0" encoding="utf-8"?>
+<p:sld xmlns:a="http://schemas.openxmlformats.org/drawingml/2006/main" xmlns:r="http://schemas.openxmlformats.org/officeDocument/2006/relationships" xmlns:p="http://schemas.openxmlformats.org/presentationml/2006/main">
+  <p:cSld>
+    <p:spTree>
+      <p:nvGrpSpPr>
+        <p:cNvPr id="1" name=""/>
+        <p:cNvGrpSpPr/>
+        <p:nvPr/>
+      </p:nvGrpSpPr>
+      <p:grpSpPr>
+        <a:xfrm>
+          <a:off x="0" y="0"/>
+          <a:ext cx="0" cy="0"/>
+          <a:chOff x="0" y="0"/>
+          <a:chExt cx="0" cy="0"/>
+        </a:xfrm>
+      </p:grpSpPr>
+      <p:sp>
+        <p:nvSpPr>
+          <p:cNvPr id="2" name="Title 1"/>
+          <p:cNvSpPr>
+            <a:spLocks noGrp="1"/>
+          </p:cNvSpPr>
+          <p:nvPr>
+            <p:ph type="title"/>
+          </p:nvPr>
+        </p:nvSpPr>
+        <p:spPr>
+          <a:xfrm>
+            <a:off x="964927" y="1"/>
+            <a:ext cx="10515600" cy="6858000"/>
+          </a:xfrm>
+        </p:spPr>
+        <p:txBody>
+          <a:bodyPr anchor="ctr">
+            <a:normAutofit/>
+          </a:bodyPr>
+          <a:lstStyle/>
+          <a:p>
+            <a:pPr algn="ctr"/>
+            <a:r>
+              <a:rPr lang="en-US" sz="4800" strike="sngStrike" dirty="0" smtClean="0">
+                <a:solidFill>
+                  <a:schemeClr val="bg1">
+                    <a:lumMod val="75000"/>
+                  </a:schemeClr>
+                </a:solidFill>
+              </a:rPr>
+              <a:t>I hate writing secure code</a:t>
+            </a:r>
+            <a:br>
+              <a:rPr lang="en-US" sz="4800" strike="sngStrike" dirty="0" smtClean="0">
+                <a:solidFill>
+                  <a:schemeClr val="bg1">
+                    <a:lumMod val="75000"/>
+                  </a:schemeClr>
+                </a:solidFill>
+              </a:rPr>
+            </a:br>
+            <a:r>
+              <a:rPr lang="en-US" sz="4800" strike="sngStrike" dirty="0" smtClean="0">
+                <a:solidFill>
+                  <a:schemeClr val="bg1">
+                    <a:lumMod val="75000"/>
+                  </a:schemeClr>
+                </a:solidFill>
+              </a:rPr>
+              <a:t>I hate writing secure features</a:t>
+            </a:r>
+            <a:r>
+              <a:rPr lang="en-US" sz="4800" strike="sngStrike" dirty="0" smtClean="0"/>
+              <a:t/>
+            </a:r>
+            <a:br>
+              <a:rPr lang="en-US" sz="4800" strike="sngStrike" dirty="0" smtClean="0"/>
+            </a:br>
+            <a:r>
+              <a:rPr lang="en-US" sz="4800" dirty="0" smtClean="0"/>
+              <a:t>I hate implementing </a:t>
+            </a:r>
+            <a:r>
+              <a:rPr lang="en-US" sz="4800" i="1" dirty="0" smtClean="0"/>
+              <a:t>cross-cutting security concerns</a:t>
+            </a:r>
+            <a:r>
+              <a:rPr lang="en-US" sz="4800" dirty="0" smtClean="0"/>
+              <a:t> by repeating the same patterns over and over again in my feature-level code</a:t>
+            </a:r>
+            <a:endParaRPr lang="en-US" sz="4800" dirty="0"/>
+          </a:p>
+        </p:txBody>
+      </p:sp>
+    </p:spTree>
+    <p:extLst>
+      <p:ext uri="{BB962C8B-B14F-4D97-AF65-F5344CB8AC3E}">
+        <p14:creationId xmlns:p14="http://schemas.microsoft.com/office/powerpoint/2010/main" val="3846056723"/>
+      </p:ext>
+    </p:extLst>
+  </p:cSld>
+  <p:clrMapOvr>
+    <a:masterClrMapping/>
+  </p:clrMapOvr>
+  <p:timing>
+    <p:tnLst>
+      <p:par>
+        <p:cTn id="1" dur="indefinite" restart="never" nodeType="tmRoot"/>
+      </p:par>
+    </p:tnLst>
+  </p:timing>
+</p:sld>
+</file>
+
+<file path=ppt/slides/slide40.xml><?xml version="1.0" encoding="utf-8"?>
+<p:sld xmlns:a="http://schemas.openxmlformats.org/drawingml/2006/main" xmlns:r="http://schemas.openxmlformats.org/officeDocument/2006/relationships" xmlns:p="http://schemas.openxmlformats.org/presentationml/2006/main">
+  <p:cSld>
+    <p:spTree>
+      <p:nvGrpSpPr>
+        <p:cNvPr id="1" name=""/>
+        <p:cNvGrpSpPr/>
+        <p:nvPr/>
+      </p:nvGrpSpPr>
+      <p:grpSpPr>
+        <a:xfrm>
+          <a:off x="0" y="0"/>
+          <a:ext cx="0" cy="0"/>
+          <a:chOff x="0" y="0"/>
+          <a:chExt cx="0" cy="0"/>
+        </a:xfrm>
+      </p:grpSpPr>
+      <p:sp>
+        <p:nvSpPr>
+          <p:cNvPr id="2" name="Title 1"/>
+          <p:cNvSpPr>
+            <a:spLocks noGrp="1"/>
+          </p:cNvSpPr>
+          <p:nvPr>
+            <p:ph type="title"/>
+          </p:nvPr>
+        </p:nvSpPr>
+        <p:spPr>
+          <a:xfrm>
+            <a:off x="964927" y="1"/>
+            <a:ext cx="10515600" cy="6858000"/>
+          </a:xfrm>
+        </p:spPr>
+        <p:txBody>
+          <a:bodyPr anchor="ctr">
+            <a:normAutofit/>
+          </a:bodyPr>
+          <a:lstStyle/>
+          <a:p>
+            <a:pPr algn="ctr"/>
+            <a:r>
+              <a:rPr lang="en-US" sz="4800" dirty="0" smtClean="0"/>
+              <a:t>A6 – Sensitive Data Exposure</a:t>
+            </a:r>
+            <a:br>
+              <a:rPr lang="en-US" sz="4800" dirty="0" smtClean="0"/>
+            </a:br>
+            <a:r>
+              <a:rPr lang="en-US" sz="4800" dirty="0"/>
+              <a:t/>
+            </a:r>
+            <a:br>
+              <a:rPr lang="en-US" sz="4800" dirty="0"/>
+            </a:br>
+            <a:r>
+              <a:rPr lang="en-US" dirty="0" smtClean="0">
+                <a:solidFill>
+                  <a:srgbClr val="013947"/>
+                </a:solidFill>
+              </a:rPr>
+              <a:t>Keeping private data private!</a:t>
+            </a:r>
+            <a:endParaRPr lang="en-US" sz="4800" dirty="0">
+              <a:solidFill>
+                <a:srgbClr val="013947"/>
+              </a:solidFill>
+            </a:endParaRPr>
+          </a:p>
+        </p:txBody>
+      </p:sp>
+    </p:spTree>
+    <p:extLst>
+      <p:ext uri="{BB962C8B-B14F-4D97-AF65-F5344CB8AC3E}">
+        <p14:creationId xmlns:p14="http://schemas.microsoft.com/office/powerpoint/2010/main" val="1350980747"/>
+      </p:ext>
+    </p:extLst>
+  </p:cSld>
+  <p:clrMapOvr>
+    <a:masterClrMapping/>
+  </p:clrMapOvr>
+  <p:timing>
+    <p:tnLst>
+      <p:par>
+        <p:cTn id="1" dur="indefinite" restart="never" nodeType="tmRoot"/>
+      </p:par>
+    </p:tnLst>
+  </p:timing>
+</p:sld>
+</file>
+
+<file path=ppt/slides/slide41.xml><?xml version="1.0" encoding="utf-8"?>
 <p:sld xmlns:a="http://schemas.openxmlformats.org/drawingml/2006/main" xmlns:r="http://schemas.openxmlformats.org/officeDocument/2006/relationships" xmlns:p="http://schemas.openxmlformats.org/presentationml/2006/main">
   <p:cSld>
     <p:spTree>
@@ -11844,7 +13191,7 @@
 </p:sld>
 </file>
 
-<file path=ppt/slides/slide37.xml><?xml version="1.0" encoding="utf-8"?>
+<file path=ppt/slides/slide42.xml><?xml version="1.0" encoding="utf-8"?>
 <p:sld xmlns:a="http://schemas.openxmlformats.org/drawingml/2006/main" xmlns:r="http://schemas.openxmlformats.org/officeDocument/2006/relationships" xmlns:p="http://schemas.openxmlformats.org/presentationml/2006/main">
   <p:cSld>
     <p:spTree>
@@ -11969,7 +13316,7 @@
 </p:sld>
 </file>
 
-<file path=ppt/slides/slide38.xml><?xml version="1.0" encoding="utf-8"?>
+<file path=ppt/slides/slide43.xml><?xml version="1.0" encoding="utf-8"?>
 <p:sld xmlns:a="http://schemas.openxmlformats.org/drawingml/2006/main" xmlns:r="http://schemas.openxmlformats.org/officeDocument/2006/relationships" xmlns:p="http://schemas.openxmlformats.org/presentationml/2006/main">
   <p:cSld>
     <p:spTree>
@@ -12062,7 +13409,7 @@
 </p:sld>
 </file>
 
-<file path=ppt/slides/slide39.xml><?xml version="1.0" encoding="utf-8"?>
+<file path=ppt/slides/slide44.xml><?xml version="1.0" encoding="utf-8"?>
 <p:sld xmlns:a="http://schemas.openxmlformats.org/drawingml/2006/main" xmlns:r="http://schemas.openxmlformats.org/officeDocument/2006/relationships" xmlns:p="http://schemas.openxmlformats.org/presentationml/2006/main">
   <p:cSld>
     <p:spTree>
@@ -12187,119 +13534,7 @@
 </p:sld>
 </file>
 
-<file path=ppt/slides/slide4.xml><?xml version="1.0" encoding="utf-8"?>
-<p:sld xmlns:a="http://schemas.openxmlformats.org/drawingml/2006/main" xmlns:r="http://schemas.openxmlformats.org/officeDocument/2006/relationships" xmlns:p="http://schemas.openxmlformats.org/presentationml/2006/main">
-  <p:cSld>
-    <p:spTree>
-      <p:nvGrpSpPr>
-        <p:cNvPr id="1" name=""/>
-        <p:cNvGrpSpPr/>
-        <p:nvPr/>
-      </p:nvGrpSpPr>
-      <p:grpSpPr>
-        <a:xfrm>
-          <a:off x="0" y="0"/>
-          <a:ext cx="0" cy="0"/>
-          <a:chOff x="0" y="0"/>
-          <a:chExt cx="0" cy="0"/>
-        </a:xfrm>
-      </p:grpSpPr>
-      <p:sp>
-        <p:nvSpPr>
-          <p:cNvPr id="2" name="Title 1"/>
-          <p:cNvSpPr>
-            <a:spLocks noGrp="1"/>
-          </p:cNvSpPr>
-          <p:nvPr>
-            <p:ph type="title"/>
-          </p:nvPr>
-        </p:nvSpPr>
-        <p:spPr>
-          <a:xfrm>
-            <a:off x="964927" y="1"/>
-            <a:ext cx="10515600" cy="6858000"/>
-          </a:xfrm>
-        </p:spPr>
-        <p:txBody>
-          <a:bodyPr anchor="ctr">
-            <a:normAutofit/>
-          </a:bodyPr>
-          <a:lstStyle/>
-          <a:p>
-            <a:pPr algn="ctr"/>
-            <a:r>
-              <a:rPr lang="en-US" sz="4800" strike="sngStrike" dirty="0" smtClean="0">
-                <a:solidFill>
-                  <a:schemeClr val="bg1">
-                    <a:lumMod val="75000"/>
-                  </a:schemeClr>
-                </a:solidFill>
-              </a:rPr>
-              <a:t>I hate writing secure code</a:t>
-            </a:r>
-            <a:br>
-              <a:rPr lang="en-US" sz="4800" strike="sngStrike" dirty="0" smtClean="0">
-                <a:solidFill>
-                  <a:schemeClr val="bg1">
-                    <a:lumMod val="75000"/>
-                  </a:schemeClr>
-                </a:solidFill>
-              </a:rPr>
-            </a:br>
-            <a:r>
-              <a:rPr lang="en-US" sz="4800" strike="sngStrike" dirty="0" smtClean="0">
-                <a:solidFill>
-                  <a:schemeClr val="bg1">
-                    <a:lumMod val="75000"/>
-                  </a:schemeClr>
-                </a:solidFill>
-              </a:rPr>
-              <a:t>I hate writing secure features</a:t>
-            </a:r>
-            <a:r>
-              <a:rPr lang="en-US" sz="4800" strike="sngStrike" dirty="0" smtClean="0"/>
-              <a:t/>
-            </a:r>
-            <a:br>
-              <a:rPr lang="en-US" sz="4800" strike="sngStrike" dirty="0" smtClean="0"/>
-            </a:br>
-            <a:r>
-              <a:rPr lang="en-US" sz="4800" dirty="0" smtClean="0"/>
-              <a:t>I hate implementing </a:t>
-            </a:r>
-            <a:r>
-              <a:rPr lang="en-US" sz="4800" i="1" dirty="0" smtClean="0"/>
-              <a:t>cross-cutting security concerns</a:t>
-            </a:r>
-            <a:r>
-              <a:rPr lang="en-US" sz="4800" dirty="0" smtClean="0"/>
-              <a:t> by repeating the same patterns over and over again in my feature-level code</a:t>
-            </a:r>
-            <a:endParaRPr lang="en-US" sz="4800" dirty="0"/>
-          </a:p>
-        </p:txBody>
-      </p:sp>
-    </p:spTree>
-    <p:extLst>
-      <p:ext uri="{BB962C8B-B14F-4D97-AF65-F5344CB8AC3E}">
-        <p14:creationId xmlns:p14="http://schemas.microsoft.com/office/powerpoint/2010/main" val="3846056723"/>
-      </p:ext>
-    </p:extLst>
-  </p:cSld>
-  <p:clrMapOvr>
-    <a:masterClrMapping/>
-  </p:clrMapOvr>
-  <p:timing>
-    <p:tnLst>
-      <p:par>
-        <p:cTn id="1" dur="indefinite" restart="never" nodeType="tmRoot"/>
-      </p:par>
-    </p:tnLst>
-  </p:timing>
-</p:sld>
-</file>
-
-<file path=ppt/slides/slide40.xml><?xml version="1.0" encoding="utf-8"?>
+<file path=ppt/slides/slide45.xml><?xml version="1.0" encoding="utf-8"?>
 <p:sld xmlns:a="http://schemas.openxmlformats.org/drawingml/2006/main" xmlns:r="http://schemas.openxmlformats.org/officeDocument/2006/relationships" xmlns:p="http://schemas.openxmlformats.org/presentationml/2006/main">
   <p:cSld>
     <p:spTree>
@@ -12432,7 +13667,7 @@
 </p:sld>
 </file>
 
-<file path=ppt/slides/slide41.xml><?xml version="1.0" encoding="utf-8"?>
+<file path=ppt/slides/slide46.xml><?xml version="1.0" encoding="utf-8"?>
 <p:sld xmlns:a="http://schemas.openxmlformats.org/drawingml/2006/main" xmlns:r="http://schemas.openxmlformats.org/officeDocument/2006/relationships" xmlns:p="http://schemas.openxmlformats.org/presentationml/2006/main">
   <p:cSld>
     <p:spTree>
@@ -12522,7 +13757,7 @@
 </p:sld>
 </file>
 
-<file path=ppt/slides/slide42.xml><?xml version="1.0" encoding="utf-8"?>
+<file path=ppt/slides/slide47.xml><?xml version="1.0" encoding="utf-8"?>
 <p:sld xmlns:a="http://schemas.openxmlformats.org/drawingml/2006/main" xmlns:r="http://schemas.openxmlformats.org/officeDocument/2006/relationships" xmlns:p="http://schemas.openxmlformats.org/presentationml/2006/main">
   <p:cSld>
     <p:spTree>
@@ -12648,7 +13883,7 @@
 </p:sld>
 </file>
 
-<file path=ppt/slides/slide43.xml><?xml version="1.0" encoding="utf-8"?>
+<file path=ppt/slides/slide48.xml><?xml version="1.0" encoding="utf-8"?>
 <p:sld xmlns:a="http://schemas.openxmlformats.org/drawingml/2006/main" xmlns:r="http://schemas.openxmlformats.org/officeDocument/2006/relationships" xmlns:p="http://schemas.openxmlformats.org/presentationml/2006/main">
   <p:cSld>
     <p:spTree>
@@ -12774,7 +14009,7 @@
 </p:sld>
 </file>
 
-<file path=ppt/slides/slide44.xml><?xml version="1.0" encoding="utf-8"?>
+<file path=ppt/slides/slide49.xml><?xml version="1.0" encoding="utf-8"?>
 <p:sld xmlns:a="http://schemas.openxmlformats.org/drawingml/2006/main" xmlns:r="http://schemas.openxmlformats.org/officeDocument/2006/relationships" xmlns:p="http://schemas.openxmlformats.org/presentationml/2006/main">
   <p:cSld>
     <p:spTree>
@@ -12895,7 +14130,146 @@
 </p:sld>
 </file>
 
-<file path=ppt/slides/slide45.xml><?xml version="1.0" encoding="utf-8"?>
+<file path=ppt/slides/slide5.xml><?xml version="1.0" encoding="utf-8"?>
+<p:sld xmlns:a="http://schemas.openxmlformats.org/drawingml/2006/main" xmlns:r="http://schemas.openxmlformats.org/officeDocument/2006/relationships" xmlns:p="http://schemas.openxmlformats.org/presentationml/2006/main">
+  <p:cSld>
+    <p:spTree>
+      <p:nvGrpSpPr>
+        <p:cNvPr id="1" name=""/>
+        <p:cNvGrpSpPr/>
+        <p:nvPr/>
+      </p:nvGrpSpPr>
+      <p:grpSpPr>
+        <a:xfrm>
+          <a:off x="0" y="0"/>
+          <a:ext cx="0" cy="0"/>
+          <a:chOff x="0" y="0"/>
+          <a:chExt cx="0" cy="0"/>
+        </a:xfrm>
+      </p:grpSpPr>
+      <p:sp>
+        <p:nvSpPr>
+          <p:cNvPr id="2" name="Title 1"/>
+          <p:cNvSpPr>
+            <a:spLocks noGrp="1"/>
+          </p:cNvSpPr>
+          <p:nvPr>
+            <p:ph type="title"/>
+          </p:nvPr>
+        </p:nvSpPr>
+        <p:spPr/>
+        <p:txBody>
+          <a:bodyPr>
+            <a:normAutofit/>
+          </a:bodyPr>
+          <a:lstStyle/>
+          <a:p>
+            <a:r>
+              <a:rPr lang="en-US" sz="4800" dirty="0" smtClean="0"/>
+              <a:t>What's on </a:t>
+            </a:r>
+            <a:r>
+              <a:rPr lang="en-US" sz="4800" smtClean="0"/>
+              <a:t>the agenda?</a:t>
+            </a:r>
+            <a:endParaRPr lang="en-US" sz="4800" dirty="0"/>
+          </a:p>
+        </p:txBody>
+      </p:sp>
+      <p:sp>
+        <p:nvSpPr>
+          <p:cNvPr id="3" name="Content Placeholder 2"/>
+          <p:cNvSpPr>
+            <a:spLocks noGrp="1"/>
+          </p:cNvSpPr>
+          <p:nvPr>
+            <p:ph idx="1"/>
+          </p:nvPr>
+        </p:nvSpPr>
+        <p:spPr>
+          <a:xfrm>
+            <a:off x="838200" y="1825624"/>
+            <a:ext cx="10515600" cy="4589923"/>
+          </a:xfrm>
+        </p:spPr>
+        <p:txBody>
+          <a:bodyPr>
+            <a:normAutofit/>
+          </a:bodyPr>
+          <a:lstStyle/>
+          <a:p>
+            <a:r>
+              <a:rPr lang="en-US" sz="4000" dirty="0" smtClean="0"/>
+              <a:t>Define "cross cutting" security concerns</a:t>
+            </a:r>
+          </a:p>
+          <a:p>
+            <a:endParaRPr lang="en-US" sz="4000" dirty="0"/>
+          </a:p>
+          <a:p>
+            <a:r>
+              <a:rPr lang="en-US" sz="4000" dirty="0" smtClean="0"/>
+              <a:t>&lt;x&gt; real-world examples (</a:t>
+            </a:r>
+            <a:r>
+              <a:rPr lang="en-US" sz="4000" i="1" dirty="0" smtClean="0"/>
+              <a:t>.NET and JS</a:t>
+            </a:r>
+            <a:r>
+              <a:rPr lang="en-US" sz="4000" dirty="0" smtClean="0"/>
+              <a:t>)</a:t>
+            </a:r>
+          </a:p>
+          <a:p>
+            <a:endParaRPr lang="en-US" sz="4000" dirty="0"/>
+          </a:p>
+          <a:p>
+            <a:r>
+              <a:rPr lang="en-US" sz="4000" dirty="0" smtClean="0"/>
+              <a:t>???</a:t>
+            </a:r>
+          </a:p>
+          <a:p>
+            <a:endParaRPr lang="en-US" sz="4000" dirty="0"/>
+          </a:p>
+          <a:p>
+            <a:endParaRPr lang="en-US" sz="4000" dirty="0" smtClean="0"/>
+          </a:p>
+          <a:p>
+            <a:endParaRPr lang="en-US" sz="4000" dirty="0" smtClean="0"/>
+          </a:p>
+          <a:p>
+            <a:endParaRPr lang="en-US" dirty="0" smtClean="0"/>
+          </a:p>
+          <a:p>
+            <a:endParaRPr lang="en-US" dirty="0" smtClean="0"/>
+          </a:p>
+          <a:p>
+            <a:endParaRPr lang="en-US" dirty="0"/>
+          </a:p>
+        </p:txBody>
+      </p:sp>
+    </p:spTree>
+    <p:extLst>
+      <p:ext uri="{BB962C8B-B14F-4D97-AF65-F5344CB8AC3E}">
+        <p14:creationId xmlns:p14="http://schemas.microsoft.com/office/powerpoint/2010/main" val="2651230507"/>
+      </p:ext>
+    </p:extLst>
+  </p:cSld>
+  <p:clrMapOvr>
+    <a:masterClrMapping/>
+  </p:clrMapOvr>
+  <p:timing>
+    <p:tnLst>
+      <p:par>
+        <p:cTn id="1" dur="indefinite" restart="never" nodeType="tmRoot"/>
+      </p:par>
+    </p:tnLst>
+  </p:timing>
+</p:sld>
+</file>
+
+<file path=ppt/slides/slide50.xml><?xml version="1.0" encoding="utf-8"?>
 <p:sld xmlns:a="http://schemas.openxmlformats.org/drawingml/2006/main" xmlns:r="http://schemas.openxmlformats.org/officeDocument/2006/relationships" xmlns:p="http://schemas.openxmlformats.org/presentationml/2006/main">
   <p:cSld>
     <p:spTree>
@@ -13021,7 +14395,7 @@
 </p:sld>
 </file>
 
-<file path=ppt/slides/slide46.xml><?xml version="1.0" encoding="utf-8"?>
+<file path=ppt/slides/slide51.xml><?xml version="1.0" encoding="utf-8"?>
 <p:sld xmlns:a="http://schemas.openxmlformats.org/drawingml/2006/main" xmlns:r="http://schemas.openxmlformats.org/officeDocument/2006/relationships" xmlns:p="http://schemas.openxmlformats.org/presentationml/2006/main">
   <p:cSld>
     <p:spTree>
@@ -13147,7 +14521,7 @@
 </p:sld>
 </file>
 
-<file path=ppt/slides/slide47.xml><?xml version="1.0" encoding="utf-8"?>
+<file path=ppt/slides/slide52.xml><?xml version="1.0" encoding="utf-8"?>
 <p:sld xmlns:a="http://schemas.openxmlformats.org/drawingml/2006/main" xmlns:r="http://schemas.openxmlformats.org/officeDocument/2006/relationships" xmlns:p="http://schemas.openxmlformats.org/presentationml/2006/main">
   <p:cSld>
     <p:spTree>
@@ -13273,7 +14647,7 @@
 </p:sld>
 </file>
 
-<file path=ppt/slides/slide48.xml><?xml version="1.0" encoding="utf-8"?>
+<file path=ppt/slides/slide53.xml><?xml version="1.0" encoding="utf-8"?>
 <p:sld xmlns:a="http://schemas.openxmlformats.org/drawingml/2006/main" xmlns:r="http://schemas.openxmlformats.org/officeDocument/2006/relationships" xmlns:p="http://schemas.openxmlformats.org/presentationml/2006/main">
   <p:cSld>
     <p:spTree>
@@ -13394,7 +14768,7 @@
 </p:sld>
 </file>
 
-<file path=ppt/slides/slide49.xml><?xml version="1.0" encoding="utf-8"?>
+<file path=ppt/slides/slide54.xml><?xml version="1.0" encoding="utf-8"?>
 <p:sld xmlns:a="http://schemas.openxmlformats.org/drawingml/2006/main" xmlns:r="http://schemas.openxmlformats.org/officeDocument/2006/relationships" xmlns:p="http://schemas.openxmlformats.org/presentationml/2006/main">
   <p:cSld>
     <p:spTree>
@@ -13525,146 +14899,7 @@
 </p:sld>
 </file>
 
-<file path=ppt/slides/slide5.xml><?xml version="1.0" encoding="utf-8"?>
-<p:sld xmlns:a="http://schemas.openxmlformats.org/drawingml/2006/main" xmlns:r="http://schemas.openxmlformats.org/officeDocument/2006/relationships" xmlns:p="http://schemas.openxmlformats.org/presentationml/2006/main">
-  <p:cSld>
-    <p:spTree>
-      <p:nvGrpSpPr>
-        <p:cNvPr id="1" name=""/>
-        <p:cNvGrpSpPr/>
-        <p:nvPr/>
-      </p:nvGrpSpPr>
-      <p:grpSpPr>
-        <a:xfrm>
-          <a:off x="0" y="0"/>
-          <a:ext cx="0" cy="0"/>
-          <a:chOff x="0" y="0"/>
-          <a:chExt cx="0" cy="0"/>
-        </a:xfrm>
-      </p:grpSpPr>
-      <p:sp>
-        <p:nvSpPr>
-          <p:cNvPr id="2" name="Title 1"/>
-          <p:cNvSpPr>
-            <a:spLocks noGrp="1"/>
-          </p:cNvSpPr>
-          <p:nvPr>
-            <p:ph type="title"/>
-          </p:nvPr>
-        </p:nvSpPr>
-        <p:spPr/>
-        <p:txBody>
-          <a:bodyPr>
-            <a:normAutofit/>
-          </a:bodyPr>
-          <a:lstStyle/>
-          <a:p>
-            <a:r>
-              <a:rPr lang="en-US" sz="4800" dirty="0" smtClean="0"/>
-              <a:t>What's on </a:t>
-            </a:r>
-            <a:r>
-              <a:rPr lang="en-US" sz="4800" smtClean="0"/>
-              <a:t>the agenda?</a:t>
-            </a:r>
-            <a:endParaRPr lang="en-US" sz="4800" dirty="0"/>
-          </a:p>
-        </p:txBody>
-      </p:sp>
-      <p:sp>
-        <p:nvSpPr>
-          <p:cNvPr id="3" name="Content Placeholder 2"/>
-          <p:cNvSpPr>
-            <a:spLocks noGrp="1"/>
-          </p:cNvSpPr>
-          <p:nvPr>
-            <p:ph idx="1"/>
-          </p:nvPr>
-        </p:nvSpPr>
-        <p:spPr>
-          <a:xfrm>
-            <a:off x="838200" y="1825624"/>
-            <a:ext cx="10515600" cy="4589923"/>
-          </a:xfrm>
-        </p:spPr>
-        <p:txBody>
-          <a:bodyPr>
-            <a:normAutofit/>
-          </a:bodyPr>
-          <a:lstStyle/>
-          <a:p>
-            <a:r>
-              <a:rPr lang="en-US" sz="4000" dirty="0" smtClean="0"/>
-              <a:t>Define "cross cutting" security concerns</a:t>
-            </a:r>
-          </a:p>
-          <a:p>
-            <a:endParaRPr lang="en-US" sz="4000" dirty="0"/>
-          </a:p>
-          <a:p>
-            <a:r>
-              <a:rPr lang="en-US" sz="4000" dirty="0" smtClean="0"/>
-              <a:t>&lt;x&gt; real-world examples (</a:t>
-            </a:r>
-            <a:r>
-              <a:rPr lang="en-US" sz="4000" i="1" dirty="0" smtClean="0"/>
-              <a:t>.NET and JS</a:t>
-            </a:r>
-            <a:r>
-              <a:rPr lang="en-US" sz="4000" dirty="0" smtClean="0"/>
-              <a:t>)</a:t>
-            </a:r>
-          </a:p>
-          <a:p>
-            <a:endParaRPr lang="en-US" sz="4000" dirty="0"/>
-          </a:p>
-          <a:p>
-            <a:r>
-              <a:rPr lang="en-US" sz="4000" dirty="0" smtClean="0"/>
-              <a:t>???</a:t>
-            </a:r>
-          </a:p>
-          <a:p>
-            <a:endParaRPr lang="en-US" sz="4000" dirty="0"/>
-          </a:p>
-          <a:p>
-            <a:endParaRPr lang="en-US" sz="4000" dirty="0" smtClean="0"/>
-          </a:p>
-          <a:p>
-            <a:endParaRPr lang="en-US" sz="4000" dirty="0" smtClean="0"/>
-          </a:p>
-          <a:p>
-            <a:endParaRPr lang="en-US" dirty="0" smtClean="0"/>
-          </a:p>
-          <a:p>
-            <a:endParaRPr lang="en-US" dirty="0" smtClean="0"/>
-          </a:p>
-          <a:p>
-            <a:endParaRPr lang="en-US" dirty="0"/>
-          </a:p>
-        </p:txBody>
-      </p:sp>
-    </p:spTree>
-    <p:extLst>
-      <p:ext uri="{BB962C8B-B14F-4D97-AF65-F5344CB8AC3E}">
-        <p14:creationId xmlns:p14="http://schemas.microsoft.com/office/powerpoint/2010/main" val="2651230507"/>
-      </p:ext>
-    </p:extLst>
-  </p:cSld>
-  <p:clrMapOvr>
-    <a:masterClrMapping/>
-  </p:clrMapOvr>
-  <p:timing>
-    <p:tnLst>
-      <p:par>
-        <p:cTn id="1" dur="indefinite" restart="never" nodeType="tmRoot"/>
-      </p:par>
-    </p:tnLst>
-  </p:timing>
-</p:sld>
-</file>
-
-<file path=ppt/slides/slide50.xml><?xml version="1.0" encoding="utf-8"?>
+<file path=ppt/slides/slide55.xml><?xml version="1.0" encoding="utf-8"?>
 <p:sld xmlns:a="http://schemas.openxmlformats.org/drawingml/2006/main" xmlns:r="http://schemas.openxmlformats.org/officeDocument/2006/relationships" xmlns:p="http://schemas.openxmlformats.org/presentationml/2006/main">
   <p:cSld>
     <p:spTree>
@@ -13761,7 +14996,7 @@
 </p:sld>
 </file>
 
-<file path=ppt/slides/slide51.xml><?xml version="1.0" encoding="utf-8"?>
+<file path=ppt/slides/slide56.xml><?xml version="1.0" encoding="utf-8"?>
 <p:sld xmlns:a="http://schemas.openxmlformats.org/drawingml/2006/main" xmlns:r="http://schemas.openxmlformats.org/officeDocument/2006/relationships" xmlns:p="http://schemas.openxmlformats.org/presentationml/2006/main">
   <p:cSld>
     <p:spTree>

</xml_diff>

<commit_message>
Added a portion of the "audit" narrative
</commit_message>
<xml_diff>
--- a/Secure Systems - CodeMash 2017.pptx
+++ b/Secure Systems - CodeMash 2017.pptx
@@ -5,7 +5,7 @@
     <p:sldMasterId id="2147483749" r:id="rId1"/>
   </p:sldMasterIdLst>
   <p:notesMasterIdLst>
-    <p:notesMasterId r:id="rId62"/>
+    <p:notesMasterId r:id="rId66"/>
   </p:notesMasterIdLst>
   <p:sldIdLst>
     <p:sldId id="395" r:id="rId2"/>
@@ -65,9 +65,13 @@
     <p:sldId id="533" r:id="rId56"/>
     <p:sldId id="554" r:id="rId57"/>
     <p:sldId id="530" r:id="rId58"/>
-    <p:sldId id="504" r:id="rId59"/>
-    <p:sldId id="485" r:id="rId60"/>
-    <p:sldId id="443" r:id="rId61"/>
+    <p:sldId id="555" r:id="rId59"/>
+    <p:sldId id="556" r:id="rId60"/>
+    <p:sldId id="557" r:id="rId61"/>
+    <p:sldId id="558" r:id="rId62"/>
+    <p:sldId id="504" r:id="rId63"/>
+    <p:sldId id="485" r:id="rId64"/>
+    <p:sldId id="443" r:id="rId65"/>
   </p:sldIdLst>
   <p:sldSz cx="12192000" cy="6858000"/>
   <p:notesSz cx="6858000" cy="9144000"/>
@@ -293,7 +297,7 @@
           <a:p>
             <a:fld id="{C54A4886-B4AF-42F7-97BE-95CDF82A73E3}" type="datetimeFigureOut">
               <a:rPr lang="en-US" smtClean="0"/>
-              <a:t>12/28/2016</a:t>
+              <a:t>1/2/2017</a:t>
             </a:fld>
             <a:endParaRPr lang="en-US"/>
           </a:p>
@@ -5370,7 +5374,7 @@
     </p:spTree>
     <p:extLst>
       <p:ext uri="{BB962C8B-B14F-4D97-AF65-F5344CB8AC3E}">
-        <p14:creationId xmlns:p14="http://schemas.microsoft.com/office/powerpoint/2010/main" val="2602777311"/>
+        <p14:creationId xmlns:p14="http://schemas.microsoft.com/office/powerpoint/2010/main" val="2079785236"/>
       </p:ext>
     </p:extLst>
   </p:cSld>
@@ -5454,7 +5458,7 @@
     </p:spTree>
     <p:extLst>
       <p:ext uri="{BB962C8B-B14F-4D97-AF65-F5344CB8AC3E}">
-        <p14:creationId xmlns:p14="http://schemas.microsoft.com/office/powerpoint/2010/main" val="2267138517"/>
+        <p14:creationId xmlns:p14="http://schemas.microsoft.com/office/powerpoint/2010/main" val="1664318980"/>
       </p:ext>
     </p:extLst>
   </p:cSld>
@@ -5592,6 +5596,342 @@
           <a:bodyPr/>
           <a:lstStyle/>
           <a:p>
+            <a:endParaRPr lang="en-US" b="0" dirty="0" smtClean="0"/>
+          </a:p>
+        </p:txBody>
+      </p:sp>
+      <p:sp>
+        <p:nvSpPr>
+          <p:cNvPr id="4" name="Slide Number Placeholder 3"/>
+          <p:cNvSpPr>
+            <a:spLocks noGrp="1"/>
+          </p:cNvSpPr>
+          <p:nvPr>
+            <p:ph type="sldNum" sz="quarter" idx="10"/>
+          </p:nvPr>
+        </p:nvSpPr>
+        <p:spPr/>
+        <p:txBody>
+          <a:bodyPr/>
+          <a:lstStyle/>
+          <a:p>
+            <a:fld id="{89029652-62E7-43D6-83B5-097D7B7AA5D8}" type="slidenum">
+              <a:rPr lang="en-US" smtClean="0"/>
+              <a:t>60</a:t>
+            </a:fld>
+            <a:endParaRPr lang="en-US"/>
+          </a:p>
+        </p:txBody>
+      </p:sp>
+    </p:spTree>
+    <p:extLst>
+      <p:ext uri="{BB962C8B-B14F-4D97-AF65-F5344CB8AC3E}">
+        <p14:creationId xmlns:p14="http://schemas.microsoft.com/office/powerpoint/2010/main" val="1581406028"/>
+      </p:ext>
+    </p:extLst>
+  </p:cSld>
+  <p:clrMapOvr>
+    <a:masterClrMapping/>
+  </p:clrMapOvr>
+</p:notes>
+</file>
+
+<file path=ppt/notesSlides/notesSlide61.xml><?xml version="1.0" encoding="utf-8"?>
+<p:notes xmlns:a="http://schemas.openxmlformats.org/drawingml/2006/main" xmlns:r="http://schemas.openxmlformats.org/officeDocument/2006/relationships" xmlns:p="http://schemas.openxmlformats.org/presentationml/2006/main">
+  <p:cSld>
+    <p:spTree>
+      <p:nvGrpSpPr>
+        <p:cNvPr id="1" name=""/>
+        <p:cNvGrpSpPr/>
+        <p:nvPr/>
+      </p:nvGrpSpPr>
+      <p:grpSpPr>
+        <a:xfrm>
+          <a:off x="0" y="0"/>
+          <a:ext cx="0" cy="0"/>
+          <a:chOff x="0" y="0"/>
+          <a:chExt cx="0" cy="0"/>
+        </a:xfrm>
+      </p:grpSpPr>
+      <p:sp>
+        <p:nvSpPr>
+          <p:cNvPr id="2" name="Slide Image Placeholder 1"/>
+          <p:cNvSpPr>
+            <a:spLocks noGrp="1" noRot="1" noChangeAspect="1"/>
+          </p:cNvSpPr>
+          <p:nvPr>
+            <p:ph type="sldImg"/>
+          </p:nvPr>
+        </p:nvSpPr>
+        <p:spPr/>
+      </p:sp>
+      <p:sp>
+        <p:nvSpPr>
+          <p:cNvPr id="3" name="Notes Placeholder 2"/>
+          <p:cNvSpPr>
+            <a:spLocks noGrp="1"/>
+          </p:cNvSpPr>
+          <p:nvPr>
+            <p:ph type="body" idx="1"/>
+          </p:nvPr>
+        </p:nvSpPr>
+        <p:spPr/>
+        <p:txBody>
+          <a:bodyPr/>
+          <a:lstStyle/>
+          <a:p>
+            <a:endParaRPr lang="en-US" b="0" dirty="0" smtClean="0"/>
+          </a:p>
+        </p:txBody>
+      </p:sp>
+      <p:sp>
+        <p:nvSpPr>
+          <p:cNvPr id="4" name="Slide Number Placeholder 3"/>
+          <p:cNvSpPr>
+            <a:spLocks noGrp="1"/>
+          </p:cNvSpPr>
+          <p:nvPr>
+            <p:ph type="sldNum" sz="quarter" idx="10"/>
+          </p:nvPr>
+        </p:nvSpPr>
+        <p:spPr/>
+        <p:txBody>
+          <a:bodyPr/>
+          <a:lstStyle/>
+          <a:p>
+            <a:fld id="{89029652-62E7-43D6-83B5-097D7B7AA5D8}" type="slidenum">
+              <a:rPr lang="en-US" smtClean="0"/>
+              <a:t>61</a:t>
+            </a:fld>
+            <a:endParaRPr lang="en-US"/>
+          </a:p>
+        </p:txBody>
+      </p:sp>
+    </p:spTree>
+    <p:extLst>
+      <p:ext uri="{BB962C8B-B14F-4D97-AF65-F5344CB8AC3E}">
+        <p14:creationId xmlns:p14="http://schemas.microsoft.com/office/powerpoint/2010/main" val="299799724"/>
+      </p:ext>
+    </p:extLst>
+  </p:cSld>
+  <p:clrMapOvr>
+    <a:masterClrMapping/>
+  </p:clrMapOvr>
+</p:notes>
+</file>
+
+<file path=ppt/notesSlides/notesSlide62.xml><?xml version="1.0" encoding="utf-8"?>
+<p:notes xmlns:a="http://schemas.openxmlformats.org/drawingml/2006/main" xmlns:r="http://schemas.openxmlformats.org/officeDocument/2006/relationships" xmlns:p="http://schemas.openxmlformats.org/presentationml/2006/main">
+  <p:cSld>
+    <p:spTree>
+      <p:nvGrpSpPr>
+        <p:cNvPr id="1" name=""/>
+        <p:cNvGrpSpPr/>
+        <p:nvPr/>
+      </p:nvGrpSpPr>
+      <p:grpSpPr>
+        <a:xfrm>
+          <a:off x="0" y="0"/>
+          <a:ext cx="0" cy="0"/>
+          <a:chOff x="0" y="0"/>
+          <a:chExt cx="0" cy="0"/>
+        </a:xfrm>
+      </p:grpSpPr>
+      <p:sp>
+        <p:nvSpPr>
+          <p:cNvPr id="2" name="Slide Image Placeholder 1"/>
+          <p:cNvSpPr>
+            <a:spLocks noGrp="1" noRot="1" noChangeAspect="1"/>
+          </p:cNvSpPr>
+          <p:nvPr>
+            <p:ph type="sldImg"/>
+          </p:nvPr>
+        </p:nvSpPr>
+        <p:spPr/>
+      </p:sp>
+      <p:sp>
+        <p:nvSpPr>
+          <p:cNvPr id="3" name="Notes Placeholder 2"/>
+          <p:cNvSpPr>
+            <a:spLocks noGrp="1"/>
+          </p:cNvSpPr>
+          <p:nvPr>
+            <p:ph type="body" idx="1"/>
+          </p:nvPr>
+        </p:nvSpPr>
+        <p:spPr/>
+        <p:txBody>
+          <a:bodyPr/>
+          <a:lstStyle/>
+          <a:p>
+            <a:endParaRPr lang="en-US" b="0" dirty="0" smtClean="0"/>
+          </a:p>
+        </p:txBody>
+      </p:sp>
+      <p:sp>
+        <p:nvSpPr>
+          <p:cNvPr id="4" name="Slide Number Placeholder 3"/>
+          <p:cNvSpPr>
+            <a:spLocks noGrp="1"/>
+          </p:cNvSpPr>
+          <p:nvPr>
+            <p:ph type="sldNum" sz="quarter" idx="10"/>
+          </p:nvPr>
+        </p:nvSpPr>
+        <p:spPr/>
+        <p:txBody>
+          <a:bodyPr/>
+          <a:lstStyle/>
+          <a:p>
+            <a:fld id="{89029652-62E7-43D6-83B5-097D7B7AA5D8}" type="slidenum">
+              <a:rPr lang="en-US" smtClean="0"/>
+              <a:t>62</a:t>
+            </a:fld>
+            <a:endParaRPr lang="en-US"/>
+          </a:p>
+        </p:txBody>
+      </p:sp>
+    </p:spTree>
+    <p:extLst>
+      <p:ext uri="{BB962C8B-B14F-4D97-AF65-F5344CB8AC3E}">
+        <p14:creationId xmlns:p14="http://schemas.microsoft.com/office/powerpoint/2010/main" val="2602777311"/>
+      </p:ext>
+    </p:extLst>
+  </p:cSld>
+  <p:clrMapOvr>
+    <a:masterClrMapping/>
+  </p:clrMapOvr>
+</p:notes>
+</file>
+
+<file path=ppt/notesSlides/notesSlide63.xml><?xml version="1.0" encoding="utf-8"?>
+<p:notes xmlns:a="http://schemas.openxmlformats.org/drawingml/2006/main" xmlns:r="http://schemas.openxmlformats.org/officeDocument/2006/relationships" xmlns:p="http://schemas.openxmlformats.org/presentationml/2006/main">
+  <p:cSld>
+    <p:spTree>
+      <p:nvGrpSpPr>
+        <p:cNvPr id="1" name=""/>
+        <p:cNvGrpSpPr/>
+        <p:nvPr/>
+      </p:nvGrpSpPr>
+      <p:grpSpPr>
+        <a:xfrm>
+          <a:off x="0" y="0"/>
+          <a:ext cx="0" cy="0"/>
+          <a:chOff x="0" y="0"/>
+          <a:chExt cx="0" cy="0"/>
+        </a:xfrm>
+      </p:grpSpPr>
+      <p:sp>
+        <p:nvSpPr>
+          <p:cNvPr id="2" name="Slide Image Placeholder 1"/>
+          <p:cNvSpPr>
+            <a:spLocks noGrp="1" noRot="1" noChangeAspect="1"/>
+          </p:cNvSpPr>
+          <p:nvPr>
+            <p:ph type="sldImg"/>
+          </p:nvPr>
+        </p:nvSpPr>
+        <p:spPr/>
+      </p:sp>
+      <p:sp>
+        <p:nvSpPr>
+          <p:cNvPr id="3" name="Notes Placeholder 2"/>
+          <p:cNvSpPr>
+            <a:spLocks noGrp="1"/>
+          </p:cNvSpPr>
+          <p:nvPr>
+            <p:ph type="body" idx="1"/>
+          </p:nvPr>
+        </p:nvSpPr>
+        <p:spPr/>
+        <p:txBody>
+          <a:bodyPr/>
+          <a:lstStyle/>
+          <a:p>
+            <a:endParaRPr lang="en-US" b="0" dirty="0" smtClean="0"/>
+          </a:p>
+        </p:txBody>
+      </p:sp>
+      <p:sp>
+        <p:nvSpPr>
+          <p:cNvPr id="4" name="Slide Number Placeholder 3"/>
+          <p:cNvSpPr>
+            <a:spLocks noGrp="1"/>
+          </p:cNvSpPr>
+          <p:nvPr>
+            <p:ph type="sldNum" sz="quarter" idx="10"/>
+          </p:nvPr>
+        </p:nvSpPr>
+        <p:spPr/>
+        <p:txBody>
+          <a:bodyPr/>
+          <a:lstStyle/>
+          <a:p>
+            <a:fld id="{89029652-62E7-43D6-83B5-097D7B7AA5D8}" type="slidenum">
+              <a:rPr lang="en-US" smtClean="0"/>
+              <a:t>63</a:t>
+            </a:fld>
+            <a:endParaRPr lang="en-US"/>
+          </a:p>
+        </p:txBody>
+      </p:sp>
+    </p:spTree>
+    <p:extLst>
+      <p:ext uri="{BB962C8B-B14F-4D97-AF65-F5344CB8AC3E}">
+        <p14:creationId xmlns:p14="http://schemas.microsoft.com/office/powerpoint/2010/main" val="2267138517"/>
+      </p:ext>
+    </p:extLst>
+  </p:cSld>
+  <p:clrMapOvr>
+    <a:masterClrMapping/>
+  </p:clrMapOvr>
+</p:notes>
+</file>
+
+<file path=ppt/notesSlides/notesSlide64.xml><?xml version="1.0" encoding="utf-8"?>
+<p:notes xmlns:a="http://schemas.openxmlformats.org/drawingml/2006/main" xmlns:r="http://schemas.openxmlformats.org/officeDocument/2006/relationships" xmlns:p="http://schemas.openxmlformats.org/presentationml/2006/main">
+  <p:cSld>
+    <p:spTree>
+      <p:nvGrpSpPr>
+        <p:cNvPr id="1" name=""/>
+        <p:cNvGrpSpPr/>
+        <p:nvPr/>
+      </p:nvGrpSpPr>
+      <p:grpSpPr>
+        <a:xfrm>
+          <a:off x="0" y="0"/>
+          <a:ext cx="0" cy="0"/>
+          <a:chOff x="0" y="0"/>
+          <a:chExt cx="0" cy="0"/>
+        </a:xfrm>
+      </p:grpSpPr>
+      <p:sp>
+        <p:nvSpPr>
+          <p:cNvPr id="2" name="Slide Image Placeholder 1"/>
+          <p:cNvSpPr>
+            <a:spLocks noGrp="1" noRot="1" noChangeAspect="1"/>
+          </p:cNvSpPr>
+          <p:nvPr>
+            <p:ph type="sldImg"/>
+          </p:nvPr>
+        </p:nvSpPr>
+        <p:spPr/>
+      </p:sp>
+      <p:sp>
+        <p:nvSpPr>
+          <p:cNvPr id="3" name="Notes Placeholder 2"/>
+          <p:cNvSpPr>
+            <a:spLocks noGrp="1"/>
+          </p:cNvSpPr>
+          <p:nvPr>
+            <p:ph type="body" idx="1"/>
+          </p:nvPr>
+        </p:nvSpPr>
+        <p:spPr/>
+        <p:txBody>
+          <a:bodyPr/>
+          <a:lstStyle/>
+          <a:p>
             <a:endParaRPr lang="en-US" sz="1200" kern="1200" dirty="0" smtClean="0">
               <a:solidFill>
                 <a:schemeClr val="tx1"/>
@@ -5621,7 +5961,7 @@
           <a:p>
             <a:fld id="{89029652-62E7-43D6-83B5-097D7B7AA5D8}" type="slidenum">
               <a:rPr lang="en-US" smtClean="0"/>
-              <a:t>60</a:t>
+              <a:t>64</a:t>
             </a:fld>
             <a:endParaRPr lang="en-US"/>
           </a:p>
@@ -6023,7 +6363,7 @@
           <a:p>
             <a:fld id="{75AA6396-395E-4ADA-8EE5-F328BC863A04}" type="datetimeFigureOut">
               <a:rPr lang="en-US" smtClean="0"/>
-              <a:t>12/28/2016</a:t>
+              <a:t>1/2/2017</a:t>
             </a:fld>
             <a:endParaRPr lang="en-US"/>
           </a:p>
@@ -6200,7 +6540,7 @@
           <a:p>
             <a:fld id="{75AA6396-395E-4ADA-8EE5-F328BC863A04}" type="datetimeFigureOut">
               <a:rPr lang="en-US" smtClean="0"/>
-              <a:t>12/28/2016</a:t>
+              <a:t>1/2/2017</a:t>
             </a:fld>
             <a:endParaRPr lang="en-US"/>
           </a:p>
@@ -6380,7 +6720,7 @@
           <a:p>
             <a:fld id="{75AA6396-395E-4ADA-8EE5-F328BC863A04}" type="datetimeFigureOut">
               <a:rPr lang="en-US" smtClean="0"/>
-              <a:t>12/28/2016</a:t>
+              <a:t>1/2/2017</a:t>
             </a:fld>
             <a:endParaRPr lang="en-US"/>
           </a:p>
@@ -6600,7 +6940,7 @@
           <a:p>
             <a:fld id="{75AA6396-395E-4ADA-8EE5-F328BC863A04}" type="datetimeFigureOut">
               <a:rPr lang="en-US" smtClean="0"/>
-              <a:t>12/28/2016</a:t>
+              <a:t>1/2/2017</a:t>
             </a:fld>
             <a:endParaRPr lang="en-US"/>
           </a:p>
@@ -6853,7 +7193,7 @@
           <a:p>
             <a:fld id="{75AA6396-395E-4ADA-8EE5-F328BC863A04}" type="datetimeFigureOut">
               <a:rPr lang="en-US" smtClean="0"/>
-              <a:t>12/28/2016</a:t>
+              <a:t>1/2/2017</a:t>
             </a:fld>
             <a:endParaRPr lang="en-US"/>
           </a:p>
@@ -7092,7 +7432,7 @@
           <a:p>
             <a:fld id="{75AA6396-395E-4ADA-8EE5-F328BC863A04}" type="datetimeFigureOut">
               <a:rPr lang="en-US" smtClean="0"/>
-              <a:t>12/28/2016</a:t>
+              <a:t>1/2/2017</a:t>
             </a:fld>
             <a:endParaRPr lang="en-US"/>
           </a:p>
@@ -7466,7 +7806,7 @@
           <a:p>
             <a:fld id="{75AA6396-395E-4ADA-8EE5-F328BC863A04}" type="datetimeFigureOut">
               <a:rPr lang="en-US" smtClean="0"/>
-              <a:t>12/28/2016</a:t>
+              <a:t>1/2/2017</a:t>
             </a:fld>
             <a:endParaRPr lang="en-US"/>
           </a:p>
@@ -7584,7 +7924,7 @@
           <a:p>
             <a:fld id="{75AA6396-395E-4ADA-8EE5-F328BC863A04}" type="datetimeFigureOut">
               <a:rPr lang="en-US" smtClean="0"/>
-              <a:t>12/28/2016</a:t>
+              <a:t>1/2/2017</a:t>
             </a:fld>
             <a:endParaRPr lang="en-US"/>
           </a:p>
@@ -7679,7 +8019,7 @@
           <a:p>
             <a:fld id="{75AA6396-395E-4ADA-8EE5-F328BC863A04}" type="datetimeFigureOut">
               <a:rPr lang="en-US" smtClean="0"/>
-              <a:t>12/28/2016</a:t>
+              <a:t>1/2/2017</a:t>
             </a:fld>
             <a:endParaRPr lang="en-US"/>
           </a:p>
@@ -7956,7 +8296,7 @@
           <a:p>
             <a:fld id="{75AA6396-395E-4ADA-8EE5-F328BC863A04}" type="datetimeFigureOut">
               <a:rPr lang="en-US" smtClean="0"/>
-              <a:t>12/28/2016</a:t>
+              <a:t>1/2/2017</a:t>
             </a:fld>
             <a:endParaRPr lang="en-US"/>
           </a:p>
@@ -8209,7 +8549,7 @@
           <a:p>
             <a:fld id="{75AA6396-395E-4ADA-8EE5-F328BC863A04}" type="datetimeFigureOut">
               <a:rPr lang="en-US" smtClean="0"/>
-              <a:t>12/28/2016</a:t>
+              <a:t>1/2/2017</a:t>
             </a:fld>
             <a:endParaRPr lang="en-US"/>
           </a:p>
@@ -8422,7 +8762,7 @@
           <a:p>
             <a:fld id="{75AA6396-395E-4ADA-8EE5-F328BC863A04}" type="datetimeFigureOut">
               <a:rPr lang="en-US" smtClean="0"/>
-              <a:t>12/28/2016</a:t>
+              <a:t>1/2/2017</a:t>
             </a:fld>
             <a:endParaRPr lang="en-US"/>
           </a:p>
@@ -10778,11 +11118,7 @@
           <a:p>
             <a:r>
               <a:rPr lang="en-US" sz="4800" dirty="0" smtClean="0"/>
-              <a:t>What </a:t>
-            </a:r>
-            <a:r>
-              <a:rPr lang="en-US" sz="4800" dirty="0" smtClean="0"/>
-              <a:t>belongs in the "framework"?</a:t>
+              <a:t>What belongs in the "framework"?</a:t>
             </a:r>
             <a:endParaRPr lang="en-US" sz="4800" dirty="0"/>
           </a:p>
@@ -10821,11 +11157,7 @@
           <a:p>
             <a:r>
               <a:rPr lang="en-US" sz="4000" dirty="0" smtClean="0"/>
-              <a:t>Anything that can </a:t>
-            </a:r>
-            <a:r>
-              <a:rPr lang="en-US" sz="4000" dirty="0" smtClean="0"/>
-              <a:t>be made "secure by default"</a:t>
+              <a:t>Anything that can be made "secure by default"</a:t>
             </a:r>
           </a:p>
           <a:p>
@@ -10836,7 +11168,6 @@
               <a:rPr lang="en-US" sz="4000" dirty="0" smtClean="0"/>
               <a:t>Anything that needs auditing / global testing</a:t>
             </a:r>
-            <a:endParaRPr lang="en-US" sz="4000" dirty="0" smtClean="0"/>
           </a:p>
           <a:p>
             <a:endParaRPr lang="en-US" sz="4000" dirty="0"/>
@@ -14132,10 +14463,6 @@
               <a:rPr lang="en-US" sz="4800" dirty="0" smtClean="0"/>
               <a:t>Page-level Authorization</a:t>
             </a:r>
-            <a:r>
-              <a:rPr lang="en-US" sz="4800" dirty="0" smtClean="0"/>
-              <a:t/>
-            </a:r>
             <a:br>
               <a:rPr lang="en-US" sz="4800" dirty="0" smtClean="0"/>
             </a:br>
@@ -14152,23 +14479,7 @@
                   <a:srgbClr val="013947"/>
                 </a:solidFill>
               </a:rPr>
-              <a:t>Security </a:t>
-            </a:r>
-            <a:r>
-              <a:rPr lang="en-US" dirty="0" smtClean="0">
-                <a:solidFill>
-                  <a:srgbClr val="013947"/>
-                </a:solidFill>
-              </a:rPr>
-              <a:t>by obscurity </a:t>
-            </a:r>
-            <a:r>
-              <a:rPr lang="en-US" dirty="0" smtClean="0">
-                <a:solidFill>
-                  <a:srgbClr val="013947"/>
-                </a:solidFill>
-              </a:rPr>
-              <a:t>is weak sauce</a:t>
+              <a:t>Security by obscurity is weak sauce</a:t>
             </a:r>
             <a:endParaRPr lang="en-US" sz="4800" dirty="0">
               <a:solidFill>
@@ -15487,15 +15798,7 @@
           <a:p>
             <a:r>
               <a:rPr lang="en-US" sz="4800" dirty="0" smtClean="0"/>
-              <a:t>Page Authorization </a:t>
-            </a:r>
-            <a:r>
-              <a:rPr lang="en-US" sz="4800" dirty="0"/>
-              <a:t>– </a:t>
-            </a:r>
-            <a:r>
-              <a:rPr lang="en-US" sz="4800" dirty="0" smtClean="0"/>
-              <a:t>auditing</a:t>
+              <a:t>Authorization auditing</a:t>
             </a:r>
             <a:endParaRPr lang="en-US" sz="4800" dirty="0"/>
           </a:p>
@@ -15615,8 +15918,8 @@
           <a:lstStyle/>
           <a:p>
             <a:r>
-              <a:rPr lang="en-US" sz="4800" dirty="0" smtClean="0"/>
-              <a:t>Patented step-by-step slide</a:t>
+              <a:rPr lang="en-US" sz="4800" dirty="0"/>
+              <a:t>Authorization auditing</a:t>
             </a:r>
             <a:endParaRPr lang="en-US" sz="4800" dirty="0"/>
           </a:p>
@@ -15644,40 +15947,6 @@
           </a:bodyPr>
           <a:lstStyle/>
           <a:p>
-            <a:r>
-              <a:rPr lang="en-US" sz="4000" dirty="0" smtClean="0">
-                <a:solidFill>
-                  <a:schemeClr val="bg1">
-                    <a:lumMod val="65000"/>
-                  </a:schemeClr>
-                </a:solidFill>
-              </a:rPr>
-              <a:t>Old news</a:t>
-            </a:r>
-            <a:br>
-              <a:rPr lang="en-US" sz="4000" dirty="0" smtClean="0">
-                <a:solidFill>
-                  <a:schemeClr val="bg1">
-                    <a:lumMod val="65000"/>
-                  </a:schemeClr>
-                </a:solidFill>
-              </a:rPr>
-            </a:br>
-            <a:endParaRPr lang="en-US" sz="4000" dirty="0" smtClean="0">
-              <a:solidFill>
-                <a:schemeClr val="bg1">
-                  <a:lumMod val="65000"/>
-                </a:schemeClr>
-              </a:solidFill>
-            </a:endParaRPr>
-          </a:p>
-          <a:p>
-            <a:r>
-              <a:rPr lang="en-US" sz="4000" b="1" dirty="0" smtClean="0"/>
-              <a:t>New hotness</a:t>
-            </a:r>
-          </a:p>
-          <a:p>
             <a:endParaRPr lang="en-US" sz="4000" dirty="0" smtClean="0"/>
           </a:p>
           <a:p>
@@ -15691,10 +15960,34 @@
           </a:p>
         </p:txBody>
       </p:sp>
+      <p:pic>
+        <p:nvPicPr>
+          <p:cNvPr id="5" name="Picture 4"/>
+          <p:cNvPicPr>
+            <a:picLocks noChangeAspect="1"/>
+          </p:cNvPicPr>
+          <p:nvPr/>
+        </p:nvPicPr>
+        <p:blipFill>
+          <a:blip r:embed="rId3"/>
+          <a:stretch>
+            <a:fillRect/>
+          </a:stretch>
+        </p:blipFill>
+        <p:spPr>
+          <a:xfrm>
+            <a:off x="838200" y="1690688"/>
+            <a:ext cx="8817773" cy="5005080"/>
+          </a:xfrm>
+          <a:prstGeom prst="rect">
+            <a:avLst/>
+          </a:prstGeom>
+        </p:spPr>
+      </p:pic>
     </p:spTree>
     <p:extLst>
       <p:ext uri="{BB962C8B-B14F-4D97-AF65-F5344CB8AC3E}">
-        <p14:creationId xmlns:p14="http://schemas.microsoft.com/office/powerpoint/2010/main" val="1887088746"/>
+        <p14:creationId xmlns:p14="http://schemas.microsoft.com/office/powerpoint/2010/main" val="2488286567"/>
       </p:ext>
     </p:extLst>
   </p:cSld>
@@ -15746,8 +16039,8 @@
           <a:lstStyle/>
           <a:p>
             <a:r>
-              <a:rPr lang="en-US" sz="4800" dirty="0" smtClean="0"/>
-              <a:t>Canonical example: SQL Injection</a:t>
+              <a:rPr lang="en-US" sz="4800" dirty="0"/>
+              <a:t>Authorization auditing</a:t>
             </a:r>
             <a:endParaRPr lang="en-US" sz="4800" dirty="0"/>
           </a:p>
@@ -15788,10 +16081,34 @@
           </a:p>
         </p:txBody>
       </p:sp>
+      <p:pic>
+        <p:nvPicPr>
+          <p:cNvPr id="4" name="Picture 3"/>
+          <p:cNvPicPr>
+            <a:picLocks noChangeAspect="1"/>
+          </p:cNvPicPr>
+          <p:nvPr/>
+        </p:nvPicPr>
+        <p:blipFill>
+          <a:blip r:embed="rId3"/>
+          <a:stretch>
+            <a:fillRect/>
+          </a:stretch>
+        </p:blipFill>
+        <p:spPr>
+          <a:xfrm>
+            <a:off x="838200" y="1378206"/>
+            <a:ext cx="11318310" cy="5479794"/>
+          </a:xfrm>
+          <a:prstGeom prst="rect">
+            <a:avLst/>
+          </a:prstGeom>
+        </p:spPr>
+      </p:pic>
     </p:spTree>
     <p:extLst>
       <p:ext uri="{BB962C8B-B14F-4D97-AF65-F5344CB8AC3E}">
-        <p14:creationId xmlns:p14="http://schemas.microsoft.com/office/powerpoint/2010/main" val="1766242099"/>
+        <p14:creationId xmlns:p14="http://schemas.microsoft.com/office/powerpoint/2010/main" val="3632889154"/>
       </p:ext>
     </p:extLst>
   </p:cSld>
@@ -15895,7 +16212,6 @@
               <a:rPr lang="en-US" sz="4000" dirty="0" smtClean="0"/>
               <a:t>"Secure by default" examples</a:t>
             </a:r>
-            <a:endParaRPr lang="en-US" sz="4000" dirty="0" smtClean="0"/>
           </a:p>
           <a:p>
             <a:endParaRPr lang="en-US" sz="4000" dirty="0"/>
@@ -15970,6 +16286,476 @@
             <p:ph type="title"/>
           </p:nvPr>
         </p:nvSpPr>
+        <p:spPr/>
+        <p:txBody>
+          <a:bodyPr>
+            <a:normAutofit/>
+          </a:bodyPr>
+          <a:lstStyle/>
+          <a:p>
+            <a:r>
+              <a:rPr lang="en-US" sz="4800" dirty="0"/>
+              <a:t>Authorization auditing</a:t>
+            </a:r>
+            <a:endParaRPr lang="en-US" sz="4800" dirty="0"/>
+          </a:p>
+        </p:txBody>
+      </p:sp>
+      <p:sp>
+        <p:nvSpPr>
+          <p:cNvPr id="3" name="Content Placeholder 2"/>
+          <p:cNvSpPr>
+            <a:spLocks noGrp="1"/>
+          </p:cNvSpPr>
+          <p:nvPr>
+            <p:ph idx="1"/>
+          </p:nvPr>
+        </p:nvSpPr>
+        <p:spPr>
+          <a:xfrm>
+            <a:off x="838200" y="1825624"/>
+            <a:ext cx="10515600" cy="4589923"/>
+          </a:xfrm>
+        </p:spPr>
+        <p:txBody>
+          <a:bodyPr>
+            <a:normAutofit/>
+          </a:bodyPr>
+          <a:lstStyle/>
+          <a:p>
+            <a:endParaRPr lang="en-US" sz="4000" dirty="0" smtClean="0"/>
+          </a:p>
+          <a:p>
+            <a:endParaRPr lang="en-US" dirty="0" smtClean="0"/>
+          </a:p>
+          <a:p>
+            <a:endParaRPr lang="en-US" dirty="0" smtClean="0"/>
+          </a:p>
+          <a:p>
+            <a:endParaRPr lang="en-US" dirty="0"/>
+          </a:p>
+        </p:txBody>
+      </p:sp>
+      <p:pic>
+        <p:nvPicPr>
+          <p:cNvPr id="6" name="Picture 5"/>
+          <p:cNvPicPr>
+            <a:picLocks noChangeAspect="1"/>
+          </p:cNvPicPr>
+          <p:nvPr/>
+        </p:nvPicPr>
+        <p:blipFill>
+          <a:blip r:embed="rId3"/>
+          <a:stretch>
+            <a:fillRect/>
+          </a:stretch>
+        </p:blipFill>
+        <p:spPr>
+          <a:xfrm>
+            <a:off x="838200" y="1825624"/>
+            <a:ext cx="8467167" cy="4457189"/>
+          </a:xfrm>
+          <a:prstGeom prst="rect">
+            <a:avLst/>
+          </a:prstGeom>
+        </p:spPr>
+      </p:pic>
+    </p:spTree>
+    <p:extLst>
+      <p:ext uri="{BB962C8B-B14F-4D97-AF65-F5344CB8AC3E}">
+        <p14:creationId xmlns:p14="http://schemas.microsoft.com/office/powerpoint/2010/main" val="1740141571"/>
+      </p:ext>
+    </p:extLst>
+  </p:cSld>
+  <p:clrMapOvr>
+    <a:masterClrMapping/>
+  </p:clrMapOvr>
+  <p:timing>
+    <p:tnLst>
+      <p:par>
+        <p:cTn id="1" dur="indefinite" restart="never" nodeType="tmRoot"/>
+      </p:par>
+    </p:tnLst>
+  </p:timing>
+</p:sld>
+</file>
+
+<file path=ppt/slides/slide61.xml><?xml version="1.0" encoding="utf-8"?>
+<p:sld xmlns:a="http://schemas.openxmlformats.org/drawingml/2006/main" xmlns:r="http://schemas.openxmlformats.org/officeDocument/2006/relationships" xmlns:p="http://schemas.openxmlformats.org/presentationml/2006/main">
+  <p:cSld>
+    <p:spTree>
+      <p:nvGrpSpPr>
+        <p:cNvPr id="1" name=""/>
+        <p:cNvGrpSpPr/>
+        <p:nvPr/>
+      </p:nvGrpSpPr>
+      <p:grpSpPr>
+        <a:xfrm>
+          <a:off x="0" y="0"/>
+          <a:ext cx="0" cy="0"/>
+          <a:chOff x="0" y="0"/>
+          <a:chExt cx="0" cy="0"/>
+        </a:xfrm>
+      </p:grpSpPr>
+      <p:sp>
+        <p:nvSpPr>
+          <p:cNvPr id="2" name="Title 1"/>
+          <p:cNvSpPr>
+            <a:spLocks noGrp="1"/>
+          </p:cNvSpPr>
+          <p:nvPr>
+            <p:ph type="title"/>
+          </p:nvPr>
+        </p:nvSpPr>
+        <p:spPr/>
+        <p:txBody>
+          <a:bodyPr>
+            <a:normAutofit/>
+          </a:bodyPr>
+          <a:lstStyle/>
+          <a:p>
+            <a:r>
+              <a:rPr lang="en-US" sz="4800" dirty="0"/>
+              <a:t>Authorization auditing</a:t>
+            </a:r>
+            <a:endParaRPr lang="en-US" sz="4800" dirty="0"/>
+          </a:p>
+        </p:txBody>
+      </p:sp>
+      <p:sp>
+        <p:nvSpPr>
+          <p:cNvPr id="3" name="Content Placeholder 2"/>
+          <p:cNvSpPr>
+            <a:spLocks noGrp="1"/>
+          </p:cNvSpPr>
+          <p:nvPr>
+            <p:ph idx="1"/>
+          </p:nvPr>
+        </p:nvSpPr>
+        <p:spPr>
+          <a:xfrm>
+            <a:off x="838200" y="1825624"/>
+            <a:ext cx="10515600" cy="4589923"/>
+          </a:xfrm>
+        </p:spPr>
+        <p:txBody>
+          <a:bodyPr>
+            <a:normAutofit/>
+          </a:bodyPr>
+          <a:lstStyle/>
+          <a:p>
+            <a:endParaRPr lang="en-US" sz="4000" dirty="0" smtClean="0"/>
+          </a:p>
+          <a:p>
+            <a:endParaRPr lang="en-US" dirty="0" smtClean="0"/>
+          </a:p>
+          <a:p>
+            <a:endParaRPr lang="en-US" dirty="0" smtClean="0"/>
+          </a:p>
+          <a:p>
+            <a:endParaRPr lang="en-US" dirty="0"/>
+          </a:p>
+        </p:txBody>
+      </p:sp>
+      <p:pic>
+        <p:nvPicPr>
+          <p:cNvPr id="5" name="Picture 4"/>
+          <p:cNvPicPr>
+            <a:picLocks noChangeAspect="1"/>
+          </p:cNvPicPr>
+          <p:nvPr/>
+        </p:nvPicPr>
+        <p:blipFill>
+          <a:blip r:embed="rId3"/>
+          <a:stretch>
+            <a:fillRect/>
+          </a:stretch>
+        </p:blipFill>
+        <p:spPr>
+          <a:xfrm>
+            <a:off x="838200" y="1690688"/>
+            <a:ext cx="8817773" cy="5005080"/>
+          </a:xfrm>
+          <a:prstGeom prst="rect">
+            <a:avLst/>
+          </a:prstGeom>
+        </p:spPr>
+      </p:pic>
+    </p:spTree>
+    <p:extLst>
+      <p:ext uri="{BB962C8B-B14F-4D97-AF65-F5344CB8AC3E}">
+        <p14:creationId xmlns:p14="http://schemas.microsoft.com/office/powerpoint/2010/main" val="99041716"/>
+      </p:ext>
+    </p:extLst>
+  </p:cSld>
+  <p:clrMapOvr>
+    <a:masterClrMapping/>
+  </p:clrMapOvr>
+  <p:timing>
+    <p:tnLst>
+      <p:par>
+        <p:cTn id="1" dur="indefinite" restart="never" nodeType="tmRoot"/>
+      </p:par>
+    </p:tnLst>
+  </p:timing>
+</p:sld>
+</file>
+
+<file path=ppt/slides/slide62.xml><?xml version="1.0" encoding="utf-8"?>
+<p:sld xmlns:a="http://schemas.openxmlformats.org/drawingml/2006/main" xmlns:r="http://schemas.openxmlformats.org/officeDocument/2006/relationships" xmlns:p="http://schemas.openxmlformats.org/presentationml/2006/main">
+  <p:cSld>
+    <p:spTree>
+      <p:nvGrpSpPr>
+        <p:cNvPr id="1" name=""/>
+        <p:cNvGrpSpPr/>
+        <p:nvPr/>
+      </p:nvGrpSpPr>
+      <p:grpSpPr>
+        <a:xfrm>
+          <a:off x="0" y="0"/>
+          <a:ext cx="0" cy="0"/>
+          <a:chOff x="0" y="0"/>
+          <a:chExt cx="0" cy="0"/>
+        </a:xfrm>
+      </p:grpSpPr>
+      <p:sp>
+        <p:nvSpPr>
+          <p:cNvPr id="2" name="Title 1"/>
+          <p:cNvSpPr>
+            <a:spLocks noGrp="1"/>
+          </p:cNvSpPr>
+          <p:nvPr>
+            <p:ph type="title"/>
+          </p:nvPr>
+        </p:nvSpPr>
+        <p:spPr/>
+        <p:txBody>
+          <a:bodyPr>
+            <a:normAutofit/>
+          </a:bodyPr>
+          <a:lstStyle/>
+          <a:p>
+            <a:r>
+              <a:rPr lang="en-US" sz="4800" dirty="0" smtClean="0"/>
+              <a:t>Patented step-by-step slide</a:t>
+            </a:r>
+            <a:endParaRPr lang="en-US" sz="4800" dirty="0"/>
+          </a:p>
+        </p:txBody>
+      </p:sp>
+      <p:sp>
+        <p:nvSpPr>
+          <p:cNvPr id="3" name="Content Placeholder 2"/>
+          <p:cNvSpPr>
+            <a:spLocks noGrp="1"/>
+          </p:cNvSpPr>
+          <p:nvPr>
+            <p:ph idx="1"/>
+          </p:nvPr>
+        </p:nvSpPr>
+        <p:spPr>
+          <a:xfrm>
+            <a:off x="838200" y="1825624"/>
+            <a:ext cx="10515600" cy="4589923"/>
+          </a:xfrm>
+        </p:spPr>
+        <p:txBody>
+          <a:bodyPr>
+            <a:normAutofit/>
+          </a:bodyPr>
+          <a:lstStyle/>
+          <a:p>
+            <a:r>
+              <a:rPr lang="en-US" sz="4000" dirty="0" smtClean="0">
+                <a:solidFill>
+                  <a:schemeClr val="bg1">
+                    <a:lumMod val="65000"/>
+                  </a:schemeClr>
+                </a:solidFill>
+              </a:rPr>
+              <a:t>Old news</a:t>
+            </a:r>
+            <a:br>
+              <a:rPr lang="en-US" sz="4000" dirty="0" smtClean="0">
+                <a:solidFill>
+                  <a:schemeClr val="bg1">
+                    <a:lumMod val="65000"/>
+                  </a:schemeClr>
+                </a:solidFill>
+              </a:rPr>
+            </a:br>
+            <a:endParaRPr lang="en-US" sz="4000" dirty="0" smtClean="0">
+              <a:solidFill>
+                <a:schemeClr val="bg1">
+                  <a:lumMod val="65000"/>
+                </a:schemeClr>
+              </a:solidFill>
+            </a:endParaRPr>
+          </a:p>
+          <a:p>
+            <a:r>
+              <a:rPr lang="en-US" sz="4000" b="1" dirty="0" smtClean="0"/>
+              <a:t>New hotness</a:t>
+            </a:r>
+          </a:p>
+          <a:p>
+            <a:endParaRPr lang="en-US" sz="4000" dirty="0" smtClean="0"/>
+          </a:p>
+          <a:p>
+            <a:endParaRPr lang="en-US" dirty="0" smtClean="0"/>
+          </a:p>
+          <a:p>
+            <a:endParaRPr lang="en-US" dirty="0" smtClean="0"/>
+          </a:p>
+          <a:p>
+            <a:endParaRPr lang="en-US" dirty="0"/>
+          </a:p>
+        </p:txBody>
+      </p:sp>
+    </p:spTree>
+    <p:extLst>
+      <p:ext uri="{BB962C8B-B14F-4D97-AF65-F5344CB8AC3E}">
+        <p14:creationId xmlns:p14="http://schemas.microsoft.com/office/powerpoint/2010/main" val="1887088746"/>
+      </p:ext>
+    </p:extLst>
+  </p:cSld>
+  <p:clrMapOvr>
+    <a:masterClrMapping/>
+  </p:clrMapOvr>
+  <p:timing>
+    <p:tnLst>
+      <p:par>
+        <p:cTn id="1" dur="indefinite" restart="never" nodeType="tmRoot"/>
+      </p:par>
+    </p:tnLst>
+  </p:timing>
+</p:sld>
+</file>
+
+<file path=ppt/slides/slide63.xml><?xml version="1.0" encoding="utf-8"?>
+<p:sld xmlns:a="http://schemas.openxmlformats.org/drawingml/2006/main" xmlns:r="http://schemas.openxmlformats.org/officeDocument/2006/relationships" xmlns:p="http://schemas.openxmlformats.org/presentationml/2006/main">
+  <p:cSld>
+    <p:spTree>
+      <p:nvGrpSpPr>
+        <p:cNvPr id="1" name=""/>
+        <p:cNvGrpSpPr/>
+        <p:nvPr/>
+      </p:nvGrpSpPr>
+      <p:grpSpPr>
+        <a:xfrm>
+          <a:off x="0" y="0"/>
+          <a:ext cx="0" cy="0"/>
+          <a:chOff x="0" y="0"/>
+          <a:chExt cx="0" cy="0"/>
+        </a:xfrm>
+      </p:grpSpPr>
+      <p:sp>
+        <p:nvSpPr>
+          <p:cNvPr id="2" name="Title 1"/>
+          <p:cNvSpPr>
+            <a:spLocks noGrp="1"/>
+          </p:cNvSpPr>
+          <p:nvPr>
+            <p:ph type="title"/>
+          </p:nvPr>
+        </p:nvSpPr>
+        <p:spPr/>
+        <p:txBody>
+          <a:bodyPr>
+            <a:normAutofit/>
+          </a:bodyPr>
+          <a:lstStyle/>
+          <a:p>
+            <a:r>
+              <a:rPr lang="en-US" sz="4800" dirty="0" smtClean="0"/>
+              <a:t>Canonical example: SQL Injection</a:t>
+            </a:r>
+            <a:endParaRPr lang="en-US" sz="4800" dirty="0"/>
+          </a:p>
+        </p:txBody>
+      </p:sp>
+      <p:sp>
+        <p:nvSpPr>
+          <p:cNvPr id="3" name="Content Placeholder 2"/>
+          <p:cNvSpPr>
+            <a:spLocks noGrp="1"/>
+          </p:cNvSpPr>
+          <p:nvPr>
+            <p:ph idx="1"/>
+          </p:nvPr>
+        </p:nvSpPr>
+        <p:spPr>
+          <a:xfrm>
+            <a:off x="838200" y="1825624"/>
+            <a:ext cx="10515600" cy="4589923"/>
+          </a:xfrm>
+        </p:spPr>
+        <p:txBody>
+          <a:bodyPr>
+            <a:normAutofit/>
+          </a:bodyPr>
+          <a:lstStyle/>
+          <a:p>
+            <a:endParaRPr lang="en-US" sz="4000" dirty="0" smtClean="0"/>
+          </a:p>
+          <a:p>
+            <a:endParaRPr lang="en-US" dirty="0" smtClean="0"/>
+          </a:p>
+          <a:p>
+            <a:endParaRPr lang="en-US" dirty="0" smtClean="0"/>
+          </a:p>
+          <a:p>
+            <a:endParaRPr lang="en-US" dirty="0"/>
+          </a:p>
+        </p:txBody>
+      </p:sp>
+    </p:spTree>
+    <p:extLst>
+      <p:ext uri="{BB962C8B-B14F-4D97-AF65-F5344CB8AC3E}">
+        <p14:creationId xmlns:p14="http://schemas.microsoft.com/office/powerpoint/2010/main" val="1766242099"/>
+      </p:ext>
+    </p:extLst>
+  </p:cSld>
+  <p:clrMapOvr>
+    <a:masterClrMapping/>
+  </p:clrMapOvr>
+  <p:timing>
+    <p:tnLst>
+      <p:par>
+        <p:cTn id="1" dur="indefinite" restart="never" nodeType="tmRoot"/>
+      </p:par>
+    </p:tnLst>
+  </p:timing>
+</p:sld>
+</file>
+
+<file path=ppt/slides/slide64.xml><?xml version="1.0" encoding="utf-8"?>
+<p:sld xmlns:a="http://schemas.openxmlformats.org/drawingml/2006/main" xmlns:r="http://schemas.openxmlformats.org/officeDocument/2006/relationships" xmlns:p="http://schemas.openxmlformats.org/presentationml/2006/main">
+  <p:cSld>
+    <p:spTree>
+      <p:nvGrpSpPr>
+        <p:cNvPr id="1" name=""/>
+        <p:cNvGrpSpPr/>
+        <p:nvPr/>
+      </p:nvGrpSpPr>
+      <p:grpSpPr>
+        <a:xfrm>
+          <a:off x="0" y="0"/>
+          <a:ext cx="0" cy="0"/>
+          <a:chOff x="0" y="0"/>
+          <a:chExt cx="0" cy="0"/>
+        </a:xfrm>
+      </p:grpSpPr>
+      <p:sp>
+        <p:nvSpPr>
+          <p:cNvPr id="2" name="Title 1"/>
+          <p:cNvSpPr>
+            <a:spLocks noGrp="1"/>
+          </p:cNvSpPr>
+          <p:nvPr>
+            <p:ph type="title"/>
+          </p:nvPr>
+        </p:nvSpPr>
         <p:spPr>
           <a:xfrm>
             <a:off x="838200" y="365125"/>
@@ -16232,13 +17018,6 @@
               </a:rPr>
               <a:t>"Secure by default" examples</a:t>
             </a:r>
-            <a:endParaRPr lang="en-US" sz="4000" dirty="0" smtClean="0">
-              <a:solidFill>
-                <a:schemeClr val="bg1">
-                  <a:lumMod val="65000"/>
-                </a:schemeClr>
-              </a:solidFill>
-            </a:endParaRPr>
           </a:p>
           <a:p>
             <a:endParaRPr lang="en-US" sz="4000" dirty="0"/>
@@ -16391,13 +17170,6 @@
               </a:rPr>
               <a:t>"Secure by default" examples</a:t>
             </a:r>
-            <a:endParaRPr lang="en-US" sz="4000" dirty="0" smtClean="0">
-              <a:solidFill>
-                <a:schemeClr val="bg1">
-                  <a:lumMod val="65000"/>
-                </a:schemeClr>
-              </a:solidFill>
-            </a:endParaRPr>
           </a:p>
           <a:p>
             <a:endParaRPr lang="en-US" sz="4000" dirty="0">
@@ -16428,7 +17200,6 @@
               <a:rPr lang="en-US" sz="4000" dirty="0" smtClean="0"/>
               <a:t>Audit / Testing</a:t>
             </a:r>
-            <a:endParaRPr lang="en-US" sz="4000" dirty="0" smtClean="0"/>
           </a:p>
           <a:p>
             <a:endParaRPr lang="en-US" sz="4000" dirty="0"/>

</xml_diff>

<commit_message>
Added some Approval Tests stuff
</commit_message>
<xml_diff>
--- a/Secure Systems - CodeMash 2017.pptx
+++ b/Secure Systems - CodeMash 2017.pptx
@@ -5,7 +5,7 @@
     <p:sldMasterId id="2147483749" r:id="rId1"/>
   </p:sldMasterIdLst>
   <p:notesMasterIdLst>
-    <p:notesMasterId r:id="rId66"/>
+    <p:notesMasterId r:id="rId71"/>
   </p:notesMasterIdLst>
   <p:sldIdLst>
     <p:sldId id="395" r:id="rId2"/>
@@ -69,9 +69,14 @@
     <p:sldId id="556" r:id="rId60"/>
     <p:sldId id="557" r:id="rId61"/>
     <p:sldId id="558" r:id="rId62"/>
-    <p:sldId id="504" r:id="rId63"/>
-    <p:sldId id="485" r:id="rId64"/>
-    <p:sldId id="443" r:id="rId65"/>
+    <p:sldId id="559" r:id="rId63"/>
+    <p:sldId id="560" r:id="rId64"/>
+    <p:sldId id="561" r:id="rId65"/>
+    <p:sldId id="562" r:id="rId66"/>
+    <p:sldId id="563" r:id="rId67"/>
+    <p:sldId id="504" r:id="rId68"/>
+    <p:sldId id="485" r:id="rId69"/>
+    <p:sldId id="443" r:id="rId70"/>
   </p:sldIdLst>
   <p:sldSz cx="12192000" cy="6858000"/>
   <p:notesSz cx="6858000" cy="9144000"/>
@@ -297,7 +302,7 @@
           <a:p>
             <a:fld id="{C54A4886-B4AF-42F7-97BE-95CDF82A73E3}" type="datetimeFigureOut">
               <a:rPr lang="en-US" smtClean="0"/>
-              <a:t>1/2/2017</a:t>
+              <a:t>1/3/2017</a:t>
             </a:fld>
             <a:endParaRPr lang="en-US"/>
           </a:p>
@@ -5794,7 +5799,7 @@
     </p:spTree>
     <p:extLst>
       <p:ext uri="{BB962C8B-B14F-4D97-AF65-F5344CB8AC3E}">
-        <p14:creationId xmlns:p14="http://schemas.microsoft.com/office/powerpoint/2010/main" val="2602777311"/>
+        <p14:creationId xmlns:p14="http://schemas.microsoft.com/office/powerpoint/2010/main" val="2229440876"/>
       </p:ext>
     </p:extLst>
   </p:cSld>
@@ -5878,7 +5883,7 @@
     </p:spTree>
     <p:extLst>
       <p:ext uri="{BB962C8B-B14F-4D97-AF65-F5344CB8AC3E}">
-        <p14:creationId xmlns:p14="http://schemas.microsoft.com/office/powerpoint/2010/main" val="2267138517"/>
+        <p14:creationId xmlns:p14="http://schemas.microsoft.com/office/powerpoint/2010/main" val="994674812"/>
       </p:ext>
     </p:extLst>
   </p:cSld>
@@ -5932,6 +5937,426 @@
           <a:bodyPr/>
           <a:lstStyle/>
           <a:p>
+            <a:endParaRPr lang="en-US" b="0" dirty="0" smtClean="0"/>
+          </a:p>
+        </p:txBody>
+      </p:sp>
+      <p:sp>
+        <p:nvSpPr>
+          <p:cNvPr id="4" name="Slide Number Placeholder 3"/>
+          <p:cNvSpPr>
+            <a:spLocks noGrp="1"/>
+          </p:cNvSpPr>
+          <p:nvPr>
+            <p:ph type="sldNum" sz="quarter" idx="10"/>
+          </p:nvPr>
+        </p:nvSpPr>
+        <p:spPr/>
+        <p:txBody>
+          <a:bodyPr/>
+          <a:lstStyle/>
+          <a:p>
+            <a:fld id="{89029652-62E7-43D6-83B5-097D7B7AA5D8}" type="slidenum">
+              <a:rPr lang="en-US" smtClean="0"/>
+              <a:t>64</a:t>
+            </a:fld>
+            <a:endParaRPr lang="en-US"/>
+          </a:p>
+        </p:txBody>
+      </p:sp>
+    </p:spTree>
+    <p:extLst>
+      <p:ext uri="{BB962C8B-B14F-4D97-AF65-F5344CB8AC3E}">
+        <p14:creationId xmlns:p14="http://schemas.microsoft.com/office/powerpoint/2010/main" val="1004591723"/>
+      </p:ext>
+    </p:extLst>
+  </p:cSld>
+  <p:clrMapOvr>
+    <a:masterClrMapping/>
+  </p:clrMapOvr>
+</p:notes>
+</file>
+
+<file path=ppt/notesSlides/notesSlide65.xml><?xml version="1.0" encoding="utf-8"?>
+<p:notes xmlns:a="http://schemas.openxmlformats.org/drawingml/2006/main" xmlns:r="http://schemas.openxmlformats.org/officeDocument/2006/relationships" xmlns:p="http://schemas.openxmlformats.org/presentationml/2006/main">
+  <p:cSld>
+    <p:spTree>
+      <p:nvGrpSpPr>
+        <p:cNvPr id="1" name=""/>
+        <p:cNvGrpSpPr/>
+        <p:nvPr/>
+      </p:nvGrpSpPr>
+      <p:grpSpPr>
+        <a:xfrm>
+          <a:off x="0" y="0"/>
+          <a:ext cx="0" cy="0"/>
+          <a:chOff x="0" y="0"/>
+          <a:chExt cx="0" cy="0"/>
+        </a:xfrm>
+      </p:grpSpPr>
+      <p:sp>
+        <p:nvSpPr>
+          <p:cNvPr id="2" name="Slide Image Placeholder 1"/>
+          <p:cNvSpPr>
+            <a:spLocks noGrp="1" noRot="1" noChangeAspect="1"/>
+          </p:cNvSpPr>
+          <p:nvPr>
+            <p:ph type="sldImg"/>
+          </p:nvPr>
+        </p:nvSpPr>
+        <p:spPr/>
+      </p:sp>
+      <p:sp>
+        <p:nvSpPr>
+          <p:cNvPr id="3" name="Notes Placeholder 2"/>
+          <p:cNvSpPr>
+            <a:spLocks noGrp="1"/>
+          </p:cNvSpPr>
+          <p:nvPr>
+            <p:ph type="body" idx="1"/>
+          </p:nvPr>
+        </p:nvSpPr>
+        <p:spPr/>
+        <p:txBody>
+          <a:bodyPr/>
+          <a:lstStyle/>
+          <a:p>
+            <a:endParaRPr lang="en-US" b="0" dirty="0" smtClean="0"/>
+          </a:p>
+        </p:txBody>
+      </p:sp>
+      <p:sp>
+        <p:nvSpPr>
+          <p:cNvPr id="4" name="Slide Number Placeholder 3"/>
+          <p:cNvSpPr>
+            <a:spLocks noGrp="1"/>
+          </p:cNvSpPr>
+          <p:nvPr>
+            <p:ph type="sldNum" sz="quarter" idx="10"/>
+          </p:nvPr>
+        </p:nvSpPr>
+        <p:spPr/>
+        <p:txBody>
+          <a:bodyPr/>
+          <a:lstStyle/>
+          <a:p>
+            <a:fld id="{89029652-62E7-43D6-83B5-097D7B7AA5D8}" type="slidenum">
+              <a:rPr lang="en-US" smtClean="0"/>
+              <a:t>65</a:t>
+            </a:fld>
+            <a:endParaRPr lang="en-US"/>
+          </a:p>
+        </p:txBody>
+      </p:sp>
+    </p:spTree>
+    <p:extLst>
+      <p:ext uri="{BB962C8B-B14F-4D97-AF65-F5344CB8AC3E}">
+        <p14:creationId xmlns:p14="http://schemas.microsoft.com/office/powerpoint/2010/main" val="2345448789"/>
+      </p:ext>
+    </p:extLst>
+  </p:cSld>
+  <p:clrMapOvr>
+    <a:masterClrMapping/>
+  </p:clrMapOvr>
+</p:notes>
+</file>
+
+<file path=ppt/notesSlides/notesSlide66.xml><?xml version="1.0" encoding="utf-8"?>
+<p:notes xmlns:a="http://schemas.openxmlformats.org/drawingml/2006/main" xmlns:r="http://schemas.openxmlformats.org/officeDocument/2006/relationships" xmlns:p="http://schemas.openxmlformats.org/presentationml/2006/main">
+  <p:cSld>
+    <p:spTree>
+      <p:nvGrpSpPr>
+        <p:cNvPr id="1" name=""/>
+        <p:cNvGrpSpPr/>
+        <p:nvPr/>
+      </p:nvGrpSpPr>
+      <p:grpSpPr>
+        <a:xfrm>
+          <a:off x="0" y="0"/>
+          <a:ext cx="0" cy="0"/>
+          <a:chOff x="0" y="0"/>
+          <a:chExt cx="0" cy="0"/>
+        </a:xfrm>
+      </p:grpSpPr>
+      <p:sp>
+        <p:nvSpPr>
+          <p:cNvPr id="2" name="Slide Image Placeholder 1"/>
+          <p:cNvSpPr>
+            <a:spLocks noGrp="1" noRot="1" noChangeAspect="1"/>
+          </p:cNvSpPr>
+          <p:nvPr>
+            <p:ph type="sldImg"/>
+          </p:nvPr>
+        </p:nvSpPr>
+        <p:spPr/>
+      </p:sp>
+      <p:sp>
+        <p:nvSpPr>
+          <p:cNvPr id="3" name="Notes Placeholder 2"/>
+          <p:cNvSpPr>
+            <a:spLocks noGrp="1"/>
+          </p:cNvSpPr>
+          <p:nvPr>
+            <p:ph type="body" idx="1"/>
+          </p:nvPr>
+        </p:nvSpPr>
+        <p:spPr/>
+        <p:txBody>
+          <a:bodyPr/>
+          <a:lstStyle/>
+          <a:p>
+            <a:endParaRPr lang="en-US" b="0" dirty="0" smtClean="0"/>
+          </a:p>
+        </p:txBody>
+      </p:sp>
+      <p:sp>
+        <p:nvSpPr>
+          <p:cNvPr id="4" name="Slide Number Placeholder 3"/>
+          <p:cNvSpPr>
+            <a:spLocks noGrp="1"/>
+          </p:cNvSpPr>
+          <p:nvPr>
+            <p:ph type="sldNum" sz="quarter" idx="10"/>
+          </p:nvPr>
+        </p:nvSpPr>
+        <p:spPr/>
+        <p:txBody>
+          <a:bodyPr/>
+          <a:lstStyle/>
+          <a:p>
+            <a:fld id="{89029652-62E7-43D6-83B5-097D7B7AA5D8}" type="slidenum">
+              <a:rPr lang="en-US" smtClean="0"/>
+              <a:t>66</a:t>
+            </a:fld>
+            <a:endParaRPr lang="en-US"/>
+          </a:p>
+        </p:txBody>
+      </p:sp>
+    </p:spTree>
+    <p:extLst>
+      <p:ext uri="{BB962C8B-B14F-4D97-AF65-F5344CB8AC3E}">
+        <p14:creationId xmlns:p14="http://schemas.microsoft.com/office/powerpoint/2010/main" val="397105126"/>
+      </p:ext>
+    </p:extLst>
+  </p:cSld>
+  <p:clrMapOvr>
+    <a:masterClrMapping/>
+  </p:clrMapOvr>
+</p:notes>
+</file>
+
+<file path=ppt/notesSlides/notesSlide67.xml><?xml version="1.0" encoding="utf-8"?>
+<p:notes xmlns:a="http://schemas.openxmlformats.org/drawingml/2006/main" xmlns:r="http://schemas.openxmlformats.org/officeDocument/2006/relationships" xmlns:p="http://schemas.openxmlformats.org/presentationml/2006/main">
+  <p:cSld>
+    <p:spTree>
+      <p:nvGrpSpPr>
+        <p:cNvPr id="1" name=""/>
+        <p:cNvGrpSpPr/>
+        <p:nvPr/>
+      </p:nvGrpSpPr>
+      <p:grpSpPr>
+        <a:xfrm>
+          <a:off x="0" y="0"/>
+          <a:ext cx="0" cy="0"/>
+          <a:chOff x="0" y="0"/>
+          <a:chExt cx="0" cy="0"/>
+        </a:xfrm>
+      </p:grpSpPr>
+      <p:sp>
+        <p:nvSpPr>
+          <p:cNvPr id="2" name="Slide Image Placeholder 1"/>
+          <p:cNvSpPr>
+            <a:spLocks noGrp="1" noRot="1" noChangeAspect="1"/>
+          </p:cNvSpPr>
+          <p:nvPr>
+            <p:ph type="sldImg"/>
+          </p:nvPr>
+        </p:nvSpPr>
+        <p:spPr/>
+      </p:sp>
+      <p:sp>
+        <p:nvSpPr>
+          <p:cNvPr id="3" name="Notes Placeholder 2"/>
+          <p:cNvSpPr>
+            <a:spLocks noGrp="1"/>
+          </p:cNvSpPr>
+          <p:nvPr>
+            <p:ph type="body" idx="1"/>
+          </p:nvPr>
+        </p:nvSpPr>
+        <p:spPr/>
+        <p:txBody>
+          <a:bodyPr/>
+          <a:lstStyle/>
+          <a:p>
+            <a:endParaRPr lang="en-US" b="0" dirty="0" smtClean="0"/>
+          </a:p>
+        </p:txBody>
+      </p:sp>
+      <p:sp>
+        <p:nvSpPr>
+          <p:cNvPr id="4" name="Slide Number Placeholder 3"/>
+          <p:cNvSpPr>
+            <a:spLocks noGrp="1"/>
+          </p:cNvSpPr>
+          <p:nvPr>
+            <p:ph type="sldNum" sz="quarter" idx="10"/>
+          </p:nvPr>
+        </p:nvSpPr>
+        <p:spPr/>
+        <p:txBody>
+          <a:bodyPr/>
+          <a:lstStyle/>
+          <a:p>
+            <a:fld id="{89029652-62E7-43D6-83B5-097D7B7AA5D8}" type="slidenum">
+              <a:rPr lang="en-US" smtClean="0"/>
+              <a:t>67</a:t>
+            </a:fld>
+            <a:endParaRPr lang="en-US"/>
+          </a:p>
+        </p:txBody>
+      </p:sp>
+    </p:spTree>
+    <p:extLst>
+      <p:ext uri="{BB962C8B-B14F-4D97-AF65-F5344CB8AC3E}">
+        <p14:creationId xmlns:p14="http://schemas.microsoft.com/office/powerpoint/2010/main" val="2602777311"/>
+      </p:ext>
+    </p:extLst>
+  </p:cSld>
+  <p:clrMapOvr>
+    <a:masterClrMapping/>
+  </p:clrMapOvr>
+</p:notes>
+</file>
+
+<file path=ppt/notesSlides/notesSlide68.xml><?xml version="1.0" encoding="utf-8"?>
+<p:notes xmlns:a="http://schemas.openxmlformats.org/drawingml/2006/main" xmlns:r="http://schemas.openxmlformats.org/officeDocument/2006/relationships" xmlns:p="http://schemas.openxmlformats.org/presentationml/2006/main">
+  <p:cSld>
+    <p:spTree>
+      <p:nvGrpSpPr>
+        <p:cNvPr id="1" name=""/>
+        <p:cNvGrpSpPr/>
+        <p:nvPr/>
+      </p:nvGrpSpPr>
+      <p:grpSpPr>
+        <a:xfrm>
+          <a:off x="0" y="0"/>
+          <a:ext cx="0" cy="0"/>
+          <a:chOff x="0" y="0"/>
+          <a:chExt cx="0" cy="0"/>
+        </a:xfrm>
+      </p:grpSpPr>
+      <p:sp>
+        <p:nvSpPr>
+          <p:cNvPr id="2" name="Slide Image Placeholder 1"/>
+          <p:cNvSpPr>
+            <a:spLocks noGrp="1" noRot="1" noChangeAspect="1"/>
+          </p:cNvSpPr>
+          <p:nvPr>
+            <p:ph type="sldImg"/>
+          </p:nvPr>
+        </p:nvSpPr>
+        <p:spPr/>
+      </p:sp>
+      <p:sp>
+        <p:nvSpPr>
+          <p:cNvPr id="3" name="Notes Placeholder 2"/>
+          <p:cNvSpPr>
+            <a:spLocks noGrp="1"/>
+          </p:cNvSpPr>
+          <p:nvPr>
+            <p:ph type="body" idx="1"/>
+          </p:nvPr>
+        </p:nvSpPr>
+        <p:spPr/>
+        <p:txBody>
+          <a:bodyPr/>
+          <a:lstStyle/>
+          <a:p>
+            <a:endParaRPr lang="en-US" b="0" dirty="0" smtClean="0"/>
+          </a:p>
+        </p:txBody>
+      </p:sp>
+      <p:sp>
+        <p:nvSpPr>
+          <p:cNvPr id="4" name="Slide Number Placeholder 3"/>
+          <p:cNvSpPr>
+            <a:spLocks noGrp="1"/>
+          </p:cNvSpPr>
+          <p:nvPr>
+            <p:ph type="sldNum" sz="quarter" idx="10"/>
+          </p:nvPr>
+        </p:nvSpPr>
+        <p:spPr/>
+        <p:txBody>
+          <a:bodyPr/>
+          <a:lstStyle/>
+          <a:p>
+            <a:fld id="{89029652-62E7-43D6-83B5-097D7B7AA5D8}" type="slidenum">
+              <a:rPr lang="en-US" smtClean="0"/>
+              <a:t>68</a:t>
+            </a:fld>
+            <a:endParaRPr lang="en-US"/>
+          </a:p>
+        </p:txBody>
+      </p:sp>
+    </p:spTree>
+    <p:extLst>
+      <p:ext uri="{BB962C8B-B14F-4D97-AF65-F5344CB8AC3E}">
+        <p14:creationId xmlns:p14="http://schemas.microsoft.com/office/powerpoint/2010/main" val="2267138517"/>
+      </p:ext>
+    </p:extLst>
+  </p:cSld>
+  <p:clrMapOvr>
+    <a:masterClrMapping/>
+  </p:clrMapOvr>
+</p:notes>
+</file>
+
+<file path=ppt/notesSlides/notesSlide69.xml><?xml version="1.0" encoding="utf-8"?>
+<p:notes xmlns:a="http://schemas.openxmlformats.org/drawingml/2006/main" xmlns:r="http://schemas.openxmlformats.org/officeDocument/2006/relationships" xmlns:p="http://schemas.openxmlformats.org/presentationml/2006/main">
+  <p:cSld>
+    <p:spTree>
+      <p:nvGrpSpPr>
+        <p:cNvPr id="1" name=""/>
+        <p:cNvGrpSpPr/>
+        <p:nvPr/>
+      </p:nvGrpSpPr>
+      <p:grpSpPr>
+        <a:xfrm>
+          <a:off x="0" y="0"/>
+          <a:ext cx="0" cy="0"/>
+          <a:chOff x="0" y="0"/>
+          <a:chExt cx="0" cy="0"/>
+        </a:xfrm>
+      </p:grpSpPr>
+      <p:sp>
+        <p:nvSpPr>
+          <p:cNvPr id="2" name="Slide Image Placeholder 1"/>
+          <p:cNvSpPr>
+            <a:spLocks noGrp="1" noRot="1" noChangeAspect="1"/>
+          </p:cNvSpPr>
+          <p:nvPr>
+            <p:ph type="sldImg"/>
+          </p:nvPr>
+        </p:nvSpPr>
+        <p:spPr/>
+      </p:sp>
+      <p:sp>
+        <p:nvSpPr>
+          <p:cNvPr id="3" name="Notes Placeholder 2"/>
+          <p:cNvSpPr>
+            <a:spLocks noGrp="1"/>
+          </p:cNvSpPr>
+          <p:nvPr>
+            <p:ph type="body" idx="1"/>
+          </p:nvPr>
+        </p:nvSpPr>
+        <p:spPr/>
+        <p:txBody>
+          <a:bodyPr/>
+          <a:lstStyle/>
+          <a:p>
             <a:endParaRPr lang="en-US" sz="1200" kern="1200" dirty="0" smtClean="0">
               <a:solidFill>
                 <a:schemeClr val="tx1"/>
@@ -5961,7 +6386,7 @@
           <a:p>
             <a:fld id="{89029652-62E7-43D6-83B5-097D7B7AA5D8}" type="slidenum">
               <a:rPr lang="en-US" smtClean="0"/>
-              <a:t>64</a:t>
+              <a:t>69</a:t>
             </a:fld>
             <a:endParaRPr lang="en-US"/>
           </a:p>
@@ -6363,7 +6788,7 @@
           <a:p>
             <a:fld id="{75AA6396-395E-4ADA-8EE5-F328BC863A04}" type="datetimeFigureOut">
               <a:rPr lang="en-US" smtClean="0"/>
-              <a:t>1/2/2017</a:t>
+              <a:t>1/3/2017</a:t>
             </a:fld>
             <a:endParaRPr lang="en-US"/>
           </a:p>
@@ -6540,7 +6965,7 @@
           <a:p>
             <a:fld id="{75AA6396-395E-4ADA-8EE5-F328BC863A04}" type="datetimeFigureOut">
               <a:rPr lang="en-US" smtClean="0"/>
-              <a:t>1/2/2017</a:t>
+              <a:t>1/3/2017</a:t>
             </a:fld>
             <a:endParaRPr lang="en-US"/>
           </a:p>
@@ -6720,7 +7145,7 @@
           <a:p>
             <a:fld id="{75AA6396-395E-4ADA-8EE5-F328BC863A04}" type="datetimeFigureOut">
               <a:rPr lang="en-US" smtClean="0"/>
-              <a:t>1/2/2017</a:t>
+              <a:t>1/3/2017</a:t>
             </a:fld>
             <a:endParaRPr lang="en-US"/>
           </a:p>
@@ -6940,7 +7365,7 @@
           <a:p>
             <a:fld id="{75AA6396-395E-4ADA-8EE5-F328BC863A04}" type="datetimeFigureOut">
               <a:rPr lang="en-US" smtClean="0"/>
-              <a:t>1/2/2017</a:t>
+              <a:t>1/3/2017</a:t>
             </a:fld>
             <a:endParaRPr lang="en-US"/>
           </a:p>
@@ -7193,7 +7618,7 @@
           <a:p>
             <a:fld id="{75AA6396-395E-4ADA-8EE5-F328BC863A04}" type="datetimeFigureOut">
               <a:rPr lang="en-US" smtClean="0"/>
-              <a:t>1/2/2017</a:t>
+              <a:t>1/3/2017</a:t>
             </a:fld>
             <a:endParaRPr lang="en-US"/>
           </a:p>
@@ -7432,7 +7857,7 @@
           <a:p>
             <a:fld id="{75AA6396-395E-4ADA-8EE5-F328BC863A04}" type="datetimeFigureOut">
               <a:rPr lang="en-US" smtClean="0"/>
-              <a:t>1/2/2017</a:t>
+              <a:t>1/3/2017</a:t>
             </a:fld>
             <a:endParaRPr lang="en-US"/>
           </a:p>
@@ -7806,7 +8231,7 @@
           <a:p>
             <a:fld id="{75AA6396-395E-4ADA-8EE5-F328BC863A04}" type="datetimeFigureOut">
               <a:rPr lang="en-US" smtClean="0"/>
-              <a:t>1/2/2017</a:t>
+              <a:t>1/3/2017</a:t>
             </a:fld>
             <a:endParaRPr lang="en-US"/>
           </a:p>
@@ -7924,7 +8349,7 @@
           <a:p>
             <a:fld id="{75AA6396-395E-4ADA-8EE5-F328BC863A04}" type="datetimeFigureOut">
               <a:rPr lang="en-US" smtClean="0"/>
-              <a:t>1/2/2017</a:t>
+              <a:t>1/3/2017</a:t>
             </a:fld>
             <a:endParaRPr lang="en-US"/>
           </a:p>
@@ -8019,7 +8444,7 @@
           <a:p>
             <a:fld id="{75AA6396-395E-4ADA-8EE5-F328BC863A04}" type="datetimeFigureOut">
               <a:rPr lang="en-US" smtClean="0"/>
-              <a:t>1/2/2017</a:t>
+              <a:t>1/3/2017</a:t>
             </a:fld>
             <a:endParaRPr lang="en-US"/>
           </a:p>
@@ -8296,7 +8721,7 @@
           <a:p>
             <a:fld id="{75AA6396-395E-4ADA-8EE5-F328BC863A04}" type="datetimeFigureOut">
               <a:rPr lang="en-US" smtClean="0"/>
-              <a:t>1/2/2017</a:t>
+              <a:t>1/3/2017</a:t>
             </a:fld>
             <a:endParaRPr lang="en-US"/>
           </a:p>
@@ -8549,7 +8974,7 @@
           <a:p>
             <a:fld id="{75AA6396-395E-4ADA-8EE5-F328BC863A04}" type="datetimeFigureOut">
               <a:rPr lang="en-US" smtClean="0"/>
-              <a:t>1/2/2017</a:t>
+              <a:t>1/3/2017</a:t>
             </a:fld>
             <a:endParaRPr lang="en-US"/>
           </a:p>
@@ -8762,7 +9187,7 @@
           <a:p>
             <a:fld id="{75AA6396-395E-4ADA-8EE5-F328BC863A04}" type="datetimeFigureOut">
               <a:rPr lang="en-US" smtClean="0"/>
-              <a:t>1/2/2017</a:t>
+              <a:t>1/3/2017</a:t>
             </a:fld>
             <a:endParaRPr lang="en-US"/>
           </a:p>
@@ -15921,7 +16346,6 @@
               <a:rPr lang="en-US" sz="4800" dirty="0"/>
               <a:t>Authorization auditing</a:t>
             </a:r>
-            <a:endParaRPr lang="en-US" sz="4800" dirty="0"/>
           </a:p>
         </p:txBody>
       </p:sp>
@@ -16042,7 +16466,6 @@
               <a:rPr lang="en-US" sz="4800" dirty="0"/>
               <a:t>Authorization auditing</a:t>
             </a:r>
-            <a:endParaRPr lang="en-US" sz="4800" dirty="0"/>
           </a:p>
         </p:txBody>
       </p:sp>
@@ -16297,7 +16720,6 @@
               <a:rPr lang="en-US" sz="4800" dirty="0"/>
               <a:t>Authorization auditing</a:t>
             </a:r>
-            <a:endParaRPr lang="en-US" sz="4800" dirty="0"/>
           </a:p>
         </p:txBody>
       </p:sp>
@@ -16418,7 +16840,6 @@
               <a:rPr lang="en-US" sz="4800" dirty="0"/>
               <a:t>Authorization auditing</a:t>
             </a:r>
-            <a:endParaRPr lang="en-US" sz="4800" dirty="0"/>
           </a:p>
         </p:txBody>
       </p:sp>
@@ -16520,31 +16941,6 @@
       </p:grpSpPr>
       <p:sp>
         <p:nvSpPr>
-          <p:cNvPr id="2" name="Title 1"/>
-          <p:cNvSpPr>
-            <a:spLocks noGrp="1"/>
-          </p:cNvSpPr>
-          <p:nvPr>
-            <p:ph type="title"/>
-          </p:nvPr>
-        </p:nvSpPr>
-        <p:spPr/>
-        <p:txBody>
-          <a:bodyPr>
-            <a:normAutofit/>
-          </a:bodyPr>
-          <a:lstStyle/>
-          <a:p>
-            <a:r>
-              <a:rPr lang="en-US" sz="4800" dirty="0" smtClean="0"/>
-              <a:t>Patented step-by-step slide</a:t>
-            </a:r>
-            <a:endParaRPr lang="en-US" sz="4800" dirty="0"/>
-          </a:p>
-        </p:txBody>
-      </p:sp>
-      <p:sp>
-        <p:nvSpPr>
           <p:cNvPr id="3" name="Content Placeholder 2"/>
           <p:cNvSpPr>
             <a:spLocks noGrp="1"/>
@@ -16565,57 +16961,93 @@
           </a:bodyPr>
           <a:lstStyle/>
           <a:p>
-            <a:r>
-              <a:rPr lang="en-US" sz="4000" dirty="0" smtClean="0">
+            <a:endParaRPr lang="en-US" sz="4000" dirty="0" smtClean="0"/>
+          </a:p>
+          <a:p>
+            <a:endParaRPr lang="en-US" dirty="0" smtClean="0"/>
+          </a:p>
+          <a:p>
+            <a:endParaRPr lang="en-US" dirty="0" smtClean="0"/>
+          </a:p>
+          <a:p>
+            <a:endParaRPr lang="en-US" dirty="0"/>
+          </a:p>
+        </p:txBody>
+      </p:sp>
+      <p:pic>
+        <p:nvPicPr>
+          <p:cNvPr id="6" name="Picture 5"/>
+          <p:cNvPicPr>
+            <a:picLocks noChangeAspect="1"/>
+          </p:cNvPicPr>
+          <p:nvPr/>
+        </p:nvPicPr>
+        <p:blipFill>
+          <a:blip r:embed="rId3"/>
+          <a:stretch>
+            <a:fillRect/>
+          </a:stretch>
+        </p:blipFill>
+        <p:spPr>
+          <a:xfrm>
+            <a:off x="3347554" y="1672545"/>
+            <a:ext cx="5496889" cy="1598818"/>
+          </a:xfrm>
+          <a:prstGeom prst="rect">
+            <a:avLst/>
+          </a:prstGeom>
+        </p:spPr>
+      </p:pic>
+      <p:sp>
+        <p:nvSpPr>
+          <p:cNvPr id="7" name="TextBox 6"/>
+          <p:cNvSpPr txBox="1"/>
+          <p:nvPr/>
+        </p:nvSpPr>
+        <p:spPr>
+          <a:xfrm>
+            <a:off x="3832122" y="3797419"/>
+            <a:ext cx="4854678" cy="646331"/>
+          </a:xfrm>
+          <a:prstGeom prst="rect">
+            <a:avLst/>
+          </a:prstGeom>
+          <a:noFill/>
+        </p:spPr>
+        <p:txBody>
+          <a:bodyPr wrap="square" rtlCol="0">
+            <a:spAutoFit/>
+          </a:bodyPr>
+          <a:lstStyle/>
+          <a:p>
+            <a:r>
+              <a:rPr lang="en-US" sz="3600" dirty="0">
                 <a:solidFill>
-                  <a:schemeClr val="bg1">
-                    <a:lumMod val="65000"/>
-                  </a:schemeClr>
+                  <a:srgbClr val="013947"/>
                 </a:solidFill>
               </a:rPr>
-              <a:t>Old news</a:t>
-            </a:r>
-            <a:br>
-              <a:rPr lang="en-US" sz="4000" dirty="0" smtClean="0">
+              <a:t>http://</a:t>
+            </a:r>
+            <a:r>
+              <a:rPr lang="en-US" sz="3600" dirty="0" smtClean="0">
                 <a:solidFill>
-                  <a:schemeClr val="bg1">
-                    <a:lumMod val="65000"/>
-                  </a:schemeClr>
+                  <a:srgbClr val="013947"/>
                 </a:solidFill>
               </a:rPr>
-            </a:br>
-            <a:endParaRPr lang="en-US" sz="4000" dirty="0" smtClean="0">
+              <a:t>approvaltests.com</a:t>
+            </a:r>
+            <a:endParaRPr lang="en-US" sz="3600" dirty="0">
               <a:solidFill>
-                <a:schemeClr val="bg1">
-                  <a:lumMod val="65000"/>
-                </a:schemeClr>
+                <a:srgbClr val="013947"/>
               </a:solidFill>
             </a:endParaRPr>
-          </a:p>
-          <a:p>
-            <a:r>
-              <a:rPr lang="en-US" sz="4000" b="1" dirty="0" smtClean="0"/>
-              <a:t>New hotness</a:t>
-            </a:r>
-          </a:p>
-          <a:p>
-            <a:endParaRPr lang="en-US" sz="4000" dirty="0" smtClean="0"/>
-          </a:p>
-          <a:p>
-            <a:endParaRPr lang="en-US" dirty="0" smtClean="0"/>
-          </a:p>
-          <a:p>
-            <a:endParaRPr lang="en-US" dirty="0" smtClean="0"/>
-          </a:p>
-          <a:p>
-            <a:endParaRPr lang="en-US" dirty="0"/>
           </a:p>
         </p:txBody>
       </p:sp>
     </p:spTree>
     <p:extLst>
       <p:ext uri="{BB962C8B-B14F-4D97-AF65-F5344CB8AC3E}">
-        <p14:creationId xmlns:p14="http://schemas.microsoft.com/office/powerpoint/2010/main" val="1887088746"/>
+        <p14:creationId xmlns:p14="http://schemas.microsoft.com/office/powerpoint/2010/main" val="1588857752"/>
       </p:ext>
     </p:extLst>
   </p:cSld>
@@ -16668,6 +17100,571 @@
           <a:p>
             <a:r>
               <a:rPr lang="en-US" sz="4800" dirty="0" smtClean="0"/>
+              <a:t>Approval Tests – Step 1</a:t>
+            </a:r>
+            <a:endParaRPr lang="en-US" sz="4800" dirty="0"/>
+          </a:p>
+        </p:txBody>
+      </p:sp>
+      <p:sp>
+        <p:nvSpPr>
+          <p:cNvPr id="3" name="Content Placeholder 2"/>
+          <p:cNvSpPr>
+            <a:spLocks noGrp="1"/>
+          </p:cNvSpPr>
+          <p:nvPr>
+            <p:ph idx="1"/>
+          </p:nvPr>
+        </p:nvSpPr>
+        <p:spPr>
+          <a:xfrm>
+            <a:off x="838200" y="1825624"/>
+            <a:ext cx="10515600" cy="4589923"/>
+          </a:xfrm>
+        </p:spPr>
+        <p:txBody>
+          <a:bodyPr>
+            <a:normAutofit/>
+          </a:bodyPr>
+          <a:lstStyle/>
+          <a:p>
+            <a:endParaRPr lang="en-US" sz="4000" dirty="0" smtClean="0"/>
+          </a:p>
+          <a:p>
+            <a:endParaRPr lang="en-US" dirty="0" smtClean="0"/>
+          </a:p>
+          <a:p>
+            <a:endParaRPr lang="en-US" dirty="0" smtClean="0"/>
+          </a:p>
+          <a:p>
+            <a:endParaRPr lang="en-US" dirty="0"/>
+          </a:p>
+        </p:txBody>
+      </p:sp>
+      <p:pic>
+        <p:nvPicPr>
+          <p:cNvPr id="4" name="Picture 3"/>
+          <p:cNvPicPr>
+            <a:picLocks noChangeAspect="1"/>
+          </p:cNvPicPr>
+          <p:nvPr/>
+        </p:nvPicPr>
+        <p:blipFill>
+          <a:blip r:embed="rId3"/>
+          <a:stretch>
+            <a:fillRect/>
+          </a:stretch>
+        </p:blipFill>
+        <p:spPr>
+          <a:xfrm>
+            <a:off x="838200" y="1690687"/>
+            <a:ext cx="8166885" cy="5034577"/>
+          </a:xfrm>
+          <a:prstGeom prst="rect">
+            <a:avLst/>
+          </a:prstGeom>
+        </p:spPr>
+      </p:pic>
+    </p:spTree>
+    <p:extLst>
+      <p:ext uri="{BB962C8B-B14F-4D97-AF65-F5344CB8AC3E}">
+        <p14:creationId xmlns:p14="http://schemas.microsoft.com/office/powerpoint/2010/main" val="2227038732"/>
+      </p:ext>
+    </p:extLst>
+  </p:cSld>
+  <p:clrMapOvr>
+    <a:masterClrMapping/>
+  </p:clrMapOvr>
+  <p:timing>
+    <p:tnLst>
+      <p:par>
+        <p:cTn id="1" dur="indefinite" restart="never" nodeType="tmRoot"/>
+      </p:par>
+    </p:tnLst>
+  </p:timing>
+</p:sld>
+</file>
+
+<file path=ppt/slides/slide64.xml><?xml version="1.0" encoding="utf-8"?>
+<p:sld xmlns:a="http://schemas.openxmlformats.org/drawingml/2006/main" xmlns:r="http://schemas.openxmlformats.org/officeDocument/2006/relationships" xmlns:p="http://schemas.openxmlformats.org/presentationml/2006/main">
+  <p:cSld>
+    <p:spTree>
+      <p:nvGrpSpPr>
+        <p:cNvPr id="1" name=""/>
+        <p:cNvGrpSpPr/>
+        <p:nvPr/>
+      </p:nvGrpSpPr>
+      <p:grpSpPr>
+        <a:xfrm>
+          <a:off x="0" y="0"/>
+          <a:ext cx="0" cy="0"/>
+          <a:chOff x="0" y="0"/>
+          <a:chExt cx="0" cy="0"/>
+        </a:xfrm>
+      </p:grpSpPr>
+      <p:sp>
+        <p:nvSpPr>
+          <p:cNvPr id="2" name="Title 1"/>
+          <p:cNvSpPr>
+            <a:spLocks noGrp="1"/>
+          </p:cNvSpPr>
+          <p:nvPr>
+            <p:ph type="title"/>
+          </p:nvPr>
+        </p:nvSpPr>
+        <p:spPr/>
+        <p:txBody>
+          <a:bodyPr>
+            <a:normAutofit/>
+          </a:bodyPr>
+          <a:lstStyle/>
+          <a:p>
+            <a:r>
+              <a:rPr lang="en-US" sz="4800" dirty="0" smtClean="0"/>
+              <a:t>Approval Tests – Step 2</a:t>
+            </a:r>
+            <a:endParaRPr lang="en-US" sz="4800" dirty="0"/>
+          </a:p>
+        </p:txBody>
+      </p:sp>
+      <p:sp>
+        <p:nvSpPr>
+          <p:cNvPr id="3" name="Content Placeholder 2"/>
+          <p:cNvSpPr>
+            <a:spLocks noGrp="1"/>
+          </p:cNvSpPr>
+          <p:nvPr>
+            <p:ph idx="1"/>
+          </p:nvPr>
+        </p:nvSpPr>
+        <p:spPr>
+          <a:xfrm>
+            <a:off x="838200" y="1825624"/>
+            <a:ext cx="10515600" cy="4589923"/>
+          </a:xfrm>
+        </p:spPr>
+        <p:txBody>
+          <a:bodyPr>
+            <a:normAutofit/>
+          </a:bodyPr>
+          <a:lstStyle/>
+          <a:p>
+            <a:endParaRPr lang="en-US" sz="4000" dirty="0" smtClean="0"/>
+          </a:p>
+          <a:p>
+            <a:endParaRPr lang="en-US" dirty="0" smtClean="0"/>
+          </a:p>
+          <a:p>
+            <a:endParaRPr lang="en-US" dirty="0" smtClean="0"/>
+          </a:p>
+          <a:p>
+            <a:endParaRPr lang="en-US" dirty="0"/>
+          </a:p>
+        </p:txBody>
+      </p:sp>
+      <p:pic>
+        <p:nvPicPr>
+          <p:cNvPr id="5" name="Picture 4"/>
+          <p:cNvPicPr>
+            <a:picLocks noChangeAspect="1"/>
+          </p:cNvPicPr>
+          <p:nvPr/>
+        </p:nvPicPr>
+        <p:blipFill>
+          <a:blip r:embed="rId3"/>
+          <a:stretch>
+            <a:fillRect/>
+          </a:stretch>
+        </p:blipFill>
+        <p:spPr>
+          <a:xfrm>
+            <a:off x="838200" y="2606187"/>
+            <a:ext cx="11249815" cy="3028796"/>
+          </a:xfrm>
+          <a:prstGeom prst="rect">
+            <a:avLst/>
+          </a:prstGeom>
+        </p:spPr>
+      </p:pic>
+    </p:spTree>
+    <p:extLst>
+      <p:ext uri="{BB962C8B-B14F-4D97-AF65-F5344CB8AC3E}">
+        <p14:creationId xmlns:p14="http://schemas.microsoft.com/office/powerpoint/2010/main" val="2880740301"/>
+      </p:ext>
+    </p:extLst>
+  </p:cSld>
+  <p:clrMapOvr>
+    <a:masterClrMapping/>
+  </p:clrMapOvr>
+  <p:timing>
+    <p:tnLst>
+      <p:par>
+        <p:cTn id="1" dur="indefinite" restart="never" nodeType="tmRoot"/>
+      </p:par>
+    </p:tnLst>
+  </p:timing>
+</p:sld>
+</file>
+
+<file path=ppt/slides/slide65.xml><?xml version="1.0" encoding="utf-8"?>
+<p:sld xmlns:a="http://schemas.openxmlformats.org/drawingml/2006/main" xmlns:r="http://schemas.openxmlformats.org/officeDocument/2006/relationships" xmlns:p="http://schemas.openxmlformats.org/presentationml/2006/main">
+  <p:cSld>
+    <p:spTree>
+      <p:nvGrpSpPr>
+        <p:cNvPr id="1" name=""/>
+        <p:cNvGrpSpPr/>
+        <p:nvPr/>
+      </p:nvGrpSpPr>
+      <p:grpSpPr>
+        <a:xfrm>
+          <a:off x="0" y="0"/>
+          <a:ext cx="0" cy="0"/>
+          <a:chOff x="0" y="0"/>
+          <a:chExt cx="0" cy="0"/>
+        </a:xfrm>
+      </p:grpSpPr>
+      <p:sp>
+        <p:nvSpPr>
+          <p:cNvPr id="3" name="Content Placeholder 2"/>
+          <p:cNvSpPr>
+            <a:spLocks noGrp="1"/>
+          </p:cNvSpPr>
+          <p:nvPr>
+            <p:ph idx="1"/>
+          </p:nvPr>
+        </p:nvSpPr>
+        <p:spPr>
+          <a:xfrm>
+            <a:off x="838200" y="1825624"/>
+            <a:ext cx="10515600" cy="4589923"/>
+          </a:xfrm>
+        </p:spPr>
+        <p:txBody>
+          <a:bodyPr>
+            <a:normAutofit/>
+          </a:bodyPr>
+          <a:lstStyle/>
+          <a:p>
+            <a:endParaRPr lang="en-US" sz="4000" dirty="0" smtClean="0"/>
+          </a:p>
+          <a:p>
+            <a:endParaRPr lang="en-US" dirty="0" smtClean="0"/>
+          </a:p>
+          <a:p>
+            <a:endParaRPr lang="en-US" dirty="0" smtClean="0"/>
+          </a:p>
+          <a:p>
+            <a:endParaRPr lang="en-US" dirty="0"/>
+          </a:p>
+        </p:txBody>
+      </p:sp>
+      <p:pic>
+        <p:nvPicPr>
+          <p:cNvPr id="6" name="Picture 5"/>
+          <p:cNvPicPr>
+            <a:picLocks noChangeAspect="1"/>
+          </p:cNvPicPr>
+          <p:nvPr/>
+        </p:nvPicPr>
+        <p:blipFill>
+          <a:blip r:embed="rId3"/>
+          <a:stretch>
+            <a:fillRect/>
+          </a:stretch>
+        </p:blipFill>
+        <p:spPr>
+          <a:xfrm>
+            <a:off x="135333" y="388043"/>
+            <a:ext cx="11921334" cy="6027504"/>
+          </a:xfrm>
+          <a:prstGeom prst="rect">
+            <a:avLst/>
+          </a:prstGeom>
+        </p:spPr>
+      </p:pic>
+    </p:spTree>
+    <p:extLst>
+      <p:ext uri="{BB962C8B-B14F-4D97-AF65-F5344CB8AC3E}">
+        <p14:creationId xmlns:p14="http://schemas.microsoft.com/office/powerpoint/2010/main" val="674782299"/>
+      </p:ext>
+    </p:extLst>
+  </p:cSld>
+  <p:clrMapOvr>
+    <a:masterClrMapping/>
+  </p:clrMapOvr>
+  <p:timing>
+    <p:tnLst>
+      <p:par>
+        <p:cTn id="1" dur="indefinite" restart="never" nodeType="tmRoot"/>
+      </p:par>
+    </p:tnLst>
+  </p:timing>
+</p:sld>
+</file>
+
+<file path=ppt/slides/slide66.xml><?xml version="1.0" encoding="utf-8"?>
+<p:sld xmlns:a="http://schemas.openxmlformats.org/drawingml/2006/main" xmlns:r="http://schemas.openxmlformats.org/officeDocument/2006/relationships" xmlns:p="http://schemas.openxmlformats.org/presentationml/2006/main">
+  <p:cSld>
+    <p:spTree>
+      <p:nvGrpSpPr>
+        <p:cNvPr id="1" name=""/>
+        <p:cNvGrpSpPr/>
+        <p:nvPr/>
+      </p:nvGrpSpPr>
+      <p:grpSpPr>
+        <a:xfrm>
+          <a:off x="0" y="0"/>
+          <a:ext cx="0" cy="0"/>
+          <a:chOff x="0" y="0"/>
+          <a:chExt cx="0" cy="0"/>
+        </a:xfrm>
+      </p:grpSpPr>
+      <p:sp>
+        <p:nvSpPr>
+          <p:cNvPr id="3" name="Content Placeholder 2"/>
+          <p:cNvSpPr>
+            <a:spLocks noGrp="1"/>
+          </p:cNvSpPr>
+          <p:nvPr>
+            <p:ph idx="1"/>
+          </p:nvPr>
+        </p:nvSpPr>
+        <p:spPr>
+          <a:xfrm>
+            <a:off x="838200" y="1825624"/>
+            <a:ext cx="10515600" cy="4589923"/>
+          </a:xfrm>
+        </p:spPr>
+        <p:txBody>
+          <a:bodyPr>
+            <a:normAutofit/>
+          </a:bodyPr>
+          <a:lstStyle/>
+          <a:p>
+            <a:endParaRPr lang="en-US" sz="4000" dirty="0" smtClean="0"/>
+          </a:p>
+          <a:p>
+            <a:endParaRPr lang="en-US" dirty="0" smtClean="0"/>
+          </a:p>
+          <a:p>
+            <a:endParaRPr lang="en-US" dirty="0" smtClean="0"/>
+          </a:p>
+          <a:p>
+            <a:endParaRPr lang="en-US" dirty="0"/>
+          </a:p>
+        </p:txBody>
+      </p:sp>
+      <p:pic>
+        <p:nvPicPr>
+          <p:cNvPr id="7" name="Picture 6"/>
+          <p:cNvPicPr>
+            <a:picLocks noChangeAspect="1"/>
+          </p:cNvPicPr>
+          <p:nvPr/>
+        </p:nvPicPr>
+        <p:blipFill>
+          <a:blip r:embed="rId3"/>
+          <a:stretch>
+            <a:fillRect/>
+          </a:stretch>
+        </p:blipFill>
+        <p:spPr>
+          <a:xfrm>
+            <a:off x="206588" y="2513089"/>
+            <a:ext cx="11778823" cy="1607496"/>
+          </a:xfrm>
+          <a:prstGeom prst="rect">
+            <a:avLst/>
+          </a:prstGeom>
+        </p:spPr>
+      </p:pic>
+    </p:spTree>
+    <p:extLst>
+      <p:ext uri="{BB962C8B-B14F-4D97-AF65-F5344CB8AC3E}">
+        <p14:creationId xmlns:p14="http://schemas.microsoft.com/office/powerpoint/2010/main" val="854306639"/>
+      </p:ext>
+    </p:extLst>
+  </p:cSld>
+  <p:clrMapOvr>
+    <a:masterClrMapping/>
+  </p:clrMapOvr>
+  <p:timing>
+    <p:tnLst>
+      <p:par>
+        <p:cTn id="1" dur="indefinite" restart="never" nodeType="tmRoot"/>
+      </p:par>
+    </p:tnLst>
+  </p:timing>
+</p:sld>
+</file>
+
+<file path=ppt/slides/slide67.xml><?xml version="1.0" encoding="utf-8"?>
+<p:sld xmlns:a="http://schemas.openxmlformats.org/drawingml/2006/main" xmlns:r="http://schemas.openxmlformats.org/officeDocument/2006/relationships" xmlns:p="http://schemas.openxmlformats.org/presentationml/2006/main">
+  <p:cSld>
+    <p:spTree>
+      <p:nvGrpSpPr>
+        <p:cNvPr id="1" name=""/>
+        <p:cNvGrpSpPr/>
+        <p:nvPr/>
+      </p:nvGrpSpPr>
+      <p:grpSpPr>
+        <a:xfrm>
+          <a:off x="0" y="0"/>
+          <a:ext cx="0" cy="0"/>
+          <a:chOff x="0" y="0"/>
+          <a:chExt cx="0" cy="0"/>
+        </a:xfrm>
+      </p:grpSpPr>
+      <p:sp>
+        <p:nvSpPr>
+          <p:cNvPr id="2" name="Title 1"/>
+          <p:cNvSpPr>
+            <a:spLocks noGrp="1"/>
+          </p:cNvSpPr>
+          <p:nvPr>
+            <p:ph type="title"/>
+          </p:nvPr>
+        </p:nvSpPr>
+        <p:spPr/>
+        <p:txBody>
+          <a:bodyPr>
+            <a:normAutofit/>
+          </a:bodyPr>
+          <a:lstStyle/>
+          <a:p>
+            <a:r>
+              <a:rPr lang="en-US" sz="4800" dirty="0" smtClean="0"/>
+              <a:t>Patented step-by-step slide</a:t>
+            </a:r>
+            <a:endParaRPr lang="en-US" sz="4800" dirty="0"/>
+          </a:p>
+        </p:txBody>
+      </p:sp>
+      <p:sp>
+        <p:nvSpPr>
+          <p:cNvPr id="3" name="Content Placeholder 2"/>
+          <p:cNvSpPr>
+            <a:spLocks noGrp="1"/>
+          </p:cNvSpPr>
+          <p:nvPr>
+            <p:ph idx="1"/>
+          </p:nvPr>
+        </p:nvSpPr>
+        <p:spPr>
+          <a:xfrm>
+            <a:off x="838200" y="1825624"/>
+            <a:ext cx="10515600" cy="4589923"/>
+          </a:xfrm>
+        </p:spPr>
+        <p:txBody>
+          <a:bodyPr>
+            <a:normAutofit/>
+          </a:bodyPr>
+          <a:lstStyle/>
+          <a:p>
+            <a:r>
+              <a:rPr lang="en-US" sz="4000" dirty="0" smtClean="0">
+                <a:solidFill>
+                  <a:schemeClr val="bg1">
+                    <a:lumMod val="65000"/>
+                  </a:schemeClr>
+                </a:solidFill>
+              </a:rPr>
+              <a:t>Old news</a:t>
+            </a:r>
+            <a:br>
+              <a:rPr lang="en-US" sz="4000" dirty="0" smtClean="0">
+                <a:solidFill>
+                  <a:schemeClr val="bg1">
+                    <a:lumMod val="65000"/>
+                  </a:schemeClr>
+                </a:solidFill>
+              </a:rPr>
+            </a:br>
+            <a:endParaRPr lang="en-US" sz="4000" dirty="0" smtClean="0">
+              <a:solidFill>
+                <a:schemeClr val="bg1">
+                  <a:lumMod val="65000"/>
+                </a:schemeClr>
+              </a:solidFill>
+            </a:endParaRPr>
+          </a:p>
+          <a:p>
+            <a:r>
+              <a:rPr lang="en-US" sz="4000" b="1" dirty="0" smtClean="0"/>
+              <a:t>New hotness</a:t>
+            </a:r>
+          </a:p>
+          <a:p>
+            <a:endParaRPr lang="en-US" sz="4000" dirty="0" smtClean="0"/>
+          </a:p>
+          <a:p>
+            <a:endParaRPr lang="en-US" dirty="0" smtClean="0"/>
+          </a:p>
+          <a:p>
+            <a:endParaRPr lang="en-US" dirty="0" smtClean="0"/>
+          </a:p>
+          <a:p>
+            <a:endParaRPr lang="en-US" dirty="0"/>
+          </a:p>
+        </p:txBody>
+      </p:sp>
+    </p:spTree>
+    <p:extLst>
+      <p:ext uri="{BB962C8B-B14F-4D97-AF65-F5344CB8AC3E}">
+        <p14:creationId xmlns:p14="http://schemas.microsoft.com/office/powerpoint/2010/main" val="1887088746"/>
+      </p:ext>
+    </p:extLst>
+  </p:cSld>
+  <p:clrMapOvr>
+    <a:masterClrMapping/>
+  </p:clrMapOvr>
+  <p:timing>
+    <p:tnLst>
+      <p:par>
+        <p:cTn id="1" dur="indefinite" restart="never" nodeType="tmRoot"/>
+      </p:par>
+    </p:tnLst>
+  </p:timing>
+</p:sld>
+</file>
+
+<file path=ppt/slides/slide68.xml><?xml version="1.0" encoding="utf-8"?>
+<p:sld xmlns:a="http://schemas.openxmlformats.org/drawingml/2006/main" xmlns:r="http://schemas.openxmlformats.org/officeDocument/2006/relationships" xmlns:p="http://schemas.openxmlformats.org/presentationml/2006/main">
+  <p:cSld>
+    <p:spTree>
+      <p:nvGrpSpPr>
+        <p:cNvPr id="1" name=""/>
+        <p:cNvGrpSpPr/>
+        <p:nvPr/>
+      </p:nvGrpSpPr>
+      <p:grpSpPr>
+        <a:xfrm>
+          <a:off x="0" y="0"/>
+          <a:ext cx="0" cy="0"/>
+          <a:chOff x="0" y="0"/>
+          <a:chExt cx="0" cy="0"/>
+        </a:xfrm>
+      </p:grpSpPr>
+      <p:sp>
+        <p:nvSpPr>
+          <p:cNvPr id="2" name="Title 1"/>
+          <p:cNvSpPr>
+            <a:spLocks noGrp="1"/>
+          </p:cNvSpPr>
+          <p:nvPr>
+            <p:ph type="title"/>
+          </p:nvPr>
+        </p:nvSpPr>
+        <p:spPr/>
+        <p:txBody>
+          <a:bodyPr>
+            <a:normAutofit/>
+          </a:bodyPr>
+          <a:lstStyle/>
+          <a:p>
+            <a:r>
+              <a:rPr lang="en-US" sz="4800" dirty="0" smtClean="0"/>
               <a:t>Canonical example: SQL Injection</a:t>
             </a:r>
             <a:endParaRPr lang="en-US" sz="4800" dirty="0"/>
@@ -16729,7 +17726,7 @@
 </p:sld>
 </file>
 
-<file path=ppt/slides/slide64.xml><?xml version="1.0" encoding="utf-8"?>
+<file path=ppt/slides/slide69.xml><?xml version="1.0" encoding="utf-8"?>
 <p:sld xmlns:a="http://schemas.openxmlformats.org/drawingml/2006/main" xmlns:r="http://schemas.openxmlformats.org/officeDocument/2006/relationships" xmlns:p="http://schemas.openxmlformats.org/presentationml/2006/main">
   <p:cSld>
     <p:spTree>

</xml_diff>

<commit_message>
Narrative/deck 1st draft is complete!
</commit_message>
<xml_diff>
--- a/Secure Systems - CodeMash 2017.pptx
+++ b/Secure Systems - CodeMash 2017.pptx
@@ -70,12 +70,12 @@
     <p:sldId id="557" r:id="rId61"/>
     <p:sldId id="558" r:id="rId62"/>
     <p:sldId id="559" r:id="rId63"/>
-    <p:sldId id="560" r:id="rId64"/>
+    <p:sldId id="564" r:id="rId64"/>
     <p:sldId id="561" r:id="rId65"/>
-    <p:sldId id="562" r:id="rId66"/>
-    <p:sldId id="563" r:id="rId67"/>
-    <p:sldId id="504" r:id="rId68"/>
-    <p:sldId id="485" r:id="rId69"/>
+    <p:sldId id="565" r:id="rId66"/>
+    <p:sldId id="566" r:id="rId67"/>
+    <p:sldId id="568" r:id="rId68"/>
+    <p:sldId id="569" r:id="rId69"/>
     <p:sldId id="443" r:id="rId70"/>
   </p:sldIdLst>
   <p:sldSz cx="12192000" cy="6858000"/>
@@ -5883,7 +5883,7 @@
     </p:spTree>
     <p:extLst>
       <p:ext uri="{BB962C8B-B14F-4D97-AF65-F5344CB8AC3E}">
-        <p14:creationId xmlns:p14="http://schemas.microsoft.com/office/powerpoint/2010/main" val="994674812"/>
+        <p14:creationId xmlns:p14="http://schemas.microsoft.com/office/powerpoint/2010/main" val="2350728921"/>
       </p:ext>
     </p:extLst>
   </p:cSld>
@@ -6051,7 +6051,7 @@
     </p:spTree>
     <p:extLst>
       <p:ext uri="{BB962C8B-B14F-4D97-AF65-F5344CB8AC3E}">
-        <p14:creationId xmlns:p14="http://schemas.microsoft.com/office/powerpoint/2010/main" val="2345448789"/>
+        <p14:creationId xmlns:p14="http://schemas.microsoft.com/office/powerpoint/2010/main" val="1737165775"/>
       </p:ext>
     </p:extLst>
   </p:cSld>
@@ -6135,7 +6135,7 @@
     </p:spTree>
     <p:extLst>
       <p:ext uri="{BB962C8B-B14F-4D97-AF65-F5344CB8AC3E}">
-        <p14:creationId xmlns:p14="http://schemas.microsoft.com/office/powerpoint/2010/main" val="397105126"/>
+        <p14:creationId xmlns:p14="http://schemas.microsoft.com/office/powerpoint/2010/main" val="1030293071"/>
       </p:ext>
     </p:extLst>
   </p:cSld>
@@ -6219,7 +6219,7 @@
     </p:spTree>
     <p:extLst>
       <p:ext uri="{BB962C8B-B14F-4D97-AF65-F5344CB8AC3E}">
-        <p14:creationId xmlns:p14="http://schemas.microsoft.com/office/powerpoint/2010/main" val="2602777311"/>
+        <p14:creationId xmlns:p14="http://schemas.microsoft.com/office/powerpoint/2010/main" val="834707851"/>
       </p:ext>
     </p:extLst>
   </p:cSld>
@@ -6303,7 +6303,7 @@
     </p:spTree>
     <p:extLst>
       <p:ext uri="{BB962C8B-B14F-4D97-AF65-F5344CB8AC3E}">
-        <p14:creationId xmlns:p14="http://schemas.microsoft.com/office/powerpoint/2010/main" val="2267138517"/>
+        <p14:creationId xmlns:p14="http://schemas.microsoft.com/office/powerpoint/2010/main" val="1542746690"/>
       </p:ext>
     </p:extLst>
   </p:cSld>
@@ -17143,7 +17143,7 @@
       </p:sp>
       <p:pic>
         <p:nvPicPr>
-          <p:cNvPr id="4" name="Picture 3"/>
+          <p:cNvPr id="6" name="Picture 5"/>
           <p:cNvPicPr>
             <a:picLocks noChangeAspect="1"/>
           </p:cNvPicPr>
@@ -17157,8 +17157,8 @@
         </p:blipFill>
         <p:spPr>
           <a:xfrm>
-            <a:off x="838200" y="1690687"/>
-            <a:ext cx="8166885" cy="5034577"/>
+            <a:off x="838200" y="1825624"/>
+            <a:ext cx="7946506" cy="4811150"/>
           </a:xfrm>
           <a:prstGeom prst="rect">
             <a:avLst/>
@@ -17168,7 +17168,7 @@
     </p:spTree>
     <p:extLst>
       <p:ext uri="{BB962C8B-B14F-4D97-AF65-F5344CB8AC3E}">
-        <p14:creationId xmlns:p14="http://schemas.microsoft.com/office/powerpoint/2010/main" val="2227038732"/>
+        <p14:creationId xmlns:p14="http://schemas.microsoft.com/office/powerpoint/2010/main" val="3666660301"/>
       </p:ext>
     </p:extLst>
   </p:cSld>
@@ -17325,6 +17325,35 @@
       </p:grpSpPr>
       <p:sp>
         <p:nvSpPr>
+          <p:cNvPr id="2" name="Title 1"/>
+          <p:cNvSpPr>
+            <a:spLocks noGrp="1"/>
+          </p:cNvSpPr>
+          <p:nvPr>
+            <p:ph type="title"/>
+          </p:nvPr>
+        </p:nvSpPr>
+        <p:spPr/>
+        <p:txBody>
+          <a:bodyPr>
+            <a:normAutofit/>
+          </a:bodyPr>
+          <a:lstStyle/>
+          <a:p>
+            <a:r>
+              <a:rPr lang="en-US" sz="4800" dirty="0" smtClean="0"/>
+              <a:t>Approval Tests – Step </a:t>
+            </a:r>
+            <a:r>
+              <a:rPr lang="en-US" sz="4800" dirty="0" smtClean="0"/>
+              <a:t>3</a:t>
+            </a:r>
+            <a:endParaRPr lang="en-US" sz="4800" dirty="0"/>
+          </a:p>
+        </p:txBody>
+      </p:sp>
+      <p:sp>
+        <p:nvSpPr>
           <p:cNvPr id="3" name="Content Placeholder 2"/>
           <p:cNvSpPr>
             <a:spLocks noGrp="1"/>
@@ -17360,7 +17389,7 @@
       </p:sp>
       <p:pic>
         <p:nvPicPr>
-          <p:cNvPr id="6" name="Picture 5"/>
+          <p:cNvPr id="4" name="Picture 3"/>
           <p:cNvPicPr>
             <a:picLocks noChangeAspect="1"/>
           </p:cNvPicPr>
@@ -17374,8 +17403,8 @@
         </p:blipFill>
         <p:spPr>
           <a:xfrm>
-            <a:off x="135333" y="388043"/>
-            <a:ext cx="11921334" cy="6027504"/>
+            <a:off x="838200" y="1484210"/>
+            <a:ext cx="7361903" cy="5335456"/>
           </a:xfrm>
           <a:prstGeom prst="rect">
             <a:avLst/>
@@ -17385,7 +17414,7 @@
     </p:spTree>
     <p:extLst>
       <p:ext uri="{BB962C8B-B14F-4D97-AF65-F5344CB8AC3E}">
-        <p14:creationId xmlns:p14="http://schemas.microsoft.com/office/powerpoint/2010/main" val="674782299"/>
+        <p14:creationId xmlns:p14="http://schemas.microsoft.com/office/powerpoint/2010/main" val="794583393"/>
       </p:ext>
     </p:extLst>
   </p:cSld>
@@ -17421,6 +17450,35 @@
       </p:grpSpPr>
       <p:sp>
         <p:nvSpPr>
+          <p:cNvPr id="2" name="Title 1"/>
+          <p:cNvSpPr>
+            <a:spLocks noGrp="1"/>
+          </p:cNvSpPr>
+          <p:nvPr>
+            <p:ph type="title"/>
+          </p:nvPr>
+        </p:nvSpPr>
+        <p:spPr/>
+        <p:txBody>
+          <a:bodyPr>
+            <a:normAutofit/>
+          </a:bodyPr>
+          <a:lstStyle/>
+          <a:p>
+            <a:r>
+              <a:rPr lang="en-US" sz="4800" dirty="0" smtClean="0"/>
+              <a:t>Approval Tests – Step </a:t>
+            </a:r>
+            <a:r>
+              <a:rPr lang="en-US" sz="4800" dirty="0"/>
+              <a:t>4</a:t>
+            </a:r>
+            <a:endParaRPr lang="en-US" sz="4800" dirty="0"/>
+          </a:p>
+        </p:txBody>
+      </p:sp>
+      <p:sp>
+        <p:nvSpPr>
           <p:cNvPr id="3" name="Content Placeholder 2"/>
           <p:cNvSpPr>
             <a:spLocks noGrp="1"/>
@@ -17456,7 +17514,7 @@
       </p:sp>
       <p:pic>
         <p:nvPicPr>
-          <p:cNvPr id="7" name="Picture 6"/>
+          <p:cNvPr id="6" name="Picture 5"/>
           <p:cNvPicPr>
             <a:picLocks noChangeAspect="1"/>
           </p:cNvPicPr>
@@ -17470,8 +17528,8 @@
         </p:blipFill>
         <p:spPr>
           <a:xfrm>
-            <a:off x="206588" y="2513089"/>
-            <a:ext cx="11778823" cy="1607496"/>
+            <a:off x="838199" y="1705436"/>
+            <a:ext cx="11180747" cy="4724859"/>
           </a:xfrm>
           <a:prstGeom prst="rect">
             <a:avLst/>
@@ -17481,7 +17539,7 @@
     </p:spTree>
     <p:extLst>
       <p:ext uri="{BB962C8B-B14F-4D97-AF65-F5344CB8AC3E}">
-        <p14:creationId xmlns:p14="http://schemas.microsoft.com/office/powerpoint/2010/main" val="854306639"/>
+        <p14:creationId xmlns:p14="http://schemas.microsoft.com/office/powerpoint/2010/main" val="2882460215"/>
       </p:ext>
     </p:extLst>
   </p:cSld>
@@ -17534,7 +17592,7 @@
           <a:p>
             <a:r>
               <a:rPr lang="en-US" sz="4800" dirty="0" smtClean="0"/>
-              <a:t>Patented step-by-step slide</a:t>
+              <a:t>What makes auditing easier?</a:t>
             </a:r>
             <a:endParaRPr lang="en-US" sz="4800" dirty="0"/>
           </a:p>
@@ -17553,7 +17611,7 @@
         <p:spPr>
           <a:xfrm>
             <a:off x="838200" y="1825624"/>
-            <a:ext cx="10515600" cy="4589923"/>
+            <a:ext cx="10515600" cy="4899641"/>
           </a:xfrm>
         </p:spPr>
         <p:txBody>
@@ -17563,37 +17621,37 @@
           <a:lstStyle/>
           <a:p>
             <a:r>
-              <a:rPr lang="en-US" sz="4000" dirty="0" smtClean="0">
-                <a:solidFill>
-                  <a:schemeClr val="bg1">
-                    <a:lumMod val="65000"/>
-                  </a:schemeClr>
-                </a:solidFill>
-              </a:rPr>
-              <a:t>Old news</a:t>
-            </a:r>
-            <a:br>
-              <a:rPr lang="en-US" sz="4000" dirty="0" smtClean="0">
-                <a:solidFill>
-                  <a:schemeClr val="bg1">
-                    <a:lumMod val="65000"/>
-                  </a:schemeClr>
-                </a:solidFill>
-              </a:rPr>
-            </a:br>
-            <a:endParaRPr lang="en-US" sz="4000" dirty="0" smtClean="0">
-              <a:solidFill>
-                <a:schemeClr val="bg1">
-                  <a:lumMod val="65000"/>
-                </a:schemeClr>
-              </a:solidFill>
-            </a:endParaRPr>
-          </a:p>
-          <a:p>
-            <a:r>
-              <a:rPr lang="en-US" sz="4000" b="1" dirty="0" smtClean="0"/>
-              <a:t>New hotness</a:t>
-            </a:r>
+              <a:rPr lang="en-US" sz="4000" dirty="0" smtClean="0"/>
+              <a:t>Using [Attributes] to decorate classes/methods</a:t>
+            </a:r>
+          </a:p>
+          <a:p>
+            <a:endParaRPr lang="en-US" sz="4000" dirty="0" smtClean="0"/>
+          </a:p>
+          <a:p>
+            <a:r>
+              <a:rPr lang="en-US" sz="4000" dirty="0" smtClean="0"/>
+              <a:t>Inheriting a base class</a:t>
+            </a:r>
+          </a:p>
+          <a:p>
+            <a:endParaRPr lang="en-US" sz="4000" dirty="0"/>
+          </a:p>
+          <a:p>
+            <a:r>
+              <a:rPr lang="en-US" sz="4000" dirty="0" smtClean="0"/>
+              <a:t>Implementing an interface</a:t>
+            </a:r>
+            <a:endParaRPr lang="en-US" sz="4000" dirty="0" smtClean="0"/>
+          </a:p>
+          <a:p>
+            <a:endParaRPr lang="en-US" sz="4000" dirty="0"/>
+          </a:p>
+          <a:p>
+            <a:endParaRPr lang="en-US" sz="4000" dirty="0"/>
+          </a:p>
+          <a:p>
+            <a:endParaRPr lang="en-US" sz="4000" dirty="0" smtClean="0"/>
           </a:p>
           <a:p>
             <a:endParaRPr lang="en-US" sz="4000" dirty="0" smtClean="0"/>
@@ -17612,7 +17670,7 @@
     </p:spTree>
     <p:extLst>
       <p:ext uri="{BB962C8B-B14F-4D97-AF65-F5344CB8AC3E}">
-        <p14:creationId xmlns:p14="http://schemas.microsoft.com/office/powerpoint/2010/main" val="1887088746"/>
+        <p14:creationId xmlns:p14="http://schemas.microsoft.com/office/powerpoint/2010/main" val="469543913"/>
       </p:ext>
     </p:extLst>
   </p:cSld>
@@ -17656,16 +17714,22 @@
             <p:ph type="title"/>
           </p:nvPr>
         </p:nvSpPr>
-        <p:spPr/>
+        <p:spPr>
+          <a:xfrm>
+            <a:off x="838200" y="1574493"/>
+            <a:ext cx="10515600" cy="1325563"/>
+          </a:xfrm>
+        </p:spPr>
         <p:txBody>
           <a:bodyPr>
             <a:normAutofit/>
           </a:bodyPr>
           <a:lstStyle/>
           <a:p>
+            <a:pPr algn="ctr"/>
             <a:r>
               <a:rPr lang="en-US" sz="4800" dirty="0" smtClean="0"/>
-              <a:t>Canonical example: SQL Injection</a:t>
+              <a:t>Recap</a:t>
             </a:r>
             <a:endParaRPr lang="en-US" sz="4800" dirty="0"/>
           </a:p>
@@ -17683,8 +17747,8 @@
         </p:nvSpPr>
         <p:spPr>
           <a:xfrm>
-            <a:off x="838200" y="1825624"/>
-            <a:ext cx="10515600" cy="4589923"/>
+            <a:off x="838200" y="3318387"/>
+            <a:ext cx="10515600" cy="1814052"/>
           </a:xfrm>
         </p:spPr>
         <p:txBody>
@@ -17693,6 +17757,19 @@
           </a:bodyPr>
           <a:lstStyle/>
           <a:p>
+            <a:pPr marL="0" indent="0" algn="ctr">
+              <a:buNone/>
+            </a:pPr>
+            <a:r>
+              <a:rPr lang="en-US" sz="4000" dirty="0" smtClean="0"/>
+              <a:t>The CliffsNotes version of this talk</a:t>
+            </a:r>
+            <a:endParaRPr lang="en-US" sz="4000" dirty="0" smtClean="0"/>
+          </a:p>
+          <a:p>
+            <a:endParaRPr lang="en-US" sz="4000" dirty="0" smtClean="0"/>
+          </a:p>
+          <a:p>
             <a:endParaRPr lang="en-US" sz="4000" dirty="0" smtClean="0"/>
           </a:p>
           <a:p>
@@ -17709,7 +17786,7 @@
     </p:spTree>
     <p:extLst>
       <p:ext uri="{BB962C8B-B14F-4D97-AF65-F5344CB8AC3E}">
-        <p14:creationId xmlns:p14="http://schemas.microsoft.com/office/powerpoint/2010/main" val="1766242099"/>
+        <p14:creationId xmlns:p14="http://schemas.microsoft.com/office/powerpoint/2010/main" val="3948013080"/>
       </p:ext>
     </p:extLst>
   </p:cSld>
@@ -17767,7 +17844,7 @@
           <a:p>
             <a:r>
               <a:rPr lang="en-US" sz="4800" dirty="0" smtClean="0"/>
-              <a:t>Closing slide</a:t>
+              <a:t>That's all, folks!</a:t>
             </a:r>
             <a:endParaRPr lang="en-US" sz="4800" dirty="0"/>
           </a:p>
@@ -17795,10 +17872,38 @@
           </a:bodyPr>
           <a:lstStyle/>
           <a:p>
+            <a:pPr marL="0" indent="0">
+              <a:buNone/>
+            </a:pPr>
             <a:r>
               <a:rPr lang="en-US" sz="4000" dirty="0" smtClean="0"/>
-              <a:t>The knowledge gets dropped here</a:t>
-            </a:r>
+              <a:t>Slide deck + complete sample app in GitHub</a:t>
+            </a:r>
+          </a:p>
+          <a:p>
+            <a:pPr marL="0" indent="0">
+              <a:buNone/>
+            </a:pPr>
+            <a:r>
+              <a:rPr lang="en-US" sz="4000" dirty="0" smtClean="0"/>
+              <a:t/>
+            </a:r>
+            <a:br>
+              <a:rPr lang="en-US" sz="4000" dirty="0" smtClean="0"/>
+            </a:br>
+            <a:r>
+              <a:rPr lang="en-US" sz="4000" b="1" dirty="0"/>
+              <a:t>bit.ly/2i0J91d</a:t>
+            </a:r>
+            <a:endParaRPr lang="en-US" sz="4000" b="1" dirty="0" smtClean="0"/>
+          </a:p>
+          <a:p>
+            <a:pPr marL="0" indent="0">
+              <a:buNone/>
+            </a:pPr>
+            <a:endParaRPr lang="en-US" sz="3200" dirty="0" smtClean="0">
+              <a:hlinkClick r:id="rId3"/>
+            </a:endParaRPr>
           </a:p>
           <a:p>
             <a:pPr marL="0" indent="0">
@@ -17863,11 +17968,7 @@
             </a:pPr>
             <a:r>
               <a:rPr lang="en-US" sz="3600" b="1" dirty="0" smtClean="0"/>
-              <a:t>@</a:t>
-            </a:r>
-            <a:r>
-              <a:rPr lang="en-US" sz="3600" b="1" dirty="0" err="1" smtClean="0"/>
-              <a:t>spetryjohnson</a:t>
+              <a:t>@spetryjohnson</a:t>
             </a:r>
             <a:endParaRPr lang="en-US" b="1" dirty="0" smtClean="0"/>
           </a:p>

</xml_diff>

<commit_message>
Added notes from 1st run through
</commit_message>
<xml_diff>
--- a/Secure Systems - CodeMash 2017.pptx
+++ b/Secure Systems - CodeMash 2017.pptx
@@ -5,7 +5,7 @@
     <p:sldMasterId id="2147483749" r:id="rId1"/>
   </p:sldMasterIdLst>
   <p:notesMasterIdLst>
-    <p:notesMasterId r:id="rId76"/>
+    <p:notesMasterId r:id="rId80"/>
   </p:notesMasterIdLst>
   <p:sldIdLst>
     <p:sldId id="395" r:id="rId2"/>
@@ -46,42 +46,46 @@
     <p:sldId id="540" r:id="rId37"/>
     <p:sldId id="500" r:id="rId38"/>
     <p:sldId id="553" r:id="rId39"/>
-    <p:sldId id="573" r:id="rId40"/>
-    <p:sldId id="574" r:id="rId41"/>
-    <p:sldId id="534" r:id="rId42"/>
-    <p:sldId id="505" r:id="rId43"/>
-    <p:sldId id="535" r:id="rId44"/>
-    <p:sldId id="507" r:id="rId45"/>
-    <p:sldId id="536" r:id="rId46"/>
-    <p:sldId id="538" r:id="rId47"/>
-    <p:sldId id="539" r:id="rId48"/>
-    <p:sldId id="537" r:id="rId49"/>
-    <p:sldId id="551" r:id="rId50"/>
-    <p:sldId id="552" r:id="rId51"/>
-    <p:sldId id="501" r:id="rId52"/>
-    <p:sldId id="529" r:id="rId53"/>
-    <p:sldId id="546" r:id="rId54"/>
-    <p:sldId id="502" r:id="rId55"/>
-    <p:sldId id="503" r:id="rId56"/>
-    <p:sldId id="531" r:id="rId57"/>
-    <p:sldId id="532" r:id="rId58"/>
-    <p:sldId id="533" r:id="rId59"/>
-    <p:sldId id="554" r:id="rId60"/>
-    <p:sldId id="530" r:id="rId61"/>
-    <p:sldId id="555" r:id="rId62"/>
-    <p:sldId id="556" r:id="rId63"/>
-    <p:sldId id="557" r:id="rId64"/>
-    <p:sldId id="558" r:id="rId65"/>
-    <p:sldId id="559" r:id="rId66"/>
-    <p:sldId id="564" r:id="rId67"/>
-    <p:sldId id="561" r:id="rId68"/>
-    <p:sldId id="565" r:id="rId69"/>
-    <p:sldId id="566" r:id="rId70"/>
-    <p:sldId id="568" r:id="rId71"/>
-    <p:sldId id="569" r:id="rId72"/>
-    <p:sldId id="571" r:id="rId73"/>
-    <p:sldId id="572" r:id="rId74"/>
-    <p:sldId id="443" r:id="rId75"/>
+    <p:sldId id="574" r:id="rId40"/>
+    <p:sldId id="573" r:id="rId41"/>
+    <p:sldId id="575" r:id="rId42"/>
+    <p:sldId id="534" r:id="rId43"/>
+    <p:sldId id="505" r:id="rId44"/>
+    <p:sldId id="535" r:id="rId45"/>
+    <p:sldId id="576" r:id="rId46"/>
+    <p:sldId id="507" r:id="rId47"/>
+    <p:sldId id="536" r:id="rId48"/>
+    <p:sldId id="577" r:id="rId49"/>
+    <p:sldId id="538" r:id="rId50"/>
+    <p:sldId id="539" r:id="rId51"/>
+    <p:sldId id="537" r:id="rId52"/>
+    <p:sldId id="551" r:id="rId53"/>
+    <p:sldId id="552" r:id="rId54"/>
+    <p:sldId id="578" r:id="rId55"/>
+    <p:sldId id="501" r:id="rId56"/>
+    <p:sldId id="529" r:id="rId57"/>
+    <p:sldId id="546" r:id="rId58"/>
+    <p:sldId id="502" r:id="rId59"/>
+    <p:sldId id="503" r:id="rId60"/>
+    <p:sldId id="531" r:id="rId61"/>
+    <p:sldId id="532" r:id="rId62"/>
+    <p:sldId id="533" r:id="rId63"/>
+    <p:sldId id="554" r:id="rId64"/>
+    <p:sldId id="530" r:id="rId65"/>
+    <p:sldId id="555" r:id="rId66"/>
+    <p:sldId id="556" r:id="rId67"/>
+    <p:sldId id="557" r:id="rId68"/>
+    <p:sldId id="558" r:id="rId69"/>
+    <p:sldId id="559" r:id="rId70"/>
+    <p:sldId id="564" r:id="rId71"/>
+    <p:sldId id="561" r:id="rId72"/>
+    <p:sldId id="565" r:id="rId73"/>
+    <p:sldId id="566" r:id="rId74"/>
+    <p:sldId id="568" r:id="rId75"/>
+    <p:sldId id="569" r:id="rId76"/>
+    <p:sldId id="571" r:id="rId77"/>
+    <p:sldId id="572" r:id="rId78"/>
+    <p:sldId id="443" r:id="rId79"/>
   </p:sldIdLst>
   <p:sldSz cx="12192000" cy="6858000"/>
   <p:notesSz cx="6858000" cy="9144000"/>
@@ -307,7 +311,7 @@
           <a:p>
             <a:fld id="{C54A4886-B4AF-42F7-97BE-95CDF82A73E3}" type="datetimeFigureOut">
               <a:rPr lang="en-US" smtClean="0"/>
-              <a:t>1/3/2017</a:t>
+              <a:t>1/4/2017</a:t>
             </a:fld>
             <a:endParaRPr lang="en-US"/>
           </a:p>
@@ -3495,7 +3499,7 @@
     </p:spTree>
     <p:extLst>
       <p:ext uri="{BB962C8B-B14F-4D97-AF65-F5344CB8AC3E}">
-        <p14:creationId xmlns:p14="http://schemas.microsoft.com/office/powerpoint/2010/main" val="1255163866"/>
+        <p14:creationId xmlns:p14="http://schemas.microsoft.com/office/powerpoint/2010/main" val="3263699449"/>
       </p:ext>
     </p:extLst>
   </p:cSld>
@@ -3688,7 +3692,7 @@
     </p:spTree>
     <p:extLst>
       <p:ext uri="{BB962C8B-B14F-4D97-AF65-F5344CB8AC3E}">
-        <p14:creationId xmlns:p14="http://schemas.microsoft.com/office/powerpoint/2010/main" val="3263699449"/>
+        <p14:creationId xmlns:p14="http://schemas.microsoft.com/office/powerpoint/2010/main" val="1255163866"/>
       </p:ext>
     </p:extLst>
   </p:cSld>
@@ -3742,6 +3746,90 @@
           <a:bodyPr/>
           <a:lstStyle/>
           <a:p>
+            <a:endParaRPr lang="en-US" b="0" dirty="0" smtClean="0"/>
+          </a:p>
+        </p:txBody>
+      </p:sp>
+      <p:sp>
+        <p:nvSpPr>
+          <p:cNvPr id="4" name="Slide Number Placeholder 3"/>
+          <p:cNvSpPr>
+            <a:spLocks noGrp="1"/>
+          </p:cNvSpPr>
+          <p:nvPr>
+            <p:ph type="sldNum" sz="quarter" idx="10"/>
+          </p:nvPr>
+        </p:nvSpPr>
+        <p:spPr/>
+        <p:txBody>
+          <a:bodyPr/>
+          <a:lstStyle/>
+          <a:p>
+            <a:fld id="{89029652-62E7-43D6-83B5-097D7B7AA5D8}" type="slidenum">
+              <a:rPr lang="en-US" smtClean="0"/>
+              <a:t>41</a:t>
+            </a:fld>
+            <a:endParaRPr lang="en-US"/>
+          </a:p>
+        </p:txBody>
+      </p:sp>
+    </p:spTree>
+    <p:extLst>
+      <p:ext uri="{BB962C8B-B14F-4D97-AF65-F5344CB8AC3E}">
+        <p14:creationId xmlns:p14="http://schemas.microsoft.com/office/powerpoint/2010/main" val="532748052"/>
+      </p:ext>
+    </p:extLst>
+  </p:cSld>
+  <p:clrMapOvr>
+    <a:masterClrMapping/>
+  </p:clrMapOvr>
+</p:notes>
+</file>
+
+<file path=ppt/notesSlides/notesSlide42.xml><?xml version="1.0" encoding="utf-8"?>
+<p:notes xmlns:a="http://schemas.openxmlformats.org/drawingml/2006/main" xmlns:r="http://schemas.openxmlformats.org/officeDocument/2006/relationships" xmlns:p="http://schemas.openxmlformats.org/presentationml/2006/main">
+  <p:cSld>
+    <p:spTree>
+      <p:nvGrpSpPr>
+        <p:cNvPr id="1" name=""/>
+        <p:cNvGrpSpPr/>
+        <p:nvPr/>
+      </p:nvGrpSpPr>
+      <p:grpSpPr>
+        <a:xfrm>
+          <a:off x="0" y="0"/>
+          <a:ext cx="0" cy="0"/>
+          <a:chOff x="0" y="0"/>
+          <a:chExt cx="0" cy="0"/>
+        </a:xfrm>
+      </p:grpSpPr>
+      <p:sp>
+        <p:nvSpPr>
+          <p:cNvPr id="2" name="Slide Image Placeholder 1"/>
+          <p:cNvSpPr>
+            <a:spLocks noGrp="1" noRot="1" noChangeAspect="1"/>
+          </p:cNvSpPr>
+          <p:nvPr>
+            <p:ph type="sldImg"/>
+          </p:nvPr>
+        </p:nvSpPr>
+        <p:spPr/>
+      </p:sp>
+      <p:sp>
+        <p:nvSpPr>
+          <p:cNvPr id="3" name="Notes Placeholder 2"/>
+          <p:cNvSpPr>
+            <a:spLocks noGrp="1"/>
+          </p:cNvSpPr>
+          <p:nvPr>
+            <p:ph type="body" idx="1"/>
+          </p:nvPr>
+        </p:nvSpPr>
+        <p:spPr/>
+        <p:txBody>
+          <a:bodyPr/>
+          <a:lstStyle/>
+          <a:p>
             <a:pPr marL="0" marR="0" indent="0" algn="l" defTabSz="914400" rtl="0" eaLnBrk="1" fontAlgn="auto" latinLnBrk="0" hangingPunct="1">
               <a:lnSpc>
                 <a:spcPct val="100000"/>
@@ -3788,7 +3876,7 @@
           <a:p>
             <a:fld id="{89029652-62E7-43D6-83B5-097D7B7AA5D8}" type="slidenum">
               <a:rPr lang="en-US" smtClean="0"/>
-              <a:t>41</a:t>
+              <a:t>42</a:t>
             </a:fld>
             <a:endParaRPr lang="en-US"/>
           </a:p>
@@ -3798,90 +3886,6 @@
     <p:extLst>
       <p:ext uri="{BB962C8B-B14F-4D97-AF65-F5344CB8AC3E}">
         <p14:creationId xmlns:p14="http://schemas.microsoft.com/office/powerpoint/2010/main" val="2286755864"/>
-      </p:ext>
-    </p:extLst>
-  </p:cSld>
-  <p:clrMapOvr>
-    <a:masterClrMapping/>
-  </p:clrMapOvr>
-</p:notes>
-</file>
-
-<file path=ppt/notesSlides/notesSlide42.xml><?xml version="1.0" encoding="utf-8"?>
-<p:notes xmlns:a="http://schemas.openxmlformats.org/drawingml/2006/main" xmlns:r="http://schemas.openxmlformats.org/officeDocument/2006/relationships" xmlns:p="http://schemas.openxmlformats.org/presentationml/2006/main">
-  <p:cSld>
-    <p:spTree>
-      <p:nvGrpSpPr>
-        <p:cNvPr id="1" name=""/>
-        <p:cNvGrpSpPr/>
-        <p:nvPr/>
-      </p:nvGrpSpPr>
-      <p:grpSpPr>
-        <a:xfrm>
-          <a:off x="0" y="0"/>
-          <a:ext cx="0" cy="0"/>
-          <a:chOff x="0" y="0"/>
-          <a:chExt cx="0" cy="0"/>
-        </a:xfrm>
-      </p:grpSpPr>
-      <p:sp>
-        <p:nvSpPr>
-          <p:cNvPr id="2" name="Slide Image Placeholder 1"/>
-          <p:cNvSpPr>
-            <a:spLocks noGrp="1" noRot="1" noChangeAspect="1"/>
-          </p:cNvSpPr>
-          <p:nvPr>
-            <p:ph type="sldImg"/>
-          </p:nvPr>
-        </p:nvSpPr>
-        <p:spPr/>
-      </p:sp>
-      <p:sp>
-        <p:nvSpPr>
-          <p:cNvPr id="3" name="Notes Placeholder 2"/>
-          <p:cNvSpPr>
-            <a:spLocks noGrp="1"/>
-          </p:cNvSpPr>
-          <p:nvPr>
-            <p:ph type="body" idx="1"/>
-          </p:nvPr>
-        </p:nvSpPr>
-        <p:spPr/>
-        <p:txBody>
-          <a:bodyPr/>
-          <a:lstStyle/>
-          <a:p>
-            <a:endParaRPr lang="en-US" b="0" dirty="0" smtClean="0"/>
-          </a:p>
-        </p:txBody>
-      </p:sp>
-      <p:sp>
-        <p:nvSpPr>
-          <p:cNvPr id="4" name="Slide Number Placeholder 3"/>
-          <p:cNvSpPr>
-            <a:spLocks noGrp="1"/>
-          </p:cNvSpPr>
-          <p:nvPr>
-            <p:ph type="sldNum" sz="quarter" idx="10"/>
-          </p:nvPr>
-        </p:nvSpPr>
-        <p:spPr/>
-        <p:txBody>
-          <a:bodyPr/>
-          <a:lstStyle/>
-          <a:p>
-            <a:fld id="{89029652-62E7-43D6-83B5-097D7B7AA5D8}" type="slidenum">
-              <a:rPr lang="en-US" smtClean="0"/>
-              <a:t>42</a:t>
-            </a:fld>
-            <a:endParaRPr lang="en-US"/>
-          </a:p>
-        </p:txBody>
-      </p:sp>
-    </p:spTree>
-    <p:extLst>
-      <p:ext uri="{BB962C8B-B14F-4D97-AF65-F5344CB8AC3E}">
-        <p14:creationId xmlns:p14="http://schemas.microsoft.com/office/powerpoint/2010/main" val="2653332077"/>
       </p:ext>
     </p:extLst>
   </p:cSld>
@@ -3965,7 +3969,7 @@
     </p:spTree>
     <p:extLst>
       <p:ext uri="{BB962C8B-B14F-4D97-AF65-F5344CB8AC3E}">
-        <p14:creationId xmlns:p14="http://schemas.microsoft.com/office/powerpoint/2010/main" val="3778399677"/>
+        <p14:creationId xmlns:p14="http://schemas.microsoft.com/office/powerpoint/2010/main" val="2653332077"/>
       </p:ext>
     </p:extLst>
   </p:cSld>
@@ -4049,7 +4053,7 @@
     </p:spTree>
     <p:extLst>
       <p:ext uri="{BB962C8B-B14F-4D97-AF65-F5344CB8AC3E}">
-        <p14:creationId xmlns:p14="http://schemas.microsoft.com/office/powerpoint/2010/main" val="3271057564"/>
+        <p14:creationId xmlns:p14="http://schemas.microsoft.com/office/powerpoint/2010/main" val="3778399677"/>
       </p:ext>
     </p:extLst>
   </p:cSld>
@@ -4133,7 +4137,7 @@
     </p:spTree>
     <p:extLst>
       <p:ext uri="{BB962C8B-B14F-4D97-AF65-F5344CB8AC3E}">
-        <p14:creationId xmlns:p14="http://schemas.microsoft.com/office/powerpoint/2010/main" val="150335864"/>
+        <p14:creationId xmlns:p14="http://schemas.microsoft.com/office/powerpoint/2010/main" val="4047639699"/>
       </p:ext>
     </p:extLst>
   </p:cSld>
@@ -4217,7 +4221,7 @@
     </p:spTree>
     <p:extLst>
       <p:ext uri="{BB962C8B-B14F-4D97-AF65-F5344CB8AC3E}">
-        <p14:creationId xmlns:p14="http://schemas.microsoft.com/office/powerpoint/2010/main" val="1174323916"/>
+        <p14:creationId xmlns:p14="http://schemas.microsoft.com/office/powerpoint/2010/main" val="3271057564"/>
       </p:ext>
     </p:extLst>
   </p:cSld>
@@ -4301,7 +4305,7 @@
     </p:spTree>
     <p:extLst>
       <p:ext uri="{BB962C8B-B14F-4D97-AF65-F5344CB8AC3E}">
-        <p14:creationId xmlns:p14="http://schemas.microsoft.com/office/powerpoint/2010/main" val="22929660"/>
+        <p14:creationId xmlns:p14="http://schemas.microsoft.com/office/powerpoint/2010/main" val="150335864"/>
       </p:ext>
     </p:extLst>
   </p:cSld>
@@ -4385,7 +4389,7 @@
     </p:spTree>
     <p:extLst>
       <p:ext uri="{BB962C8B-B14F-4D97-AF65-F5344CB8AC3E}">
-        <p14:creationId xmlns:p14="http://schemas.microsoft.com/office/powerpoint/2010/main" val="3079792467"/>
+        <p14:creationId xmlns:p14="http://schemas.microsoft.com/office/powerpoint/2010/main" val="508677048"/>
       </p:ext>
     </p:extLst>
   </p:cSld>
@@ -4439,32 +4443,7 @@
           <a:bodyPr/>
           <a:lstStyle/>
           <a:p>
-            <a:pPr marL="0" marR="0" indent="0" algn="l" defTabSz="914400" rtl="0" eaLnBrk="1" fontAlgn="auto" latinLnBrk="0" hangingPunct="1">
-              <a:lnSpc>
-                <a:spcPct val="100000"/>
-              </a:lnSpc>
-              <a:spcBef>
-                <a:spcPts val="0"/>
-              </a:spcBef>
-              <a:spcAft>
-                <a:spcPts val="0"/>
-              </a:spcAft>
-              <a:buClrTx/>
-              <a:buSzTx/>
-              <a:buFontTx/>
-              <a:buNone/>
-              <a:tabLst/>
-              <a:defRPr/>
-            </a:pPr>
-            <a:endParaRPr lang="en-US" sz="1200" kern="1200" dirty="0" smtClean="0">
-              <a:solidFill>
-                <a:schemeClr val="tx1"/>
-              </a:solidFill>
-              <a:effectLst/>
-              <a:latin typeface="+mn-lt"/>
-              <a:ea typeface="+mn-ea"/>
-              <a:cs typeface="+mn-cs"/>
-            </a:endParaRPr>
+            <a:endParaRPr lang="en-US" b="0" dirty="0" smtClean="0"/>
           </a:p>
         </p:txBody>
       </p:sp>
@@ -4494,7 +4473,7 @@
     </p:spTree>
     <p:extLst>
       <p:ext uri="{BB962C8B-B14F-4D97-AF65-F5344CB8AC3E}">
-        <p14:creationId xmlns:p14="http://schemas.microsoft.com/office/powerpoint/2010/main" val="1704645259"/>
+        <p14:creationId xmlns:p14="http://schemas.microsoft.com/office/powerpoint/2010/main" val="1174323916"/>
       </p:ext>
     </p:extLst>
   </p:cSld>
@@ -4662,7 +4641,7 @@
     </p:spTree>
     <p:extLst>
       <p:ext uri="{BB962C8B-B14F-4D97-AF65-F5344CB8AC3E}">
-        <p14:creationId xmlns:p14="http://schemas.microsoft.com/office/powerpoint/2010/main" val="381415188"/>
+        <p14:creationId xmlns:p14="http://schemas.microsoft.com/office/powerpoint/2010/main" val="22929660"/>
       </p:ext>
     </p:extLst>
   </p:cSld>
@@ -4746,7 +4725,7 @@
     </p:spTree>
     <p:extLst>
       <p:ext uri="{BB962C8B-B14F-4D97-AF65-F5344CB8AC3E}">
-        <p14:creationId xmlns:p14="http://schemas.microsoft.com/office/powerpoint/2010/main" val="3344468672"/>
+        <p14:creationId xmlns:p14="http://schemas.microsoft.com/office/powerpoint/2010/main" val="3079792467"/>
       </p:ext>
     </p:extLst>
   </p:cSld>
@@ -4800,7 +4779,32 @@
           <a:bodyPr/>
           <a:lstStyle/>
           <a:p>
-            <a:endParaRPr lang="en-US" b="0" dirty="0" smtClean="0"/>
+            <a:pPr marL="0" marR="0" indent="0" algn="l" defTabSz="914400" rtl="0" eaLnBrk="1" fontAlgn="auto" latinLnBrk="0" hangingPunct="1">
+              <a:lnSpc>
+                <a:spcPct val="100000"/>
+              </a:lnSpc>
+              <a:spcBef>
+                <a:spcPts val="0"/>
+              </a:spcBef>
+              <a:spcAft>
+                <a:spcPts val="0"/>
+              </a:spcAft>
+              <a:buClrTx/>
+              <a:buSzTx/>
+              <a:buFontTx/>
+              <a:buNone/>
+              <a:tabLst/>
+              <a:defRPr/>
+            </a:pPr>
+            <a:endParaRPr lang="en-US" sz="1200" kern="1200" dirty="0" smtClean="0">
+              <a:solidFill>
+                <a:schemeClr val="tx1"/>
+              </a:solidFill>
+              <a:effectLst/>
+              <a:latin typeface="+mn-lt"/>
+              <a:ea typeface="+mn-ea"/>
+              <a:cs typeface="+mn-cs"/>
+            </a:endParaRPr>
           </a:p>
         </p:txBody>
       </p:sp>
@@ -4830,7 +4834,7 @@
     </p:spTree>
     <p:extLst>
       <p:ext uri="{BB962C8B-B14F-4D97-AF65-F5344CB8AC3E}">
-        <p14:creationId xmlns:p14="http://schemas.microsoft.com/office/powerpoint/2010/main" val="3143393369"/>
+        <p14:creationId xmlns:p14="http://schemas.microsoft.com/office/powerpoint/2010/main" val="1704645259"/>
       </p:ext>
     </p:extLst>
   </p:cSld>
@@ -4884,6 +4888,342 @@
           <a:bodyPr/>
           <a:lstStyle/>
           <a:p>
+            <a:endParaRPr lang="en-US" b="0" dirty="0" smtClean="0"/>
+          </a:p>
+        </p:txBody>
+      </p:sp>
+      <p:sp>
+        <p:nvSpPr>
+          <p:cNvPr id="4" name="Slide Number Placeholder 3"/>
+          <p:cNvSpPr>
+            <a:spLocks noGrp="1"/>
+          </p:cNvSpPr>
+          <p:nvPr>
+            <p:ph type="sldNum" sz="quarter" idx="10"/>
+          </p:nvPr>
+        </p:nvSpPr>
+        <p:spPr/>
+        <p:txBody>
+          <a:bodyPr/>
+          <a:lstStyle/>
+          <a:p>
+            <a:fld id="{89029652-62E7-43D6-83B5-097D7B7AA5D8}" type="slidenum">
+              <a:rPr lang="en-US" smtClean="0"/>
+              <a:t>53</a:t>
+            </a:fld>
+            <a:endParaRPr lang="en-US"/>
+          </a:p>
+        </p:txBody>
+      </p:sp>
+    </p:spTree>
+    <p:extLst>
+      <p:ext uri="{BB962C8B-B14F-4D97-AF65-F5344CB8AC3E}">
+        <p14:creationId xmlns:p14="http://schemas.microsoft.com/office/powerpoint/2010/main" val="381415188"/>
+      </p:ext>
+    </p:extLst>
+  </p:cSld>
+  <p:clrMapOvr>
+    <a:masterClrMapping/>
+  </p:clrMapOvr>
+</p:notes>
+</file>
+
+<file path=ppt/notesSlides/notesSlide54.xml><?xml version="1.0" encoding="utf-8"?>
+<p:notes xmlns:a="http://schemas.openxmlformats.org/drawingml/2006/main" xmlns:r="http://schemas.openxmlformats.org/officeDocument/2006/relationships" xmlns:p="http://schemas.openxmlformats.org/presentationml/2006/main">
+  <p:cSld>
+    <p:spTree>
+      <p:nvGrpSpPr>
+        <p:cNvPr id="1" name=""/>
+        <p:cNvGrpSpPr/>
+        <p:nvPr/>
+      </p:nvGrpSpPr>
+      <p:grpSpPr>
+        <a:xfrm>
+          <a:off x="0" y="0"/>
+          <a:ext cx="0" cy="0"/>
+          <a:chOff x="0" y="0"/>
+          <a:chExt cx="0" cy="0"/>
+        </a:xfrm>
+      </p:grpSpPr>
+      <p:sp>
+        <p:nvSpPr>
+          <p:cNvPr id="2" name="Slide Image Placeholder 1"/>
+          <p:cNvSpPr>
+            <a:spLocks noGrp="1" noRot="1" noChangeAspect="1"/>
+          </p:cNvSpPr>
+          <p:nvPr>
+            <p:ph type="sldImg"/>
+          </p:nvPr>
+        </p:nvSpPr>
+        <p:spPr/>
+      </p:sp>
+      <p:sp>
+        <p:nvSpPr>
+          <p:cNvPr id="3" name="Notes Placeholder 2"/>
+          <p:cNvSpPr>
+            <a:spLocks noGrp="1"/>
+          </p:cNvSpPr>
+          <p:nvPr>
+            <p:ph type="body" idx="1"/>
+          </p:nvPr>
+        </p:nvSpPr>
+        <p:spPr/>
+        <p:txBody>
+          <a:bodyPr/>
+          <a:lstStyle/>
+          <a:p>
+            <a:endParaRPr lang="en-US" b="0" dirty="0" smtClean="0"/>
+          </a:p>
+        </p:txBody>
+      </p:sp>
+      <p:sp>
+        <p:nvSpPr>
+          <p:cNvPr id="4" name="Slide Number Placeholder 3"/>
+          <p:cNvSpPr>
+            <a:spLocks noGrp="1"/>
+          </p:cNvSpPr>
+          <p:nvPr>
+            <p:ph type="sldNum" sz="quarter" idx="10"/>
+          </p:nvPr>
+        </p:nvSpPr>
+        <p:spPr/>
+        <p:txBody>
+          <a:bodyPr/>
+          <a:lstStyle/>
+          <a:p>
+            <a:fld id="{89029652-62E7-43D6-83B5-097D7B7AA5D8}" type="slidenum">
+              <a:rPr lang="en-US" smtClean="0"/>
+              <a:t>54</a:t>
+            </a:fld>
+            <a:endParaRPr lang="en-US"/>
+          </a:p>
+        </p:txBody>
+      </p:sp>
+    </p:spTree>
+    <p:extLst>
+      <p:ext uri="{BB962C8B-B14F-4D97-AF65-F5344CB8AC3E}">
+        <p14:creationId xmlns:p14="http://schemas.microsoft.com/office/powerpoint/2010/main" val="3479328780"/>
+      </p:ext>
+    </p:extLst>
+  </p:cSld>
+  <p:clrMapOvr>
+    <a:masterClrMapping/>
+  </p:clrMapOvr>
+</p:notes>
+</file>
+
+<file path=ppt/notesSlides/notesSlide55.xml><?xml version="1.0" encoding="utf-8"?>
+<p:notes xmlns:a="http://schemas.openxmlformats.org/drawingml/2006/main" xmlns:r="http://schemas.openxmlformats.org/officeDocument/2006/relationships" xmlns:p="http://schemas.openxmlformats.org/presentationml/2006/main">
+  <p:cSld>
+    <p:spTree>
+      <p:nvGrpSpPr>
+        <p:cNvPr id="1" name=""/>
+        <p:cNvGrpSpPr/>
+        <p:nvPr/>
+      </p:nvGrpSpPr>
+      <p:grpSpPr>
+        <a:xfrm>
+          <a:off x="0" y="0"/>
+          <a:ext cx="0" cy="0"/>
+          <a:chOff x="0" y="0"/>
+          <a:chExt cx="0" cy="0"/>
+        </a:xfrm>
+      </p:grpSpPr>
+      <p:sp>
+        <p:nvSpPr>
+          <p:cNvPr id="2" name="Slide Image Placeholder 1"/>
+          <p:cNvSpPr>
+            <a:spLocks noGrp="1" noRot="1" noChangeAspect="1"/>
+          </p:cNvSpPr>
+          <p:nvPr>
+            <p:ph type="sldImg"/>
+          </p:nvPr>
+        </p:nvSpPr>
+        <p:spPr/>
+      </p:sp>
+      <p:sp>
+        <p:nvSpPr>
+          <p:cNvPr id="3" name="Notes Placeholder 2"/>
+          <p:cNvSpPr>
+            <a:spLocks noGrp="1"/>
+          </p:cNvSpPr>
+          <p:nvPr>
+            <p:ph type="body" idx="1"/>
+          </p:nvPr>
+        </p:nvSpPr>
+        <p:spPr/>
+        <p:txBody>
+          <a:bodyPr/>
+          <a:lstStyle/>
+          <a:p>
+            <a:endParaRPr lang="en-US" b="0" dirty="0" smtClean="0"/>
+          </a:p>
+        </p:txBody>
+      </p:sp>
+      <p:sp>
+        <p:nvSpPr>
+          <p:cNvPr id="4" name="Slide Number Placeholder 3"/>
+          <p:cNvSpPr>
+            <a:spLocks noGrp="1"/>
+          </p:cNvSpPr>
+          <p:nvPr>
+            <p:ph type="sldNum" sz="quarter" idx="10"/>
+          </p:nvPr>
+        </p:nvSpPr>
+        <p:spPr/>
+        <p:txBody>
+          <a:bodyPr/>
+          <a:lstStyle/>
+          <a:p>
+            <a:fld id="{89029652-62E7-43D6-83B5-097D7B7AA5D8}" type="slidenum">
+              <a:rPr lang="en-US" smtClean="0"/>
+              <a:t>55</a:t>
+            </a:fld>
+            <a:endParaRPr lang="en-US"/>
+          </a:p>
+        </p:txBody>
+      </p:sp>
+    </p:spTree>
+    <p:extLst>
+      <p:ext uri="{BB962C8B-B14F-4D97-AF65-F5344CB8AC3E}">
+        <p14:creationId xmlns:p14="http://schemas.microsoft.com/office/powerpoint/2010/main" val="3344468672"/>
+      </p:ext>
+    </p:extLst>
+  </p:cSld>
+  <p:clrMapOvr>
+    <a:masterClrMapping/>
+  </p:clrMapOvr>
+</p:notes>
+</file>
+
+<file path=ppt/notesSlides/notesSlide56.xml><?xml version="1.0" encoding="utf-8"?>
+<p:notes xmlns:a="http://schemas.openxmlformats.org/drawingml/2006/main" xmlns:r="http://schemas.openxmlformats.org/officeDocument/2006/relationships" xmlns:p="http://schemas.openxmlformats.org/presentationml/2006/main">
+  <p:cSld>
+    <p:spTree>
+      <p:nvGrpSpPr>
+        <p:cNvPr id="1" name=""/>
+        <p:cNvGrpSpPr/>
+        <p:nvPr/>
+      </p:nvGrpSpPr>
+      <p:grpSpPr>
+        <a:xfrm>
+          <a:off x="0" y="0"/>
+          <a:ext cx="0" cy="0"/>
+          <a:chOff x="0" y="0"/>
+          <a:chExt cx="0" cy="0"/>
+        </a:xfrm>
+      </p:grpSpPr>
+      <p:sp>
+        <p:nvSpPr>
+          <p:cNvPr id="2" name="Slide Image Placeholder 1"/>
+          <p:cNvSpPr>
+            <a:spLocks noGrp="1" noRot="1" noChangeAspect="1"/>
+          </p:cNvSpPr>
+          <p:nvPr>
+            <p:ph type="sldImg"/>
+          </p:nvPr>
+        </p:nvSpPr>
+        <p:spPr/>
+      </p:sp>
+      <p:sp>
+        <p:nvSpPr>
+          <p:cNvPr id="3" name="Notes Placeholder 2"/>
+          <p:cNvSpPr>
+            <a:spLocks noGrp="1"/>
+          </p:cNvSpPr>
+          <p:nvPr>
+            <p:ph type="body" idx="1"/>
+          </p:nvPr>
+        </p:nvSpPr>
+        <p:spPr/>
+        <p:txBody>
+          <a:bodyPr/>
+          <a:lstStyle/>
+          <a:p>
+            <a:endParaRPr lang="en-US" b="0" dirty="0" smtClean="0"/>
+          </a:p>
+        </p:txBody>
+      </p:sp>
+      <p:sp>
+        <p:nvSpPr>
+          <p:cNvPr id="4" name="Slide Number Placeholder 3"/>
+          <p:cNvSpPr>
+            <a:spLocks noGrp="1"/>
+          </p:cNvSpPr>
+          <p:nvPr>
+            <p:ph type="sldNum" sz="quarter" idx="10"/>
+          </p:nvPr>
+        </p:nvSpPr>
+        <p:spPr/>
+        <p:txBody>
+          <a:bodyPr/>
+          <a:lstStyle/>
+          <a:p>
+            <a:fld id="{89029652-62E7-43D6-83B5-097D7B7AA5D8}" type="slidenum">
+              <a:rPr lang="en-US" smtClean="0"/>
+              <a:t>56</a:t>
+            </a:fld>
+            <a:endParaRPr lang="en-US"/>
+          </a:p>
+        </p:txBody>
+      </p:sp>
+    </p:spTree>
+    <p:extLst>
+      <p:ext uri="{BB962C8B-B14F-4D97-AF65-F5344CB8AC3E}">
+        <p14:creationId xmlns:p14="http://schemas.microsoft.com/office/powerpoint/2010/main" val="3143393369"/>
+      </p:ext>
+    </p:extLst>
+  </p:cSld>
+  <p:clrMapOvr>
+    <a:masterClrMapping/>
+  </p:clrMapOvr>
+</p:notes>
+</file>
+
+<file path=ppt/notesSlides/notesSlide57.xml><?xml version="1.0" encoding="utf-8"?>
+<p:notes xmlns:a="http://schemas.openxmlformats.org/drawingml/2006/main" xmlns:r="http://schemas.openxmlformats.org/officeDocument/2006/relationships" xmlns:p="http://schemas.openxmlformats.org/presentationml/2006/main">
+  <p:cSld>
+    <p:spTree>
+      <p:nvGrpSpPr>
+        <p:cNvPr id="1" name=""/>
+        <p:cNvGrpSpPr/>
+        <p:nvPr/>
+      </p:nvGrpSpPr>
+      <p:grpSpPr>
+        <a:xfrm>
+          <a:off x="0" y="0"/>
+          <a:ext cx="0" cy="0"/>
+          <a:chOff x="0" y="0"/>
+          <a:chExt cx="0" cy="0"/>
+        </a:xfrm>
+      </p:grpSpPr>
+      <p:sp>
+        <p:nvSpPr>
+          <p:cNvPr id="2" name="Slide Image Placeholder 1"/>
+          <p:cNvSpPr>
+            <a:spLocks noGrp="1" noRot="1" noChangeAspect="1"/>
+          </p:cNvSpPr>
+          <p:nvPr>
+            <p:ph type="sldImg"/>
+          </p:nvPr>
+        </p:nvSpPr>
+        <p:spPr/>
+      </p:sp>
+      <p:sp>
+        <p:nvSpPr>
+          <p:cNvPr id="3" name="Notes Placeholder 2"/>
+          <p:cNvSpPr>
+            <a:spLocks noGrp="1"/>
+          </p:cNvSpPr>
+          <p:nvPr>
+            <p:ph type="body" idx="1"/>
+          </p:nvPr>
+        </p:nvSpPr>
+        <p:spPr/>
+        <p:txBody>
+          <a:bodyPr/>
+          <a:lstStyle/>
+          <a:p>
             <a:pPr marL="0" marR="0" indent="0" algn="l" defTabSz="914400" rtl="0" eaLnBrk="1" fontAlgn="auto" latinLnBrk="0" hangingPunct="1">
               <a:lnSpc>
                 <a:spcPct val="100000"/>
@@ -4930,7 +5270,7 @@
           <a:p>
             <a:fld id="{89029652-62E7-43D6-83B5-097D7B7AA5D8}" type="slidenum">
               <a:rPr lang="en-US" smtClean="0"/>
-              <a:t>53</a:t>
+              <a:t>57</a:t>
             </a:fld>
             <a:endParaRPr lang="en-US"/>
           </a:p>
@@ -4940,342 +5280,6 @@
     <p:extLst>
       <p:ext uri="{BB962C8B-B14F-4D97-AF65-F5344CB8AC3E}">
         <p14:creationId xmlns:p14="http://schemas.microsoft.com/office/powerpoint/2010/main" val="1557858908"/>
-      </p:ext>
-    </p:extLst>
-  </p:cSld>
-  <p:clrMapOvr>
-    <a:masterClrMapping/>
-  </p:clrMapOvr>
-</p:notes>
-</file>
-
-<file path=ppt/notesSlides/notesSlide54.xml><?xml version="1.0" encoding="utf-8"?>
-<p:notes xmlns:a="http://schemas.openxmlformats.org/drawingml/2006/main" xmlns:r="http://schemas.openxmlformats.org/officeDocument/2006/relationships" xmlns:p="http://schemas.openxmlformats.org/presentationml/2006/main">
-  <p:cSld>
-    <p:spTree>
-      <p:nvGrpSpPr>
-        <p:cNvPr id="1" name=""/>
-        <p:cNvGrpSpPr/>
-        <p:nvPr/>
-      </p:nvGrpSpPr>
-      <p:grpSpPr>
-        <a:xfrm>
-          <a:off x="0" y="0"/>
-          <a:ext cx="0" cy="0"/>
-          <a:chOff x="0" y="0"/>
-          <a:chExt cx="0" cy="0"/>
-        </a:xfrm>
-      </p:grpSpPr>
-      <p:sp>
-        <p:nvSpPr>
-          <p:cNvPr id="2" name="Slide Image Placeholder 1"/>
-          <p:cNvSpPr>
-            <a:spLocks noGrp="1" noRot="1" noChangeAspect="1"/>
-          </p:cNvSpPr>
-          <p:nvPr>
-            <p:ph type="sldImg"/>
-          </p:nvPr>
-        </p:nvSpPr>
-        <p:spPr/>
-      </p:sp>
-      <p:sp>
-        <p:nvSpPr>
-          <p:cNvPr id="3" name="Notes Placeholder 2"/>
-          <p:cNvSpPr>
-            <a:spLocks noGrp="1"/>
-          </p:cNvSpPr>
-          <p:nvPr>
-            <p:ph type="body" idx="1"/>
-          </p:nvPr>
-        </p:nvSpPr>
-        <p:spPr/>
-        <p:txBody>
-          <a:bodyPr/>
-          <a:lstStyle/>
-          <a:p>
-            <a:endParaRPr lang="en-US" b="0" dirty="0" smtClean="0"/>
-          </a:p>
-        </p:txBody>
-      </p:sp>
-      <p:sp>
-        <p:nvSpPr>
-          <p:cNvPr id="4" name="Slide Number Placeholder 3"/>
-          <p:cNvSpPr>
-            <a:spLocks noGrp="1"/>
-          </p:cNvSpPr>
-          <p:nvPr>
-            <p:ph type="sldNum" sz="quarter" idx="10"/>
-          </p:nvPr>
-        </p:nvSpPr>
-        <p:spPr/>
-        <p:txBody>
-          <a:bodyPr/>
-          <a:lstStyle/>
-          <a:p>
-            <a:fld id="{89029652-62E7-43D6-83B5-097D7B7AA5D8}" type="slidenum">
-              <a:rPr lang="en-US" smtClean="0"/>
-              <a:t>54</a:t>
-            </a:fld>
-            <a:endParaRPr lang="en-US"/>
-          </a:p>
-        </p:txBody>
-      </p:sp>
-    </p:spTree>
-    <p:extLst>
-      <p:ext uri="{BB962C8B-B14F-4D97-AF65-F5344CB8AC3E}">
-        <p14:creationId xmlns:p14="http://schemas.microsoft.com/office/powerpoint/2010/main" val="3450469856"/>
-      </p:ext>
-    </p:extLst>
-  </p:cSld>
-  <p:clrMapOvr>
-    <a:masterClrMapping/>
-  </p:clrMapOvr>
-</p:notes>
-</file>
-
-<file path=ppt/notesSlides/notesSlide55.xml><?xml version="1.0" encoding="utf-8"?>
-<p:notes xmlns:a="http://schemas.openxmlformats.org/drawingml/2006/main" xmlns:r="http://schemas.openxmlformats.org/officeDocument/2006/relationships" xmlns:p="http://schemas.openxmlformats.org/presentationml/2006/main">
-  <p:cSld>
-    <p:spTree>
-      <p:nvGrpSpPr>
-        <p:cNvPr id="1" name=""/>
-        <p:cNvGrpSpPr/>
-        <p:nvPr/>
-      </p:nvGrpSpPr>
-      <p:grpSpPr>
-        <a:xfrm>
-          <a:off x="0" y="0"/>
-          <a:ext cx="0" cy="0"/>
-          <a:chOff x="0" y="0"/>
-          <a:chExt cx="0" cy="0"/>
-        </a:xfrm>
-      </p:grpSpPr>
-      <p:sp>
-        <p:nvSpPr>
-          <p:cNvPr id="2" name="Slide Image Placeholder 1"/>
-          <p:cNvSpPr>
-            <a:spLocks noGrp="1" noRot="1" noChangeAspect="1"/>
-          </p:cNvSpPr>
-          <p:nvPr>
-            <p:ph type="sldImg"/>
-          </p:nvPr>
-        </p:nvSpPr>
-        <p:spPr/>
-      </p:sp>
-      <p:sp>
-        <p:nvSpPr>
-          <p:cNvPr id="3" name="Notes Placeholder 2"/>
-          <p:cNvSpPr>
-            <a:spLocks noGrp="1"/>
-          </p:cNvSpPr>
-          <p:nvPr>
-            <p:ph type="body" idx="1"/>
-          </p:nvPr>
-        </p:nvSpPr>
-        <p:spPr/>
-        <p:txBody>
-          <a:bodyPr/>
-          <a:lstStyle/>
-          <a:p>
-            <a:endParaRPr lang="en-US" b="0" dirty="0" smtClean="0"/>
-          </a:p>
-        </p:txBody>
-      </p:sp>
-      <p:sp>
-        <p:nvSpPr>
-          <p:cNvPr id="4" name="Slide Number Placeholder 3"/>
-          <p:cNvSpPr>
-            <a:spLocks noGrp="1"/>
-          </p:cNvSpPr>
-          <p:nvPr>
-            <p:ph type="sldNum" sz="quarter" idx="10"/>
-          </p:nvPr>
-        </p:nvSpPr>
-        <p:spPr/>
-        <p:txBody>
-          <a:bodyPr/>
-          <a:lstStyle/>
-          <a:p>
-            <a:fld id="{89029652-62E7-43D6-83B5-097D7B7AA5D8}" type="slidenum">
-              <a:rPr lang="en-US" smtClean="0"/>
-              <a:t>55</a:t>
-            </a:fld>
-            <a:endParaRPr lang="en-US"/>
-          </a:p>
-        </p:txBody>
-      </p:sp>
-    </p:spTree>
-    <p:extLst>
-      <p:ext uri="{BB962C8B-B14F-4D97-AF65-F5344CB8AC3E}">
-        <p14:creationId xmlns:p14="http://schemas.microsoft.com/office/powerpoint/2010/main" val="2647091800"/>
-      </p:ext>
-    </p:extLst>
-  </p:cSld>
-  <p:clrMapOvr>
-    <a:masterClrMapping/>
-  </p:clrMapOvr>
-</p:notes>
-</file>
-
-<file path=ppt/notesSlides/notesSlide56.xml><?xml version="1.0" encoding="utf-8"?>
-<p:notes xmlns:a="http://schemas.openxmlformats.org/drawingml/2006/main" xmlns:r="http://schemas.openxmlformats.org/officeDocument/2006/relationships" xmlns:p="http://schemas.openxmlformats.org/presentationml/2006/main">
-  <p:cSld>
-    <p:spTree>
-      <p:nvGrpSpPr>
-        <p:cNvPr id="1" name=""/>
-        <p:cNvGrpSpPr/>
-        <p:nvPr/>
-      </p:nvGrpSpPr>
-      <p:grpSpPr>
-        <a:xfrm>
-          <a:off x="0" y="0"/>
-          <a:ext cx="0" cy="0"/>
-          <a:chOff x="0" y="0"/>
-          <a:chExt cx="0" cy="0"/>
-        </a:xfrm>
-      </p:grpSpPr>
-      <p:sp>
-        <p:nvSpPr>
-          <p:cNvPr id="2" name="Slide Image Placeholder 1"/>
-          <p:cNvSpPr>
-            <a:spLocks noGrp="1" noRot="1" noChangeAspect="1"/>
-          </p:cNvSpPr>
-          <p:nvPr>
-            <p:ph type="sldImg"/>
-          </p:nvPr>
-        </p:nvSpPr>
-        <p:spPr/>
-      </p:sp>
-      <p:sp>
-        <p:nvSpPr>
-          <p:cNvPr id="3" name="Notes Placeholder 2"/>
-          <p:cNvSpPr>
-            <a:spLocks noGrp="1"/>
-          </p:cNvSpPr>
-          <p:nvPr>
-            <p:ph type="body" idx="1"/>
-          </p:nvPr>
-        </p:nvSpPr>
-        <p:spPr/>
-        <p:txBody>
-          <a:bodyPr/>
-          <a:lstStyle/>
-          <a:p>
-            <a:endParaRPr lang="en-US" b="0" dirty="0" smtClean="0"/>
-          </a:p>
-        </p:txBody>
-      </p:sp>
-      <p:sp>
-        <p:nvSpPr>
-          <p:cNvPr id="4" name="Slide Number Placeholder 3"/>
-          <p:cNvSpPr>
-            <a:spLocks noGrp="1"/>
-          </p:cNvSpPr>
-          <p:nvPr>
-            <p:ph type="sldNum" sz="quarter" idx="10"/>
-          </p:nvPr>
-        </p:nvSpPr>
-        <p:spPr/>
-        <p:txBody>
-          <a:bodyPr/>
-          <a:lstStyle/>
-          <a:p>
-            <a:fld id="{89029652-62E7-43D6-83B5-097D7B7AA5D8}" type="slidenum">
-              <a:rPr lang="en-US" smtClean="0"/>
-              <a:t>56</a:t>
-            </a:fld>
-            <a:endParaRPr lang="en-US"/>
-          </a:p>
-        </p:txBody>
-      </p:sp>
-    </p:spTree>
-    <p:extLst>
-      <p:ext uri="{BB962C8B-B14F-4D97-AF65-F5344CB8AC3E}">
-        <p14:creationId xmlns:p14="http://schemas.microsoft.com/office/powerpoint/2010/main" val="3603726692"/>
-      </p:ext>
-    </p:extLst>
-  </p:cSld>
-  <p:clrMapOvr>
-    <a:masterClrMapping/>
-  </p:clrMapOvr>
-</p:notes>
-</file>
-
-<file path=ppt/notesSlides/notesSlide57.xml><?xml version="1.0" encoding="utf-8"?>
-<p:notes xmlns:a="http://schemas.openxmlformats.org/drawingml/2006/main" xmlns:r="http://schemas.openxmlformats.org/officeDocument/2006/relationships" xmlns:p="http://schemas.openxmlformats.org/presentationml/2006/main">
-  <p:cSld>
-    <p:spTree>
-      <p:nvGrpSpPr>
-        <p:cNvPr id="1" name=""/>
-        <p:cNvGrpSpPr/>
-        <p:nvPr/>
-      </p:nvGrpSpPr>
-      <p:grpSpPr>
-        <a:xfrm>
-          <a:off x="0" y="0"/>
-          <a:ext cx="0" cy="0"/>
-          <a:chOff x="0" y="0"/>
-          <a:chExt cx="0" cy="0"/>
-        </a:xfrm>
-      </p:grpSpPr>
-      <p:sp>
-        <p:nvSpPr>
-          <p:cNvPr id="2" name="Slide Image Placeholder 1"/>
-          <p:cNvSpPr>
-            <a:spLocks noGrp="1" noRot="1" noChangeAspect="1"/>
-          </p:cNvSpPr>
-          <p:nvPr>
-            <p:ph type="sldImg"/>
-          </p:nvPr>
-        </p:nvSpPr>
-        <p:spPr/>
-      </p:sp>
-      <p:sp>
-        <p:nvSpPr>
-          <p:cNvPr id="3" name="Notes Placeholder 2"/>
-          <p:cNvSpPr>
-            <a:spLocks noGrp="1"/>
-          </p:cNvSpPr>
-          <p:nvPr>
-            <p:ph type="body" idx="1"/>
-          </p:nvPr>
-        </p:nvSpPr>
-        <p:spPr/>
-        <p:txBody>
-          <a:bodyPr/>
-          <a:lstStyle/>
-          <a:p>
-            <a:endParaRPr lang="en-US" b="0" dirty="0" smtClean="0"/>
-          </a:p>
-        </p:txBody>
-      </p:sp>
-      <p:sp>
-        <p:nvSpPr>
-          <p:cNvPr id="4" name="Slide Number Placeholder 3"/>
-          <p:cNvSpPr>
-            <a:spLocks noGrp="1"/>
-          </p:cNvSpPr>
-          <p:nvPr>
-            <p:ph type="sldNum" sz="quarter" idx="10"/>
-          </p:nvPr>
-        </p:nvSpPr>
-        <p:spPr/>
-        <p:txBody>
-          <a:bodyPr/>
-          <a:lstStyle/>
-          <a:p>
-            <a:fld id="{89029652-62E7-43D6-83B5-097D7B7AA5D8}" type="slidenum">
-              <a:rPr lang="en-US" smtClean="0"/>
-              <a:t>57</a:t>
-            </a:fld>
-            <a:endParaRPr lang="en-US"/>
-          </a:p>
-        </p:txBody>
-      </p:sp>
-    </p:spTree>
-    <p:extLst>
-      <p:ext uri="{BB962C8B-B14F-4D97-AF65-F5344CB8AC3E}">
-        <p14:creationId xmlns:p14="http://schemas.microsoft.com/office/powerpoint/2010/main" val="2106924964"/>
       </p:ext>
     </p:extLst>
   </p:cSld>
@@ -5359,7 +5363,7 @@
     </p:spTree>
     <p:extLst>
       <p:ext uri="{BB962C8B-B14F-4D97-AF65-F5344CB8AC3E}">
-        <p14:creationId xmlns:p14="http://schemas.microsoft.com/office/powerpoint/2010/main" val="506673237"/>
+        <p14:creationId xmlns:p14="http://schemas.microsoft.com/office/powerpoint/2010/main" val="3450469856"/>
       </p:ext>
     </p:extLst>
   </p:cSld>
@@ -5413,32 +5417,7 @@
           <a:bodyPr/>
           <a:lstStyle/>
           <a:p>
-            <a:pPr marL="0" marR="0" indent="0" algn="l" defTabSz="914400" rtl="0" eaLnBrk="1" fontAlgn="auto" latinLnBrk="0" hangingPunct="1">
-              <a:lnSpc>
-                <a:spcPct val="100000"/>
-              </a:lnSpc>
-              <a:spcBef>
-                <a:spcPts val="0"/>
-              </a:spcBef>
-              <a:spcAft>
-                <a:spcPts val="0"/>
-              </a:spcAft>
-              <a:buClrTx/>
-              <a:buSzTx/>
-              <a:buFontTx/>
-              <a:buNone/>
-              <a:tabLst/>
-              <a:defRPr/>
-            </a:pPr>
-            <a:endParaRPr lang="en-US" sz="1200" kern="1200" dirty="0" smtClean="0">
-              <a:solidFill>
-                <a:schemeClr val="tx1"/>
-              </a:solidFill>
-              <a:effectLst/>
-              <a:latin typeface="+mn-lt"/>
-              <a:ea typeface="+mn-ea"/>
-              <a:cs typeface="+mn-cs"/>
-            </a:endParaRPr>
+            <a:endParaRPr lang="en-US" b="0" dirty="0" smtClean="0"/>
           </a:p>
         </p:txBody>
       </p:sp>
@@ -5468,7 +5447,7 @@
     </p:spTree>
     <p:extLst>
       <p:ext uri="{BB962C8B-B14F-4D97-AF65-F5344CB8AC3E}">
-        <p14:creationId xmlns:p14="http://schemas.microsoft.com/office/powerpoint/2010/main" val="1923953829"/>
+        <p14:creationId xmlns:p14="http://schemas.microsoft.com/office/powerpoint/2010/main" val="2647091800"/>
       </p:ext>
     </p:extLst>
   </p:cSld>
@@ -5636,7 +5615,7 @@
     </p:spTree>
     <p:extLst>
       <p:ext uri="{BB962C8B-B14F-4D97-AF65-F5344CB8AC3E}">
-        <p14:creationId xmlns:p14="http://schemas.microsoft.com/office/powerpoint/2010/main" val="531577243"/>
+        <p14:creationId xmlns:p14="http://schemas.microsoft.com/office/powerpoint/2010/main" val="3603726692"/>
       </p:ext>
     </p:extLst>
   </p:cSld>
@@ -5720,7 +5699,7 @@
     </p:spTree>
     <p:extLst>
       <p:ext uri="{BB962C8B-B14F-4D97-AF65-F5344CB8AC3E}">
-        <p14:creationId xmlns:p14="http://schemas.microsoft.com/office/powerpoint/2010/main" val="2079785236"/>
+        <p14:creationId xmlns:p14="http://schemas.microsoft.com/office/powerpoint/2010/main" val="2106924964"/>
       </p:ext>
     </p:extLst>
   </p:cSld>
@@ -5804,7 +5783,7 @@
     </p:spTree>
     <p:extLst>
       <p:ext uri="{BB962C8B-B14F-4D97-AF65-F5344CB8AC3E}">
-        <p14:creationId xmlns:p14="http://schemas.microsoft.com/office/powerpoint/2010/main" val="1664318980"/>
+        <p14:creationId xmlns:p14="http://schemas.microsoft.com/office/powerpoint/2010/main" val="506673237"/>
       </p:ext>
     </p:extLst>
   </p:cSld>
@@ -5858,7 +5837,32 @@
           <a:bodyPr/>
           <a:lstStyle/>
           <a:p>
-            <a:endParaRPr lang="en-US" b="0" dirty="0" smtClean="0"/>
+            <a:pPr marL="0" marR="0" indent="0" algn="l" defTabSz="914400" rtl="0" eaLnBrk="1" fontAlgn="auto" latinLnBrk="0" hangingPunct="1">
+              <a:lnSpc>
+                <a:spcPct val="100000"/>
+              </a:lnSpc>
+              <a:spcBef>
+                <a:spcPts val="0"/>
+              </a:spcBef>
+              <a:spcAft>
+                <a:spcPts val="0"/>
+              </a:spcAft>
+              <a:buClrTx/>
+              <a:buSzTx/>
+              <a:buFontTx/>
+              <a:buNone/>
+              <a:tabLst/>
+              <a:defRPr/>
+            </a:pPr>
+            <a:endParaRPr lang="en-US" sz="1200" kern="1200" dirty="0" smtClean="0">
+              <a:solidFill>
+                <a:schemeClr val="tx1"/>
+              </a:solidFill>
+              <a:effectLst/>
+              <a:latin typeface="+mn-lt"/>
+              <a:ea typeface="+mn-ea"/>
+              <a:cs typeface="+mn-cs"/>
+            </a:endParaRPr>
           </a:p>
         </p:txBody>
       </p:sp>
@@ -5888,7 +5892,7 @@
     </p:spTree>
     <p:extLst>
       <p:ext uri="{BB962C8B-B14F-4D97-AF65-F5344CB8AC3E}">
-        <p14:creationId xmlns:p14="http://schemas.microsoft.com/office/powerpoint/2010/main" val="1581406028"/>
+        <p14:creationId xmlns:p14="http://schemas.microsoft.com/office/powerpoint/2010/main" val="1923953829"/>
       </p:ext>
     </p:extLst>
   </p:cSld>
@@ -5972,7 +5976,7 @@
     </p:spTree>
     <p:extLst>
       <p:ext uri="{BB962C8B-B14F-4D97-AF65-F5344CB8AC3E}">
-        <p14:creationId xmlns:p14="http://schemas.microsoft.com/office/powerpoint/2010/main" val="299799724"/>
+        <p14:creationId xmlns:p14="http://schemas.microsoft.com/office/powerpoint/2010/main" val="531577243"/>
       </p:ext>
     </p:extLst>
   </p:cSld>
@@ -6056,7 +6060,7 @@
     </p:spTree>
     <p:extLst>
       <p:ext uri="{BB962C8B-B14F-4D97-AF65-F5344CB8AC3E}">
-        <p14:creationId xmlns:p14="http://schemas.microsoft.com/office/powerpoint/2010/main" val="2229440876"/>
+        <p14:creationId xmlns:p14="http://schemas.microsoft.com/office/powerpoint/2010/main" val="2079785236"/>
       </p:ext>
     </p:extLst>
   </p:cSld>
@@ -6140,7 +6144,7 @@
     </p:spTree>
     <p:extLst>
       <p:ext uri="{BB962C8B-B14F-4D97-AF65-F5344CB8AC3E}">
-        <p14:creationId xmlns:p14="http://schemas.microsoft.com/office/powerpoint/2010/main" val="2350728921"/>
+        <p14:creationId xmlns:p14="http://schemas.microsoft.com/office/powerpoint/2010/main" val="1664318980"/>
       </p:ext>
     </p:extLst>
   </p:cSld>
@@ -6224,7 +6228,7 @@
     </p:spTree>
     <p:extLst>
       <p:ext uri="{BB962C8B-B14F-4D97-AF65-F5344CB8AC3E}">
-        <p14:creationId xmlns:p14="http://schemas.microsoft.com/office/powerpoint/2010/main" val="1004591723"/>
+        <p14:creationId xmlns:p14="http://schemas.microsoft.com/office/powerpoint/2010/main" val="1581406028"/>
       </p:ext>
     </p:extLst>
   </p:cSld>
@@ -6308,7 +6312,7 @@
     </p:spTree>
     <p:extLst>
       <p:ext uri="{BB962C8B-B14F-4D97-AF65-F5344CB8AC3E}">
-        <p14:creationId xmlns:p14="http://schemas.microsoft.com/office/powerpoint/2010/main" val="1737165775"/>
+        <p14:creationId xmlns:p14="http://schemas.microsoft.com/office/powerpoint/2010/main" val="299799724"/>
       </p:ext>
     </p:extLst>
   </p:cSld>
@@ -6392,7 +6396,7 @@
     </p:spTree>
     <p:extLst>
       <p:ext uri="{BB962C8B-B14F-4D97-AF65-F5344CB8AC3E}">
-        <p14:creationId xmlns:p14="http://schemas.microsoft.com/office/powerpoint/2010/main" val="1030293071"/>
+        <p14:creationId xmlns:p14="http://schemas.microsoft.com/office/powerpoint/2010/main" val="2229440876"/>
       </p:ext>
     </p:extLst>
   </p:cSld>
@@ -6560,7 +6564,7 @@
     </p:spTree>
     <p:extLst>
       <p:ext uri="{BB962C8B-B14F-4D97-AF65-F5344CB8AC3E}">
-        <p14:creationId xmlns:p14="http://schemas.microsoft.com/office/powerpoint/2010/main" val="834707851"/>
+        <p14:creationId xmlns:p14="http://schemas.microsoft.com/office/powerpoint/2010/main" val="2350728921"/>
       </p:ext>
     </p:extLst>
   </p:cSld>
@@ -6644,7 +6648,7 @@
     </p:spTree>
     <p:extLst>
       <p:ext uri="{BB962C8B-B14F-4D97-AF65-F5344CB8AC3E}">
-        <p14:creationId xmlns:p14="http://schemas.microsoft.com/office/powerpoint/2010/main" val="1542746690"/>
+        <p14:creationId xmlns:p14="http://schemas.microsoft.com/office/powerpoint/2010/main" val="1004591723"/>
       </p:ext>
     </p:extLst>
   </p:cSld>
@@ -6728,7 +6732,7 @@
     </p:spTree>
     <p:extLst>
       <p:ext uri="{BB962C8B-B14F-4D97-AF65-F5344CB8AC3E}">
-        <p14:creationId xmlns:p14="http://schemas.microsoft.com/office/powerpoint/2010/main" val="3271074343"/>
+        <p14:creationId xmlns:p14="http://schemas.microsoft.com/office/powerpoint/2010/main" val="1737165775"/>
       </p:ext>
     </p:extLst>
   </p:cSld>
@@ -6812,7 +6816,7 @@
     </p:spTree>
     <p:extLst>
       <p:ext uri="{BB962C8B-B14F-4D97-AF65-F5344CB8AC3E}">
-        <p14:creationId xmlns:p14="http://schemas.microsoft.com/office/powerpoint/2010/main" val="2298775834"/>
+        <p14:creationId xmlns:p14="http://schemas.microsoft.com/office/powerpoint/2010/main" val="1030293071"/>
       </p:ext>
     </p:extLst>
   </p:cSld>
@@ -6866,6 +6870,342 @@
           <a:bodyPr/>
           <a:lstStyle/>
           <a:p>
+            <a:endParaRPr lang="en-US" b="0" dirty="0" smtClean="0"/>
+          </a:p>
+        </p:txBody>
+      </p:sp>
+      <p:sp>
+        <p:nvSpPr>
+          <p:cNvPr id="4" name="Slide Number Placeholder 3"/>
+          <p:cNvSpPr>
+            <a:spLocks noGrp="1"/>
+          </p:cNvSpPr>
+          <p:nvPr>
+            <p:ph type="sldNum" sz="quarter" idx="10"/>
+          </p:nvPr>
+        </p:nvSpPr>
+        <p:spPr/>
+        <p:txBody>
+          <a:bodyPr/>
+          <a:lstStyle/>
+          <a:p>
+            <a:fld id="{89029652-62E7-43D6-83B5-097D7B7AA5D8}" type="slidenum">
+              <a:rPr lang="en-US" smtClean="0"/>
+              <a:t>74</a:t>
+            </a:fld>
+            <a:endParaRPr lang="en-US"/>
+          </a:p>
+        </p:txBody>
+      </p:sp>
+    </p:spTree>
+    <p:extLst>
+      <p:ext uri="{BB962C8B-B14F-4D97-AF65-F5344CB8AC3E}">
+        <p14:creationId xmlns:p14="http://schemas.microsoft.com/office/powerpoint/2010/main" val="834707851"/>
+      </p:ext>
+    </p:extLst>
+  </p:cSld>
+  <p:clrMapOvr>
+    <a:masterClrMapping/>
+  </p:clrMapOvr>
+</p:notes>
+</file>
+
+<file path=ppt/notesSlides/notesSlide75.xml><?xml version="1.0" encoding="utf-8"?>
+<p:notes xmlns:a="http://schemas.openxmlformats.org/drawingml/2006/main" xmlns:r="http://schemas.openxmlformats.org/officeDocument/2006/relationships" xmlns:p="http://schemas.openxmlformats.org/presentationml/2006/main">
+  <p:cSld>
+    <p:spTree>
+      <p:nvGrpSpPr>
+        <p:cNvPr id="1" name=""/>
+        <p:cNvGrpSpPr/>
+        <p:nvPr/>
+      </p:nvGrpSpPr>
+      <p:grpSpPr>
+        <a:xfrm>
+          <a:off x="0" y="0"/>
+          <a:ext cx="0" cy="0"/>
+          <a:chOff x="0" y="0"/>
+          <a:chExt cx="0" cy="0"/>
+        </a:xfrm>
+      </p:grpSpPr>
+      <p:sp>
+        <p:nvSpPr>
+          <p:cNvPr id="2" name="Slide Image Placeholder 1"/>
+          <p:cNvSpPr>
+            <a:spLocks noGrp="1" noRot="1" noChangeAspect="1"/>
+          </p:cNvSpPr>
+          <p:nvPr>
+            <p:ph type="sldImg"/>
+          </p:nvPr>
+        </p:nvSpPr>
+        <p:spPr/>
+      </p:sp>
+      <p:sp>
+        <p:nvSpPr>
+          <p:cNvPr id="3" name="Notes Placeholder 2"/>
+          <p:cNvSpPr>
+            <a:spLocks noGrp="1"/>
+          </p:cNvSpPr>
+          <p:nvPr>
+            <p:ph type="body" idx="1"/>
+          </p:nvPr>
+        </p:nvSpPr>
+        <p:spPr/>
+        <p:txBody>
+          <a:bodyPr/>
+          <a:lstStyle/>
+          <a:p>
+            <a:endParaRPr lang="en-US" b="0" dirty="0" smtClean="0"/>
+          </a:p>
+        </p:txBody>
+      </p:sp>
+      <p:sp>
+        <p:nvSpPr>
+          <p:cNvPr id="4" name="Slide Number Placeholder 3"/>
+          <p:cNvSpPr>
+            <a:spLocks noGrp="1"/>
+          </p:cNvSpPr>
+          <p:nvPr>
+            <p:ph type="sldNum" sz="quarter" idx="10"/>
+          </p:nvPr>
+        </p:nvSpPr>
+        <p:spPr/>
+        <p:txBody>
+          <a:bodyPr/>
+          <a:lstStyle/>
+          <a:p>
+            <a:fld id="{89029652-62E7-43D6-83B5-097D7B7AA5D8}" type="slidenum">
+              <a:rPr lang="en-US" smtClean="0"/>
+              <a:t>75</a:t>
+            </a:fld>
+            <a:endParaRPr lang="en-US"/>
+          </a:p>
+        </p:txBody>
+      </p:sp>
+    </p:spTree>
+    <p:extLst>
+      <p:ext uri="{BB962C8B-B14F-4D97-AF65-F5344CB8AC3E}">
+        <p14:creationId xmlns:p14="http://schemas.microsoft.com/office/powerpoint/2010/main" val="1542746690"/>
+      </p:ext>
+    </p:extLst>
+  </p:cSld>
+  <p:clrMapOvr>
+    <a:masterClrMapping/>
+  </p:clrMapOvr>
+</p:notes>
+</file>
+
+<file path=ppt/notesSlides/notesSlide76.xml><?xml version="1.0" encoding="utf-8"?>
+<p:notes xmlns:a="http://schemas.openxmlformats.org/drawingml/2006/main" xmlns:r="http://schemas.openxmlformats.org/officeDocument/2006/relationships" xmlns:p="http://schemas.openxmlformats.org/presentationml/2006/main">
+  <p:cSld>
+    <p:spTree>
+      <p:nvGrpSpPr>
+        <p:cNvPr id="1" name=""/>
+        <p:cNvGrpSpPr/>
+        <p:nvPr/>
+      </p:nvGrpSpPr>
+      <p:grpSpPr>
+        <a:xfrm>
+          <a:off x="0" y="0"/>
+          <a:ext cx="0" cy="0"/>
+          <a:chOff x="0" y="0"/>
+          <a:chExt cx="0" cy="0"/>
+        </a:xfrm>
+      </p:grpSpPr>
+      <p:sp>
+        <p:nvSpPr>
+          <p:cNvPr id="2" name="Slide Image Placeholder 1"/>
+          <p:cNvSpPr>
+            <a:spLocks noGrp="1" noRot="1" noChangeAspect="1"/>
+          </p:cNvSpPr>
+          <p:nvPr>
+            <p:ph type="sldImg"/>
+          </p:nvPr>
+        </p:nvSpPr>
+        <p:spPr/>
+      </p:sp>
+      <p:sp>
+        <p:nvSpPr>
+          <p:cNvPr id="3" name="Notes Placeholder 2"/>
+          <p:cNvSpPr>
+            <a:spLocks noGrp="1"/>
+          </p:cNvSpPr>
+          <p:nvPr>
+            <p:ph type="body" idx="1"/>
+          </p:nvPr>
+        </p:nvSpPr>
+        <p:spPr/>
+        <p:txBody>
+          <a:bodyPr/>
+          <a:lstStyle/>
+          <a:p>
+            <a:endParaRPr lang="en-US" b="0" dirty="0" smtClean="0"/>
+          </a:p>
+        </p:txBody>
+      </p:sp>
+      <p:sp>
+        <p:nvSpPr>
+          <p:cNvPr id="4" name="Slide Number Placeholder 3"/>
+          <p:cNvSpPr>
+            <a:spLocks noGrp="1"/>
+          </p:cNvSpPr>
+          <p:nvPr>
+            <p:ph type="sldNum" sz="quarter" idx="10"/>
+          </p:nvPr>
+        </p:nvSpPr>
+        <p:spPr/>
+        <p:txBody>
+          <a:bodyPr/>
+          <a:lstStyle/>
+          <a:p>
+            <a:fld id="{89029652-62E7-43D6-83B5-097D7B7AA5D8}" type="slidenum">
+              <a:rPr lang="en-US" smtClean="0"/>
+              <a:t>76</a:t>
+            </a:fld>
+            <a:endParaRPr lang="en-US"/>
+          </a:p>
+        </p:txBody>
+      </p:sp>
+    </p:spTree>
+    <p:extLst>
+      <p:ext uri="{BB962C8B-B14F-4D97-AF65-F5344CB8AC3E}">
+        <p14:creationId xmlns:p14="http://schemas.microsoft.com/office/powerpoint/2010/main" val="3271074343"/>
+      </p:ext>
+    </p:extLst>
+  </p:cSld>
+  <p:clrMapOvr>
+    <a:masterClrMapping/>
+  </p:clrMapOvr>
+</p:notes>
+</file>
+
+<file path=ppt/notesSlides/notesSlide77.xml><?xml version="1.0" encoding="utf-8"?>
+<p:notes xmlns:a="http://schemas.openxmlformats.org/drawingml/2006/main" xmlns:r="http://schemas.openxmlformats.org/officeDocument/2006/relationships" xmlns:p="http://schemas.openxmlformats.org/presentationml/2006/main">
+  <p:cSld>
+    <p:spTree>
+      <p:nvGrpSpPr>
+        <p:cNvPr id="1" name=""/>
+        <p:cNvGrpSpPr/>
+        <p:nvPr/>
+      </p:nvGrpSpPr>
+      <p:grpSpPr>
+        <a:xfrm>
+          <a:off x="0" y="0"/>
+          <a:ext cx="0" cy="0"/>
+          <a:chOff x="0" y="0"/>
+          <a:chExt cx="0" cy="0"/>
+        </a:xfrm>
+      </p:grpSpPr>
+      <p:sp>
+        <p:nvSpPr>
+          <p:cNvPr id="2" name="Slide Image Placeholder 1"/>
+          <p:cNvSpPr>
+            <a:spLocks noGrp="1" noRot="1" noChangeAspect="1"/>
+          </p:cNvSpPr>
+          <p:nvPr>
+            <p:ph type="sldImg"/>
+          </p:nvPr>
+        </p:nvSpPr>
+        <p:spPr/>
+      </p:sp>
+      <p:sp>
+        <p:nvSpPr>
+          <p:cNvPr id="3" name="Notes Placeholder 2"/>
+          <p:cNvSpPr>
+            <a:spLocks noGrp="1"/>
+          </p:cNvSpPr>
+          <p:nvPr>
+            <p:ph type="body" idx="1"/>
+          </p:nvPr>
+        </p:nvSpPr>
+        <p:spPr/>
+        <p:txBody>
+          <a:bodyPr/>
+          <a:lstStyle/>
+          <a:p>
+            <a:endParaRPr lang="en-US" b="0" dirty="0" smtClean="0"/>
+          </a:p>
+        </p:txBody>
+      </p:sp>
+      <p:sp>
+        <p:nvSpPr>
+          <p:cNvPr id="4" name="Slide Number Placeholder 3"/>
+          <p:cNvSpPr>
+            <a:spLocks noGrp="1"/>
+          </p:cNvSpPr>
+          <p:nvPr>
+            <p:ph type="sldNum" sz="quarter" idx="10"/>
+          </p:nvPr>
+        </p:nvSpPr>
+        <p:spPr/>
+        <p:txBody>
+          <a:bodyPr/>
+          <a:lstStyle/>
+          <a:p>
+            <a:fld id="{89029652-62E7-43D6-83B5-097D7B7AA5D8}" type="slidenum">
+              <a:rPr lang="en-US" smtClean="0"/>
+              <a:t>77</a:t>
+            </a:fld>
+            <a:endParaRPr lang="en-US"/>
+          </a:p>
+        </p:txBody>
+      </p:sp>
+    </p:spTree>
+    <p:extLst>
+      <p:ext uri="{BB962C8B-B14F-4D97-AF65-F5344CB8AC3E}">
+        <p14:creationId xmlns:p14="http://schemas.microsoft.com/office/powerpoint/2010/main" val="2298775834"/>
+      </p:ext>
+    </p:extLst>
+  </p:cSld>
+  <p:clrMapOvr>
+    <a:masterClrMapping/>
+  </p:clrMapOvr>
+</p:notes>
+</file>
+
+<file path=ppt/notesSlides/notesSlide78.xml><?xml version="1.0" encoding="utf-8"?>
+<p:notes xmlns:a="http://schemas.openxmlformats.org/drawingml/2006/main" xmlns:r="http://schemas.openxmlformats.org/officeDocument/2006/relationships" xmlns:p="http://schemas.openxmlformats.org/presentationml/2006/main">
+  <p:cSld>
+    <p:spTree>
+      <p:nvGrpSpPr>
+        <p:cNvPr id="1" name=""/>
+        <p:cNvGrpSpPr/>
+        <p:nvPr/>
+      </p:nvGrpSpPr>
+      <p:grpSpPr>
+        <a:xfrm>
+          <a:off x="0" y="0"/>
+          <a:ext cx="0" cy="0"/>
+          <a:chOff x="0" y="0"/>
+          <a:chExt cx="0" cy="0"/>
+        </a:xfrm>
+      </p:grpSpPr>
+      <p:sp>
+        <p:nvSpPr>
+          <p:cNvPr id="2" name="Slide Image Placeholder 1"/>
+          <p:cNvSpPr>
+            <a:spLocks noGrp="1" noRot="1" noChangeAspect="1"/>
+          </p:cNvSpPr>
+          <p:nvPr>
+            <p:ph type="sldImg"/>
+          </p:nvPr>
+        </p:nvSpPr>
+        <p:spPr/>
+      </p:sp>
+      <p:sp>
+        <p:nvSpPr>
+          <p:cNvPr id="3" name="Notes Placeholder 2"/>
+          <p:cNvSpPr>
+            <a:spLocks noGrp="1"/>
+          </p:cNvSpPr>
+          <p:nvPr>
+            <p:ph type="body" idx="1"/>
+          </p:nvPr>
+        </p:nvSpPr>
+        <p:spPr/>
+        <p:txBody>
+          <a:bodyPr/>
+          <a:lstStyle/>
+          <a:p>
             <a:endParaRPr lang="en-US" sz="1200" kern="1200" dirty="0" smtClean="0">
               <a:solidFill>
                 <a:schemeClr val="tx1"/>
@@ -6895,7 +7235,7 @@
           <a:p>
             <a:fld id="{89029652-62E7-43D6-83B5-097D7B7AA5D8}" type="slidenum">
               <a:rPr lang="en-US" smtClean="0"/>
-              <a:t>74</a:t>
+              <a:t>78</a:t>
             </a:fld>
             <a:endParaRPr lang="en-US"/>
           </a:p>
@@ -7213,7 +7553,7 @@
           <a:p>
             <a:fld id="{75AA6396-395E-4ADA-8EE5-F328BC863A04}" type="datetimeFigureOut">
               <a:rPr lang="en-US" smtClean="0"/>
-              <a:t>1/3/2017</a:t>
+              <a:t>1/4/2017</a:t>
             </a:fld>
             <a:endParaRPr lang="en-US"/>
           </a:p>
@@ -7390,7 +7730,7 @@
           <a:p>
             <a:fld id="{75AA6396-395E-4ADA-8EE5-F328BC863A04}" type="datetimeFigureOut">
               <a:rPr lang="en-US" smtClean="0"/>
-              <a:t>1/3/2017</a:t>
+              <a:t>1/4/2017</a:t>
             </a:fld>
             <a:endParaRPr lang="en-US"/>
           </a:p>
@@ -7570,7 +7910,7 @@
           <a:p>
             <a:fld id="{75AA6396-395E-4ADA-8EE5-F328BC863A04}" type="datetimeFigureOut">
               <a:rPr lang="en-US" smtClean="0"/>
-              <a:t>1/3/2017</a:t>
+              <a:t>1/4/2017</a:t>
             </a:fld>
             <a:endParaRPr lang="en-US"/>
           </a:p>
@@ -7790,7 +8130,7 @@
           <a:p>
             <a:fld id="{75AA6396-395E-4ADA-8EE5-F328BC863A04}" type="datetimeFigureOut">
               <a:rPr lang="en-US" smtClean="0"/>
-              <a:t>1/3/2017</a:t>
+              <a:t>1/4/2017</a:t>
             </a:fld>
             <a:endParaRPr lang="en-US"/>
           </a:p>
@@ -8043,7 +8383,7 @@
           <a:p>
             <a:fld id="{75AA6396-395E-4ADA-8EE5-F328BC863A04}" type="datetimeFigureOut">
               <a:rPr lang="en-US" smtClean="0"/>
-              <a:t>1/3/2017</a:t>
+              <a:t>1/4/2017</a:t>
             </a:fld>
             <a:endParaRPr lang="en-US"/>
           </a:p>
@@ -8282,7 +8622,7 @@
           <a:p>
             <a:fld id="{75AA6396-395E-4ADA-8EE5-F328BC863A04}" type="datetimeFigureOut">
               <a:rPr lang="en-US" smtClean="0"/>
-              <a:t>1/3/2017</a:t>
+              <a:t>1/4/2017</a:t>
             </a:fld>
             <a:endParaRPr lang="en-US"/>
           </a:p>
@@ -8656,7 +8996,7 @@
           <a:p>
             <a:fld id="{75AA6396-395E-4ADA-8EE5-F328BC863A04}" type="datetimeFigureOut">
               <a:rPr lang="en-US" smtClean="0"/>
-              <a:t>1/3/2017</a:t>
+              <a:t>1/4/2017</a:t>
             </a:fld>
             <a:endParaRPr lang="en-US"/>
           </a:p>
@@ -8774,7 +9114,7 @@
           <a:p>
             <a:fld id="{75AA6396-395E-4ADA-8EE5-F328BC863A04}" type="datetimeFigureOut">
               <a:rPr lang="en-US" smtClean="0"/>
-              <a:t>1/3/2017</a:t>
+              <a:t>1/4/2017</a:t>
             </a:fld>
             <a:endParaRPr lang="en-US"/>
           </a:p>
@@ -8869,7 +9209,7 @@
           <a:p>
             <a:fld id="{75AA6396-395E-4ADA-8EE5-F328BC863A04}" type="datetimeFigureOut">
               <a:rPr lang="en-US" smtClean="0"/>
-              <a:t>1/3/2017</a:t>
+              <a:t>1/4/2017</a:t>
             </a:fld>
             <a:endParaRPr lang="en-US"/>
           </a:p>
@@ -9146,7 +9486,7 @@
           <a:p>
             <a:fld id="{75AA6396-395E-4ADA-8EE5-F328BC863A04}" type="datetimeFigureOut">
               <a:rPr lang="en-US" smtClean="0"/>
-              <a:t>1/3/2017</a:t>
+              <a:t>1/4/2017</a:t>
             </a:fld>
             <a:endParaRPr lang="en-US"/>
           </a:p>
@@ -9399,7 +9739,7 @@
           <a:p>
             <a:fld id="{75AA6396-395E-4ADA-8EE5-F328BC863A04}" type="datetimeFigureOut">
               <a:rPr lang="en-US" smtClean="0"/>
-              <a:t>1/3/2017</a:t>
+              <a:t>1/4/2017</a:t>
             </a:fld>
             <a:endParaRPr lang="en-US"/>
           </a:p>
@@ -9612,7 +9952,7 @@
           <a:p>
             <a:fld id="{75AA6396-395E-4ADA-8EE5-F328BC863A04}" type="datetimeFigureOut">
               <a:rPr lang="en-US" smtClean="0"/>
-              <a:t>1/3/2017</a:t>
+              <a:t>1/4/2017</a:t>
             </a:fld>
             <a:endParaRPr lang="en-US"/>
           </a:p>
@@ -12225,15 +12565,7 @@
             <a:pPr algn="ctr"/>
             <a:r>
               <a:rPr lang="en-US" sz="4800" dirty="0" smtClean="0"/>
-              <a:t>Show me the </a:t>
-            </a:r>
-            <a:r>
-              <a:rPr lang="en-US" sz="4800" dirty="0" err="1" smtClean="0"/>
-              <a:t>codez</a:t>
-            </a:r>
-            <a:r>
-              <a:rPr lang="en-US" sz="4800" dirty="0" smtClean="0"/>
-              <a:t>!</a:t>
+              <a:t>Show me the codez!</a:t>
             </a:r>
             <a:br>
               <a:rPr lang="en-US" sz="4800" dirty="0" smtClean="0"/>
@@ -14461,7 +14793,7 @@
         <p:spPr>
           <a:xfrm>
             <a:off x="838199" y="1690688"/>
-            <a:ext cx="9373015" cy="5034577"/>
+            <a:ext cx="11363759" cy="5034577"/>
           </a:xfrm>
           <a:prstGeom prst="rect">
             <a:avLst/>
@@ -14471,7 +14803,7 @@
     </p:spTree>
     <p:extLst>
       <p:ext uri="{BB962C8B-B14F-4D97-AF65-F5344CB8AC3E}">
-        <p14:creationId xmlns:p14="http://schemas.microsoft.com/office/powerpoint/2010/main" val="1328286172"/>
+        <p14:creationId xmlns:p14="http://schemas.microsoft.com/office/powerpoint/2010/main" val="750296430"/>
       </p:ext>
     </p:extLst>
   </p:cSld>
@@ -14694,7 +15026,7 @@
         <p:spPr>
           <a:xfrm>
             <a:off x="838199" y="1690688"/>
-            <a:ext cx="11363759" cy="5034577"/>
+            <a:ext cx="9373015" cy="5034577"/>
           </a:xfrm>
           <a:prstGeom prst="rect">
             <a:avLst/>
@@ -14704,7 +15036,7 @@
     </p:spTree>
     <p:extLst>
       <p:ext uri="{BB962C8B-B14F-4D97-AF65-F5344CB8AC3E}">
-        <p14:creationId xmlns:p14="http://schemas.microsoft.com/office/powerpoint/2010/main" val="750296430"/>
+        <p14:creationId xmlns:p14="http://schemas.microsoft.com/office/powerpoint/2010/main" val="1328286172"/>
       </p:ext>
     </p:extLst>
   </p:cSld>
@@ -14748,6 +15080,127 @@
             <p:ph type="title"/>
           </p:nvPr>
         </p:nvSpPr>
+        <p:spPr/>
+        <p:txBody>
+          <a:bodyPr>
+            <a:normAutofit/>
+          </a:bodyPr>
+          <a:lstStyle/>
+          <a:p>
+            <a:r>
+              <a:rPr lang="en-US" sz="4800" dirty="0" smtClean="0"/>
+              <a:t>Authentication</a:t>
+            </a:r>
+            <a:endParaRPr lang="en-US" sz="4800" dirty="0"/>
+          </a:p>
+        </p:txBody>
+      </p:sp>
+      <p:sp>
+        <p:nvSpPr>
+          <p:cNvPr id="3" name="Content Placeholder 2"/>
+          <p:cNvSpPr>
+            <a:spLocks noGrp="1"/>
+          </p:cNvSpPr>
+          <p:nvPr>
+            <p:ph idx="1"/>
+          </p:nvPr>
+        </p:nvSpPr>
+        <p:spPr>
+          <a:xfrm>
+            <a:off x="838200" y="1825624"/>
+            <a:ext cx="10515600" cy="4589923"/>
+          </a:xfrm>
+        </p:spPr>
+        <p:txBody>
+          <a:bodyPr>
+            <a:normAutofit/>
+          </a:bodyPr>
+          <a:lstStyle/>
+          <a:p>
+            <a:endParaRPr lang="en-US" sz="4000" dirty="0" smtClean="0"/>
+          </a:p>
+          <a:p>
+            <a:endParaRPr lang="en-US" dirty="0" smtClean="0"/>
+          </a:p>
+          <a:p>
+            <a:endParaRPr lang="en-US" dirty="0" smtClean="0"/>
+          </a:p>
+          <a:p>
+            <a:endParaRPr lang="en-US" dirty="0"/>
+          </a:p>
+        </p:txBody>
+      </p:sp>
+      <p:pic>
+        <p:nvPicPr>
+          <p:cNvPr id="4" name="Picture 3"/>
+          <p:cNvPicPr>
+            <a:picLocks noChangeAspect="1"/>
+          </p:cNvPicPr>
+          <p:nvPr/>
+        </p:nvPicPr>
+        <p:blipFill>
+          <a:blip r:embed="rId3"/>
+          <a:stretch>
+            <a:fillRect/>
+          </a:stretch>
+        </p:blipFill>
+        <p:spPr>
+          <a:xfrm>
+            <a:off x="838199" y="1690688"/>
+            <a:ext cx="11363759" cy="5034577"/>
+          </a:xfrm>
+          <a:prstGeom prst="rect">
+            <a:avLst/>
+          </a:prstGeom>
+        </p:spPr>
+      </p:pic>
+    </p:spTree>
+    <p:extLst>
+      <p:ext uri="{BB962C8B-B14F-4D97-AF65-F5344CB8AC3E}">
+        <p14:creationId xmlns:p14="http://schemas.microsoft.com/office/powerpoint/2010/main" val="3643659107"/>
+      </p:ext>
+    </p:extLst>
+  </p:cSld>
+  <p:clrMapOvr>
+    <a:masterClrMapping/>
+  </p:clrMapOvr>
+  <p:timing>
+    <p:tnLst>
+      <p:par>
+        <p:cTn id="1" dur="indefinite" restart="never" nodeType="tmRoot"/>
+      </p:par>
+    </p:tnLst>
+  </p:timing>
+</p:sld>
+</file>
+
+<file path=ppt/slides/slide42.xml><?xml version="1.0" encoding="utf-8"?>
+<p:sld xmlns:a="http://schemas.openxmlformats.org/drawingml/2006/main" xmlns:r="http://schemas.openxmlformats.org/officeDocument/2006/relationships" xmlns:p="http://schemas.openxmlformats.org/presentationml/2006/main">
+  <p:cSld>
+    <p:spTree>
+      <p:nvGrpSpPr>
+        <p:cNvPr id="1" name=""/>
+        <p:cNvGrpSpPr/>
+        <p:nvPr/>
+      </p:nvGrpSpPr>
+      <p:grpSpPr>
+        <a:xfrm>
+          <a:off x="0" y="0"/>
+          <a:ext cx="0" cy="0"/>
+          <a:chOff x="0" y="0"/>
+          <a:chExt cx="0" cy="0"/>
+        </a:xfrm>
+      </p:grpSpPr>
+      <p:sp>
+        <p:nvSpPr>
+          <p:cNvPr id="2" name="Title 1"/>
+          <p:cNvSpPr>
+            <a:spLocks noGrp="1"/>
+          </p:cNvSpPr>
+          <p:nvPr>
+            <p:ph type="title"/>
+          </p:nvPr>
+        </p:nvSpPr>
         <p:spPr>
           <a:xfrm>
             <a:off x="964927" y="1"/>
@@ -14811,7 +15264,7 @@
 </p:sld>
 </file>
 
-<file path=ppt/slides/slide42.xml><?xml version="1.0" encoding="utf-8"?>
+<file path=ppt/slides/slide43.xml><?xml version="1.0" encoding="utf-8"?>
 <p:sld xmlns:a="http://schemas.openxmlformats.org/drawingml/2006/main" xmlns:r="http://schemas.openxmlformats.org/officeDocument/2006/relationships" xmlns:p="http://schemas.openxmlformats.org/presentationml/2006/main">
   <p:cSld>
     <p:spTree>
@@ -14937,7 +15390,7 @@
 </p:sld>
 </file>
 
-<file path=ppt/slides/slide43.xml><?xml version="1.0" encoding="utf-8"?>
+<file path=ppt/slides/slide44.xml><?xml version="1.0" encoding="utf-8"?>
 <p:sld xmlns:a="http://schemas.openxmlformats.org/drawingml/2006/main" xmlns:r="http://schemas.openxmlformats.org/officeDocument/2006/relationships" xmlns:p="http://schemas.openxmlformats.org/presentationml/2006/main">
   <p:cSld>
     <p:spTree>
@@ -15063,7 +15516,142 @@
 </p:sld>
 </file>
 
-<file path=ppt/slides/slide44.xml><?xml version="1.0" encoding="utf-8"?>
+<file path=ppt/slides/slide45.xml><?xml version="1.0" encoding="utf-8"?>
+<p:sld xmlns:a="http://schemas.openxmlformats.org/drawingml/2006/main" xmlns:r="http://schemas.openxmlformats.org/officeDocument/2006/relationships" xmlns:p="http://schemas.openxmlformats.org/presentationml/2006/main">
+  <p:cSld>
+    <p:spTree>
+      <p:nvGrpSpPr>
+        <p:cNvPr id="1" name=""/>
+        <p:cNvGrpSpPr/>
+        <p:nvPr/>
+      </p:nvGrpSpPr>
+      <p:grpSpPr>
+        <a:xfrm>
+          <a:off x="0" y="0"/>
+          <a:ext cx="0" cy="0"/>
+          <a:chOff x="0" y="0"/>
+          <a:chExt cx="0" cy="0"/>
+        </a:xfrm>
+      </p:grpSpPr>
+      <p:sp>
+        <p:nvSpPr>
+          <p:cNvPr id="2" name="Title 1"/>
+          <p:cNvSpPr>
+            <a:spLocks noGrp="1"/>
+          </p:cNvSpPr>
+          <p:nvPr>
+            <p:ph type="title"/>
+          </p:nvPr>
+        </p:nvSpPr>
+        <p:spPr/>
+        <p:txBody>
+          <a:bodyPr>
+            <a:normAutofit/>
+          </a:bodyPr>
+          <a:lstStyle/>
+          <a:p>
+            <a:r>
+              <a:rPr lang="en-US" sz="4800" dirty="0" smtClean="0"/>
+              <a:t>Access Control </a:t>
+            </a:r>
+            <a:r>
+              <a:rPr lang="en-US" sz="4800" dirty="0"/>
+              <a:t>– framework</a:t>
+            </a:r>
+          </a:p>
+        </p:txBody>
+      </p:sp>
+      <p:sp>
+        <p:nvSpPr>
+          <p:cNvPr id="3" name="Content Placeholder 2"/>
+          <p:cNvSpPr>
+            <a:spLocks noGrp="1"/>
+          </p:cNvSpPr>
+          <p:nvPr>
+            <p:ph idx="1"/>
+          </p:nvPr>
+        </p:nvSpPr>
+        <p:spPr>
+          <a:xfrm>
+            <a:off x="838200" y="1825624"/>
+            <a:ext cx="10515600" cy="4589923"/>
+          </a:xfrm>
+        </p:spPr>
+        <p:txBody>
+          <a:bodyPr>
+            <a:normAutofit/>
+          </a:bodyPr>
+          <a:lstStyle/>
+          <a:p>
+            <a:endParaRPr lang="en-US" dirty="0" smtClean="0"/>
+          </a:p>
+          <a:p>
+            <a:endParaRPr lang="en-US" dirty="0" smtClean="0"/>
+          </a:p>
+          <a:p>
+            <a:endParaRPr lang="en-US" dirty="0"/>
+          </a:p>
+        </p:txBody>
+      </p:sp>
+      <p:sp>
+        <p:nvSpPr>
+          <p:cNvPr id="4" name="TextBox 3"/>
+          <p:cNvSpPr txBox="1"/>
+          <p:nvPr/>
+        </p:nvSpPr>
+        <p:spPr>
+          <a:xfrm>
+            <a:off x="2091813" y="2507226"/>
+            <a:ext cx="8008374" cy="1077218"/>
+          </a:xfrm>
+          <a:prstGeom prst="rect">
+            <a:avLst/>
+          </a:prstGeom>
+          <a:noFill/>
+        </p:spPr>
+        <p:txBody>
+          <a:bodyPr wrap="square" rtlCol="0">
+            <a:spAutoFit/>
+          </a:bodyPr>
+          <a:lstStyle/>
+          <a:p>
+            <a:r>
+              <a:rPr lang="en-US" sz="3200" dirty="0" smtClean="0">
+                <a:solidFill>
+                  <a:srgbClr val="FF0000"/>
+                </a:solidFill>
+              </a:rPr>
+              <a:t>TODO: Show method names w/ out "secure" and "insecure"</a:t>
+            </a:r>
+            <a:endParaRPr lang="en-US" sz="3200" dirty="0">
+              <a:solidFill>
+                <a:srgbClr val="FF0000"/>
+              </a:solidFill>
+            </a:endParaRPr>
+          </a:p>
+        </p:txBody>
+      </p:sp>
+    </p:spTree>
+    <p:extLst>
+      <p:ext uri="{BB962C8B-B14F-4D97-AF65-F5344CB8AC3E}">
+        <p14:creationId xmlns:p14="http://schemas.microsoft.com/office/powerpoint/2010/main" val="599466552"/>
+      </p:ext>
+    </p:extLst>
+  </p:cSld>
+  <p:clrMapOvr>
+    <a:masterClrMapping/>
+  </p:clrMapOvr>
+  <p:timing>
+    <p:tnLst>
+      <p:par>
+        <p:cTn id="1" dur="indefinite" restart="never" nodeType="tmRoot"/>
+      </p:par>
+    </p:tnLst>
+  </p:timing>
+</p:sld>
+</file>
+
+<file path=ppt/slides/slide46.xml><?xml version="1.0" encoding="utf-8"?>
 <p:sld xmlns:a="http://schemas.openxmlformats.org/drawingml/2006/main" xmlns:r="http://schemas.openxmlformats.org/officeDocument/2006/relationships" xmlns:p="http://schemas.openxmlformats.org/presentationml/2006/main">
   <p:cSld>
     <p:spTree>
@@ -15184,7 +15772,147 @@
 </p:sld>
 </file>
 
-<file path=ppt/slides/slide45.xml><?xml version="1.0" encoding="utf-8"?>
+<file path=ppt/slides/slide47.xml><?xml version="1.0" encoding="utf-8"?>
+<p:sld xmlns:a="http://schemas.openxmlformats.org/drawingml/2006/main" xmlns:r="http://schemas.openxmlformats.org/officeDocument/2006/relationships" xmlns:p="http://schemas.openxmlformats.org/presentationml/2006/main">
+  <p:cSld>
+    <p:spTree>
+      <p:nvGrpSpPr>
+        <p:cNvPr id="1" name=""/>
+        <p:cNvGrpSpPr/>
+        <p:nvPr/>
+      </p:nvGrpSpPr>
+      <p:grpSpPr>
+        <a:xfrm>
+          <a:off x="0" y="0"/>
+          <a:ext cx="0" cy="0"/>
+          <a:chOff x="0" y="0"/>
+          <a:chExt cx="0" cy="0"/>
+        </a:xfrm>
+      </p:grpSpPr>
+      <p:sp>
+        <p:nvSpPr>
+          <p:cNvPr id="2" name="Title 1"/>
+          <p:cNvSpPr>
+            <a:spLocks noGrp="1"/>
+          </p:cNvSpPr>
+          <p:nvPr>
+            <p:ph type="title"/>
+          </p:nvPr>
+        </p:nvSpPr>
+        <p:spPr/>
+        <p:txBody>
+          <a:bodyPr>
+            <a:normAutofit/>
+          </a:bodyPr>
+          <a:lstStyle/>
+          <a:p>
+            <a:r>
+              <a:rPr lang="en-US" sz="4800" dirty="0" smtClean="0"/>
+              <a:t>Access Control </a:t>
+            </a:r>
+            <a:r>
+              <a:rPr lang="en-US" sz="4800" dirty="0"/>
+              <a:t>– </a:t>
+            </a:r>
+            <a:r>
+              <a:rPr lang="en-US" sz="4800" dirty="0" smtClean="0"/>
+              <a:t>Row Level Security</a:t>
+            </a:r>
+            <a:endParaRPr lang="en-US" sz="4800" dirty="0"/>
+          </a:p>
+        </p:txBody>
+      </p:sp>
+      <p:sp>
+        <p:nvSpPr>
+          <p:cNvPr id="3" name="Content Placeholder 2"/>
+          <p:cNvSpPr>
+            <a:spLocks noGrp="1"/>
+          </p:cNvSpPr>
+          <p:nvPr>
+            <p:ph idx="1"/>
+          </p:nvPr>
+        </p:nvSpPr>
+        <p:spPr>
+          <a:xfrm>
+            <a:off x="838200" y="1825624"/>
+            <a:ext cx="10515600" cy="4589923"/>
+          </a:xfrm>
+        </p:spPr>
+        <p:txBody>
+          <a:bodyPr>
+            <a:normAutofit/>
+          </a:bodyPr>
+          <a:lstStyle/>
+          <a:p>
+            <a:endParaRPr lang="en-US" dirty="0" smtClean="0"/>
+          </a:p>
+          <a:p>
+            <a:endParaRPr lang="en-US" dirty="0" smtClean="0"/>
+          </a:p>
+          <a:p>
+            <a:endParaRPr lang="en-US" dirty="0"/>
+          </a:p>
+        </p:txBody>
+      </p:sp>
+      <p:sp>
+        <p:nvSpPr>
+          <p:cNvPr id="4" name="TextBox 3"/>
+          <p:cNvSpPr txBox="1"/>
+          <p:nvPr/>
+        </p:nvSpPr>
+        <p:spPr>
+          <a:xfrm>
+            <a:off x="1327355" y="2241755"/>
+            <a:ext cx="7079226" cy="1323439"/>
+          </a:xfrm>
+          <a:prstGeom prst="rect">
+            <a:avLst/>
+          </a:prstGeom>
+          <a:noFill/>
+        </p:spPr>
+        <p:txBody>
+          <a:bodyPr wrap="square" rtlCol="0">
+            <a:spAutoFit/>
+          </a:bodyPr>
+          <a:lstStyle/>
+          <a:p>
+            <a:r>
+              <a:rPr lang="en-US" sz="4000" dirty="0" smtClean="0">
+                <a:solidFill>
+                  <a:srgbClr val="FF0000"/>
+                </a:solidFill>
+              </a:rPr>
+              <a:t>TODO Add transition slide for Session Context</a:t>
+            </a:r>
+            <a:endParaRPr lang="en-US" sz="4000" dirty="0">
+              <a:solidFill>
+                <a:srgbClr val="FF0000"/>
+              </a:solidFill>
+            </a:endParaRPr>
+          </a:p>
+        </p:txBody>
+      </p:sp>
+    </p:spTree>
+    <p:extLst>
+      <p:ext uri="{BB962C8B-B14F-4D97-AF65-F5344CB8AC3E}">
+        <p14:creationId xmlns:p14="http://schemas.microsoft.com/office/powerpoint/2010/main" val="1142635180"/>
+      </p:ext>
+    </p:extLst>
+  </p:cSld>
+  <p:clrMapOvr>
+    <a:masterClrMapping/>
+  </p:clrMapOvr>
+  <p:timing>
+    <p:tnLst>
+      <p:par>
+        <p:cTn id="1" dur="indefinite" restart="never" nodeType="tmRoot"/>
+      </p:par>
+    </p:tnLst>
+  </p:timing>
+</p:sld>
+</file>
+
+<file path=ppt/slides/slide48.xml><?xml version="1.0" encoding="utf-8"?>
 <p:sld xmlns:a="http://schemas.openxmlformats.org/drawingml/2006/main" xmlns:r="http://schemas.openxmlformats.org/officeDocument/2006/relationships" xmlns:p="http://schemas.openxmlformats.org/presentationml/2006/main">
   <p:cSld>
     <p:spTree>
@@ -15293,7 +16021,7 @@
     </p:spTree>
     <p:extLst>
       <p:ext uri="{BB962C8B-B14F-4D97-AF65-F5344CB8AC3E}">
-        <p14:creationId xmlns:p14="http://schemas.microsoft.com/office/powerpoint/2010/main" val="1142635180"/>
+        <p14:creationId xmlns:p14="http://schemas.microsoft.com/office/powerpoint/2010/main" val="820867429"/>
       </p:ext>
     </p:extLst>
   </p:cSld>
@@ -15310,7 +16038,7 @@
 </p:sld>
 </file>
 
-<file path=ppt/slides/slide46.xml><?xml version="1.0" encoding="utf-8"?>
+<file path=ppt/slides/slide49.xml><?xml version="1.0" encoding="utf-8"?>
 <p:sld xmlns:a="http://schemas.openxmlformats.org/drawingml/2006/main" xmlns:r="http://schemas.openxmlformats.org/officeDocument/2006/relationships" xmlns:p="http://schemas.openxmlformats.org/presentationml/2006/main">
   <p:cSld>
     <p:spTree>
@@ -15436,7 +16164,123 @@
 </p:sld>
 </file>
 
-<file path=ppt/slides/slide47.xml><?xml version="1.0" encoding="utf-8"?>
+<file path=ppt/slides/slide5.xml><?xml version="1.0" encoding="utf-8"?>
+<p:sld xmlns:a="http://schemas.openxmlformats.org/drawingml/2006/main" xmlns:r="http://schemas.openxmlformats.org/officeDocument/2006/relationships" xmlns:p="http://schemas.openxmlformats.org/presentationml/2006/main">
+  <p:cSld>
+    <p:spTree>
+      <p:nvGrpSpPr>
+        <p:cNvPr id="1" name=""/>
+        <p:cNvGrpSpPr/>
+        <p:nvPr/>
+      </p:nvGrpSpPr>
+      <p:grpSpPr>
+        <a:xfrm>
+          <a:off x="0" y="0"/>
+          <a:ext cx="0" cy="0"/>
+          <a:chOff x="0" y="0"/>
+          <a:chExt cx="0" cy="0"/>
+        </a:xfrm>
+      </p:grpSpPr>
+      <p:sp>
+        <p:nvSpPr>
+          <p:cNvPr id="2" name="Title 1"/>
+          <p:cNvSpPr>
+            <a:spLocks noGrp="1"/>
+          </p:cNvSpPr>
+          <p:nvPr>
+            <p:ph type="title"/>
+          </p:nvPr>
+        </p:nvSpPr>
+        <p:spPr/>
+        <p:txBody>
+          <a:bodyPr>
+            <a:normAutofit/>
+          </a:bodyPr>
+          <a:lstStyle/>
+          <a:p>
+            <a:r>
+              <a:rPr lang="en-US" sz="4800" dirty="0" smtClean="0"/>
+              <a:t>What's on </a:t>
+            </a:r>
+            <a:r>
+              <a:rPr lang="en-US" sz="4800" smtClean="0"/>
+              <a:t>the agenda?</a:t>
+            </a:r>
+            <a:endParaRPr lang="en-US" sz="4800" dirty="0"/>
+          </a:p>
+        </p:txBody>
+      </p:sp>
+      <p:sp>
+        <p:nvSpPr>
+          <p:cNvPr id="3" name="Content Placeholder 2"/>
+          <p:cNvSpPr>
+            <a:spLocks noGrp="1"/>
+          </p:cNvSpPr>
+          <p:nvPr>
+            <p:ph idx="1"/>
+          </p:nvPr>
+        </p:nvSpPr>
+        <p:spPr>
+          <a:xfrm>
+            <a:off x="838200" y="1825624"/>
+            <a:ext cx="10515600" cy="4899641"/>
+          </a:xfrm>
+        </p:spPr>
+        <p:txBody>
+          <a:bodyPr>
+            <a:normAutofit/>
+          </a:bodyPr>
+          <a:lstStyle/>
+          <a:p>
+            <a:r>
+              <a:rPr lang="en-US" sz="4000" dirty="0" smtClean="0"/>
+              <a:t>Define "cross cutting" security concerns</a:t>
+            </a:r>
+          </a:p>
+          <a:p>
+            <a:endParaRPr lang="en-US" sz="4000" dirty="0"/>
+          </a:p>
+          <a:p>
+            <a:endParaRPr lang="en-US" sz="4000" dirty="0"/>
+          </a:p>
+          <a:p>
+            <a:endParaRPr lang="en-US" sz="4000" dirty="0" smtClean="0"/>
+          </a:p>
+          <a:p>
+            <a:endParaRPr lang="en-US" sz="4000" dirty="0" smtClean="0"/>
+          </a:p>
+          <a:p>
+            <a:endParaRPr lang="en-US" dirty="0" smtClean="0"/>
+          </a:p>
+          <a:p>
+            <a:endParaRPr lang="en-US" dirty="0" smtClean="0"/>
+          </a:p>
+          <a:p>
+            <a:endParaRPr lang="en-US" dirty="0"/>
+          </a:p>
+        </p:txBody>
+      </p:sp>
+    </p:spTree>
+    <p:extLst>
+      <p:ext uri="{BB962C8B-B14F-4D97-AF65-F5344CB8AC3E}">
+        <p14:creationId xmlns:p14="http://schemas.microsoft.com/office/powerpoint/2010/main" val="2651230507"/>
+      </p:ext>
+    </p:extLst>
+  </p:cSld>
+  <p:clrMapOvr>
+    <a:masterClrMapping/>
+  </p:clrMapOvr>
+  <p:timing>
+    <p:tnLst>
+      <p:par>
+        <p:cTn id="1" dur="indefinite" restart="never" nodeType="tmRoot"/>
+      </p:par>
+    </p:tnLst>
+  </p:timing>
+</p:sld>
+</file>
+
+<file path=ppt/slides/slide50.xml><?xml version="1.0" encoding="utf-8"?>
 <p:sld xmlns:a="http://schemas.openxmlformats.org/drawingml/2006/main" xmlns:r="http://schemas.openxmlformats.org/officeDocument/2006/relationships" xmlns:p="http://schemas.openxmlformats.org/presentationml/2006/main">
   <p:cSld>
     <p:spTree>
@@ -15562,7 +16406,7 @@
 </p:sld>
 </file>
 
-<file path=ppt/slides/slide48.xml><?xml version="1.0" encoding="utf-8"?>
+<file path=ppt/slides/slide51.xml><?xml version="1.0" encoding="utf-8"?>
 <p:sld xmlns:a="http://schemas.openxmlformats.org/drawingml/2006/main" xmlns:r="http://schemas.openxmlformats.org/officeDocument/2006/relationships" xmlns:p="http://schemas.openxmlformats.org/presentationml/2006/main">
   <p:cSld>
     <p:spTree>
@@ -15683,7 +16527,7 @@
 </p:sld>
 </file>
 
-<file path=ppt/slides/slide49.xml><?xml version="1.0" encoding="utf-8"?>
+<file path=ppt/slides/slide52.xml><?xml version="1.0" encoding="utf-8"?>
 <p:sld xmlns:a="http://schemas.openxmlformats.org/drawingml/2006/main" xmlns:r="http://schemas.openxmlformats.org/officeDocument/2006/relationships" xmlns:p="http://schemas.openxmlformats.org/presentationml/2006/main">
   <p:cSld>
     <p:spTree>
@@ -15773,123 +16617,7 @@
 </p:sld>
 </file>
 
-<file path=ppt/slides/slide5.xml><?xml version="1.0" encoding="utf-8"?>
-<p:sld xmlns:a="http://schemas.openxmlformats.org/drawingml/2006/main" xmlns:r="http://schemas.openxmlformats.org/officeDocument/2006/relationships" xmlns:p="http://schemas.openxmlformats.org/presentationml/2006/main">
-  <p:cSld>
-    <p:spTree>
-      <p:nvGrpSpPr>
-        <p:cNvPr id="1" name=""/>
-        <p:cNvGrpSpPr/>
-        <p:nvPr/>
-      </p:nvGrpSpPr>
-      <p:grpSpPr>
-        <a:xfrm>
-          <a:off x="0" y="0"/>
-          <a:ext cx="0" cy="0"/>
-          <a:chOff x="0" y="0"/>
-          <a:chExt cx="0" cy="0"/>
-        </a:xfrm>
-      </p:grpSpPr>
-      <p:sp>
-        <p:nvSpPr>
-          <p:cNvPr id="2" name="Title 1"/>
-          <p:cNvSpPr>
-            <a:spLocks noGrp="1"/>
-          </p:cNvSpPr>
-          <p:nvPr>
-            <p:ph type="title"/>
-          </p:nvPr>
-        </p:nvSpPr>
-        <p:spPr/>
-        <p:txBody>
-          <a:bodyPr>
-            <a:normAutofit/>
-          </a:bodyPr>
-          <a:lstStyle/>
-          <a:p>
-            <a:r>
-              <a:rPr lang="en-US" sz="4800" dirty="0" smtClean="0"/>
-              <a:t>What's on </a:t>
-            </a:r>
-            <a:r>
-              <a:rPr lang="en-US" sz="4800" smtClean="0"/>
-              <a:t>the agenda?</a:t>
-            </a:r>
-            <a:endParaRPr lang="en-US" sz="4800" dirty="0"/>
-          </a:p>
-        </p:txBody>
-      </p:sp>
-      <p:sp>
-        <p:nvSpPr>
-          <p:cNvPr id="3" name="Content Placeholder 2"/>
-          <p:cNvSpPr>
-            <a:spLocks noGrp="1"/>
-          </p:cNvSpPr>
-          <p:nvPr>
-            <p:ph idx="1"/>
-          </p:nvPr>
-        </p:nvSpPr>
-        <p:spPr>
-          <a:xfrm>
-            <a:off x="838200" y="1825624"/>
-            <a:ext cx="10515600" cy="4899641"/>
-          </a:xfrm>
-        </p:spPr>
-        <p:txBody>
-          <a:bodyPr>
-            <a:normAutofit/>
-          </a:bodyPr>
-          <a:lstStyle/>
-          <a:p>
-            <a:r>
-              <a:rPr lang="en-US" sz="4000" dirty="0" smtClean="0"/>
-              <a:t>Define "cross cutting" security concerns</a:t>
-            </a:r>
-          </a:p>
-          <a:p>
-            <a:endParaRPr lang="en-US" sz="4000" dirty="0"/>
-          </a:p>
-          <a:p>
-            <a:endParaRPr lang="en-US" sz="4000" dirty="0"/>
-          </a:p>
-          <a:p>
-            <a:endParaRPr lang="en-US" sz="4000" dirty="0" smtClean="0"/>
-          </a:p>
-          <a:p>
-            <a:endParaRPr lang="en-US" sz="4000" dirty="0" smtClean="0"/>
-          </a:p>
-          <a:p>
-            <a:endParaRPr lang="en-US" dirty="0" smtClean="0"/>
-          </a:p>
-          <a:p>
-            <a:endParaRPr lang="en-US" dirty="0" smtClean="0"/>
-          </a:p>
-          <a:p>
-            <a:endParaRPr lang="en-US" dirty="0"/>
-          </a:p>
-        </p:txBody>
-      </p:sp>
-    </p:spTree>
-    <p:extLst>
-      <p:ext uri="{BB962C8B-B14F-4D97-AF65-F5344CB8AC3E}">
-        <p14:creationId xmlns:p14="http://schemas.microsoft.com/office/powerpoint/2010/main" val="2651230507"/>
-      </p:ext>
-    </p:extLst>
-  </p:cSld>
-  <p:clrMapOvr>
-    <a:masterClrMapping/>
-  </p:clrMapOvr>
-  <p:timing>
-    <p:tnLst>
-      <p:par>
-        <p:cTn id="1" dur="indefinite" restart="never" nodeType="tmRoot"/>
-      </p:par>
-    </p:tnLst>
-  </p:timing>
-</p:sld>
-</file>
-
-<file path=ppt/slides/slide50.xml><?xml version="1.0" encoding="utf-8"?>
+<file path=ppt/slides/slide53.xml><?xml version="1.0" encoding="utf-8"?>
 <p:sld xmlns:a="http://schemas.openxmlformats.org/drawingml/2006/main" xmlns:r="http://schemas.openxmlformats.org/officeDocument/2006/relationships" xmlns:p="http://schemas.openxmlformats.org/presentationml/2006/main">
   <p:cSld>
     <p:spTree>
@@ -16009,7 +16737,165 @@
 </p:sld>
 </file>
 
-<file path=ppt/slides/slide51.xml><?xml version="1.0" encoding="utf-8"?>
+<file path=ppt/slides/slide54.xml><?xml version="1.0" encoding="utf-8"?>
+<p:sld xmlns:a="http://schemas.openxmlformats.org/drawingml/2006/main" xmlns:r="http://schemas.openxmlformats.org/officeDocument/2006/relationships" xmlns:p="http://schemas.openxmlformats.org/presentationml/2006/main">
+  <p:cSld>
+    <p:spTree>
+      <p:nvGrpSpPr>
+        <p:cNvPr id="1" name=""/>
+        <p:cNvGrpSpPr/>
+        <p:nvPr/>
+      </p:nvGrpSpPr>
+      <p:grpSpPr>
+        <a:xfrm>
+          <a:off x="0" y="0"/>
+          <a:ext cx="0" cy="0"/>
+          <a:chOff x="0" y="0"/>
+          <a:chExt cx="0" cy="0"/>
+        </a:xfrm>
+      </p:grpSpPr>
+      <p:sp>
+        <p:nvSpPr>
+          <p:cNvPr id="2" name="Title 1"/>
+          <p:cNvSpPr>
+            <a:spLocks noGrp="1"/>
+          </p:cNvSpPr>
+          <p:nvPr>
+            <p:ph type="title"/>
+          </p:nvPr>
+        </p:nvSpPr>
+        <p:spPr/>
+        <p:txBody>
+          <a:bodyPr>
+            <a:normAutofit/>
+          </a:bodyPr>
+          <a:lstStyle/>
+          <a:p>
+            <a:r>
+              <a:rPr lang="en-US" sz="4800" dirty="0"/>
+              <a:t>Page Authorization – feature</a:t>
+            </a:r>
+          </a:p>
+        </p:txBody>
+      </p:sp>
+      <p:sp>
+        <p:nvSpPr>
+          <p:cNvPr id="3" name="Content Placeholder 2"/>
+          <p:cNvSpPr>
+            <a:spLocks noGrp="1"/>
+          </p:cNvSpPr>
+          <p:nvPr>
+            <p:ph idx="1"/>
+          </p:nvPr>
+        </p:nvSpPr>
+        <p:spPr>
+          <a:xfrm>
+            <a:off x="838200" y="1825624"/>
+            <a:ext cx="10515600" cy="4589923"/>
+          </a:xfrm>
+        </p:spPr>
+        <p:txBody>
+          <a:bodyPr>
+            <a:normAutofit/>
+          </a:bodyPr>
+          <a:lstStyle/>
+          <a:p>
+            <a:endParaRPr lang="en-US" sz="4000" dirty="0" smtClean="0"/>
+          </a:p>
+          <a:p>
+            <a:endParaRPr lang="en-US" dirty="0" smtClean="0"/>
+          </a:p>
+          <a:p>
+            <a:endParaRPr lang="en-US" dirty="0" smtClean="0"/>
+          </a:p>
+          <a:p>
+            <a:endParaRPr lang="en-US" dirty="0"/>
+          </a:p>
+        </p:txBody>
+      </p:sp>
+      <p:pic>
+        <p:nvPicPr>
+          <p:cNvPr id="5" name="Picture 4"/>
+          <p:cNvPicPr>
+            <a:picLocks noChangeAspect="1"/>
+          </p:cNvPicPr>
+          <p:nvPr/>
+        </p:nvPicPr>
+        <p:blipFill>
+          <a:blip r:embed="rId3"/>
+          <a:stretch>
+            <a:fillRect/>
+          </a:stretch>
+        </p:blipFill>
+        <p:spPr>
+          <a:xfrm>
+            <a:off x="838199" y="2946501"/>
+            <a:ext cx="11154151" cy="2731628"/>
+          </a:xfrm>
+          <a:prstGeom prst="rect">
+            <a:avLst/>
+          </a:prstGeom>
+        </p:spPr>
+      </p:pic>
+      <p:sp>
+        <p:nvSpPr>
+          <p:cNvPr id="4" name="TextBox 3"/>
+          <p:cNvSpPr txBox="1"/>
+          <p:nvPr/>
+        </p:nvSpPr>
+        <p:spPr>
+          <a:xfrm>
+            <a:off x="2389239" y="1578077"/>
+            <a:ext cx="6474542" cy="954107"/>
+          </a:xfrm>
+          <a:prstGeom prst="rect">
+            <a:avLst/>
+          </a:prstGeom>
+          <a:noFill/>
+        </p:spPr>
+        <p:txBody>
+          <a:bodyPr wrap="square" rtlCol="0">
+            <a:spAutoFit/>
+          </a:bodyPr>
+          <a:lstStyle/>
+          <a:p>
+            <a:r>
+              <a:rPr lang="en-US" sz="2800" dirty="0" smtClean="0">
+                <a:solidFill>
+                  <a:srgbClr val="FF0000"/>
+                </a:solidFill>
+              </a:rPr>
+              <a:t>TODO: Show arrows and circles highlighting what stays the same, and what changes</a:t>
+            </a:r>
+            <a:endParaRPr lang="en-US" sz="2800" dirty="0">
+              <a:solidFill>
+                <a:srgbClr val="FF0000"/>
+              </a:solidFill>
+            </a:endParaRPr>
+          </a:p>
+        </p:txBody>
+      </p:sp>
+    </p:spTree>
+    <p:extLst>
+      <p:ext uri="{BB962C8B-B14F-4D97-AF65-F5344CB8AC3E}">
+        <p14:creationId xmlns:p14="http://schemas.microsoft.com/office/powerpoint/2010/main" val="2638902081"/>
+      </p:ext>
+    </p:extLst>
+  </p:cSld>
+  <p:clrMapOvr>
+    <a:masterClrMapping/>
+  </p:clrMapOvr>
+  <p:timing>
+    <p:tnLst>
+      <p:par>
+        <p:cTn id="1" dur="indefinite" restart="never" nodeType="tmRoot"/>
+      </p:par>
+    </p:tnLst>
+  </p:timing>
+</p:sld>
+</file>
+
+<file path=ppt/slides/slide55.xml><?xml version="1.0" encoding="utf-8"?>
 <p:sld xmlns:a="http://schemas.openxmlformats.org/drawingml/2006/main" xmlns:r="http://schemas.openxmlformats.org/officeDocument/2006/relationships" xmlns:p="http://schemas.openxmlformats.org/presentationml/2006/main">
   <p:cSld>
     <p:spTree>
@@ -16134,7 +17020,7 @@
 </p:sld>
 </file>
 
-<file path=ppt/slides/slide52.xml><?xml version="1.0" encoding="utf-8"?>
+<file path=ppt/slides/slide56.xml><?xml version="1.0" encoding="utf-8"?>
 <p:sld xmlns:a="http://schemas.openxmlformats.org/drawingml/2006/main" xmlns:r="http://schemas.openxmlformats.org/officeDocument/2006/relationships" xmlns:p="http://schemas.openxmlformats.org/presentationml/2006/main">
   <p:cSld>
     <p:spTree>
@@ -16230,7 +17116,7 @@
 </p:sld>
 </file>
 
-<file path=ppt/slides/slide53.xml><?xml version="1.0" encoding="utf-8"?>
+<file path=ppt/slides/slide57.xml><?xml version="1.0" encoding="utf-8"?>
 <p:sld xmlns:a="http://schemas.openxmlformats.org/drawingml/2006/main" xmlns:r="http://schemas.openxmlformats.org/officeDocument/2006/relationships" xmlns:p="http://schemas.openxmlformats.org/presentationml/2006/main">
   <p:cSld>
     <p:spTree>
@@ -16320,7 +17206,7 @@
 </p:sld>
 </file>
 
-<file path=ppt/slides/slide54.xml><?xml version="1.0" encoding="utf-8"?>
+<file path=ppt/slides/slide58.xml><?xml version="1.0" encoding="utf-8"?>
 <p:sld xmlns:a="http://schemas.openxmlformats.org/drawingml/2006/main" xmlns:r="http://schemas.openxmlformats.org/officeDocument/2006/relationships" xmlns:p="http://schemas.openxmlformats.org/presentationml/2006/main">
   <p:cSld>
     <p:spTree>
@@ -16444,7 +17330,7 @@
 </p:sld>
 </file>
 
-<file path=ppt/slides/slide55.xml><?xml version="1.0" encoding="utf-8"?>
+<file path=ppt/slides/slide59.xml><?xml version="1.0" encoding="utf-8"?>
 <p:sld xmlns:a="http://schemas.openxmlformats.org/drawingml/2006/main" xmlns:r="http://schemas.openxmlformats.org/officeDocument/2006/relationships" xmlns:p="http://schemas.openxmlformats.org/presentationml/2006/main">
   <p:cSld>
     <p:spTree>
@@ -16569,7 +17455,141 @@
 </p:sld>
 </file>
 
-<file path=ppt/slides/slide56.xml><?xml version="1.0" encoding="utf-8"?>
+<file path=ppt/slides/slide6.xml><?xml version="1.0" encoding="utf-8"?>
+<p:sld xmlns:a="http://schemas.openxmlformats.org/drawingml/2006/main" xmlns:r="http://schemas.openxmlformats.org/officeDocument/2006/relationships" xmlns:p="http://schemas.openxmlformats.org/presentationml/2006/main">
+  <p:cSld>
+    <p:spTree>
+      <p:nvGrpSpPr>
+        <p:cNvPr id="1" name=""/>
+        <p:cNvGrpSpPr/>
+        <p:nvPr/>
+      </p:nvGrpSpPr>
+      <p:grpSpPr>
+        <a:xfrm>
+          <a:off x="0" y="0"/>
+          <a:ext cx="0" cy="0"/>
+          <a:chOff x="0" y="0"/>
+          <a:chExt cx="0" cy="0"/>
+        </a:xfrm>
+      </p:grpSpPr>
+      <p:sp>
+        <p:nvSpPr>
+          <p:cNvPr id="2" name="Title 1"/>
+          <p:cNvSpPr>
+            <a:spLocks noGrp="1"/>
+          </p:cNvSpPr>
+          <p:nvPr>
+            <p:ph type="title"/>
+          </p:nvPr>
+        </p:nvSpPr>
+        <p:spPr/>
+        <p:txBody>
+          <a:bodyPr>
+            <a:normAutofit/>
+          </a:bodyPr>
+          <a:lstStyle/>
+          <a:p>
+            <a:r>
+              <a:rPr lang="en-US" sz="4800" dirty="0" smtClean="0"/>
+              <a:t>What's on </a:t>
+            </a:r>
+            <a:r>
+              <a:rPr lang="en-US" sz="4800" smtClean="0"/>
+              <a:t>the agenda?</a:t>
+            </a:r>
+            <a:endParaRPr lang="en-US" sz="4800" dirty="0"/>
+          </a:p>
+        </p:txBody>
+      </p:sp>
+      <p:sp>
+        <p:nvSpPr>
+          <p:cNvPr id="3" name="Content Placeholder 2"/>
+          <p:cNvSpPr>
+            <a:spLocks noGrp="1"/>
+          </p:cNvSpPr>
+          <p:nvPr>
+            <p:ph idx="1"/>
+          </p:nvPr>
+        </p:nvSpPr>
+        <p:spPr>
+          <a:xfrm>
+            <a:off x="838200" y="1825624"/>
+            <a:ext cx="10515600" cy="4899641"/>
+          </a:xfrm>
+        </p:spPr>
+        <p:txBody>
+          <a:bodyPr>
+            <a:normAutofit/>
+          </a:bodyPr>
+          <a:lstStyle/>
+          <a:p>
+            <a:r>
+              <a:rPr lang="en-US" sz="4000" dirty="0" smtClean="0">
+                <a:solidFill>
+                  <a:schemeClr val="bg1">
+                    <a:lumMod val="65000"/>
+                  </a:schemeClr>
+                </a:solidFill>
+              </a:rPr>
+              <a:t>Define "cross cutting" security concerns</a:t>
+            </a:r>
+          </a:p>
+          <a:p>
+            <a:endParaRPr lang="en-US" sz="4000" dirty="0"/>
+          </a:p>
+          <a:p>
+            <a:r>
+              <a:rPr lang="en-US" sz="4000" dirty="0" smtClean="0"/>
+              <a:t>"Secure by default" examples</a:t>
+            </a:r>
+          </a:p>
+          <a:p>
+            <a:endParaRPr lang="en-US" sz="4000" dirty="0"/>
+          </a:p>
+          <a:p>
+            <a:endParaRPr lang="en-US" sz="4000" dirty="0" smtClean="0"/>
+          </a:p>
+          <a:p>
+            <a:endParaRPr lang="en-US" sz="4000" dirty="0"/>
+          </a:p>
+          <a:p>
+            <a:endParaRPr lang="en-US" sz="4000" dirty="0" smtClean="0"/>
+          </a:p>
+          <a:p>
+            <a:endParaRPr lang="en-US" sz="4000" dirty="0" smtClean="0"/>
+          </a:p>
+          <a:p>
+            <a:endParaRPr lang="en-US" dirty="0" smtClean="0"/>
+          </a:p>
+          <a:p>
+            <a:endParaRPr lang="en-US" dirty="0" smtClean="0"/>
+          </a:p>
+          <a:p>
+            <a:endParaRPr lang="en-US" dirty="0"/>
+          </a:p>
+        </p:txBody>
+      </p:sp>
+    </p:spTree>
+    <p:extLst>
+      <p:ext uri="{BB962C8B-B14F-4D97-AF65-F5344CB8AC3E}">
+        <p14:creationId xmlns:p14="http://schemas.microsoft.com/office/powerpoint/2010/main" val="902317821"/>
+      </p:ext>
+    </p:extLst>
+  </p:cSld>
+  <p:clrMapOvr>
+    <a:masterClrMapping/>
+  </p:clrMapOvr>
+  <p:timing>
+    <p:tnLst>
+      <p:par>
+        <p:cTn id="1" dur="indefinite" restart="never" nodeType="tmRoot"/>
+      </p:par>
+    </p:tnLst>
+  </p:timing>
+</p:sld>
+</file>
+
+<file path=ppt/slides/slide60.xml><?xml version="1.0" encoding="utf-8"?>
 <p:sld xmlns:a="http://schemas.openxmlformats.org/drawingml/2006/main" xmlns:r="http://schemas.openxmlformats.org/officeDocument/2006/relationships" xmlns:p="http://schemas.openxmlformats.org/presentationml/2006/main">
   <p:cSld>
     <p:spTree>
@@ -16662,7 +17682,7 @@
 </p:sld>
 </file>
 
-<file path=ppt/slides/slide57.xml><?xml version="1.0" encoding="utf-8"?>
+<file path=ppt/slides/slide61.xml><?xml version="1.0" encoding="utf-8"?>
 <p:sld xmlns:a="http://schemas.openxmlformats.org/drawingml/2006/main" xmlns:r="http://schemas.openxmlformats.org/officeDocument/2006/relationships" xmlns:p="http://schemas.openxmlformats.org/presentationml/2006/main">
   <p:cSld>
     <p:spTree>
@@ -16787,7 +17807,7 @@
 </p:sld>
 </file>
 
-<file path=ppt/slides/slide58.xml><?xml version="1.0" encoding="utf-8"?>
+<file path=ppt/slides/slide62.xml><?xml version="1.0" encoding="utf-8"?>
 <p:sld xmlns:a="http://schemas.openxmlformats.org/drawingml/2006/main" xmlns:r="http://schemas.openxmlformats.org/officeDocument/2006/relationships" xmlns:p="http://schemas.openxmlformats.org/presentationml/2006/main">
   <p:cSld>
     <p:spTree>
@@ -16920,7 +17940,7 @@
 </p:sld>
 </file>
 
-<file path=ppt/slides/slide59.xml><?xml version="1.0" encoding="utf-8"?>
+<file path=ppt/slides/slide63.xml><?xml version="1.0" encoding="utf-8"?>
 <p:sld xmlns:a="http://schemas.openxmlformats.org/drawingml/2006/main" xmlns:r="http://schemas.openxmlformats.org/officeDocument/2006/relationships" xmlns:p="http://schemas.openxmlformats.org/presentationml/2006/main">
   <p:cSld>
     <p:spTree>
@@ -17026,141 +18046,7 @@
 </p:sld>
 </file>
 
-<file path=ppt/slides/slide6.xml><?xml version="1.0" encoding="utf-8"?>
-<p:sld xmlns:a="http://schemas.openxmlformats.org/drawingml/2006/main" xmlns:r="http://schemas.openxmlformats.org/officeDocument/2006/relationships" xmlns:p="http://schemas.openxmlformats.org/presentationml/2006/main">
-  <p:cSld>
-    <p:spTree>
-      <p:nvGrpSpPr>
-        <p:cNvPr id="1" name=""/>
-        <p:cNvGrpSpPr/>
-        <p:nvPr/>
-      </p:nvGrpSpPr>
-      <p:grpSpPr>
-        <a:xfrm>
-          <a:off x="0" y="0"/>
-          <a:ext cx="0" cy="0"/>
-          <a:chOff x="0" y="0"/>
-          <a:chExt cx="0" cy="0"/>
-        </a:xfrm>
-      </p:grpSpPr>
-      <p:sp>
-        <p:nvSpPr>
-          <p:cNvPr id="2" name="Title 1"/>
-          <p:cNvSpPr>
-            <a:spLocks noGrp="1"/>
-          </p:cNvSpPr>
-          <p:nvPr>
-            <p:ph type="title"/>
-          </p:nvPr>
-        </p:nvSpPr>
-        <p:spPr/>
-        <p:txBody>
-          <a:bodyPr>
-            <a:normAutofit/>
-          </a:bodyPr>
-          <a:lstStyle/>
-          <a:p>
-            <a:r>
-              <a:rPr lang="en-US" sz="4800" dirty="0" smtClean="0"/>
-              <a:t>What's on </a:t>
-            </a:r>
-            <a:r>
-              <a:rPr lang="en-US" sz="4800" smtClean="0"/>
-              <a:t>the agenda?</a:t>
-            </a:r>
-            <a:endParaRPr lang="en-US" sz="4800" dirty="0"/>
-          </a:p>
-        </p:txBody>
-      </p:sp>
-      <p:sp>
-        <p:nvSpPr>
-          <p:cNvPr id="3" name="Content Placeholder 2"/>
-          <p:cNvSpPr>
-            <a:spLocks noGrp="1"/>
-          </p:cNvSpPr>
-          <p:nvPr>
-            <p:ph idx="1"/>
-          </p:nvPr>
-        </p:nvSpPr>
-        <p:spPr>
-          <a:xfrm>
-            <a:off x="838200" y="1825624"/>
-            <a:ext cx="10515600" cy="4899641"/>
-          </a:xfrm>
-        </p:spPr>
-        <p:txBody>
-          <a:bodyPr>
-            <a:normAutofit/>
-          </a:bodyPr>
-          <a:lstStyle/>
-          <a:p>
-            <a:r>
-              <a:rPr lang="en-US" sz="4000" dirty="0" smtClean="0">
-                <a:solidFill>
-                  <a:schemeClr val="bg1">
-                    <a:lumMod val="65000"/>
-                  </a:schemeClr>
-                </a:solidFill>
-              </a:rPr>
-              <a:t>Define "cross cutting" security concerns</a:t>
-            </a:r>
-          </a:p>
-          <a:p>
-            <a:endParaRPr lang="en-US" sz="4000" dirty="0"/>
-          </a:p>
-          <a:p>
-            <a:r>
-              <a:rPr lang="en-US" sz="4000" dirty="0" smtClean="0"/>
-              <a:t>"Secure by default" examples</a:t>
-            </a:r>
-          </a:p>
-          <a:p>
-            <a:endParaRPr lang="en-US" sz="4000" dirty="0"/>
-          </a:p>
-          <a:p>
-            <a:endParaRPr lang="en-US" sz="4000" dirty="0" smtClean="0"/>
-          </a:p>
-          <a:p>
-            <a:endParaRPr lang="en-US" sz="4000" dirty="0"/>
-          </a:p>
-          <a:p>
-            <a:endParaRPr lang="en-US" sz="4000" dirty="0" smtClean="0"/>
-          </a:p>
-          <a:p>
-            <a:endParaRPr lang="en-US" sz="4000" dirty="0" smtClean="0"/>
-          </a:p>
-          <a:p>
-            <a:endParaRPr lang="en-US" dirty="0" smtClean="0"/>
-          </a:p>
-          <a:p>
-            <a:endParaRPr lang="en-US" dirty="0" smtClean="0"/>
-          </a:p>
-          <a:p>
-            <a:endParaRPr lang="en-US" dirty="0"/>
-          </a:p>
-        </p:txBody>
-      </p:sp>
-    </p:spTree>
-    <p:extLst>
-      <p:ext uri="{BB962C8B-B14F-4D97-AF65-F5344CB8AC3E}">
-        <p14:creationId xmlns:p14="http://schemas.microsoft.com/office/powerpoint/2010/main" val="902317821"/>
-      </p:ext>
-    </p:extLst>
-  </p:cSld>
-  <p:clrMapOvr>
-    <a:masterClrMapping/>
-  </p:clrMapOvr>
-  <p:timing>
-    <p:tnLst>
-      <p:par>
-        <p:cTn id="1" dur="indefinite" restart="never" nodeType="tmRoot"/>
-      </p:par>
-    </p:tnLst>
-  </p:timing>
-</p:sld>
-</file>
-
-<file path=ppt/slides/slide60.xml><?xml version="1.0" encoding="utf-8"?>
+<file path=ppt/slides/slide64.xml><?xml version="1.0" encoding="utf-8"?>
 <p:sld xmlns:a="http://schemas.openxmlformats.org/drawingml/2006/main" xmlns:r="http://schemas.openxmlformats.org/officeDocument/2006/relationships" xmlns:p="http://schemas.openxmlformats.org/presentationml/2006/main">
   <p:cSld>
     <p:spTree>
@@ -17281,7 +18167,7 @@
 </p:sld>
 </file>
 
-<file path=ppt/slides/slide61.xml><?xml version="1.0" encoding="utf-8"?>
+<file path=ppt/slides/slide65.xml><?xml version="1.0" encoding="utf-8"?>
 <p:sld xmlns:a="http://schemas.openxmlformats.org/drawingml/2006/main" xmlns:r="http://schemas.openxmlformats.org/officeDocument/2006/relationships" xmlns:p="http://schemas.openxmlformats.org/presentationml/2006/main">
   <p:cSld>
     <p:spTree>
@@ -17401,7 +18287,7 @@
 </p:sld>
 </file>
 
-<file path=ppt/slides/slide62.xml><?xml version="1.0" encoding="utf-8"?>
+<file path=ppt/slides/slide66.xml><?xml version="1.0" encoding="utf-8"?>
 <p:sld xmlns:a="http://schemas.openxmlformats.org/drawingml/2006/main" xmlns:r="http://schemas.openxmlformats.org/officeDocument/2006/relationships" xmlns:p="http://schemas.openxmlformats.org/presentationml/2006/main">
   <p:cSld>
     <p:spTree>
@@ -17521,7 +18407,7 @@
 </p:sld>
 </file>
 
-<file path=ppt/slides/slide63.xml><?xml version="1.0" encoding="utf-8"?>
+<file path=ppt/slides/slide67.xml><?xml version="1.0" encoding="utf-8"?>
 <p:sld xmlns:a="http://schemas.openxmlformats.org/drawingml/2006/main" xmlns:r="http://schemas.openxmlformats.org/officeDocument/2006/relationships" xmlns:p="http://schemas.openxmlformats.org/presentationml/2006/main">
   <p:cSld>
     <p:spTree>
@@ -17641,7 +18527,7 @@
 </p:sld>
 </file>
 
-<file path=ppt/slides/slide64.xml><?xml version="1.0" encoding="utf-8"?>
+<file path=ppt/slides/slide68.xml><?xml version="1.0" encoding="utf-8"?>
 <p:sld xmlns:a="http://schemas.openxmlformats.org/drawingml/2006/main" xmlns:r="http://schemas.openxmlformats.org/officeDocument/2006/relationships" xmlns:p="http://schemas.openxmlformats.org/presentationml/2006/main">
   <p:cSld>
     <p:spTree>
@@ -17761,7 +18647,7 @@
 </p:sld>
 </file>
 
-<file path=ppt/slides/slide65.xml><?xml version="1.0" encoding="utf-8"?>
+<file path=ppt/slides/slide69.xml><?xml version="1.0" encoding="utf-8"?>
 <p:sld xmlns:a="http://schemas.openxmlformats.org/drawingml/2006/main" xmlns:r="http://schemas.openxmlformats.org/officeDocument/2006/relationships" xmlns:p="http://schemas.openxmlformats.org/presentationml/2006/main">
   <p:cSld>
     <p:spTree>
@@ -17903,7 +18789,159 @@
 </p:sld>
 </file>
 
-<file path=ppt/slides/slide66.xml><?xml version="1.0" encoding="utf-8"?>
+<file path=ppt/slides/slide7.xml><?xml version="1.0" encoding="utf-8"?>
+<p:sld xmlns:a="http://schemas.openxmlformats.org/drawingml/2006/main" xmlns:r="http://schemas.openxmlformats.org/officeDocument/2006/relationships" xmlns:p="http://schemas.openxmlformats.org/presentationml/2006/main">
+  <p:cSld>
+    <p:spTree>
+      <p:nvGrpSpPr>
+        <p:cNvPr id="1" name=""/>
+        <p:cNvGrpSpPr/>
+        <p:nvPr/>
+      </p:nvGrpSpPr>
+      <p:grpSpPr>
+        <a:xfrm>
+          <a:off x="0" y="0"/>
+          <a:ext cx="0" cy="0"/>
+          <a:chOff x="0" y="0"/>
+          <a:chExt cx="0" cy="0"/>
+        </a:xfrm>
+      </p:grpSpPr>
+      <p:sp>
+        <p:nvSpPr>
+          <p:cNvPr id="2" name="Title 1"/>
+          <p:cNvSpPr>
+            <a:spLocks noGrp="1"/>
+          </p:cNvSpPr>
+          <p:nvPr>
+            <p:ph type="title"/>
+          </p:nvPr>
+        </p:nvSpPr>
+        <p:spPr/>
+        <p:txBody>
+          <a:bodyPr>
+            <a:normAutofit/>
+          </a:bodyPr>
+          <a:lstStyle/>
+          <a:p>
+            <a:r>
+              <a:rPr lang="en-US" sz="4800" dirty="0" smtClean="0"/>
+              <a:t>What's on </a:t>
+            </a:r>
+            <a:r>
+              <a:rPr lang="en-US" sz="4800" smtClean="0"/>
+              <a:t>the agenda?</a:t>
+            </a:r>
+            <a:endParaRPr lang="en-US" sz="4800" dirty="0"/>
+          </a:p>
+        </p:txBody>
+      </p:sp>
+      <p:sp>
+        <p:nvSpPr>
+          <p:cNvPr id="3" name="Content Placeholder 2"/>
+          <p:cNvSpPr>
+            <a:spLocks noGrp="1"/>
+          </p:cNvSpPr>
+          <p:nvPr>
+            <p:ph idx="1"/>
+          </p:nvPr>
+        </p:nvSpPr>
+        <p:spPr>
+          <a:xfrm>
+            <a:off x="838200" y="1825624"/>
+            <a:ext cx="10515600" cy="4899641"/>
+          </a:xfrm>
+        </p:spPr>
+        <p:txBody>
+          <a:bodyPr>
+            <a:normAutofit/>
+          </a:bodyPr>
+          <a:lstStyle/>
+          <a:p>
+            <a:r>
+              <a:rPr lang="en-US" sz="4000" dirty="0" smtClean="0">
+                <a:solidFill>
+                  <a:schemeClr val="bg1">
+                    <a:lumMod val="65000"/>
+                  </a:schemeClr>
+                </a:solidFill>
+              </a:rPr>
+              <a:t>Define "cross cutting" security concerns</a:t>
+            </a:r>
+          </a:p>
+          <a:p>
+            <a:endParaRPr lang="en-US" sz="4000" dirty="0">
+              <a:solidFill>
+                <a:schemeClr val="bg1">
+                  <a:lumMod val="65000"/>
+                </a:schemeClr>
+              </a:solidFill>
+            </a:endParaRPr>
+          </a:p>
+          <a:p>
+            <a:r>
+              <a:rPr lang="en-US" sz="4000" dirty="0" smtClean="0">
+                <a:solidFill>
+                  <a:schemeClr val="bg1">
+                    <a:lumMod val="65000"/>
+                  </a:schemeClr>
+                </a:solidFill>
+              </a:rPr>
+              <a:t>"Secure by default" examples</a:t>
+            </a:r>
+          </a:p>
+          <a:p>
+            <a:endParaRPr lang="en-US" sz="4000" dirty="0"/>
+          </a:p>
+          <a:p>
+            <a:r>
+              <a:rPr lang="en-US" sz="4000" dirty="0" smtClean="0"/>
+              <a:t>Declarative vs Imperative security</a:t>
+            </a:r>
+          </a:p>
+          <a:p>
+            <a:endParaRPr lang="en-US" sz="4000" dirty="0"/>
+          </a:p>
+          <a:p>
+            <a:endParaRPr lang="en-US" sz="4000" dirty="0"/>
+          </a:p>
+          <a:p>
+            <a:endParaRPr lang="en-US" sz="4000" dirty="0" smtClean="0"/>
+          </a:p>
+          <a:p>
+            <a:endParaRPr lang="en-US" sz="4000" dirty="0" smtClean="0"/>
+          </a:p>
+          <a:p>
+            <a:endParaRPr lang="en-US" dirty="0" smtClean="0"/>
+          </a:p>
+          <a:p>
+            <a:endParaRPr lang="en-US" dirty="0" smtClean="0"/>
+          </a:p>
+          <a:p>
+            <a:endParaRPr lang="en-US" dirty="0"/>
+          </a:p>
+        </p:txBody>
+      </p:sp>
+    </p:spTree>
+    <p:extLst>
+      <p:ext uri="{BB962C8B-B14F-4D97-AF65-F5344CB8AC3E}">
+        <p14:creationId xmlns:p14="http://schemas.microsoft.com/office/powerpoint/2010/main" val="1001694156"/>
+      </p:ext>
+    </p:extLst>
+  </p:cSld>
+  <p:clrMapOvr>
+    <a:masterClrMapping/>
+  </p:clrMapOvr>
+  <p:timing>
+    <p:tnLst>
+      <p:par>
+        <p:cTn id="1" dur="indefinite" restart="never" nodeType="tmRoot"/>
+      </p:par>
+    </p:tnLst>
+  </p:timing>
+</p:sld>
+</file>
+
+<file path=ppt/slides/slide70.xml><?xml version="1.0" encoding="utf-8"?>
 <p:sld xmlns:a="http://schemas.openxmlformats.org/drawingml/2006/main" xmlns:r="http://schemas.openxmlformats.org/officeDocument/2006/relationships" xmlns:p="http://schemas.openxmlformats.org/presentationml/2006/main">
   <p:cSld>
     <p:spTree>
@@ -18024,7 +19062,7 @@
 </p:sld>
 </file>
 
-<file path=ppt/slides/slide67.xml><?xml version="1.0" encoding="utf-8"?>
+<file path=ppt/slides/slide71.xml><?xml version="1.0" encoding="utf-8"?>
 <p:sld xmlns:a="http://schemas.openxmlformats.org/drawingml/2006/main" xmlns:r="http://schemas.openxmlformats.org/officeDocument/2006/relationships" xmlns:p="http://schemas.openxmlformats.org/presentationml/2006/main">
   <p:cSld>
     <p:spTree>
@@ -18145,7 +19183,7 @@
 </p:sld>
 </file>
 
-<file path=ppt/slides/slide68.xml><?xml version="1.0" encoding="utf-8"?>
+<file path=ppt/slides/slide72.xml><?xml version="1.0" encoding="utf-8"?>
 <p:sld xmlns:a="http://schemas.openxmlformats.org/drawingml/2006/main" xmlns:r="http://schemas.openxmlformats.org/officeDocument/2006/relationships" xmlns:p="http://schemas.openxmlformats.org/presentationml/2006/main">
   <p:cSld>
     <p:spTree>
@@ -18266,7 +19304,7 @@
 </p:sld>
 </file>
 
-<file path=ppt/slides/slide69.xml><?xml version="1.0" encoding="utf-8"?>
+<file path=ppt/slides/slide73.xml><?xml version="1.0" encoding="utf-8"?>
 <p:sld xmlns:a="http://schemas.openxmlformats.org/drawingml/2006/main" xmlns:r="http://schemas.openxmlformats.org/officeDocument/2006/relationships" xmlns:p="http://schemas.openxmlformats.org/presentationml/2006/main">
   <p:cSld>
     <p:spTree>
@@ -18390,159 +19428,7 @@
 </p:sld>
 </file>
 
-<file path=ppt/slides/slide7.xml><?xml version="1.0" encoding="utf-8"?>
-<p:sld xmlns:a="http://schemas.openxmlformats.org/drawingml/2006/main" xmlns:r="http://schemas.openxmlformats.org/officeDocument/2006/relationships" xmlns:p="http://schemas.openxmlformats.org/presentationml/2006/main">
-  <p:cSld>
-    <p:spTree>
-      <p:nvGrpSpPr>
-        <p:cNvPr id="1" name=""/>
-        <p:cNvGrpSpPr/>
-        <p:nvPr/>
-      </p:nvGrpSpPr>
-      <p:grpSpPr>
-        <a:xfrm>
-          <a:off x="0" y="0"/>
-          <a:ext cx="0" cy="0"/>
-          <a:chOff x="0" y="0"/>
-          <a:chExt cx="0" cy="0"/>
-        </a:xfrm>
-      </p:grpSpPr>
-      <p:sp>
-        <p:nvSpPr>
-          <p:cNvPr id="2" name="Title 1"/>
-          <p:cNvSpPr>
-            <a:spLocks noGrp="1"/>
-          </p:cNvSpPr>
-          <p:nvPr>
-            <p:ph type="title"/>
-          </p:nvPr>
-        </p:nvSpPr>
-        <p:spPr/>
-        <p:txBody>
-          <a:bodyPr>
-            <a:normAutofit/>
-          </a:bodyPr>
-          <a:lstStyle/>
-          <a:p>
-            <a:r>
-              <a:rPr lang="en-US" sz="4800" dirty="0" smtClean="0"/>
-              <a:t>What's on </a:t>
-            </a:r>
-            <a:r>
-              <a:rPr lang="en-US" sz="4800" smtClean="0"/>
-              <a:t>the agenda?</a:t>
-            </a:r>
-            <a:endParaRPr lang="en-US" sz="4800" dirty="0"/>
-          </a:p>
-        </p:txBody>
-      </p:sp>
-      <p:sp>
-        <p:nvSpPr>
-          <p:cNvPr id="3" name="Content Placeholder 2"/>
-          <p:cNvSpPr>
-            <a:spLocks noGrp="1"/>
-          </p:cNvSpPr>
-          <p:nvPr>
-            <p:ph idx="1"/>
-          </p:nvPr>
-        </p:nvSpPr>
-        <p:spPr>
-          <a:xfrm>
-            <a:off x="838200" y="1825624"/>
-            <a:ext cx="10515600" cy="4899641"/>
-          </a:xfrm>
-        </p:spPr>
-        <p:txBody>
-          <a:bodyPr>
-            <a:normAutofit/>
-          </a:bodyPr>
-          <a:lstStyle/>
-          <a:p>
-            <a:r>
-              <a:rPr lang="en-US" sz="4000" dirty="0" smtClean="0">
-                <a:solidFill>
-                  <a:schemeClr val="bg1">
-                    <a:lumMod val="65000"/>
-                  </a:schemeClr>
-                </a:solidFill>
-              </a:rPr>
-              <a:t>Define "cross cutting" security concerns</a:t>
-            </a:r>
-          </a:p>
-          <a:p>
-            <a:endParaRPr lang="en-US" sz="4000" dirty="0">
-              <a:solidFill>
-                <a:schemeClr val="bg1">
-                  <a:lumMod val="65000"/>
-                </a:schemeClr>
-              </a:solidFill>
-            </a:endParaRPr>
-          </a:p>
-          <a:p>
-            <a:r>
-              <a:rPr lang="en-US" sz="4000" dirty="0" smtClean="0">
-                <a:solidFill>
-                  <a:schemeClr val="bg1">
-                    <a:lumMod val="65000"/>
-                  </a:schemeClr>
-                </a:solidFill>
-              </a:rPr>
-              <a:t>"Secure by default" examples</a:t>
-            </a:r>
-          </a:p>
-          <a:p>
-            <a:endParaRPr lang="en-US" sz="4000" dirty="0"/>
-          </a:p>
-          <a:p>
-            <a:r>
-              <a:rPr lang="en-US" sz="4000" dirty="0" smtClean="0"/>
-              <a:t>Declarative vs Imperative security</a:t>
-            </a:r>
-          </a:p>
-          <a:p>
-            <a:endParaRPr lang="en-US" sz="4000" dirty="0"/>
-          </a:p>
-          <a:p>
-            <a:endParaRPr lang="en-US" sz="4000" dirty="0"/>
-          </a:p>
-          <a:p>
-            <a:endParaRPr lang="en-US" sz="4000" dirty="0" smtClean="0"/>
-          </a:p>
-          <a:p>
-            <a:endParaRPr lang="en-US" sz="4000" dirty="0" smtClean="0"/>
-          </a:p>
-          <a:p>
-            <a:endParaRPr lang="en-US" dirty="0" smtClean="0"/>
-          </a:p>
-          <a:p>
-            <a:endParaRPr lang="en-US" dirty="0" smtClean="0"/>
-          </a:p>
-          <a:p>
-            <a:endParaRPr lang="en-US" dirty="0"/>
-          </a:p>
-        </p:txBody>
-      </p:sp>
-    </p:spTree>
-    <p:extLst>
-      <p:ext uri="{BB962C8B-B14F-4D97-AF65-F5344CB8AC3E}">
-        <p14:creationId xmlns:p14="http://schemas.microsoft.com/office/powerpoint/2010/main" val="1001694156"/>
-      </p:ext>
-    </p:extLst>
-  </p:cSld>
-  <p:clrMapOvr>
-    <a:masterClrMapping/>
-  </p:clrMapOvr>
-  <p:timing>
-    <p:tnLst>
-      <p:par>
-        <p:cTn id="1" dur="indefinite" restart="never" nodeType="tmRoot"/>
-      </p:par>
-    </p:tnLst>
-  </p:timing>
-</p:sld>
-</file>
-
-<file path=ppt/slides/slide70.xml><?xml version="1.0" encoding="utf-8"?>
+<file path=ppt/slides/slide74.xml><?xml version="1.0" encoding="utf-8"?>
 <p:sld xmlns:a="http://schemas.openxmlformats.org/drawingml/2006/main" xmlns:r="http://schemas.openxmlformats.org/officeDocument/2006/relationships" xmlns:p="http://schemas.openxmlformats.org/presentationml/2006/main">
   <p:cSld>
     <p:spTree>
@@ -18672,7 +19558,7 @@
 </p:sld>
 </file>
 
-<file path=ppt/slides/slide71.xml><?xml version="1.0" encoding="utf-8"?>
+<file path=ppt/slides/slide75.xml><?xml version="1.0" encoding="utf-8"?>
 <p:sld xmlns:a="http://schemas.openxmlformats.org/drawingml/2006/main" xmlns:r="http://schemas.openxmlformats.org/officeDocument/2006/relationships" xmlns:p="http://schemas.openxmlformats.org/presentationml/2006/main">
   <p:cSld>
     <p:spTree>
@@ -18787,7 +19673,7 @@
 </p:sld>
 </file>
 
-<file path=ppt/slides/slide72.xml><?xml version="1.0" encoding="utf-8"?>
+<file path=ppt/slides/slide76.xml><?xml version="1.0" encoding="utf-8"?>
 <p:sld xmlns:a="http://schemas.openxmlformats.org/drawingml/2006/main" xmlns:r="http://schemas.openxmlformats.org/officeDocument/2006/relationships" xmlns:p="http://schemas.openxmlformats.org/presentationml/2006/main">
   <p:cSld>
     <p:spTree>
@@ -18907,7 +19793,6 @@
               <a:rPr lang="en-US" sz="3200" dirty="0" smtClean="0"/>
               <a:t>Method boundaries</a:t>
             </a:r>
-            <a:endParaRPr lang="en-US" sz="3200" dirty="0" smtClean="0"/>
           </a:p>
           <a:p>
             <a:pPr marL="0" indent="0">
@@ -19009,7 +19894,7 @@
 </p:sld>
 </file>
 
-<file path=ppt/slides/slide73.xml><?xml version="1.0" encoding="utf-8"?>
+<file path=ppt/slides/slide77.xml><?xml version="1.0" encoding="utf-8"?>
 <p:sld xmlns:a="http://schemas.openxmlformats.org/drawingml/2006/main" xmlns:r="http://schemas.openxmlformats.org/officeDocument/2006/relationships" xmlns:p="http://schemas.openxmlformats.org/presentationml/2006/main">
   <p:cSld>
     <p:spTree>
@@ -19151,7 +20036,7 @@
 </p:sld>
 </file>
 
-<file path=ppt/slides/slide74.xml><?xml version="1.0" encoding="utf-8"?>
+<file path=ppt/slides/slide78.xml><?xml version="1.0" encoding="utf-8"?>
 <p:sld xmlns:a="http://schemas.openxmlformats.org/drawingml/2006/main" xmlns:r="http://schemas.openxmlformats.org/officeDocument/2006/relationships" xmlns:p="http://schemas.openxmlformats.org/presentationml/2006/main">
   <p:cSld>
     <p:spTree>
@@ -19621,7 +20506,6 @@
               <a:rPr lang="en-US" sz="4000" dirty="0" smtClean="0"/>
               <a:t>in the underlying system</a:t>
             </a:r>
-            <a:endParaRPr lang="en-US" sz="4000" dirty="0" smtClean="0"/>
           </a:p>
           <a:p>
             <a:endParaRPr lang="en-US" sz="4000" dirty="0" smtClean="0"/>

</xml_diff>

<commit_message>
Tweaks based on last run through
</commit_message>
<xml_diff>
--- a/Secure Systems - CodeMash 2017.pptx
+++ b/Secure Systems - CodeMash 2017.pptx
@@ -311,7 +311,7 @@
           <a:p>
             <a:fld id="{C54A4886-B4AF-42F7-97BE-95CDF82A73E3}" type="datetimeFigureOut">
               <a:rPr lang="en-US" smtClean="0"/>
-              <a:t>1/4/2017</a:t>
+              <a:t>1/5/2017</a:t>
             </a:fld>
             <a:endParaRPr lang="en-US"/>
           </a:p>
@@ -7553,7 +7553,7 @@
           <a:p>
             <a:fld id="{75AA6396-395E-4ADA-8EE5-F328BC863A04}" type="datetimeFigureOut">
               <a:rPr lang="en-US" smtClean="0"/>
-              <a:t>1/4/2017</a:t>
+              <a:t>1/5/2017</a:t>
             </a:fld>
             <a:endParaRPr lang="en-US"/>
           </a:p>
@@ -7730,7 +7730,7 @@
           <a:p>
             <a:fld id="{75AA6396-395E-4ADA-8EE5-F328BC863A04}" type="datetimeFigureOut">
               <a:rPr lang="en-US" smtClean="0"/>
-              <a:t>1/4/2017</a:t>
+              <a:t>1/5/2017</a:t>
             </a:fld>
             <a:endParaRPr lang="en-US"/>
           </a:p>
@@ -7910,7 +7910,7 @@
           <a:p>
             <a:fld id="{75AA6396-395E-4ADA-8EE5-F328BC863A04}" type="datetimeFigureOut">
               <a:rPr lang="en-US" smtClean="0"/>
-              <a:t>1/4/2017</a:t>
+              <a:t>1/5/2017</a:t>
             </a:fld>
             <a:endParaRPr lang="en-US"/>
           </a:p>
@@ -8130,7 +8130,7 @@
           <a:p>
             <a:fld id="{75AA6396-395E-4ADA-8EE5-F328BC863A04}" type="datetimeFigureOut">
               <a:rPr lang="en-US" smtClean="0"/>
-              <a:t>1/4/2017</a:t>
+              <a:t>1/5/2017</a:t>
             </a:fld>
             <a:endParaRPr lang="en-US"/>
           </a:p>
@@ -8383,7 +8383,7 @@
           <a:p>
             <a:fld id="{75AA6396-395E-4ADA-8EE5-F328BC863A04}" type="datetimeFigureOut">
               <a:rPr lang="en-US" smtClean="0"/>
-              <a:t>1/4/2017</a:t>
+              <a:t>1/5/2017</a:t>
             </a:fld>
             <a:endParaRPr lang="en-US"/>
           </a:p>
@@ -8622,7 +8622,7 @@
           <a:p>
             <a:fld id="{75AA6396-395E-4ADA-8EE5-F328BC863A04}" type="datetimeFigureOut">
               <a:rPr lang="en-US" smtClean="0"/>
-              <a:t>1/4/2017</a:t>
+              <a:t>1/5/2017</a:t>
             </a:fld>
             <a:endParaRPr lang="en-US"/>
           </a:p>
@@ -8996,7 +8996,7 @@
           <a:p>
             <a:fld id="{75AA6396-395E-4ADA-8EE5-F328BC863A04}" type="datetimeFigureOut">
               <a:rPr lang="en-US" smtClean="0"/>
-              <a:t>1/4/2017</a:t>
+              <a:t>1/5/2017</a:t>
             </a:fld>
             <a:endParaRPr lang="en-US"/>
           </a:p>
@@ -9114,7 +9114,7 @@
           <a:p>
             <a:fld id="{75AA6396-395E-4ADA-8EE5-F328BC863A04}" type="datetimeFigureOut">
               <a:rPr lang="en-US" smtClean="0"/>
-              <a:t>1/4/2017</a:t>
+              <a:t>1/5/2017</a:t>
             </a:fld>
             <a:endParaRPr lang="en-US"/>
           </a:p>
@@ -9209,7 +9209,7 @@
           <a:p>
             <a:fld id="{75AA6396-395E-4ADA-8EE5-F328BC863A04}" type="datetimeFigureOut">
               <a:rPr lang="en-US" smtClean="0"/>
-              <a:t>1/4/2017</a:t>
+              <a:t>1/5/2017</a:t>
             </a:fld>
             <a:endParaRPr lang="en-US"/>
           </a:p>
@@ -9486,7 +9486,7 @@
           <a:p>
             <a:fld id="{75AA6396-395E-4ADA-8EE5-F328BC863A04}" type="datetimeFigureOut">
               <a:rPr lang="en-US" smtClean="0"/>
-              <a:t>1/4/2017</a:t>
+              <a:t>1/5/2017</a:t>
             </a:fld>
             <a:endParaRPr lang="en-US"/>
           </a:p>
@@ -9739,7 +9739,7 @@
           <a:p>
             <a:fld id="{75AA6396-395E-4ADA-8EE5-F328BC863A04}" type="datetimeFigureOut">
               <a:rPr lang="en-US" smtClean="0"/>
-              <a:t>1/4/2017</a:t>
+              <a:t>1/5/2017</a:t>
             </a:fld>
             <a:endParaRPr lang="en-US"/>
           </a:p>
@@ -9952,7 +9952,7 @@
           <a:p>
             <a:fld id="{75AA6396-395E-4ADA-8EE5-F328BC863A04}" type="datetimeFigureOut">
               <a:rPr lang="en-US" smtClean="0"/>
-              <a:t>1/4/2017</a:t>
+              <a:t>1/5/2017</a:t>
             </a:fld>
             <a:endParaRPr lang="en-US"/>
           </a:p>
@@ -15474,7 +15474,7 @@
       </p:sp>
       <p:pic>
         <p:nvPicPr>
-          <p:cNvPr id="4" name="Picture 3"/>
+          <p:cNvPr id="5" name="Picture 4"/>
           <p:cNvPicPr>
             <a:picLocks noChangeAspect="1"/>
           </p:cNvPicPr>
@@ -15488,8 +15488,8 @@
         </p:blipFill>
         <p:spPr>
           <a:xfrm>
-            <a:off x="838200" y="2221629"/>
-            <a:ext cx="11276443" cy="4193918"/>
+            <a:off x="449419" y="1825624"/>
+            <a:ext cx="11614245" cy="4324453"/>
           </a:xfrm>
           <a:prstGeom prst="rect">
             <a:avLst/>
@@ -15593,44 +15593,30 @@
           </a:p>
         </p:txBody>
       </p:sp>
-      <p:sp>
-        <p:nvSpPr>
-          <p:cNvPr id="4" name="TextBox 3"/>
-          <p:cNvSpPr txBox="1"/>
+      <p:pic>
+        <p:nvPicPr>
+          <p:cNvPr id="6" name="Picture 5"/>
+          <p:cNvPicPr>
+            <a:picLocks noChangeAspect="1"/>
+          </p:cNvPicPr>
           <p:nvPr/>
-        </p:nvSpPr>
+        </p:nvPicPr>
+        <p:blipFill>
+          <a:blip r:embed="rId3"/>
+          <a:stretch>
+            <a:fillRect/>
+          </a:stretch>
+        </p:blipFill>
         <p:spPr>
           <a:xfrm>
-            <a:off x="2091813" y="2507226"/>
-            <a:ext cx="8008374" cy="1077218"/>
+            <a:off x="838200" y="2194332"/>
+            <a:ext cx="10894379" cy="3852505"/>
           </a:xfrm>
           <a:prstGeom prst="rect">
             <a:avLst/>
           </a:prstGeom>
-          <a:noFill/>
         </p:spPr>
-        <p:txBody>
-          <a:bodyPr wrap="square" rtlCol="0">
-            <a:spAutoFit/>
-          </a:bodyPr>
-          <a:lstStyle/>
-          <a:p>
-            <a:r>
-              <a:rPr lang="en-US" sz="3200" dirty="0" smtClean="0">
-                <a:solidFill>
-                  <a:srgbClr val="FF0000"/>
-                </a:solidFill>
-              </a:rPr>
-              <a:t>TODO: Show method names w/ out "secure" and "insecure"</a:t>
-            </a:r>
-            <a:endParaRPr lang="en-US" sz="3200" dirty="0">
-              <a:solidFill>
-                <a:srgbClr val="FF0000"/>
-              </a:solidFill>
-            </a:endParaRPr>
-          </a:p>
-        </p:txBody>
-      </p:sp>
+      </p:pic>
     </p:spTree>
     <p:extLst>
       <p:ext uri="{BB962C8B-B14F-4D97-AF65-F5344CB8AC3E}">
@@ -15730,7 +15716,7 @@
       </p:sp>
       <p:pic>
         <p:nvPicPr>
-          <p:cNvPr id="7" name="Picture 6"/>
+          <p:cNvPr id="4" name="Picture 3"/>
           <p:cNvPicPr>
             <a:picLocks noChangeAspect="1"/>
           </p:cNvPicPr>
@@ -15744,8 +15730,8 @@
         </p:blipFill>
         <p:spPr>
           <a:xfrm>
-            <a:off x="838200" y="1960560"/>
-            <a:ext cx="10991659" cy="4589923"/>
+            <a:off x="838200" y="2253326"/>
+            <a:ext cx="10532864" cy="3734518"/>
           </a:xfrm>
           <a:prstGeom prst="rect">
             <a:avLst/>

</xml_diff>

<commit_message>
Fixing the flow, yo.
</commit_message>
<xml_diff>
--- a/Secure Systems - CodeMash 2017.pptx
+++ b/Secure Systems - CodeMash 2017.pptx
@@ -5,7 +5,7 @@
     <p:sldMasterId id="2147483749" r:id="rId1"/>
   </p:sldMasterIdLst>
   <p:notesMasterIdLst>
-    <p:notesMasterId r:id="rId79"/>
+    <p:notesMasterId r:id="rId77"/>
   </p:notesMasterIdLst>
   <p:sldIdLst>
     <p:sldId id="395" r:id="rId2"/>
@@ -29,62 +29,60 @@
     <p:sldId id="510" r:id="rId20"/>
     <p:sldId id="511" r:id="rId21"/>
     <p:sldId id="512" r:id="rId22"/>
-    <p:sldId id="516" r:id="rId23"/>
-    <p:sldId id="518" r:id="rId24"/>
-    <p:sldId id="499" r:id="rId25"/>
-    <p:sldId id="545" r:id="rId26"/>
-    <p:sldId id="541" r:id="rId27"/>
-    <p:sldId id="550" r:id="rId28"/>
-    <p:sldId id="579" r:id="rId29"/>
-    <p:sldId id="519" r:id="rId30"/>
-    <p:sldId id="524" r:id="rId31"/>
-    <p:sldId id="521" r:id="rId32"/>
-    <p:sldId id="522" r:id="rId33"/>
-    <p:sldId id="525" r:id="rId34"/>
-    <p:sldId id="523" r:id="rId35"/>
-    <p:sldId id="520" r:id="rId36"/>
-    <p:sldId id="526" r:id="rId37"/>
-    <p:sldId id="540" r:id="rId38"/>
-    <p:sldId id="500" r:id="rId39"/>
-    <p:sldId id="553" r:id="rId40"/>
-    <p:sldId id="574" r:id="rId41"/>
-    <p:sldId id="573" r:id="rId42"/>
-    <p:sldId id="575" r:id="rId43"/>
-    <p:sldId id="534" r:id="rId44"/>
-    <p:sldId id="505" r:id="rId45"/>
-    <p:sldId id="535" r:id="rId46"/>
-    <p:sldId id="576" r:id="rId47"/>
-    <p:sldId id="507" r:id="rId48"/>
-    <p:sldId id="536" r:id="rId49"/>
-    <p:sldId id="580" r:id="rId50"/>
-    <p:sldId id="538" r:id="rId51"/>
-    <p:sldId id="539" r:id="rId52"/>
-    <p:sldId id="577" r:id="rId53"/>
-    <p:sldId id="537" r:id="rId54"/>
-    <p:sldId id="551" r:id="rId55"/>
-    <p:sldId id="552" r:id="rId56"/>
-    <p:sldId id="581" r:id="rId57"/>
-    <p:sldId id="501" r:id="rId58"/>
-    <p:sldId id="529" r:id="rId59"/>
-    <p:sldId id="546" r:id="rId60"/>
-    <p:sldId id="502" r:id="rId61"/>
-    <p:sldId id="503" r:id="rId62"/>
-    <p:sldId id="531" r:id="rId63"/>
-    <p:sldId id="532" r:id="rId64"/>
-    <p:sldId id="533" r:id="rId65"/>
-    <p:sldId id="554" r:id="rId66"/>
-    <p:sldId id="530" r:id="rId67"/>
-    <p:sldId id="555" r:id="rId68"/>
-    <p:sldId id="556" r:id="rId69"/>
-    <p:sldId id="557" r:id="rId70"/>
-    <p:sldId id="558" r:id="rId71"/>
-    <p:sldId id="559" r:id="rId72"/>
-    <p:sldId id="564" r:id="rId73"/>
-    <p:sldId id="561" r:id="rId74"/>
-    <p:sldId id="565" r:id="rId75"/>
-    <p:sldId id="566" r:id="rId76"/>
-    <p:sldId id="568" r:id="rId77"/>
-    <p:sldId id="583" r:id="rId78"/>
+    <p:sldId id="499" r:id="rId23"/>
+    <p:sldId id="545" r:id="rId24"/>
+    <p:sldId id="541" r:id="rId25"/>
+    <p:sldId id="550" r:id="rId26"/>
+    <p:sldId id="579" r:id="rId27"/>
+    <p:sldId id="519" r:id="rId28"/>
+    <p:sldId id="524" r:id="rId29"/>
+    <p:sldId id="521" r:id="rId30"/>
+    <p:sldId id="522" r:id="rId31"/>
+    <p:sldId id="525" r:id="rId32"/>
+    <p:sldId id="523" r:id="rId33"/>
+    <p:sldId id="520" r:id="rId34"/>
+    <p:sldId id="526" r:id="rId35"/>
+    <p:sldId id="540" r:id="rId36"/>
+    <p:sldId id="500" r:id="rId37"/>
+    <p:sldId id="553" r:id="rId38"/>
+    <p:sldId id="574" r:id="rId39"/>
+    <p:sldId id="573" r:id="rId40"/>
+    <p:sldId id="575" r:id="rId41"/>
+    <p:sldId id="534" r:id="rId42"/>
+    <p:sldId id="505" r:id="rId43"/>
+    <p:sldId id="535" r:id="rId44"/>
+    <p:sldId id="576" r:id="rId45"/>
+    <p:sldId id="507" r:id="rId46"/>
+    <p:sldId id="536" r:id="rId47"/>
+    <p:sldId id="580" r:id="rId48"/>
+    <p:sldId id="538" r:id="rId49"/>
+    <p:sldId id="539" r:id="rId50"/>
+    <p:sldId id="577" r:id="rId51"/>
+    <p:sldId id="537" r:id="rId52"/>
+    <p:sldId id="551" r:id="rId53"/>
+    <p:sldId id="552" r:id="rId54"/>
+    <p:sldId id="581" r:id="rId55"/>
+    <p:sldId id="501" r:id="rId56"/>
+    <p:sldId id="529" r:id="rId57"/>
+    <p:sldId id="546" r:id="rId58"/>
+    <p:sldId id="502" r:id="rId59"/>
+    <p:sldId id="503" r:id="rId60"/>
+    <p:sldId id="531" r:id="rId61"/>
+    <p:sldId id="532" r:id="rId62"/>
+    <p:sldId id="533" r:id="rId63"/>
+    <p:sldId id="554" r:id="rId64"/>
+    <p:sldId id="530" r:id="rId65"/>
+    <p:sldId id="555" r:id="rId66"/>
+    <p:sldId id="556" r:id="rId67"/>
+    <p:sldId id="557" r:id="rId68"/>
+    <p:sldId id="558" r:id="rId69"/>
+    <p:sldId id="559" r:id="rId70"/>
+    <p:sldId id="564" r:id="rId71"/>
+    <p:sldId id="561" r:id="rId72"/>
+    <p:sldId id="565" r:id="rId73"/>
+    <p:sldId id="566" r:id="rId74"/>
+    <p:sldId id="568" r:id="rId75"/>
+    <p:sldId id="583" r:id="rId76"/>
   </p:sldIdLst>
   <p:sldSz cx="12192000" cy="6858000"/>
   <p:notesSz cx="6858000" cy="9144000"/>
@@ -310,7 +308,7 @@
           <a:p>
             <a:fld id="{C54A4886-B4AF-42F7-97BE-95CDF82A73E3}" type="datetimeFigureOut">
               <a:rPr lang="en-US" smtClean="0"/>
-              <a:t>1/5/2017</a:t>
+              <a:t>1/6/2017</a:t>
             </a:fld>
             <a:endParaRPr lang="en-US"/>
           </a:p>
@@ -1831,7 +1829,32 @@
           <a:bodyPr/>
           <a:lstStyle/>
           <a:p>
-            <a:endParaRPr lang="en-US" b="0" dirty="0" smtClean="0"/>
+            <a:pPr marL="0" marR="0" indent="0" algn="l" defTabSz="914400" rtl="0" eaLnBrk="1" fontAlgn="auto" latinLnBrk="0" hangingPunct="1">
+              <a:lnSpc>
+                <a:spcPct val="100000"/>
+              </a:lnSpc>
+              <a:spcBef>
+                <a:spcPts val="0"/>
+              </a:spcBef>
+              <a:spcAft>
+                <a:spcPts val="0"/>
+              </a:spcAft>
+              <a:buClrTx/>
+              <a:buSzTx/>
+              <a:buFontTx/>
+              <a:buNone/>
+              <a:tabLst/>
+              <a:defRPr/>
+            </a:pPr>
+            <a:endParaRPr lang="en-US" sz="1200" kern="1200" dirty="0" smtClean="0">
+              <a:solidFill>
+                <a:schemeClr val="tx1"/>
+              </a:solidFill>
+              <a:effectLst/>
+              <a:latin typeface="+mn-lt"/>
+              <a:ea typeface="+mn-ea"/>
+              <a:cs typeface="+mn-cs"/>
+            </a:endParaRPr>
           </a:p>
         </p:txBody>
       </p:sp>
@@ -1861,7 +1884,7 @@
     </p:spTree>
     <p:extLst>
       <p:ext uri="{BB962C8B-B14F-4D97-AF65-F5344CB8AC3E}">
-        <p14:creationId xmlns:p14="http://schemas.microsoft.com/office/powerpoint/2010/main" val="2539089675"/>
+        <p14:creationId xmlns:p14="http://schemas.microsoft.com/office/powerpoint/2010/main" val="2181037172"/>
       </p:ext>
     </p:extLst>
   </p:cSld>
@@ -1915,7 +1938,32 @@
           <a:bodyPr/>
           <a:lstStyle/>
           <a:p>
-            <a:endParaRPr lang="en-US" b="0" dirty="0" smtClean="0"/>
+            <a:pPr marL="0" marR="0" indent="0" algn="l" defTabSz="914400" rtl="0" eaLnBrk="1" fontAlgn="auto" latinLnBrk="0" hangingPunct="1">
+              <a:lnSpc>
+                <a:spcPct val="100000"/>
+              </a:lnSpc>
+              <a:spcBef>
+                <a:spcPts val="0"/>
+              </a:spcBef>
+              <a:spcAft>
+                <a:spcPts val="0"/>
+              </a:spcAft>
+              <a:buClrTx/>
+              <a:buSzTx/>
+              <a:buFontTx/>
+              <a:buNone/>
+              <a:tabLst/>
+              <a:defRPr/>
+            </a:pPr>
+            <a:endParaRPr lang="en-US" sz="1200" kern="1200" dirty="0" smtClean="0">
+              <a:solidFill>
+                <a:schemeClr val="tx1"/>
+              </a:solidFill>
+              <a:effectLst/>
+              <a:latin typeface="+mn-lt"/>
+              <a:ea typeface="+mn-ea"/>
+              <a:cs typeface="+mn-cs"/>
+            </a:endParaRPr>
           </a:p>
         </p:txBody>
       </p:sp>
@@ -1945,7 +1993,7 @@
     </p:spTree>
     <p:extLst>
       <p:ext uri="{BB962C8B-B14F-4D97-AF65-F5344CB8AC3E}">
-        <p14:creationId xmlns:p14="http://schemas.microsoft.com/office/powerpoint/2010/main" val="1916901341"/>
+        <p14:creationId xmlns:p14="http://schemas.microsoft.com/office/powerpoint/2010/main" val="532131523"/>
       </p:ext>
     </p:extLst>
   </p:cSld>
@@ -1999,6 +2047,90 @@
           <a:bodyPr/>
           <a:lstStyle/>
           <a:p>
+            <a:endParaRPr lang="en-US" b="0" dirty="0" smtClean="0"/>
+          </a:p>
+        </p:txBody>
+      </p:sp>
+      <p:sp>
+        <p:nvSpPr>
+          <p:cNvPr id="4" name="Slide Number Placeholder 3"/>
+          <p:cNvSpPr>
+            <a:spLocks noGrp="1"/>
+          </p:cNvSpPr>
+          <p:nvPr>
+            <p:ph type="sldNum" sz="quarter" idx="10"/>
+          </p:nvPr>
+        </p:nvSpPr>
+        <p:spPr/>
+        <p:txBody>
+          <a:bodyPr/>
+          <a:lstStyle/>
+          <a:p>
+            <a:fld id="{89029652-62E7-43D6-83B5-097D7B7AA5D8}" type="slidenum">
+              <a:rPr lang="en-US" smtClean="0"/>
+              <a:t>24</a:t>
+            </a:fld>
+            <a:endParaRPr lang="en-US"/>
+          </a:p>
+        </p:txBody>
+      </p:sp>
+    </p:spTree>
+    <p:extLst>
+      <p:ext uri="{BB962C8B-B14F-4D97-AF65-F5344CB8AC3E}">
+        <p14:creationId xmlns:p14="http://schemas.microsoft.com/office/powerpoint/2010/main" val="2847908271"/>
+      </p:ext>
+    </p:extLst>
+  </p:cSld>
+  <p:clrMapOvr>
+    <a:masterClrMapping/>
+  </p:clrMapOvr>
+</p:notes>
+</file>
+
+<file path=ppt/notesSlides/notesSlide25.xml><?xml version="1.0" encoding="utf-8"?>
+<p:notes xmlns:a="http://schemas.openxmlformats.org/drawingml/2006/main" xmlns:r="http://schemas.openxmlformats.org/officeDocument/2006/relationships" xmlns:p="http://schemas.openxmlformats.org/presentationml/2006/main">
+  <p:cSld>
+    <p:spTree>
+      <p:nvGrpSpPr>
+        <p:cNvPr id="1" name=""/>
+        <p:cNvGrpSpPr/>
+        <p:nvPr/>
+      </p:nvGrpSpPr>
+      <p:grpSpPr>
+        <a:xfrm>
+          <a:off x="0" y="0"/>
+          <a:ext cx="0" cy="0"/>
+          <a:chOff x="0" y="0"/>
+          <a:chExt cx="0" cy="0"/>
+        </a:xfrm>
+      </p:grpSpPr>
+      <p:sp>
+        <p:nvSpPr>
+          <p:cNvPr id="2" name="Slide Image Placeholder 1"/>
+          <p:cNvSpPr>
+            <a:spLocks noGrp="1" noRot="1" noChangeAspect="1"/>
+          </p:cNvSpPr>
+          <p:nvPr>
+            <p:ph type="sldImg"/>
+          </p:nvPr>
+        </p:nvSpPr>
+        <p:spPr/>
+      </p:sp>
+      <p:sp>
+        <p:nvSpPr>
+          <p:cNvPr id="3" name="Notes Placeholder 2"/>
+          <p:cNvSpPr>
+            <a:spLocks noGrp="1"/>
+          </p:cNvSpPr>
+          <p:nvPr>
+            <p:ph type="body" idx="1"/>
+          </p:nvPr>
+        </p:nvSpPr>
+        <p:spPr/>
+        <p:txBody>
+          <a:bodyPr/>
+          <a:lstStyle/>
+          <a:p>
             <a:pPr marL="0" marR="0" indent="0" algn="l" defTabSz="914400" rtl="0" eaLnBrk="1" fontAlgn="auto" latinLnBrk="0" hangingPunct="1">
               <a:lnSpc>
                 <a:spcPct val="100000"/>
@@ -2045,7 +2177,7 @@
           <a:p>
             <a:fld id="{89029652-62E7-43D6-83B5-097D7B7AA5D8}" type="slidenum">
               <a:rPr lang="en-US" smtClean="0"/>
-              <a:t>24</a:t>
+              <a:t>25</a:t>
             </a:fld>
             <a:endParaRPr lang="en-US"/>
           </a:p>
@@ -2054,116 +2186,7 @@
     </p:spTree>
     <p:extLst>
       <p:ext uri="{BB962C8B-B14F-4D97-AF65-F5344CB8AC3E}">
-        <p14:creationId xmlns:p14="http://schemas.microsoft.com/office/powerpoint/2010/main" val="2181037172"/>
-      </p:ext>
-    </p:extLst>
-  </p:cSld>
-  <p:clrMapOvr>
-    <a:masterClrMapping/>
-  </p:clrMapOvr>
-</p:notes>
-</file>
-
-<file path=ppt/notesSlides/notesSlide25.xml><?xml version="1.0" encoding="utf-8"?>
-<p:notes xmlns:a="http://schemas.openxmlformats.org/drawingml/2006/main" xmlns:r="http://schemas.openxmlformats.org/officeDocument/2006/relationships" xmlns:p="http://schemas.openxmlformats.org/presentationml/2006/main">
-  <p:cSld>
-    <p:spTree>
-      <p:nvGrpSpPr>
-        <p:cNvPr id="1" name=""/>
-        <p:cNvGrpSpPr/>
-        <p:nvPr/>
-      </p:nvGrpSpPr>
-      <p:grpSpPr>
-        <a:xfrm>
-          <a:off x="0" y="0"/>
-          <a:ext cx="0" cy="0"/>
-          <a:chOff x="0" y="0"/>
-          <a:chExt cx="0" cy="0"/>
-        </a:xfrm>
-      </p:grpSpPr>
-      <p:sp>
-        <p:nvSpPr>
-          <p:cNvPr id="2" name="Slide Image Placeholder 1"/>
-          <p:cNvSpPr>
-            <a:spLocks noGrp="1" noRot="1" noChangeAspect="1"/>
-          </p:cNvSpPr>
-          <p:nvPr>
-            <p:ph type="sldImg"/>
-          </p:nvPr>
-        </p:nvSpPr>
-        <p:spPr/>
-      </p:sp>
-      <p:sp>
-        <p:nvSpPr>
-          <p:cNvPr id="3" name="Notes Placeholder 2"/>
-          <p:cNvSpPr>
-            <a:spLocks noGrp="1"/>
-          </p:cNvSpPr>
-          <p:nvPr>
-            <p:ph type="body" idx="1"/>
-          </p:nvPr>
-        </p:nvSpPr>
-        <p:spPr/>
-        <p:txBody>
-          <a:bodyPr/>
-          <a:lstStyle/>
-          <a:p>
-            <a:pPr marL="0" marR="0" indent="0" algn="l" defTabSz="914400" rtl="0" eaLnBrk="1" fontAlgn="auto" latinLnBrk="0" hangingPunct="1">
-              <a:lnSpc>
-                <a:spcPct val="100000"/>
-              </a:lnSpc>
-              <a:spcBef>
-                <a:spcPts val="0"/>
-              </a:spcBef>
-              <a:spcAft>
-                <a:spcPts val="0"/>
-              </a:spcAft>
-              <a:buClrTx/>
-              <a:buSzTx/>
-              <a:buFontTx/>
-              <a:buNone/>
-              <a:tabLst/>
-              <a:defRPr/>
-            </a:pPr>
-            <a:endParaRPr lang="en-US" sz="1200" kern="1200" dirty="0" smtClean="0">
-              <a:solidFill>
-                <a:schemeClr val="tx1"/>
-              </a:solidFill>
-              <a:effectLst/>
-              <a:latin typeface="+mn-lt"/>
-              <a:ea typeface="+mn-ea"/>
-              <a:cs typeface="+mn-cs"/>
-            </a:endParaRPr>
-          </a:p>
-        </p:txBody>
-      </p:sp>
-      <p:sp>
-        <p:nvSpPr>
-          <p:cNvPr id="4" name="Slide Number Placeholder 3"/>
-          <p:cNvSpPr>
-            <a:spLocks noGrp="1"/>
-          </p:cNvSpPr>
-          <p:nvPr>
-            <p:ph type="sldNum" sz="quarter" idx="10"/>
-          </p:nvPr>
-        </p:nvSpPr>
-        <p:spPr/>
-        <p:txBody>
-          <a:bodyPr/>
-          <a:lstStyle/>
-          <a:p>
-            <a:fld id="{89029652-62E7-43D6-83B5-097D7B7AA5D8}" type="slidenum">
-              <a:rPr lang="en-US" smtClean="0"/>
-              <a:t>25</a:t>
-            </a:fld>
-            <a:endParaRPr lang="en-US"/>
-          </a:p>
-        </p:txBody>
-      </p:sp>
-    </p:spTree>
-    <p:extLst>
-      <p:ext uri="{BB962C8B-B14F-4D97-AF65-F5344CB8AC3E}">
-        <p14:creationId xmlns:p14="http://schemas.microsoft.com/office/powerpoint/2010/main" val="532131523"/>
+        <p14:creationId xmlns:p14="http://schemas.microsoft.com/office/powerpoint/2010/main" val="3797934880"/>
       </p:ext>
     </p:extLst>
   </p:cSld>
@@ -2247,7 +2270,7 @@
     </p:spTree>
     <p:extLst>
       <p:ext uri="{BB962C8B-B14F-4D97-AF65-F5344CB8AC3E}">
-        <p14:creationId xmlns:p14="http://schemas.microsoft.com/office/powerpoint/2010/main" val="2847908271"/>
+        <p14:creationId xmlns:p14="http://schemas.microsoft.com/office/powerpoint/2010/main" val="920834877"/>
       </p:ext>
     </p:extLst>
   </p:cSld>
@@ -2301,32 +2324,7 @@
           <a:bodyPr/>
           <a:lstStyle/>
           <a:p>
-            <a:pPr marL="0" marR="0" indent="0" algn="l" defTabSz="914400" rtl="0" eaLnBrk="1" fontAlgn="auto" latinLnBrk="0" hangingPunct="1">
-              <a:lnSpc>
-                <a:spcPct val="100000"/>
-              </a:lnSpc>
-              <a:spcBef>
-                <a:spcPts val="0"/>
-              </a:spcBef>
-              <a:spcAft>
-                <a:spcPts val="0"/>
-              </a:spcAft>
-              <a:buClrTx/>
-              <a:buSzTx/>
-              <a:buFontTx/>
-              <a:buNone/>
-              <a:tabLst/>
-              <a:defRPr/>
-            </a:pPr>
-            <a:endParaRPr lang="en-US" sz="1200" kern="1200" dirty="0" smtClean="0">
-              <a:solidFill>
-                <a:schemeClr val="tx1"/>
-              </a:solidFill>
-              <a:effectLst/>
-              <a:latin typeface="+mn-lt"/>
-              <a:ea typeface="+mn-ea"/>
-              <a:cs typeface="+mn-cs"/>
-            </a:endParaRPr>
+            <a:endParaRPr lang="en-US" b="0" dirty="0" smtClean="0"/>
           </a:p>
         </p:txBody>
       </p:sp>
@@ -2356,7 +2354,7 @@
     </p:spTree>
     <p:extLst>
       <p:ext uri="{BB962C8B-B14F-4D97-AF65-F5344CB8AC3E}">
-        <p14:creationId xmlns:p14="http://schemas.microsoft.com/office/powerpoint/2010/main" val="3797934880"/>
+        <p14:creationId xmlns:p14="http://schemas.microsoft.com/office/powerpoint/2010/main" val="1777663287"/>
       </p:ext>
     </p:extLst>
   </p:cSld>
@@ -2440,7 +2438,7 @@
     </p:spTree>
     <p:extLst>
       <p:ext uri="{BB962C8B-B14F-4D97-AF65-F5344CB8AC3E}">
-        <p14:creationId xmlns:p14="http://schemas.microsoft.com/office/powerpoint/2010/main" val="920834877"/>
+        <p14:creationId xmlns:p14="http://schemas.microsoft.com/office/powerpoint/2010/main" val="128284815"/>
       </p:ext>
     </p:extLst>
   </p:cSld>
@@ -2524,7 +2522,7 @@
     </p:spTree>
     <p:extLst>
       <p:ext uri="{BB962C8B-B14F-4D97-AF65-F5344CB8AC3E}">
-        <p14:creationId xmlns:p14="http://schemas.microsoft.com/office/powerpoint/2010/main" val="1777663287"/>
+        <p14:creationId xmlns:p14="http://schemas.microsoft.com/office/powerpoint/2010/main" val="1266200327"/>
       </p:ext>
     </p:extLst>
   </p:cSld>
@@ -2717,7 +2715,7 @@
     </p:spTree>
     <p:extLst>
       <p:ext uri="{BB962C8B-B14F-4D97-AF65-F5344CB8AC3E}">
-        <p14:creationId xmlns:p14="http://schemas.microsoft.com/office/powerpoint/2010/main" val="128284815"/>
+        <p14:creationId xmlns:p14="http://schemas.microsoft.com/office/powerpoint/2010/main" val="3516029556"/>
       </p:ext>
     </p:extLst>
   </p:cSld>
@@ -2801,7 +2799,7 @@
     </p:spTree>
     <p:extLst>
       <p:ext uri="{BB962C8B-B14F-4D97-AF65-F5344CB8AC3E}">
-        <p14:creationId xmlns:p14="http://schemas.microsoft.com/office/powerpoint/2010/main" val="1266200327"/>
+        <p14:creationId xmlns:p14="http://schemas.microsoft.com/office/powerpoint/2010/main" val="3404565588"/>
       </p:ext>
     </p:extLst>
   </p:cSld>
@@ -2885,7 +2883,7 @@
     </p:spTree>
     <p:extLst>
       <p:ext uri="{BB962C8B-B14F-4D97-AF65-F5344CB8AC3E}">
-        <p14:creationId xmlns:p14="http://schemas.microsoft.com/office/powerpoint/2010/main" val="3516029556"/>
+        <p14:creationId xmlns:p14="http://schemas.microsoft.com/office/powerpoint/2010/main" val="2712589128"/>
       </p:ext>
     </p:extLst>
   </p:cSld>
@@ -2969,7 +2967,7 @@
     </p:spTree>
     <p:extLst>
       <p:ext uri="{BB962C8B-B14F-4D97-AF65-F5344CB8AC3E}">
-        <p14:creationId xmlns:p14="http://schemas.microsoft.com/office/powerpoint/2010/main" val="3404565588"/>
+        <p14:creationId xmlns:p14="http://schemas.microsoft.com/office/powerpoint/2010/main" val="1609105756"/>
       </p:ext>
     </p:extLst>
   </p:cSld>
@@ -3053,7 +3051,7 @@
     </p:spTree>
     <p:extLst>
       <p:ext uri="{BB962C8B-B14F-4D97-AF65-F5344CB8AC3E}">
-        <p14:creationId xmlns:p14="http://schemas.microsoft.com/office/powerpoint/2010/main" val="2712589128"/>
+        <p14:creationId xmlns:p14="http://schemas.microsoft.com/office/powerpoint/2010/main" val="4079219210"/>
       </p:ext>
     </p:extLst>
   </p:cSld>
@@ -3107,7 +3105,32 @@
           <a:bodyPr/>
           <a:lstStyle/>
           <a:p>
-            <a:endParaRPr lang="en-US" b="0" dirty="0" smtClean="0"/>
+            <a:pPr marL="0" marR="0" indent="0" algn="l" defTabSz="914400" rtl="0" eaLnBrk="1" fontAlgn="auto" latinLnBrk="0" hangingPunct="1">
+              <a:lnSpc>
+                <a:spcPct val="100000"/>
+              </a:lnSpc>
+              <a:spcBef>
+                <a:spcPts val="0"/>
+              </a:spcBef>
+              <a:spcAft>
+                <a:spcPts val="0"/>
+              </a:spcAft>
+              <a:buClrTx/>
+              <a:buSzTx/>
+              <a:buFontTx/>
+              <a:buNone/>
+              <a:tabLst/>
+              <a:defRPr/>
+            </a:pPr>
+            <a:endParaRPr lang="en-US" sz="1200" kern="1200" dirty="0" smtClean="0">
+              <a:solidFill>
+                <a:schemeClr val="tx1"/>
+              </a:solidFill>
+              <a:effectLst/>
+              <a:latin typeface="+mn-lt"/>
+              <a:ea typeface="+mn-ea"/>
+              <a:cs typeface="+mn-cs"/>
+            </a:endParaRPr>
           </a:p>
         </p:txBody>
       </p:sp>
@@ -3137,7 +3160,7 @@
     </p:spTree>
     <p:extLst>
       <p:ext uri="{BB962C8B-B14F-4D97-AF65-F5344CB8AC3E}">
-        <p14:creationId xmlns:p14="http://schemas.microsoft.com/office/powerpoint/2010/main" val="1609105756"/>
+        <p14:creationId xmlns:p14="http://schemas.microsoft.com/office/powerpoint/2010/main" val="1830730383"/>
       </p:ext>
     </p:extLst>
   </p:cSld>
@@ -3221,7 +3244,7 @@
     </p:spTree>
     <p:extLst>
       <p:ext uri="{BB962C8B-B14F-4D97-AF65-F5344CB8AC3E}">
-        <p14:creationId xmlns:p14="http://schemas.microsoft.com/office/powerpoint/2010/main" val="4079219210"/>
+        <p14:creationId xmlns:p14="http://schemas.microsoft.com/office/powerpoint/2010/main" val="1561525116"/>
       </p:ext>
     </p:extLst>
   </p:cSld>
@@ -3275,32 +3298,7 @@
           <a:bodyPr/>
           <a:lstStyle/>
           <a:p>
-            <a:pPr marL="0" marR="0" indent="0" algn="l" defTabSz="914400" rtl="0" eaLnBrk="1" fontAlgn="auto" latinLnBrk="0" hangingPunct="1">
-              <a:lnSpc>
-                <a:spcPct val="100000"/>
-              </a:lnSpc>
-              <a:spcBef>
-                <a:spcPts val="0"/>
-              </a:spcBef>
-              <a:spcAft>
-                <a:spcPts val="0"/>
-              </a:spcAft>
-              <a:buClrTx/>
-              <a:buSzTx/>
-              <a:buFontTx/>
-              <a:buNone/>
-              <a:tabLst/>
-              <a:defRPr/>
-            </a:pPr>
-            <a:endParaRPr lang="en-US" sz="1200" kern="1200" dirty="0" smtClean="0">
-              <a:solidFill>
-                <a:schemeClr val="tx1"/>
-              </a:solidFill>
-              <a:effectLst/>
-              <a:latin typeface="+mn-lt"/>
-              <a:ea typeface="+mn-ea"/>
-              <a:cs typeface="+mn-cs"/>
-            </a:endParaRPr>
+            <a:endParaRPr lang="en-US" b="0" dirty="0" smtClean="0"/>
           </a:p>
         </p:txBody>
       </p:sp>
@@ -3330,7 +3328,7 @@
     </p:spTree>
     <p:extLst>
       <p:ext uri="{BB962C8B-B14F-4D97-AF65-F5344CB8AC3E}">
-        <p14:creationId xmlns:p14="http://schemas.microsoft.com/office/powerpoint/2010/main" val="1830730383"/>
+        <p14:creationId xmlns:p14="http://schemas.microsoft.com/office/powerpoint/2010/main" val="1514808285"/>
       </p:ext>
     </p:extLst>
   </p:cSld>
@@ -3414,7 +3412,7 @@
     </p:spTree>
     <p:extLst>
       <p:ext uri="{BB962C8B-B14F-4D97-AF65-F5344CB8AC3E}">
-        <p14:creationId xmlns:p14="http://schemas.microsoft.com/office/powerpoint/2010/main" val="1561525116"/>
+        <p14:creationId xmlns:p14="http://schemas.microsoft.com/office/powerpoint/2010/main" val="3263699449"/>
       </p:ext>
     </p:extLst>
   </p:cSld>
@@ -3498,7 +3496,7 @@
     </p:spTree>
     <p:extLst>
       <p:ext uri="{BB962C8B-B14F-4D97-AF65-F5344CB8AC3E}">
-        <p14:creationId xmlns:p14="http://schemas.microsoft.com/office/powerpoint/2010/main" val="1514808285"/>
+        <p14:creationId xmlns:p14="http://schemas.microsoft.com/office/powerpoint/2010/main" val="1255163866"/>
       </p:ext>
     </p:extLst>
   </p:cSld>
@@ -3691,7 +3689,7 @@
     </p:spTree>
     <p:extLst>
       <p:ext uri="{BB962C8B-B14F-4D97-AF65-F5344CB8AC3E}">
-        <p14:creationId xmlns:p14="http://schemas.microsoft.com/office/powerpoint/2010/main" val="3263699449"/>
+        <p14:creationId xmlns:p14="http://schemas.microsoft.com/office/powerpoint/2010/main" val="532748052"/>
       </p:ext>
     </p:extLst>
   </p:cSld>
@@ -3745,7 +3743,32 @@
           <a:bodyPr/>
           <a:lstStyle/>
           <a:p>
-            <a:endParaRPr lang="en-US" b="0" dirty="0" smtClean="0"/>
+            <a:pPr marL="0" marR="0" indent="0" algn="l" defTabSz="914400" rtl="0" eaLnBrk="1" fontAlgn="auto" latinLnBrk="0" hangingPunct="1">
+              <a:lnSpc>
+                <a:spcPct val="100000"/>
+              </a:lnSpc>
+              <a:spcBef>
+                <a:spcPts val="0"/>
+              </a:spcBef>
+              <a:spcAft>
+                <a:spcPts val="0"/>
+              </a:spcAft>
+              <a:buClrTx/>
+              <a:buSzTx/>
+              <a:buFontTx/>
+              <a:buNone/>
+              <a:tabLst/>
+              <a:defRPr/>
+            </a:pPr>
+            <a:endParaRPr lang="en-US" sz="1200" kern="1200" dirty="0" smtClean="0">
+              <a:solidFill>
+                <a:schemeClr val="tx1"/>
+              </a:solidFill>
+              <a:effectLst/>
+              <a:latin typeface="+mn-lt"/>
+              <a:ea typeface="+mn-ea"/>
+              <a:cs typeface="+mn-cs"/>
+            </a:endParaRPr>
           </a:p>
         </p:txBody>
       </p:sp>
@@ -3775,7 +3798,7 @@
     </p:spTree>
     <p:extLst>
       <p:ext uri="{BB962C8B-B14F-4D97-AF65-F5344CB8AC3E}">
-        <p14:creationId xmlns:p14="http://schemas.microsoft.com/office/powerpoint/2010/main" val="1255163866"/>
+        <p14:creationId xmlns:p14="http://schemas.microsoft.com/office/powerpoint/2010/main" val="2286755864"/>
       </p:ext>
     </p:extLst>
   </p:cSld>
@@ -3859,7 +3882,7 @@
     </p:spTree>
     <p:extLst>
       <p:ext uri="{BB962C8B-B14F-4D97-AF65-F5344CB8AC3E}">
-        <p14:creationId xmlns:p14="http://schemas.microsoft.com/office/powerpoint/2010/main" val="532748052"/>
+        <p14:creationId xmlns:p14="http://schemas.microsoft.com/office/powerpoint/2010/main" val="2653332077"/>
       </p:ext>
     </p:extLst>
   </p:cSld>
@@ -3913,32 +3936,7 @@
           <a:bodyPr/>
           <a:lstStyle/>
           <a:p>
-            <a:pPr marL="0" marR="0" indent="0" algn="l" defTabSz="914400" rtl="0" eaLnBrk="1" fontAlgn="auto" latinLnBrk="0" hangingPunct="1">
-              <a:lnSpc>
-                <a:spcPct val="100000"/>
-              </a:lnSpc>
-              <a:spcBef>
-                <a:spcPts val="0"/>
-              </a:spcBef>
-              <a:spcAft>
-                <a:spcPts val="0"/>
-              </a:spcAft>
-              <a:buClrTx/>
-              <a:buSzTx/>
-              <a:buFontTx/>
-              <a:buNone/>
-              <a:tabLst/>
-              <a:defRPr/>
-            </a:pPr>
-            <a:endParaRPr lang="en-US" sz="1200" kern="1200" dirty="0" smtClean="0">
-              <a:solidFill>
-                <a:schemeClr val="tx1"/>
-              </a:solidFill>
-              <a:effectLst/>
-              <a:latin typeface="+mn-lt"/>
-              <a:ea typeface="+mn-ea"/>
-              <a:cs typeface="+mn-cs"/>
-            </a:endParaRPr>
+            <a:endParaRPr lang="en-US" b="0" dirty="0" smtClean="0"/>
           </a:p>
         </p:txBody>
       </p:sp>
@@ -3968,7 +3966,7 @@
     </p:spTree>
     <p:extLst>
       <p:ext uri="{BB962C8B-B14F-4D97-AF65-F5344CB8AC3E}">
-        <p14:creationId xmlns:p14="http://schemas.microsoft.com/office/powerpoint/2010/main" val="2286755864"/>
+        <p14:creationId xmlns:p14="http://schemas.microsoft.com/office/powerpoint/2010/main" val="3778399677"/>
       </p:ext>
     </p:extLst>
   </p:cSld>
@@ -4052,7 +4050,7 @@
     </p:spTree>
     <p:extLst>
       <p:ext uri="{BB962C8B-B14F-4D97-AF65-F5344CB8AC3E}">
-        <p14:creationId xmlns:p14="http://schemas.microsoft.com/office/powerpoint/2010/main" val="2653332077"/>
+        <p14:creationId xmlns:p14="http://schemas.microsoft.com/office/powerpoint/2010/main" val="4047639699"/>
       </p:ext>
     </p:extLst>
   </p:cSld>
@@ -4136,7 +4134,7 @@
     </p:spTree>
     <p:extLst>
       <p:ext uri="{BB962C8B-B14F-4D97-AF65-F5344CB8AC3E}">
-        <p14:creationId xmlns:p14="http://schemas.microsoft.com/office/powerpoint/2010/main" val="3778399677"/>
+        <p14:creationId xmlns:p14="http://schemas.microsoft.com/office/powerpoint/2010/main" val="3271057564"/>
       </p:ext>
     </p:extLst>
   </p:cSld>
@@ -4220,7 +4218,7 @@
     </p:spTree>
     <p:extLst>
       <p:ext uri="{BB962C8B-B14F-4D97-AF65-F5344CB8AC3E}">
-        <p14:creationId xmlns:p14="http://schemas.microsoft.com/office/powerpoint/2010/main" val="4047639699"/>
+        <p14:creationId xmlns:p14="http://schemas.microsoft.com/office/powerpoint/2010/main" val="150335864"/>
       </p:ext>
     </p:extLst>
   </p:cSld>
@@ -4304,7 +4302,7 @@
     </p:spTree>
     <p:extLst>
       <p:ext uri="{BB962C8B-B14F-4D97-AF65-F5344CB8AC3E}">
-        <p14:creationId xmlns:p14="http://schemas.microsoft.com/office/powerpoint/2010/main" val="3271057564"/>
+        <p14:creationId xmlns:p14="http://schemas.microsoft.com/office/powerpoint/2010/main" val="3480706183"/>
       </p:ext>
     </p:extLst>
   </p:cSld>
@@ -4388,7 +4386,7 @@
     </p:spTree>
     <p:extLst>
       <p:ext uri="{BB962C8B-B14F-4D97-AF65-F5344CB8AC3E}">
-        <p14:creationId xmlns:p14="http://schemas.microsoft.com/office/powerpoint/2010/main" val="150335864"/>
+        <p14:creationId xmlns:p14="http://schemas.microsoft.com/office/powerpoint/2010/main" val="1174323916"/>
       </p:ext>
     </p:extLst>
   </p:cSld>
@@ -4472,7 +4470,7 @@
     </p:spTree>
     <p:extLst>
       <p:ext uri="{BB962C8B-B14F-4D97-AF65-F5344CB8AC3E}">
-        <p14:creationId xmlns:p14="http://schemas.microsoft.com/office/powerpoint/2010/main" val="3480706183"/>
+        <p14:creationId xmlns:p14="http://schemas.microsoft.com/office/powerpoint/2010/main" val="22929660"/>
       </p:ext>
     </p:extLst>
   </p:cSld>
@@ -4640,7 +4638,7 @@
     </p:spTree>
     <p:extLst>
       <p:ext uri="{BB962C8B-B14F-4D97-AF65-F5344CB8AC3E}">
-        <p14:creationId xmlns:p14="http://schemas.microsoft.com/office/powerpoint/2010/main" val="1174323916"/>
+        <p14:creationId xmlns:p14="http://schemas.microsoft.com/office/powerpoint/2010/main" val="508677048"/>
       </p:ext>
     </p:extLst>
   </p:cSld>
@@ -4724,7 +4722,7 @@
     </p:spTree>
     <p:extLst>
       <p:ext uri="{BB962C8B-B14F-4D97-AF65-F5344CB8AC3E}">
-        <p14:creationId xmlns:p14="http://schemas.microsoft.com/office/powerpoint/2010/main" val="22929660"/>
+        <p14:creationId xmlns:p14="http://schemas.microsoft.com/office/powerpoint/2010/main" val="3079792467"/>
       </p:ext>
     </p:extLst>
   </p:cSld>
@@ -4778,7 +4776,32 @@
           <a:bodyPr/>
           <a:lstStyle/>
           <a:p>
-            <a:endParaRPr lang="en-US" b="0" dirty="0" smtClean="0"/>
+            <a:pPr marL="0" marR="0" indent="0" algn="l" defTabSz="914400" rtl="0" eaLnBrk="1" fontAlgn="auto" latinLnBrk="0" hangingPunct="1">
+              <a:lnSpc>
+                <a:spcPct val="100000"/>
+              </a:lnSpc>
+              <a:spcBef>
+                <a:spcPts val="0"/>
+              </a:spcBef>
+              <a:spcAft>
+                <a:spcPts val="0"/>
+              </a:spcAft>
+              <a:buClrTx/>
+              <a:buSzTx/>
+              <a:buFontTx/>
+              <a:buNone/>
+              <a:tabLst/>
+              <a:defRPr/>
+            </a:pPr>
+            <a:endParaRPr lang="en-US" sz="1200" kern="1200" dirty="0" smtClean="0">
+              <a:solidFill>
+                <a:schemeClr val="tx1"/>
+              </a:solidFill>
+              <a:effectLst/>
+              <a:latin typeface="+mn-lt"/>
+              <a:ea typeface="+mn-ea"/>
+              <a:cs typeface="+mn-cs"/>
+            </a:endParaRPr>
           </a:p>
         </p:txBody>
       </p:sp>
@@ -4808,7 +4831,7 @@
     </p:spTree>
     <p:extLst>
       <p:ext uri="{BB962C8B-B14F-4D97-AF65-F5344CB8AC3E}">
-        <p14:creationId xmlns:p14="http://schemas.microsoft.com/office/powerpoint/2010/main" val="508677048"/>
+        <p14:creationId xmlns:p14="http://schemas.microsoft.com/office/powerpoint/2010/main" val="1704645259"/>
       </p:ext>
     </p:extLst>
   </p:cSld>
@@ -4892,7 +4915,7 @@
     </p:spTree>
     <p:extLst>
       <p:ext uri="{BB962C8B-B14F-4D97-AF65-F5344CB8AC3E}">
-        <p14:creationId xmlns:p14="http://schemas.microsoft.com/office/powerpoint/2010/main" val="3079792467"/>
+        <p14:creationId xmlns:p14="http://schemas.microsoft.com/office/powerpoint/2010/main" val="381415188"/>
       </p:ext>
     </p:extLst>
   </p:cSld>
@@ -4946,6 +4969,258 @@
           <a:bodyPr/>
           <a:lstStyle/>
           <a:p>
+            <a:endParaRPr lang="en-US" b="0" dirty="0" smtClean="0"/>
+          </a:p>
+        </p:txBody>
+      </p:sp>
+      <p:sp>
+        <p:nvSpPr>
+          <p:cNvPr id="4" name="Slide Number Placeholder 3"/>
+          <p:cNvSpPr>
+            <a:spLocks noGrp="1"/>
+          </p:cNvSpPr>
+          <p:nvPr>
+            <p:ph type="sldNum" sz="quarter" idx="10"/>
+          </p:nvPr>
+        </p:nvSpPr>
+        <p:spPr/>
+        <p:txBody>
+          <a:bodyPr/>
+          <a:lstStyle/>
+          <a:p>
+            <a:fld id="{89029652-62E7-43D6-83B5-097D7B7AA5D8}" type="slidenum">
+              <a:rPr lang="en-US" smtClean="0"/>
+              <a:t>54</a:t>
+            </a:fld>
+            <a:endParaRPr lang="en-US"/>
+          </a:p>
+        </p:txBody>
+      </p:sp>
+    </p:spTree>
+    <p:extLst>
+      <p:ext uri="{BB962C8B-B14F-4D97-AF65-F5344CB8AC3E}">
+        <p14:creationId xmlns:p14="http://schemas.microsoft.com/office/powerpoint/2010/main" val="3234596091"/>
+      </p:ext>
+    </p:extLst>
+  </p:cSld>
+  <p:clrMapOvr>
+    <a:masterClrMapping/>
+  </p:clrMapOvr>
+</p:notes>
+</file>
+
+<file path=ppt/notesSlides/notesSlide55.xml><?xml version="1.0" encoding="utf-8"?>
+<p:notes xmlns:a="http://schemas.openxmlformats.org/drawingml/2006/main" xmlns:r="http://schemas.openxmlformats.org/officeDocument/2006/relationships" xmlns:p="http://schemas.openxmlformats.org/presentationml/2006/main">
+  <p:cSld>
+    <p:spTree>
+      <p:nvGrpSpPr>
+        <p:cNvPr id="1" name=""/>
+        <p:cNvGrpSpPr/>
+        <p:nvPr/>
+      </p:nvGrpSpPr>
+      <p:grpSpPr>
+        <a:xfrm>
+          <a:off x="0" y="0"/>
+          <a:ext cx="0" cy="0"/>
+          <a:chOff x="0" y="0"/>
+          <a:chExt cx="0" cy="0"/>
+        </a:xfrm>
+      </p:grpSpPr>
+      <p:sp>
+        <p:nvSpPr>
+          <p:cNvPr id="2" name="Slide Image Placeholder 1"/>
+          <p:cNvSpPr>
+            <a:spLocks noGrp="1" noRot="1" noChangeAspect="1"/>
+          </p:cNvSpPr>
+          <p:nvPr>
+            <p:ph type="sldImg"/>
+          </p:nvPr>
+        </p:nvSpPr>
+        <p:spPr/>
+      </p:sp>
+      <p:sp>
+        <p:nvSpPr>
+          <p:cNvPr id="3" name="Notes Placeholder 2"/>
+          <p:cNvSpPr>
+            <a:spLocks noGrp="1"/>
+          </p:cNvSpPr>
+          <p:nvPr>
+            <p:ph type="body" idx="1"/>
+          </p:nvPr>
+        </p:nvSpPr>
+        <p:spPr/>
+        <p:txBody>
+          <a:bodyPr/>
+          <a:lstStyle/>
+          <a:p>
+            <a:endParaRPr lang="en-US" b="0" dirty="0" smtClean="0"/>
+          </a:p>
+        </p:txBody>
+      </p:sp>
+      <p:sp>
+        <p:nvSpPr>
+          <p:cNvPr id="4" name="Slide Number Placeholder 3"/>
+          <p:cNvSpPr>
+            <a:spLocks noGrp="1"/>
+          </p:cNvSpPr>
+          <p:nvPr>
+            <p:ph type="sldNum" sz="quarter" idx="10"/>
+          </p:nvPr>
+        </p:nvSpPr>
+        <p:spPr/>
+        <p:txBody>
+          <a:bodyPr/>
+          <a:lstStyle/>
+          <a:p>
+            <a:fld id="{89029652-62E7-43D6-83B5-097D7B7AA5D8}" type="slidenum">
+              <a:rPr lang="en-US" smtClean="0"/>
+              <a:t>55</a:t>
+            </a:fld>
+            <a:endParaRPr lang="en-US"/>
+          </a:p>
+        </p:txBody>
+      </p:sp>
+    </p:spTree>
+    <p:extLst>
+      <p:ext uri="{BB962C8B-B14F-4D97-AF65-F5344CB8AC3E}">
+        <p14:creationId xmlns:p14="http://schemas.microsoft.com/office/powerpoint/2010/main" val="3344468672"/>
+      </p:ext>
+    </p:extLst>
+  </p:cSld>
+  <p:clrMapOvr>
+    <a:masterClrMapping/>
+  </p:clrMapOvr>
+</p:notes>
+</file>
+
+<file path=ppt/notesSlides/notesSlide56.xml><?xml version="1.0" encoding="utf-8"?>
+<p:notes xmlns:a="http://schemas.openxmlformats.org/drawingml/2006/main" xmlns:r="http://schemas.openxmlformats.org/officeDocument/2006/relationships" xmlns:p="http://schemas.openxmlformats.org/presentationml/2006/main">
+  <p:cSld>
+    <p:spTree>
+      <p:nvGrpSpPr>
+        <p:cNvPr id="1" name=""/>
+        <p:cNvGrpSpPr/>
+        <p:nvPr/>
+      </p:nvGrpSpPr>
+      <p:grpSpPr>
+        <a:xfrm>
+          <a:off x="0" y="0"/>
+          <a:ext cx="0" cy="0"/>
+          <a:chOff x="0" y="0"/>
+          <a:chExt cx="0" cy="0"/>
+        </a:xfrm>
+      </p:grpSpPr>
+      <p:sp>
+        <p:nvSpPr>
+          <p:cNvPr id="2" name="Slide Image Placeholder 1"/>
+          <p:cNvSpPr>
+            <a:spLocks noGrp="1" noRot="1" noChangeAspect="1"/>
+          </p:cNvSpPr>
+          <p:nvPr>
+            <p:ph type="sldImg"/>
+          </p:nvPr>
+        </p:nvSpPr>
+        <p:spPr/>
+      </p:sp>
+      <p:sp>
+        <p:nvSpPr>
+          <p:cNvPr id="3" name="Notes Placeholder 2"/>
+          <p:cNvSpPr>
+            <a:spLocks noGrp="1"/>
+          </p:cNvSpPr>
+          <p:nvPr>
+            <p:ph type="body" idx="1"/>
+          </p:nvPr>
+        </p:nvSpPr>
+        <p:spPr/>
+        <p:txBody>
+          <a:bodyPr/>
+          <a:lstStyle/>
+          <a:p>
+            <a:endParaRPr lang="en-US" b="0" dirty="0" smtClean="0"/>
+          </a:p>
+        </p:txBody>
+      </p:sp>
+      <p:sp>
+        <p:nvSpPr>
+          <p:cNvPr id="4" name="Slide Number Placeholder 3"/>
+          <p:cNvSpPr>
+            <a:spLocks noGrp="1"/>
+          </p:cNvSpPr>
+          <p:nvPr>
+            <p:ph type="sldNum" sz="quarter" idx="10"/>
+          </p:nvPr>
+        </p:nvSpPr>
+        <p:spPr/>
+        <p:txBody>
+          <a:bodyPr/>
+          <a:lstStyle/>
+          <a:p>
+            <a:fld id="{89029652-62E7-43D6-83B5-097D7B7AA5D8}" type="slidenum">
+              <a:rPr lang="en-US" smtClean="0"/>
+              <a:t>56</a:t>
+            </a:fld>
+            <a:endParaRPr lang="en-US"/>
+          </a:p>
+        </p:txBody>
+      </p:sp>
+    </p:spTree>
+    <p:extLst>
+      <p:ext uri="{BB962C8B-B14F-4D97-AF65-F5344CB8AC3E}">
+        <p14:creationId xmlns:p14="http://schemas.microsoft.com/office/powerpoint/2010/main" val="3143393369"/>
+      </p:ext>
+    </p:extLst>
+  </p:cSld>
+  <p:clrMapOvr>
+    <a:masterClrMapping/>
+  </p:clrMapOvr>
+</p:notes>
+</file>
+
+<file path=ppt/notesSlides/notesSlide57.xml><?xml version="1.0" encoding="utf-8"?>
+<p:notes xmlns:a="http://schemas.openxmlformats.org/drawingml/2006/main" xmlns:r="http://schemas.openxmlformats.org/officeDocument/2006/relationships" xmlns:p="http://schemas.openxmlformats.org/presentationml/2006/main">
+  <p:cSld>
+    <p:spTree>
+      <p:nvGrpSpPr>
+        <p:cNvPr id="1" name=""/>
+        <p:cNvGrpSpPr/>
+        <p:nvPr/>
+      </p:nvGrpSpPr>
+      <p:grpSpPr>
+        <a:xfrm>
+          <a:off x="0" y="0"/>
+          <a:ext cx="0" cy="0"/>
+          <a:chOff x="0" y="0"/>
+          <a:chExt cx="0" cy="0"/>
+        </a:xfrm>
+      </p:grpSpPr>
+      <p:sp>
+        <p:nvSpPr>
+          <p:cNvPr id="2" name="Slide Image Placeholder 1"/>
+          <p:cNvSpPr>
+            <a:spLocks noGrp="1" noRot="1" noChangeAspect="1"/>
+          </p:cNvSpPr>
+          <p:nvPr>
+            <p:ph type="sldImg"/>
+          </p:nvPr>
+        </p:nvSpPr>
+        <p:spPr/>
+      </p:sp>
+      <p:sp>
+        <p:nvSpPr>
+          <p:cNvPr id="3" name="Notes Placeholder 2"/>
+          <p:cNvSpPr>
+            <a:spLocks noGrp="1"/>
+          </p:cNvSpPr>
+          <p:nvPr>
+            <p:ph type="body" idx="1"/>
+          </p:nvPr>
+        </p:nvSpPr>
+        <p:spPr/>
+        <p:txBody>
+          <a:bodyPr/>
+          <a:lstStyle/>
+          <a:p>
             <a:pPr marL="0" marR="0" indent="0" algn="l" defTabSz="914400" rtl="0" eaLnBrk="1" fontAlgn="auto" latinLnBrk="0" hangingPunct="1">
               <a:lnSpc>
                 <a:spcPct val="100000"/>
@@ -4992,7 +5267,7 @@
           <a:p>
             <a:fld id="{89029652-62E7-43D6-83B5-097D7B7AA5D8}" type="slidenum">
               <a:rPr lang="en-US" smtClean="0"/>
-              <a:t>54</a:t>
+              <a:t>57</a:t>
             </a:fld>
             <a:endParaRPr lang="en-US"/>
           </a:p>
@@ -5001,259 +5276,7 @@
     </p:spTree>
     <p:extLst>
       <p:ext uri="{BB962C8B-B14F-4D97-AF65-F5344CB8AC3E}">
-        <p14:creationId xmlns:p14="http://schemas.microsoft.com/office/powerpoint/2010/main" val="1704645259"/>
-      </p:ext>
-    </p:extLst>
-  </p:cSld>
-  <p:clrMapOvr>
-    <a:masterClrMapping/>
-  </p:clrMapOvr>
-</p:notes>
-</file>
-
-<file path=ppt/notesSlides/notesSlide55.xml><?xml version="1.0" encoding="utf-8"?>
-<p:notes xmlns:a="http://schemas.openxmlformats.org/drawingml/2006/main" xmlns:r="http://schemas.openxmlformats.org/officeDocument/2006/relationships" xmlns:p="http://schemas.openxmlformats.org/presentationml/2006/main">
-  <p:cSld>
-    <p:spTree>
-      <p:nvGrpSpPr>
-        <p:cNvPr id="1" name=""/>
-        <p:cNvGrpSpPr/>
-        <p:nvPr/>
-      </p:nvGrpSpPr>
-      <p:grpSpPr>
-        <a:xfrm>
-          <a:off x="0" y="0"/>
-          <a:ext cx="0" cy="0"/>
-          <a:chOff x="0" y="0"/>
-          <a:chExt cx="0" cy="0"/>
-        </a:xfrm>
-      </p:grpSpPr>
-      <p:sp>
-        <p:nvSpPr>
-          <p:cNvPr id="2" name="Slide Image Placeholder 1"/>
-          <p:cNvSpPr>
-            <a:spLocks noGrp="1" noRot="1" noChangeAspect="1"/>
-          </p:cNvSpPr>
-          <p:nvPr>
-            <p:ph type="sldImg"/>
-          </p:nvPr>
-        </p:nvSpPr>
-        <p:spPr/>
-      </p:sp>
-      <p:sp>
-        <p:nvSpPr>
-          <p:cNvPr id="3" name="Notes Placeholder 2"/>
-          <p:cNvSpPr>
-            <a:spLocks noGrp="1"/>
-          </p:cNvSpPr>
-          <p:nvPr>
-            <p:ph type="body" idx="1"/>
-          </p:nvPr>
-        </p:nvSpPr>
-        <p:spPr/>
-        <p:txBody>
-          <a:bodyPr/>
-          <a:lstStyle/>
-          <a:p>
-            <a:endParaRPr lang="en-US" b="0" dirty="0" smtClean="0"/>
-          </a:p>
-        </p:txBody>
-      </p:sp>
-      <p:sp>
-        <p:nvSpPr>
-          <p:cNvPr id="4" name="Slide Number Placeholder 3"/>
-          <p:cNvSpPr>
-            <a:spLocks noGrp="1"/>
-          </p:cNvSpPr>
-          <p:nvPr>
-            <p:ph type="sldNum" sz="quarter" idx="10"/>
-          </p:nvPr>
-        </p:nvSpPr>
-        <p:spPr/>
-        <p:txBody>
-          <a:bodyPr/>
-          <a:lstStyle/>
-          <a:p>
-            <a:fld id="{89029652-62E7-43D6-83B5-097D7B7AA5D8}" type="slidenum">
-              <a:rPr lang="en-US" smtClean="0"/>
-              <a:t>55</a:t>
-            </a:fld>
-            <a:endParaRPr lang="en-US"/>
-          </a:p>
-        </p:txBody>
-      </p:sp>
-    </p:spTree>
-    <p:extLst>
-      <p:ext uri="{BB962C8B-B14F-4D97-AF65-F5344CB8AC3E}">
-        <p14:creationId xmlns:p14="http://schemas.microsoft.com/office/powerpoint/2010/main" val="381415188"/>
-      </p:ext>
-    </p:extLst>
-  </p:cSld>
-  <p:clrMapOvr>
-    <a:masterClrMapping/>
-  </p:clrMapOvr>
-</p:notes>
-</file>
-
-<file path=ppt/notesSlides/notesSlide56.xml><?xml version="1.0" encoding="utf-8"?>
-<p:notes xmlns:a="http://schemas.openxmlformats.org/drawingml/2006/main" xmlns:r="http://schemas.openxmlformats.org/officeDocument/2006/relationships" xmlns:p="http://schemas.openxmlformats.org/presentationml/2006/main">
-  <p:cSld>
-    <p:spTree>
-      <p:nvGrpSpPr>
-        <p:cNvPr id="1" name=""/>
-        <p:cNvGrpSpPr/>
-        <p:nvPr/>
-      </p:nvGrpSpPr>
-      <p:grpSpPr>
-        <a:xfrm>
-          <a:off x="0" y="0"/>
-          <a:ext cx="0" cy="0"/>
-          <a:chOff x="0" y="0"/>
-          <a:chExt cx="0" cy="0"/>
-        </a:xfrm>
-      </p:grpSpPr>
-      <p:sp>
-        <p:nvSpPr>
-          <p:cNvPr id="2" name="Slide Image Placeholder 1"/>
-          <p:cNvSpPr>
-            <a:spLocks noGrp="1" noRot="1" noChangeAspect="1"/>
-          </p:cNvSpPr>
-          <p:nvPr>
-            <p:ph type="sldImg"/>
-          </p:nvPr>
-        </p:nvSpPr>
-        <p:spPr/>
-      </p:sp>
-      <p:sp>
-        <p:nvSpPr>
-          <p:cNvPr id="3" name="Notes Placeholder 2"/>
-          <p:cNvSpPr>
-            <a:spLocks noGrp="1"/>
-          </p:cNvSpPr>
-          <p:nvPr>
-            <p:ph type="body" idx="1"/>
-          </p:nvPr>
-        </p:nvSpPr>
-        <p:spPr/>
-        <p:txBody>
-          <a:bodyPr/>
-          <a:lstStyle/>
-          <a:p>
-            <a:endParaRPr lang="en-US" b="0" dirty="0" smtClean="0"/>
-          </a:p>
-        </p:txBody>
-      </p:sp>
-      <p:sp>
-        <p:nvSpPr>
-          <p:cNvPr id="4" name="Slide Number Placeholder 3"/>
-          <p:cNvSpPr>
-            <a:spLocks noGrp="1"/>
-          </p:cNvSpPr>
-          <p:nvPr>
-            <p:ph type="sldNum" sz="quarter" idx="10"/>
-          </p:nvPr>
-        </p:nvSpPr>
-        <p:spPr/>
-        <p:txBody>
-          <a:bodyPr/>
-          <a:lstStyle/>
-          <a:p>
-            <a:fld id="{89029652-62E7-43D6-83B5-097D7B7AA5D8}" type="slidenum">
-              <a:rPr lang="en-US" smtClean="0"/>
-              <a:t>56</a:t>
-            </a:fld>
-            <a:endParaRPr lang="en-US"/>
-          </a:p>
-        </p:txBody>
-      </p:sp>
-    </p:spTree>
-    <p:extLst>
-      <p:ext uri="{BB962C8B-B14F-4D97-AF65-F5344CB8AC3E}">
-        <p14:creationId xmlns:p14="http://schemas.microsoft.com/office/powerpoint/2010/main" val="3234596091"/>
-      </p:ext>
-    </p:extLst>
-  </p:cSld>
-  <p:clrMapOvr>
-    <a:masterClrMapping/>
-  </p:clrMapOvr>
-</p:notes>
-</file>
-
-<file path=ppt/notesSlides/notesSlide57.xml><?xml version="1.0" encoding="utf-8"?>
-<p:notes xmlns:a="http://schemas.openxmlformats.org/drawingml/2006/main" xmlns:r="http://schemas.openxmlformats.org/officeDocument/2006/relationships" xmlns:p="http://schemas.openxmlformats.org/presentationml/2006/main">
-  <p:cSld>
-    <p:spTree>
-      <p:nvGrpSpPr>
-        <p:cNvPr id="1" name=""/>
-        <p:cNvGrpSpPr/>
-        <p:nvPr/>
-      </p:nvGrpSpPr>
-      <p:grpSpPr>
-        <a:xfrm>
-          <a:off x="0" y="0"/>
-          <a:ext cx="0" cy="0"/>
-          <a:chOff x="0" y="0"/>
-          <a:chExt cx="0" cy="0"/>
-        </a:xfrm>
-      </p:grpSpPr>
-      <p:sp>
-        <p:nvSpPr>
-          <p:cNvPr id="2" name="Slide Image Placeholder 1"/>
-          <p:cNvSpPr>
-            <a:spLocks noGrp="1" noRot="1" noChangeAspect="1"/>
-          </p:cNvSpPr>
-          <p:nvPr>
-            <p:ph type="sldImg"/>
-          </p:nvPr>
-        </p:nvSpPr>
-        <p:spPr/>
-      </p:sp>
-      <p:sp>
-        <p:nvSpPr>
-          <p:cNvPr id="3" name="Notes Placeholder 2"/>
-          <p:cNvSpPr>
-            <a:spLocks noGrp="1"/>
-          </p:cNvSpPr>
-          <p:nvPr>
-            <p:ph type="body" idx="1"/>
-          </p:nvPr>
-        </p:nvSpPr>
-        <p:spPr/>
-        <p:txBody>
-          <a:bodyPr/>
-          <a:lstStyle/>
-          <a:p>
-            <a:endParaRPr lang="en-US" b="0" dirty="0" smtClean="0"/>
-          </a:p>
-        </p:txBody>
-      </p:sp>
-      <p:sp>
-        <p:nvSpPr>
-          <p:cNvPr id="4" name="Slide Number Placeholder 3"/>
-          <p:cNvSpPr>
-            <a:spLocks noGrp="1"/>
-          </p:cNvSpPr>
-          <p:nvPr>
-            <p:ph type="sldNum" sz="quarter" idx="10"/>
-          </p:nvPr>
-        </p:nvSpPr>
-        <p:spPr/>
-        <p:txBody>
-          <a:bodyPr/>
-          <a:lstStyle/>
-          <a:p>
-            <a:fld id="{89029652-62E7-43D6-83B5-097D7B7AA5D8}" type="slidenum">
-              <a:rPr lang="en-US" smtClean="0"/>
-              <a:t>57</a:t>
-            </a:fld>
-            <a:endParaRPr lang="en-US"/>
-          </a:p>
-        </p:txBody>
-      </p:sp>
-    </p:spTree>
-    <p:extLst>
-      <p:ext uri="{BB962C8B-B14F-4D97-AF65-F5344CB8AC3E}">
-        <p14:creationId xmlns:p14="http://schemas.microsoft.com/office/powerpoint/2010/main" val="3344468672"/>
+        <p14:creationId xmlns:p14="http://schemas.microsoft.com/office/powerpoint/2010/main" val="1557858908"/>
       </p:ext>
     </p:extLst>
   </p:cSld>
@@ -5337,7 +5360,7 @@
     </p:spTree>
     <p:extLst>
       <p:ext uri="{BB962C8B-B14F-4D97-AF65-F5344CB8AC3E}">
-        <p14:creationId xmlns:p14="http://schemas.microsoft.com/office/powerpoint/2010/main" val="3143393369"/>
+        <p14:creationId xmlns:p14="http://schemas.microsoft.com/office/powerpoint/2010/main" val="3450469856"/>
       </p:ext>
     </p:extLst>
   </p:cSld>
@@ -5391,32 +5414,7 @@
           <a:bodyPr/>
           <a:lstStyle/>
           <a:p>
-            <a:pPr marL="0" marR="0" indent="0" algn="l" defTabSz="914400" rtl="0" eaLnBrk="1" fontAlgn="auto" latinLnBrk="0" hangingPunct="1">
-              <a:lnSpc>
-                <a:spcPct val="100000"/>
-              </a:lnSpc>
-              <a:spcBef>
-                <a:spcPts val="0"/>
-              </a:spcBef>
-              <a:spcAft>
-                <a:spcPts val="0"/>
-              </a:spcAft>
-              <a:buClrTx/>
-              <a:buSzTx/>
-              <a:buFontTx/>
-              <a:buNone/>
-              <a:tabLst/>
-              <a:defRPr/>
-            </a:pPr>
-            <a:endParaRPr lang="en-US" sz="1200" kern="1200" dirty="0" smtClean="0">
-              <a:solidFill>
-                <a:schemeClr val="tx1"/>
-              </a:solidFill>
-              <a:effectLst/>
-              <a:latin typeface="+mn-lt"/>
-              <a:ea typeface="+mn-ea"/>
-              <a:cs typeface="+mn-cs"/>
-            </a:endParaRPr>
+            <a:endParaRPr lang="en-US" b="0" dirty="0" smtClean="0"/>
           </a:p>
         </p:txBody>
       </p:sp>
@@ -5446,7 +5444,7 @@
     </p:spTree>
     <p:extLst>
       <p:ext uri="{BB962C8B-B14F-4D97-AF65-F5344CB8AC3E}">
-        <p14:creationId xmlns:p14="http://schemas.microsoft.com/office/powerpoint/2010/main" val="1557858908"/>
+        <p14:creationId xmlns:p14="http://schemas.microsoft.com/office/powerpoint/2010/main" val="2647091800"/>
       </p:ext>
     </p:extLst>
   </p:cSld>
@@ -5614,7 +5612,7 @@
     </p:spTree>
     <p:extLst>
       <p:ext uri="{BB962C8B-B14F-4D97-AF65-F5344CB8AC3E}">
-        <p14:creationId xmlns:p14="http://schemas.microsoft.com/office/powerpoint/2010/main" val="3450469856"/>
+        <p14:creationId xmlns:p14="http://schemas.microsoft.com/office/powerpoint/2010/main" val="3603726692"/>
       </p:ext>
     </p:extLst>
   </p:cSld>
@@ -5698,7 +5696,7 @@
     </p:spTree>
     <p:extLst>
       <p:ext uri="{BB962C8B-B14F-4D97-AF65-F5344CB8AC3E}">
-        <p14:creationId xmlns:p14="http://schemas.microsoft.com/office/powerpoint/2010/main" val="2647091800"/>
+        <p14:creationId xmlns:p14="http://schemas.microsoft.com/office/powerpoint/2010/main" val="2106924964"/>
       </p:ext>
     </p:extLst>
   </p:cSld>
@@ -5782,7 +5780,7 @@
     </p:spTree>
     <p:extLst>
       <p:ext uri="{BB962C8B-B14F-4D97-AF65-F5344CB8AC3E}">
-        <p14:creationId xmlns:p14="http://schemas.microsoft.com/office/powerpoint/2010/main" val="3603726692"/>
+        <p14:creationId xmlns:p14="http://schemas.microsoft.com/office/powerpoint/2010/main" val="506673237"/>
       </p:ext>
     </p:extLst>
   </p:cSld>
@@ -5836,7 +5834,32 @@
           <a:bodyPr/>
           <a:lstStyle/>
           <a:p>
-            <a:endParaRPr lang="en-US" b="0" dirty="0" smtClean="0"/>
+            <a:pPr marL="0" marR="0" indent="0" algn="l" defTabSz="914400" rtl="0" eaLnBrk="1" fontAlgn="auto" latinLnBrk="0" hangingPunct="1">
+              <a:lnSpc>
+                <a:spcPct val="100000"/>
+              </a:lnSpc>
+              <a:spcBef>
+                <a:spcPts val="0"/>
+              </a:spcBef>
+              <a:spcAft>
+                <a:spcPts val="0"/>
+              </a:spcAft>
+              <a:buClrTx/>
+              <a:buSzTx/>
+              <a:buFontTx/>
+              <a:buNone/>
+              <a:tabLst/>
+              <a:defRPr/>
+            </a:pPr>
+            <a:endParaRPr lang="en-US" sz="1200" kern="1200" dirty="0" smtClean="0">
+              <a:solidFill>
+                <a:schemeClr val="tx1"/>
+              </a:solidFill>
+              <a:effectLst/>
+              <a:latin typeface="+mn-lt"/>
+              <a:ea typeface="+mn-ea"/>
+              <a:cs typeface="+mn-cs"/>
+            </a:endParaRPr>
           </a:p>
         </p:txBody>
       </p:sp>
@@ -5866,7 +5889,7 @@
     </p:spTree>
     <p:extLst>
       <p:ext uri="{BB962C8B-B14F-4D97-AF65-F5344CB8AC3E}">
-        <p14:creationId xmlns:p14="http://schemas.microsoft.com/office/powerpoint/2010/main" val="2106924964"/>
+        <p14:creationId xmlns:p14="http://schemas.microsoft.com/office/powerpoint/2010/main" val="1923953829"/>
       </p:ext>
     </p:extLst>
   </p:cSld>
@@ -5950,7 +5973,7 @@
     </p:spTree>
     <p:extLst>
       <p:ext uri="{BB962C8B-B14F-4D97-AF65-F5344CB8AC3E}">
-        <p14:creationId xmlns:p14="http://schemas.microsoft.com/office/powerpoint/2010/main" val="506673237"/>
+        <p14:creationId xmlns:p14="http://schemas.microsoft.com/office/powerpoint/2010/main" val="531577243"/>
       </p:ext>
     </p:extLst>
   </p:cSld>
@@ -6004,32 +6027,7 @@
           <a:bodyPr/>
           <a:lstStyle/>
           <a:p>
-            <a:pPr marL="0" marR="0" indent="0" algn="l" defTabSz="914400" rtl="0" eaLnBrk="1" fontAlgn="auto" latinLnBrk="0" hangingPunct="1">
-              <a:lnSpc>
-                <a:spcPct val="100000"/>
-              </a:lnSpc>
-              <a:spcBef>
-                <a:spcPts val="0"/>
-              </a:spcBef>
-              <a:spcAft>
-                <a:spcPts val="0"/>
-              </a:spcAft>
-              <a:buClrTx/>
-              <a:buSzTx/>
-              <a:buFontTx/>
-              <a:buNone/>
-              <a:tabLst/>
-              <a:defRPr/>
-            </a:pPr>
-            <a:endParaRPr lang="en-US" sz="1200" kern="1200" dirty="0" smtClean="0">
-              <a:solidFill>
-                <a:schemeClr val="tx1"/>
-              </a:solidFill>
-              <a:effectLst/>
-              <a:latin typeface="+mn-lt"/>
-              <a:ea typeface="+mn-ea"/>
-              <a:cs typeface="+mn-cs"/>
-            </a:endParaRPr>
+            <a:endParaRPr lang="en-US" b="0" dirty="0" smtClean="0"/>
           </a:p>
         </p:txBody>
       </p:sp>
@@ -6059,7 +6057,7 @@
     </p:spTree>
     <p:extLst>
       <p:ext uri="{BB962C8B-B14F-4D97-AF65-F5344CB8AC3E}">
-        <p14:creationId xmlns:p14="http://schemas.microsoft.com/office/powerpoint/2010/main" val="1923953829"/>
+        <p14:creationId xmlns:p14="http://schemas.microsoft.com/office/powerpoint/2010/main" val="2079785236"/>
       </p:ext>
     </p:extLst>
   </p:cSld>
@@ -6143,7 +6141,7 @@
     </p:spTree>
     <p:extLst>
       <p:ext uri="{BB962C8B-B14F-4D97-AF65-F5344CB8AC3E}">
-        <p14:creationId xmlns:p14="http://schemas.microsoft.com/office/powerpoint/2010/main" val="531577243"/>
+        <p14:creationId xmlns:p14="http://schemas.microsoft.com/office/powerpoint/2010/main" val="1664318980"/>
       </p:ext>
     </p:extLst>
   </p:cSld>
@@ -6227,7 +6225,7 @@
     </p:spTree>
     <p:extLst>
       <p:ext uri="{BB962C8B-B14F-4D97-AF65-F5344CB8AC3E}">
-        <p14:creationId xmlns:p14="http://schemas.microsoft.com/office/powerpoint/2010/main" val="2079785236"/>
+        <p14:creationId xmlns:p14="http://schemas.microsoft.com/office/powerpoint/2010/main" val="1581406028"/>
       </p:ext>
     </p:extLst>
   </p:cSld>
@@ -6311,7 +6309,7 @@
     </p:spTree>
     <p:extLst>
       <p:ext uri="{BB962C8B-B14F-4D97-AF65-F5344CB8AC3E}">
-        <p14:creationId xmlns:p14="http://schemas.microsoft.com/office/powerpoint/2010/main" val="1664318980"/>
+        <p14:creationId xmlns:p14="http://schemas.microsoft.com/office/powerpoint/2010/main" val="299799724"/>
       </p:ext>
     </p:extLst>
   </p:cSld>
@@ -6395,7 +6393,7 @@
     </p:spTree>
     <p:extLst>
       <p:ext uri="{BB962C8B-B14F-4D97-AF65-F5344CB8AC3E}">
-        <p14:creationId xmlns:p14="http://schemas.microsoft.com/office/powerpoint/2010/main" val="1581406028"/>
+        <p14:creationId xmlns:p14="http://schemas.microsoft.com/office/powerpoint/2010/main" val="2229440876"/>
       </p:ext>
     </p:extLst>
   </p:cSld>
@@ -6563,7 +6561,7 @@
     </p:spTree>
     <p:extLst>
       <p:ext uri="{BB962C8B-B14F-4D97-AF65-F5344CB8AC3E}">
-        <p14:creationId xmlns:p14="http://schemas.microsoft.com/office/powerpoint/2010/main" val="299799724"/>
+        <p14:creationId xmlns:p14="http://schemas.microsoft.com/office/powerpoint/2010/main" val="2350728921"/>
       </p:ext>
     </p:extLst>
   </p:cSld>
@@ -6647,7 +6645,7 @@
     </p:spTree>
     <p:extLst>
       <p:ext uri="{BB962C8B-B14F-4D97-AF65-F5344CB8AC3E}">
-        <p14:creationId xmlns:p14="http://schemas.microsoft.com/office/powerpoint/2010/main" val="2229440876"/>
+        <p14:creationId xmlns:p14="http://schemas.microsoft.com/office/powerpoint/2010/main" val="1004591723"/>
       </p:ext>
     </p:extLst>
   </p:cSld>
@@ -6731,7 +6729,7 @@
     </p:spTree>
     <p:extLst>
       <p:ext uri="{BB962C8B-B14F-4D97-AF65-F5344CB8AC3E}">
-        <p14:creationId xmlns:p14="http://schemas.microsoft.com/office/powerpoint/2010/main" val="2350728921"/>
+        <p14:creationId xmlns:p14="http://schemas.microsoft.com/office/powerpoint/2010/main" val="1737165775"/>
       </p:ext>
     </p:extLst>
   </p:cSld>
@@ -6815,7 +6813,7 @@
     </p:spTree>
     <p:extLst>
       <p:ext uri="{BB962C8B-B14F-4D97-AF65-F5344CB8AC3E}">
-        <p14:creationId xmlns:p14="http://schemas.microsoft.com/office/powerpoint/2010/main" val="1004591723"/>
+        <p14:creationId xmlns:p14="http://schemas.microsoft.com/office/powerpoint/2010/main" val="1030293071"/>
       </p:ext>
     </p:extLst>
   </p:cSld>
@@ -6899,7 +6897,7 @@
     </p:spTree>
     <p:extLst>
       <p:ext uri="{BB962C8B-B14F-4D97-AF65-F5344CB8AC3E}">
-        <p14:creationId xmlns:p14="http://schemas.microsoft.com/office/powerpoint/2010/main" val="1737165775"/>
+        <p14:creationId xmlns:p14="http://schemas.microsoft.com/office/powerpoint/2010/main" val="834707851"/>
       </p:ext>
     </p:extLst>
   </p:cSld>
@@ -6975,174 +6973,6 @@
             <a:fld id="{89029652-62E7-43D6-83B5-097D7B7AA5D8}" type="slidenum">
               <a:rPr lang="en-US" smtClean="0"/>
               <a:t>75</a:t>
-            </a:fld>
-            <a:endParaRPr lang="en-US"/>
-          </a:p>
-        </p:txBody>
-      </p:sp>
-    </p:spTree>
-    <p:extLst>
-      <p:ext uri="{BB962C8B-B14F-4D97-AF65-F5344CB8AC3E}">
-        <p14:creationId xmlns:p14="http://schemas.microsoft.com/office/powerpoint/2010/main" val="1030293071"/>
-      </p:ext>
-    </p:extLst>
-  </p:cSld>
-  <p:clrMapOvr>
-    <a:masterClrMapping/>
-  </p:clrMapOvr>
-</p:notes>
-</file>
-
-<file path=ppt/notesSlides/notesSlide76.xml><?xml version="1.0" encoding="utf-8"?>
-<p:notes xmlns:a="http://schemas.openxmlformats.org/drawingml/2006/main" xmlns:r="http://schemas.openxmlformats.org/officeDocument/2006/relationships" xmlns:p="http://schemas.openxmlformats.org/presentationml/2006/main">
-  <p:cSld>
-    <p:spTree>
-      <p:nvGrpSpPr>
-        <p:cNvPr id="1" name=""/>
-        <p:cNvGrpSpPr/>
-        <p:nvPr/>
-      </p:nvGrpSpPr>
-      <p:grpSpPr>
-        <a:xfrm>
-          <a:off x="0" y="0"/>
-          <a:ext cx="0" cy="0"/>
-          <a:chOff x="0" y="0"/>
-          <a:chExt cx="0" cy="0"/>
-        </a:xfrm>
-      </p:grpSpPr>
-      <p:sp>
-        <p:nvSpPr>
-          <p:cNvPr id="2" name="Slide Image Placeholder 1"/>
-          <p:cNvSpPr>
-            <a:spLocks noGrp="1" noRot="1" noChangeAspect="1"/>
-          </p:cNvSpPr>
-          <p:nvPr>
-            <p:ph type="sldImg"/>
-          </p:nvPr>
-        </p:nvSpPr>
-        <p:spPr/>
-      </p:sp>
-      <p:sp>
-        <p:nvSpPr>
-          <p:cNvPr id="3" name="Notes Placeholder 2"/>
-          <p:cNvSpPr>
-            <a:spLocks noGrp="1"/>
-          </p:cNvSpPr>
-          <p:nvPr>
-            <p:ph type="body" idx="1"/>
-          </p:nvPr>
-        </p:nvSpPr>
-        <p:spPr/>
-        <p:txBody>
-          <a:bodyPr/>
-          <a:lstStyle/>
-          <a:p>
-            <a:endParaRPr lang="en-US" b="0" dirty="0" smtClean="0"/>
-          </a:p>
-        </p:txBody>
-      </p:sp>
-      <p:sp>
-        <p:nvSpPr>
-          <p:cNvPr id="4" name="Slide Number Placeholder 3"/>
-          <p:cNvSpPr>
-            <a:spLocks noGrp="1"/>
-          </p:cNvSpPr>
-          <p:nvPr>
-            <p:ph type="sldNum" sz="quarter" idx="10"/>
-          </p:nvPr>
-        </p:nvSpPr>
-        <p:spPr/>
-        <p:txBody>
-          <a:bodyPr/>
-          <a:lstStyle/>
-          <a:p>
-            <a:fld id="{89029652-62E7-43D6-83B5-097D7B7AA5D8}" type="slidenum">
-              <a:rPr lang="en-US" smtClean="0"/>
-              <a:t>76</a:t>
-            </a:fld>
-            <a:endParaRPr lang="en-US"/>
-          </a:p>
-        </p:txBody>
-      </p:sp>
-    </p:spTree>
-    <p:extLst>
-      <p:ext uri="{BB962C8B-B14F-4D97-AF65-F5344CB8AC3E}">
-        <p14:creationId xmlns:p14="http://schemas.microsoft.com/office/powerpoint/2010/main" val="834707851"/>
-      </p:ext>
-    </p:extLst>
-  </p:cSld>
-  <p:clrMapOvr>
-    <a:masterClrMapping/>
-  </p:clrMapOvr>
-</p:notes>
-</file>
-
-<file path=ppt/notesSlides/notesSlide77.xml><?xml version="1.0" encoding="utf-8"?>
-<p:notes xmlns:a="http://schemas.openxmlformats.org/drawingml/2006/main" xmlns:r="http://schemas.openxmlformats.org/officeDocument/2006/relationships" xmlns:p="http://schemas.openxmlformats.org/presentationml/2006/main">
-  <p:cSld>
-    <p:spTree>
-      <p:nvGrpSpPr>
-        <p:cNvPr id="1" name=""/>
-        <p:cNvGrpSpPr/>
-        <p:nvPr/>
-      </p:nvGrpSpPr>
-      <p:grpSpPr>
-        <a:xfrm>
-          <a:off x="0" y="0"/>
-          <a:ext cx="0" cy="0"/>
-          <a:chOff x="0" y="0"/>
-          <a:chExt cx="0" cy="0"/>
-        </a:xfrm>
-      </p:grpSpPr>
-      <p:sp>
-        <p:nvSpPr>
-          <p:cNvPr id="2" name="Slide Image Placeholder 1"/>
-          <p:cNvSpPr>
-            <a:spLocks noGrp="1" noRot="1" noChangeAspect="1"/>
-          </p:cNvSpPr>
-          <p:nvPr>
-            <p:ph type="sldImg"/>
-          </p:nvPr>
-        </p:nvSpPr>
-        <p:spPr/>
-      </p:sp>
-      <p:sp>
-        <p:nvSpPr>
-          <p:cNvPr id="3" name="Notes Placeholder 2"/>
-          <p:cNvSpPr>
-            <a:spLocks noGrp="1"/>
-          </p:cNvSpPr>
-          <p:nvPr>
-            <p:ph type="body" idx="1"/>
-          </p:nvPr>
-        </p:nvSpPr>
-        <p:spPr/>
-        <p:txBody>
-          <a:bodyPr/>
-          <a:lstStyle/>
-          <a:p>
-            <a:endParaRPr lang="en-US" b="0" dirty="0" smtClean="0"/>
-          </a:p>
-        </p:txBody>
-      </p:sp>
-      <p:sp>
-        <p:nvSpPr>
-          <p:cNvPr id="4" name="Slide Number Placeholder 3"/>
-          <p:cNvSpPr>
-            <a:spLocks noGrp="1"/>
-          </p:cNvSpPr>
-          <p:nvPr>
-            <p:ph type="sldNum" sz="quarter" idx="10"/>
-          </p:nvPr>
-        </p:nvSpPr>
-        <p:spPr/>
-        <p:txBody>
-          <a:bodyPr/>
-          <a:lstStyle/>
-          <a:p>
-            <a:fld id="{89029652-62E7-43D6-83B5-097D7B7AA5D8}" type="slidenum">
-              <a:rPr lang="en-US" smtClean="0"/>
-              <a:t>77</a:t>
             </a:fld>
             <a:endParaRPr lang="en-US"/>
           </a:p>
@@ -7460,7 +7290,7 @@
           <a:p>
             <a:fld id="{75AA6396-395E-4ADA-8EE5-F328BC863A04}" type="datetimeFigureOut">
               <a:rPr lang="en-US" smtClean="0"/>
-              <a:t>1/5/2017</a:t>
+              <a:t>1/6/2017</a:t>
             </a:fld>
             <a:endParaRPr lang="en-US"/>
           </a:p>
@@ -7637,7 +7467,7 @@
           <a:p>
             <a:fld id="{75AA6396-395E-4ADA-8EE5-F328BC863A04}" type="datetimeFigureOut">
               <a:rPr lang="en-US" smtClean="0"/>
-              <a:t>1/5/2017</a:t>
+              <a:t>1/6/2017</a:t>
             </a:fld>
             <a:endParaRPr lang="en-US"/>
           </a:p>
@@ -7817,7 +7647,7 @@
           <a:p>
             <a:fld id="{75AA6396-395E-4ADA-8EE5-F328BC863A04}" type="datetimeFigureOut">
               <a:rPr lang="en-US" smtClean="0"/>
-              <a:t>1/5/2017</a:t>
+              <a:t>1/6/2017</a:t>
             </a:fld>
             <a:endParaRPr lang="en-US"/>
           </a:p>
@@ -8037,7 +7867,7 @@
           <a:p>
             <a:fld id="{75AA6396-395E-4ADA-8EE5-F328BC863A04}" type="datetimeFigureOut">
               <a:rPr lang="en-US" smtClean="0"/>
-              <a:t>1/5/2017</a:t>
+              <a:t>1/6/2017</a:t>
             </a:fld>
             <a:endParaRPr lang="en-US"/>
           </a:p>
@@ -8290,7 +8120,7 @@
           <a:p>
             <a:fld id="{75AA6396-395E-4ADA-8EE5-F328BC863A04}" type="datetimeFigureOut">
               <a:rPr lang="en-US" smtClean="0"/>
-              <a:t>1/5/2017</a:t>
+              <a:t>1/6/2017</a:t>
             </a:fld>
             <a:endParaRPr lang="en-US"/>
           </a:p>
@@ -8529,7 +8359,7 @@
           <a:p>
             <a:fld id="{75AA6396-395E-4ADA-8EE5-F328BC863A04}" type="datetimeFigureOut">
               <a:rPr lang="en-US" smtClean="0"/>
-              <a:t>1/5/2017</a:t>
+              <a:t>1/6/2017</a:t>
             </a:fld>
             <a:endParaRPr lang="en-US"/>
           </a:p>
@@ -8903,7 +8733,7 @@
           <a:p>
             <a:fld id="{75AA6396-395E-4ADA-8EE5-F328BC863A04}" type="datetimeFigureOut">
               <a:rPr lang="en-US" smtClean="0"/>
-              <a:t>1/5/2017</a:t>
+              <a:t>1/6/2017</a:t>
             </a:fld>
             <a:endParaRPr lang="en-US"/>
           </a:p>
@@ -9021,7 +8851,7 @@
           <a:p>
             <a:fld id="{75AA6396-395E-4ADA-8EE5-F328BC863A04}" type="datetimeFigureOut">
               <a:rPr lang="en-US" smtClean="0"/>
-              <a:t>1/5/2017</a:t>
+              <a:t>1/6/2017</a:t>
             </a:fld>
             <a:endParaRPr lang="en-US"/>
           </a:p>
@@ -9116,7 +8946,7 @@
           <a:p>
             <a:fld id="{75AA6396-395E-4ADA-8EE5-F328BC863A04}" type="datetimeFigureOut">
               <a:rPr lang="en-US" smtClean="0"/>
-              <a:t>1/5/2017</a:t>
+              <a:t>1/6/2017</a:t>
             </a:fld>
             <a:endParaRPr lang="en-US"/>
           </a:p>
@@ -9393,7 +9223,7 @@
           <a:p>
             <a:fld id="{75AA6396-395E-4ADA-8EE5-F328BC863A04}" type="datetimeFigureOut">
               <a:rPr lang="en-US" smtClean="0"/>
-              <a:t>1/5/2017</a:t>
+              <a:t>1/6/2017</a:t>
             </a:fld>
             <a:endParaRPr lang="en-US"/>
           </a:p>
@@ -9646,7 +9476,7 @@
           <a:p>
             <a:fld id="{75AA6396-395E-4ADA-8EE5-F328BC863A04}" type="datetimeFigureOut">
               <a:rPr lang="en-US" smtClean="0"/>
-              <a:t>1/5/2017</a:t>
+              <a:t>1/6/2017</a:t>
             </a:fld>
             <a:endParaRPr lang="en-US"/>
           </a:p>
@@ -9859,7 +9689,7 @@
           <a:p>
             <a:fld id="{75AA6396-395E-4ADA-8EE5-F328BC863A04}" type="datetimeFigureOut">
               <a:rPr lang="en-US" smtClean="0"/>
-              <a:t>1/5/2017</a:t>
+              <a:t>1/6/2017</a:t>
             </a:fld>
             <a:endParaRPr lang="en-US"/>
           </a:p>
@@ -10496,8 +10326,46 @@
           </a:p>
           <a:p>
             <a:r>
+              <a:rPr lang="en-US" sz="4000" dirty="0"/>
+              <a:t>jQuery AJAX events (</a:t>
+            </a:r>
+            <a:r>
+              <a:rPr lang="en-US" sz="4000" i="1" dirty="0" err="1"/>
+              <a:t>ajaxStart</a:t>
+            </a:r>
+            <a:r>
+              <a:rPr lang="en-US" sz="4000" i="1" dirty="0"/>
+              <a:t>, </a:t>
+            </a:r>
+            <a:r>
+              <a:rPr lang="en-US" sz="4000" i="1" dirty="0" err="1"/>
+              <a:t>ajaxEnd</a:t>
+            </a:r>
+            <a:r>
+              <a:rPr lang="en-US" sz="4000" i="1" dirty="0"/>
+              <a:t>, </a:t>
+            </a:r>
+            <a:r>
+              <a:rPr lang="en-US" sz="4000" i="1" dirty="0" err="1"/>
+              <a:t>ajaxPrefilter</a:t>
+            </a:r>
+            <a:r>
+              <a:rPr lang="en-US" sz="4000" i="1" dirty="0"/>
+              <a:t>)</a:t>
+            </a:r>
+            <a:br>
+              <a:rPr lang="en-US" sz="4000" i="1" dirty="0"/>
+            </a:br>
+            <a:endParaRPr lang="en-US" sz="4000" i="1" dirty="0"/>
+          </a:p>
+          <a:p>
+            <a:r>
               <a:rPr lang="en-US" sz="4000" dirty="0" smtClean="0"/>
-              <a:t>ORM interceptors (</a:t>
+              <a:t>ORM </a:t>
+            </a:r>
+            <a:r>
+              <a:rPr lang="en-US" sz="4000" dirty="0" smtClean="0"/>
+              <a:t>interceptors (</a:t>
             </a:r>
             <a:r>
               <a:rPr lang="en-US" sz="4000" i="1" dirty="0" smtClean="0"/>
@@ -10510,46 +10378,16 @@
           </a:p>
           <a:p>
             <a:r>
-              <a:rPr lang="en-US" sz="4000" dirty="0" smtClean="0"/>
-              <a:t>jQuery AJAX events (</a:t>
-            </a:r>
-            <a:r>
-              <a:rPr lang="en-US" sz="4000" i="1" dirty="0" err="1" smtClean="0"/>
-              <a:t>ajaxStart</a:t>
-            </a:r>
-            <a:r>
-              <a:rPr lang="en-US" sz="4000" i="1" dirty="0" smtClean="0"/>
-              <a:t>, </a:t>
-            </a:r>
-            <a:r>
-              <a:rPr lang="en-US" sz="4000" i="1" dirty="0" err="1" smtClean="0"/>
-              <a:t>ajaxEnd</a:t>
-            </a:r>
-            <a:r>
-              <a:rPr lang="en-US" sz="4000" i="1" dirty="0" smtClean="0"/>
-              <a:t>, </a:t>
-            </a:r>
-            <a:r>
-              <a:rPr lang="en-US" sz="4000" i="1" dirty="0" err="1" smtClean="0"/>
-              <a:t>ajaxPrefilter</a:t>
-            </a:r>
-            <a:r>
-              <a:rPr lang="en-US" sz="4000" i="1" dirty="0" smtClean="0"/>
-              <a:t>)</a:t>
-            </a:r>
-            <a:br>
-              <a:rPr lang="en-US" sz="4000" i="1" dirty="0" smtClean="0"/>
-            </a:br>
-            <a:endParaRPr lang="en-US" sz="4000" i="1" dirty="0" smtClean="0"/>
-          </a:p>
-          <a:p>
-            <a:r>
               <a:rPr lang="en-US" sz="4000" dirty="0" err="1" smtClean="0"/>
               <a:t>PostSharp</a:t>
             </a:r>
             <a:r>
               <a:rPr lang="en-US" sz="4000" dirty="0" smtClean="0"/>
-              <a:t> (</a:t>
+              <a:t> </a:t>
+            </a:r>
+            <a:r>
+              <a:rPr lang="en-US" sz="4000" dirty="0" smtClean="0"/>
+              <a:t>(</a:t>
             </a:r>
             <a:r>
               <a:rPr lang="en-US" sz="4000" i="1" dirty="0" smtClean="0"/>
@@ -10559,7 +10397,6 @@
               <a:rPr lang="en-US" sz="4000" dirty="0" smtClean="0"/>
               <a:t>)</a:t>
             </a:r>
-            <a:endParaRPr lang="en-US" sz="4000" dirty="0" smtClean="0"/>
           </a:p>
           <a:p>
             <a:endParaRPr lang="en-US" sz="3200" dirty="0" smtClean="0"/>
@@ -12414,88 +12251,51 @@
         </p:nvSpPr>
         <p:spPr>
           <a:xfrm>
-            <a:off x="838200" y="365125"/>
-            <a:ext cx="10960510" cy="1325563"/>
+            <a:off x="964927" y="1"/>
+            <a:ext cx="10515600" cy="6858000"/>
           </a:xfrm>
         </p:spPr>
         <p:txBody>
-          <a:bodyPr>
+          <a:bodyPr anchor="ctr">
             <a:normAutofit/>
           </a:bodyPr>
           <a:lstStyle/>
           <a:p>
+            <a:pPr algn="ctr"/>
             <a:r>
               <a:rPr lang="en-US" sz="4800" dirty="0" smtClean="0"/>
-              <a:t>What makes a concern "cross cutting"?</a:t>
-            </a:r>
-            <a:endParaRPr lang="en-US" sz="4800" dirty="0"/>
-          </a:p>
-        </p:txBody>
-      </p:sp>
-      <p:sp>
-        <p:nvSpPr>
-          <p:cNvPr id="3" name="Content Placeholder 2"/>
-          <p:cNvSpPr>
-            <a:spLocks noGrp="1"/>
-          </p:cNvSpPr>
-          <p:nvPr>
-            <p:ph idx="1"/>
-          </p:nvPr>
-        </p:nvSpPr>
-        <p:spPr>
-          <a:xfrm>
-            <a:off x="838200" y="1825624"/>
-            <a:ext cx="10515600" cy="4899641"/>
-          </a:xfrm>
-        </p:spPr>
-        <p:txBody>
-          <a:bodyPr>
-            <a:normAutofit/>
-          </a:bodyPr>
-          <a:lstStyle/>
-          <a:p>
-            <a:r>
-              <a:rPr lang="en-US" sz="4000" dirty="0" smtClean="0"/>
-              <a:t>Orthogonal to feature-specific business rules</a:t>
-            </a:r>
-            <a:endParaRPr lang="en-US" sz="4000" dirty="0"/>
-          </a:p>
-          <a:p>
-            <a:endParaRPr lang="en-US" sz="4000" dirty="0" smtClean="0"/>
-          </a:p>
-          <a:p>
-            <a:r>
-              <a:rPr lang="en-US" sz="4000" dirty="0" smtClean="0"/>
-              <a:t>Applies to multiple features</a:t>
-            </a:r>
-          </a:p>
-          <a:p>
-            <a:endParaRPr lang="en-US" sz="4000" dirty="0" smtClean="0"/>
-          </a:p>
-          <a:p>
-            <a:endParaRPr lang="en-US" sz="4000" dirty="0"/>
-          </a:p>
-          <a:p>
-            <a:endParaRPr lang="en-US" sz="4000" dirty="0" smtClean="0"/>
-          </a:p>
-          <a:p>
-            <a:endParaRPr lang="en-US" sz="4000" dirty="0" smtClean="0"/>
-          </a:p>
-          <a:p>
-            <a:endParaRPr lang="en-US" dirty="0" smtClean="0"/>
-          </a:p>
-          <a:p>
-            <a:endParaRPr lang="en-US" dirty="0" smtClean="0"/>
-          </a:p>
-          <a:p>
-            <a:endParaRPr lang="en-US" dirty="0"/>
+              <a:t>Show me the codez!</a:t>
+            </a:r>
+            <a:br>
+              <a:rPr lang="en-US" sz="4800" dirty="0" smtClean="0"/>
+            </a:br>
+            <a:r>
+              <a:rPr lang="en-US" sz="4800" dirty="0"/>
+              <a:t/>
+            </a:r>
+            <a:br>
+              <a:rPr lang="en-US" sz="4800" dirty="0"/>
+            </a:br>
+            <a:r>
+              <a:rPr lang="en-US" dirty="0" smtClean="0">
+                <a:solidFill>
+                  <a:srgbClr val="013947"/>
+                </a:solidFill>
+              </a:rPr>
+              <a:t>bit.ly/2i0J91d</a:t>
+            </a:r>
+            <a:endParaRPr lang="en-US" sz="4800" dirty="0">
+              <a:solidFill>
+                <a:srgbClr val="013947"/>
+              </a:solidFill>
+            </a:endParaRPr>
           </a:p>
         </p:txBody>
       </p:sp>
     </p:spTree>
     <p:extLst>
       <p:ext uri="{BB962C8B-B14F-4D97-AF65-F5344CB8AC3E}">
-        <p14:creationId xmlns:p14="http://schemas.microsoft.com/office/powerpoint/2010/main" val="4241676050"/>
+        <p14:creationId xmlns:p14="http://schemas.microsoft.com/office/powerpoint/2010/main" val="269211379"/>
       </p:ext>
     </p:extLst>
   </p:cSld>
@@ -12541,228 +12341,6 @@
         </p:nvSpPr>
         <p:spPr>
           <a:xfrm>
-            <a:off x="838200" y="365125"/>
-            <a:ext cx="10960510" cy="1325563"/>
-          </a:xfrm>
-        </p:spPr>
-        <p:txBody>
-          <a:bodyPr>
-            <a:normAutofit/>
-          </a:bodyPr>
-          <a:lstStyle/>
-          <a:p>
-            <a:r>
-              <a:rPr lang="en-US" sz="4800" dirty="0" smtClean="0"/>
-              <a:t>What belongs in the "framework"?</a:t>
-            </a:r>
-            <a:endParaRPr lang="en-US" sz="4800" dirty="0"/>
-          </a:p>
-        </p:txBody>
-      </p:sp>
-      <p:sp>
-        <p:nvSpPr>
-          <p:cNvPr id="3" name="Content Placeholder 2"/>
-          <p:cNvSpPr>
-            <a:spLocks noGrp="1"/>
-          </p:cNvSpPr>
-          <p:nvPr>
-            <p:ph idx="1"/>
-          </p:nvPr>
-        </p:nvSpPr>
-        <p:spPr>
-          <a:xfrm>
-            <a:off x="838200" y="1825624"/>
-            <a:ext cx="10515600" cy="4899641"/>
-          </a:xfrm>
-        </p:spPr>
-        <p:txBody>
-          <a:bodyPr>
-            <a:normAutofit/>
-          </a:bodyPr>
-          <a:lstStyle/>
-          <a:p>
-            <a:r>
-              <a:rPr lang="en-US" sz="4000" dirty="0" smtClean="0"/>
-              <a:t>All "cross-cutting" concerns</a:t>
-            </a:r>
-          </a:p>
-          <a:p>
-            <a:endParaRPr lang="en-US" sz="4000" dirty="0" smtClean="0"/>
-          </a:p>
-          <a:p>
-            <a:r>
-              <a:rPr lang="en-US" sz="4000" dirty="0" smtClean="0"/>
-              <a:t>Anything that can be made "secure by default"</a:t>
-            </a:r>
-          </a:p>
-          <a:p>
-            <a:endParaRPr lang="en-US" sz="4000" dirty="0"/>
-          </a:p>
-          <a:p>
-            <a:r>
-              <a:rPr lang="en-US" sz="4000" dirty="0" smtClean="0"/>
-              <a:t>Anything that needs auditing / global testing</a:t>
-            </a:r>
-          </a:p>
-          <a:p>
-            <a:endParaRPr lang="en-US" sz="4000" dirty="0"/>
-          </a:p>
-          <a:p>
-            <a:endParaRPr lang="en-US" sz="4000" dirty="0" smtClean="0"/>
-          </a:p>
-          <a:p>
-            <a:endParaRPr lang="en-US" sz="4000" dirty="0" smtClean="0"/>
-          </a:p>
-          <a:p>
-            <a:endParaRPr lang="en-US" dirty="0" smtClean="0"/>
-          </a:p>
-          <a:p>
-            <a:endParaRPr lang="en-US" dirty="0" smtClean="0"/>
-          </a:p>
-          <a:p>
-            <a:endParaRPr lang="en-US" dirty="0"/>
-          </a:p>
-        </p:txBody>
-      </p:sp>
-    </p:spTree>
-    <p:extLst>
-      <p:ext uri="{BB962C8B-B14F-4D97-AF65-F5344CB8AC3E}">
-        <p14:creationId xmlns:p14="http://schemas.microsoft.com/office/powerpoint/2010/main" val="617467512"/>
-      </p:ext>
-    </p:extLst>
-  </p:cSld>
-  <p:clrMapOvr>
-    <a:masterClrMapping/>
-  </p:clrMapOvr>
-  <p:timing>
-    <p:tnLst>
-      <p:par>
-        <p:cTn id="1" dur="indefinite" restart="never" nodeType="tmRoot"/>
-      </p:par>
-    </p:tnLst>
-  </p:timing>
-</p:sld>
-</file>
-
-<file path=ppt/slides/slide24.xml><?xml version="1.0" encoding="utf-8"?>
-<p:sld xmlns:a="http://schemas.openxmlformats.org/drawingml/2006/main" xmlns:r="http://schemas.openxmlformats.org/officeDocument/2006/relationships" xmlns:p="http://schemas.openxmlformats.org/presentationml/2006/main">
-  <p:cSld>
-    <p:spTree>
-      <p:nvGrpSpPr>
-        <p:cNvPr id="1" name=""/>
-        <p:cNvGrpSpPr/>
-        <p:nvPr/>
-      </p:nvGrpSpPr>
-      <p:grpSpPr>
-        <a:xfrm>
-          <a:off x="0" y="0"/>
-          <a:ext cx="0" cy="0"/>
-          <a:chOff x="0" y="0"/>
-          <a:chExt cx="0" cy="0"/>
-        </a:xfrm>
-      </p:grpSpPr>
-      <p:sp>
-        <p:nvSpPr>
-          <p:cNvPr id="2" name="Title 1"/>
-          <p:cNvSpPr>
-            <a:spLocks noGrp="1"/>
-          </p:cNvSpPr>
-          <p:nvPr>
-            <p:ph type="title"/>
-          </p:nvPr>
-        </p:nvSpPr>
-        <p:spPr>
-          <a:xfrm>
-            <a:off x="964927" y="1"/>
-            <a:ext cx="10515600" cy="6858000"/>
-          </a:xfrm>
-        </p:spPr>
-        <p:txBody>
-          <a:bodyPr anchor="ctr">
-            <a:normAutofit/>
-          </a:bodyPr>
-          <a:lstStyle/>
-          <a:p>
-            <a:pPr algn="ctr"/>
-            <a:r>
-              <a:rPr lang="en-US" sz="4800" dirty="0" smtClean="0"/>
-              <a:t>Show me the codez!</a:t>
-            </a:r>
-            <a:br>
-              <a:rPr lang="en-US" sz="4800" dirty="0" smtClean="0"/>
-            </a:br>
-            <a:r>
-              <a:rPr lang="en-US" sz="4800" dirty="0"/>
-              <a:t/>
-            </a:r>
-            <a:br>
-              <a:rPr lang="en-US" sz="4800" dirty="0"/>
-            </a:br>
-            <a:r>
-              <a:rPr lang="en-US" dirty="0" smtClean="0">
-                <a:solidFill>
-                  <a:srgbClr val="013947"/>
-                </a:solidFill>
-              </a:rPr>
-              <a:t>bit.ly/2i0J91d</a:t>
-            </a:r>
-            <a:endParaRPr lang="en-US" sz="4800" dirty="0">
-              <a:solidFill>
-                <a:srgbClr val="013947"/>
-              </a:solidFill>
-            </a:endParaRPr>
-          </a:p>
-        </p:txBody>
-      </p:sp>
-    </p:spTree>
-    <p:extLst>
-      <p:ext uri="{BB962C8B-B14F-4D97-AF65-F5344CB8AC3E}">
-        <p14:creationId xmlns:p14="http://schemas.microsoft.com/office/powerpoint/2010/main" val="269211379"/>
-      </p:ext>
-    </p:extLst>
-  </p:cSld>
-  <p:clrMapOvr>
-    <a:masterClrMapping/>
-  </p:clrMapOvr>
-  <p:timing>
-    <p:tnLst>
-      <p:par>
-        <p:cTn id="1" dur="indefinite" restart="never" nodeType="tmRoot"/>
-      </p:par>
-    </p:tnLst>
-  </p:timing>
-</p:sld>
-</file>
-
-<file path=ppt/slides/slide25.xml><?xml version="1.0" encoding="utf-8"?>
-<p:sld xmlns:a="http://schemas.openxmlformats.org/drawingml/2006/main" xmlns:r="http://schemas.openxmlformats.org/officeDocument/2006/relationships" xmlns:p="http://schemas.openxmlformats.org/presentationml/2006/main">
-  <p:cSld>
-    <p:spTree>
-      <p:nvGrpSpPr>
-        <p:cNvPr id="1" name=""/>
-        <p:cNvGrpSpPr/>
-        <p:nvPr/>
-      </p:nvGrpSpPr>
-      <p:grpSpPr>
-        <a:xfrm>
-          <a:off x="0" y="0"/>
-          <a:ext cx="0" cy="0"/>
-          <a:chOff x="0" y="0"/>
-          <a:chExt cx="0" cy="0"/>
-        </a:xfrm>
-      </p:grpSpPr>
-      <p:sp>
-        <p:nvSpPr>
-          <p:cNvPr id="2" name="Title 1"/>
-          <p:cNvSpPr>
-            <a:spLocks noGrp="1"/>
-          </p:cNvSpPr>
-          <p:nvPr>
-            <p:ph type="title"/>
-          </p:nvPr>
-        </p:nvSpPr>
-        <p:spPr>
-          <a:xfrm>
             <a:off x="964927" y="1"/>
             <a:ext cx="10515600" cy="6858000"/>
           </a:xfrm>
@@ -12824,7 +12402,7 @@
 </p:sld>
 </file>
 
-<file path=ppt/slides/slide26.xml><?xml version="1.0" encoding="utf-8"?>
+<file path=ppt/slides/slide24.xml><?xml version="1.0" encoding="utf-8"?>
 <p:sld xmlns:a="http://schemas.openxmlformats.org/drawingml/2006/main" xmlns:r="http://schemas.openxmlformats.org/officeDocument/2006/relationships" xmlns:p="http://schemas.openxmlformats.org/presentationml/2006/main">
   <p:cSld>
     <p:spTree>
@@ -12966,7 +12544,7 @@
 </p:sld>
 </file>
 
-<file path=ppt/slides/slide27.xml><?xml version="1.0" encoding="utf-8"?>
+<file path=ppt/slides/slide25.xml><?xml version="1.0" encoding="utf-8"?>
 <p:sld xmlns:a="http://schemas.openxmlformats.org/drawingml/2006/main" xmlns:r="http://schemas.openxmlformats.org/officeDocument/2006/relationships" xmlns:p="http://schemas.openxmlformats.org/presentationml/2006/main">
   <p:cSld>
     <p:spTree>
@@ -13142,7 +12720,7 @@
 </p:sld>
 </file>
 
-<file path=ppt/slides/slide28.xml><?xml version="1.0" encoding="utf-8"?>
+<file path=ppt/slides/slide26.xml><?xml version="1.0" encoding="utf-8"?>
 <p:sld xmlns:a="http://schemas.openxmlformats.org/drawingml/2006/main" xmlns:r="http://schemas.openxmlformats.org/officeDocument/2006/relationships" xmlns:p="http://schemas.openxmlformats.org/presentationml/2006/main">
   <p:cSld>
     <p:spTree>
@@ -13260,7 +12838,7 @@
 </p:sld>
 </file>
 
-<file path=ppt/slides/slide29.xml><?xml version="1.0" encoding="utf-8"?>
+<file path=ppt/slides/slide27.xml><?xml version="1.0" encoding="utf-8"?>
 <p:sld xmlns:a="http://schemas.openxmlformats.org/drawingml/2006/main" xmlns:r="http://schemas.openxmlformats.org/officeDocument/2006/relationships" xmlns:p="http://schemas.openxmlformats.org/presentationml/2006/main">
   <p:cSld>
     <p:spTree>
@@ -13405,96 +12983,7 @@
 </p:sld>
 </file>
 
-<file path=ppt/slides/slide3.xml><?xml version="1.0" encoding="utf-8"?>
-<p:sld xmlns:a="http://schemas.openxmlformats.org/drawingml/2006/main" xmlns:r="http://schemas.openxmlformats.org/officeDocument/2006/relationships" xmlns:p="http://schemas.openxmlformats.org/presentationml/2006/main">
-  <p:cSld>
-    <p:spTree>
-      <p:nvGrpSpPr>
-        <p:cNvPr id="1" name=""/>
-        <p:cNvGrpSpPr/>
-        <p:nvPr/>
-      </p:nvGrpSpPr>
-      <p:grpSpPr>
-        <a:xfrm>
-          <a:off x="0" y="0"/>
-          <a:ext cx="0" cy="0"/>
-          <a:chOff x="0" y="0"/>
-          <a:chExt cx="0" cy="0"/>
-        </a:xfrm>
-      </p:grpSpPr>
-      <p:sp>
-        <p:nvSpPr>
-          <p:cNvPr id="2" name="Title 1"/>
-          <p:cNvSpPr>
-            <a:spLocks noGrp="1"/>
-          </p:cNvSpPr>
-          <p:nvPr>
-            <p:ph type="title"/>
-          </p:nvPr>
-        </p:nvSpPr>
-        <p:spPr>
-          <a:xfrm>
-            <a:off x="964927" y="1"/>
-            <a:ext cx="10515600" cy="6858000"/>
-          </a:xfrm>
-        </p:spPr>
-        <p:txBody>
-          <a:bodyPr anchor="ctr">
-            <a:normAutofit/>
-          </a:bodyPr>
-          <a:lstStyle/>
-          <a:p>
-            <a:pPr algn="ctr"/>
-            <a:r>
-              <a:rPr lang="en-US" sz="4800" strike="sngStrike" dirty="0" smtClean="0">
-                <a:solidFill>
-                  <a:schemeClr val="bg1">
-                    <a:lumMod val="75000"/>
-                  </a:schemeClr>
-                </a:solidFill>
-              </a:rPr>
-              <a:t>I hate writing secure code</a:t>
-            </a:r>
-            <a:r>
-              <a:rPr lang="en-US" sz="4800" strike="sngStrike" dirty="0" smtClean="0"/>
-              <a:t/>
-            </a:r>
-            <a:br>
-              <a:rPr lang="en-US" sz="4800" strike="sngStrike" dirty="0" smtClean="0"/>
-            </a:br>
-            <a:r>
-              <a:rPr lang="en-US" sz="4800" dirty="0" smtClean="0"/>
-              <a:t>I hate writing secure </a:t>
-            </a:r>
-            <a:r>
-              <a:rPr lang="en-US" sz="4800" i="1" dirty="0" smtClean="0"/>
-              <a:t>features</a:t>
-            </a:r>
-            <a:endParaRPr lang="en-US" sz="4800" i="1" dirty="0"/>
-          </a:p>
-        </p:txBody>
-      </p:sp>
-    </p:spTree>
-    <p:extLst>
-      <p:ext uri="{BB962C8B-B14F-4D97-AF65-F5344CB8AC3E}">
-        <p14:creationId xmlns:p14="http://schemas.microsoft.com/office/powerpoint/2010/main" val="75936766"/>
-      </p:ext>
-    </p:extLst>
-  </p:cSld>
-  <p:clrMapOvr>
-    <a:masterClrMapping/>
-  </p:clrMapOvr>
-  <p:timing>
-    <p:tnLst>
-      <p:par>
-        <p:cTn id="1" dur="indefinite" restart="never" nodeType="tmRoot"/>
-      </p:par>
-    </p:tnLst>
-  </p:timing>
-</p:sld>
-</file>
-
-<file path=ppt/slides/slide30.xml><?xml version="1.0" encoding="utf-8"?>
+<file path=ppt/slides/slide28.xml><?xml version="1.0" encoding="utf-8"?>
 <p:sld xmlns:a="http://schemas.openxmlformats.org/drawingml/2006/main" xmlns:r="http://schemas.openxmlformats.org/officeDocument/2006/relationships" xmlns:p="http://schemas.openxmlformats.org/presentationml/2006/main">
   <p:cSld>
     <p:spTree>
@@ -13636,7 +13125,7 @@
 </p:sld>
 </file>
 
-<file path=ppt/slides/slide31.xml><?xml version="1.0" encoding="utf-8"?>
+<file path=ppt/slides/slide29.xml><?xml version="1.0" encoding="utf-8"?>
 <p:sld xmlns:a="http://schemas.openxmlformats.org/drawingml/2006/main" xmlns:r="http://schemas.openxmlformats.org/officeDocument/2006/relationships" xmlns:p="http://schemas.openxmlformats.org/presentationml/2006/main">
   <p:cSld>
     <p:spTree>
@@ -13779,7 +13268,100 @@
 </p:sld>
 </file>
 
-<file path=ppt/slides/slide32.xml><?xml version="1.0" encoding="utf-8"?>
+<file path=ppt/slides/slide3.xml><?xml version="1.0" encoding="utf-8"?>
+<p:sld xmlns:a="http://schemas.openxmlformats.org/drawingml/2006/main" xmlns:r="http://schemas.openxmlformats.org/officeDocument/2006/relationships" xmlns:p="http://schemas.openxmlformats.org/presentationml/2006/main">
+  <p:cSld>
+    <p:spTree>
+      <p:nvGrpSpPr>
+        <p:cNvPr id="1" name=""/>
+        <p:cNvGrpSpPr/>
+        <p:nvPr/>
+      </p:nvGrpSpPr>
+      <p:grpSpPr>
+        <a:xfrm>
+          <a:off x="0" y="0"/>
+          <a:ext cx="0" cy="0"/>
+          <a:chOff x="0" y="0"/>
+          <a:chExt cx="0" cy="0"/>
+        </a:xfrm>
+      </p:grpSpPr>
+      <p:sp>
+        <p:nvSpPr>
+          <p:cNvPr id="2" name="Title 1"/>
+          <p:cNvSpPr>
+            <a:spLocks noGrp="1"/>
+          </p:cNvSpPr>
+          <p:nvPr>
+            <p:ph type="title"/>
+          </p:nvPr>
+        </p:nvSpPr>
+        <p:spPr>
+          <a:xfrm>
+            <a:off x="964927" y="1"/>
+            <a:ext cx="10515600" cy="6858000"/>
+          </a:xfrm>
+        </p:spPr>
+        <p:txBody>
+          <a:bodyPr anchor="ctr">
+            <a:normAutofit/>
+          </a:bodyPr>
+          <a:lstStyle/>
+          <a:p>
+            <a:pPr algn="ctr"/>
+            <a:r>
+              <a:rPr lang="en-US" sz="4800" strike="sngStrike" dirty="0" smtClean="0">
+                <a:solidFill>
+                  <a:schemeClr val="bg1">
+                    <a:lumMod val="75000"/>
+                  </a:schemeClr>
+                </a:solidFill>
+              </a:rPr>
+              <a:t>I hate writing secure code</a:t>
+            </a:r>
+            <a:r>
+              <a:rPr lang="en-US" sz="4800" strike="sngStrike" dirty="0" smtClean="0"/>
+              <a:t/>
+            </a:r>
+            <a:br>
+              <a:rPr lang="en-US" sz="4800" strike="sngStrike" dirty="0" smtClean="0"/>
+            </a:br>
+            <a:r>
+              <a:rPr lang="en-US" sz="4800" dirty="0" smtClean="0"/>
+              <a:t>I hate writing secure </a:t>
+            </a:r>
+            <a:r>
+              <a:rPr lang="en-US" sz="4800" i="1" dirty="0" smtClean="0"/>
+              <a:t>feature </a:t>
+            </a:r>
+            <a:r>
+              <a:rPr lang="en-US" sz="4800" dirty="0" smtClean="0"/>
+              <a:t>code</a:t>
+            </a:r>
+            <a:endParaRPr lang="en-US" sz="4800" dirty="0"/>
+          </a:p>
+        </p:txBody>
+      </p:sp>
+    </p:spTree>
+    <p:extLst>
+      <p:ext uri="{BB962C8B-B14F-4D97-AF65-F5344CB8AC3E}">
+        <p14:creationId xmlns:p14="http://schemas.microsoft.com/office/powerpoint/2010/main" val="75936766"/>
+      </p:ext>
+    </p:extLst>
+  </p:cSld>
+  <p:clrMapOvr>
+    <a:masterClrMapping/>
+  </p:clrMapOvr>
+  <p:timing>
+    <p:tnLst>
+      <p:par>
+        <p:cTn id="1" dur="indefinite" restart="never" nodeType="tmRoot"/>
+      </p:par>
+    </p:tnLst>
+  </p:timing>
+</p:sld>
+</file>
+
+<file path=ppt/slides/slide30.xml><?xml version="1.0" encoding="utf-8"?>
 <p:sld xmlns:a="http://schemas.openxmlformats.org/drawingml/2006/main" xmlns:r="http://schemas.openxmlformats.org/officeDocument/2006/relationships" xmlns:p="http://schemas.openxmlformats.org/presentationml/2006/main">
   <p:cSld>
     <p:spTree>
@@ -13917,7 +13499,7 @@
 </p:sld>
 </file>
 
-<file path=ppt/slides/slide33.xml><?xml version="1.0" encoding="utf-8"?>
+<file path=ppt/slides/slide31.xml><?xml version="1.0" encoding="utf-8"?>
 <p:sld xmlns:a="http://schemas.openxmlformats.org/drawingml/2006/main" xmlns:r="http://schemas.openxmlformats.org/officeDocument/2006/relationships" xmlns:p="http://schemas.openxmlformats.org/presentationml/2006/main">
   <p:cSld>
     <p:spTree>
@@ -14055,7 +13637,7 @@
 </p:sld>
 </file>
 
-<file path=ppt/slides/slide34.xml><?xml version="1.0" encoding="utf-8"?>
+<file path=ppt/slides/slide32.xml><?xml version="1.0" encoding="utf-8"?>
 <p:sld xmlns:a="http://schemas.openxmlformats.org/drawingml/2006/main" xmlns:r="http://schemas.openxmlformats.org/officeDocument/2006/relationships" xmlns:p="http://schemas.openxmlformats.org/presentationml/2006/main">
   <p:cSld>
     <p:spTree>
@@ -14193,7 +13775,7 @@
 </p:sld>
 </file>
 
-<file path=ppt/slides/slide35.xml><?xml version="1.0" encoding="utf-8"?>
+<file path=ppt/slides/slide33.xml><?xml version="1.0" encoding="utf-8"?>
 <p:sld xmlns:a="http://schemas.openxmlformats.org/drawingml/2006/main" xmlns:r="http://schemas.openxmlformats.org/officeDocument/2006/relationships" xmlns:p="http://schemas.openxmlformats.org/presentationml/2006/main">
   <p:cSld>
     <p:spTree>
@@ -14338,7 +13920,7 @@
 </p:sld>
 </file>
 
-<file path=ppt/slides/slide36.xml><?xml version="1.0" encoding="utf-8"?>
+<file path=ppt/slides/slide34.xml><?xml version="1.0" encoding="utf-8"?>
 <p:sld xmlns:a="http://schemas.openxmlformats.org/drawingml/2006/main" xmlns:r="http://schemas.openxmlformats.org/officeDocument/2006/relationships" xmlns:p="http://schemas.openxmlformats.org/presentationml/2006/main">
   <p:cSld>
     <p:spTree>
@@ -14488,7 +14070,7 @@
 </p:sld>
 </file>
 
-<file path=ppt/slides/slide37.xml><?xml version="1.0" encoding="utf-8"?>
+<file path=ppt/slides/slide35.xml><?xml version="1.0" encoding="utf-8"?>
 <p:sld xmlns:a="http://schemas.openxmlformats.org/drawingml/2006/main" xmlns:r="http://schemas.openxmlformats.org/officeDocument/2006/relationships" xmlns:p="http://schemas.openxmlformats.org/presentationml/2006/main">
   <p:cSld>
     <p:spTree>
@@ -14578,7 +14160,7 @@
 </p:sld>
 </file>
 
-<file path=ppt/slides/slide38.xml><?xml version="1.0" encoding="utf-8"?>
+<file path=ppt/slides/slide36.xml><?xml version="1.0" encoding="utf-8"?>
 <p:sld xmlns:a="http://schemas.openxmlformats.org/drawingml/2006/main" xmlns:r="http://schemas.openxmlformats.org/officeDocument/2006/relationships" xmlns:p="http://schemas.openxmlformats.org/presentationml/2006/main">
   <p:cSld>
     <p:spTree>
@@ -14699,7 +14281,7 @@
 </p:sld>
 </file>
 
-<file path=ppt/slides/slide39.xml><?xml version="1.0" encoding="utf-8"?>
+<file path=ppt/slides/slide37.xml><?xml version="1.0" encoding="utf-8"?>
 <p:sld xmlns:a="http://schemas.openxmlformats.org/drawingml/2006/main" xmlns:r="http://schemas.openxmlformats.org/officeDocument/2006/relationships" xmlns:p="http://schemas.openxmlformats.org/presentationml/2006/main">
   <p:cSld>
     <p:spTree>
@@ -14820,119 +14402,7 @@
 </p:sld>
 </file>
 
-<file path=ppt/slides/slide4.xml><?xml version="1.0" encoding="utf-8"?>
-<p:sld xmlns:a="http://schemas.openxmlformats.org/drawingml/2006/main" xmlns:r="http://schemas.openxmlformats.org/officeDocument/2006/relationships" xmlns:p="http://schemas.openxmlformats.org/presentationml/2006/main">
-  <p:cSld>
-    <p:spTree>
-      <p:nvGrpSpPr>
-        <p:cNvPr id="1" name=""/>
-        <p:cNvGrpSpPr/>
-        <p:nvPr/>
-      </p:nvGrpSpPr>
-      <p:grpSpPr>
-        <a:xfrm>
-          <a:off x="0" y="0"/>
-          <a:ext cx="0" cy="0"/>
-          <a:chOff x="0" y="0"/>
-          <a:chExt cx="0" cy="0"/>
-        </a:xfrm>
-      </p:grpSpPr>
-      <p:sp>
-        <p:nvSpPr>
-          <p:cNvPr id="2" name="Title 1"/>
-          <p:cNvSpPr>
-            <a:spLocks noGrp="1"/>
-          </p:cNvSpPr>
-          <p:nvPr>
-            <p:ph type="title"/>
-          </p:nvPr>
-        </p:nvSpPr>
-        <p:spPr>
-          <a:xfrm>
-            <a:off x="964927" y="1"/>
-            <a:ext cx="10515600" cy="6858000"/>
-          </a:xfrm>
-        </p:spPr>
-        <p:txBody>
-          <a:bodyPr anchor="ctr">
-            <a:normAutofit/>
-          </a:bodyPr>
-          <a:lstStyle/>
-          <a:p>
-            <a:pPr algn="ctr"/>
-            <a:r>
-              <a:rPr lang="en-US" sz="4800" strike="sngStrike" dirty="0" smtClean="0">
-                <a:solidFill>
-                  <a:schemeClr val="bg1">
-                    <a:lumMod val="75000"/>
-                  </a:schemeClr>
-                </a:solidFill>
-              </a:rPr>
-              <a:t>I hate writing secure code</a:t>
-            </a:r>
-            <a:br>
-              <a:rPr lang="en-US" sz="4800" strike="sngStrike" dirty="0" smtClean="0">
-                <a:solidFill>
-                  <a:schemeClr val="bg1">
-                    <a:lumMod val="75000"/>
-                  </a:schemeClr>
-                </a:solidFill>
-              </a:rPr>
-            </a:br>
-            <a:r>
-              <a:rPr lang="en-US" sz="4800" strike="sngStrike" dirty="0" smtClean="0">
-                <a:solidFill>
-                  <a:schemeClr val="bg1">
-                    <a:lumMod val="75000"/>
-                  </a:schemeClr>
-                </a:solidFill>
-              </a:rPr>
-              <a:t>I hate writing secure features</a:t>
-            </a:r>
-            <a:r>
-              <a:rPr lang="en-US" sz="4800" strike="sngStrike" dirty="0" smtClean="0"/>
-              <a:t/>
-            </a:r>
-            <a:br>
-              <a:rPr lang="en-US" sz="4800" strike="sngStrike" dirty="0" smtClean="0"/>
-            </a:br>
-            <a:r>
-              <a:rPr lang="en-US" sz="4800" dirty="0" smtClean="0"/>
-              <a:t>I hate implementing </a:t>
-            </a:r>
-            <a:r>
-              <a:rPr lang="en-US" sz="4800" i="1" dirty="0" smtClean="0"/>
-              <a:t>cross-cutting security concerns</a:t>
-            </a:r>
-            <a:r>
-              <a:rPr lang="en-US" sz="4800" dirty="0" smtClean="0"/>
-              <a:t> by repeating the same patterns over and over again in my feature-level code</a:t>
-            </a:r>
-            <a:endParaRPr lang="en-US" sz="4800" dirty="0"/>
-          </a:p>
-        </p:txBody>
-      </p:sp>
-    </p:spTree>
-    <p:extLst>
-      <p:ext uri="{BB962C8B-B14F-4D97-AF65-F5344CB8AC3E}">
-        <p14:creationId xmlns:p14="http://schemas.microsoft.com/office/powerpoint/2010/main" val="3846056723"/>
-      </p:ext>
-    </p:extLst>
-  </p:cSld>
-  <p:clrMapOvr>
-    <a:masterClrMapping/>
-  </p:clrMapOvr>
-  <p:timing>
-    <p:tnLst>
-      <p:par>
-        <p:cTn id="1" dur="indefinite" restart="never" nodeType="tmRoot"/>
-      </p:par>
-    </p:tnLst>
-  </p:timing>
-</p:sld>
-</file>
-
-<file path=ppt/slides/slide40.xml><?xml version="1.0" encoding="utf-8"?>
+<file path=ppt/slides/slide38.xml><?xml version="1.0" encoding="utf-8"?>
 <p:sld xmlns:a="http://schemas.openxmlformats.org/drawingml/2006/main" xmlns:r="http://schemas.openxmlformats.org/officeDocument/2006/relationships" xmlns:p="http://schemas.openxmlformats.org/presentationml/2006/main">
   <p:cSld>
     <p:spTree>
@@ -15053,7 +14523,7 @@
 </p:sld>
 </file>
 
-<file path=ppt/slides/slide41.xml><?xml version="1.0" encoding="utf-8"?>
+<file path=ppt/slides/slide39.xml><?xml version="1.0" encoding="utf-8"?>
 <p:sld xmlns:a="http://schemas.openxmlformats.org/drawingml/2006/main" xmlns:r="http://schemas.openxmlformats.org/officeDocument/2006/relationships" xmlns:p="http://schemas.openxmlformats.org/presentationml/2006/main">
   <p:cSld>
     <p:spTree>
@@ -15174,7 +14644,119 @@
 </p:sld>
 </file>
 
-<file path=ppt/slides/slide42.xml><?xml version="1.0" encoding="utf-8"?>
+<file path=ppt/slides/slide4.xml><?xml version="1.0" encoding="utf-8"?>
+<p:sld xmlns:a="http://schemas.openxmlformats.org/drawingml/2006/main" xmlns:r="http://schemas.openxmlformats.org/officeDocument/2006/relationships" xmlns:p="http://schemas.openxmlformats.org/presentationml/2006/main">
+  <p:cSld>
+    <p:spTree>
+      <p:nvGrpSpPr>
+        <p:cNvPr id="1" name=""/>
+        <p:cNvGrpSpPr/>
+        <p:nvPr/>
+      </p:nvGrpSpPr>
+      <p:grpSpPr>
+        <a:xfrm>
+          <a:off x="0" y="0"/>
+          <a:ext cx="0" cy="0"/>
+          <a:chOff x="0" y="0"/>
+          <a:chExt cx="0" cy="0"/>
+        </a:xfrm>
+      </p:grpSpPr>
+      <p:sp>
+        <p:nvSpPr>
+          <p:cNvPr id="2" name="Title 1"/>
+          <p:cNvSpPr>
+            <a:spLocks noGrp="1"/>
+          </p:cNvSpPr>
+          <p:nvPr>
+            <p:ph type="title"/>
+          </p:nvPr>
+        </p:nvSpPr>
+        <p:spPr>
+          <a:xfrm>
+            <a:off x="964927" y="1"/>
+            <a:ext cx="10515600" cy="6858000"/>
+          </a:xfrm>
+        </p:spPr>
+        <p:txBody>
+          <a:bodyPr anchor="ctr">
+            <a:normAutofit/>
+          </a:bodyPr>
+          <a:lstStyle/>
+          <a:p>
+            <a:pPr algn="ctr"/>
+            <a:r>
+              <a:rPr lang="en-US" sz="4800" strike="sngStrike" dirty="0" smtClean="0">
+                <a:solidFill>
+                  <a:schemeClr val="bg1">
+                    <a:lumMod val="75000"/>
+                  </a:schemeClr>
+                </a:solidFill>
+              </a:rPr>
+              <a:t>I hate writing secure code</a:t>
+            </a:r>
+            <a:br>
+              <a:rPr lang="en-US" sz="4800" strike="sngStrike" dirty="0" smtClean="0">
+                <a:solidFill>
+                  <a:schemeClr val="bg1">
+                    <a:lumMod val="75000"/>
+                  </a:schemeClr>
+                </a:solidFill>
+              </a:rPr>
+            </a:br>
+            <a:r>
+              <a:rPr lang="en-US" sz="4800" strike="sngStrike" dirty="0" smtClean="0">
+                <a:solidFill>
+                  <a:schemeClr val="bg1">
+                    <a:lumMod val="75000"/>
+                  </a:schemeClr>
+                </a:solidFill>
+              </a:rPr>
+              <a:t>I hate writing secure features</a:t>
+            </a:r>
+            <a:r>
+              <a:rPr lang="en-US" sz="4800" strike="sngStrike" dirty="0" smtClean="0"/>
+              <a:t/>
+            </a:r>
+            <a:br>
+              <a:rPr lang="en-US" sz="4800" strike="sngStrike" dirty="0" smtClean="0"/>
+            </a:br>
+            <a:r>
+              <a:rPr lang="en-US" sz="4800" dirty="0" smtClean="0"/>
+              <a:t>I hate implementing </a:t>
+            </a:r>
+            <a:r>
+              <a:rPr lang="en-US" sz="4800" i="1" dirty="0" smtClean="0"/>
+              <a:t>cross-cutting security concerns</a:t>
+            </a:r>
+            <a:r>
+              <a:rPr lang="en-US" sz="4800" dirty="0" smtClean="0"/>
+              <a:t> by repeating the same patterns over and over again in my feature-level code</a:t>
+            </a:r>
+            <a:endParaRPr lang="en-US" sz="4800" dirty="0"/>
+          </a:p>
+        </p:txBody>
+      </p:sp>
+    </p:spTree>
+    <p:extLst>
+      <p:ext uri="{BB962C8B-B14F-4D97-AF65-F5344CB8AC3E}">
+        <p14:creationId xmlns:p14="http://schemas.microsoft.com/office/powerpoint/2010/main" val="3846056723"/>
+      </p:ext>
+    </p:extLst>
+  </p:cSld>
+  <p:clrMapOvr>
+    <a:masterClrMapping/>
+  </p:clrMapOvr>
+  <p:timing>
+    <p:tnLst>
+      <p:par>
+        <p:cTn id="1" dur="indefinite" restart="never" nodeType="tmRoot"/>
+      </p:par>
+    </p:tnLst>
+  </p:timing>
+</p:sld>
+</file>
+
+<file path=ppt/slides/slide40.xml><?xml version="1.0" encoding="utf-8"?>
 <p:sld xmlns:a="http://schemas.openxmlformats.org/drawingml/2006/main" xmlns:r="http://schemas.openxmlformats.org/officeDocument/2006/relationships" xmlns:p="http://schemas.openxmlformats.org/presentationml/2006/main">
   <p:cSld>
     <p:spTree>
@@ -15295,7 +14877,7 @@
 </p:sld>
 </file>
 
-<file path=ppt/slides/slide43.xml><?xml version="1.0" encoding="utf-8"?>
+<file path=ppt/slides/slide41.xml><?xml version="1.0" encoding="utf-8"?>
 <p:sld xmlns:a="http://schemas.openxmlformats.org/drawingml/2006/main" xmlns:r="http://schemas.openxmlformats.org/officeDocument/2006/relationships" xmlns:p="http://schemas.openxmlformats.org/presentationml/2006/main">
   <p:cSld>
     <p:spTree>
@@ -15385,7 +14967,7 @@
 </p:sld>
 </file>
 
-<file path=ppt/slides/slide44.xml><?xml version="1.0" encoding="utf-8"?>
+<file path=ppt/slides/slide42.xml><?xml version="1.0" encoding="utf-8"?>
 <p:sld xmlns:a="http://schemas.openxmlformats.org/drawingml/2006/main" xmlns:r="http://schemas.openxmlformats.org/officeDocument/2006/relationships" xmlns:p="http://schemas.openxmlformats.org/presentationml/2006/main">
   <p:cSld>
     <p:spTree>
@@ -15511,7 +15093,7 @@
 </p:sld>
 </file>
 
-<file path=ppt/slides/slide45.xml><?xml version="1.0" encoding="utf-8"?>
+<file path=ppt/slides/slide43.xml><?xml version="1.0" encoding="utf-8"?>
 <p:sld xmlns:a="http://schemas.openxmlformats.org/drawingml/2006/main" xmlns:r="http://schemas.openxmlformats.org/officeDocument/2006/relationships" xmlns:p="http://schemas.openxmlformats.org/presentationml/2006/main">
   <p:cSld>
     <p:spTree>
@@ -15637,7 +15219,7 @@
 </p:sld>
 </file>
 
-<file path=ppt/slides/slide46.xml><?xml version="1.0" encoding="utf-8"?>
+<file path=ppt/slides/slide44.xml><?xml version="1.0" encoding="utf-8"?>
 <p:sld xmlns:a="http://schemas.openxmlformats.org/drawingml/2006/main" xmlns:r="http://schemas.openxmlformats.org/officeDocument/2006/relationships" xmlns:p="http://schemas.openxmlformats.org/presentationml/2006/main">
   <p:cSld>
     <p:spTree>
@@ -15758,7 +15340,7 @@
 </p:sld>
 </file>
 
-<file path=ppt/slides/slide47.xml><?xml version="1.0" encoding="utf-8"?>
+<file path=ppt/slides/slide45.xml><?xml version="1.0" encoding="utf-8"?>
 <p:sld xmlns:a="http://schemas.openxmlformats.org/drawingml/2006/main" xmlns:r="http://schemas.openxmlformats.org/officeDocument/2006/relationships" xmlns:p="http://schemas.openxmlformats.org/presentationml/2006/main">
   <p:cSld>
     <p:spTree>
@@ -15879,7 +15461,7 @@
 </p:sld>
 </file>
 
-<file path=ppt/slides/slide48.xml><?xml version="1.0" encoding="utf-8"?>
+<file path=ppt/slides/slide46.xml><?xml version="1.0" encoding="utf-8"?>
 <p:sld xmlns:a="http://schemas.openxmlformats.org/drawingml/2006/main" xmlns:r="http://schemas.openxmlformats.org/officeDocument/2006/relationships" xmlns:p="http://schemas.openxmlformats.org/presentationml/2006/main">
   <p:cSld>
     <p:spTree>
@@ -16005,7 +15587,7 @@
 </p:sld>
 </file>
 
-<file path=ppt/slides/slide49.xml><?xml version="1.0" encoding="utf-8"?>
+<file path=ppt/slides/slide47.xml><?xml version="1.0" encoding="utf-8"?>
 <p:sld xmlns:a="http://schemas.openxmlformats.org/drawingml/2006/main" xmlns:r="http://schemas.openxmlformats.org/officeDocument/2006/relationships" xmlns:p="http://schemas.openxmlformats.org/presentationml/2006/main">
   <p:cSld>
     <p:spTree>
@@ -16155,123 +15737,7 @@
 </p:sld>
 </file>
 
-<file path=ppt/slides/slide5.xml><?xml version="1.0" encoding="utf-8"?>
-<p:sld xmlns:a="http://schemas.openxmlformats.org/drawingml/2006/main" xmlns:r="http://schemas.openxmlformats.org/officeDocument/2006/relationships" xmlns:p="http://schemas.openxmlformats.org/presentationml/2006/main">
-  <p:cSld>
-    <p:spTree>
-      <p:nvGrpSpPr>
-        <p:cNvPr id="1" name=""/>
-        <p:cNvGrpSpPr/>
-        <p:nvPr/>
-      </p:nvGrpSpPr>
-      <p:grpSpPr>
-        <a:xfrm>
-          <a:off x="0" y="0"/>
-          <a:ext cx="0" cy="0"/>
-          <a:chOff x="0" y="0"/>
-          <a:chExt cx="0" cy="0"/>
-        </a:xfrm>
-      </p:grpSpPr>
-      <p:sp>
-        <p:nvSpPr>
-          <p:cNvPr id="2" name="Title 1"/>
-          <p:cNvSpPr>
-            <a:spLocks noGrp="1"/>
-          </p:cNvSpPr>
-          <p:nvPr>
-            <p:ph type="title"/>
-          </p:nvPr>
-        </p:nvSpPr>
-        <p:spPr/>
-        <p:txBody>
-          <a:bodyPr>
-            <a:normAutofit/>
-          </a:bodyPr>
-          <a:lstStyle/>
-          <a:p>
-            <a:r>
-              <a:rPr lang="en-US" sz="4800" dirty="0" smtClean="0"/>
-              <a:t>What's on </a:t>
-            </a:r>
-            <a:r>
-              <a:rPr lang="en-US" sz="4800" smtClean="0"/>
-              <a:t>the agenda?</a:t>
-            </a:r>
-            <a:endParaRPr lang="en-US" sz="4800" dirty="0"/>
-          </a:p>
-        </p:txBody>
-      </p:sp>
-      <p:sp>
-        <p:nvSpPr>
-          <p:cNvPr id="3" name="Content Placeholder 2"/>
-          <p:cNvSpPr>
-            <a:spLocks noGrp="1"/>
-          </p:cNvSpPr>
-          <p:nvPr>
-            <p:ph idx="1"/>
-          </p:nvPr>
-        </p:nvSpPr>
-        <p:spPr>
-          <a:xfrm>
-            <a:off x="838200" y="1825624"/>
-            <a:ext cx="10515600" cy="4899641"/>
-          </a:xfrm>
-        </p:spPr>
-        <p:txBody>
-          <a:bodyPr>
-            <a:normAutofit/>
-          </a:bodyPr>
-          <a:lstStyle/>
-          <a:p>
-            <a:r>
-              <a:rPr lang="en-US" sz="4000" dirty="0" smtClean="0"/>
-              <a:t>Define "cross cutting" security concerns</a:t>
-            </a:r>
-          </a:p>
-          <a:p>
-            <a:endParaRPr lang="en-US" sz="4000" dirty="0"/>
-          </a:p>
-          <a:p>
-            <a:endParaRPr lang="en-US" sz="4000" dirty="0"/>
-          </a:p>
-          <a:p>
-            <a:endParaRPr lang="en-US" sz="4000" dirty="0" smtClean="0"/>
-          </a:p>
-          <a:p>
-            <a:endParaRPr lang="en-US" sz="4000" dirty="0" smtClean="0"/>
-          </a:p>
-          <a:p>
-            <a:endParaRPr lang="en-US" dirty="0" smtClean="0"/>
-          </a:p>
-          <a:p>
-            <a:endParaRPr lang="en-US" dirty="0" smtClean="0"/>
-          </a:p>
-          <a:p>
-            <a:endParaRPr lang="en-US" dirty="0"/>
-          </a:p>
-        </p:txBody>
-      </p:sp>
-    </p:spTree>
-    <p:extLst>
-      <p:ext uri="{BB962C8B-B14F-4D97-AF65-F5344CB8AC3E}">
-        <p14:creationId xmlns:p14="http://schemas.microsoft.com/office/powerpoint/2010/main" val="2651230507"/>
-      </p:ext>
-    </p:extLst>
-  </p:cSld>
-  <p:clrMapOvr>
-    <a:masterClrMapping/>
-  </p:clrMapOvr>
-  <p:timing>
-    <p:tnLst>
-      <p:par>
-        <p:cTn id="1" dur="indefinite" restart="never" nodeType="tmRoot"/>
-      </p:par>
-    </p:tnLst>
-  </p:timing>
-</p:sld>
-</file>
-
-<file path=ppt/slides/slide50.xml><?xml version="1.0" encoding="utf-8"?>
+<file path=ppt/slides/slide48.xml><?xml version="1.0" encoding="utf-8"?>
 <p:sld xmlns:a="http://schemas.openxmlformats.org/drawingml/2006/main" xmlns:r="http://schemas.openxmlformats.org/officeDocument/2006/relationships" xmlns:p="http://schemas.openxmlformats.org/presentationml/2006/main">
   <p:cSld>
     <p:spTree>
@@ -16397,7 +15863,7 @@
 </p:sld>
 </file>
 
-<file path=ppt/slides/slide51.xml><?xml version="1.0" encoding="utf-8"?>
+<file path=ppt/slides/slide49.xml><?xml version="1.0" encoding="utf-8"?>
 <p:sld xmlns:a="http://schemas.openxmlformats.org/drawingml/2006/main" xmlns:r="http://schemas.openxmlformats.org/officeDocument/2006/relationships" xmlns:p="http://schemas.openxmlformats.org/presentationml/2006/main">
   <p:cSld>
     <p:spTree>
@@ -16523,7 +15989,123 @@
 </p:sld>
 </file>
 
-<file path=ppt/slides/slide52.xml><?xml version="1.0" encoding="utf-8"?>
+<file path=ppt/slides/slide5.xml><?xml version="1.0" encoding="utf-8"?>
+<p:sld xmlns:a="http://schemas.openxmlformats.org/drawingml/2006/main" xmlns:r="http://schemas.openxmlformats.org/officeDocument/2006/relationships" xmlns:p="http://schemas.openxmlformats.org/presentationml/2006/main">
+  <p:cSld>
+    <p:spTree>
+      <p:nvGrpSpPr>
+        <p:cNvPr id="1" name=""/>
+        <p:cNvGrpSpPr/>
+        <p:nvPr/>
+      </p:nvGrpSpPr>
+      <p:grpSpPr>
+        <a:xfrm>
+          <a:off x="0" y="0"/>
+          <a:ext cx="0" cy="0"/>
+          <a:chOff x="0" y="0"/>
+          <a:chExt cx="0" cy="0"/>
+        </a:xfrm>
+      </p:grpSpPr>
+      <p:sp>
+        <p:nvSpPr>
+          <p:cNvPr id="2" name="Title 1"/>
+          <p:cNvSpPr>
+            <a:spLocks noGrp="1"/>
+          </p:cNvSpPr>
+          <p:nvPr>
+            <p:ph type="title"/>
+          </p:nvPr>
+        </p:nvSpPr>
+        <p:spPr/>
+        <p:txBody>
+          <a:bodyPr>
+            <a:normAutofit/>
+          </a:bodyPr>
+          <a:lstStyle/>
+          <a:p>
+            <a:r>
+              <a:rPr lang="en-US" sz="4800" dirty="0" smtClean="0"/>
+              <a:t>What's on </a:t>
+            </a:r>
+            <a:r>
+              <a:rPr lang="en-US" sz="4800" smtClean="0"/>
+              <a:t>the agenda?</a:t>
+            </a:r>
+            <a:endParaRPr lang="en-US" sz="4800" dirty="0"/>
+          </a:p>
+        </p:txBody>
+      </p:sp>
+      <p:sp>
+        <p:nvSpPr>
+          <p:cNvPr id="3" name="Content Placeholder 2"/>
+          <p:cNvSpPr>
+            <a:spLocks noGrp="1"/>
+          </p:cNvSpPr>
+          <p:nvPr>
+            <p:ph idx="1"/>
+          </p:nvPr>
+        </p:nvSpPr>
+        <p:spPr>
+          <a:xfrm>
+            <a:off x="838200" y="1825624"/>
+            <a:ext cx="10515600" cy="4899641"/>
+          </a:xfrm>
+        </p:spPr>
+        <p:txBody>
+          <a:bodyPr>
+            <a:normAutofit/>
+          </a:bodyPr>
+          <a:lstStyle/>
+          <a:p>
+            <a:r>
+              <a:rPr lang="en-US" sz="4000" dirty="0" smtClean="0"/>
+              <a:t>Define "cross cutting" security concerns</a:t>
+            </a:r>
+          </a:p>
+          <a:p>
+            <a:endParaRPr lang="en-US" sz="4000" dirty="0"/>
+          </a:p>
+          <a:p>
+            <a:endParaRPr lang="en-US" sz="4000" dirty="0"/>
+          </a:p>
+          <a:p>
+            <a:endParaRPr lang="en-US" sz="4000" dirty="0" smtClean="0"/>
+          </a:p>
+          <a:p>
+            <a:endParaRPr lang="en-US" sz="4000" dirty="0" smtClean="0"/>
+          </a:p>
+          <a:p>
+            <a:endParaRPr lang="en-US" dirty="0" smtClean="0"/>
+          </a:p>
+          <a:p>
+            <a:endParaRPr lang="en-US" dirty="0" smtClean="0"/>
+          </a:p>
+          <a:p>
+            <a:endParaRPr lang="en-US" dirty="0"/>
+          </a:p>
+        </p:txBody>
+      </p:sp>
+    </p:spTree>
+    <p:extLst>
+      <p:ext uri="{BB962C8B-B14F-4D97-AF65-F5344CB8AC3E}">
+        <p14:creationId xmlns:p14="http://schemas.microsoft.com/office/powerpoint/2010/main" val="2651230507"/>
+      </p:ext>
+    </p:extLst>
+  </p:cSld>
+  <p:clrMapOvr>
+    <a:masterClrMapping/>
+  </p:clrMapOvr>
+  <p:timing>
+    <p:tnLst>
+      <p:par>
+        <p:cTn id="1" dur="indefinite" restart="never" nodeType="tmRoot"/>
+      </p:par>
+    </p:tnLst>
+  </p:timing>
+</p:sld>
+</file>
+
+<file path=ppt/slides/slide50.xml><?xml version="1.0" encoding="utf-8"?>
 <p:sld xmlns:a="http://schemas.openxmlformats.org/drawingml/2006/main" xmlns:r="http://schemas.openxmlformats.org/officeDocument/2006/relationships" xmlns:p="http://schemas.openxmlformats.org/presentationml/2006/main">
   <p:cSld>
     <p:spTree>
@@ -16649,7 +16231,7 @@
 </p:sld>
 </file>
 
-<file path=ppt/slides/slide53.xml><?xml version="1.0" encoding="utf-8"?>
+<file path=ppt/slides/slide51.xml><?xml version="1.0" encoding="utf-8"?>
 <p:sld xmlns:a="http://schemas.openxmlformats.org/drawingml/2006/main" xmlns:r="http://schemas.openxmlformats.org/officeDocument/2006/relationships" xmlns:p="http://schemas.openxmlformats.org/presentationml/2006/main">
   <p:cSld>
     <p:spTree>
@@ -16770,7 +16352,7 @@
 </p:sld>
 </file>
 
-<file path=ppt/slides/slide54.xml><?xml version="1.0" encoding="utf-8"?>
+<file path=ppt/slides/slide52.xml><?xml version="1.0" encoding="utf-8"?>
 <p:sld xmlns:a="http://schemas.openxmlformats.org/drawingml/2006/main" xmlns:r="http://schemas.openxmlformats.org/officeDocument/2006/relationships" xmlns:p="http://schemas.openxmlformats.org/presentationml/2006/main">
   <p:cSld>
     <p:spTree>
@@ -16860,7 +16442,7 @@
 </p:sld>
 </file>
 
-<file path=ppt/slides/slide55.xml><?xml version="1.0" encoding="utf-8"?>
+<file path=ppt/slides/slide53.xml><?xml version="1.0" encoding="utf-8"?>
 <p:sld xmlns:a="http://schemas.openxmlformats.org/drawingml/2006/main" xmlns:r="http://schemas.openxmlformats.org/officeDocument/2006/relationships" xmlns:p="http://schemas.openxmlformats.org/presentationml/2006/main">
   <p:cSld>
     <p:spTree>
@@ -16980,7 +16562,7 @@
 </p:sld>
 </file>
 
-<file path=ppt/slides/slide56.xml><?xml version="1.0" encoding="utf-8"?>
+<file path=ppt/slides/slide54.xml><?xml version="1.0" encoding="utf-8"?>
 <p:sld xmlns:a="http://schemas.openxmlformats.org/drawingml/2006/main" xmlns:r="http://schemas.openxmlformats.org/officeDocument/2006/relationships" xmlns:p="http://schemas.openxmlformats.org/presentationml/2006/main">
   <p:cSld>
     <p:spTree>
@@ -17124,7 +16706,7 @@
 </p:sld>
 </file>
 
-<file path=ppt/slides/slide57.xml><?xml version="1.0" encoding="utf-8"?>
+<file path=ppt/slides/slide55.xml><?xml version="1.0" encoding="utf-8"?>
 <p:sld xmlns:a="http://schemas.openxmlformats.org/drawingml/2006/main" xmlns:r="http://schemas.openxmlformats.org/officeDocument/2006/relationships" xmlns:p="http://schemas.openxmlformats.org/presentationml/2006/main">
   <p:cSld>
     <p:spTree>
@@ -17249,7 +16831,7 @@
 </p:sld>
 </file>
 
-<file path=ppt/slides/slide58.xml><?xml version="1.0" encoding="utf-8"?>
+<file path=ppt/slides/slide56.xml><?xml version="1.0" encoding="utf-8"?>
 <p:sld xmlns:a="http://schemas.openxmlformats.org/drawingml/2006/main" xmlns:r="http://schemas.openxmlformats.org/officeDocument/2006/relationships" xmlns:p="http://schemas.openxmlformats.org/presentationml/2006/main">
   <p:cSld>
     <p:spTree>
@@ -17345,7 +16927,7 @@
 </p:sld>
 </file>
 
-<file path=ppt/slides/slide59.xml><?xml version="1.0" encoding="utf-8"?>
+<file path=ppt/slides/slide57.xml><?xml version="1.0" encoding="utf-8"?>
 <p:sld xmlns:a="http://schemas.openxmlformats.org/drawingml/2006/main" xmlns:r="http://schemas.openxmlformats.org/officeDocument/2006/relationships" xmlns:p="http://schemas.openxmlformats.org/presentationml/2006/main">
   <p:cSld>
     <p:spTree>
@@ -17435,141 +17017,7 @@
 </p:sld>
 </file>
 
-<file path=ppt/slides/slide6.xml><?xml version="1.0" encoding="utf-8"?>
-<p:sld xmlns:a="http://schemas.openxmlformats.org/drawingml/2006/main" xmlns:r="http://schemas.openxmlformats.org/officeDocument/2006/relationships" xmlns:p="http://schemas.openxmlformats.org/presentationml/2006/main">
-  <p:cSld>
-    <p:spTree>
-      <p:nvGrpSpPr>
-        <p:cNvPr id="1" name=""/>
-        <p:cNvGrpSpPr/>
-        <p:nvPr/>
-      </p:nvGrpSpPr>
-      <p:grpSpPr>
-        <a:xfrm>
-          <a:off x="0" y="0"/>
-          <a:ext cx="0" cy="0"/>
-          <a:chOff x="0" y="0"/>
-          <a:chExt cx="0" cy="0"/>
-        </a:xfrm>
-      </p:grpSpPr>
-      <p:sp>
-        <p:nvSpPr>
-          <p:cNvPr id="2" name="Title 1"/>
-          <p:cNvSpPr>
-            <a:spLocks noGrp="1"/>
-          </p:cNvSpPr>
-          <p:nvPr>
-            <p:ph type="title"/>
-          </p:nvPr>
-        </p:nvSpPr>
-        <p:spPr/>
-        <p:txBody>
-          <a:bodyPr>
-            <a:normAutofit/>
-          </a:bodyPr>
-          <a:lstStyle/>
-          <a:p>
-            <a:r>
-              <a:rPr lang="en-US" sz="4800" dirty="0" smtClean="0"/>
-              <a:t>What's on </a:t>
-            </a:r>
-            <a:r>
-              <a:rPr lang="en-US" sz="4800" smtClean="0"/>
-              <a:t>the agenda?</a:t>
-            </a:r>
-            <a:endParaRPr lang="en-US" sz="4800" dirty="0"/>
-          </a:p>
-        </p:txBody>
-      </p:sp>
-      <p:sp>
-        <p:nvSpPr>
-          <p:cNvPr id="3" name="Content Placeholder 2"/>
-          <p:cNvSpPr>
-            <a:spLocks noGrp="1"/>
-          </p:cNvSpPr>
-          <p:nvPr>
-            <p:ph idx="1"/>
-          </p:nvPr>
-        </p:nvSpPr>
-        <p:spPr>
-          <a:xfrm>
-            <a:off x="838200" y="1825624"/>
-            <a:ext cx="10515600" cy="4899641"/>
-          </a:xfrm>
-        </p:spPr>
-        <p:txBody>
-          <a:bodyPr>
-            <a:normAutofit/>
-          </a:bodyPr>
-          <a:lstStyle/>
-          <a:p>
-            <a:r>
-              <a:rPr lang="en-US" sz="4000" dirty="0" smtClean="0">
-                <a:solidFill>
-                  <a:schemeClr val="bg1">
-                    <a:lumMod val="65000"/>
-                  </a:schemeClr>
-                </a:solidFill>
-              </a:rPr>
-              <a:t>Define "cross cutting" security concerns</a:t>
-            </a:r>
-          </a:p>
-          <a:p>
-            <a:endParaRPr lang="en-US" sz="4000" dirty="0"/>
-          </a:p>
-          <a:p>
-            <a:r>
-              <a:rPr lang="en-US" sz="4000" dirty="0" smtClean="0"/>
-              <a:t>"Secure by default" examples</a:t>
-            </a:r>
-          </a:p>
-          <a:p>
-            <a:endParaRPr lang="en-US" sz="4000" dirty="0"/>
-          </a:p>
-          <a:p>
-            <a:endParaRPr lang="en-US" sz="4000" dirty="0" smtClean="0"/>
-          </a:p>
-          <a:p>
-            <a:endParaRPr lang="en-US" sz="4000" dirty="0"/>
-          </a:p>
-          <a:p>
-            <a:endParaRPr lang="en-US" sz="4000" dirty="0" smtClean="0"/>
-          </a:p>
-          <a:p>
-            <a:endParaRPr lang="en-US" sz="4000" dirty="0" smtClean="0"/>
-          </a:p>
-          <a:p>
-            <a:endParaRPr lang="en-US" dirty="0" smtClean="0"/>
-          </a:p>
-          <a:p>
-            <a:endParaRPr lang="en-US" dirty="0" smtClean="0"/>
-          </a:p>
-          <a:p>
-            <a:endParaRPr lang="en-US" dirty="0"/>
-          </a:p>
-        </p:txBody>
-      </p:sp>
-    </p:spTree>
-    <p:extLst>
-      <p:ext uri="{BB962C8B-B14F-4D97-AF65-F5344CB8AC3E}">
-        <p14:creationId xmlns:p14="http://schemas.microsoft.com/office/powerpoint/2010/main" val="902317821"/>
-      </p:ext>
-    </p:extLst>
-  </p:cSld>
-  <p:clrMapOvr>
-    <a:masterClrMapping/>
-  </p:clrMapOvr>
-  <p:timing>
-    <p:tnLst>
-      <p:par>
-        <p:cTn id="1" dur="indefinite" restart="never" nodeType="tmRoot"/>
-      </p:par>
-    </p:tnLst>
-  </p:timing>
-</p:sld>
-</file>
-
-<file path=ppt/slides/slide60.xml><?xml version="1.0" encoding="utf-8"?>
+<file path=ppt/slides/slide58.xml><?xml version="1.0" encoding="utf-8"?>
 <p:sld xmlns:a="http://schemas.openxmlformats.org/drawingml/2006/main" xmlns:r="http://schemas.openxmlformats.org/officeDocument/2006/relationships" xmlns:p="http://schemas.openxmlformats.org/presentationml/2006/main">
   <p:cSld>
     <p:spTree>
@@ -17693,7 +17141,7 @@
 </p:sld>
 </file>
 
-<file path=ppt/slides/slide61.xml><?xml version="1.0" encoding="utf-8"?>
+<file path=ppt/slides/slide59.xml><?xml version="1.0" encoding="utf-8"?>
 <p:sld xmlns:a="http://schemas.openxmlformats.org/drawingml/2006/main" xmlns:r="http://schemas.openxmlformats.org/officeDocument/2006/relationships" xmlns:p="http://schemas.openxmlformats.org/presentationml/2006/main">
   <p:cSld>
     <p:spTree>
@@ -17818,7 +17266,141 @@
 </p:sld>
 </file>
 
-<file path=ppt/slides/slide62.xml><?xml version="1.0" encoding="utf-8"?>
+<file path=ppt/slides/slide6.xml><?xml version="1.0" encoding="utf-8"?>
+<p:sld xmlns:a="http://schemas.openxmlformats.org/drawingml/2006/main" xmlns:r="http://schemas.openxmlformats.org/officeDocument/2006/relationships" xmlns:p="http://schemas.openxmlformats.org/presentationml/2006/main">
+  <p:cSld>
+    <p:spTree>
+      <p:nvGrpSpPr>
+        <p:cNvPr id="1" name=""/>
+        <p:cNvGrpSpPr/>
+        <p:nvPr/>
+      </p:nvGrpSpPr>
+      <p:grpSpPr>
+        <a:xfrm>
+          <a:off x="0" y="0"/>
+          <a:ext cx="0" cy="0"/>
+          <a:chOff x="0" y="0"/>
+          <a:chExt cx="0" cy="0"/>
+        </a:xfrm>
+      </p:grpSpPr>
+      <p:sp>
+        <p:nvSpPr>
+          <p:cNvPr id="2" name="Title 1"/>
+          <p:cNvSpPr>
+            <a:spLocks noGrp="1"/>
+          </p:cNvSpPr>
+          <p:nvPr>
+            <p:ph type="title"/>
+          </p:nvPr>
+        </p:nvSpPr>
+        <p:spPr/>
+        <p:txBody>
+          <a:bodyPr>
+            <a:normAutofit/>
+          </a:bodyPr>
+          <a:lstStyle/>
+          <a:p>
+            <a:r>
+              <a:rPr lang="en-US" sz="4800" dirty="0" smtClean="0"/>
+              <a:t>What's on </a:t>
+            </a:r>
+            <a:r>
+              <a:rPr lang="en-US" sz="4800" smtClean="0"/>
+              <a:t>the agenda?</a:t>
+            </a:r>
+            <a:endParaRPr lang="en-US" sz="4800" dirty="0"/>
+          </a:p>
+        </p:txBody>
+      </p:sp>
+      <p:sp>
+        <p:nvSpPr>
+          <p:cNvPr id="3" name="Content Placeholder 2"/>
+          <p:cNvSpPr>
+            <a:spLocks noGrp="1"/>
+          </p:cNvSpPr>
+          <p:nvPr>
+            <p:ph idx="1"/>
+          </p:nvPr>
+        </p:nvSpPr>
+        <p:spPr>
+          <a:xfrm>
+            <a:off x="838200" y="1825624"/>
+            <a:ext cx="10515600" cy="4899641"/>
+          </a:xfrm>
+        </p:spPr>
+        <p:txBody>
+          <a:bodyPr>
+            <a:normAutofit/>
+          </a:bodyPr>
+          <a:lstStyle/>
+          <a:p>
+            <a:r>
+              <a:rPr lang="en-US" sz="4000" dirty="0" smtClean="0">
+                <a:solidFill>
+                  <a:schemeClr val="bg1">
+                    <a:lumMod val="65000"/>
+                  </a:schemeClr>
+                </a:solidFill>
+              </a:rPr>
+              <a:t>Define "cross cutting" security concerns</a:t>
+            </a:r>
+          </a:p>
+          <a:p>
+            <a:endParaRPr lang="en-US" sz="4000" dirty="0"/>
+          </a:p>
+          <a:p>
+            <a:r>
+              <a:rPr lang="en-US" sz="4000" dirty="0" smtClean="0"/>
+              <a:t>"Secure by default" examples</a:t>
+            </a:r>
+          </a:p>
+          <a:p>
+            <a:endParaRPr lang="en-US" sz="4000" dirty="0"/>
+          </a:p>
+          <a:p>
+            <a:endParaRPr lang="en-US" sz="4000" dirty="0" smtClean="0"/>
+          </a:p>
+          <a:p>
+            <a:endParaRPr lang="en-US" sz="4000" dirty="0"/>
+          </a:p>
+          <a:p>
+            <a:endParaRPr lang="en-US" sz="4000" dirty="0" smtClean="0"/>
+          </a:p>
+          <a:p>
+            <a:endParaRPr lang="en-US" sz="4000" dirty="0" smtClean="0"/>
+          </a:p>
+          <a:p>
+            <a:endParaRPr lang="en-US" dirty="0" smtClean="0"/>
+          </a:p>
+          <a:p>
+            <a:endParaRPr lang="en-US" dirty="0" smtClean="0"/>
+          </a:p>
+          <a:p>
+            <a:endParaRPr lang="en-US" dirty="0"/>
+          </a:p>
+        </p:txBody>
+      </p:sp>
+    </p:spTree>
+    <p:extLst>
+      <p:ext uri="{BB962C8B-B14F-4D97-AF65-F5344CB8AC3E}">
+        <p14:creationId xmlns:p14="http://schemas.microsoft.com/office/powerpoint/2010/main" val="902317821"/>
+      </p:ext>
+    </p:extLst>
+  </p:cSld>
+  <p:clrMapOvr>
+    <a:masterClrMapping/>
+  </p:clrMapOvr>
+  <p:timing>
+    <p:tnLst>
+      <p:par>
+        <p:cTn id="1" dur="indefinite" restart="never" nodeType="tmRoot"/>
+      </p:par>
+    </p:tnLst>
+  </p:timing>
+</p:sld>
+</file>
+
+<file path=ppt/slides/slide60.xml><?xml version="1.0" encoding="utf-8"?>
 <p:sld xmlns:a="http://schemas.openxmlformats.org/drawingml/2006/main" xmlns:r="http://schemas.openxmlformats.org/officeDocument/2006/relationships" xmlns:p="http://schemas.openxmlformats.org/presentationml/2006/main">
   <p:cSld>
     <p:spTree>
@@ -17911,7 +17493,7 @@
 </p:sld>
 </file>
 
-<file path=ppt/slides/slide63.xml><?xml version="1.0" encoding="utf-8"?>
+<file path=ppt/slides/slide61.xml><?xml version="1.0" encoding="utf-8"?>
 <p:sld xmlns:a="http://schemas.openxmlformats.org/drawingml/2006/main" xmlns:r="http://schemas.openxmlformats.org/officeDocument/2006/relationships" xmlns:p="http://schemas.openxmlformats.org/presentationml/2006/main">
   <p:cSld>
     <p:spTree>
@@ -18036,7 +17618,7 @@
 </p:sld>
 </file>
 
-<file path=ppt/slides/slide64.xml><?xml version="1.0" encoding="utf-8"?>
+<file path=ppt/slides/slide62.xml><?xml version="1.0" encoding="utf-8"?>
 <p:sld xmlns:a="http://schemas.openxmlformats.org/drawingml/2006/main" xmlns:r="http://schemas.openxmlformats.org/officeDocument/2006/relationships" xmlns:p="http://schemas.openxmlformats.org/presentationml/2006/main">
   <p:cSld>
     <p:spTree>
@@ -18169,7 +17751,7 @@
 </p:sld>
 </file>
 
-<file path=ppt/slides/slide65.xml><?xml version="1.0" encoding="utf-8"?>
+<file path=ppt/slides/slide63.xml><?xml version="1.0" encoding="utf-8"?>
 <p:sld xmlns:a="http://schemas.openxmlformats.org/drawingml/2006/main" xmlns:r="http://schemas.openxmlformats.org/officeDocument/2006/relationships" xmlns:p="http://schemas.openxmlformats.org/presentationml/2006/main">
   <p:cSld>
     <p:spTree>
@@ -18275,7 +17857,7 @@
 </p:sld>
 </file>
 
-<file path=ppt/slides/slide66.xml><?xml version="1.0" encoding="utf-8"?>
+<file path=ppt/slides/slide64.xml><?xml version="1.0" encoding="utf-8"?>
 <p:sld xmlns:a="http://schemas.openxmlformats.org/drawingml/2006/main" xmlns:r="http://schemas.openxmlformats.org/officeDocument/2006/relationships" xmlns:p="http://schemas.openxmlformats.org/presentationml/2006/main">
   <p:cSld>
     <p:spTree>
@@ -18396,7 +17978,7 @@
 </p:sld>
 </file>
 
-<file path=ppt/slides/slide67.xml><?xml version="1.0" encoding="utf-8"?>
+<file path=ppt/slides/slide65.xml><?xml version="1.0" encoding="utf-8"?>
 <p:sld xmlns:a="http://schemas.openxmlformats.org/drawingml/2006/main" xmlns:r="http://schemas.openxmlformats.org/officeDocument/2006/relationships" xmlns:p="http://schemas.openxmlformats.org/presentationml/2006/main">
   <p:cSld>
     <p:spTree>
@@ -18516,7 +18098,7 @@
 </p:sld>
 </file>
 
-<file path=ppt/slides/slide68.xml><?xml version="1.0" encoding="utf-8"?>
+<file path=ppt/slides/slide66.xml><?xml version="1.0" encoding="utf-8"?>
 <p:sld xmlns:a="http://schemas.openxmlformats.org/drawingml/2006/main" xmlns:r="http://schemas.openxmlformats.org/officeDocument/2006/relationships" xmlns:p="http://schemas.openxmlformats.org/presentationml/2006/main">
   <p:cSld>
     <p:spTree>
@@ -18636,7 +18218,7 @@
 </p:sld>
 </file>
 
-<file path=ppt/slides/slide69.xml><?xml version="1.0" encoding="utf-8"?>
+<file path=ppt/slides/slide67.xml><?xml version="1.0" encoding="utf-8"?>
 <p:sld xmlns:a="http://schemas.openxmlformats.org/drawingml/2006/main" xmlns:r="http://schemas.openxmlformats.org/officeDocument/2006/relationships" xmlns:p="http://schemas.openxmlformats.org/presentationml/2006/main">
   <p:cSld>
     <p:spTree>
@@ -18756,159 +18338,7 @@
 </p:sld>
 </file>
 
-<file path=ppt/slides/slide7.xml><?xml version="1.0" encoding="utf-8"?>
-<p:sld xmlns:a="http://schemas.openxmlformats.org/drawingml/2006/main" xmlns:r="http://schemas.openxmlformats.org/officeDocument/2006/relationships" xmlns:p="http://schemas.openxmlformats.org/presentationml/2006/main">
-  <p:cSld>
-    <p:spTree>
-      <p:nvGrpSpPr>
-        <p:cNvPr id="1" name=""/>
-        <p:cNvGrpSpPr/>
-        <p:nvPr/>
-      </p:nvGrpSpPr>
-      <p:grpSpPr>
-        <a:xfrm>
-          <a:off x="0" y="0"/>
-          <a:ext cx="0" cy="0"/>
-          <a:chOff x="0" y="0"/>
-          <a:chExt cx="0" cy="0"/>
-        </a:xfrm>
-      </p:grpSpPr>
-      <p:sp>
-        <p:nvSpPr>
-          <p:cNvPr id="2" name="Title 1"/>
-          <p:cNvSpPr>
-            <a:spLocks noGrp="1"/>
-          </p:cNvSpPr>
-          <p:nvPr>
-            <p:ph type="title"/>
-          </p:nvPr>
-        </p:nvSpPr>
-        <p:spPr/>
-        <p:txBody>
-          <a:bodyPr>
-            <a:normAutofit/>
-          </a:bodyPr>
-          <a:lstStyle/>
-          <a:p>
-            <a:r>
-              <a:rPr lang="en-US" sz="4800" dirty="0" smtClean="0"/>
-              <a:t>What's on </a:t>
-            </a:r>
-            <a:r>
-              <a:rPr lang="en-US" sz="4800" smtClean="0"/>
-              <a:t>the agenda?</a:t>
-            </a:r>
-            <a:endParaRPr lang="en-US" sz="4800" dirty="0"/>
-          </a:p>
-        </p:txBody>
-      </p:sp>
-      <p:sp>
-        <p:nvSpPr>
-          <p:cNvPr id="3" name="Content Placeholder 2"/>
-          <p:cNvSpPr>
-            <a:spLocks noGrp="1"/>
-          </p:cNvSpPr>
-          <p:nvPr>
-            <p:ph idx="1"/>
-          </p:nvPr>
-        </p:nvSpPr>
-        <p:spPr>
-          <a:xfrm>
-            <a:off x="838200" y="1825624"/>
-            <a:ext cx="10515600" cy="4899641"/>
-          </a:xfrm>
-        </p:spPr>
-        <p:txBody>
-          <a:bodyPr>
-            <a:normAutofit/>
-          </a:bodyPr>
-          <a:lstStyle/>
-          <a:p>
-            <a:r>
-              <a:rPr lang="en-US" sz="4000" dirty="0" smtClean="0">
-                <a:solidFill>
-                  <a:schemeClr val="bg1">
-                    <a:lumMod val="65000"/>
-                  </a:schemeClr>
-                </a:solidFill>
-              </a:rPr>
-              <a:t>Define "cross cutting" security concerns</a:t>
-            </a:r>
-          </a:p>
-          <a:p>
-            <a:endParaRPr lang="en-US" sz="4000" dirty="0">
-              <a:solidFill>
-                <a:schemeClr val="bg1">
-                  <a:lumMod val="65000"/>
-                </a:schemeClr>
-              </a:solidFill>
-            </a:endParaRPr>
-          </a:p>
-          <a:p>
-            <a:r>
-              <a:rPr lang="en-US" sz="4000" dirty="0" smtClean="0">
-                <a:solidFill>
-                  <a:schemeClr val="bg1">
-                    <a:lumMod val="65000"/>
-                  </a:schemeClr>
-                </a:solidFill>
-              </a:rPr>
-              <a:t>"Secure by default" examples</a:t>
-            </a:r>
-          </a:p>
-          <a:p>
-            <a:endParaRPr lang="en-US" sz="4000" dirty="0"/>
-          </a:p>
-          <a:p>
-            <a:r>
-              <a:rPr lang="en-US" sz="4000" dirty="0" smtClean="0"/>
-              <a:t>Declarative vs Imperative security</a:t>
-            </a:r>
-          </a:p>
-          <a:p>
-            <a:endParaRPr lang="en-US" sz="4000" dirty="0"/>
-          </a:p>
-          <a:p>
-            <a:endParaRPr lang="en-US" sz="4000" dirty="0"/>
-          </a:p>
-          <a:p>
-            <a:endParaRPr lang="en-US" sz="4000" dirty="0" smtClean="0"/>
-          </a:p>
-          <a:p>
-            <a:endParaRPr lang="en-US" sz="4000" dirty="0" smtClean="0"/>
-          </a:p>
-          <a:p>
-            <a:endParaRPr lang="en-US" dirty="0" smtClean="0"/>
-          </a:p>
-          <a:p>
-            <a:endParaRPr lang="en-US" dirty="0" smtClean="0"/>
-          </a:p>
-          <a:p>
-            <a:endParaRPr lang="en-US" dirty="0"/>
-          </a:p>
-        </p:txBody>
-      </p:sp>
-    </p:spTree>
-    <p:extLst>
-      <p:ext uri="{BB962C8B-B14F-4D97-AF65-F5344CB8AC3E}">
-        <p14:creationId xmlns:p14="http://schemas.microsoft.com/office/powerpoint/2010/main" val="1001694156"/>
-      </p:ext>
-    </p:extLst>
-  </p:cSld>
-  <p:clrMapOvr>
-    <a:masterClrMapping/>
-  </p:clrMapOvr>
-  <p:timing>
-    <p:tnLst>
-      <p:par>
-        <p:cTn id="1" dur="indefinite" restart="never" nodeType="tmRoot"/>
-      </p:par>
-    </p:tnLst>
-  </p:timing>
-</p:sld>
-</file>
-
-<file path=ppt/slides/slide70.xml><?xml version="1.0" encoding="utf-8"?>
+<file path=ppt/slides/slide68.xml><?xml version="1.0" encoding="utf-8"?>
 <p:sld xmlns:a="http://schemas.openxmlformats.org/drawingml/2006/main" xmlns:r="http://schemas.openxmlformats.org/officeDocument/2006/relationships" xmlns:p="http://schemas.openxmlformats.org/presentationml/2006/main">
   <p:cSld>
     <p:spTree>
@@ -19028,7 +18458,7 @@
 </p:sld>
 </file>
 
-<file path=ppt/slides/slide71.xml><?xml version="1.0" encoding="utf-8"?>
+<file path=ppt/slides/slide69.xml><?xml version="1.0" encoding="utf-8"?>
 <p:sld xmlns:a="http://schemas.openxmlformats.org/drawingml/2006/main" xmlns:r="http://schemas.openxmlformats.org/officeDocument/2006/relationships" xmlns:p="http://schemas.openxmlformats.org/presentationml/2006/main">
   <p:cSld>
     <p:spTree>
@@ -19170,7 +18600,159 @@
 </p:sld>
 </file>
 
-<file path=ppt/slides/slide72.xml><?xml version="1.0" encoding="utf-8"?>
+<file path=ppt/slides/slide7.xml><?xml version="1.0" encoding="utf-8"?>
+<p:sld xmlns:a="http://schemas.openxmlformats.org/drawingml/2006/main" xmlns:r="http://schemas.openxmlformats.org/officeDocument/2006/relationships" xmlns:p="http://schemas.openxmlformats.org/presentationml/2006/main">
+  <p:cSld>
+    <p:spTree>
+      <p:nvGrpSpPr>
+        <p:cNvPr id="1" name=""/>
+        <p:cNvGrpSpPr/>
+        <p:nvPr/>
+      </p:nvGrpSpPr>
+      <p:grpSpPr>
+        <a:xfrm>
+          <a:off x="0" y="0"/>
+          <a:ext cx="0" cy="0"/>
+          <a:chOff x="0" y="0"/>
+          <a:chExt cx="0" cy="0"/>
+        </a:xfrm>
+      </p:grpSpPr>
+      <p:sp>
+        <p:nvSpPr>
+          <p:cNvPr id="2" name="Title 1"/>
+          <p:cNvSpPr>
+            <a:spLocks noGrp="1"/>
+          </p:cNvSpPr>
+          <p:nvPr>
+            <p:ph type="title"/>
+          </p:nvPr>
+        </p:nvSpPr>
+        <p:spPr/>
+        <p:txBody>
+          <a:bodyPr>
+            <a:normAutofit/>
+          </a:bodyPr>
+          <a:lstStyle/>
+          <a:p>
+            <a:r>
+              <a:rPr lang="en-US" sz="4800" dirty="0" smtClean="0"/>
+              <a:t>What's on </a:t>
+            </a:r>
+            <a:r>
+              <a:rPr lang="en-US" sz="4800" smtClean="0"/>
+              <a:t>the agenda?</a:t>
+            </a:r>
+            <a:endParaRPr lang="en-US" sz="4800" dirty="0"/>
+          </a:p>
+        </p:txBody>
+      </p:sp>
+      <p:sp>
+        <p:nvSpPr>
+          <p:cNvPr id="3" name="Content Placeholder 2"/>
+          <p:cNvSpPr>
+            <a:spLocks noGrp="1"/>
+          </p:cNvSpPr>
+          <p:nvPr>
+            <p:ph idx="1"/>
+          </p:nvPr>
+        </p:nvSpPr>
+        <p:spPr>
+          <a:xfrm>
+            <a:off x="838200" y="1825624"/>
+            <a:ext cx="10515600" cy="4899641"/>
+          </a:xfrm>
+        </p:spPr>
+        <p:txBody>
+          <a:bodyPr>
+            <a:normAutofit/>
+          </a:bodyPr>
+          <a:lstStyle/>
+          <a:p>
+            <a:r>
+              <a:rPr lang="en-US" sz="4000" dirty="0" smtClean="0">
+                <a:solidFill>
+                  <a:schemeClr val="bg1">
+                    <a:lumMod val="65000"/>
+                  </a:schemeClr>
+                </a:solidFill>
+              </a:rPr>
+              <a:t>Define "cross cutting" security concerns</a:t>
+            </a:r>
+          </a:p>
+          <a:p>
+            <a:endParaRPr lang="en-US" sz="4000" dirty="0">
+              <a:solidFill>
+                <a:schemeClr val="bg1">
+                  <a:lumMod val="65000"/>
+                </a:schemeClr>
+              </a:solidFill>
+            </a:endParaRPr>
+          </a:p>
+          <a:p>
+            <a:r>
+              <a:rPr lang="en-US" sz="4000" dirty="0" smtClean="0">
+                <a:solidFill>
+                  <a:schemeClr val="bg1">
+                    <a:lumMod val="65000"/>
+                  </a:schemeClr>
+                </a:solidFill>
+              </a:rPr>
+              <a:t>"Secure by default" examples</a:t>
+            </a:r>
+          </a:p>
+          <a:p>
+            <a:endParaRPr lang="en-US" sz="4000" dirty="0"/>
+          </a:p>
+          <a:p>
+            <a:r>
+              <a:rPr lang="en-US" sz="4000" dirty="0" smtClean="0"/>
+              <a:t>Declarative vs Imperative security</a:t>
+            </a:r>
+          </a:p>
+          <a:p>
+            <a:endParaRPr lang="en-US" sz="4000" dirty="0"/>
+          </a:p>
+          <a:p>
+            <a:endParaRPr lang="en-US" sz="4000" dirty="0"/>
+          </a:p>
+          <a:p>
+            <a:endParaRPr lang="en-US" sz="4000" dirty="0" smtClean="0"/>
+          </a:p>
+          <a:p>
+            <a:endParaRPr lang="en-US" sz="4000" dirty="0" smtClean="0"/>
+          </a:p>
+          <a:p>
+            <a:endParaRPr lang="en-US" dirty="0" smtClean="0"/>
+          </a:p>
+          <a:p>
+            <a:endParaRPr lang="en-US" dirty="0" smtClean="0"/>
+          </a:p>
+          <a:p>
+            <a:endParaRPr lang="en-US" dirty="0"/>
+          </a:p>
+        </p:txBody>
+      </p:sp>
+    </p:spTree>
+    <p:extLst>
+      <p:ext uri="{BB962C8B-B14F-4D97-AF65-F5344CB8AC3E}">
+        <p14:creationId xmlns:p14="http://schemas.microsoft.com/office/powerpoint/2010/main" val="1001694156"/>
+      </p:ext>
+    </p:extLst>
+  </p:cSld>
+  <p:clrMapOvr>
+    <a:masterClrMapping/>
+  </p:clrMapOvr>
+  <p:timing>
+    <p:tnLst>
+      <p:par>
+        <p:cTn id="1" dur="indefinite" restart="never" nodeType="tmRoot"/>
+      </p:par>
+    </p:tnLst>
+  </p:timing>
+</p:sld>
+</file>
+
+<file path=ppt/slides/slide70.xml><?xml version="1.0" encoding="utf-8"?>
 <p:sld xmlns:a="http://schemas.openxmlformats.org/drawingml/2006/main" xmlns:r="http://schemas.openxmlformats.org/officeDocument/2006/relationships" xmlns:p="http://schemas.openxmlformats.org/presentationml/2006/main">
   <p:cSld>
     <p:spTree>
@@ -19291,7 +18873,7 @@
 </p:sld>
 </file>
 
-<file path=ppt/slides/slide73.xml><?xml version="1.0" encoding="utf-8"?>
+<file path=ppt/slides/slide71.xml><?xml version="1.0" encoding="utf-8"?>
 <p:sld xmlns:a="http://schemas.openxmlformats.org/drawingml/2006/main" xmlns:r="http://schemas.openxmlformats.org/officeDocument/2006/relationships" xmlns:p="http://schemas.openxmlformats.org/presentationml/2006/main">
   <p:cSld>
     <p:spTree>
@@ -19412,7 +18994,7 @@
 </p:sld>
 </file>
 
-<file path=ppt/slides/slide74.xml><?xml version="1.0" encoding="utf-8"?>
+<file path=ppt/slides/slide72.xml><?xml version="1.0" encoding="utf-8"?>
 <p:sld xmlns:a="http://schemas.openxmlformats.org/drawingml/2006/main" xmlns:r="http://schemas.openxmlformats.org/officeDocument/2006/relationships" xmlns:p="http://schemas.openxmlformats.org/presentationml/2006/main">
   <p:cSld>
     <p:spTree>
@@ -19533,7 +19115,7 @@
 </p:sld>
 </file>
 
-<file path=ppt/slides/slide75.xml><?xml version="1.0" encoding="utf-8"?>
+<file path=ppt/slides/slide73.xml><?xml version="1.0" encoding="utf-8"?>
 <p:sld xmlns:a="http://schemas.openxmlformats.org/drawingml/2006/main" xmlns:r="http://schemas.openxmlformats.org/officeDocument/2006/relationships" xmlns:p="http://schemas.openxmlformats.org/presentationml/2006/main">
   <p:cSld>
     <p:spTree>
@@ -19657,7 +19239,7 @@
 </p:sld>
 </file>
 
-<file path=ppt/slides/slide76.xml><?xml version="1.0" encoding="utf-8"?>
+<file path=ppt/slides/slide74.xml><?xml version="1.0" encoding="utf-8"?>
 <p:sld xmlns:a="http://schemas.openxmlformats.org/drawingml/2006/main" xmlns:r="http://schemas.openxmlformats.org/officeDocument/2006/relationships" xmlns:p="http://schemas.openxmlformats.org/presentationml/2006/main">
   <p:cSld>
     <p:spTree>
@@ -19787,7 +19369,7 @@
 </p:sld>
 </file>
 
-<file path=ppt/slides/slide77.xml><?xml version="1.0" encoding="utf-8"?>
+<file path=ppt/slides/slide75.xml><?xml version="1.0" encoding="utf-8"?>
 <p:sld xmlns:a="http://schemas.openxmlformats.org/drawingml/2006/main" xmlns:r="http://schemas.openxmlformats.org/officeDocument/2006/relationships" xmlns:p="http://schemas.openxmlformats.org/presentationml/2006/main">
   <p:cSld>
     <p:spTree>
@@ -19868,7 +19450,6 @@
               <a:rPr lang="en-US" sz="4000" dirty="0" smtClean="0"/>
               <a:t>"Secure by default" is the holy grail</a:t>
             </a:r>
-            <a:endParaRPr lang="en-US" sz="4000" dirty="0" smtClean="0"/>
           </a:p>
           <a:p>
             <a:r>

</xml_diff>

<commit_message>
Minor tweaks - getting close to final!
</commit_message>
<xml_diff>
--- a/Secure Systems - CodeMash 2017.pptx
+++ b/Secure Systems - CodeMash 2017.pptx
@@ -12313,7 +12313,7 @@
 </file>
 
 <file path=ppt/slides/slide23.xml><?xml version="1.0" encoding="utf-8"?>
-<p:sld xmlns:a="http://schemas.openxmlformats.org/drawingml/2006/main" xmlns:r="http://schemas.openxmlformats.org/officeDocument/2006/relationships" xmlns:p="http://schemas.openxmlformats.org/presentationml/2006/main">
+<p:sld xmlns:a="http://schemas.openxmlformats.org/drawingml/2006/main" xmlns:r="http://schemas.openxmlformats.org/officeDocument/2006/relationships" xmlns:p="http://schemas.openxmlformats.org/presentationml/2006/main" show="0">
   <p:cSld>
     <p:spTree>
       <p:nvGrpSpPr>
@@ -12392,6 +12392,14 @@
   <p:clrMapOvr>
     <a:masterClrMapping/>
   </p:clrMapOvr>
+  <mc:AlternateContent xmlns:mc="http://schemas.openxmlformats.org/markup-compatibility/2006">
+    <mc:Choice xmlns:p14="http://schemas.microsoft.com/office/powerpoint/2010/main" Requires="p14">
+      <p:transition spd="slow" p14:dur="2000"/>
+    </mc:Choice>
+    <mc:Fallback>
+      <p:transition spd="slow"/>
+    </mc:Fallback>
+  </mc:AlternateContent>
   <p:timing>
     <p:tnLst>
       <p:par>
@@ -12403,7 +12411,7 @@
 </file>
 
 <file path=ppt/slides/slide24.xml><?xml version="1.0" encoding="utf-8"?>
-<p:sld xmlns:a="http://schemas.openxmlformats.org/drawingml/2006/main" xmlns:r="http://schemas.openxmlformats.org/officeDocument/2006/relationships" xmlns:p="http://schemas.openxmlformats.org/presentationml/2006/main">
+<p:sld xmlns:a="http://schemas.openxmlformats.org/drawingml/2006/main" xmlns:r="http://schemas.openxmlformats.org/officeDocument/2006/relationships" xmlns:p="http://schemas.openxmlformats.org/presentationml/2006/main" show="0">
   <p:cSld>
     <p:spTree>
       <p:nvGrpSpPr>
@@ -12534,6 +12542,14 @@
   <p:clrMapOvr>
     <a:masterClrMapping/>
   </p:clrMapOvr>
+  <mc:AlternateContent xmlns:mc="http://schemas.openxmlformats.org/markup-compatibility/2006">
+    <mc:Choice xmlns:p14="http://schemas.microsoft.com/office/powerpoint/2010/main" Requires="p14">
+      <p:transition spd="slow" p14:dur="2000"/>
+    </mc:Choice>
+    <mc:Fallback>
+      <p:transition spd="slow"/>
+    </mc:Fallback>
+  </mc:AlternateContent>
   <p:timing>
     <p:tnLst>
       <p:par>

</xml_diff>

<commit_message>
More minor tweaks - polishing the gem now
</commit_message>
<xml_diff>
--- a/Secure Systems - CodeMash 2017.pptx
+++ b/Secure Systems - CodeMash 2017.pptx
@@ -10361,11 +10361,7 @@
           <a:p>
             <a:r>
               <a:rPr lang="en-US" sz="4000" dirty="0" smtClean="0"/>
-              <a:t>ORM </a:t>
-            </a:r>
-            <a:r>
-              <a:rPr lang="en-US" sz="4000" dirty="0" smtClean="0"/>
-              <a:t>interceptors (</a:t>
+              <a:t>ORM interceptors (</a:t>
             </a:r>
             <a:r>
               <a:rPr lang="en-US" sz="4000" i="1" dirty="0" smtClean="0"/>
@@ -10383,11 +10379,7 @@
             </a:r>
             <a:r>
               <a:rPr lang="en-US" sz="4000" dirty="0" smtClean="0"/>
-              <a:t> </a:t>
-            </a:r>
-            <a:r>
-              <a:rPr lang="en-US" sz="4000" dirty="0" smtClean="0"/>
-              <a:t>(</a:t>
+              <a:t> (</a:t>
             </a:r>
             <a:r>
               <a:rPr lang="en-US" sz="4000" i="1" dirty="0" smtClean="0"/>
@@ -12392,11 +12384,11 @@
   <p:clrMapOvr>
     <a:masterClrMapping/>
   </p:clrMapOvr>
-  <mc:AlternateContent xmlns:mc="http://schemas.openxmlformats.org/markup-compatibility/2006">
-    <mc:Choice xmlns:p14="http://schemas.microsoft.com/office/powerpoint/2010/main" Requires="p14">
+  <mc:AlternateContent xmlns:mc="http://schemas.openxmlformats.org/markup-compatibility/2006" xmlns:p14="http://schemas.microsoft.com/office/powerpoint/2010/main">
+    <mc:Choice Requires="p14">
       <p:transition spd="slow" p14:dur="2000"/>
     </mc:Choice>
-    <mc:Fallback>
+    <mc:Fallback xmlns="">
       <p:transition spd="slow"/>
     </mc:Fallback>
   </mc:AlternateContent>
@@ -12542,11 +12534,11 @@
   <p:clrMapOvr>
     <a:masterClrMapping/>
   </p:clrMapOvr>
-  <mc:AlternateContent xmlns:mc="http://schemas.openxmlformats.org/markup-compatibility/2006">
-    <mc:Choice xmlns:p14="http://schemas.microsoft.com/office/powerpoint/2010/main" Requires="p14">
+  <mc:AlternateContent xmlns:mc="http://schemas.openxmlformats.org/markup-compatibility/2006" xmlns:p14="http://schemas.microsoft.com/office/powerpoint/2010/main">
+    <mc:Choice Requires="p14">
       <p:transition spd="slow" p14:dur="2000"/>
     </mc:Choice>
-    <mc:Fallback>
+    <mc:Fallback xmlns="">
       <p:transition spd="slow"/>
     </mc:Fallback>
   </mc:AlternateContent>

</xml_diff>

<commit_message>
Cleanup up recap and last slide
</commit_message>
<xml_diff>
--- a/Secure Systems - CodeMash 2017.pptx
+++ b/Secure Systems - CodeMash 2017.pptx
@@ -5,7 +5,7 @@
     <p:sldMasterId id="2147483749" r:id="rId1"/>
   </p:sldMasterIdLst>
   <p:notesMasterIdLst>
-    <p:notesMasterId r:id="rId78"/>
+    <p:notesMasterId r:id="rId77"/>
   </p:notesMasterIdLst>
   <p:sldIdLst>
     <p:sldId id="395" r:id="rId2"/>
@@ -30,60 +30,59 @@
     <p:sldId id="511" r:id="rId21"/>
     <p:sldId id="512" r:id="rId22"/>
     <p:sldId id="499" r:id="rId23"/>
-    <p:sldId id="545" r:id="rId24"/>
-    <p:sldId id="541" r:id="rId25"/>
-    <p:sldId id="550" r:id="rId26"/>
-    <p:sldId id="579" r:id="rId27"/>
-    <p:sldId id="519" r:id="rId28"/>
-    <p:sldId id="524" r:id="rId29"/>
-    <p:sldId id="521" r:id="rId30"/>
-    <p:sldId id="522" r:id="rId31"/>
-    <p:sldId id="525" r:id="rId32"/>
-    <p:sldId id="523" r:id="rId33"/>
-    <p:sldId id="520" r:id="rId34"/>
-    <p:sldId id="526" r:id="rId35"/>
-    <p:sldId id="540" r:id="rId36"/>
-    <p:sldId id="500" r:id="rId37"/>
-    <p:sldId id="553" r:id="rId38"/>
-    <p:sldId id="574" r:id="rId39"/>
-    <p:sldId id="573" r:id="rId40"/>
-    <p:sldId id="575" r:id="rId41"/>
-    <p:sldId id="534" r:id="rId42"/>
-    <p:sldId id="505" r:id="rId43"/>
-    <p:sldId id="535" r:id="rId44"/>
-    <p:sldId id="576" r:id="rId45"/>
-    <p:sldId id="507" r:id="rId46"/>
-    <p:sldId id="536" r:id="rId47"/>
-    <p:sldId id="580" r:id="rId48"/>
-    <p:sldId id="538" r:id="rId49"/>
-    <p:sldId id="539" r:id="rId50"/>
-    <p:sldId id="577" r:id="rId51"/>
-    <p:sldId id="537" r:id="rId52"/>
-    <p:sldId id="551" r:id="rId53"/>
-    <p:sldId id="552" r:id="rId54"/>
-    <p:sldId id="581" r:id="rId55"/>
-    <p:sldId id="501" r:id="rId56"/>
-    <p:sldId id="529" r:id="rId57"/>
-    <p:sldId id="546" r:id="rId58"/>
-    <p:sldId id="502" r:id="rId59"/>
-    <p:sldId id="503" r:id="rId60"/>
-    <p:sldId id="584" r:id="rId61"/>
-    <p:sldId id="586" r:id="rId62"/>
-    <p:sldId id="531" r:id="rId63"/>
-    <p:sldId id="585" r:id="rId64"/>
-    <p:sldId id="554" r:id="rId65"/>
-    <p:sldId id="530" r:id="rId66"/>
-    <p:sldId id="555" r:id="rId67"/>
-    <p:sldId id="556" r:id="rId68"/>
-    <p:sldId id="557" r:id="rId69"/>
-    <p:sldId id="558" r:id="rId70"/>
-    <p:sldId id="559" r:id="rId71"/>
-    <p:sldId id="564" r:id="rId72"/>
-    <p:sldId id="561" r:id="rId73"/>
-    <p:sldId id="565" r:id="rId74"/>
-    <p:sldId id="566" r:id="rId75"/>
-    <p:sldId id="568" r:id="rId76"/>
-    <p:sldId id="583" r:id="rId77"/>
+    <p:sldId id="550" r:id="rId24"/>
+    <p:sldId id="579" r:id="rId25"/>
+    <p:sldId id="519" r:id="rId26"/>
+    <p:sldId id="524" r:id="rId27"/>
+    <p:sldId id="521" r:id="rId28"/>
+    <p:sldId id="522" r:id="rId29"/>
+    <p:sldId id="525" r:id="rId30"/>
+    <p:sldId id="523" r:id="rId31"/>
+    <p:sldId id="520" r:id="rId32"/>
+    <p:sldId id="526" r:id="rId33"/>
+    <p:sldId id="540" r:id="rId34"/>
+    <p:sldId id="500" r:id="rId35"/>
+    <p:sldId id="553" r:id="rId36"/>
+    <p:sldId id="574" r:id="rId37"/>
+    <p:sldId id="573" r:id="rId38"/>
+    <p:sldId id="575" r:id="rId39"/>
+    <p:sldId id="534" r:id="rId40"/>
+    <p:sldId id="505" r:id="rId41"/>
+    <p:sldId id="535" r:id="rId42"/>
+    <p:sldId id="576" r:id="rId43"/>
+    <p:sldId id="507" r:id="rId44"/>
+    <p:sldId id="536" r:id="rId45"/>
+    <p:sldId id="580" r:id="rId46"/>
+    <p:sldId id="538" r:id="rId47"/>
+    <p:sldId id="539" r:id="rId48"/>
+    <p:sldId id="577" r:id="rId49"/>
+    <p:sldId id="537" r:id="rId50"/>
+    <p:sldId id="551" r:id="rId51"/>
+    <p:sldId id="552" r:id="rId52"/>
+    <p:sldId id="581" r:id="rId53"/>
+    <p:sldId id="501" r:id="rId54"/>
+    <p:sldId id="529" r:id="rId55"/>
+    <p:sldId id="546" r:id="rId56"/>
+    <p:sldId id="502" r:id="rId57"/>
+    <p:sldId id="503" r:id="rId58"/>
+    <p:sldId id="584" r:id="rId59"/>
+    <p:sldId id="586" r:id="rId60"/>
+    <p:sldId id="531" r:id="rId61"/>
+    <p:sldId id="585" r:id="rId62"/>
+    <p:sldId id="554" r:id="rId63"/>
+    <p:sldId id="530" r:id="rId64"/>
+    <p:sldId id="555" r:id="rId65"/>
+    <p:sldId id="556" r:id="rId66"/>
+    <p:sldId id="557" r:id="rId67"/>
+    <p:sldId id="558" r:id="rId68"/>
+    <p:sldId id="559" r:id="rId69"/>
+    <p:sldId id="564" r:id="rId70"/>
+    <p:sldId id="561" r:id="rId71"/>
+    <p:sldId id="565" r:id="rId72"/>
+    <p:sldId id="566" r:id="rId73"/>
+    <p:sldId id="568" r:id="rId74"/>
+    <p:sldId id="588" r:id="rId75"/>
+    <p:sldId id="587" r:id="rId76"/>
   </p:sldIdLst>
   <p:sldSz cx="12192000" cy="6858000"/>
   <p:notesSz cx="6858000" cy="9144000"/>
@@ -213,20 +212,6 @@
 </p:cmAuthorLst>
 </file>
 
-<file path=ppt/comments/comment1.xml><?xml version="1.0" encoding="utf-8"?>
-<p:cmLst xmlns:a="http://schemas.openxmlformats.org/drawingml/2006/main" xmlns:r="http://schemas.openxmlformats.org/officeDocument/2006/relationships" xmlns:p="http://schemas.openxmlformats.org/presentationml/2006/main">
-  <p:cm authorId="1" dt="2016-12-27T21:40:50.582" idx="1">
-    <p:pos x="10" y="10"/>
-    <p:text/>
-    <p:extLst>
-      <p:ext uri="{C676402C-5697-4E1C-873F-D02D1690AC5C}">
-        <p15:threadingInfo xmlns:p15="http://schemas.microsoft.com/office/powerpoint/2012/main" timeZoneBias="300"/>
-      </p:ext>
-    </p:extLst>
-  </p:cm>
-</p:cmLst>
-</file>
-
 <file path=ppt/notesMasters/notesMaster1.xml><?xml version="1.0" encoding="utf-8"?>
 <p:notesMaster xmlns:a="http://schemas.openxmlformats.org/drawingml/2006/main" xmlns:r="http://schemas.openxmlformats.org/officeDocument/2006/relationships" xmlns:p="http://schemas.openxmlformats.org/presentationml/2006/main">
   <p:cSld>
@@ -309,7 +294,7 @@
           <a:p>
             <a:fld id="{C54A4886-B4AF-42F7-97BE-95CDF82A73E3}" type="datetimeFigureOut">
               <a:rPr lang="en-US" smtClean="0"/>
-              <a:t>1/6/2017</a:t>
+              <a:t>1/8/2017</a:t>
             </a:fld>
             <a:endParaRPr lang="en-US"/>
           </a:p>
@@ -1994,7 +1979,7 @@
     </p:spTree>
     <p:extLst>
       <p:ext uri="{BB962C8B-B14F-4D97-AF65-F5344CB8AC3E}">
-        <p14:creationId xmlns:p14="http://schemas.microsoft.com/office/powerpoint/2010/main" val="532131523"/>
+        <p14:creationId xmlns:p14="http://schemas.microsoft.com/office/powerpoint/2010/main" val="3797934880"/>
       </p:ext>
     </p:extLst>
   </p:cSld>
@@ -2078,7 +2063,7 @@
     </p:spTree>
     <p:extLst>
       <p:ext uri="{BB962C8B-B14F-4D97-AF65-F5344CB8AC3E}">
-        <p14:creationId xmlns:p14="http://schemas.microsoft.com/office/powerpoint/2010/main" val="2847908271"/>
+        <p14:creationId xmlns:p14="http://schemas.microsoft.com/office/powerpoint/2010/main" val="920834877"/>
       </p:ext>
     </p:extLst>
   </p:cSld>
@@ -2132,32 +2117,7 @@
           <a:bodyPr/>
           <a:lstStyle/>
           <a:p>
-            <a:pPr marL="0" marR="0" indent="0" algn="l" defTabSz="914400" rtl="0" eaLnBrk="1" fontAlgn="auto" latinLnBrk="0" hangingPunct="1">
-              <a:lnSpc>
-                <a:spcPct val="100000"/>
-              </a:lnSpc>
-              <a:spcBef>
-                <a:spcPts val="0"/>
-              </a:spcBef>
-              <a:spcAft>
-                <a:spcPts val="0"/>
-              </a:spcAft>
-              <a:buClrTx/>
-              <a:buSzTx/>
-              <a:buFontTx/>
-              <a:buNone/>
-              <a:tabLst/>
-              <a:defRPr/>
-            </a:pPr>
-            <a:endParaRPr lang="en-US" sz="1200" kern="1200" dirty="0" smtClean="0">
-              <a:solidFill>
-                <a:schemeClr val="tx1"/>
-              </a:solidFill>
-              <a:effectLst/>
-              <a:latin typeface="+mn-lt"/>
-              <a:ea typeface="+mn-ea"/>
-              <a:cs typeface="+mn-cs"/>
-            </a:endParaRPr>
+            <a:endParaRPr lang="en-US" b="0" dirty="0" smtClean="0"/>
           </a:p>
         </p:txBody>
       </p:sp>
@@ -2187,7 +2147,7 @@
     </p:spTree>
     <p:extLst>
       <p:ext uri="{BB962C8B-B14F-4D97-AF65-F5344CB8AC3E}">
-        <p14:creationId xmlns:p14="http://schemas.microsoft.com/office/powerpoint/2010/main" val="3797934880"/>
+        <p14:creationId xmlns:p14="http://schemas.microsoft.com/office/powerpoint/2010/main" val="1777663287"/>
       </p:ext>
     </p:extLst>
   </p:cSld>
@@ -2271,7 +2231,7 @@
     </p:spTree>
     <p:extLst>
       <p:ext uri="{BB962C8B-B14F-4D97-AF65-F5344CB8AC3E}">
-        <p14:creationId xmlns:p14="http://schemas.microsoft.com/office/powerpoint/2010/main" val="920834877"/>
+        <p14:creationId xmlns:p14="http://schemas.microsoft.com/office/powerpoint/2010/main" val="128284815"/>
       </p:ext>
     </p:extLst>
   </p:cSld>
@@ -2355,7 +2315,7 @@
     </p:spTree>
     <p:extLst>
       <p:ext uri="{BB962C8B-B14F-4D97-AF65-F5344CB8AC3E}">
-        <p14:creationId xmlns:p14="http://schemas.microsoft.com/office/powerpoint/2010/main" val="1777663287"/>
+        <p14:creationId xmlns:p14="http://schemas.microsoft.com/office/powerpoint/2010/main" val="1266200327"/>
       </p:ext>
     </p:extLst>
   </p:cSld>
@@ -2439,7 +2399,7 @@
     </p:spTree>
     <p:extLst>
       <p:ext uri="{BB962C8B-B14F-4D97-AF65-F5344CB8AC3E}">
-        <p14:creationId xmlns:p14="http://schemas.microsoft.com/office/powerpoint/2010/main" val="128284815"/>
+        <p14:creationId xmlns:p14="http://schemas.microsoft.com/office/powerpoint/2010/main" val="3516029556"/>
       </p:ext>
     </p:extLst>
   </p:cSld>
@@ -2523,7 +2483,7 @@
     </p:spTree>
     <p:extLst>
       <p:ext uri="{BB962C8B-B14F-4D97-AF65-F5344CB8AC3E}">
-        <p14:creationId xmlns:p14="http://schemas.microsoft.com/office/powerpoint/2010/main" val="1266200327"/>
+        <p14:creationId xmlns:p14="http://schemas.microsoft.com/office/powerpoint/2010/main" val="3404565588"/>
       </p:ext>
     </p:extLst>
   </p:cSld>
@@ -2716,7 +2676,7 @@
     </p:spTree>
     <p:extLst>
       <p:ext uri="{BB962C8B-B14F-4D97-AF65-F5344CB8AC3E}">
-        <p14:creationId xmlns:p14="http://schemas.microsoft.com/office/powerpoint/2010/main" val="3516029556"/>
+        <p14:creationId xmlns:p14="http://schemas.microsoft.com/office/powerpoint/2010/main" val="2712589128"/>
       </p:ext>
     </p:extLst>
   </p:cSld>
@@ -2800,7 +2760,7 @@
     </p:spTree>
     <p:extLst>
       <p:ext uri="{BB962C8B-B14F-4D97-AF65-F5344CB8AC3E}">
-        <p14:creationId xmlns:p14="http://schemas.microsoft.com/office/powerpoint/2010/main" val="3404565588"/>
+        <p14:creationId xmlns:p14="http://schemas.microsoft.com/office/powerpoint/2010/main" val="1609105756"/>
       </p:ext>
     </p:extLst>
   </p:cSld>
@@ -2884,7 +2844,7 @@
     </p:spTree>
     <p:extLst>
       <p:ext uri="{BB962C8B-B14F-4D97-AF65-F5344CB8AC3E}">
-        <p14:creationId xmlns:p14="http://schemas.microsoft.com/office/powerpoint/2010/main" val="2712589128"/>
+        <p14:creationId xmlns:p14="http://schemas.microsoft.com/office/powerpoint/2010/main" val="4079219210"/>
       </p:ext>
     </p:extLst>
   </p:cSld>
@@ -2938,7 +2898,32 @@
           <a:bodyPr/>
           <a:lstStyle/>
           <a:p>
-            <a:endParaRPr lang="en-US" b="0" dirty="0" smtClean="0"/>
+            <a:pPr marL="0" marR="0" indent="0" algn="l" defTabSz="914400" rtl="0" eaLnBrk="1" fontAlgn="auto" latinLnBrk="0" hangingPunct="1">
+              <a:lnSpc>
+                <a:spcPct val="100000"/>
+              </a:lnSpc>
+              <a:spcBef>
+                <a:spcPts val="0"/>
+              </a:spcBef>
+              <a:spcAft>
+                <a:spcPts val="0"/>
+              </a:spcAft>
+              <a:buClrTx/>
+              <a:buSzTx/>
+              <a:buFontTx/>
+              <a:buNone/>
+              <a:tabLst/>
+              <a:defRPr/>
+            </a:pPr>
+            <a:endParaRPr lang="en-US" sz="1200" kern="1200" dirty="0" smtClean="0">
+              <a:solidFill>
+                <a:schemeClr val="tx1"/>
+              </a:solidFill>
+              <a:effectLst/>
+              <a:latin typeface="+mn-lt"/>
+              <a:ea typeface="+mn-ea"/>
+              <a:cs typeface="+mn-cs"/>
+            </a:endParaRPr>
           </a:p>
         </p:txBody>
       </p:sp>
@@ -2968,7 +2953,7 @@
     </p:spTree>
     <p:extLst>
       <p:ext uri="{BB962C8B-B14F-4D97-AF65-F5344CB8AC3E}">
-        <p14:creationId xmlns:p14="http://schemas.microsoft.com/office/powerpoint/2010/main" val="1609105756"/>
+        <p14:creationId xmlns:p14="http://schemas.microsoft.com/office/powerpoint/2010/main" val="1830730383"/>
       </p:ext>
     </p:extLst>
   </p:cSld>
@@ -3052,7 +3037,7 @@
     </p:spTree>
     <p:extLst>
       <p:ext uri="{BB962C8B-B14F-4D97-AF65-F5344CB8AC3E}">
-        <p14:creationId xmlns:p14="http://schemas.microsoft.com/office/powerpoint/2010/main" val="4079219210"/>
+        <p14:creationId xmlns:p14="http://schemas.microsoft.com/office/powerpoint/2010/main" val="1561525116"/>
       </p:ext>
     </p:extLst>
   </p:cSld>
@@ -3106,6 +3091,342 @@
           <a:bodyPr/>
           <a:lstStyle/>
           <a:p>
+            <a:endParaRPr lang="en-US" b="0" dirty="0" smtClean="0"/>
+          </a:p>
+        </p:txBody>
+      </p:sp>
+      <p:sp>
+        <p:nvSpPr>
+          <p:cNvPr id="4" name="Slide Number Placeholder 3"/>
+          <p:cNvSpPr>
+            <a:spLocks noGrp="1"/>
+          </p:cNvSpPr>
+          <p:nvPr>
+            <p:ph type="sldNum" sz="quarter" idx="10"/>
+          </p:nvPr>
+        </p:nvSpPr>
+        <p:spPr/>
+        <p:txBody>
+          <a:bodyPr/>
+          <a:lstStyle/>
+          <a:p>
+            <a:fld id="{89029652-62E7-43D6-83B5-097D7B7AA5D8}" type="slidenum">
+              <a:rPr lang="en-US" smtClean="0"/>
+              <a:t>35</a:t>
+            </a:fld>
+            <a:endParaRPr lang="en-US"/>
+          </a:p>
+        </p:txBody>
+      </p:sp>
+    </p:spTree>
+    <p:extLst>
+      <p:ext uri="{BB962C8B-B14F-4D97-AF65-F5344CB8AC3E}">
+        <p14:creationId xmlns:p14="http://schemas.microsoft.com/office/powerpoint/2010/main" val="1514808285"/>
+      </p:ext>
+    </p:extLst>
+  </p:cSld>
+  <p:clrMapOvr>
+    <a:masterClrMapping/>
+  </p:clrMapOvr>
+</p:notes>
+</file>
+
+<file path=ppt/notesSlides/notesSlide36.xml><?xml version="1.0" encoding="utf-8"?>
+<p:notes xmlns:a="http://schemas.openxmlformats.org/drawingml/2006/main" xmlns:r="http://schemas.openxmlformats.org/officeDocument/2006/relationships" xmlns:p="http://schemas.openxmlformats.org/presentationml/2006/main">
+  <p:cSld>
+    <p:spTree>
+      <p:nvGrpSpPr>
+        <p:cNvPr id="1" name=""/>
+        <p:cNvGrpSpPr/>
+        <p:nvPr/>
+      </p:nvGrpSpPr>
+      <p:grpSpPr>
+        <a:xfrm>
+          <a:off x="0" y="0"/>
+          <a:ext cx="0" cy="0"/>
+          <a:chOff x="0" y="0"/>
+          <a:chExt cx="0" cy="0"/>
+        </a:xfrm>
+      </p:grpSpPr>
+      <p:sp>
+        <p:nvSpPr>
+          <p:cNvPr id="2" name="Slide Image Placeholder 1"/>
+          <p:cNvSpPr>
+            <a:spLocks noGrp="1" noRot="1" noChangeAspect="1"/>
+          </p:cNvSpPr>
+          <p:nvPr>
+            <p:ph type="sldImg"/>
+          </p:nvPr>
+        </p:nvSpPr>
+        <p:spPr/>
+      </p:sp>
+      <p:sp>
+        <p:nvSpPr>
+          <p:cNvPr id="3" name="Notes Placeholder 2"/>
+          <p:cNvSpPr>
+            <a:spLocks noGrp="1"/>
+          </p:cNvSpPr>
+          <p:nvPr>
+            <p:ph type="body" idx="1"/>
+          </p:nvPr>
+        </p:nvSpPr>
+        <p:spPr/>
+        <p:txBody>
+          <a:bodyPr/>
+          <a:lstStyle/>
+          <a:p>
+            <a:endParaRPr lang="en-US" b="0" dirty="0" smtClean="0"/>
+          </a:p>
+        </p:txBody>
+      </p:sp>
+      <p:sp>
+        <p:nvSpPr>
+          <p:cNvPr id="4" name="Slide Number Placeholder 3"/>
+          <p:cNvSpPr>
+            <a:spLocks noGrp="1"/>
+          </p:cNvSpPr>
+          <p:nvPr>
+            <p:ph type="sldNum" sz="quarter" idx="10"/>
+          </p:nvPr>
+        </p:nvSpPr>
+        <p:spPr/>
+        <p:txBody>
+          <a:bodyPr/>
+          <a:lstStyle/>
+          <a:p>
+            <a:fld id="{89029652-62E7-43D6-83B5-097D7B7AA5D8}" type="slidenum">
+              <a:rPr lang="en-US" smtClean="0"/>
+              <a:t>36</a:t>
+            </a:fld>
+            <a:endParaRPr lang="en-US"/>
+          </a:p>
+        </p:txBody>
+      </p:sp>
+    </p:spTree>
+    <p:extLst>
+      <p:ext uri="{BB962C8B-B14F-4D97-AF65-F5344CB8AC3E}">
+        <p14:creationId xmlns:p14="http://schemas.microsoft.com/office/powerpoint/2010/main" val="3263699449"/>
+      </p:ext>
+    </p:extLst>
+  </p:cSld>
+  <p:clrMapOvr>
+    <a:masterClrMapping/>
+  </p:clrMapOvr>
+</p:notes>
+</file>
+
+<file path=ppt/notesSlides/notesSlide37.xml><?xml version="1.0" encoding="utf-8"?>
+<p:notes xmlns:a="http://schemas.openxmlformats.org/drawingml/2006/main" xmlns:r="http://schemas.openxmlformats.org/officeDocument/2006/relationships" xmlns:p="http://schemas.openxmlformats.org/presentationml/2006/main">
+  <p:cSld>
+    <p:spTree>
+      <p:nvGrpSpPr>
+        <p:cNvPr id="1" name=""/>
+        <p:cNvGrpSpPr/>
+        <p:nvPr/>
+      </p:nvGrpSpPr>
+      <p:grpSpPr>
+        <a:xfrm>
+          <a:off x="0" y="0"/>
+          <a:ext cx="0" cy="0"/>
+          <a:chOff x="0" y="0"/>
+          <a:chExt cx="0" cy="0"/>
+        </a:xfrm>
+      </p:grpSpPr>
+      <p:sp>
+        <p:nvSpPr>
+          <p:cNvPr id="2" name="Slide Image Placeholder 1"/>
+          <p:cNvSpPr>
+            <a:spLocks noGrp="1" noRot="1" noChangeAspect="1"/>
+          </p:cNvSpPr>
+          <p:nvPr>
+            <p:ph type="sldImg"/>
+          </p:nvPr>
+        </p:nvSpPr>
+        <p:spPr/>
+      </p:sp>
+      <p:sp>
+        <p:nvSpPr>
+          <p:cNvPr id="3" name="Notes Placeholder 2"/>
+          <p:cNvSpPr>
+            <a:spLocks noGrp="1"/>
+          </p:cNvSpPr>
+          <p:nvPr>
+            <p:ph type="body" idx="1"/>
+          </p:nvPr>
+        </p:nvSpPr>
+        <p:spPr/>
+        <p:txBody>
+          <a:bodyPr/>
+          <a:lstStyle/>
+          <a:p>
+            <a:endParaRPr lang="en-US" b="0" dirty="0" smtClean="0"/>
+          </a:p>
+        </p:txBody>
+      </p:sp>
+      <p:sp>
+        <p:nvSpPr>
+          <p:cNvPr id="4" name="Slide Number Placeholder 3"/>
+          <p:cNvSpPr>
+            <a:spLocks noGrp="1"/>
+          </p:cNvSpPr>
+          <p:nvPr>
+            <p:ph type="sldNum" sz="quarter" idx="10"/>
+          </p:nvPr>
+        </p:nvSpPr>
+        <p:spPr/>
+        <p:txBody>
+          <a:bodyPr/>
+          <a:lstStyle/>
+          <a:p>
+            <a:fld id="{89029652-62E7-43D6-83B5-097D7B7AA5D8}" type="slidenum">
+              <a:rPr lang="en-US" smtClean="0"/>
+              <a:t>37</a:t>
+            </a:fld>
+            <a:endParaRPr lang="en-US"/>
+          </a:p>
+        </p:txBody>
+      </p:sp>
+    </p:spTree>
+    <p:extLst>
+      <p:ext uri="{BB962C8B-B14F-4D97-AF65-F5344CB8AC3E}">
+        <p14:creationId xmlns:p14="http://schemas.microsoft.com/office/powerpoint/2010/main" val="1255163866"/>
+      </p:ext>
+    </p:extLst>
+  </p:cSld>
+  <p:clrMapOvr>
+    <a:masterClrMapping/>
+  </p:clrMapOvr>
+</p:notes>
+</file>
+
+<file path=ppt/notesSlides/notesSlide38.xml><?xml version="1.0" encoding="utf-8"?>
+<p:notes xmlns:a="http://schemas.openxmlformats.org/drawingml/2006/main" xmlns:r="http://schemas.openxmlformats.org/officeDocument/2006/relationships" xmlns:p="http://schemas.openxmlformats.org/presentationml/2006/main">
+  <p:cSld>
+    <p:spTree>
+      <p:nvGrpSpPr>
+        <p:cNvPr id="1" name=""/>
+        <p:cNvGrpSpPr/>
+        <p:nvPr/>
+      </p:nvGrpSpPr>
+      <p:grpSpPr>
+        <a:xfrm>
+          <a:off x="0" y="0"/>
+          <a:ext cx="0" cy="0"/>
+          <a:chOff x="0" y="0"/>
+          <a:chExt cx="0" cy="0"/>
+        </a:xfrm>
+      </p:grpSpPr>
+      <p:sp>
+        <p:nvSpPr>
+          <p:cNvPr id="2" name="Slide Image Placeholder 1"/>
+          <p:cNvSpPr>
+            <a:spLocks noGrp="1" noRot="1" noChangeAspect="1"/>
+          </p:cNvSpPr>
+          <p:nvPr>
+            <p:ph type="sldImg"/>
+          </p:nvPr>
+        </p:nvSpPr>
+        <p:spPr/>
+      </p:sp>
+      <p:sp>
+        <p:nvSpPr>
+          <p:cNvPr id="3" name="Notes Placeholder 2"/>
+          <p:cNvSpPr>
+            <a:spLocks noGrp="1"/>
+          </p:cNvSpPr>
+          <p:nvPr>
+            <p:ph type="body" idx="1"/>
+          </p:nvPr>
+        </p:nvSpPr>
+        <p:spPr/>
+        <p:txBody>
+          <a:bodyPr/>
+          <a:lstStyle/>
+          <a:p>
+            <a:endParaRPr lang="en-US" b="0" dirty="0" smtClean="0"/>
+          </a:p>
+        </p:txBody>
+      </p:sp>
+      <p:sp>
+        <p:nvSpPr>
+          <p:cNvPr id="4" name="Slide Number Placeholder 3"/>
+          <p:cNvSpPr>
+            <a:spLocks noGrp="1"/>
+          </p:cNvSpPr>
+          <p:nvPr>
+            <p:ph type="sldNum" sz="quarter" idx="10"/>
+          </p:nvPr>
+        </p:nvSpPr>
+        <p:spPr/>
+        <p:txBody>
+          <a:bodyPr/>
+          <a:lstStyle/>
+          <a:p>
+            <a:fld id="{89029652-62E7-43D6-83B5-097D7B7AA5D8}" type="slidenum">
+              <a:rPr lang="en-US" smtClean="0"/>
+              <a:t>38</a:t>
+            </a:fld>
+            <a:endParaRPr lang="en-US"/>
+          </a:p>
+        </p:txBody>
+      </p:sp>
+    </p:spTree>
+    <p:extLst>
+      <p:ext uri="{BB962C8B-B14F-4D97-AF65-F5344CB8AC3E}">
+        <p14:creationId xmlns:p14="http://schemas.microsoft.com/office/powerpoint/2010/main" val="532748052"/>
+      </p:ext>
+    </p:extLst>
+  </p:cSld>
+  <p:clrMapOvr>
+    <a:masterClrMapping/>
+  </p:clrMapOvr>
+</p:notes>
+</file>
+
+<file path=ppt/notesSlides/notesSlide39.xml><?xml version="1.0" encoding="utf-8"?>
+<p:notes xmlns:a="http://schemas.openxmlformats.org/drawingml/2006/main" xmlns:r="http://schemas.openxmlformats.org/officeDocument/2006/relationships" xmlns:p="http://schemas.openxmlformats.org/presentationml/2006/main">
+  <p:cSld>
+    <p:spTree>
+      <p:nvGrpSpPr>
+        <p:cNvPr id="1" name=""/>
+        <p:cNvGrpSpPr/>
+        <p:nvPr/>
+      </p:nvGrpSpPr>
+      <p:grpSpPr>
+        <a:xfrm>
+          <a:off x="0" y="0"/>
+          <a:ext cx="0" cy="0"/>
+          <a:chOff x="0" y="0"/>
+          <a:chExt cx="0" cy="0"/>
+        </a:xfrm>
+      </p:grpSpPr>
+      <p:sp>
+        <p:nvSpPr>
+          <p:cNvPr id="2" name="Slide Image Placeholder 1"/>
+          <p:cNvSpPr>
+            <a:spLocks noGrp="1" noRot="1" noChangeAspect="1"/>
+          </p:cNvSpPr>
+          <p:nvPr>
+            <p:ph type="sldImg"/>
+          </p:nvPr>
+        </p:nvSpPr>
+        <p:spPr/>
+      </p:sp>
+      <p:sp>
+        <p:nvSpPr>
+          <p:cNvPr id="3" name="Notes Placeholder 2"/>
+          <p:cNvSpPr>
+            <a:spLocks noGrp="1"/>
+          </p:cNvSpPr>
+          <p:nvPr>
+            <p:ph type="body" idx="1"/>
+          </p:nvPr>
+        </p:nvSpPr>
+        <p:spPr/>
+        <p:txBody>
+          <a:bodyPr/>
+          <a:lstStyle/>
+          <a:p>
             <a:pPr marL="0" marR="0" indent="0" algn="l" defTabSz="914400" rtl="0" eaLnBrk="1" fontAlgn="auto" latinLnBrk="0" hangingPunct="1">
               <a:lnSpc>
                 <a:spcPct val="100000"/>
@@ -3152,7 +3473,7 @@
           <a:p>
             <a:fld id="{89029652-62E7-43D6-83B5-097D7B7AA5D8}" type="slidenum">
               <a:rPr lang="en-US" smtClean="0"/>
-              <a:t>35</a:t>
+              <a:t>39</a:t>
             </a:fld>
             <a:endParaRPr lang="en-US"/>
           </a:p>
@@ -3161,343 +3482,7 @@
     </p:spTree>
     <p:extLst>
       <p:ext uri="{BB962C8B-B14F-4D97-AF65-F5344CB8AC3E}">
-        <p14:creationId xmlns:p14="http://schemas.microsoft.com/office/powerpoint/2010/main" val="1830730383"/>
-      </p:ext>
-    </p:extLst>
-  </p:cSld>
-  <p:clrMapOvr>
-    <a:masterClrMapping/>
-  </p:clrMapOvr>
-</p:notes>
-</file>
-
-<file path=ppt/notesSlides/notesSlide36.xml><?xml version="1.0" encoding="utf-8"?>
-<p:notes xmlns:a="http://schemas.openxmlformats.org/drawingml/2006/main" xmlns:r="http://schemas.openxmlformats.org/officeDocument/2006/relationships" xmlns:p="http://schemas.openxmlformats.org/presentationml/2006/main">
-  <p:cSld>
-    <p:spTree>
-      <p:nvGrpSpPr>
-        <p:cNvPr id="1" name=""/>
-        <p:cNvGrpSpPr/>
-        <p:nvPr/>
-      </p:nvGrpSpPr>
-      <p:grpSpPr>
-        <a:xfrm>
-          <a:off x="0" y="0"/>
-          <a:ext cx="0" cy="0"/>
-          <a:chOff x="0" y="0"/>
-          <a:chExt cx="0" cy="0"/>
-        </a:xfrm>
-      </p:grpSpPr>
-      <p:sp>
-        <p:nvSpPr>
-          <p:cNvPr id="2" name="Slide Image Placeholder 1"/>
-          <p:cNvSpPr>
-            <a:spLocks noGrp="1" noRot="1" noChangeAspect="1"/>
-          </p:cNvSpPr>
-          <p:nvPr>
-            <p:ph type="sldImg"/>
-          </p:nvPr>
-        </p:nvSpPr>
-        <p:spPr/>
-      </p:sp>
-      <p:sp>
-        <p:nvSpPr>
-          <p:cNvPr id="3" name="Notes Placeholder 2"/>
-          <p:cNvSpPr>
-            <a:spLocks noGrp="1"/>
-          </p:cNvSpPr>
-          <p:nvPr>
-            <p:ph type="body" idx="1"/>
-          </p:nvPr>
-        </p:nvSpPr>
-        <p:spPr/>
-        <p:txBody>
-          <a:bodyPr/>
-          <a:lstStyle/>
-          <a:p>
-            <a:endParaRPr lang="en-US" b="0" dirty="0" smtClean="0"/>
-          </a:p>
-        </p:txBody>
-      </p:sp>
-      <p:sp>
-        <p:nvSpPr>
-          <p:cNvPr id="4" name="Slide Number Placeholder 3"/>
-          <p:cNvSpPr>
-            <a:spLocks noGrp="1"/>
-          </p:cNvSpPr>
-          <p:nvPr>
-            <p:ph type="sldNum" sz="quarter" idx="10"/>
-          </p:nvPr>
-        </p:nvSpPr>
-        <p:spPr/>
-        <p:txBody>
-          <a:bodyPr/>
-          <a:lstStyle/>
-          <a:p>
-            <a:fld id="{89029652-62E7-43D6-83B5-097D7B7AA5D8}" type="slidenum">
-              <a:rPr lang="en-US" smtClean="0"/>
-              <a:t>36</a:t>
-            </a:fld>
-            <a:endParaRPr lang="en-US"/>
-          </a:p>
-        </p:txBody>
-      </p:sp>
-    </p:spTree>
-    <p:extLst>
-      <p:ext uri="{BB962C8B-B14F-4D97-AF65-F5344CB8AC3E}">
-        <p14:creationId xmlns:p14="http://schemas.microsoft.com/office/powerpoint/2010/main" val="1561525116"/>
-      </p:ext>
-    </p:extLst>
-  </p:cSld>
-  <p:clrMapOvr>
-    <a:masterClrMapping/>
-  </p:clrMapOvr>
-</p:notes>
-</file>
-
-<file path=ppt/notesSlides/notesSlide37.xml><?xml version="1.0" encoding="utf-8"?>
-<p:notes xmlns:a="http://schemas.openxmlformats.org/drawingml/2006/main" xmlns:r="http://schemas.openxmlformats.org/officeDocument/2006/relationships" xmlns:p="http://schemas.openxmlformats.org/presentationml/2006/main">
-  <p:cSld>
-    <p:spTree>
-      <p:nvGrpSpPr>
-        <p:cNvPr id="1" name=""/>
-        <p:cNvGrpSpPr/>
-        <p:nvPr/>
-      </p:nvGrpSpPr>
-      <p:grpSpPr>
-        <a:xfrm>
-          <a:off x="0" y="0"/>
-          <a:ext cx="0" cy="0"/>
-          <a:chOff x="0" y="0"/>
-          <a:chExt cx="0" cy="0"/>
-        </a:xfrm>
-      </p:grpSpPr>
-      <p:sp>
-        <p:nvSpPr>
-          <p:cNvPr id="2" name="Slide Image Placeholder 1"/>
-          <p:cNvSpPr>
-            <a:spLocks noGrp="1" noRot="1" noChangeAspect="1"/>
-          </p:cNvSpPr>
-          <p:nvPr>
-            <p:ph type="sldImg"/>
-          </p:nvPr>
-        </p:nvSpPr>
-        <p:spPr/>
-      </p:sp>
-      <p:sp>
-        <p:nvSpPr>
-          <p:cNvPr id="3" name="Notes Placeholder 2"/>
-          <p:cNvSpPr>
-            <a:spLocks noGrp="1"/>
-          </p:cNvSpPr>
-          <p:nvPr>
-            <p:ph type="body" idx="1"/>
-          </p:nvPr>
-        </p:nvSpPr>
-        <p:spPr/>
-        <p:txBody>
-          <a:bodyPr/>
-          <a:lstStyle/>
-          <a:p>
-            <a:endParaRPr lang="en-US" b="0" dirty="0" smtClean="0"/>
-          </a:p>
-        </p:txBody>
-      </p:sp>
-      <p:sp>
-        <p:nvSpPr>
-          <p:cNvPr id="4" name="Slide Number Placeholder 3"/>
-          <p:cNvSpPr>
-            <a:spLocks noGrp="1"/>
-          </p:cNvSpPr>
-          <p:nvPr>
-            <p:ph type="sldNum" sz="quarter" idx="10"/>
-          </p:nvPr>
-        </p:nvSpPr>
-        <p:spPr/>
-        <p:txBody>
-          <a:bodyPr/>
-          <a:lstStyle/>
-          <a:p>
-            <a:fld id="{89029652-62E7-43D6-83B5-097D7B7AA5D8}" type="slidenum">
-              <a:rPr lang="en-US" smtClean="0"/>
-              <a:t>37</a:t>
-            </a:fld>
-            <a:endParaRPr lang="en-US"/>
-          </a:p>
-        </p:txBody>
-      </p:sp>
-    </p:spTree>
-    <p:extLst>
-      <p:ext uri="{BB962C8B-B14F-4D97-AF65-F5344CB8AC3E}">
-        <p14:creationId xmlns:p14="http://schemas.microsoft.com/office/powerpoint/2010/main" val="1514808285"/>
-      </p:ext>
-    </p:extLst>
-  </p:cSld>
-  <p:clrMapOvr>
-    <a:masterClrMapping/>
-  </p:clrMapOvr>
-</p:notes>
-</file>
-
-<file path=ppt/notesSlides/notesSlide38.xml><?xml version="1.0" encoding="utf-8"?>
-<p:notes xmlns:a="http://schemas.openxmlformats.org/drawingml/2006/main" xmlns:r="http://schemas.openxmlformats.org/officeDocument/2006/relationships" xmlns:p="http://schemas.openxmlformats.org/presentationml/2006/main">
-  <p:cSld>
-    <p:spTree>
-      <p:nvGrpSpPr>
-        <p:cNvPr id="1" name=""/>
-        <p:cNvGrpSpPr/>
-        <p:nvPr/>
-      </p:nvGrpSpPr>
-      <p:grpSpPr>
-        <a:xfrm>
-          <a:off x="0" y="0"/>
-          <a:ext cx="0" cy="0"/>
-          <a:chOff x="0" y="0"/>
-          <a:chExt cx="0" cy="0"/>
-        </a:xfrm>
-      </p:grpSpPr>
-      <p:sp>
-        <p:nvSpPr>
-          <p:cNvPr id="2" name="Slide Image Placeholder 1"/>
-          <p:cNvSpPr>
-            <a:spLocks noGrp="1" noRot="1" noChangeAspect="1"/>
-          </p:cNvSpPr>
-          <p:nvPr>
-            <p:ph type="sldImg"/>
-          </p:nvPr>
-        </p:nvSpPr>
-        <p:spPr/>
-      </p:sp>
-      <p:sp>
-        <p:nvSpPr>
-          <p:cNvPr id="3" name="Notes Placeholder 2"/>
-          <p:cNvSpPr>
-            <a:spLocks noGrp="1"/>
-          </p:cNvSpPr>
-          <p:nvPr>
-            <p:ph type="body" idx="1"/>
-          </p:nvPr>
-        </p:nvSpPr>
-        <p:spPr/>
-        <p:txBody>
-          <a:bodyPr/>
-          <a:lstStyle/>
-          <a:p>
-            <a:endParaRPr lang="en-US" b="0" dirty="0" smtClean="0"/>
-          </a:p>
-        </p:txBody>
-      </p:sp>
-      <p:sp>
-        <p:nvSpPr>
-          <p:cNvPr id="4" name="Slide Number Placeholder 3"/>
-          <p:cNvSpPr>
-            <a:spLocks noGrp="1"/>
-          </p:cNvSpPr>
-          <p:nvPr>
-            <p:ph type="sldNum" sz="quarter" idx="10"/>
-          </p:nvPr>
-        </p:nvSpPr>
-        <p:spPr/>
-        <p:txBody>
-          <a:bodyPr/>
-          <a:lstStyle/>
-          <a:p>
-            <a:fld id="{89029652-62E7-43D6-83B5-097D7B7AA5D8}" type="slidenum">
-              <a:rPr lang="en-US" smtClean="0"/>
-              <a:t>38</a:t>
-            </a:fld>
-            <a:endParaRPr lang="en-US"/>
-          </a:p>
-        </p:txBody>
-      </p:sp>
-    </p:spTree>
-    <p:extLst>
-      <p:ext uri="{BB962C8B-B14F-4D97-AF65-F5344CB8AC3E}">
-        <p14:creationId xmlns:p14="http://schemas.microsoft.com/office/powerpoint/2010/main" val="3263699449"/>
-      </p:ext>
-    </p:extLst>
-  </p:cSld>
-  <p:clrMapOvr>
-    <a:masterClrMapping/>
-  </p:clrMapOvr>
-</p:notes>
-</file>
-
-<file path=ppt/notesSlides/notesSlide39.xml><?xml version="1.0" encoding="utf-8"?>
-<p:notes xmlns:a="http://schemas.openxmlformats.org/drawingml/2006/main" xmlns:r="http://schemas.openxmlformats.org/officeDocument/2006/relationships" xmlns:p="http://schemas.openxmlformats.org/presentationml/2006/main">
-  <p:cSld>
-    <p:spTree>
-      <p:nvGrpSpPr>
-        <p:cNvPr id="1" name=""/>
-        <p:cNvGrpSpPr/>
-        <p:nvPr/>
-      </p:nvGrpSpPr>
-      <p:grpSpPr>
-        <a:xfrm>
-          <a:off x="0" y="0"/>
-          <a:ext cx="0" cy="0"/>
-          <a:chOff x="0" y="0"/>
-          <a:chExt cx="0" cy="0"/>
-        </a:xfrm>
-      </p:grpSpPr>
-      <p:sp>
-        <p:nvSpPr>
-          <p:cNvPr id="2" name="Slide Image Placeholder 1"/>
-          <p:cNvSpPr>
-            <a:spLocks noGrp="1" noRot="1" noChangeAspect="1"/>
-          </p:cNvSpPr>
-          <p:nvPr>
-            <p:ph type="sldImg"/>
-          </p:nvPr>
-        </p:nvSpPr>
-        <p:spPr/>
-      </p:sp>
-      <p:sp>
-        <p:nvSpPr>
-          <p:cNvPr id="3" name="Notes Placeholder 2"/>
-          <p:cNvSpPr>
-            <a:spLocks noGrp="1"/>
-          </p:cNvSpPr>
-          <p:nvPr>
-            <p:ph type="body" idx="1"/>
-          </p:nvPr>
-        </p:nvSpPr>
-        <p:spPr/>
-        <p:txBody>
-          <a:bodyPr/>
-          <a:lstStyle/>
-          <a:p>
-            <a:endParaRPr lang="en-US" b="0" dirty="0" smtClean="0"/>
-          </a:p>
-        </p:txBody>
-      </p:sp>
-      <p:sp>
-        <p:nvSpPr>
-          <p:cNvPr id="4" name="Slide Number Placeholder 3"/>
-          <p:cNvSpPr>
-            <a:spLocks noGrp="1"/>
-          </p:cNvSpPr>
-          <p:nvPr>
-            <p:ph type="sldNum" sz="quarter" idx="10"/>
-          </p:nvPr>
-        </p:nvSpPr>
-        <p:spPr/>
-        <p:txBody>
-          <a:bodyPr/>
-          <a:lstStyle/>
-          <a:p>
-            <a:fld id="{89029652-62E7-43D6-83B5-097D7B7AA5D8}" type="slidenum">
-              <a:rPr lang="en-US" smtClean="0"/>
-              <a:t>39</a:t>
-            </a:fld>
-            <a:endParaRPr lang="en-US"/>
-          </a:p>
-        </p:txBody>
-      </p:sp>
-    </p:spTree>
-    <p:extLst>
-      <p:ext uri="{BB962C8B-B14F-4D97-AF65-F5344CB8AC3E}">
-        <p14:creationId xmlns:p14="http://schemas.microsoft.com/office/powerpoint/2010/main" val="1255163866"/>
+        <p14:creationId xmlns:p14="http://schemas.microsoft.com/office/powerpoint/2010/main" val="2286755864"/>
       </p:ext>
     </p:extLst>
   </p:cSld>
@@ -3690,7 +3675,7 @@
     </p:spTree>
     <p:extLst>
       <p:ext uri="{BB962C8B-B14F-4D97-AF65-F5344CB8AC3E}">
-        <p14:creationId xmlns:p14="http://schemas.microsoft.com/office/powerpoint/2010/main" val="532748052"/>
+        <p14:creationId xmlns:p14="http://schemas.microsoft.com/office/powerpoint/2010/main" val="2653332077"/>
       </p:ext>
     </p:extLst>
   </p:cSld>
@@ -3744,32 +3729,7 @@
           <a:bodyPr/>
           <a:lstStyle/>
           <a:p>
-            <a:pPr marL="0" marR="0" indent="0" algn="l" defTabSz="914400" rtl="0" eaLnBrk="1" fontAlgn="auto" latinLnBrk="0" hangingPunct="1">
-              <a:lnSpc>
-                <a:spcPct val="100000"/>
-              </a:lnSpc>
-              <a:spcBef>
-                <a:spcPts val="0"/>
-              </a:spcBef>
-              <a:spcAft>
-                <a:spcPts val="0"/>
-              </a:spcAft>
-              <a:buClrTx/>
-              <a:buSzTx/>
-              <a:buFontTx/>
-              <a:buNone/>
-              <a:tabLst/>
-              <a:defRPr/>
-            </a:pPr>
-            <a:endParaRPr lang="en-US" sz="1200" kern="1200" dirty="0" smtClean="0">
-              <a:solidFill>
-                <a:schemeClr val="tx1"/>
-              </a:solidFill>
-              <a:effectLst/>
-              <a:latin typeface="+mn-lt"/>
-              <a:ea typeface="+mn-ea"/>
-              <a:cs typeface="+mn-cs"/>
-            </a:endParaRPr>
+            <a:endParaRPr lang="en-US" b="0" dirty="0" smtClean="0"/>
           </a:p>
         </p:txBody>
       </p:sp>
@@ -3799,7 +3759,7 @@
     </p:spTree>
     <p:extLst>
       <p:ext uri="{BB962C8B-B14F-4D97-AF65-F5344CB8AC3E}">
-        <p14:creationId xmlns:p14="http://schemas.microsoft.com/office/powerpoint/2010/main" val="2286755864"/>
+        <p14:creationId xmlns:p14="http://schemas.microsoft.com/office/powerpoint/2010/main" val="3778399677"/>
       </p:ext>
     </p:extLst>
   </p:cSld>
@@ -3883,7 +3843,7 @@
     </p:spTree>
     <p:extLst>
       <p:ext uri="{BB962C8B-B14F-4D97-AF65-F5344CB8AC3E}">
-        <p14:creationId xmlns:p14="http://schemas.microsoft.com/office/powerpoint/2010/main" val="2653332077"/>
+        <p14:creationId xmlns:p14="http://schemas.microsoft.com/office/powerpoint/2010/main" val="4047639699"/>
       </p:ext>
     </p:extLst>
   </p:cSld>
@@ -3967,7 +3927,7 @@
     </p:spTree>
     <p:extLst>
       <p:ext uri="{BB962C8B-B14F-4D97-AF65-F5344CB8AC3E}">
-        <p14:creationId xmlns:p14="http://schemas.microsoft.com/office/powerpoint/2010/main" val="3778399677"/>
+        <p14:creationId xmlns:p14="http://schemas.microsoft.com/office/powerpoint/2010/main" val="3271057564"/>
       </p:ext>
     </p:extLst>
   </p:cSld>
@@ -4051,7 +4011,7 @@
     </p:spTree>
     <p:extLst>
       <p:ext uri="{BB962C8B-B14F-4D97-AF65-F5344CB8AC3E}">
-        <p14:creationId xmlns:p14="http://schemas.microsoft.com/office/powerpoint/2010/main" val="4047639699"/>
+        <p14:creationId xmlns:p14="http://schemas.microsoft.com/office/powerpoint/2010/main" val="150335864"/>
       </p:ext>
     </p:extLst>
   </p:cSld>
@@ -4135,7 +4095,7 @@
     </p:spTree>
     <p:extLst>
       <p:ext uri="{BB962C8B-B14F-4D97-AF65-F5344CB8AC3E}">
-        <p14:creationId xmlns:p14="http://schemas.microsoft.com/office/powerpoint/2010/main" val="3271057564"/>
+        <p14:creationId xmlns:p14="http://schemas.microsoft.com/office/powerpoint/2010/main" val="3480706183"/>
       </p:ext>
     </p:extLst>
   </p:cSld>
@@ -4219,7 +4179,7 @@
     </p:spTree>
     <p:extLst>
       <p:ext uri="{BB962C8B-B14F-4D97-AF65-F5344CB8AC3E}">
-        <p14:creationId xmlns:p14="http://schemas.microsoft.com/office/powerpoint/2010/main" val="150335864"/>
+        <p14:creationId xmlns:p14="http://schemas.microsoft.com/office/powerpoint/2010/main" val="1174323916"/>
       </p:ext>
     </p:extLst>
   </p:cSld>
@@ -4303,7 +4263,7 @@
     </p:spTree>
     <p:extLst>
       <p:ext uri="{BB962C8B-B14F-4D97-AF65-F5344CB8AC3E}">
-        <p14:creationId xmlns:p14="http://schemas.microsoft.com/office/powerpoint/2010/main" val="3480706183"/>
+        <p14:creationId xmlns:p14="http://schemas.microsoft.com/office/powerpoint/2010/main" val="22929660"/>
       </p:ext>
     </p:extLst>
   </p:cSld>
@@ -4387,7 +4347,7 @@
     </p:spTree>
     <p:extLst>
       <p:ext uri="{BB962C8B-B14F-4D97-AF65-F5344CB8AC3E}">
-        <p14:creationId xmlns:p14="http://schemas.microsoft.com/office/powerpoint/2010/main" val="1174323916"/>
+        <p14:creationId xmlns:p14="http://schemas.microsoft.com/office/powerpoint/2010/main" val="508677048"/>
       </p:ext>
     </p:extLst>
   </p:cSld>
@@ -4471,7 +4431,7 @@
     </p:spTree>
     <p:extLst>
       <p:ext uri="{BB962C8B-B14F-4D97-AF65-F5344CB8AC3E}">
-        <p14:creationId xmlns:p14="http://schemas.microsoft.com/office/powerpoint/2010/main" val="22929660"/>
+        <p14:creationId xmlns:p14="http://schemas.microsoft.com/office/powerpoint/2010/main" val="3079792467"/>
       </p:ext>
     </p:extLst>
   </p:cSld>
@@ -4609,7 +4569,32 @@
           <a:bodyPr/>
           <a:lstStyle/>
           <a:p>
-            <a:endParaRPr lang="en-US" b="0" dirty="0" smtClean="0"/>
+            <a:pPr marL="0" marR="0" indent="0" algn="l" defTabSz="914400" rtl="0" eaLnBrk="1" fontAlgn="auto" latinLnBrk="0" hangingPunct="1">
+              <a:lnSpc>
+                <a:spcPct val="100000"/>
+              </a:lnSpc>
+              <a:spcBef>
+                <a:spcPts val="0"/>
+              </a:spcBef>
+              <a:spcAft>
+                <a:spcPts val="0"/>
+              </a:spcAft>
+              <a:buClrTx/>
+              <a:buSzTx/>
+              <a:buFontTx/>
+              <a:buNone/>
+              <a:tabLst/>
+              <a:defRPr/>
+            </a:pPr>
+            <a:endParaRPr lang="en-US" sz="1200" kern="1200" dirty="0" smtClean="0">
+              <a:solidFill>
+                <a:schemeClr val="tx1"/>
+              </a:solidFill>
+              <a:effectLst/>
+              <a:latin typeface="+mn-lt"/>
+              <a:ea typeface="+mn-ea"/>
+              <a:cs typeface="+mn-cs"/>
+            </a:endParaRPr>
           </a:p>
         </p:txBody>
       </p:sp>
@@ -4639,7 +4624,7 @@
     </p:spTree>
     <p:extLst>
       <p:ext uri="{BB962C8B-B14F-4D97-AF65-F5344CB8AC3E}">
-        <p14:creationId xmlns:p14="http://schemas.microsoft.com/office/powerpoint/2010/main" val="508677048"/>
+        <p14:creationId xmlns:p14="http://schemas.microsoft.com/office/powerpoint/2010/main" val="1704645259"/>
       </p:ext>
     </p:extLst>
   </p:cSld>
@@ -4723,7 +4708,7 @@
     </p:spTree>
     <p:extLst>
       <p:ext uri="{BB962C8B-B14F-4D97-AF65-F5344CB8AC3E}">
-        <p14:creationId xmlns:p14="http://schemas.microsoft.com/office/powerpoint/2010/main" val="3079792467"/>
+        <p14:creationId xmlns:p14="http://schemas.microsoft.com/office/powerpoint/2010/main" val="381415188"/>
       </p:ext>
     </p:extLst>
   </p:cSld>
@@ -4777,6 +4762,258 @@
           <a:bodyPr/>
           <a:lstStyle/>
           <a:p>
+            <a:endParaRPr lang="en-US" b="0" dirty="0" smtClean="0"/>
+          </a:p>
+        </p:txBody>
+      </p:sp>
+      <p:sp>
+        <p:nvSpPr>
+          <p:cNvPr id="4" name="Slide Number Placeholder 3"/>
+          <p:cNvSpPr>
+            <a:spLocks noGrp="1"/>
+          </p:cNvSpPr>
+          <p:nvPr>
+            <p:ph type="sldNum" sz="quarter" idx="10"/>
+          </p:nvPr>
+        </p:nvSpPr>
+        <p:spPr/>
+        <p:txBody>
+          <a:bodyPr/>
+          <a:lstStyle/>
+          <a:p>
+            <a:fld id="{89029652-62E7-43D6-83B5-097D7B7AA5D8}" type="slidenum">
+              <a:rPr lang="en-US" smtClean="0"/>
+              <a:t>52</a:t>
+            </a:fld>
+            <a:endParaRPr lang="en-US"/>
+          </a:p>
+        </p:txBody>
+      </p:sp>
+    </p:spTree>
+    <p:extLst>
+      <p:ext uri="{BB962C8B-B14F-4D97-AF65-F5344CB8AC3E}">
+        <p14:creationId xmlns:p14="http://schemas.microsoft.com/office/powerpoint/2010/main" val="3234596091"/>
+      </p:ext>
+    </p:extLst>
+  </p:cSld>
+  <p:clrMapOvr>
+    <a:masterClrMapping/>
+  </p:clrMapOvr>
+</p:notes>
+</file>
+
+<file path=ppt/notesSlides/notesSlide53.xml><?xml version="1.0" encoding="utf-8"?>
+<p:notes xmlns:a="http://schemas.openxmlformats.org/drawingml/2006/main" xmlns:r="http://schemas.openxmlformats.org/officeDocument/2006/relationships" xmlns:p="http://schemas.openxmlformats.org/presentationml/2006/main">
+  <p:cSld>
+    <p:spTree>
+      <p:nvGrpSpPr>
+        <p:cNvPr id="1" name=""/>
+        <p:cNvGrpSpPr/>
+        <p:nvPr/>
+      </p:nvGrpSpPr>
+      <p:grpSpPr>
+        <a:xfrm>
+          <a:off x="0" y="0"/>
+          <a:ext cx="0" cy="0"/>
+          <a:chOff x="0" y="0"/>
+          <a:chExt cx="0" cy="0"/>
+        </a:xfrm>
+      </p:grpSpPr>
+      <p:sp>
+        <p:nvSpPr>
+          <p:cNvPr id="2" name="Slide Image Placeholder 1"/>
+          <p:cNvSpPr>
+            <a:spLocks noGrp="1" noRot="1" noChangeAspect="1"/>
+          </p:cNvSpPr>
+          <p:nvPr>
+            <p:ph type="sldImg"/>
+          </p:nvPr>
+        </p:nvSpPr>
+        <p:spPr/>
+      </p:sp>
+      <p:sp>
+        <p:nvSpPr>
+          <p:cNvPr id="3" name="Notes Placeholder 2"/>
+          <p:cNvSpPr>
+            <a:spLocks noGrp="1"/>
+          </p:cNvSpPr>
+          <p:nvPr>
+            <p:ph type="body" idx="1"/>
+          </p:nvPr>
+        </p:nvSpPr>
+        <p:spPr/>
+        <p:txBody>
+          <a:bodyPr/>
+          <a:lstStyle/>
+          <a:p>
+            <a:endParaRPr lang="en-US" b="0" dirty="0" smtClean="0"/>
+          </a:p>
+        </p:txBody>
+      </p:sp>
+      <p:sp>
+        <p:nvSpPr>
+          <p:cNvPr id="4" name="Slide Number Placeholder 3"/>
+          <p:cNvSpPr>
+            <a:spLocks noGrp="1"/>
+          </p:cNvSpPr>
+          <p:nvPr>
+            <p:ph type="sldNum" sz="quarter" idx="10"/>
+          </p:nvPr>
+        </p:nvSpPr>
+        <p:spPr/>
+        <p:txBody>
+          <a:bodyPr/>
+          <a:lstStyle/>
+          <a:p>
+            <a:fld id="{89029652-62E7-43D6-83B5-097D7B7AA5D8}" type="slidenum">
+              <a:rPr lang="en-US" smtClean="0"/>
+              <a:t>53</a:t>
+            </a:fld>
+            <a:endParaRPr lang="en-US"/>
+          </a:p>
+        </p:txBody>
+      </p:sp>
+    </p:spTree>
+    <p:extLst>
+      <p:ext uri="{BB962C8B-B14F-4D97-AF65-F5344CB8AC3E}">
+        <p14:creationId xmlns:p14="http://schemas.microsoft.com/office/powerpoint/2010/main" val="3344468672"/>
+      </p:ext>
+    </p:extLst>
+  </p:cSld>
+  <p:clrMapOvr>
+    <a:masterClrMapping/>
+  </p:clrMapOvr>
+</p:notes>
+</file>
+
+<file path=ppt/notesSlides/notesSlide54.xml><?xml version="1.0" encoding="utf-8"?>
+<p:notes xmlns:a="http://schemas.openxmlformats.org/drawingml/2006/main" xmlns:r="http://schemas.openxmlformats.org/officeDocument/2006/relationships" xmlns:p="http://schemas.openxmlformats.org/presentationml/2006/main">
+  <p:cSld>
+    <p:spTree>
+      <p:nvGrpSpPr>
+        <p:cNvPr id="1" name=""/>
+        <p:cNvGrpSpPr/>
+        <p:nvPr/>
+      </p:nvGrpSpPr>
+      <p:grpSpPr>
+        <a:xfrm>
+          <a:off x="0" y="0"/>
+          <a:ext cx="0" cy="0"/>
+          <a:chOff x="0" y="0"/>
+          <a:chExt cx="0" cy="0"/>
+        </a:xfrm>
+      </p:grpSpPr>
+      <p:sp>
+        <p:nvSpPr>
+          <p:cNvPr id="2" name="Slide Image Placeholder 1"/>
+          <p:cNvSpPr>
+            <a:spLocks noGrp="1" noRot="1" noChangeAspect="1"/>
+          </p:cNvSpPr>
+          <p:nvPr>
+            <p:ph type="sldImg"/>
+          </p:nvPr>
+        </p:nvSpPr>
+        <p:spPr/>
+      </p:sp>
+      <p:sp>
+        <p:nvSpPr>
+          <p:cNvPr id="3" name="Notes Placeholder 2"/>
+          <p:cNvSpPr>
+            <a:spLocks noGrp="1"/>
+          </p:cNvSpPr>
+          <p:nvPr>
+            <p:ph type="body" idx="1"/>
+          </p:nvPr>
+        </p:nvSpPr>
+        <p:spPr/>
+        <p:txBody>
+          <a:bodyPr/>
+          <a:lstStyle/>
+          <a:p>
+            <a:endParaRPr lang="en-US" b="0" dirty="0" smtClean="0"/>
+          </a:p>
+        </p:txBody>
+      </p:sp>
+      <p:sp>
+        <p:nvSpPr>
+          <p:cNvPr id="4" name="Slide Number Placeholder 3"/>
+          <p:cNvSpPr>
+            <a:spLocks noGrp="1"/>
+          </p:cNvSpPr>
+          <p:nvPr>
+            <p:ph type="sldNum" sz="quarter" idx="10"/>
+          </p:nvPr>
+        </p:nvSpPr>
+        <p:spPr/>
+        <p:txBody>
+          <a:bodyPr/>
+          <a:lstStyle/>
+          <a:p>
+            <a:fld id="{89029652-62E7-43D6-83B5-097D7B7AA5D8}" type="slidenum">
+              <a:rPr lang="en-US" smtClean="0"/>
+              <a:t>54</a:t>
+            </a:fld>
+            <a:endParaRPr lang="en-US"/>
+          </a:p>
+        </p:txBody>
+      </p:sp>
+    </p:spTree>
+    <p:extLst>
+      <p:ext uri="{BB962C8B-B14F-4D97-AF65-F5344CB8AC3E}">
+        <p14:creationId xmlns:p14="http://schemas.microsoft.com/office/powerpoint/2010/main" val="3143393369"/>
+      </p:ext>
+    </p:extLst>
+  </p:cSld>
+  <p:clrMapOvr>
+    <a:masterClrMapping/>
+  </p:clrMapOvr>
+</p:notes>
+</file>
+
+<file path=ppt/notesSlides/notesSlide55.xml><?xml version="1.0" encoding="utf-8"?>
+<p:notes xmlns:a="http://schemas.openxmlformats.org/drawingml/2006/main" xmlns:r="http://schemas.openxmlformats.org/officeDocument/2006/relationships" xmlns:p="http://schemas.openxmlformats.org/presentationml/2006/main">
+  <p:cSld>
+    <p:spTree>
+      <p:nvGrpSpPr>
+        <p:cNvPr id="1" name=""/>
+        <p:cNvGrpSpPr/>
+        <p:nvPr/>
+      </p:nvGrpSpPr>
+      <p:grpSpPr>
+        <a:xfrm>
+          <a:off x="0" y="0"/>
+          <a:ext cx="0" cy="0"/>
+          <a:chOff x="0" y="0"/>
+          <a:chExt cx="0" cy="0"/>
+        </a:xfrm>
+      </p:grpSpPr>
+      <p:sp>
+        <p:nvSpPr>
+          <p:cNvPr id="2" name="Slide Image Placeholder 1"/>
+          <p:cNvSpPr>
+            <a:spLocks noGrp="1" noRot="1" noChangeAspect="1"/>
+          </p:cNvSpPr>
+          <p:nvPr>
+            <p:ph type="sldImg"/>
+          </p:nvPr>
+        </p:nvSpPr>
+        <p:spPr/>
+      </p:sp>
+      <p:sp>
+        <p:nvSpPr>
+          <p:cNvPr id="3" name="Notes Placeholder 2"/>
+          <p:cNvSpPr>
+            <a:spLocks noGrp="1"/>
+          </p:cNvSpPr>
+          <p:nvPr>
+            <p:ph type="body" idx="1"/>
+          </p:nvPr>
+        </p:nvSpPr>
+        <p:spPr/>
+        <p:txBody>
+          <a:bodyPr/>
+          <a:lstStyle/>
+          <a:p>
             <a:pPr marL="0" marR="0" indent="0" algn="l" defTabSz="914400" rtl="0" eaLnBrk="1" fontAlgn="auto" latinLnBrk="0" hangingPunct="1">
               <a:lnSpc>
                 <a:spcPct val="100000"/>
@@ -4823,7 +5060,7 @@
           <a:p>
             <a:fld id="{89029652-62E7-43D6-83B5-097D7B7AA5D8}" type="slidenum">
               <a:rPr lang="en-US" smtClean="0"/>
-              <a:t>52</a:t>
+              <a:t>55</a:t>
             </a:fld>
             <a:endParaRPr lang="en-US"/>
           </a:p>
@@ -4832,259 +5069,7 @@
     </p:spTree>
     <p:extLst>
       <p:ext uri="{BB962C8B-B14F-4D97-AF65-F5344CB8AC3E}">
-        <p14:creationId xmlns:p14="http://schemas.microsoft.com/office/powerpoint/2010/main" val="1704645259"/>
-      </p:ext>
-    </p:extLst>
-  </p:cSld>
-  <p:clrMapOvr>
-    <a:masterClrMapping/>
-  </p:clrMapOvr>
-</p:notes>
-</file>
-
-<file path=ppt/notesSlides/notesSlide53.xml><?xml version="1.0" encoding="utf-8"?>
-<p:notes xmlns:a="http://schemas.openxmlformats.org/drawingml/2006/main" xmlns:r="http://schemas.openxmlformats.org/officeDocument/2006/relationships" xmlns:p="http://schemas.openxmlformats.org/presentationml/2006/main">
-  <p:cSld>
-    <p:spTree>
-      <p:nvGrpSpPr>
-        <p:cNvPr id="1" name=""/>
-        <p:cNvGrpSpPr/>
-        <p:nvPr/>
-      </p:nvGrpSpPr>
-      <p:grpSpPr>
-        <a:xfrm>
-          <a:off x="0" y="0"/>
-          <a:ext cx="0" cy="0"/>
-          <a:chOff x="0" y="0"/>
-          <a:chExt cx="0" cy="0"/>
-        </a:xfrm>
-      </p:grpSpPr>
-      <p:sp>
-        <p:nvSpPr>
-          <p:cNvPr id="2" name="Slide Image Placeholder 1"/>
-          <p:cNvSpPr>
-            <a:spLocks noGrp="1" noRot="1" noChangeAspect="1"/>
-          </p:cNvSpPr>
-          <p:nvPr>
-            <p:ph type="sldImg"/>
-          </p:nvPr>
-        </p:nvSpPr>
-        <p:spPr/>
-      </p:sp>
-      <p:sp>
-        <p:nvSpPr>
-          <p:cNvPr id="3" name="Notes Placeholder 2"/>
-          <p:cNvSpPr>
-            <a:spLocks noGrp="1"/>
-          </p:cNvSpPr>
-          <p:nvPr>
-            <p:ph type="body" idx="1"/>
-          </p:nvPr>
-        </p:nvSpPr>
-        <p:spPr/>
-        <p:txBody>
-          <a:bodyPr/>
-          <a:lstStyle/>
-          <a:p>
-            <a:endParaRPr lang="en-US" b="0" dirty="0" smtClean="0"/>
-          </a:p>
-        </p:txBody>
-      </p:sp>
-      <p:sp>
-        <p:nvSpPr>
-          <p:cNvPr id="4" name="Slide Number Placeholder 3"/>
-          <p:cNvSpPr>
-            <a:spLocks noGrp="1"/>
-          </p:cNvSpPr>
-          <p:nvPr>
-            <p:ph type="sldNum" sz="quarter" idx="10"/>
-          </p:nvPr>
-        </p:nvSpPr>
-        <p:spPr/>
-        <p:txBody>
-          <a:bodyPr/>
-          <a:lstStyle/>
-          <a:p>
-            <a:fld id="{89029652-62E7-43D6-83B5-097D7B7AA5D8}" type="slidenum">
-              <a:rPr lang="en-US" smtClean="0"/>
-              <a:t>53</a:t>
-            </a:fld>
-            <a:endParaRPr lang="en-US"/>
-          </a:p>
-        </p:txBody>
-      </p:sp>
-    </p:spTree>
-    <p:extLst>
-      <p:ext uri="{BB962C8B-B14F-4D97-AF65-F5344CB8AC3E}">
-        <p14:creationId xmlns:p14="http://schemas.microsoft.com/office/powerpoint/2010/main" val="381415188"/>
-      </p:ext>
-    </p:extLst>
-  </p:cSld>
-  <p:clrMapOvr>
-    <a:masterClrMapping/>
-  </p:clrMapOvr>
-</p:notes>
-</file>
-
-<file path=ppt/notesSlides/notesSlide54.xml><?xml version="1.0" encoding="utf-8"?>
-<p:notes xmlns:a="http://schemas.openxmlformats.org/drawingml/2006/main" xmlns:r="http://schemas.openxmlformats.org/officeDocument/2006/relationships" xmlns:p="http://schemas.openxmlformats.org/presentationml/2006/main">
-  <p:cSld>
-    <p:spTree>
-      <p:nvGrpSpPr>
-        <p:cNvPr id="1" name=""/>
-        <p:cNvGrpSpPr/>
-        <p:nvPr/>
-      </p:nvGrpSpPr>
-      <p:grpSpPr>
-        <a:xfrm>
-          <a:off x="0" y="0"/>
-          <a:ext cx="0" cy="0"/>
-          <a:chOff x="0" y="0"/>
-          <a:chExt cx="0" cy="0"/>
-        </a:xfrm>
-      </p:grpSpPr>
-      <p:sp>
-        <p:nvSpPr>
-          <p:cNvPr id="2" name="Slide Image Placeholder 1"/>
-          <p:cNvSpPr>
-            <a:spLocks noGrp="1" noRot="1" noChangeAspect="1"/>
-          </p:cNvSpPr>
-          <p:nvPr>
-            <p:ph type="sldImg"/>
-          </p:nvPr>
-        </p:nvSpPr>
-        <p:spPr/>
-      </p:sp>
-      <p:sp>
-        <p:nvSpPr>
-          <p:cNvPr id="3" name="Notes Placeholder 2"/>
-          <p:cNvSpPr>
-            <a:spLocks noGrp="1"/>
-          </p:cNvSpPr>
-          <p:nvPr>
-            <p:ph type="body" idx="1"/>
-          </p:nvPr>
-        </p:nvSpPr>
-        <p:spPr/>
-        <p:txBody>
-          <a:bodyPr/>
-          <a:lstStyle/>
-          <a:p>
-            <a:endParaRPr lang="en-US" b="0" dirty="0" smtClean="0"/>
-          </a:p>
-        </p:txBody>
-      </p:sp>
-      <p:sp>
-        <p:nvSpPr>
-          <p:cNvPr id="4" name="Slide Number Placeholder 3"/>
-          <p:cNvSpPr>
-            <a:spLocks noGrp="1"/>
-          </p:cNvSpPr>
-          <p:nvPr>
-            <p:ph type="sldNum" sz="quarter" idx="10"/>
-          </p:nvPr>
-        </p:nvSpPr>
-        <p:spPr/>
-        <p:txBody>
-          <a:bodyPr/>
-          <a:lstStyle/>
-          <a:p>
-            <a:fld id="{89029652-62E7-43D6-83B5-097D7B7AA5D8}" type="slidenum">
-              <a:rPr lang="en-US" smtClean="0"/>
-              <a:t>54</a:t>
-            </a:fld>
-            <a:endParaRPr lang="en-US"/>
-          </a:p>
-        </p:txBody>
-      </p:sp>
-    </p:spTree>
-    <p:extLst>
-      <p:ext uri="{BB962C8B-B14F-4D97-AF65-F5344CB8AC3E}">
-        <p14:creationId xmlns:p14="http://schemas.microsoft.com/office/powerpoint/2010/main" val="3234596091"/>
-      </p:ext>
-    </p:extLst>
-  </p:cSld>
-  <p:clrMapOvr>
-    <a:masterClrMapping/>
-  </p:clrMapOvr>
-</p:notes>
-</file>
-
-<file path=ppt/notesSlides/notesSlide55.xml><?xml version="1.0" encoding="utf-8"?>
-<p:notes xmlns:a="http://schemas.openxmlformats.org/drawingml/2006/main" xmlns:r="http://schemas.openxmlformats.org/officeDocument/2006/relationships" xmlns:p="http://schemas.openxmlformats.org/presentationml/2006/main">
-  <p:cSld>
-    <p:spTree>
-      <p:nvGrpSpPr>
-        <p:cNvPr id="1" name=""/>
-        <p:cNvGrpSpPr/>
-        <p:nvPr/>
-      </p:nvGrpSpPr>
-      <p:grpSpPr>
-        <a:xfrm>
-          <a:off x="0" y="0"/>
-          <a:ext cx="0" cy="0"/>
-          <a:chOff x="0" y="0"/>
-          <a:chExt cx="0" cy="0"/>
-        </a:xfrm>
-      </p:grpSpPr>
-      <p:sp>
-        <p:nvSpPr>
-          <p:cNvPr id="2" name="Slide Image Placeholder 1"/>
-          <p:cNvSpPr>
-            <a:spLocks noGrp="1" noRot="1" noChangeAspect="1"/>
-          </p:cNvSpPr>
-          <p:nvPr>
-            <p:ph type="sldImg"/>
-          </p:nvPr>
-        </p:nvSpPr>
-        <p:spPr/>
-      </p:sp>
-      <p:sp>
-        <p:nvSpPr>
-          <p:cNvPr id="3" name="Notes Placeholder 2"/>
-          <p:cNvSpPr>
-            <a:spLocks noGrp="1"/>
-          </p:cNvSpPr>
-          <p:nvPr>
-            <p:ph type="body" idx="1"/>
-          </p:nvPr>
-        </p:nvSpPr>
-        <p:spPr/>
-        <p:txBody>
-          <a:bodyPr/>
-          <a:lstStyle/>
-          <a:p>
-            <a:endParaRPr lang="en-US" b="0" dirty="0" smtClean="0"/>
-          </a:p>
-        </p:txBody>
-      </p:sp>
-      <p:sp>
-        <p:nvSpPr>
-          <p:cNvPr id="4" name="Slide Number Placeholder 3"/>
-          <p:cNvSpPr>
-            <a:spLocks noGrp="1"/>
-          </p:cNvSpPr>
-          <p:nvPr>
-            <p:ph type="sldNum" sz="quarter" idx="10"/>
-          </p:nvPr>
-        </p:nvSpPr>
-        <p:spPr/>
-        <p:txBody>
-          <a:bodyPr/>
-          <a:lstStyle/>
-          <a:p>
-            <a:fld id="{89029652-62E7-43D6-83B5-097D7B7AA5D8}" type="slidenum">
-              <a:rPr lang="en-US" smtClean="0"/>
-              <a:t>55</a:t>
-            </a:fld>
-            <a:endParaRPr lang="en-US"/>
-          </a:p>
-        </p:txBody>
-      </p:sp>
-    </p:spTree>
-    <p:extLst>
-      <p:ext uri="{BB962C8B-B14F-4D97-AF65-F5344CB8AC3E}">
-        <p14:creationId xmlns:p14="http://schemas.microsoft.com/office/powerpoint/2010/main" val="3344468672"/>
+        <p14:creationId xmlns:p14="http://schemas.microsoft.com/office/powerpoint/2010/main" val="1557858908"/>
       </p:ext>
     </p:extLst>
   </p:cSld>
@@ -5168,7 +5153,7 @@
     </p:spTree>
     <p:extLst>
       <p:ext uri="{BB962C8B-B14F-4D97-AF65-F5344CB8AC3E}">
-        <p14:creationId xmlns:p14="http://schemas.microsoft.com/office/powerpoint/2010/main" val="3143393369"/>
+        <p14:creationId xmlns:p14="http://schemas.microsoft.com/office/powerpoint/2010/main" val="3450469856"/>
       </p:ext>
     </p:extLst>
   </p:cSld>
@@ -5222,32 +5207,7 @@
           <a:bodyPr/>
           <a:lstStyle/>
           <a:p>
-            <a:pPr marL="0" marR="0" indent="0" algn="l" defTabSz="914400" rtl="0" eaLnBrk="1" fontAlgn="auto" latinLnBrk="0" hangingPunct="1">
-              <a:lnSpc>
-                <a:spcPct val="100000"/>
-              </a:lnSpc>
-              <a:spcBef>
-                <a:spcPts val="0"/>
-              </a:spcBef>
-              <a:spcAft>
-                <a:spcPts val="0"/>
-              </a:spcAft>
-              <a:buClrTx/>
-              <a:buSzTx/>
-              <a:buFontTx/>
-              <a:buNone/>
-              <a:tabLst/>
-              <a:defRPr/>
-            </a:pPr>
-            <a:endParaRPr lang="en-US" sz="1200" kern="1200" dirty="0" smtClean="0">
-              <a:solidFill>
-                <a:schemeClr val="tx1"/>
-              </a:solidFill>
-              <a:effectLst/>
-              <a:latin typeface="+mn-lt"/>
-              <a:ea typeface="+mn-ea"/>
-              <a:cs typeface="+mn-cs"/>
-            </a:endParaRPr>
+            <a:endParaRPr lang="en-US" b="0" dirty="0" smtClean="0"/>
           </a:p>
         </p:txBody>
       </p:sp>
@@ -5277,7 +5237,7 @@
     </p:spTree>
     <p:extLst>
       <p:ext uri="{BB962C8B-B14F-4D97-AF65-F5344CB8AC3E}">
-        <p14:creationId xmlns:p14="http://schemas.microsoft.com/office/powerpoint/2010/main" val="1557858908"/>
+        <p14:creationId xmlns:p14="http://schemas.microsoft.com/office/powerpoint/2010/main" val="2647091800"/>
       </p:ext>
     </p:extLst>
   </p:cSld>
@@ -5361,7 +5321,7 @@
     </p:spTree>
     <p:extLst>
       <p:ext uri="{BB962C8B-B14F-4D97-AF65-F5344CB8AC3E}">
-        <p14:creationId xmlns:p14="http://schemas.microsoft.com/office/powerpoint/2010/main" val="3450469856"/>
+        <p14:creationId xmlns:p14="http://schemas.microsoft.com/office/powerpoint/2010/main" val="2829916917"/>
       </p:ext>
     </p:extLst>
   </p:cSld>
@@ -5445,7 +5405,7 @@
     </p:spTree>
     <p:extLst>
       <p:ext uri="{BB962C8B-B14F-4D97-AF65-F5344CB8AC3E}">
-        <p14:creationId xmlns:p14="http://schemas.microsoft.com/office/powerpoint/2010/main" val="2647091800"/>
+        <p14:creationId xmlns:p14="http://schemas.microsoft.com/office/powerpoint/2010/main" val="1954400629"/>
       </p:ext>
     </p:extLst>
   </p:cSld>
@@ -5613,7 +5573,7 @@
     </p:spTree>
     <p:extLst>
       <p:ext uri="{BB962C8B-B14F-4D97-AF65-F5344CB8AC3E}">
-        <p14:creationId xmlns:p14="http://schemas.microsoft.com/office/powerpoint/2010/main" val="2829916917"/>
+        <p14:creationId xmlns:p14="http://schemas.microsoft.com/office/powerpoint/2010/main" val="3603726692"/>
       </p:ext>
     </p:extLst>
   </p:cSld>
@@ -5697,7 +5657,7 @@
     </p:spTree>
     <p:extLst>
       <p:ext uri="{BB962C8B-B14F-4D97-AF65-F5344CB8AC3E}">
-        <p14:creationId xmlns:p14="http://schemas.microsoft.com/office/powerpoint/2010/main" val="1954400629"/>
+        <p14:creationId xmlns:p14="http://schemas.microsoft.com/office/powerpoint/2010/main" val="1764780958"/>
       </p:ext>
     </p:extLst>
   </p:cSld>
@@ -5751,7 +5711,32 @@
           <a:bodyPr/>
           <a:lstStyle/>
           <a:p>
-            <a:endParaRPr lang="en-US" b="0" dirty="0" smtClean="0"/>
+            <a:pPr marL="0" marR="0" indent="0" algn="l" defTabSz="914400" rtl="0" eaLnBrk="1" fontAlgn="auto" latinLnBrk="0" hangingPunct="1">
+              <a:lnSpc>
+                <a:spcPct val="100000"/>
+              </a:lnSpc>
+              <a:spcBef>
+                <a:spcPts val="0"/>
+              </a:spcBef>
+              <a:spcAft>
+                <a:spcPts val="0"/>
+              </a:spcAft>
+              <a:buClrTx/>
+              <a:buSzTx/>
+              <a:buFontTx/>
+              <a:buNone/>
+              <a:tabLst/>
+              <a:defRPr/>
+            </a:pPr>
+            <a:endParaRPr lang="en-US" sz="1200" kern="1200" dirty="0" smtClean="0">
+              <a:solidFill>
+                <a:schemeClr val="tx1"/>
+              </a:solidFill>
+              <a:effectLst/>
+              <a:latin typeface="+mn-lt"/>
+              <a:ea typeface="+mn-ea"/>
+              <a:cs typeface="+mn-cs"/>
+            </a:endParaRPr>
           </a:p>
         </p:txBody>
       </p:sp>
@@ -5781,7 +5766,7 @@
     </p:spTree>
     <p:extLst>
       <p:ext uri="{BB962C8B-B14F-4D97-AF65-F5344CB8AC3E}">
-        <p14:creationId xmlns:p14="http://schemas.microsoft.com/office/powerpoint/2010/main" val="3603726692"/>
+        <p14:creationId xmlns:p14="http://schemas.microsoft.com/office/powerpoint/2010/main" val="1923953829"/>
       </p:ext>
     </p:extLst>
   </p:cSld>
@@ -5865,7 +5850,7 @@
     </p:spTree>
     <p:extLst>
       <p:ext uri="{BB962C8B-B14F-4D97-AF65-F5344CB8AC3E}">
-        <p14:creationId xmlns:p14="http://schemas.microsoft.com/office/powerpoint/2010/main" val="1764780958"/>
+        <p14:creationId xmlns:p14="http://schemas.microsoft.com/office/powerpoint/2010/main" val="531577243"/>
       </p:ext>
     </p:extLst>
   </p:cSld>
@@ -5919,32 +5904,7 @@
           <a:bodyPr/>
           <a:lstStyle/>
           <a:p>
-            <a:pPr marL="0" marR="0" indent="0" algn="l" defTabSz="914400" rtl="0" eaLnBrk="1" fontAlgn="auto" latinLnBrk="0" hangingPunct="1">
-              <a:lnSpc>
-                <a:spcPct val="100000"/>
-              </a:lnSpc>
-              <a:spcBef>
-                <a:spcPts val="0"/>
-              </a:spcBef>
-              <a:spcAft>
-                <a:spcPts val="0"/>
-              </a:spcAft>
-              <a:buClrTx/>
-              <a:buSzTx/>
-              <a:buFontTx/>
-              <a:buNone/>
-              <a:tabLst/>
-              <a:defRPr/>
-            </a:pPr>
-            <a:endParaRPr lang="en-US" sz="1200" kern="1200" dirty="0" smtClean="0">
-              <a:solidFill>
-                <a:schemeClr val="tx1"/>
-              </a:solidFill>
-              <a:effectLst/>
-              <a:latin typeface="+mn-lt"/>
-              <a:ea typeface="+mn-ea"/>
-              <a:cs typeface="+mn-cs"/>
-            </a:endParaRPr>
+            <a:endParaRPr lang="en-US" b="0" dirty="0" smtClean="0"/>
           </a:p>
         </p:txBody>
       </p:sp>
@@ -5974,7 +5934,7 @@
     </p:spTree>
     <p:extLst>
       <p:ext uri="{BB962C8B-B14F-4D97-AF65-F5344CB8AC3E}">
-        <p14:creationId xmlns:p14="http://schemas.microsoft.com/office/powerpoint/2010/main" val="1923953829"/>
+        <p14:creationId xmlns:p14="http://schemas.microsoft.com/office/powerpoint/2010/main" val="2079785236"/>
       </p:ext>
     </p:extLst>
   </p:cSld>
@@ -6058,7 +6018,7 @@
     </p:spTree>
     <p:extLst>
       <p:ext uri="{BB962C8B-B14F-4D97-AF65-F5344CB8AC3E}">
-        <p14:creationId xmlns:p14="http://schemas.microsoft.com/office/powerpoint/2010/main" val="531577243"/>
+        <p14:creationId xmlns:p14="http://schemas.microsoft.com/office/powerpoint/2010/main" val="1664318980"/>
       </p:ext>
     </p:extLst>
   </p:cSld>
@@ -6142,7 +6102,7 @@
     </p:spTree>
     <p:extLst>
       <p:ext uri="{BB962C8B-B14F-4D97-AF65-F5344CB8AC3E}">
-        <p14:creationId xmlns:p14="http://schemas.microsoft.com/office/powerpoint/2010/main" val="2079785236"/>
+        <p14:creationId xmlns:p14="http://schemas.microsoft.com/office/powerpoint/2010/main" val="1581406028"/>
       </p:ext>
     </p:extLst>
   </p:cSld>
@@ -6226,7 +6186,7 @@
     </p:spTree>
     <p:extLst>
       <p:ext uri="{BB962C8B-B14F-4D97-AF65-F5344CB8AC3E}">
-        <p14:creationId xmlns:p14="http://schemas.microsoft.com/office/powerpoint/2010/main" val="1664318980"/>
+        <p14:creationId xmlns:p14="http://schemas.microsoft.com/office/powerpoint/2010/main" val="299799724"/>
       </p:ext>
     </p:extLst>
   </p:cSld>
@@ -6310,7 +6270,7 @@
     </p:spTree>
     <p:extLst>
       <p:ext uri="{BB962C8B-B14F-4D97-AF65-F5344CB8AC3E}">
-        <p14:creationId xmlns:p14="http://schemas.microsoft.com/office/powerpoint/2010/main" val="1581406028"/>
+        <p14:creationId xmlns:p14="http://schemas.microsoft.com/office/powerpoint/2010/main" val="2229440876"/>
       </p:ext>
     </p:extLst>
   </p:cSld>
@@ -6394,7 +6354,7 @@
     </p:spTree>
     <p:extLst>
       <p:ext uri="{BB962C8B-B14F-4D97-AF65-F5344CB8AC3E}">
-        <p14:creationId xmlns:p14="http://schemas.microsoft.com/office/powerpoint/2010/main" val="299799724"/>
+        <p14:creationId xmlns:p14="http://schemas.microsoft.com/office/powerpoint/2010/main" val="2350728921"/>
       </p:ext>
     </p:extLst>
   </p:cSld>
@@ -6562,7 +6522,7 @@
     </p:spTree>
     <p:extLst>
       <p:ext uri="{BB962C8B-B14F-4D97-AF65-F5344CB8AC3E}">
-        <p14:creationId xmlns:p14="http://schemas.microsoft.com/office/powerpoint/2010/main" val="2229440876"/>
+        <p14:creationId xmlns:p14="http://schemas.microsoft.com/office/powerpoint/2010/main" val="1004591723"/>
       </p:ext>
     </p:extLst>
   </p:cSld>
@@ -6646,7 +6606,7 @@
     </p:spTree>
     <p:extLst>
       <p:ext uri="{BB962C8B-B14F-4D97-AF65-F5344CB8AC3E}">
-        <p14:creationId xmlns:p14="http://schemas.microsoft.com/office/powerpoint/2010/main" val="2350728921"/>
+        <p14:creationId xmlns:p14="http://schemas.microsoft.com/office/powerpoint/2010/main" val="1737165775"/>
       </p:ext>
     </p:extLst>
   </p:cSld>
@@ -6730,7 +6690,7 @@
     </p:spTree>
     <p:extLst>
       <p:ext uri="{BB962C8B-B14F-4D97-AF65-F5344CB8AC3E}">
-        <p14:creationId xmlns:p14="http://schemas.microsoft.com/office/powerpoint/2010/main" val="1004591723"/>
+        <p14:creationId xmlns:p14="http://schemas.microsoft.com/office/powerpoint/2010/main" val="1030293071"/>
       </p:ext>
     </p:extLst>
   </p:cSld>
@@ -6814,7 +6774,7 @@
     </p:spTree>
     <p:extLst>
       <p:ext uri="{BB962C8B-B14F-4D97-AF65-F5344CB8AC3E}">
-        <p14:creationId xmlns:p14="http://schemas.microsoft.com/office/powerpoint/2010/main" val="1737165775"/>
+        <p14:creationId xmlns:p14="http://schemas.microsoft.com/office/powerpoint/2010/main" val="834707851"/>
       </p:ext>
     </p:extLst>
   </p:cSld>
@@ -6868,7 +6828,32 @@
           <a:bodyPr/>
           <a:lstStyle/>
           <a:p>
-            <a:endParaRPr lang="en-US" b="0" dirty="0" smtClean="0"/>
+            <a:pPr marL="0" marR="0" indent="0" algn="l" defTabSz="914400" rtl="0" eaLnBrk="1" fontAlgn="auto" latinLnBrk="0" hangingPunct="1">
+              <a:lnSpc>
+                <a:spcPct val="100000"/>
+              </a:lnSpc>
+              <a:spcBef>
+                <a:spcPts val="0"/>
+              </a:spcBef>
+              <a:spcAft>
+                <a:spcPts val="0"/>
+              </a:spcAft>
+              <a:buClrTx/>
+              <a:buSzTx/>
+              <a:buFontTx/>
+              <a:buNone/>
+              <a:tabLst/>
+              <a:defRPr/>
+            </a:pPr>
+            <a:endParaRPr lang="en-US" sz="1200" kern="1200" dirty="0" smtClean="0">
+              <a:solidFill>
+                <a:schemeClr val="tx1"/>
+              </a:solidFill>
+              <a:effectLst/>
+              <a:latin typeface="+mn-lt"/>
+              <a:ea typeface="+mn-ea"/>
+              <a:cs typeface="+mn-cs"/>
+            </a:endParaRPr>
           </a:p>
         </p:txBody>
       </p:sp>
@@ -6898,7 +6883,7 @@
     </p:spTree>
     <p:extLst>
       <p:ext uri="{BB962C8B-B14F-4D97-AF65-F5344CB8AC3E}">
-        <p14:creationId xmlns:p14="http://schemas.microsoft.com/office/powerpoint/2010/main" val="1030293071"/>
+        <p14:creationId xmlns:p14="http://schemas.microsoft.com/office/powerpoint/2010/main" val="4095300961"/>
       </p:ext>
     </p:extLst>
   </p:cSld>
@@ -6982,91 +6967,7 @@
     </p:spTree>
     <p:extLst>
       <p:ext uri="{BB962C8B-B14F-4D97-AF65-F5344CB8AC3E}">
-        <p14:creationId xmlns:p14="http://schemas.microsoft.com/office/powerpoint/2010/main" val="834707851"/>
-      </p:ext>
-    </p:extLst>
-  </p:cSld>
-  <p:clrMapOvr>
-    <a:masterClrMapping/>
-  </p:clrMapOvr>
-</p:notes>
-</file>
-
-<file path=ppt/notesSlides/notesSlide76.xml><?xml version="1.0" encoding="utf-8"?>
-<p:notes xmlns:a="http://schemas.openxmlformats.org/drawingml/2006/main" xmlns:r="http://schemas.openxmlformats.org/officeDocument/2006/relationships" xmlns:p="http://schemas.openxmlformats.org/presentationml/2006/main">
-  <p:cSld>
-    <p:spTree>
-      <p:nvGrpSpPr>
-        <p:cNvPr id="1" name=""/>
-        <p:cNvGrpSpPr/>
-        <p:nvPr/>
-      </p:nvGrpSpPr>
-      <p:grpSpPr>
-        <a:xfrm>
-          <a:off x="0" y="0"/>
-          <a:ext cx="0" cy="0"/>
-          <a:chOff x="0" y="0"/>
-          <a:chExt cx="0" cy="0"/>
-        </a:xfrm>
-      </p:grpSpPr>
-      <p:sp>
-        <p:nvSpPr>
-          <p:cNvPr id="2" name="Slide Image Placeholder 1"/>
-          <p:cNvSpPr>
-            <a:spLocks noGrp="1" noRot="1" noChangeAspect="1"/>
-          </p:cNvSpPr>
-          <p:nvPr>
-            <p:ph type="sldImg"/>
-          </p:nvPr>
-        </p:nvSpPr>
-        <p:spPr/>
-      </p:sp>
-      <p:sp>
-        <p:nvSpPr>
-          <p:cNvPr id="3" name="Notes Placeholder 2"/>
-          <p:cNvSpPr>
-            <a:spLocks noGrp="1"/>
-          </p:cNvSpPr>
-          <p:nvPr>
-            <p:ph type="body" idx="1"/>
-          </p:nvPr>
-        </p:nvSpPr>
-        <p:spPr/>
-        <p:txBody>
-          <a:bodyPr/>
-          <a:lstStyle/>
-          <a:p>
-            <a:endParaRPr lang="en-US" b="0" dirty="0" smtClean="0"/>
-          </a:p>
-        </p:txBody>
-      </p:sp>
-      <p:sp>
-        <p:nvSpPr>
-          <p:cNvPr id="4" name="Slide Number Placeholder 3"/>
-          <p:cNvSpPr>
-            <a:spLocks noGrp="1"/>
-          </p:cNvSpPr>
-          <p:nvPr>
-            <p:ph type="sldNum" sz="quarter" idx="10"/>
-          </p:nvPr>
-        </p:nvSpPr>
-        <p:spPr/>
-        <p:txBody>
-          <a:bodyPr/>
-          <a:lstStyle/>
-          <a:p>
-            <a:fld id="{89029652-62E7-43D6-83B5-097D7B7AA5D8}" type="slidenum">
-              <a:rPr lang="en-US" smtClean="0"/>
-              <a:t>76</a:t>
-            </a:fld>
-            <a:endParaRPr lang="en-US"/>
-          </a:p>
-        </p:txBody>
-      </p:sp>
-    </p:spTree>
-    <p:extLst>
-      <p:ext uri="{BB962C8B-B14F-4D97-AF65-F5344CB8AC3E}">
-        <p14:creationId xmlns:p14="http://schemas.microsoft.com/office/powerpoint/2010/main" val="1748055161"/>
+        <p14:creationId xmlns:p14="http://schemas.microsoft.com/office/powerpoint/2010/main" val="850989674"/>
       </p:ext>
     </p:extLst>
   </p:cSld>
@@ -7375,7 +7276,7 @@
           <a:p>
             <a:fld id="{75AA6396-395E-4ADA-8EE5-F328BC863A04}" type="datetimeFigureOut">
               <a:rPr lang="en-US" smtClean="0"/>
-              <a:t>1/6/2017</a:t>
+              <a:t>1/8/2017</a:t>
             </a:fld>
             <a:endParaRPr lang="en-US"/>
           </a:p>
@@ -7552,7 +7453,7 @@
           <a:p>
             <a:fld id="{75AA6396-395E-4ADA-8EE5-F328BC863A04}" type="datetimeFigureOut">
               <a:rPr lang="en-US" smtClean="0"/>
-              <a:t>1/6/2017</a:t>
+              <a:t>1/8/2017</a:t>
             </a:fld>
             <a:endParaRPr lang="en-US"/>
           </a:p>
@@ -7732,7 +7633,7 @@
           <a:p>
             <a:fld id="{75AA6396-395E-4ADA-8EE5-F328BC863A04}" type="datetimeFigureOut">
               <a:rPr lang="en-US" smtClean="0"/>
-              <a:t>1/6/2017</a:t>
+              <a:t>1/8/2017</a:t>
             </a:fld>
             <a:endParaRPr lang="en-US"/>
           </a:p>
@@ -7952,7 +7853,7 @@
           <a:p>
             <a:fld id="{75AA6396-395E-4ADA-8EE5-F328BC863A04}" type="datetimeFigureOut">
               <a:rPr lang="en-US" smtClean="0"/>
-              <a:t>1/6/2017</a:t>
+              <a:t>1/8/2017</a:t>
             </a:fld>
             <a:endParaRPr lang="en-US"/>
           </a:p>
@@ -8205,7 +8106,7 @@
           <a:p>
             <a:fld id="{75AA6396-395E-4ADA-8EE5-F328BC863A04}" type="datetimeFigureOut">
               <a:rPr lang="en-US" smtClean="0"/>
-              <a:t>1/6/2017</a:t>
+              <a:t>1/8/2017</a:t>
             </a:fld>
             <a:endParaRPr lang="en-US"/>
           </a:p>
@@ -8444,7 +8345,7 @@
           <a:p>
             <a:fld id="{75AA6396-395E-4ADA-8EE5-F328BC863A04}" type="datetimeFigureOut">
               <a:rPr lang="en-US" smtClean="0"/>
-              <a:t>1/6/2017</a:t>
+              <a:t>1/8/2017</a:t>
             </a:fld>
             <a:endParaRPr lang="en-US"/>
           </a:p>
@@ -8818,7 +8719,7 @@
           <a:p>
             <a:fld id="{75AA6396-395E-4ADA-8EE5-F328BC863A04}" type="datetimeFigureOut">
               <a:rPr lang="en-US" smtClean="0"/>
-              <a:t>1/6/2017</a:t>
+              <a:t>1/8/2017</a:t>
             </a:fld>
             <a:endParaRPr lang="en-US"/>
           </a:p>
@@ -8936,7 +8837,7 @@
           <a:p>
             <a:fld id="{75AA6396-395E-4ADA-8EE5-F328BC863A04}" type="datetimeFigureOut">
               <a:rPr lang="en-US" smtClean="0"/>
-              <a:t>1/6/2017</a:t>
+              <a:t>1/8/2017</a:t>
             </a:fld>
             <a:endParaRPr lang="en-US"/>
           </a:p>
@@ -9031,7 +8932,7 @@
           <a:p>
             <a:fld id="{75AA6396-395E-4ADA-8EE5-F328BC863A04}" type="datetimeFigureOut">
               <a:rPr lang="en-US" smtClean="0"/>
-              <a:t>1/6/2017</a:t>
+              <a:t>1/8/2017</a:t>
             </a:fld>
             <a:endParaRPr lang="en-US"/>
           </a:p>
@@ -9308,7 +9209,7 @@
           <a:p>
             <a:fld id="{75AA6396-395E-4ADA-8EE5-F328BC863A04}" type="datetimeFigureOut">
               <a:rPr lang="en-US" smtClean="0"/>
-              <a:t>1/6/2017</a:t>
+              <a:t>1/8/2017</a:t>
             </a:fld>
             <a:endParaRPr lang="en-US"/>
           </a:p>
@@ -9561,7 +9462,7 @@
           <a:p>
             <a:fld id="{75AA6396-395E-4ADA-8EE5-F328BC863A04}" type="datetimeFigureOut">
               <a:rPr lang="en-US" smtClean="0"/>
-              <a:t>1/6/2017</a:t>
+              <a:t>1/8/2017</a:t>
             </a:fld>
             <a:endParaRPr lang="en-US"/>
           </a:p>
@@ -9774,7 +9675,7 @@
           <a:p>
             <a:fld id="{75AA6396-395E-4ADA-8EE5-F328BC863A04}" type="datetimeFigureOut">
               <a:rPr lang="en-US" smtClean="0"/>
-              <a:t>1/6/2017</a:t>
+              <a:t>1/8/2017</a:t>
             </a:fld>
             <a:endParaRPr lang="en-US"/>
           </a:p>
@@ -10228,11 +10129,7 @@
             <a:pPr algn="ctr"/>
             <a:r>
               <a:rPr lang="en-US" sz="6000" dirty="0" smtClean="0"/>
-              <a:t>Don't Write Secure Code</a:t>
-            </a:r>
-            <a:r>
-              <a:rPr lang="en-US" sz="6000" dirty="0" smtClean="0"/>
-              <a:t>!</a:t>
+              <a:t>Don't Write Secure Code!</a:t>
             </a:r>
             <a:br>
               <a:rPr lang="en-US" sz="6000" dirty="0" smtClean="0"/>
@@ -10260,17 +10157,7 @@
                   </a:schemeClr>
                 </a:solidFill>
               </a:rPr>
-              <a:t>(</a:t>
-            </a:r>
-            <a:r>
-              <a:rPr lang="en-US" dirty="0" smtClean="0">
-                <a:solidFill>
-                  <a:schemeClr val="bg1">
-                    <a:lumMod val="50000"/>
-                  </a:schemeClr>
-                </a:solidFill>
-              </a:rPr>
-              <a:t>Build secure systems instead)</a:t>
+              <a:t>(Build secure systems instead)</a:t>
             </a:r>
             <a:endParaRPr lang="en-US" sz="4000" dirty="0">
               <a:solidFill>
@@ -12387,7 +12274,15 @@
                   <a:srgbClr val="013947"/>
                 </a:solidFill>
               </a:rPr>
-              <a:t>bit.ly/2i0J91d</a:t>
+              <a:t>bit.ly/</a:t>
+            </a:r>
+            <a:r>
+              <a:rPr lang="en-US" dirty="0" err="1" smtClean="0">
+                <a:solidFill>
+                  <a:srgbClr val="013947"/>
+                </a:solidFill>
+              </a:rPr>
+              <a:t>DontWriteSecureCode</a:t>
             </a:r>
             <a:endParaRPr lang="en-US" sz="4800" dirty="0">
               <a:solidFill>
@@ -12418,254 +12313,6 @@
 </file>
 
 <file path=ppt/slides/slide23.xml><?xml version="1.0" encoding="utf-8"?>
-<p:sld xmlns:a="http://schemas.openxmlformats.org/drawingml/2006/main" xmlns:r="http://schemas.openxmlformats.org/officeDocument/2006/relationships" xmlns:p="http://schemas.openxmlformats.org/presentationml/2006/main" show="0">
-  <p:cSld>
-    <p:spTree>
-      <p:nvGrpSpPr>
-        <p:cNvPr id="1" name=""/>
-        <p:cNvGrpSpPr/>
-        <p:nvPr/>
-      </p:nvGrpSpPr>
-      <p:grpSpPr>
-        <a:xfrm>
-          <a:off x="0" y="0"/>
-          <a:ext cx="0" cy="0"/>
-          <a:chOff x="0" y="0"/>
-          <a:chExt cx="0" cy="0"/>
-        </a:xfrm>
-      </p:grpSpPr>
-      <p:sp>
-        <p:nvSpPr>
-          <p:cNvPr id="2" name="Title 1"/>
-          <p:cNvSpPr>
-            <a:spLocks noGrp="1"/>
-          </p:cNvSpPr>
-          <p:nvPr>
-            <p:ph type="title"/>
-          </p:nvPr>
-        </p:nvSpPr>
-        <p:spPr>
-          <a:xfrm>
-            <a:off x="964927" y="1"/>
-            <a:ext cx="10515600" cy="6858000"/>
-          </a:xfrm>
-        </p:spPr>
-        <p:txBody>
-          <a:bodyPr anchor="ctr">
-            <a:normAutofit/>
-          </a:bodyPr>
-          <a:lstStyle/>
-          <a:p>
-            <a:pPr algn="ctr"/>
-            <a:r>
-              <a:rPr lang="en-US" sz="4800" dirty="0" smtClean="0"/>
-              <a:t>SQL Injection</a:t>
-            </a:r>
-            <a:br>
-              <a:rPr lang="en-US" sz="4800" dirty="0" smtClean="0"/>
-            </a:br>
-            <a:r>
-              <a:rPr lang="en-US" sz="4800" dirty="0"/>
-              <a:t/>
-            </a:r>
-            <a:br>
-              <a:rPr lang="en-US" sz="4800" dirty="0"/>
-            </a:br>
-            <a:r>
-              <a:rPr lang="en-US" dirty="0" smtClean="0">
-                <a:solidFill>
-                  <a:srgbClr val="013947"/>
-                </a:solidFill>
-              </a:rPr>
-              <a:t>Little Bobby Tables, at it again</a:t>
-            </a:r>
-            <a:endParaRPr lang="en-US" sz="4800" dirty="0">
-              <a:solidFill>
-                <a:srgbClr val="013947"/>
-              </a:solidFill>
-            </a:endParaRPr>
-          </a:p>
-        </p:txBody>
-      </p:sp>
-    </p:spTree>
-    <p:extLst>
-      <p:ext uri="{BB962C8B-B14F-4D97-AF65-F5344CB8AC3E}">
-        <p14:creationId xmlns:p14="http://schemas.microsoft.com/office/powerpoint/2010/main" val="1693683598"/>
-      </p:ext>
-    </p:extLst>
-  </p:cSld>
-  <p:clrMapOvr>
-    <a:masterClrMapping/>
-  </p:clrMapOvr>
-  <mc:AlternateContent xmlns:mc="http://schemas.openxmlformats.org/markup-compatibility/2006" xmlns:p14="http://schemas.microsoft.com/office/powerpoint/2010/main">
-    <mc:Choice Requires="p14">
-      <p:transition spd="slow" p14:dur="2000"/>
-    </mc:Choice>
-    <mc:Fallback xmlns="">
-      <p:transition spd="slow"/>
-    </mc:Fallback>
-  </mc:AlternateContent>
-  <p:timing>
-    <p:tnLst>
-      <p:par>
-        <p:cTn id="1" dur="indefinite" restart="never" nodeType="tmRoot"/>
-      </p:par>
-    </p:tnLst>
-  </p:timing>
-</p:sld>
-</file>
-
-<file path=ppt/slides/slide24.xml><?xml version="1.0" encoding="utf-8"?>
-<p:sld xmlns:a="http://schemas.openxmlformats.org/drawingml/2006/main" xmlns:r="http://schemas.openxmlformats.org/officeDocument/2006/relationships" xmlns:p="http://schemas.openxmlformats.org/presentationml/2006/main" show="0">
-  <p:cSld>
-    <p:spTree>
-      <p:nvGrpSpPr>
-        <p:cNvPr id="1" name=""/>
-        <p:cNvGrpSpPr/>
-        <p:nvPr/>
-      </p:nvGrpSpPr>
-      <p:grpSpPr>
-        <a:xfrm>
-          <a:off x="0" y="0"/>
-          <a:ext cx="0" cy="0"/>
-          <a:chOff x="0" y="0"/>
-          <a:chExt cx="0" cy="0"/>
-        </a:xfrm>
-      </p:grpSpPr>
-      <p:sp>
-        <p:nvSpPr>
-          <p:cNvPr id="2" name="Title 1"/>
-          <p:cNvSpPr>
-            <a:spLocks noGrp="1"/>
-          </p:cNvSpPr>
-          <p:nvPr>
-            <p:ph type="title"/>
-          </p:nvPr>
-        </p:nvSpPr>
-        <p:spPr/>
-        <p:txBody>
-          <a:bodyPr>
-            <a:normAutofit/>
-          </a:bodyPr>
-          <a:lstStyle/>
-          <a:p>
-            <a:r>
-              <a:rPr lang="en-US" sz="4800" dirty="0" smtClean="0"/>
-              <a:t>SQL Injection</a:t>
-            </a:r>
-            <a:endParaRPr lang="en-US" sz="4800" dirty="0"/>
-          </a:p>
-        </p:txBody>
-      </p:sp>
-      <p:sp>
-        <p:nvSpPr>
-          <p:cNvPr id="3" name="Content Placeholder 2"/>
-          <p:cNvSpPr>
-            <a:spLocks noGrp="1"/>
-          </p:cNvSpPr>
-          <p:nvPr>
-            <p:ph idx="1"/>
-          </p:nvPr>
-        </p:nvSpPr>
-        <p:spPr>
-          <a:xfrm>
-            <a:off x="838200" y="1825624"/>
-            <a:ext cx="10515600" cy="4589923"/>
-          </a:xfrm>
-        </p:spPr>
-        <p:txBody>
-          <a:bodyPr>
-            <a:normAutofit/>
-          </a:bodyPr>
-          <a:lstStyle/>
-          <a:p>
-            <a:endParaRPr lang="en-US" dirty="0" smtClean="0"/>
-          </a:p>
-          <a:p>
-            <a:endParaRPr lang="en-US" dirty="0" smtClean="0"/>
-          </a:p>
-          <a:p>
-            <a:endParaRPr lang="en-US" dirty="0"/>
-          </a:p>
-        </p:txBody>
-      </p:sp>
-      <p:pic>
-        <p:nvPicPr>
-          <p:cNvPr id="4" name="Picture 3"/>
-          <p:cNvPicPr>
-            <a:picLocks noChangeAspect="1"/>
-          </p:cNvPicPr>
-          <p:nvPr/>
-        </p:nvPicPr>
-        <p:blipFill>
-          <a:blip r:embed="rId3"/>
-          <a:stretch>
-            <a:fillRect/>
-          </a:stretch>
-        </p:blipFill>
-        <p:spPr>
-          <a:xfrm>
-            <a:off x="838200" y="2139744"/>
-            <a:ext cx="10783529" cy="1797256"/>
-          </a:xfrm>
-          <a:prstGeom prst="rect">
-            <a:avLst/>
-          </a:prstGeom>
-        </p:spPr>
-      </p:pic>
-      <p:pic>
-        <p:nvPicPr>
-          <p:cNvPr id="9" name="Picture 8"/>
-          <p:cNvPicPr>
-            <a:picLocks noChangeAspect="1"/>
-          </p:cNvPicPr>
-          <p:nvPr/>
-        </p:nvPicPr>
-        <p:blipFill>
-          <a:blip r:embed="rId4"/>
-          <a:stretch>
-            <a:fillRect/>
-          </a:stretch>
-        </p:blipFill>
-        <p:spPr>
-          <a:xfrm>
-            <a:off x="838200" y="4386055"/>
-            <a:ext cx="10870128" cy="1439557"/>
-          </a:xfrm>
-          <a:prstGeom prst="rect">
-            <a:avLst/>
-          </a:prstGeom>
-        </p:spPr>
-      </p:pic>
-    </p:spTree>
-    <p:extLst>
-      <p:ext uri="{BB962C8B-B14F-4D97-AF65-F5344CB8AC3E}">
-        <p14:creationId xmlns:p14="http://schemas.microsoft.com/office/powerpoint/2010/main" val="27120899"/>
-      </p:ext>
-    </p:extLst>
-  </p:cSld>
-  <p:clrMapOvr>
-    <a:masterClrMapping/>
-  </p:clrMapOvr>
-  <mc:AlternateContent xmlns:mc="http://schemas.openxmlformats.org/markup-compatibility/2006" xmlns:p14="http://schemas.microsoft.com/office/powerpoint/2010/main">
-    <mc:Choice Requires="p14">
-      <p:transition spd="slow" p14:dur="2000"/>
-    </mc:Choice>
-    <mc:Fallback xmlns="">
-      <p:transition spd="slow"/>
-    </mc:Fallback>
-  </mc:AlternateContent>
-  <p:timing>
-    <p:tnLst>
-      <p:par>
-        <p:cTn id="1" dur="indefinite" restart="never" nodeType="tmRoot"/>
-      </p:par>
-    </p:tnLst>
-  </p:timing>
-</p:sld>
-</file>
-
-<file path=ppt/slides/slide25.xml><?xml version="1.0" encoding="utf-8"?>
 <p:sld xmlns:a="http://schemas.openxmlformats.org/drawingml/2006/main" xmlns:r="http://schemas.openxmlformats.org/officeDocument/2006/relationships" xmlns:p="http://schemas.openxmlformats.org/presentationml/2006/main">
   <p:cSld>
     <p:spTree>
@@ -12841,7 +12488,7 @@
 </p:sld>
 </file>
 
-<file path=ppt/slides/slide26.xml><?xml version="1.0" encoding="utf-8"?>
+<file path=ppt/slides/slide24.xml><?xml version="1.0" encoding="utf-8"?>
 <p:sld xmlns:a="http://schemas.openxmlformats.org/drawingml/2006/main" xmlns:r="http://schemas.openxmlformats.org/officeDocument/2006/relationships" xmlns:p="http://schemas.openxmlformats.org/presentationml/2006/main">
   <p:cSld>
     <p:spTree>
@@ -12959,7 +12606,7 @@
 </p:sld>
 </file>
 
-<file path=ppt/slides/slide27.xml><?xml version="1.0" encoding="utf-8"?>
+<file path=ppt/slides/slide25.xml><?xml version="1.0" encoding="utf-8"?>
 <p:sld xmlns:a="http://schemas.openxmlformats.org/drawingml/2006/main" xmlns:r="http://schemas.openxmlformats.org/officeDocument/2006/relationships" xmlns:p="http://schemas.openxmlformats.org/presentationml/2006/main">
   <p:cSld>
     <p:spTree>
@@ -13104,7 +12751,7 @@
 </p:sld>
 </file>
 
-<file path=ppt/slides/slide28.xml><?xml version="1.0" encoding="utf-8"?>
+<file path=ppt/slides/slide26.xml><?xml version="1.0" encoding="utf-8"?>
 <p:sld xmlns:a="http://schemas.openxmlformats.org/drawingml/2006/main" xmlns:r="http://schemas.openxmlformats.org/officeDocument/2006/relationships" xmlns:p="http://schemas.openxmlformats.org/presentationml/2006/main">
   <p:cSld>
     <p:spTree>
@@ -13246,7 +12893,7 @@
 </p:sld>
 </file>
 
-<file path=ppt/slides/slide29.xml><?xml version="1.0" encoding="utf-8"?>
+<file path=ppt/slides/slide27.xml><?xml version="1.0" encoding="utf-8"?>
 <p:sld xmlns:a="http://schemas.openxmlformats.org/drawingml/2006/main" xmlns:r="http://schemas.openxmlformats.org/officeDocument/2006/relationships" xmlns:p="http://schemas.openxmlformats.org/presentationml/2006/main">
   <p:cSld>
     <p:spTree>
@@ -13389,100 +13036,7 @@
 </p:sld>
 </file>
 
-<file path=ppt/slides/slide3.xml><?xml version="1.0" encoding="utf-8"?>
-<p:sld xmlns:a="http://schemas.openxmlformats.org/drawingml/2006/main" xmlns:r="http://schemas.openxmlformats.org/officeDocument/2006/relationships" xmlns:p="http://schemas.openxmlformats.org/presentationml/2006/main">
-  <p:cSld>
-    <p:spTree>
-      <p:nvGrpSpPr>
-        <p:cNvPr id="1" name=""/>
-        <p:cNvGrpSpPr/>
-        <p:nvPr/>
-      </p:nvGrpSpPr>
-      <p:grpSpPr>
-        <a:xfrm>
-          <a:off x="0" y="0"/>
-          <a:ext cx="0" cy="0"/>
-          <a:chOff x="0" y="0"/>
-          <a:chExt cx="0" cy="0"/>
-        </a:xfrm>
-      </p:grpSpPr>
-      <p:sp>
-        <p:nvSpPr>
-          <p:cNvPr id="2" name="Title 1"/>
-          <p:cNvSpPr>
-            <a:spLocks noGrp="1"/>
-          </p:cNvSpPr>
-          <p:nvPr>
-            <p:ph type="title"/>
-          </p:nvPr>
-        </p:nvSpPr>
-        <p:spPr>
-          <a:xfrm>
-            <a:off x="964927" y="1"/>
-            <a:ext cx="10515600" cy="6858000"/>
-          </a:xfrm>
-        </p:spPr>
-        <p:txBody>
-          <a:bodyPr anchor="ctr">
-            <a:normAutofit/>
-          </a:bodyPr>
-          <a:lstStyle/>
-          <a:p>
-            <a:pPr algn="ctr"/>
-            <a:r>
-              <a:rPr lang="en-US" sz="4800" strike="sngStrike" dirty="0" smtClean="0">
-                <a:solidFill>
-                  <a:schemeClr val="bg1">
-                    <a:lumMod val="75000"/>
-                  </a:schemeClr>
-                </a:solidFill>
-              </a:rPr>
-              <a:t>I hate writing secure code</a:t>
-            </a:r>
-            <a:r>
-              <a:rPr lang="en-US" sz="4800" strike="sngStrike" dirty="0" smtClean="0"/>
-              <a:t/>
-            </a:r>
-            <a:br>
-              <a:rPr lang="en-US" sz="4800" strike="sngStrike" dirty="0" smtClean="0"/>
-            </a:br>
-            <a:r>
-              <a:rPr lang="en-US" sz="4800" dirty="0" smtClean="0"/>
-              <a:t>I hate writing secure </a:t>
-            </a:r>
-            <a:r>
-              <a:rPr lang="en-US" sz="4800" i="1" dirty="0" smtClean="0"/>
-              <a:t>feature </a:t>
-            </a:r>
-            <a:r>
-              <a:rPr lang="en-US" sz="4800" dirty="0" smtClean="0"/>
-              <a:t>code</a:t>
-            </a:r>
-            <a:endParaRPr lang="en-US" sz="4800" dirty="0"/>
-          </a:p>
-        </p:txBody>
-      </p:sp>
-    </p:spTree>
-    <p:extLst>
-      <p:ext uri="{BB962C8B-B14F-4D97-AF65-F5344CB8AC3E}">
-        <p14:creationId xmlns:p14="http://schemas.microsoft.com/office/powerpoint/2010/main" val="75936766"/>
-      </p:ext>
-    </p:extLst>
-  </p:cSld>
-  <p:clrMapOvr>
-    <a:masterClrMapping/>
-  </p:clrMapOvr>
-  <p:timing>
-    <p:tnLst>
-      <p:par>
-        <p:cTn id="1" dur="indefinite" restart="never" nodeType="tmRoot"/>
-      </p:par>
-    </p:tnLst>
-  </p:timing>
-</p:sld>
-</file>
-
-<file path=ppt/slides/slide30.xml><?xml version="1.0" encoding="utf-8"?>
+<file path=ppt/slides/slide28.xml><?xml version="1.0" encoding="utf-8"?>
 <p:sld xmlns:a="http://schemas.openxmlformats.org/drawingml/2006/main" xmlns:r="http://schemas.openxmlformats.org/officeDocument/2006/relationships" xmlns:p="http://schemas.openxmlformats.org/presentationml/2006/main">
   <p:cSld>
     <p:spTree>
@@ -13620,7 +13174,7 @@
 </p:sld>
 </file>
 
-<file path=ppt/slides/slide31.xml><?xml version="1.0" encoding="utf-8"?>
+<file path=ppt/slides/slide29.xml><?xml version="1.0" encoding="utf-8"?>
 <p:sld xmlns:a="http://schemas.openxmlformats.org/drawingml/2006/main" xmlns:r="http://schemas.openxmlformats.org/officeDocument/2006/relationships" xmlns:p="http://schemas.openxmlformats.org/presentationml/2006/main">
   <p:cSld>
     <p:spTree>
@@ -13758,7 +13312,100 @@
 </p:sld>
 </file>
 
-<file path=ppt/slides/slide32.xml><?xml version="1.0" encoding="utf-8"?>
+<file path=ppt/slides/slide3.xml><?xml version="1.0" encoding="utf-8"?>
+<p:sld xmlns:a="http://schemas.openxmlformats.org/drawingml/2006/main" xmlns:r="http://schemas.openxmlformats.org/officeDocument/2006/relationships" xmlns:p="http://schemas.openxmlformats.org/presentationml/2006/main">
+  <p:cSld>
+    <p:spTree>
+      <p:nvGrpSpPr>
+        <p:cNvPr id="1" name=""/>
+        <p:cNvGrpSpPr/>
+        <p:nvPr/>
+      </p:nvGrpSpPr>
+      <p:grpSpPr>
+        <a:xfrm>
+          <a:off x="0" y="0"/>
+          <a:ext cx="0" cy="0"/>
+          <a:chOff x="0" y="0"/>
+          <a:chExt cx="0" cy="0"/>
+        </a:xfrm>
+      </p:grpSpPr>
+      <p:sp>
+        <p:nvSpPr>
+          <p:cNvPr id="2" name="Title 1"/>
+          <p:cNvSpPr>
+            <a:spLocks noGrp="1"/>
+          </p:cNvSpPr>
+          <p:nvPr>
+            <p:ph type="title"/>
+          </p:nvPr>
+        </p:nvSpPr>
+        <p:spPr>
+          <a:xfrm>
+            <a:off x="964927" y="1"/>
+            <a:ext cx="10515600" cy="6858000"/>
+          </a:xfrm>
+        </p:spPr>
+        <p:txBody>
+          <a:bodyPr anchor="ctr">
+            <a:normAutofit/>
+          </a:bodyPr>
+          <a:lstStyle/>
+          <a:p>
+            <a:pPr algn="ctr"/>
+            <a:r>
+              <a:rPr lang="en-US" sz="4800" strike="sngStrike" dirty="0" smtClean="0">
+                <a:solidFill>
+                  <a:schemeClr val="bg1">
+                    <a:lumMod val="75000"/>
+                  </a:schemeClr>
+                </a:solidFill>
+              </a:rPr>
+              <a:t>I hate writing secure code</a:t>
+            </a:r>
+            <a:r>
+              <a:rPr lang="en-US" sz="4800" strike="sngStrike" dirty="0" smtClean="0"/>
+              <a:t/>
+            </a:r>
+            <a:br>
+              <a:rPr lang="en-US" sz="4800" strike="sngStrike" dirty="0" smtClean="0"/>
+            </a:br>
+            <a:r>
+              <a:rPr lang="en-US" sz="4800" dirty="0" smtClean="0"/>
+              <a:t>I hate writing secure </a:t>
+            </a:r>
+            <a:r>
+              <a:rPr lang="en-US" sz="4800" i="1" dirty="0" smtClean="0"/>
+              <a:t>feature </a:t>
+            </a:r>
+            <a:r>
+              <a:rPr lang="en-US" sz="4800" dirty="0" smtClean="0"/>
+              <a:t>code</a:t>
+            </a:r>
+            <a:endParaRPr lang="en-US" sz="4800" dirty="0"/>
+          </a:p>
+        </p:txBody>
+      </p:sp>
+    </p:spTree>
+    <p:extLst>
+      <p:ext uri="{BB962C8B-B14F-4D97-AF65-F5344CB8AC3E}">
+        <p14:creationId xmlns:p14="http://schemas.microsoft.com/office/powerpoint/2010/main" val="75936766"/>
+      </p:ext>
+    </p:extLst>
+  </p:cSld>
+  <p:clrMapOvr>
+    <a:masterClrMapping/>
+  </p:clrMapOvr>
+  <p:timing>
+    <p:tnLst>
+      <p:par>
+        <p:cTn id="1" dur="indefinite" restart="never" nodeType="tmRoot"/>
+      </p:par>
+    </p:tnLst>
+  </p:timing>
+</p:sld>
+</file>
+
+<file path=ppt/slides/slide30.xml><?xml version="1.0" encoding="utf-8"?>
 <p:sld xmlns:a="http://schemas.openxmlformats.org/drawingml/2006/main" xmlns:r="http://schemas.openxmlformats.org/officeDocument/2006/relationships" xmlns:p="http://schemas.openxmlformats.org/presentationml/2006/main">
   <p:cSld>
     <p:spTree>
@@ -13896,7 +13543,7 @@
 </p:sld>
 </file>
 
-<file path=ppt/slides/slide33.xml><?xml version="1.0" encoding="utf-8"?>
+<file path=ppt/slides/slide31.xml><?xml version="1.0" encoding="utf-8"?>
 <p:sld xmlns:a="http://schemas.openxmlformats.org/drawingml/2006/main" xmlns:r="http://schemas.openxmlformats.org/officeDocument/2006/relationships" xmlns:p="http://schemas.openxmlformats.org/presentationml/2006/main">
   <p:cSld>
     <p:spTree>
@@ -14041,7 +13688,7 @@
 </p:sld>
 </file>
 
-<file path=ppt/slides/slide34.xml><?xml version="1.0" encoding="utf-8"?>
+<file path=ppt/slides/slide32.xml><?xml version="1.0" encoding="utf-8"?>
 <p:sld xmlns:a="http://schemas.openxmlformats.org/drawingml/2006/main" xmlns:r="http://schemas.openxmlformats.org/officeDocument/2006/relationships" xmlns:p="http://schemas.openxmlformats.org/presentationml/2006/main">
   <p:cSld>
     <p:spTree>
@@ -14191,7 +13838,7 @@
 </p:sld>
 </file>
 
-<file path=ppt/slides/slide35.xml><?xml version="1.0" encoding="utf-8"?>
+<file path=ppt/slides/slide33.xml><?xml version="1.0" encoding="utf-8"?>
 <p:sld xmlns:a="http://schemas.openxmlformats.org/drawingml/2006/main" xmlns:r="http://schemas.openxmlformats.org/officeDocument/2006/relationships" xmlns:p="http://schemas.openxmlformats.org/presentationml/2006/main">
   <p:cSld>
     <p:spTree>
@@ -14234,6 +13881,10 @@
             <a:r>
               <a:rPr lang="en-US" sz="4800" dirty="0" smtClean="0"/>
               <a:t>Authentication</a:t>
+            </a:r>
+            <a:r>
+              <a:rPr lang="en-US" sz="4800" dirty="0" smtClean="0"/>
+              <a:t/>
             </a:r>
             <a:br>
               <a:rPr lang="en-US" sz="4800" dirty="0" smtClean="0"/>
@@ -14281,7 +13932,7 @@
 </p:sld>
 </file>
 
-<file path=ppt/slides/slide36.xml><?xml version="1.0" encoding="utf-8"?>
+<file path=ppt/slides/slide34.xml><?xml version="1.0" encoding="utf-8"?>
 <p:sld xmlns:a="http://schemas.openxmlformats.org/drawingml/2006/main" xmlns:r="http://schemas.openxmlformats.org/officeDocument/2006/relationships" xmlns:p="http://schemas.openxmlformats.org/presentationml/2006/main">
   <p:cSld>
     <p:spTree>
@@ -14402,7 +14053,7 @@
 </p:sld>
 </file>
 
-<file path=ppt/slides/slide37.xml><?xml version="1.0" encoding="utf-8"?>
+<file path=ppt/slides/slide35.xml><?xml version="1.0" encoding="utf-8"?>
 <p:sld xmlns:a="http://schemas.openxmlformats.org/drawingml/2006/main" xmlns:r="http://schemas.openxmlformats.org/officeDocument/2006/relationships" xmlns:p="http://schemas.openxmlformats.org/presentationml/2006/main">
   <p:cSld>
     <p:spTree>
@@ -14523,7 +14174,7 @@
 </p:sld>
 </file>
 
-<file path=ppt/slides/slide38.xml><?xml version="1.0" encoding="utf-8"?>
+<file path=ppt/slides/slide36.xml><?xml version="1.0" encoding="utf-8"?>
 <p:sld xmlns:a="http://schemas.openxmlformats.org/drawingml/2006/main" xmlns:r="http://schemas.openxmlformats.org/officeDocument/2006/relationships" xmlns:p="http://schemas.openxmlformats.org/presentationml/2006/main">
   <p:cSld>
     <p:spTree>
@@ -14644,7 +14295,7 @@
 </p:sld>
 </file>
 
-<file path=ppt/slides/slide39.xml><?xml version="1.0" encoding="utf-8"?>
+<file path=ppt/slides/slide37.xml><?xml version="1.0" encoding="utf-8"?>
 <p:sld xmlns:a="http://schemas.openxmlformats.org/drawingml/2006/main" xmlns:r="http://schemas.openxmlformats.org/officeDocument/2006/relationships" xmlns:p="http://schemas.openxmlformats.org/presentationml/2006/main">
   <p:cSld>
     <p:spTree>
@@ -14765,119 +14416,7 @@
 </p:sld>
 </file>
 
-<file path=ppt/slides/slide4.xml><?xml version="1.0" encoding="utf-8"?>
-<p:sld xmlns:a="http://schemas.openxmlformats.org/drawingml/2006/main" xmlns:r="http://schemas.openxmlformats.org/officeDocument/2006/relationships" xmlns:p="http://schemas.openxmlformats.org/presentationml/2006/main">
-  <p:cSld>
-    <p:spTree>
-      <p:nvGrpSpPr>
-        <p:cNvPr id="1" name=""/>
-        <p:cNvGrpSpPr/>
-        <p:nvPr/>
-      </p:nvGrpSpPr>
-      <p:grpSpPr>
-        <a:xfrm>
-          <a:off x="0" y="0"/>
-          <a:ext cx="0" cy="0"/>
-          <a:chOff x="0" y="0"/>
-          <a:chExt cx="0" cy="0"/>
-        </a:xfrm>
-      </p:grpSpPr>
-      <p:sp>
-        <p:nvSpPr>
-          <p:cNvPr id="2" name="Title 1"/>
-          <p:cNvSpPr>
-            <a:spLocks noGrp="1"/>
-          </p:cNvSpPr>
-          <p:nvPr>
-            <p:ph type="title"/>
-          </p:nvPr>
-        </p:nvSpPr>
-        <p:spPr>
-          <a:xfrm>
-            <a:off x="964927" y="1"/>
-            <a:ext cx="10515600" cy="6858000"/>
-          </a:xfrm>
-        </p:spPr>
-        <p:txBody>
-          <a:bodyPr anchor="ctr">
-            <a:normAutofit/>
-          </a:bodyPr>
-          <a:lstStyle/>
-          <a:p>
-            <a:pPr algn="ctr"/>
-            <a:r>
-              <a:rPr lang="en-US" sz="4800" strike="sngStrike" dirty="0" smtClean="0">
-                <a:solidFill>
-                  <a:schemeClr val="bg1">
-                    <a:lumMod val="75000"/>
-                  </a:schemeClr>
-                </a:solidFill>
-              </a:rPr>
-              <a:t>I hate writing secure code</a:t>
-            </a:r>
-            <a:br>
-              <a:rPr lang="en-US" sz="4800" strike="sngStrike" dirty="0" smtClean="0">
-                <a:solidFill>
-                  <a:schemeClr val="bg1">
-                    <a:lumMod val="75000"/>
-                  </a:schemeClr>
-                </a:solidFill>
-              </a:rPr>
-            </a:br>
-            <a:r>
-              <a:rPr lang="en-US" sz="4800" strike="sngStrike" dirty="0" smtClean="0">
-                <a:solidFill>
-                  <a:schemeClr val="bg1">
-                    <a:lumMod val="75000"/>
-                  </a:schemeClr>
-                </a:solidFill>
-              </a:rPr>
-              <a:t>I hate writing secure features</a:t>
-            </a:r>
-            <a:r>
-              <a:rPr lang="en-US" sz="4800" strike="sngStrike" dirty="0" smtClean="0"/>
-              <a:t/>
-            </a:r>
-            <a:br>
-              <a:rPr lang="en-US" sz="4800" strike="sngStrike" dirty="0" smtClean="0"/>
-            </a:br>
-            <a:r>
-              <a:rPr lang="en-US" sz="4800" dirty="0" smtClean="0"/>
-              <a:t>I hate implementing </a:t>
-            </a:r>
-            <a:r>
-              <a:rPr lang="en-US" sz="4800" i="1" dirty="0" smtClean="0"/>
-              <a:t>cross-cutting security concerns</a:t>
-            </a:r>
-            <a:r>
-              <a:rPr lang="en-US" sz="4800" dirty="0" smtClean="0"/>
-              <a:t> by repeating the same patterns over and over again in my feature-level code</a:t>
-            </a:r>
-            <a:endParaRPr lang="en-US" sz="4800" dirty="0"/>
-          </a:p>
-        </p:txBody>
-      </p:sp>
-    </p:spTree>
-    <p:extLst>
-      <p:ext uri="{BB962C8B-B14F-4D97-AF65-F5344CB8AC3E}">
-        <p14:creationId xmlns:p14="http://schemas.microsoft.com/office/powerpoint/2010/main" val="3846056723"/>
-      </p:ext>
-    </p:extLst>
-  </p:cSld>
-  <p:clrMapOvr>
-    <a:masterClrMapping/>
-  </p:clrMapOvr>
-  <p:timing>
-    <p:tnLst>
-      <p:par>
-        <p:cTn id="1" dur="indefinite" restart="never" nodeType="tmRoot"/>
-      </p:par>
-    </p:tnLst>
-  </p:timing>
-</p:sld>
-</file>
-
-<file path=ppt/slides/slide40.xml><?xml version="1.0" encoding="utf-8"?>
+<file path=ppt/slides/slide38.xml><?xml version="1.0" encoding="utf-8"?>
 <p:sld xmlns:a="http://schemas.openxmlformats.org/drawingml/2006/main" xmlns:r="http://schemas.openxmlformats.org/officeDocument/2006/relationships" xmlns:p="http://schemas.openxmlformats.org/presentationml/2006/main">
   <p:cSld>
     <p:spTree>
@@ -14998,7 +14537,7 @@
 </p:sld>
 </file>
 
-<file path=ppt/slides/slide41.xml><?xml version="1.0" encoding="utf-8"?>
+<file path=ppt/slides/slide39.xml><?xml version="1.0" encoding="utf-8"?>
 <p:sld xmlns:a="http://schemas.openxmlformats.org/drawingml/2006/main" xmlns:r="http://schemas.openxmlformats.org/officeDocument/2006/relationships" xmlns:p="http://schemas.openxmlformats.org/presentationml/2006/main">
   <p:cSld>
     <p:spTree>
@@ -15088,7 +14627,119 @@
 </p:sld>
 </file>
 
-<file path=ppt/slides/slide42.xml><?xml version="1.0" encoding="utf-8"?>
+<file path=ppt/slides/slide4.xml><?xml version="1.0" encoding="utf-8"?>
+<p:sld xmlns:a="http://schemas.openxmlformats.org/drawingml/2006/main" xmlns:r="http://schemas.openxmlformats.org/officeDocument/2006/relationships" xmlns:p="http://schemas.openxmlformats.org/presentationml/2006/main">
+  <p:cSld>
+    <p:spTree>
+      <p:nvGrpSpPr>
+        <p:cNvPr id="1" name=""/>
+        <p:cNvGrpSpPr/>
+        <p:nvPr/>
+      </p:nvGrpSpPr>
+      <p:grpSpPr>
+        <a:xfrm>
+          <a:off x="0" y="0"/>
+          <a:ext cx="0" cy="0"/>
+          <a:chOff x="0" y="0"/>
+          <a:chExt cx="0" cy="0"/>
+        </a:xfrm>
+      </p:grpSpPr>
+      <p:sp>
+        <p:nvSpPr>
+          <p:cNvPr id="2" name="Title 1"/>
+          <p:cNvSpPr>
+            <a:spLocks noGrp="1"/>
+          </p:cNvSpPr>
+          <p:nvPr>
+            <p:ph type="title"/>
+          </p:nvPr>
+        </p:nvSpPr>
+        <p:spPr>
+          <a:xfrm>
+            <a:off x="964927" y="1"/>
+            <a:ext cx="10515600" cy="6858000"/>
+          </a:xfrm>
+        </p:spPr>
+        <p:txBody>
+          <a:bodyPr anchor="ctr">
+            <a:normAutofit/>
+          </a:bodyPr>
+          <a:lstStyle/>
+          <a:p>
+            <a:pPr algn="ctr"/>
+            <a:r>
+              <a:rPr lang="en-US" sz="4800" strike="sngStrike" dirty="0" smtClean="0">
+                <a:solidFill>
+                  <a:schemeClr val="bg1">
+                    <a:lumMod val="75000"/>
+                  </a:schemeClr>
+                </a:solidFill>
+              </a:rPr>
+              <a:t>I hate writing secure code</a:t>
+            </a:r>
+            <a:br>
+              <a:rPr lang="en-US" sz="4800" strike="sngStrike" dirty="0" smtClean="0">
+                <a:solidFill>
+                  <a:schemeClr val="bg1">
+                    <a:lumMod val="75000"/>
+                  </a:schemeClr>
+                </a:solidFill>
+              </a:rPr>
+            </a:br>
+            <a:r>
+              <a:rPr lang="en-US" sz="4800" strike="sngStrike" dirty="0" smtClean="0">
+                <a:solidFill>
+                  <a:schemeClr val="bg1">
+                    <a:lumMod val="75000"/>
+                  </a:schemeClr>
+                </a:solidFill>
+              </a:rPr>
+              <a:t>I hate writing secure features</a:t>
+            </a:r>
+            <a:r>
+              <a:rPr lang="en-US" sz="4800" strike="sngStrike" dirty="0" smtClean="0"/>
+              <a:t/>
+            </a:r>
+            <a:br>
+              <a:rPr lang="en-US" sz="4800" strike="sngStrike" dirty="0" smtClean="0"/>
+            </a:br>
+            <a:r>
+              <a:rPr lang="en-US" sz="4800" dirty="0" smtClean="0"/>
+              <a:t>I hate implementing </a:t>
+            </a:r>
+            <a:r>
+              <a:rPr lang="en-US" sz="4800" i="1" dirty="0" smtClean="0"/>
+              <a:t>cross-cutting security concerns</a:t>
+            </a:r>
+            <a:r>
+              <a:rPr lang="en-US" sz="4800" dirty="0" smtClean="0"/>
+              <a:t> by repeating the same patterns over and over again in my feature-level code</a:t>
+            </a:r>
+            <a:endParaRPr lang="en-US" sz="4800" dirty="0"/>
+          </a:p>
+        </p:txBody>
+      </p:sp>
+    </p:spTree>
+    <p:extLst>
+      <p:ext uri="{BB962C8B-B14F-4D97-AF65-F5344CB8AC3E}">
+        <p14:creationId xmlns:p14="http://schemas.microsoft.com/office/powerpoint/2010/main" val="3846056723"/>
+      </p:ext>
+    </p:extLst>
+  </p:cSld>
+  <p:clrMapOvr>
+    <a:masterClrMapping/>
+  </p:clrMapOvr>
+  <p:timing>
+    <p:tnLst>
+      <p:par>
+        <p:cTn id="1" dur="indefinite" restart="never" nodeType="tmRoot"/>
+      </p:par>
+    </p:tnLst>
+  </p:timing>
+</p:sld>
+</file>
+
+<file path=ppt/slides/slide40.xml><?xml version="1.0" encoding="utf-8"?>
 <p:sld xmlns:a="http://schemas.openxmlformats.org/drawingml/2006/main" xmlns:r="http://schemas.openxmlformats.org/officeDocument/2006/relationships" xmlns:p="http://schemas.openxmlformats.org/presentationml/2006/main">
   <p:cSld>
     <p:spTree>
@@ -15214,7 +14865,7 @@
 </p:sld>
 </file>
 
-<file path=ppt/slides/slide43.xml><?xml version="1.0" encoding="utf-8"?>
+<file path=ppt/slides/slide41.xml><?xml version="1.0" encoding="utf-8"?>
 <p:sld xmlns:a="http://schemas.openxmlformats.org/drawingml/2006/main" xmlns:r="http://schemas.openxmlformats.org/officeDocument/2006/relationships" xmlns:p="http://schemas.openxmlformats.org/presentationml/2006/main">
   <p:cSld>
     <p:spTree>
@@ -15340,7 +14991,7 @@
 </p:sld>
 </file>
 
-<file path=ppt/slides/slide44.xml><?xml version="1.0" encoding="utf-8"?>
+<file path=ppt/slides/slide42.xml><?xml version="1.0" encoding="utf-8"?>
 <p:sld xmlns:a="http://schemas.openxmlformats.org/drawingml/2006/main" xmlns:r="http://schemas.openxmlformats.org/officeDocument/2006/relationships" xmlns:p="http://schemas.openxmlformats.org/presentationml/2006/main">
   <p:cSld>
     <p:spTree>
@@ -15461,7 +15112,7 @@
 </p:sld>
 </file>
 
-<file path=ppt/slides/slide45.xml><?xml version="1.0" encoding="utf-8"?>
+<file path=ppt/slides/slide43.xml><?xml version="1.0" encoding="utf-8"?>
 <p:sld xmlns:a="http://schemas.openxmlformats.org/drawingml/2006/main" xmlns:r="http://schemas.openxmlformats.org/officeDocument/2006/relationships" xmlns:p="http://schemas.openxmlformats.org/presentationml/2006/main">
   <p:cSld>
     <p:spTree>
@@ -15582,7 +15233,7 @@
 </p:sld>
 </file>
 
-<file path=ppt/slides/slide46.xml><?xml version="1.0" encoding="utf-8"?>
+<file path=ppt/slides/slide44.xml><?xml version="1.0" encoding="utf-8"?>
 <p:sld xmlns:a="http://schemas.openxmlformats.org/drawingml/2006/main" xmlns:r="http://schemas.openxmlformats.org/officeDocument/2006/relationships" xmlns:p="http://schemas.openxmlformats.org/presentationml/2006/main">
   <p:cSld>
     <p:spTree>
@@ -15708,7 +15359,7 @@
 </p:sld>
 </file>
 
-<file path=ppt/slides/slide47.xml><?xml version="1.0" encoding="utf-8"?>
+<file path=ppt/slides/slide45.xml><?xml version="1.0" encoding="utf-8"?>
 <p:sld xmlns:a="http://schemas.openxmlformats.org/drawingml/2006/main" xmlns:r="http://schemas.openxmlformats.org/officeDocument/2006/relationships" xmlns:p="http://schemas.openxmlformats.org/presentationml/2006/main">
   <p:cSld>
     <p:spTree>
@@ -15858,7 +15509,7 @@
 </p:sld>
 </file>
 
-<file path=ppt/slides/slide48.xml><?xml version="1.0" encoding="utf-8"?>
+<file path=ppt/slides/slide46.xml><?xml version="1.0" encoding="utf-8"?>
 <p:sld xmlns:a="http://schemas.openxmlformats.org/drawingml/2006/main" xmlns:r="http://schemas.openxmlformats.org/officeDocument/2006/relationships" xmlns:p="http://schemas.openxmlformats.org/presentationml/2006/main">
   <p:cSld>
     <p:spTree>
@@ -15984,7 +15635,7 @@
 </p:sld>
 </file>
 
-<file path=ppt/slides/slide49.xml><?xml version="1.0" encoding="utf-8"?>
+<file path=ppt/slides/slide47.xml><?xml version="1.0" encoding="utf-8"?>
 <p:sld xmlns:a="http://schemas.openxmlformats.org/drawingml/2006/main" xmlns:r="http://schemas.openxmlformats.org/officeDocument/2006/relationships" xmlns:p="http://schemas.openxmlformats.org/presentationml/2006/main">
   <p:cSld>
     <p:spTree>
@@ -16110,123 +15761,7 @@
 </p:sld>
 </file>
 
-<file path=ppt/slides/slide5.xml><?xml version="1.0" encoding="utf-8"?>
-<p:sld xmlns:a="http://schemas.openxmlformats.org/drawingml/2006/main" xmlns:r="http://schemas.openxmlformats.org/officeDocument/2006/relationships" xmlns:p="http://schemas.openxmlformats.org/presentationml/2006/main">
-  <p:cSld>
-    <p:spTree>
-      <p:nvGrpSpPr>
-        <p:cNvPr id="1" name=""/>
-        <p:cNvGrpSpPr/>
-        <p:nvPr/>
-      </p:nvGrpSpPr>
-      <p:grpSpPr>
-        <a:xfrm>
-          <a:off x="0" y="0"/>
-          <a:ext cx="0" cy="0"/>
-          <a:chOff x="0" y="0"/>
-          <a:chExt cx="0" cy="0"/>
-        </a:xfrm>
-      </p:grpSpPr>
-      <p:sp>
-        <p:nvSpPr>
-          <p:cNvPr id="2" name="Title 1"/>
-          <p:cNvSpPr>
-            <a:spLocks noGrp="1"/>
-          </p:cNvSpPr>
-          <p:nvPr>
-            <p:ph type="title"/>
-          </p:nvPr>
-        </p:nvSpPr>
-        <p:spPr/>
-        <p:txBody>
-          <a:bodyPr>
-            <a:normAutofit/>
-          </a:bodyPr>
-          <a:lstStyle/>
-          <a:p>
-            <a:r>
-              <a:rPr lang="en-US" sz="4800" dirty="0" smtClean="0"/>
-              <a:t>What's on </a:t>
-            </a:r>
-            <a:r>
-              <a:rPr lang="en-US" sz="4800" smtClean="0"/>
-              <a:t>the agenda?</a:t>
-            </a:r>
-            <a:endParaRPr lang="en-US" sz="4800" dirty="0"/>
-          </a:p>
-        </p:txBody>
-      </p:sp>
-      <p:sp>
-        <p:nvSpPr>
-          <p:cNvPr id="3" name="Content Placeholder 2"/>
-          <p:cNvSpPr>
-            <a:spLocks noGrp="1"/>
-          </p:cNvSpPr>
-          <p:nvPr>
-            <p:ph idx="1"/>
-          </p:nvPr>
-        </p:nvSpPr>
-        <p:spPr>
-          <a:xfrm>
-            <a:off x="838200" y="1825624"/>
-            <a:ext cx="10515600" cy="4899641"/>
-          </a:xfrm>
-        </p:spPr>
-        <p:txBody>
-          <a:bodyPr>
-            <a:normAutofit/>
-          </a:bodyPr>
-          <a:lstStyle/>
-          <a:p>
-            <a:r>
-              <a:rPr lang="en-US" sz="4000" dirty="0" smtClean="0"/>
-              <a:t>Define "cross cutting" security concerns</a:t>
-            </a:r>
-          </a:p>
-          <a:p>
-            <a:endParaRPr lang="en-US" sz="4000" dirty="0"/>
-          </a:p>
-          <a:p>
-            <a:endParaRPr lang="en-US" sz="4000" dirty="0"/>
-          </a:p>
-          <a:p>
-            <a:endParaRPr lang="en-US" sz="4000" dirty="0" smtClean="0"/>
-          </a:p>
-          <a:p>
-            <a:endParaRPr lang="en-US" sz="4000" dirty="0" smtClean="0"/>
-          </a:p>
-          <a:p>
-            <a:endParaRPr lang="en-US" dirty="0" smtClean="0"/>
-          </a:p>
-          <a:p>
-            <a:endParaRPr lang="en-US" dirty="0" smtClean="0"/>
-          </a:p>
-          <a:p>
-            <a:endParaRPr lang="en-US" dirty="0"/>
-          </a:p>
-        </p:txBody>
-      </p:sp>
-    </p:spTree>
-    <p:extLst>
-      <p:ext uri="{BB962C8B-B14F-4D97-AF65-F5344CB8AC3E}">
-        <p14:creationId xmlns:p14="http://schemas.microsoft.com/office/powerpoint/2010/main" val="2651230507"/>
-      </p:ext>
-    </p:extLst>
-  </p:cSld>
-  <p:clrMapOvr>
-    <a:masterClrMapping/>
-  </p:clrMapOvr>
-  <p:timing>
-    <p:tnLst>
-      <p:par>
-        <p:cTn id="1" dur="indefinite" restart="never" nodeType="tmRoot"/>
-      </p:par>
-    </p:tnLst>
-  </p:timing>
-</p:sld>
-</file>
-
-<file path=ppt/slides/slide50.xml><?xml version="1.0" encoding="utf-8"?>
+<file path=ppt/slides/slide48.xml><?xml version="1.0" encoding="utf-8"?>
 <p:sld xmlns:a="http://schemas.openxmlformats.org/drawingml/2006/main" xmlns:r="http://schemas.openxmlformats.org/officeDocument/2006/relationships" xmlns:p="http://schemas.openxmlformats.org/presentationml/2006/main">
   <p:cSld>
     <p:spTree>
@@ -16352,7 +15887,7 @@
 </p:sld>
 </file>
 
-<file path=ppt/slides/slide51.xml><?xml version="1.0" encoding="utf-8"?>
+<file path=ppt/slides/slide49.xml><?xml version="1.0" encoding="utf-8"?>
 <p:sld xmlns:a="http://schemas.openxmlformats.org/drawingml/2006/main" xmlns:r="http://schemas.openxmlformats.org/officeDocument/2006/relationships" xmlns:p="http://schemas.openxmlformats.org/presentationml/2006/main">
   <p:cSld>
     <p:spTree>
@@ -16473,7 +16008,123 @@
 </p:sld>
 </file>
 
-<file path=ppt/slides/slide52.xml><?xml version="1.0" encoding="utf-8"?>
+<file path=ppt/slides/slide5.xml><?xml version="1.0" encoding="utf-8"?>
+<p:sld xmlns:a="http://schemas.openxmlformats.org/drawingml/2006/main" xmlns:r="http://schemas.openxmlformats.org/officeDocument/2006/relationships" xmlns:p="http://schemas.openxmlformats.org/presentationml/2006/main">
+  <p:cSld>
+    <p:spTree>
+      <p:nvGrpSpPr>
+        <p:cNvPr id="1" name=""/>
+        <p:cNvGrpSpPr/>
+        <p:nvPr/>
+      </p:nvGrpSpPr>
+      <p:grpSpPr>
+        <a:xfrm>
+          <a:off x="0" y="0"/>
+          <a:ext cx="0" cy="0"/>
+          <a:chOff x="0" y="0"/>
+          <a:chExt cx="0" cy="0"/>
+        </a:xfrm>
+      </p:grpSpPr>
+      <p:sp>
+        <p:nvSpPr>
+          <p:cNvPr id="2" name="Title 1"/>
+          <p:cNvSpPr>
+            <a:spLocks noGrp="1"/>
+          </p:cNvSpPr>
+          <p:nvPr>
+            <p:ph type="title"/>
+          </p:nvPr>
+        </p:nvSpPr>
+        <p:spPr/>
+        <p:txBody>
+          <a:bodyPr>
+            <a:normAutofit/>
+          </a:bodyPr>
+          <a:lstStyle/>
+          <a:p>
+            <a:r>
+              <a:rPr lang="en-US" sz="4800" dirty="0" smtClean="0"/>
+              <a:t>What's on </a:t>
+            </a:r>
+            <a:r>
+              <a:rPr lang="en-US" sz="4800" smtClean="0"/>
+              <a:t>the agenda?</a:t>
+            </a:r>
+            <a:endParaRPr lang="en-US" sz="4800" dirty="0"/>
+          </a:p>
+        </p:txBody>
+      </p:sp>
+      <p:sp>
+        <p:nvSpPr>
+          <p:cNvPr id="3" name="Content Placeholder 2"/>
+          <p:cNvSpPr>
+            <a:spLocks noGrp="1"/>
+          </p:cNvSpPr>
+          <p:nvPr>
+            <p:ph idx="1"/>
+          </p:nvPr>
+        </p:nvSpPr>
+        <p:spPr>
+          <a:xfrm>
+            <a:off x="838200" y="1825624"/>
+            <a:ext cx="10515600" cy="4899641"/>
+          </a:xfrm>
+        </p:spPr>
+        <p:txBody>
+          <a:bodyPr>
+            <a:normAutofit/>
+          </a:bodyPr>
+          <a:lstStyle/>
+          <a:p>
+            <a:r>
+              <a:rPr lang="en-US" sz="4000" dirty="0" smtClean="0"/>
+              <a:t>Define "cross cutting" security concerns</a:t>
+            </a:r>
+          </a:p>
+          <a:p>
+            <a:endParaRPr lang="en-US" sz="4000" dirty="0"/>
+          </a:p>
+          <a:p>
+            <a:endParaRPr lang="en-US" sz="4000" dirty="0"/>
+          </a:p>
+          <a:p>
+            <a:endParaRPr lang="en-US" sz="4000" dirty="0" smtClean="0"/>
+          </a:p>
+          <a:p>
+            <a:endParaRPr lang="en-US" sz="4000" dirty="0" smtClean="0"/>
+          </a:p>
+          <a:p>
+            <a:endParaRPr lang="en-US" dirty="0" smtClean="0"/>
+          </a:p>
+          <a:p>
+            <a:endParaRPr lang="en-US" dirty="0" smtClean="0"/>
+          </a:p>
+          <a:p>
+            <a:endParaRPr lang="en-US" dirty="0"/>
+          </a:p>
+        </p:txBody>
+      </p:sp>
+    </p:spTree>
+    <p:extLst>
+      <p:ext uri="{BB962C8B-B14F-4D97-AF65-F5344CB8AC3E}">
+        <p14:creationId xmlns:p14="http://schemas.microsoft.com/office/powerpoint/2010/main" val="2651230507"/>
+      </p:ext>
+    </p:extLst>
+  </p:cSld>
+  <p:clrMapOvr>
+    <a:masterClrMapping/>
+  </p:clrMapOvr>
+  <p:timing>
+    <p:tnLst>
+      <p:par>
+        <p:cTn id="1" dur="indefinite" restart="never" nodeType="tmRoot"/>
+      </p:par>
+    </p:tnLst>
+  </p:timing>
+</p:sld>
+</file>
+
+<file path=ppt/slides/slide50.xml><?xml version="1.0" encoding="utf-8"?>
 <p:sld xmlns:a="http://schemas.openxmlformats.org/drawingml/2006/main" xmlns:r="http://schemas.openxmlformats.org/officeDocument/2006/relationships" xmlns:p="http://schemas.openxmlformats.org/presentationml/2006/main">
   <p:cSld>
     <p:spTree>
@@ -16563,7 +16214,7 @@
 </p:sld>
 </file>
 
-<file path=ppt/slides/slide53.xml><?xml version="1.0" encoding="utf-8"?>
+<file path=ppt/slides/slide51.xml><?xml version="1.0" encoding="utf-8"?>
 <p:sld xmlns:a="http://schemas.openxmlformats.org/drawingml/2006/main" xmlns:r="http://schemas.openxmlformats.org/officeDocument/2006/relationships" xmlns:p="http://schemas.openxmlformats.org/presentationml/2006/main">
   <p:cSld>
     <p:spTree>
@@ -16683,7 +16334,7 @@
 </p:sld>
 </file>
 
-<file path=ppt/slides/slide54.xml><?xml version="1.0" encoding="utf-8"?>
+<file path=ppt/slides/slide52.xml><?xml version="1.0" encoding="utf-8"?>
 <p:sld xmlns:a="http://schemas.openxmlformats.org/drawingml/2006/main" xmlns:r="http://schemas.openxmlformats.org/officeDocument/2006/relationships" xmlns:p="http://schemas.openxmlformats.org/presentationml/2006/main">
   <p:cSld>
     <p:spTree>
@@ -16827,7 +16478,7 @@
 </p:sld>
 </file>
 
-<file path=ppt/slides/slide55.xml><?xml version="1.0" encoding="utf-8"?>
+<file path=ppt/slides/slide53.xml><?xml version="1.0" encoding="utf-8"?>
 <p:sld xmlns:a="http://schemas.openxmlformats.org/drawingml/2006/main" xmlns:r="http://schemas.openxmlformats.org/officeDocument/2006/relationships" xmlns:p="http://schemas.openxmlformats.org/presentationml/2006/main">
   <p:cSld>
     <p:spTree>
@@ -16952,7 +16603,7 @@
 </p:sld>
 </file>
 
-<file path=ppt/slides/slide56.xml><?xml version="1.0" encoding="utf-8"?>
+<file path=ppt/slides/slide54.xml><?xml version="1.0" encoding="utf-8"?>
 <p:sld xmlns:a="http://schemas.openxmlformats.org/drawingml/2006/main" xmlns:r="http://schemas.openxmlformats.org/officeDocument/2006/relationships" xmlns:p="http://schemas.openxmlformats.org/presentationml/2006/main">
   <p:cSld>
     <p:spTree>
@@ -17048,7 +16699,7 @@
 </p:sld>
 </file>
 
-<file path=ppt/slides/slide57.xml><?xml version="1.0" encoding="utf-8"?>
+<file path=ppt/slides/slide55.xml><?xml version="1.0" encoding="utf-8"?>
 <p:sld xmlns:a="http://schemas.openxmlformats.org/drawingml/2006/main" xmlns:r="http://schemas.openxmlformats.org/officeDocument/2006/relationships" xmlns:p="http://schemas.openxmlformats.org/presentationml/2006/main">
   <p:cSld>
     <p:spTree>
@@ -17138,7 +16789,7 @@
 </p:sld>
 </file>
 
-<file path=ppt/slides/slide58.xml><?xml version="1.0" encoding="utf-8"?>
+<file path=ppt/slides/slide56.xml><?xml version="1.0" encoding="utf-8"?>
 <p:sld xmlns:a="http://schemas.openxmlformats.org/drawingml/2006/main" xmlns:r="http://schemas.openxmlformats.org/officeDocument/2006/relationships" xmlns:p="http://schemas.openxmlformats.org/presentationml/2006/main">
   <p:cSld>
     <p:spTree>
@@ -17262,7 +16913,7 @@
 </p:sld>
 </file>
 
-<file path=ppt/slides/slide59.xml><?xml version="1.0" encoding="utf-8"?>
+<file path=ppt/slides/slide57.xml><?xml version="1.0" encoding="utf-8"?>
 <p:sld xmlns:a="http://schemas.openxmlformats.org/drawingml/2006/main" xmlns:r="http://schemas.openxmlformats.org/officeDocument/2006/relationships" xmlns:p="http://schemas.openxmlformats.org/presentationml/2006/main">
   <p:cSld>
     <p:spTree>
@@ -17387,141 +17038,7 @@
 </p:sld>
 </file>
 
-<file path=ppt/slides/slide6.xml><?xml version="1.0" encoding="utf-8"?>
-<p:sld xmlns:a="http://schemas.openxmlformats.org/drawingml/2006/main" xmlns:r="http://schemas.openxmlformats.org/officeDocument/2006/relationships" xmlns:p="http://schemas.openxmlformats.org/presentationml/2006/main">
-  <p:cSld>
-    <p:spTree>
-      <p:nvGrpSpPr>
-        <p:cNvPr id="1" name=""/>
-        <p:cNvGrpSpPr/>
-        <p:nvPr/>
-      </p:nvGrpSpPr>
-      <p:grpSpPr>
-        <a:xfrm>
-          <a:off x="0" y="0"/>
-          <a:ext cx="0" cy="0"/>
-          <a:chOff x="0" y="0"/>
-          <a:chExt cx="0" cy="0"/>
-        </a:xfrm>
-      </p:grpSpPr>
-      <p:sp>
-        <p:nvSpPr>
-          <p:cNvPr id="2" name="Title 1"/>
-          <p:cNvSpPr>
-            <a:spLocks noGrp="1"/>
-          </p:cNvSpPr>
-          <p:nvPr>
-            <p:ph type="title"/>
-          </p:nvPr>
-        </p:nvSpPr>
-        <p:spPr/>
-        <p:txBody>
-          <a:bodyPr>
-            <a:normAutofit/>
-          </a:bodyPr>
-          <a:lstStyle/>
-          <a:p>
-            <a:r>
-              <a:rPr lang="en-US" sz="4800" dirty="0" smtClean="0"/>
-              <a:t>What's on </a:t>
-            </a:r>
-            <a:r>
-              <a:rPr lang="en-US" sz="4800" smtClean="0"/>
-              <a:t>the agenda?</a:t>
-            </a:r>
-            <a:endParaRPr lang="en-US" sz="4800" dirty="0"/>
-          </a:p>
-        </p:txBody>
-      </p:sp>
-      <p:sp>
-        <p:nvSpPr>
-          <p:cNvPr id="3" name="Content Placeholder 2"/>
-          <p:cNvSpPr>
-            <a:spLocks noGrp="1"/>
-          </p:cNvSpPr>
-          <p:nvPr>
-            <p:ph idx="1"/>
-          </p:nvPr>
-        </p:nvSpPr>
-        <p:spPr>
-          <a:xfrm>
-            <a:off x="838200" y="1825624"/>
-            <a:ext cx="10515600" cy="4899641"/>
-          </a:xfrm>
-        </p:spPr>
-        <p:txBody>
-          <a:bodyPr>
-            <a:normAutofit/>
-          </a:bodyPr>
-          <a:lstStyle/>
-          <a:p>
-            <a:r>
-              <a:rPr lang="en-US" sz="4000" dirty="0" smtClean="0">
-                <a:solidFill>
-                  <a:schemeClr val="bg1">
-                    <a:lumMod val="65000"/>
-                  </a:schemeClr>
-                </a:solidFill>
-              </a:rPr>
-              <a:t>Define "cross cutting" security concerns</a:t>
-            </a:r>
-          </a:p>
-          <a:p>
-            <a:endParaRPr lang="en-US" sz="4000" dirty="0"/>
-          </a:p>
-          <a:p>
-            <a:r>
-              <a:rPr lang="en-US" sz="4000" dirty="0" smtClean="0"/>
-              <a:t>"Secure by default" examples</a:t>
-            </a:r>
-          </a:p>
-          <a:p>
-            <a:endParaRPr lang="en-US" sz="4000" dirty="0"/>
-          </a:p>
-          <a:p>
-            <a:endParaRPr lang="en-US" sz="4000" dirty="0" smtClean="0"/>
-          </a:p>
-          <a:p>
-            <a:endParaRPr lang="en-US" sz="4000" dirty="0"/>
-          </a:p>
-          <a:p>
-            <a:endParaRPr lang="en-US" sz="4000" dirty="0" smtClean="0"/>
-          </a:p>
-          <a:p>
-            <a:endParaRPr lang="en-US" sz="4000" dirty="0" smtClean="0"/>
-          </a:p>
-          <a:p>
-            <a:endParaRPr lang="en-US" dirty="0" smtClean="0"/>
-          </a:p>
-          <a:p>
-            <a:endParaRPr lang="en-US" dirty="0" smtClean="0"/>
-          </a:p>
-          <a:p>
-            <a:endParaRPr lang="en-US" dirty="0"/>
-          </a:p>
-        </p:txBody>
-      </p:sp>
-    </p:spTree>
-    <p:extLst>
-      <p:ext uri="{BB962C8B-B14F-4D97-AF65-F5344CB8AC3E}">
-        <p14:creationId xmlns:p14="http://schemas.microsoft.com/office/powerpoint/2010/main" val="902317821"/>
-      </p:ext>
-    </p:extLst>
-  </p:cSld>
-  <p:clrMapOvr>
-    <a:masterClrMapping/>
-  </p:clrMapOvr>
-  <p:timing>
-    <p:tnLst>
-      <p:par>
-        <p:cTn id="1" dur="indefinite" restart="never" nodeType="tmRoot"/>
-      </p:par>
-    </p:tnLst>
-  </p:timing>
-</p:sld>
-</file>
-
-<file path=ppt/slides/slide60.xml><?xml version="1.0" encoding="utf-8"?>
+<file path=ppt/slides/slide58.xml><?xml version="1.0" encoding="utf-8"?>
 <p:sld xmlns:a="http://schemas.openxmlformats.org/drawingml/2006/main" xmlns:r="http://schemas.openxmlformats.org/officeDocument/2006/relationships" xmlns:p="http://schemas.openxmlformats.org/presentationml/2006/main">
   <p:cSld>
     <p:spTree>
@@ -17646,7 +17163,7 @@
 </p:sld>
 </file>
 
-<file path=ppt/slides/slide61.xml><?xml version="1.0" encoding="utf-8"?>
+<file path=ppt/slides/slide59.xml><?xml version="1.0" encoding="utf-8"?>
 <p:sld xmlns:a="http://schemas.openxmlformats.org/drawingml/2006/main" xmlns:r="http://schemas.openxmlformats.org/officeDocument/2006/relationships" xmlns:p="http://schemas.openxmlformats.org/presentationml/2006/main">
   <p:cSld>
     <p:spTree>
@@ -17795,7 +17312,141 @@
 </p:sld>
 </file>
 
-<file path=ppt/slides/slide62.xml><?xml version="1.0" encoding="utf-8"?>
+<file path=ppt/slides/slide6.xml><?xml version="1.0" encoding="utf-8"?>
+<p:sld xmlns:a="http://schemas.openxmlformats.org/drawingml/2006/main" xmlns:r="http://schemas.openxmlformats.org/officeDocument/2006/relationships" xmlns:p="http://schemas.openxmlformats.org/presentationml/2006/main">
+  <p:cSld>
+    <p:spTree>
+      <p:nvGrpSpPr>
+        <p:cNvPr id="1" name=""/>
+        <p:cNvGrpSpPr/>
+        <p:nvPr/>
+      </p:nvGrpSpPr>
+      <p:grpSpPr>
+        <a:xfrm>
+          <a:off x="0" y="0"/>
+          <a:ext cx="0" cy="0"/>
+          <a:chOff x="0" y="0"/>
+          <a:chExt cx="0" cy="0"/>
+        </a:xfrm>
+      </p:grpSpPr>
+      <p:sp>
+        <p:nvSpPr>
+          <p:cNvPr id="2" name="Title 1"/>
+          <p:cNvSpPr>
+            <a:spLocks noGrp="1"/>
+          </p:cNvSpPr>
+          <p:nvPr>
+            <p:ph type="title"/>
+          </p:nvPr>
+        </p:nvSpPr>
+        <p:spPr/>
+        <p:txBody>
+          <a:bodyPr>
+            <a:normAutofit/>
+          </a:bodyPr>
+          <a:lstStyle/>
+          <a:p>
+            <a:r>
+              <a:rPr lang="en-US" sz="4800" dirty="0" smtClean="0"/>
+              <a:t>What's on </a:t>
+            </a:r>
+            <a:r>
+              <a:rPr lang="en-US" sz="4800" smtClean="0"/>
+              <a:t>the agenda?</a:t>
+            </a:r>
+            <a:endParaRPr lang="en-US" sz="4800" dirty="0"/>
+          </a:p>
+        </p:txBody>
+      </p:sp>
+      <p:sp>
+        <p:nvSpPr>
+          <p:cNvPr id="3" name="Content Placeholder 2"/>
+          <p:cNvSpPr>
+            <a:spLocks noGrp="1"/>
+          </p:cNvSpPr>
+          <p:nvPr>
+            <p:ph idx="1"/>
+          </p:nvPr>
+        </p:nvSpPr>
+        <p:spPr>
+          <a:xfrm>
+            <a:off x="838200" y="1825624"/>
+            <a:ext cx="10515600" cy="4899641"/>
+          </a:xfrm>
+        </p:spPr>
+        <p:txBody>
+          <a:bodyPr>
+            <a:normAutofit/>
+          </a:bodyPr>
+          <a:lstStyle/>
+          <a:p>
+            <a:r>
+              <a:rPr lang="en-US" sz="4000" dirty="0" smtClean="0">
+                <a:solidFill>
+                  <a:schemeClr val="bg1">
+                    <a:lumMod val="65000"/>
+                  </a:schemeClr>
+                </a:solidFill>
+              </a:rPr>
+              <a:t>Define "cross cutting" security concerns</a:t>
+            </a:r>
+          </a:p>
+          <a:p>
+            <a:endParaRPr lang="en-US" sz="4000" dirty="0"/>
+          </a:p>
+          <a:p>
+            <a:r>
+              <a:rPr lang="en-US" sz="4000" dirty="0" smtClean="0"/>
+              <a:t>"Secure by default" examples</a:t>
+            </a:r>
+          </a:p>
+          <a:p>
+            <a:endParaRPr lang="en-US" sz="4000" dirty="0"/>
+          </a:p>
+          <a:p>
+            <a:endParaRPr lang="en-US" sz="4000" dirty="0" smtClean="0"/>
+          </a:p>
+          <a:p>
+            <a:endParaRPr lang="en-US" sz="4000" dirty="0"/>
+          </a:p>
+          <a:p>
+            <a:endParaRPr lang="en-US" sz="4000" dirty="0" smtClean="0"/>
+          </a:p>
+          <a:p>
+            <a:endParaRPr lang="en-US" sz="4000" dirty="0" smtClean="0"/>
+          </a:p>
+          <a:p>
+            <a:endParaRPr lang="en-US" dirty="0" smtClean="0"/>
+          </a:p>
+          <a:p>
+            <a:endParaRPr lang="en-US" dirty="0" smtClean="0"/>
+          </a:p>
+          <a:p>
+            <a:endParaRPr lang="en-US" dirty="0"/>
+          </a:p>
+        </p:txBody>
+      </p:sp>
+    </p:spTree>
+    <p:extLst>
+      <p:ext uri="{BB962C8B-B14F-4D97-AF65-F5344CB8AC3E}">
+        <p14:creationId xmlns:p14="http://schemas.microsoft.com/office/powerpoint/2010/main" val="902317821"/>
+      </p:ext>
+    </p:extLst>
+  </p:cSld>
+  <p:clrMapOvr>
+    <a:masterClrMapping/>
+  </p:clrMapOvr>
+  <p:timing>
+    <p:tnLst>
+      <p:par>
+        <p:cTn id="1" dur="indefinite" restart="never" nodeType="tmRoot"/>
+      </p:par>
+    </p:tnLst>
+  </p:timing>
+</p:sld>
+</file>
+
+<file path=ppt/slides/slide60.xml><?xml version="1.0" encoding="utf-8"?>
 <p:sld xmlns:a="http://schemas.openxmlformats.org/drawingml/2006/main" xmlns:r="http://schemas.openxmlformats.org/officeDocument/2006/relationships" xmlns:p="http://schemas.openxmlformats.org/presentationml/2006/main">
   <p:cSld>
     <p:spTree>
@@ -17888,7 +17539,7 @@
 </p:sld>
 </file>
 
-<file path=ppt/slides/slide63.xml><?xml version="1.0" encoding="utf-8"?>
+<file path=ppt/slides/slide61.xml><?xml version="1.0" encoding="utf-8"?>
 <p:sld xmlns:a="http://schemas.openxmlformats.org/drawingml/2006/main" xmlns:r="http://schemas.openxmlformats.org/officeDocument/2006/relationships" xmlns:p="http://schemas.openxmlformats.org/presentationml/2006/main">
   <p:cSld>
     <p:spTree>
@@ -18013,7 +17664,7 @@
 </p:sld>
 </file>
 
-<file path=ppt/slides/slide64.xml><?xml version="1.0" encoding="utf-8"?>
+<file path=ppt/slides/slide62.xml><?xml version="1.0" encoding="utf-8"?>
 <p:sld xmlns:a="http://schemas.openxmlformats.org/drawingml/2006/main" xmlns:r="http://schemas.openxmlformats.org/officeDocument/2006/relationships" xmlns:p="http://schemas.openxmlformats.org/presentationml/2006/main">
   <p:cSld>
     <p:spTree>
@@ -18119,7 +17770,7 @@
 </p:sld>
 </file>
 
-<file path=ppt/slides/slide65.xml><?xml version="1.0" encoding="utf-8"?>
+<file path=ppt/slides/slide63.xml><?xml version="1.0" encoding="utf-8"?>
 <p:sld xmlns:a="http://schemas.openxmlformats.org/drawingml/2006/main" xmlns:r="http://schemas.openxmlformats.org/officeDocument/2006/relationships" xmlns:p="http://schemas.openxmlformats.org/presentationml/2006/main">
   <p:cSld>
     <p:spTree>
@@ -18240,7 +17891,7 @@
 </p:sld>
 </file>
 
-<file path=ppt/slides/slide66.xml><?xml version="1.0" encoding="utf-8"?>
+<file path=ppt/slides/slide64.xml><?xml version="1.0" encoding="utf-8"?>
 <p:sld xmlns:a="http://schemas.openxmlformats.org/drawingml/2006/main" xmlns:r="http://schemas.openxmlformats.org/officeDocument/2006/relationships" xmlns:p="http://schemas.openxmlformats.org/presentationml/2006/main">
   <p:cSld>
     <p:spTree>
@@ -18360,7 +18011,7 @@
 </p:sld>
 </file>
 
-<file path=ppt/slides/slide67.xml><?xml version="1.0" encoding="utf-8"?>
+<file path=ppt/slides/slide65.xml><?xml version="1.0" encoding="utf-8"?>
 <p:sld xmlns:a="http://schemas.openxmlformats.org/drawingml/2006/main" xmlns:r="http://schemas.openxmlformats.org/officeDocument/2006/relationships" xmlns:p="http://schemas.openxmlformats.org/presentationml/2006/main">
   <p:cSld>
     <p:spTree>
@@ -18480,7 +18131,7 @@
 </p:sld>
 </file>
 
-<file path=ppt/slides/slide68.xml><?xml version="1.0" encoding="utf-8"?>
+<file path=ppt/slides/slide66.xml><?xml version="1.0" encoding="utf-8"?>
 <p:sld xmlns:a="http://schemas.openxmlformats.org/drawingml/2006/main" xmlns:r="http://schemas.openxmlformats.org/officeDocument/2006/relationships" xmlns:p="http://schemas.openxmlformats.org/presentationml/2006/main">
   <p:cSld>
     <p:spTree>
@@ -18600,7 +18251,7 @@
 </p:sld>
 </file>
 
-<file path=ppt/slides/slide69.xml><?xml version="1.0" encoding="utf-8"?>
+<file path=ppt/slides/slide67.xml><?xml version="1.0" encoding="utf-8"?>
 <p:sld xmlns:a="http://schemas.openxmlformats.org/drawingml/2006/main" xmlns:r="http://schemas.openxmlformats.org/officeDocument/2006/relationships" xmlns:p="http://schemas.openxmlformats.org/presentationml/2006/main">
   <p:cSld>
     <p:spTree>
@@ -18720,159 +18371,7 @@
 </p:sld>
 </file>
 
-<file path=ppt/slides/slide7.xml><?xml version="1.0" encoding="utf-8"?>
-<p:sld xmlns:a="http://schemas.openxmlformats.org/drawingml/2006/main" xmlns:r="http://schemas.openxmlformats.org/officeDocument/2006/relationships" xmlns:p="http://schemas.openxmlformats.org/presentationml/2006/main">
-  <p:cSld>
-    <p:spTree>
-      <p:nvGrpSpPr>
-        <p:cNvPr id="1" name=""/>
-        <p:cNvGrpSpPr/>
-        <p:nvPr/>
-      </p:nvGrpSpPr>
-      <p:grpSpPr>
-        <a:xfrm>
-          <a:off x="0" y="0"/>
-          <a:ext cx="0" cy="0"/>
-          <a:chOff x="0" y="0"/>
-          <a:chExt cx="0" cy="0"/>
-        </a:xfrm>
-      </p:grpSpPr>
-      <p:sp>
-        <p:nvSpPr>
-          <p:cNvPr id="2" name="Title 1"/>
-          <p:cNvSpPr>
-            <a:spLocks noGrp="1"/>
-          </p:cNvSpPr>
-          <p:nvPr>
-            <p:ph type="title"/>
-          </p:nvPr>
-        </p:nvSpPr>
-        <p:spPr/>
-        <p:txBody>
-          <a:bodyPr>
-            <a:normAutofit/>
-          </a:bodyPr>
-          <a:lstStyle/>
-          <a:p>
-            <a:r>
-              <a:rPr lang="en-US" sz="4800" dirty="0" smtClean="0"/>
-              <a:t>What's on </a:t>
-            </a:r>
-            <a:r>
-              <a:rPr lang="en-US" sz="4800" smtClean="0"/>
-              <a:t>the agenda?</a:t>
-            </a:r>
-            <a:endParaRPr lang="en-US" sz="4800" dirty="0"/>
-          </a:p>
-        </p:txBody>
-      </p:sp>
-      <p:sp>
-        <p:nvSpPr>
-          <p:cNvPr id="3" name="Content Placeholder 2"/>
-          <p:cNvSpPr>
-            <a:spLocks noGrp="1"/>
-          </p:cNvSpPr>
-          <p:nvPr>
-            <p:ph idx="1"/>
-          </p:nvPr>
-        </p:nvSpPr>
-        <p:spPr>
-          <a:xfrm>
-            <a:off x="838200" y="1825624"/>
-            <a:ext cx="10515600" cy="4899641"/>
-          </a:xfrm>
-        </p:spPr>
-        <p:txBody>
-          <a:bodyPr>
-            <a:normAutofit/>
-          </a:bodyPr>
-          <a:lstStyle/>
-          <a:p>
-            <a:r>
-              <a:rPr lang="en-US" sz="4000" dirty="0" smtClean="0">
-                <a:solidFill>
-                  <a:schemeClr val="bg1">
-                    <a:lumMod val="65000"/>
-                  </a:schemeClr>
-                </a:solidFill>
-              </a:rPr>
-              <a:t>Define "cross cutting" security concerns</a:t>
-            </a:r>
-          </a:p>
-          <a:p>
-            <a:endParaRPr lang="en-US" sz="4000" dirty="0">
-              <a:solidFill>
-                <a:schemeClr val="bg1">
-                  <a:lumMod val="65000"/>
-                </a:schemeClr>
-              </a:solidFill>
-            </a:endParaRPr>
-          </a:p>
-          <a:p>
-            <a:r>
-              <a:rPr lang="en-US" sz="4000" dirty="0" smtClean="0">
-                <a:solidFill>
-                  <a:schemeClr val="bg1">
-                    <a:lumMod val="65000"/>
-                  </a:schemeClr>
-                </a:solidFill>
-              </a:rPr>
-              <a:t>"Secure by default" examples</a:t>
-            </a:r>
-          </a:p>
-          <a:p>
-            <a:endParaRPr lang="en-US" sz="4000" dirty="0"/>
-          </a:p>
-          <a:p>
-            <a:r>
-              <a:rPr lang="en-US" sz="4000" dirty="0" smtClean="0"/>
-              <a:t>Declarative vs Imperative security</a:t>
-            </a:r>
-          </a:p>
-          <a:p>
-            <a:endParaRPr lang="en-US" sz="4000" dirty="0"/>
-          </a:p>
-          <a:p>
-            <a:endParaRPr lang="en-US" sz="4000" dirty="0"/>
-          </a:p>
-          <a:p>
-            <a:endParaRPr lang="en-US" sz="4000" dirty="0" smtClean="0"/>
-          </a:p>
-          <a:p>
-            <a:endParaRPr lang="en-US" sz="4000" dirty="0" smtClean="0"/>
-          </a:p>
-          <a:p>
-            <a:endParaRPr lang="en-US" dirty="0" smtClean="0"/>
-          </a:p>
-          <a:p>
-            <a:endParaRPr lang="en-US" dirty="0" smtClean="0"/>
-          </a:p>
-          <a:p>
-            <a:endParaRPr lang="en-US" dirty="0"/>
-          </a:p>
-        </p:txBody>
-      </p:sp>
-    </p:spTree>
-    <p:extLst>
-      <p:ext uri="{BB962C8B-B14F-4D97-AF65-F5344CB8AC3E}">
-        <p14:creationId xmlns:p14="http://schemas.microsoft.com/office/powerpoint/2010/main" val="1001694156"/>
-      </p:ext>
-    </p:extLst>
-  </p:cSld>
-  <p:clrMapOvr>
-    <a:masterClrMapping/>
-  </p:clrMapOvr>
-  <p:timing>
-    <p:tnLst>
-      <p:par>
-        <p:cTn id="1" dur="indefinite" restart="never" nodeType="tmRoot"/>
-      </p:par>
-    </p:tnLst>
-  </p:timing>
-</p:sld>
-</file>
-
-<file path=ppt/slides/slide70.xml><?xml version="1.0" encoding="utf-8"?>
+<file path=ppt/slides/slide68.xml><?xml version="1.0" encoding="utf-8"?>
 <p:sld xmlns:a="http://schemas.openxmlformats.org/drawingml/2006/main" xmlns:r="http://schemas.openxmlformats.org/officeDocument/2006/relationships" xmlns:p="http://schemas.openxmlformats.org/presentationml/2006/main">
   <p:cSld>
     <p:spTree>
@@ -19014,7 +18513,7 @@
 </p:sld>
 </file>
 
-<file path=ppt/slides/slide71.xml><?xml version="1.0" encoding="utf-8"?>
+<file path=ppt/slides/slide69.xml><?xml version="1.0" encoding="utf-8"?>
 <p:sld xmlns:a="http://schemas.openxmlformats.org/drawingml/2006/main" xmlns:r="http://schemas.openxmlformats.org/officeDocument/2006/relationships" xmlns:p="http://schemas.openxmlformats.org/presentationml/2006/main">
   <p:cSld>
     <p:spTree>
@@ -19135,7 +18634,159 @@
 </p:sld>
 </file>
 
-<file path=ppt/slides/slide72.xml><?xml version="1.0" encoding="utf-8"?>
+<file path=ppt/slides/slide7.xml><?xml version="1.0" encoding="utf-8"?>
+<p:sld xmlns:a="http://schemas.openxmlformats.org/drawingml/2006/main" xmlns:r="http://schemas.openxmlformats.org/officeDocument/2006/relationships" xmlns:p="http://schemas.openxmlformats.org/presentationml/2006/main">
+  <p:cSld>
+    <p:spTree>
+      <p:nvGrpSpPr>
+        <p:cNvPr id="1" name=""/>
+        <p:cNvGrpSpPr/>
+        <p:nvPr/>
+      </p:nvGrpSpPr>
+      <p:grpSpPr>
+        <a:xfrm>
+          <a:off x="0" y="0"/>
+          <a:ext cx="0" cy="0"/>
+          <a:chOff x="0" y="0"/>
+          <a:chExt cx="0" cy="0"/>
+        </a:xfrm>
+      </p:grpSpPr>
+      <p:sp>
+        <p:nvSpPr>
+          <p:cNvPr id="2" name="Title 1"/>
+          <p:cNvSpPr>
+            <a:spLocks noGrp="1"/>
+          </p:cNvSpPr>
+          <p:nvPr>
+            <p:ph type="title"/>
+          </p:nvPr>
+        </p:nvSpPr>
+        <p:spPr/>
+        <p:txBody>
+          <a:bodyPr>
+            <a:normAutofit/>
+          </a:bodyPr>
+          <a:lstStyle/>
+          <a:p>
+            <a:r>
+              <a:rPr lang="en-US" sz="4800" dirty="0" smtClean="0"/>
+              <a:t>What's on </a:t>
+            </a:r>
+            <a:r>
+              <a:rPr lang="en-US" sz="4800" smtClean="0"/>
+              <a:t>the agenda?</a:t>
+            </a:r>
+            <a:endParaRPr lang="en-US" sz="4800" dirty="0"/>
+          </a:p>
+        </p:txBody>
+      </p:sp>
+      <p:sp>
+        <p:nvSpPr>
+          <p:cNvPr id="3" name="Content Placeholder 2"/>
+          <p:cNvSpPr>
+            <a:spLocks noGrp="1"/>
+          </p:cNvSpPr>
+          <p:nvPr>
+            <p:ph idx="1"/>
+          </p:nvPr>
+        </p:nvSpPr>
+        <p:spPr>
+          <a:xfrm>
+            <a:off x="838200" y="1825624"/>
+            <a:ext cx="10515600" cy="4899641"/>
+          </a:xfrm>
+        </p:spPr>
+        <p:txBody>
+          <a:bodyPr>
+            <a:normAutofit/>
+          </a:bodyPr>
+          <a:lstStyle/>
+          <a:p>
+            <a:r>
+              <a:rPr lang="en-US" sz="4000" dirty="0" smtClean="0">
+                <a:solidFill>
+                  <a:schemeClr val="bg1">
+                    <a:lumMod val="65000"/>
+                  </a:schemeClr>
+                </a:solidFill>
+              </a:rPr>
+              <a:t>Define "cross cutting" security concerns</a:t>
+            </a:r>
+          </a:p>
+          <a:p>
+            <a:endParaRPr lang="en-US" sz="4000" dirty="0">
+              <a:solidFill>
+                <a:schemeClr val="bg1">
+                  <a:lumMod val="65000"/>
+                </a:schemeClr>
+              </a:solidFill>
+            </a:endParaRPr>
+          </a:p>
+          <a:p>
+            <a:r>
+              <a:rPr lang="en-US" sz="4000" dirty="0" smtClean="0">
+                <a:solidFill>
+                  <a:schemeClr val="bg1">
+                    <a:lumMod val="65000"/>
+                  </a:schemeClr>
+                </a:solidFill>
+              </a:rPr>
+              <a:t>"Secure by default" examples</a:t>
+            </a:r>
+          </a:p>
+          <a:p>
+            <a:endParaRPr lang="en-US" sz="4000" dirty="0"/>
+          </a:p>
+          <a:p>
+            <a:r>
+              <a:rPr lang="en-US" sz="4000" dirty="0" smtClean="0"/>
+              <a:t>Declarative vs Imperative security</a:t>
+            </a:r>
+          </a:p>
+          <a:p>
+            <a:endParaRPr lang="en-US" sz="4000" dirty="0"/>
+          </a:p>
+          <a:p>
+            <a:endParaRPr lang="en-US" sz="4000" dirty="0"/>
+          </a:p>
+          <a:p>
+            <a:endParaRPr lang="en-US" sz="4000" dirty="0" smtClean="0"/>
+          </a:p>
+          <a:p>
+            <a:endParaRPr lang="en-US" sz="4000" dirty="0" smtClean="0"/>
+          </a:p>
+          <a:p>
+            <a:endParaRPr lang="en-US" dirty="0" smtClean="0"/>
+          </a:p>
+          <a:p>
+            <a:endParaRPr lang="en-US" dirty="0" smtClean="0"/>
+          </a:p>
+          <a:p>
+            <a:endParaRPr lang="en-US" dirty="0"/>
+          </a:p>
+        </p:txBody>
+      </p:sp>
+    </p:spTree>
+    <p:extLst>
+      <p:ext uri="{BB962C8B-B14F-4D97-AF65-F5344CB8AC3E}">
+        <p14:creationId xmlns:p14="http://schemas.microsoft.com/office/powerpoint/2010/main" val="1001694156"/>
+      </p:ext>
+    </p:extLst>
+  </p:cSld>
+  <p:clrMapOvr>
+    <a:masterClrMapping/>
+  </p:clrMapOvr>
+  <p:timing>
+    <p:tnLst>
+      <p:par>
+        <p:cTn id="1" dur="indefinite" restart="never" nodeType="tmRoot"/>
+      </p:par>
+    </p:tnLst>
+  </p:timing>
+</p:sld>
+</file>
+
+<file path=ppt/slides/slide70.xml><?xml version="1.0" encoding="utf-8"?>
 <p:sld xmlns:a="http://schemas.openxmlformats.org/drawingml/2006/main" xmlns:r="http://schemas.openxmlformats.org/officeDocument/2006/relationships" xmlns:p="http://schemas.openxmlformats.org/presentationml/2006/main">
   <p:cSld>
     <p:spTree>
@@ -19256,7 +18907,7 @@
 </p:sld>
 </file>
 
-<file path=ppt/slides/slide73.xml><?xml version="1.0" encoding="utf-8"?>
+<file path=ppt/slides/slide71.xml><?xml version="1.0" encoding="utf-8"?>
 <p:sld xmlns:a="http://schemas.openxmlformats.org/drawingml/2006/main" xmlns:r="http://schemas.openxmlformats.org/officeDocument/2006/relationships" xmlns:p="http://schemas.openxmlformats.org/presentationml/2006/main">
   <p:cSld>
     <p:spTree>
@@ -19377,7 +19028,7 @@
 </p:sld>
 </file>
 
-<file path=ppt/slides/slide74.xml><?xml version="1.0" encoding="utf-8"?>
+<file path=ppt/slides/slide72.xml><?xml version="1.0" encoding="utf-8"?>
 <p:sld xmlns:a="http://schemas.openxmlformats.org/drawingml/2006/main" xmlns:r="http://schemas.openxmlformats.org/officeDocument/2006/relationships" xmlns:p="http://schemas.openxmlformats.org/presentationml/2006/main">
   <p:cSld>
     <p:spTree>
@@ -19501,7 +19152,7 @@
 </p:sld>
 </file>
 
-<file path=ppt/slides/slide75.xml><?xml version="1.0" encoding="utf-8"?>
+<file path=ppt/slides/slide73.xml><?xml version="1.0" encoding="utf-8"?>
 <p:sld xmlns:a="http://schemas.openxmlformats.org/drawingml/2006/main" xmlns:r="http://schemas.openxmlformats.org/officeDocument/2006/relationships" xmlns:p="http://schemas.openxmlformats.org/presentationml/2006/main">
   <p:cSld>
     <p:spTree>
@@ -19631,7 +19282,7 @@
 </p:sld>
 </file>
 
-<file path=ppt/slides/slide76.xml><?xml version="1.0" encoding="utf-8"?>
+<file path=ppt/slides/slide74.xml><?xml version="1.0" encoding="utf-8"?>
 <p:sld xmlns:a="http://schemas.openxmlformats.org/drawingml/2006/main" xmlns:r="http://schemas.openxmlformats.org/officeDocument/2006/relationships" xmlns:p="http://schemas.openxmlformats.org/presentationml/2006/main">
   <p:cSld>
     <p:spTree>
@@ -19658,7 +19309,106 @@
             <p:ph type="title"/>
           </p:nvPr>
         </p:nvSpPr>
-        <p:spPr/>
+        <p:spPr>
+          <a:xfrm>
+            <a:off x="964927" y="1"/>
+            <a:ext cx="10515600" cy="6858000"/>
+          </a:xfrm>
+        </p:spPr>
+        <p:txBody>
+          <a:bodyPr anchor="ctr">
+            <a:normAutofit/>
+          </a:bodyPr>
+          <a:lstStyle/>
+          <a:p>
+            <a:pPr algn="ctr"/>
+            <a:r>
+              <a:rPr lang="en-US" sz="4800" dirty="0" smtClean="0"/>
+              <a:t>Recap</a:t>
+            </a:r>
+            <a:r>
+              <a:rPr lang="en-US" sz="4800" dirty="0" smtClean="0"/>
+              <a:t/>
+            </a:r>
+            <a:br>
+              <a:rPr lang="en-US" sz="4800" dirty="0" smtClean="0"/>
+            </a:br>
+            <a:r>
+              <a:rPr lang="en-US" sz="4800" dirty="0"/>
+              <a:t/>
+            </a:r>
+            <a:br>
+              <a:rPr lang="en-US" sz="4800" dirty="0"/>
+            </a:br>
+            <a:r>
+              <a:rPr lang="en-US" dirty="0" smtClean="0">
+                <a:solidFill>
+                  <a:srgbClr val="013947"/>
+                </a:solidFill>
+              </a:rPr>
+              <a:t>The CliffsNotes version</a:t>
+            </a:r>
+            <a:endParaRPr lang="en-US" sz="4800" dirty="0">
+              <a:solidFill>
+                <a:srgbClr val="013947"/>
+              </a:solidFill>
+            </a:endParaRPr>
+          </a:p>
+        </p:txBody>
+      </p:sp>
+    </p:spTree>
+    <p:extLst>
+      <p:ext uri="{BB962C8B-B14F-4D97-AF65-F5344CB8AC3E}">
+        <p14:creationId xmlns:p14="http://schemas.microsoft.com/office/powerpoint/2010/main" val="3867943196"/>
+      </p:ext>
+    </p:extLst>
+  </p:cSld>
+  <p:clrMapOvr>
+    <a:masterClrMapping/>
+  </p:clrMapOvr>
+  <p:timing>
+    <p:tnLst>
+      <p:par>
+        <p:cTn id="1" dur="indefinite" restart="never" nodeType="tmRoot"/>
+      </p:par>
+    </p:tnLst>
+  </p:timing>
+</p:sld>
+</file>
+
+<file path=ppt/slides/slide75.xml><?xml version="1.0" encoding="utf-8"?>
+<p:sld xmlns:a="http://schemas.openxmlformats.org/drawingml/2006/main" xmlns:r="http://schemas.openxmlformats.org/officeDocument/2006/relationships" xmlns:p="http://schemas.openxmlformats.org/presentationml/2006/main">
+  <p:cSld>
+    <p:spTree>
+      <p:nvGrpSpPr>
+        <p:cNvPr id="1" name=""/>
+        <p:cNvGrpSpPr/>
+        <p:nvPr/>
+      </p:nvGrpSpPr>
+      <p:grpSpPr>
+        <a:xfrm>
+          <a:off x="0" y="0"/>
+          <a:ext cx="0" cy="0"/>
+          <a:chOff x="0" y="0"/>
+          <a:chExt cx="0" cy="0"/>
+        </a:xfrm>
+      </p:grpSpPr>
+      <p:sp>
+        <p:nvSpPr>
+          <p:cNvPr id="2" name="Title 1"/>
+          <p:cNvSpPr>
+            <a:spLocks noGrp="1"/>
+          </p:cNvSpPr>
+          <p:nvPr>
+            <p:ph type="title"/>
+          </p:nvPr>
+        </p:nvSpPr>
+        <p:spPr>
+          <a:xfrm>
+            <a:off x="838200" y="365125"/>
+            <a:ext cx="10515600" cy="1174115"/>
+          </a:xfrm>
+        </p:spPr>
         <p:txBody>
           <a:bodyPr>
             <a:normAutofit/>
@@ -19666,8 +19416,12 @@
           <a:lstStyle/>
           <a:p>
             <a:r>
-              <a:rPr lang="en-US" sz="4800" dirty="0" smtClean="0"/>
-              <a:t>Recap – 55 minutes of knowledge, 1 slide</a:t>
+              <a:rPr lang="en-US" sz="4800" b="1" dirty="0" smtClean="0"/>
+              <a:t>bit.ly/</a:t>
+            </a:r>
+            <a:r>
+              <a:rPr lang="en-US" sz="4800" b="1" dirty="0" err="1" smtClean="0"/>
+              <a:t>DontWriteSecureCode</a:t>
             </a:r>
             <a:endParaRPr lang="en-US" sz="4800" dirty="0"/>
           </a:p>
@@ -19691,39 +19445,56 @@
         </p:spPr>
         <p:txBody>
           <a:bodyPr>
-            <a:normAutofit fontScale="92500" lnSpcReduction="20000"/>
+            <a:normAutofit fontScale="85000" lnSpcReduction="20000"/>
           </a:bodyPr>
           <a:lstStyle/>
           <a:p>
             <a:r>
               <a:rPr lang="en-US" sz="4000" dirty="0" smtClean="0"/>
-              <a:t>Cross cutting concerns </a:t>
-            </a:r>
-            <a:r>
-              <a:rPr lang="en-US" sz="4000" dirty="0" smtClean="0">
-                <a:sym typeface="Wingdings" panose="05000000000000000000" pitchFamily="2" charset="2"/>
-              </a:rPr>
-              <a:t> framework code</a:t>
+              <a:t>Global CSRF defense</a:t>
             </a:r>
             <a:endParaRPr lang="en-US" sz="4000" dirty="0" smtClean="0"/>
           </a:p>
           <a:p>
             <a:r>
               <a:rPr lang="en-US" sz="4000" dirty="0" smtClean="0"/>
-              <a:t>"Secure by default" is the holy grail</a:t>
+              <a:t>Private-by-default </a:t>
+            </a:r>
+            <a:r>
+              <a:rPr lang="en-US" sz="4000" dirty="0"/>
+              <a:t>MVC controllers</a:t>
             </a:r>
           </a:p>
           <a:p>
             <a:r>
               <a:rPr lang="en-US" sz="4000" dirty="0" smtClean="0"/>
-              <a:t>Declarative &gt; imperative</a:t>
+              <a:t>Row level security in SQL Server 2016</a:t>
             </a:r>
           </a:p>
           <a:p>
             <a:r>
               <a:rPr lang="en-US" sz="4000" dirty="0" smtClean="0"/>
-              <a:t>Automated audits &gt; exhaustive testing</a:t>
-            </a:r>
+              <a:t>Permission-based MVC attributes</a:t>
+            </a:r>
+            <a:endParaRPr lang="en-US" sz="4000" dirty="0" smtClean="0"/>
+          </a:p>
+          <a:p>
+            <a:r>
+              <a:rPr lang="en-US" sz="4000" dirty="0" smtClean="0"/>
+              <a:t>Permission-based property access, with </a:t>
+            </a:r>
+            <a:r>
+              <a:rPr lang="en-US" sz="4000" dirty="0" err="1" smtClean="0"/>
+              <a:t>PostSharp</a:t>
+            </a:r>
+            <a:endParaRPr lang="en-US" sz="4000" dirty="0" smtClean="0"/>
+          </a:p>
+          <a:p>
+            <a:r>
+              <a:rPr lang="en-US" sz="4000" dirty="0" smtClean="0"/>
+              <a:t>Auditing w/ reflection and Approval Tests</a:t>
+            </a:r>
+            <a:endParaRPr lang="en-US" sz="4000" dirty="0" smtClean="0"/>
           </a:p>
           <a:p>
             <a:pPr marL="0" indent="0">
@@ -19737,32 +19508,19 @@
               <a:rPr lang="en-US" sz="4000" b="1" dirty="0" smtClean="0"/>
             </a:br>
             <a:r>
-              <a:rPr lang="en-US" sz="4000" b="1" dirty="0" smtClean="0"/>
-              <a:t>bit.ly/2i0J91d</a:t>
-            </a:r>
-            <a:endParaRPr lang="en-US" sz="4000" b="1" dirty="0"/>
-          </a:p>
-          <a:p>
-            <a:endParaRPr lang="en-US" sz="4000" dirty="0"/>
-          </a:p>
-          <a:p>
-            <a:pPr marL="0" indent="0">
-              <a:buNone/>
-            </a:pPr>
-            <a:r>
-              <a:rPr lang="en-US" sz="4000" dirty="0">
+              <a:rPr lang="en-US" sz="4000" dirty="0" smtClean="0">
                 <a:hlinkClick r:id="rId3"/>
               </a:rPr>
               <a:t>github.com/</a:t>
             </a:r>
             <a:r>
-              <a:rPr lang="en-US" sz="4000" dirty="0" err="1">
+              <a:rPr lang="en-US" sz="4000" dirty="0" err="1" smtClean="0">
                 <a:hlinkClick r:id="rId3"/>
               </a:rPr>
               <a:t>spetryjohnson</a:t>
             </a:r>
             <a:r>
-              <a:rPr lang="en-US" sz="4000" dirty="0"/>
+              <a:rPr lang="en-US" sz="4000" dirty="0" smtClean="0"/>
               <a:t> </a:t>
             </a:r>
             <a:r>
@@ -19831,7 +19589,7 @@
     </p:spTree>
     <p:extLst>
       <p:ext uri="{BB962C8B-B14F-4D97-AF65-F5344CB8AC3E}">
-        <p14:creationId xmlns:p14="http://schemas.microsoft.com/office/powerpoint/2010/main" val="1736657086"/>
+        <p14:creationId xmlns:p14="http://schemas.microsoft.com/office/powerpoint/2010/main" val="3024009127"/>
       </p:ext>
     </p:extLst>
   </p:cSld>

</xml_diff>

<commit_message>
Final tweaks. Icing on the cake.
</commit_message>
<xml_diff>
--- a/Secure Systems - CodeMash 2017.pptx
+++ b/Secure Systems - CodeMash 2017.pptx
@@ -13882,10 +13882,6 @@
               <a:rPr lang="en-US" sz="4800" dirty="0" smtClean="0"/>
               <a:t>Authentication</a:t>
             </a:r>
-            <a:r>
-              <a:rPr lang="en-US" sz="4800" dirty="0" smtClean="0"/>
-              <a:t/>
-            </a:r>
             <a:br>
               <a:rPr lang="en-US" sz="4800" dirty="0" smtClean="0"/>
             </a:br>
@@ -19326,10 +19322,6 @@
               <a:rPr lang="en-US" sz="4800" dirty="0" smtClean="0"/>
               <a:t>Recap</a:t>
             </a:r>
-            <a:r>
-              <a:rPr lang="en-US" sz="4800" dirty="0" smtClean="0"/>
-              <a:t/>
-            </a:r>
             <a:br>
               <a:rPr lang="en-US" sz="4800" dirty="0" smtClean="0"/>
             </a:br>
@@ -19453,7 +19445,6 @@
               <a:rPr lang="en-US" sz="4000" dirty="0" smtClean="0"/>
               <a:t>Global CSRF defense</a:t>
             </a:r>
-            <a:endParaRPr lang="en-US" sz="4000" dirty="0" smtClean="0"/>
           </a:p>
           <a:p>
             <a:r>
@@ -19476,7 +19467,6 @@
               <a:rPr lang="en-US" sz="4000" dirty="0" smtClean="0"/>
               <a:t>Permission-based MVC attributes</a:t>
             </a:r>
-            <a:endParaRPr lang="en-US" sz="4000" dirty="0" smtClean="0"/>
           </a:p>
           <a:p>
             <a:r>
@@ -19494,7 +19484,6 @@
               <a:rPr lang="en-US" sz="4000" dirty="0" smtClean="0"/>
               <a:t>Auditing w/ reflection and Approval Tests</a:t>
             </a:r>
-            <a:endParaRPr lang="en-US" sz="4000" dirty="0" smtClean="0"/>
           </a:p>
           <a:p>
             <a:pPr marL="0" indent="0">

</xml_diff>

<commit_message>
Halfway thru adding narrative to deck notes
</commit_message>
<xml_diff>
--- a/Secure Systems - CodeMash 2017.pptx
+++ b/Secure Systems - CodeMash 2017.pptx
@@ -294,7 +294,7 @@
           <a:p>
             <a:fld id="{C54A4886-B4AF-42F7-97BE-95CDF82A73E3}" type="datetimeFigureOut">
               <a:rPr lang="en-US" smtClean="0"/>
-              <a:t>1/8/2017</a:t>
+              <a:t>1/10/2017</a:t>
             </a:fld>
             <a:endParaRPr lang="en-US"/>
           </a:p>
@@ -606,6 +606,37 @@
           <a:bodyPr/>
           <a:lstStyle/>
           <a:p>
+            <a:pPr marL="0" marR="0" lvl="0" indent="0" algn="l" defTabSz="914400" rtl="0" eaLnBrk="1" fontAlgn="auto" latinLnBrk="0" hangingPunct="1">
+              <a:lnSpc>
+                <a:spcPct val="100000"/>
+              </a:lnSpc>
+              <a:spcBef>
+                <a:spcPts val="0"/>
+              </a:spcBef>
+              <a:spcAft>
+                <a:spcPts val="0"/>
+              </a:spcAft>
+              <a:buClrTx/>
+              <a:buSzTx/>
+              <a:buFontTx/>
+              <a:buNone/>
+              <a:tabLst/>
+              <a:defRPr/>
+            </a:pPr>
+            <a:r>
+              <a:rPr lang="en-US" sz="1200" kern="1200" dirty="0" smtClean="0">
+                <a:solidFill>
+                  <a:schemeClr val="tx1"/>
+                </a:solidFill>
+                <a:effectLst/>
+                <a:latin typeface="+mn-lt"/>
+                <a:ea typeface="+mn-ea"/>
+                <a:cs typeface="+mn-cs"/>
+              </a:rPr>
+              <a:t>Hello, and welcome to “Don’t Write Secure Code”. I’m Seth Petry-Johnson, and unlike some of the other speakers in this track, I am not a security professional. I’m just a normal programmer, although I do have a security related confession to make.</a:t>
+            </a:r>
+          </a:p>
+          <a:p>
             <a:endParaRPr lang="en-US" sz="1200" kern="1200" dirty="0">
               <a:solidFill>
                 <a:schemeClr val="tx1"/>
@@ -698,7 +729,185 @@
           <a:bodyPr/>
           <a:lstStyle/>
           <a:p>
-            <a:endParaRPr lang="en-US" b="0" dirty="0" smtClean="0"/>
+            <a:r>
+              <a:rPr lang="en-US" sz="1200" kern="1200" dirty="0" smtClean="0">
+                <a:solidFill>
+                  <a:schemeClr val="tx1"/>
+                </a:solidFill>
+                <a:effectLst/>
+                <a:latin typeface="+mn-lt"/>
+                <a:ea typeface="+mn-ea"/>
+                <a:cs typeface="+mn-cs"/>
+              </a:rPr>
+              <a:t>For example, ASPNET MVC lets you tap into the MVC pipeline w/ Action Filter.</a:t>
+            </a:r>
+          </a:p>
+          <a:p>
+            <a:endParaRPr lang="en-US" sz="1200" kern="1200" dirty="0" smtClean="0">
+              <a:solidFill>
+                <a:schemeClr val="tx1"/>
+              </a:solidFill>
+              <a:effectLst/>
+              <a:latin typeface="+mn-lt"/>
+              <a:ea typeface="+mn-ea"/>
+              <a:cs typeface="+mn-cs"/>
+            </a:endParaRPr>
+          </a:p>
+          <a:p>
+            <a:r>
+              <a:rPr lang="en-US" sz="1200" kern="1200" dirty="0" smtClean="0">
+                <a:solidFill>
+                  <a:schemeClr val="tx1"/>
+                </a:solidFill>
+                <a:effectLst/>
+                <a:latin typeface="+mn-lt"/>
+                <a:ea typeface="+mn-ea"/>
+                <a:cs typeface="+mn-cs"/>
+              </a:rPr>
+              <a:t>jQuery lets you tap into AJAX request pipeline using global event handlers.</a:t>
+            </a:r>
+          </a:p>
+          <a:p>
+            <a:r>
+              <a:rPr lang="en-US" sz="1200" kern="1200" dirty="0" smtClean="0">
+                <a:solidFill>
+                  <a:schemeClr val="tx1"/>
+                </a:solidFill>
+                <a:effectLst/>
+                <a:latin typeface="+mn-lt"/>
+                <a:ea typeface="+mn-ea"/>
+                <a:cs typeface="+mn-cs"/>
+              </a:rPr>
+              <a:t> </a:t>
+            </a:r>
+          </a:p>
+          <a:p>
+            <a:r>
+              <a:rPr lang="en-US" sz="1200" kern="1200" dirty="0" smtClean="0">
+                <a:solidFill>
+                  <a:schemeClr val="tx1"/>
+                </a:solidFill>
+                <a:effectLst/>
+                <a:latin typeface="+mn-lt"/>
+                <a:ea typeface="+mn-ea"/>
+                <a:cs typeface="+mn-cs"/>
+              </a:rPr>
+              <a:t>ORMs like EF &amp; NH let you run code whenever a database connection is opened or transaction begins.</a:t>
+            </a:r>
+          </a:p>
+          <a:p>
+            <a:r>
+              <a:rPr lang="en-US" sz="1200" kern="1200" dirty="0" smtClean="0">
+                <a:solidFill>
+                  <a:schemeClr val="tx1"/>
+                </a:solidFill>
+                <a:effectLst/>
+                <a:latin typeface="+mn-lt"/>
+                <a:ea typeface="+mn-ea"/>
+                <a:cs typeface="+mn-cs"/>
+              </a:rPr>
+              <a:t> </a:t>
+            </a:r>
+          </a:p>
+          <a:p>
+            <a:r>
+              <a:rPr lang="en-US" sz="1200" kern="1200" dirty="0" smtClean="0">
+                <a:solidFill>
+                  <a:schemeClr val="tx1"/>
+                </a:solidFill>
+                <a:effectLst/>
+                <a:latin typeface="+mn-lt"/>
+                <a:ea typeface="+mn-ea"/>
+                <a:cs typeface="+mn-cs"/>
+              </a:rPr>
+              <a:t>And if you need hook that doesn’t already exist, tools like </a:t>
+            </a:r>
+            <a:r>
+              <a:rPr lang="en-US" sz="1200" kern="1200" dirty="0" err="1" smtClean="0">
+                <a:solidFill>
+                  <a:schemeClr val="tx1"/>
+                </a:solidFill>
+                <a:effectLst/>
+                <a:latin typeface="+mn-lt"/>
+                <a:ea typeface="+mn-ea"/>
+                <a:cs typeface="+mn-cs"/>
+              </a:rPr>
+              <a:t>PostSharp</a:t>
+            </a:r>
+            <a:r>
+              <a:rPr lang="en-US" sz="1200" kern="1200" dirty="0" smtClean="0">
+                <a:solidFill>
+                  <a:schemeClr val="tx1"/>
+                </a:solidFill>
+                <a:effectLst/>
+                <a:latin typeface="+mn-lt"/>
+                <a:ea typeface="+mn-ea"/>
+                <a:cs typeface="+mn-cs"/>
+              </a:rPr>
+              <a:t> let you create your own. We’ll talk about this in a bit.</a:t>
+            </a:r>
+          </a:p>
+          <a:p>
+            <a:r>
+              <a:rPr lang="en-US" sz="1200" kern="1200" dirty="0" smtClean="0">
+                <a:solidFill>
+                  <a:schemeClr val="tx1"/>
+                </a:solidFill>
+                <a:effectLst/>
+                <a:latin typeface="+mn-lt"/>
+                <a:ea typeface="+mn-ea"/>
+                <a:cs typeface="+mn-cs"/>
+              </a:rPr>
+              <a:t> </a:t>
+            </a:r>
+          </a:p>
+          <a:p>
+            <a:r>
+              <a:rPr lang="en-US" sz="1200" kern="1200" dirty="0" smtClean="0">
+                <a:solidFill>
+                  <a:schemeClr val="tx1"/>
+                </a:solidFill>
+                <a:effectLst/>
+                <a:latin typeface="+mn-lt"/>
+                <a:ea typeface="+mn-ea"/>
+                <a:cs typeface="+mn-cs"/>
+              </a:rPr>
+              <a:t>And of course, your custom application code might provide own framework level hooks. For instance, if you have some base class that everything derives from, then you can provide your extension points that make sense in your own system.</a:t>
+            </a:r>
+          </a:p>
+          <a:p>
+            <a:endParaRPr lang="en-US" sz="1200" kern="1200" dirty="0" smtClean="0">
+              <a:solidFill>
+                <a:schemeClr val="tx1"/>
+              </a:solidFill>
+              <a:effectLst/>
+              <a:latin typeface="+mn-lt"/>
+              <a:ea typeface="+mn-ea"/>
+              <a:cs typeface="+mn-cs"/>
+            </a:endParaRPr>
+          </a:p>
+          <a:p>
+            <a:r>
+              <a:rPr lang="en-US" sz="1200" kern="1200" dirty="0" smtClean="0">
+                <a:solidFill>
+                  <a:schemeClr val="tx1"/>
+                </a:solidFill>
+                <a:effectLst/>
+                <a:latin typeface="+mn-lt"/>
+                <a:ea typeface="+mn-ea"/>
+                <a:cs typeface="+mn-cs"/>
+              </a:rPr>
+              <a:t>Basically, when I say “framework code”, I’m referring to something that you write that gets executed automatically by some underlying system, as opposed to the specific feature-level code you write at the top of your stack.</a:t>
+            </a:r>
+            <a:endParaRPr lang="en-US" sz="1200" kern="1200" dirty="0">
+              <a:solidFill>
+                <a:schemeClr val="tx1"/>
+              </a:solidFill>
+              <a:effectLst/>
+              <a:latin typeface="+mn-lt"/>
+              <a:ea typeface="+mn-ea"/>
+              <a:cs typeface="+mn-cs"/>
+            </a:endParaRPr>
           </a:p>
         </p:txBody>
       </p:sp>
@@ -782,6 +991,120 @@
           <a:bodyPr/>
           <a:lstStyle/>
           <a:p>
+            <a:r>
+              <a:rPr lang="en-US" sz="1200" kern="1200" dirty="0" smtClean="0">
+                <a:solidFill>
+                  <a:schemeClr val="tx1"/>
+                </a:solidFill>
+                <a:effectLst/>
+                <a:latin typeface="+mn-lt"/>
+                <a:ea typeface="+mn-ea"/>
+                <a:cs typeface="+mn-cs"/>
+              </a:rPr>
+              <a:t>When I say “cross cutting concern”, I’m referring to any security requirement that spans multiple features.</a:t>
+            </a:r>
+          </a:p>
+          <a:p>
+            <a:endParaRPr lang="en-US" sz="1200" kern="1200" dirty="0" smtClean="0">
+              <a:solidFill>
+                <a:schemeClr val="tx1"/>
+              </a:solidFill>
+              <a:effectLst/>
+              <a:latin typeface="+mn-lt"/>
+              <a:ea typeface="+mn-ea"/>
+              <a:cs typeface="+mn-cs"/>
+            </a:endParaRPr>
+          </a:p>
+          <a:p>
+            <a:r>
+              <a:rPr lang="en-US" sz="1200" kern="1200" dirty="0" smtClean="0">
+                <a:solidFill>
+                  <a:schemeClr val="tx1"/>
+                </a:solidFill>
+                <a:effectLst/>
+                <a:latin typeface="+mn-lt"/>
+                <a:ea typeface="+mn-ea"/>
+                <a:cs typeface="+mn-cs"/>
+              </a:rPr>
+              <a:t>Cross cutting concerns can be low level &amp; unrelated to your business domain, such as SQL injection. </a:t>
+            </a:r>
+          </a:p>
+          <a:p>
+            <a:endParaRPr lang="en-US" sz="1200" kern="1200" dirty="0" smtClean="0">
+              <a:solidFill>
+                <a:schemeClr val="tx1"/>
+              </a:solidFill>
+              <a:effectLst/>
+              <a:latin typeface="+mn-lt"/>
+              <a:ea typeface="+mn-ea"/>
+              <a:cs typeface="+mn-cs"/>
+            </a:endParaRPr>
+          </a:p>
+          <a:p>
+            <a:r>
+              <a:rPr lang="en-US" sz="1200" kern="1200" dirty="0" smtClean="0">
+                <a:solidFill>
+                  <a:schemeClr val="tx1"/>
+                </a:solidFill>
+                <a:effectLst/>
+                <a:latin typeface="+mn-lt"/>
+                <a:ea typeface="+mn-ea"/>
+                <a:cs typeface="+mn-cs"/>
+              </a:rPr>
+              <a:t>Higher level requirements can be cross-cutting as well. You might have group of related pages or features that share permission requirement or access control strategy.</a:t>
+            </a:r>
+          </a:p>
+          <a:p>
+            <a:endParaRPr lang="en-US" sz="1200" kern="1200" dirty="0" smtClean="0">
+              <a:solidFill>
+                <a:schemeClr val="tx1"/>
+              </a:solidFill>
+              <a:effectLst/>
+              <a:latin typeface="+mn-lt"/>
+              <a:ea typeface="+mn-ea"/>
+              <a:cs typeface="+mn-cs"/>
+            </a:endParaRPr>
+          </a:p>
+          <a:p>
+            <a:r>
+              <a:rPr lang="en-US" sz="1200" kern="1200" dirty="0" smtClean="0">
+                <a:solidFill>
+                  <a:schemeClr val="tx1"/>
+                </a:solidFill>
+                <a:effectLst/>
+                <a:latin typeface="+mn-lt"/>
+                <a:ea typeface="+mn-ea"/>
+                <a:cs typeface="+mn-cs"/>
+              </a:rPr>
+              <a:t>In both cases, the point is that separating cross-cutting concerns from feature or page-specific concerns makes code easier to maintain and your system more secure.</a:t>
+            </a:r>
+          </a:p>
+          <a:p>
+            <a:endParaRPr lang="en-US" sz="1200" kern="1200" dirty="0" smtClean="0">
+              <a:solidFill>
+                <a:schemeClr val="tx1"/>
+              </a:solidFill>
+              <a:effectLst/>
+              <a:latin typeface="+mn-lt"/>
+              <a:ea typeface="+mn-ea"/>
+              <a:cs typeface="+mn-cs"/>
+            </a:endParaRPr>
+          </a:p>
+          <a:p>
+            <a:r>
+              <a:rPr lang="en-US" sz="1200" kern="1200" dirty="0" smtClean="0">
+                <a:solidFill>
+                  <a:schemeClr val="tx1"/>
+                </a:solidFill>
+                <a:effectLst/>
+                <a:latin typeface="+mn-lt"/>
+                <a:ea typeface="+mn-ea"/>
+                <a:cs typeface="+mn-cs"/>
+              </a:rPr>
+              <a:t>To illustrate this, I used my world-class Visio skills to bring you this example.</a:t>
+            </a:r>
+          </a:p>
+          <a:p>
             <a:endParaRPr lang="en-US" b="0" dirty="0" smtClean="0"/>
           </a:p>
         </p:txBody>
@@ -866,6 +1189,106 @@
           <a:bodyPr/>
           <a:lstStyle/>
           <a:p>
+            <a:r>
+              <a:rPr lang="en-US" sz="1200" kern="1200" dirty="0" smtClean="0">
+                <a:solidFill>
+                  <a:schemeClr val="tx1"/>
+                </a:solidFill>
+                <a:effectLst/>
+                <a:latin typeface="+mn-lt"/>
+                <a:ea typeface="+mn-ea"/>
+                <a:cs typeface="+mn-cs"/>
+              </a:rPr>
+              <a:t>This beautiful green square represents a feature on our website. It’s the “Order List” feature that displays to a user the list of orders that user is allowed to see.</a:t>
+            </a:r>
+          </a:p>
+          <a:p>
+            <a:endParaRPr lang="en-US" sz="1200" kern="1200" dirty="0" smtClean="0">
+              <a:solidFill>
+                <a:schemeClr val="tx1"/>
+              </a:solidFill>
+              <a:effectLst/>
+              <a:latin typeface="+mn-lt"/>
+              <a:ea typeface="+mn-ea"/>
+              <a:cs typeface="+mn-cs"/>
+            </a:endParaRPr>
+          </a:p>
+          <a:p>
+            <a:r>
+              <a:rPr lang="en-US" sz="1200" kern="1200" dirty="0" smtClean="0">
+                <a:solidFill>
+                  <a:schemeClr val="tx1"/>
+                </a:solidFill>
+                <a:effectLst/>
+                <a:latin typeface="+mn-lt"/>
+                <a:ea typeface="+mn-ea"/>
+                <a:cs typeface="+mn-cs"/>
+              </a:rPr>
+              <a:t>Page has three requirements:</a:t>
+            </a:r>
+          </a:p>
+          <a:p>
+            <a:pPr lvl="0"/>
+            <a:r>
+              <a:rPr lang="en-US" sz="1200" kern="1200" dirty="0" smtClean="0">
+                <a:solidFill>
+                  <a:schemeClr val="tx1"/>
+                </a:solidFill>
+                <a:effectLst/>
+                <a:latin typeface="+mn-lt"/>
+                <a:ea typeface="+mn-ea"/>
+                <a:cs typeface="+mn-cs"/>
+              </a:rPr>
+              <a:t>1) user must be logged in to see the page.</a:t>
+            </a:r>
+            <a:br>
+              <a:rPr lang="en-US" sz="1200" kern="1200" dirty="0" smtClean="0">
+                <a:solidFill>
+                  <a:schemeClr val="tx1"/>
+                </a:solidFill>
+                <a:effectLst/>
+                <a:latin typeface="+mn-lt"/>
+                <a:ea typeface="+mn-ea"/>
+                <a:cs typeface="+mn-cs"/>
+              </a:rPr>
+            </a:br>
+            <a:r>
+              <a:rPr lang="en-US" sz="1200" kern="1200" dirty="0" smtClean="0">
+                <a:solidFill>
+                  <a:schemeClr val="tx1"/>
+                </a:solidFill>
+                <a:effectLst/>
+                <a:latin typeface="+mn-lt"/>
+                <a:ea typeface="+mn-ea"/>
+                <a:cs typeface="+mn-cs"/>
+              </a:rPr>
+              <a:t>2) users can only see their own data, </a:t>
+            </a:r>
+            <a:br>
+              <a:rPr lang="en-US" sz="1200" kern="1200" dirty="0" smtClean="0">
+                <a:solidFill>
+                  <a:schemeClr val="tx1"/>
+                </a:solidFill>
+                <a:effectLst/>
+                <a:latin typeface="+mn-lt"/>
+                <a:ea typeface="+mn-ea"/>
+                <a:cs typeface="+mn-cs"/>
+              </a:rPr>
+            </a:br>
+            <a:r>
+              <a:rPr lang="en-US" sz="1200" kern="1200" dirty="0" smtClean="0">
+                <a:solidFill>
+                  <a:schemeClr val="tx1"/>
+                </a:solidFill>
+                <a:effectLst/>
+                <a:latin typeface="+mn-lt"/>
+                <a:ea typeface="+mn-ea"/>
+                <a:cs typeface="+mn-cs"/>
+              </a:rPr>
+              <a:t>3) Unless they have a specific permission that grants them access to all records</a:t>
+            </a:r>
+          </a:p>
+          <a:p>
             <a:endParaRPr lang="en-US" b="0" dirty="0" smtClean="0"/>
           </a:p>
         </p:txBody>
@@ -950,6 +1373,179 @@
           <a:bodyPr/>
           <a:lstStyle/>
           <a:p>
+            <a:pPr marL="0" marR="0" lvl="0" indent="0" algn="l" defTabSz="914400" rtl="0" eaLnBrk="1" fontAlgn="auto" latinLnBrk="0" hangingPunct="1">
+              <a:lnSpc>
+                <a:spcPct val="100000"/>
+              </a:lnSpc>
+              <a:spcBef>
+                <a:spcPts val="0"/>
+              </a:spcBef>
+              <a:spcAft>
+                <a:spcPts val="0"/>
+              </a:spcAft>
+              <a:buClrTx/>
+              <a:buSzTx/>
+              <a:buFontTx/>
+              <a:buNone/>
+              <a:tabLst/>
+              <a:defRPr/>
+            </a:pPr>
+            <a:r>
+              <a:rPr lang="en-US" sz="1200" kern="1200" dirty="0" smtClean="0">
+                <a:solidFill>
+                  <a:schemeClr val="tx1"/>
+                </a:solidFill>
+                <a:effectLst/>
+                <a:latin typeface="+mn-lt"/>
+                <a:ea typeface="+mn-ea"/>
+                <a:cs typeface="+mn-cs"/>
+              </a:rPr>
+              <a:t>The naïve approach is to implement those requirements directly within the feature code. </a:t>
+            </a:r>
+          </a:p>
+          <a:p>
+            <a:pPr marL="0" marR="0" lvl="0" indent="0" algn="l" defTabSz="914400" rtl="0" eaLnBrk="1" fontAlgn="auto" latinLnBrk="0" hangingPunct="1">
+              <a:lnSpc>
+                <a:spcPct val="100000"/>
+              </a:lnSpc>
+              <a:spcBef>
+                <a:spcPts val="0"/>
+              </a:spcBef>
+              <a:spcAft>
+                <a:spcPts val="0"/>
+              </a:spcAft>
+              <a:buClrTx/>
+              <a:buSzTx/>
+              <a:buFontTx/>
+              <a:buNone/>
+              <a:tabLst/>
+              <a:defRPr/>
+            </a:pPr>
+            <a:endParaRPr lang="en-US" sz="1200" kern="1200" dirty="0" smtClean="0">
+              <a:solidFill>
+                <a:schemeClr val="tx1"/>
+              </a:solidFill>
+              <a:effectLst/>
+              <a:latin typeface="+mn-lt"/>
+              <a:ea typeface="+mn-ea"/>
+              <a:cs typeface="+mn-cs"/>
+            </a:endParaRPr>
+          </a:p>
+          <a:p>
+            <a:pPr marL="0" marR="0" lvl="0" indent="0" algn="l" defTabSz="914400" rtl="0" eaLnBrk="1" fontAlgn="auto" latinLnBrk="0" hangingPunct="1">
+              <a:lnSpc>
+                <a:spcPct val="100000"/>
+              </a:lnSpc>
+              <a:spcBef>
+                <a:spcPts val="0"/>
+              </a:spcBef>
+              <a:spcAft>
+                <a:spcPts val="0"/>
+              </a:spcAft>
+              <a:buClrTx/>
+              <a:buSzTx/>
+              <a:buFontTx/>
+              <a:buNone/>
+              <a:tabLst/>
+              <a:defRPr/>
+            </a:pPr>
+            <a:r>
+              <a:rPr lang="en-US" sz="1200" kern="1200" dirty="0" smtClean="0">
+                <a:solidFill>
+                  <a:schemeClr val="tx1"/>
+                </a:solidFill>
+                <a:effectLst/>
+                <a:latin typeface="+mn-lt"/>
+                <a:ea typeface="+mn-ea"/>
+                <a:cs typeface="+mn-cs"/>
+              </a:rPr>
+              <a:t>This beautiful</a:t>
+            </a:r>
+            <a:r>
+              <a:rPr lang="en-US" sz="1200" kern="1200" baseline="0" dirty="0" smtClean="0">
+                <a:solidFill>
+                  <a:schemeClr val="tx1"/>
+                </a:solidFill>
+                <a:effectLst/>
+                <a:latin typeface="+mn-lt"/>
+                <a:ea typeface="+mn-ea"/>
+                <a:cs typeface="+mn-cs"/>
+              </a:rPr>
+              <a:t> </a:t>
+            </a:r>
+            <a:r>
+              <a:rPr lang="en-US" sz="1200" kern="1200" dirty="0" smtClean="0">
+                <a:solidFill>
+                  <a:schemeClr val="tx1"/>
+                </a:solidFill>
+                <a:effectLst/>
+                <a:latin typeface="+mn-lt"/>
+                <a:ea typeface="+mn-ea"/>
+                <a:cs typeface="+mn-cs"/>
+              </a:rPr>
+              <a:t>red square represents the security code being intermingled with the feature code. </a:t>
+            </a:r>
+          </a:p>
+          <a:p>
+            <a:pPr marL="0" marR="0" lvl="0" indent="0" algn="l" defTabSz="914400" rtl="0" eaLnBrk="1" fontAlgn="auto" latinLnBrk="0" hangingPunct="1">
+              <a:lnSpc>
+                <a:spcPct val="100000"/>
+              </a:lnSpc>
+              <a:spcBef>
+                <a:spcPts val="0"/>
+              </a:spcBef>
+              <a:spcAft>
+                <a:spcPts val="0"/>
+              </a:spcAft>
+              <a:buClrTx/>
+              <a:buSzTx/>
+              <a:buFontTx/>
+              <a:buNone/>
+              <a:tabLst/>
+              <a:defRPr/>
+            </a:pPr>
+            <a:endParaRPr lang="en-US" sz="1200" kern="1200" dirty="0" smtClean="0">
+              <a:solidFill>
+                <a:schemeClr val="tx1"/>
+              </a:solidFill>
+              <a:effectLst/>
+              <a:latin typeface="+mn-lt"/>
+              <a:ea typeface="+mn-ea"/>
+              <a:cs typeface="+mn-cs"/>
+            </a:endParaRPr>
+          </a:p>
+          <a:p>
+            <a:pPr marL="0" marR="0" lvl="0" indent="0" algn="l" defTabSz="914400" rtl="0" eaLnBrk="1" fontAlgn="auto" latinLnBrk="0" hangingPunct="1">
+              <a:lnSpc>
+                <a:spcPct val="100000"/>
+              </a:lnSpc>
+              <a:spcBef>
+                <a:spcPts val="0"/>
+              </a:spcBef>
+              <a:spcAft>
+                <a:spcPts val="0"/>
+              </a:spcAft>
+              <a:buClrTx/>
+              <a:buSzTx/>
+              <a:buFontTx/>
+              <a:buNone/>
+              <a:tabLst/>
+              <a:defRPr/>
+            </a:pPr>
+            <a:r>
+              <a:rPr lang="en-US" sz="1200" kern="1200" dirty="0" smtClean="0">
+                <a:solidFill>
+                  <a:schemeClr val="tx1"/>
+                </a:solidFill>
+                <a:effectLst/>
+                <a:latin typeface="+mn-lt"/>
+                <a:ea typeface="+mn-ea"/>
+                <a:cs typeface="+mn-cs"/>
+              </a:rPr>
+              <a:t>If this was an MVC app, for instance, this red square might represent a couple of lines of code in the body of a controller action.</a:t>
+            </a:r>
+          </a:p>
+          <a:p>
             <a:endParaRPr lang="en-US" b="0" dirty="0" smtClean="0"/>
           </a:p>
         </p:txBody>
@@ -1034,6 +1630,45 @@
           <a:bodyPr/>
           <a:lstStyle/>
           <a:p>
+            <a:r>
+              <a:rPr lang="en-US" sz="1200" kern="1200" dirty="0" smtClean="0">
+                <a:solidFill>
+                  <a:schemeClr val="tx1"/>
+                </a:solidFill>
+                <a:effectLst/>
+                <a:latin typeface="+mn-lt"/>
+                <a:ea typeface="+mn-ea"/>
+                <a:cs typeface="+mn-cs"/>
+              </a:rPr>
+              <a:t>The next feature we build is the Order Detail page so that the user can click on an Order and get more information about it. This page probably has the exact same security requirements for obvious reasons.</a:t>
+            </a:r>
+          </a:p>
+          <a:p>
+            <a:endParaRPr lang="en-US" sz="1200" kern="1200" dirty="0" smtClean="0">
+              <a:solidFill>
+                <a:schemeClr val="tx1"/>
+              </a:solidFill>
+              <a:effectLst/>
+              <a:latin typeface="+mn-lt"/>
+              <a:ea typeface="+mn-ea"/>
+              <a:cs typeface="+mn-cs"/>
+            </a:endParaRPr>
+          </a:p>
+          <a:p>
+            <a:r>
+              <a:rPr lang="en-US" sz="1200" kern="1200" dirty="0" smtClean="0">
+                <a:solidFill>
+                  <a:schemeClr val="tx1"/>
+                </a:solidFill>
+                <a:effectLst/>
+                <a:latin typeface="+mn-lt"/>
+                <a:ea typeface="+mn-ea"/>
+                <a:cs typeface="+mn-cs"/>
+              </a:rPr>
+              <a:t>For the sake of this example, let’s assume those requirements are implemented exactly the same way on this feature as the first one.</a:t>
+            </a:r>
+          </a:p>
+          <a:p>
             <a:endParaRPr lang="en-US" b="0" dirty="0" smtClean="0"/>
           </a:p>
         </p:txBody>
@@ -1118,6 +1753,179 @@
           <a:bodyPr/>
           <a:lstStyle/>
           <a:p>
+            <a:pPr marL="0" marR="0" lvl="0" indent="0" algn="l" defTabSz="914400" rtl="0" eaLnBrk="1" fontAlgn="auto" latinLnBrk="0" hangingPunct="1">
+              <a:lnSpc>
+                <a:spcPct val="100000"/>
+              </a:lnSpc>
+              <a:spcBef>
+                <a:spcPts val="0"/>
+              </a:spcBef>
+              <a:spcAft>
+                <a:spcPts val="0"/>
+              </a:spcAft>
+              <a:buClrTx/>
+              <a:buSzTx/>
+              <a:buFontTx/>
+              <a:buNone/>
+              <a:tabLst/>
+              <a:defRPr/>
+            </a:pPr>
+            <a:r>
+              <a:rPr lang="en-US" sz="1200" kern="1200" dirty="0" smtClean="0">
+                <a:solidFill>
+                  <a:schemeClr val="tx1"/>
+                </a:solidFill>
+                <a:effectLst/>
+                <a:latin typeface="+mn-lt"/>
+                <a:ea typeface="+mn-ea"/>
+                <a:cs typeface="+mn-cs"/>
+              </a:rPr>
+              <a:t>Next we build a feature to Cancel the order. </a:t>
+            </a:r>
+          </a:p>
+          <a:p>
+            <a:pPr marL="0" marR="0" lvl="0" indent="0" algn="l" defTabSz="914400" rtl="0" eaLnBrk="1" fontAlgn="auto" latinLnBrk="0" hangingPunct="1">
+              <a:lnSpc>
+                <a:spcPct val="100000"/>
+              </a:lnSpc>
+              <a:spcBef>
+                <a:spcPts val="0"/>
+              </a:spcBef>
+              <a:spcAft>
+                <a:spcPts val="0"/>
+              </a:spcAft>
+              <a:buClrTx/>
+              <a:buSzTx/>
+              <a:buFontTx/>
+              <a:buNone/>
+              <a:tabLst/>
+              <a:defRPr/>
+            </a:pPr>
+            <a:endParaRPr lang="en-US" sz="1200" kern="1200" dirty="0" smtClean="0">
+              <a:solidFill>
+                <a:schemeClr val="tx1"/>
+              </a:solidFill>
+              <a:effectLst/>
+              <a:latin typeface="+mn-lt"/>
+              <a:ea typeface="+mn-ea"/>
+              <a:cs typeface="+mn-cs"/>
+            </a:endParaRPr>
+          </a:p>
+          <a:p>
+            <a:pPr marL="0" marR="0" lvl="0" indent="0" algn="l" defTabSz="914400" rtl="0" eaLnBrk="1" fontAlgn="auto" latinLnBrk="0" hangingPunct="1">
+              <a:lnSpc>
+                <a:spcPct val="100000"/>
+              </a:lnSpc>
+              <a:spcBef>
+                <a:spcPts val="0"/>
+              </a:spcBef>
+              <a:spcAft>
+                <a:spcPts val="0"/>
+              </a:spcAft>
+              <a:buClrTx/>
+              <a:buSzTx/>
+              <a:buFontTx/>
+              <a:buNone/>
+              <a:tabLst/>
+              <a:defRPr/>
+            </a:pPr>
+            <a:r>
+              <a:rPr lang="en-US" sz="1200" kern="1200" dirty="0" smtClean="0">
+                <a:solidFill>
+                  <a:schemeClr val="tx1"/>
+                </a:solidFill>
+                <a:effectLst/>
+                <a:latin typeface="+mn-lt"/>
+                <a:ea typeface="+mn-ea"/>
+                <a:cs typeface="+mn-cs"/>
+              </a:rPr>
+              <a:t>This feature </a:t>
+            </a:r>
+            <a:r>
+              <a:rPr lang="en-US" sz="1200" i="1" kern="1200" dirty="0" smtClean="0">
+                <a:solidFill>
+                  <a:schemeClr val="tx1"/>
+                </a:solidFill>
+                <a:effectLst/>
+                <a:latin typeface="+mn-lt"/>
+                <a:ea typeface="+mn-ea"/>
+                <a:cs typeface="+mn-cs"/>
+              </a:rPr>
+              <a:t>should </a:t>
+            </a:r>
+            <a:r>
+              <a:rPr lang="en-US" sz="1200" kern="1200" dirty="0" smtClean="0">
+                <a:solidFill>
+                  <a:schemeClr val="tx1"/>
+                </a:solidFill>
+                <a:effectLst/>
+                <a:latin typeface="+mn-lt"/>
+                <a:ea typeface="+mn-ea"/>
+                <a:cs typeface="+mn-cs"/>
+              </a:rPr>
+              <a:t>have same requirements as the first two, but maybe it was built by a different developer that wasn’t security conscious or was under some deadline pressure.</a:t>
+            </a:r>
+          </a:p>
+          <a:p>
+            <a:pPr marL="0" marR="0" lvl="0" indent="0" algn="l" defTabSz="914400" rtl="0" eaLnBrk="1" fontAlgn="auto" latinLnBrk="0" hangingPunct="1">
+              <a:lnSpc>
+                <a:spcPct val="100000"/>
+              </a:lnSpc>
+              <a:spcBef>
+                <a:spcPts val="0"/>
+              </a:spcBef>
+              <a:spcAft>
+                <a:spcPts val="0"/>
+              </a:spcAft>
+              <a:buClrTx/>
+              <a:buSzTx/>
+              <a:buFontTx/>
+              <a:buNone/>
+              <a:tabLst/>
+              <a:defRPr/>
+            </a:pPr>
+            <a:endParaRPr lang="en-US" sz="1200" kern="1200" dirty="0" smtClean="0">
+              <a:solidFill>
+                <a:schemeClr val="tx1"/>
+              </a:solidFill>
+              <a:effectLst/>
+              <a:latin typeface="+mn-lt"/>
+              <a:ea typeface="+mn-ea"/>
+              <a:cs typeface="+mn-cs"/>
+            </a:endParaRPr>
+          </a:p>
+          <a:p>
+            <a:pPr marL="0" marR="0" lvl="0" indent="0" algn="l" defTabSz="914400" rtl="0" eaLnBrk="1" fontAlgn="auto" latinLnBrk="0" hangingPunct="1">
+              <a:lnSpc>
+                <a:spcPct val="100000"/>
+              </a:lnSpc>
+              <a:spcBef>
+                <a:spcPts val="0"/>
+              </a:spcBef>
+              <a:spcAft>
+                <a:spcPts val="0"/>
+              </a:spcAft>
+              <a:buClrTx/>
+              <a:buSzTx/>
+              <a:buFontTx/>
+              <a:buNone/>
+              <a:tabLst/>
+              <a:defRPr/>
+            </a:pPr>
+            <a:r>
+              <a:rPr lang="en-US" sz="1200" kern="1200" dirty="0" smtClean="0">
+                <a:solidFill>
+                  <a:schemeClr val="tx1"/>
+                </a:solidFill>
+                <a:effectLst/>
+                <a:latin typeface="+mn-lt"/>
+                <a:ea typeface="+mn-ea"/>
+                <a:cs typeface="+mn-cs"/>
+              </a:rPr>
+              <a:t>For whatever reason, this feature isn't secure at all.</a:t>
+            </a:r>
+          </a:p>
+          <a:p>
             <a:endParaRPr lang="en-US" b="0" dirty="0" smtClean="0"/>
           </a:p>
         </p:txBody>
@@ -1202,6 +2010,165 @@
           <a:bodyPr/>
           <a:lstStyle/>
           <a:p>
+            <a:r>
+              <a:rPr lang="en-US" sz="1200" kern="1200" dirty="0" smtClean="0">
+                <a:solidFill>
+                  <a:schemeClr val="tx1"/>
+                </a:solidFill>
+                <a:effectLst/>
+                <a:latin typeface="+mn-lt"/>
+                <a:ea typeface="+mn-ea"/>
+                <a:cs typeface="+mn-cs"/>
+              </a:rPr>
+              <a:t>Finally, we build 4</a:t>
+            </a:r>
+            <a:r>
+              <a:rPr lang="en-US" sz="1200" kern="1200" baseline="30000" dirty="0" smtClean="0">
+                <a:solidFill>
+                  <a:schemeClr val="tx1"/>
+                </a:solidFill>
+                <a:effectLst/>
+                <a:latin typeface="+mn-lt"/>
+                <a:ea typeface="+mn-ea"/>
+                <a:cs typeface="+mn-cs"/>
+              </a:rPr>
+              <a:t>th</a:t>
+            </a:r>
+            <a:r>
+              <a:rPr lang="en-US" sz="1200" kern="1200" dirty="0" smtClean="0">
+                <a:solidFill>
+                  <a:schemeClr val="tx1"/>
+                </a:solidFill>
+                <a:effectLst/>
+                <a:latin typeface="+mn-lt"/>
+                <a:ea typeface="+mn-ea"/>
+                <a:cs typeface="+mn-cs"/>
+              </a:rPr>
+              <a:t> feature to Refund the order. Again</a:t>
+            </a:r>
+            <a:r>
+              <a:rPr lang="en-US" sz="1200" kern="1200" baseline="0" dirty="0" smtClean="0">
+                <a:solidFill>
+                  <a:schemeClr val="tx1"/>
+                </a:solidFill>
+                <a:effectLst/>
+                <a:latin typeface="+mn-lt"/>
+                <a:ea typeface="+mn-ea"/>
+                <a:cs typeface="+mn-cs"/>
+              </a:rPr>
+              <a:t> s</a:t>
+            </a:r>
+            <a:r>
+              <a:rPr lang="en-US" sz="1200" kern="1200" dirty="0" smtClean="0">
+                <a:solidFill>
+                  <a:schemeClr val="tx1"/>
+                </a:solidFill>
+                <a:effectLst/>
+                <a:latin typeface="+mn-lt"/>
+                <a:ea typeface="+mn-ea"/>
+                <a:cs typeface="+mn-cs"/>
+              </a:rPr>
+              <a:t>ame requirements as other features, but maybe dev was unfamiliar with those implementations and they implement the same rules, but in a different manner. Maybe instead of doing check in controller action, they move into model or something. Red diamond represents the same basic rules, but implemented in a different way.</a:t>
+            </a:r>
+          </a:p>
+          <a:p>
+            <a:endParaRPr lang="en-US" sz="1200" kern="1200" dirty="0" smtClean="0">
+              <a:solidFill>
+                <a:schemeClr val="tx1"/>
+              </a:solidFill>
+              <a:effectLst/>
+              <a:latin typeface="+mn-lt"/>
+              <a:ea typeface="+mn-ea"/>
+              <a:cs typeface="+mn-cs"/>
+            </a:endParaRPr>
+          </a:p>
+          <a:p>
+            <a:r>
+              <a:rPr lang="en-US" sz="1200" kern="1200" dirty="0" smtClean="0">
+                <a:solidFill>
+                  <a:schemeClr val="tx1"/>
+                </a:solidFill>
+                <a:effectLst/>
+                <a:latin typeface="+mn-lt"/>
+                <a:ea typeface="+mn-ea"/>
+                <a:cs typeface="+mn-cs"/>
+              </a:rPr>
+              <a:t>Problems with this approach might be obvious.</a:t>
+            </a:r>
+          </a:p>
+          <a:p>
+            <a:pPr marL="228600" lvl="0" indent="-228600">
+              <a:buAutoNum type="arabicParenR"/>
+            </a:pPr>
+            <a:r>
+              <a:rPr lang="en-US" sz="1200" kern="1200" dirty="0" smtClean="0">
+                <a:solidFill>
+                  <a:schemeClr val="tx1"/>
+                </a:solidFill>
+                <a:effectLst/>
+                <a:latin typeface="+mn-lt"/>
+                <a:ea typeface="+mn-ea"/>
+                <a:cs typeface="+mn-cs"/>
+              </a:rPr>
+              <a:t>1 of these 4 features is insecure. If QA primarily tests through the UI, then as long as List &amp; Detail page implement the rules, they might never discover that the Cancel feature allows anonymous access. With this architecture, only way to guarantee QA would find issue is via</a:t>
+            </a:r>
+            <a:r>
+              <a:rPr lang="en-US" sz="1200" kern="1200" baseline="0" dirty="0" smtClean="0">
+                <a:solidFill>
+                  <a:schemeClr val="tx1"/>
+                </a:solidFill>
+                <a:effectLst/>
+                <a:latin typeface="+mn-lt"/>
+                <a:ea typeface="+mn-ea"/>
+                <a:cs typeface="+mn-cs"/>
+              </a:rPr>
+              <a:t> </a:t>
+            </a:r>
+            <a:r>
+              <a:rPr lang="en-US" sz="1200" kern="1200" dirty="0" smtClean="0">
+                <a:solidFill>
+                  <a:schemeClr val="tx1"/>
+                </a:solidFill>
+                <a:effectLst/>
+                <a:latin typeface="+mn-lt"/>
+                <a:ea typeface="+mn-ea"/>
+                <a:cs typeface="+mn-cs"/>
+              </a:rPr>
+              <a:t>exhaustive, black-box testing of every rule against every endpoint</a:t>
+            </a:r>
+          </a:p>
+          <a:p>
+            <a:pPr marL="228600" lvl="0" indent="-228600">
+              <a:buAutoNum type="arabicParenR"/>
+            </a:pPr>
+            <a:endParaRPr lang="en-US" sz="1200" kern="1200" dirty="0" smtClean="0">
+              <a:solidFill>
+                <a:schemeClr val="tx1"/>
+              </a:solidFill>
+              <a:effectLst/>
+              <a:latin typeface="+mn-lt"/>
+              <a:ea typeface="+mn-ea"/>
+              <a:cs typeface="+mn-cs"/>
+            </a:endParaRPr>
+          </a:p>
+          <a:p>
+            <a:pPr marL="228600" lvl="0" indent="-228600">
+              <a:buAutoNum type="arabicParenR"/>
+            </a:pPr>
+            <a:r>
+              <a:rPr lang="en-US" sz="1200" kern="1200" dirty="0" smtClean="0">
+                <a:solidFill>
+                  <a:schemeClr val="tx1"/>
+                </a:solidFill>
+                <a:effectLst/>
+                <a:latin typeface="+mn-lt"/>
+                <a:ea typeface="+mn-ea"/>
+                <a:cs typeface="+mn-cs"/>
+              </a:rPr>
+              <a:t>Maintaining the security code will be difficult. What happens when we add a new user role…</a:t>
+            </a:r>
+          </a:p>
+          <a:p>
             <a:endParaRPr lang="en-US" b="0" dirty="0" smtClean="0"/>
           </a:p>
         </p:txBody>
@@ -1286,6 +2253,142 @@
           <a:bodyPr/>
           <a:lstStyle/>
           <a:p>
+            <a:r>
+              <a:rPr lang="en-US" sz="1200" kern="1200" dirty="0" smtClean="0">
+                <a:solidFill>
+                  <a:schemeClr val="tx1"/>
+                </a:solidFill>
+                <a:effectLst/>
+                <a:latin typeface="+mn-lt"/>
+                <a:ea typeface="+mn-ea"/>
+                <a:cs typeface="+mn-cs"/>
+              </a:rPr>
+              <a:t>If dev making the change doesn’t realize same rules are duplicated in other features, might end up changing just one of them. Now we have </a:t>
+            </a:r>
+            <a:r>
+              <a:rPr lang="en-US" sz="1200" i="1" kern="1200" dirty="0" smtClean="0">
+                <a:solidFill>
+                  <a:schemeClr val="tx1"/>
+                </a:solidFill>
+                <a:effectLst/>
+                <a:latin typeface="+mn-lt"/>
+                <a:ea typeface="+mn-ea"/>
+                <a:cs typeface="+mn-cs"/>
+              </a:rPr>
+              <a:t>three </a:t>
+            </a:r>
+            <a:r>
+              <a:rPr lang="en-US" sz="1200" kern="1200" dirty="0" smtClean="0">
+                <a:solidFill>
+                  <a:schemeClr val="tx1"/>
+                </a:solidFill>
+                <a:effectLst/>
+                <a:latin typeface="+mn-lt"/>
+                <a:ea typeface="+mn-ea"/>
+                <a:cs typeface="+mn-cs"/>
+              </a:rPr>
+              <a:t>implementations: triangle, square, and diamond. </a:t>
+            </a:r>
+          </a:p>
+          <a:p>
+            <a:endParaRPr lang="en-US" sz="1200" kern="1200" dirty="0" smtClean="0">
+              <a:solidFill>
+                <a:schemeClr val="tx1"/>
+              </a:solidFill>
+              <a:effectLst/>
+              <a:latin typeface="+mn-lt"/>
+              <a:ea typeface="+mn-ea"/>
+              <a:cs typeface="+mn-cs"/>
+            </a:endParaRPr>
+          </a:p>
+          <a:p>
+            <a:r>
+              <a:rPr lang="en-US" sz="1200" kern="1200" dirty="0" smtClean="0">
+                <a:solidFill>
+                  <a:schemeClr val="tx1"/>
+                </a:solidFill>
+                <a:effectLst/>
+                <a:latin typeface="+mn-lt"/>
+                <a:ea typeface="+mn-ea"/>
+                <a:cs typeface="+mn-cs"/>
+              </a:rPr>
+              <a:t>Even if dev does replace all places using the “square” </a:t>
+            </a:r>
+            <a:r>
+              <a:rPr lang="en-US" sz="1200" kern="1200" dirty="0" err="1" smtClean="0">
+                <a:solidFill>
+                  <a:schemeClr val="tx1"/>
+                </a:solidFill>
+                <a:effectLst/>
+                <a:latin typeface="+mn-lt"/>
+                <a:ea typeface="+mn-ea"/>
+                <a:cs typeface="+mn-cs"/>
+              </a:rPr>
+              <a:t>impl</a:t>
+            </a:r>
+            <a:r>
+              <a:rPr lang="en-US" sz="1200" kern="1200" dirty="0" smtClean="0">
+                <a:solidFill>
+                  <a:schemeClr val="tx1"/>
+                </a:solidFill>
+                <a:effectLst/>
+                <a:latin typeface="+mn-lt"/>
+                <a:ea typeface="+mn-ea"/>
+                <a:cs typeface="+mn-cs"/>
+              </a:rPr>
+              <a:t>, might still miss Cancel feature w/ no security and Refund feature w/ “diamond” </a:t>
+            </a:r>
+            <a:r>
+              <a:rPr lang="en-US" sz="1200" kern="1200" dirty="0" err="1" smtClean="0">
+                <a:solidFill>
+                  <a:schemeClr val="tx1"/>
+                </a:solidFill>
+                <a:effectLst/>
+                <a:latin typeface="+mn-lt"/>
+                <a:ea typeface="+mn-ea"/>
+                <a:cs typeface="+mn-cs"/>
+              </a:rPr>
+              <a:t>impl</a:t>
+            </a:r>
+            <a:r>
+              <a:rPr lang="en-US" sz="1200" kern="1200" dirty="0" smtClean="0">
+                <a:solidFill>
+                  <a:schemeClr val="tx1"/>
+                </a:solidFill>
+                <a:effectLst/>
+                <a:latin typeface="+mn-lt"/>
+                <a:ea typeface="+mn-ea"/>
+                <a:cs typeface="+mn-cs"/>
+              </a:rPr>
+              <a:t>.</a:t>
+            </a:r>
+          </a:p>
+          <a:p>
+            <a:endParaRPr lang="en-US" sz="1200" kern="1200" dirty="0" smtClean="0">
+              <a:solidFill>
+                <a:schemeClr val="tx1"/>
+              </a:solidFill>
+              <a:effectLst/>
+              <a:latin typeface="+mn-lt"/>
+              <a:ea typeface="+mn-ea"/>
+              <a:cs typeface="+mn-cs"/>
+            </a:endParaRPr>
+          </a:p>
+          <a:p>
+            <a:r>
+              <a:rPr lang="en-US" sz="1200" kern="1200" dirty="0" smtClean="0">
+                <a:solidFill>
+                  <a:schemeClr val="tx1"/>
+                </a:solidFill>
+                <a:effectLst/>
+                <a:latin typeface="+mn-lt"/>
+                <a:ea typeface="+mn-ea"/>
+                <a:cs typeface="+mn-cs"/>
+              </a:rPr>
+              <a:t>This is how security defects creep into software. Well-meaning developers either forget to implement a security check, or they inconsistently maintain security checks over time. Either way, we end up with a confusing and inconsistent mess of security code intermingled with feature code, or missing altogether.</a:t>
+            </a:r>
+          </a:p>
+          <a:p>
             <a:endParaRPr lang="en-US" b="0" dirty="0" smtClean="0"/>
           </a:p>
         </p:txBody>
@@ -1370,6 +2473,45 @@
           <a:bodyPr/>
           <a:lstStyle/>
           <a:p>
+            <a:r>
+              <a:rPr lang="en-US" sz="1200" kern="1200" dirty="0" smtClean="0">
+                <a:solidFill>
+                  <a:schemeClr val="tx1"/>
+                </a:solidFill>
+                <a:effectLst/>
+                <a:latin typeface="+mn-lt"/>
+                <a:ea typeface="+mn-ea"/>
+                <a:cs typeface="+mn-cs"/>
+              </a:rPr>
+              <a:t>My approach would be to extract those business rules into something reusable so that we can implement the requirements only once.</a:t>
+            </a:r>
+          </a:p>
+          <a:p>
+            <a:endParaRPr lang="en-US" sz="1200" kern="1200" dirty="0" smtClean="0">
+              <a:solidFill>
+                <a:schemeClr val="tx1"/>
+              </a:solidFill>
+              <a:effectLst/>
+              <a:latin typeface="+mn-lt"/>
+              <a:ea typeface="+mn-ea"/>
+              <a:cs typeface="+mn-cs"/>
+            </a:endParaRPr>
+          </a:p>
+          <a:p>
+            <a:r>
+              <a:rPr lang="en-US" sz="1200" kern="1200" dirty="0" smtClean="0">
+                <a:solidFill>
+                  <a:schemeClr val="tx1"/>
+                </a:solidFill>
+                <a:effectLst/>
+                <a:latin typeface="+mn-lt"/>
+                <a:ea typeface="+mn-ea"/>
+                <a:cs typeface="+mn-cs"/>
+              </a:rPr>
+              <a:t>There’s multiple ways that you could do this. </a:t>
+            </a:r>
+          </a:p>
+          <a:p>
             <a:endParaRPr lang="en-US" b="0" dirty="0" smtClean="0"/>
           </a:p>
         </p:txBody>
@@ -1454,7 +2596,120 @@
           <a:bodyPr/>
           <a:lstStyle/>
           <a:p>
-            <a:endParaRPr lang="en-US" b="0" dirty="0" smtClean="0"/>
+            <a:r>
+              <a:rPr lang="en-US" sz="1200" kern="1200" dirty="0" smtClean="0">
+                <a:solidFill>
+                  <a:schemeClr val="tx1"/>
+                </a:solidFill>
+                <a:effectLst/>
+                <a:latin typeface="+mn-lt"/>
+                <a:ea typeface="+mn-ea"/>
+                <a:cs typeface="+mn-cs"/>
+              </a:rPr>
+              <a:t>The simplest would be to extract this logic into a helper method and call it from all 4 controller actions or something. </a:t>
+            </a:r>
+          </a:p>
+          <a:p>
+            <a:endParaRPr lang="en-US" sz="1200" kern="1200" dirty="0" smtClean="0">
+              <a:solidFill>
+                <a:schemeClr val="tx1"/>
+              </a:solidFill>
+              <a:effectLst/>
+              <a:latin typeface="+mn-lt"/>
+              <a:ea typeface="+mn-ea"/>
+              <a:cs typeface="+mn-cs"/>
+            </a:endParaRPr>
+          </a:p>
+          <a:p>
+            <a:r>
+              <a:rPr lang="en-US" sz="1200" kern="1200" dirty="0" smtClean="0">
+                <a:solidFill>
+                  <a:schemeClr val="tx1"/>
+                </a:solidFill>
+                <a:effectLst/>
+                <a:latin typeface="+mn-lt"/>
+                <a:ea typeface="+mn-ea"/>
+                <a:cs typeface="+mn-cs"/>
+              </a:rPr>
+              <a:t>This would standardize on a single “square” implementation, but nothing prevents a developer from forgetting to call this method and leaving the feature insecure. </a:t>
+            </a:r>
+          </a:p>
+          <a:p>
+            <a:endParaRPr lang="en-US" sz="1200" kern="1200" dirty="0" smtClean="0">
+              <a:solidFill>
+                <a:schemeClr val="tx1"/>
+              </a:solidFill>
+              <a:effectLst/>
+              <a:latin typeface="+mn-lt"/>
+              <a:ea typeface="+mn-ea"/>
+              <a:cs typeface="+mn-cs"/>
+            </a:endParaRPr>
+          </a:p>
+          <a:p>
+            <a:pPr marL="0" marR="0" lvl="0" indent="0" algn="l" defTabSz="914400" rtl="0" eaLnBrk="1" fontAlgn="auto" latinLnBrk="0" hangingPunct="1">
+              <a:lnSpc>
+                <a:spcPct val="100000"/>
+              </a:lnSpc>
+              <a:spcBef>
+                <a:spcPts val="0"/>
+              </a:spcBef>
+              <a:spcAft>
+                <a:spcPts val="0"/>
+              </a:spcAft>
+              <a:buClrTx/>
+              <a:buSzTx/>
+              <a:buFontTx/>
+              <a:buNone/>
+              <a:tabLst/>
+              <a:defRPr/>
+            </a:pPr>
+            <a:r>
+              <a:rPr lang="en-US" sz="1200" kern="1200" dirty="0" smtClean="0">
+                <a:solidFill>
+                  <a:schemeClr val="tx1"/>
+                </a:solidFill>
+                <a:effectLst/>
+                <a:latin typeface="+mn-lt"/>
+                <a:ea typeface="+mn-ea"/>
+                <a:cs typeface="+mn-cs"/>
+              </a:rPr>
+              <a:t>And again,</a:t>
+            </a:r>
+            <a:r>
+              <a:rPr lang="en-US" sz="1200" kern="1200" baseline="0" dirty="0" smtClean="0">
+                <a:solidFill>
+                  <a:schemeClr val="tx1"/>
+                </a:solidFill>
+                <a:effectLst/>
+                <a:latin typeface="+mn-lt"/>
+                <a:ea typeface="+mn-ea"/>
+                <a:cs typeface="+mn-cs"/>
+              </a:rPr>
+              <a:t> the only way to guarantee that we'll find those insecure features, is if we're doing black-box testing of every single endpoint </a:t>
+            </a:r>
+            <a:r>
+              <a:rPr lang="en-US" sz="1200" kern="1200" dirty="0" smtClean="0">
+                <a:solidFill>
+                  <a:schemeClr val="tx1"/>
+                </a:solidFill>
+                <a:effectLst/>
+                <a:latin typeface="+mn-lt"/>
+                <a:ea typeface="+mn-ea"/>
+                <a:cs typeface="+mn-cs"/>
+              </a:rPr>
+              <a:t>against the security requirements.</a:t>
+            </a:r>
+          </a:p>
+          <a:p>
+            <a:endParaRPr lang="en-US" sz="1200" kern="1200" dirty="0">
+              <a:solidFill>
+                <a:schemeClr val="tx1"/>
+              </a:solidFill>
+              <a:effectLst/>
+              <a:latin typeface="+mn-lt"/>
+              <a:ea typeface="+mn-ea"/>
+              <a:cs typeface="+mn-cs"/>
+            </a:endParaRPr>
           </a:p>
         </p:txBody>
       </p:sp>
@@ -1538,6 +2793,145 @@
           <a:bodyPr/>
           <a:lstStyle/>
           <a:p>
+            <a:r>
+              <a:rPr lang="en-US" sz="1200" kern="1200" dirty="0" smtClean="0">
+                <a:solidFill>
+                  <a:schemeClr val="tx1"/>
+                </a:solidFill>
+                <a:effectLst/>
+                <a:latin typeface="+mn-lt"/>
+                <a:ea typeface="+mn-ea"/>
+                <a:cs typeface="+mn-cs"/>
+              </a:rPr>
+              <a:t>That confession is that I hate writing secure code.</a:t>
+            </a:r>
+          </a:p>
+          <a:p>
+            <a:endParaRPr lang="en-US" sz="1200" kern="1200" dirty="0" smtClean="0">
+              <a:solidFill>
+                <a:schemeClr val="tx1"/>
+              </a:solidFill>
+              <a:effectLst/>
+              <a:latin typeface="+mn-lt"/>
+              <a:ea typeface="+mn-ea"/>
+              <a:cs typeface="+mn-cs"/>
+            </a:endParaRPr>
+          </a:p>
+          <a:p>
+            <a:r>
+              <a:rPr lang="en-US" sz="1200" kern="1200" dirty="0" smtClean="0">
+                <a:solidFill>
+                  <a:schemeClr val="tx1"/>
+                </a:solidFill>
+                <a:effectLst/>
+                <a:latin typeface="+mn-lt"/>
+                <a:ea typeface="+mn-ea"/>
+                <a:cs typeface="+mn-cs"/>
+              </a:rPr>
+              <a:t>Not proud of it, but when building a feature and elbow deep in complex business logic or functional requirements, I don’t want to think about security. </a:t>
+            </a:r>
+          </a:p>
+          <a:p>
+            <a:endParaRPr lang="en-US" sz="1200" kern="1200" dirty="0" smtClean="0">
+              <a:solidFill>
+                <a:schemeClr val="tx1"/>
+              </a:solidFill>
+              <a:effectLst/>
+              <a:latin typeface="+mn-lt"/>
+              <a:ea typeface="+mn-ea"/>
+              <a:cs typeface="+mn-cs"/>
+            </a:endParaRPr>
+          </a:p>
+          <a:p>
+            <a:r>
+              <a:rPr lang="en-US" sz="1200" kern="1200" dirty="0" smtClean="0">
+                <a:solidFill>
+                  <a:schemeClr val="tx1"/>
+                </a:solidFill>
+                <a:effectLst/>
+                <a:latin typeface="+mn-lt"/>
+                <a:ea typeface="+mn-ea"/>
+                <a:cs typeface="+mn-cs"/>
+              </a:rPr>
+              <a:t>Want to be totally focused on biz problem, but ever-present security issues keep stealing focus. </a:t>
+            </a:r>
+          </a:p>
+          <a:p>
+            <a:endParaRPr lang="en-US" sz="1200" kern="1200" dirty="0" smtClean="0">
+              <a:solidFill>
+                <a:schemeClr val="tx1"/>
+              </a:solidFill>
+              <a:effectLst/>
+              <a:latin typeface="+mn-lt"/>
+              <a:ea typeface="+mn-ea"/>
+              <a:cs typeface="+mn-cs"/>
+            </a:endParaRPr>
+          </a:p>
+          <a:p>
+            <a:r>
+              <a:rPr lang="en-US" sz="1200" kern="1200" dirty="0" smtClean="0">
+                <a:solidFill>
+                  <a:schemeClr val="tx1"/>
+                </a:solidFill>
+                <a:effectLst/>
+                <a:latin typeface="+mn-lt"/>
+                <a:ea typeface="+mn-ea"/>
+                <a:cs typeface="+mn-cs"/>
+              </a:rPr>
+              <a:t>User has to be logged in to do this. Have to have some permission to do that. Alice shouldn’t be able to see Bob’s data. … yadda</a:t>
+            </a:r>
+          </a:p>
+          <a:p>
+            <a:endParaRPr lang="en-US" sz="1200" kern="1200" dirty="0" smtClean="0">
+              <a:solidFill>
+                <a:schemeClr val="tx1"/>
+              </a:solidFill>
+              <a:effectLst/>
+              <a:latin typeface="+mn-lt"/>
+              <a:ea typeface="+mn-ea"/>
+              <a:cs typeface="+mn-cs"/>
+            </a:endParaRPr>
+          </a:p>
+          <a:p>
+            <a:r>
+              <a:rPr lang="en-US" sz="1200" kern="1200" dirty="0" smtClean="0">
+                <a:solidFill>
+                  <a:schemeClr val="tx1"/>
+                </a:solidFill>
+                <a:effectLst/>
+                <a:latin typeface="+mn-lt"/>
+                <a:ea typeface="+mn-ea"/>
+                <a:cs typeface="+mn-cs"/>
+              </a:rPr>
+              <a:t>Constant need to pay attention to those same security concerns, over and over, feature after feature, bums me out.</a:t>
+            </a:r>
+          </a:p>
+          <a:p>
+            <a:endParaRPr lang="en-US" sz="1200" kern="1200" dirty="0" smtClean="0">
+              <a:solidFill>
+                <a:schemeClr val="tx1"/>
+              </a:solidFill>
+              <a:effectLst/>
+              <a:latin typeface="+mn-lt"/>
+              <a:ea typeface="+mn-ea"/>
+              <a:cs typeface="+mn-cs"/>
+            </a:endParaRPr>
+          </a:p>
+          <a:p>
+            <a:r>
+              <a:rPr lang="en-US" sz="1200" kern="1200" dirty="0" smtClean="0">
+                <a:solidFill>
+                  <a:schemeClr val="tx1"/>
+                </a:solidFill>
+                <a:effectLst/>
+                <a:latin typeface="+mn-lt"/>
+                <a:ea typeface="+mn-ea"/>
+                <a:cs typeface="+mn-cs"/>
+              </a:rPr>
+              <a:t>So, maybe a better way of expressing myself is that</a:t>
+            </a:r>
+          </a:p>
+          <a:p>
             <a:pPr marL="0" marR="0" indent="0" algn="l" defTabSz="914400" rtl="0" eaLnBrk="1" fontAlgn="auto" latinLnBrk="0" hangingPunct="1">
               <a:lnSpc>
                 <a:spcPct val="100000"/>
@@ -1647,7 +3041,52 @@
           <a:bodyPr/>
           <a:lstStyle/>
           <a:p>
-            <a:endParaRPr lang="en-US" b="0" dirty="0" smtClean="0"/>
+            <a:r>
+              <a:rPr lang="en-US" sz="1200" kern="1200" dirty="0" smtClean="0">
+                <a:solidFill>
+                  <a:schemeClr val="tx1"/>
+                </a:solidFill>
+                <a:effectLst/>
+                <a:latin typeface="+mn-lt"/>
+                <a:ea typeface="+mn-ea"/>
+                <a:cs typeface="+mn-cs"/>
+              </a:rPr>
+              <a:t>Another approach would be to extract the logic into some sort of attribute that injects that logic into the appropriate part of the processing pipeline.</a:t>
+            </a:r>
+          </a:p>
+          <a:p>
+            <a:endParaRPr lang="en-US" sz="1200" kern="1200" dirty="0" smtClean="0">
+              <a:solidFill>
+                <a:schemeClr val="tx1"/>
+              </a:solidFill>
+              <a:effectLst/>
+              <a:latin typeface="+mn-lt"/>
+              <a:ea typeface="+mn-ea"/>
+              <a:cs typeface="+mn-cs"/>
+            </a:endParaRPr>
+          </a:p>
+          <a:p>
+            <a:r>
+              <a:rPr lang="en-US" sz="1200" kern="1200" dirty="0" smtClean="0">
+                <a:solidFill>
+                  <a:schemeClr val="tx1"/>
+                </a:solidFill>
+                <a:effectLst/>
+                <a:latin typeface="+mn-lt"/>
+                <a:ea typeface="+mn-ea"/>
+                <a:cs typeface="+mn-cs"/>
+              </a:rPr>
+              <a:t>This also results in a consistent implementation, but it’s just as easy for a developer to forget. However, this approach is easier to audit. In a little bit I’ll talk about using static analysis to generate a report of secure and insecure endpoints based on attribute usage.</a:t>
+            </a:r>
+            <a:endParaRPr lang="en-US" sz="1200" kern="1200" dirty="0">
+              <a:solidFill>
+                <a:schemeClr val="tx1"/>
+              </a:solidFill>
+              <a:effectLst/>
+              <a:latin typeface="+mn-lt"/>
+              <a:ea typeface="+mn-ea"/>
+              <a:cs typeface="+mn-cs"/>
+            </a:endParaRPr>
           </a:p>
         </p:txBody>
       </p:sp>
@@ -1731,6 +3170,93 @@
           <a:bodyPr/>
           <a:lstStyle/>
           <a:p>
+            <a:r>
+              <a:rPr lang="en-US" sz="1200" kern="1200" dirty="0" smtClean="0">
+                <a:solidFill>
+                  <a:schemeClr val="tx1"/>
+                </a:solidFill>
+                <a:effectLst/>
+                <a:latin typeface="+mn-lt"/>
+                <a:ea typeface="+mn-ea"/>
+                <a:cs typeface="+mn-cs"/>
+              </a:rPr>
+              <a:t>In a perfect world, the developer wouldn’t have to do anything at all except write their business logic, and the security stuff would be handled automagically </a:t>
+            </a:r>
+            <a:r>
+              <a:rPr lang="en-US" sz="1200" i="1" kern="1200" dirty="0" smtClean="0">
+                <a:solidFill>
+                  <a:schemeClr val="tx1"/>
+                </a:solidFill>
+                <a:effectLst/>
+                <a:latin typeface="+mn-lt"/>
+                <a:ea typeface="+mn-ea"/>
+                <a:cs typeface="+mn-cs"/>
+              </a:rPr>
+              <a:t>and </a:t>
+            </a:r>
+            <a:r>
+              <a:rPr lang="en-US" sz="1200" kern="1200" dirty="0" smtClean="0">
+                <a:solidFill>
+                  <a:schemeClr val="tx1"/>
+                </a:solidFill>
+                <a:effectLst/>
+                <a:latin typeface="+mn-lt"/>
+                <a:ea typeface="+mn-ea"/>
+                <a:cs typeface="+mn-cs"/>
+              </a:rPr>
+              <a:t>in a way that was easily audited and tested. And that’s the point of this talk.</a:t>
+            </a:r>
+          </a:p>
+          <a:p>
+            <a:endParaRPr lang="en-US" sz="1200" kern="1200" dirty="0" smtClean="0">
+              <a:solidFill>
+                <a:schemeClr val="tx1"/>
+              </a:solidFill>
+              <a:effectLst/>
+              <a:latin typeface="+mn-lt"/>
+              <a:ea typeface="+mn-ea"/>
+              <a:cs typeface="+mn-cs"/>
+            </a:endParaRPr>
+          </a:p>
+          <a:p>
+            <a:r>
+              <a:rPr lang="en-US" sz="1200" kern="1200" dirty="0" smtClean="0">
+                <a:solidFill>
+                  <a:schemeClr val="tx1"/>
+                </a:solidFill>
+                <a:effectLst/>
+                <a:latin typeface="+mn-lt"/>
+                <a:ea typeface="+mn-ea"/>
+                <a:cs typeface="+mn-cs"/>
+              </a:rPr>
+              <a:t>It isn’t always possible to get it </a:t>
+            </a:r>
+            <a:r>
+              <a:rPr lang="en-US" sz="1200" i="1" kern="1200" dirty="0" smtClean="0">
+                <a:solidFill>
+                  <a:schemeClr val="tx1"/>
+                </a:solidFill>
+                <a:effectLst/>
+                <a:latin typeface="+mn-lt"/>
+                <a:ea typeface="+mn-ea"/>
+                <a:cs typeface="+mn-cs"/>
+              </a:rPr>
+              <a:t>quite </a:t>
+            </a:r>
+            <a:r>
+              <a:rPr lang="en-US" sz="1200" kern="1200" dirty="0" smtClean="0">
+                <a:solidFill>
+                  <a:schemeClr val="tx1"/>
+                </a:solidFill>
+                <a:effectLst/>
+                <a:latin typeface="+mn-lt"/>
+                <a:ea typeface="+mn-ea"/>
+                <a:cs typeface="+mn-cs"/>
+              </a:rPr>
+              <a:t>this magical, but we can probably get a lot closer than you’d expect.</a:t>
+            </a:r>
+          </a:p>
+          <a:p>
             <a:endParaRPr lang="en-US" b="0" dirty="0" smtClean="0"/>
           </a:p>
         </p:txBody>
@@ -1815,6 +3341,94 @@
           <a:bodyPr/>
           <a:lstStyle/>
           <a:p>
+            <a:r>
+              <a:rPr lang="en-US" sz="1200" kern="1200" dirty="0" smtClean="0">
+                <a:solidFill>
+                  <a:schemeClr val="tx1"/>
+                </a:solidFill>
+                <a:effectLst/>
+                <a:latin typeface="+mn-lt"/>
+                <a:ea typeface="+mn-ea"/>
+                <a:cs typeface="+mn-cs"/>
+              </a:rPr>
+              <a:t>For the rest of this talk I’ll be showing you a bunch of code samples from a demo app I wrote. This app, which you can get from my </a:t>
+            </a:r>
+            <a:r>
+              <a:rPr lang="en-US" sz="1200" kern="1200" dirty="0" err="1" smtClean="0">
+                <a:solidFill>
+                  <a:schemeClr val="tx1"/>
+                </a:solidFill>
+                <a:effectLst/>
+                <a:latin typeface="+mn-lt"/>
+                <a:ea typeface="+mn-ea"/>
+                <a:cs typeface="+mn-cs"/>
+              </a:rPr>
+              <a:t>Github</a:t>
+            </a:r>
+            <a:r>
+              <a:rPr lang="en-US" sz="1200" kern="1200" dirty="0" smtClean="0">
+                <a:solidFill>
+                  <a:schemeClr val="tx1"/>
+                </a:solidFill>
+                <a:effectLst/>
+                <a:latin typeface="+mn-lt"/>
+                <a:ea typeface="+mn-ea"/>
+                <a:cs typeface="+mn-cs"/>
+              </a:rPr>
+              <a:t> page, shows the same features implemented three ways: first, with no security at all, then using “secure feature” code where the security requirement is handled directly within the business logic, and finally with the security concerns extracted into some part of the framework. </a:t>
+            </a:r>
+          </a:p>
+          <a:p>
+            <a:endParaRPr lang="en-US" sz="1200" kern="1200" dirty="0" smtClean="0">
+              <a:solidFill>
+                <a:schemeClr val="tx1"/>
+              </a:solidFill>
+              <a:effectLst/>
+              <a:latin typeface="+mn-lt"/>
+              <a:ea typeface="+mn-ea"/>
+              <a:cs typeface="+mn-cs"/>
+            </a:endParaRPr>
+          </a:p>
+          <a:p>
+            <a:r>
+              <a:rPr lang="en-US" sz="1200" kern="1200" dirty="0" smtClean="0">
+                <a:solidFill>
+                  <a:schemeClr val="tx1"/>
+                </a:solidFill>
+                <a:effectLst/>
+                <a:latin typeface="+mn-lt"/>
+                <a:ea typeface="+mn-ea"/>
+                <a:cs typeface="+mn-cs"/>
+              </a:rPr>
+              <a:t>I will move through my slides pretty quickly, but everything you’ll see up here comes straight from that project that you can reference later. It’s fully functional and heavily commented so I hope it’s a useful resource for you.</a:t>
+            </a:r>
+          </a:p>
+          <a:p>
+            <a:endParaRPr lang="en-US" sz="1200" kern="1200" dirty="0" smtClean="0">
+              <a:solidFill>
+                <a:schemeClr val="tx1"/>
+              </a:solidFill>
+              <a:effectLst/>
+              <a:latin typeface="+mn-lt"/>
+              <a:ea typeface="+mn-ea"/>
+              <a:cs typeface="+mn-cs"/>
+            </a:endParaRPr>
+          </a:p>
+          <a:p>
+            <a:r>
+              <a:rPr lang="en-US" sz="1200" kern="1200" dirty="0" smtClean="0">
+                <a:solidFill>
+                  <a:schemeClr val="tx1"/>
+                </a:solidFill>
+                <a:effectLst/>
+                <a:latin typeface="+mn-lt"/>
+                <a:ea typeface="+mn-ea"/>
+                <a:cs typeface="+mn-cs"/>
+              </a:rPr>
+              <a:t>To start, I’m going to show you 3 examples of what I call a “secure by default” system. Each of these examples demonstrates how you can solve a problem once, and then more or less forget about it. Once it’s been solved in the framework, no additional developer effort is needed on a feature-by-feature basis.</a:t>
+            </a:r>
+          </a:p>
+          <a:p>
             <a:pPr marL="0" marR="0" indent="0" algn="l" defTabSz="914400" rtl="0" eaLnBrk="1" fontAlgn="auto" latinLnBrk="0" hangingPunct="1">
               <a:lnSpc>
                 <a:spcPct val="100000"/>
@@ -1924,6 +3538,37 @@
           <a:bodyPr/>
           <a:lstStyle/>
           <a:p>
+            <a:pPr marL="0" marR="0" lvl="0" indent="0" algn="l" defTabSz="914400" rtl="0" eaLnBrk="1" fontAlgn="auto" latinLnBrk="0" hangingPunct="1">
+              <a:lnSpc>
+                <a:spcPct val="100000"/>
+              </a:lnSpc>
+              <a:spcBef>
+                <a:spcPts val="0"/>
+              </a:spcBef>
+              <a:spcAft>
+                <a:spcPts val="0"/>
+              </a:spcAft>
+              <a:buClrTx/>
+              <a:buSzTx/>
+              <a:buFontTx/>
+              <a:buNone/>
+              <a:tabLst/>
+              <a:defRPr/>
+            </a:pPr>
+            <a:r>
+              <a:rPr lang="en-US" sz="1200" kern="1200" dirty="0" smtClean="0">
+                <a:solidFill>
+                  <a:schemeClr val="tx1"/>
+                </a:solidFill>
+                <a:effectLst/>
+                <a:latin typeface="+mn-lt"/>
+                <a:ea typeface="+mn-ea"/>
+                <a:cs typeface="+mn-cs"/>
+              </a:rPr>
+              <a:t>My first example deals with #8 on the OWASP Top 10, Cross Site Request Forgery. In case you’re not familiar with CSRF, here’s a quick overview. </a:t>
+            </a:r>
+          </a:p>
+          <a:p>
             <a:pPr marL="0" marR="0" indent="0" algn="l" defTabSz="914400" rtl="0" eaLnBrk="1" fontAlgn="auto" latinLnBrk="0" hangingPunct="1">
               <a:lnSpc>
                 <a:spcPct val="100000"/>
@@ -2033,6 +3678,119 @@
           <a:bodyPr/>
           <a:lstStyle/>
           <a:p>
+            <a:r>
+              <a:rPr lang="en-US" sz="1200" kern="1200" dirty="0" smtClean="0">
+                <a:solidFill>
+                  <a:schemeClr val="tx1"/>
+                </a:solidFill>
+                <a:effectLst/>
+                <a:latin typeface="+mn-lt"/>
+                <a:ea typeface="+mn-ea"/>
+                <a:cs typeface="+mn-cs"/>
+              </a:rPr>
+              <a:t>First, a user logs into a site they trust, such as their bank. </a:t>
+            </a:r>
+          </a:p>
+          <a:p>
+            <a:endParaRPr lang="en-US" sz="1200" kern="1200" dirty="0" smtClean="0">
+              <a:solidFill>
+                <a:schemeClr val="tx1"/>
+              </a:solidFill>
+              <a:effectLst/>
+              <a:latin typeface="+mn-lt"/>
+              <a:ea typeface="+mn-ea"/>
+              <a:cs typeface="+mn-cs"/>
+            </a:endParaRPr>
+          </a:p>
+          <a:p>
+            <a:r>
+              <a:rPr lang="en-US" sz="1200" kern="1200" dirty="0" smtClean="0">
+                <a:solidFill>
+                  <a:schemeClr val="tx1"/>
+                </a:solidFill>
+                <a:effectLst/>
+                <a:latin typeface="+mn-lt"/>
+                <a:ea typeface="+mn-ea"/>
+                <a:cs typeface="+mn-cs"/>
+              </a:rPr>
+              <a:t>Second, while the session with the bank is active, they visit a malicious website. This could be in a different tab but it doesn’t have to be.</a:t>
+            </a:r>
+          </a:p>
+          <a:p>
+            <a:endParaRPr lang="en-US" sz="1200" kern="1200" dirty="0" smtClean="0">
+              <a:solidFill>
+                <a:schemeClr val="tx1"/>
+              </a:solidFill>
+              <a:effectLst/>
+              <a:latin typeface="+mn-lt"/>
+              <a:ea typeface="+mn-ea"/>
+              <a:cs typeface="+mn-cs"/>
+            </a:endParaRPr>
+          </a:p>
+          <a:p>
+            <a:r>
+              <a:rPr lang="en-US" sz="1200" kern="1200" dirty="0" smtClean="0">
+                <a:solidFill>
+                  <a:schemeClr val="tx1"/>
+                </a:solidFill>
+                <a:effectLst/>
+                <a:latin typeface="+mn-lt"/>
+                <a:ea typeface="+mn-ea"/>
+                <a:cs typeface="+mn-cs"/>
+              </a:rPr>
+              <a:t>Third, the bad guy website tricks the user into submitting a form post TO the bank’s website, for example to the “transfer money” endpoint. If the bank website hasn’t been properly secured, all it’s going to see is a request coming in, from a logged in user with a valid session, requesting a fund transfer into the bad guy’s account. </a:t>
+            </a:r>
+          </a:p>
+          <a:p>
+            <a:endParaRPr lang="en-US" sz="1200" kern="1200" dirty="0" smtClean="0">
+              <a:solidFill>
+                <a:schemeClr val="tx1"/>
+              </a:solidFill>
+              <a:effectLst/>
+              <a:latin typeface="+mn-lt"/>
+              <a:ea typeface="+mn-ea"/>
+              <a:cs typeface="+mn-cs"/>
+            </a:endParaRPr>
+          </a:p>
+          <a:p>
+            <a:r>
+              <a:rPr lang="en-US" sz="1200" kern="1200" dirty="0" smtClean="0">
+                <a:solidFill>
+                  <a:schemeClr val="tx1"/>
+                </a:solidFill>
+                <a:effectLst/>
+                <a:latin typeface="+mn-lt"/>
+                <a:ea typeface="+mn-ea"/>
+                <a:cs typeface="+mn-cs"/>
+              </a:rPr>
+              <a:t>In order to protect itself from this sort of thing, the bank needs a way to differentiate between a form post that initiated from its own domain versus a post that initiated from the bad guy’s website. The HTTP Referrer can help with this, but it’s insufficient on its own because that value is </a:t>
+            </a:r>
+            <a:r>
+              <a:rPr lang="en-US" sz="1200" kern="1200" dirty="0" err="1" smtClean="0">
+                <a:solidFill>
+                  <a:schemeClr val="tx1"/>
+                </a:solidFill>
+                <a:effectLst/>
+                <a:latin typeface="+mn-lt"/>
+                <a:ea typeface="+mn-ea"/>
+                <a:cs typeface="+mn-cs"/>
+              </a:rPr>
+              <a:t>spoofable</a:t>
+            </a:r>
+            <a:r>
+              <a:rPr lang="en-US" sz="1200" kern="1200" dirty="0" smtClean="0">
+                <a:solidFill>
+                  <a:schemeClr val="tx1"/>
+                </a:solidFill>
+                <a:effectLst/>
+                <a:latin typeface="+mn-lt"/>
+                <a:ea typeface="+mn-ea"/>
+                <a:cs typeface="+mn-cs"/>
+              </a:rPr>
+              <a:t>.</a:t>
+            </a:r>
+          </a:p>
+          <a:p>
             <a:endParaRPr lang="en-US" b="0" dirty="0" smtClean="0"/>
           </a:p>
         </p:txBody>
@@ -2117,6 +3875,193 @@
           <a:bodyPr/>
           <a:lstStyle/>
           <a:p>
+            <a:r>
+              <a:rPr lang="en-US" sz="1200" kern="1200" dirty="0" smtClean="0">
+                <a:solidFill>
+                  <a:schemeClr val="tx1"/>
+                </a:solidFill>
+                <a:effectLst/>
+                <a:latin typeface="+mn-lt"/>
+                <a:ea typeface="+mn-ea"/>
+                <a:cs typeface="+mn-cs"/>
+              </a:rPr>
+              <a:t>ASP.NET gives us tools to protect against CSRF. You have to do 2 things: call helper inside body of form, &amp; add </a:t>
+            </a:r>
+            <a:r>
+              <a:rPr lang="en-US" sz="1200" kern="1200" dirty="0" err="1" smtClean="0">
+                <a:solidFill>
+                  <a:schemeClr val="tx1"/>
+                </a:solidFill>
+                <a:effectLst/>
+                <a:latin typeface="+mn-lt"/>
+                <a:ea typeface="+mn-ea"/>
+                <a:cs typeface="+mn-cs"/>
+              </a:rPr>
+              <a:t>ValidateAntiForgeryToken</a:t>
+            </a:r>
+            <a:r>
+              <a:rPr lang="en-US" sz="1200" kern="1200" dirty="0" smtClean="0">
+                <a:solidFill>
+                  <a:schemeClr val="tx1"/>
+                </a:solidFill>
+                <a:effectLst/>
+                <a:latin typeface="+mn-lt"/>
+                <a:ea typeface="+mn-ea"/>
+                <a:cs typeface="+mn-cs"/>
+              </a:rPr>
+              <a:t> attribute to the action.</a:t>
+            </a:r>
+          </a:p>
+          <a:p>
+            <a:endParaRPr lang="en-US" sz="1200" kern="1200" dirty="0" smtClean="0">
+              <a:solidFill>
+                <a:schemeClr val="tx1"/>
+              </a:solidFill>
+              <a:effectLst/>
+              <a:latin typeface="+mn-lt"/>
+              <a:ea typeface="+mn-ea"/>
+              <a:cs typeface="+mn-cs"/>
+            </a:endParaRPr>
+          </a:p>
+          <a:p>
+            <a:r>
+              <a:rPr lang="en-US" sz="1200" kern="1200" dirty="0" smtClean="0">
+                <a:solidFill>
+                  <a:schemeClr val="tx1"/>
+                </a:solidFill>
+                <a:effectLst/>
+                <a:latin typeface="+mn-lt"/>
+                <a:ea typeface="+mn-ea"/>
+                <a:cs typeface="+mn-cs"/>
+              </a:rPr>
+              <a:t>The helper does three things. (1) creates a cryptographic token, (2) emits hidden form field, (3) creates cookie.</a:t>
+            </a:r>
+          </a:p>
+          <a:p>
+            <a:endParaRPr lang="en-US" sz="1200" kern="1200" dirty="0" smtClean="0">
+              <a:solidFill>
+                <a:schemeClr val="tx1"/>
+              </a:solidFill>
+              <a:effectLst/>
+              <a:latin typeface="+mn-lt"/>
+              <a:ea typeface="+mn-ea"/>
+              <a:cs typeface="+mn-cs"/>
+            </a:endParaRPr>
+          </a:p>
+          <a:p>
+            <a:r>
+              <a:rPr lang="en-US" sz="1200" kern="1200" dirty="0" smtClean="0">
+                <a:solidFill>
+                  <a:schemeClr val="tx1"/>
+                </a:solidFill>
+                <a:effectLst/>
+                <a:latin typeface="+mn-lt"/>
+                <a:ea typeface="+mn-ea"/>
+                <a:cs typeface="+mn-cs"/>
+              </a:rPr>
+              <a:t>When form is submitted, the attribute compares the value in the form body against the cookie value and rejects the post if they don't match. </a:t>
+            </a:r>
+          </a:p>
+          <a:p>
+            <a:endParaRPr lang="en-US" sz="1200" kern="1200" dirty="0" smtClean="0">
+              <a:solidFill>
+                <a:schemeClr val="tx1"/>
+              </a:solidFill>
+              <a:effectLst/>
+              <a:latin typeface="+mn-lt"/>
+              <a:ea typeface="+mn-ea"/>
+              <a:cs typeface="+mn-cs"/>
+            </a:endParaRPr>
+          </a:p>
+          <a:p>
+            <a:r>
+              <a:rPr lang="en-US" sz="1200" kern="1200" dirty="0" smtClean="0">
+                <a:solidFill>
+                  <a:schemeClr val="tx1"/>
+                </a:solidFill>
+                <a:effectLst/>
+                <a:latin typeface="+mn-lt"/>
+                <a:ea typeface="+mn-ea"/>
+                <a:cs typeface="+mn-cs"/>
+              </a:rPr>
+              <a:t>Browser’s security model prevents the</a:t>
+            </a:r>
+            <a:r>
+              <a:rPr lang="en-US" sz="1200" kern="1200" baseline="0" dirty="0" smtClean="0">
+                <a:solidFill>
+                  <a:schemeClr val="tx1"/>
+                </a:solidFill>
+                <a:effectLst/>
+                <a:latin typeface="+mn-lt"/>
+                <a:ea typeface="+mn-ea"/>
+                <a:cs typeface="+mn-cs"/>
+              </a:rPr>
+              <a:t> bad guy </a:t>
+            </a:r>
+            <a:r>
+              <a:rPr lang="en-US" sz="1200" kern="1200" dirty="0" smtClean="0">
+                <a:solidFill>
+                  <a:schemeClr val="tx1"/>
+                </a:solidFill>
+                <a:effectLst/>
+                <a:latin typeface="+mn-lt"/>
+                <a:ea typeface="+mn-ea"/>
+                <a:cs typeface="+mn-cs"/>
+              </a:rPr>
+              <a:t>website from reading or writing the cookies for the friendly site, so only way the tokens will match is if the form being submitted is coming from the friendly site itself.</a:t>
+            </a:r>
+          </a:p>
+          <a:p>
+            <a:endParaRPr lang="en-US" sz="1200" kern="1200" dirty="0" smtClean="0">
+              <a:solidFill>
+                <a:schemeClr val="tx1"/>
+              </a:solidFill>
+              <a:effectLst/>
+              <a:latin typeface="+mn-lt"/>
+              <a:ea typeface="+mn-ea"/>
+              <a:cs typeface="+mn-cs"/>
+            </a:endParaRPr>
+          </a:p>
+          <a:p>
+            <a:r>
+              <a:rPr lang="en-US" sz="1200" kern="1200" dirty="0" smtClean="0">
+                <a:solidFill>
+                  <a:schemeClr val="tx1"/>
+                </a:solidFill>
+                <a:effectLst/>
+                <a:latin typeface="+mn-lt"/>
+                <a:ea typeface="+mn-ea"/>
+                <a:cs typeface="+mn-cs"/>
+              </a:rPr>
+              <a:t>Easy to do, but not secure by default. Requires dev to make corresponding changes in two files. And if dev remembers helper, but forgets the attribute, form post will be accepted. Dev might think they’re secure, but actually vulnerable.</a:t>
+            </a:r>
+          </a:p>
+          <a:p>
+            <a:endParaRPr lang="en-US" sz="1200" kern="1200" dirty="0" smtClean="0">
+              <a:solidFill>
+                <a:schemeClr val="tx1"/>
+              </a:solidFill>
+              <a:effectLst/>
+              <a:latin typeface="+mn-lt"/>
+              <a:ea typeface="+mn-ea"/>
+              <a:cs typeface="+mn-cs"/>
+            </a:endParaRPr>
+          </a:p>
+          <a:p>
+            <a:r>
+              <a:rPr lang="en-US" sz="1200" kern="1200" dirty="0" smtClean="0">
+                <a:solidFill>
+                  <a:schemeClr val="tx1"/>
+                </a:solidFill>
+                <a:effectLst/>
+                <a:latin typeface="+mn-lt"/>
+                <a:ea typeface="+mn-ea"/>
+                <a:cs typeface="+mn-cs"/>
+              </a:rPr>
+              <a:t>Also, this only works if you’re submitting a form. This helper doesn’t really help if you’re doing an AJAX post because there’s no form to write the hidden field into.</a:t>
+            </a:r>
+          </a:p>
+          <a:p>
             <a:endParaRPr lang="en-US" b="0" dirty="0" smtClean="0"/>
           </a:p>
         </p:txBody>
@@ -2201,6 +4146,45 @@
           <a:bodyPr/>
           <a:lstStyle/>
           <a:p>
+            <a:r>
+              <a:rPr lang="en-US" sz="1200" kern="1200" dirty="0" smtClean="0">
+                <a:solidFill>
+                  <a:schemeClr val="tx1"/>
+                </a:solidFill>
+                <a:effectLst/>
+                <a:latin typeface="+mn-lt"/>
+                <a:ea typeface="+mn-ea"/>
+                <a:cs typeface="+mn-cs"/>
+              </a:rPr>
+              <a:t>If you’re making an AJAX form post, you have to do something like create a div, call the helper to create the hidden form field, and then manually copy that hidden form field value into your AJAX payload.</a:t>
+            </a:r>
+          </a:p>
+          <a:p>
+            <a:endParaRPr lang="en-US" sz="1200" kern="1200" dirty="0" smtClean="0">
+              <a:solidFill>
+                <a:schemeClr val="tx1"/>
+              </a:solidFill>
+              <a:effectLst/>
+              <a:latin typeface="+mn-lt"/>
+              <a:ea typeface="+mn-ea"/>
+              <a:cs typeface="+mn-cs"/>
+            </a:endParaRPr>
+          </a:p>
+          <a:p>
+            <a:r>
+              <a:rPr lang="en-US" sz="1200" kern="1200" dirty="0" smtClean="0">
+                <a:solidFill>
+                  <a:schemeClr val="tx1"/>
+                </a:solidFill>
+                <a:effectLst/>
+                <a:latin typeface="+mn-lt"/>
+                <a:ea typeface="+mn-ea"/>
+                <a:cs typeface="+mn-cs"/>
+              </a:rPr>
+              <a:t>This really sucks. It’s ugly, it’s error prone, and it’s not a pattern that I want to be repeating every single time I need to make an AJAX post. </a:t>
+            </a:r>
+          </a:p>
+          <a:p>
             <a:endParaRPr lang="en-US" b="0" dirty="0" smtClean="0"/>
           </a:p>
         </p:txBody>
@@ -2285,6 +4269,45 @@
           <a:bodyPr/>
           <a:lstStyle/>
           <a:p>
+            <a:r>
+              <a:rPr lang="en-US" sz="1200" kern="1200" dirty="0" smtClean="0">
+                <a:solidFill>
+                  <a:schemeClr val="tx1"/>
+                </a:solidFill>
+                <a:effectLst/>
+                <a:latin typeface="+mn-lt"/>
+                <a:ea typeface="+mn-ea"/>
+                <a:cs typeface="+mn-cs"/>
+              </a:rPr>
+              <a:t>To handle this in a cross-cutting way we need to do a few things. </a:t>
+            </a:r>
+          </a:p>
+          <a:p>
+            <a:endParaRPr lang="en-US" sz="1200" kern="1200" dirty="0" smtClean="0">
+              <a:solidFill>
+                <a:schemeClr val="tx1"/>
+              </a:solidFill>
+              <a:effectLst/>
+              <a:latin typeface="+mn-lt"/>
+              <a:ea typeface="+mn-ea"/>
+              <a:cs typeface="+mn-cs"/>
+            </a:endParaRPr>
+          </a:p>
+          <a:p>
+            <a:r>
+              <a:rPr lang="en-US" sz="1200" kern="1200" dirty="0" smtClean="0">
+                <a:solidFill>
+                  <a:schemeClr val="tx1"/>
+                </a:solidFill>
+                <a:effectLst/>
+                <a:latin typeface="+mn-lt"/>
+                <a:ea typeface="+mn-ea"/>
+                <a:cs typeface="+mn-cs"/>
+              </a:rPr>
+              <a:t>First, we need to create one, global anti-CSRF token. I do this in my global layout file so that it applies to every page on my site. Remember that this creates a hidden text field AND creates a cookie.</a:t>
+            </a:r>
+          </a:p>
+          <a:p>
             <a:endParaRPr lang="en-US" b="0" dirty="0" smtClean="0"/>
           </a:p>
         </p:txBody>
@@ -2369,6 +4392,71 @@
           <a:bodyPr/>
           <a:lstStyle/>
           <a:p>
+            <a:pPr marL="0" marR="0" lvl="0" indent="0" algn="l" defTabSz="914400" rtl="0" eaLnBrk="1" fontAlgn="auto" latinLnBrk="0" hangingPunct="1">
+              <a:lnSpc>
+                <a:spcPct val="100000"/>
+              </a:lnSpc>
+              <a:spcBef>
+                <a:spcPts val="0"/>
+              </a:spcBef>
+              <a:spcAft>
+                <a:spcPts val="0"/>
+              </a:spcAft>
+              <a:buClrTx/>
+              <a:buSzTx/>
+              <a:buFontTx/>
+              <a:buNone/>
+              <a:tabLst/>
+              <a:defRPr/>
+            </a:pPr>
+            <a:r>
+              <a:rPr lang="en-US" sz="1200" kern="1200" dirty="0" smtClean="0">
+                <a:solidFill>
+                  <a:schemeClr val="tx1"/>
+                </a:solidFill>
+                <a:effectLst/>
+                <a:latin typeface="+mn-lt"/>
+                <a:ea typeface="+mn-ea"/>
+                <a:cs typeface="+mn-cs"/>
+              </a:rPr>
+              <a:t>Second, on document ready I run a tiny bit of jQuery that loops through every form on the page, looks to see if it already has a token field, and if not, clones the global one and adds it to the form.</a:t>
+            </a:r>
+          </a:p>
+          <a:p>
+            <a:endParaRPr lang="en-US" b="0" dirty="0" smtClean="0"/>
+          </a:p>
+          <a:p>
+            <a:pPr marL="0" marR="0" lvl="0" indent="0" algn="l" defTabSz="914400" rtl="0" eaLnBrk="1" fontAlgn="auto" latinLnBrk="0" hangingPunct="1">
+              <a:lnSpc>
+                <a:spcPct val="100000"/>
+              </a:lnSpc>
+              <a:spcBef>
+                <a:spcPts val="0"/>
+              </a:spcBef>
+              <a:spcAft>
+                <a:spcPts val="0"/>
+              </a:spcAft>
+              <a:buClrTx/>
+              <a:buSzTx/>
+              <a:buFontTx/>
+              <a:buNone/>
+              <a:tabLst/>
+              <a:defRPr/>
+            </a:pPr>
+            <a:r>
+              <a:rPr lang="en-US" sz="1200" kern="1200" dirty="0" smtClean="0">
+                <a:solidFill>
+                  <a:schemeClr val="tx1"/>
+                </a:solidFill>
+                <a:effectLst/>
+                <a:latin typeface="+mn-lt"/>
+                <a:ea typeface="+mn-ea"/>
+                <a:cs typeface="+mn-cs"/>
+              </a:rPr>
+              <a:t>This ensures that every single form that I use on my site will end up with a hidden field containing that security token.</a:t>
+            </a:r>
+          </a:p>
+          <a:p>
             <a:endParaRPr lang="en-US" b="0" dirty="0" smtClean="0"/>
           </a:p>
         </p:txBody>
@@ -2453,6 +4541,153 @@
           <a:bodyPr/>
           <a:lstStyle/>
           <a:p>
+            <a:r>
+              <a:rPr lang="en-US" sz="1200" kern="1200" dirty="0" smtClean="0">
+                <a:solidFill>
+                  <a:schemeClr val="tx1"/>
+                </a:solidFill>
+                <a:effectLst/>
+                <a:latin typeface="+mn-lt"/>
+                <a:ea typeface="+mn-ea"/>
+                <a:cs typeface="+mn-cs"/>
+              </a:rPr>
+              <a:t>To handle AJAX posts, I run a second bit of JQuery that defines a global </a:t>
+            </a:r>
+            <a:r>
+              <a:rPr lang="en-US" sz="1200" kern="1200" dirty="0" err="1" smtClean="0">
+                <a:solidFill>
+                  <a:schemeClr val="tx1"/>
+                </a:solidFill>
+                <a:effectLst/>
+                <a:latin typeface="+mn-lt"/>
+                <a:ea typeface="+mn-ea"/>
+                <a:cs typeface="+mn-cs"/>
+              </a:rPr>
+              <a:t>jquery</a:t>
+            </a:r>
+            <a:r>
+              <a:rPr lang="en-US" sz="1200" kern="1200" dirty="0" smtClean="0">
+                <a:solidFill>
+                  <a:schemeClr val="tx1"/>
+                </a:solidFill>
+                <a:effectLst/>
+                <a:latin typeface="+mn-lt"/>
+                <a:ea typeface="+mn-ea"/>
+                <a:cs typeface="+mn-cs"/>
+              </a:rPr>
+              <a:t> “ajax </a:t>
+            </a:r>
+            <a:r>
+              <a:rPr lang="en-US" sz="1200" kern="1200" dirty="0" err="1" smtClean="0">
+                <a:solidFill>
+                  <a:schemeClr val="tx1"/>
+                </a:solidFill>
+                <a:effectLst/>
+                <a:latin typeface="+mn-lt"/>
+                <a:ea typeface="+mn-ea"/>
+                <a:cs typeface="+mn-cs"/>
+              </a:rPr>
+              <a:t>prefilter</a:t>
+            </a:r>
+            <a:r>
+              <a:rPr lang="en-US" sz="1200" kern="1200" dirty="0" smtClean="0">
+                <a:solidFill>
+                  <a:schemeClr val="tx1"/>
+                </a:solidFill>
+                <a:effectLst/>
+                <a:latin typeface="+mn-lt"/>
+                <a:ea typeface="+mn-ea"/>
+                <a:cs typeface="+mn-cs"/>
+              </a:rPr>
+              <a:t>” handler. </a:t>
+            </a:r>
+          </a:p>
+          <a:p>
+            <a:endParaRPr lang="en-US" sz="1200" kern="1200" smtClean="0">
+              <a:solidFill>
+                <a:schemeClr val="tx1"/>
+              </a:solidFill>
+              <a:effectLst/>
+              <a:latin typeface="+mn-lt"/>
+              <a:ea typeface="+mn-ea"/>
+              <a:cs typeface="+mn-cs"/>
+            </a:endParaRPr>
+          </a:p>
+          <a:p>
+            <a:r>
+              <a:rPr lang="en-US" sz="1200" kern="1200" smtClean="0">
+                <a:solidFill>
+                  <a:schemeClr val="tx1"/>
+                </a:solidFill>
+                <a:effectLst/>
+                <a:latin typeface="+mn-lt"/>
+                <a:ea typeface="+mn-ea"/>
+                <a:cs typeface="+mn-cs"/>
+              </a:rPr>
+              <a:t>Hooking </a:t>
+            </a:r>
+            <a:r>
+              <a:rPr lang="en-US" sz="1200" kern="1200" dirty="0" smtClean="0">
+                <a:solidFill>
+                  <a:schemeClr val="tx1"/>
+                </a:solidFill>
+                <a:effectLst/>
+                <a:latin typeface="+mn-lt"/>
+                <a:ea typeface="+mn-ea"/>
+                <a:cs typeface="+mn-cs"/>
+              </a:rPr>
+              <a:t>into the </a:t>
+            </a:r>
+            <a:r>
+              <a:rPr lang="en-US" sz="1200" kern="1200" dirty="0" err="1" smtClean="0">
+                <a:solidFill>
+                  <a:schemeClr val="tx1"/>
+                </a:solidFill>
+                <a:effectLst/>
+                <a:latin typeface="+mn-lt"/>
+                <a:ea typeface="+mn-ea"/>
+                <a:cs typeface="+mn-cs"/>
+              </a:rPr>
+              <a:t>prefilter</a:t>
+            </a:r>
+            <a:r>
+              <a:rPr lang="en-US" sz="1200" kern="1200" dirty="0" smtClean="0">
+                <a:solidFill>
+                  <a:schemeClr val="tx1"/>
+                </a:solidFill>
+                <a:effectLst/>
+                <a:latin typeface="+mn-lt"/>
+                <a:ea typeface="+mn-ea"/>
+                <a:cs typeface="+mn-cs"/>
+              </a:rPr>
+              <a:t> event lets you can modify the AJAX options </a:t>
+            </a:r>
+            <a:r>
+              <a:rPr lang="en-US" sz="1200" i="1" kern="1200" dirty="0" smtClean="0">
+                <a:solidFill>
+                  <a:schemeClr val="tx1"/>
+                </a:solidFill>
+                <a:effectLst/>
+                <a:latin typeface="+mn-lt"/>
+                <a:ea typeface="+mn-ea"/>
+                <a:cs typeface="+mn-cs"/>
+              </a:rPr>
+              <a:t>before </a:t>
+            </a:r>
+            <a:r>
+              <a:rPr lang="en-US" sz="1200" kern="1200" dirty="0" smtClean="0">
+                <a:solidFill>
+                  <a:schemeClr val="tx1"/>
+                </a:solidFill>
+                <a:effectLst/>
+                <a:latin typeface="+mn-lt"/>
+                <a:ea typeface="+mn-ea"/>
+                <a:cs typeface="+mn-cs"/>
+              </a:rPr>
+              <a:t>the request is sent. In this case, I add that CSRF token to every single AJAX POST.</a:t>
+            </a:r>
+          </a:p>
+          <a:p>
             <a:endParaRPr lang="en-US" b="0" dirty="0" smtClean="0"/>
           </a:p>
         </p:txBody>
@@ -2537,6 +4772,146 @@
           <a:bodyPr/>
           <a:lstStyle/>
           <a:p>
+            <a:r>
+              <a:rPr lang="en-US" sz="1200" kern="1200" dirty="0" smtClean="0">
+                <a:solidFill>
+                  <a:schemeClr val="tx1"/>
+                </a:solidFill>
+                <a:effectLst/>
+                <a:latin typeface="+mn-lt"/>
+                <a:ea typeface="+mn-ea"/>
+                <a:cs typeface="+mn-cs"/>
+              </a:rPr>
+              <a:t>I hate writing secure </a:t>
+            </a:r>
+            <a:r>
+              <a:rPr lang="en-US" sz="1200" i="1" kern="1200" dirty="0" smtClean="0">
+                <a:solidFill>
+                  <a:schemeClr val="tx1"/>
+                </a:solidFill>
+                <a:effectLst/>
+                <a:latin typeface="+mn-lt"/>
+                <a:ea typeface="+mn-ea"/>
+                <a:cs typeface="+mn-cs"/>
+              </a:rPr>
+              <a:t>feature </a:t>
+            </a:r>
+            <a:r>
+              <a:rPr lang="en-US" sz="1200" kern="1200" dirty="0" smtClean="0">
+                <a:solidFill>
+                  <a:schemeClr val="tx1"/>
+                </a:solidFill>
+                <a:effectLst/>
+                <a:latin typeface="+mn-lt"/>
+                <a:ea typeface="+mn-ea"/>
+                <a:cs typeface="+mn-cs"/>
+              </a:rPr>
+              <a:t>code. </a:t>
+            </a:r>
+          </a:p>
+          <a:p>
+            <a:endParaRPr lang="en-US" sz="1200" kern="1200" dirty="0" smtClean="0">
+              <a:solidFill>
+                <a:schemeClr val="tx1"/>
+              </a:solidFill>
+              <a:effectLst/>
+              <a:latin typeface="+mn-lt"/>
+              <a:ea typeface="+mn-ea"/>
+              <a:cs typeface="+mn-cs"/>
+            </a:endParaRPr>
+          </a:p>
+          <a:p>
+            <a:r>
+              <a:rPr lang="en-US" sz="1200" kern="1200" dirty="0" smtClean="0">
+                <a:solidFill>
+                  <a:schemeClr val="tx1"/>
+                </a:solidFill>
+                <a:effectLst/>
+                <a:latin typeface="+mn-lt"/>
+                <a:ea typeface="+mn-ea"/>
+                <a:cs typeface="+mn-cs"/>
+              </a:rPr>
+              <a:t>Actually don’t mind thinking about security, enjoy making system secure, just want to separate security code from features. </a:t>
+            </a:r>
+          </a:p>
+          <a:p>
+            <a:endParaRPr lang="en-US" sz="1200" kern="1200" dirty="0" smtClean="0">
+              <a:solidFill>
+                <a:schemeClr val="tx1"/>
+              </a:solidFill>
+              <a:effectLst/>
+              <a:latin typeface="+mn-lt"/>
+              <a:ea typeface="+mn-ea"/>
+              <a:cs typeface="+mn-cs"/>
+            </a:endParaRPr>
+          </a:p>
+          <a:p>
+            <a:r>
+              <a:rPr lang="en-US" sz="1200" kern="1200" dirty="0" smtClean="0">
+                <a:solidFill>
+                  <a:schemeClr val="tx1"/>
+                </a:solidFill>
+                <a:effectLst/>
+                <a:latin typeface="+mn-lt"/>
+                <a:ea typeface="+mn-ea"/>
+                <a:cs typeface="+mn-cs"/>
+              </a:rPr>
+              <a:t>Want features to be clean / simple / elegant, not sullied up with a bunch of duplicate security checks copied and pasted between features.</a:t>
+            </a:r>
+          </a:p>
+          <a:p>
+            <a:r>
+              <a:rPr lang="en-US" sz="1200" kern="1200" dirty="0" smtClean="0">
+                <a:solidFill>
+                  <a:schemeClr val="tx1"/>
+                </a:solidFill>
+                <a:effectLst/>
+                <a:latin typeface="+mn-lt"/>
+                <a:ea typeface="+mn-ea"/>
+                <a:cs typeface="+mn-cs"/>
+              </a:rPr>
+              <a:t> </a:t>
+            </a:r>
+          </a:p>
+          <a:p>
+            <a:r>
+              <a:rPr lang="en-US" sz="1200" kern="1200" dirty="0" smtClean="0">
+                <a:solidFill>
+                  <a:schemeClr val="tx1"/>
+                </a:solidFill>
+                <a:effectLst/>
+                <a:latin typeface="+mn-lt"/>
+                <a:ea typeface="+mn-ea"/>
+                <a:cs typeface="+mn-cs"/>
+              </a:rPr>
+              <a:t>So I guess what I’m </a:t>
+            </a:r>
+            <a:r>
+              <a:rPr lang="en-US" sz="1200" i="1" kern="1200" dirty="0" smtClean="0">
+                <a:solidFill>
+                  <a:schemeClr val="tx1"/>
+                </a:solidFill>
+                <a:effectLst/>
+                <a:latin typeface="+mn-lt"/>
+                <a:ea typeface="+mn-ea"/>
+                <a:cs typeface="+mn-cs"/>
+              </a:rPr>
+              <a:t>really </a:t>
+            </a:r>
+            <a:r>
+              <a:rPr lang="en-US" sz="1200" kern="1200" dirty="0" smtClean="0">
+                <a:solidFill>
+                  <a:schemeClr val="tx1"/>
+                </a:solidFill>
+                <a:effectLst/>
+                <a:latin typeface="+mn-lt"/>
+                <a:ea typeface="+mn-ea"/>
+                <a:cs typeface="+mn-cs"/>
+              </a:rPr>
+              <a:t>trying to say is that </a:t>
+            </a:r>
+          </a:p>
+          <a:p>
             <a:pPr marL="0" marR="0" indent="0" algn="l" defTabSz="914400" rtl="0" eaLnBrk="1" fontAlgn="auto" latinLnBrk="0" hangingPunct="1">
               <a:lnSpc>
                 <a:spcPct val="100000"/>
@@ -3536,6 +5911,191 @@
           <a:bodyPr/>
           <a:lstStyle/>
           <a:p>
+            <a:r>
+              <a:rPr lang="en-US" sz="1200" kern="1200" dirty="0" smtClean="0">
+                <a:solidFill>
+                  <a:schemeClr val="tx1"/>
+                </a:solidFill>
+                <a:effectLst/>
+                <a:latin typeface="+mn-lt"/>
+                <a:ea typeface="+mn-ea"/>
+                <a:cs typeface="+mn-cs"/>
+              </a:rPr>
+              <a:t>Hate implementing </a:t>
+            </a:r>
+            <a:r>
+              <a:rPr lang="en-US" sz="1200" i="1" kern="1200" dirty="0" smtClean="0">
+                <a:solidFill>
+                  <a:schemeClr val="tx1"/>
+                </a:solidFill>
+                <a:effectLst/>
+                <a:latin typeface="+mn-lt"/>
+                <a:ea typeface="+mn-ea"/>
+                <a:cs typeface="+mn-cs"/>
+              </a:rPr>
+              <a:t>cross-cutting security concerns </a:t>
+            </a:r>
+            <a:r>
+              <a:rPr lang="en-US" sz="1200" kern="1200" dirty="0" smtClean="0">
+                <a:solidFill>
+                  <a:schemeClr val="tx1"/>
+                </a:solidFill>
+                <a:effectLst/>
+                <a:latin typeface="+mn-lt"/>
+                <a:ea typeface="+mn-ea"/>
+                <a:cs typeface="+mn-cs"/>
+              </a:rPr>
+              <a:t>by repeating the same patterns over and over again in my </a:t>
+            </a:r>
+            <a:r>
+              <a:rPr lang="en-US" sz="1200" i="1" kern="1200" dirty="0" smtClean="0">
+                <a:solidFill>
+                  <a:schemeClr val="tx1"/>
+                </a:solidFill>
+                <a:effectLst/>
+                <a:latin typeface="+mn-lt"/>
+                <a:ea typeface="+mn-ea"/>
+                <a:cs typeface="+mn-cs"/>
+              </a:rPr>
+              <a:t>feature-level code</a:t>
+            </a:r>
+            <a:r>
+              <a:rPr lang="en-US" sz="1200" kern="1200" dirty="0" smtClean="0">
+                <a:solidFill>
+                  <a:schemeClr val="tx1"/>
+                </a:solidFill>
+                <a:effectLst/>
+                <a:latin typeface="+mn-lt"/>
+                <a:ea typeface="+mn-ea"/>
+                <a:cs typeface="+mn-cs"/>
+              </a:rPr>
+              <a:t>. </a:t>
+            </a:r>
+          </a:p>
+          <a:p>
+            <a:endParaRPr lang="en-US" sz="1200" kern="1200" dirty="0" smtClean="0">
+              <a:solidFill>
+                <a:schemeClr val="tx1"/>
+              </a:solidFill>
+              <a:effectLst/>
+              <a:latin typeface="+mn-lt"/>
+              <a:ea typeface="+mn-ea"/>
+              <a:cs typeface="+mn-cs"/>
+            </a:endParaRPr>
+          </a:p>
+          <a:p>
+            <a:r>
+              <a:rPr lang="en-US" sz="1200" kern="1200" dirty="0" smtClean="0">
+                <a:solidFill>
+                  <a:schemeClr val="tx1"/>
+                </a:solidFill>
+                <a:effectLst/>
+                <a:latin typeface="+mn-lt"/>
+                <a:ea typeface="+mn-ea"/>
+                <a:cs typeface="+mn-cs"/>
+              </a:rPr>
+              <a:t>That’s mouthful, but it’s exactly what this talk is all about. Because I hate doing this, I’ve invested time and energy looking for ways to avoid it. </a:t>
+            </a:r>
+          </a:p>
+          <a:p>
+            <a:endParaRPr lang="en-US" sz="1200" kern="1200" dirty="0" smtClean="0">
+              <a:solidFill>
+                <a:schemeClr val="tx1"/>
+              </a:solidFill>
+              <a:effectLst/>
+              <a:latin typeface="+mn-lt"/>
+              <a:ea typeface="+mn-ea"/>
+              <a:cs typeface="+mn-cs"/>
+            </a:endParaRPr>
+          </a:p>
+          <a:p>
+            <a:r>
+              <a:rPr lang="en-US" sz="1200" kern="1200" dirty="0" smtClean="0">
+                <a:solidFill>
+                  <a:schemeClr val="tx1"/>
+                </a:solidFill>
+                <a:effectLst/>
+                <a:latin typeface="+mn-lt"/>
+                <a:ea typeface="+mn-ea"/>
+                <a:cs typeface="+mn-cs"/>
+              </a:rPr>
+              <a:t>Way I typically avoid it is by extracting security code into some part of my application framework so that it can be automatically applied across all features. This lets me keep brain in “feature mode”, keeps my feature code clean, and I still get to deliver secure system.</a:t>
+            </a:r>
+          </a:p>
+          <a:p>
+            <a:endParaRPr lang="en-US" sz="1200" kern="1200" dirty="0" smtClean="0">
+              <a:solidFill>
+                <a:schemeClr val="tx1"/>
+              </a:solidFill>
+              <a:effectLst/>
+              <a:latin typeface="+mn-lt"/>
+              <a:ea typeface="+mn-ea"/>
+              <a:cs typeface="+mn-cs"/>
+            </a:endParaRPr>
+          </a:p>
+          <a:p>
+            <a:r>
+              <a:rPr lang="en-US" sz="1200" kern="1200" dirty="0" smtClean="0">
+                <a:solidFill>
+                  <a:schemeClr val="tx1"/>
+                </a:solidFill>
+                <a:effectLst/>
+                <a:latin typeface="+mn-lt"/>
+                <a:ea typeface="+mn-ea"/>
+                <a:cs typeface="+mn-cs"/>
+              </a:rPr>
+              <a:t>Over next 55 minutes going to share techniques with you. I want you to recognize intermingling of security &amp; feature code in your systems, and give</a:t>
+            </a:r>
+            <a:r>
+              <a:rPr lang="en-US" sz="1200" kern="1200" baseline="0" dirty="0" smtClean="0">
+                <a:solidFill>
+                  <a:schemeClr val="tx1"/>
+                </a:solidFill>
+                <a:effectLst/>
+                <a:latin typeface="+mn-lt"/>
+                <a:ea typeface="+mn-ea"/>
+                <a:cs typeface="+mn-cs"/>
+              </a:rPr>
+              <a:t> </a:t>
+            </a:r>
+            <a:r>
+              <a:rPr lang="en-US" sz="1200" kern="1200" dirty="0" smtClean="0">
+                <a:solidFill>
+                  <a:schemeClr val="tx1"/>
+                </a:solidFill>
+                <a:effectLst/>
+                <a:latin typeface="+mn-lt"/>
+                <a:ea typeface="+mn-ea"/>
+                <a:cs typeface="+mn-cs"/>
+              </a:rPr>
+              <a:t>you tools for decoupling them so that you can maximize </a:t>
+            </a:r>
+            <a:r>
+              <a:rPr lang="en-US" sz="1200" i="1" kern="1200" dirty="0" smtClean="0">
+                <a:solidFill>
+                  <a:schemeClr val="tx1"/>
+                </a:solidFill>
+                <a:effectLst/>
+                <a:latin typeface="+mn-lt"/>
+                <a:ea typeface="+mn-ea"/>
+                <a:cs typeface="+mn-cs"/>
+              </a:rPr>
+              <a:t>both </a:t>
+            </a:r>
+            <a:r>
+              <a:rPr lang="en-US" sz="1200" kern="1200" dirty="0" smtClean="0">
+                <a:solidFill>
+                  <a:schemeClr val="tx1"/>
+                </a:solidFill>
+                <a:effectLst/>
+                <a:latin typeface="+mn-lt"/>
+                <a:ea typeface="+mn-ea"/>
+                <a:cs typeface="+mn-cs"/>
+              </a:rPr>
+              <a:t>security AND maintainability. </a:t>
+            </a:r>
+          </a:p>
+          <a:p>
             <a:pPr marL="0" marR="0" indent="0" algn="l" defTabSz="914400" rtl="0" eaLnBrk="1" fontAlgn="auto" latinLnBrk="0" hangingPunct="1">
               <a:lnSpc>
                 <a:spcPct val="100000"/>
@@ -4485,6 +7045,45 @@
           <a:bodyPr/>
           <a:lstStyle/>
           <a:p>
+            <a:r>
+              <a:rPr lang="en-US" sz="1200" kern="1200" dirty="0" smtClean="0">
+                <a:solidFill>
+                  <a:schemeClr val="tx1"/>
+                </a:solidFill>
+                <a:effectLst/>
+                <a:latin typeface="+mn-lt"/>
+                <a:ea typeface="+mn-ea"/>
+                <a:cs typeface="+mn-cs"/>
+              </a:rPr>
+              <a:t>Here’s our agenda: </a:t>
+            </a:r>
+          </a:p>
+          <a:p>
+            <a:endParaRPr lang="en-US" sz="1200" kern="1200" dirty="0" smtClean="0">
+              <a:solidFill>
+                <a:schemeClr val="tx1"/>
+              </a:solidFill>
+              <a:effectLst/>
+              <a:latin typeface="+mn-lt"/>
+              <a:ea typeface="+mn-ea"/>
+              <a:cs typeface="+mn-cs"/>
+            </a:endParaRPr>
+          </a:p>
+          <a:p>
+            <a:r>
+              <a:rPr lang="en-US" sz="1200" kern="1200" dirty="0" smtClean="0">
+                <a:solidFill>
+                  <a:schemeClr val="tx1"/>
+                </a:solidFill>
+                <a:effectLst/>
+                <a:latin typeface="+mn-lt"/>
+                <a:ea typeface="+mn-ea"/>
+                <a:cs typeface="+mn-cs"/>
+              </a:rPr>
+              <a:t>First I’ll define what it means for something to be a “cross cutting” security concern and what types of things are best suited to pushed into the framework.</a:t>
+            </a:r>
+          </a:p>
+          <a:p>
             <a:endParaRPr lang="en-US" b="0" dirty="0" smtClean="0"/>
           </a:p>
         </p:txBody>
@@ -5459,6 +8058,200 @@
           <a:bodyPr/>
           <a:lstStyle/>
           <a:p>
+            <a:pPr marL="0" marR="0" lvl="0" indent="0" algn="l" defTabSz="914400" rtl="0" eaLnBrk="1" fontAlgn="auto" latinLnBrk="0" hangingPunct="1">
+              <a:lnSpc>
+                <a:spcPct val="100000"/>
+              </a:lnSpc>
+              <a:spcBef>
+                <a:spcPts val="0"/>
+              </a:spcBef>
+              <a:spcAft>
+                <a:spcPts val="0"/>
+              </a:spcAft>
+              <a:buClrTx/>
+              <a:buSzTx/>
+              <a:buFontTx/>
+              <a:buNone/>
+              <a:tabLst/>
+              <a:defRPr/>
+            </a:pPr>
+            <a:r>
+              <a:rPr lang="en-US" sz="1200" kern="1200" dirty="0" smtClean="0">
+                <a:solidFill>
+                  <a:schemeClr val="tx1"/>
+                </a:solidFill>
+                <a:effectLst/>
+                <a:latin typeface="+mn-lt"/>
+                <a:ea typeface="+mn-ea"/>
+                <a:cs typeface="+mn-cs"/>
+              </a:rPr>
+              <a:t>Second, going to show you some examples of cross-cutting concerns that you can 100% completely solve in your framework code, without requiring </a:t>
+            </a:r>
+            <a:r>
+              <a:rPr lang="en-US" sz="1200" i="1" kern="1200" dirty="0" smtClean="0">
+                <a:solidFill>
+                  <a:schemeClr val="tx1"/>
+                </a:solidFill>
+                <a:effectLst/>
+                <a:latin typeface="+mn-lt"/>
+                <a:ea typeface="+mn-ea"/>
+                <a:cs typeface="+mn-cs"/>
+              </a:rPr>
+              <a:t>any </a:t>
+            </a:r>
+            <a:r>
+              <a:rPr lang="en-US" sz="1200" kern="1200" dirty="0" smtClean="0">
+                <a:solidFill>
+                  <a:schemeClr val="tx1"/>
+                </a:solidFill>
+                <a:effectLst/>
+                <a:latin typeface="+mn-lt"/>
+                <a:ea typeface="+mn-ea"/>
+                <a:cs typeface="+mn-cs"/>
+              </a:rPr>
+              <a:t>changes to your feature code. </a:t>
+            </a:r>
+          </a:p>
+          <a:p>
+            <a:pPr marL="0" marR="0" lvl="0" indent="0" algn="l" defTabSz="914400" rtl="0" eaLnBrk="1" fontAlgn="auto" latinLnBrk="0" hangingPunct="1">
+              <a:lnSpc>
+                <a:spcPct val="100000"/>
+              </a:lnSpc>
+              <a:spcBef>
+                <a:spcPts val="0"/>
+              </a:spcBef>
+              <a:spcAft>
+                <a:spcPts val="0"/>
+              </a:spcAft>
+              <a:buClrTx/>
+              <a:buSzTx/>
+              <a:buFontTx/>
+              <a:buNone/>
+              <a:tabLst/>
+              <a:defRPr/>
+            </a:pPr>
+            <a:endParaRPr lang="en-US" sz="1200" kern="1200" dirty="0" smtClean="0">
+              <a:solidFill>
+                <a:schemeClr val="tx1"/>
+              </a:solidFill>
+              <a:effectLst/>
+              <a:latin typeface="+mn-lt"/>
+              <a:ea typeface="+mn-ea"/>
+              <a:cs typeface="+mn-cs"/>
+            </a:endParaRPr>
+          </a:p>
+          <a:p>
+            <a:pPr marL="0" marR="0" lvl="0" indent="0" algn="l" defTabSz="914400" rtl="0" eaLnBrk="1" fontAlgn="auto" latinLnBrk="0" hangingPunct="1">
+              <a:lnSpc>
+                <a:spcPct val="100000"/>
+              </a:lnSpc>
+              <a:spcBef>
+                <a:spcPts val="0"/>
+              </a:spcBef>
+              <a:spcAft>
+                <a:spcPts val="0"/>
+              </a:spcAft>
+              <a:buClrTx/>
+              <a:buSzTx/>
+              <a:buFontTx/>
+              <a:buNone/>
+              <a:tabLst/>
+              <a:defRPr/>
+            </a:pPr>
+            <a:r>
+              <a:rPr lang="en-US" sz="1200" kern="1200" dirty="0" smtClean="0">
+                <a:solidFill>
+                  <a:schemeClr val="tx1"/>
+                </a:solidFill>
+                <a:effectLst/>
+                <a:latin typeface="+mn-lt"/>
+                <a:ea typeface="+mn-ea"/>
+                <a:cs typeface="+mn-cs"/>
+              </a:rPr>
+              <a:t>Call this being “secure by default” b/c once these things are in place, it takes literally zero effort for developers to ship secure features. </a:t>
+            </a:r>
+          </a:p>
+          <a:p>
+            <a:pPr marL="0" marR="0" lvl="0" indent="0" algn="l" defTabSz="914400" rtl="0" eaLnBrk="1" fontAlgn="auto" latinLnBrk="0" hangingPunct="1">
+              <a:lnSpc>
+                <a:spcPct val="100000"/>
+              </a:lnSpc>
+              <a:spcBef>
+                <a:spcPts val="0"/>
+              </a:spcBef>
+              <a:spcAft>
+                <a:spcPts val="0"/>
+              </a:spcAft>
+              <a:buClrTx/>
+              <a:buSzTx/>
+              <a:buFontTx/>
+              <a:buNone/>
+              <a:tabLst/>
+              <a:defRPr/>
+            </a:pPr>
+            <a:endParaRPr lang="en-US" sz="1200" kern="1200" dirty="0" smtClean="0">
+              <a:solidFill>
+                <a:schemeClr val="tx1"/>
+              </a:solidFill>
+              <a:effectLst/>
+              <a:latin typeface="+mn-lt"/>
+              <a:ea typeface="+mn-ea"/>
+              <a:cs typeface="+mn-cs"/>
+            </a:endParaRPr>
+          </a:p>
+          <a:p>
+            <a:pPr marL="0" marR="0" lvl="0" indent="0" algn="l" defTabSz="914400" rtl="0" eaLnBrk="1" fontAlgn="auto" latinLnBrk="0" hangingPunct="1">
+              <a:lnSpc>
+                <a:spcPct val="100000"/>
+              </a:lnSpc>
+              <a:spcBef>
+                <a:spcPts val="0"/>
+              </a:spcBef>
+              <a:spcAft>
+                <a:spcPts val="0"/>
+              </a:spcAft>
+              <a:buClrTx/>
+              <a:buSzTx/>
+              <a:buFontTx/>
+              <a:buNone/>
+              <a:tabLst/>
+              <a:defRPr/>
+            </a:pPr>
+            <a:r>
+              <a:rPr lang="en-US" sz="1200" kern="1200" dirty="0" smtClean="0">
+                <a:solidFill>
+                  <a:schemeClr val="tx1"/>
+                </a:solidFill>
+                <a:effectLst/>
+                <a:latin typeface="+mn-lt"/>
+                <a:ea typeface="+mn-ea"/>
+                <a:cs typeface="+mn-cs"/>
+              </a:rPr>
+              <a:t>If</a:t>
+            </a:r>
+            <a:r>
+              <a:rPr lang="en-US" sz="1200" kern="1200" baseline="0" dirty="0" smtClean="0">
+                <a:solidFill>
+                  <a:schemeClr val="tx1"/>
+                </a:solidFill>
+                <a:effectLst/>
+                <a:latin typeface="+mn-lt"/>
+                <a:ea typeface="+mn-ea"/>
+                <a:cs typeface="+mn-cs"/>
+              </a:rPr>
+              <a:t> you're familiar with the phrase "pit of success", then that applies here because it actually takes more effort to be INSECURE than secure.</a:t>
+            </a:r>
+            <a:endParaRPr lang="en-US" sz="1200" kern="1200" dirty="0" smtClean="0">
+              <a:solidFill>
+                <a:schemeClr val="tx1"/>
+              </a:solidFill>
+              <a:effectLst/>
+              <a:latin typeface="+mn-lt"/>
+              <a:ea typeface="+mn-ea"/>
+              <a:cs typeface="+mn-cs"/>
+            </a:endParaRPr>
+          </a:p>
+          <a:p>
             <a:endParaRPr lang="en-US" b="0" dirty="0" smtClean="0"/>
           </a:p>
         </p:txBody>
@@ -6408,6 +9201,61 @@
           <a:bodyPr/>
           <a:lstStyle/>
           <a:p>
+            <a:pPr marL="0" marR="0" lvl="0" indent="0" algn="l" defTabSz="914400" rtl="0" eaLnBrk="1" fontAlgn="auto" latinLnBrk="0" hangingPunct="1">
+              <a:lnSpc>
+                <a:spcPct val="100000"/>
+              </a:lnSpc>
+              <a:spcBef>
+                <a:spcPts val="0"/>
+              </a:spcBef>
+              <a:spcAft>
+                <a:spcPts val="0"/>
+              </a:spcAft>
+              <a:buClrTx/>
+              <a:buSzTx/>
+              <a:buFontTx/>
+              <a:buNone/>
+              <a:tabLst/>
+              <a:defRPr/>
+            </a:pPr>
+            <a:r>
+              <a:rPr lang="en-US" sz="1200" kern="1200" dirty="0" smtClean="0">
+                <a:solidFill>
+                  <a:schemeClr val="tx1"/>
+                </a:solidFill>
+                <a:effectLst/>
+                <a:latin typeface="+mn-lt"/>
+                <a:ea typeface="+mn-ea"/>
+                <a:cs typeface="+mn-cs"/>
+              </a:rPr>
+              <a:t>Unfortunately, not everything can be made </a:t>
+            </a:r>
+            <a:r>
+              <a:rPr lang="en-US" sz="1200" i="1" kern="1200" dirty="0" smtClean="0">
+                <a:solidFill>
+                  <a:schemeClr val="tx1"/>
+                </a:solidFill>
+                <a:effectLst/>
+                <a:latin typeface="+mn-lt"/>
+                <a:ea typeface="+mn-ea"/>
+                <a:cs typeface="+mn-cs"/>
+              </a:rPr>
+              <a:t>fully </a:t>
+            </a:r>
+            <a:r>
+              <a:rPr lang="en-US" sz="1200" kern="1200" dirty="0" smtClean="0">
+                <a:solidFill>
+                  <a:schemeClr val="tx1"/>
+                </a:solidFill>
+                <a:effectLst/>
+                <a:latin typeface="+mn-lt"/>
+                <a:ea typeface="+mn-ea"/>
+                <a:cs typeface="+mn-cs"/>
+              </a:rPr>
+              <a:t>secure by default, and sometimes you’ll still need to put some sort of security code into your features. I’ll show you how a declarative approach results in better factored code that minimizes the intermingling of concerns.</a:t>
+            </a:r>
+          </a:p>
+          <a:p>
             <a:endParaRPr lang="en-US" b="0" dirty="0" smtClean="0"/>
           </a:p>
         </p:txBody>
@@ -7021,6 +9869,45 @@
           <a:bodyPr/>
           <a:lstStyle/>
           <a:p>
+            <a:r>
+              <a:rPr lang="en-US" sz="1200" kern="1200" dirty="0" smtClean="0">
+                <a:solidFill>
+                  <a:schemeClr val="tx1"/>
+                </a:solidFill>
+                <a:effectLst/>
+                <a:latin typeface="+mn-lt"/>
+                <a:ea typeface="+mn-ea"/>
+                <a:cs typeface="+mn-cs"/>
+              </a:rPr>
+              <a:t>Finally, I’ll show you some ways that you can use static analysis tools to perform a security audit, and how you could incorporate that audit into your automated testing process.</a:t>
+            </a:r>
+          </a:p>
+          <a:p>
+            <a:endParaRPr lang="en-US" sz="1200" kern="1200" dirty="0" smtClean="0">
+              <a:solidFill>
+                <a:schemeClr val="tx1"/>
+              </a:solidFill>
+              <a:effectLst/>
+              <a:latin typeface="+mn-lt"/>
+              <a:ea typeface="+mn-ea"/>
+              <a:cs typeface="+mn-cs"/>
+            </a:endParaRPr>
+          </a:p>
+          <a:p>
+            <a:r>
+              <a:rPr lang="en-US" sz="1200" kern="1200" dirty="0" smtClean="0">
+                <a:solidFill>
+                  <a:schemeClr val="tx1"/>
+                </a:solidFill>
+                <a:effectLst/>
+                <a:latin typeface="+mn-lt"/>
+                <a:ea typeface="+mn-ea"/>
+                <a:cs typeface="+mn-cs"/>
+              </a:rPr>
+              <a:t>Code samples in this talk are in .NET and JS, because that’s what I’m familiar with. However, many of the techniques I’ll show you have parallels in other languages and platforms as well, so the general ideas should be portable even if the specific code samples are not.</a:t>
+            </a:r>
+          </a:p>
+          <a:p>
             <a:endParaRPr lang="en-US" b="0" dirty="0" smtClean="0"/>
           </a:p>
         </p:txBody>
@@ -7104,6 +9991,70 @@
         <p:txBody>
           <a:bodyPr/>
           <a:lstStyle/>
+          <a:p>
+            <a:r>
+              <a:rPr lang="en-US" sz="1200" kern="1200" dirty="0" smtClean="0">
+                <a:solidFill>
+                  <a:schemeClr val="tx1"/>
+                </a:solidFill>
+                <a:effectLst/>
+                <a:latin typeface="+mn-lt"/>
+                <a:ea typeface="+mn-ea"/>
+                <a:cs typeface="+mn-cs"/>
+              </a:rPr>
+              <a:t>The main point of this talk is the idea of pulling cross cutting concerns out of your feature code and pushing them down into your framework.</a:t>
+            </a:r>
+          </a:p>
+          <a:p>
+            <a:endParaRPr lang="en-US" sz="1200" kern="1200" dirty="0" smtClean="0">
+              <a:solidFill>
+                <a:schemeClr val="tx1"/>
+              </a:solidFill>
+              <a:effectLst/>
+              <a:latin typeface="+mn-lt"/>
+              <a:ea typeface="+mn-ea"/>
+              <a:cs typeface="+mn-cs"/>
+            </a:endParaRPr>
+          </a:p>
+          <a:p>
+            <a:r>
+              <a:rPr lang="en-US" sz="1200" kern="1200" dirty="0" smtClean="0">
+                <a:solidFill>
+                  <a:schemeClr val="tx1"/>
+                </a:solidFill>
+                <a:effectLst/>
+                <a:latin typeface="+mn-lt"/>
+                <a:ea typeface="+mn-ea"/>
+                <a:cs typeface="+mn-cs"/>
+              </a:rPr>
+              <a:t>Before I show any code, let me define those terms a little better.</a:t>
+            </a:r>
+          </a:p>
+          <a:p>
+            <a:endParaRPr lang="en-US" sz="1200" kern="1200" dirty="0" smtClean="0">
+              <a:solidFill>
+                <a:schemeClr val="tx1"/>
+              </a:solidFill>
+              <a:effectLst/>
+              <a:latin typeface="+mn-lt"/>
+              <a:ea typeface="+mn-ea"/>
+              <a:cs typeface="+mn-cs"/>
+            </a:endParaRPr>
+          </a:p>
+          <a:p>
+            <a:r>
+              <a:rPr lang="en-US" sz="1200" kern="1200" dirty="0" smtClean="0">
+                <a:solidFill>
+                  <a:schemeClr val="tx1"/>
+                </a:solidFill>
+                <a:effectLst/>
+                <a:latin typeface="+mn-lt"/>
+                <a:ea typeface="+mn-ea"/>
+                <a:cs typeface="+mn-cs"/>
+              </a:rPr>
+              <a:t>When I talk about “framework level code”, referring to any code that leverages hooks in an underlying system or library so that it can be automatically executed at a specific time. </a:t>
+            </a:r>
+          </a:p>
           <a:p>
             <a:endParaRPr lang="en-US" b="0" dirty="0" smtClean="0"/>
           </a:p>
@@ -7276,7 +10227,7 @@
           <a:p>
             <a:fld id="{75AA6396-395E-4ADA-8EE5-F328BC863A04}" type="datetimeFigureOut">
               <a:rPr lang="en-US" smtClean="0"/>
-              <a:t>1/8/2017</a:t>
+              <a:t>1/10/2017</a:t>
             </a:fld>
             <a:endParaRPr lang="en-US"/>
           </a:p>
@@ -7453,7 +10404,7 @@
           <a:p>
             <a:fld id="{75AA6396-395E-4ADA-8EE5-F328BC863A04}" type="datetimeFigureOut">
               <a:rPr lang="en-US" smtClean="0"/>
-              <a:t>1/8/2017</a:t>
+              <a:t>1/10/2017</a:t>
             </a:fld>
             <a:endParaRPr lang="en-US"/>
           </a:p>
@@ -7633,7 +10584,7 @@
           <a:p>
             <a:fld id="{75AA6396-395E-4ADA-8EE5-F328BC863A04}" type="datetimeFigureOut">
               <a:rPr lang="en-US" smtClean="0"/>
-              <a:t>1/8/2017</a:t>
+              <a:t>1/10/2017</a:t>
             </a:fld>
             <a:endParaRPr lang="en-US"/>
           </a:p>
@@ -7853,7 +10804,7 @@
           <a:p>
             <a:fld id="{75AA6396-395E-4ADA-8EE5-F328BC863A04}" type="datetimeFigureOut">
               <a:rPr lang="en-US" smtClean="0"/>
-              <a:t>1/8/2017</a:t>
+              <a:t>1/10/2017</a:t>
             </a:fld>
             <a:endParaRPr lang="en-US"/>
           </a:p>
@@ -8106,7 +11057,7 @@
           <a:p>
             <a:fld id="{75AA6396-395E-4ADA-8EE5-F328BC863A04}" type="datetimeFigureOut">
               <a:rPr lang="en-US" smtClean="0"/>
-              <a:t>1/8/2017</a:t>
+              <a:t>1/10/2017</a:t>
             </a:fld>
             <a:endParaRPr lang="en-US"/>
           </a:p>
@@ -8345,7 +11296,7 @@
           <a:p>
             <a:fld id="{75AA6396-395E-4ADA-8EE5-F328BC863A04}" type="datetimeFigureOut">
               <a:rPr lang="en-US" smtClean="0"/>
-              <a:t>1/8/2017</a:t>
+              <a:t>1/10/2017</a:t>
             </a:fld>
             <a:endParaRPr lang="en-US"/>
           </a:p>
@@ -8719,7 +11670,7 @@
           <a:p>
             <a:fld id="{75AA6396-395E-4ADA-8EE5-F328BC863A04}" type="datetimeFigureOut">
               <a:rPr lang="en-US" smtClean="0"/>
-              <a:t>1/8/2017</a:t>
+              <a:t>1/10/2017</a:t>
             </a:fld>
             <a:endParaRPr lang="en-US"/>
           </a:p>
@@ -8837,7 +11788,7 @@
           <a:p>
             <a:fld id="{75AA6396-395E-4ADA-8EE5-F328BC863A04}" type="datetimeFigureOut">
               <a:rPr lang="en-US" smtClean="0"/>
-              <a:t>1/8/2017</a:t>
+              <a:t>1/10/2017</a:t>
             </a:fld>
             <a:endParaRPr lang="en-US"/>
           </a:p>
@@ -8932,7 +11883,7 @@
           <a:p>
             <a:fld id="{75AA6396-395E-4ADA-8EE5-F328BC863A04}" type="datetimeFigureOut">
               <a:rPr lang="en-US" smtClean="0"/>
-              <a:t>1/8/2017</a:t>
+              <a:t>1/10/2017</a:t>
             </a:fld>
             <a:endParaRPr lang="en-US"/>
           </a:p>
@@ -9209,7 +12160,7 @@
           <a:p>
             <a:fld id="{75AA6396-395E-4ADA-8EE5-F328BC863A04}" type="datetimeFigureOut">
               <a:rPr lang="en-US" smtClean="0"/>
-              <a:t>1/8/2017</a:t>
+              <a:t>1/10/2017</a:t>
             </a:fld>
             <a:endParaRPr lang="en-US"/>
           </a:p>
@@ -9462,7 +12413,7 @@
           <a:p>
             <a:fld id="{75AA6396-395E-4ADA-8EE5-F328BC863A04}" type="datetimeFigureOut">
               <a:rPr lang="en-US" smtClean="0"/>
-              <a:t>1/8/2017</a:t>
+              <a:t>1/10/2017</a:t>
             </a:fld>
             <a:endParaRPr lang="en-US"/>
           </a:p>
@@ -9675,7 +12626,7 @@
           <a:p>
             <a:fld id="{75AA6396-395E-4ADA-8EE5-F328BC863A04}" type="datetimeFigureOut">
               <a:rPr lang="en-US" smtClean="0"/>
-              <a:t>1/8/2017</a:t>
+              <a:t>1/10/2017</a:t>
             </a:fld>
             <a:endParaRPr lang="en-US"/>
           </a:p>
@@ -10752,7 +13703,15 @@
             </a:pPr>
             <a:r>
               <a:rPr lang="en-US" sz="2800" dirty="0" smtClean="0"/>
-              <a:t>Users with the "Manage Orders" permission see all Orders</a:t>
+              <a:t>Users </a:t>
+            </a:r>
+            <a:r>
+              <a:rPr lang="en-US" sz="2800" dirty="0" smtClean="0"/>
+              <a:t>only see their own Orders…</a:t>
+            </a:r>
+            <a:r>
+              <a:rPr lang="en-US" sz="2800" dirty="0" smtClean="0"/>
+              <a:t/>
             </a:r>
             <a:br>
               <a:rPr lang="en-US" sz="2800" dirty="0" smtClean="0"/>
@@ -10765,7 +13724,7 @@
             </a:pPr>
             <a:r>
               <a:rPr lang="en-US" sz="2800" dirty="0" smtClean="0"/>
-              <a:t>Everyone else sees only their own Orders</a:t>
+              <a:t>… unless they have "Manage Orders" permission, and can see everything</a:t>
             </a:r>
             <a:endParaRPr lang="en-US" sz="2800" dirty="0"/>
           </a:p>
@@ -13270,7 +16229,7 @@
       </p:sp>
       <p:pic>
         <p:nvPicPr>
-          <p:cNvPr id="4" name="Picture 3"/>
+          <p:cNvPr id="5" name="Picture 4"/>
           <p:cNvPicPr>
             <a:picLocks noChangeAspect="1"/>
           </p:cNvPicPr>
@@ -13284,8 +16243,8 @@
         </p:blipFill>
         <p:spPr>
           <a:xfrm>
-            <a:off x="218981" y="2354365"/>
-            <a:ext cx="11754038" cy="3323764"/>
+            <a:off x="634928" y="2329057"/>
+            <a:ext cx="11490728" cy="3249809"/>
           </a:xfrm>
           <a:prstGeom prst="rect">
             <a:avLst/>

</xml_diff>

<commit_message>
Updated narrative and slides re: "private by default" auth
</commit_message>
<xml_diff>
--- a/Secure Systems - CodeMash 2017.pptx
+++ b/Secure Systems - CodeMash 2017.pptx
@@ -5,7 +5,7 @@
     <p:sldMasterId id="2147483749" r:id="rId1"/>
   </p:sldMasterIdLst>
   <p:notesMasterIdLst>
-    <p:notesMasterId r:id="rId77"/>
+    <p:notesMasterId r:id="rId76"/>
   </p:notesMasterIdLst>
   <p:sldIdLst>
     <p:sldId id="395" r:id="rId2"/>
@@ -42,47 +42,46 @@
     <p:sldId id="526" r:id="rId33"/>
     <p:sldId id="540" r:id="rId34"/>
     <p:sldId id="500" r:id="rId35"/>
-    <p:sldId id="553" r:id="rId36"/>
-    <p:sldId id="574" r:id="rId37"/>
-    <p:sldId id="573" r:id="rId38"/>
-    <p:sldId id="575" r:id="rId39"/>
-    <p:sldId id="534" r:id="rId40"/>
-    <p:sldId id="505" r:id="rId41"/>
-    <p:sldId id="535" r:id="rId42"/>
-    <p:sldId id="576" r:id="rId43"/>
-    <p:sldId id="507" r:id="rId44"/>
-    <p:sldId id="536" r:id="rId45"/>
-    <p:sldId id="580" r:id="rId46"/>
-    <p:sldId id="538" r:id="rId47"/>
-    <p:sldId id="539" r:id="rId48"/>
-    <p:sldId id="577" r:id="rId49"/>
-    <p:sldId id="537" r:id="rId50"/>
-    <p:sldId id="551" r:id="rId51"/>
-    <p:sldId id="552" r:id="rId52"/>
-    <p:sldId id="581" r:id="rId53"/>
-    <p:sldId id="501" r:id="rId54"/>
-    <p:sldId id="529" r:id="rId55"/>
-    <p:sldId id="546" r:id="rId56"/>
-    <p:sldId id="502" r:id="rId57"/>
-    <p:sldId id="503" r:id="rId58"/>
-    <p:sldId id="584" r:id="rId59"/>
-    <p:sldId id="586" r:id="rId60"/>
-    <p:sldId id="531" r:id="rId61"/>
-    <p:sldId id="585" r:id="rId62"/>
-    <p:sldId id="554" r:id="rId63"/>
-    <p:sldId id="530" r:id="rId64"/>
-    <p:sldId id="555" r:id="rId65"/>
-    <p:sldId id="556" r:id="rId66"/>
-    <p:sldId id="557" r:id="rId67"/>
-    <p:sldId id="558" r:id="rId68"/>
-    <p:sldId id="559" r:id="rId69"/>
-    <p:sldId id="564" r:id="rId70"/>
-    <p:sldId id="561" r:id="rId71"/>
-    <p:sldId id="565" r:id="rId72"/>
-    <p:sldId id="566" r:id="rId73"/>
-    <p:sldId id="568" r:id="rId74"/>
-    <p:sldId id="588" r:id="rId75"/>
-    <p:sldId id="587" r:id="rId76"/>
+    <p:sldId id="573" r:id="rId36"/>
+    <p:sldId id="553" r:id="rId37"/>
+    <p:sldId id="574" r:id="rId38"/>
+    <p:sldId id="534" r:id="rId39"/>
+    <p:sldId id="505" r:id="rId40"/>
+    <p:sldId id="535" r:id="rId41"/>
+    <p:sldId id="576" r:id="rId42"/>
+    <p:sldId id="507" r:id="rId43"/>
+    <p:sldId id="536" r:id="rId44"/>
+    <p:sldId id="580" r:id="rId45"/>
+    <p:sldId id="538" r:id="rId46"/>
+    <p:sldId id="539" r:id="rId47"/>
+    <p:sldId id="577" r:id="rId48"/>
+    <p:sldId id="537" r:id="rId49"/>
+    <p:sldId id="551" r:id="rId50"/>
+    <p:sldId id="552" r:id="rId51"/>
+    <p:sldId id="581" r:id="rId52"/>
+    <p:sldId id="501" r:id="rId53"/>
+    <p:sldId id="529" r:id="rId54"/>
+    <p:sldId id="546" r:id="rId55"/>
+    <p:sldId id="502" r:id="rId56"/>
+    <p:sldId id="503" r:id="rId57"/>
+    <p:sldId id="584" r:id="rId58"/>
+    <p:sldId id="586" r:id="rId59"/>
+    <p:sldId id="531" r:id="rId60"/>
+    <p:sldId id="585" r:id="rId61"/>
+    <p:sldId id="554" r:id="rId62"/>
+    <p:sldId id="530" r:id="rId63"/>
+    <p:sldId id="555" r:id="rId64"/>
+    <p:sldId id="556" r:id="rId65"/>
+    <p:sldId id="557" r:id="rId66"/>
+    <p:sldId id="558" r:id="rId67"/>
+    <p:sldId id="559" r:id="rId68"/>
+    <p:sldId id="564" r:id="rId69"/>
+    <p:sldId id="561" r:id="rId70"/>
+    <p:sldId id="565" r:id="rId71"/>
+    <p:sldId id="566" r:id="rId72"/>
+    <p:sldId id="568" r:id="rId73"/>
+    <p:sldId id="588" r:id="rId74"/>
+    <p:sldId id="587" r:id="rId75"/>
   </p:sldIdLst>
   <p:sldSz cx="12192000" cy="6858000"/>
   <p:notesSz cx="6858000" cy="9144000"/>
@@ -755,6 +754,64 @@
           </a:p>
           <a:p>
             <a:r>
+              <a:rPr lang="en-US" sz="1200" kern="1200" dirty="0" err="1" smtClean="0">
+                <a:solidFill>
+                  <a:schemeClr val="tx1"/>
+                </a:solidFill>
+                <a:effectLst/>
+                <a:latin typeface="+mn-lt"/>
+                <a:ea typeface="+mn-ea"/>
+                <a:cs typeface="+mn-cs"/>
+              </a:rPr>
+              <a:t>ASP.Net</a:t>
+            </a:r>
+            <a:r>
+              <a:rPr lang="en-US" sz="1200" kern="1200" dirty="0" smtClean="0">
+                <a:solidFill>
+                  <a:schemeClr val="tx1"/>
+                </a:solidFill>
+                <a:effectLst/>
+                <a:latin typeface="+mn-lt"/>
+                <a:ea typeface="+mn-ea"/>
+                <a:cs typeface="+mn-cs"/>
+              </a:rPr>
+              <a:t> HTTP</a:t>
+            </a:r>
+            <a:r>
+              <a:rPr lang="en-US" sz="1200" kern="1200" baseline="0" dirty="0" smtClean="0">
+                <a:solidFill>
+                  <a:schemeClr val="tx1"/>
+                </a:solidFill>
+                <a:effectLst/>
+                <a:latin typeface="+mn-lt"/>
+                <a:ea typeface="+mn-ea"/>
+                <a:cs typeface="+mn-cs"/>
+              </a:rPr>
+              <a:t> Modules let you tap into the entire ASPNET request pipeline</a:t>
+            </a:r>
+            <a:endParaRPr lang="en-US" sz="1200" kern="1200" dirty="0" smtClean="0">
+              <a:solidFill>
+                <a:schemeClr val="tx1"/>
+              </a:solidFill>
+              <a:effectLst/>
+              <a:latin typeface="+mn-lt"/>
+              <a:ea typeface="+mn-ea"/>
+              <a:cs typeface="+mn-cs"/>
+            </a:endParaRPr>
+          </a:p>
+          <a:p>
+            <a:endParaRPr lang="en-US" sz="1200" kern="1200" dirty="0" smtClean="0">
+              <a:solidFill>
+                <a:schemeClr val="tx1"/>
+              </a:solidFill>
+              <a:effectLst/>
+              <a:latin typeface="+mn-lt"/>
+              <a:ea typeface="+mn-ea"/>
+              <a:cs typeface="+mn-cs"/>
+            </a:endParaRPr>
+          </a:p>
+          <a:p>
+            <a:r>
               <a:rPr lang="en-US" sz="1200" kern="1200" dirty="0" smtClean="0">
                 <a:solidFill>
                   <a:schemeClr val="tx1"/>
@@ -4603,7 +4660,7 @@
             </a:r>
           </a:p>
           <a:p>
-            <a:endParaRPr lang="en-US" sz="1200" kern="1200" smtClean="0">
+            <a:endParaRPr lang="en-US" sz="1200" kern="1200" dirty="0" smtClean="0">
               <a:solidFill>
                 <a:schemeClr val="tx1"/>
               </a:solidFill>
@@ -4615,7 +4672,7 @@
           </a:p>
           <a:p>
             <a:r>
-              <a:rPr lang="en-US" sz="1200" kern="1200" smtClean="0">
+              <a:rPr lang="en-US" sz="1200" kern="1200" dirty="0" smtClean="0">
                 <a:solidFill>
                   <a:schemeClr val="tx1"/>
                 </a:solidFill>
@@ -4624,19 +4681,7 @@
                 <a:ea typeface="+mn-ea"/>
                 <a:cs typeface="+mn-cs"/>
               </a:rPr>
-              <a:t>Hooking </a:t>
-            </a:r>
-            <a:r>
-              <a:rPr lang="en-US" sz="1200" kern="1200" dirty="0" smtClean="0">
-                <a:solidFill>
-                  <a:schemeClr val="tx1"/>
-                </a:solidFill>
-                <a:effectLst/>
-                <a:latin typeface="+mn-lt"/>
-                <a:ea typeface="+mn-ea"/>
-                <a:cs typeface="+mn-cs"/>
-              </a:rPr>
-              <a:t>into the </a:t>
+              <a:t>Hooking into the </a:t>
             </a:r>
             <a:r>
               <a:rPr lang="en-US" sz="1200" kern="1200" dirty="0" err="1" smtClean="0">
@@ -5021,6 +5066,93 @@
           <a:bodyPr/>
           <a:lstStyle/>
           <a:p>
+            <a:r>
+              <a:rPr lang="en-US" sz="1200" kern="1200" dirty="0" smtClean="0">
+                <a:solidFill>
+                  <a:schemeClr val="tx1"/>
+                </a:solidFill>
+                <a:effectLst/>
+                <a:latin typeface="+mn-lt"/>
+                <a:ea typeface="+mn-ea"/>
+                <a:cs typeface="+mn-cs"/>
+              </a:rPr>
+              <a:t>Finally, we need to run the token validation logic automatically for all form post actions. We can do that by creating a custom controller class and overriding the </a:t>
+            </a:r>
+            <a:r>
+              <a:rPr lang="en-US" sz="1200" kern="1200" dirty="0" err="1" smtClean="0">
+                <a:solidFill>
+                  <a:schemeClr val="tx1"/>
+                </a:solidFill>
+                <a:effectLst/>
+                <a:latin typeface="+mn-lt"/>
+                <a:ea typeface="+mn-ea"/>
+                <a:cs typeface="+mn-cs"/>
+              </a:rPr>
+              <a:t>OnActionExecuting</a:t>
+            </a:r>
+            <a:r>
+              <a:rPr lang="en-US" sz="1200" kern="1200" dirty="0" smtClean="0">
+                <a:solidFill>
+                  <a:schemeClr val="tx1"/>
+                </a:solidFill>
+                <a:effectLst/>
+                <a:latin typeface="+mn-lt"/>
+                <a:ea typeface="+mn-ea"/>
+                <a:cs typeface="+mn-cs"/>
+              </a:rPr>
+              <a:t> method. The code that we put here will run on every single request, so if that request is a form post then we run the token verification logic.</a:t>
+            </a:r>
+          </a:p>
+          <a:p>
+            <a:endParaRPr lang="en-US" sz="1200" kern="1200" dirty="0" smtClean="0">
+              <a:solidFill>
+                <a:schemeClr val="tx1"/>
+              </a:solidFill>
+              <a:effectLst/>
+              <a:latin typeface="+mn-lt"/>
+              <a:ea typeface="+mn-ea"/>
+              <a:cs typeface="+mn-cs"/>
+            </a:endParaRPr>
+          </a:p>
+          <a:p>
+            <a:r>
+              <a:rPr lang="en-US" sz="1200" kern="1200" dirty="0" smtClean="0">
+                <a:solidFill>
+                  <a:schemeClr val="tx1"/>
+                </a:solidFill>
+                <a:effectLst/>
+                <a:latin typeface="+mn-lt"/>
+                <a:ea typeface="+mn-ea"/>
+                <a:cs typeface="+mn-cs"/>
+              </a:rPr>
+              <a:t>The </a:t>
+            </a:r>
+            <a:r>
+              <a:rPr lang="en-US" sz="1200" i="1" kern="1200" dirty="0" smtClean="0">
+                <a:solidFill>
+                  <a:schemeClr val="tx1"/>
+                </a:solidFill>
+                <a:effectLst/>
+                <a:latin typeface="+mn-lt"/>
+                <a:ea typeface="+mn-ea"/>
+                <a:cs typeface="+mn-cs"/>
+              </a:rPr>
+              <a:t>only thing </a:t>
+            </a:r>
+            <a:r>
+              <a:rPr lang="en-US" sz="1200" kern="1200" dirty="0" smtClean="0">
+                <a:solidFill>
+                  <a:schemeClr val="tx1"/>
+                </a:solidFill>
+                <a:effectLst/>
+                <a:latin typeface="+mn-lt"/>
+                <a:ea typeface="+mn-ea"/>
+                <a:cs typeface="+mn-cs"/>
+              </a:rPr>
+              <a:t>the developer has to do is derive their controller from the correct base class. As long as they do that, everything is handled automatically.</a:t>
+            </a:r>
+          </a:p>
+          <a:p>
             <a:endParaRPr lang="en-US" b="0" dirty="0" smtClean="0"/>
           </a:p>
         </p:txBody>
@@ -5105,6 +5237,37 @@
           <a:bodyPr/>
           <a:lstStyle/>
           <a:p>
+            <a:pPr marL="0" marR="0" lvl="0" indent="0" algn="l" defTabSz="914400" rtl="0" eaLnBrk="1" fontAlgn="auto" latinLnBrk="0" hangingPunct="1">
+              <a:lnSpc>
+                <a:spcPct val="100000"/>
+              </a:lnSpc>
+              <a:spcBef>
+                <a:spcPts val="0"/>
+              </a:spcBef>
+              <a:spcAft>
+                <a:spcPts val="0"/>
+              </a:spcAft>
+              <a:buClrTx/>
+              <a:buSzTx/>
+              <a:buFontTx/>
+              <a:buNone/>
+              <a:tabLst/>
+              <a:defRPr/>
+            </a:pPr>
+            <a:r>
+              <a:rPr lang="en-US" sz="1200" kern="1200" dirty="0" smtClean="0">
+                <a:solidFill>
+                  <a:schemeClr val="tx1"/>
+                </a:solidFill>
+                <a:effectLst/>
+                <a:latin typeface="+mn-lt"/>
+                <a:ea typeface="+mn-ea"/>
+                <a:cs typeface="+mn-cs"/>
+              </a:rPr>
+              <a:t>Here’s what the feature level code looks like when we’re done. This is 100% business logic, and yet every single form post is still protected from cross site request forgery attacks.</a:t>
+            </a:r>
+          </a:p>
+          <a:p>
             <a:endParaRPr lang="en-US" b="0" dirty="0" smtClean="0"/>
           </a:p>
         </p:txBody>
@@ -5189,6 +5352,45 @@
           <a:bodyPr/>
           <a:lstStyle/>
           <a:p>
+            <a:r>
+              <a:rPr lang="en-US" sz="1200" kern="1200" dirty="0" smtClean="0">
+                <a:solidFill>
+                  <a:schemeClr val="tx1"/>
+                </a:solidFill>
+                <a:effectLst/>
+                <a:latin typeface="+mn-lt"/>
+                <a:ea typeface="+mn-ea"/>
+                <a:cs typeface="+mn-cs"/>
+              </a:rPr>
+              <a:t>And here’s what it looks like for an AJAX POST. Again, it’s 100% business logic, yet still protected.</a:t>
+            </a:r>
+          </a:p>
+          <a:p>
+            <a:endParaRPr lang="en-US" sz="1200" kern="1200" dirty="0" smtClean="0">
+              <a:solidFill>
+                <a:schemeClr val="tx1"/>
+              </a:solidFill>
+              <a:effectLst/>
+              <a:latin typeface="+mn-lt"/>
+              <a:ea typeface="+mn-ea"/>
+              <a:cs typeface="+mn-cs"/>
+            </a:endParaRPr>
+          </a:p>
+          <a:p>
+            <a:r>
+              <a:rPr lang="en-US" sz="1200" kern="1200" dirty="0" smtClean="0">
+                <a:solidFill>
+                  <a:schemeClr val="tx1"/>
+                </a:solidFill>
+                <a:effectLst/>
+                <a:latin typeface="+mn-lt"/>
+                <a:ea typeface="+mn-ea"/>
+                <a:cs typeface="+mn-cs"/>
+              </a:rPr>
+              <a:t>CSRF defense is a great example of a cross-cutting concern because it’s orthogonal to individual feature requirements, it applies globally to the whole system, and it’s pretty easy to make it “secure by default”.</a:t>
+            </a:r>
+          </a:p>
+          <a:p>
             <a:endParaRPr lang="en-US" b="0" dirty="0" smtClean="0"/>
           </a:p>
         </p:txBody>
@@ -5273,6 +5475,45 @@
           <a:bodyPr/>
           <a:lstStyle/>
           <a:p>
+            <a:r>
+              <a:rPr lang="en-US" sz="1200" kern="1200" dirty="0" smtClean="0">
+                <a:solidFill>
+                  <a:schemeClr val="tx1"/>
+                </a:solidFill>
+                <a:effectLst/>
+                <a:latin typeface="+mn-lt"/>
+                <a:ea typeface="+mn-ea"/>
+                <a:cs typeface="+mn-cs"/>
+              </a:rPr>
+              <a:t>My next example of making a feature “secure by default” deals with Authentication, or specifically with preventing anonymous access to protected areas of your site.</a:t>
+            </a:r>
+          </a:p>
+          <a:p>
+            <a:endParaRPr lang="en-US" sz="1200" kern="1200" dirty="0" smtClean="0">
+              <a:solidFill>
+                <a:schemeClr val="tx1"/>
+              </a:solidFill>
+              <a:effectLst/>
+              <a:latin typeface="+mn-lt"/>
+              <a:ea typeface="+mn-ea"/>
+              <a:cs typeface="+mn-cs"/>
+            </a:endParaRPr>
+          </a:p>
+          <a:p>
+            <a:r>
+              <a:rPr lang="en-US" sz="1200" kern="1200" dirty="0" smtClean="0">
+                <a:solidFill>
+                  <a:schemeClr val="tx1"/>
+                </a:solidFill>
+                <a:effectLst/>
+                <a:latin typeface="+mn-lt"/>
+                <a:ea typeface="+mn-ea"/>
+                <a:cs typeface="+mn-cs"/>
+              </a:rPr>
+              <a:t>Most web frameworks make this fairly easy to do.</a:t>
+            </a:r>
+          </a:p>
+          <a:p>
             <a:pPr marL="0" marR="0" indent="0" algn="l" defTabSz="914400" rtl="0" eaLnBrk="1" fontAlgn="auto" latinLnBrk="0" hangingPunct="1">
               <a:lnSpc>
                 <a:spcPct val="100000"/>
@@ -5382,6 +5623,95 @@
           <a:bodyPr/>
           <a:lstStyle/>
           <a:p>
+            <a:r>
+              <a:rPr lang="en-US" sz="1200" kern="1200" dirty="0" smtClean="0">
+                <a:solidFill>
+                  <a:schemeClr val="tx1"/>
+                </a:solidFill>
+                <a:effectLst/>
+                <a:latin typeface="+mn-lt"/>
+                <a:ea typeface="+mn-ea"/>
+                <a:cs typeface="+mn-cs"/>
+              </a:rPr>
+              <a:t>In ASPNET MVC, for instance, you can add the [Authorize] attribute to an Action and it will automatically redirect users to the login page if they aren’t logged in.</a:t>
+            </a:r>
+          </a:p>
+          <a:p>
+            <a:endParaRPr lang="en-US" sz="1200" kern="1200" dirty="0" smtClean="0">
+              <a:solidFill>
+                <a:schemeClr val="tx1"/>
+              </a:solidFill>
+              <a:effectLst/>
+              <a:latin typeface="+mn-lt"/>
+              <a:ea typeface="+mn-ea"/>
+              <a:cs typeface="+mn-cs"/>
+            </a:endParaRPr>
+          </a:p>
+          <a:p>
+            <a:r>
+              <a:rPr lang="en-US" sz="1200" kern="1200" dirty="0" smtClean="0">
+                <a:solidFill>
+                  <a:schemeClr val="tx1"/>
+                </a:solidFill>
+                <a:effectLst/>
+                <a:latin typeface="+mn-lt"/>
+                <a:ea typeface="+mn-ea"/>
+                <a:cs typeface="+mn-cs"/>
+              </a:rPr>
+              <a:t>I don’t like using this though, because it represents a “public by default” model where any given MVC endpoint is accessible anonymously unless it is explicitly flagged as private. I tend to work on applications where the vast majority of resources are private, and only a specific few are public, so I want a “private by default” model instead.</a:t>
+            </a:r>
+          </a:p>
+          <a:p>
+            <a:endParaRPr lang="en-US" sz="1200" kern="1200" dirty="0" smtClean="0">
+              <a:solidFill>
+                <a:schemeClr val="tx1"/>
+              </a:solidFill>
+              <a:effectLst/>
+              <a:latin typeface="+mn-lt"/>
+              <a:ea typeface="+mn-ea"/>
+              <a:cs typeface="+mn-cs"/>
+            </a:endParaRPr>
+          </a:p>
+          <a:p>
+            <a:r>
+              <a:rPr lang="en-US" sz="1200" kern="1200" dirty="0" smtClean="0">
+                <a:solidFill>
+                  <a:schemeClr val="tx1"/>
+                </a:solidFill>
+                <a:effectLst/>
+                <a:latin typeface="+mn-lt"/>
+                <a:ea typeface="+mn-ea"/>
+                <a:cs typeface="+mn-cs"/>
+              </a:rPr>
+              <a:t>One way to build a “private by default” model is to create a custom HTTP Module that runs on every request and enforces a login, unless the URL matches a whitelist of endpoints that allow anonymous access.</a:t>
+            </a:r>
+          </a:p>
+          <a:p>
+            <a:endParaRPr lang="en-US" sz="1200" kern="1200" dirty="0" smtClean="0">
+              <a:solidFill>
+                <a:schemeClr val="tx1"/>
+              </a:solidFill>
+              <a:effectLst/>
+              <a:latin typeface="+mn-lt"/>
+              <a:ea typeface="+mn-ea"/>
+              <a:cs typeface="+mn-cs"/>
+            </a:endParaRPr>
+          </a:p>
+          <a:p>
+            <a:r>
+              <a:rPr lang="en-US" sz="1200" kern="1200" dirty="0" smtClean="0">
+                <a:solidFill>
+                  <a:schemeClr val="tx1"/>
+                </a:solidFill>
+                <a:effectLst/>
+                <a:latin typeface="+mn-lt"/>
+                <a:ea typeface="+mn-ea"/>
+                <a:cs typeface="+mn-cs"/>
+              </a:rPr>
+              <a:t>This is actually really easy to do.</a:t>
+            </a:r>
+          </a:p>
+          <a:p>
             <a:endParaRPr lang="en-US" b="0" dirty="0" smtClean="0"/>
           </a:p>
         </p:txBody>
@@ -5466,6 +5796,191 @@
           <a:bodyPr/>
           <a:lstStyle/>
           <a:p>
+            <a:r>
+              <a:rPr lang="en-US" sz="1200" kern="1200" dirty="0" smtClean="0">
+                <a:solidFill>
+                  <a:schemeClr val="tx1"/>
+                </a:solidFill>
+                <a:effectLst/>
+                <a:latin typeface="+mn-lt"/>
+                <a:ea typeface="+mn-ea"/>
+                <a:cs typeface="+mn-cs"/>
+              </a:rPr>
+              <a:t>First, we need some place to manage that whitelist. Since our goal is to require zero changes to the feature code, I like to use a custom section of </a:t>
+            </a:r>
+            <a:r>
+              <a:rPr lang="en-US" sz="1200" kern="1200" dirty="0" err="1" smtClean="0">
+                <a:solidFill>
+                  <a:schemeClr val="tx1"/>
+                </a:solidFill>
+                <a:effectLst/>
+                <a:latin typeface="+mn-lt"/>
+                <a:ea typeface="+mn-ea"/>
+                <a:cs typeface="+mn-cs"/>
+              </a:rPr>
+              <a:t>web.config</a:t>
+            </a:r>
+            <a:r>
+              <a:rPr lang="en-US" sz="1200" kern="1200" dirty="0" smtClean="0">
+                <a:solidFill>
+                  <a:schemeClr val="tx1"/>
+                </a:solidFill>
+                <a:effectLst/>
+                <a:latin typeface="+mn-lt"/>
+                <a:ea typeface="+mn-ea"/>
+                <a:cs typeface="+mn-cs"/>
+              </a:rPr>
+              <a:t> to do this. That way I don’t need to make any changes at all to the controllers themselves.</a:t>
+            </a:r>
+          </a:p>
+          <a:p>
+            <a:endParaRPr lang="en-US" sz="1200" kern="1200" dirty="0" smtClean="0">
+              <a:solidFill>
+                <a:schemeClr val="tx1"/>
+              </a:solidFill>
+              <a:effectLst/>
+              <a:latin typeface="+mn-lt"/>
+              <a:ea typeface="+mn-ea"/>
+              <a:cs typeface="+mn-cs"/>
+            </a:endParaRPr>
+          </a:p>
+          <a:p>
+            <a:r>
+              <a:rPr lang="en-US" sz="1200" kern="1200" dirty="0" smtClean="0">
+                <a:solidFill>
+                  <a:schemeClr val="tx1"/>
+                </a:solidFill>
+                <a:effectLst/>
+                <a:latin typeface="+mn-lt"/>
+                <a:ea typeface="+mn-ea"/>
+                <a:cs typeface="+mn-cs"/>
+              </a:rPr>
+              <a:t>Now, it’s important to note that HTTP Modules run for EVERY request, not just ones that get routed into MVC. That means that our whitelist needs to include static resources, such as stylesheets or scripts, that we want to use on our login page. </a:t>
+            </a:r>
+          </a:p>
+          <a:p>
+            <a:endParaRPr lang="en-US" sz="1200" kern="1200" dirty="0" smtClean="0">
+              <a:solidFill>
+                <a:schemeClr val="tx1"/>
+              </a:solidFill>
+              <a:effectLst/>
+              <a:latin typeface="+mn-lt"/>
+              <a:ea typeface="+mn-ea"/>
+              <a:cs typeface="+mn-cs"/>
+            </a:endParaRPr>
+          </a:p>
+          <a:p>
+            <a:r>
+              <a:rPr lang="en-US" sz="1200" kern="1200" dirty="0" smtClean="0">
+                <a:solidFill>
+                  <a:schemeClr val="tx1"/>
+                </a:solidFill>
+                <a:effectLst/>
+                <a:latin typeface="+mn-lt"/>
+                <a:ea typeface="+mn-ea"/>
+                <a:cs typeface="+mn-cs"/>
+              </a:rPr>
+              <a:t>For that reason, I like to build my whitelist using regular expressions. That way I can create a single rule that grants access to my entire Scripts folder so that I don’t have to continually modify </a:t>
+            </a:r>
+            <a:r>
+              <a:rPr lang="en-US" sz="1200" kern="1200" dirty="0" err="1" smtClean="0">
+                <a:solidFill>
+                  <a:schemeClr val="tx1"/>
+                </a:solidFill>
+                <a:effectLst/>
+                <a:latin typeface="+mn-lt"/>
+                <a:ea typeface="+mn-ea"/>
+                <a:cs typeface="+mn-cs"/>
+              </a:rPr>
+              <a:t>web.config</a:t>
+            </a:r>
+            <a:r>
+              <a:rPr lang="en-US" sz="1200" kern="1200" dirty="0" smtClean="0">
+                <a:solidFill>
+                  <a:schemeClr val="tx1"/>
+                </a:solidFill>
+                <a:effectLst/>
+                <a:latin typeface="+mn-lt"/>
+                <a:ea typeface="+mn-ea"/>
+                <a:cs typeface="+mn-cs"/>
+              </a:rPr>
+              <a:t> each time we add a new </a:t>
+            </a:r>
+            <a:r>
+              <a:rPr lang="en-US" sz="1200" kern="1200" dirty="0" err="1" smtClean="0">
+                <a:solidFill>
+                  <a:schemeClr val="tx1"/>
+                </a:solidFill>
+                <a:effectLst/>
+                <a:latin typeface="+mn-lt"/>
+                <a:ea typeface="+mn-ea"/>
+                <a:cs typeface="+mn-cs"/>
+              </a:rPr>
+              <a:t>jquery</a:t>
+            </a:r>
+            <a:r>
+              <a:rPr lang="en-US" sz="1200" kern="1200" dirty="0" smtClean="0">
+                <a:solidFill>
+                  <a:schemeClr val="tx1"/>
+                </a:solidFill>
+                <a:effectLst/>
+                <a:latin typeface="+mn-lt"/>
+                <a:ea typeface="+mn-ea"/>
+                <a:cs typeface="+mn-cs"/>
+              </a:rPr>
+              <a:t> plugin.</a:t>
+            </a:r>
+          </a:p>
+          <a:p>
+            <a:endParaRPr lang="en-US" sz="1200" kern="1200" dirty="0" smtClean="0">
+              <a:solidFill>
+                <a:schemeClr val="tx1"/>
+              </a:solidFill>
+              <a:effectLst/>
+              <a:latin typeface="+mn-lt"/>
+              <a:ea typeface="+mn-ea"/>
+              <a:cs typeface="+mn-cs"/>
+            </a:endParaRPr>
+          </a:p>
+          <a:p>
+            <a:r>
+              <a:rPr lang="en-US" sz="1200" kern="1200" dirty="0" smtClean="0">
+                <a:solidFill>
+                  <a:schemeClr val="tx1"/>
+                </a:solidFill>
+                <a:effectLst/>
+                <a:latin typeface="+mn-lt"/>
+                <a:ea typeface="+mn-ea"/>
+                <a:cs typeface="+mn-cs"/>
+              </a:rPr>
+              <a:t>Creating custom web </a:t>
+            </a:r>
+            <a:r>
+              <a:rPr lang="en-US" sz="1200" kern="1200" dirty="0" err="1" smtClean="0">
+                <a:solidFill>
+                  <a:schemeClr val="tx1"/>
+                </a:solidFill>
+                <a:effectLst/>
+                <a:latin typeface="+mn-lt"/>
+                <a:ea typeface="+mn-ea"/>
+                <a:cs typeface="+mn-cs"/>
+              </a:rPr>
+              <a:t>config</a:t>
+            </a:r>
+            <a:r>
+              <a:rPr lang="en-US" sz="1200" kern="1200" dirty="0" smtClean="0">
+                <a:solidFill>
+                  <a:schemeClr val="tx1"/>
+                </a:solidFill>
+                <a:effectLst/>
+                <a:latin typeface="+mn-lt"/>
+                <a:ea typeface="+mn-ea"/>
+                <a:cs typeface="+mn-cs"/>
+              </a:rPr>
+              <a:t> sections is pretty simple, but I don’t have time to show the code in this session so just check out my demo app to see how it works.</a:t>
+            </a:r>
+          </a:p>
+          <a:p>
             <a:endParaRPr lang="en-US" b="0" dirty="0" smtClean="0"/>
           </a:p>
         </p:txBody>
@@ -5496,7 +6011,7 @@
     </p:spTree>
     <p:extLst>
       <p:ext uri="{BB962C8B-B14F-4D97-AF65-F5344CB8AC3E}">
-        <p14:creationId xmlns:p14="http://schemas.microsoft.com/office/powerpoint/2010/main" val="1514808285"/>
+        <p14:creationId xmlns:p14="http://schemas.microsoft.com/office/powerpoint/2010/main" val="1255163866"/>
       </p:ext>
     </p:extLst>
   </p:cSld>
@@ -5550,6 +6065,118 @@
           <a:bodyPr/>
           <a:lstStyle/>
           <a:p>
+            <a:r>
+              <a:rPr lang="en-US" sz="1200" kern="1200" dirty="0" smtClean="0">
+                <a:solidFill>
+                  <a:schemeClr val="tx1"/>
+                </a:solidFill>
+                <a:effectLst/>
+                <a:latin typeface="+mn-lt"/>
+                <a:ea typeface="+mn-ea"/>
+                <a:cs typeface="+mn-cs"/>
+              </a:rPr>
+              <a:t>Once we’ve defined the whitelist, we need to create the HTTP module to enforce it. </a:t>
+            </a:r>
+          </a:p>
+          <a:p>
+            <a:endParaRPr lang="en-US" sz="1200" kern="1200" dirty="0" smtClean="0">
+              <a:solidFill>
+                <a:schemeClr val="tx1"/>
+              </a:solidFill>
+              <a:effectLst/>
+              <a:latin typeface="+mn-lt"/>
+              <a:ea typeface="+mn-ea"/>
+              <a:cs typeface="+mn-cs"/>
+            </a:endParaRPr>
+          </a:p>
+          <a:p>
+            <a:r>
+              <a:rPr lang="en-US" sz="1200" kern="1200" dirty="0" smtClean="0">
+                <a:solidFill>
+                  <a:schemeClr val="tx1"/>
+                </a:solidFill>
+                <a:effectLst/>
+                <a:latin typeface="+mn-lt"/>
+                <a:ea typeface="+mn-ea"/>
+                <a:cs typeface="+mn-cs"/>
+              </a:rPr>
+              <a:t>This is also really easy to do. It’s just a class that implements the </a:t>
+            </a:r>
+            <a:r>
+              <a:rPr lang="en-US" sz="1200" kern="1200" dirty="0" err="1" smtClean="0">
+                <a:solidFill>
+                  <a:schemeClr val="tx1"/>
+                </a:solidFill>
+                <a:effectLst/>
+                <a:latin typeface="+mn-lt"/>
+                <a:ea typeface="+mn-ea"/>
+                <a:cs typeface="+mn-cs"/>
+              </a:rPr>
+              <a:t>IHttpModule</a:t>
+            </a:r>
+            <a:r>
+              <a:rPr lang="en-US" sz="1200" kern="1200" dirty="0" smtClean="0">
+                <a:solidFill>
+                  <a:schemeClr val="tx1"/>
+                </a:solidFill>
+                <a:effectLst/>
+                <a:latin typeface="+mn-lt"/>
+                <a:ea typeface="+mn-ea"/>
+                <a:cs typeface="+mn-cs"/>
+              </a:rPr>
+              <a:t> interface and then provides an implementation for this </a:t>
+            </a:r>
+            <a:r>
+              <a:rPr lang="en-US" sz="1200" kern="1200" dirty="0" err="1" smtClean="0">
+                <a:solidFill>
+                  <a:schemeClr val="tx1"/>
+                </a:solidFill>
+                <a:effectLst/>
+                <a:latin typeface="+mn-lt"/>
+                <a:ea typeface="+mn-ea"/>
+                <a:cs typeface="+mn-cs"/>
+              </a:rPr>
+              <a:t>OnAcquireRequestState</a:t>
+            </a:r>
+            <a:r>
+              <a:rPr lang="en-US" sz="1200" kern="1200" dirty="0" smtClean="0">
+                <a:solidFill>
+                  <a:schemeClr val="tx1"/>
+                </a:solidFill>
+                <a:effectLst/>
+                <a:latin typeface="+mn-lt"/>
+                <a:ea typeface="+mn-ea"/>
+                <a:cs typeface="+mn-cs"/>
+              </a:rPr>
+              <a:t> method.</a:t>
+            </a:r>
+          </a:p>
+          <a:p>
+            <a:endParaRPr lang="en-US" sz="1200" kern="1200" dirty="0" smtClean="0">
+              <a:solidFill>
+                <a:schemeClr val="tx1"/>
+              </a:solidFill>
+              <a:effectLst/>
+              <a:latin typeface="+mn-lt"/>
+              <a:ea typeface="+mn-ea"/>
+              <a:cs typeface="+mn-cs"/>
+            </a:endParaRPr>
+          </a:p>
+          <a:p>
+            <a:r>
+              <a:rPr lang="en-US" sz="1200" kern="1200" dirty="0" smtClean="0">
+                <a:solidFill>
+                  <a:schemeClr val="tx1"/>
+                </a:solidFill>
+                <a:effectLst/>
+                <a:latin typeface="+mn-lt"/>
+                <a:ea typeface="+mn-ea"/>
+                <a:cs typeface="+mn-cs"/>
+              </a:rPr>
+              <a:t>In the body of this method we look to see whether or not the URL matches our whitelist and whether or not the user is already logged in. If either of those things are true then we do nothing. Otherwise, we send the user to the login page.</a:t>
+            </a:r>
+          </a:p>
+          <a:p>
             <a:endParaRPr lang="en-US" b="0" dirty="0" smtClean="0"/>
           </a:p>
         </p:txBody>
@@ -5580,7 +6207,7 @@
     </p:spTree>
     <p:extLst>
       <p:ext uri="{BB962C8B-B14F-4D97-AF65-F5344CB8AC3E}">
-        <p14:creationId xmlns:p14="http://schemas.microsoft.com/office/powerpoint/2010/main" val="3263699449"/>
+        <p14:creationId xmlns:p14="http://schemas.microsoft.com/office/powerpoint/2010/main" val="1514808285"/>
       </p:ext>
     </p:extLst>
   </p:cSld>
@@ -5634,6 +6261,94 @@
           <a:bodyPr/>
           <a:lstStyle/>
           <a:p>
+            <a:r>
+              <a:rPr lang="en-US" sz="1200" kern="1200" dirty="0" smtClean="0">
+                <a:solidFill>
+                  <a:schemeClr val="tx1"/>
+                </a:solidFill>
+                <a:effectLst/>
+                <a:latin typeface="+mn-lt"/>
+                <a:ea typeface="+mn-ea"/>
+                <a:cs typeface="+mn-cs"/>
+              </a:rPr>
+              <a:t>The last piece of the puzzle is to tell IIS to run that module for all requests, and we can do that with a single line of code in </a:t>
+            </a:r>
+            <a:r>
+              <a:rPr lang="en-US" sz="1200" kern="1200" dirty="0" err="1" smtClean="0">
+                <a:solidFill>
+                  <a:schemeClr val="tx1"/>
+                </a:solidFill>
+                <a:effectLst/>
+                <a:latin typeface="+mn-lt"/>
+                <a:ea typeface="+mn-ea"/>
+                <a:cs typeface="+mn-cs"/>
+              </a:rPr>
+              <a:t>web.config</a:t>
+            </a:r>
+            <a:r>
+              <a:rPr lang="en-US" sz="1200" kern="1200" dirty="0" smtClean="0">
+                <a:solidFill>
+                  <a:schemeClr val="tx1"/>
+                </a:solidFill>
+                <a:effectLst/>
+                <a:latin typeface="+mn-lt"/>
+                <a:ea typeface="+mn-ea"/>
+                <a:cs typeface="+mn-cs"/>
+              </a:rPr>
+              <a:t>. </a:t>
+            </a:r>
+          </a:p>
+          <a:p>
+            <a:endParaRPr lang="en-US" sz="1200" kern="1200" dirty="0" smtClean="0">
+              <a:solidFill>
+                <a:schemeClr val="tx1"/>
+              </a:solidFill>
+              <a:effectLst/>
+              <a:latin typeface="+mn-lt"/>
+              <a:ea typeface="+mn-ea"/>
+              <a:cs typeface="+mn-cs"/>
+            </a:endParaRPr>
+          </a:p>
+          <a:p>
+            <a:r>
+              <a:rPr lang="en-US" sz="1200" kern="1200" dirty="0" smtClean="0">
+                <a:solidFill>
+                  <a:schemeClr val="tx1"/>
+                </a:solidFill>
+                <a:effectLst/>
+                <a:latin typeface="+mn-lt"/>
+                <a:ea typeface="+mn-ea"/>
+                <a:cs typeface="+mn-cs"/>
+              </a:rPr>
+              <a:t>And that’s it. Now, every single request that comes into my site will be automatically redirected to the login page unless the user is logged in, OR the URL matches a whitelist that I can control in a single, centralized place. The developers literally need to take zero additional effort to make their endpoints secure, and if they want to make something public it’s just a single adjustment to the whitelist.</a:t>
+            </a:r>
+          </a:p>
+          <a:p>
+            <a:endParaRPr lang="en-US" sz="1200" kern="1200" dirty="0" smtClean="0">
+              <a:solidFill>
+                <a:schemeClr val="tx1"/>
+              </a:solidFill>
+              <a:effectLst/>
+              <a:latin typeface="+mn-lt"/>
+              <a:ea typeface="+mn-ea"/>
+              <a:cs typeface="+mn-cs"/>
+            </a:endParaRPr>
+          </a:p>
+          <a:p>
+            <a:r>
+              <a:rPr lang="en-US" sz="1200" kern="1200" dirty="0" smtClean="0">
+                <a:solidFill>
+                  <a:schemeClr val="tx1"/>
+                </a:solidFill>
+                <a:effectLst/>
+                <a:latin typeface="+mn-lt"/>
+                <a:ea typeface="+mn-ea"/>
+                <a:cs typeface="+mn-cs"/>
+              </a:rPr>
+              <a:t>Also, in the last segment of this talk, I’ll show you a way to generate a report of all of your MVC controller actions and whether or not they are publicly accessible. That sort of auditing is a useful way of validating that your whitelist is doing what you expect it do.</a:t>
+            </a:r>
+          </a:p>
+          <a:p>
             <a:endParaRPr lang="en-US" b="0" dirty="0" smtClean="0"/>
           </a:p>
         </p:txBody>
@@ -5664,7 +6379,7 @@
     </p:spTree>
     <p:extLst>
       <p:ext uri="{BB962C8B-B14F-4D97-AF65-F5344CB8AC3E}">
-        <p14:creationId xmlns:p14="http://schemas.microsoft.com/office/powerpoint/2010/main" val="1255163866"/>
+        <p14:creationId xmlns:p14="http://schemas.microsoft.com/office/powerpoint/2010/main" val="3263699449"/>
       </p:ext>
     </p:extLst>
   </p:cSld>
@@ -5718,7 +6433,32 @@
           <a:bodyPr/>
           <a:lstStyle/>
           <a:p>
-            <a:endParaRPr lang="en-US" b="0" dirty="0" smtClean="0"/>
+            <a:pPr marL="0" marR="0" indent="0" algn="l" defTabSz="914400" rtl="0" eaLnBrk="1" fontAlgn="auto" latinLnBrk="0" hangingPunct="1">
+              <a:lnSpc>
+                <a:spcPct val="100000"/>
+              </a:lnSpc>
+              <a:spcBef>
+                <a:spcPts val="0"/>
+              </a:spcBef>
+              <a:spcAft>
+                <a:spcPts val="0"/>
+              </a:spcAft>
+              <a:buClrTx/>
+              <a:buSzTx/>
+              <a:buFontTx/>
+              <a:buNone/>
+              <a:tabLst/>
+              <a:defRPr/>
+            </a:pPr>
+            <a:endParaRPr lang="en-US" sz="1200" kern="1200" dirty="0" smtClean="0">
+              <a:solidFill>
+                <a:schemeClr val="tx1"/>
+              </a:solidFill>
+              <a:effectLst/>
+              <a:latin typeface="+mn-lt"/>
+              <a:ea typeface="+mn-ea"/>
+              <a:cs typeface="+mn-cs"/>
+            </a:endParaRPr>
           </a:p>
         </p:txBody>
       </p:sp>
@@ -5748,7 +6488,7 @@
     </p:spTree>
     <p:extLst>
       <p:ext uri="{BB962C8B-B14F-4D97-AF65-F5344CB8AC3E}">
-        <p14:creationId xmlns:p14="http://schemas.microsoft.com/office/powerpoint/2010/main" val="532748052"/>
+        <p14:creationId xmlns:p14="http://schemas.microsoft.com/office/powerpoint/2010/main" val="2286755864"/>
       </p:ext>
     </p:extLst>
   </p:cSld>
@@ -5802,32 +6542,7 @@
           <a:bodyPr/>
           <a:lstStyle/>
           <a:p>
-            <a:pPr marL="0" marR="0" indent="0" algn="l" defTabSz="914400" rtl="0" eaLnBrk="1" fontAlgn="auto" latinLnBrk="0" hangingPunct="1">
-              <a:lnSpc>
-                <a:spcPct val="100000"/>
-              </a:lnSpc>
-              <a:spcBef>
-                <a:spcPts val="0"/>
-              </a:spcBef>
-              <a:spcAft>
-                <a:spcPts val="0"/>
-              </a:spcAft>
-              <a:buClrTx/>
-              <a:buSzTx/>
-              <a:buFontTx/>
-              <a:buNone/>
-              <a:tabLst/>
-              <a:defRPr/>
-            </a:pPr>
-            <a:endParaRPr lang="en-US" sz="1200" kern="1200" dirty="0" smtClean="0">
-              <a:solidFill>
-                <a:schemeClr val="tx1"/>
-              </a:solidFill>
-              <a:effectLst/>
-              <a:latin typeface="+mn-lt"/>
-              <a:ea typeface="+mn-ea"/>
-              <a:cs typeface="+mn-cs"/>
-            </a:endParaRPr>
+            <a:endParaRPr lang="en-US" b="0" dirty="0" smtClean="0"/>
           </a:p>
         </p:txBody>
       </p:sp>
@@ -5857,7 +6572,7 @@
     </p:spTree>
     <p:extLst>
       <p:ext uri="{BB962C8B-B14F-4D97-AF65-F5344CB8AC3E}">
-        <p14:creationId xmlns:p14="http://schemas.microsoft.com/office/powerpoint/2010/main" val="2286755864"/>
+        <p14:creationId xmlns:p14="http://schemas.microsoft.com/office/powerpoint/2010/main" val="2653332077"/>
       </p:ext>
     </p:extLst>
   </p:cSld>
@@ -6235,7 +6950,7 @@
     </p:spTree>
     <p:extLst>
       <p:ext uri="{BB962C8B-B14F-4D97-AF65-F5344CB8AC3E}">
-        <p14:creationId xmlns:p14="http://schemas.microsoft.com/office/powerpoint/2010/main" val="2653332077"/>
+        <p14:creationId xmlns:p14="http://schemas.microsoft.com/office/powerpoint/2010/main" val="3778399677"/>
       </p:ext>
     </p:extLst>
   </p:cSld>
@@ -6319,7 +7034,7 @@
     </p:spTree>
     <p:extLst>
       <p:ext uri="{BB962C8B-B14F-4D97-AF65-F5344CB8AC3E}">
-        <p14:creationId xmlns:p14="http://schemas.microsoft.com/office/powerpoint/2010/main" val="3778399677"/>
+        <p14:creationId xmlns:p14="http://schemas.microsoft.com/office/powerpoint/2010/main" val="4047639699"/>
       </p:ext>
     </p:extLst>
   </p:cSld>
@@ -6403,7 +7118,7 @@
     </p:spTree>
     <p:extLst>
       <p:ext uri="{BB962C8B-B14F-4D97-AF65-F5344CB8AC3E}">
-        <p14:creationId xmlns:p14="http://schemas.microsoft.com/office/powerpoint/2010/main" val="4047639699"/>
+        <p14:creationId xmlns:p14="http://schemas.microsoft.com/office/powerpoint/2010/main" val="3271057564"/>
       </p:ext>
     </p:extLst>
   </p:cSld>
@@ -6487,7 +7202,7 @@
     </p:spTree>
     <p:extLst>
       <p:ext uri="{BB962C8B-B14F-4D97-AF65-F5344CB8AC3E}">
-        <p14:creationId xmlns:p14="http://schemas.microsoft.com/office/powerpoint/2010/main" val="3271057564"/>
+        <p14:creationId xmlns:p14="http://schemas.microsoft.com/office/powerpoint/2010/main" val="150335864"/>
       </p:ext>
     </p:extLst>
   </p:cSld>
@@ -6571,7 +7286,7 @@
     </p:spTree>
     <p:extLst>
       <p:ext uri="{BB962C8B-B14F-4D97-AF65-F5344CB8AC3E}">
-        <p14:creationId xmlns:p14="http://schemas.microsoft.com/office/powerpoint/2010/main" val="150335864"/>
+        <p14:creationId xmlns:p14="http://schemas.microsoft.com/office/powerpoint/2010/main" val="3480706183"/>
       </p:ext>
     </p:extLst>
   </p:cSld>
@@ -6655,7 +7370,7 @@
     </p:spTree>
     <p:extLst>
       <p:ext uri="{BB962C8B-B14F-4D97-AF65-F5344CB8AC3E}">
-        <p14:creationId xmlns:p14="http://schemas.microsoft.com/office/powerpoint/2010/main" val="3480706183"/>
+        <p14:creationId xmlns:p14="http://schemas.microsoft.com/office/powerpoint/2010/main" val="1174323916"/>
       </p:ext>
     </p:extLst>
   </p:cSld>
@@ -6739,7 +7454,7 @@
     </p:spTree>
     <p:extLst>
       <p:ext uri="{BB962C8B-B14F-4D97-AF65-F5344CB8AC3E}">
-        <p14:creationId xmlns:p14="http://schemas.microsoft.com/office/powerpoint/2010/main" val="1174323916"/>
+        <p14:creationId xmlns:p14="http://schemas.microsoft.com/office/powerpoint/2010/main" val="22929660"/>
       </p:ext>
     </p:extLst>
   </p:cSld>
@@ -6823,7 +7538,7 @@
     </p:spTree>
     <p:extLst>
       <p:ext uri="{BB962C8B-B14F-4D97-AF65-F5344CB8AC3E}">
-        <p14:creationId xmlns:p14="http://schemas.microsoft.com/office/powerpoint/2010/main" val="22929660"/>
+        <p14:creationId xmlns:p14="http://schemas.microsoft.com/office/powerpoint/2010/main" val="508677048"/>
       </p:ext>
     </p:extLst>
   </p:cSld>
@@ -6907,7 +7622,7 @@
     </p:spTree>
     <p:extLst>
       <p:ext uri="{BB962C8B-B14F-4D97-AF65-F5344CB8AC3E}">
-        <p14:creationId xmlns:p14="http://schemas.microsoft.com/office/powerpoint/2010/main" val="508677048"/>
+        <p14:creationId xmlns:p14="http://schemas.microsoft.com/office/powerpoint/2010/main" val="3079792467"/>
       </p:ext>
     </p:extLst>
   </p:cSld>
@@ -6961,7 +7676,32 @@
           <a:bodyPr/>
           <a:lstStyle/>
           <a:p>
-            <a:endParaRPr lang="en-US" b="0" dirty="0" smtClean="0"/>
+            <a:pPr marL="0" marR="0" indent="0" algn="l" defTabSz="914400" rtl="0" eaLnBrk="1" fontAlgn="auto" latinLnBrk="0" hangingPunct="1">
+              <a:lnSpc>
+                <a:spcPct val="100000"/>
+              </a:lnSpc>
+              <a:spcBef>
+                <a:spcPts val="0"/>
+              </a:spcBef>
+              <a:spcAft>
+                <a:spcPts val="0"/>
+              </a:spcAft>
+              <a:buClrTx/>
+              <a:buSzTx/>
+              <a:buFontTx/>
+              <a:buNone/>
+              <a:tabLst/>
+              <a:defRPr/>
+            </a:pPr>
+            <a:endParaRPr lang="en-US" sz="1200" kern="1200" dirty="0" smtClean="0">
+              <a:solidFill>
+                <a:schemeClr val="tx1"/>
+              </a:solidFill>
+              <a:effectLst/>
+              <a:latin typeface="+mn-lt"/>
+              <a:ea typeface="+mn-ea"/>
+              <a:cs typeface="+mn-cs"/>
+            </a:endParaRPr>
           </a:p>
         </p:txBody>
       </p:sp>
@@ -6991,7 +7731,7 @@
     </p:spTree>
     <p:extLst>
       <p:ext uri="{BB962C8B-B14F-4D97-AF65-F5344CB8AC3E}">
-        <p14:creationId xmlns:p14="http://schemas.microsoft.com/office/powerpoint/2010/main" val="3079792467"/>
+        <p14:creationId xmlns:p14="http://schemas.microsoft.com/office/powerpoint/2010/main" val="1704645259"/>
       </p:ext>
     </p:extLst>
   </p:cSld>
@@ -7168,6 +7908,342 @@
           <a:bodyPr/>
           <a:lstStyle/>
           <a:p>
+            <a:endParaRPr lang="en-US" b="0" dirty="0" smtClean="0"/>
+          </a:p>
+        </p:txBody>
+      </p:sp>
+      <p:sp>
+        <p:nvSpPr>
+          <p:cNvPr id="4" name="Slide Number Placeholder 3"/>
+          <p:cNvSpPr>
+            <a:spLocks noGrp="1"/>
+          </p:cNvSpPr>
+          <p:nvPr>
+            <p:ph type="sldNum" sz="quarter" idx="10"/>
+          </p:nvPr>
+        </p:nvSpPr>
+        <p:spPr/>
+        <p:txBody>
+          <a:bodyPr/>
+          <a:lstStyle/>
+          <a:p>
+            <a:fld id="{89029652-62E7-43D6-83B5-097D7B7AA5D8}" type="slidenum">
+              <a:rPr lang="en-US" smtClean="0"/>
+              <a:t>50</a:t>
+            </a:fld>
+            <a:endParaRPr lang="en-US"/>
+          </a:p>
+        </p:txBody>
+      </p:sp>
+    </p:spTree>
+    <p:extLst>
+      <p:ext uri="{BB962C8B-B14F-4D97-AF65-F5344CB8AC3E}">
+        <p14:creationId xmlns:p14="http://schemas.microsoft.com/office/powerpoint/2010/main" val="381415188"/>
+      </p:ext>
+    </p:extLst>
+  </p:cSld>
+  <p:clrMapOvr>
+    <a:masterClrMapping/>
+  </p:clrMapOvr>
+</p:notes>
+</file>
+
+<file path=ppt/notesSlides/notesSlide51.xml><?xml version="1.0" encoding="utf-8"?>
+<p:notes xmlns:a="http://schemas.openxmlformats.org/drawingml/2006/main" xmlns:r="http://schemas.openxmlformats.org/officeDocument/2006/relationships" xmlns:p="http://schemas.openxmlformats.org/presentationml/2006/main">
+  <p:cSld>
+    <p:spTree>
+      <p:nvGrpSpPr>
+        <p:cNvPr id="1" name=""/>
+        <p:cNvGrpSpPr/>
+        <p:nvPr/>
+      </p:nvGrpSpPr>
+      <p:grpSpPr>
+        <a:xfrm>
+          <a:off x="0" y="0"/>
+          <a:ext cx="0" cy="0"/>
+          <a:chOff x="0" y="0"/>
+          <a:chExt cx="0" cy="0"/>
+        </a:xfrm>
+      </p:grpSpPr>
+      <p:sp>
+        <p:nvSpPr>
+          <p:cNvPr id="2" name="Slide Image Placeholder 1"/>
+          <p:cNvSpPr>
+            <a:spLocks noGrp="1" noRot="1" noChangeAspect="1"/>
+          </p:cNvSpPr>
+          <p:nvPr>
+            <p:ph type="sldImg"/>
+          </p:nvPr>
+        </p:nvSpPr>
+        <p:spPr/>
+      </p:sp>
+      <p:sp>
+        <p:nvSpPr>
+          <p:cNvPr id="3" name="Notes Placeholder 2"/>
+          <p:cNvSpPr>
+            <a:spLocks noGrp="1"/>
+          </p:cNvSpPr>
+          <p:nvPr>
+            <p:ph type="body" idx="1"/>
+          </p:nvPr>
+        </p:nvSpPr>
+        <p:spPr/>
+        <p:txBody>
+          <a:bodyPr/>
+          <a:lstStyle/>
+          <a:p>
+            <a:endParaRPr lang="en-US" b="0" dirty="0" smtClean="0"/>
+          </a:p>
+        </p:txBody>
+      </p:sp>
+      <p:sp>
+        <p:nvSpPr>
+          <p:cNvPr id="4" name="Slide Number Placeholder 3"/>
+          <p:cNvSpPr>
+            <a:spLocks noGrp="1"/>
+          </p:cNvSpPr>
+          <p:nvPr>
+            <p:ph type="sldNum" sz="quarter" idx="10"/>
+          </p:nvPr>
+        </p:nvSpPr>
+        <p:spPr/>
+        <p:txBody>
+          <a:bodyPr/>
+          <a:lstStyle/>
+          <a:p>
+            <a:fld id="{89029652-62E7-43D6-83B5-097D7B7AA5D8}" type="slidenum">
+              <a:rPr lang="en-US" smtClean="0"/>
+              <a:t>51</a:t>
+            </a:fld>
+            <a:endParaRPr lang="en-US"/>
+          </a:p>
+        </p:txBody>
+      </p:sp>
+    </p:spTree>
+    <p:extLst>
+      <p:ext uri="{BB962C8B-B14F-4D97-AF65-F5344CB8AC3E}">
+        <p14:creationId xmlns:p14="http://schemas.microsoft.com/office/powerpoint/2010/main" val="3234596091"/>
+      </p:ext>
+    </p:extLst>
+  </p:cSld>
+  <p:clrMapOvr>
+    <a:masterClrMapping/>
+  </p:clrMapOvr>
+</p:notes>
+</file>
+
+<file path=ppt/notesSlides/notesSlide52.xml><?xml version="1.0" encoding="utf-8"?>
+<p:notes xmlns:a="http://schemas.openxmlformats.org/drawingml/2006/main" xmlns:r="http://schemas.openxmlformats.org/officeDocument/2006/relationships" xmlns:p="http://schemas.openxmlformats.org/presentationml/2006/main">
+  <p:cSld>
+    <p:spTree>
+      <p:nvGrpSpPr>
+        <p:cNvPr id="1" name=""/>
+        <p:cNvGrpSpPr/>
+        <p:nvPr/>
+      </p:nvGrpSpPr>
+      <p:grpSpPr>
+        <a:xfrm>
+          <a:off x="0" y="0"/>
+          <a:ext cx="0" cy="0"/>
+          <a:chOff x="0" y="0"/>
+          <a:chExt cx="0" cy="0"/>
+        </a:xfrm>
+      </p:grpSpPr>
+      <p:sp>
+        <p:nvSpPr>
+          <p:cNvPr id="2" name="Slide Image Placeholder 1"/>
+          <p:cNvSpPr>
+            <a:spLocks noGrp="1" noRot="1" noChangeAspect="1"/>
+          </p:cNvSpPr>
+          <p:nvPr>
+            <p:ph type="sldImg"/>
+          </p:nvPr>
+        </p:nvSpPr>
+        <p:spPr/>
+      </p:sp>
+      <p:sp>
+        <p:nvSpPr>
+          <p:cNvPr id="3" name="Notes Placeholder 2"/>
+          <p:cNvSpPr>
+            <a:spLocks noGrp="1"/>
+          </p:cNvSpPr>
+          <p:nvPr>
+            <p:ph type="body" idx="1"/>
+          </p:nvPr>
+        </p:nvSpPr>
+        <p:spPr/>
+        <p:txBody>
+          <a:bodyPr/>
+          <a:lstStyle/>
+          <a:p>
+            <a:endParaRPr lang="en-US" b="0" dirty="0" smtClean="0"/>
+          </a:p>
+        </p:txBody>
+      </p:sp>
+      <p:sp>
+        <p:nvSpPr>
+          <p:cNvPr id="4" name="Slide Number Placeholder 3"/>
+          <p:cNvSpPr>
+            <a:spLocks noGrp="1"/>
+          </p:cNvSpPr>
+          <p:nvPr>
+            <p:ph type="sldNum" sz="quarter" idx="10"/>
+          </p:nvPr>
+        </p:nvSpPr>
+        <p:spPr/>
+        <p:txBody>
+          <a:bodyPr/>
+          <a:lstStyle/>
+          <a:p>
+            <a:fld id="{89029652-62E7-43D6-83B5-097D7B7AA5D8}" type="slidenum">
+              <a:rPr lang="en-US" smtClean="0"/>
+              <a:t>52</a:t>
+            </a:fld>
+            <a:endParaRPr lang="en-US"/>
+          </a:p>
+        </p:txBody>
+      </p:sp>
+    </p:spTree>
+    <p:extLst>
+      <p:ext uri="{BB962C8B-B14F-4D97-AF65-F5344CB8AC3E}">
+        <p14:creationId xmlns:p14="http://schemas.microsoft.com/office/powerpoint/2010/main" val="3344468672"/>
+      </p:ext>
+    </p:extLst>
+  </p:cSld>
+  <p:clrMapOvr>
+    <a:masterClrMapping/>
+  </p:clrMapOvr>
+</p:notes>
+</file>
+
+<file path=ppt/notesSlides/notesSlide53.xml><?xml version="1.0" encoding="utf-8"?>
+<p:notes xmlns:a="http://schemas.openxmlformats.org/drawingml/2006/main" xmlns:r="http://schemas.openxmlformats.org/officeDocument/2006/relationships" xmlns:p="http://schemas.openxmlformats.org/presentationml/2006/main">
+  <p:cSld>
+    <p:spTree>
+      <p:nvGrpSpPr>
+        <p:cNvPr id="1" name=""/>
+        <p:cNvGrpSpPr/>
+        <p:nvPr/>
+      </p:nvGrpSpPr>
+      <p:grpSpPr>
+        <a:xfrm>
+          <a:off x="0" y="0"/>
+          <a:ext cx="0" cy="0"/>
+          <a:chOff x="0" y="0"/>
+          <a:chExt cx="0" cy="0"/>
+        </a:xfrm>
+      </p:grpSpPr>
+      <p:sp>
+        <p:nvSpPr>
+          <p:cNvPr id="2" name="Slide Image Placeholder 1"/>
+          <p:cNvSpPr>
+            <a:spLocks noGrp="1" noRot="1" noChangeAspect="1"/>
+          </p:cNvSpPr>
+          <p:nvPr>
+            <p:ph type="sldImg"/>
+          </p:nvPr>
+        </p:nvSpPr>
+        <p:spPr/>
+      </p:sp>
+      <p:sp>
+        <p:nvSpPr>
+          <p:cNvPr id="3" name="Notes Placeholder 2"/>
+          <p:cNvSpPr>
+            <a:spLocks noGrp="1"/>
+          </p:cNvSpPr>
+          <p:nvPr>
+            <p:ph type="body" idx="1"/>
+          </p:nvPr>
+        </p:nvSpPr>
+        <p:spPr/>
+        <p:txBody>
+          <a:bodyPr/>
+          <a:lstStyle/>
+          <a:p>
+            <a:endParaRPr lang="en-US" b="0" dirty="0" smtClean="0"/>
+          </a:p>
+        </p:txBody>
+      </p:sp>
+      <p:sp>
+        <p:nvSpPr>
+          <p:cNvPr id="4" name="Slide Number Placeholder 3"/>
+          <p:cNvSpPr>
+            <a:spLocks noGrp="1"/>
+          </p:cNvSpPr>
+          <p:nvPr>
+            <p:ph type="sldNum" sz="quarter" idx="10"/>
+          </p:nvPr>
+        </p:nvSpPr>
+        <p:spPr/>
+        <p:txBody>
+          <a:bodyPr/>
+          <a:lstStyle/>
+          <a:p>
+            <a:fld id="{89029652-62E7-43D6-83B5-097D7B7AA5D8}" type="slidenum">
+              <a:rPr lang="en-US" smtClean="0"/>
+              <a:t>53</a:t>
+            </a:fld>
+            <a:endParaRPr lang="en-US"/>
+          </a:p>
+        </p:txBody>
+      </p:sp>
+    </p:spTree>
+    <p:extLst>
+      <p:ext uri="{BB962C8B-B14F-4D97-AF65-F5344CB8AC3E}">
+        <p14:creationId xmlns:p14="http://schemas.microsoft.com/office/powerpoint/2010/main" val="3143393369"/>
+      </p:ext>
+    </p:extLst>
+  </p:cSld>
+  <p:clrMapOvr>
+    <a:masterClrMapping/>
+  </p:clrMapOvr>
+</p:notes>
+</file>
+
+<file path=ppt/notesSlides/notesSlide54.xml><?xml version="1.0" encoding="utf-8"?>
+<p:notes xmlns:a="http://schemas.openxmlformats.org/drawingml/2006/main" xmlns:r="http://schemas.openxmlformats.org/officeDocument/2006/relationships" xmlns:p="http://schemas.openxmlformats.org/presentationml/2006/main">
+  <p:cSld>
+    <p:spTree>
+      <p:nvGrpSpPr>
+        <p:cNvPr id="1" name=""/>
+        <p:cNvGrpSpPr/>
+        <p:nvPr/>
+      </p:nvGrpSpPr>
+      <p:grpSpPr>
+        <a:xfrm>
+          <a:off x="0" y="0"/>
+          <a:ext cx="0" cy="0"/>
+          <a:chOff x="0" y="0"/>
+          <a:chExt cx="0" cy="0"/>
+        </a:xfrm>
+      </p:grpSpPr>
+      <p:sp>
+        <p:nvSpPr>
+          <p:cNvPr id="2" name="Slide Image Placeholder 1"/>
+          <p:cNvSpPr>
+            <a:spLocks noGrp="1" noRot="1" noChangeAspect="1"/>
+          </p:cNvSpPr>
+          <p:nvPr>
+            <p:ph type="sldImg"/>
+          </p:nvPr>
+        </p:nvSpPr>
+        <p:spPr/>
+      </p:sp>
+      <p:sp>
+        <p:nvSpPr>
+          <p:cNvPr id="3" name="Notes Placeholder 2"/>
+          <p:cNvSpPr>
+            <a:spLocks noGrp="1"/>
+          </p:cNvSpPr>
+          <p:nvPr>
+            <p:ph type="body" idx="1"/>
+          </p:nvPr>
+        </p:nvSpPr>
+        <p:spPr/>
+        <p:txBody>
+          <a:bodyPr/>
+          <a:lstStyle/>
+          <a:p>
             <a:pPr marL="0" marR="0" indent="0" algn="l" defTabSz="914400" rtl="0" eaLnBrk="1" fontAlgn="auto" latinLnBrk="0" hangingPunct="1">
               <a:lnSpc>
                 <a:spcPct val="100000"/>
@@ -7214,7 +8290,7 @@
           <a:p>
             <a:fld id="{89029652-62E7-43D6-83B5-097D7B7AA5D8}" type="slidenum">
               <a:rPr lang="en-US" smtClean="0"/>
-              <a:t>50</a:t>
+              <a:t>54</a:t>
             </a:fld>
             <a:endParaRPr lang="en-US"/>
           </a:p>
@@ -7223,343 +8299,7 @@
     </p:spTree>
     <p:extLst>
       <p:ext uri="{BB962C8B-B14F-4D97-AF65-F5344CB8AC3E}">
-        <p14:creationId xmlns:p14="http://schemas.microsoft.com/office/powerpoint/2010/main" val="1704645259"/>
-      </p:ext>
-    </p:extLst>
-  </p:cSld>
-  <p:clrMapOvr>
-    <a:masterClrMapping/>
-  </p:clrMapOvr>
-</p:notes>
-</file>
-
-<file path=ppt/notesSlides/notesSlide51.xml><?xml version="1.0" encoding="utf-8"?>
-<p:notes xmlns:a="http://schemas.openxmlformats.org/drawingml/2006/main" xmlns:r="http://schemas.openxmlformats.org/officeDocument/2006/relationships" xmlns:p="http://schemas.openxmlformats.org/presentationml/2006/main">
-  <p:cSld>
-    <p:spTree>
-      <p:nvGrpSpPr>
-        <p:cNvPr id="1" name=""/>
-        <p:cNvGrpSpPr/>
-        <p:nvPr/>
-      </p:nvGrpSpPr>
-      <p:grpSpPr>
-        <a:xfrm>
-          <a:off x="0" y="0"/>
-          <a:ext cx="0" cy="0"/>
-          <a:chOff x="0" y="0"/>
-          <a:chExt cx="0" cy="0"/>
-        </a:xfrm>
-      </p:grpSpPr>
-      <p:sp>
-        <p:nvSpPr>
-          <p:cNvPr id="2" name="Slide Image Placeholder 1"/>
-          <p:cNvSpPr>
-            <a:spLocks noGrp="1" noRot="1" noChangeAspect="1"/>
-          </p:cNvSpPr>
-          <p:nvPr>
-            <p:ph type="sldImg"/>
-          </p:nvPr>
-        </p:nvSpPr>
-        <p:spPr/>
-      </p:sp>
-      <p:sp>
-        <p:nvSpPr>
-          <p:cNvPr id="3" name="Notes Placeholder 2"/>
-          <p:cNvSpPr>
-            <a:spLocks noGrp="1"/>
-          </p:cNvSpPr>
-          <p:nvPr>
-            <p:ph type="body" idx="1"/>
-          </p:nvPr>
-        </p:nvSpPr>
-        <p:spPr/>
-        <p:txBody>
-          <a:bodyPr/>
-          <a:lstStyle/>
-          <a:p>
-            <a:endParaRPr lang="en-US" b="0" dirty="0" smtClean="0"/>
-          </a:p>
-        </p:txBody>
-      </p:sp>
-      <p:sp>
-        <p:nvSpPr>
-          <p:cNvPr id="4" name="Slide Number Placeholder 3"/>
-          <p:cNvSpPr>
-            <a:spLocks noGrp="1"/>
-          </p:cNvSpPr>
-          <p:nvPr>
-            <p:ph type="sldNum" sz="quarter" idx="10"/>
-          </p:nvPr>
-        </p:nvSpPr>
-        <p:spPr/>
-        <p:txBody>
-          <a:bodyPr/>
-          <a:lstStyle/>
-          <a:p>
-            <a:fld id="{89029652-62E7-43D6-83B5-097D7B7AA5D8}" type="slidenum">
-              <a:rPr lang="en-US" smtClean="0"/>
-              <a:t>51</a:t>
-            </a:fld>
-            <a:endParaRPr lang="en-US"/>
-          </a:p>
-        </p:txBody>
-      </p:sp>
-    </p:spTree>
-    <p:extLst>
-      <p:ext uri="{BB962C8B-B14F-4D97-AF65-F5344CB8AC3E}">
-        <p14:creationId xmlns:p14="http://schemas.microsoft.com/office/powerpoint/2010/main" val="381415188"/>
-      </p:ext>
-    </p:extLst>
-  </p:cSld>
-  <p:clrMapOvr>
-    <a:masterClrMapping/>
-  </p:clrMapOvr>
-</p:notes>
-</file>
-
-<file path=ppt/notesSlides/notesSlide52.xml><?xml version="1.0" encoding="utf-8"?>
-<p:notes xmlns:a="http://schemas.openxmlformats.org/drawingml/2006/main" xmlns:r="http://schemas.openxmlformats.org/officeDocument/2006/relationships" xmlns:p="http://schemas.openxmlformats.org/presentationml/2006/main">
-  <p:cSld>
-    <p:spTree>
-      <p:nvGrpSpPr>
-        <p:cNvPr id="1" name=""/>
-        <p:cNvGrpSpPr/>
-        <p:nvPr/>
-      </p:nvGrpSpPr>
-      <p:grpSpPr>
-        <a:xfrm>
-          <a:off x="0" y="0"/>
-          <a:ext cx="0" cy="0"/>
-          <a:chOff x="0" y="0"/>
-          <a:chExt cx="0" cy="0"/>
-        </a:xfrm>
-      </p:grpSpPr>
-      <p:sp>
-        <p:nvSpPr>
-          <p:cNvPr id="2" name="Slide Image Placeholder 1"/>
-          <p:cNvSpPr>
-            <a:spLocks noGrp="1" noRot="1" noChangeAspect="1"/>
-          </p:cNvSpPr>
-          <p:nvPr>
-            <p:ph type="sldImg"/>
-          </p:nvPr>
-        </p:nvSpPr>
-        <p:spPr/>
-      </p:sp>
-      <p:sp>
-        <p:nvSpPr>
-          <p:cNvPr id="3" name="Notes Placeholder 2"/>
-          <p:cNvSpPr>
-            <a:spLocks noGrp="1"/>
-          </p:cNvSpPr>
-          <p:nvPr>
-            <p:ph type="body" idx="1"/>
-          </p:nvPr>
-        </p:nvSpPr>
-        <p:spPr/>
-        <p:txBody>
-          <a:bodyPr/>
-          <a:lstStyle/>
-          <a:p>
-            <a:endParaRPr lang="en-US" b="0" dirty="0" smtClean="0"/>
-          </a:p>
-        </p:txBody>
-      </p:sp>
-      <p:sp>
-        <p:nvSpPr>
-          <p:cNvPr id="4" name="Slide Number Placeholder 3"/>
-          <p:cNvSpPr>
-            <a:spLocks noGrp="1"/>
-          </p:cNvSpPr>
-          <p:nvPr>
-            <p:ph type="sldNum" sz="quarter" idx="10"/>
-          </p:nvPr>
-        </p:nvSpPr>
-        <p:spPr/>
-        <p:txBody>
-          <a:bodyPr/>
-          <a:lstStyle/>
-          <a:p>
-            <a:fld id="{89029652-62E7-43D6-83B5-097D7B7AA5D8}" type="slidenum">
-              <a:rPr lang="en-US" smtClean="0"/>
-              <a:t>52</a:t>
-            </a:fld>
-            <a:endParaRPr lang="en-US"/>
-          </a:p>
-        </p:txBody>
-      </p:sp>
-    </p:spTree>
-    <p:extLst>
-      <p:ext uri="{BB962C8B-B14F-4D97-AF65-F5344CB8AC3E}">
-        <p14:creationId xmlns:p14="http://schemas.microsoft.com/office/powerpoint/2010/main" val="3234596091"/>
-      </p:ext>
-    </p:extLst>
-  </p:cSld>
-  <p:clrMapOvr>
-    <a:masterClrMapping/>
-  </p:clrMapOvr>
-</p:notes>
-</file>
-
-<file path=ppt/notesSlides/notesSlide53.xml><?xml version="1.0" encoding="utf-8"?>
-<p:notes xmlns:a="http://schemas.openxmlformats.org/drawingml/2006/main" xmlns:r="http://schemas.openxmlformats.org/officeDocument/2006/relationships" xmlns:p="http://schemas.openxmlformats.org/presentationml/2006/main">
-  <p:cSld>
-    <p:spTree>
-      <p:nvGrpSpPr>
-        <p:cNvPr id="1" name=""/>
-        <p:cNvGrpSpPr/>
-        <p:nvPr/>
-      </p:nvGrpSpPr>
-      <p:grpSpPr>
-        <a:xfrm>
-          <a:off x="0" y="0"/>
-          <a:ext cx="0" cy="0"/>
-          <a:chOff x="0" y="0"/>
-          <a:chExt cx="0" cy="0"/>
-        </a:xfrm>
-      </p:grpSpPr>
-      <p:sp>
-        <p:nvSpPr>
-          <p:cNvPr id="2" name="Slide Image Placeholder 1"/>
-          <p:cNvSpPr>
-            <a:spLocks noGrp="1" noRot="1" noChangeAspect="1"/>
-          </p:cNvSpPr>
-          <p:nvPr>
-            <p:ph type="sldImg"/>
-          </p:nvPr>
-        </p:nvSpPr>
-        <p:spPr/>
-      </p:sp>
-      <p:sp>
-        <p:nvSpPr>
-          <p:cNvPr id="3" name="Notes Placeholder 2"/>
-          <p:cNvSpPr>
-            <a:spLocks noGrp="1"/>
-          </p:cNvSpPr>
-          <p:nvPr>
-            <p:ph type="body" idx="1"/>
-          </p:nvPr>
-        </p:nvSpPr>
-        <p:spPr/>
-        <p:txBody>
-          <a:bodyPr/>
-          <a:lstStyle/>
-          <a:p>
-            <a:endParaRPr lang="en-US" b="0" dirty="0" smtClean="0"/>
-          </a:p>
-        </p:txBody>
-      </p:sp>
-      <p:sp>
-        <p:nvSpPr>
-          <p:cNvPr id="4" name="Slide Number Placeholder 3"/>
-          <p:cNvSpPr>
-            <a:spLocks noGrp="1"/>
-          </p:cNvSpPr>
-          <p:nvPr>
-            <p:ph type="sldNum" sz="quarter" idx="10"/>
-          </p:nvPr>
-        </p:nvSpPr>
-        <p:spPr/>
-        <p:txBody>
-          <a:bodyPr/>
-          <a:lstStyle/>
-          <a:p>
-            <a:fld id="{89029652-62E7-43D6-83B5-097D7B7AA5D8}" type="slidenum">
-              <a:rPr lang="en-US" smtClean="0"/>
-              <a:t>53</a:t>
-            </a:fld>
-            <a:endParaRPr lang="en-US"/>
-          </a:p>
-        </p:txBody>
-      </p:sp>
-    </p:spTree>
-    <p:extLst>
-      <p:ext uri="{BB962C8B-B14F-4D97-AF65-F5344CB8AC3E}">
-        <p14:creationId xmlns:p14="http://schemas.microsoft.com/office/powerpoint/2010/main" val="3344468672"/>
-      </p:ext>
-    </p:extLst>
-  </p:cSld>
-  <p:clrMapOvr>
-    <a:masterClrMapping/>
-  </p:clrMapOvr>
-</p:notes>
-</file>
-
-<file path=ppt/notesSlides/notesSlide54.xml><?xml version="1.0" encoding="utf-8"?>
-<p:notes xmlns:a="http://schemas.openxmlformats.org/drawingml/2006/main" xmlns:r="http://schemas.openxmlformats.org/officeDocument/2006/relationships" xmlns:p="http://schemas.openxmlformats.org/presentationml/2006/main">
-  <p:cSld>
-    <p:spTree>
-      <p:nvGrpSpPr>
-        <p:cNvPr id="1" name=""/>
-        <p:cNvGrpSpPr/>
-        <p:nvPr/>
-      </p:nvGrpSpPr>
-      <p:grpSpPr>
-        <a:xfrm>
-          <a:off x="0" y="0"/>
-          <a:ext cx="0" cy="0"/>
-          <a:chOff x="0" y="0"/>
-          <a:chExt cx="0" cy="0"/>
-        </a:xfrm>
-      </p:grpSpPr>
-      <p:sp>
-        <p:nvSpPr>
-          <p:cNvPr id="2" name="Slide Image Placeholder 1"/>
-          <p:cNvSpPr>
-            <a:spLocks noGrp="1" noRot="1" noChangeAspect="1"/>
-          </p:cNvSpPr>
-          <p:nvPr>
-            <p:ph type="sldImg"/>
-          </p:nvPr>
-        </p:nvSpPr>
-        <p:spPr/>
-      </p:sp>
-      <p:sp>
-        <p:nvSpPr>
-          <p:cNvPr id="3" name="Notes Placeholder 2"/>
-          <p:cNvSpPr>
-            <a:spLocks noGrp="1"/>
-          </p:cNvSpPr>
-          <p:nvPr>
-            <p:ph type="body" idx="1"/>
-          </p:nvPr>
-        </p:nvSpPr>
-        <p:spPr/>
-        <p:txBody>
-          <a:bodyPr/>
-          <a:lstStyle/>
-          <a:p>
-            <a:endParaRPr lang="en-US" b="0" dirty="0" smtClean="0"/>
-          </a:p>
-        </p:txBody>
-      </p:sp>
-      <p:sp>
-        <p:nvSpPr>
-          <p:cNvPr id="4" name="Slide Number Placeholder 3"/>
-          <p:cNvSpPr>
-            <a:spLocks noGrp="1"/>
-          </p:cNvSpPr>
-          <p:nvPr>
-            <p:ph type="sldNum" sz="quarter" idx="10"/>
-          </p:nvPr>
-        </p:nvSpPr>
-        <p:spPr/>
-        <p:txBody>
-          <a:bodyPr/>
-          <a:lstStyle/>
-          <a:p>
-            <a:fld id="{89029652-62E7-43D6-83B5-097D7B7AA5D8}" type="slidenum">
-              <a:rPr lang="en-US" smtClean="0"/>
-              <a:t>54</a:t>
-            </a:fld>
-            <a:endParaRPr lang="en-US"/>
-          </a:p>
-        </p:txBody>
-      </p:sp>
-    </p:spTree>
-    <p:extLst>
-      <p:ext uri="{BB962C8B-B14F-4D97-AF65-F5344CB8AC3E}">
-        <p14:creationId xmlns:p14="http://schemas.microsoft.com/office/powerpoint/2010/main" val="3143393369"/>
+        <p14:creationId xmlns:p14="http://schemas.microsoft.com/office/powerpoint/2010/main" val="1557858908"/>
       </p:ext>
     </p:extLst>
   </p:cSld>
@@ -7613,32 +8353,7 @@
           <a:bodyPr/>
           <a:lstStyle/>
           <a:p>
-            <a:pPr marL="0" marR="0" indent="0" algn="l" defTabSz="914400" rtl="0" eaLnBrk="1" fontAlgn="auto" latinLnBrk="0" hangingPunct="1">
-              <a:lnSpc>
-                <a:spcPct val="100000"/>
-              </a:lnSpc>
-              <a:spcBef>
-                <a:spcPts val="0"/>
-              </a:spcBef>
-              <a:spcAft>
-                <a:spcPts val="0"/>
-              </a:spcAft>
-              <a:buClrTx/>
-              <a:buSzTx/>
-              <a:buFontTx/>
-              <a:buNone/>
-              <a:tabLst/>
-              <a:defRPr/>
-            </a:pPr>
-            <a:endParaRPr lang="en-US" sz="1200" kern="1200" dirty="0" smtClean="0">
-              <a:solidFill>
-                <a:schemeClr val="tx1"/>
-              </a:solidFill>
-              <a:effectLst/>
-              <a:latin typeface="+mn-lt"/>
-              <a:ea typeface="+mn-ea"/>
-              <a:cs typeface="+mn-cs"/>
-            </a:endParaRPr>
+            <a:endParaRPr lang="en-US" b="0" dirty="0" smtClean="0"/>
           </a:p>
         </p:txBody>
       </p:sp>
@@ -7668,7 +8383,7 @@
     </p:spTree>
     <p:extLst>
       <p:ext uri="{BB962C8B-B14F-4D97-AF65-F5344CB8AC3E}">
-        <p14:creationId xmlns:p14="http://schemas.microsoft.com/office/powerpoint/2010/main" val="1557858908"/>
+        <p14:creationId xmlns:p14="http://schemas.microsoft.com/office/powerpoint/2010/main" val="3450469856"/>
       </p:ext>
     </p:extLst>
   </p:cSld>
@@ -7752,7 +8467,7 @@
     </p:spTree>
     <p:extLst>
       <p:ext uri="{BB962C8B-B14F-4D97-AF65-F5344CB8AC3E}">
-        <p14:creationId xmlns:p14="http://schemas.microsoft.com/office/powerpoint/2010/main" val="3450469856"/>
+        <p14:creationId xmlns:p14="http://schemas.microsoft.com/office/powerpoint/2010/main" val="2647091800"/>
       </p:ext>
     </p:extLst>
   </p:cSld>
@@ -7836,7 +8551,7 @@
     </p:spTree>
     <p:extLst>
       <p:ext uri="{BB962C8B-B14F-4D97-AF65-F5344CB8AC3E}">
-        <p14:creationId xmlns:p14="http://schemas.microsoft.com/office/powerpoint/2010/main" val="2647091800"/>
+        <p14:creationId xmlns:p14="http://schemas.microsoft.com/office/powerpoint/2010/main" val="2829916917"/>
       </p:ext>
     </p:extLst>
   </p:cSld>
@@ -7920,7 +8635,7 @@
     </p:spTree>
     <p:extLst>
       <p:ext uri="{BB962C8B-B14F-4D97-AF65-F5344CB8AC3E}">
-        <p14:creationId xmlns:p14="http://schemas.microsoft.com/office/powerpoint/2010/main" val="2829916917"/>
+        <p14:creationId xmlns:p14="http://schemas.microsoft.com/office/powerpoint/2010/main" val="1954400629"/>
       </p:ext>
     </p:extLst>
   </p:cSld>
@@ -8004,7 +8719,7 @@
     </p:spTree>
     <p:extLst>
       <p:ext uri="{BB962C8B-B14F-4D97-AF65-F5344CB8AC3E}">
-        <p14:creationId xmlns:p14="http://schemas.microsoft.com/office/powerpoint/2010/main" val="1954400629"/>
+        <p14:creationId xmlns:p14="http://schemas.microsoft.com/office/powerpoint/2010/main" val="3603726692"/>
       </p:ext>
     </p:extLst>
   </p:cSld>
@@ -8366,7 +9081,7 @@
     </p:spTree>
     <p:extLst>
       <p:ext uri="{BB962C8B-B14F-4D97-AF65-F5344CB8AC3E}">
-        <p14:creationId xmlns:p14="http://schemas.microsoft.com/office/powerpoint/2010/main" val="3603726692"/>
+        <p14:creationId xmlns:p14="http://schemas.microsoft.com/office/powerpoint/2010/main" val="1764780958"/>
       </p:ext>
     </p:extLst>
   </p:cSld>
@@ -8420,7 +9135,32 @@
           <a:bodyPr/>
           <a:lstStyle/>
           <a:p>
-            <a:endParaRPr lang="en-US" b="0" dirty="0" smtClean="0"/>
+            <a:pPr marL="0" marR="0" indent="0" algn="l" defTabSz="914400" rtl="0" eaLnBrk="1" fontAlgn="auto" latinLnBrk="0" hangingPunct="1">
+              <a:lnSpc>
+                <a:spcPct val="100000"/>
+              </a:lnSpc>
+              <a:spcBef>
+                <a:spcPts val="0"/>
+              </a:spcBef>
+              <a:spcAft>
+                <a:spcPts val="0"/>
+              </a:spcAft>
+              <a:buClrTx/>
+              <a:buSzTx/>
+              <a:buFontTx/>
+              <a:buNone/>
+              <a:tabLst/>
+              <a:defRPr/>
+            </a:pPr>
+            <a:endParaRPr lang="en-US" sz="1200" kern="1200" dirty="0" smtClean="0">
+              <a:solidFill>
+                <a:schemeClr val="tx1"/>
+              </a:solidFill>
+              <a:effectLst/>
+              <a:latin typeface="+mn-lt"/>
+              <a:ea typeface="+mn-ea"/>
+              <a:cs typeface="+mn-cs"/>
+            </a:endParaRPr>
           </a:p>
         </p:txBody>
       </p:sp>
@@ -8450,7 +9190,7 @@
     </p:spTree>
     <p:extLst>
       <p:ext uri="{BB962C8B-B14F-4D97-AF65-F5344CB8AC3E}">
-        <p14:creationId xmlns:p14="http://schemas.microsoft.com/office/powerpoint/2010/main" val="1764780958"/>
+        <p14:creationId xmlns:p14="http://schemas.microsoft.com/office/powerpoint/2010/main" val="1923953829"/>
       </p:ext>
     </p:extLst>
   </p:cSld>
@@ -8504,32 +9244,7 @@
           <a:bodyPr/>
           <a:lstStyle/>
           <a:p>
-            <a:pPr marL="0" marR="0" indent="0" algn="l" defTabSz="914400" rtl="0" eaLnBrk="1" fontAlgn="auto" latinLnBrk="0" hangingPunct="1">
-              <a:lnSpc>
-                <a:spcPct val="100000"/>
-              </a:lnSpc>
-              <a:spcBef>
-                <a:spcPts val="0"/>
-              </a:spcBef>
-              <a:spcAft>
-                <a:spcPts val="0"/>
-              </a:spcAft>
-              <a:buClrTx/>
-              <a:buSzTx/>
-              <a:buFontTx/>
-              <a:buNone/>
-              <a:tabLst/>
-              <a:defRPr/>
-            </a:pPr>
-            <a:endParaRPr lang="en-US" sz="1200" kern="1200" dirty="0" smtClean="0">
-              <a:solidFill>
-                <a:schemeClr val="tx1"/>
-              </a:solidFill>
-              <a:effectLst/>
-              <a:latin typeface="+mn-lt"/>
-              <a:ea typeface="+mn-ea"/>
-              <a:cs typeface="+mn-cs"/>
-            </a:endParaRPr>
+            <a:endParaRPr lang="en-US" b="0" dirty="0" smtClean="0"/>
           </a:p>
         </p:txBody>
       </p:sp>
@@ -8559,7 +9274,7 @@
     </p:spTree>
     <p:extLst>
       <p:ext uri="{BB962C8B-B14F-4D97-AF65-F5344CB8AC3E}">
-        <p14:creationId xmlns:p14="http://schemas.microsoft.com/office/powerpoint/2010/main" val="1923953829"/>
+        <p14:creationId xmlns:p14="http://schemas.microsoft.com/office/powerpoint/2010/main" val="531577243"/>
       </p:ext>
     </p:extLst>
   </p:cSld>
@@ -8643,7 +9358,7 @@
     </p:spTree>
     <p:extLst>
       <p:ext uri="{BB962C8B-B14F-4D97-AF65-F5344CB8AC3E}">
-        <p14:creationId xmlns:p14="http://schemas.microsoft.com/office/powerpoint/2010/main" val="531577243"/>
+        <p14:creationId xmlns:p14="http://schemas.microsoft.com/office/powerpoint/2010/main" val="2079785236"/>
       </p:ext>
     </p:extLst>
   </p:cSld>
@@ -8727,7 +9442,7 @@
     </p:spTree>
     <p:extLst>
       <p:ext uri="{BB962C8B-B14F-4D97-AF65-F5344CB8AC3E}">
-        <p14:creationId xmlns:p14="http://schemas.microsoft.com/office/powerpoint/2010/main" val="2079785236"/>
+        <p14:creationId xmlns:p14="http://schemas.microsoft.com/office/powerpoint/2010/main" val="1664318980"/>
       </p:ext>
     </p:extLst>
   </p:cSld>
@@ -8811,7 +9526,7 @@
     </p:spTree>
     <p:extLst>
       <p:ext uri="{BB962C8B-B14F-4D97-AF65-F5344CB8AC3E}">
-        <p14:creationId xmlns:p14="http://schemas.microsoft.com/office/powerpoint/2010/main" val="1664318980"/>
+        <p14:creationId xmlns:p14="http://schemas.microsoft.com/office/powerpoint/2010/main" val="1581406028"/>
       </p:ext>
     </p:extLst>
   </p:cSld>
@@ -8895,7 +9610,7 @@
     </p:spTree>
     <p:extLst>
       <p:ext uri="{BB962C8B-B14F-4D97-AF65-F5344CB8AC3E}">
-        <p14:creationId xmlns:p14="http://schemas.microsoft.com/office/powerpoint/2010/main" val="1581406028"/>
+        <p14:creationId xmlns:p14="http://schemas.microsoft.com/office/powerpoint/2010/main" val="299799724"/>
       </p:ext>
     </p:extLst>
   </p:cSld>
@@ -8979,7 +9694,7 @@
     </p:spTree>
     <p:extLst>
       <p:ext uri="{BB962C8B-B14F-4D97-AF65-F5344CB8AC3E}">
-        <p14:creationId xmlns:p14="http://schemas.microsoft.com/office/powerpoint/2010/main" val="299799724"/>
+        <p14:creationId xmlns:p14="http://schemas.microsoft.com/office/powerpoint/2010/main" val="2229440876"/>
       </p:ext>
     </p:extLst>
   </p:cSld>
@@ -9063,7 +9778,7 @@
     </p:spTree>
     <p:extLst>
       <p:ext uri="{BB962C8B-B14F-4D97-AF65-F5344CB8AC3E}">
-        <p14:creationId xmlns:p14="http://schemas.microsoft.com/office/powerpoint/2010/main" val="2229440876"/>
+        <p14:creationId xmlns:p14="http://schemas.microsoft.com/office/powerpoint/2010/main" val="2350728921"/>
       </p:ext>
     </p:extLst>
   </p:cSld>
@@ -9147,7 +9862,7 @@
     </p:spTree>
     <p:extLst>
       <p:ext uri="{BB962C8B-B14F-4D97-AF65-F5344CB8AC3E}">
-        <p14:creationId xmlns:p14="http://schemas.microsoft.com/office/powerpoint/2010/main" val="2350728921"/>
+        <p14:creationId xmlns:p14="http://schemas.microsoft.com/office/powerpoint/2010/main" val="1004591723"/>
       </p:ext>
     </p:extLst>
   </p:cSld>
@@ -9370,7 +10085,7 @@
     </p:spTree>
     <p:extLst>
       <p:ext uri="{BB962C8B-B14F-4D97-AF65-F5344CB8AC3E}">
-        <p14:creationId xmlns:p14="http://schemas.microsoft.com/office/powerpoint/2010/main" val="1004591723"/>
+        <p14:creationId xmlns:p14="http://schemas.microsoft.com/office/powerpoint/2010/main" val="1737165775"/>
       </p:ext>
     </p:extLst>
   </p:cSld>
@@ -9454,7 +10169,7 @@
     </p:spTree>
     <p:extLst>
       <p:ext uri="{BB962C8B-B14F-4D97-AF65-F5344CB8AC3E}">
-        <p14:creationId xmlns:p14="http://schemas.microsoft.com/office/powerpoint/2010/main" val="1737165775"/>
+        <p14:creationId xmlns:p14="http://schemas.microsoft.com/office/powerpoint/2010/main" val="1030293071"/>
       </p:ext>
     </p:extLst>
   </p:cSld>
@@ -9538,7 +10253,7 @@
     </p:spTree>
     <p:extLst>
       <p:ext uri="{BB962C8B-B14F-4D97-AF65-F5344CB8AC3E}">
-        <p14:creationId xmlns:p14="http://schemas.microsoft.com/office/powerpoint/2010/main" val="1030293071"/>
+        <p14:creationId xmlns:p14="http://schemas.microsoft.com/office/powerpoint/2010/main" val="834707851"/>
       </p:ext>
     </p:extLst>
   </p:cSld>
@@ -9592,7 +10307,32 @@
           <a:bodyPr/>
           <a:lstStyle/>
           <a:p>
-            <a:endParaRPr lang="en-US" b="0" dirty="0" smtClean="0"/>
+            <a:pPr marL="0" marR="0" indent="0" algn="l" defTabSz="914400" rtl="0" eaLnBrk="1" fontAlgn="auto" latinLnBrk="0" hangingPunct="1">
+              <a:lnSpc>
+                <a:spcPct val="100000"/>
+              </a:lnSpc>
+              <a:spcBef>
+                <a:spcPts val="0"/>
+              </a:spcBef>
+              <a:spcAft>
+                <a:spcPts val="0"/>
+              </a:spcAft>
+              <a:buClrTx/>
+              <a:buSzTx/>
+              <a:buFontTx/>
+              <a:buNone/>
+              <a:tabLst/>
+              <a:defRPr/>
+            </a:pPr>
+            <a:endParaRPr lang="en-US" sz="1200" kern="1200" dirty="0" smtClean="0">
+              <a:solidFill>
+                <a:schemeClr val="tx1"/>
+              </a:solidFill>
+              <a:effectLst/>
+              <a:latin typeface="+mn-lt"/>
+              <a:ea typeface="+mn-ea"/>
+              <a:cs typeface="+mn-cs"/>
+            </a:endParaRPr>
           </a:p>
         </p:txBody>
       </p:sp>
@@ -9622,7 +10362,7 @@
     </p:spTree>
     <p:extLst>
       <p:ext uri="{BB962C8B-B14F-4D97-AF65-F5344CB8AC3E}">
-        <p14:creationId xmlns:p14="http://schemas.microsoft.com/office/powerpoint/2010/main" val="834707851"/>
+        <p14:creationId xmlns:p14="http://schemas.microsoft.com/office/powerpoint/2010/main" val="4095300961"/>
       </p:ext>
     </p:extLst>
   </p:cSld>
@@ -9676,32 +10416,7 @@
           <a:bodyPr/>
           <a:lstStyle/>
           <a:p>
-            <a:pPr marL="0" marR="0" indent="0" algn="l" defTabSz="914400" rtl="0" eaLnBrk="1" fontAlgn="auto" latinLnBrk="0" hangingPunct="1">
-              <a:lnSpc>
-                <a:spcPct val="100000"/>
-              </a:lnSpc>
-              <a:spcBef>
-                <a:spcPts val="0"/>
-              </a:spcBef>
-              <a:spcAft>
-                <a:spcPts val="0"/>
-              </a:spcAft>
-              <a:buClrTx/>
-              <a:buSzTx/>
-              <a:buFontTx/>
-              <a:buNone/>
-              <a:tabLst/>
-              <a:defRPr/>
-            </a:pPr>
-            <a:endParaRPr lang="en-US" sz="1200" kern="1200" dirty="0" smtClean="0">
-              <a:solidFill>
-                <a:schemeClr val="tx1"/>
-              </a:solidFill>
-              <a:effectLst/>
-              <a:latin typeface="+mn-lt"/>
-              <a:ea typeface="+mn-ea"/>
-              <a:cs typeface="+mn-cs"/>
-            </a:endParaRPr>
+            <a:endParaRPr lang="en-US" b="0" dirty="0" smtClean="0"/>
           </a:p>
         </p:txBody>
       </p:sp>
@@ -9723,90 +10438,6 @@
             <a:fld id="{89029652-62E7-43D6-83B5-097D7B7AA5D8}" type="slidenum">
               <a:rPr lang="en-US" smtClean="0"/>
               <a:t>74</a:t>
-            </a:fld>
-            <a:endParaRPr lang="en-US"/>
-          </a:p>
-        </p:txBody>
-      </p:sp>
-    </p:spTree>
-    <p:extLst>
-      <p:ext uri="{BB962C8B-B14F-4D97-AF65-F5344CB8AC3E}">
-        <p14:creationId xmlns:p14="http://schemas.microsoft.com/office/powerpoint/2010/main" val="4095300961"/>
-      </p:ext>
-    </p:extLst>
-  </p:cSld>
-  <p:clrMapOvr>
-    <a:masterClrMapping/>
-  </p:clrMapOvr>
-</p:notes>
-</file>
-
-<file path=ppt/notesSlides/notesSlide75.xml><?xml version="1.0" encoding="utf-8"?>
-<p:notes xmlns:a="http://schemas.openxmlformats.org/drawingml/2006/main" xmlns:r="http://schemas.openxmlformats.org/officeDocument/2006/relationships" xmlns:p="http://schemas.openxmlformats.org/presentationml/2006/main">
-  <p:cSld>
-    <p:spTree>
-      <p:nvGrpSpPr>
-        <p:cNvPr id="1" name=""/>
-        <p:cNvGrpSpPr/>
-        <p:nvPr/>
-      </p:nvGrpSpPr>
-      <p:grpSpPr>
-        <a:xfrm>
-          <a:off x="0" y="0"/>
-          <a:ext cx="0" cy="0"/>
-          <a:chOff x="0" y="0"/>
-          <a:chExt cx="0" cy="0"/>
-        </a:xfrm>
-      </p:grpSpPr>
-      <p:sp>
-        <p:nvSpPr>
-          <p:cNvPr id="2" name="Slide Image Placeholder 1"/>
-          <p:cNvSpPr>
-            <a:spLocks noGrp="1" noRot="1" noChangeAspect="1"/>
-          </p:cNvSpPr>
-          <p:nvPr>
-            <p:ph type="sldImg"/>
-          </p:nvPr>
-        </p:nvSpPr>
-        <p:spPr/>
-      </p:sp>
-      <p:sp>
-        <p:nvSpPr>
-          <p:cNvPr id="3" name="Notes Placeholder 2"/>
-          <p:cNvSpPr>
-            <a:spLocks noGrp="1"/>
-          </p:cNvSpPr>
-          <p:nvPr>
-            <p:ph type="body" idx="1"/>
-          </p:nvPr>
-        </p:nvSpPr>
-        <p:spPr/>
-        <p:txBody>
-          <a:bodyPr/>
-          <a:lstStyle/>
-          <a:p>
-            <a:endParaRPr lang="en-US" b="0" dirty="0" smtClean="0"/>
-          </a:p>
-        </p:txBody>
-      </p:sp>
-      <p:sp>
-        <p:nvSpPr>
-          <p:cNvPr id="4" name="Slide Number Placeholder 3"/>
-          <p:cNvSpPr>
-            <a:spLocks noGrp="1"/>
-          </p:cNvSpPr>
-          <p:nvPr>
-            <p:ph type="sldNum" sz="quarter" idx="10"/>
-          </p:nvPr>
-        </p:nvSpPr>
-        <p:spPr/>
-        <p:txBody>
-          <a:bodyPr/>
-          <a:lstStyle/>
-          <a:p>
-            <a:fld id="{89029652-62E7-43D6-83B5-097D7B7AA5D8}" type="slidenum">
-              <a:rPr lang="en-US" smtClean="0"/>
-              <a:t>75</a:t>
             </a:fld>
             <a:endParaRPr lang="en-US"/>
           </a:p>
@@ -13251,24 +13882,37 @@
           <a:lstStyle/>
           <a:p>
             <a:r>
-              <a:rPr lang="en-US" sz="4000" dirty="0" smtClean="0"/>
+              <a:rPr lang="en-US" sz="4000" dirty="0"/>
               <a:t>MVC </a:t>
             </a:r>
             <a:r>
-              <a:rPr lang="en-US" sz="4000" dirty="0" err="1" smtClean="0"/>
+              <a:rPr lang="en-US" sz="4000" dirty="0" err="1"/>
               <a:t>ActionFilter</a:t>
             </a:r>
             <a:r>
-              <a:rPr lang="en-US" sz="4000" dirty="0" smtClean="0"/>
+              <a:rPr lang="en-US" sz="4000" dirty="0"/>
               <a:t> attributes (</a:t>
             </a:r>
             <a:r>
-              <a:rPr lang="en-US" sz="4000" i="1" dirty="0" err="1" smtClean="0"/>
+              <a:rPr lang="en-US" sz="4000" i="1" dirty="0" err="1"/>
               <a:t>OnActionExecuting</a:t>
             </a:r>
             <a:r>
               <a:rPr lang="en-US" sz="4000" i="1" dirty="0" smtClean="0"/>
               <a:t>)</a:t>
+            </a:r>
+          </a:p>
+          <a:p>
+            <a:endParaRPr lang="en-US" sz="4000" dirty="0" smtClean="0"/>
+          </a:p>
+          <a:p>
+            <a:r>
+              <a:rPr lang="en-US" sz="4000" dirty="0" smtClean="0"/>
+              <a:t>ASP.NET HTTP Modules</a:t>
+            </a:r>
+            <a:r>
+              <a:rPr lang="en-US" sz="4000" i="1" dirty="0" smtClean="0"/>
+              <a:t/>
             </a:r>
             <a:br>
               <a:rPr lang="en-US" sz="4000" i="1" dirty="0" smtClean="0"/>
@@ -13278,35 +13922,30 @@
           <a:p>
             <a:r>
               <a:rPr lang="en-US" sz="4000" dirty="0"/>
-              <a:t>jQuery AJAX events (</a:t>
-            </a:r>
-            <a:r>
-              <a:rPr lang="en-US" sz="4000" i="1" dirty="0" err="1"/>
+              <a:t>jQuery AJAX </a:t>
+            </a:r>
+            <a:r>
+              <a:rPr lang="en-US" sz="4000" dirty="0" smtClean="0"/>
+              <a:t>events (</a:t>
+            </a:r>
+            <a:r>
+              <a:rPr lang="en-US" sz="4000" i="1" dirty="0" err="1" smtClean="0"/>
               <a:t>ajaxStart</a:t>
             </a:r>
             <a:r>
-              <a:rPr lang="en-US" sz="4000" i="1" dirty="0"/>
+              <a:rPr lang="en-US" sz="4000" i="1" dirty="0" smtClean="0"/>
               <a:t>, </a:t>
             </a:r>
             <a:r>
-              <a:rPr lang="en-US" sz="4000" i="1" dirty="0" err="1"/>
-              <a:t>ajaxEnd</a:t>
-            </a:r>
-            <a:r>
-              <a:rPr lang="en-US" sz="4000" i="1" dirty="0"/>
-              <a:t>, </a:t>
-            </a:r>
-            <a:r>
-              <a:rPr lang="en-US" sz="4000" i="1" dirty="0" err="1"/>
-              <a:t>ajaxPrefilter</a:t>
-            </a:r>
-            <a:r>
-              <a:rPr lang="en-US" sz="4000" i="1" dirty="0"/>
+              <a:rPr lang="en-US" sz="4000" i="1" dirty="0" err="1" smtClean="0"/>
+              <a:t>ajaxEnd,etc</a:t>
+            </a:r>
+            <a:r>
+              <a:rPr lang="en-US" sz="4000" i="1" dirty="0" smtClean="0"/>
               <a:t>)</a:t>
             </a:r>
-            <a:br>
-              <a:rPr lang="en-US" sz="4000" i="1" dirty="0"/>
-            </a:br>
+          </a:p>
+          <a:p>
             <a:endParaRPr lang="en-US" sz="4000" i="1" dirty="0"/>
           </a:p>
           <a:p>
@@ -13316,38 +13955,12 @@
             </a:r>
             <a:r>
               <a:rPr lang="en-US" sz="4000" i="1" dirty="0" smtClean="0"/>
-              <a:t>connection opened)</a:t>
-            </a:r>
-            <a:br>
+              <a:t>connection opened</a:t>
+            </a:r>
+            <a:r>
               <a:rPr lang="en-US" sz="4000" i="1" dirty="0" smtClean="0"/>
-            </a:br>
-            <a:endParaRPr lang="en-US" sz="4000" dirty="0" smtClean="0"/>
-          </a:p>
-          <a:p>
-            <a:r>
-              <a:rPr lang="en-US" sz="4000" dirty="0" err="1" smtClean="0"/>
-              <a:t>PostSharp</a:t>
-            </a:r>
-            <a:r>
-              <a:rPr lang="en-US" sz="4000" dirty="0" smtClean="0"/>
-              <a:t> (</a:t>
-            </a:r>
-            <a:r>
-              <a:rPr lang="en-US" sz="4000" i="1" dirty="0" smtClean="0"/>
-              <a:t>property access, method boundaries</a:t>
-            </a:r>
-            <a:r>
-              <a:rPr lang="en-US" sz="4000" dirty="0" smtClean="0"/>
               <a:t>)</a:t>
             </a:r>
-          </a:p>
-          <a:p>
-            <a:endParaRPr lang="en-US" sz="3200" dirty="0" smtClean="0"/>
-          </a:p>
-          <a:p>
-            <a:pPr marL="0" indent="0">
-              <a:buNone/>
-            </a:pPr>
             <a:endParaRPr lang="en-US" sz="3200" dirty="0" smtClean="0"/>
           </a:p>
           <a:p>
@@ -17087,248 +17700,6 @@
       </p:sp>
       <p:pic>
         <p:nvPicPr>
-          <p:cNvPr id="6" name="Picture 5"/>
-          <p:cNvPicPr>
-            <a:picLocks noChangeAspect="1"/>
-          </p:cNvPicPr>
-          <p:nvPr/>
-        </p:nvPicPr>
-        <p:blipFill>
-          <a:blip r:embed="rId3"/>
-          <a:stretch>
-            <a:fillRect/>
-          </a:stretch>
-        </p:blipFill>
-        <p:spPr>
-          <a:xfrm>
-            <a:off x="838200" y="1690688"/>
-            <a:ext cx="11353800" cy="5030165"/>
-          </a:xfrm>
-          <a:prstGeom prst="rect">
-            <a:avLst/>
-          </a:prstGeom>
-        </p:spPr>
-      </p:pic>
-    </p:spTree>
-    <p:extLst>
-      <p:ext uri="{BB962C8B-B14F-4D97-AF65-F5344CB8AC3E}">
-        <p14:creationId xmlns:p14="http://schemas.microsoft.com/office/powerpoint/2010/main" val="295902893"/>
-      </p:ext>
-    </p:extLst>
-  </p:cSld>
-  <p:clrMapOvr>
-    <a:masterClrMapping/>
-  </p:clrMapOvr>
-  <p:timing>
-    <p:tnLst>
-      <p:par>
-        <p:cTn id="1" dur="indefinite" restart="never" nodeType="tmRoot"/>
-      </p:par>
-    </p:tnLst>
-  </p:timing>
-</p:sld>
-</file>
-
-<file path=ppt/slides/slide36.xml><?xml version="1.0" encoding="utf-8"?>
-<p:sld xmlns:a="http://schemas.openxmlformats.org/drawingml/2006/main" xmlns:r="http://schemas.openxmlformats.org/officeDocument/2006/relationships" xmlns:p="http://schemas.openxmlformats.org/presentationml/2006/main">
-  <p:cSld>
-    <p:spTree>
-      <p:nvGrpSpPr>
-        <p:cNvPr id="1" name=""/>
-        <p:cNvGrpSpPr/>
-        <p:nvPr/>
-      </p:nvGrpSpPr>
-      <p:grpSpPr>
-        <a:xfrm>
-          <a:off x="0" y="0"/>
-          <a:ext cx="0" cy="0"/>
-          <a:chOff x="0" y="0"/>
-          <a:chExt cx="0" cy="0"/>
-        </a:xfrm>
-      </p:grpSpPr>
-      <p:sp>
-        <p:nvSpPr>
-          <p:cNvPr id="2" name="Title 1"/>
-          <p:cNvSpPr>
-            <a:spLocks noGrp="1"/>
-          </p:cNvSpPr>
-          <p:nvPr>
-            <p:ph type="title"/>
-          </p:nvPr>
-        </p:nvSpPr>
-        <p:spPr/>
-        <p:txBody>
-          <a:bodyPr>
-            <a:normAutofit/>
-          </a:bodyPr>
-          <a:lstStyle/>
-          <a:p>
-            <a:r>
-              <a:rPr lang="en-US" sz="4800" dirty="0" smtClean="0"/>
-              <a:t>Authentication</a:t>
-            </a:r>
-            <a:endParaRPr lang="en-US" sz="4800" dirty="0"/>
-          </a:p>
-        </p:txBody>
-      </p:sp>
-      <p:sp>
-        <p:nvSpPr>
-          <p:cNvPr id="3" name="Content Placeholder 2"/>
-          <p:cNvSpPr>
-            <a:spLocks noGrp="1"/>
-          </p:cNvSpPr>
-          <p:nvPr>
-            <p:ph idx="1"/>
-          </p:nvPr>
-        </p:nvSpPr>
-        <p:spPr>
-          <a:xfrm>
-            <a:off x="838200" y="1825624"/>
-            <a:ext cx="10515600" cy="4589923"/>
-          </a:xfrm>
-        </p:spPr>
-        <p:txBody>
-          <a:bodyPr>
-            <a:normAutofit/>
-          </a:bodyPr>
-          <a:lstStyle/>
-          <a:p>
-            <a:endParaRPr lang="en-US" sz="4000" dirty="0" smtClean="0"/>
-          </a:p>
-          <a:p>
-            <a:endParaRPr lang="en-US" dirty="0" smtClean="0"/>
-          </a:p>
-          <a:p>
-            <a:endParaRPr lang="en-US" dirty="0" smtClean="0"/>
-          </a:p>
-          <a:p>
-            <a:endParaRPr lang="en-US" dirty="0"/>
-          </a:p>
-        </p:txBody>
-      </p:sp>
-      <p:pic>
-        <p:nvPicPr>
-          <p:cNvPr id="4" name="Picture 3"/>
-          <p:cNvPicPr>
-            <a:picLocks noChangeAspect="1"/>
-          </p:cNvPicPr>
-          <p:nvPr/>
-        </p:nvPicPr>
-        <p:blipFill>
-          <a:blip r:embed="rId3"/>
-          <a:stretch>
-            <a:fillRect/>
-          </a:stretch>
-        </p:blipFill>
-        <p:spPr>
-          <a:xfrm>
-            <a:off x="838199" y="1690688"/>
-            <a:ext cx="11363759" cy="5034577"/>
-          </a:xfrm>
-          <a:prstGeom prst="rect">
-            <a:avLst/>
-          </a:prstGeom>
-        </p:spPr>
-      </p:pic>
-    </p:spTree>
-    <p:extLst>
-      <p:ext uri="{BB962C8B-B14F-4D97-AF65-F5344CB8AC3E}">
-        <p14:creationId xmlns:p14="http://schemas.microsoft.com/office/powerpoint/2010/main" val="750296430"/>
-      </p:ext>
-    </p:extLst>
-  </p:cSld>
-  <p:clrMapOvr>
-    <a:masterClrMapping/>
-  </p:clrMapOvr>
-  <p:timing>
-    <p:tnLst>
-      <p:par>
-        <p:cTn id="1" dur="indefinite" restart="never" nodeType="tmRoot"/>
-      </p:par>
-    </p:tnLst>
-  </p:timing>
-</p:sld>
-</file>
-
-<file path=ppt/slides/slide37.xml><?xml version="1.0" encoding="utf-8"?>
-<p:sld xmlns:a="http://schemas.openxmlformats.org/drawingml/2006/main" xmlns:r="http://schemas.openxmlformats.org/officeDocument/2006/relationships" xmlns:p="http://schemas.openxmlformats.org/presentationml/2006/main">
-  <p:cSld>
-    <p:spTree>
-      <p:nvGrpSpPr>
-        <p:cNvPr id="1" name=""/>
-        <p:cNvGrpSpPr/>
-        <p:nvPr/>
-      </p:nvGrpSpPr>
-      <p:grpSpPr>
-        <a:xfrm>
-          <a:off x="0" y="0"/>
-          <a:ext cx="0" cy="0"/>
-          <a:chOff x="0" y="0"/>
-          <a:chExt cx="0" cy="0"/>
-        </a:xfrm>
-      </p:grpSpPr>
-      <p:sp>
-        <p:nvSpPr>
-          <p:cNvPr id="2" name="Title 1"/>
-          <p:cNvSpPr>
-            <a:spLocks noGrp="1"/>
-          </p:cNvSpPr>
-          <p:nvPr>
-            <p:ph type="title"/>
-          </p:nvPr>
-        </p:nvSpPr>
-        <p:spPr/>
-        <p:txBody>
-          <a:bodyPr>
-            <a:normAutofit/>
-          </a:bodyPr>
-          <a:lstStyle/>
-          <a:p>
-            <a:r>
-              <a:rPr lang="en-US" sz="4800" dirty="0" smtClean="0"/>
-              <a:t>Authentication</a:t>
-            </a:r>
-            <a:endParaRPr lang="en-US" sz="4800" dirty="0"/>
-          </a:p>
-        </p:txBody>
-      </p:sp>
-      <p:sp>
-        <p:nvSpPr>
-          <p:cNvPr id="3" name="Content Placeholder 2"/>
-          <p:cNvSpPr>
-            <a:spLocks noGrp="1"/>
-          </p:cNvSpPr>
-          <p:nvPr>
-            <p:ph idx="1"/>
-          </p:nvPr>
-        </p:nvSpPr>
-        <p:spPr>
-          <a:xfrm>
-            <a:off x="838200" y="1825624"/>
-            <a:ext cx="10515600" cy="4589923"/>
-          </a:xfrm>
-        </p:spPr>
-        <p:txBody>
-          <a:bodyPr>
-            <a:normAutofit/>
-          </a:bodyPr>
-          <a:lstStyle/>
-          <a:p>
-            <a:endParaRPr lang="en-US" sz="4000" dirty="0" smtClean="0"/>
-          </a:p>
-          <a:p>
-            <a:endParaRPr lang="en-US" dirty="0" smtClean="0"/>
-          </a:p>
-          <a:p>
-            <a:endParaRPr lang="en-US" dirty="0" smtClean="0"/>
-          </a:p>
-          <a:p>
-            <a:endParaRPr lang="en-US" dirty="0"/>
-          </a:p>
-        </p:txBody>
-      </p:sp>
-      <p:pic>
-        <p:nvPicPr>
           <p:cNvPr id="4" name="Picture 3"/>
           <p:cNvPicPr>
             <a:picLocks noChangeAspect="1"/>
@@ -17371,7 +17742,7 @@
 </p:sld>
 </file>
 
-<file path=ppt/slides/slide38.xml><?xml version="1.0" encoding="utf-8"?>
+<file path=ppt/slides/slide36.xml><?xml version="1.0" encoding="utf-8"?>
 <p:sld xmlns:a="http://schemas.openxmlformats.org/drawingml/2006/main" xmlns:r="http://schemas.openxmlformats.org/officeDocument/2006/relationships" xmlns:p="http://schemas.openxmlformats.org/presentationml/2006/main">
   <p:cSld>
     <p:spTree>
@@ -17464,8 +17835,8 @@
         </p:blipFill>
         <p:spPr>
           <a:xfrm>
-            <a:off x="838199" y="1690688"/>
-            <a:ext cx="11363759" cy="5034577"/>
+            <a:off x="269924" y="1690688"/>
+            <a:ext cx="11786118" cy="5167312"/>
           </a:xfrm>
           <a:prstGeom prst="rect">
             <a:avLst/>
@@ -17475,7 +17846,7 @@
     </p:spTree>
     <p:extLst>
       <p:ext uri="{BB962C8B-B14F-4D97-AF65-F5344CB8AC3E}">
-        <p14:creationId xmlns:p14="http://schemas.microsoft.com/office/powerpoint/2010/main" val="3643659107"/>
+        <p14:creationId xmlns:p14="http://schemas.microsoft.com/office/powerpoint/2010/main" val="295902893"/>
       </p:ext>
     </p:extLst>
   </p:cSld>
@@ -17492,7 +17863,128 @@
 </p:sld>
 </file>
 
-<file path=ppt/slides/slide39.xml><?xml version="1.0" encoding="utf-8"?>
+<file path=ppt/slides/slide37.xml><?xml version="1.0" encoding="utf-8"?>
+<p:sld xmlns:a="http://schemas.openxmlformats.org/drawingml/2006/main" xmlns:r="http://schemas.openxmlformats.org/officeDocument/2006/relationships" xmlns:p="http://schemas.openxmlformats.org/presentationml/2006/main">
+  <p:cSld>
+    <p:spTree>
+      <p:nvGrpSpPr>
+        <p:cNvPr id="1" name=""/>
+        <p:cNvGrpSpPr/>
+        <p:nvPr/>
+      </p:nvGrpSpPr>
+      <p:grpSpPr>
+        <a:xfrm>
+          <a:off x="0" y="0"/>
+          <a:ext cx="0" cy="0"/>
+          <a:chOff x="0" y="0"/>
+          <a:chExt cx="0" cy="0"/>
+        </a:xfrm>
+      </p:grpSpPr>
+      <p:sp>
+        <p:nvSpPr>
+          <p:cNvPr id="2" name="Title 1"/>
+          <p:cNvSpPr>
+            <a:spLocks noGrp="1"/>
+          </p:cNvSpPr>
+          <p:nvPr>
+            <p:ph type="title"/>
+          </p:nvPr>
+        </p:nvSpPr>
+        <p:spPr/>
+        <p:txBody>
+          <a:bodyPr>
+            <a:normAutofit/>
+          </a:bodyPr>
+          <a:lstStyle/>
+          <a:p>
+            <a:r>
+              <a:rPr lang="en-US" sz="4800" dirty="0" smtClean="0"/>
+              <a:t>Authentication</a:t>
+            </a:r>
+            <a:endParaRPr lang="en-US" sz="4800" dirty="0"/>
+          </a:p>
+        </p:txBody>
+      </p:sp>
+      <p:sp>
+        <p:nvSpPr>
+          <p:cNvPr id="3" name="Content Placeholder 2"/>
+          <p:cNvSpPr>
+            <a:spLocks noGrp="1"/>
+          </p:cNvSpPr>
+          <p:nvPr>
+            <p:ph idx="1"/>
+          </p:nvPr>
+        </p:nvSpPr>
+        <p:spPr>
+          <a:xfrm>
+            <a:off x="838200" y="1825624"/>
+            <a:ext cx="10515600" cy="4589923"/>
+          </a:xfrm>
+        </p:spPr>
+        <p:txBody>
+          <a:bodyPr>
+            <a:normAutofit/>
+          </a:bodyPr>
+          <a:lstStyle/>
+          <a:p>
+            <a:endParaRPr lang="en-US" sz="4000" dirty="0" smtClean="0"/>
+          </a:p>
+          <a:p>
+            <a:endParaRPr lang="en-US" dirty="0" smtClean="0"/>
+          </a:p>
+          <a:p>
+            <a:endParaRPr lang="en-US" dirty="0" smtClean="0"/>
+          </a:p>
+          <a:p>
+            <a:endParaRPr lang="en-US" dirty="0"/>
+          </a:p>
+        </p:txBody>
+      </p:sp>
+      <p:pic>
+        <p:nvPicPr>
+          <p:cNvPr id="6" name="Picture 5"/>
+          <p:cNvPicPr>
+            <a:picLocks noChangeAspect="1"/>
+          </p:cNvPicPr>
+          <p:nvPr/>
+        </p:nvPicPr>
+        <p:blipFill>
+          <a:blip r:embed="rId3"/>
+          <a:stretch>
+            <a:fillRect/>
+          </a:stretch>
+        </p:blipFill>
+        <p:spPr>
+          <a:xfrm>
+            <a:off x="838200" y="2909950"/>
+            <a:ext cx="11152121" cy="1651776"/>
+          </a:xfrm>
+          <a:prstGeom prst="rect">
+            <a:avLst/>
+          </a:prstGeom>
+        </p:spPr>
+      </p:pic>
+    </p:spTree>
+    <p:extLst>
+      <p:ext uri="{BB962C8B-B14F-4D97-AF65-F5344CB8AC3E}">
+        <p14:creationId xmlns:p14="http://schemas.microsoft.com/office/powerpoint/2010/main" val="750296430"/>
+      </p:ext>
+    </p:extLst>
+  </p:cSld>
+  <p:clrMapOvr>
+    <a:masterClrMapping/>
+  </p:clrMapOvr>
+  <p:timing>
+    <p:tnLst>
+      <p:par>
+        <p:cTn id="1" dur="indefinite" restart="never" nodeType="tmRoot"/>
+      </p:par>
+    </p:tnLst>
+  </p:timing>
+</p:sld>
+</file>
+
+<file path=ppt/slides/slide38.xml><?xml version="1.0" encoding="utf-8"?>
 <p:sld xmlns:a="http://schemas.openxmlformats.org/drawingml/2006/main" xmlns:r="http://schemas.openxmlformats.org/officeDocument/2006/relationships" xmlns:p="http://schemas.openxmlformats.org/presentationml/2006/main">
   <p:cSld>
     <p:spTree>
@@ -17582,119 +18074,7 @@
 </p:sld>
 </file>
 
-<file path=ppt/slides/slide4.xml><?xml version="1.0" encoding="utf-8"?>
-<p:sld xmlns:a="http://schemas.openxmlformats.org/drawingml/2006/main" xmlns:r="http://schemas.openxmlformats.org/officeDocument/2006/relationships" xmlns:p="http://schemas.openxmlformats.org/presentationml/2006/main">
-  <p:cSld>
-    <p:spTree>
-      <p:nvGrpSpPr>
-        <p:cNvPr id="1" name=""/>
-        <p:cNvGrpSpPr/>
-        <p:nvPr/>
-      </p:nvGrpSpPr>
-      <p:grpSpPr>
-        <a:xfrm>
-          <a:off x="0" y="0"/>
-          <a:ext cx="0" cy="0"/>
-          <a:chOff x="0" y="0"/>
-          <a:chExt cx="0" cy="0"/>
-        </a:xfrm>
-      </p:grpSpPr>
-      <p:sp>
-        <p:nvSpPr>
-          <p:cNvPr id="2" name="Title 1"/>
-          <p:cNvSpPr>
-            <a:spLocks noGrp="1"/>
-          </p:cNvSpPr>
-          <p:nvPr>
-            <p:ph type="title"/>
-          </p:nvPr>
-        </p:nvSpPr>
-        <p:spPr>
-          <a:xfrm>
-            <a:off x="964927" y="1"/>
-            <a:ext cx="10515600" cy="6858000"/>
-          </a:xfrm>
-        </p:spPr>
-        <p:txBody>
-          <a:bodyPr anchor="ctr">
-            <a:normAutofit/>
-          </a:bodyPr>
-          <a:lstStyle/>
-          <a:p>
-            <a:pPr algn="ctr"/>
-            <a:r>
-              <a:rPr lang="en-US" sz="4800" strike="sngStrike" dirty="0" smtClean="0">
-                <a:solidFill>
-                  <a:schemeClr val="bg1">
-                    <a:lumMod val="75000"/>
-                  </a:schemeClr>
-                </a:solidFill>
-              </a:rPr>
-              <a:t>I hate writing secure code</a:t>
-            </a:r>
-            <a:br>
-              <a:rPr lang="en-US" sz="4800" strike="sngStrike" dirty="0" smtClean="0">
-                <a:solidFill>
-                  <a:schemeClr val="bg1">
-                    <a:lumMod val="75000"/>
-                  </a:schemeClr>
-                </a:solidFill>
-              </a:rPr>
-            </a:br>
-            <a:r>
-              <a:rPr lang="en-US" sz="4800" strike="sngStrike" dirty="0" smtClean="0">
-                <a:solidFill>
-                  <a:schemeClr val="bg1">
-                    <a:lumMod val="75000"/>
-                  </a:schemeClr>
-                </a:solidFill>
-              </a:rPr>
-              <a:t>I hate writing secure features</a:t>
-            </a:r>
-            <a:r>
-              <a:rPr lang="en-US" sz="4800" strike="sngStrike" dirty="0" smtClean="0"/>
-              <a:t/>
-            </a:r>
-            <a:br>
-              <a:rPr lang="en-US" sz="4800" strike="sngStrike" dirty="0" smtClean="0"/>
-            </a:br>
-            <a:r>
-              <a:rPr lang="en-US" sz="4800" dirty="0" smtClean="0"/>
-              <a:t>I hate implementing </a:t>
-            </a:r>
-            <a:r>
-              <a:rPr lang="en-US" sz="4800" i="1" dirty="0" smtClean="0"/>
-              <a:t>cross-cutting security concerns</a:t>
-            </a:r>
-            <a:r>
-              <a:rPr lang="en-US" sz="4800" dirty="0" smtClean="0"/>
-              <a:t> by repeating the same patterns over and over again in my feature-level code</a:t>
-            </a:r>
-            <a:endParaRPr lang="en-US" sz="4800" dirty="0"/>
-          </a:p>
-        </p:txBody>
-      </p:sp>
-    </p:spTree>
-    <p:extLst>
-      <p:ext uri="{BB962C8B-B14F-4D97-AF65-F5344CB8AC3E}">
-        <p14:creationId xmlns:p14="http://schemas.microsoft.com/office/powerpoint/2010/main" val="3846056723"/>
-      </p:ext>
-    </p:extLst>
-  </p:cSld>
-  <p:clrMapOvr>
-    <a:masterClrMapping/>
-  </p:clrMapOvr>
-  <p:timing>
-    <p:tnLst>
-      <p:par>
-        <p:cTn id="1" dur="indefinite" restart="never" nodeType="tmRoot"/>
-      </p:par>
-    </p:tnLst>
-  </p:timing>
-</p:sld>
-</file>
-
-<file path=ppt/slides/slide40.xml><?xml version="1.0" encoding="utf-8"?>
+<file path=ppt/slides/slide39.xml><?xml version="1.0" encoding="utf-8"?>
 <p:sld xmlns:a="http://schemas.openxmlformats.org/drawingml/2006/main" xmlns:r="http://schemas.openxmlformats.org/officeDocument/2006/relationships" xmlns:p="http://schemas.openxmlformats.org/presentationml/2006/main">
   <p:cSld>
     <p:spTree>
@@ -17820,7 +18200,119 @@
 </p:sld>
 </file>
 
-<file path=ppt/slides/slide41.xml><?xml version="1.0" encoding="utf-8"?>
+<file path=ppt/slides/slide4.xml><?xml version="1.0" encoding="utf-8"?>
+<p:sld xmlns:a="http://schemas.openxmlformats.org/drawingml/2006/main" xmlns:r="http://schemas.openxmlformats.org/officeDocument/2006/relationships" xmlns:p="http://schemas.openxmlformats.org/presentationml/2006/main">
+  <p:cSld>
+    <p:spTree>
+      <p:nvGrpSpPr>
+        <p:cNvPr id="1" name=""/>
+        <p:cNvGrpSpPr/>
+        <p:nvPr/>
+      </p:nvGrpSpPr>
+      <p:grpSpPr>
+        <a:xfrm>
+          <a:off x="0" y="0"/>
+          <a:ext cx="0" cy="0"/>
+          <a:chOff x="0" y="0"/>
+          <a:chExt cx="0" cy="0"/>
+        </a:xfrm>
+      </p:grpSpPr>
+      <p:sp>
+        <p:nvSpPr>
+          <p:cNvPr id="2" name="Title 1"/>
+          <p:cNvSpPr>
+            <a:spLocks noGrp="1"/>
+          </p:cNvSpPr>
+          <p:nvPr>
+            <p:ph type="title"/>
+          </p:nvPr>
+        </p:nvSpPr>
+        <p:spPr>
+          <a:xfrm>
+            <a:off x="964927" y="1"/>
+            <a:ext cx="10515600" cy="6858000"/>
+          </a:xfrm>
+        </p:spPr>
+        <p:txBody>
+          <a:bodyPr anchor="ctr">
+            <a:normAutofit/>
+          </a:bodyPr>
+          <a:lstStyle/>
+          <a:p>
+            <a:pPr algn="ctr"/>
+            <a:r>
+              <a:rPr lang="en-US" sz="4800" strike="sngStrike" dirty="0" smtClean="0">
+                <a:solidFill>
+                  <a:schemeClr val="bg1">
+                    <a:lumMod val="75000"/>
+                  </a:schemeClr>
+                </a:solidFill>
+              </a:rPr>
+              <a:t>I hate writing secure code</a:t>
+            </a:r>
+            <a:br>
+              <a:rPr lang="en-US" sz="4800" strike="sngStrike" dirty="0" smtClean="0">
+                <a:solidFill>
+                  <a:schemeClr val="bg1">
+                    <a:lumMod val="75000"/>
+                  </a:schemeClr>
+                </a:solidFill>
+              </a:rPr>
+            </a:br>
+            <a:r>
+              <a:rPr lang="en-US" sz="4800" strike="sngStrike" dirty="0" smtClean="0">
+                <a:solidFill>
+                  <a:schemeClr val="bg1">
+                    <a:lumMod val="75000"/>
+                  </a:schemeClr>
+                </a:solidFill>
+              </a:rPr>
+              <a:t>I hate writing secure features</a:t>
+            </a:r>
+            <a:r>
+              <a:rPr lang="en-US" sz="4800" strike="sngStrike" dirty="0" smtClean="0"/>
+              <a:t/>
+            </a:r>
+            <a:br>
+              <a:rPr lang="en-US" sz="4800" strike="sngStrike" dirty="0" smtClean="0"/>
+            </a:br>
+            <a:r>
+              <a:rPr lang="en-US" sz="4800" dirty="0" smtClean="0"/>
+              <a:t>I hate implementing </a:t>
+            </a:r>
+            <a:r>
+              <a:rPr lang="en-US" sz="4800" i="1" dirty="0" smtClean="0"/>
+              <a:t>cross-cutting security concerns</a:t>
+            </a:r>
+            <a:r>
+              <a:rPr lang="en-US" sz="4800" dirty="0" smtClean="0"/>
+              <a:t> by repeating the same patterns over and over again in my feature-level code</a:t>
+            </a:r>
+            <a:endParaRPr lang="en-US" sz="4800" dirty="0"/>
+          </a:p>
+        </p:txBody>
+      </p:sp>
+    </p:spTree>
+    <p:extLst>
+      <p:ext uri="{BB962C8B-B14F-4D97-AF65-F5344CB8AC3E}">
+        <p14:creationId xmlns:p14="http://schemas.microsoft.com/office/powerpoint/2010/main" val="3846056723"/>
+      </p:ext>
+    </p:extLst>
+  </p:cSld>
+  <p:clrMapOvr>
+    <a:masterClrMapping/>
+  </p:clrMapOvr>
+  <p:timing>
+    <p:tnLst>
+      <p:par>
+        <p:cTn id="1" dur="indefinite" restart="never" nodeType="tmRoot"/>
+      </p:par>
+    </p:tnLst>
+  </p:timing>
+</p:sld>
+</file>
+
+<file path=ppt/slides/slide40.xml><?xml version="1.0" encoding="utf-8"?>
 <p:sld xmlns:a="http://schemas.openxmlformats.org/drawingml/2006/main" xmlns:r="http://schemas.openxmlformats.org/officeDocument/2006/relationships" xmlns:p="http://schemas.openxmlformats.org/presentationml/2006/main">
   <p:cSld>
     <p:spTree>
@@ -17946,7 +18438,7 @@
 </p:sld>
 </file>
 
-<file path=ppt/slides/slide42.xml><?xml version="1.0" encoding="utf-8"?>
+<file path=ppt/slides/slide41.xml><?xml version="1.0" encoding="utf-8"?>
 <p:sld xmlns:a="http://schemas.openxmlformats.org/drawingml/2006/main" xmlns:r="http://schemas.openxmlformats.org/officeDocument/2006/relationships" xmlns:p="http://schemas.openxmlformats.org/presentationml/2006/main">
   <p:cSld>
     <p:spTree>
@@ -18067,7 +18559,7 @@
 </p:sld>
 </file>
 
-<file path=ppt/slides/slide43.xml><?xml version="1.0" encoding="utf-8"?>
+<file path=ppt/slides/slide42.xml><?xml version="1.0" encoding="utf-8"?>
 <p:sld xmlns:a="http://schemas.openxmlformats.org/drawingml/2006/main" xmlns:r="http://schemas.openxmlformats.org/officeDocument/2006/relationships" xmlns:p="http://schemas.openxmlformats.org/presentationml/2006/main">
   <p:cSld>
     <p:spTree>
@@ -18188,7 +18680,7 @@
 </p:sld>
 </file>
 
-<file path=ppt/slides/slide44.xml><?xml version="1.0" encoding="utf-8"?>
+<file path=ppt/slides/slide43.xml><?xml version="1.0" encoding="utf-8"?>
 <p:sld xmlns:a="http://schemas.openxmlformats.org/drawingml/2006/main" xmlns:r="http://schemas.openxmlformats.org/officeDocument/2006/relationships" xmlns:p="http://schemas.openxmlformats.org/presentationml/2006/main">
   <p:cSld>
     <p:spTree>
@@ -18314,7 +18806,7 @@
 </p:sld>
 </file>
 
-<file path=ppt/slides/slide45.xml><?xml version="1.0" encoding="utf-8"?>
+<file path=ppt/slides/slide44.xml><?xml version="1.0" encoding="utf-8"?>
 <p:sld xmlns:a="http://schemas.openxmlformats.org/drawingml/2006/main" xmlns:r="http://schemas.openxmlformats.org/officeDocument/2006/relationships" xmlns:p="http://schemas.openxmlformats.org/presentationml/2006/main">
   <p:cSld>
     <p:spTree>
@@ -18464,7 +18956,7 @@
 </p:sld>
 </file>
 
-<file path=ppt/slides/slide46.xml><?xml version="1.0" encoding="utf-8"?>
+<file path=ppt/slides/slide45.xml><?xml version="1.0" encoding="utf-8"?>
 <p:sld xmlns:a="http://schemas.openxmlformats.org/drawingml/2006/main" xmlns:r="http://schemas.openxmlformats.org/officeDocument/2006/relationships" xmlns:p="http://schemas.openxmlformats.org/presentationml/2006/main">
   <p:cSld>
     <p:spTree>
@@ -18590,7 +19082,7 @@
 </p:sld>
 </file>
 
-<file path=ppt/slides/slide47.xml><?xml version="1.0" encoding="utf-8"?>
+<file path=ppt/slides/slide46.xml><?xml version="1.0" encoding="utf-8"?>
 <p:sld xmlns:a="http://schemas.openxmlformats.org/drawingml/2006/main" xmlns:r="http://schemas.openxmlformats.org/officeDocument/2006/relationships" xmlns:p="http://schemas.openxmlformats.org/presentationml/2006/main">
   <p:cSld>
     <p:spTree>
@@ -18716,7 +19208,7 @@
 </p:sld>
 </file>
 
-<file path=ppt/slides/slide48.xml><?xml version="1.0" encoding="utf-8"?>
+<file path=ppt/slides/slide47.xml><?xml version="1.0" encoding="utf-8"?>
 <p:sld xmlns:a="http://schemas.openxmlformats.org/drawingml/2006/main" xmlns:r="http://schemas.openxmlformats.org/officeDocument/2006/relationships" xmlns:p="http://schemas.openxmlformats.org/presentationml/2006/main">
   <p:cSld>
     <p:spTree>
@@ -18842,7 +19334,7 @@
 </p:sld>
 </file>
 
-<file path=ppt/slides/slide49.xml><?xml version="1.0" encoding="utf-8"?>
+<file path=ppt/slides/slide48.xml><?xml version="1.0" encoding="utf-8"?>
 <p:sld xmlns:a="http://schemas.openxmlformats.org/drawingml/2006/main" xmlns:r="http://schemas.openxmlformats.org/officeDocument/2006/relationships" xmlns:p="http://schemas.openxmlformats.org/presentationml/2006/main">
   <p:cSld>
     <p:spTree>
@@ -18963,6 +19455,96 @@
 </p:sld>
 </file>
 
+<file path=ppt/slides/slide49.xml><?xml version="1.0" encoding="utf-8"?>
+<p:sld xmlns:a="http://schemas.openxmlformats.org/drawingml/2006/main" xmlns:r="http://schemas.openxmlformats.org/officeDocument/2006/relationships" xmlns:p="http://schemas.openxmlformats.org/presentationml/2006/main">
+  <p:cSld>
+    <p:spTree>
+      <p:nvGrpSpPr>
+        <p:cNvPr id="1" name=""/>
+        <p:cNvGrpSpPr/>
+        <p:nvPr/>
+      </p:nvGrpSpPr>
+      <p:grpSpPr>
+        <a:xfrm>
+          <a:off x="0" y="0"/>
+          <a:ext cx="0" cy="0"/>
+          <a:chOff x="0" y="0"/>
+          <a:chExt cx="0" cy="0"/>
+        </a:xfrm>
+      </p:grpSpPr>
+      <p:sp>
+        <p:nvSpPr>
+          <p:cNvPr id="2" name="Title 1"/>
+          <p:cNvSpPr>
+            <a:spLocks noGrp="1"/>
+          </p:cNvSpPr>
+          <p:nvPr>
+            <p:ph type="title"/>
+          </p:nvPr>
+        </p:nvSpPr>
+        <p:spPr>
+          <a:xfrm>
+            <a:off x="964927" y="1"/>
+            <a:ext cx="10515600" cy="6858000"/>
+          </a:xfrm>
+        </p:spPr>
+        <p:txBody>
+          <a:bodyPr anchor="ctr">
+            <a:normAutofit/>
+          </a:bodyPr>
+          <a:lstStyle/>
+          <a:p>
+            <a:pPr algn="ctr"/>
+            <a:r>
+              <a:rPr lang="en-US" sz="4800" dirty="0" smtClean="0"/>
+              <a:t>Page-level Authorization</a:t>
+            </a:r>
+            <a:br>
+              <a:rPr lang="en-US" sz="4800" dirty="0" smtClean="0"/>
+            </a:br>
+            <a:r>
+              <a:rPr lang="en-US" sz="4800" dirty="0"/>
+              <a:t/>
+            </a:r>
+            <a:br>
+              <a:rPr lang="en-US" sz="4800" dirty="0"/>
+            </a:br>
+            <a:r>
+              <a:rPr lang="en-US" dirty="0" smtClean="0">
+                <a:solidFill>
+                  <a:srgbClr val="013947"/>
+                </a:solidFill>
+              </a:rPr>
+              <a:t>Keeping Bob in his sandbox </a:t>
+            </a:r>
+            <a:endParaRPr lang="en-US" sz="4800" dirty="0">
+              <a:solidFill>
+                <a:srgbClr val="013947"/>
+              </a:solidFill>
+            </a:endParaRPr>
+          </a:p>
+        </p:txBody>
+      </p:sp>
+    </p:spTree>
+    <p:extLst>
+      <p:ext uri="{BB962C8B-B14F-4D97-AF65-F5344CB8AC3E}">
+        <p14:creationId xmlns:p14="http://schemas.microsoft.com/office/powerpoint/2010/main" val="410853883"/>
+      </p:ext>
+    </p:extLst>
+  </p:cSld>
+  <p:clrMapOvr>
+    <a:masterClrMapping/>
+  </p:clrMapOvr>
+  <p:timing>
+    <p:tnLst>
+      <p:par>
+        <p:cTn id="1" dur="indefinite" restart="never" nodeType="tmRoot"/>
+      </p:par>
+    </p:tnLst>
+  </p:timing>
+</p:sld>
+</file>
+
 <file path=ppt/slides/slide5.xml><?xml version="1.0" encoding="utf-8"?>
 <p:sld xmlns:a="http://schemas.openxmlformats.org/drawingml/2006/main" xmlns:r="http://schemas.openxmlformats.org/officeDocument/2006/relationships" xmlns:p="http://schemas.openxmlformats.org/presentationml/2006/main">
   <p:cSld>
@@ -19080,96 +19662,6 @@
 </file>
 
 <file path=ppt/slides/slide50.xml><?xml version="1.0" encoding="utf-8"?>
-<p:sld xmlns:a="http://schemas.openxmlformats.org/drawingml/2006/main" xmlns:r="http://schemas.openxmlformats.org/officeDocument/2006/relationships" xmlns:p="http://schemas.openxmlformats.org/presentationml/2006/main">
-  <p:cSld>
-    <p:spTree>
-      <p:nvGrpSpPr>
-        <p:cNvPr id="1" name=""/>
-        <p:cNvGrpSpPr/>
-        <p:nvPr/>
-      </p:nvGrpSpPr>
-      <p:grpSpPr>
-        <a:xfrm>
-          <a:off x="0" y="0"/>
-          <a:ext cx="0" cy="0"/>
-          <a:chOff x="0" y="0"/>
-          <a:chExt cx="0" cy="0"/>
-        </a:xfrm>
-      </p:grpSpPr>
-      <p:sp>
-        <p:nvSpPr>
-          <p:cNvPr id="2" name="Title 1"/>
-          <p:cNvSpPr>
-            <a:spLocks noGrp="1"/>
-          </p:cNvSpPr>
-          <p:nvPr>
-            <p:ph type="title"/>
-          </p:nvPr>
-        </p:nvSpPr>
-        <p:spPr>
-          <a:xfrm>
-            <a:off x="964927" y="1"/>
-            <a:ext cx="10515600" cy="6858000"/>
-          </a:xfrm>
-        </p:spPr>
-        <p:txBody>
-          <a:bodyPr anchor="ctr">
-            <a:normAutofit/>
-          </a:bodyPr>
-          <a:lstStyle/>
-          <a:p>
-            <a:pPr algn="ctr"/>
-            <a:r>
-              <a:rPr lang="en-US" sz="4800" dirty="0" smtClean="0"/>
-              <a:t>Page-level Authorization</a:t>
-            </a:r>
-            <a:br>
-              <a:rPr lang="en-US" sz="4800" dirty="0" smtClean="0"/>
-            </a:br>
-            <a:r>
-              <a:rPr lang="en-US" sz="4800" dirty="0"/>
-              <a:t/>
-            </a:r>
-            <a:br>
-              <a:rPr lang="en-US" sz="4800" dirty="0"/>
-            </a:br>
-            <a:r>
-              <a:rPr lang="en-US" dirty="0" smtClean="0">
-                <a:solidFill>
-                  <a:srgbClr val="013947"/>
-                </a:solidFill>
-              </a:rPr>
-              <a:t>Keeping Bob in his sandbox </a:t>
-            </a:r>
-            <a:endParaRPr lang="en-US" sz="4800" dirty="0">
-              <a:solidFill>
-                <a:srgbClr val="013947"/>
-              </a:solidFill>
-            </a:endParaRPr>
-          </a:p>
-        </p:txBody>
-      </p:sp>
-    </p:spTree>
-    <p:extLst>
-      <p:ext uri="{BB962C8B-B14F-4D97-AF65-F5344CB8AC3E}">
-        <p14:creationId xmlns:p14="http://schemas.microsoft.com/office/powerpoint/2010/main" val="410853883"/>
-      </p:ext>
-    </p:extLst>
-  </p:cSld>
-  <p:clrMapOvr>
-    <a:masterClrMapping/>
-  </p:clrMapOvr>
-  <p:timing>
-    <p:tnLst>
-      <p:par>
-        <p:cTn id="1" dur="indefinite" restart="never" nodeType="tmRoot"/>
-      </p:par>
-    </p:tnLst>
-  </p:timing>
-</p:sld>
-</file>
-
-<file path=ppt/slides/slide51.xml><?xml version="1.0" encoding="utf-8"?>
 <p:sld xmlns:a="http://schemas.openxmlformats.org/drawingml/2006/main" xmlns:r="http://schemas.openxmlformats.org/officeDocument/2006/relationships" xmlns:p="http://schemas.openxmlformats.org/presentationml/2006/main">
   <p:cSld>
     <p:spTree>
@@ -19289,7 +19781,7 @@
 </p:sld>
 </file>
 
-<file path=ppt/slides/slide52.xml><?xml version="1.0" encoding="utf-8"?>
+<file path=ppt/slides/slide51.xml><?xml version="1.0" encoding="utf-8"?>
 <p:sld xmlns:a="http://schemas.openxmlformats.org/drawingml/2006/main" xmlns:r="http://schemas.openxmlformats.org/officeDocument/2006/relationships" xmlns:p="http://schemas.openxmlformats.org/presentationml/2006/main">
   <p:cSld>
     <p:spTree>
@@ -19433,7 +19925,7 @@
 </p:sld>
 </file>
 
-<file path=ppt/slides/slide53.xml><?xml version="1.0" encoding="utf-8"?>
+<file path=ppt/slides/slide52.xml><?xml version="1.0" encoding="utf-8"?>
 <p:sld xmlns:a="http://schemas.openxmlformats.org/drawingml/2006/main" xmlns:r="http://schemas.openxmlformats.org/officeDocument/2006/relationships" xmlns:p="http://schemas.openxmlformats.org/presentationml/2006/main">
   <p:cSld>
     <p:spTree>
@@ -19558,7 +20050,7 @@
 </p:sld>
 </file>
 
-<file path=ppt/slides/slide54.xml><?xml version="1.0" encoding="utf-8"?>
+<file path=ppt/slides/slide53.xml><?xml version="1.0" encoding="utf-8"?>
 <p:sld xmlns:a="http://schemas.openxmlformats.org/drawingml/2006/main" xmlns:r="http://schemas.openxmlformats.org/officeDocument/2006/relationships" xmlns:p="http://schemas.openxmlformats.org/presentationml/2006/main">
   <p:cSld>
     <p:spTree>
@@ -19654,7 +20146,7 @@
 </p:sld>
 </file>
 
-<file path=ppt/slides/slide55.xml><?xml version="1.0" encoding="utf-8"?>
+<file path=ppt/slides/slide54.xml><?xml version="1.0" encoding="utf-8"?>
 <p:sld xmlns:a="http://schemas.openxmlformats.org/drawingml/2006/main" xmlns:r="http://schemas.openxmlformats.org/officeDocument/2006/relationships" xmlns:p="http://schemas.openxmlformats.org/presentationml/2006/main">
   <p:cSld>
     <p:spTree>
@@ -19744,7 +20236,7 @@
 </p:sld>
 </file>
 
-<file path=ppt/slides/slide56.xml><?xml version="1.0" encoding="utf-8"?>
+<file path=ppt/slides/slide55.xml><?xml version="1.0" encoding="utf-8"?>
 <p:sld xmlns:a="http://schemas.openxmlformats.org/drawingml/2006/main" xmlns:r="http://schemas.openxmlformats.org/officeDocument/2006/relationships" xmlns:p="http://schemas.openxmlformats.org/presentationml/2006/main">
   <p:cSld>
     <p:spTree>
@@ -19868,7 +20360,7 @@
 </p:sld>
 </file>
 
-<file path=ppt/slides/slide57.xml><?xml version="1.0" encoding="utf-8"?>
+<file path=ppt/slides/slide56.xml><?xml version="1.0" encoding="utf-8"?>
 <p:sld xmlns:a="http://schemas.openxmlformats.org/drawingml/2006/main" xmlns:r="http://schemas.openxmlformats.org/officeDocument/2006/relationships" xmlns:p="http://schemas.openxmlformats.org/presentationml/2006/main">
   <p:cSld>
     <p:spTree>
@@ -19993,7 +20485,7 @@
 </p:sld>
 </file>
 
-<file path=ppt/slides/slide58.xml><?xml version="1.0" encoding="utf-8"?>
+<file path=ppt/slides/slide57.xml><?xml version="1.0" encoding="utf-8"?>
 <p:sld xmlns:a="http://schemas.openxmlformats.org/drawingml/2006/main" xmlns:r="http://schemas.openxmlformats.org/officeDocument/2006/relationships" xmlns:p="http://schemas.openxmlformats.org/presentationml/2006/main">
   <p:cSld>
     <p:spTree>
@@ -20118,7 +20610,7 @@
 </p:sld>
 </file>
 
-<file path=ppt/slides/slide59.xml><?xml version="1.0" encoding="utf-8"?>
+<file path=ppt/slides/slide58.xml><?xml version="1.0" encoding="utf-8"?>
 <p:sld xmlns:a="http://schemas.openxmlformats.org/drawingml/2006/main" xmlns:r="http://schemas.openxmlformats.org/officeDocument/2006/relationships" xmlns:p="http://schemas.openxmlformats.org/presentationml/2006/main">
   <p:cSld>
     <p:spTree>
@@ -20267,141 +20759,7 @@
 </p:sld>
 </file>
 
-<file path=ppt/slides/slide6.xml><?xml version="1.0" encoding="utf-8"?>
-<p:sld xmlns:a="http://schemas.openxmlformats.org/drawingml/2006/main" xmlns:r="http://schemas.openxmlformats.org/officeDocument/2006/relationships" xmlns:p="http://schemas.openxmlformats.org/presentationml/2006/main">
-  <p:cSld>
-    <p:spTree>
-      <p:nvGrpSpPr>
-        <p:cNvPr id="1" name=""/>
-        <p:cNvGrpSpPr/>
-        <p:nvPr/>
-      </p:nvGrpSpPr>
-      <p:grpSpPr>
-        <a:xfrm>
-          <a:off x="0" y="0"/>
-          <a:ext cx="0" cy="0"/>
-          <a:chOff x="0" y="0"/>
-          <a:chExt cx="0" cy="0"/>
-        </a:xfrm>
-      </p:grpSpPr>
-      <p:sp>
-        <p:nvSpPr>
-          <p:cNvPr id="2" name="Title 1"/>
-          <p:cNvSpPr>
-            <a:spLocks noGrp="1"/>
-          </p:cNvSpPr>
-          <p:nvPr>
-            <p:ph type="title"/>
-          </p:nvPr>
-        </p:nvSpPr>
-        <p:spPr/>
-        <p:txBody>
-          <a:bodyPr>
-            <a:normAutofit/>
-          </a:bodyPr>
-          <a:lstStyle/>
-          <a:p>
-            <a:r>
-              <a:rPr lang="en-US" sz="4800" dirty="0" smtClean="0"/>
-              <a:t>What's on </a:t>
-            </a:r>
-            <a:r>
-              <a:rPr lang="en-US" sz="4800" smtClean="0"/>
-              <a:t>the agenda?</a:t>
-            </a:r>
-            <a:endParaRPr lang="en-US" sz="4800" dirty="0"/>
-          </a:p>
-        </p:txBody>
-      </p:sp>
-      <p:sp>
-        <p:nvSpPr>
-          <p:cNvPr id="3" name="Content Placeholder 2"/>
-          <p:cNvSpPr>
-            <a:spLocks noGrp="1"/>
-          </p:cNvSpPr>
-          <p:nvPr>
-            <p:ph idx="1"/>
-          </p:nvPr>
-        </p:nvSpPr>
-        <p:spPr>
-          <a:xfrm>
-            <a:off x="838200" y="1825624"/>
-            <a:ext cx="10515600" cy="4899641"/>
-          </a:xfrm>
-        </p:spPr>
-        <p:txBody>
-          <a:bodyPr>
-            <a:normAutofit/>
-          </a:bodyPr>
-          <a:lstStyle/>
-          <a:p>
-            <a:r>
-              <a:rPr lang="en-US" sz="4000" dirty="0" smtClean="0">
-                <a:solidFill>
-                  <a:schemeClr val="bg1">
-                    <a:lumMod val="65000"/>
-                  </a:schemeClr>
-                </a:solidFill>
-              </a:rPr>
-              <a:t>Define "cross cutting" security concerns</a:t>
-            </a:r>
-          </a:p>
-          <a:p>
-            <a:endParaRPr lang="en-US" sz="4000" dirty="0"/>
-          </a:p>
-          <a:p>
-            <a:r>
-              <a:rPr lang="en-US" sz="4000" dirty="0" smtClean="0"/>
-              <a:t>"Secure by default" examples</a:t>
-            </a:r>
-          </a:p>
-          <a:p>
-            <a:endParaRPr lang="en-US" sz="4000" dirty="0"/>
-          </a:p>
-          <a:p>
-            <a:endParaRPr lang="en-US" sz="4000" dirty="0" smtClean="0"/>
-          </a:p>
-          <a:p>
-            <a:endParaRPr lang="en-US" sz="4000" dirty="0"/>
-          </a:p>
-          <a:p>
-            <a:endParaRPr lang="en-US" sz="4000" dirty="0" smtClean="0"/>
-          </a:p>
-          <a:p>
-            <a:endParaRPr lang="en-US" sz="4000" dirty="0" smtClean="0"/>
-          </a:p>
-          <a:p>
-            <a:endParaRPr lang="en-US" dirty="0" smtClean="0"/>
-          </a:p>
-          <a:p>
-            <a:endParaRPr lang="en-US" dirty="0" smtClean="0"/>
-          </a:p>
-          <a:p>
-            <a:endParaRPr lang="en-US" dirty="0"/>
-          </a:p>
-        </p:txBody>
-      </p:sp>
-    </p:spTree>
-    <p:extLst>
-      <p:ext uri="{BB962C8B-B14F-4D97-AF65-F5344CB8AC3E}">
-        <p14:creationId xmlns:p14="http://schemas.microsoft.com/office/powerpoint/2010/main" val="902317821"/>
-      </p:ext>
-    </p:extLst>
-  </p:cSld>
-  <p:clrMapOvr>
-    <a:masterClrMapping/>
-  </p:clrMapOvr>
-  <p:timing>
-    <p:tnLst>
-      <p:par>
-        <p:cTn id="1" dur="indefinite" restart="never" nodeType="tmRoot"/>
-      </p:par>
-    </p:tnLst>
-  </p:timing>
-</p:sld>
-</file>
-
-<file path=ppt/slides/slide60.xml><?xml version="1.0" encoding="utf-8"?>
+<file path=ppt/slides/slide59.xml><?xml version="1.0" encoding="utf-8"?>
 <p:sld xmlns:a="http://schemas.openxmlformats.org/drawingml/2006/main" xmlns:r="http://schemas.openxmlformats.org/officeDocument/2006/relationships" xmlns:p="http://schemas.openxmlformats.org/presentationml/2006/main">
   <p:cSld>
     <p:spTree>
@@ -20494,7 +20852,141 @@
 </p:sld>
 </file>
 
-<file path=ppt/slides/slide61.xml><?xml version="1.0" encoding="utf-8"?>
+<file path=ppt/slides/slide6.xml><?xml version="1.0" encoding="utf-8"?>
+<p:sld xmlns:a="http://schemas.openxmlformats.org/drawingml/2006/main" xmlns:r="http://schemas.openxmlformats.org/officeDocument/2006/relationships" xmlns:p="http://schemas.openxmlformats.org/presentationml/2006/main">
+  <p:cSld>
+    <p:spTree>
+      <p:nvGrpSpPr>
+        <p:cNvPr id="1" name=""/>
+        <p:cNvGrpSpPr/>
+        <p:nvPr/>
+      </p:nvGrpSpPr>
+      <p:grpSpPr>
+        <a:xfrm>
+          <a:off x="0" y="0"/>
+          <a:ext cx="0" cy="0"/>
+          <a:chOff x="0" y="0"/>
+          <a:chExt cx="0" cy="0"/>
+        </a:xfrm>
+      </p:grpSpPr>
+      <p:sp>
+        <p:nvSpPr>
+          <p:cNvPr id="2" name="Title 1"/>
+          <p:cNvSpPr>
+            <a:spLocks noGrp="1"/>
+          </p:cNvSpPr>
+          <p:nvPr>
+            <p:ph type="title"/>
+          </p:nvPr>
+        </p:nvSpPr>
+        <p:spPr/>
+        <p:txBody>
+          <a:bodyPr>
+            <a:normAutofit/>
+          </a:bodyPr>
+          <a:lstStyle/>
+          <a:p>
+            <a:r>
+              <a:rPr lang="en-US" sz="4800" dirty="0" smtClean="0"/>
+              <a:t>What's on </a:t>
+            </a:r>
+            <a:r>
+              <a:rPr lang="en-US" sz="4800" smtClean="0"/>
+              <a:t>the agenda?</a:t>
+            </a:r>
+            <a:endParaRPr lang="en-US" sz="4800" dirty="0"/>
+          </a:p>
+        </p:txBody>
+      </p:sp>
+      <p:sp>
+        <p:nvSpPr>
+          <p:cNvPr id="3" name="Content Placeholder 2"/>
+          <p:cNvSpPr>
+            <a:spLocks noGrp="1"/>
+          </p:cNvSpPr>
+          <p:nvPr>
+            <p:ph idx="1"/>
+          </p:nvPr>
+        </p:nvSpPr>
+        <p:spPr>
+          <a:xfrm>
+            <a:off x="838200" y="1825624"/>
+            <a:ext cx="10515600" cy="4899641"/>
+          </a:xfrm>
+        </p:spPr>
+        <p:txBody>
+          <a:bodyPr>
+            <a:normAutofit/>
+          </a:bodyPr>
+          <a:lstStyle/>
+          <a:p>
+            <a:r>
+              <a:rPr lang="en-US" sz="4000" dirty="0" smtClean="0">
+                <a:solidFill>
+                  <a:schemeClr val="bg1">
+                    <a:lumMod val="65000"/>
+                  </a:schemeClr>
+                </a:solidFill>
+              </a:rPr>
+              <a:t>Define "cross cutting" security concerns</a:t>
+            </a:r>
+          </a:p>
+          <a:p>
+            <a:endParaRPr lang="en-US" sz="4000" dirty="0"/>
+          </a:p>
+          <a:p>
+            <a:r>
+              <a:rPr lang="en-US" sz="4000" dirty="0" smtClean="0"/>
+              <a:t>"Secure by default" examples</a:t>
+            </a:r>
+          </a:p>
+          <a:p>
+            <a:endParaRPr lang="en-US" sz="4000" dirty="0"/>
+          </a:p>
+          <a:p>
+            <a:endParaRPr lang="en-US" sz="4000" dirty="0" smtClean="0"/>
+          </a:p>
+          <a:p>
+            <a:endParaRPr lang="en-US" sz="4000" dirty="0"/>
+          </a:p>
+          <a:p>
+            <a:endParaRPr lang="en-US" sz="4000" dirty="0" smtClean="0"/>
+          </a:p>
+          <a:p>
+            <a:endParaRPr lang="en-US" sz="4000" dirty="0" smtClean="0"/>
+          </a:p>
+          <a:p>
+            <a:endParaRPr lang="en-US" dirty="0" smtClean="0"/>
+          </a:p>
+          <a:p>
+            <a:endParaRPr lang="en-US" dirty="0" smtClean="0"/>
+          </a:p>
+          <a:p>
+            <a:endParaRPr lang="en-US" dirty="0"/>
+          </a:p>
+        </p:txBody>
+      </p:sp>
+    </p:spTree>
+    <p:extLst>
+      <p:ext uri="{BB962C8B-B14F-4D97-AF65-F5344CB8AC3E}">
+        <p14:creationId xmlns:p14="http://schemas.microsoft.com/office/powerpoint/2010/main" val="902317821"/>
+      </p:ext>
+    </p:extLst>
+  </p:cSld>
+  <p:clrMapOvr>
+    <a:masterClrMapping/>
+  </p:clrMapOvr>
+  <p:timing>
+    <p:tnLst>
+      <p:par>
+        <p:cTn id="1" dur="indefinite" restart="never" nodeType="tmRoot"/>
+      </p:par>
+    </p:tnLst>
+  </p:timing>
+</p:sld>
+</file>
+
+<file path=ppt/slides/slide60.xml><?xml version="1.0" encoding="utf-8"?>
 <p:sld xmlns:a="http://schemas.openxmlformats.org/drawingml/2006/main" xmlns:r="http://schemas.openxmlformats.org/officeDocument/2006/relationships" xmlns:p="http://schemas.openxmlformats.org/presentationml/2006/main">
   <p:cSld>
     <p:spTree>
@@ -20619,7 +21111,7 @@
 </p:sld>
 </file>
 
-<file path=ppt/slides/slide62.xml><?xml version="1.0" encoding="utf-8"?>
+<file path=ppt/slides/slide61.xml><?xml version="1.0" encoding="utf-8"?>
 <p:sld xmlns:a="http://schemas.openxmlformats.org/drawingml/2006/main" xmlns:r="http://schemas.openxmlformats.org/officeDocument/2006/relationships" xmlns:p="http://schemas.openxmlformats.org/presentationml/2006/main">
   <p:cSld>
     <p:spTree>
@@ -20725,7 +21217,7 @@
 </p:sld>
 </file>
 
-<file path=ppt/slides/slide63.xml><?xml version="1.0" encoding="utf-8"?>
+<file path=ppt/slides/slide62.xml><?xml version="1.0" encoding="utf-8"?>
 <p:sld xmlns:a="http://schemas.openxmlformats.org/drawingml/2006/main" xmlns:r="http://schemas.openxmlformats.org/officeDocument/2006/relationships" xmlns:p="http://schemas.openxmlformats.org/presentationml/2006/main">
   <p:cSld>
     <p:spTree>
@@ -20846,7 +21338,7 @@
 </p:sld>
 </file>
 
-<file path=ppt/slides/slide64.xml><?xml version="1.0" encoding="utf-8"?>
+<file path=ppt/slides/slide63.xml><?xml version="1.0" encoding="utf-8"?>
 <p:sld xmlns:a="http://schemas.openxmlformats.org/drawingml/2006/main" xmlns:r="http://schemas.openxmlformats.org/officeDocument/2006/relationships" xmlns:p="http://schemas.openxmlformats.org/presentationml/2006/main">
   <p:cSld>
     <p:spTree>
@@ -20966,7 +21458,7 @@
 </p:sld>
 </file>
 
-<file path=ppt/slides/slide65.xml><?xml version="1.0" encoding="utf-8"?>
+<file path=ppt/slides/slide64.xml><?xml version="1.0" encoding="utf-8"?>
 <p:sld xmlns:a="http://schemas.openxmlformats.org/drawingml/2006/main" xmlns:r="http://schemas.openxmlformats.org/officeDocument/2006/relationships" xmlns:p="http://schemas.openxmlformats.org/presentationml/2006/main">
   <p:cSld>
     <p:spTree>
@@ -21086,7 +21578,7 @@
 </p:sld>
 </file>
 
-<file path=ppt/slides/slide66.xml><?xml version="1.0" encoding="utf-8"?>
+<file path=ppt/slides/slide65.xml><?xml version="1.0" encoding="utf-8"?>
 <p:sld xmlns:a="http://schemas.openxmlformats.org/drawingml/2006/main" xmlns:r="http://schemas.openxmlformats.org/officeDocument/2006/relationships" xmlns:p="http://schemas.openxmlformats.org/presentationml/2006/main">
   <p:cSld>
     <p:spTree>
@@ -21206,7 +21698,7 @@
 </p:sld>
 </file>
 
-<file path=ppt/slides/slide67.xml><?xml version="1.0" encoding="utf-8"?>
+<file path=ppt/slides/slide66.xml><?xml version="1.0" encoding="utf-8"?>
 <p:sld xmlns:a="http://schemas.openxmlformats.org/drawingml/2006/main" xmlns:r="http://schemas.openxmlformats.org/officeDocument/2006/relationships" xmlns:p="http://schemas.openxmlformats.org/presentationml/2006/main">
   <p:cSld>
     <p:spTree>
@@ -21326,7 +21818,7 @@
 </p:sld>
 </file>
 
-<file path=ppt/slides/slide68.xml><?xml version="1.0" encoding="utf-8"?>
+<file path=ppt/slides/slide67.xml><?xml version="1.0" encoding="utf-8"?>
 <p:sld xmlns:a="http://schemas.openxmlformats.org/drawingml/2006/main" xmlns:r="http://schemas.openxmlformats.org/officeDocument/2006/relationships" xmlns:p="http://schemas.openxmlformats.org/presentationml/2006/main">
   <p:cSld>
     <p:spTree>
@@ -21468,7 +21960,7 @@
 </p:sld>
 </file>
 
-<file path=ppt/slides/slide69.xml><?xml version="1.0" encoding="utf-8"?>
+<file path=ppt/slides/slide68.xml><?xml version="1.0" encoding="utf-8"?>
 <p:sld xmlns:a="http://schemas.openxmlformats.org/drawingml/2006/main" xmlns:r="http://schemas.openxmlformats.org/officeDocument/2006/relationships" xmlns:p="http://schemas.openxmlformats.org/presentationml/2006/main">
   <p:cSld>
     <p:spTree>
@@ -21589,159 +22081,7 @@
 </p:sld>
 </file>
 
-<file path=ppt/slides/slide7.xml><?xml version="1.0" encoding="utf-8"?>
-<p:sld xmlns:a="http://schemas.openxmlformats.org/drawingml/2006/main" xmlns:r="http://schemas.openxmlformats.org/officeDocument/2006/relationships" xmlns:p="http://schemas.openxmlformats.org/presentationml/2006/main">
-  <p:cSld>
-    <p:spTree>
-      <p:nvGrpSpPr>
-        <p:cNvPr id="1" name=""/>
-        <p:cNvGrpSpPr/>
-        <p:nvPr/>
-      </p:nvGrpSpPr>
-      <p:grpSpPr>
-        <a:xfrm>
-          <a:off x="0" y="0"/>
-          <a:ext cx="0" cy="0"/>
-          <a:chOff x="0" y="0"/>
-          <a:chExt cx="0" cy="0"/>
-        </a:xfrm>
-      </p:grpSpPr>
-      <p:sp>
-        <p:nvSpPr>
-          <p:cNvPr id="2" name="Title 1"/>
-          <p:cNvSpPr>
-            <a:spLocks noGrp="1"/>
-          </p:cNvSpPr>
-          <p:nvPr>
-            <p:ph type="title"/>
-          </p:nvPr>
-        </p:nvSpPr>
-        <p:spPr/>
-        <p:txBody>
-          <a:bodyPr>
-            <a:normAutofit/>
-          </a:bodyPr>
-          <a:lstStyle/>
-          <a:p>
-            <a:r>
-              <a:rPr lang="en-US" sz="4800" dirty="0" smtClean="0"/>
-              <a:t>What's on </a:t>
-            </a:r>
-            <a:r>
-              <a:rPr lang="en-US" sz="4800" smtClean="0"/>
-              <a:t>the agenda?</a:t>
-            </a:r>
-            <a:endParaRPr lang="en-US" sz="4800" dirty="0"/>
-          </a:p>
-        </p:txBody>
-      </p:sp>
-      <p:sp>
-        <p:nvSpPr>
-          <p:cNvPr id="3" name="Content Placeholder 2"/>
-          <p:cNvSpPr>
-            <a:spLocks noGrp="1"/>
-          </p:cNvSpPr>
-          <p:nvPr>
-            <p:ph idx="1"/>
-          </p:nvPr>
-        </p:nvSpPr>
-        <p:spPr>
-          <a:xfrm>
-            <a:off x="838200" y="1825624"/>
-            <a:ext cx="10515600" cy="4899641"/>
-          </a:xfrm>
-        </p:spPr>
-        <p:txBody>
-          <a:bodyPr>
-            <a:normAutofit/>
-          </a:bodyPr>
-          <a:lstStyle/>
-          <a:p>
-            <a:r>
-              <a:rPr lang="en-US" sz="4000" dirty="0" smtClean="0">
-                <a:solidFill>
-                  <a:schemeClr val="bg1">
-                    <a:lumMod val="65000"/>
-                  </a:schemeClr>
-                </a:solidFill>
-              </a:rPr>
-              <a:t>Define "cross cutting" security concerns</a:t>
-            </a:r>
-          </a:p>
-          <a:p>
-            <a:endParaRPr lang="en-US" sz="4000" dirty="0">
-              <a:solidFill>
-                <a:schemeClr val="bg1">
-                  <a:lumMod val="65000"/>
-                </a:schemeClr>
-              </a:solidFill>
-            </a:endParaRPr>
-          </a:p>
-          <a:p>
-            <a:r>
-              <a:rPr lang="en-US" sz="4000" dirty="0" smtClean="0">
-                <a:solidFill>
-                  <a:schemeClr val="bg1">
-                    <a:lumMod val="65000"/>
-                  </a:schemeClr>
-                </a:solidFill>
-              </a:rPr>
-              <a:t>"Secure by default" examples</a:t>
-            </a:r>
-          </a:p>
-          <a:p>
-            <a:endParaRPr lang="en-US" sz="4000" dirty="0"/>
-          </a:p>
-          <a:p>
-            <a:r>
-              <a:rPr lang="en-US" sz="4000" dirty="0" smtClean="0"/>
-              <a:t>Declarative vs Imperative security</a:t>
-            </a:r>
-          </a:p>
-          <a:p>
-            <a:endParaRPr lang="en-US" sz="4000" dirty="0"/>
-          </a:p>
-          <a:p>
-            <a:endParaRPr lang="en-US" sz="4000" dirty="0"/>
-          </a:p>
-          <a:p>
-            <a:endParaRPr lang="en-US" sz="4000" dirty="0" smtClean="0"/>
-          </a:p>
-          <a:p>
-            <a:endParaRPr lang="en-US" sz="4000" dirty="0" smtClean="0"/>
-          </a:p>
-          <a:p>
-            <a:endParaRPr lang="en-US" dirty="0" smtClean="0"/>
-          </a:p>
-          <a:p>
-            <a:endParaRPr lang="en-US" dirty="0" smtClean="0"/>
-          </a:p>
-          <a:p>
-            <a:endParaRPr lang="en-US" dirty="0"/>
-          </a:p>
-        </p:txBody>
-      </p:sp>
-    </p:spTree>
-    <p:extLst>
-      <p:ext uri="{BB962C8B-B14F-4D97-AF65-F5344CB8AC3E}">
-        <p14:creationId xmlns:p14="http://schemas.microsoft.com/office/powerpoint/2010/main" val="1001694156"/>
-      </p:ext>
-    </p:extLst>
-  </p:cSld>
-  <p:clrMapOvr>
-    <a:masterClrMapping/>
-  </p:clrMapOvr>
-  <p:timing>
-    <p:tnLst>
-      <p:par>
-        <p:cTn id="1" dur="indefinite" restart="never" nodeType="tmRoot"/>
-      </p:par>
-    </p:tnLst>
-  </p:timing>
-</p:sld>
-</file>
-
-<file path=ppt/slides/slide70.xml><?xml version="1.0" encoding="utf-8"?>
+<file path=ppt/slides/slide69.xml><?xml version="1.0" encoding="utf-8"?>
 <p:sld xmlns:a="http://schemas.openxmlformats.org/drawingml/2006/main" xmlns:r="http://schemas.openxmlformats.org/officeDocument/2006/relationships" xmlns:p="http://schemas.openxmlformats.org/presentationml/2006/main">
   <p:cSld>
     <p:spTree>
@@ -21862,7 +22202,159 @@
 </p:sld>
 </file>
 
-<file path=ppt/slides/slide71.xml><?xml version="1.0" encoding="utf-8"?>
+<file path=ppt/slides/slide7.xml><?xml version="1.0" encoding="utf-8"?>
+<p:sld xmlns:a="http://schemas.openxmlformats.org/drawingml/2006/main" xmlns:r="http://schemas.openxmlformats.org/officeDocument/2006/relationships" xmlns:p="http://schemas.openxmlformats.org/presentationml/2006/main">
+  <p:cSld>
+    <p:spTree>
+      <p:nvGrpSpPr>
+        <p:cNvPr id="1" name=""/>
+        <p:cNvGrpSpPr/>
+        <p:nvPr/>
+      </p:nvGrpSpPr>
+      <p:grpSpPr>
+        <a:xfrm>
+          <a:off x="0" y="0"/>
+          <a:ext cx="0" cy="0"/>
+          <a:chOff x="0" y="0"/>
+          <a:chExt cx="0" cy="0"/>
+        </a:xfrm>
+      </p:grpSpPr>
+      <p:sp>
+        <p:nvSpPr>
+          <p:cNvPr id="2" name="Title 1"/>
+          <p:cNvSpPr>
+            <a:spLocks noGrp="1"/>
+          </p:cNvSpPr>
+          <p:nvPr>
+            <p:ph type="title"/>
+          </p:nvPr>
+        </p:nvSpPr>
+        <p:spPr/>
+        <p:txBody>
+          <a:bodyPr>
+            <a:normAutofit/>
+          </a:bodyPr>
+          <a:lstStyle/>
+          <a:p>
+            <a:r>
+              <a:rPr lang="en-US" sz="4800" dirty="0" smtClean="0"/>
+              <a:t>What's on </a:t>
+            </a:r>
+            <a:r>
+              <a:rPr lang="en-US" sz="4800" smtClean="0"/>
+              <a:t>the agenda?</a:t>
+            </a:r>
+            <a:endParaRPr lang="en-US" sz="4800" dirty="0"/>
+          </a:p>
+        </p:txBody>
+      </p:sp>
+      <p:sp>
+        <p:nvSpPr>
+          <p:cNvPr id="3" name="Content Placeholder 2"/>
+          <p:cNvSpPr>
+            <a:spLocks noGrp="1"/>
+          </p:cNvSpPr>
+          <p:nvPr>
+            <p:ph idx="1"/>
+          </p:nvPr>
+        </p:nvSpPr>
+        <p:spPr>
+          <a:xfrm>
+            <a:off x="838200" y="1825624"/>
+            <a:ext cx="10515600" cy="4899641"/>
+          </a:xfrm>
+        </p:spPr>
+        <p:txBody>
+          <a:bodyPr>
+            <a:normAutofit/>
+          </a:bodyPr>
+          <a:lstStyle/>
+          <a:p>
+            <a:r>
+              <a:rPr lang="en-US" sz="4000" dirty="0" smtClean="0">
+                <a:solidFill>
+                  <a:schemeClr val="bg1">
+                    <a:lumMod val="65000"/>
+                  </a:schemeClr>
+                </a:solidFill>
+              </a:rPr>
+              <a:t>Define "cross cutting" security concerns</a:t>
+            </a:r>
+          </a:p>
+          <a:p>
+            <a:endParaRPr lang="en-US" sz="4000" dirty="0">
+              <a:solidFill>
+                <a:schemeClr val="bg1">
+                  <a:lumMod val="65000"/>
+                </a:schemeClr>
+              </a:solidFill>
+            </a:endParaRPr>
+          </a:p>
+          <a:p>
+            <a:r>
+              <a:rPr lang="en-US" sz="4000" dirty="0" smtClean="0">
+                <a:solidFill>
+                  <a:schemeClr val="bg1">
+                    <a:lumMod val="65000"/>
+                  </a:schemeClr>
+                </a:solidFill>
+              </a:rPr>
+              <a:t>"Secure by default" examples</a:t>
+            </a:r>
+          </a:p>
+          <a:p>
+            <a:endParaRPr lang="en-US" sz="4000" dirty="0"/>
+          </a:p>
+          <a:p>
+            <a:r>
+              <a:rPr lang="en-US" sz="4000" dirty="0" smtClean="0"/>
+              <a:t>Declarative vs Imperative security</a:t>
+            </a:r>
+          </a:p>
+          <a:p>
+            <a:endParaRPr lang="en-US" sz="4000" dirty="0"/>
+          </a:p>
+          <a:p>
+            <a:endParaRPr lang="en-US" sz="4000" dirty="0"/>
+          </a:p>
+          <a:p>
+            <a:endParaRPr lang="en-US" sz="4000" dirty="0" smtClean="0"/>
+          </a:p>
+          <a:p>
+            <a:endParaRPr lang="en-US" sz="4000" dirty="0" smtClean="0"/>
+          </a:p>
+          <a:p>
+            <a:endParaRPr lang="en-US" dirty="0" smtClean="0"/>
+          </a:p>
+          <a:p>
+            <a:endParaRPr lang="en-US" dirty="0" smtClean="0"/>
+          </a:p>
+          <a:p>
+            <a:endParaRPr lang="en-US" dirty="0"/>
+          </a:p>
+        </p:txBody>
+      </p:sp>
+    </p:spTree>
+    <p:extLst>
+      <p:ext uri="{BB962C8B-B14F-4D97-AF65-F5344CB8AC3E}">
+        <p14:creationId xmlns:p14="http://schemas.microsoft.com/office/powerpoint/2010/main" val="1001694156"/>
+      </p:ext>
+    </p:extLst>
+  </p:cSld>
+  <p:clrMapOvr>
+    <a:masterClrMapping/>
+  </p:clrMapOvr>
+  <p:timing>
+    <p:tnLst>
+      <p:par>
+        <p:cTn id="1" dur="indefinite" restart="never" nodeType="tmRoot"/>
+      </p:par>
+    </p:tnLst>
+  </p:timing>
+</p:sld>
+</file>
+
+<file path=ppt/slides/slide70.xml><?xml version="1.0" encoding="utf-8"?>
 <p:sld xmlns:a="http://schemas.openxmlformats.org/drawingml/2006/main" xmlns:r="http://schemas.openxmlformats.org/officeDocument/2006/relationships" xmlns:p="http://schemas.openxmlformats.org/presentationml/2006/main">
   <p:cSld>
     <p:spTree>
@@ -21983,7 +22475,7 @@
 </p:sld>
 </file>
 
-<file path=ppt/slides/slide72.xml><?xml version="1.0" encoding="utf-8"?>
+<file path=ppt/slides/slide71.xml><?xml version="1.0" encoding="utf-8"?>
 <p:sld xmlns:a="http://schemas.openxmlformats.org/drawingml/2006/main" xmlns:r="http://schemas.openxmlformats.org/officeDocument/2006/relationships" xmlns:p="http://schemas.openxmlformats.org/presentationml/2006/main">
   <p:cSld>
     <p:spTree>
@@ -22107,7 +22599,7 @@
 </p:sld>
 </file>
 
-<file path=ppt/slides/slide73.xml><?xml version="1.0" encoding="utf-8"?>
+<file path=ppt/slides/slide72.xml><?xml version="1.0" encoding="utf-8"?>
 <p:sld xmlns:a="http://schemas.openxmlformats.org/drawingml/2006/main" xmlns:r="http://schemas.openxmlformats.org/officeDocument/2006/relationships" xmlns:p="http://schemas.openxmlformats.org/presentationml/2006/main">
   <p:cSld>
     <p:spTree>
@@ -22237,7 +22729,7 @@
 </p:sld>
 </file>
 
-<file path=ppt/slides/slide74.xml><?xml version="1.0" encoding="utf-8"?>
+<file path=ppt/slides/slide73.xml><?xml version="1.0" encoding="utf-8"?>
 <p:sld xmlns:a="http://schemas.openxmlformats.org/drawingml/2006/main" xmlns:r="http://schemas.openxmlformats.org/officeDocument/2006/relationships" xmlns:p="http://schemas.openxmlformats.org/presentationml/2006/main">
   <p:cSld>
     <p:spTree>
@@ -22327,7 +22819,7 @@
 </p:sld>
 </file>
 
-<file path=ppt/slides/slide75.xml><?xml version="1.0" encoding="utf-8"?>
+<file path=ppt/slides/slide74.xml><?xml version="1.0" encoding="utf-8"?>
 <p:sld xmlns:a="http://schemas.openxmlformats.org/drawingml/2006/main" xmlns:r="http://schemas.openxmlformats.org/officeDocument/2006/relationships" xmlns:p="http://schemas.openxmlformats.org/presentationml/2006/main">
   <p:cSld>
     <p:spTree>

</xml_diff>

<commit_message>
All slides have speaker notes (but not all edited down yet)
</commit_message>
<xml_diff>
--- a/Secure Systems - CodeMash 2017.pptx
+++ b/Secure Systems - CodeMash 2017.pptx
@@ -6433,6 +6433,45 @@
           <a:bodyPr/>
           <a:lstStyle/>
           <a:p>
+            <a:r>
+              <a:rPr lang="en-US" sz="1200" kern="1200" dirty="0" smtClean="0">
+                <a:solidFill>
+                  <a:schemeClr val="tx1"/>
+                </a:solidFill>
+                <a:effectLst/>
+                <a:latin typeface="+mn-lt"/>
+                <a:ea typeface="+mn-ea"/>
+                <a:cs typeface="+mn-cs"/>
+              </a:rPr>
+              <a:t>My final example of “secure by default” framework deals w/ access control, which is about preventing users from accessing data they don’t own. </a:t>
+            </a:r>
+          </a:p>
+          <a:p>
+            <a:endParaRPr lang="en-US" sz="1200" kern="1200" dirty="0" smtClean="0">
+              <a:solidFill>
+                <a:schemeClr val="tx1"/>
+              </a:solidFill>
+              <a:effectLst/>
+              <a:latin typeface="+mn-lt"/>
+              <a:ea typeface="+mn-ea"/>
+              <a:cs typeface="+mn-cs"/>
+            </a:endParaRPr>
+          </a:p>
+          <a:p>
+            <a:r>
+              <a:rPr lang="en-US" sz="1200" kern="1200" dirty="0" smtClean="0">
+                <a:solidFill>
+                  <a:schemeClr val="tx1"/>
+                </a:solidFill>
+                <a:effectLst/>
+                <a:latin typeface="+mn-lt"/>
+                <a:ea typeface="+mn-ea"/>
+                <a:cs typeface="+mn-cs"/>
+              </a:rPr>
+              <a:t>This type of requirement tends to cut across multiple features. For instance, if there’s some code that prevents Bob from seeing Alice’s orders on a list page, then we probably want to apply that same restriction on the order details page. This makes it a good candidate for a cross-cutting concern.</a:t>
+            </a:r>
+          </a:p>
+          <a:p>
             <a:pPr marL="0" marR="0" indent="0" algn="l" defTabSz="914400" rtl="0" eaLnBrk="1" fontAlgn="auto" latinLnBrk="0" hangingPunct="1">
               <a:lnSpc>
                 <a:spcPct val="100000"/>
@@ -6542,6 +6581,70 @@
           <a:bodyPr/>
           <a:lstStyle/>
           <a:p>
+            <a:r>
+              <a:rPr lang="en-US" sz="1200" kern="1200" dirty="0" smtClean="0">
+                <a:solidFill>
+                  <a:schemeClr val="tx1"/>
+                </a:solidFill>
+                <a:effectLst/>
+                <a:latin typeface="+mn-lt"/>
+                <a:ea typeface="+mn-ea"/>
+                <a:cs typeface="+mn-cs"/>
+              </a:rPr>
+              <a:t>This is what an access control requirement looks like in the List page feature code.</a:t>
+            </a:r>
+          </a:p>
+          <a:p>
+            <a:endParaRPr lang="en-US" sz="1200" kern="1200" dirty="0" smtClean="0">
+              <a:solidFill>
+                <a:schemeClr val="tx1"/>
+              </a:solidFill>
+              <a:effectLst/>
+              <a:latin typeface="+mn-lt"/>
+              <a:ea typeface="+mn-ea"/>
+              <a:cs typeface="+mn-cs"/>
+            </a:endParaRPr>
+          </a:p>
+          <a:p>
+            <a:r>
+              <a:rPr lang="en-US" sz="1200" kern="1200" dirty="0" smtClean="0">
+                <a:solidFill>
+                  <a:schemeClr val="tx1"/>
+                </a:solidFill>
+                <a:effectLst/>
+                <a:latin typeface="+mn-lt"/>
+                <a:ea typeface="+mn-ea"/>
+                <a:cs typeface="+mn-cs"/>
+              </a:rPr>
+              <a:t>I call the data access layer, get a list of all orders, and then I explicitly remove ones the user can’t access. </a:t>
+            </a:r>
+          </a:p>
+          <a:p>
+            <a:endParaRPr lang="en-US" sz="1200" kern="1200" dirty="0" smtClean="0">
+              <a:solidFill>
+                <a:schemeClr val="tx1"/>
+              </a:solidFill>
+              <a:effectLst/>
+              <a:latin typeface="+mn-lt"/>
+              <a:ea typeface="+mn-ea"/>
+              <a:cs typeface="+mn-cs"/>
+            </a:endParaRPr>
+          </a:p>
+          <a:p>
+            <a:r>
+              <a:rPr lang="en-US" sz="1200" kern="1200" dirty="0" smtClean="0">
+                <a:solidFill>
+                  <a:schemeClr val="tx1"/>
+                </a:solidFill>
+                <a:effectLst/>
+                <a:latin typeface="+mn-lt"/>
+                <a:ea typeface="+mn-ea"/>
+                <a:cs typeface="+mn-cs"/>
+              </a:rPr>
+              <a:t>Again, this is an example of security logic being intermingled with feature logic.</a:t>
+            </a:r>
+          </a:p>
+          <a:p>
             <a:endParaRPr lang="en-US" b="0" dirty="0" smtClean="0"/>
           </a:p>
         </p:txBody>
@@ -6920,6 +7023,195 @@
           <a:bodyPr/>
           <a:lstStyle/>
           <a:p>
+            <a:r>
+              <a:rPr lang="en-US" sz="1200" kern="1200" dirty="0" smtClean="0">
+                <a:solidFill>
+                  <a:schemeClr val="tx1"/>
+                </a:solidFill>
+                <a:effectLst/>
+                <a:latin typeface="+mn-lt"/>
+                <a:ea typeface="+mn-ea"/>
+                <a:cs typeface="+mn-cs"/>
+              </a:rPr>
+              <a:t>That same requirement looks like this</a:t>
+            </a:r>
+            <a:r>
+              <a:rPr lang="en-US" sz="1200" kern="1200" baseline="0" dirty="0" smtClean="0">
+                <a:solidFill>
+                  <a:schemeClr val="tx1"/>
+                </a:solidFill>
+                <a:effectLst/>
+                <a:latin typeface="+mn-lt"/>
+                <a:ea typeface="+mn-ea"/>
+                <a:cs typeface="+mn-cs"/>
+              </a:rPr>
+              <a:t> when implemented on the Order Detail page.</a:t>
+            </a:r>
+          </a:p>
+          <a:p>
+            <a:r>
+              <a:rPr lang="en-US" sz="1200" kern="1200" dirty="0" smtClean="0">
+                <a:solidFill>
+                  <a:schemeClr val="tx1"/>
+                </a:solidFill>
+                <a:effectLst/>
+                <a:latin typeface="+mn-lt"/>
+                <a:ea typeface="+mn-ea"/>
+                <a:cs typeface="+mn-cs"/>
+              </a:rPr>
+              <a:t> </a:t>
+            </a:r>
+          </a:p>
+          <a:p>
+            <a:r>
+              <a:rPr lang="en-US" sz="1200" kern="1200" dirty="0" smtClean="0">
+                <a:solidFill>
+                  <a:schemeClr val="tx1"/>
+                </a:solidFill>
+                <a:effectLst/>
+                <a:latin typeface="+mn-lt"/>
+                <a:ea typeface="+mn-ea"/>
+                <a:cs typeface="+mn-cs"/>
+              </a:rPr>
+              <a:t>First I call </a:t>
+            </a:r>
+            <a:r>
+              <a:rPr lang="en-US" sz="1200" kern="1200" dirty="0" err="1" smtClean="0">
+                <a:solidFill>
+                  <a:schemeClr val="tx1"/>
+                </a:solidFill>
+                <a:effectLst/>
+                <a:latin typeface="+mn-lt"/>
+                <a:ea typeface="+mn-ea"/>
+                <a:cs typeface="+mn-cs"/>
+              </a:rPr>
+              <a:t>GetById</a:t>
+            </a:r>
+            <a:r>
+              <a:rPr lang="en-US" sz="1200" kern="1200" dirty="0" smtClean="0">
+                <a:solidFill>
+                  <a:schemeClr val="tx1"/>
+                </a:solidFill>
+                <a:effectLst/>
+                <a:latin typeface="+mn-lt"/>
+                <a:ea typeface="+mn-ea"/>
+                <a:cs typeface="+mn-cs"/>
+              </a:rPr>
+              <a:t> to retrieve the order, then I check the permission and kick the user out if necessary.</a:t>
+            </a:r>
+          </a:p>
+          <a:p>
+            <a:endParaRPr lang="en-US" sz="1200" kern="1200" dirty="0" smtClean="0">
+              <a:solidFill>
+                <a:schemeClr val="tx1"/>
+              </a:solidFill>
+              <a:effectLst/>
+              <a:latin typeface="+mn-lt"/>
+              <a:ea typeface="+mn-ea"/>
+              <a:cs typeface="+mn-cs"/>
+            </a:endParaRPr>
+          </a:p>
+          <a:p>
+            <a:r>
+              <a:rPr lang="en-US" sz="1200" kern="1200" dirty="0" smtClean="0">
+                <a:solidFill>
+                  <a:schemeClr val="tx1"/>
+                </a:solidFill>
+                <a:effectLst/>
+                <a:latin typeface="+mn-lt"/>
+                <a:ea typeface="+mn-ea"/>
+                <a:cs typeface="+mn-cs"/>
+              </a:rPr>
+              <a:t>This is an example of the situation I showed you at the start of my talk. We have same LOGICAL RULE being implemented in two different ways. One of these</a:t>
+            </a:r>
+            <a:r>
+              <a:rPr lang="en-US" sz="1200" kern="1200" baseline="0" dirty="0" smtClean="0">
+                <a:solidFill>
+                  <a:schemeClr val="tx1"/>
+                </a:solidFill>
+                <a:effectLst/>
+                <a:latin typeface="+mn-lt"/>
+                <a:ea typeface="+mn-ea"/>
+                <a:cs typeface="+mn-cs"/>
+              </a:rPr>
+              <a:t> is a red square, and the other is a red diamond. </a:t>
+            </a:r>
+          </a:p>
+          <a:p>
+            <a:endParaRPr lang="en-US" sz="1200" kern="1200" baseline="0" dirty="0" smtClean="0">
+              <a:solidFill>
+                <a:schemeClr val="tx1"/>
+              </a:solidFill>
+              <a:effectLst/>
+              <a:latin typeface="+mn-lt"/>
+              <a:ea typeface="+mn-ea"/>
+              <a:cs typeface="+mn-cs"/>
+            </a:endParaRPr>
+          </a:p>
+          <a:p>
+            <a:r>
+              <a:rPr lang="en-US" sz="1200" kern="1200" dirty="0" smtClean="0">
+                <a:solidFill>
+                  <a:schemeClr val="tx1"/>
+                </a:solidFill>
+                <a:effectLst/>
+                <a:latin typeface="+mn-lt"/>
+                <a:ea typeface="+mn-ea"/>
+                <a:cs typeface="+mn-cs"/>
+              </a:rPr>
+              <a:t>Without a centralized </a:t>
+            </a:r>
+            <a:r>
+              <a:rPr lang="en-US" sz="1200" kern="1200" dirty="0" err="1" smtClean="0">
+                <a:solidFill>
+                  <a:schemeClr val="tx1"/>
+                </a:solidFill>
+                <a:effectLst/>
+                <a:latin typeface="+mn-lt"/>
+                <a:ea typeface="+mn-ea"/>
+                <a:cs typeface="+mn-cs"/>
+              </a:rPr>
+              <a:t>impl</a:t>
+            </a:r>
+            <a:r>
+              <a:rPr lang="en-US" sz="1200" kern="1200" dirty="0" smtClean="0">
+                <a:solidFill>
+                  <a:schemeClr val="tx1"/>
+                </a:solidFill>
+                <a:effectLst/>
+                <a:latin typeface="+mn-lt"/>
+                <a:ea typeface="+mn-ea"/>
+                <a:cs typeface="+mn-cs"/>
+              </a:rPr>
+              <a:t> it’s going to be very difficult to keep them in sync as requirements change.</a:t>
+            </a:r>
+          </a:p>
+          <a:p>
+            <a:endParaRPr lang="en-US" sz="1200" kern="1200" dirty="0" smtClean="0">
+              <a:solidFill>
+                <a:schemeClr val="tx1"/>
+              </a:solidFill>
+              <a:effectLst/>
+              <a:latin typeface="+mn-lt"/>
+              <a:ea typeface="+mn-ea"/>
+              <a:cs typeface="+mn-cs"/>
+            </a:endParaRPr>
+          </a:p>
+          <a:p>
+            <a:r>
+              <a:rPr lang="en-US" sz="1200" kern="1200" dirty="0" smtClean="0">
+                <a:solidFill>
+                  <a:schemeClr val="tx1"/>
+                </a:solidFill>
+                <a:effectLst/>
+                <a:latin typeface="+mn-lt"/>
+                <a:ea typeface="+mn-ea"/>
+                <a:cs typeface="+mn-cs"/>
+              </a:rPr>
+              <a:t>There are two ways that we could centralize the implementation of this access control logic. </a:t>
+            </a:r>
+          </a:p>
+          <a:p>
             <a:endParaRPr lang="en-US" b="0" dirty="0" smtClean="0"/>
           </a:p>
         </p:txBody>
@@ -7004,6 +7296,172 @@
           <a:bodyPr/>
           <a:lstStyle/>
           <a:p>
+            <a:r>
+              <a:rPr lang="en-US" sz="1200" kern="1200" dirty="0" smtClean="0">
+                <a:solidFill>
+                  <a:schemeClr val="tx1"/>
+                </a:solidFill>
+                <a:effectLst/>
+                <a:latin typeface="+mn-lt"/>
+                <a:ea typeface="+mn-ea"/>
+                <a:cs typeface="+mn-cs"/>
+              </a:rPr>
+              <a:t>The easiest way to make this a cross-cutting concern is to push responsibility for access control into your data access code where it can be reused by multiple features.</a:t>
+            </a:r>
+          </a:p>
+          <a:p>
+            <a:endParaRPr lang="en-US" sz="1200" kern="1200" dirty="0" smtClean="0">
+              <a:solidFill>
+                <a:schemeClr val="tx1"/>
+              </a:solidFill>
+              <a:effectLst/>
+              <a:latin typeface="+mn-lt"/>
+              <a:ea typeface="+mn-ea"/>
+              <a:cs typeface="+mn-cs"/>
+            </a:endParaRPr>
+          </a:p>
+          <a:p>
+            <a:r>
+              <a:rPr lang="en-US" sz="1200" kern="1200" dirty="0" smtClean="0">
+                <a:solidFill>
+                  <a:schemeClr val="tx1"/>
+                </a:solidFill>
+                <a:effectLst/>
+                <a:latin typeface="+mn-lt"/>
+                <a:ea typeface="+mn-ea"/>
+                <a:cs typeface="+mn-cs"/>
+              </a:rPr>
+              <a:t>Example of simple data service that provides two ways to get order data. </a:t>
+            </a:r>
+            <a:r>
+              <a:rPr lang="en-US" sz="1200" kern="1200" dirty="0" err="1" smtClean="0">
+                <a:solidFill>
+                  <a:schemeClr val="tx1"/>
+                </a:solidFill>
+                <a:effectLst/>
+                <a:latin typeface="+mn-lt"/>
+                <a:ea typeface="+mn-ea"/>
+                <a:cs typeface="+mn-cs"/>
+              </a:rPr>
+              <a:t>GetAll</a:t>
+            </a:r>
+            <a:r>
+              <a:rPr lang="en-US" sz="1200" kern="1200" dirty="0" smtClean="0">
+                <a:solidFill>
+                  <a:schemeClr val="tx1"/>
+                </a:solidFill>
+                <a:effectLst/>
+                <a:latin typeface="+mn-lt"/>
+                <a:ea typeface="+mn-ea"/>
+                <a:cs typeface="+mn-cs"/>
+              </a:rPr>
+              <a:t> / </a:t>
+            </a:r>
+            <a:r>
+              <a:rPr lang="en-US" sz="1200" kern="1200" dirty="0" err="1" smtClean="0">
+                <a:solidFill>
+                  <a:schemeClr val="tx1"/>
+                </a:solidFill>
+                <a:effectLst/>
+                <a:latin typeface="+mn-lt"/>
+                <a:ea typeface="+mn-ea"/>
+                <a:cs typeface="+mn-cs"/>
+              </a:rPr>
+              <a:t>GetById</a:t>
+            </a:r>
+            <a:endParaRPr lang="en-US" sz="1200" kern="1200" dirty="0" smtClean="0">
+              <a:solidFill>
+                <a:schemeClr val="tx1"/>
+              </a:solidFill>
+              <a:effectLst/>
+              <a:latin typeface="+mn-lt"/>
+              <a:ea typeface="+mn-ea"/>
+              <a:cs typeface="+mn-cs"/>
+            </a:endParaRPr>
+          </a:p>
+          <a:p>
+            <a:endParaRPr lang="en-US" sz="1200" kern="1200" dirty="0" smtClean="0">
+              <a:solidFill>
+                <a:schemeClr val="tx1"/>
+              </a:solidFill>
+              <a:effectLst/>
+              <a:latin typeface="+mn-lt"/>
+              <a:ea typeface="+mn-ea"/>
+              <a:cs typeface="+mn-cs"/>
+            </a:endParaRPr>
+          </a:p>
+          <a:p>
+            <a:r>
+              <a:rPr lang="en-US" sz="1200" kern="1200" dirty="0" smtClean="0">
+                <a:solidFill>
+                  <a:schemeClr val="tx1"/>
+                </a:solidFill>
+                <a:effectLst/>
+                <a:latin typeface="+mn-lt"/>
+                <a:ea typeface="+mn-ea"/>
+                <a:cs typeface="+mn-cs"/>
+              </a:rPr>
+              <a:t>Two versions of each method – one that takes the current user as an argument, and one that doesn’t.  The one that does provides</a:t>
+            </a:r>
+            <a:r>
+              <a:rPr lang="en-US" sz="1200" kern="1200" baseline="0" dirty="0" smtClean="0">
+                <a:solidFill>
+                  <a:schemeClr val="tx1"/>
+                </a:solidFill>
+                <a:effectLst/>
+                <a:latin typeface="+mn-lt"/>
+                <a:ea typeface="+mn-ea"/>
+                <a:cs typeface="+mn-cs"/>
+              </a:rPr>
+              <a:t> access control</a:t>
+            </a:r>
+            <a:endParaRPr lang="en-US" sz="1200" kern="1200" dirty="0" smtClean="0">
+              <a:solidFill>
+                <a:schemeClr val="tx1"/>
+              </a:solidFill>
+              <a:effectLst/>
+              <a:latin typeface="+mn-lt"/>
+              <a:ea typeface="+mn-ea"/>
+              <a:cs typeface="+mn-cs"/>
+            </a:endParaRPr>
+          </a:p>
+          <a:p>
+            <a:endParaRPr lang="en-US" sz="1200" kern="1200" dirty="0" smtClean="0">
+              <a:solidFill>
+                <a:schemeClr val="tx1"/>
+              </a:solidFill>
+              <a:effectLst/>
+              <a:latin typeface="+mn-lt"/>
+              <a:ea typeface="+mn-ea"/>
+              <a:cs typeface="+mn-cs"/>
+            </a:endParaRPr>
+          </a:p>
+          <a:p>
+            <a:r>
+              <a:rPr lang="en-US" sz="1200" kern="1200" dirty="0" smtClean="0">
+                <a:solidFill>
+                  <a:schemeClr val="tx1"/>
+                </a:solidFill>
+                <a:effectLst/>
+                <a:latin typeface="+mn-lt"/>
+                <a:ea typeface="+mn-ea"/>
+                <a:cs typeface="+mn-cs"/>
+              </a:rPr>
+              <a:t>Why have two versions? Well, there might be scenarios where there is no “current user”, such as an automated maintenance program running on a schedule.  </a:t>
+            </a:r>
+          </a:p>
+          <a:p>
+            <a:endParaRPr lang="en-US" sz="1200" kern="1200" dirty="0" smtClean="0">
+              <a:solidFill>
+                <a:schemeClr val="tx1"/>
+              </a:solidFill>
+              <a:effectLst/>
+              <a:latin typeface="+mn-lt"/>
+              <a:ea typeface="+mn-ea"/>
+              <a:cs typeface="+mn-cs"/>
+            </a:endParaRPr>
+          </a:p>
+          <a:p>
             <a:endParaRPr lang="en-US" b="0" dirty="0" smtClean="0"/>
           </a:p>
         </p:txBody>
@@ -7088,7 +7546,186 @@
           <a:bodyPr/>
           <a:lstStyle/>
           <a:p>
-            <a:endParaRPr lang="en-US" b="0" dirty="0" smtClean="0"/>
+            <a:r>
+              <a:rPr lang="en-US" sz="1200" kern="1200" dirty="0" smtClean="0">
+                <a:solidFill>
+                  <a:schemeClr val="tx1"/>
+                </a:solidFill>
+                <a:effectLst/>
+                <a:latin typeface="+mn-lt"/>
+                <a:ea typeface="+mn-ea"/>
+                <a:cs typeface="+mn-cs"/>
+              </a:rPr>
+              <a:t>If you can avoid it, I’d recommend NOT having the insecure versions at all. But if you </a:t>
+            </a:r>
+            <a:r>
+              <a:rPr lang="en-US" sz="1200" i="1" kern="1200" dirty="0" smtClean="0">
+                <a:solidFill>
+                  <a:schemeClr val="tx1"/>
+                </a:solidFill>
+                <a:effectLst/>
+                <a:latin typeface="+mn-lt"/>
+                <a:ea typeface="+mn-ea"/>
+                <a:cs typeface="+mn-cs"/>
+              </a:rPr>
+              <a:t>do </a:t>
+            </a:r>
+            <a:r>
+              <a:rPr lang="en-US" sz="1200" kern="1200" dirty="0" smtClean="0">
+                <a:solidFill>
+                  <a:schemeClr val="tx1"/>
+                </a:solidFill>
+                <a:effectLst/>
+                <a:latin typeface="+mn-lt"/>
+                <a:ea typeface="+mn-ea"/>
+                <a:cs typeface="+mn-cs"/>
+              </a:rPr>
+              <a:t>have to provide two versions of your data access methods, I recommend a naming convention like you see here.</a:t>
+            </a:r>
+          </a:p>
+          <a:p>
+            <a:endParaRPr lang="en-US" sz="1200" kern="1200" dirty="0" smtClean="0">
+              <a:solidFill>
+                <a:schemeClr val="tx1"/>
+              </a:solidFill>
+              <a:effectLst/>
+              <a:latin typeface="+mn-lt"/>
+              <a:ea typeface="+mn-ea"/>
+              <a:cs typeface="+mn-cs"/>
+            </a:endParaRPr>
+          </a:p>
+          <a:p>
+            <a:r>
+              <a:rPr lang="en-US" sz="1200" kern="1200" dirty="0" smtClean="0">
+                <a:solidFill>
+                  <a:schemeClr val="tx1"/>
+                </a:solidFill>
+                <a:effectLst/>
+                <a:latin typeface="+mn-lt"/>
+                <a:ea typeface="+mn-ea"/>
+                <a:cs typeface="+mn-cs"/>
+              </a:rPr>
+              <a:t>In this case, I’ve added the suffix “Insecure” to the methods that do NOT do any access control. The idea here is to remind programmers of their obligations when calling these methods.</a:t>
+            </a:r>
+          </a:p>
+          <a:p>
+            <a:endParaRPr lang="en-US" sz="1200" kern="1200" dirty="0" smtClean="0">
+              <a:solidFill>
+                <a:schemeClr val="tx1"/>
+              </a:solidFill>
+              <a:effectLst/>
+              <a:latin typeface="+mn-lt"/>
+              <a:ea typeface="+mn-ea"/>
+              <a:cs typeface="+mn-cs"/>
+            </a:endParaRPr>
+          </a:p>
+          <a:p>
+            <a:r>
+              <a:rPr lang="en-US" sz="1200" kern="1200" dirty="0" smtClean="0">
+                <a:solidFill>
+                  <a:schemeClr val="tx1"/>
+                </a:solidFill>
+                <a:effectLst/>
+                <a:latin typeface="+mn-lt"/>
+                <a:ea typeface="+mn-ea"/>
+                <a:cs typeface="+mn-cs"/>
+              </a:rPr>
+              <a:t>For instance, if I type “</a:t>
+            </a:r>
+            <a:r>
+              <a:rPr lang="en-US" sz="1200" kern="1200" dirty="0" err="1" smtClean="0">
+                <a:solidFill>
+                  <a:schemeClr val="tx1"/>
+                </a:solidFill>
+                <a:effectLst/>
+                <a:latin typeface="+mn-lt"/>
+                <a:ea typeface="+mn-ea"/>
+                <a:cs typeface="+mn-cs"/>
+              </a:rPr>
+              <a:t>OrderService.GetById</a:t>
+            </a:r>
+            <a:r>
+              <a:rPr lang="en-US" sz="1200" kern="1200" dirty="0" smtClean="0">
+                <a:solidFill>
+                  <a:schemeClr val="tx1"/>
+                </a:solidFill>
+                <a:effectLst/>
+                <a:latin typeface="+mn-lt"/>
+                <a:ea typeface="+mn-ea"/>
+                <a:cs typeface="+mn-cs"/>
+              </a:rPr>
+              <a:t>”, it isn’t explicitly obvious whether or not access control is being handled. But if I type “</a:t>
+            </a:r>
+            <a:r>
+              <a:rPr lang="en-US" sz="1200" kern="1200" dirty="0" err="1" smtClean="0">
+                <a:solidFill>
+                  <a:schemeClr val="tx1"/>
+                </a:solidFill>
+                <a:effectLst/>
+                <a:latin typeface="+mn-lt"/>
+                <a:ea typeface="+mn-ea"/>
+                <a:cs typeface="+mn-cs"/>
+              </a:rPr>
+              <a:t>GetById</a:t>
+            </a:r>
+            <a:r>
+              <a:rPr lang="en-US" sz="1200" u="sng" kern="1200" dirty="0" err="1" smtClean="0">
+                <a:solidFill>
+                  <a:schemeClr val="tx1"/>
+                </a:solidFill>
+                <a:effectLst/>
+                <a:latin typeface="+mn-lt"/>
+                <a:ea typeface="+mn-ea"/>
+                <a:cs typeface="+mn-cs"/>
+              </a:rPr>
+              <a:t>Insecure</a:t>
+            </a:r>
+            <a:r>
+              <a:rPr lang="en-US" sz="1200" kern="1200" dirty="0" smtClean="0">
+                <a:solidFill>
+                  <a:schemeClr val="tx1"/>
+                </a:solidFill>
+                <a:effectLst/>
+                <a:latin typeface="+mn-lt"/>
+                <a:ea typeface="+mn-ea"/>
+                <a:cs typeface="+mn-cs"/>
+              </a:rPr>
+              <a:t>”, that’s a pretty clear reminder that I’m on the hook for security in my feature code.</a:t>
+            </a:r>
+          </a:p>
+          <a:p>
+            <a:endParaRPr lang="en-US" sz="1200" kern="1200" dirty="0" smtClean="0">
+              <a:solidFill>
+                <a:schemeClr val="tx1"/>
+              </a:solidFill>
+              <a:effectLst/>
+              <a:latin typeface="+mn-lt"/>
+              <a:ea typeface="+mn-ea"/>
+              <a:cs typeface="+mn-cs"/>
+            </a:endParaRPr>
+          </a:p>
+          <a:p>
+            <a:r>
+              <a:rPr lang="en-US" sz="1200" kern="1200" dirty="0" smtClean="0">
+                <a:solidFill>
+                  <a:schemeClr val="tx1"/>
+                </a:solidFill>
+                <a:effectLst/>
+                <a:latin typeface="+mn-lt"/>
+                <a:ea typeface="+mn-ea"/>
+                <a:cs typeface="+mn-cs"/>
+              </a:rPr>
+              <a:t>This approach is better than nothing, and it does push the access control logic down from the top level feature code and into the data access layer. But this is far from “secure by default”; the security code needs to be manually added to every data access method, and that can result in a lot of duplication. It can also result in a lot of inconsistency if each method implements those rules in a haphazard way.</a:t>
+            </a:r>
+            <a:endParaRPr lang="en-US" sz="1200" kern="1200" dirty="0">
+              <a:solidFill>
+                <a:schemeClr val="tx1"/>
+              </a:solidFill>
+              <a:effectLst/>
+              <a:latin typeface="+mn-lt"/>
+              <a:ea typeface="+mn-ea"/>
+              <a:cs typeface="+mn-cs"/>
+            </a:endParaRPr>
           </a:p>
         </p:txBody>
       </p:sp>
@@ -7172,6 +7809,94 @@
           <a:bodyPr/>
           <a:lstStyle/>
           <a:p>
+            <a:r>
+              <a:rPr lang="en-US" sz="1200" kern="1200" dirty="0" smtClean="0">
+                <a:solidFill>
+                  <a:schemeClr val="tx1"/>
+                </a:solidFill>
+                <a:effectLst/>
+                <a:latin typeface="+mn-lt"/>
+                <a:ea typeface="+mn-ea"/>
+                <a:cs typeface="+mn-cs"/>
+              </a:rPr>
+              <a:t>Another way to handle access control is through a technique called Row Level Security. The idea here is that instead of filtering out data in our application code, we create a security policy </a:t>
+            </a:r>
+            <a:r>
+              <a:rPr lang="en-US" sz="1200" i="1" kern="1200" dirty="0" smtClean="0">
+                <a:solidFill>
+                  <a:schemeClr val="tx1"/>
+                </a:solidFill>
+                <a:effectLst/>
+                <a:latin typeface="+mn-lt"/>
+                <a:ea typeface="+mn-ea"/>
+                <a:cs typeface="+mn-cs"/>
+              </a:rPr>
+              <a:t>in the database itself </a:t>
+            </a:r>
+            <a:r>
+              <a:rPr lang="en-US" sz="1200" kern="1200" dirty="0" smtClean="0">
+                <a:solidFill>
+                  <a:schemeClr val="tx1"/>
+                </a:solidFill>
+                <a:effectLst/>
+                <a:latin typeface="+mn-lt"/>
+                <a:ea typeface="+mn-ea"/>
+                <a:cs typeface="+mn-cs"/>
+              </a:rPr>
+              <a:t>that does the filtering. Then, the application can simply ask for the data it needs, and the database will only return the data that the user is allowed to access. This essentially makes the access control transparent to the application code and makes the entire data access layer “secure by default”.</a:t>
+            </a:r>
+          </a:p>
+          <a:p>
+            <a:endParaRPr lang="en-US" sz="1200" kern="1200" dirty="0" smtClean="0">
+              <a:solidFill>
+                <a:schemeClr val="tx1"/>
+              </a:solidFill>
+              <a:effectLst/>
+              <a:latin typeface="+mn-lt"/>
+              <a:ea typeface="+mn-ea"/>
+              <a:cs typeface="+mn-cs"/>
+            </a:endParaRPr>
+          </a:p>
+          <a:p>
+            <a:r>
+              <a:rPr lang="en-US" sz="1200" kern="1200" dirty="0" smtClean="0">
+                <a:solidFill>
+                  <a:schemeClr val="tx1"/>
+                </a:solidFill>
+                <a:effectLst/>
+                <a:latin typeface="+mn-lt"/>
+                <a:ea typeface="+mn-ea"/>
+                <a:cs typeface="+mn-cs"/>
+              </a:rPr>
+              <a:t>Of course, the devil is in the details, and this approach depends heavily on making this security policy thing aware of who the current user is. Unless you want to give each of your users a dedicated database login, this is typically easier said than done.</a:t>
+            </a:r>
+          </a:p>
+          <a:p>
+            <a:endParaRPr lang="en-US" sz="1200" kern="1200" dirty="0" smtClean="0">
+              <a:solidFill>
+                <a:schemeClr val="tx1"/>
+              </a:solidFill>
+              <a:effectLst/>
+              <a:latin typeface="+mn-lt"/>
+              <a:ea typeface="+mn-ea"/>
+              <a:cs typeface="+mn-cs"/>
+            </a:endParaRPr>
+          </a:p>
+          <a:p>
+            <a:r>
+              <a:rPr lang="en-US" sz="1200" kern="1200" dirty="0" smtClean="0">
+                <a:solidFill>
+                  <a:schemeClr val="tx1"/>
+                </a:solidFill>
+                <a:effectLst/>
+                <a:latin typeface="+mn-lt"/>
+                <a:ea typeface="+mn-ea"/>
+                <a:cs typeface="+mn-cs"/>
+              </a:rPr>
+              <a:t>However, SQL Server 2016 added a new feature that makes this much, much easier to do.</a:t>
+            </a:r>
+          </a:p>
+          <a:p>
             <a:endParaRPr lang="en-US" b="0" dirty="0" smtClean="0"/>
           </a:p>
         </p:txBody>
@@ -7256,6 +7981,70 @@
           <a:bodyPr/>
           <a:lstStyle/>
           <a:p>
+            <a:r>
+              <a:rPr lang="en-US" sz="1200" kern="1200" dirty="0" smtClean="0">
+                <a:solidFill>
+                  <a:schemeClr val="tx1"/>
+                </a:solidFill>
+                <a:effectLst/>
+                <a:latin typeface="+mn-lt"/>
+                <a:ea typeface="+mn-ea"/>
+                <a:cs typeface="+mn-cs"/>
+              </a:rPr>
+              <a:t>This new feature is called the “session context”, and it’s basically a key/value collection that’s scoped to the database connection. This gives us a global dictionary that is shared by all queries within a connection. </a:t>
+            </a:r>
+          </a:p>
+          <a:p>
+            <a:endParaRPr lang="en-US" sz="1200" kern="1200" dirty="0" smtClean="0">
+              <a:solidFill>
+                <a:schemeClr val="tx1"/>
+              </a:solidFill>
+              <a:effectLst/>
+              <a:latin typeface="+mn-lt"/>
+              <a:ea typeface="+mn-ea"/>
+              <a:cs typeface="+mn-cs"/>
+            </a:endParaRPr>
+          </a:p>
+          <a:p>
+            <a:r>
+              <a:rPr lang="en-US" sz="1200" kern="1200" dirty="0" smtClean="0">
+                <a:solidFill>
+                  <a:schemeClr val="tx1"/>
+                </a:solidFill>
+                <a:effectLst/>
+                <a:latin typeface="+mn-lt"/>
+                <a:ea typeface="+mn-ea"/>
+                <a:cs typeface="+mn-cs"/>
+              </a:rPr>
+              <a:t>You put a value into the collection like this, and you can select it back out like this. And you can read this value anywhere in the connection: inside a view, inside a stored procedure, etc.</a:t>
+            </a:r>
+          </a:p>
+          <a:p>
+            <a:endParaRPr lang="en-US" sz="1200" kern="1200" dirty="0" smtClean="0">
+              <a:solidFill>
+                <a:schemeClr val="tx1"/>
+              </a:solidFill>
+              <a:effectLst/>
+              <a:latin typeface="+mn-lt"/>
+              <a:ea typeface="+mn-ea"/>
+              <a:cs typeface="+mn-cs"/>
+            </a:endParaRPr>
+          </a:p>
+          <a:p>
+            <a:r>
+              <a:rPr lang="en-US" sz="1200" kern="1200" dirty="0" smtClean="0">
+                <a:solidFill>
+                  <a:schemeClr val="tx1"/>
+                </a:solidFill>
+                <a:effectLst/>
+                <a:latin typeface="+mn-lt"/>
+                <a:ea typeface="+mn-ea"/>
+                <a:cs typeface="+mn-cs"/>
+              </a:rPr>
+              <a:t>This now gives us a really easy way to tell that security policy who the current user is. Here’s how it all works.</a:t>
+            </a:r>
+          </a:p>
+          <a:p>
             <a:endParaRPr lang="en-US" b="0" dirty="0" smtClean="0"/>
           </a:p>
         </p:txBody>
@@ -7340,6 +8129,197 @@
           <a:bodyPr/>
           <a:lstStyle/>
           <a:p>
+            <a:r>
+              <a:rPr lang="en-US" sz="1200" kern="1200" dirty="0" smtClean="0">
+                <a:solidFill>
+                  <a:schemeClr val="tx1"/>
+                </a:solidFill>
+                <a:effectLst/>
+                <a:latin typeface="+mn-lt"/>
+                <a:ea typeface="+mn-ea"/>
+                <a:cs typeface="+mn-cs"/>
+              </a:rPr>
+              <a:t>First, we need to create what’s called a predicate function. This function will get executed against each row of a result set containing Order records. If the function returns TRUE then the Order gets returned, and if it returns FALSE the order is not returned.</a:t>
+            </a:r>
+          </a:p>
+          <a:p>
+            <a:endParaRPr lang="en-US" sz="1200" kern="1200" dirty="0" smtClean="0">
+              <a:solidFill>
+                <a:schemeClr val="tx1"/>
+              </a:solidFill>
+              <a:effectLst/>
+              <a:latin typeface="+mn-lt"/>
+              <a:ea typeface="+mn-ea"/>
+              <a:cs typeface="+mn-cs"/>
+            </a:endParaRPr>
+          </a:p>
+          <a:p>
+            <a:r>
+              <a:rPr lang="en-US" sz="1200" kern="1200" dirty="0" smtClean="0">
+                <a:solidFill>
+                  <a:schemeClr val="tx1"/>
+                </a:solidFill>
+                <a:effectLst/>
+                <a:latin typeface="+mn-lt"/>
+                <a:ea typeface="+mn-ea"/>
+                <a:cs typeface="+mn-cs"/>
+              </a:rPr>
+              <a:t>The function assumes that the current user ID has been added to the session context. It accepts as input the user ID associated with an Order. </a:t>
+            </a:r>
+          </a:p>
+          <a:p>
+            <a:endParaRPr lang="en-US" sz="1200" kern="1200" dirty="0" smtClean="0">
+              <a:solidFill>
+                <a:schemeClr val="tx1"/>
+              </a:solidFill>
+              <a:effectLst/>
+              <a:latin typeface="+mn-lt"/>
+              <a:ea typeface="+mn-ea"/>
+              <a:cs typeface="+mn-cs"/>
+            </a:endParaRPr>
+          </a:p>
+          <a:p>
+            <a:r>
+              <a:rPr lang="en-US" sz="1200" kern="1200" dirty="0" smtClean="0">
+                <a:solidFill>
+                  <a:schemeClr val="tx1"/>
+                </a:solidFill>
+                <a:effectLst/>
+                <a:latin typeface="+mn-lt"/>
+                <a:ea typeface="+mn-ea"/>
+                <a:cs typeface="+mn-cs"/>
+              </a:rPr>
+              <a:t>If the user ID that’s passed in is equal to the value in the session context, then it means that the given order record is owned by the current user, and the function returns TRUE.</a:t>
+            </a:r>
+          </a:p>
+          <a:p>
+            <a:endParaRPr lang="en-US" sz="1200" kern="1200" dirty="0" smtClean="0">
+              <a:solidFill>
+                <a:schemeClr val="tx1"/>
+              </a:solidFill>
+              <a:effectLst/>
+              <a:latin typeface="+mn-lt"/>
+              <a:ea typeface="+mn-ea"/>
+              <a:cs typeface="+mn-cs"/>
+            </a:endParaRPr>
+          </a:p>
+          <a:p>
+            <a:r>
+              <a:rPr lang="en-US" sz="1200" kern="1200" dirty="0" smtClean="0">
+                <a:solidFill>
+                  <a:schemeClr val="tx1"/>
+                </a:solidFill>
+                <a:effectLst/>
+                <a:latin typeface="+mn-lt"/>
+                <a:ea typeface="+mn-ea"/>
+                <a:cs typeface="+mn-cs"/>
+              </a:rPr>
+              <a:t>If the user ID that’s passed in is NOT equal to the value in the session context, we do a permission lookup for the currently logged in user. If they are allowed to manage all orders, we return TRUE, and otherwise we return FALSE.</a:t>
+            </a:r>
+          </a:p>
+          <a:p>
+            <a:endParaRPr lang="en-US" sz="1200" kern="1200" dirty="0" smtClean="0">
+              <a:solidFill>
+                <a:schemeClr val="tx1"/>
+              </a:solidFill>
+              <a:effectLst/>
+              <a:latin typeface="+mn-lt"/>
+              <a:ea typeface="+mn-ea"/>
+              <a:cs typeface="+mn-cs"/>
+            </a:endParaRPr>
+          </a:p>
+          <a:p>
+            <a:r>
+              <a:rPr lang="en-US" sz="1200" kern="1200" dirty="0" smtClean="0">
+                <a:solidFill>
+                  <a:schemeClr val="tx1"/>
+                </a:solidFill>
+                <a:effectLst/>
+                <a:latin typeface="+mn-lt"/>
+                <a:ea typeface="+mn-ea"/>
+                <a:cs typeface="+mn-cs"/>
+              </a:rPr>
+              <a:t>You can think of this like a lambda expression that you might pass into a LINQ query, it’s basically a filter function that is used to reduce a result set.</a:t>
+            </a:r>
+          </a:p>
+          <a:p>
+            <a:endParaRPr lang="en-US" sz="1200" kern="1200" dirty="0" smtClean="0">
+              <a:solidFill>
+                <a:schemeClr val="tx1"/>
+              </a:solidFill>
+              <a:effectLst/>
+              <a:latin typeface="+mn-lt"/>
+              <a:ea typeface="+mn-ea"/>
+              <a:cs typeface="+mn-cs"/>
+            </a:endParaRPr>
+          </a:p>
+          <a:p>
+            <a:r>
+              <a:rPr lang="en-US" sz="1200" kern="1200" dirty="0" smtClean="0">
+                <a:solidFill>
+                  <a:schemeClr val="tx1"/>
+                </a:solidFill>
+                <a:effectLst/>
+                <a:latin typeface="+mn-lt"/>
+                <a:ea typeface="+mn-ea"/>
+                <a:cs typeface="+mn-cs"/>
+              </a:rPr>
+              <a:t>There is one </a:t>
+            </a:r>
+            <a:r>
+              <a:rPr lang="en-US" sz="1200" kern="1200" dirty="0" err="1" smtClean="0">
+                <a:solidFill>
+                  <a:schemeClr val="tx1"/>
+                </a:solidFill>
+                <a:effectLst/>
+                <a:latin typeface="+mn-lt"/>
+                <a:ea typeface="+mn-ea"/>
+                <a:cs typeface="+mn-cs"/>
+              </a:rPr>
+              <a:t>gotcha</a:t>
+            </a:r>
+            <a:r>
+              <a:rPr lang="en-US" sz="1200" kern="1200" dirty="0" smtClean="0">
+                <a:solidFill>
+                  <a:schemeClr val="tx1"/>
+                </a:solidFill>
+                <a:effectLst/>
+                <a:latin typeface="+mn-lt"/>
+                <a:ea typeface="+mn-ea"/>
+                <a:cs typeface="+mn-cs"/>
+              </a:rPr>
+              <a:t> here: when we’re done, the security policy is going to execute this predicate whenever ANYONE tries to access the Orders table. It’s important that you check to see if the user ID is in the session context or not. If not, don’t filter anything. Otherwise, you won’t be able to see the data in SSMS without setting a user id.</a:t>
+            </a:r>
+          </a:p>
+          <a:p>
+            <a:r>
+              <a:rPr lang="en-US" sz="1200" kern="1200" dirty="0" smtClean="0">
+                <a:solidFill>
+                  <a:schemeClr val="tx1"/>
+                </a:solidFill>
+                <a:effectLst/>
+                <a:latin typeface="+mn-lt"/>
+                <a:ea typeface="+mn-ea"/>
+                <a:cs typeface="+mn-cs"/>
+              </a:rPr>
+              <a:t>I learned this the hard way. When I was writing the sample code for this section I couldn’t figure out why my test data scripts were successful, but the Orders table was empty. It took me about 30 minutes to realize that my security policy was working flawlessly and was successfully hiding every record in the table. Good times.</a:t>
+            </a:r>
+          </a:p>
+          <a:p>
+            <a:r>
+              <a:rPr lang="en-US" sz="1200" kern="1200" dirty="0" smtClean="0">
+                <a:solidFill>
+                  <a:schemeClr val="tx1"/>
+                </a:solidFill>
+                <a:effectLst/>
+                <a:latin typeface="+mn-lt"/>
+                <a:ea typeface="+mn-ea"/>
+                <a:cs typeface="+mn-cs"/>
+              </a:rPr>
+              <a:t>Once we have this predicate defined, we need to tell SQL Server where to use it.</a:t>
+            </a:r>
+          </a:p>
+          <a:p>
             <a:endParaRPr lang="en-US" b="0" dirty="0" smtClean="0"/>
           </a:p>
         </p:txBody>
@@ -7424,6 +8404,70 @@
           <a:bodyPr/>
           <a:lstStyle/>
           <a:p>
+            <a:r>
+              <a:rPr lang="en-US" sz="1200" kern="1200" dirty="0" smtClean="0">
+                <a:solidFill>
+                  <a:schemeClr val="tx1"/>
+                </a:solidFill>
+                <a:effectLst/>
+                <a:latin typeface="+mn-lt"/>
+                <a:ea typeface="+mn-ea"/>
+                <a:cs typeface="+mn-cs"/>
+              </a:rPr>
+              <a:t>To do that, we create a security policy on the Orders table that contains a FILTER PREDICATE referencing the function we just created.</a:t>
+            </a:r>
+          </a:p>
+          <a:p>
+            <a:endParaRPr lang="en-US" sz="1200" kern="1200" dirty="0" smtClean="0">
+              <a:solidFill>
+                <a:schemeClr val="tx1"/>
+              </a:solidFill>
+              <a:effectLst/>
+              <a:latin typeface="+mn-lt"/>
+              <a:ea typeface="+mn-ea"/>
+              <a:cs typeface="+mn-cs"/>
+            </a:endParaRPr>
+          </a:p>
+          <a:p>
+            <a:r>
+              <a:rPr lang="en-US" sz="1200" kern="1200" dirty="0" smtClean="0">
+                <a:solidFill>
+                  <a:schemeClr val="tx1"/>
+                </a:solidFill>
+                <a:effectLst/>
+                <a:latin typeface="+mn-lt"/>
+                <a:ea typeface="+mn-ea"/>
+                <a:cs typeface="+mn-cs"/>
+              </a:rPr>
+              <a:t>Once this is in place, any attempt to read from the Orders table will be subject to the access control logic we defined.</a:t>
+            </a:r>
+          </a:p>
+          <a:p>
+            <a:endParaRPr lang="en-US" sz="1200" kern="1200" dirty="0" smtClean="0">
+              <a:solidFill>
+                <a:schemeClr val="tx1"/>
+              </a:solidFill>
+              <a:effectLst/>
+              <a:latin typeface="+mn-lt"/>
+              <a:ea typeface="+mn-ea"/>
+              <a:cs typeface="+mn-cs"/>
+            </a:endParaRPr>
+          </a:p>
+          <a:p>
+            <a:r>
+              <a:rPr lang="en-US" sz="1200" kern="1200" dirty="0" smtClean="0">
+                <a:solidFill>
+                  <a:schemeClr val="tx1"/>
+                </a:solidFill>
+                <a:effectLst/>
+                <a:latin typeface="+mn-lt"/>
+                <a:ea typeface="+mn-ea"/>
+                <a:cs typeface="+mn-cs"/>
+              </a:rPr>
+              <a:t>The last piece of the puzzle is to actually set the user ID into the session context so that it’s available to the security policy.</a:t>
+            </a:r>
+          </a:p>
+          <a:p>
             <a:endParaRPr lang="en-US" b="0" dirty="0" smtClean="0"/>
           </a:p>
         </p:txBody>
@@ -7508,6 +8552,108 @@
           <a:bodyPr/>
           <a:lstStyle/>
           <a:p>
+            <a:r>
+              <a:rPr lang="en-US" sz="1200" kern="1200" dirty="0" smtClean="0">
+                <a:solidFill>
+                  <a:schemeClr val="tx1"/>
+                </a:solidFill>
+                <a:effectLst/>
+                <a:latin typeface="+mn-lt"/>
+                <a:ea typeface="+mn-ea"/>
+                <a:cs typeface="+mn-cs"/>
+              </a:rPr>
+              <a:t>To do that, we need some sort of hook that we can tap into and run custom code at the start of every database connection. </a:t>
+            </a:r>
+          </a:p>
+          <a:p>
+            <a:endParaRPr lang="en-US" sz="1200" kern="1200" dirty="0" smtClean="0">
+              <a:solidFill>
+                <a:schemeClr val="tx1"/>
+              </a:solidFill>
+              <a:effectLst/>
+              <a:latin typeface="+mn-lt"/>
+              <a:ea typeface="+mn-ea"/>
+              <a:cs typeface="+mn-cs"/>
+            </a:endParaRPr>
+          </a:p>
+          <a:p>
+            <a:r>
+              <a:rPr lang="en-US" sz="1200" kern="1200" dirty="0" smtClean="0">
+                <a:solidFill>
+                  <a:schemeClr val="tx1"/>
+                </a:solidFill>
+                <a:effectLst/>
+                <a:latin typeface="+mn-lt"/>
+                <a:ea typeface="+mn-ea"/>
+                <a:cs typeface="+mn-cs"/>
+              </a:rPr>
+              <a:t>In Entity Framework, for example, we can create a class that implements the </a:t>
+            </a:r>
+            <a:r>
+              <a:rPr lang="en-US" sz="1200" kern="1200" dirty="0" err="1" smtClean="0">
+                <a:solidFill>
+                  <a:schemeClr val="tx1"/>
+                </a:solidFill>
+                <a:effectLst/>
+                <a:latin typeface="+mn-lt"/>
+                <a:ea typeface="+mn-ea"/>
+                <a:cs typeface="+mn-cs"/>
+              </a:rPr>
+              <a:t>IDbConnectionInterceptor</a:t>
+            </a:r>
+            <a:r>
+              <a:rPr lang="en-US" sz="1200" kern="1200" dirty="0" smtClean="0">
+                <a:solidFill>
+                  <a:schemeClr val="tx1"/>
+                </a:solidFill>
+                <a:effectLst/>
+                <a:latin typeface="+mn-lt"/>
+                <a:ea typeface="+mn-ea"/>
+                <a:cs typeface="+mn-cs"/>
+              </a:rPr>
+              <a:t> interface and implement the “Opened” method. The code we put here gets run each time Entity Framework opens a new connection.</a:t>
+            </a:r>
+          </a:p>
+          <a:p>
+            <a:endParaRPr lang="en-US" sz="1200" kern="1200" dirty="0" smtClean="0">
+              <a:solidFill>
+                <a:schemeClr val="tx1"/>
+              </a:solidFill>
+              <a:effectLst/>
+              <a:latin typeface="+mn-lt"/>
+              <a:ea typeface="+mn-ea"/>
+              <a:cs typeface="+mn-cs"/>
+            </a:endParaRPr>
+          </a:p>
+          <a:p>
+            <a:r>
+              <a:rPr lang="en-US" sz="1200" kern="1200" dirty="0" smtClean="0">
+                <a:solidFill>
+                  <a:schemeClr val="tx1"/>
+                </a:solidFill>
+                <a:effectLst/>
+                <a:latin typeface="+mn-lt"/>
+                <a:ea typeface="+mn-ea"/>
+                <a:cs typeface="+mn-cs"/>
+              </a:rPr>
+              <a:t>All we need to do is figure out who the current user is, and then add that value to the session context.</a:t>
+            </a:r>
+          </a:p>
+          <a:p>
+            <a:r>
+              <a:rPr lang="en-US" sz="1200" kern="1200" dirty="0" smtClean="0">
+                <a:solidFill>
+                  <a:schemeClr val="tx1"/>
+                </a:solidFill>
+                <a:effectLst/>
+                <a:latin typeface="+mn-lt"/>
+                <a:ea typeface="+mn-ea"/>
+                <a:cs typeface="+mn-cs"/>
+              </a:rPr>
+              <a:t>That’s it.</a:t>
+            </a:r>
+          </a:p>
+          <a:p>
             <a:endParaRPr lang="en-US" b="0" dirty="0" smtClean="0"/>
           </a:p>
         </p:txBody>
@@ -7592,6 +8738,45 @@
           <a:bodyPr/>
           <a:lstStyle/>
           <a:p>
+            <a:r>
+              <a:rPr lang="en-US" sz="1200" kern="1200" dirty="0" smtClean="0">
+                <a:solidFill>
+                  <a:schemeClr val="tx1"/>
+                </a:solidFill>
+                <a:effectLst/>
+                <a:latin typeface="+mn-lt"/>
+                <a:ea typeface="+mn-ea"/>
+                <a:cs typeface="+mn-cs"/>
+              </a:rPr>
+              <a:t>Once those things are in place, our feature code can be 100% focused on business logic because all of the access control is taking place automatically. Pretty sweet!</a:t>
+            </a:r>
+          </a:p>
+          <a:p>
+            <a:endParaRPr lang="en-US" sz="1200" kern="1200" dirty="0" smtClean="0">
+              <a:solidFill>
+                <a:schemeClr val="tx1"/>
+              </a:solidFill>
+              <a:effectLst/>
+              <a:latin typeface="+mn-lt"/>
+              <a:ea typeface="+mn-ea"/>
+              <a:cs typeface="+mn-cs"/>
+            </a:endParaRPr>
+          </a:p>
+          <a:p>
+            <a:r>
+              <a:rPr lang="en-US" sz="1200" kern="1200" dirty="0" smtClean="0">
+                <a:solidFill>
+                  <a:schemeClr val="tx1"/>
+                </a:solidFill>
+                <a:effectLst/>
+                <a:latin typeface="+mn-lt"/>
+                <a:ea typeface="+mn-ea"/>
+                <a:cs typeface="+mn-cs"/>
+              </a:rPr>
+              <a:t>This is a very new feature in SQL Server and there are a couple of restrictions that you need to be aware of, so definitely do your own research before you totally replace your existing security code. Based on my preliminary analysis though it looks promising.</a:t>
+            </a:r>
+          </a:p>
+          <a:p>
             <a:endParaRPr lang="en-US" b="0" dirty="0" smtClean="0"/>
           </a:p>
         </p:txBody>
@@ -7676,6 +8861,132 @@
           <a:bodyPr/>
           <a:lstStyle/>
           <a:p>
+            <a:r>
+              <a:rPr lang="en-US" sz="1200" kern="1200" dirty="0" smtClean="0">
+                <a:solidFill>
+                  <a:schemeClr val="tx1"/>
+                </a:solidFill>
+                <a:effectLst/>
+                <a:latin typeface="+mn-lt"/>
+                <a:ea typeface="+mn-ea"/>
+                <a:cs typeface="+mn-cs"/>
+              </a:rPr>
+              <a:t>I just showed you three things that you can implement completely in your framework, with no feature level code whatsoever. </a:t>
+            </a:r>
+          </a:p>
+          <a:p>
+            <a:r>
+              <a:rPr lang="en-US" sz="1200" kern="1200" dirty="0" smtClean="0">
+                <a:solidFill>
+                  <a:schemeClr val="tx1"/>
+                </a:solidFill>
+                <a:effectLst/>
+                <a:latin typeface="+mn-lt"/>
+                <a:ea typeface="+mn-ea"/>
+                <a:cs typeface="+mn-cs"/>
+              </a:rPr>
+              <a:t>In many cases, though, the security concerns can’t be </a:t>
+            </a:r>
+            <a:r>
+              <a:rPr lang="en-US" sz="1200" i="1" kern="1200" dirty="0" smtClean="0">
+                <a:solidFill>
+                  <a:schemeClr val="tx1"/>
+                </a:solidFill>
+                <a:effectLst/>
+                <a:latin typeface="+mn-lt"/>
+                <a:ea typeface="+mn-ea"/>
+                <a:cs typeface="+mn-cs"/>
+              </a:rPr>
+              <a:t>fully </a:t>
+            </a:r>
+            <a:r>
+              <a:rPr lang="en-US" sz="1200" kern="1200" dirty="0" smtClean="0">
+                <a:solidFill>
+                  <a:schemeClr val="tx1"/>
+                </a:solidFill>
+                <a:effectLst/>
+                <a:latin typeface="+mn-lt"/>
+                <a:ea typeface="+mn-ea"/>
+                <a:cs typeface="+mn-cs"/>
+              </a:rPr>
+              <a:t>swept under the covers. Authorization is a good example of why. You can move the code that implements a permission check into the framework, but you still need </a:t>
+            </a:r>
+            <a:r>
+              <a:rPr lang="en-US" sz="1200" i="1" kern="1200" dirty="0" smtClean="0">
+                <a:solidFill>
+                  <a:schemeClr val="tx1"/>
+                </a:solidFill>
+                <a:effectLst/>
+                <a:latin typeface="+mn-lt"/>
+                <a:ea typeface="+mn-ea"/>
+                <a:cs typeface="+mn-cs"/>
+              </a:rPr>
+              <a:t>something</a:t>
+            </a:r>
+            <a:r>
+              <a:rPr lang="en-US" sz="1200" kern="1200" dirty="0" smtClean="0">
+                <a:solidFill>
+                  <a:schemeClr val="tx1"/>
+                </a:solidFill>
+                <a:effectLst/>
+                <a:latin typeface="+mn-lt"/>
+                <a:ea typeface="+mn-ea"/>
+                <a:cs typeface="+mn-cs"/>
+              </a:rPr>
+              <a:t> at the feature level to indicate which permissions are required. </a:t>
+            </a:r>
+          </a:p>
+          <a:p>
+            <a:endParaRPr lang="en-US" sz="1200" kern="1200" dirty="0" smtClean="0">
+              <a:solidFill>
+                <a:schemeClr val="tx1"/>
+              </a:solidFill>
+              <a:effectLst/>
+              <a:latin typeface="+mn-lt"/>
+              <a:ea typeface="+mn-ea"/>
+              <a:cs typeface="+mn-cs"/>
+            </a:endParaRPr>
+          </a:p>
+          <a:p>
+            <a:r>
+              <a:rPr lang="en-US" sz="1200" kern="1200" dirty="0" smtClean="0">
+                <a:solidFill>
+                  <a:schemeClr val="tx1"/>
+                </a:solidFill>
+                <a:effectLst/>
+                <a:latin typeface="+mn-lt"/>
+                <a:ea typeface="+mn-ea"/>
+                <a:cs typeface="+mn-cs"/>
+              </a:rPr>
+              <a:t>These next two examples are going to show you how to take a declarative approach to those concerns so that you can decouple the implementation of the security check from the declaration that it’s actually needed.</a:t>
+            </a:r>
+          </a:p>
+          <a:p>
+            <a:endParaRPr lang="en-US" sz="1200" kern="1200" dirty="0" smtClean="0">
+              <a:solidFill>
+                <a:schemeClr val="tx1"/>
+              </a:solidFill>
+              <a:effectLst/>
+              <a:latin typeface="+mn-lt"/>
+              <a:ea typeface="+mn-ea"/>
+              <a:cs typeface="+mn-cs"/>
+            </a:endParaRPr>
+          </a:p>
+          <a:p>
+            <a:r>
+              <a:rPr lang="en-US" sz="1200" kern="1200" dirty="0" smtClean="0">
+                <a:solidFill>
+                  <a:schemeClr val="tx1"/>
+                </a:solidFill>
+                <a:effectLst/>
+                <a:latin typeface="+mn-lt"/>
+                <a:ea typeface="+mn-ea"/>
+                <a:cs typeface="+mn-cs"/>
+              </a:rPr>
+              <a:t>Let’s start with a basic example where we want to ensure that only users with a specific permission are allowed to access a certain MVC endpoint.</a:t>
+            </a:r>
+          </a:p>
+          <a:p>
             <a:pPr marL="0" marR="0" indent="0" algn="l" defTabSz="914400" rtl="0" eaLnBrk="1" fontAlgn="auto" latinLnBrk="0" hangingPunct="1">
               <a:lnSpc>
                 <a:spcPct val="100000"/>
@@ -7908,6 +9219,69 @@
           <a:bodyPr/>
           <a:lstStyle/>
           <a:p>
+            <a:r>
+              <a:rPr lang="en-US" sz="1200" kern="1200" dirty="0" smtClean="0">
+                <a:solidFill>
+                  <a:schemeClr val="tx1"/>
+                </a:solidFill>
+                <a:effectLst/>
+                <a:latin typeface="+mn-lt"/>
+                <a:ea typeface="+mn-ea"/>
+                <a:cs typeface="+mn-cs"/>
+              </a:rPr>
+              <a:t>If you implement this rule in feature code it will look something like this: somewhere in the body of each page or action you’ll check to see if the user has the necessary permission and, if not, you’ll kick them out.</a:t>
+            </a:r>
+          </a:p>
+          <a:p>
+            <a:endParaRPr lang="en-US" sz="1200" kern="1200" dirty="0" smtClean="0">
+              <a:solidFill>
+                <a:schemeClr val="tx1"/>
+              </a:solidFill>
+              <a:effectLst/>
+              <a:latin typeface="+mn-lt"/>
+              <a:ea typeface="+mn-ea"/>
+              <a:cs typeface="+mn-cs"/>
+            </a:endParaRPr>
+          </a:p>
+          <a:p>
+            <a:r>
+              <a:rPr lang="en-US" sz="1200" kern="1200" dirty="0" smtClean="0">
+                <a:solidFill>
+                  <a:schemeClr val="tx1"/>
+                </a:solidFill>
+                <a:effectLst/>
+                <a:latin typeface="+mn-lt"/>
+                <a:ea typeface="+mn-ea"/>
+                <a:cs typeface="+mn-cs"/>
+              </a:rPr>
+              <a:t>This is simple, but it results in a lot of duplicative code. If you change how the permission check works, or if you decide you want to do something different than return an </a:t>
+            </a:r>
+            <a:r>
+              <a:rPr lang="en-US" sz="1200" kern="1200" dirty="0" err="1" smtClean="0">
+                <a:solidFill>
+                  <a:schemeClr val="tx1"/>
+                </a:solidFill>
+                <a:effectLst/>
+                <a:latin typeface="+mn-lt"/>
+                <a:ea typeface="+mn-ea"/>
+                <a:cs typeface="+mn-cs"/>
+              </a:rPr>
+              <a:t>HttpUnauthorizedResult</a:t>
+            </a:r>
+            <a:r>
+              <a:rPr lang="en-US" sz="1200" kern="1200" dirty="0" smtClean="0">
+                <a:solidFill>
+                  <a:schemeClr val="tx1"/>
+                </a:solidFill>
+                <a:effectLst/>
+                <a:latin typeface="+mn-lt"/>
+                <a:ea typeface="+mn-ea"/>
+                <a:cs typeface="+mn-cs"/>
+              </a:rPr>
+              <a:t>, you’re going to have a lot of places to modify.</a:t>
+            </a:r>
+          </a:p>
+          <a:p>
             <a:endParaRPr lang="en-US" b="0" dirty="0" smtClean="0"/>
           </a:p>
         </p:txBody>
@@ -7992,6 +9366,37 @@
           <a:bodyPr/>
           <a:lstStyle/>
           <a:p>
+            <a:pPr marL="0" marR="0" lvl="0" indent="0" algn="l" defTabSz="914400" rtl="0" eaLnBrk="1" fontAlgn="auto" latinLnBrk="0" hangingPunct="1">
+              <a:lnSpc>
+                <a:spcPct val="100000"/>
+              </a:lnSpc>
+              <a:spcBef>
+                <a:spcPts val="0"/>
+              </a:spcBef>
+              <a:spcAft>
+                <a:spcPts val="0"/>
+              </a:spcAft>
+              <a:buClrTx/>
+              <a:buSzTx/>
+              <a:buFontTx/>
+              <a:buNone/>
+              <a:tabLst/>
+              <a:defRPr/>
+            </a:pPr>
+            <a:r>
+              <a:rPr lang="en-US" sz="1200" kern="1200" dirty="0" smtClean="0">
+                <a:solidFill>
+                  <a:schemeClr val="tx1"/>
+                </a:solidFill>
+                <a:effectLst/>
+                <a:latin typeface="+mn-lt"/>
+                <a:ea typeface="+mn-ea"/>
+                <a:cs typeface="+mn-cs"/>
+              </a:rPr>
+              <a:t>The only thing about this piece of code that will change between features is the specific permission that is required; the rest of this code is boilerplate, and that makes it a good candidate for being solved in the framework.</a:t>
+            </a:r>
+          </a:p>
+          <a:p>
             <a:endParaRPr lang="en-US" b="0" dirty="0" smtClean="0"/>
           </a:p>
         </p:txBody>
@@ -8076,6 +9481,85 @@
           <a:bodyPr/>
           <a:lstStyle/>
           <a:p>
+            <a:pPr marL="0" marR="0" lvl="0" indent="0" algn="l" defTabSz="914400" rtl="0" eaLnBrk="1" fontAlgn="auto" latinLnBrk="0" hangingPunct="1">
+              <a:lnSpc>
+                <a:spcPct val="100000"/>
+              </a:lnSpc>
+              <a:spcBef>
+                <a:spcPts val="0"/>
+              </a:spcBef>
+              <a:spcAft>
+                <a:spcPts val="0"/>
+              </a:spcAft>
+              <a:buClrTx/>
+              <a:buSzTx/>
+              <a:buFontTx/>
+              <a:buNone/>
+              <a:tabLst/>
+              <a:defRPr/>
+            </a:pPr>
+            <a:r>
+              <a:rPr lang="en-US" sz="1200" kern="1200" dirty="0" smtClean="0">
+                <a:solidFill>
+                  <a:schemeClr val="tx1"/>
+                </a:solidFill>
+                <a:effectLst/>
+                <a:latin typeface="+mn-lt"/>
+                <a:ea typeface="+mn-ea"/>
+                <a:cs typeface="+mn-cs"/>
+              </a:rPr>
+              <a:t>To make this a cross-cutting concern, extract the </a:t>
+            </a:r>
+            <a:r>
+              <a:rPr lang="en-US" sz="1200" i="1" kern="1200" dirty="0" smtClean="0">
+                <a:solidFill>
+                  <a:schemeClr val="tx1"/>
+                </a:solidFill>
+                <a:effectLst/>
+                <a:latin typeface="+mn-lt"/>
+                <a:ea typeface="+mn-ea"/>
+                <a:cs typeface="+mn-cs"/>
+              </a:rPr>
+              <a:t>implementation </a:t>
+            </a:r>
+            <a:r>
+              <a:rPr lang="en-US" sz="1200" kern="1200" dirty="0" smtClean="0">
+                <a:solidFill>
+                  <a:schemeClr val="tx1"/>
+                </a:solidFill>
+                <a:effectLst/>
+                <a:latin typeface="+mn-lt"/>
+                <a:ea typeface="+mn-ea"/>
+                <a:cs typeface="+mn-cs"/>
+              </a:rPr>
+              <a:t>of the permission check into an Action Filter attribute, and then provide the </a:t>
+            </a:r>
+            <a:r>
+              <a:rPr lang="en-US" sz="1200" i="1" kern="1200" dirty="0" smtClean="0">
+                <a:solidFill>
+                  <a:schemeClr val="tx1"/>
+                </a:solidFill>
+                <a:effectLst/>
+                <a:latin typeface="+mn-lt"/>
+                <a:ea typeface="+mn-ea"/>
+                <a:cs typeface="+mn-cs"/>
+              </a:rPr>
+              <a:t>feature-specific </a:t>
+            </a:r>
+            <a:r>
+              <a:rPr lang="en-US" sz="1200" kern="1200" dirty="0" smtClean="0">
+                <a:solidFill>
+                  <a:schemeClr val="tx1"/>
+                </a:solidFill>
+                <a:effectLst/>
+                <a:latin typeface="+mn-lt"/>
+                <a:ea typeface="+mn-ea"/>
+                <a:cs typeface="+mn-cs"/>
+              </a:rPr>
+              <a:t>data as an argument to that attribute.</a:t>
+            </a:r>
+          </a:p>
+          <a:p>
             <a:endParaRPr lang="en-US" b="0" dirty="0" smtClean="0"/>
           </a:p>
         </p:txBody>
@@ -8160,6 +9644,69 @@
           <a:bodyPr/>
           <a:lstStyle/>
           <a:p>
+            <a:r>
+              <a:rPr lang="en-US" sz="1200" kern="1200" dirty="0" smtClean="0">
+                <a:solidFill>
+                  <a:schemeClr val="tx1"/>
+                </a:solidFill>
+                <a:effectLst/>
+                <a:latin typeface="+mn-lt"/>
+                <a:ea typeface="+mn-ea"/>
+                <a:cs typeface="+mn-cs"/>
+              </a:rPr>
+              <a:t>The implementation is really straightforward. MVC will automatically execute the code at the right time, so the only tricky thing is figuring out what permissions the user has. If your controllers all derive from that base class I keep talking about, then just add a “</a:t>
+            </a:r>
+            <a:r>
+              <a:rPr lang="en-US" sz="1200" kern="1200" dirty="0" err="1" smtClean="0">
+                <a:solidFill>
+                  <a:schemeClr val="tx1"/>
+                </a:solidFill>
+                <a:effectLst/>
+                <a:latin typeface="+mn-lt"/>
+                <a:ea typeface="+mn-ea"/>
+                <a:cs typeface="+mn-cs"/>
+              </a:rPr>
+              <a:t>CurrentUser</a:t>
+            </a:r>
+            <a:r>
+              <a:rPr lang="en-US" sz="1200" kern="1200" dirty="0" smtClean="0">
+                <a:solidFill>
+                  <a:schemeClr val="tx1"/>
+                </a:solidFill>
+                <a:effectLst/>
+                <a:latin typeface="+mn-lt"/>
+                <a:ea typeface="+mn-ea"/>
+                <a:cs typeface="+mn-cs"/>
+              </a:rPr>
+              <a:t>” property to that base controller and then you can access it with a little bit of casting.</a:t>
+            </a:r>
+          </a:p>
+          <a:p>
+            <a:endParaRPr lang="en-US" sz="1200" kern="1200" dirty="0" smtClean="0">
+              <a:solidFill>
+                <a:schemeClr val="tx1"/>
+              </a:solidFill>
+              <a:effectLst/>
+              <a:latin typeface="+mn-lt"/>
+              <a:ea typeface="+mn-ea"/>
+              <a:cs typeface="+mn-cs"/>
+            </a:endParaRPr>
+          </a:p>
+          <a:p>
+            <a:r>
+              <a:rPr lang="en-US" sz="1200" kern="1200" dirty="0" smtClean="0">
+                <a:solidFill>
+                  <a:schemeClr val="tx1"/>
+                </a:solidFill>
+                <a:effectLst/>
+                <a:latin typeface="+mn-lt"/>
+                <a:ea typeface="+mn-ea"/>
+                <a:cs typeface="+mn-cs"/>
+              </a:rPr>
+              <a:t>Once we know who the user is, we can enforce the permission check from a centralized place.</a:t>
+            </a:r>
+          </a:p>
+          <a:p>
             <a:endParaRPr lang="en-US" b="0" dirty="0" smtClean="0"/>
           </a:p>
         </p:txBody>
@@ -8244,6 +9791,45 @@
           <a:bodyPr/>
           <a:lstStyle/>
           <a:p>
+            <a:r>
+              <a:rPr lang="en-US" sz="1200" kern="1200" dirty="0" smtClean="0">
+                <a:solidFill>
+                  <a:schemeClr val="tx1"/>
+                </a:solidFill>
+                <a:effectLst/>
+                <a:latin typeface="+mn-lt"/>
+                <a:ea typeface="+mn-ea"/>
+                <a:cs typeface="+mn-cs"/>
+              </a:rPr>
+              <a:t>In some cases, you might need to apply permission checks at a more granular level than you get with page-level authorization. For instance, certain parts of a page might be hidden or locked based on the user’s permissions, or specific pieces of data might be hidden for certain types of users.</a:t>
+            </a:r>
+          </a:p>
+          <a:p>
+            <a:endParaRPr lang="en-US" sz="1200" kern="1200" dirty="0" smtClean="0">
+              <a:solidFill>
+                <a:schemeClr val="tx1"/>
+              </a:solidFill>
+              <a:effectLst/>
+              <a:latin typeface="+mn-lt"/>
+              <a:ea typeface="+mn-ea"/>
+              <a:cs typeface="+mn-cs"/>
+            </a:endParaRPr>
+          </a:p>
+          <a:p>
+            <a:r>
+              <a:rPr lang="en-US" sz="1200" kern="1200" dirty="0" smtClean="0">
+                <a:solidFill>
+                  <a:schemeClr val="tx1"/>
+                </a:solidFill>
+                <a:effectLst/>
+                <a:latin typeface="+mn-lt"/>
+                <a:ea typeface="+mn-ea"/>
+                <a:cs typeface="+mn-cs"/>
+              </a:rPr>
+              <a:t>With a little extra effort, you can handle these requirements with framework level code as well.</a:t>
+            </a:r>
+          </a:p>
+          <a:p>
             <a:pPr marL="0" marR="0" indent="0" algn="l" defTabSz="914400" rtl="0" eaLnBrk="1" fontAlgn="auto" latinLnBrk="0" hangingPunct="1">
               <a:lnSpc>
                 <a:spcPct val="100000"/>
@@ -8353,6 +9939,94 @@
           <a:bodyPr/>
           <a:lstStyle/>
           <a:p>
+            <a:r>
+              <a:rPr lang="en-US" sz="1200" kern="1200" dirty="0" smtClean="0">
+                <a:solidFill>
+                  <a:schemeClr val="tx1"/>
+                </a:solidFill>
+                <a:effectLst/>
+                <a:latin typeface="+mn-lt"/>
+                <a:ea typeface="+mn-ea"/>
+                <a:cs typeface="+mn-cs"/>
+              </a:rPr>
+              <a:t>This is a feature-level code sample from a view model in my sample app. It implements a business rule that a user must have a specific permission in order to see plain-text social security numbers. If the user doesn’t have the permission, the value gets masked for display.</a:t>
+            </a:r>
+          </a:p>
+          <a:p>
+            <a:endParaRPr lang="en-US" sz="1200" kern="1200" dirty="0" smtClean="0">
+              <a:solidFill>
+                <a:schemeClr val="tx1"/>
+              </a:solidFill>
+              <a:effectLst/>
+              <a:latin typeface="+mn-lt"/>
+              <a:ea typeface="+mn-ea"/>
+              <a:cs typeface="+mn-cs"/>
+            </a:endParaRPr>
+          </a:p>
+          <a:p>
+            <a:r>
+              <a:rPr lang="en-US" sz="1200" kern="1200" dirty="0" smtClean="0">
+                <a:solidFill>
+                  <a:schemeClr val="tx1"/>
+                </a:solidFill>
+                <a:effectLst/>
+                <a:latin typeface="+mn-lt"/>
+                <a:ea typeface="+mn-ea"/>
+                <a:cs typeface="+mn-cs"/>
+              </a:rPr>
+              <a:t>Just like with page-level authorization, this is simple to do in the feature code, but it can result in a lot of duplication. It also requires that we couple the object model to the concept of a user identity, which might be undesirable.</a:t>
+            </a:r>
+          </a:p>
+          <a:p>
+            <a:endParaRPr lang="en-US" sz="1200" kern="1200" dirty="0" smtClean="0">
+              <a:solidFill>
+                <a:schemeClr val="tx1"/>
+              </a:solidFill>
+              <a:effectLst/>
+              <a:latin typeface="+mn-lt"/>
+              <a:ea typeface="+mn-ea"/>
+              <a:cs typeface="+mn-cs"/>
+            </a:endParaRPr>
+          </a:p>
+          <a:p>
+            <a:r>
+              <a:rPr lang="en-US" sz="1200" kern="1200" dirty="0" smtClean="0">
+                <a:solidFill>
+                  <a:schemeClr val="tx1"/>
+                </a:solidFill>
+                <a:effectLst/>
+                <a:latin typeface="+mn-lt"/>
+                <a:ea typeface="+mn-ea"/>
+                <a:cs typeface="+mn-cs"/>
+              </a:rPr>
+              <a:t>And since this rule applies to </a:t>
+            </a:r>
+            <a:r>
+              <a:rPr lang="en-US" sz="1200" i="1" kern="1200" dirty="0" smtClean="0">
+                <a:solidFill>
+                  <a:schemeClr val="tx1"/>
+                </a:solidFill>
+                <a:effectLst/>
+                <a:latin typeface="+mn-lt"/>
+                <a:ea typeface="+mn-ea"/>
+                <a:cs typeface="+mn-cs"/>
+              </a:rPr>
+              <a:t>any </a:t>
+            </a:r>
+            <a:r>
+              <a:rPr lang="en-US" sz="1200" kern="1200" dirty="0" smtClean="0">
+                <a:solidFill>
+                  <a:schemeClr val="tx1"/>
+                </a:solidFill>
+                <a:effectLst/>
+                <a:latin typeface="+mn-lt"/>
+                <a:ea typeface="+mn-ea"/>
+                <a:cs typeface="+mn-cs"/>
+              </a:rPr>
+              <a:t>feature that displays SSNs, it meets our definition of a cross cutting concern that should be extracted from feature level code.</a:t>
+            </a:r>
+          </a:p>
+          <a:p>
             <a:endParaRPr lang="en-US" b="0" dirty="0" smtClean="0"/>
           </a:p>
         </p:txBody>
@@ -8437,6 +10111,228 @@
           <a:bodyPr/>
           <a:lstStyle/>
           <a:p>
+            <a:r>
+              <a:rPr lang="en-US" sz="1200" kern="1200" dirty="0" smtClean="0">
+                <a:solidFill>
+                  <a:schemeClr val="tx1"/>
+                </a:solidFill>
+                <a:effectLst/>
+                <a:latin typeface="+mn-lt"/>
+                <a:ea typeface="+mn-ea"/>
+                <a:cs typeface="+mn-cs"/>
+              </a:rPr>
+              <a:t>This is what we’d </a:t>
+            </a:r>
+            <a:r>
+              <a:rPr lang="en-US" sz="1200" i="1" kern="1200" dirty="0" smtClean="0">
+                <a:solidFill>
+                  <a:schemeClr val="tx1"/>
+                </a:solidFill>
+                <a:effectLst/>
+                <a:latin typeface="+mn-lt"/>
+                <a:ea typeface="+mn-ea"/>
+                <a:cs typeface="+mn-cs"/>
+              </a:rPr>
+              <a:t>like </a:t>
+            </a:r>
+            <a:r>
+              <a:rPr lang="en-US" sz="1200" kern="1200" dirty="0" smtClean="0">
+                <a:solidFill>
+                  <a:schemeClr val="tx1"/>
+                </a:solidFill>
+                <a:effectLst/>
+                <a:latin typeface="+mn-lt"/>
+                <a:ea typeface="+mn-ea"/>
+                <a:cs typeface="+mn-cs"/>
+              </a:rPr>
+              <a:t>to do: just put an attribute on the property, declare the necessary permission, and be done with it.</a:t>
+            </a:r>
+          </a:p>
+          <a:p>
+            <a:endParaRPr lang="en-US" sz="1200" kern="1200" dirty="0" smtClean="0">
+              <a:solidFill>
+                <a:schemeClr val="tx1"/>
+              </a:solidFill>
+              <a:effectLst/>
+              <a:latin typeface="+mn-lt"/>
+              <a:ea typeface="+mn-ea"/>
+              <a:cs typeface="+mn-cs"/>
+            </a:endParaRPr>
+          </a:p>
+          <a:p>
+            <a:r>
+              <a:rPr lang="en-US" sz="1200" kern="1200" dirty="0" smtClean="0">
+                <a:solidFill>
+                  <a:schemeClr val="tx1"/>
+                </a:solidFill>
+                <a:effectLst/>
+                <a:latin typeface="+mn-lt"/>
+                <a:ea typeface="+mn-ea"/>
+                <a:cs typeface="+mn-cs"/>
+              </a:rPr>
+              <a:t>If this worked, it would be awesome. There’s no reference in this class to my Application User object, which is a cleaner design, and it would be really easy to use this approach on multiple properties of multiple classes without duplicating any code.</a:t>
+            </a:r>
+          </a:p>
+          <a:p>
+            <a:endParaRPr lang="en-US" sz="1200" kern="1200" dirty="0" smtClean="0">
+              <a:solidFill>
+                <a:schemeClr val="tx1"/>
+              </a:solidFill>
+              <a:effectLst/>
+              <a:latin typeface="+mn-lt"/>
+              <a:ea typeface="+mn-ea"/>
+              <a:cs typeface="+mn-cs"/>
+            </a:endParaRPr>
+          </a:p>
+          <a:p>
+            <a:r>
+              <a:rPr lang="en-US" sz="1200" kern="1200" dirty="0" smtClean="0">
+                <a:solidFill>
+                  <a:schemeClr val="tx1"/>
+                </a:solidFill>
+                <a:effectLst/>
+                <a:latin typeface="+mn-lt"/>
+                <a:ea typeface="+mn-ea"/>
+                <a:cs typeface="+mn-cs"/>
+              </a:rPr>
+              <a:t>Unfortunately, this is easier said than done. Putting attributes on MVC actions is easy because the MVC framework provides specific hooks for those attributes to plug into. By default, however, .NET doesn’t provide any hooks for property access. There’s no way to </a:t>
+            </a:r>
+            <a:r>
+              <a:rPr lang="en-US" sz="1200" i="1" kern="1200" dirty="0" smtClean="0">
+                <a:solidFill>
+                  <a:schemeClr val="tx1"/>
+                </a:solidFill>
+                <a:effectLst/>
+                <a:latin typeface="+mn-lt"/>
+                <a:ea typeface="+mn-ea"/>
+                <a:cs typeface="+mn-cs"/>
+              </a:rPr>
+              <a:t>automatically </a:t>
+            </a:r>
+            <a:r>
+              <a:rPr lang="en-US" sz="1200" kern="1200" dirty="0" smtClean="0">
+                <a:solidFill>
+                  <a:schemeClr val="tx1"/>
+                </a:solidFill>
+                <a:effectLst/>
+                <a:latin typeface="+mn-lt"/>
+                <a:ea typeface="+mn-ea"/>
+                <a:cs typeface="+mn-cs"/>
+              </a:rPr>
+              <a:t>run this code whenever someone tries to read the SSN property.</a:t>
+            </a:r>
+          </a:p>
+          <a:p>
+            <a:endParaRPr lang="en-US" sz="1200" kern="1200" dirty="0" smtClean="0">
+              <a:solidFill>
+                <a:schemeClr val="tx1"/>
+              </a:solidFill>
+              <a:effectLst/>
+              <a:latin typeface="+mn-lt"/>
+              <a:ea typeface="+mn-ea"/>
+              <a:cs typeface="+mn-cs"/>
+            </a:endParaRPr>
+          </a:p>
+          <a:p>
+            <a:r>
+              <a:rPr lang="en-US" sz="1200" kern="1200" dirty="0" smtClean="0">
+                <a:solidFill>
+                  <a:schemeClr val="tx1"/>
+                </a:solidFill>
+                <a:effectLst/>
+                <a:latin typeface="+mn-lt"/>
+                <a:ea typeface="+mn-ea"/>
+                <a:cs typeface="+mn-cs"/>
+              </a:rPr>
+              <a:t>Fortunately, we can use a really neat tool called </a:t>
+            </a:r>
+            <a:r>
+              <a:rPr lang="en-US" sz="1200" kern="1200" dirty="0" err="1" smtClean="0">
+                <a:solidFill>
+                  <a:schemeClr val="tx1"/>
+                </a:solidFill>
+                <a:effectLst/>
+                <a:latin typeface="+mn-lt"/>
+                <a:ea typeface="+mn-ea"/>
+                <a:cs typeface="+mn-cs"/>
+              </a:rPr>
+              <a:t>PostSharp</a:t>
+            </a:r>
+            <a:r>
+              <a:rPr lang="en-US" sz="1200" kern="1200" dirty="0" smtClean="0">
+                <a:solidFill>
+                  <a:schemeClr val="tx1"/>
+                </a:solidFill>
+                <a:effectLst/>
+                <a:latin typeface="+mn-lt"/>
+                <a:ea typeface="+mn-ea"/>
+                <a:cs typeface="+mn-cs"/>
+              </a:rPr>
+              <a:t> to </a:t>
+            </a:r>
+            <a:r>
+              <a:rPr lang="en-US" sz="1200" i="1" kern="1200" dirty="0" smtClean="0">
+                <a:solidFill>
+                  <a:schemeClr val="tx1"/>
+                </a:solidFill>
+                <a:effectLst/>
+                <a:latin typeface="+mn-lt"/>
+                <a:ea typeface="+mn-ea"/>
+                <a:cs typeface="+mn-cs"/>
+              </a:rPr>
+              <a:t>create </a:t>
+            </a:r>
+            <a:r>
+              <a:rPr lang="en-US" sz="1200" kern="1200" dirty="0" smtClean="0">
+                <a:solidFill>
+                  <a:schemeClr val="tx1"/>
+                </a:solidFill>
+                <a:effectLst/>
+                <a:latin typeface="+mn-lt"/>
+                <a:ea typeface="+mn-ea"/>
+                <a:cs typeface="+mn-cs"/>
+              </a:rPr>
+              <a:t>those hooks.</a:t>
+            </a:r>
+          </a:p>
+          <a:p>
+            <a:endParaRPr lang="en-US" sz="1200" kern="1200" dirty="0" smtClean="0">
+              <a:solidFill>
+                <a:schemeClr val="tx1"/>
+              </a:solidFill>
+              <a:effectLst/>
+              <a:latin typeface="+mn-lt"/>
+              <a:ea typeface="+mn-ea"/>
+              <a:cs typeface="+mn-cs"/>
+            </a:endParaRPr>
+          </a:p>
+          <a:p>
+            <a:r>
+              <a:rPr lang="en-US" sz="1200" kern="1200" dirty="0" err="1" smtClean="0">
+                <a:solidFill>
+                  <a:schemeClr val="tx1"/>
+                </a:solidFill>
+                <a:effectLst/>
+                <a:latin typeface="+mn-lt"/>
+                <a:ea typeface="+mn-ea"/>
+                <a:cs typeface="+mn-cs"/>
+              </a:rPr>
+              <a:t>PostSharp</a:t>
+            </a:r>
+            <a:r>
+              <a:rPr lang="en-US" sz="1200" kern="1200" dirty="0" smtClean="0">
+                <a:solidFill>
+                  <a:schemeClr val="tx1"/>
+                </a:solidFill>
+                <a:effectLst/>
+                <a:latin typeface="+mn-lt"/>
+                <a:ea typeface="+mn-ea"/>
+                <a:cs typeface="+mn-cs"/>
+              </a:rPr>
+              <a:t> is an Aspect Oriented Programming tool that is specifically designed to handle cross cutting concerns. It works by modifying the IL that is produced by the C# compiler in order to do things that aren’t natively supported in the language.</a:t>
+            </a:r>
+          </a:p>
+          <a:p>
             <a:endParaRPr lang="en-US" b="0" dirty="0" smtClean="0"/>
           </a:p>
         </p:txBody>
@@ -8521,6 +10417,37 @@
           <a:bodyPr/>
           <a:lstStyle/>
           <a:p>
+            <a:pPr marL="0" marR="0" lvl="0" indent="0" algn="l" defTabSz="914400" rtl="0" eaLnBrk="1" fontAlgn="auto" latinLnBrk="0" hangingPunct="1">
+              <a:lnSpc>
+                <a:spcPct val="100000"/>
+              </a:lnSpc>
+              <a:spcBef>
+                <a:spcPts val="0"/>
+              </a:spcBef>
+              <a:spcAft>
+                <a:spcPts val="0"/>
+              </a:spcAft>
+              <a:buClrTx/>
+              <a:buSzTx/>
+              <a:buFontTx/>
+              <a:buNone/>
+              <a:tabLst/>
+              <a:defRPr/>
+            </a:pPr>
+            <a:r>
+              <a:rPr lang="en-US" sz="1200" kern="1200" dirty="0" smtClean="0">
+                <a:solidFill>
+                  <a:schemeClr val="tx1"/>
+                </a:solidFill>
+                <a:effectLst/>
+                <a:latin typeface="+mn-lt"/>
+                <a:ea typeface="+mn-ea"/>
+                <a:cs typeface="+mn-cs"/>
+              </a:rPr>
+              <a:t>Here’s an example. This is a standard C# property. Behind the scenes, the C# compiler creates a getter method that returns some instance variable, and any code that reads this property is essentially calling this method. The property syntax is just a syntactic sugar over this getter method.</a:t>
+            </a:r>
+          </a:p>
+          <a:p>
             <a:endParaRPr lang="en-US" b="0" dirty="0" smtClean="0"/>
           </a:p>
         </p:txBody>
@@ -8605,6 +10532,107 @@
           <a:bodyPr/>
           <a:lstStyle/>
           <a:p>
+            <a:r>
+              <a:rPr lang="en-US" sz="1200" kern="1200" dirty="0" smtClean="0">
+                <a:solidFill>
+                  <a:schemeClr val="tx1"/>
+                </a:solidFill>
+                <a:effectLst/>
+                <a:latin typeface="+mn-lt"/>
+                <a:ea typeface="+mn-ea"/>
+                <a:cs typeface="+mn-cs"/>
+              </a:rPr>
+              <a:t>Using </a:t>
+            </a:r>
+            <a:r>
+              <a:rPr lang="en-US" sz="1200" kern="1200" dirty="0" err="1" smtClean="0">
+                <a:solidFill>
+                  <a:schemeClr val="tx1"/>
+                </a:solidFill>
+                <a:effectLst/>
+                <a:latin typeface="+mn-lt"/>
+                <a:ea typeface="+mn-ea"/>
+                <a:cs typeface="+mn-cs"/>
+              </a:rPr>
+              <a:t>PostSharp</a:t>
+            </a:r>
+            <a:r>
+              <a:rPr lang="en-US" sz="1200" kern="1200" dirty="0" smtClean="0">
+                <a:solidFill>
+                  <a:schemeClr val="tx1"/>
+                </a:solidFill>
+                <a:effectLst/>
+                <a:latin typeface="+mn-lt"/>
+                <a:ea typeface="+mn-ea"/>
+                <a:cs typeface="+mn-cs"/>
+              </a:rPr>
+              <a:t>, I can create what’s called a “property interception aspect”. This is basically a piece of code that we want to “inject into” the property.</a:t>
+            </a:r>
+          </a:p>
+          <a:p>
+            <a:r>
+              <a:rPr lang="en-US" sz="1200" kern="1200" dirty="0" smtClean="0">
+                <a:solidFill>
+                  <a:schemeClr val="tx1"/>
+                </a:solidFill>
+                <a:effectLst/>
+                <a:latin typeface="+mn-lt"/>
+                <a:ea typeface="+mn-ea"/>
+                <a:cs typeface="+mn-cs"/>
+              </a:rPr>
+              <a:t>When I compile the project, the </a:t>
+            </a:r>
+            <a:r>
+              <a:rPr lang="en-US" sz="1200" kern="1200" dirty="0" err="1" smtClean="0">
+                <a:solidFill>
+                  <a:schemeClr val="tx1"/>
+                </a:solidFill>
+                <a:effectLst/>
+                <a:latin typeface="+mn-lt"/>
+                <a:ea typeface="+mn-ea"/>
+                <a:cs typeface="+mn-cs"/>
+              </a:rPr>
+              <a:t>PostSharp</a:t>
+            </a:r>
+            <a:r>
+              <a:rPr lang="en-US" sz="1200" kern="1200" dirty="0" smtClean="0">
+                <a:solidFill>
+                  <a:schemeClr val="tx1"/>
+                </a:solidFill>
+                <a:effectLst/>
+                <a:latin typeface="+mn-lt"/>
+                <a:ea typeface="+mn-ea"/>
+                <a:cs typeface="+mn-cs"/>
+              </a:rPr>
+              <a:t> engine basically re-writes the getter method, injecting the code from the aspect into it.</a:t>
+            </a:r>
+          </a:p>
+          <a:p>
+            <a:endParaRPr lang="en-US" sz="1200" kern="1200" dirty="0" smtClean="0">
+              <a:solidFill>
+                <a:schemeClr val="tx1"/>
+              </a:solidFill>
+              <a:effectLst/>
+              <a:latin typeface="+mn-lt"/>
+              <a:ea typeface="+mn-ea"/>
+              <a:cs typeface="+mn-cs"/>
+            </a:endParaRPr>
+          </a:p>
+          <a:p>
+            <a:r>
+              <a:rPr lang="en-US" sz="1200" kern="1200" dirty="0" smtClean="0">
+                <a:solidFill>
+                  <a:schemeClr val="tx1"/>
+                </a:solidFill>
+                <a:effectLst/>
+                <a:latin typeface="+mn-lt"/>
+                <a:ea typeface="+mn-ea"/>
+                <a:cs typeface="+mn-cs"/>
+              </a:rPr>
+              <a:t>Now, any code that is reading that SSN property is actually calling a method that now includes the security code.</a:t>
+            </a:r>
+          </a:p>
+          <a:p>
             <a:endParaRPr lang="en-US" b="0" dirty="0" smtClean="0"/>
           </a:p>
         </p:txBody>
@@ -8689,6 +10717,130 @@
           <a:bodyPr/>
           <a:lstStyle/>
           <a:p>
+            <a:r>
+              <a:rPr lang="en-US" sz="1200" kern="1200" dirty="0" smtClean="0">
+                <a:solidFill>
+                  <a:schemeClr val="tx1"/>
+                </a:solidFill>
+                <a:effectLst/>
+                <a:latin typeface="+mn-lt"/>
+                <a:ea typeface="+mn-ea"/>
+                <a:cs typeface="+mn-cs"/>
+              </a:rPr>
+              <a:t>This is what that interception aspect actually looks like.</a:t>
+            </a:r>
+          </a:p>
+          <a:p>
+            <a:endParaRPr lang="en-US" sz="1200" kern="1200" dirty="0" smtClean="0">
+              <a:solidFill>
+                <a:schemeClr val="tx1"/>
+              </a:solidFill>
+              <a:effectLst/>
+              <a:latin typeface="+mn-lt"/>
+              <a:ea typeface="+mn-ea"/>
+              <a:cs typeface="+mn-cs"/>
+            </a:endParaRPr>
+          </a:p>
+          <a:p>
+            <a:r>
+              <a:rPr lang="en-US" sz="1200" kern="1200" dirty="0" smtClean="0">
+                <a:solidFill>
+                  <a:schemeClr val="tx1"/>
+                </a:solidFill>
+                <a:effectLst/>
+                <a:latin typeface="+mn-lt"/>
+                <a:ea typeface="+mn-ea"/>
+                <a:cs typeface="+mn-cs"/>
+              </a:rPr>
+              <a:t>First, I created a base class called a “</a:t>
+            </a:r>
+            <a:r>
+              <a:rPr lang="en-US" sz="1200" kern="1200" dirty="0" err="1" smtClean="0">
+                <a:solidFill>
+                  <a:schemeClr val="tx1"/>
+                </a:solidFill>
+                <a:effectLst/>
+                <a:latin typeface="+mn-lt"/>
+                <a:ea typeface="+mn-ea"/>
+                <a:cs typeface="+mn-cs"/>
+              </a:rPr>
+              <a:t>UserAwarePropertyInterceptor</a:t>
+            </a:r>
+            <a:r>
+              <a:rPr lang="en-US" sz="1200" kern="1200" dirty="0" smtClean="0">
+                <a:solidFill>
+                  <a:schemeClr val="tx1"/>
+                </a:solidFill>
+                <a:effectLst/>
+                <a:latin typeface="+mn-lt"/>
+                <a:ea typeface="+mn-ea"/>
+                <a:cs typeface="+mn-cs"/>
+              </a:rPr>
+              <a:t>”. That class is responsible for talking to the current thread and figuring out who the current user is. This is what allows us to decouple the view model itself from the application user class.</a:t>
+            </a:r>
+          </a:p>
+          <a:p>
+            <a:endParaRPr lang="en-US" sz="1200" kern="1200" dirty="0" smtClean="0">
+              <a:solidFill>
+                <a:schemeClr val="tx1"/>
+              </a:solidFill>
+              <a:effectLst/>
+              <a:latin typeface="+mn-lt"/>
+              <a:ea typeface="+mn-ea"/>
+              <a:cs typeface="+mn-cs"/>
+            </a:endParaRPr>
+          </a:p>
+          <a:p>
+            <a:r>
+              <a:rPr lang="en-US" sz="1200" kern="1200" dirty="0" err="1" smtClean="0">
+                <a:solidFill>
+                  <a:schemeClr val="tx1"/>
+                </a:solidFill>
+                <a:effectLst/>
+                <a:latin typeface="+mn-lt"/>
+                <a:ea typeface="+mn-ea"/>
+                <a:cs typeface="+mn-cs"/>
+              </a:rPr>
+              <a:t>PostSharp</a:t>
+            </a:r>
+            <a:r>
+              <a:rPr lang="en-US" sz="1200" kern="1200" dirty="0" smtClean="0">
+                <a:solidFill>
+                  <a:schemeClr val="tx1"/>
+                </a:solidFill>
+                <a:effectLst/>
+                <a:latin typeface="+mn-lt"/>
+                <a:ea typeface="+mn-ea"/>
+                <a:cs typeface="+mn-cs"/>
+              </a:rPr>
+              <a:t> gives us this </a:t>
+            </a:r>
+            <a:r>
+              <a:rPr lang="en-US" sz="1200" i="1" kern="1200" dirty="0" err="1" smtClean="0">
+                <a:solidFill>
+                  <a:schemeClr val="tx1"/>
+                </a:solidFill>
+                <a:effectLst/>
+                <a:latin typeface="+mn-lt"/>
+                <a:ea typeface="+mn-ea"/>
+                <a:cs typeface="+mn-cs"/>
+              </a:rPr>
+              <a:t>OnGetValue</a:t>
+            </a:r>
+            <a:r>
+              <a:rPr lang="en-US" sz="1200" kern="1200" dirty="0" smtClean="0">
+                <a:solidFill>
+                  <a:schemeClr val="tx1"/>
+                </a:solidFill>
+                <a:effectLst/>
+                <a:latin typeface="+mn-lt"/>
+                <a:ea typeface="+mn-ea"/>
+                <a:cs typeface="+mn-cs"/>
+              </a:rPr>
+              <a:t> method to override. This method basically provides the code that will get injected into that property getter method. This is where I put the permission check and, if the user doesn’t have the necessary privileges, I return a masked value instead of the raw SSN.</a:t>
+            </a:r>
+          </a:p>
+          <a:p>
             <a:endParaRPr lang="en-US" b="0" dirty="0" smtClean="0"/>
           </a:p>
         </p:txBody>
@@ -9051,6 +11203,192 @@
           <a:bodyPr/>
           <a:lstStyle/>
           <a:p>
+            <a:r>
+              <a:rPr lang="en-US" sz="1200" kern="1200" dirty="0" smtClean="0">
+                <a:solidFill>
+                  <a:schemeClr val="tx1"/>
+                </a:solidFill>
+                <a:effectLst/>
+                <a:latin typeface="+mn-lt"/>
+                <a:ea typeface="+mn-ea"/>
+                <a:cs typeface="+mn-cs"/>
+              </a:rPr>
+              <a:t>And as a result of that </a:t>
+            </a:r>
+            <a:r>
+              <a:rPr lang="en-US" sz="1200" kern="1200" dirty="0" err="1" smtClean="0">
+                <a:solidFill>
+                  <a:schemeClr val="tx1"/>
+                </a:solidFill>
+                <a:effectLst/>
+                <a:latin typeface="+mn-lt"/>
+                <a:ea typeface="+mn-ea"/>
+                <a:cs typeface="+mn-cs"/>
+              </a:rPr>
+              <a:t>PostSharp</a:t>
+            </a:r>
+            <a:r>
+              <a:rPr lang="en-US" sz="1200" kern="1200" dirty="0" smtClean="0">
+                <a:solidFill>
+                  <a:schemeClr val="tx1"/>
+                </a:solidFill>
+                <a:effectLst/>
+                <a:latin typeface="+mn-lt"/>
+                <a:ea typeface="+mn-ea"/>
+                <a:cs typeface="+mn-cs"/>
+              </a:rPr>
+              <a:t> magic, I’m able to do exactly what I want to do. All I need to do is put this “</a:t>
+            </a:r>
+            <a:r>
+              <a:rPr lang="en-US" sz="1200" kern="1200" dirty="0" err="1" smtClean="0">
+                <a:solidFill>
+                  <a:schemeClr val="tx1"/>
+                </a:solidFill>
+                <a:effectLst/>
+                <a:latin typeface="+mn-lt"/>
+                <a:ea typeface="+mn-ea"/>
+                <a:cs typeface="+mn-cs"/>
+              </a:rPr>
+              <a:t>MaskedValue</a:t>
+            </a:r>
+            <a:r>
+              <a:rPr lang="en-US" sz="1200" kern="1200" dirty="0" smtClean="0">
+                <a:solidFill>
+                  <a:schemeClr val="tx1"/>
+                </a:solidFill>
+                <a:effectLst/>
+                <a:latin typeface="+mn-lt"/>
+                <a:ea typeface="+mn-ea"/>
+                <a:cs typeface="+mn-cs"/>
+              </a:rPr>
+              <a:t>” attribute on a view model property, and the raw value of that property will be automatically hidden if the user lacks the correct permissions.</a:t>
+            </a:r>
+          </a:p>
+          <a:p>
+            <a:endParaRPr lang="en-US" sz="1200" kern="1200" dirty="0" smtClean="0">
+              <a:solidFill>
+                <a:schemeClr val="tx1"/>
+              </a:solidFill>
+              <a:effectLst/>
+              <a:latin typeface="+mn-lt"/>
+              <a:ea typeface="+mn-ea"/>
+              <a:cs typeface="+mn-cs"/>
+            </a:endParaRPr>
+          </a:p>
+          <a:p>
+            <a:r>
+              <a:rPr lang="en-US" sz="1200" kern="1200" dirty="0" err="1" smtClean="0">
+                <a:solidFill>
+                  <a:schemeClr val="tx1"/>
+                </a:solidFill>
+                <a:effectLst/>
+                <a:latin typeface="+mn-lt"/>
+                <a:ea typeface="+mn-ea"/>
+                <a:cs typeface="+mn-cs"/>
+              </a:rPr>
+              <a:t>PostSharp</a:t>
+            </a:r>
+            <a:r>
+              <a:rPr lang="en-US" sz="1200" kern="1200" dirty="0" smtClean="0">
+                <a:solidFill>
+                  <a:schemeClr val="tx1"/>
+                </a:solidFill>
+                <a:effectLst/>
+                <a:latin typeface="+mn-lt"/>
+                <a:ea typeface="+mn-ea"/>
+                <a:cs typeface="+mn-cs"/>
+              </a:rPr>
+              <a:t> has tons of other uses as well. Instead of just masking values, we could implement an encryption scheme as well. The interception aspect could encrypt a value when it’s being stored and decrypt it when it’s being read. I don’t have time to show it today, but there’s a working sample of this in my demo app.</a:t>
+            </a:r>
+          </a:p>
+          <a:p>
+            <a:r>
+              <a:rPr lang="en-US" sz="1200" kern="1200" dirty="0" err="1" smtClean="0">
+                <a:solidFill>
+                  <a:schemeClr val="tx1"/>
+                </a:solidFill>
+                <a:effectLst/>
+                <a:latin typeface="+mn-lt"/>
+                <a:ea typeface="+mn-ea"/>
+                <a:cs typeface="+mn-cs"/>
+              </a:rPr>
+              <a:t>PostSharp</a:t>
+            </a:r>
+            <a:r>
+              <a:rPr lang="en-US" sz="1200" kern="1200" dirty="0" smtClean="0">
+                <a:solidFill>
+                  <a:schemeClr val="tx1"/>
+                </a:solidFill>
+                <a:effectLst/>
+                <a:latin typeface="+mn-lt"/>
+                <a:ea typeface="+mn-ea"/>
+                <a:cs typeface="+mn-cs"/>
+              </a:rPr>
+              <a:t> can also intercept method calls, not just property access. You could use it to automatically inject access control code into every MVC controller action, if you don’t want to take a property-based approach. You could use it for auditing, for logging, there are tons of use cases where it can radically simplify your feature code by eliminating cross-cutting concerns.</a:t>
+            </a:r>
+          </a:p>
+          <a:p>
+            <a:endParaRPr lang="en-US" sz="1200" kern="1200" dirty="0" smtClean="0">
+              <a:solidFill>
+                <a:schemeClr val="tx1"/>
+              </a:solidFill>
+              <a:effectLst/>
+              <a:latin typeface="+mn-lt"/>
+              <a:ea typeface="+mn-ea"/>
+              <a:cs typeface="+mn-cs"/>
+            </a:endParaRPr>
+          </a:p>
+          <a:p>
+            <a:r>
+              <a:rPr lang="en-US" sz="1200" kern="1200" dirty="0" err="1" smtClean="0">
+                <a:solidFill>
+                  <a:schemeClr val="tx1"/>
+                </a:solidFill>
+                <a:effectLst/>
+                <a:latin typeface="+mn-lt"/>
+                <a:ea typeface="+mn-ea"/>
+                <a:cs typeface="+mn-cs"/>
+              </a:rPr>
+              <a:t>PostSharp</a:t>
+            </a:r>
+            <a:r>
+              <a:rPr lang="en-US" sz="1200" kern="1200" dirty="0" smtClean="0">
+                <a:solidFill>
+                  <a:schemeClr val="tx1"/>
+                </a:solidFill>
+                <a:effectLst/>
+                <a:latin typeface="+mn-lt"/>
+                <a:ea typeface="+mn-ea"/>
+                <a:cs typeface="+mn-cs"/>
+              </a:rPr>
+              <a:t> is available on </a:t>
+            </a:r>
+            <a:r>
+              <a:rPr lang="en-US" sz="1200" kern="1200" dirty="0" err="1" smtClean="0">
+                <a:solidFill>
+                  <a:schemeClr val="tx1"/>
+                </a:solidFill>
+                <a:effectLst/>
+                <a:latin typeface="+mn-lt"/>
+                <a:ea typeface="+mn-ea"/>
+                <a:cs typeface="+mn-cs"/>
+              </a:rPr>
+              <a:t>Nuget</a:t>
+            </a:r>
+            <a:r>
+              <a:rPr lang="en-US" sz="1200" kern="1200" dirty="0" smtClean="0">
+                <a:solidFill>
+                  <a:schemeClr val="tx1"/>
+                </a:solidFill>
+                <a:effectLst/>
+                <a:latin typeface="+mn-lt"/>
+                <a:ea typeface="+mn-ea"/>
+                <a:cs typeface="+mn-cs"/>
+              </a:rPr>
+              <a:t> and I encourage you to check it out on your own, or through my demo app. It IS a paid tool, although there’s a free version available if your projects are small and simple enough. The cost is extremely reasonable given the things it can do.</a:t>
+            </a:r>
+          </a:p>
+          <a:p>
             <a:endParaRPr lang="en-US" b="0" dirty="0" smtClean="0"/>
           </a:p>
         </p:txBody>
@@ -9135,6 +11473,84 @@
           <a:bodyPr/>
           <a:lstStyle/>
           <a:p>
+            <a:r>
+              <a:rPr lang="en-US" sz="1200" kern="1200" dirty="0" smtClean="0">
+                <a:solidFill>
+                  <a:schemeClr val="tx1"/>
+                </a:solidFill>
+                <a:effectLst/>
+                <a:latin typeface="+mn-lt"/>
+                <a:ea typeface="+mn-ea"/>
+                <a:cs typeface="+mn-cs"/>
+              </a:rPr>
+              <a:t>For the final segment of this session I want to talk about auditing and testing.</a:t>
+            </a:r>
+          </a:p>
+          <a:p>
+            <a:r>
+              <a:rPr lang="en-US" sz="1200" kern="1200" dirty="0" smtClean="0">
+                <a:solidFill>
+                  <a:schemeClr val="tx1"/>
+                </a:solidFill>
+                <a:effectLst/>
+                <a:latin typeface="+mn-lt"/>
+                <a:ea typeface="+mn-ea"/>
+                <a:cs typeface="+mn-cs"/>
+              </a:rPr>
+              <a:t>Building a secure system is about more than just writing secure code. It’s also about the overall development process and how effectively it helps your team spot and remove vulnerabilities that might otherwise sneak past the developer.</a:t>
+            </a:r>
+          </a:p>
+          <a:p>
+            <a:endParaRPr lang="en-US" sz="1200" kern="1200" dirty="0" smtClean="0">
+              <a:solidFill>
+                <a:schemeClr val="tx1"/>
+              </a:solidFill>
+              <a:effectLst/>
+              <a:latin typeface="+mn-lt"/>
+              <a:ea typeface="+mn-ea"/>
+              <a:cs typeface="+mn-cs"/>
+            </a:endParaRPr>
+          </a:p>
+          <a:p>
+            <a:r>
+              <a:rPr lang="en-US" sz="1200" kern="1200" dirty="0" smtClean="0">
+                <a:solidFill>
+                  <a:schemeClr val="tx1"/>
+                </a:solidFill>
+                <a:effectLst/>
+                <a:latin typeface="+mn-lt"/>
+                <a:ea typeface="+mn-ea"/>
+                <a:cs typeface="+mn-cs"/>
+              </a:rPr>
+              <a:t>In my experience, exhaustively testing the security of an application is a moving target. You can spend an obscene amount of time and energy doing a full system test, and then your confidence in the results vanishes with the first non-trivial commit that gets pushed. Every time a dev changes existing code there’s the risk that they inadvertently broke an existing security check, or inadvertently introduced a new vulnerability.</a:t>
+            </a:r>
+          </a:p>
+          <a:p>
+            <a:endParaRPr lang="en-US" sz="1200" kern="1200" dirty="0" smtClean="0">
+              <a:solidFill>
+                <a:schemeClr val="tx1"/>
+              </a:solidFill>
+              <a:effectLst/>
+              <a:latin typeface="+mn-lt"/>
+              <a:ea typeface="+mn-ea"/>
+              <a:cs typeface="+mn-cs"/>
+            </a:endParaRPr>
+          </a:p>
+          <a:p>
+            <a:r>
+              <a:rPr lang="en-US" sz="1200" kern="1200" dirty="0" smtClean="0">
+                <a:solidFill>
+                  <a:schemeClr val="tx1"/>
+                </a:solidFill>
+                <a:effectLst/>
+                <a:latin typeface="+mn-lt"/>
+                <a:ea typeface="+mn-ea"/>
+                <a:cs typeface="+mn-cs"/>
+              </a:rPr>
+              <a:t>One way to mitigate that risk is to automate as much of the security audit and testing as possible, so that you can continually re-run it as the code changes. And in very general terms, this will be easier to do when you’ve isolated your security code into cross cutting concerns.</a:t>
+            </a:r>
+          </a:p>
+          <a:p>
             <a:pPr marL="0" marR="0" indent="0" algn="l" defTabSz="914400" rtl="0" eaLnBrk="1" fontAlgn="auto" latinLnBrk="0" hangingPunct="1">
               <a:lnSpc>
                 <a:spcPct val="100000"/>
@@ -9244,6 +11660,133 @@
           <a:bodyPr/>
           <a:lstStyle/>
           <a:p>
+            <a:r>
+              <a:rPr lang="en-US" sz="1200" kern="1200" dirty="0" smtClean="0">
+                <a:solidFill>
+                  <a:schemeClr val="tx1"/>
+                </a:solidFill>
+                <a:effectLst/>
+                <a:latin typeface="+mn-lt"/>
+                <a:ea typeface="+mn-ea"/>
+                <a:cs typeface="+mn-cs"/>
+              </a:rPr>
+              <a:t>Here’s an example:</a:t>
+            </a:r>
+          </a:p>
+          <a:p>
+            <a:endParaRPr lang="en-US" sz="1200" kern="1200" dirty="0" smtClean="0">
+              <a:solidFill>
+                <a:schemeClr val="tx1"/>
+              </a:solidFill>
+              <a:effectLst/>
+              <a:latin typeface="+mn-lt"/>
+              <a:ea typeface="+mn-ea"/>
+              <a:cs typeface="+mn-cs"/>
+            </a:endParaRPr>
+          </a:p>
+          <a:p>
+            <a:r>
+              <a:rPr lang="en-US" sz="1200" kern="1200" dirty="0" smtClean="0">
+                <a:solidFill>
+                  <a:schemeClr val="tx1"/>
+                </a:solidFill>
+                <a:effectLst/>
+                <a:latin typeface="+mn-lt"/>
+                <a:ea typeface="+mn-ea"/>
+                <a:cs typeface="+mn-cs"/>
+              </a:rPr>
+              <a:t>Let’s say we have a large website with lots of different endpoints. It’s reasonable to expect the QA team to validate that every endpoint implements the correct permission check. </a:t>
+            </a:r>
+          </a:p>
+          <a:p>
+            <a:r>
+              <a:rPr lang="en-US" sz="1200" kern="1200" dirty="0" smtClean="0">
+                <a:solidFill>
+                  <a:schemeClr val="tx1"/>
+                </a:solidFill>
+                <a:effectLst/>
+                <a:latin typeface="+mn-lt"/>
+                <a:ea typeface="+mn-ea"/>
+                <a:cs typeface="+mn-cs"/>
+              </a:rPr>
+              <a:t>The brute force approach would be for QA to perform black-box testing against every single endpoint, verifying that the authentication and authorization checks are properly implemented. This is a really expensive way to go; even if they automate those tests, they still need to spend a lot of effort granting and removing permissions for each test, and automated browser-level tests can be very brittle.</a:t>
+            </a:r>
+          </a:p>
+          <a:p>
+            <a:endParaRPr lang="en-US" sz="1200" kern="1200" dirty="0" smtClean="0">
+              <a:solidFill>
+                <a:schemeClr val="tx1"/>
+              </a:solidFill>
+              <a:effectLst/>
+              <a:latin typeface="+mn-lt"/>
+              <a:ea typeface="+mn-ea"/>
+              <a:cs typeface="+mn-cs"/>
+            </a:endParaRPr>
+          </a:p>
+          <a:p>
+            <a:r>
+              <a:rPr lang="en-US" sz="1200" kern="1200" dirty="0" smtClean="0">
+                <a:solidFill>
+                  <a:schemeClr val="tx1"/>
+                </a:solidFill>
+                <a:effectLst/>
+                <a:latin typeface="+mn-lt"/>
+                <a:ea typeface="+mn-ea"/>
+                <a:cs typeface="+mn-cs"/>
+              </a:rPr>
+              <a:t>Another approach would be for the dev to write unit tests for those controller actions, but if that’s </a:t>
+            </a:r>
+            <a:r>
+              <a:rPr lang="en-US" sz="1200" i="1" kern="1200" dirty="0" smtClean="0">
+                <a:solidFill>
+                  <a:schemeClr val="tx1"/>
+                </a:solidFill>
+                <a:effectLst/>
+                <a:latin typeface="+mn-lt"/>
+                <a:ea typeface="+mn-ea"/>
+                <a:cs typeface="+mn-cs"/>
+              </a:rPr>
+              <a:t>all </a:t>
+            </a:r>
+            <a:r>
+              <a:rPr lang="en-US" sz="1200" kern="1200" dirty="0" smtClean="0">
+                <a:solidFill>
+                  <a:schemeClr val="tx1"/>
+                </a:solidFill>
+                <a:effectLst/>
+                <a:latin typeface="+mn-lt"/>
+                <a:ea typeface="+mn-ea"/>
+                <a:cs typeface="+mn-cs"/>
+              </a:rPr>
+              <a:t>we do then we’re not giving QA an opportunity to double-check the developer’s work. The testing is less expensive, but at the cost of creating a single point of failure. </a:t>
+            </a:r>
+          </a:p>
+          <a:p>
+            <a:endParaRPr lang="en-US" sz="1200" kern="1200" dirty="0" smtClean="0">
+              <a:solidFill>
+                <a:schemeClr val="tx1"/>
+              </a:solidFill>
+              <a:effectLst/>
+              <a:latin typeface="+mn-lt"/>
+              <a:ea typeface="+mn-ea"/>
+              <a:cs typeface="+mn-cs"/>
+            </a:endParaRPr>
+          </a:p>
+          <a:p>
+            <a:r>
+              <a:rPr lang="en-US" sz="1200" kern="1200" dirty="0" smtClean="0">
+                <a:solidFill>
+                  <a:schemeClr val="tx1"/>
+                </a:solidFill>
+                <a:effectLst/>
+                <a:latin typeface="+mn-lt"/>
+                <a:ea typeface="+mn-ea"/>
+                <a:cs typeface="+mn-cs"/>
+              </a:rPr>
+              <a:t>In the best of both worlds we’d have QA involved in the verification process, but they’d have a more efficient way of doing so. And, if you’ve implemented your security code as cross-cutting concerns, then you have some interesting options available to you.</a:t>
+            </a:r>
+          </a:p>
+          <a:p>
             <a:endParaRPr lang="en-US" b="0" dirty="0" smtClean="0"/>
           </a:p>
         </p:txBody>
@@ -9328,6 +11871,94 @@
           <a:bodyPr/>
           <a:lstStyle/>
           <a:p>
+            <a:r>
+              <a:rPr lang="en-US" sz="1200" kern="1200" dirty="0" smtClean="0">
+                <a:solidFill>
+                  <a:schemeClr val="tx1"/>
+                </a:solidFill>
+                <a:effectLst/>
+                <a:latin typeface="+mn-lt"/>
+                <a:ea typeface="+mn-ea"/>
+                <a:cs typeface="+mn-cs"/>
+              </a:rPr>
+              <a:t>For instance, if you’ve implemented your authorization checks using attributes, then it’s really easy to write a little bit of reflection code to generate a report like this.</a:t>
+            </a:r>
+          </a:p>
+          <a:p>
+            <a:endParaRPr lang="en-US" sz="1200" kern="1200" dirty="0" smtClean="0">
+              <a:solidFill>
+                <a:schemeClr val="tx1"/>
+              </a:solidFill>
+              <a:effectLst/>
+              <a:latin typeface="+mn-lt"/>
+              <a:ea typeface="+mn-ea"/>
+              <a:cs typeface="+mn-cs"/>
+            </a:endParaRPr>
+          </a:p>
+          <a:p>
+            <a:r>
+              <a:rPr lang="en-US" sz="1200" kern="1200" dirty="0" smtClean="0">
+                <a:solidFill>
+                  <a:schemeClr val="tx1"/>
+                </a:solidFill>
+                <a:effectLst/>
+                <a:latin typeface="+mn-lt"/>
+                <a:ea typeface="+mn-ea"/>
+                <a:cs typeface="+mn-cs"/>
+              </a:rPr>
+              <a:t>This is a snippet of a report from my demo app showing a couple of endpoints. You can see that a couple of them allow public access, others require a login but do not require any specific permissions, and one of them is only accessible to logged in users that also have the </a:t>
+            </a:r>
+            <a:r>
+              <a:rPr lang="en-US" sz="1200" kern="1200" dirty="0" err="1" smtClean="0">
+                <a:solidFill>
+                  <a:schemeClr val="tx1"/>
+                </a:solidFill>
+                <a:effectLst/>
+                <a:latin typeface="+mn-lt"/>
+                <a:ea typeface="+mn-ea"/>
+                <a:cs typeface="+mn-cs"/>
+              </a:rPr>
+              <a:t>ManageOrders</a:t>
+            </a:r>
+            <a:r>
+              <a:rPr lang="en-US" sz="1200" kern="1200" dirty="0" smtClean="0">
+                <a:solidFill>
+                  <a:schemeClr val="tx1"/>
+                </a:solidFill>
+                <a:effectLst/>
+                <a:latin typeface="+mn-lt"/>
+                <a:ea typeface="+mn-ea"/>
+                <a:cs typeface="+mn-cs"/>
+              </a:rPr>
+              <a:t> permission.</a:t>
+            </a:r>
+          </a:p>
+          <a:p>
+            <a:endParaRPr lang="en-US" sz="1200" kern="1200" dirty="0" smtClean="0">
+              <a:solidFill>
+                <a:schemeClr val="tx1"/>
+              </a:solidFill>
+              <a:effectLst/>
+              <a:latin typeface="+mn-lt"/>
+              <a:ea typeface="+mn-ea"/>
+              <a:cs typeface="+mn-cs"/>
+            </a:endParaRPr>
+          </a:p>
+          <a:p>
+            <a:r>
+              <a:rPr lang="en-US" sz="1200" kern="1200" dirty="0" smtClean="0">
+                <a:solidFill>
+                  <a:schemeClr val="tx1"/>
+                </a:solidFill>
+                <a:effectLst/>
+                <a:latin typeface="+mn-lt"/>
+                <a:ea typeface="+mn-ea"/>
+                <a:cs typeface="+mn-cs"/>
+              </a:rPr>
+              <a:t>If you publish this report to your QA team, they can be responsible for cross-referencing this data against their security matrix or requirements documents or whatever, so they can maximize the time they spend looking for mistakes and minimize the time they spend fighting with tooling or automating the browser.</a:t>
+            </a:r>
+          </a:p>
+          <a:p>
             <a:endParaRPr lang="en-US" b="0" dirty="0" smtClean="0"/>
           </a:p>
         </p:txBody>
@@ -9412,6 +12043,45 @@
           <a:bodyPr/>
           <a:lstStyle/>
           <a:p>
+            <a:r>
+              <a:rPr lang="en-US" sz="1200" kern="1200" dirty="0" smtClean="0">
+                <a:solidFill>
+                  <a:schemeClr val="tx1"/>
+                </a:solidFill>
+                <a:effectLst/>
+                <a:latin typeface="+mn-lt"/>
+                <a:ea typeface="+mn-ea"/>
+                <a:cs typeface="+mn-cs"/>
+              </a:rPr>
+              <a:t>That report was really easy to create. This is basically all it took.</a:t>
+            </a:r>
+          </a:p>
+          <a:p>
+            <a:endParaRPr lang="en-US" sz="1200" kern="1200" dirty="0" smtClean="0">
+              <a:solidFill>
+                <a:schemeClr val="tx1"/>
+              </a:solidFill>
+              <a:effectLst/>
+              <a:latin typeface="+mn-lt"/>
+              <a:ea typeface="+mn-ea"/>
+              <a:cs typeface="+mn-cs"/>
+            </a:endParaRPr>
+          </a:p>
+          <a:p>
+            <a:r>
+              <a:rPr lang="en-US" sz="1200" kern="1200" dirty="0" smtClean="0">
+                <a:solidFill>
+                  <a:schemeClr val="tx1"/>
+                </a:solidFill>
+                <a:effectLst/>
+                <a:latin typeface="+mn-lt"/>
+                <a:ea typeface="+mn-ea"/>
+                <a:cs typeface="+mn-cs"/>
+              </a:rPr>
+              <a:t>Using reflection, I look for every class that is a type of MVC Controller, I identify all of the public instance methods that are available as endpoints, I ignore some behind-the-scenes stuff added by the MVC framework itself, and then I return an anonymous data structure summarizing those methods. </a:t>
+            </a:r>
+          </a:p>
+          <a:p>
             <a:endParaRPr lang="en-US" b="0" dirty="0" smtClean="0"/>
           </a:p>
         </p:txBody>
@@ -9496,6 +12166,117 @@
           <a:bodyPr/>
           <a:lstStyle/>
           <a:p>
+            <a:r>
+              <a:rPr lang="en-US" sz="1200" kern="1200" dirty="0" smtClean="0">
+                <a:solidFill>
+                  <a:schemeClr val="tx1"/>
+                </a:solidFill>
+                <a:effectLst/>
+                <a:latin typeface="+mn-lt"/>
+                <a:ea typeface="+mn-ea"/>
+                <a:cs typeface="+mn-cs"/>
+              </a:rPr>
+              <a:t>After that, all it takes is a short loop over the data structure to generate the report. Since both the authentication and authorization data are expressed as attributes, it’s easy to use reflection to determine which endpoints require a login or a permission.</a:t>
+            </a:r>
+          </a:p>
+          <a:p>
+            <a:endParaRPr lang="en-US" sz="1200" kern="1200" dirty="0" smtClean="0">
+              <a:solidFill>
+                <a:schemeClr val="tx1"/>
+              </a:solidFill>
+              <a:effectLst/>
+              <a:latin typeface="+mn-lt"/>
+              <a:ea typeface="+mn-ea"/>
+              <a:cs typeface="+mn-cs"/>
+            </a:endParaRPr>
+          </a:p>
+          <a:p>
+            <a:r>
+              <a:rPr lang="en-US" sz="1200" kern="1200" dirty="0" smtClean="0">
+                <a:solidFill>
+                  <a:schemeClr val="tx1"/>
+                </a:solidFill>
+                <a:effectLst/>
+                <a:latin typeface="+mn-lt"/>
+                <a:ea typeface="+mn-ea"/>
+                <a:cs typeface="+mn-cs"/>
+              </a:rPr>
+              <a:t>If I had implemented those checks as plain-old feature code, rather than using attributes, this would have been a lot harder to do. Granted, with the introduction of Roslyn it’s now </a:t>
+            </a:r>
+            <a:r>
+              <a:rPr lang="en-US" sz="1200" i="1" kern="1200" dirty="0" smtClean="0">
+                <a:solidFill>
+                  <a:schemeClr val="tx1"/>
+                </a:solidFill>
+                <a:effectLst/>
+                <a:latin typeface="+mn-lt"/>
+                <a:ea typeface="+mn-ea"/>
+                <a:cs typeface="+mn-cs"/>
+              </a:rPr>
+              <a:t>possible </a:t>
+            </a:r>
+            <a:r>
+              <a:rPr lang="en-US" sz="1200" kern="1200" dirty="0" smtClean="0">
+                <a:solidFill>
+                  <a:schemeClr val="tx1"/>
+                </a:solidFill>
+                <a:effectLst/>
+                <a:latin typeface="+mn-lt"/>
+                <a:ea typeface="+mn-ea"/>
+                <a:cs typeface="+mn-cs"/>
+              </a:rPr>
+              <a:t>to do static analysis of method bodies themselves so you </a:t>
+            </a:r>
+            <a:r>
+              <a:rPr lang="en-US" sz="1200" i="1" kern="1200" dirty="0" smtClean="0">
+                <a:solidFill>
+                  <a:schemeClr val="tx1"/>
+                </a:solidFill>
+                <a:effectLst/>
+                <a:latin typeface="+mn-lt"/>
+                <a:ea typeface="+mn-ea"/>
+                <a:cs typeface="+mn-cs"/>
+              </a:rPr>
+              <a:t>could </a:t>
+            </a:r>
+            <a:r>
+              <a:rPr lang="en-US" sz="1200" kern="1200" dirty="0" smtClean="0">
+                <a:solidFill>
+                  <a:schemeClr val="tx1"/>
+                </a:solidFill>
+                <a:effectLst/>
+                <a:latin typeface="+mn-lt"/>
+                <a:ea typeface="+mn-ea"/>
+                <a:cs typeface="+mn-cs"/>
+              </a:rPr>
+              <a:t>do something like this without attributes, but it’s certainly </a:t>
+            </a:r>
+            <a:r>
+              <a:rPr lang="en-US" sz="1200" i="1" kern="1200" dirty="0" smtClean="0">
+                <a:solidFill>
+                  <a:schemeClr val="tx1"/>
+                </a:solidFill>
+                <a:effectLst/>
+                <a:latin typeface="+mn-lt"/>
+                <a:ea typeface="+mn-ea"/>
+                <a:cs typeface="+mn-cs"/>
+              </a:rPr>
+              <a:t>easier </a:t>
+            </a:r>
+            <a:r>
+              <a:rPr lang="en-US" sz="1200" kern="1200" dirty="0" smtClean="0">
+                <a:solidFill>
+                  <a:schemeClr val="tx1"/>
+                </a:solidFill>
+                <a:effectLst/>
+                <a:latin typeface="+mn-lt"/>
+                <a:ea typeface="+mn-ea"/>
+                <a:cs typeface="+mn-cs"/>
+              </a:rPr>
+              <a:t>to use reflection and look for the presence of attributes.</a:t>
+            </a:r>
+          </a:p>
+          <a:p>
             <a:endParaRPr lang="en-US" b="0" dirty="0" smtClean="0"/>
           </a:p>
         </p:txBody>
@@ -9580,6 +12361,117 @@
           <a:bodyPr/>
           <a:lstStyle/>
           <a:p>
+            <a:r>
+              <a:rPr lang="en-US" sz="1200" kern="1200" dirty="0" smtClean="0">
+                <a:solidFill>
+                  <a:schemeClr val="tx1"/>
+                </a:solidFill>
+                <a:effectLst/>
+                <a:latin typeface="+mn-lt"/>
+                <a:ea typeface="+mn-ea"/>
+                <a:cs typeface="+mn-cs"/>
+              </a:rPr>
+              <a:t>In my example here, I’m showing a report of MVC endpoints and the permissions they require. But it would be just as easy to generate a report showing which properties of which classes are using the </a:t>
+            </a:r>
+            <a:r>
+              <a:rPr lang="en-US" sz="1200" kern="1200" dirty="0" err="1" smtClean="0">
+                <a:solidFill>
+                  <a:schemeClr val="tx1"/>
+                </a:solidFill>
+                <a:effectLst/>
+                <a:latin typeface="+mn-lt"/>
+                <a:ea typeface="+mn-ea"/>
+                <a:cs typeface="+mn-cs"/>
+              </a:rPr>
+              <a:t>MaskedValue</a:t>
+            </a:r>
+            <a:r>
+              <a:rPr lang="en-US" sz="1200" kern="1200" dirty="0" smtClean="0">
+                <a:solidFill>
+                  <a:schemeClr val="tx1"/>
+                </a:solidFill>
+                <a:effectLst/>
+                <a:latin typeface="+mn-lt"/>
+                <a:ea typeface="+mn-ea"/>
+                <a:cs typeface="+mn-cs"/>
+              </a:rPr>
+              <a:t> or </a:t>
+            </a:r>
+            <a:r>
+              <a:rPr lang="en-US" sz="1200" kern="1200" dirty="0" err="1" smtClean="0">
+                <a:solidFill>
+                  <a:schemeClr val="tx1"/>
+                </a:solidFill>
+                <a:effectLst/>
+                <a:latin typeface="+mn-lt"/>
+                <a:ea typeface="+mn-ea"/>
+                <a:cs typeface="+mn-cs"/>
+              </a:rPr>
+              <a:t>EncryptedValue</a:t>
+            </a:r>
+            <a:r>
+              <a:rPr lang="en-US" sz="1200" kern="1200" dirty="0" smtClean="0">
+                <a:solidFill>
+                  <a:schemeClr val="tx1"/>
+                </a:solidFill>
+                <a:effectLst/>
+                <a:latin typeface="+mn-lt"/>
+                <a:ea typeface="+mn-ea"/>
+                <a:cs typeface="+mn-cs"/>
+              </a:rPr>
+              <a:t> attributes, or whatever else that you’ve implemented as a cross-cutting concern using Attributes.</a:t>
+            </a:r>
+          </a:p>
+          <a:p>
+            <a:endParaRPr lang="en-US" sz="1200" kern="1200" dirty="0" smtClean="0">
+              <a:solidFill>
+                <a:schemeClr val="tx1"/>
+              </a:solidFill>
+              <a:effectLst/>
+              <a:latin typeface="+mn-lt"/>
+              <a:ea typeface="+mn-ea"/>
+              <a:cs typeface="+mn-cs"/>
+            </a:endParaRPr>
+          </a:p>
+          <a:p>
+            <a:r>
+              <a:rPr lang="en-US" sz="1200" kern="1200" dirty="0" smtClean="0">
+                <a:solidFill>
+                  <a:schemeClr val="tx1"/>
+                </a:solidFill>
+                <a:effectLst/>
+                <a:latin typeface="+mn-lt"/>
+                <a:ea typeface="+mn-ea"/>
+                <a:cs typeface="+mn-cs"/>
+              </a:rPr>
+              <a:t>However, let’s say you have a large application and these reports contain hundreds or even thousands of rows. We’ve made QA’s job </a:t>
+            </a:r>
+            <a:r>
+              <a:rPr lang="en-US" sz="1200" i="1" kern="1200" dirty="0" smtClean="0">
+                <a:solidFill>
+                  <a:schemeClr val="tx1"/>
+                </a:solidFill>
+                <a:effectLst/>
+                <a:latin typeface="+mn-lt"/>
+                <a:ea typeface="+mn-ea"/>
+                <a:cs typeface="+mn-cs"/>
+              </a:rPr>
+              <a:t>easier</a:t>
+            </a:r>
+            <a:r>
+              <a:rPr lang="en-US" sz="1200" kern="1200" dirty="0" smtClean="0">
+                <a:solidFill>
+                  <a:schemeClr val="tx1"/>
+                </a:solidFill>
+                <a:effectLst/>
+                <a:latin typeface="+mn-lt"/>
+                <a:ea typeface="+mn-ea"/>
+                <a:cs typeface="+mn-cs"/>
+              </a:rPr>
+              <a:t> than the alternative, but it’s still far from “easy”. They still need to examine the report, compare it against their “source of truth”, and identify anything that’s been added, removed, or changed.</a:t>
+            </a:r>
+          </a:p>
+          <a:p>
             <a:endParaRPr lang="en-US" b="0" dirty="0" smtClean="0"/>
           </a:p>
         </p:txBody>
@@ -9664,6 +12556,204 @@
           <a:bodyPr/>
           <a:lstStyle/>
           <a:p>
+            <a:r>
+              <a:rPr lang="en-US" sz="1200" kern="1200" dirty="0" smtClean="0">
+                <a:solidFill>
+                  <a:schemeClr val="tx1"/>
+                </a:solidFill>
+                <a:effectLst/>
+                <a:latin typeface="+mn-lt"/>
+                <a:ea typeface="+mn-ea"/>
+                <a:cs typeface="+mn-cs"/>
+              </a:rPr>
+              <a:t>The very last thing I’m going to show you today is using a library called </a:t>
+            </a:r>
+            <a:r>
+              <a:rPr lang="en-US" sz="1200" kern="1200" dirty="0" err="1" smtClean="0">
+                <a:solidFill>
+                  <a:schemeClr val="tx1"/>
+                </a:solidFill>
+                <a:effectLst/>
+                <a:latin typeface="+mn-lt"/>
+                <a:ea typeface="+mn-ea"/>
+                <a:cs typeface="+mn-cs"/>
+              </a:rPr>
+              <a:t>ApprovalTests</a:t>
+            </a:r>
+            <a:r>
+              <a:rPr lang="en-US" sz="1200" kern="1200" dirty="0" smtClean="0">
+                <a:solidFill>
+                  <a:schemeClr val="tx1"/>
+                </a:solidFill>
+                <a:effectLst/>
+                <a:latin typeface="+mn-lt"/>
+                <a:ea typeface="+mn-ea"/>
+                <a:cs typeface="+mn-cs"/>
+              </a:rPr>
+              <a:t> to automate the auditing of this report.</a:t>
+            </a:r>
+          </a:p>
+          <a:p>
+            <a:r>
+              <a:rPr lang="en-US" sz="1200" kern="1200" dirty="0" smtClean="0">
+                <a:solidFill>
+                  <a:schemeClr val="tx1"/>
+                </a:solidFill>
+                <a:effectLst/>
+                <a:latin typeface="+mn-lt"/>
+                <a:ea typeface="+mn-ea"/>
+                <a:cs typeface="+mn-cs"/>
+              </a:rPr>
+              <a:t>Approval Tests is an alternative way of writing assertions in your tests. It works with everything from </a:t>
+            </a:r>
+            <a:r>
+              <a:rPr lang="en-US" sz="1200" kern="1200" dirty="0" err="1" smtClean="0">
+                <a:solidFill>
+                  <a:schemeClr val="tx1"/>
+                </a:solidFill>
+                <a:effectLst/>
+                <a:latin typeface="+mn-lt"/>
+                <a:ea typeface="+mn-ea"/>
+                <a:cs typeface="+mn-cs"/>
+              </a:rPr>
+              <a:t>MSTest</a:t>
+            </a:r>
+            <a:r>
+              <a:rPr lang="en-US" sz="1200" kern="1200" dirty="0" smtClean="0">
+                <a:solidFill>
+                  <a:schemeClr val="tx1"/>
+                </a:solidFill>
+                <a:effectLst/>
+                <a:latin typeface="+mn-lt"/>
+                <a:ea typeface="+mn-ea"/>
+                <a:cs typeface="+mn-cs"/>
+              </a:rPr>
+              <a:t> to </a:t>
+            </a:r>
+            <a:r>
+              <a:rPr lang="en-US" sz="1200" kern="1200" dirty="0" err="1" smtClean="0">
+                <a:solidFill>
+                  <a:schemeClr val="tx1"/>
+                </a:solidFill>
+                <a:effectLst/>
+                <a:latin typeface="+mn-lt"/>
+                <a:ea typeface="+mn-ea"/>
+                <a:cs typeface="+mn-cs"/>
+              </a:rPr>
+              <a:t>NUnit</a:t>
+            </a:r>
+            <a:r>
+              <a:rPr lang="en-US" sz="1200" kern="1200" dirty="0" smtClean="0">
+                <a:solidFill>
+                  <a:schemeClr val="tx1"/>
+                </a:solidFill>
+                <a:effectLst/>
+                <a:latin typeface="+mn-lt"/>
+                <a:ea typeface="+mn-ea"/>
+                <a:cs typeface="+mn-cs"/>
+              </a:rPr>
+              <a:t> to </a:t>
+            </a:r>
+            <a:r>
+              <a:rPr lang="en-US" sz="1200" kern="1200" dirty="0" err="1" smtClean="0">
+                <a:solidFill>
+                  <a:schemeClr val="tx1"/>
+                </a:solidFill>
+                <a:effectLst/>
+                <a:latin typeface="+mn-lt"/>
+                <a:ea typeface="+mn-ea"/>
+                <a:cs typeface="+mn-cs"/>
+              </a:rPr>
+              <a:t>RSpec</a:t>
+            </a:r>
+            <a:r>
+              <a:rPr lang="en-US" sz="1200" kern="1200" dirty="0" smtClean="0">
+                <a:solidFill>
+                  <a:schemeClr val="tx1"/>
+                </a:solidFill>
+                <a:effectLst/>
+                <a:latin typeface="+mn-lt"/>
+                <a:ea typeface="+mn-ea"/>
+                <a:cs typeface="+mn-cs"/>
+              </a:rPr>
+              <a:t> to Cucumber and a bunch of things in the middle. It is freely available on </a:t>
+            </a:r>
+            <a:r>
+              <a:rPr lang="en-US" sz="1200" kern="1200" dirty="0" err="1" smtClean="0">
+                <a:solidFill>
+                  <a:schemeClr val="tx1"/>
+                </a:solidFill>
+                <a:effectLst/>
+                <a:latin typeface="+mn-lt"/>
+                <a:ea typeface="+mn-ea"/>
+                <a:cs typeface="+mn-cs"/>
+              </a:rPr>
+              <a:t>Nuget</a:t>
+            </a:r>
+            <a:r>
+              <a:rPr lang="en-US" sz="1200" kern="1200" dirty="0" smtClean="0">
+                <a:solidFill>
+                  <a:schemeClr val="tx1"/>
+                </a:solidFill>
+                <a:effectLst/>
+                <a:latin typeface="+mn-lt"/>
+                <a:ea typeface="+mn-ea"/>
+                <a:cs typeface="+mn-cs"/>
+              </a:rPr>
+              <a:t>.</a:t>
+            </a:r>
+          </a:p>
+          <a:p>
+            <a:endParaRPr lang="en-US" sz="1200" kern="1200" dirty="0" smtClean="0">
+              <a:solidFill>
+                <a:schemeClr val="tx1"/>
+              </a:solidFill>
+              <a:effectLst/>
+              <a:latin typeface="+mn-lt"/>
+              <a:ea typeface="+mn-ea"/>
+              <a:cs typeface="+mn-cs"/>
+            </a:endParaRPr>
+          </a:p>
+          <a:p>
+            <a:r>
+              <a:rPr lang="en-US" sz="1200" kern="1200" dirty="0" smtClean="0">
+                <a:solidFill>
+                  <a:schemeClr val="tx1"/>
+                </a:solidFill>
+                <a:effectLst/>
+                <a:latin typeface="+mn-lt"/>
+                <a:ea typeface="+mn-ea"/>
+                <a:cs typeface="+mn-cs"/>
+              </a:rPr>
+              <a:t>It’s designed for scenarios where you have an automated test that does some work, but where you need a human being to interpret the results. That’s exactly the scenario we’re talking about with this security audit idea: we can run some code to produce a report showing our endpoints, but we specifically WANT a human being to verify it.</a:t>
+            </a:r>
+          </a:p>
+          <a:p>
+            <a:endParaRPr lang="en-US" sz="1200" kern="1200" dirty="0" smtClean="0">
+              <a:solidFill>
+                <a:schemeClr val="tx1"/>
+              </a:solidFill>
+              <a:effectLst/>
+              <a:latin typeface="+mn-lt"/>
+              <a:ea typeface="+mn-ea"/>
+              <a:cs typeface="+mn-cs"/>
+            </a:endParaRPr>
+          </a:p>
+          <a:p>
+            <a:r>
+              <a:rPr lang="en-US" sz="1200" kern="1200" dirty="0" smtClean="0">
+                <a:solidFill>
+                  <a:schemeClr val="tx1"/>
+                </a:solidFill>
+                <a:effectLst/>
+                <a:latin typeface="+mn-lt"/>
+                <a:ea typeface="+mn-ea"/>
+                <a:cs typeface="+mn-cs"/>
+              </a:rPr>
+              <a:t>Here’s how you could use this for your security audit.</a:t>
+            </a:r>
+          </a:p>
+          <a:p>
             <a:endParaRPr lang="en-US" b="0" dirty="0" smtClean="0"/>
           </a:p>
         </p:txBody>
@@ -9748,6 +12838,37 @@
           <a:bodyPr/>
           <a:lstStyle/>
           <a:p>
+            <a:pPr marL="0" marR="0" lvl="0" indent="0" algn="l" defTabSz="914400" rtl="0" eaLnBrk="1" fontAlgn="auto" latinLnBrk="0" hangingPunct="1">
+              <a:lnSpc>
+                <a:spcPct val="100000"/>
+              </a:lnSpc>
+              <a:spcBef>
+                <a:spcPts val="0"/>
+              </a:spcBef>
+              <a:spcAft>
+                <a:spcPts val="0"/>
+              </a:spcAft>
+              <a:buClrTx/>
+              <a:buSzTx/>
+              <a:buFontTx/>
+              <a:buNone/>
+              <a:tabLst/>
+              <a:defRPr/>
+            </a:pPr>
+            <a:r>
+              <a:rPr lang="en-US" sz="1200" kern="1200" dirty="0" smtClean="0">
+                <a:solidFill>
+                  <a:schemeClr val="tx1"/>
+                </a:solidFill>
+                <a:effectLst/>
+                <a:latin typeface="+mn-lt"/>
+                <a:ea typeface="+mn-ea"/>
+                <a:cs typeface="+mn-cs"/>
+              </a:rPr>
+              <a:t>First, create a plain-text version of the report that you want to audit. In my demo project I wrote a simple console app that produces a report like this. It’s the same data I just showed you in that HTML page, but in plain text.</a:t>
+            </a:r>
+          </a:p>
+          <a:p>
             <a:endParaRPr lang="en-US" b="0" dirty="0" smtClean="0"/>
           </a:p>
         </p:txBody>
@@ -9832,6 +12953,69 @@
           <a:bodyPr/>
           <a:lstStyle/>
           <a:p>
+            <a:r>
+              <a:rPr lang="en-US" sz="1200" kern="1200" dirty="0" smtClean="0">
+                <a:solidFill>
+                  <a:schemeClr val="tx1"/>
+                </a:solidFill>
+                <a:effectLst/>
+                <a:latin typeface="+mn-lt"/>
+                <a:ea typeface="+mn-ea"/>
+                <a:cs typeface="+mn-cs"/>
+              </a:rPr>
+              <a:t>Next, write a unit test that generates that report. Instead of making an assertion, however, call </a:t>
+            </a:r>
+            <a:r>
+              <a:rPr lang="en-US" sz="1200" kern="1200" dirty="0" err="1" smtClean="0">
+                <a:solidFill>
+                  <a:schemeClr val="tx1"/>
+                </a:solidFill>
+                <a:effectLst/>
+                <a:latin typeface="+mn-lt"/>
+                <a:ea typeface="+mn-ea"/>
+                <a:cs typeface="+mn-cs"/>
+              </a:rPr>
+              <a:t>Approvals.Verify</a:t>
+            </a:r>
+            <a:r>
+              <a:rPr lang="en-US" sz="1200" kern="1200" dirty="0" smtClean="0">
+                <a:solidFill>
+                  <a:schemeClr val="tx1"/>
+                </a:solidFill>
+                <a:effectLst/>
+                <a:latin typeface="+mn-lt"/>
+                <a:ea typeface="+mn-ea"/>
+                <a:cs typeface="+mn-cs"/>
+              </a:rPr>
+              <a:t>() and pass the report text. You can also work with files on disk if you have to, but keeping it string based makes things a little easier.</a:t>
+            </a:r>
+          </a:p>
+          <a:p>
+            <a:endParaRPr lang="en-US" sz="1200" kern="1200" dirty="0" smtClean="0">
+              <a:solidFill>
+                <a:schemeClr val="tx1"/>
+              </a:solidFill>
+              <a:effectLst/>
+              <a:latin typeface="+mn-lt"/>
+              <a:ea typeface="+mn-ea"/>
+              <a:cs typeface="+mn-cs"/>
+            </a:endParaRPr>
+          </a:p>
+          <a:p>
+            <a:r>
+              <a:rPr lang="en-US" sz="1200" kern="1200" dirty="0" smtClean="0">
+                <a:solidFill>
+                  <a:schemeClr val="tx1"/>
+                </a:solidFill>
+                <a:effectLst/>
+                <a:latin typeface="+mn-lt"/>
+                <a:ea typeface="+mn-ea"/>
+                <a:cs typeface="+mn-cs"/>
+              </a:rPr>
+              <a:t>The Approval Test framework keeps track of the “accepted” state of each test. When this test runs, the framework will compare the new version of the report text against that last known accepted state. If they match, the test passes. If they don’t match, Approval Tests automatically opens a diff tool so that a human being can compare the results and make a decision.</a:t>
+            </a:r>
+          </a:p>
+          <a:p>
             <a:endParaRPr lang="en-US" b="0" dirty="0" smtClean="0"/>
           </a:p>
         </p:txBody>
@@ -10055,6 +13239,70 @@
           <a:bodyPr/>
           <a:lstStyle/>
           <a:p>
+            <a:r>
+              <a:rPr lang="en-US" sz="1200" kern="1200" dirty="0" smtClean="0">
+                <a:solidFill>
+                  <a:schemeClr val="tx1"/>
+                </a:solidFill>
+                <a:effectLst/>
+                <a:latin typeface="+mn-lt"/>
+                <a:ea typeface="+mn-ea"/>
+                <a:cs typeface="+mn-cs"/>
+              </a:rPr>
+              <a:t>The very first time that QA runs the test, since there is no “accepted state” yet, the test will launch a diff tool, like you see here. On the left is the report text, and on the right is a blank file. </a:t>
+            </a:r>
+          </a:p>
+          <a:p>
+            <a:endParaRPr lang="en-US" sz="1200" kern="1200" dirty="0" smtClean="0">
+              <a:solidFill>
+                <a:schemeClr val="tx1"/>
+              </a:solidFill>
+              <a:effectLst/>
+              <a:latin typeface="+mn-lt"/>
+              <a:ea typeface="+mn-ea"/>
+              <a:cs typeface="+mn-cs"/>
+            </a:endParaRPr>
+          </a:p>
+          <a:p>
+            <a:r>
+              <a:rPr lang="en-US" sz="1200" kern="1200" dirty="0" smtClean="0">
+                <a:solidFill>
+                  <a:schemeClr val="tx1"/>
+                </a:solidFill>
+                <a:effectLst/>
+                <a:latin typeface="+mn-lt"/>
+                <a:ea typeface="+mn-ea"/>
+                <a:cs typeface="+mn-cs"/>
+              </a:rPr>
+              <a:t>At this point, the tester would manually verify the report contents. Once they are satisfied that everything matches expectations, they’d merge the left contents into the right file and save them. This is what creates the “accepted state”.</a:t>
+            </a:r>
+          </a:p>
+          <a:p>
+            <a:endParaRPr lang="en-US" sz="1200" kern="1200" dirty="0" smtClean="0">
+              <a:solidFill>
+                <a:schemeClr val="tx1"/>
+              </a:solidFill>
+              <a:effectLst/>
+              <a:latin typeface="+mn-lt"/>
+              <a:ea typeface="+mn-ea"/>
+              <a:cs typeface="+mn-cs"/>
+            </a:endParaRPr>
+          </a:p>
+          <a:p>
+            <a:r>
+              <a:rPr lang="en-US" sz="1200" kern="1200" dirty="0" smtClean="0">
+                <a:solidFill>
+                  <a:schemeClr val="tx1"/>
+                </a:solidFill>
+                <a:effectLst/>
+                <a:latin typeface="+mn-lt"/>
+                <a:ea typeface="+mn-ea"/>
+                <a:cs typeface="+mn-cs"/>
+              </a:rPr>
+              <a:t>From this point forward, as long as the output of the report doesn’t change, the test will pass without manual intervention.</a:t>
+            </a:r>
+          </a:p>
+          <a:p>
             <a:endParaRPr lang="en-US" b="0" dirty="0" smtClean="0"/>
           </a:p>
         </p:txBody>
@@ -10139,6 +13387,94 @@
           <a:bodyPr/>
           <a:lstStyle/>
           <a:p>
+            <a:r>
+              <a:rPr lang="en-US" sz="1200" kern="1200" dirty="0" smtClean="0">
+                <a:solidFill>
+                  <a:schemeClr val="tx1"/>
+                </a:solidFill>
+                <a:effectLst/>
+                <a:latin typeface="+mn-lt"/>
+                <a:ea typeface="+mn-ea"/>
+                <a:cs typeface="+mn-cs"/>
+              </a:rPr>
+              <a:t>In the future, let’s say I make two changes. I add a new endpoint, and I accidently remove the permission attribute from an existing endpoint.</a:t>
+            </a:r>
+          </a:p>
+          <a:p>
+            <a:endParaRPr lang="en-US" sz="1200" kern="1200" dirty="0" smtClean="0">
+              <a:solidFill>
+                <a:schemeClr val="tx1"/>
+              </a:solidFill>
+              <a:effectLst/>
+              <a:latin typeface="+mn-lt"/>
+              <a:ea typeface="+mn-ea"/>
+              <a:cs typeface="+mn-cs"/>
+            </a:endParaRPr>
+          </a:p>
+          <a:p>
+            <a:r>
+              <a:rPr lang="en-US" sz="1200" kern="1200" dirty="0" smtClean="0">
+                <a:solidFill>
+                  <a:schemeClr val="tx1"/>
+                </a:solidFill>
+                <a:effectLst/>
+                <a:latin typeface="+mn-lt"/>
+                <a:ea typeface="+mn-ea"/>
+                <a:cs typeface="+mn-cs"/>
+              </a:rPr>
+              <a:t>The next time that QA runs the approval tests, the diff tool will automatically open and will show the differences. In this case, the tester might determine that the new endpoint was expected and is configured properly, but the removal of the permission setting for the existing endpoint was not expected. The tester could then open a security ticket or otherwise contact the developer to discuss.</a:t>
+            </a:r>
+          </a:p>
+          <a:p>
+            <a:endParaRPr lang="en-US" sz="1200" kern="1200" dirty="0" smtClean="0">
+              <a:solidFill>
+                <a:schemeClr val="tx1"/>
+              </a:solidFill>
+              <a:effectLst/>
+              <a:latin typeface="+mn-lt"/>
+              <a:ea typeface="+mn-ea"/>
+              <a:cs typeface="+mn-cs"/>
+            </a:endParaRPr>
+          </a:p>
+          <a:p>
+            <a:r>
+              <a:rPr lang="en-US" sz="1200" kern="1200" dirty="0" smtClean="0">
+                <a:solidFill>
+                  <a:schemeClr val="tx1"/>
+                </a:solidFill>
+                <a:effectLst/>
+                <a:latin typeface="+mn-lt"/>
+                <a:ea typeface="+mn-ea"/>
+                <a:cs typeface="+mn-cs"/>
+              </a:rPr>
+              <a:t>This is all really simple to set up, </a:t>
+            </a:r>
+            <a:r>
+              <a:rPr lang="en-US" sz="1200" i="1" kern="1200" dirty="0" smtClean="0">
+                <a:solidFill>
+                  <a:schemeClr val="tx1"/>
+                </a:solidFill>
+                <a:effectLst/>
+                <a:latin typeface="+mn-lt"/>
+                <a:ea typeface="+mn-ea"/>
+                <a:cs typeface="+mn-cs"/>
+              </a:rPr>
+              <a:t>if </a:t>
+            </a:r>
+            <a:r>
+              <a:rPr lang="en-US" sz="1200" kern="1200" dirty="0" smtClean="0">
+                <a:solidFill>
+                  <a:schemeClr val="tx1"/>
+                </a:solidFill>
+                <a:effectLst/>
+                <a:latin typeface="+mn-lt"/>
+                <a:ea typeface="+mn-ea"/>
+                <a:cs typeface="+mn-cs"/>
+              </a:rPr>
+              <a:t>you’ve written your security code in a way that lends itself to static analysis. </a:t>
+            </a:r>
+          </a:p>
+          <a:p>
             <a:endParaRPr lang="en-US" b="0" dirty="0" smtClean="0"/>
           </a:p>
         </p:txBody>
@@ -10223,6 +13559,34 @@
           <a:bodyPr/>
           <a:lstStyle/>
           <a:p>
+            <a:r>
+              <a:rPr lang="en-US" sz="1200" kern="1200" dirty="0" smtClean="0">
+                <a:solidFill>
+                  <a:schemeClr val="tx1"/>
+                </a:solidFill>
+                <a:effectLst/>
+                <a:latin typeface="+mn-lt"/>
+                <a:ea typeface="+mn-ea"/>
+                <a:cs typeface="+mn-cs"/>
+              </a:rPr>
+              <a:t>Generally speaking, these are the things that are easiest to audit using reflection: attributes, class inheritance, and interface implementation. If you use these techniques to implement your cross cutting concerns, then you’ll find it pretty easy to do security audits with a little bit of custom code.</a:t>
+            </a:r>
+          </a:p>
+          <a:p>
+            <a:r>
+              <a:rPr lang="en-US" sz="1200" kern="1200" dirty="0" smtClean="0">
+                <a:solidFill>
+                  <a:schemeClr val="tx1"/>
+                </a:solidFill>
+                <a:effectLst/>
+                <a:latin typeface="+mn-lt"/>
+                <a:ea typeface="+mn-ea"/>
+                <a:cs typeface="+mn-cs"/>
+              </a:rPr>
+              <a:t>If you don’t do this, for instance if you implement your security concerns as just some random methods that get called from specific places in your code, then it’s going to be harder to audit.</a:t>
+            </a:r>
+          </a:p>
+          <a:p>
             <a:endParaRPr lang="en-US" b="0" dirty="0" smtClean="0"/>
           </a:p>
         </p:txBody>
@@ -10307,6 +13671,273 @@
           <a:bodyPr/>
           <a:lstStyle/>
           <a:p>
+            <a:r>
+              <a:rPr lang="en-US" sz="1200" kern="1200" dirty="0" smtClean="0">
+                <a:solidFill>
+                  <a:schemeClr val="tx1"/>
+                </a:solidFill>
+                <a:effectLst/>
+                <a:latin typeface="+mn-lt"/>
+                <a:ea typeface="+mn-ea"/>
+                <a:cs typeface="+mn-cs"/>
+              </a:rPr>
+              <a:t>Let’s do a quick recap.</a:t>
+            </a:r>
+          </a:p>
+          <a:p>
+            <a:r>
+              <a:rPr lang="en-US" sz="1200" kern="1200" dirty="0" smtClean="0">
+                <a:solidFill>
+                  <a:schemeClr val="tx1"/>
+                </a:solidFill>
+                <a:effectLst/>
+                <a:latin typeface="+mn-lt"/>
+                <a:ea typeface="+mn-ea"/>
+                <a:cs typeface="+mn-cs"/>
+              </a:rPr>
+              <a:t>The whole point of this is to identity when you have security code intermingled with your feature code that could be decoupled and pushed into your application framework. Separating them will make your system easier to maintain and more secure.</a:t>
+            </a:r>
+          </a:p>
+          <a:p>
+            <a:r>
+              <a:rPr lang="en-US" sz="1200" kern="1200" dirty="0" smtClean="0">
+                <a:solidFill>
+                  <a:schemeClr val="tx1"/>
+                </a:solidFill>
+                <a:effectLst/>
+                <a:latin typeface="+mn-lt"/>
+                <a:ea typeface="+mn-ea"/>
+                <a:cs typeface="+mn-cs"/>
+              </a:rPr>
+              <a:t>To do that, leverage “hooks” in the underlying system to run your security code across multiple features. Examples of these hooks are</a:t>
+            </a:r>
+          </a:p>
+          <a:p>
+            <a:pPr lvl="0"/>
+            <a:r>
+              <a:rPr lang="en-US" sz="1200" kern="1200" dirty="0" smtClean="0">
+                <a:solidFill>
+                  <a:schemeClr val="tx1"/>
+                </a:solidFill>
+                <a:effectLst/>
+                <a:latin typeface="+mn-lt"/>
+                <a:ea typeface="+mn-ea"/>
+                <a:cs typeface="+mn-cs"/>
+              </a:rPr>
+              <a:t>MVC action filters</a:t>
+            </a:r>
+          </a:p>
+          <a:p>
+            <a:pPr lvl="0"/>
+            <a:r>
+              <a:rPr lang="en-US" sz="1200" kern="1200" dirty="0" smtClean="0">
+                <a:solidFill>
+                  <a:schemeClr val="tx1"/>
+                </a:solidFill>
+                <a:effectLst/>
+                <a:latin typeface="+mn-lt"/>
+                <a:ea typeface="+mn-ea"/>
+                <a:cs typeface="+mn-cs"/>
+              </a:rPr>
+              <a:t>HTTP Modules</a:t>
+            </a:r>
+          </a:p>
+          <a:p>
+            <a:pPr lvl="0"/>
+            <a:r>
+              <a:rPr lang="en-US" sz="1200" kern="1200" dirty="0" smtClean="0">
+                <a:solidFill>
+                  <a:schemeClr val="tx1"/>
+                </a:solidFill>
+                <a:effectLst/>
+                <a:latin typeface="+mn-lt"/>
+                <a:ea typeface="+mn-ea"/>
+                <a:cs typeface="+mn-cs"/>
+              </a:rPr>
+              <a:t>jQuery AJAX events</a:t>
+            </a:r>
+          </a:p>
+          <a:p>
+            <a:pPr lvl="0"/>
+            <a:r>
+              <a:rPr lang="en-US" sz="1200" kern="1200" dirty="0" smtClean="0">
+                <a:solidFill>
+                  <a:schemeClr val="tx1"/>
+                </a:solidFill>
+                <a:effectLst/>
+                <a:latin typeface="+mn-lt"/>
+                <a:ea typeface="+mn-ea"/>
+                <a:cs typeface="+mn-cs"/>
+              </a:rPr>
+              <a:t>Base classes</a:t>
+            </a:r>
+          </a:p>
+          <a:p>
+            <a:pPr lvl="0"/>
+            <a:r>
+              <a:rPr lang="en-US" sz="1200" kern="1200" dirty="0" smtClean="0">
+                <a:solidFill>
+                  <a:schemeClr val="tx1"/>
+                </a:solidFill>
+                <a:effectLst/>
+                <a:latin typeface="+mn-lt"/>
+                <a:ea typeface="+mn-ea"/>
+                <a:cs typeface="+mn-cs"/>
+              </a:rPr>
+              <a:t>ORM interceptors </a:t>
+            </a:r>
+          </a:p>
+          <a:p>
+            <a:pPr lvl="0"/>
+            <a:r>
+              <a:rPr lang="en-US" sz="1200" kern="1200" dirty="0" smtClean="0">
+                <a:solidFill>
+                  <a:schemeClr val="tx1"/>
+                </a:solidFill>
+                <a:effectLst/>
+                <a:latin typeface="+mn-lt"/>
+                <a:ea typeface="+mn-ea"/>
+                <a:cs typeface="+mn-cs"/>
+              </a:rPr>
+              <a:t>SQL Server security </a:t>
+            </a:r>
+            <a:r>
+              <a:rPr lang="en-US" sz="1200" kern="1200" dirty="0" err="1" smtClean="0">
+                <a:solidFill>
+                  <a:schemeClr val="tx1"/>
+                </a:solidFill>
+                <a:effectLst/>
+                <a:latin typeface="+mn-lt"/>
+                <a:ea typeface="+mn-ea"/>
+                <a:cs typeface="+mn-cs"/>
+              </a:rPr>
+              <a:t>policities</a:t>
+            </a:r>
+            <a:endParaRPr lang="en-US" sz="1200" kern="1200" dirty="0" smtClean="0">
+              <a:solidFill>
+                <a:schemeClr val="tx1"/>
+              </a:solidFill>
+              <a:effectLst/>
+              <a:latin typeface="+mn-lt"/>
+              <a:ea typeface="+mn-ea"/>
+              <a:cs typeface="+mn-cs"/>
+            </a:endParaRPr>
+          </a:p>
+          <a:p>
+            <a:pPr lvl="0"/>
+            <a:r>
+              <a:rPr lang="en-US" sz="1200" kern="1200" dirty="0" err="1" smtClean="0">
+                <a:solidFill>
+                  <a:schemeClr val="tx1"/>
+                </a:solidFill>
+                <a:effectLst/>
+                <a:latin typeface="+mn-lt"/>
+                <a:ea typeface="+mn-ea"/>
+                <a:cs typeface="+mn-cs"/>
+              </a:rPr>
+              <a:t>Etc</a:t>
+            </a:r>
+            <a:endParaRPr lang="en-US" sz="1200" kern="1200" dirty="0" smtClean="0">
+              <a:solidFill>
+                <a:schemeClr val="tx1"/>
+              </a:solidFill>
+              <a:effectLst/>
+              <a:latin typeface="+mn-lt"/>
+              <a:ea typeface="+mn-ea"/>
+              <a:cs typeface="+mn-cs"/>
+            </a:endParaRPr>
+          </a:p>
+          <a:p>
+            <a:r>
+              <a:rPr lang="en-US" sz="1200" kern="1200" dirty="0" smtClean="0">
+                <a:solidFill>
+                  <a:schemeClr val="tx1"/>
+                </a:solidFill>
+                <a:effectLst/>
+                <a:latin typeface="+mn-lt"/>
+                <a:ea typeface="+mn-ea"/>
+                <a:cs typeface="+mn-cs"/>
+              </a:rPr>
+              <a:t>Remember that if C# or MVC or your custom application framework don’t provide the hooks that you need, you can use </a:t>
+            </a:r>
+            <a:r>
+              <a:rPr lang="en-US" sz="1200" kern="1200" dirty="0" err="1" smtClean="0">
+                <a:solidFill>
+                  <a:schemeClr val="tx1"/>
+                </a:solidFill>
+                <a:effectLst/>
+                <a:latin typeface="+mn-lt"/>
+                <a:ea typeface="+mn-ea"/>
+                <a:cs typeface="+mn-cs"/>
+              </a:rPr>
+              <a:t>PostSharp</a:t>
+            </a:r>
+            <a:r>
+              <a:rPr lang="en-US" sz="1200" kern="1200" dirty="0" smtClean="0">
+                <a:solidFill>
+                  <a:schemeClr val="tx1"/>
+                </a:solidFill>
+                <a:effectLst/>
+                <a:latin typeface="+mn-lt"/>
+                <a:ea typeface="+mn-ea"/>
+                <a:cs typeface="+mn-cs"/>
+              </a:rPr>
+              <a:t> to create you own. It’s specifically designed to handle cross cutting concerns and is well worth your time to research.</a:t>
+            </a:r>
+          </a:p>
+          <a:p>
+            <a:r>
+              <a:rPr lang="en-US" sz="1200" kern="1200" dirty="0" smtClean="0">
+                <a:solidFill>
+                  <a:schemeClr val="tx1"/>
+                </a:solidFill>
+                <a:effectLst/>
+                <a:latin typeface="+mn-lt"/>
+                <a:ea typeface="+mn-ea"/>
+                <a:cs typeface="+mn-cs"/>
+              </a:rPr>
+              <a:t>The holy grail of course is to make features “secure by default” by completely handling the security requirements in a global way. Sometimes though you’ll still need to do </a:t>
+            </a:r>
+            <a:r>
+              <a:rPr lang="en-US" sz="1200" i="1" kern="1200" dirty="0" smtClean="0">
+                <a:solidFill>
+                  <a:schemeClr val="tx1"/>
+                </a:solidFill>
+                <a:effectLst/>
+                <a:latin typeface="+mn-lt"/>
+                <a:ea typeface="+mn-ea"/>
+                <a:cs typeface="+mn-cs"/>
+              </a:rPr>
+              <a:t>something on</a:t>
+            </a:r>
+            <a:r>
+              <a:rPr lang="en-US" sz="1200" kern="1200" dirty="0" smtClean="0">
+                <a:solidFill>
+                  <a:schemeClr val="tx1"/>
+                </a:solidFill>
+                <a:effectLst/>
+                <a:latin typeface="+mn-lt"/>
+                <a:ea typeface="+mn-ea"/>
+                <a:cs typeface="+mn-cs"/>
+              </a:rPr>
+              <a:t> a per-feature basis. The best way to do that is to use some sort of attribute or marker interface to declaratively specify what rules should be applied, and them implement those rules in a consistent part of the processing pipeline. </a:t>
+            </a:r>
+          </a:p>
+          <a:p>
+            <a:r>
+              <a:rPr lang="en-US" sz="1200" kern="1200" dirty="0" smtClean="0">
+                <a:solidFill>
+                  <a:schemeClr val="tx1"/>
+                </a:solidFill>
+                <a:effectLst/>
+                <a:latin typeface="+mn-lt"/>
+                <a:ea typeface="+mn-ea"/>
+                <a:cs typeface="+mn-cs"/>
+              </a:rPr>
+              <a:t>If you do that, then you can make your life easy for testers by using reflection to generate reports showing which areas or classes implement which security rules. This allows QA to better validate those rules with less effort than brute force, black-box testing. And for bonus points, use the Approval Tests library to further automate that sort of security audit.</a:t>
+            </a:r>
+          </a:p>
+          <a:p>
             <a:pPr marL="0" marR="0" indent="0" algn="l" defTabSz="914400" rtl="0" eaLnBrk="1" fontAlgn="auto" latinLnBrk="0" hangingPunct="1">
               <a:lnSpc>
                 <a:spcPct val="100000"/>
@@ -10415,6 +14046,168 @@
         <p:txBody>
           <a:bodyPr/>
           <a:lstStyle/>
+          <a:p>
+            <a:r>
+              <a:rPr lang="en-US" sz="1200" kern="1200" dirty="0" smtClean="0">
+                <a:solidFill>
+                  <a:schemeClr val="tx1"/>
+                </a:solidFill>
+                <a:effectLst/>
+                <a:latin typeface="+mn-lt"/>
+                <a:ea typeface="+mn-ea"/>
+                <a:cs typeface="+mn-cs"/>
+              </a:rPr>
+              <a:t>My examples of those concepts are in my sample app, which you can get from this link here. This </a:t>
+            </a:r>
+            <a:r>
+              <a:rPr lang="en-US" sz="1200" kern="1200" dirty="0" err="1" smtClean="0">
+                <a:solidFill>
+                  <a:schemeClr val="tx1"/>
+                </a:solidFill>
+                <a:effectLst/>
+                <a:latin typeface="+mn-lt"/>
+                <a:ea typeface="+mn-ea"/>
+                <a:cs typeface="+mn-cs"/>
+              </a:rPr>
+              <a:t>github</a:t>
+            </a:r>
+            <a:r>
+              <a:rPr lang="en-US" sz="1200" kern="1200" dirty="0" smtClean="0">
+                <a:solidFill>
+                  <a:schemeClr val="tx1"/>
+                </a:solidFill>
+                <a:effectLst/>
+                <a:latin typeface="+mn-lt"/>
+                <a:ea typeface="+mn-ea"/>
+                <a:cs typeface="+mn-cs"/>
+              </a:rPr>
+              <a:t> repo contains my slide deck, my speaker notes, and a fully functional sample of everything I showed you today including:</a:t>
+            </a:r>
+          </a:p>
+          <a:p>
+            <a:pPr lvl="0"/>
+            <a:r>
+              <a:rPr lang="en-US" sz="1200" kern="1200" dirty="0" smtClean="0">
+                <a:solidFill>
+                  <a:schemeClr val="tx1"/>
+                </a:solidFill>
+                <a:effectLst/>
+                <a:latin typeface="+mn-lt"/>
+                <a:ea typeface="+mn-ea"/>
+                <a:cs typeface="+mn-cs"/>
+              </a:rPr>
+              <a:t>Global CSRF defense</a:t>
+            </a:r>
+          </a:p>
+          <a:p>
+            <a:pPr lvl="0"/>
+            <a:r>
+              <a:rPr lang="en-US" sz="1200" kern="1200" dirty="0" smtClean="0">
+                <a:solidFill>
+                  <a:schemeClr val="tx1"/>
+                </a:solidFill>
+                <a:effectLst/>
+                <a:latin typeface="+mn-lt"/>
+                <a:ea typeface="+mn-ea"/>
+                <a:cs typeface="+mn-cs"/>
+              </a:rPr>
+              <a:t>MVC authentication that makes actions private, unless explicitly made public</a:t>
+            </a:r>
+          </a:p>
+          <a:p>
+            <a:pPr lvl="0"/>
+            <a:r>
+              <a:rPr lang="en-US" sz="1200" kern="1200" dirty="0" smtClean="0">
+                <a:solidFill>
+                  <a:schemeClr val="tx1"/>
+                </a:solidFill>
+                <a:effectLst/>
+                <a:latin typeface="+mn-lt"/>
+                <a:ea typeface="+mn-ea"/>
+                <a:cs typeface="+mn-cs"/>
+              </a:rPr>
+              <a:t>Row level security using SQL Server 2016 and Entity Framework</a:t>
+            </a:r>
+          </a:p>
+          <a:p>
+            <a:pPr lvl="0"/>
+            <a:r>
+              <a:rPr lang="en-US" sz="1200" kern="1200" dirty="0" smtClean="0">
+                <a:solidFill>
+                  <a:schemeClr val="tx1"/>
+                </a:solidFill>
+                <a:effectLst/>
+                <a:latin typeface="+mn-lt"/>
+                <a:ea typeface="+mn-ea"/>
+                <a:cs typeface="+mn-cs"/>
+              </a:rPr>
+              <a:t>Permission-based authorization at both the MVC action level, and on specific C# properties using </a:t>
+            </a:r>
+            <a:r>
+              <a:rPr lang="en-US" sz="1200" kern="1200" dirty="0" err="1" smtClean="0">
+                <a:solidFill>
+                  <a:schemeClr val="tx1"/>
+                </a:solidFill>
+                <a:effectLst/>
+                <a:latin typeface="+mn-lt"/>
+                <a:ea typeface="+mn-ea"/>
+                <a:cs typeface="+mn-cs"/>
+              </a:rPr>
+              <a:t>PostSharp</a:t>
+            </a:r>
+            <a:endParaRPr lang="en-US" sz="1200" kern="1200" dirty="0" smtClean="0">
+              <a:solidFill>
+                <a:schemeClr val="tx1"/>
+              </a:solidFill>
+              <a:effectLst/>
+              <a:latin typeface="+mn-lt"/>
+              <a:ea typeface="+mn-ea"/>
+              <a:cs typeface="+mn-cs"/>
+            </a:endParaRPr>
+          </a:p>
+          <a:p>
+            <a:pPr lvl="0"/>
+            <a:r>
+              <a:rPr lang="en-US" sz="1200" kern="1200" dirty="0" smtClean="0">
+                <a:solidFill>
+                  <a:schemeClr val="tx1"/>
+                </a:solidFill>
+                <a:effectLst/>
+                <a:latin typeface="+mn-lt"/>
+                <a:ea typeface="+mn-ea"/>
+                <a:cs typeface="+mn-cs"/>
+              </a:rPr>
+              <a:t>Auditing using reflection and the Approval Tests library</a:t>
+            </a:r>
+          </a:p>
+          <a:p>
+            <a:r>
+              <a:rPr lang="en-US" sz="1200" kern="1200" dirty="0" smtClean="0">
+                <a:solidFill>
+                  <a:schemeClr val="tx1"/>
+                </a:solidFill>
+                <a:effectLst/>
+                <a:latin typeface="+mn-lt"/>
+                <a:ea typeface="+mn-ea"/>
+                <a:cs typeface="+mn-cs"/>
+              </a:rPr>
+              <a:t>You can get ahold of me through GitHub, my blog, or on Twitter. I’d love to hear from you, and feel free to send a pull request if you add a technique of your own.</a:t>
+            </a:r>
+          </a:p>
+          <a:p>
+            <a:r>
+              <a:rPr lang="en-US" sz="1200" kern="1200" smtClean="0">
+                <a:solidFill>
+                  <a:schemeClr val="tx1"/>
+                </a:solidFill>
+                <a:effectLst/>
+                <a:latin typeface="+mn-lt"/>
+                <a:ea typeface="+mn-ea"/>
+                <a:cs typeface="+mn-cs"/>
+              </a:rPr>
+              <a:t>Thank you so much!</a:t>
+            </a:r>
+          </a:p>
           <a:p>
             <a:endParaRPr lang="en-US" b="0" dirty="0" smtClean="0"/>
           </a:p>

</xml_diff>

<commit_message>
I don't even know any more
</commit_message>
<xml_diff>
--- a/Secure Systems - CodeMash 2017.pptx
+++ b/Secure Systems - CodeMash 2017.pptx
@@ -2885,7 +2885,7 @@
                 <a:ea typeface="+mn-ea"/>
                 <a:cs typeface="+mn-cs"/>
               </a:rPr>
-              <a:t>Not proud of it, but when building a feature and elbow deep in complex business logic or functional requirements, I don’t want to think about security. </a:t>
+              <a:t>NOT PROD of it, but when building a feature and elbow deep in complex business logic or functional requirements, I don’t want to think about security. </a:t>
             </a:r>
           </a:p>
           <a:p>
@@ -2910,7 +2910,31 @@
                 <a:ea typeface="+mn-ea"/>
                 <a:cs typeface="+mn-cs"/>
               </a:rPr>
-              <a:t>Want to be totally focused on biz problem, but ever-present security issues keep stealing focus. </a:t>
+              <a:t>Want to be TOTALLY</a:t>
+            </a:r>
+            <a:r>
+              <a:rPr lang="en-US" sz="1200" kern="1200" baseline="0" dirty="0" smtClean="0">
+                <a:solidFill>
+                  <a:schemeClr val="tx1"/>
+                </a:solidFill>
+                <a:effectLst/>
+                <a:latin typeface="+mn-lt"/>
+                <a:ea typeface="+mn-ea"/>
+                <a:cs typeface="+mn-cs"/>
+              </a:rPr>
+              <a:t> FOCUSED </a:t>
+            </a:r>
+            <a:r>
+              <a:rPr lang="en-US" sz="1200" kern="1200" dirty="0" smtClean="0">
+                <a:solidFill>
+                  <a:schemeClr val="tx1"/>
+                </a:solidFill>
+                <a:effectLst/>
+                <a:latin typeface="+mn-lt"/>
+                <a:ea typeface="+mn-ea"/>
+                <a:cs typeface="+mn-cs"/>
+              </a:rPr>
+              <a:t>on biz problem, but ever-present security issues keep stealing focus. </a:t>
             </a:r>
           </a:p>
           <a:p>
@@ -14196,7 +14220,7 @@
           </a:p>
           <a:p>
             <a:r>
-              <a:rPr lang="en-US" sz="1200" kern="1200" smtClean="0">
+              <a:rPr lang="en-US" sz="1200" kern="1200" dirty="0" smtClean="0">
                 <a:solidFill>
                   <a:schemeClr val="tx1"/>
                 </a:solidFill>

</xml_diff>

<commit_message>
Shortened some notes in PPT
</commit_message>
<xml_diff>
--- a/Secure Systems - CodeMash 2017.pptx
+++ b/Secure Systems - CodeMash 2017.pptx
@@ -748,6 +748,54 @@
             </a:r>
           </a:p>
           <a:p>
+            <a:r>
+              <a:rPr lang="en-US" sz="1200" kern="1200" dirty="0" err="1" smtClean="0">
+                <a:solidFill>
+                  <a:schemeClr val="tx1"/>
+                </a:solidFill>
+                <a:effectLst/>
+                <a:latin typeface="+mn-lt"/>
+                <a:ea typeface="+mn-ea"/>
+                <a:cs typeface="+mn-cs"/>
+              </a:rPr>
+              <a:t>ASP.Net</a:t>
+            </a:r>
+            <a:r>
+              <a:rPr lang="en-US" sz="1200" kern="1200" dirty="0" smtClean="0">
+                <a:solidFill>
+                  <a:schemeClr val="tx1"/>
+                </a:solidFill>
+                <a:effectLst/>
+                <a:latin typeface="+mn-lt"/>
+                <a:ea typeface="+mn-ea"/>
+                <a:cs typeface="+mn-cs"/>
+              </a:rPr>
+              <a:t> HTTP MODULES</a:t>
+            </a:r>
+            <a:r>
+              <a:rPr lang="en-US" sz="1200" kern="1200" baseline="0" dirty="0" smtClean="0">
+                <a:solidFill>
+                  <a:schemeClr val="tx1"/>
+                </a:solidFill>
+                <a:effectLst/>
+                <a:latin typeface="+mn-lt"/>
+                <a:ea typeface="+mn-ea"/>
+                <a:cs typeface="+mn-cs"/>
+              </a:rPr>
+              <a:t> let </a:t>
+            </a:r>
+            <a:r>
+              <a:rPr lang="en-US" sz="1200" kern="1200" baseline="0" dirty="0" smtClean="0">
+                <a:solidFill>
+                  <a:schemeClr val="tx1"/>
+                </a:solidFill>
+                <a:effectLst/>
+                <a:latin typeface="+mn-lt"/>
+                <a:ea typeface="+mn-ea"/>
+                <a:cs typeface="+mn-cs"/>
+              </a:rPr>
+              <a:t>you tap into the entire ASPNET request pipeline</a:t>
+            </a:r>
             <a:endParaRPr lang="en-US" sz="1200" kern="1200" dirty="0" smtClean="0">
               <a:solidFill>
                 <a:schemeClr val="tx1"/>
@@ -760,6 +808,84 @@
           </a:p>
           <a:p>
             <a:r>
+              <a:rPr lang="en-US" sz="1200" kern="1200" dirty="0" smtClean="0">
+                <a:solidFill>
+                  <a:schemeClr val="tx1"/>
+                </a:solidFill>
+                <a:effectLst/>
+                <a:latin typeface="+mn-lt"/>
+                <a:ea typeface="+mn-ea"/>
+                <a:cs typeface="+mn-cs"/>
+              </a:rPr>
+              <a:t>jQuery </a:t>
+            </a:r>
+            <a:r>
+              <a:rPr lang="en-US" sz="1200" kern="1200" dirty="0" smtClean="0">
+                <a:solidFill>
+                  <a:schemeClr val="tx1"/>
+                </a:solidFill>
+                <a:effectLst/>
+                <a:latin typeface="+mn-lt"/>
+                <a:ea typeface="+mn-ea"/>
+                <a:cs typeface="+mn-cs"/>
+              </a:rPr>
+              <a:t>lets you tap into AJAX request pipeline using global event handlers.</a:t>
+            </a:r>
+          </a:p>
+          <a:p>
+            <a:r>
+              <a:rPr lang="en-US" sz="1200" kern="1200" dirty="0" smtClean="0">
+                <a:solidFill>
+                  <a:schemeClr val="tx1"/>
+                </a:solidFill>
+                <a:effectLst/>
+                <a:latin typeface="+mn-lt"/>
+                <a:ea typeface="+mn-ea"/>
+                <a:cs typeface="+mn-cs"/>
+              </a:rPr>
+              <a:t>ORMs </a:t>
+            </a:r>
+            <a:r>
+              <a:rPr lang="en-US" sz="1200" kern="1200" dirty="0" smtClean="0">
+                <a:solidFill>
+                  <a:schemeClr val="tx1"/>
+                </a:solidFill>
+                <a:effectLst/>
+                <a:latin typeface="+mn-lt"/>
+                <a:ea typeface="+mn-ea"/>
+                <a:cs typeface="+mn-cs"/>
+              </a:rPr>
+              <a:t>like EF &amp; NH let you run code whenever a database connection is opened or transaction begins.</a:t>
+            </a:r>
+          </a:p>
+          <a:p>
+            <a:r>
+              <a:rPr lang="en-US" sz="1200" kern="1200" dirty="0" smtClean="0">
+                <a:solidFill>
+                  <a:schemeClr val="tx1"/>
+                </a:solidFill>
+                <a:effectLst/>
+                <a:latin typeface="+mn-lt"/>
+                <a:ea typeface="+mn-ea"/>
+                <a:cs typeface="+mn-cs"/>
+              </a:rPr>
+              <a:t> </a:t>
+            </a:r>
+          </a:p>
+          <a:p>
+            <a:r>
+              <a:rPr lang="en-US" sz="1200" kern="1200" dirty="0" smtClean="0">
+                <a:solidFill>
+                  <a:schemeClr val="tx1"/>
+                </a:solidFill>
+                <a:effectLst/>
+                <a:latin typeface="+mn-lt"/>
+                <a:ea typeface="+mn-ea"/>
+                <a:cs typeface="+mn-cs"/>
+              </a:rPr>
+              <a:t>And if you need hook that doesn’t already exist, tools like </a:t>
+            </a:r>
+            <a:r>
               <a:rPr lang="en-US" sz="1200" kern="1200" dirty="0" err="1" smtClean="0">
                 <a:solidFill>
                   <a:schemeClr val="tx1"/>
@@ -769,32 +895,98 @@
                 <a:ea typeface="+mn-ea"/>
                 <a:cs typeface="+mn-cs"/>
               </a:rPr>
-              <a:t>ASP.Net</a:t>
-            </a:r>
-            <a:r>
-              <a:rPr lang="en-US" sz="1200" kern="1200" dirty="0" smtClean="0">
-                <a:solidFill>
-                  <a:schemeClr val="tx1"/>
-                </a:solidFill>
-                <a:effectLst/>
-                <a:latin typeface="+mn-lt"/>
-                <a:ea typeface="+mn-ea"/>
-                <a:cs typeface="+mn-cs"/>
-              </a:rPr>
-              <a:t> HTTP</a:t>
-            </a:r>
-            <a:r>
-              <a:rPr lang="en-US" sz="1200" kern="1200" baseline="0" dirty="0" smtClean="0">
-                <a:solidFill>
-                  <a:schemeClr val="tx1"/>
-                </a:solidFill>
-                <a:effectLst/>
-                <a:latin typeface="+mn-lt"/>
-                <a:ea typeface="+mn-ea"/>
-                <a:cs typeface="+mn-cs"/>
-              </a:rPr>
-              <a:t> Modules let you tap into the entire ASPNET request pipeline</a:t>
-            </a:r>
+              <a:t>PostSharp</a:t>
+            </a:r>
+            <a:r>
+              <a:rPr lang="en-US" sz="1200" kern="1200" dirty="0" smtClean="0">
+                <a:solidFill>
+                  <a:schemeClr val="tx1"/>
+                </a:solidFill>
+                <a:effectLst/>
+                <a:latin typeface="+mn-lt"/>
+                <a:ea typeface="+mn-ea"/>
+                <a:cs typeface="+mn-cs"/>
+              </a:rPr>
+              <a:t> let you create your own. We’ll talk about this in a bit.</a:t>
+            </a:r>
+          </a:p>
+          <a:p>
+            <a:r>
+              <a:rPr lang="en-US" sz="1200" kern="1200" dirty="0" smtClean="0">
+                <a:solidFill>
+                  <a:schemeClr val="tx1"/>
+                </a:solidFill>
+                <a:effectLst/>
+                <a:latin typeface="+mn-lt"/>
+                <a:ea typeface="+mn-ea"/>
+                <a:cs typeface="+mn-cs"/>
+              </a:rPr>
+              <a:t> </a:t>
+            </a:r>
+          </a:p>
+          <a:p>
+            <a:r>
+              <a:rPr lang="en-US" sz="1200" kern="1200" dirty="0" smtClean="0">
+                <a:solidFill>
+                  <a:schemeClr val="tx1"/>
+                </a:solidFill>
+                <a:effectLst/>
+                <a:latin typeface="+mn-lt"/>
+                <a:ea typeface="+mn-ea"/>
+                <a:cs typeface="+mn-cs"/>
+              </a:rPr>
+              <a:t>And of course, your </a:t>
+            </a:r>
+            <a:r>
+              <a:rPr lang="en-US" sz="1200" kern="1200" dirty="0" smtClean="0">
+                <a:solidFill>
+                  <a:schemeClr val="tx1"/>
+                </a:solidFill>
+                <a:effectLst/>
+                <a:latin typeface="+mn-lt"/>
+                <a:ea typeface="+mn-ea"/>
+                <a:cs typeface="+mn-cs"/>
+              </a:rPr>
+              <a:t>CUSTOM APPLICATION code </a:t>
+            </a:r>
+            <a:r>
+              <a:rPr lang="en-US" sz="1200" kern="1200" dirty="0" smtClean="0">
+                <a:solidFill>
+                  <a:schemeClr val="tx1"/>
+                </a:solidFill>
+                <a:effectLst/>
+                <a:latin typeface="+mn-lt"/>
+                <a:ea typeface="+mn-ea"/>
+                <a:cs typeface="+mn-cs"/>
+              </a:rPr>
+              <a:t>might provide </a:t>
+            </a:r>
+            <a:r>
+              <a:rPr lang="en-US" sz="1200" kern="1200" dirty="0" smtClean="0">
+                <a:solidFill>
+                  <a:schemeClr val="tx1"/>
+                </a:solidFill>
+                <a:effectLst/>
+                <a:latin typeface="+mn-lt"/>
+                <a:ea typeface="+mn-ea"/>
+                <a:cs typeface="+mn-cs"/>
+              </a:rPr>
+              <a:t>framework </a:t>
+            </a:r>
+            <a:r>
+              <a:rPr lang="en-US" sz="1200" kern="1200" dirty="0" smtClean="0">
+                <a:solidFill>
+                  <a:schemeClr val="tx1"/>
+                </a:solidFill>
+                <a:effectLst/>
+                <a:latin typeface="+mn-lt"/>
+                <a:ea typeface="+mn-ea"/>
+                <a:cs typeface="+mn-cs"/>
+              </a:rPr>
+              <a:t>level hooks. For instance, if you have some base class that everything derives from, then you can provide your extension points that make sense in your own system.</a:t>
+            </a:r>
+          </a:p>
+          <a:p>
             <a:endParaRPr lang="en-US" sz="1200" kern="1200" dirty="0" smtClean="0">
               <a:solidFill>
                 <a:schemeClr val="tx1"/>
@@ -806,161 +998,65 @@
             </a:endParaRPr>
           </a:p>
           <a:p>
-            <a:endParaRPr lang="en-US" sz="1200" kern="1200" dirty="0" smtClean="0">
-              <a:solidFill>
-                <a:schemeClr val="tx1"/>
-              </a:solidFill>
-              <a:effectLst/>
-              <a:latin typeface="+mn-lt"/>
-              <a:ea typeface="+mn-ea"/>
-              <a:cs typeface="+mn-cs"/>
-            </a:endParaRPr>
-          </a:p>
-          <a:p>
-            <a:r>
-              <a:rPr lang="en-US" sz="1200" kern="1200" dirty="0" smtClean="0">
-                <a:solidFill>
-                  <a:schemeClr val="tx1"/>
-                </a:solidFill>
-                <a:effectLst/>
-                <a:latin typeface="+mn-lt"/>
-                <a:ea typeface="+mn-ea"/>
-                <a:cs typeface="+mn-cs"/>
-              </a:rPr>
-              <a:t>jQuery lets you tap into AJAX request pipeline using global event handlers.</a:t>
-            </a:r>
-          </a:p>
-          <a:p>
-            <a:r>
-              <a:rPr lang="en-US" sz="1200" kern="1200" dirty="0" smtClean="0">
-                <a:solidFill>
-                  <a:schemeClr val="tx1"/>
-                </a:solidFill>
-                <a:effectLst/>
-                <a:latin typeface="+mn-lt"/>
-                <a:ea typeface="+mn-ea"/>
-                <a:cs typeface="+mn-cs"/>
-              </a:rPr>
-              <a:t> </a:t>
-            </a:r>
-          </a:p>
-          <a:p>
-            <a:r>
-              <a:rPr lang="en-US" sz="1200" kern="1200" dirty="0" smtClean="0">
-                <a:solidFill>
-                  <a:schemeClr val="tx1"/>
-                </a:solidFill>
-                <a:effectLst/>
-                <a:latin typeface="+mn-lt"/>
-                <a:ea typeface="+mn-ea"/>
-                <a:cs typeface="+mn-cs"/>
-              </a:rPr>
-              <a:t>ORMs like EF &amp; NH let you run code whenever a database connection is opened or transaction begins.</a:t>
-            </a:r>
-          </a:p>
-          <a:p>
-            <a:r>
-              <a:rPr lang="en-US" sz="1200" kern="1200" dirty="0" smtClean="0">
-                <a:solidFill>
-                  <a:schemeClr val="tx1"/>
-                </a:solidFill>
-                <a:effectLst/>
-                <a:latin typeface="+mn-lt"/>
-                <a:ea typeface="+mn-ea"/>
-                <a:cs typeface="+mn-cs"/>
-              </a:rPr>
-              <a:t> </a:t>
-            </a:r>
-          </a:p>
-          <a:p>
-            <a:r>
-              <a:rPr lang="en-US" sz="1200" kern="1200" dirty="0" smtClean="0">
-                <a:solidFill>
-                  <a:schemeClr val="tx1"/>
-                </a:solidFill>
-                <a:effectLst/>
-                <a:latin typeface="+mn-lt"/>
-                <a:ea typeface="+mn-ea"/>
-                <a:cs typeface="+mn-cs"/>
-              </a:rPr>
-              <a:t>And if you need hook that doesn’t already exist, tools like </a:t>
-            </a:r>
-            <a:r>
-              <a:rPr lang="en-US" sz="1200" kern="1200" dirty="0" err="1" smtClean="0">
-                <a:solidFill>
-                  <a:schemeClr val="tx1"/>
-                </a:solidFill>
-                <a:effectLst/>
-                <a:latin typeface="+mn-lt"/>
-                <a:ea typeface="+mn-ea"/>
-                <a:cs typeface="+mn-cs"/>
-              </a:rPr>
-              <a:t>PostSharp</a:t>
-            </a:r>
-            <a:r>
-              <a:rPr lang="en-US" sz="1200" kern="1200" dirty="0" smtClean="0">
-                <a:solidFill>
-                  <a:schemeClr val="tx1"/>
-                </a:solidFill>
-                <a:effectLst/>
-                <a:latin typeface="+mn-lt"/>
-                <a:ea typeface="+mn-ea"/>
-                <a:cs typeface="+mn-cs"/>
-              </a:rPr>
-              <a:t> let you create your own. We’ll talk about this in a bit.</a:t>
-            </a:r>
-          </a:p>
-          <a:p>
-            <a:r>
-              <a:rPr lang="en-US" sz="1200" kern="1200" dirty="0" smtClean="0">
-                <a:solidFill>
-                  <a:schemeClr val="tx1"/>
-                </a:solidFill>
-                <a:effectLst/>
-                <a:latin typeface="+mn-lt"/>
-                <a:ea typeface="+mn-ea"/>
-                <a:cs typeface="+mn-cs"/>
-              </a:rPr>
-              <a:t> </a:t>
-            </a:r>
-          </a:p>
-          <a:p>
-            <a:r>
-              <a:rPr lang="en-US" sz="1200" kern="1200" dirty="0" smtClean="0">
-                <a:solidFill>
-                  <a:schemeClr val="tx1"/>
-                </a:solidFill>
-                <a:effectLst/>
-                <a:latin typeface="+mn-lt"/>
-                <a:ea typeface="+mn-ea"/>
-                <a:cs typeface="+mn-cs"/>
-              </a:rPr>
-              <a:t>And of course, your custom application code might provide own framework level hooks. For instance, if you have some base class that everything derives from, then you can provide your extension points that make sense in your own system.</a:t>
-            </a:r>
-          </a:p>
-          <a:p>
-            <a:endParaRPr lang="en-US" sz="1200" kern="1200" dirty="0" smtClean="0">
-              <a:solidFill>
-                <a:schemeClr val="tx1"/>
-              </a:solidFill>
-              <a:effectLst/>
-              <a:latin typeface="+mn-lt"/>
-              <a:ea typeface="+mn-ea"/>
-              <a:cs typeface="+mn-cs"/>
-            </a:endParaRPr>
-          </a:p>
-          <a:p>
-            <a:r>
-              <a:rPr lang="en-US" sz="1200" kern="1200" dirty="0" smtClean="0">
-                <a:solidFill>
-                  <a:schemeClr val="tx1"/>
-                </a:solidFill>
-                <a:effectLst/>
-                <a:latin typeface="+mn-lt"/>
-                <a:ea typeface="+mn-ea"/>
-                <a:cs typeface="+mn-cs"/>
-              </a:rPr>
-              <a:t>Basically, when I say “framework code”, I’m referring to something that you write that gets executed automatically by some underlying system, as opposed to the specific feature-level code you write at the top of your stack.</a:t>
+            <a:r>
+              <a:rPr lang="en-US" sz="1200" kern="1200" dirty="0" smtClean="0">
+                <a:solidFill>
+                  <a:schemeClr val="tx1"/>
+                </a:solidFill>
+                <a:effectLst/>
+                <a:latin typeface="+mn-lt"/>
+                <a:ea typeface="+mn-ea"/>
+                <a:cs typeface="+mn-cs"/>
+              </a:rPr>
+              <a:t>Basically, when I say “framework code”, I’m referring to something that you write that gets </a:t>
+            </a:r>
+            <a:r>
+              <a:rPr lang="en-US" sz="1200" kern="1200" dirty="0" smtClean="0">
+                <a:solidFill>
+                  <a:schemeClr val="tx1"/>
+                </a:solidFill>
+                <a:effectLst/>
+                <a:latin typeface="+mn-lt"/>
+                <a:ea typeface="+mn-ea"/>
+                <a:cs typeface="+mn-cs"/>
+              </a:rPr>
+              <a:t>EXECUTED</a:t>
+            </a:r>
+            <a:r>
+              <a:rPr lang="en-US" sz="1200" kern="1200" baseline="0" dirty="0" smtClean="0">
+                <a:solidFill>
+                  <a:schemeClr val="tx1"/>
+                </a:solidFill>
+                <a:effectLst/>
+                <a:latin typeface="+mn-lt"/>
+                <a:ea typeface="+mn-ea"/>
+                <a:cs typeface="+mn-cs"/>
+              </a:rPr>
+              <a:t> AUTOMATICALLY </a:t>
+            </a:r>
+            <a:r>
+              <a:rPr lang="en-US" sz="1200" kern="1200" dirty="0" smtClean="0">
+                <a:solidFill>
+                  <a:schemeClr val="tx1"/>
+                </a:solidFill>
+                <a:effectLst/>
+                <a:latin typeface="+mn-lt"/>
+                <a:ea typeface="+mn-ea"/>
+                <a:cs typeface="+mn-cs"/>
+              </a:rPr>
+              <a:t>by </a:t>
+            </a:r>
+            <a:r>
+              <a:rPr lang="en-US" sz="1200" kern="1200" dirty="0" smtClean="0">
+                <a:solidFill>
+                  <a:schemeClr val="tx1"/>
+                </a:solidFill>
+                <a:effectLst/>
+                <a:latin typeface="+mn-lt"/>
+                <a:ea typeface="+mn-ea"/>
+                <a:cs typeface="+mn-cs"/>
+              </a:rPr>
+              <a:t>some underlying system, as opposed to the specific feature-level code you write at the top of your stack.</a:t>
             </a:r>
             <a:endParaRPr lang="en-US" sz="1200" kern="1200" dirty="0">
               <a:solidFill>
@@ -8175,7 +8271,31 @@
                 <a:ea typeface="+mn-ea"/>
                 <a:cs typeface="+mn-cs"/>
               </a:rPr>
-              <a:t>If you can avoid it, I’d recommend NOT having the insecure versions at all. But if you </a:t>
+              <a:t>If you can avoid it, </a:t>
+            </a:r>
+            <a:r>
+              <a:rPr lang="en-US" sz="1200" kern="1200" dirty="0" smtClean="0">
+                <a:solidFill>
+                  <a:schemeClr val="tx1"/>
+                </a:solidFill>
+                <a:effectLst/>
+                <a:latin typeface="+mn-lt"/>
+                <a:ea typeface="+mn-ea"/>
+                <a:cs typeface="+mn-cs"/>
+              </a:rPr>
+              <a:t>I </a:t>
+            </a:r>
+            <a:r>
+              <a:rPr lang="en-US" sz="1200" kern="1200" dirty="0" smtClean="0">
+                <a:solidFill>
+                  <a:schemeClr val="tx1"/>
+                </a:solidFill>
+                <a:effectLst/>
+                <a:latin typeface="+mn-lt"/>
+                <a:ea typeface="+mn-ea"/>
+                <a:cs typeface="+mn-cs"/>
+              </a:rPr>
+              <a:t>recommend NOT having the insecure versions at all. But if you </a:t>
             </a:r>
             <a:r>
               <a:rPr lang="en-US" sz="1200" i="1" kern="1200" dirty="0" smtClean="0">
@@ -8199,10 +8319,20 @@
                 <a:ea typeface="+mn-ea"/>
                 <a:cs typeface="+mn-cs"/>
               </a:rPr>
-              <a:t>have to provide two versions of your data access methods, I recommend a naming convention like you see here.</a:t>
-            </a:r>
-          </a:p>
-          <a:p>
+              <a:t>have to provide two versions of your data access methods, I recommend a naming convention </a:t>
+            </a:r>
+            <a:r>
+              <a:rPr lang="en-US" sz="1200" kern="1200" dirty="0" smtClean="0">
+                <a:solidFill>
+                  <a:schemeClr val="tx1"/>
+                </a:solidFill>
+                <a:effectLst/>
+                <a:latin typeface="+mn-lt"/>
+                <a:ea typeface="+mn-ea"/>
+                <a:cs typeface="+mn-cs"/>
+              </a:rPr>
+              <a:t>that reminds developers of their obligations.</a:t>
+            </a:r>
             <a:endParaRPr lang="en-US" sz="1200" kern="1200" dirty="0" smtClean="0">
               <a:solidFill>
                 <a:schemeClr val="tx1"/>
@@ -8214,20 +8344,23 @@
             </a:endParaRPr>
           </a:p>
           <a:p>
-            <a:r>
-              <a:rPr lang="en-US" sz="1200" kern="1200" dirty="0" smtClean="0">
-                <a:solidFill>
-                  <a:schemeClr val="tx1"/>
-                </a:solidFill>
-                <a:effectLst/>
-                <a:latin typeface="+mn-lt"/>
-                <a:ea typeface="+mn-ea"/>
-                <a:cs typeface="+mn-cs"/>
-              </a:rPr>
-              <a:t>In this case, I’ve added the suffix “Insecure” to the methods that do NOT do any access control. The idea here is to remind programmers of their obligations when calling these methods.</a:t>
-            </a:r>
-          </a:p>
-          <a:p>
+            <a:pPr marL="0" marR="0" lvl="0" indent="0" algn="l" defTabSz="914400" rtl="0" eaLnBrk="1" fontAlgn="auto" latinLnBrk="0" hangingPunct="1">
+              <a:lnSpc>
+                <a:spcPct val="100000"/>
+              </a:lnSpc>
+              <a:spcBef>
+                <a:spcPts val="0"/>
+              </a:spcBef>
+              <a:spcAft>
+                <a:spcPts val="0"/>
+              </a:spcAft>
+              <a:buClrTx/>
+              <a:buSzTx/>
+              <a:buFontTx/>
+              <a:buNone/>
+              <a:tabLst/>
+              <a:defRPr/>
+            </a:pPr>
             <a:endParaRPr lang="en-US" sz="1200" kern="1200" dirty="0" smtClean="0">
               <a:solidFill>
                 <a:schemeClr val="tx1"/>
@@ -8239,6 +8372,23 @@
             </a:endParaRPr>
           </a:p>
           <a:p>
+            <a:pPr marL="0" marR="0" lvl="0" indent="0" algn="l" defTabSz="914400" rtl="0" eaLnBrk="1" fontAlgn="auto" latinLnBrk="0" hangingPunct="1">
+              <a:lnSpc>
+                <a:spcPct val="100000"/>
+              </a:lnSpc>
+              <a:spcBef>
+                <a:spcPts val="0"/>
+              </a:spcBef>
+              <a:spcAft>
+                <a:spcPts val="0"/>
+              </a:spcAft>
+              <a:buClrTx/>
+              <a:buSzTx/>
+              <a:buFontTx/>
+              <a:buNone/>
+              <a:tabLst/>
+              <a:defRPr/>
+            </a:pPr>
             <a:r>
               <a:rPr lang="en-US" sz="1200" kern="1200" dirty="0" smtClean="0">
                 <a:solidFill>
@@ -8273,7 +8423,7 @@
                 <a:ea typeface="+mn-ea"/>
                 <a:cs typeface="+mn-cs"/>
               </a:rPr>
-              <a:t>”, it isn’t explicitly obvious whether or not access control is being handled. But if I type “</a:t>
+              <a:t>”, nothing tells me whether or </a:t>
             </a:r>
             <a:r>
               <a:rPr lang="en-US" sz="1200" kern="1200" dirty="0" err="1" smtClean="0">
@@ -8285,34 +8435,39 @@
                 <a:ea typeface="+mn-ea"/>
                 <a:cs typeface="+mn-cs"/>
               </a:rPr>
-              <a:t>GetById</a:t>
-            </a:r>
-            <a:r>
-              <a:rPr lang="en-US" sz="1200" u="sng" kern="1200" dirty="0" err="1" smtClean="0">
-                <a:solidFill>
-                  <a:schemeClr val="tx1"/>
-                </a:solidFill>
-                <a:effectLst/>
-                <a:latin typeface="+mn-lt"/>
-                <a:ea typeface="+mn-ea"/>
-                <a:cs typeface="+mn-cs"/>
-              </a:rPr>
-              <a:t>Insecure</a:t>
-            </a:r>
-            <a:r>
-              <a:rPr lang="en-US" sz="1200" kern="1200" dirty="0" smtClean="0">
-                <a:solidFill>
-                  <a:schemeClr val="tx1"/>
-                </a:solidFill>
-                <a:effectLst/>
-                <a:latin typeface="+mn-lt"/>
-                <a:ea typeface="+mn-ea"/>
-                <a:cs typeface="+mn-cs"/>
-              </a:rPr>
-              <a:t>”, that’s a pretty clear reminder that I’m on the hook for security in my feature code.</a:t>
-            </a:r>
-          </a:p>
-          <a:p>
+              <a:t>or</a:t>
+            </a:r>
+            <a:r>
+              <a:rPr lang="en-US" sz="1200" kern="1200" dirty="0" smtClean="0">
+                <a:solidFill>
+                  <a:schemeClr val="tx1"/>
+                </a:solidFill>
+                <a:effectLst/>
+                <a:latin typeface="+mn-lt"/>
+                <a:ea typeface="+mn-ea"/>
+                <a:cs typeface="+mn-cs"/>
+              </a:rPr>
+              <a:t> not access control is being handled. </a:t>
+            </a:r>
+          </a:p>
+          <a:p>
+            <a:pPr marL="0" marR="0" lvl="0" indent="0" algn="l" defTabSz="914400" rtl="0" eaLnBrk="1" fontAlgn="auto" latinLnBrk="0" hangingPunct="1">
+              <a:lnSpc>
+                <a:spcPct val="100000"/>
+              </a:lnSpc>
+              <a:spcBef>
+                <a:spcPts val="0"/>
+              </a:spcBef>
+              <a:spcAft>
+                <a:spcPts val="0"/>
+              </a:spcAft>
+              <a:buClrTx/>
+              <a:buSzTx/>
+              <a:buFontTx/>
+              <a:buNone/>
+              <a:tabLst/>
+              <a:defRPr/>
+            </a:pPr>
             <a:endParaRPr lang="en-US" sz="1200" kern="1200" dirty="0" smtClean="0">
               <a:solidFill>
                 <a:schemeClr val="tx1"/>
@@ -8324,17 +8479,119 @@
             </a:endParaRPr>
           </a:p>
           <a:p>
-            <a:r>
-              <a:rPr lang="en-US" sz="1200" kern="1200" dirty="0" smtClean="0">
-                <a:solidFill>
-                  <a:schemeClr val="tx1"/>
-                </a:solidFill>
-                <a:effectLst/>
-                <a:latin typeface="+mn-lt"/>
-                <a:ea typeface="+mn-ea"/>
-                <a:cs typeface="+mn-cs"/>
-              </a:rPr>
-              <a:t>This approach is better than nothing, and it does push the access control logic down from the top level feature code and into the data access layer. But this is far from “secure by default”; the security code needs to be manually added to every data access method, and that can result in a lot of duplication. It can also result in a lot of inconsistency if each method implements those rules in a haphazard way.</a:t>
+            <a:pPr marL="0" marR="0" lvl="0" indent="0" algn="l" defTabSz="914400" rtl="0" eaLnBrk="1" fontAlgn="auto" latinLnBrk="0" hangingPunct="1">
+              <a:lnSpc>
+                <a:spcPct val="100000"/>
+              </a:lnSpc>
+              <a:spcBef>
+                <a:spcPts val="0"/>
+              </a:spcBef>
+              <a:spcAft>
+                <a:spcPts val="0"/>
+              </a:spcAft>
+              <a:buClrTx/>
+              <a:buSzTx/>
+              <a:buFontTx/>
+              <a:buNone/>
+              <a:tabLst/>
+              <a:defRPr/>
+            </a:pPr>
+            <a:r>
+              <a:rPr lang="en-US" sz="1200" kern="1200" dirty="0" smtClean="0">
+                <a:solidFill>
+                  <a:schemeClr val="tx1"/>
+                </a:solidFill>
+                <a:effectLst/>
+                <a:latin typeface="+mn-lt"/>
+                <a:ea typeface="+mn-ea"/>
+                <a:cs typeface="+mn-cs"/>
+              </a:rPr>
+              <a:t>But if I type “</a:t>
+            </a:r>
+            <a:r>
+              <a:rPr lang="en-US" sz="1200" kern="1200" dirty="0" err="1" smtClean="0">
+                <a:solidFill>
+                  <a:schemeClr val="tx1"/>
+                </a:solidFill>
+                <a:effectLst/>
+                <a:latin typeface="+mn-lt"/>
+                <a:ea typeface="+mn-ea"/>
+                <a:cs typeface="+mn-cs"/>
+              </a:rPr>
+              <a:t>GetById</a:t>
+            </a:r>
+            <a:r>
+              <a:rPr lang="en-US" sz="1200" u="sng" kern="1200" dirty="0" err="1" smtClean="0">
+                <a:solidFill>
+                  <a:schemeClr val="tx1"/>
+                </a:solidFill>
+                <a:effectLst/>
+                <a:latin typeface="+mn-lt"/>
+                <a:ea typeface="+mn-ea"/>
+                <a:cs typeface="+mn-cs"/>
+              </a:rPr>
+              <a:t>Insecure</a:t>
+            </a:r>
+            <a:r>
+              <a:rPr lang="en-US" sz="1200" kern="1200" dirty="0" smtClean="0">
+                <a:solidFill>
+                  <a:schemeClr val="tx1"/>
+                </a:solidFill>
+                <a:effectLst/>
+                <a:latin typeface="+mn-lt"/>
+                <a:ea typeface="+mn-ea"/>
+                <a:cs typeface="+mn-cs"/>
+              </a:rPr>
+              <a:t>”, that’s a pretty clear reminder that I’m on the hook for security in my feature code.</a:t>
+            </a:r>
+          </a:p>
+          <a:p>
+            <a:endParaRPr lang="en-US" sz="1200" kern="1200" dirty="0" smtClean="0">
+              <a:solidFill>
+                <a:schemeClr val="tx1"/>
+              </a:solidFill>
+              <a:effectLst/>
+              <a:latin typeface="+mn-lt"/>
+              <a:ea typeface="+mn-ea"/>
+              <a:cs typeface="+mn-cs"/>
+            </a:endParaRPr>
+          </a:p>
+          <a:p>
+            <a:r>
+              <a:rPr lang="en-US" sz="1200" kern="1200" dirty="0" smtClean="0">
+                <a:solidFill>
+                  <a:schemeClr val="tx1"/>
+                </a:solidFill>
+                <a:effectLst/>
+                <a:latin typeface="+mn-lt"/>
+                <a:ea typeface="+mn-ea"/>
+                <a:cs typeface="+mn-cs"/>
+              </a:rPr>
+              <a:t>This approach is better than nothing, and it does push the access control logic down from the top level feature code and into the data access layer. But this is </a:t>
+            </a:r>
+            <a:r>
+              <a:rPr lang="en-US" sz="1200" kern="1200" dirty="0" smtClean="0">
+                <a:solidFill>
+                  <a:schemeClr val="tx1"/>
+                </a:solidFill>
+                <a:effectLst/>
+                <a:latin typeface="+mn-lt"/>
+                <a:ea typeface="+mn-ea"/>
+                <a:cs typeface="+mn-cs"/>
+              </a:rPr>
+              <a:t>NOT SECURE BY DEFAULT; </a:t>
+            </a:r>
+            <a:r>
+              <a:rPr lang="en-US" sz="1200" kern="1200" dirty="0" smtClean="0">
+                <a:solidFill>
+                  <a:schemeClr val="tx1"/>
+                </a:solidFill>
+                <a:effectLst/>
+                <a:latin typeface="+mn-lt"/>
+                <a:ea typeface="+mn-ea"/>
+                <a:cs typeface="+mn-cs"/>
+              </a:rPr>
+              <a:t>the security code needs to be manually added to every data access method, and that can result in a lot of duplication. It can also result in a lot of inconsistency if each method implements those rules in a haphazard way.</a:t>
             </a:r>
             <a:endParaRPr lang="en-US" sz="1200" kern="1200" dirty="0">
               <a:solidFill>
@@ -8438,7 +8695,31 @@
                 <a:ea typeface="+mn-ea"/>
                 <a:cs typeface="+mn-cs"/>
               </a:rPr>
-              <a:t>Another way to handle access control is through a technique called Row Level Security. The idea here is that instead of filtering out data in our application code, we create a security policy </a:t>
+              <a:t>Another way to handle access control is through a technique called Row Level Security. </a:t>
+            </a:r>
+            <a:r>
+              <a:rPr lang="en-US" sz="1200" kern="1200" dirty="0" smtClean="0">
+                <a:solidFill>
+                  <a:schemeClr val="tx1"/>
+                </a:solidFill>
+                <a:effectLst/>
+                <a:latin typeface="+mn-lt"/>
+                <a:ea typeface="+mn-ea"/>
+                <a:cs typeface="+mn-cs"/>
+              </a:rPr>
+              <a:t>The </a:t>
+            </a:r>
+            <a:r>
+              <a:rPr lang="en-US" sz="1200" kern="1200" dirty="0" smtClean="0">
+                <a:solidFill>
+                  <a:schemeClr val="tx1"/>
+                </a:solidFill>
+                <a:effectLst/>
+                <a:latin typeface="+mn-lt"/>
+                <a:ea typeface="+mn-ea"/>
+                <a:cs typeface="+mn-cs"/>
+              </a:rPr>
+              <a:t>idea here is that instead of filtering out data in our application code, we create a security policy </a:t>
             </a:r>
             <a:r>
               <a:rPr lang="en-US" sz="1200" i="1" kern="1200" dirty="0" smtClean="0">
@@ -8758,10 +9039,104 @@
                 <a:ea typeface="+mn-ea"/>
                 <a:cs typeface="+mn-cs"/>
               </a:rPr>
-              <a:t>First, we need to create what’s called a predicate function. This function will get executed against each row of a result set containing Order records. If the function returns TRUE then the Order gets returned, and if it returns FALSE the order is not returned.</a:t>
-            </a:r>
-          </a:p>
-          <a:p>
+              <a:t>First, we need to create </a:t>
+            </a:r>
+            <a:r>
+              <a:rPr lang="en-US" sz="1200" kern="1200" dirty="0" smtClean="0">
+                <a:solidFill>
+                  <a:schemeClr val="tx1"/>
+                </a:solidFill>
+                <a:effectLst/>
+                <a:latin typeface="+mn-lt"/>
+                <a:ea typeface="+mn-ea"/>
+                <a:cs typeface="+mn-cs"/>
+              </a:rPr>
+              <a:t>predicate </a:t>
+            </a:r>
+            <a:r>
+              <a:rPr lang="en-US" sz="1200" kern="1200" dirty="0" smtClean="0">
+                <a:solidFill>
+                  <a:schemeClr val="tx1"/>
+                </a:solidFill>
+                <a:effectLst/>
+                <a:latin typeface="+mn-lt"/>
+                <a:ea typeface="+mn-ea"/>
+                <a:cs typeface="+mn-cs"/>
+              </a:rPr>
+              <a:t>function. This function will get executed against </a:t>
+            </a:r>
+            <a:r>
+              <a:rPr lang="en-US" sz="1200" kern="1200" dirty="0" smtClean="0">
+                <a:solidFill>
+                  <a:schemeClr val="tx1"/>
+                </a:solidFill>
+                <a:effectLst/>
+                <a:latin typeface="+mn-lt"/>
+                <a:ea typeface="+mn-ea"/>
+                <a:cs typeface="+mn-cs"/>
+              </a:rPr>
+              <a:t>EACH ROW of </a:t>
+            </a:r>
+            <a:r>
+              <a:rPr lang="en-US" sz="1200" kern="1200" dirty="0" smtClean="0">
+                <a:solidFill>
+                  <a:schemeClr val="tx1"/>
+                </a:solidFill>
+                <a:effectLst/>
+                <a:latin typeface="+mn-lt"/>
+                <a:ea typeface="+mn-ea"/>
+                <a:cs typeface="+mn-cs"/>
+              </a:rPr>
+              <a:t>a result set containing Order </a:t>
+            </a:r>
+            <a:r>
+              <a:rPr lang="en-US" sz="1200" kern="1200" dirty="0" smtClean="0">
+                <a:solidFill>
+                  <a:schemeClr val="tx1"/>
+                </a:solidFill>
+                <a:effectLst/>
+                <a:latin typeface="+mn-lt"/>
+                <a:ea typeface="+mn-ea"/>
+                <a:cs typeface="+mn-cs"/>
+              </a:rPr>
+              <a:t>records and controls</a:t>
+            </a:r>
+            <a:r>
+              <a:rPr lang="en-US" sz="1200" kern="1200" baseline="0" dirty="0" smtClean="0">
+                <a:solidFill>
+                  <a:schemeClr val="tx1"/>
+                </a:solidFill>
+                <a:effectLst/>
+                <a:latin typeface="+mn-lt"/>
+                <a:ea typeface="+mn-ea"/>
+                <a:cs typeface="+mn-cs"/>
+              </a:rPr>
+              <a:t> which of them get returned</a:t>
+            </a:r>
+            <a:r>
+              <a:rPr lang="en-US" sz="1200" kern="1200" dirty="0" smtClean="0">
+                <a:solidFill>
+                  <a:schemeClr val="tx1"/>
+                </a:solidFill>
+                <a:effectLst/>
+                <a:latin typeface="+mn-lt"/>
+                <a:ea typeface="+mn-ea"/>
+                <a:cs typeface="+mn-cs"/>
+              </a:rPr>
+              <a:t> to the application.</a:t>
+            </a:r>
+            <a:r>
+              <a:rPr lang="en-US" sz="1200" kern="1200" baseline="0" dirty="0" smtClean="0">
+                <a:solidFill>
+                  <a:schemeClr val="tx1"/>
+                </a:solidFill>
+                <a:effectLst/>
+                <a:latin typeface="+mn-lt"/>
+                <a:ea typeface="+mn-ea"/>
+                <a:cs typeface="+mn-cs"/>
+              </a:rPr>
+              <a:t> It's LIKE A LAMBDA that you might pass to a LINQ query to filter a result set.</a:t>
+            </a:r>
             <a:endParaRPr lang="en-US" sz="1200" kern="1200" dirty="0" smtClean="0">
               <a:solidFill>
                 <a:schemeClr val="tx1"/>
@@ -8773,20 +9148,6 @@
             </a:endParaRPr>
           </a:p>
           <a:p>
-            <a:r>
-              <a:rPr lang="en-US" sz="1200" kern="1200" dirty="0" smtClean="0">
-                <a:solidFill>
-                  <a:schemeClr val="tx1"/>
-                </a:solidFill>
-                <a:effectLst/>
-                <a:latin typeface="+mn-lt"/>
-                <a:ea typeface="+mn-ea"/>
-                <a:cs typeface="+mn-cs"/>
-              </a:rPr>
-              <a:t>The function assumes that the current user ID has been added to the session context. It accepts as input the user ID associated with an Order. </a:t>
-            </a:r>
-          </a:p>
-          <a:p>
             <a:endParaRPr lang="en-US" sz="1200" kern="1200" dirty="0" smtClean="0">
               <a:solidFill>
                 <a:schemeClr val="tx1"/>
@@ -8808,7 +9169,7 @@
                 <a:ea typeface="+mn-ea"/>
                 <a:cs typeface="+mn-cs"/>
               </a:rPr>
-              <a:t>If the user ID that’s passed in is equal to the value in the session context, then it means that the given order record is owned by the current user, and the function returns TRUE.</a:t>
+              <a:t>The function assumes that the current user ID has been added to the session context. It accepts as input the user ID associated with an Order. </a:t>
             </a:r>
           </a:p>
           <a:p>
@@ -8833,10 +9194,80 @@
                 <a:ea typeface="+mn-ea"/>
                 <a:cs typeface="+mn-cs"/>
               </a:rPr>
-              <a:t>If the user ID that’s passed in is NOT equal to the value in the session context, we do a permission lookup for the currently logged in user. If they are allowed to manage all orders, we return TRUE, and otherwise we return FALSE.</a:t>
-            </a:r>
-          </a:p>
-          <a:p>
+              <a:t>If the user ID that’s passed in is equal to the value in the session context, </a:t>
+            </a:r>
+            <a:r>
+              <a:rPr lang="en-US" sz="1200" kern="1200" dirty="0" smtClean="0">
+                <a:solidFill>
+                  <a:schemeClr val="tx1"/>
+                </a:solidFill>
+                <a:effectLst/>
+                <a:latin typeface="+mn-lt"/>
+                <a:ea typeface="+mn-ea"/>
+                <a:cs typeface="+mn-cs"/>
+              </a:rPr>
+              <a:t>user is viewing own order. If </a:t>
+            </a:r>
+            <a:r>
+              <a:rPr lang="en-US" sz="1200" kern="1200" dirty="0" smtClean="0">
+                <a:solidFill>
+                  <a:schemeClr val="tx1"/>
+                </a:solidFill>
+                <a:effectLst/>
+                <a:latin typeface="+mn-lt"/>
+                <a:ea typeface="+mn-ea"/>
+                <a:cs typeface="+mn-cs"/>
+              </a:rPr>
+              <a:t>the </a:t>
+            </a:r>
+            <a:r>
+              <a:rPr lang="en-US" sz="1200" kern="1200" dirty="0" smtClean="0">
+                <a:solidFill>
+                  <a:schemeClr val="tx1"/>
+                </a:solidFill>
+                <a:effectLst/>
+                <a:latin typeface="+mn-lt"/>
+                <a:ea typeface="+mn-ea"/>
+                <a:cs typeface="+mn-cs"/>
+              </a:rPr>
+              <a:t>ID that’s </a:t>
+            </a:r>
+            <a:r>
+              <a:rPr lang="en-US" sz="1200" kern="1200" dirty="0" smtClean="0">
+                <a:solidFill>
+                  <a:schemeClr val="tx1"/>
+                </a:solidFill>
+                <a:effectLst/>
+                <a:latin typeface="+mn-lt"/>
+                <a:ea typeface="+mn-ea"/>
+                <a:cs typeface="+mn-cs"/>
+              </a:rPr>
+              <a:t>passed in is NOT </a:t>
+            </a:r>
+            <a:r>
+              <a:rPr lang="en-US" sz="1200" kern="1200" dirty="0" smtClean="0">
+                <a:solidFill>
+                  <a:schemeClr val="tx1"/>
+                </a:solidFill>
+                <a:effectLst/>
+                <a:latin typeface="+mn-lt"/>
+                <a:ea typeface="+mn-ea"/>
+                <a:cs typeface="+mn-cs"/>
+              </a:rPr>
+              <a:t>EQUAL then</a:t>
+            </a:r>
+            <a:r>
+              <a:rPr lang="en-US" sz="1200" kern="1200" baseline="0" dirty="0" smtClean="0">
+                <a:solidFill>
+                  <a:schemeClr val="tx1"/>
+                </a:solidFill>
+                <a:effectLst/>
+                <a:latin typeface="+mn-lt"/>
+                <a:ea typeface="+mn-ea"/>
+                <a:cs typeface="+mn-cs"/>
+              </a:rPr>
+              <a:t> we do a perm check.</a:t>
+            </a:r>
             <a:endParaRPr lang="en-US" sz="1200" kern="1200" dirty="0" smtClean="0">
               <a:solidFill>
                 <a:schemeClr val="tx1"/>
@@ -8848,20 +9279,6 @@
             </a:endParaRPr>
           </a:p>
           <a:p>
-            <a:r>
-              <a:rPr lang="en-US" sz="1200" kern="1200" dirty="0" smtClean="0">
-                <a:solidFill>
-                  <a:schemeClr val="tx1"/>
-                </a:solidFill>
-                <a:effectLst/>
-                <a:latin typeface="+mn-lt"/>
-                <a:ea typeface="+mn-ea"/>
-                <a:cs typeface="+mn-cs"/>
-              </a:rPr>
-              <a:t>You can think of this like a lambda expression that you might pass into a LINQ query, it’s basically a filter function that is used to reduce a result set.</a:t>
-            </a:r>
-          </a:p>
-          <a:p>
             <a:endParaRPr lang="en-US" sz="1200" kern="1200" dirty="0" smtClean="0">
               <a:solidFill>
                 <a:schemeClr val="tx1"/>
@@ -8883,7 +9300,19 @@
                 <a:ea typeface="+mn-ea"/>
                 <a:cs typeface="+mn-cs"/>
               </a:rPr>
-              <a:t>There is one </a:t>
+              <a:t>There </a:t>
+            </a:r>
+            <a:r>
+              <a:rPr lang="en-US" sz="1200" kern="1200" dirty="0" smtClean="0">
+                <a:solidFill>
+                  <a:schemeClr val="tx1"/>
+                </a:solidFill>
+                <a:effectLst/>
+                <a:latin typeface="+mn-lt"/>
+                <a:ea typeface="+mn-ea"/>
+                <a:cs typeface="+mn-cs"/>
+              </a:rPr>
+              <a:t>is one </a:t>
             </a:r>
             <a:r>
               <a:rPr lang="en-US" sz="1200" kern="1200" dirty="0" err="1" smtClean="0">
@@ -11714,10 +12143,44 @@
                 <a:ea typeface="+mn-ea"/>
                 <a:cs typeface="+mn-cs"/>
               </a:rPr>
-              <a:t>to do: just put an attribute on the property, declare the necessary permission, and be done with it.</a:t>
-            </a:r>
-          </a:p>
-          <a:p>
+              <a:t>to do: just put an attribute on the property, declare </a:t>
+            </a:r>
+            <a:r>
+              <a:rPr lang="en-US" sz="1200" kern="1200" dirty="0" smtClean="0">
+                <a:solidFill>
+                  <a:schemeClr val="tx1"/>
+                </a:solidFill>
+                <a:effectLst/>
+                <a:latin typeface="+mn-lt"/>
+                <a:ea typeface="+mn-ea"/>
+                <a:cs typeface="+mn-cs"/>
+              </a:rPr>
+              <a:t>permission</a:t>
+            </a:r>
+            <a:r>
+              <a:rPr lang="en-US" sz="1200" kern="1200" dirty="0" smtClean="0">
+                <a:solidFill>
+                  <a:schemeClr val="tx1"/>
+                </a:solidFill>
+                <a:effectLst/>
+                <a:latin typeface="+mn-lt"/>
+                <a:ea typeface="+mn-ea"/>
+                <a:cs typeface="+mn-cs"/>
+              </a:rPr>
+              <a:t>, </a:t>
+            </a:r>
+            <a:r>
+              <a:rPr lang="en-US" sz="1200" kern="1200" dirty="0" smtClean="0">
+                <a:solidFill>
+                  <a:schemeClr val="tx1"/>
+                </a:solidFill>
+                <a:effectLst/>
+                <a:latin typeface="+mn-lt"/>
+                <a:ea typeface="+mn-ea"/>
+                <a:cs typeface="+mn-cs"/>
+              </a:rPr>
+              <a:t>&amp; be done.</a:t>
+            </a:r>
             <a:endParaRPr lang="en-US" sz="1200" kern="1200" dirty="0" smtClean="0">
               <a:solidFill>
                 <a:schemeClr val="tx1"/>
@@ -11729,20 +12192,6 @@
             </a:endParaRPr>
           </a:p>
           <a:p>
-            <a:r>
-              <a:rPr lang="en-US" sz="1200" kern="1200" dirty="0" smtClean="0">
-                <a:solidFill>
-                  <a:schemeClr val="tx1"/>
-                </a:solidFill>
-                <a:effectLst/>
-                <a:latin typeface="+mn-lt"/>
-                <a:ea typeface="+mn-ea"/>
-                <a:cs typeface="+mn-cs"/>
-              </a:rPr>
-              <a:t>If this worked, it would be awesome. There’s no reference in this class to my Application User object, which is a cleaner design, and it would be really easy to use this approach on multiple properties of multiple classes without duplicating any code.</a:t>
-            </a:r>
-          </a:p>
-          <a:p>
             <a:endParaRPr lang="en-US" sz="1200" kern="1200" dirty="0" smtClean="0">
               <a:solidFill>
                 <a:schemeClr val="tx1"/>
@@ -11764,34 +12213,104 @@
                 <a:ea typeface="+mn-ea"/>
                 <a:cs typeface="+mn-cs"/>
               </a:rPr>
-              <a:t>Unfortunately, this is easier said than done. Putting attributes on MVC actions is easy because the MVC framework provides specific hooks for those attributes to plug into. By default, however, .NET doesn’t provide any hooks for property access. There’s no way to </a:t>
-            </a:r>
-            <a:r>
-              <a:rPr lang="en-US" sz="1200" i="1" kern="1200" dirty="0" smtClean="0">
-                <a:solidFill>
-                  <a:schemeClr val="tx1"/>
-                </a:solidFill>
-                <a:effectLst/>
-                <a:latin typeface="+mn-lt"/>
-                <a:ea typeface="+mn-ea"/>
-                <a:cs typeface="+mn-cs"/>
-              </a:rPr>
-              <a:t>automatically </a:t>
-            </a:r>
-            <a:r>
-              <a:rPr lang="en-US" sz="1200" kern="1200" dirty="0" smtClean="0">
-                <a:solidFill>
-                  <a:schemeClr val="tx1"/>
-                </a:solidFill>
-                <a:effectLst/>
-                <a:latin typeface="+mn-lt"/>
-                <a:ea typeface="+mn-ea"/>
-                <a:cs typeface="+mn-cs"/>
-              </a:rPr>
-              <a:t>run this code whenever someone tries to read the SSN property.</a:t>
-            </a:r>
-          </a:p>
-          <a:p>
+              <a:t>If this worked, it would be awesome. </a:t>
+            </a:r>
+            <a:r>
+              <a:rPr lang="en-US" sz="1200" kern="1200" dirty="0" smtClean="0">
+                <a:solidFill>
+                  <a:schemeClr val="tx1"/>
+                </a:solidFill>
+                <a:effectLst/>
+                <a:latin typeface="+mn-lt"/>
+                <a:ea typeface="+mn-ea"/>
+                <a:cs typeface="+mn-cs"/>
+              </a:rPr>
+              <a:t>NO REF TO APP USER, </a:t>
+            </a:r>
+            <a:r>
+              <a:rPr lang="en-US" sz="1200" kern="1200" dirty="0" smtClean="0">
+                <a:solidFill>
+                  <a:schemeClr val="tx1"/>
+                </a:solidFill>
+                <a:effectLst/>
+                <a:latin typeface="+mn-lt"/>
+                <a:ea typeface="+mn-ea"/>
+                <a:cs typeface="+mn-cs"/>
+              </a:rPr>
+              <a:t>which is a cleaner design, </a:t>
+            </a:r>
+            <a:r>
+              <a:rPr lang="en-US" sz="1200" kern="1200" dirty="0" smtClean="0">
+                <a:solidFill>
+                  <a:schemeClr val="tx1"/>
+                </a:solidFill>
+                <a:effectLst/>
+                <a:latin typeface="+mn-lt"/>
+                <a:ea typeface="+mn-ea"/>
+                <a:cs typeface="+mn-cs"/>
+              </a:rPr>
+              <a:t>&amp; would </a:t>
+            </a:r>
+            <a:r>
+              <a:rPr lang="en-US" sz="1200" kern="1200" dirty="0" smtClean="0">
+                <a:solidFill>
+                  <a:schemeClr val="tx1"/>
+                </a:solidFill>
+                <a:effectLst/>
+                <a:latin typeface="+mn-lt"/>
+                <a:ea typeface="+mn-ea"/>
+                <a:cs typeface="+mn-cs"/>
+              </a:rPr>
+              <a:t>be </a:t>
+            </a:r>
+            <a:r>
+              <a:rPr lang="en-US" sz="1200" kern="1200" dirty="0" smtClean="0">
+                <a:solidFill>
+                  <a:schemeClr val="tx1"/>
+                </a:solidFill>
+                <a:effectLst/>
+                <a:latin typeface="+mn-lt"/>
+                <a:ea typeface="+mn-ea"/>
+                <a:cs typeface="+mn-cs"/>
+              </a:rPr>
+              <a:t>easy </a:t>
+            </a:r>
+            <a:r>
+              <a:rPr lang="en-US" sz="1200" kern="1200" dirty="0" smtClean="0">
+                <a:solidFill>
+                  <a:schemeClr val="tx1"/>
+                </a:solidFill>
+                <a:effectLst/>
+                <a:latin typeface="+mn-lt"/>
+                <a:ea typeface="+mn-ea"/>
+                <a:cs typeface="+mn-cs"/>
+              </a:rPr>
+              <a:t>to use this approach on </a:t>
+            </a:r>
+            <a:r>
+              <a:rPr lang="en-US" sz="1200" kern="1200" dirty="0" smtClean="0">
+                <a:solidFill>
+                  <a:schemeClr val="tx1"/>
+                </a:solidFill>
+                <a:effectLst/>
+                <a:latin typeface="+mn-lt"/>
+                <a:ea typeface="+mn-ea"/>
+                <a:cs typeface="+mn-cs"/>
+              </a:rPr>
+              <a:t>other properties w/out</a:t>
+            </a:r>
+            <a:r>
+              <a:rPr lang="en-US" sz="1200" kern="1200" baseline="0" dirty="0" smtClean="0">
+                <a:solidFill>
+                  <a:schemeClr val="tx1"/>
+                </a:solidFill>
+                <a:effectLst/>
+                <a:latin typeface="+mn-lt"/>
+                <a:ea typeface="+mn-ea"/>
+                <a:cs typeface="+mn-cs"/>
+              </a:rPr>
+              <a:t> duplication</a:t>
+            </a:r>
             <a:endParaRPr lang="en-US" sz="1200" kern="1200" dirty="0" smtClean="0">
               <a:solidFill>
                 <a:schemeClr val="tx1"/>
@@ -11803,68 +12322,6 @@
             </a:endParaRPr>
           </a:p>
           <a:p>
-            <a:r>
-              <a:rPr lang="en-US" sz="1200" kern="1200" dirty="0" smtClean="0">
-                <a:solidFill>
-                  <a:schemeClr val="tx1"/>
-                </a:solidFill>
-                <a:effectLst/>
-                <a:latin typeface="+mn-lt"/>
-                <a:ea typeface="+mn-ea"/>
-                <a:cs typeface="+mn-cs"/>
-              </a:rPr>
-              <a:t>Fortunately, we can use a really neat tool called </a:t>
-            </a:r>
-            <a:r>
-              <a:rPr lang="en-US" sz="1200" kern="1200" dirty="0" err="1" smtClean="0">
-                <a:solidFill>
-                  <a:schemeClr val="tx1"/>
-                </a:solidFill>
-                <a:effectLst/>
-                <a:latin typeface="+mn-lt"/>
-                <a:ea typeface="+mn-ea"/>
-                <a:cs typeface="+mn-cs"/>
-              </a:rPr>
-              <a:t>PostSharp</a:t>
-            </a:r>
-            <a:r>
-              <a:rPr lang="en-US" sz="1200" kern="1200" dirty="0" smtClean="0">
-                <a:solidFill>
-                  <a:schemeClr val="tx1"/>
-                </a:solidFill>
-                <a:effectLst/>
-                <a:latin typeface="+mn-lt"/>
-                <a:ea typeface="+mn-ea"/>
-                <a:cs typeface="+mn-cs"/>
-              </a:rPr>
-              <a:t> to </a:t>
-            </a:r>
-            <a:r>
-              <a:rPr lang="en-US" sz="1200" i="1" kern="1200" dirty="0" smtClean="0">
-                <a:solidFill>
-                  <a:schemeClr val="tx1"/>
-                </a:solidFill>
-                <a:effectLst/>
-                <a:latin typeface="+mn-lt"/>
-                <a:ea typeface="+mn-ea"/>
-                <a:cs typeface="+mn-cs"/>
-              </a:rPr>
-              <a:t>create </a:t>
-            </a:r>
-            <a:r>
-              <a:rPr lang="en-US" sz="1200" kern="1200" dirty="0" smtClean="0">
-                <a:solidFill>
-                  <a:schemeClr val="tx1"/>
-                </a:solidFill>
-                <a:effectLst/>
-                <a:latin typeface="+mn-lt"/>
-                <a:ea typeface="+mn-ea"/>
-                <a:cs typeface="+mn-cs"/>
-              </a:rPr>
-              <a:t>those hooks.</a:t>
-            </a:r>
-          </a:p>
-          <a:p>
             <a:endParaRPr lang="en-US" sz="1200" kern="1200" dirty="0" smtClean="0">
               <a:solidFill>
                 <a:schemeClr val="tx1"/>
@@ -11877,6 +12334,163 @@
           </a:p>
           <a:p>
             <a:r>
+              <a:rPr lang="en-US" sz="1200" kern="1200" dirty="0" smtClean="0">
+                <a:solidFill>
+                  <a:schemeClr val="tx1"/>
+                </a:solidFill>
+                <a:effectLst/>
+                <a:latin typeface="+mn-lt"/>
+                <a:ea typeface="+mn-ea"/>
+                <a:cs typeface="+mn-cs"/>
+              </a:rPr>
+              <a:t>Unfortunately, </a:t>
+            </a:r>
+            <a:r>
+              <a:rPr lang="en-US" sz="1200" kern="1200" dirty="0" smtClean="0">
+                <a:solidFill>
+                  <a:schemeClr val="tx1"/>
+                </a:solidFill>
+                <a:effectLst/>
+                <a:latin typeface="+mn-lt"/>
+                <a:ea typeface="+mn-ea"/>
+                <a:cs typeface="+mn-cs"/>
+              </a:rPr>
+              <a:t>easier </a:t>
+            </a:r>
+            <a:r>
+              <a:rPr lang="en-US" sz="1200" kern="1200" dirty="0" smtClean="0">
+                <a:solidFill>
+                  <a:schemeClr val="tx1"/>
+                </a:solidFill>
+                <a:effectLst/>
+                <a:latin typeface="+mn-lt"/>
+                <a:ea typeface="+mn-ea"/>
+                <a:cs typeface="+mn-cs"/>
+              </a:rPr>
+              <a:t>said than done. </a:t>
+            </a:r>
+            <a:r>
+              <a:rPr lang="en-US" sz="1200" kern="1200" dirty="0" smtClean="0">
+                <a:solidFill>
+                  <a:schemeClr val="tx1"/>
+                </a:solidFill>
+                <a:effectLst/>
+                <a:latin typeface="+mn-lt"/>
+                <a:ea typeface="+mn-ea"/>
+                <a:cs typeface="+mn-cs"/>
+              </a:rPr>
+              <a:t>MVC provides</a:t>
+            </a:r>
+            <a:r>
+              <a:rPr lang="en-US" sz="1200" kern="1200" baseline="0" dirty="0" smtClean="0">
+                <a:solidFill>
+                  <a:schemeClr val="tx1"/>
+                </a:solidFill>
+                <a:effectLst/>
+                <a:latin typeface="+mn-lt"/>
+                <a:ea typeface="+mn-ea"/>
+                <a:cs typeface="+mn-cs"/>
+              </a:rPr>
+              <a:t> a framework that we can tap into, </a:t>
+            </a:r>
+            <a:r>
+              <a:rPr lang="en-US" sz="1200" kern="1200" dirty="0" smtClean="0">
+                <a:solidFill>
+                  <a:schemeClr val="tx1"/>
+                </a:solidFill>
+                <a:effectLst/>
+                <a:latin typeface="+mn-lt"/>
+                <a:ea typeface="+mn-ea"/>
+                <a:cs typeface="+mn-cs"/>
+              </a:rPr>
+              <a:t>but</a:t>
+            </a:r>
+            <a:r>
+              <a:rPr lang="en-US" sz="1200" kern="1200" baseline="0" dirty="0" smtClean="0">
+                <a:solidFill>
+                  <a:schemeClr val="tx1"/>
+                </a:solidFill>
+                <a:effectLst/>
+                <a:latin typeface="+mn-lt"/>
+                <a:ea typeface="+mn-ea"/>
+                <a:cs typeface="+mn-cs"/>
+              </a:rPr>
+              <a:t> .N</a:t>
+            </a:r>
+            <a:r>
+              <a:rPr lang="en-US" sz="1200" kern="1200" dirty="0" smtClean="0">
+                <a:solidFill>
+                  <a:schemeClr val="tx1"/>
+                </a:solidFill>
+                <a:effectLst/>
+                <a:latin typeface="+mn-lt"/>
+                <a:ea typeface="+mn-ea"/>
+                <a:cs typeface="+mn-cs"/>
+              </a:rPr>
+              <a:t>ET doesn’t. </a:t>
+            </a:r>
+            <a:r>
+              <a:rPr lang="en-US" sz="1200" kern="1200" dirty="0" smtClean="0">
+                <a:solidFill>
+                  <a:schemeClr val="tx1"/>
+                </a:solidFill>
+                <a:effectLst/>
+                <a:latin typeface="+mn-lt"/>
+                <a:ea typeface="+mn-ea"/>
+                <a:cs typeface="+mn-cs"/>
+              </a:rPr>
+              <a:t>There’s no way to </a:t>
+            </a:r>
+            <a:r>
+              <a:rPr lang="en-US" sz="1200" i="1" kern="1200" dirty="0" smtClean="0">
+                <a:solidFill>
+                  <a:schemeClr val="tx1"/>
+                </a:solidFill>
+                <a:effectLst/>
+                <a:latin typeface="+mn-lt"/>
+                <a:ea typeface="+mn-ea"/>
+                <a:cs typeface="+mn-cs"/>
+              </a:rPr>
+              <a:t>automatically </a:t>
+            </a:r>
+            <a:r>
+              <a:rPr lang="en-US" sz="1200" kern="1200" dirty="0" smtClean="0">
+                <a:solidFill>
+                  <a:schemeClr val="tx1"/>
+                </a:solidFill>
+                <a:effectLst/>
+                <a:latin typeface="+mn-lt"/>
+                <a:ea typeface="+mn-ea"/>
+                <a:cs typeface="+mn-cs"/>
+              </a:rPr>
+              <a:t>run this code whenever someone tries to read the SSN property.</a:t>
+            </a:r>
+          </a:p>
+          <a:p>
+            <a:endParaRPr lang="en-US" sz="1200" kern="1200" dirty="0" smtClean="0">
+              <a:solidFill>
+                <a:schemeClr val="tx1"/>
+              </a:solidFill>
+              <a:effectLst/>
+              <a:latin typeface="+mn-lt"/>
+              <a:ea typeface="+mn-ea"/>
+              <a:cs typeface="+mn-cs"/>
+            </a:endParaRPr>
+          </a:p>
+          <a:p>
+            <a:r>
+              <a:rPr lang="en-US" sz="1200" kern="1200" dirty="0" smtClean="0">
+                <a:solidFill>
+                  <a:schemeClr val="tx1"/>
+                </a:solidFill>
+                <a:effectLst/>
+                <a:latin typeface="+mn-lt"/>
+                <a:ea typeface="+mn-ea"/>
+                <a:cs typeface="+mn-cs"/>
+              </a:rPr>
+              <a:t>Fortunately, we can use a really neat tool called </a:t>
+            </a:r>
+            <a:r>
               <a:rPr lang="en-US" sz="1200" kern="1200" dirty="0" err="1" smtClean="0">
                 <a:solidFill>
                   <a:schemeClr val="tx1"/>
@@ -11898,7 +12512,55 @@
                 <a:ea typeface="+mn-ea"/>
                 <a:cs typeface="+mn-cs"/>
               </a:rPr>
-              <a:t> is an Aspect Oriented Programming tool that is specifically designed to handle cross cutting concerns. It works by modifying the IL that is produced by the C# compiler in order to do things that aren’t natively supported in the language.</a:t>
+              <a:t> to </a:t>
+            </a:r>
+            <a:r>
+              <a:rPr lang="en-US" sz="1200" i="1" kern="1200" dirty="0" smtClean="0">
+                <a:solidFill>
+                  <a:schemeClr val="tx1"/>
+                </a:solidFill>
+                <a:effectLst/>
+                <a:latin typeface="+mn-lt"/>
+                <a:ea typeface="+mn-ea"/>
+                <a:cs typeface="+mn-cs"/>
+              </a:rPr>
+              <a:t>create </a:t>
+            </a:r>
+            <a:r>
+              <a:rPr lang="en-US" sz="1200" kern="1200" dirty="0" smtClean="0">
+                <a:solidFill>
+                  <a:schemeClr val="tx1"/>
+                </a:solidFill>
+                <a:effectLst/>
+                <a:latin typeface="+mn-lt"/>
+                <a:ea typeface="+mn-ea"/>
+                <a:cs typeface="+mn-cs"/>
+              </a:rPr>
+              <a:t>those hooks</a:t>
+            </a:r>
+            <a:r>
+              <a:rPr lang="en-US" sz="1200" kern="1200" dirty="0" smtClean="0">
+                <a:solidFill>
+                  <a:schemeClr val="tx1"/>
+                </a:solidFill>
+                <a:effectLst/>
+                <a:latin typeface="+mn-lt"/>
+                <a:ea typeface="+mn-ea"/>
+                <a:cs typeface="+mn-cs"/>
+              </a:rPr>
+              <a:t>. PS is an AOP tool specifically </a:t>
+            </a:r>
+            <a:r>
+              <a:rPr lang="en-US" sz="1200" kern="1200" dirty="0" smtClean="0">
+                <a:solidFill>
+                  <a:schemeClr val="tx1"/>
+                </a:solidFill>
+                <a:effectLst/>
+                <a:latin typeface="+mn-lt"/>
+                <a:ea typeface="+mn-ea"/>
+                <a:cs typeface="+mn-cs"/>
+              </a:rPr>
+              <a:t>designed to handle cross cutting concerns. It works by modifying the IL that is produced by the C# compiler in order to do things that aren’t natively supported in the language.</a:t>
             </a:r>
           </a:p>
           <a:p>
@@ -16528,103 +17190,7 @@
                 <a:ea typeface="+mn-ea"/>
                 <a:cs typeface="+mn-cs"/>
               </a:rPr>
-              <a:t>My examples of those concepts are in my sample app, which you can get from this link here. This </a:t>
-            </a:r>
-            <a:r>
-              <a:rPr lang="en-US" sz="1200" kern="1200" dirty="0" err="1" smtClean="0">
-                <a:solidFill>
-                  <a:schemeClr val="tx1"/>
-                </a:solidFill>
-                <a:effectLst/>
-                <a:latin typeface="+mn-lt"/>
-                <a:ea typeface="+mn-ea"/>
-                <a:cs typeface="+mn-cs"/>
-              </a:rPr>
-              <a:t>github</a:t>
-            </a:r>
-            <a:r>
-              <a:rPr lang="en-US" sz="1200" kern="1200" dirty="0" smtClean="0">
-                <a:solidFill>
-                  <a:schemeClr val="tx1"/>
-                </a:solidFill>
-                <a:effectLst/>
-                <a:latin typeface="+mn-lt"/>
-                <a:ea typeface="+mn-ea"/>
-                <a:cs typeface="+mn-cs"/>
-              </a:rPr>
-              <a:t> repo contains my slide deck, my speaker notes, and a fully functional sample of everything I showed you today including:</a:t>
-            </a:r>
-          </a:p>
-          <a:p>
-            <a:pPr lvl="0"/>
-            <a:r>
-              <a:rPr lang="en-US" sz="1200" kern="1200" dirty="0" smtClean="0">
-                <a:solidFill>
-                  <a:schemeClr val="tx1"/>
-                </a:solidFill>
-                <a:effectLst/>
-                <a:latin typeface="+mn-lt"/>
-                <a:ea typeface="+mn-ea"/>
-                <a:cs typeface="+mn-cs"/>
-              </a:rPr>
-              <a:t>Global CSRF defense</a:t>
-            </a:r>
-          </a:p>
-          <a:p>
-            <a:pPr lvl="0"/>
-            <a:r>
-              <a:rPr lang="en-US" sz="1200" kern="1200" dirty="0" smtClean="0">
-                <a:solidFill>
-                  <a:schemeClr val="tx1"/>
-                </a:solidFill>
-                <a:effectLst/>
-                <a:latin typeface="+mn-lt"/>
-                <a:ea typeface="+mn-ea"/>
-                <a:cs typeface="+mn-cs"/>
-              </a:rPr>
-              <a:t>MVC authentication that makes actions private, unless explicitly made public</a:t>
-            </a:r>
-          </a:p>
-          <a:p>
-            <a:pPr lvl="0"/>
-            <a:r>
-              <a:rPr lang="en-US" sz="1200" kern="1200" dirty="0" smtClean="0">
-                <a:solidFill>
-                  <a:schemeClr val="tx1"/>
-                </a:solidFill>
-                <a:effectLst/>
-                <a:latin typeface="+mn-lt"/>
-                <a:ea typeface="+mn-ea"/>
-                <a:cs typeface="+mn-cs"/>
-              </a:rPr>
-              <a:t>Row level security using SQL Server 2016 and Entity Framework</a:t>
-            </a:r>
-          </a:p>
-          <a:p>
-            <a:pPr lvl="0"/>
-            <a:r>
-              <a:rPr lang="en-US" sz="1200" kern="1200" dirty="0" smtClean="0">
-                <a:solidFill>
-                  <a:schemeClr val="tx1"/>
-                </a:solidFill>
-                <a:effectLst/>
-                <a:latin typeface="+mn-lt"/>
-                <a:ea typeface="+mn-ea"/>
-                <a:cs typeface="+mn-cs"/>
-              </a:rPr>
-              <a:t>Permission-based authorization at both the MVC action level, and on specific C# properties using </a:t>
-            </a:r>
-            <a:r>
-              <a:rPr lang="en-US" sz="1200" kern="1200" dirty="0" err="1" smtClean="0">
-                <a:solidFill>
-                  <a:schemeClr val="tx1"/>
-                </a:solidFill>
-                <a:effectLst/>
-                <a:latin typeface="+mn-lt"/>
-                <a:ea typeface="+mn-ea"/>
-                <a:cs typeface="+mn-cs"/>
-              </a:rPr>
-              <a:t>PostSharp</a:t>
+              <a:t>My examples of those concepts are in my sample app, which you can get from this link here. </a:t>
             </a:r>
             <a:endParaRPr lang="en-US" sz="1200" kern="1200" dirty="0" smtClean="0">
               <a:solidFill>
@@ -16637,33 +17203,149 @@
             </a:endParaRPr>
           </a:p>
           <a:p>
-            <a:pPr lvl="0"/>
-            <a:r>
-              <a:rPr lang="en-US" sz="1200" kern="1200" dirty="0" smtClean="0">
-                <a:solidFill>
-                  <a:schemeClr val="tx1"/>
-                </a:solidFill>
-                <a:effectLst/>
-                <a:latin typeface="+mn-lt"/>
-                <a:ea typeface="+mn-ea"/>
-                <a:cs typeface="+mn-cs"/>
-              </a:rPr>
-              <a:t>Auditing using reflection and the Approval Tests library</a:t>
-            </a:r>
-          </a:p>
-          <a:p>
-            <a:r>
-              <a:rPr lang="en-US" sz="1200" kern="1200" dirty="0" smtClean="0">
-                <a:solidFill>
-                  <a:schemeClr val="tx1"/>
-                </a:solidFill>
-                <a:effectLst/>
-                <a:latin typeface="+mn-lt"/>
-                <a:ea typeface="+mn-ea"/>
-                <a:cs typeface="+mn-cs"/>
-              </a:rPr>
-              <a:t>You can get ahold of me through GitHub, my blog, or on Twitter. I’d love to hear from you, and feel free to send a pull request if you add a technique of your own.</a:t>
-            </a:r>
+            <a:endParaRPr lang="en-US" sz="1200" kern="1200" dirty="0" smtClean="0">
+              <a:solidFill>
+                <a:schemeClr val="tx1"/>
+              </a:solidFill>
+              <a:effectLst/>
+              <a:latin typeface="+mn-lt"/>
+              <a:ea typeface="+mn-ea"/>
+              <a:cs typeface="+mn-cs"/>
+            </a:endParaRPr>
+          </a:p>
+          <a:p>
+            <a:r>
+              <a:rPr lang="en-US" sz="1200" kern="1200" dirty="0" smtClean="0">
+                <a:solidFill>
+                  <a:schemeClr val="tx1"/>
+                </a:solidFill>
+                <a:effectLst/>
+                <a:latin typeface="+mn-lt"/>
+                <a:ea typeface="+mn-ea"/>
+                <a:cs typeface="+mn-cs"/>
+              </a:rPr>
+              <a:t>This </a:t>
+            </a:r>
+            <a:r>
+              <a:rPr lang="en-US" sz="1200" kern="1200" dirty="0" err="1" smtClean="0">
+                <a:solidFill>
+                  <a:schemeClr val="tx1"/>
+                </a:solidFill>
+                <a:effectLst/>
+                <a:latin typeface="+mn-lt"/>
+                <a:ea typeface="+mn-ea"/>
+                <a:cs typeface="+mn-cs"/>
+              </a:rPr>
+              <a:t>github</a:t>
+            </a:r>
+            <a:r>
+              <a:rPr lang="en-US" sz="1200" kern="1200" dirty="0" smtClean="0">
+                <a:solidFill>
+                  <a:schemeClr val="tx1"/>
+                </a:solidFill>
+                <a:effectLst/>
+                <a:latin typeface="+mn-lt"/>
+                <a:ea typeface="+mn-ea"/>
+                <a:cs typeface="+mn-cs"/>
+              </a:rPr>
+              <a:t> repo contains my slide deck, my speaker notes, and a fully functional sample of everything I showed you </a:t>
+            </a:r>
+            <a:r>
+              <a:rPr lang="en-US" sz="1200" kern="1200" dirty="0" smtClean="0">
+                <a:solidFill>
+                  <a:schemeClr val="tx1"/>
+                </a:solidFill>
+                <a:effectLst/>
+                <a:latin typeface="+mn-lt"/>
+                <a:ea typeface="+mn-ea"/>
+                <a:cs typeface="+mn-cs"/>
+              </a:rPr>
+              <a:t>today. You</a:t>
+            </a:r>
+            <a:r>
+              <a:rPr lang="en-US" sz="1200" kern="1200" baseline="0" dirty="0" smtClean="0">
+                <a:solidFill>
+                  <a:schemeClr val="tx1"/>
+                </a:solidFill>
+                <a:effectLst/>
+                <a:latin typeface="+mn-lt"/>
+                <a:ea typeface="+mn-ea"/>
+                <a:cs typeface="+mn-cs"/>
+              </a:rPr>
+              <a:t> should be able to check it out, run the EF migration, and launch the app. There's on-screen text to walk you through using it</a:t>
+            </a:r>
+            <a:r>
+              <a:rPr lang="en-US" sz="1200" kern="1200" dirty="0" smtClean="0">
+                <a:solidFill>
+                  <a:schemeClr val="tx1"/>
+                </a:solidFill>
+                <a:effectLst/>
+                <a:latin typeface="+mn-lt"/>
+                <a:ea typeface="+mn-ea"/>
+                <a:cs typeface="+mn-cs"/>
+              </a:rPr>
+              <a:t>.</a:t>
+            </a:r>
+          </a:p>
+          <a:p>
+            <a:endParaRPr lang="en-US" sz="1200" kern="1200" dirty="0" smtClean="0">
+              <a:solidFill>
+                <a:schemeClr val="tx1"/>
+              </a:solidFill>
+              <a:effectLst/>
+              <a:latin typeface="+mn-lt"/>
+              <a:ea typeface="+mn-ea"/>
+              <a:cs typeface="+mn-cs"/>
+            </a:endParaRPr>
+          </a:p>
+          <a:p>
+            <a:r>
+              <a:rPr lang="en-US" sz="1200" kern="1200" dirty="0" smtClean="0">
+                <a:solidFill>
+                  <a:schemeClr val="tx1"/>
+                </a:solidFill>
+                <a:effectLst/>
+                <a:latin typeface="+mn-lt"/>
+                <a:ea typeface="+mn-ea"/>
+                <a:cs typeface="+mn-cs"/>
+              </a:rPr>
+              <a:t>You can get ahold of me through GitHub, my blog, or on Twitter. I’d love to hear from you, and feel free to send a pull request if you add a technique of your </a:t>
+            </a:r>
+            <a:r>
+              <a:rPr lang="en-US" sz="1200" kern="1200" smtClean="0">
+                <a:solidFill>
+                  <a:schemeClr val="tx1"/>
+                </a:solidFill>
+                <a:effectLst/>
+                <a:latin typeface="+mn-lt"/>
+                <a:ea typeface="+mn-ea"/>
+                <a:cs typeface="+mn-cs"/>
+              </a:rPr>
+              <a:t>own</a:t>
+            </a:r>
+            <a:r>
+              <a:rPr lang="en-US" sz="1200" kern="1200" smtClean="0">
+                <a:solidFill>
+                  <a:schemeClr val="tx1"/>
+                </a:solidFill>
+                <a:effectLst/>
+                <a:latin typeface="+mn-lt"/>
+                <a:ea typeface="+mn-ea"/>
+                <a:cs typeface="+mn-cs"/>
+              </a:rPr>
+              <a:t>.</a:t>
+            </a:r>
+          </a:p>
+          <a:p>
+            <a:endParaRPr lang="en-US" sz="1200" kern="1200" dirty="0" smtClean="0">
+              <a:solidFill>
+                <a:schemeClr val="tx1"/>
+              </a:solidFill>
+              <a:effectLst/>
+              <a:latin typeface="+mn-lt"/>
+              <a:ea typeface="+mn-ea"/>
+              <a:cs typeface="+mn-cs"/>
+            </a:endParaRPr>
           </a:p>
           <a:p>
             <a:r>
@@ -27124,7 +27806,15 @@
                   <a:srgbClr val="013947"/>
                 </a:solidFill>
               </a:rPr>
-              <a:t>Keeping private data private!</a:t>
+              <a:t>Down the rabbit hole with </a:t>
+            </a:r>
+            <a:r>
+              <a:rPr lang="en-US" dirty="0" err="1" smtClean="0">
+                <a:solidFill>
+                  <a:srgbClr val="013947"/>
+                </a:solidFill>
+              </a:rPr>
+              <a:t>PostSharp</a:t>
             </a:r>
             <a:endParaRPr lang="en-US" sz="4800" dirty="0">
               <a:solidFill>

</xml_diff>